<commit_message>
updates to SEM and LMEMs. Write chi and leaf N sections of results
</commit_message>
<xml_diff>
--- a/working_drafts/figs/TXeco_SEM_ppt_fig.pptx
+++ b/working_drafts/figs/TXeco_SEM_ppt_fig.pptx
@@ -5,12 +5,11 @@
     <p:sldMasterId id="2147483660" r:id="rId1"/>
   </p:sldMasterIdLst>
   <p:notesMasterIdLst>
-    <p:notesMasterId r:id="rId5"/>
+    <p:notesMasterId r:id="rId4"/>
   </p:notesMasterIdLst>
   <p:sldIdLst>
-    <p:sldId id="256" r:id="rId2"/>
-    <p:sldId id="258" r:id="rId3"/>
-    <p:sldId id="259" r:id="rId4"/>
+    <p:sldId id="258" r:id="rId2"/>
+    <p:sldId id="260" r:id="rId3"/>
   </p:sldIdLst>
   <p:sldSz cx="13716000" cy="6858000"/>
   <p:notesSz cx="6858000" cy="9144000"/>
@@ -109,6 +108,11 @@
       </a:defRPr>
     </a:lvl9pPr>
   </p:defaultTextStyle>
+  <p:extLst>
+    <p:ext uri="{EFAFB233-063F-42B5-8137-9DF3F51BA10A}">
+      <p15:sldGuideLst xmlns:p15="http://schemas.microsoft.com/office/powerpoint/2012/main"/>
+    </p:ext>
+  </p:extLst>
 </p:presentation>
 </file>
 
@@ -194,7 +198,7 @@
           <a:p>
             <a:fld id="{9C8338E3-F40D-F146-8D3B-4726E84D5200}" type="datetimeFigureOut">
               <a:rPr lang="en-US" smtClean="0"/>
-              <a:t>10/19/22</a:t>
+              <a:t>10/20/22</a:t>
             </a:fld>
             <a:endParaRPr lang="en-US"/>
           </a:p>
@@ -535,7 +539,7 @@
     </p:spTree>
     <p:extLst>
       <p:ext uri="{BB962C8B-B14F-4D97-AF65-F5344CB8AC3E}">
-        <p14:creationId xmlns:p14="http://schemas.microsoft.com/office/powerpoint/2010/main" val="479003067"/>
+        <p14:creationId xmlns:p14="http://schemas.microsoft.com/office/powerpoint/2010/main" val="1116478982"/>
       </p:ext>
     </p:extLst>
   </p:cSld>
@@ -619,91 +623,7 @@
     </p:spTree>
     <p:extLst>
       <p:ext uri="{BB962C8B-B14F-4D97-AF65-F5344CB8AC3E}">
-        <p14:creationId xmlns:p14="http://schemas.microsoft.com/office/powerpoint/2010/main" val="1116478982"/>
-      </p:ext>
-    </p:extLst>
-  </p:cSld>
-  <p:clrMapOvr>
-    <a:masterClrMapping/>
-  </p:clrMapOvr>
-</p:notes>
-</file>
-
-<file path=ppt/notesSlides/notesSlide3.xml><?xml version="1.0" encoding="utf-8"?>
-<p:notes xmlns:a="http://schemas.openxmlformats.org/drawingml/2006/main" xmlns:r="http://schemas.openxmlformats.org/officeDocument/2006/relationships" xmlns:p="http://schemas.openxmlformats.org/presentationml/2006/main">
-  <p:cSld>
-    <p:spTree>
-      <p:nvGrpSpPr>
-        <p:cNvPr id="1" name=""/>
-        <p:cNvGrpSpPr/>
-        <p:nvPr/>
-      </p:nvGrpSpPr>
-      <p:grpSpPr>
-        <a:xfrm>
-          <a:off x="0" y="0"/>
-          <a:ext cx="0" cy="0"/>
-          <a:chOff x="0" y="0"/>
-          <a:chExt cx="0" cy="0"/>
-        </a:xfrm>
-      </p:grpSpPr>
-      <p:sp>
-        <p:nvSpPr>
-          <p:cNvPr id="2" name="Slide Image Placeholder 1"/>
-          <p:cNvSpPr>
-            <a:spLocks noGrp="1" noRot="1" noChangeAspect="1"/>
-          </p:cNvSpPr>
-          <p:nvPr>
-            <p:ph type="sldImg"/>
-          </p:nvPr>
-        </p:nvSpPr>
-        <p:spPr/>
-      </p:sp>
-      <p:sp>
-        <p:nvSpPr>
-          <p:cNvPr id="3" name="Notes Placeholder 2"/>
-          <p:cNvSpPr>
-            <a:spLocks noGrp="1"/>
-          </p:cNvSpPr>
-          <p:nvPr>
-            <p:ph type="body" idx="1"/>
-          </p:nvPr>
-        </p:nvSpPr>
-        <p:spPr/>
-        <p:txBody>
-          <a:bodyPr/>
-          <a:lstStyle/>
-          <a:p>
-            <a:endParaRPr lang="en-US" dirty="0"/>
-          </a:p>
-        </p:txBody>
-      </p:sp>
-      <p:sp>
-        <p:nvSpPr>
-          <p:cNvPr id="4" name="Slide Number Placeholder 3"/>
-          <p:cNvSpPr>
-            <a:spLocks noGrp="1"/>
-          </p:cNvSpPr>
-          <p:nvPr>
-            <p:ph type="sldNum" sz="quarter" idx="5"/>
-          </p:nvPr>
-        </p:nvSpPr>
-        <p:spPr/>
-        <p:txBody>
-          <a:bodyPr/>
-          <a:lstStyle/>
-          <a:p>
-            <a:fld id="{C2800238-33D2-A44F-8135-A0F534DB873D}" type="slidenum">
-              <a:rPr lang="en-US" smtClean="0"/>
-              <a:t>3</a:t>
-            </a:fld>
-            <a:endParaRPr lang="en-US"/>
-          </a:p>
-        </p:txBody>
-      </p:sp>
-    </p:spTree>
-    <p:extLst>
-      <p:ext uri="{BB962C8B-B14F-4D97-AF65-F5344CB8AC3E}">
-        <p14:creationId xmlns:p14="http://schemas.microsoft.com/office/powerpoint/2010/main" val="1183462971"/>
+        <p14:creationId xmlns:p14="http://schemas.microsoft.com/office/powerpoint/2010/main" val="3845071394"/>
       </p:ext>
     </p:extLst>
   </p:cSld>
@@ -844,7 +764,7 @@
           <a:p>
             <a:fld id="{D3A28AA4-801E-B147-9E5C-6E6DBA6E23D1}" type="datetimeFigureOut">
               <a:rPr lang="en-US" smtClean="0"/>
-              <a:t>10/19/22</a:t>
+              <a:t>10/20/22</a:t>
             </a:fld>
             <a:endParaRPr lang="en-US"/>
           </a:p>
@@ -1014,7 +934,7 @@
           <a:p>
             <a:fld id="{D3A28AA4-801E-B147-9E5C-6E6DBA6E23D1}" type="datetimeFigureOut">
               <a:rPr lang="en-US" smtClean="0"/>
-              <a:t>10/19/22</a:t>
+              <a:t>10/20/22</a:t>
             </a:fld>
             <a:endParaRPr lang="en-US"/>
           </a:p>
@@ -1194,7 +1114,7 @@
           <a:p>
             <a:fld id="{D3A28AA4-801E-B147-9E5C-6E6DBA6E23D1}" type="datetimeFigureOut">
               <a:rPr lang="en-US" smtClean="0"/>
-              <a:t>10/19/22</a:t>
+              <a:t>10/20/22</a:t>
             </a:fld>
             <a:endParaRPr lang="en-US"/>
           </a:p>
@@ -1364,7 +1284,7 @@
           <a:p>
             <a:fld id="{D3A28AA4-801E-B147-9E5C-6E6DBA6E23D1}" type="datetimeFigureOut">
               <a:rPr lang="en-US" smtClean="0"/>
-              <a:t>10/19/22</a:t>
+              <a:t>10/20/22</a:t>
             </a:fld>
             <a:endParaRPr lang="en-US"/>
           </a:p>
@@ -1610,7 +1530,7 @@
           <a:p>
             <a:fld id="{D3A28AA4-801E-B147-9E5C-6E6DBA6E23D1}" type="datetimeFigureOut">
               <a:rPr lang="en-US" smtClean="0"/>
-              <a:t>10/19/22</a:t>
+              <a:t>10/20/22</a:t>
             </a:fld>
             <a:endParaRPr lang="en-US"/>
           </a:p>
@@ -1842,7 +1762,7 @@
           <a:p>
             <a:fld id="{D3A28AA4-801E-B147-9E5C-6E6DBA6E23D1}" type="datetimeFigureOut">
               <a:rPr lang="en-US" smtClean="0"/>
-              <a:t>10/19/22</a:t>
+              <a:t>10/20/22</a:t>
             </a:fld>
             <a:endParaRPr lang="en-US"/>
           </a:p>
@@ -2209,7 +2129,7 @@
           <a:p>
             <a:fld id="{D3A28AA4-801E-B147-9E5C-6E6DBA6E23D1}" type="datetimeFigureOut">
               <a:rPr lang="en-US" smtClean="0"/>
-              <a:t>10/19/22</a:t>
+              <a:t>10/20/22</a:t>
             </a:fld>
             <a:endParaRPr lang="en-US"/>
           </a:p>
@@ -2327,7 +2247,7 @@
           <a:p>
             <a:fld id="{D3A28AA4-801E-B147-9E5C-6E6DBA6E23D1}" type="datetimeFigureOut">
               <a:rPr lang="en-US" smtClean="0"/>
-              <a:t>10/19/22</a:t>
+              <a:t>10/20/22</a:t>
             </a:fld>
             <a:endParaRPr lang="en-US"/>
           </a:p>
@@ -2422,7 +2342,7 @@
           <a:p>
             <a:fld id="{D3A28AA4-801E-B147-9E5C-6E6DBA6E23D1}" type="datetimeFigureOut">
               <a:rPr lang="en-US" smtClean="0"/>
-              <a:t>10/19/22</a:t>
+              <a:t>10/20/22</a:t>
             </a:fld>
             <a:endParaRPr lang="en-US"/>
           </a:p>
@@ -2699,7 +2619,7 @@
           <a:p>
             <a:fld id="{D3A28AA4-801E-B147-9E5C-6E6DBA6E23D1}" type="datetimeFigureOut">
               <a:rPr lang="en-US" smtClean="0"/>
-              <a:t>10/19/22</a:t>
+              <a:t>10/20/22</a:t>
             </a:fld>
             <a:endParaRPr lang="en-US"/>
           </a:p>
@@ -2956,7 +2876,7 @@
           <a:p>
             <a:fld id="{D3A28AA4-801E-B147-9E5C-6E6DBA6E23D1}" type="datetimeFigureOut">
               <a:rPr lang="en-US" smtClean="0"/>
-              <a:t>10/19/22</a:t>
+              <a:t>10/20/22</a:t>
             </a:fld>
             <a:endParaRPr lang="en-US"/>
           </a:p>
@@ -3169,7 +3089,7 @@
           <a:p>
             <a:fld id="{D3A28AA4-801E-B147-9E5C-6E6DBA6E23D1}" type="datetimeFigureOut">
               <a:rPr lang="en-US" smtClean="0"/>
-              <a:t>10/19/22</a:t>
+              <a:t>10/20/22</a:t>
             </a:fld>
             <a:endParaRPr lang="en-US"/>
           </a:p>
@@ -3964,7 +3884,7 @@
             <a:solidFill>
               <a:srgbClr val="C00000"/>
             </a:solidFill>
-            <a:prstDash val="dash"/>
+            <a:prstDash val="solid"/>
             <a:tailEnd type="triangle"/>
           </a:ln>
         </p:spPr>
@@ -4147,6 +4067,7 @@
             <a:solidFill>
               <a:srgbClr val="C00000"/>
             </a:solidFill>
+            <a:prstDash val="dash"/>
             <a:tailEnd type="triangle"/>
           </a:ln>
         </p:spPr>
@@ -4175,6 +4096,7 @@
             </a:extLst>
           </p:cNvPr>
           <p:cNvCxnSpPr>
+            <a:cxnSpLocks/>
             <a:stCxn id="23" idx="2"/>
             <a:endCxn id="26" idx="0"/>
           </p:cNvCxnSpPr>
@@ -4323,7 +4245,9 @@
           <a:noFill/>
           <a:ln w="38100">
             <a:solidFill>
-              <a:schemeClr val="tx1"/>
+              <a:schemeClr val="tx1">
+                <a:alpha val="75000"/>
+              </a:schemeClr>
             </a:solidFill>
           </a:ln>
         </p:spPr>
@@ -4375,7 +4299,9 @@
           <a:noFill/>
           <a:ln w="38100">
             <a:solidFill>
-              <a:schemeClr val="tx1"/>
+              <a:schemeClr val="tx1">
+                <a:alpha val="75000"/>
+              </a:schemeClr>
             </a:solidFill>
           </a:ln>
         </p:spPr>
@@ -4427,7 +4353,9 @@
           <a:noFill/>
           <a:ln w="38100">
             <a:solidFill>
-              <a:schemeClr val="tx1"/>
+              <a:schemeClr val="tx1">
+                <a:alpha val="75000"/>
+              </a:schemeClr>
             </a:solidFill>
           </a:ln>
         </p:spPr>
@@ -4479,7 +4407,9 @@
           <a:noFill/>
           <a:ln w="38100">
             <a:solidFill>
-              <a:schemeClr val="tx1"/>
+              <a:schemeClr val="tx1">
+                <a:alpha val="75000"/>
+              </a:schemeClr>
             </a:solidFill>
           </a:ln>
         </p:spPr>
@@ -4531,7 +4461,9 @@
           <a:noFill/>
           <a:ln w="38100">
             <a:solidFill>
-              <a:schemeClr val="tx1"/>
+              <a:schemeClr val="tx1">
+                <a:alpha val="75000"/>
+              </a:schemeClr>
             </a:solidFill>
           </a:ln>
         </p:spPr>
@@ -4593,7 +4525,7 @@
                 <a:latin typeface="Times New Roman" panose="02020603050405020304" pitchFamily="18" charset="0"/>
                 <a:cs typeface="Times New Roman" panose="02020603050405020304" pitchFamily="18" charset="0"/>
               </a:rPr>
-              <a:t>-1.888</a:t>
+              <a:t>-1.901</a:t>
             </a:r>
           </a:p>
         </p:txBody>
@@ -4612,7 +4544,7 @@
         </p:nvSpPr>
         <p:spPr>
           <a:xfrm rot="3415512">
-            <a:off x="10036610" y="4134396"/>
+            <a:off x="10036611" y="4134396"/>
             <a:ext cx="979755" cy="461665"/>
           </a:xfrm>
           <a:prstGeom prst="rect">
@@ -4631,7 +4563,7 @@
                 <a:latin typeface="Times New Roman" panose="02020603050405020304" pitchFamily="18" charset="0"/>
                 <a:cs typeface="Times New Roman" panose="02020603050405020304" pitchFamily="18" charset="0"/>
               </a:rPr>
-              <a:t>-0.842</a:t>
+              <a:t>-0.665</a:t>
             </a:r>
           </a:p>
         </p:txBody>
@@ -4702,7 +4634,9 @@
           <a:noFill/>
           <a:ln w="38100">
             <a:solidFill>
-              <a:schemeClr val="tx1"/>
+              <a:schemeClr val="tx1">
+                <a:alpha val="75000"/>
+              </a:schemeClr>
             </a:solidFill>
           </a:ln>
         </p:spPr>
@@ -4754,7 +4688,9 @@
           <a:noFill/>
           <a:ln w="38100">
             <a:solidFill>
-              <a:schemeClr val="tx1"/>
+              <a:schemeClr val="tx1">
+                <a:alpha val="75000"/>
+              </a:schemeClr>
             </a:solidFill>
           </a:ln>
         </p:spPr>
@@ -4816,7 +4752,7 @@
                 <a:latin typeface="Times New Roman" panose="02020603050405020304" pitchFamily="18" charset="0"/>
                 <a:cs typeface="Times New Roman" panose="02020603050405020304" pitchFamily="18" charset="0"/>
               </a:rPr>
-              <a:t>0.877</a:t>
+              <a:t>1.401</a:t>
             </a:r>
           </a:p>
         </p:txBody>
@@ -4836,7 +4772,7 @@
         <p:spPr>
           <a:xfrm>
             <a:off x="4166208" y="1880106"/>
-            <a:ext cx="979755" cy="461665"/>
+            <a:ext cx="833883" cy="461665"/>
           </a:xfrm>
           <a:prstGeom prst="rect">
             <a:avLst/>
@@ -4854,7 +4790,7 @@
                 <a:latin typeface="Times New Roman" panose="02020603050405020304" pitchFamily="18" charset="0"/>
                 <a:cs typeface="Times New Roman" panose="02020603050405020304" pitchFamily="18" charset="0"/>
               </a:rPr>
-              <a:t>-0.261</a:t>
+              <a:t>-num</a:t>
             </a:r>
           </a:p>
         </p:txBody>
@@ -4874,7 +4810,7 @@
         <p:spPr>
           <a:xfrm>
             <a:off x="7707067" y="1863140"/>
-            <a:ext cx="979755" cy="461665"/>
+            <a:ext cx="886781" cy="461665"/>
           </a:xfrm>
           <a:prstGeom prst="rect">
             <a:avLst/>
@@ -4892,7 +4828,7 @@
                 <a:latin typeface="Times New Roman" panose="02020603050405020304" pitchFamily="18" charset="0"/>
                 <a:cs typeface="Times New Roman" panose="02020603050405020304" pitchFamily="18" charset="0"/>
               </a:rPr>
-              <a:t>-2.200</a:t>
+              <a:t>-num</a:t>
             </a:r>
           </a:p>
         </p:txBody>
@@ -4911,8 +4847,8 @@
         </p:nvSpPr>
         <p:spPr>
           <a:xfrm rot="20471706">
-            <a:off x="9750324" y="1764583"/>
-            <a:ext cx="979755" cy="461665"/>
+            <a:off x="9874557" y="1764583"/>
+            <a:ext cx="731290" cy="461665"/>
           </a:xfrm>
           <a:prstGeom prst="rect">
             <a:avLst/>
@@ -4930,7 +4866,7 @@
                 <a:latin typeface="Times New Roman" panose="02020603050405020304" pitchFamily="18" charset="0"/>
                 <a:cs typeface="Times New Roman" panose="02020603050405020304" pitchFamily="18" charset="0"/>
               </a:rPr>
-              <a:t>-0.645</a:t>
+              <a:t>num</a:t>
             </a:r>
           </a:p>
         </p:txBody>
@@ -4949,8 +4885,8 @@
         </p:nvSpPr>
         <p:spPr>
           <a:xfrm rot="19488555">
-            <a:off x="2081829" y="4033081"/>
-            <a:ext cx="979755" cy="461665"/>
+            <a:off x="2128316" y="4033081"/>
+            <a:ext cx="886781" cy="461665"/>
           </a:xfrm>
           <a:prstGeom prst="rect">
             <a:avLst/>
@@ -4968,7 +4904,7 @@
                 <a:latin typeface="Times New Roman" panose="02020603050405020304" pitchFamily="18" charset="0"/>
                 <a:cs typeface="Times New Roman" panose="02020603050405020304" pitchFamily="18" charset="0"/>
               </a:rPr>
-              <a:t>-3.064</a:t>
+              <a:t>-num</a:t>
             </a:r>
           </a:p>
         </p:txBody>
@@ -4987,8 +4923,8 @@
         </p:nvSpPr>
         <p:spPr>
           <a:xfrm rot="2166687">
-            <a:off x="2472656" y="2124470"/>
-            <a:ext cx="979755" cy="461665"/>
+            <a:off x="2176182" y="1910670"/>
+            <a:ext cx="833883" cy="461665"/>
           </a:xfrm>
           <a:prstGeom prst="rect">
             <a:avLst/>
@@ -5006,7 +4942,7 @@
                 <a:latin typeface="Times New Roman" panose="02020603050405020304" pitchFamily="18" charset="0"/>
                 <a:cs typeface="Times New Roman" panose="02020603050405020304" pitchFamily="18" charset="0"/>
               </a:rPr>
-              <a:t>-1.403</a:t>
+              <a:t>-num</a:t>
             </a:r>
           </a:p>
         </p:txBody>
@@ -5032,11 +4968,15 @@
             <a:avLst/>
           </a:prstGeom>
           <a:solidFill>
-            <a:schemeClr val="bg1"/>
+            <a:schemeClr val="bg1">
+              <a:alpha val="75000"/>
+            </a:schemeClr>
           </a:solidFill>
           <a:ln w="38100">
             <a:solidFill>
-              <a:schemeClr val="tx1"/>
+              <a:schemeClr val="tx1">
+                <a:alpha val="75000"/>
+              </a:schemeClr>
             </a:solidFill>
           </a:ln>
         </p:spPr>
@@ -5122,8 +5062,8 @@
         </p:nvSpPr>
         <p:spPr>
           <a:xfrm rot="2159215">
-            <a:off x="5815509" y="2045259"/>
-            <a:ext cx="1133644" cy="461665"/>
+            <a:off x="5938941" y="2045259"/>
+            <a:ext cx="886781" cy="461665"/>
           </a:xfrm>
           <a:prstGeom prst="rect">
             <a:avLst/>
@@ -5141,7 +5081,7 @@
                 <a:latin typeface="Times New Roman" panose="02020603050405020304" pitchFamily="18" charset="0"/>
                 <a:cs typeface="Times New Roman" panose="02020603050405020304" pitchFamily="18" charset="0"/>
               </a:rPr>
-              <a:t>-12.773</a:t>
+              <a:t>-num</a:t>
             </a:r>
           </a:p>
         </p:txBody>
@@ -5161,7 +5101,7 @@
         <p:spPr>
           <a:xfrm>
             <a:off x="6191367" y="2967335"/>
-            <a:ext cx="1031051" cy="461665"/>
+            <a:ext cx="784189" cy="461665"/>
           </a:xfrm>
           <a:prstGeom prst="rect">
             <a:avLst/>
@@ -5179,7 +5119,7 @@
                 <a:latin typeface="Times New Roman" panose="02020603050405020304" pitchFamily="18" charset="0"/>
                 <a:cs typeface="Times New Roman" panose="02020603050405020304" pitchFamily="18" charset="0"/>
               </a:rPr>
-              <a:t>14.005</a:t>
+              <a:t>num</a:t>
             </a:r>
           </a:p>
         </p:txBody>
@@ -5244,8 +5184,8 @@
         </p:nvSpPr>
         <p:spPr>
           <a:xfrm rot="3447489">
-            <a:off x="6422552" y="1561551"/>
-            <a:ext cx="979755" cy="461665"/>
+            <a:off x="6469039" y="1561551"/>
+            <a:ext cx="886781" cy="461665"/>
           </a:xfrm>
           <a:prstGeom prst="rect">
             <a:avLst/>
@@ -5263,24 +5203,22 @@
                 <a:latin typeface="Times New Roman" panose="02020603050405020304" pitchFamily="18" charset="0"/>
                 <a:cs typeface="Times New Roman" panose="02020603050405020304" pitchFamily="18" charset="0"/>
               </a:rPr>
-              <a:t>-9.824</a:t>
+              <a:t>-num</a:t>
             </a:r>
           </a:p>
         </p:txBody>
       </p:sp>
       <p:cxnSp>
         <p:nvCxnSpPr>
-          <p:cNvPr id="83" name="Straight Arrow Connector 82">
-            <a:extLst>
-              <a:ext uri="{FF2B5EF4-FFF2-40B4-BE49-F238E27FC236}">
-                <a16:creationId xmlns:a16="http://schemas.microsoft.com/office/drawing/2014/main" id="{5D6F173D-566F-4451-6A83-8C2662488A34}"/>
+          <p:cNvPr id="2" name="Straight Arrow Connector 1">
+            <a:extLst>
+              <a:ext uri="{FF2B5EF4-FFF2-40B4-BE49-F238E27FC236}">
+                <a16:creationId xmlns:a16="http://schemas.microsoft.com/office/drawing/2014/main" id="{82720060-A6FC-704F-8F90-E0C8FE5F764B}"/>
               </a:ext>
             </a:extLst>
           </p:cNvPr>
           <p:cNvCxnSpPr>
             <a:cxnSpLocks/>
-            <a:stCxn id="23" idx="1"/>
-            <a:endCxn id="22" idx="3"/>
           </p:cNvCxnSpPr>
           <p:nvPr/>
         </p:nvCxnSpPr>
@@ -5316,10 +5254,10 @@
       </p:cxnSp>
       <p:sp>
         <p:nvSpPr>
-          <p:cNvPr id="85" name="TextBox 84">
-            <a:extLst>
-              <a:ext uri="{FF2B5EF4-FFF2-40B4-BE49-F238E27FC236}">
-                <a16:creationId xmlns:a16="http://schemas.microsoft.com/office/drawing/2014/main" id="{384029A3-75BE-D398-7FD4-8164EFC040CF}"/>
+          <p:cNvPr id="3" name="TextBox 2">
+            <a:extLst>
+              <a:ext uri="{FF2B5EF4-FFF2-40B4-BE49-F238E27FC236}">
+                <a16:creationId xmlns:a16="http://schemas.microsoft.com/office/drawing/2014/main" id="{619B30D9-163E-1E1A-66F6-9A39C8D890EC}"/>
               </a:ext>
             </a:extLst>
           </p:cNvPr>
@@ -5329,7 +5267,7 @@
         <p:spPr>
           <a:xfrm>
             <a:off x="10013721" y="403750"/>
-            <a:ext cx="1133644" cy="461665"/>
+            <a:ext cx="784189" cy="461665"/>
           </a:xfrm>
           <a:prstGeom prst="rect">
             <a:avLst/>
@@ -5347,7 +5285,167 @@
                 <a:latin typeface="Times New Roman" panose="02020603050405020304" pitchFamily="18" charset="0"/>
                 <a:cs typeface="Times New Roman" panose="02020603050405020304" pitchFamily="18" charset="0"/>
               </a:rPr>
-              <a:t>-15.575</a:t>
+              <a:t>num</a:t>
+            </a:r>
+          </a:p>
+        </p:txBody>
+      </p:sp>
+      <p:cxnSp>
+        <p:nvCxnSpPr>
+          <p:cNvPr id="5" name="Straight Arrow Connector 4">
+            <a:extLst>
+              <a:ext uri="{FF2B5EF4-FFF2-40B4-BE49-F238E27FC236}">
+                <a16:creationId xmlns:a16="http://schemas.microsoft.com/office/drawing/2014/main" id="{38BCDA20-54E4-0205-FE26-C2E14D06C037}"/>
+              </a:ext>
+            </a:extLst>
+          </p:cNvPr>
+          <p:cNvCxnSpPr>
+            <a:stCxn id="21" idx="1"/>
+            <a:endCxn id="20" idx="3"/>
+          </p:cNvCxnSpPr>
+          <p:nvPr/>
+        </p:nvCxnSpPr>
+        <p:spPr>
+          <a:xfrm flipH="1">
+            <a:off x="2481943" y="865415"/>
+            <a:ext cx="1632858" cy="0"/>
+          </a:xfrm>
+          <a:prstGeom prst="straightConnector1">
+            <a:avLst/>
+          </a:prstGeom>
+          <a:ln w="38100">
+            <a:tailEnd type="triangle"/>
+          </a:ln>
+        </p:spPr>
+        <p:style>
+          <a:lnRef idx="1">
+            <a:schemeClr val="accent1"/>
+          </a:lnRef>
+          <a:fillRef idx="0">
+            <a:schemeClr val="accent1"/>
+          </a:fillRef>
+          <a:effectRef idx="0">
+            <a:schemeClr val="accent1"/>
+          </a:effectRef>
+          <a:fontRef idx="minor">
+            <a:schemeClr val="tx1"/>
+          </a:fontRef>
+        </p:style>
+      </p:cxnSp>
+      <p:cxnSp>
+        <p:nvCxnSpPr>
+          <p:cNvPr id="7" name="Straight Arrow Connector 6">
+            <a:extLst>
+              <a:ext uri="{FF2B5EF4-FFF2-40B4-BE49-F238E27FC236}">
+                <a16:creationId xmlns:a16="http://schemas.microsoft.com/office/drawing/2014/main" id="{59CA087A-0EC5-1F87-F1A9-20C588316628}"/>
+              </a:ext>
+            </a:extLst>
+          </p:cNvPr>
+          <p:cNvCxnSpPr>
+            <a:stCxn id="21" idx="1"/>
+            <a:endCxn id="28" idx="0"/>
+          </p:cNvCxnSpPr>
+          <p:nvPr/>
+        </p:nvCxnSpPr>
+        <p:spPr>
+          <a:xfrm flipH="1">
+            <a:off x="1491343" y="865415"/>
+            <a:ext cx="2623458" cy="4435927"/>
+          </a:xfrm>
+          <a:prstGeom prst="straightConnector1">
+            <a:avLst/>
+          </a:prstGeom>
+          <a:ln w="38100">
+            <a:tailEnd type="triangle"/>
+          </a:ln>
+        </p:spPr>
+        <p:style>
+          <a:lnRef idx="1">
+            <a:schemeClr val="accent1"/>
+          </a:lnRef>
+          <a:fillRef idx="0">
+            <a:schemeClr val="accent1"/>
+          </a:fillRef>
+          <a:effectRef idx="0">
+            <a:schemeClr val="accent1"/>
+          </a:effectRef>
+          <a:fontRef idx="minor">
+            <a:schemeClr val="tx1"/>
+          </a:fontRef>
+        </p:style>
+      </p:cxnSp>
+      <p:sp>
+        <p:nvSpPr>
+          <p:cNvPr id="8" name="TextBox 7">
+            <a:extLst>
+              <a:ext uri="{FF2B5EF4-FFF2-40B4-BE49-F238E27FC236}">
+                <a16:creationId xmlns:a16="http://schemas.microsoft.com/office/drawing/2014/main" id="{D785177C-7027-4A10-E6A3-23BF911028DE}"/>
+              </a:ext>
+            </a:extLst>
+          </p:cNvPr>
+          <p:cNvSpPr txBox="1"/>
+          <p:nvPr/>
+        </p:nvSpPr>
+        <p:spPr>
+          <a:xfrm>
+            <a:off x="2850030" y="477251"/>
+            <a:ext cx="833883" cy="461665"/>
+          </a:xfrm>
+          <a:prstGeom prst="rect">
+            <a:avLst/>
+          </a:prstGeom>
+          <a:noFill/>
+        </p:spPr>
+        <p:txBody>
+          <a:bodyPr wrap="none" rtlCol="0">
+            <a:spAutoFit/>
+          </a:bodyPr>
+          <a:lstStyle/>
+          <a:p>
+            <a:r>
+              <a:rPr lang="en-US" sz="2400" dirty="0">
+                <a:latin typeface="Times New Roman" panose="02020603050405020304" pitchFamily="18" charset="0"/>
+                <a:cs typeface="Times New Roman" panose="02020603050405020304" pitchFamily="18" charset="0"/>
+              </a:rPr>
+              <a:t>-num</a:t>
+            </a:r>
+          </a:p>
+        </p:txBody>
+      </p:sp>
+      <p:sp>
+        <p:nvSpPr>
+          <p:cNvPr id="9" name="TextBox 8">
+            <a:extLst>
+              <a:ext uri="{FF2B5EF4-FFF2-40B4-BE49-F238E27FC236}">
+                <a16:creationId xmlns:a16="http://schemas.microsoft.com/office/drawing/2014/main" id="{74C95DE5-4C17-36D7-EDBD-42ABB94D66C1}"/>
+              </a:ext>
+            </a:extLst>
+          </p:cNvPr>
+          <p:cNvSpPr txBox="1"/>
+          <p:nvPr/>
+        </p:nvSpPr>
+        <p:spPr>
+          <a:xfrm rot="17968942">
+            <a:off x="1830770" y="3356092"/>
+            <a:ext cx="833883" cy="461665"/>
+          </a:xfrm>
+          <a:prstGeom prst="rect">
+            <a:avLst/>
+          </a:prstGeom>
+          <a:noFill/>
+        </p:spPr>
+        <p:txBody>
+          <a:bodyPr wrap="none" rtlCol="0">
+            <a:spAutoFit/>
+          </a:bodyPr>
+          <a:lstStyle/>
+          <a:p>
+            <a:r>
+              <a:rPr lang="en-US" sz="2400" dirty="0">
+                <a:latin typeface="Times New Roman" panose="02020603050405020304" pitchFamily="18" charset="0"/>
+                <a:cs typeface="Times New Roman" panose="02020603050405020304" pitchFamily="18" charset="0"/>
+              </a:rPr>
+              <a:t>-num</a:t>
             </a:r>
           </a:p>
         </p:txBody>
@@ -5355,7 +5453,7 @@
     </p:spTree>
     <p:extLst>
       <p:ext uri="{BB962C8B-B14F-4D97-AF65-F5344CB8AC3E}">
-        <p14:creationId xmlns:p14="http://schemas.microsoft.com/office/powerpoint/2010/main" val="2458809744"/>
+        <p14:creationId xmlns:p14="http://schemas.microsoft.com/office/powerpoint/2010/main" val="3515727378"/>
       </p:ext>
     </p:extLst>
   </p:cSld>
@@ -5405,7 +5503,7 @@
           <a:prstGeom prst="straightConnector1">
             <a:avLst/>
           </a:prstGeom>
-          <a:ln w="38100">
+          <a:ln w="102870">
             <a:tailEnd type="triangle"/>
           </a:ln>
         </p:spPr>
@@ -5768,11 +5866,11 @@
           <a:prstGeom prst="straightConnector1">
             <a:avLst/>
           </a:prstGeom>
-          <a:ln w="38100">
+          <a:ln w="40386">
             <a:solidFill>
               <a:srgbClr val="C00000"/>
             </a:solidFill>
-            <a:prstDash val="dash"/>
+            <a:prstDash val="solid"/>
             <a:tailEnd type="triangle"/>
           </a:ln>
         </p:spPr>
@@ -5815,7 +5913,7 @@
           <a:prstGeom prst="straightConnector1">
             <a:avLst/>
           </a:prstGeom>
-          <a:ln w="38100">
+          <a:ln w="52197">
             <a:solidFill>
               <a:srgbClr val="C00000"/>
             </a:solidFill>
@@ -5860,7 +5958,7 @@
           <a:prstGeom prst="straightConnector1">
             <a:avLst/>
           </a:prstGeom>
-          <a:ln w="38100">
+          <a:ln w="32384">
             <a:solidFill>
               <a:srgbClr val="C00000"/>
             </a:solidFill>
@@ -5906,7 +6004,7 @@
           <a:prstGeom prst="straightConnector1">
             <a:avLst/>
           </a:prstGeom>
-          <a:ln w="38100">
+          <a:ln w="86106">
             <a:solidFill>
               <a:srgbClr val="C00000"/>
             </a:solidFill>
@@ -5951,10 +6049,11 @@
           <a:prstGeom prst="straightConnector1">
             <a:avLst/>
           </a:prstGeom>
-          <a:ln w="38100">
+          <a:ln w="34290">
             <a:solidFill>
               <a:srgbClr val="C00000"/>
             </a:solidFill>
+            <a:prstDash val="dash"/>
             <a:tailEnd type="triangle"/>
           </a:ln>
         </p:spPr>
@@ -5983,6 +6082,7 @@
             </a:extLst>
           </p:cNvPr>
           <p:cNvCxnSpPr>
+            <a:cxnSpLocks/>
             <a:stCxn id="23" idx="2"/>
             <a:endCxn id="26" idx="0"/>
           </p:cNvCxnSpPr>
@@ -5996,7 +6096,7 @@
           <a:prstGeom prst="straightConnector1">
             <a:avLst/>
           </a:prstGeom>
-          <a:ln w="38100">
+          <a:ln w="31496">
             <a:prstDash val="dash"/>
             <a:tailEnd type="triangle"/>
           </a:ln>
@@ -6040,7 +6140,7 @@
           <a:prstGeom prst="straightConnector1">
             <a:avLst/>
           </a:prstGeom>
-          <a:ln w="38100">
+          <a:ln w="30988">
             <a:solidFill>
               <a:srgbClr val="C00000"/>
             </a:solidFill>
@@ -6086,7 +6186,7 @@
           <a:prstGeom prst="straightConnector1">
             <a:avLst/>
           </a:prstGeom>
-          <a:ln w="17780">
+          <a:ln w="38100">
             <a:solidFill>
               <a:srgbClr val="C00000"/>
             </a:solidFill>
@@ -6131,7 +6231,9 @@
           <a:noFill/>
           <a:ln w="38100">
             <a:solidFill>
-              <a:schemeClr val="tx1"/>
+              <a:schemeClr val="tx1">
+                <a:alpha val="75000"/>
+              </a:schemeClr>
             </a:solidFill>
           </a:ln>
         </p:spPr>
@@ -6162,10 +6264,10 @@
       </p:sp>
       <p:sp>
         <p:nvSpPr>
-          <p:cNvPr id="21" name="Rectangle 20">
-            <a:extLst>
-              <a:ext uri="{FF2B5EF4-FFF2-40B4-BE49-F238E27FC236}">
-                <a16:creationId xmlns:a16="http://schemas.microsoft.com/office/drawing/2014/main" id="{2A451EDF-2134-D951-F607-AE0DC624C032}"/>
+          <p:cNvPr id="22" name="Rectangle 21">
+            <a:extLst>
+              <a:ext uri="{FF2B5EF4-FFF2-40B4-BE49-F238E27FC236}">
+                <a16:creationId xmlns:a16="http://schemas.microsoft.com/office/drawing/2014/main" id="{295B61D5-3809-B67F-F28A-43F8F95032C1}"/>
               </a:ext>
             </a:extLst>
           </p:cNvPr>
@@ -6174,7 +6276,7 @@
         </p:nvSpPr>
         <p:spPr>
           <a:xfrm>
-            <a:off x="4114801" y="174172"/>
+            <a:off x="7728859" y="174172"/>
             <a:ext cx="1981200" cy="1382486"/>
           </a:xfrm>
           <a:prstGeom prst="rect">
@@ -6183,7 +6285,9 @@
           <a:noFill/>
           <a:ln w="38100">
             <a:solidFill>
-              <a:schemeClr val="tx1"/>
+              <a:schemeClr val="tx1">
+                <a:alpha val="75000"/>
+              </a:schemeClr>
             </a:solidFill>
           </a:ln>
         </p:spPr>
@@ -6214,10 +6318,10 @@
       </p:sp>
       <p:sp>
         <p:nvSpPr>
-          <p:cNvPr id="22" name="Rectangle 21">
-            <a:extLst>
-              <a:ext uri="{FF2B5EF4-FFF2-40B4-BE49-F238E27FC236}">
-                <a16:creationId xmlns:a16="http://schemas.microsoft.com/office/drawing/2014/main" id="{295B61D5-3809-B67F-F28A-43F8F95032C1}"/>
+          <p:cNvPr id="23" name="Rectangle 22">
+            <a:extLst>
+              <a:ext uri="{FF2B5EF4-FFF2-40B4-BE49-F238E27FC236}">
+                <a16:creationId xmlns:a16="http://schemas.microsoft.com/office/drawing/2014/main" id="{542EBF9B-B494-6BAC-662C-17157CAC7101}"/>
               </a:ext>
             </a:extLst>
           </p:cNvPr>
@@ -6226,7 +6330,7 @@
         </p:nvSpPr>
         <p:spPr>
           <a:xfrm>
-            <a:off x="7728859" y="174172"/>
+            <a:off x="11342917" y="174172"/>
             <a:ext cx="1981200" cy="1382486"/>
           </a:xfrm>
           <a:prstGeom prst="rect">
@@ -6235,7 +6339,9 @@
           <a:noFill/>
           <a:ln w="38100">
             <a:solidFill>
-              <a:schemeClr val="tx1"/>
+              <a:schemeClr val="tx1">
+                <a:alpha val="75000"/>
+              </a:schemeClr>
             </a:solidFill>
           </a:ln>
         </p:spPr>
@@ -6266,10 +6372,10 @@
       </p:sp>
       <p:sp>
         <p:nvSpPr>
-          <p:cNvPr id="23" name="Rectangle 22">
-            <a:extLst>
-              <a:ext uri="{FF2B5EF4-FFF2-40B4-BE49-F238E27FC236}">
-                <a16:creationId xmlns:a16="http://schemas.microsoft.com/office/drawing/2014/main" id="{542EBF9B-B494-6BAC-662C-17157CAC7101}"/>
+          <p:cNvPr id="25" name="Rectangle 24">
+            <a:extLst>
+              <a:ext uri="{FF2B5EF4-FFF2-40B4-BE49-F238E27FC236}">
+                <a16:creationId xmlns:a16="http://schemas.microsoft.com/office/drawing/2014/main" id="{82AC0384-6387-7D57-8EB4-896E679A9F4F}"/>
               </a:ext>
             </a:extLst>
           </p:cNvPr>
@@ -6278,7 +6384,7 @@
         </p:nvSpPr>
         <p:spPr>
           <a:xfrm>
-            <a:off x="11342917" y="174172"/>
+            <a:off x="4114801" y="2737757"/>
             <a:ext cx="1981200" cy="1382486"/>
           </a:xfrm>
           <a:prstGeom prst="rect">
@@ -6287,7 +6393,9 @@
           <a:noFill/>
           <a:ln w="38100">
             <a:solidFill>
-              <a:schemeClr val="tx1"/>
+              <a:schemeClr val="tx1">
+                <a:alpha val="75000"/>
+              </a:schemeClr>
             </a:solidFill>
           </a:ln>
         </p:spPr>
@@ -6318,10 +6426,129 @@
       </p:sp>
       <p:sp>
         <p:nvSpPr>
-          <p:cNvPr id="25" name="Rectangle 24">
-            <a:extLst>
-              <a:ext uri="{FF2B5EF4-FFF2-40B4-BE49-F238E27FC236}">
-                <a16:creationId xmlns:a16="http://schemas.microsoft.com/office/drawing/2014/main" id="{82AC0384-6387-7D57-8EB4-896E679A9F4F}"/>
+          <p:cNvPr id="61" name="TextBox 60">
+            <a:extLst>
+              <a:ext uri="{FF2B5EF4-FFF2-40B4-BE49-F238E27FC236}">
+                <a16:creationId xmlns:a16="http://schemas.microsoft.com/office/drawing/2014/main" id="{B6476535-A95E-90F0-63CA-BA795134B48E}"/>
+              </a:ext>
+            </a:extLst>
+          </p:cNvPr>
+          <p:cNvSpPr txBox="1"/>
+          <p:nvPr/>
+        </p:nvSpPr>
+        <p:spPr>
+          <a:xfrm rot="980213">
+            <a:off x="7774010" y="4647571"/>
+            <a:ext cx="979755" cy="461665"/>
+          </a:xfrm>
+          <a:prstGeom prst="rect">
+            <a:avLst/>
+          </a:prstGeom>
+          <a:noFill/>
+        </p:spPr>
+        <p:txBody>
+          <a:bodyPr wrap="none" rtlCol="0">
+            <a:spAutoFit/>
+          </a:bodyPr>
+          <a:lstStyle/>
+          <a:p>
+            <a:r>
+              <a:rPr lang="en-US" sz="2400" b="1" dirty="0">
+                <a:latin typeface="Times New Roman" panose="02020603050405020304" pitchFamily="18" charset="0"/>
+                <a:cs typeface="Times New Roman" panose="02020603050405020304" pitchFamily="18" charset="0"/>
+              </a:rPr>
+              <a:t>-1.901</a:t>
+            </a:r>
+          </a:p>
+        </p:txBody>
+      </p:sp>
+      <p:sp>
+        <p:nvSpPr>
+          <p:cNvPr id="62" name="TextBox 61">
+            <a:extLst>
+              <a:ext uri="{FF2B5EF4-FFF2-40B4-BE49-F238E27FC236}">
+                <a16:creationId xmlns:a16="http://schemas.microsoft.com/office/drawing/2014/main" id="{404C6F6B-8168-572F-555D-2085A3A08B93}"/>
+              </a:ext>
+            </a:extLst>
+          </p:cNvPr>
+          <p:cNvSpPr txBox="1"/>
+          <p:nvPr/>
+        </p:nvSpPr>
+        <p:spPr>
+          <a:xfrm rot="3415512">
+            <a:off x="10036611" y="4134396"/>
+            <a:ext cx="979755" cy="461665"/>
+          </a:xfrm>
+          <a:prstGeom prst="rect">
+            <a:avLst/>
+          </a:prstGeom>
+          <a:noFill/>
+        </p:spPr>
+        <p:txBody>
+          <a:bodyPr wrap="none" rtlCol="0">
+            <a:spAutoFit/>
+          </a:bodyPr>
+          <a:lstStyle/>
+          <a:p>
+            <a:r>
+              <a:rPr lang="en-US" sz="2400" dirty="0">
+                <a:latin typeface="Times New Roman" panose="02020603050405020304" pitchFamily="18" charset="0"/>
+                <a:cs typeface="Times New Roman" panose="02020603050405020304" pitchFamily="18" charset="0"/>
+              </a:rPr>
+              <a:t>-0.665</a:t>
+            </a:r>
+          </a:p>
+        </p:txBody>
+      </p:sp>
+      <p:cxnSp>
+        <p:nvCxnSpPr>
+          <p:cNvPr id="64" name="Straight Arrow Connector 63">
+            <a:extLst>
+              <a:ext uri="{FF2B5EF4-FFF2-40B4-BE49-F238E27FC236}">
+                <a16:creationId xmlns:a16="http://schemas.microsoft.com/office/drawing/2014/main" id="{D3B8F594-F70C-BDE3-4E93-D81CE05CBF26}"/>
+              </a:ext>
+            </a:extLst>
+          </p:cNvPr>
+          <p:cNvCxnSpPr>
+            <a:stCxn id="28" idx="3"/>
+            <a:endCxn id="31" idx="1"/>
+          </p:cNvCxnSpPr>
+          <p:nvPr/>
+        </p:nvCxnSpPr>
+        <p:spPr>
+          <a:xfrm>
+            <a:off x="2481943" y="5992585"/>
+            <a:ext cx="8860974" cy="0"/>
+          </a:xfrm>
+          <a:prstGeom prst="straightConnector1">
+            <a:avLst/>
+          </a:prstGeom>
+          <a:ln w="35052">
+            <a:prstDash val="dash"/>
+            <a:tailEnd type="triangle"/>
+          </a:ln>
+        </p:spPr>
+        <p:style>
+          <a:lnRef idx="1">
+            <a:schemeClr val="accent1"/>
+          </a:lnRef>
+          <a:fillRef idx="0">
+            <a:schemeClr val="accent1"/>
+          </a:fillRef>
+          <a:effectRef idx="0">
+            <a:schemeClr val="accent1"/>
+          </a:effectRef>
+          <a:fontRef idx="minor">
+            <a:schemeClr val="tx1"/>
+          </a:fontRef>
+        </p:style>
+      </p:cxnSp>
+      <p:sp>
+        <p:nvSpPr>
+          <p:cNvPr id="28" name="Rectangle 27">
+            <a:extLst>
+              <a:ext uri="{FF2B5EF4-FFF2-40B4-BE49-F238E27FC236}">
+                <a16:creationId xmlns:a16="http://schemas.microsoft.com/office/drawing/2014/main" id="{CBB2489F-CBFE-304D-76D5-6A05865A7B18}"/>
               </a:ext>
             </a:extLst>
           </p:cNvPr>
@@ -6330,7 +6557,7 @@
         </p:nvSpPr>
         <p:spPr>
           <a:xfrm>
-            <a:off x="4114801" y="2737757"/>
+            <a:off x="500743" y="5301342"/>
             <a:ext cx="1981200" cy="1382486"/>
           </a:xfrm>
           <a:prstGeom prst="rect">
@@ -6339,7 +6566,9 @@
           <a:noFill/>
           <a:ln w="38100">
             <a:solidFill>
-              <a:schemeClr val="tx1"/>
+              <a:schemeClr val="tx1">
+                <a:alpha val="75000"/>
+              </a:schemeClr>
             </a:solidFill>
           </a:ln>
         </p:spPr>
@@ -6370,129 +6599,10 @@
       </p:sp>
       <p:sp>
         <p:nvSpPr>
-          <p:cNvPr id="61" name="TextBox 60">
-            <a:extLst>
-              <a:ext uri="{FF2B5EF4-FFF2-40B4-BE49-F238E27FC236}">
-                <a16:creationId xmlns:a16="http://schemas.microsoft.com/office/drawing/2014/main" id="{B6476535-A95E-90F0-63CA-BA795134B48E}"/>
-              </a:ext>
-            </a:extLst>
-          </p:cNvPr>
-          <p:cNvSpPr txBox="1"/>
-          <p:nvPr/>
-        </p:nvSpPr>
-        <p:spPr>
-          <a:xfrm rot="980213">
-            <a:off x="7871793" y="4647571"/>
-            <a:ext cx="784189" cy="461665"/>
-          </a:xfrm>
-          <a:prstGeom prst="rect">
-            <a:avLst/>
-          </a:prstGeom>
-          <a:noFill/>
-        </p:spPr>
-        <p:txBody>
-          <a:bodyPr wrap="none" rtlCol="0">
-            <a:spAutoFit/>
-          </a:bodyPr>
-          <a:lstStyle/>
-          <a:p>
-            <a:r>
-              <a:rPr lang="en-US" sz="2400" b="1" dirty="0">
-                <a:latin typeface="Times New Roman" panose="02020603050405020304" pitchFamily="18" charset="0"/>
-                <a:cs typeface="Times New Roman" panose="02020603050405020304" pitchFamily="18" charset="0"/>
-              </a:rPr>
-              <a:t>num</a:t>
-            </a:r>
-          </a:p>
-        </p:txBody>
-      </p:sp>
-      <p:sp>
-        <p:nvSpPr>
-          <p:cNvPr id="62" name="TextBox 61">
-            <a:extLst>
-              <a:ext uri="{FF2B5EF4-FFF2-40B4-BE49-F238E27FC236}">
-                <a16:creationId xmlns:a16="http://schemas.microsoft.com/office/drawing/2014/main" id="{404C6F6B-8168-572F-555D-2085A3A08B93}"/>
-              </a:ext>
-            </a:extLst>
-          </p:cNvPr>
-          <p:cNvSpPr txBox="1"/>
-          <p:nvPr/>
-        </p:nvSpPr>
-        <p:spPr>
-          <a:xfrm rot="3415512">
-            <a:off x="10160843" y="4134396"/>
-            <a:ext cx="731290" cy="461665"/>
-          </a:xfrm>
-          <a:prstGeom prst="rect">
-            <a:avLst/>
-          </a:prstGeom>
-          <a:noFill/>
-        </p:spPr>
-        <p:txBody>
-          <a:bodyPr wrap="none" rtlCol="0">
-            <a:spAutoFit/>
-          </a:bodyPr>
-          <a:lstStyle/>
-          <a:p>
-            <a:r>
-              <a:rPr lang="en-US" sz="2400" dirty="0">
-                <a:latin typeface="Times New Roman" panose="02020603050405020304" pitchFamily="18" charset="0"/>
-                <a:cs typeface="Times New Roman" panose="02020603050405020304" pitchFamily="18" charset="0"/>
-              </a:rPr>
-              <a:t>num</a:t>
-            </a:r>
-          </a:p>
-        </p:txBody>
-      </p:sp>
-      <p:cxnSp>
-        <p:nvCxnSpPr>
-          <p:cNvPr id="64" name="Straight Arrow Connector 63">
-            <a:extLst>
-              <a:ext uri="{FF2B5EF4-FFF2-40B4-BE49-F238E27FC236}">
-                <a16:creationId xmlns:a16="http://schemas.microsoft.com/office/drawing/2014/main" id="{D3B8F594-F70C-BDE3-4E93-D81CE05CBF26}"/>
-              </a:ext>
-            </a:extLst>
-          </p:cNvPr>
-          <p:cNvCxnSpPr>
-            <a:stCxn id="28" idx="3"/>
-            <a:endCxn id="31" idx="1"/>
-          </p:cNvCxnSpPr>
-          <p:nvPr/>
-        </p:nvCxnSpPr>
-        <p:spPr>
-          <a:xfrm>
-            <a:off x="2481943" y="5992585"/>
-            <a:ext cx="8860974" cy="0"/>
-          </a:xfrm>
-          <a:prstGeom prst="straightConnector1">
-            <a:avLst/>
-          </a:prstGeom>
-          <a:ln w="38100">
-            <a:prstDash val="dash"/>
-            <a:tailEnd type="triangle"/>
-          </a:ln>
-        </p:spPr>
-        <p:style>
-          <a:lnRef idx="1">
-            <a:schemeClr val="accent1"/>
-          </a:lnRef>
-          <a:fillRef idx="0">
-            <a:schemeClr val="accent1"/>
-          </a:fillRef>
-          <a:effectRef idx="0">
-            <a:schemeClr val="accent1"/>
-          </a:effectRef>
-          <a:fontRef idx="minor">
-            <a:schemeClr val="tx1"/>
-          </a:fontRef>
-        </p:style>
-      </p:cxnSp>
-      <p:sp>
-        <p:nvSpPr>
-          <p:cNvPr id="28" name="Rectangle 27">
-            <a:extLst>
-              <a:ext uri="{FF2B5EF4-FFF2-40B4-BE49-F238E27FC236}">
-                <a16:creationId xmlns:a16="http://schemas.microsoft.com/office/drawing/2014/main" id="{CBB2489F-CBFE-304D-76D5-6A05865A7B18}"/>
+          <p:cNvPr id="31" name="Rectangle 30">
+            <a:extLst>
+              <a:ext uri="{FF2B5EF4-FFF2-40B4-BE49-F238E27FC236}">
+                <a16:creationId xmlns:a16="http://schemas.microsoft.com/office/drawing/2014/main" id="{8B74F445-A52C-CC92-5C9F-26A6C584DFB7}"/>
               </a:ext>
             </a:extLst>
           </p:cNvPr>
@@ -6501,7 +6611,7 @@
         </p:nvSpPr>
         <p:spPr>
           <a:xfrm>
-            <a:off x="500743" y="5301342"/>
+            <a:off x="11342917" y="5301342"/>
             <a:ext cx="1981200" cy="1382486"/>
           </a:xfrm>
           <a:prstGeom prst="rect">
@@ -6510,7 +6620,9 @@
           <a:noFill/>
           <a:ln w="38100">
             <a:solidFill>
-              <a:schemeClr val="tx1"/>
+              <a:schemeClr val="tx1">
+                <a:alpha val="75000"/>
+              </a:schemeClr>
             </a:solidFill>
           </a:ln>
         </p:spPr>
@@ -6541,10 +6653,238 @@
       </p:sp>
       <p:sp>
         <p:nvSpPr>
-          <p:cNvPr id="31" name="Rectangle 30">
-            <a:extLst>
-              <a:ext uri="{FF2B5EF4-FFF2-40B4-BE49-F238E27FC236}">
-                <a16:creationId xmlns:a16="http://schemas.microsoft.com/office/drawing/2014/main" id="{8B74F445-A52C-CC92-5C9F-26A6C584DFB7}"/>
+          <p:cNvPr id="65" name="TextBox 64">
+            <a:extLst>
+              <a:ext uri="{FF2B5EF4-FFF2-40B4-BE49-F238E27FC236}">
+                <a16:creationId xmlns:a16="http://schemas.microsoft.com/office/drawing/2014/main" id="{E3249D2D-816D-5F0E-F2BB-AF171B3C9197}"/>
+              </a:ext>
+            </a:extLst>
+          </p:cNvPr>
+          <p:cNvSpPr txBox="1"/>
+          <p:nvPr/>
+        </p:nvSpPr>
+        <p:spPr>
+          <a:xfrm>
+            <a:off x="6419418" y="5530920"/>
+            <a:ext cx="877163" cy="461665"/>
+          </a:xfrm>
+          <a:prstGeom prst="rect">
+            <a:avLst/>
+          </a:prstGeom>
+          <a:noFill/>
+        </p:spPr>
+        <p:txBody>
+          <a:bodyPr wrap="none" rtlCol="0">
+            <a:spAutoFit/>
+          </a:bodyPr>
+          <a:lstStyle/>
+          <a:p>
+            <a:r>
+              <a:rPr lang="en-US" sz="2400" dirty="0">
+                <a:latin typeface="Times New Roman" panose="02020603050405020304" pitchFamily="18" charset="0"/>
+                <a:cs typeface="Times New Roman" panose="02020603050405020304" pitchFamily="18" charset="0"/>
+              </a:rPr>
+              <a:t>1.401</a:t>
+            </a:r>
+          </a:p>
+        </p:txBody>
+      </p:sp>
+      <p:sp>
+        <p:nvSpPr>
+          <p:cNvPr id="66" name="TextBox 65">
+            <a:extLst>
+              <a:ext uri="{FF2B5EF4-FFF2-40B4-BE49-F238E27FC236}">
+                <a16:creationId xmlns:a16="http://schemas.microsoft.com/office/drawing/2014/main" id="{CDC511E2-E7BC-E1E3-726E-BF5800A2DFCF}"/>
+              </a:ext>
+            </a:extLst>
+          </p:cNvPr>
+          <p:cNvSpPr txBox="1"/>
+          <p:nvPr/>
+        </p:nvSpPr>
+        <p:spPr>
+          <a:xfrm>
+            <a:off x="4166208" y="1880106"/>
+            <a:ext cx="979755" cy="461665"/>
+          </a:xfrm>
+          <a:prstGeom prst="rect">
+            <a:avLst/>
+          </a:prstGeom>
+          <a:noFill/>
+        </p:spPr>
+        <p:txBody>
+          <a:bodyPr wrap="none" rtlCol="0">
+            <a:spAutoFit/>
+          </a:bodyPr>
+          <a:lstStyle/>
+          <a:p>
+            <a:r>
+              <a:rPr lang="en-US" sz="2400" dirty="0">
+                <a:latin typeface="Times New Roman" panose="02020603050405020304" pitchFamily="18" charset="0"/>
+                <a:cs typeface="Times New Roman" panose="02020603050405020304" pitchFamily="18" charset="0"/>
+              </a:rPr>
+              <a:t>-0.916</a:t>
+            </a:r>
+          </a:p>
+        </p:txBody>
+      </p:sp>
+      <p:sp>
+        <p:nvSpPr>
+          <p:cNvPr id="67" name="TextBox 66">
+            <a:extLst>
+              <a:ext uri="{FF2B5EF4-FFF2-40B4-BE49-F238E27FC236}">
+                <a16:creationId xmlns:a16="http://schemas.microsoft.com/office/drawing/2014/main" id="{29C6D649-5026-A7FB-331D-7FBB55BE561E}"/>
+              </a:ext>
+            </a:extLst>
+          </p:cNvPr>
+          <p:cNvSpPr txBox="1"/>
+          <p:nvPr/>
+        </p:nvSpPr>
+        <p:spPr>
+          <a:xfrm>
+            <a:off x="7707067" y="1863140"/>
+            <a:ext cx="979755" cy="461665"/>
+          </a:xfrm>
+          <a:prstGeom prst="rect">
+            <a:avLst/>
+          </a:prstGeom>
+          <a:noFill/>
+        </p:spPr>
+        <p:txBody>
+          <a:bodyPr wrap="none" rtlCol="0">
+            <a:spAutoFit/>
+          </a:bodyPr>
+          <a:lstStyle/>
+          <a:p>
+            <a:r>
+              <a:rPr lang="en-US" sz="2400" dirty="0">
+                <a:latin typeface="Times New Roman" panose="02020603050405020304" pitchFamily="18" charset="0"/>
+                <a:cs typeface="Times New Roman" panose="02020603050405020304" pitchFamily="18" charset="0"/>
+              </a:rPr>
+              <a:t>-1.223</a:t>
+            </a:r>
+          </a:p>
+        </p:txBody>
+      </p:sp>
+      <p:sp>
+        <p:nvSpPr>
+          <p:cNvPr id="68" name="TextBox 67">
+            <a:extLst>
+              <a:ext uri="{FF2B5EF4-FFF2-40B4-BE49-F238E27FC236}">
+                <a16:creationId xmlns:a16="http://schemas.microsoft.com/office/drawing/2014/main" id="{6430202A-4CDC-8603-E936-050364B5EB15}"/>
+              </a:ext>
+            </a:extLst>
+          </p:cNvPr>
+          <p:cNvSpPr txBox="1"/>
+          <p:nvPr/>
+        </p:nvSpPr>
+        <p:spPr>
+          <a:xfrm rot="20471706">
+            <a:off x="9801621" y="1764583"/>
+            <a:ext cx="877163" cy="461665"/>
+          </a:xfrm>
+          <a:prstGeom prst="rect">
+            <a:avLst/>
+          </a:prstGeom>
+          <a:noFill/>
+        </p:spPr>
+        <p:txBody>
+          <a:bodyPr wrap="none" rtlCol="0">
+            <a:spAutoFit/>
+          </a:bodyPr>
+          <a:lstStyle/>
+          <a:p>
+            <a:r>
+              <a:rPr lang="en-US" sz="2400" dirty="0">
+                <a:latin typeface="Times New Roman" panose="02020603050405020304" pitchFamily="18" charset="0"/>
+                <a:cs typeface="Times New Roman" panose="02020603050405020304" pitchFamily="18" charset="0"/>
+              </a:rPr>
+              <a:t>0.755</a:t>
+            </a:r>
+          </a:p>
+        </p:txBody>
+      </p:sp>
+      <p:sp>
+        <p:nvSpPr>
+          <p:cNvPr id="69" name="TextBox 68">
+            <a:extLst>
+              <a:ext uri="{FF2B5EF4-FFF2-40B4-BE49-F238E27FC236}">
+                <a16:creationId xmlns:a16="http://schemas.microsoft.com/office/drawing/2014/main" id="{D042879D-AA23-A303-5FF7-5CDCB1157B5A}"/>
+              </a:ext>
+            </a:extLst>
+          </p:cNvPr>
+          <p:cNvSpPr txBox="1"/>
+          <p:nvPr/>
+        </p:nvSpPr>
+        <p:spPr>
+          <a:xfrm rot="19488555">
+            <a:off x="2081829" y="4033081"/>
+            <a:ext cx="979755" cy="461665"/>
+          </a:xfrm>
+          <a:prstGeom prst="rect">
+            <a:avLst/>
+          </a:prstGeom>
+          <a:noFill/>
+        </p:spPr>
+        <p:txBody>
+          <a:bodyPr wrap="none" rtlCol="0">
+            <a:spAutoFit/>
+          </a:bodyPr>
+          <a:lstStyle/>
+          <a:p>
+            <a:r>
+              <a:rPr lang="en-US" sz="2400" b="1" dirty="0">
+                <a:latin typeface="Times New Roman" panose="02020603050405020304" pitchFamily="18" charset="0"/>
+                <a:cs typeface="Times New Roman" panose="02020603050405020304" pitchFamily="18" charset="0"/>
+              </a:rPr>
+              <a:t>-4.329</a:t>
+            </a:r>
+          </a:p>
+        </p:txBody>
+      </p:sp>
+      <p:sp>
+        <p:nvSpPr>
+          <p:cNvPr id="71" name="TextBox 70">
+            <a:extLst>
+              <a:ext uri="{FF2B5EF4-FFF2-40B4-BE49-F238E27FC236}">
+                <a16:creationId xmlns:a16="http://schemas.microsoft.com/office/drawing/2014/main" id="{F44F4BFA-CE4A-DC03-9C24-80E4A8CDECE9}"/>
+              </a:ext>
+            </a:extLst>
+          </p:cNvPr>
+          <p:cNvSpPr txBox="1"/>
+          <p:nvPr/>
+        </p:nvSpPr>
+        <p:spPr>
+          <a:xfrm rot="2166687">
+            <a:off x="2103246" y="1910670"/>
+            <a:ext cx="979755" cy="461665"/>
+          </a:xfrm>
+          <a:prstGeom prst="rect">
+            <a:avLst/>
+          </a:prstGeom>
+          <a:noFill/>
+        </p:spPr>
+        <p:txBody>
+          <a:bodyPr wrap="none" rtlCol="0">
+            <a:spAutoFit/>
+          </a:bodyPr>
+          <a:lstStyle/>
+          <a:p>
+            <a:r>
+              <a:rPr lang="en-US" sz="2400" b="1" dirty="0">
+                <a:latin typeface="Times New Roman" panose="02020603050405020304" pitchFamily="18" charset="0"/>
+                <a:cs typeface="Times New Roman" panose="02020603050405020304" pitchFamily="18" charset="0"/>
+              </a:rPr>
+              <a:t>-2.280</a:t>
+            </a:r>
+          </a:p>
+        </p:txBody>
+      </p:sp>
+      <p:sp>
+        <p:nvSpPr>
+          <p:cNvPr id="26" name="Rectangle 25">
+            <a:extLst>
+              <a:ext uri="{FF2B5EF4-FFF2-40B4-BE49-F238E27FC236}">
+                <a16:creationId xmlns:a16="http://schemas.microsoft.com/office/drawing/2014/main" id="{B55C58BF-B54E-BA2F-D111-5037A627D595}"/>
               </a:ext>
             </a:extLst>
           </p:cNvPr>
@@ -6553,16 +6893,22 @@
         </p:nvSpPr>
         <p:spPr>
           <a:xfrm>
-            <a:off x="11342917" y="5301342"/>
+            <a:off x="7728859" y="2737757"/>
             <a:ext cx="1981200" cy="1382486"/>
           </a:xfrm>
           <a:prstGeom prst="rect">
             <a:avLst/>
           </a:prstGeom>
-          <a:noFill/>
+          <a:solidFill>
+            <a:schemeClr val="bg1">
+              <a:alpha val="75000"/>
+            </a:schemeClr>
+          </a:solidFill>
           <a:ln w="38100">
             <a:solidFill>
-              <a:schemeClr val="tx1"/>
+              <a:schemeClr val="tx1">
+                <a:alpha val="75000"/>
+              </a:schemeClr>
             </a:solidFill>
           </a:ln>
         </p:spPr>
@@ -6593,288 +6939,6 @@
       </p:sp>
       <p:sp>
         <p:nvSpPr>
-          <p:cNvPr id="65" name="TextBox 64">
-            <a:extLst>
-              <a:ext uri="{FF2B5EF4-FFF2-40B4-BE49-F238E27FC236}">
-                <a16:creationId xmlns:a16="http://schemas.microsoft.com/office/drawing/2014/main" id="{E3249D2D-816D-5F0E-F2BB-AF171B3C9197}"/>
-              </a:ext>
-            </a:extLst>
-          </p:cNvPr>
-          <p:cNvSpPr txBox="1"/>
-          <p:nvPr/>
-        </p:nvSpPr>
-        <p:spPr>
-          <a:xfrm>
-            <a:off x="6419418" y="5530920"/>
-            <a:ext cx="731290" cy="461665"/>
-          </a:xfrm>
-          <a:prstGeom prst="rect">
-            <a:avLst/>
-          </a:prstGeom>
-          <a:noFill/>
-        </p:spPr>
-        <p:txBody>
-          <a:bodyPr wrap="none" rtlCol="0">
-            <a:spAutoFit/>
-          </a:bodyPr>
-          <a:lstStyle/>
-          <a:p>
-            <a:r>
-              <a:rPr lang="en-US" sz="2400" dirty="0">
-                <a:latin typeface="Times New Roman" panose="02020603050405020304" pitchFamily="18" charset="0"/>
-                <a:cs typeface="Times New Roman" panose="02020603050405020304" pitchFamily="18" charset="0"/>
-              </a:rPr>
-              <a:t>num</a:t>
-            </a:r>
-          </a:p>
-        </p:txBody>
-      </p:sp>
-      <p:sp>
-        <p:nvSpPr>
-          <p:cNvPr id="66" name="TextBox 65">
-            <a:extLst>
-              <a:ext uri="{FF2B5EF4-FFF2-40B4-BE49-F238E27FC236}">
-                <a16:creationId xmlns:a16="http://schemas.microsoft.com/office/drawing/2014/main" id="{CDC511E2-E7BC-E1E3-726E-BF5800A2DFCF}"/>
-              </a:ext>
-            </a:extLst>
-          </p:cNvPr>
-          <p:cNvSpPr txBox="1"/>
-          <p:nvPr/>
-        </p:nvSpPr>
-        <p:spPr>
-          <a:xfrm>
-            <a:off x="4166208" y="1880106"/>
-            <a:ext cx="833883" cy="461665"/>
-          </a:xfrm>
-          <a:prstGeom prst="rect">
-            <a:avLst/>
-          </a:prstGeom>
-          <a:noFill/>
-        </p:spPr>
-        <p:txBody>
-          <a:bodyPr wrap="none" rtlCol="0">
-            <a:spAutoFit/>
-          </a:bodyPr>
-          <a:lstStyle/>
-          <a:p>
-            <a:r>
-              <a:rPr lang="en-US" sz="2400" dirty="0">
-                <a:latin typeface="Times New Roman" panose="02020603050405020304" pitchFamily="18" charset="0"/>
-                <a:cs typeface="Times New Roman" panose="02020603050405020304" pitchFamily="18" charset="0"/>
-              </a:rPr>
-              <a:t>-num</a:t>
-            </a:r>
-          </a:p>
-        </p:txBody>
-      </p:sp>
-      <p:sp>
-        <p:nvSpPr>
-          <p:cNvPr id="67" name="TextBox 66">
-            <a:extLst>
-              <a:ext uri="{FF2B5EF4-FFF2-40B4-BE49-F238E27FC236}">
-                <a16:creationId xmlns:a16="http://schemas.microsoft.com/office/drawing/2014/main" id="{29C6D649-5026-A7FB-331D-7FBB55BE561E}"/>
-              </a:ext>
-            </a:extLst>
-          </p:cNvPr>
-          <p:cNvSpPr txBox="1"/>
-          <p:nvPr/>
-        </p:nvSpPr>
-        <p:spPr>
-          <a:xfrm>
-            <a:off x="7707067" y="1863140"/>
-            <a:ext cx="886781" cy="461665"/>
-          </a:xfrm>
-          <a:prstGeom prst="rect">
-            <a:avLst/>
-          </a:prstGeom>
-          <a:noFill/>
-        </p:spPr>
-        <p:txBody>
-          <a:bodyPr wrap="none" rtlCol="0">
-            <a:spAutoFit/>
-          </a:bodyPr>
-          <a:lstStyle/>
-          <a:p>
-            <a:r>
-              <a:rPr lang="en-US" sz="2400" b="1" dirty="0">
-                <a:latin typeface="Times New Roman" panose="02020603050405020304" pitchFamily="18" charset="0"/>
-                <a:cs typeface="Times New Roman" panose="02020603050405020304" pitchFamily="18" charset="0"/>
-              </a:rPr>
-              <a:t>-num</a:t>
-            </a:r>
-          </a:p>
-        </p:txBody>
-      </p:sp>
-      <p:sp>
-        <p:nvSpPr>
-          <p:cNvPr id="68" name="TextBox 67">
-            <a:extLst>
-              <a:ext uri="{FF2B5EF4-FFF2-40B4-BE49-F238E27FC236}">
-                <a16:creationId xmlns:a16="http://schemas.microsoft.com/office/drawing/2014/main" id="{6430202A-4CDC-8603-E936-050364B5EB15}"/>
-              </a:ext>
-            </a:extLst>
-          </p:cNvPr>
-          <p:cNvSpPr txBox="1"/>
-          <p:nvPr/>
-        </p:nvSpPr>
-        <p:spPr>
-          <a:xfrm rot="20471706">
-            <a:off x="9874557" y="1764583"/>
-            <a:ext cx="731290" cy="461665"/>
-          </a:xfrm>
-          <a:prstGeom prst="rect">
-            <a:avLst/>
-          </a:prstGeom>
-          <a:noFill/>
-        </p:spPr>
-        <p:txBody>
-          <a:bodyPr wrap="none" rtlCol="0">
-            <a:spAutoFit/>
-          </a:bodyPr>
-          <a:lstStyle/>
-          <a:p>
-            <a:r>
-              <a:rPr lang="en-US" sz="2400" dirty="0">
-                <a:latin typeface="Times New Roman" panose="02020603050405020304" pitchFamily="18" charset="0"/>
-                <a:cs typeface="Times New Roman" panose="02020603050405020304" pitchFamily="18" charset="0"/>
-              </a:rPr>
-              <a:t>num</a:t>
-            </a:r>
-          </a:p>
-        </p:txBody>
-      </p:sp>
-      <p:sp>
-        <p:nvSpPr>
-          <p:cNvPr id="69" name="TextBox 68">
-            <a:extLst>
-              <a:ext uri="{FF2B5EF4-FFF2-40B4-BE49-F238E27FC236}">
-                <a16:creationId xmlns:a16="http://schemas.microsoft.com/office/drawing/2014/main" id="{D042879D-AA23-A303-5FF7-5CDCB1157B5A}"/>
-              </a:ext>
-            </a:extLst>
-          </p:cNvPr>
-          <p:cNvSpPr txBox="1"/>
-          <p:nvPr/>
-        </p:nvSpPr>
-        <p:spPr>
-          <a:xfrm rot="19488555">
-            <a:off x="2128316" y="4033081"/>
-            <a:ext cx="886781" cy="461665"/>
-          </a:xfrm>
-          <a:prstGeom prst="rect">
-            <a:avLst/>
-          </a:prstGeom>
-          <a:noFill/>
-        </p:spPr>
-        <p:txBody>
-          <a:bodyPr wrap="none" rtlCol="0">
-            <a:spAutoFit/>
-          </a:bodyPr>
-          <a:lstStyle/>
-          <a:p>
-            <a:r>
-              <a:rPr lang="en-US" sz="2400" b="1" dirty="0">
-                <a:latin typeface="Times New Roman" panose="02020603050405020304" pitchFamily="18" charset="0"/>
-                <a:cs typeface="Times New Roman" panose="02020603050405020304" pitchFamily="18" charset="0"/>
-              </a:rPr>
-              <a:t>-num</a:t>
-            </a:r>
-          </a:p>
-        </p:txBody>
-      </p:sp>
-      <p:sp>
-        <p:nvSpPr>
-          <p:cNvPr id="71" name="TextBox 70">
-            <a:extLst>
-              <a:ext uri="{FF2B5EF4-FFF2-40B4-BE49-F238E27FC236}">
-                <a16:creationId xmlns:a16="http://schemas.microsoft.com/office/drawing/2014/main" id="{F44F4BFA-CE4A-DC03-9C24-80E4A8CDECE9}"/>
-              </a:ext>
-            </a:extLst>
-          </p:cNvPr>
-          <p:cNvSpPr txBox="1"/>
-          <p:nvPr/>
-        </p:nvSpPr>
-        <p:spPr>
-          <a:xfrm rot="2166687">
-            <a:off x="2176182" y="1910670"/>
-            <a:ext cx="833883" cy="461665"/>
-          </a:xfrm>
-          <a:prstGeom prst="rect">
-            <a:avLst/>
-          </a:prstGeom>
-          <a:noFill/>
-        </p:spPr>
-        <p:txBody>
-          <a:bodyPr wrap="none" rtlCol="0">
-            <a:spAutoFit/>
-          </a:bodyPr>
-          <a:lstStyle/>
-          <a:p>
-            <a:r>
-              <a:rPr lang="en-US" sz="2400" dirty="0">
-                <a:latin typeface="Times New Roman" panose="02020603050405020304" pitchFamily="18" charset="0"/>
-                <a:cs typeface="Times New Roman" panose="02020603050405020304" pitchFamily="18" charset="0"/>
-              </a:rPr>
-              <a:t>-num</a:t>
-            </a:r>
-          </a:p>
-        </p:txBody>
-      </p:sp>
-      <p:sp>
-        <p:nvSpPr>
-          <p:cNvPr id="26" name="Rectangle 25">
-            <a:extLst>
-              <a:ext uri="{FF2B5EF4-FFF2-40B4-BE49-F238E27FC236}">
-                <a16:creationId xmlns:a16="http://schemas.microsoft.com/office/drawing/2014/main" id="{B55C58BF-B54E-BA2F-D111-5037A627D595}"/>
-              </a:ext>
-            </a:extLst>
-          </p:cNvPr>
-          <p:cNvSpPr/>
-          <p:nvPr/>
-        </p:nvSpPr>
-        <p:spPr>
-          <a:xfrm>
-            <a:off x="7728859" y="2737757"/>
-            <a:ext cx="1981200" cy="1382486"/>
-          </a:xfrm>
-          <a:prstGeom prst="rect">
-            <a:avLst/>
-          </a:prstGeom>
-          <a:solidFill>
-            <a:schemeClr val="bg1"/>
-          </a:solidFill>
-          <a:ln w="38100">
-            <a:solidFill>
-              <a:schemeClr val="tx1"/>
-            </a:solidFill>
-          </a:ln>
-        </p:spPr>
-        <p:style>
-          <a:lnRef idx="2">
-            <a:schemeClr val="accent1">
-              <a:shade val="50000"/>
-            </a:schemeClr>
-          </a:lnRef>
-          <a:fillRef idx="1">
-            <a:schemeClr val="accent1"/>
-          </a:fillRef>
-          <a:effectRef idx="0">
-            <a:schemeClr val="accent1"/>
-          </a:effectRef>
-          <a:fontRef idx="minor">
-            <a:schemeClr val="lt1"/>
-          </a:fontRef>
-        </p:style>
-        <p:txBody>
-          <a:bodyPr rtlCol="0" anchor="ctr"/>
-          <a:lstStyle/>
-          <a:p>
-            <a:pPr algn="ctr"/>
-            <a:endParaRPr lang="en-US"/>
-          </a:p>
-        </p:txBody>
-      </p:sp>
-      <p:sp>
-        <p:nvSpPr>
           <p:cNvPr id="37" name="TextBox 36">
             <a:extLst>
               <a:ext uri="{FF2B5EF4-FFF2-40B4-BE49-F238E27FC236}">
@@ -6930,8 +6994,8 @@
         </p:nvSpPr>
         <p:spPr>
           <a:xfrm rot="2159215">
-            <a:off x="5938941" y="2045259"/>
-            <a:ext cx="886781" cy="461665"/>
+            <a:off x="5815510" y="2029075"/>
+            <a:ext cx="1133644" cy="461665"/>
           </a:xfrm>
           <a:prstGeom prst="rect">
             <a:avLst/>
@@ -6949,7 +7013,7 @@
                 <a:latin typeface="Times New Roman" panose="02020603050405020304" pitchFamily="18" charset="0"/>
                 <a:cs typeface="Times New Roman" panose="02020603050405020304" pitchFamily="18" charset="0"/>
               </a:rPr>
-              <a:t>-num</a:t>
+              <a:t>-13.070</a:t>
             </a:r>
           </a:p>
         </p:txBody>
@@ -6969,7 +7033,7 @@
         <p:spPr>
           <a:xfrm>
             <a:off x="6191367" y="2967335"/>
-            <a:ext cx="784189" cy="461665"/>
+            <a:ext cx="1031051" cy="461665"/>
           </a:xfrm>
           <a:prstGeom prst="rect">
             <a:avLst/>
@@ -6987,7 +7051,7 @@
                 <a:latin typeface="Times New Roman" panose="02020603050405020304" pitchFamily="18" charset="0"/>
                 <a:cs typeface="Times New Roman" panose="02020603050405020304" pitchFamily="18" charset="0"/>
               </a:rPr>
-              <a:t>num</a:t>
+              <a:t>10.201</a:t>
             </a:r>
           </a:p>
         </p:txBody>
@@ -7016,7 +7080,7 @@
           <a:prstGeom prst="straightConnector1">
             <a:avLst/>
           </a:prstGeom>
-          <a:ln w="38100">
+          <a:ln w="73279">
             <a:solidFill>
               <a:srgbClr val="C00000"/>
             </a:solidFill>
@@ -7052,8 +7116,8 @@
         </p:nvSpPr>
         <p:spPr>
           <a:xfrm rot="3447489">
-            <a:off x="6469039" y="1561551"/>
-            <a:ext cx="886781" cy="461665"/>
+            <a:off x="6422552" y="1561551"/>
+            <a:ext cx="979755" cy="461665"/>
           </a:xfrm>
           <a:prstGeom prst="rect">
             <a:avLst/>
@@ -7071,7 +7135,7 @@
                 <a:latin typeface="Times New Roman" panose="02020603050405020304" pitchFamily="18" charset="0"/>
                 <a:cs typeface="Times New Roman" panose="02020603050405020304" pitchFamily="18" charset="0"/>
               </a:rPr>
-              <a:t>-num</a:t>
+              <a:t>-7.972</a:t>
             </a:r>
           </a:p>
         </p:txBody>
@@ -7098,7 +7162,7 @@
           <a:prstGeom prst="straightConnector1">
             <a:avLst/>
           </a:prstGeom>
-          <a:ln w="38100">
+          <a:ln w="87630">
             <a:solidFill>
               <a:srgbClr val="C00000"/>
             </a:solidFill>
@@ -7135,7 +7199,7 @@
         <p:spPr>
           <a:xfrm>
             <a:off x="10013721" y="403750"/>
-            <a:ext cx="784189" cy="461665"/>
+            <a:ext cx="1133644" cy="461665"/>
           </a:xfrm>
           <a:prstGeom prst="rect">
             <a:avLst/>
@@ -7153,7 +7217,7 @@
                 <a:latin typeface="Times New Roman" panose="02020603050405020304" pitchFamily="18" charset="0"/>
                 <a:cs typeface="Times New Roman" panose="02020603050405020304" pitchFamily="18" charset="0"/>
               </a:rPr>
-              <a:t>num</a:t>
+              <a:t>-10.541</a:t>
             </a:r>
           </a:p>
         </p:txBody>
@@ -7181,7 +7245,7 @@
           <a:prstGeom prst="straightConnector1">
             <a:avLst/>
           </a:prstGeom>
-          <a:ln w="38100">
+          <a:ln w="36195">
             <a:tailEnd type="triangle"/>
           </a:ln>
         </p:spPr>
@@ -7223,7 +7287,7 @@
           <a:prstGeom prst="straightConnector1">
             <a:avLst/>
           </a:prstGeom>
-          <a:ln w="38100">
+          <a:ln w="29591">
             <a:tailEnd type="triangle"/>
           </a:ln>
         </p:spPr>
@@ -7257,7 +7321,7 @@
         <p:spPr>
           <a:xfrm>
             <a:off x="2850030" y="477251"/>
-            <a:ext cx="833883" cy="461665"/>
+            <a:ext cx="979755" cy="461665"/>
           </a:xfrm>
           <a:prstGeom prst="rect">
             <a:avLst/>
@@ -7271,11 +7335,11 @@
           <a:lstStyle/>
           <a:p>
             <a:r>
-              <a:rPr lang="en-US" sz="2400" dirty="0">
+              <a:rPr lang="en-US" sz="2400" b="1" dirty="0">
                 <a:latin typeface="Times New Roman" panose="02020603050405020304" pitchFamily="18" charset="0"/>
                 <a:cs typeface="Times New Roman" panose="02020603050405020304" pitchFamily="18" charset="0"/>
               </a:rPr>
-              <a:t>-num</a:t>
+              <a:t>-1.572</a:t>
             </a:r>
           </a:p>
         </p:txBody>
@@ -7293,9 +7357,9 @@
           <p:nvPr/>
         </p:nvSpPr>
         <p:spPr>
-          <a:xfrm rot="17968942">
-            <a:off x="1830770" y="3356092"/>
-            <a:ext cx="833883" cy="461665"/>
+          <a:xfrm rot="17933854">
+            <a:off x="1726184" y="3436275"/>
+            <a:ext cx="979755" cy="461665"/>
           </a:xfrm>
           <a:prstGeom prst="rect">
             <a:avLst/>
@@ -7309,777 +7373,21 @@
           <a:lstStyle/>
           <a:p>
             <a:r>
-              <a:rPr lang="en-US" sz="2400" dirty="0">
+              <a:rPr lang="en-US" sz="2400" b="1" dirty="0">
                 <a:latin typeface="Times New Roman" panose="02020603050405020304" pitchFamily="18" charset="0"/>
                 <a:cs typeface="Times New Roman" panose="02020603050405020304" pitchFamily="18" charset="0"/>
               </a:rPr>
-              <a:t>-num</a:t>
-            </a:r>
-          </a:p>
-        </p:txBody>
-      </p:sp>
-    </p:spTree>
-    <p:extLst>
-      <p:ext uri="{BB962C8B-B14F-4D97-AF65-F5344CB8AC3E}">
-        <p14:creationId xmlns:p14="http://schemas.microsoft.com/office/powerpoint/2010/main" val="3515727378"/>
-      </p:ext>
-    </p:extLst>
-  </p:cSld>
-  <p:clrMapOvr>
-    <a:masterClrMapping/>
-  </p:clrMapOvr>
-</p:sld>
-</file>
-
-<file path=ppt/slides/slide3.xml><?xml version="1.0" encoding="utf-8"?>
-<p:sld xmlns:a="http://schemas.openxmlformats.org/drawingml/2006/main" xmlns:r="http://schemas.openxmlformats.org/officeDocument/2006/relationships" xmlns:p="http://schemas.openxmlformats.org/presentationml/2006/main">
-  <p:cSld>
-    <p:spTree>
-      <p:nvGrpSpPr>
-        <p:cNvPr id="1" name=""/>
-        <p:cNvGrpSpPr/>
-        <p:nvPr/>
-      </p:nvGrpSpPr>
-      <p:grpSpPr>
-        <a:xfrm>
-          <a:off x="0" y="0"/>
-          <a:ext cx="0" cy="0"/>
-          <a:chOff x="0" y="0"/>
-          <a:chExt cx="0" cy="0"/>
-        </a:xfrm>
-      </p:grpSpPr>
-      <p:cxnSp>
-        <p:nvCxnSpPr>
-          <p:cNvPr id="73" name="Straight Arrow Connector 72">
-            <a:extLst>
-              <a:ext uri="{FF2B5EF4-FFF2-40B4-BE49-F238E27FC236}">
-                <a16:creationId xmlns:a16="http://schemas.microsoft.com/office/drawing/2014/main" id="{61C7B4CB-3474-D72A-9F80-BB683CD500B5}"/>
-              </a:ext>
-            </a:extLst>
-          </p:cNvPr>
-          <p:cNvCxnSpPr>
-            <a:stCxn id="21" idx="2"/>
-            <a:endCxn id="31" idx="1"/>
-          </p:cNvCxnSpPr>
-          <p:nvPr/>
-        </p:nvCxnSpPr>
-        <p:spPr>
-          <a:xfrm>
-            <a:off x="5105401" y="1556658"/>
-            <a:ext cx="6237516" cy="4435927"/>
-          </a:xfrm>
-          <a:prstGeom prst="straightConnector1">
-            <a:avLst/>
-          </a:prstGeom>
-          <a:ln w="38100">
-            <a:tailEnd type="triangle"/>
-          </a:ln>
-        </p:spPr>
-        <p:style>
-          <a:lnRef idx="1">
-            <a:schemeClr val="accent1"/>
-          </a:lnRef>
-          <a:fillRef idx="0">
-            <a:schemeClr val="accent1"/>
-          </a:fillRef>
-          <a:effectRef idx="0">
-            <a:schemeClr val="accent1"/>
-          </a:effectRef>
-          <a:fontRef idx="minor">
-            <a:schemeClr val="tx1"/>
-          </a:fontRef>
-        </p:style>
-      </p:cxnSp>
-      <p:sp>
-        <p:nvSpPr>
-          <p:cNvPr id="34" name="TextBox 33">
-            <a:extLst>
-              <a:ext uri="{FF2B5EF4-FFF2-40B4-BE49-F238E27FC236}">
-                <a16:creationId xmlns:a16="http://schemas.microsoft.com/office/drawing/2014/main" id="{B6CFD367-96BB-5333-BB7D-2A376BBD254A}"/>
-              </a:ext>
-            </a:extLst>
-          </p:cNvPr>
-          <p:cNvSpPr txBox="1"/>
-          <p:nvPr/>
-        </p:nvSpPr>
-        <p:spPr>
-          <a:xfrm>
-            <a:off x="629568" y="326806"/>
-            <a:ext cx="1723549" cy="1077218"/>
-          </a:xfrm>
-          <a:prstGeom prst="rect">
-            <a:avLst/>
-          </a:prstGeom>
-          <a:noFill/>
-        </p:spPr>
-        <p:txBody>
-          <a:bodyPr wrap="none" rtlCol="0">
-            <a:spAutoFit/>
-          </a:bodyPr>
-          <a:lstStyle/>
-          <a:p>
-            <a:pPr algn="ctr"/>
-            <a:r>
-              <a:rPr lang="en-US" sz="3200" i="1" dirty="0">
-                <a:latin typeface="Times New Roman" panose="02020603050405020304" pitchFamily="18" charset="0"/>
-                <a:cs typeface="Times New Roman" panose="02020603050405020304" pitchFamily="18" charset="0"/>
-              </a:rPr>
-              <a:t>Soil </a:t>
-            </a:r>
-          </a:p>
-          <a:p>
-            <a:pPr algn="ctr"/>
-            <a:r>
-              <a:rPr lang="en-US" sz="3200" i="1" dirty="0">
-                <a:latin typeface="Times New Roman" panose="02020603050405020304" pitchFamily="18" charset="0"/>
-                <a:cs typeface="Times New Roman" panose="02020603050405020304" pitchFamily="18" charset="0"/>
-              </a:rPr>
-              <a:t>moisture </a:t>
-            </a:r>
-          </a:p>
-        </p:txBody>
-      </p:sp>
-      <p:sp>
-        <p:nvSpPr>
-          <p:cNvPr id="35" name="TextBox 34">
-            <a:extLst>
-              <a:ext uri="{FF2B5EF4-FFF2-40B4-BE49-F238E27FC236}">
-                <a16:creationId xmlns:a16="http://schemas.microsoft.com/office/drawing/2014/main" id="{6C89A079-ABD7-0D73-12B2-BAE34517A0DC}"/>
-              </a:ext>
-            </a:extLst>
-          </p:cNvPr>
-          <p:cNvSpPr txBox="1"/>
-          <p:nvPr/>
-        </p:nvSpPr>
-        <p:spPr>
-          <a:xfrm>
-            <a:off x="766625" y="5453976"/>
-            <a:ext cx="1449436" cy="1077218"/>
-          </a:xfrm>
-          <a:prstGeom prst="rect">
-            <a:avLst/>
-          </a:prstGeom>
-          <a:noFill/>
-        </p:spPr>
-        <p:txBody>
-          <a:bodyPr wrap="none" rtlCol="0">
-            <a:spAutoFit/>
-          </a:bodyPr>
-          <a:lstStyle/>
-          <a:p>
-            <a:pPr algn="ctr"/>
-            <a:r>
-              <a:rPr lang="en-US" sz="3200" i="1" dirty="0">
-                <a:latin typeface="Times New Roman" panose="02020603050405020304" pitchFamily="18" charset="0"/>
-                <a:cs typeface="Times New Roman" panose="02020603050405020304" pitchFamily="18" charset="0"/>
-              </a:rPr>
-              <a:t>Soil </a:t>
-            </a:r>
-          </a:p>
-          <a:p>
-            <a:pPr algn="ctr"/>
-            <a:r>
-              <a:rPr lang="en-US" sz="3200" i="1" dirty="0">
-                <a:latin typeface="Times New Roman" panose="02020603050405020304" pitchFamily="18" charset="0"/>
-                <a:cs typeface="Times New Roman" panose="02020603050405020304" pitchFamily="18" charset="0"/>
-              </a:rPr>
-              <a:t>NO</a:t>
-            </a:r>
-            <a:r>
-              <a:rPr lang="en-US" sz="3200" i="1" baseline="-25000" dirty="0">
-                <a:latin typeface="Times New Roman" panose="02020603050405020304" pitchFamily="18" charset="0"/>
-                <a:cs typeface="Times New Roman" panose="02020603050405020304" pitchFamily="18" charset="0"/>
-              </a:rPr>
-              <a:t>3</a:t>
-            </a:r>
-            <a:r>
-              <a:rPr lang="en-US" sz="3200" i="1" dirty="0">
-                <a:latin typeface="Times New Roman" panose="02020603050405020304" pitchFamily="18" charset="0"/>
-                <a:cs typeface="Times New Roman" panose="02020603050405020304" pitchFamily="18" charset="0"/>
-              </a:rPr>
-              <a:t>-N </a:t>
-            </a:r>
-          </a:p>
-        </p:txBody>
-      </p:sp>
-      <p:sp>
-        <p:nvSpPr>
-          <p:cNvPr id="36" name="TextBox 35">
-            <a:extLst>
-              <a:ext uri="{FF2B5EF4-FFF2-40B4-BE49-F238E27FC236}">
-                <a16:creationId xmlns:a16="http://schemas.microsoft.com/office/drawing/2014/main" id="{3E1B6594-EF86-7605-E52C-34BEFF337746}"/>
-              </a:ext>
-            </a:extLst>
-          </p:cNvPr>
-          <p:cNvSpPr txBox="1"/>
-          <p:nvPr/>
-        </p:nvSpPr>
-        <p:spPr>
-          <a:xfrm>
-            <a:off x="4910475" y="3136612"/>
-            <a:ext cx="389851" cy="584775"/>
-          </a:xfrm>
-          <a:prstGeom prst="rect">
-            <a:avLst/>
-          </a:prstGeom>
-          <a:noFill/>
-        </p:spPr>
-        <p:txBody>
-          <a:bodyPr wrap="none" rtlCol="0">
-            <a:spAutoFit/>
-          </a:bodyPr>
-          <a:lstStyle/>
-          <a:p>
-            <a:pPr algn="ctr"/>
-            <a:r>
-              <a:rPr lang="el-GR" sz="3200" i="1" dirty="0">
-                <a:latin typeface="Times New Roman" panose="02020603050405020304" pitchFamily="18" charset="0"/>
-                <a:cs typeface="Times New Roman" panose="02020603050405020304" pitchFamily="18" charset="0"/>
-              </a:rPr>
-              <a:t>β</a:t>
-            </a:r>
-            <a:endParaRPr lang="en-US" sz="3200" i="1" dirty="0">
-              <a:latin typeface="Times New Roman" panose="02020603050405020304" pitchFamily="18" charset="0"/>
-              <a:cs typeface="Times New Roman" panose="02020603050405020304" pitchFamily="18" charset="0"/>
-            </a:endParaRPr>
-          </a:p>
-        </p:txBody>
-      </p:sp>
-      <p:sp>
-        <p:nvSpPr>
-          <p:cNvPr id="38" name="TextBox 37">
-            <a:extLst>
-              <a:ext uri="{FF2B5EF4-FFF2-40B4-BE49-F238E27FC236}">
-                <a16:creationId xmlns:a16="http://schemas.microsoft.com/office/drawing/2014/main" id="{DEE8EFC0-1B48-8EC0-A5FB-9B65CBC229DB}"/>
-              </a:ext>
-            </a:extLst>
-          </p:cNvPr>
-          <p:cNvSpPr txBox="1"/>
-          <p:nvPr/>
-        </p:nvSpPr>
-        <p:spPr>
-          <a:xfrm>
-            <a:off x="11553111" y="5453976"/>
-            <a:ext cx="1560812" cy="1077218"/>
-          </a:xfrm>
-          <a:prstGeom prst="rect">
-            <a:avLst/>
-          </a:prstGeom>
-          <a:noFill/>
-        </p:spPr>
-        <p:txBody>
-          <a:bodyPr wrap="none" rtlCol="0">
-            <a:spAutoFit/>
-          </a:bodyPr>
-          <a:lstStyle/>
-          <a:p>
-            <a:pPr algn="ctr"/>
-            <a:r>
-              <a:rPr lang="en-US" sz="3200" i="1" dirty="0">
-                <a:latin typeface="Times New Roman" panose="02020603050405020304" pitchFamily="18" charset="0"/>
-                <a:cs typeface="Times New Roman" panose="02020603050405020304" pitchFamily="18" charset="0"/>
-              </a:rPr>
-              <a:t>Leaf</a:t>
-            </a:r>
-          </a:p>
-          <a:p>
-            <a:pPr algn="ctr"/>
-            <a:r>
-              <a:rPr lang="en-US" sz="3200" i="1" dirty="0">
-                <a:latin typeface="Times New Roman" panose="02020603050405020304" pitchFamily="18" charset="0"/>
-                <a:cs typeface="Times New Roman" panose="02020603050405020304" pitchFamily="18" charset="0"/>
-              </a:rPr>
-              <a:t>nitrogen</a:t>
-            </a:r>
-          </a:p>
-        </p:txBody>
-      </p:sp>
-      <p:sp>
-        <p:nvSpPr>
-          <p:cNvPr id="39" name="TextBox 38">
-            <a:extLst>
-              <a:ext uri="{FF2B5EF4-FFF2-40B4-BE49-F238E27FC236}">
-                <a16:creationId xmlns:a16="http://schemas.microsoft.com/office/drawing/2014/main" id="{3128AFF3-5CF2-6DE3-9D59-64189657E6DC}"/>
-              </a:ext>
-            </a:extLst>
-          </p:cNvPr>
-          <p:cNvSpPr txBox="1"/>
-          <p:nvPr/>
-        </p:nvSpPr>
-        <p:spPr>
-          <a:xfrm>
-            <a:off x="4649185" y="573027"/>
-            <a:ext cx="912430" cy="584775"/>
-          </a:xfrm>
-          <a:prstGeom prst="rect">
-            <a:avLst/>
-          </a:prstGeom>
-          <a:noFill/>
-        </p:spPr>
-        <p:txBody>
-          <a:bodyPr wrap="none" rtlCol="0">
-            <a:spAutoFit/>
-          </a:bodyPr>
-          <a:lstStyle/>
-          <a:p>
-            <a:pPr algn="ctr"/>
-            <a:r>
-              <a:rPr lang="en-US" sz="3200" i="1" dirty="0">
-                <a:latin typeface="Times New Roman" panose="02020603050405020304" pitchFamily="18" charset="0"/>
-                <a:cs typeface="Times New Roman" panose="02020603050405020304" pitchFamily="18" charset="0"/>
-              </a:rPr>
-              <a:t>PFT</a:t>
-            </a:r>
-          </a:p>
-        </p:txBody>
-      </p:sp>
-      <p:sp>
-        <p:nvSpPr>
-          <p:cNvPr id="40" name="TextBox 39">
-            <a:extLst>
-              <a:ext uri="{FF2B5EF4-FFF2-40B4-BE49-F238E27FC236}">
-                <a16:creationId xmlns:a16="http://schemas.microsoft.com/office/drawing/2014/main" id="{67E72C8D-3F29-25F3-F215-C1259A782E46}"/>
-              </a:ext>
-            </a:extLst>
-          </p:cNvPr>
-          <p:cNvSpPr txBox="1"/>
-          <p:nvPr/>
-        </p:nvSpPr>
-        <p:spPr>
-          <a:xfrm>
-            <a:off x="8228780" y="573026"/>
-            <a:ext cx="981359" cy="584775"/>
-          </a:xfrm>
-          <a:prstGeom prst="rect">
-            <a:avLst/>
-          </a:prstGeom>
-          <a:noFill/>
-        </p:spPr>
-        <p:txBody>
-          <a:bodyPr wrap="none" rtlCol="0">
-            <a:spAutoFit/>
-          </a:bodyPr>
-          <a:lstStyle/>
-          <a:p>
-            <a:pPr algn="ctr"/>
-            <a:r>
-              <a:rPr lang="en-US" sz="3200" i="1" dirty="0">
-                <a:latin typeface="Times New Roman" panose="02020603050405020304" pitchFamily="18" charset="0"/>
-                <a:cs typeface="Times New Roman" panose="02020603050405020304" pitchFamily="18" charset="0"/>
-              </a:rPr>
-              <a:t>VPD</a:t>
-            </a:r>
-          </a:p>
-        </p:txBody>
-      </p:sp>
-      <p:sp>
-        <p:nvSpPr>
-          <p:cNvPr id="41" name="TextBox 40">
-            <a:extLst>
-              <a:ext uri="{FF2B5EF4-FFF2-40B4-BE49-F238E27FC236}">
-                <a16:creationId xmlns:a16="http://schemas.microsoft.com/office/drawing/2014/main" id="{2C5B99C0-6E49-7B08-0180-3027C6FCE83B}"/>
-              </a:ext>
-            </a:extLst>
-          </p:cNvPr>
-          <p:cNvSpPr txBox="1"/>
-          <p:nvPr/>
-        </p:nvSpPr>
-        <p:spPr>
-          <a:xfrm>
-            <a:off x="11272137" y="573025"/>
-            <a:ext cx="2122761" cy="553998"/>
-          </a:xfrm>
-          <a:prstGeom prst="rect">
-            <a:avLst/>
-          </a:prstGeom>
-          <a:noFill/>
-        </p:spPr>
-        <p:txBody>
-          <a:bodyPr wrap="none" rtlCol="0">
-            <a:spAutoFit/>
-          </a:bodyPr>
-          <a:lstStyle/>
-          <a:p>
-            <a:pPr algn="ctr"/>
-            <a:r>
-              <a:rPr lang="en-US" sz="3000" i="1" dirty="0">
-                <a:latin typeface="Times New Roman" panose="02020603050405020304" pitchFamily="18" charset="0"/>
-                <a:cs typeface="Times New Roman" panose="02020603050405020304" pitchFamily="18" charset="0"/>
-              </a:rPr>
-              <a:t>Temperature</a:t>
-            </a:r>
-          </a:p>
-        </p:txBody>
-      </p:sp>
-      <p:cxnSp>
-        <p:nvCxnSpPr>
-          <p:cNvPr id="43" name="Straight Arrow Connector 42">
-            <a:extLst>
-              <a:ext uri="{FF2B5EF4-FFF2-40B4-BE49-F238E27FC236}">
-                <a16:creationId xmlns:a16="http://schemas.microsoft.com/office/drawing/2014/main" id="{647874A4-A342-A17B-1543-7EFDBE4BCA48}"/>
-              </a:ext>
-            </a:extLst>
-          </p:cNvPr>
-          <p:cNvCxnSpPr>
-            <a:stCxn id="20" idx="2"/>
-            <a:endCxn id="25" idx="1"/>
-          </p:cNvCxnSpPr>
-          <p:nvPr/>
-        </p:nvCxnSpPr>
-        <p:spPr>
-          <a:xfrm>
-            <a:off x="1491343" y="1556658"/>
-            <a:ext cx="2623458" cy="1872342"/>
-          </a:xfrm>
-          <a:prstGeom prst="straightConnector1">
-            <a:avLst/>
-          </a:prstGeom>
-          <a:ln w="38100">
-            <a:solidFill>
-              <a:srgbClr val="C00000"/>
-            </a:solidFill>
-            <a:prstDash val="dash"/>
-            <a:tailEnd type="triangle"/>
-          </a:ln>
-        </p:spPr>
-        <p:style>
-          <a:lnRef idx="1">
-            <a:schemeClr val="accent1"/>
-          </a:lnRef>
-          <a:fillRef idx="0">
-            <a:schemeClr val="accent1"/>
-          </a:fillRef>
-          <a:effectRef idx="0">
-            <a:schemeClr val="accent1"/>
-          </a:effectRef>
-          <a:fontRef idx="minor">
-            <a:schemeClr val="tx1"/>
-          </a:fontRef>
-        </p:style>
-      </p:cxnSp>
-      <p:cxnSp>
-        <p:nvCxnSpPr>
-          <p:cNvPr id="44" name="Straight Arrow Connector 43">
-            <a:extLst>
-              <a:ext uri="{FF2B5EF4-FFF2-40B4-BE49-F238E27FC236}">
-                <a16:creationId xmlns:a16="http://schemas.microsoft.com/office/drawing/2014/main" id="{A2E1161F-B387-5957-D318-027516E16EAC}"/>
-              </a:ext>
-            </a:extLst>
-          </p:cNvPr>
-          <p:cNvCxnSpPr>
-            <a:cxnSpLocks/>
-            <a:stCxn id="28" idx="0"/>
-            <a:endCxn id="25" idx="1"/>
-          </p:cNvCxnSpPr>
-          <p:nvPr/>
-        </p:nvCxnSpPr>
-        <p:spPr>
-          <a:xfrm flipV="1">
-            <a:off x="1491343" y="3429000"/>
-            <a:ext cx="2623458" cy="1872342"/>
-          </a:xfrm>
-          <a:prstGeom prst="straightConnector1">
-            <a:avLst/>
-          </a:prstGeom>
-          <a:ln w="38100">
-            <a:solidFill>
-              <a:srgbClr val="C00000"/>
-            </a:solidFill>
-            <a:tailEnd type="triangle"/>
-          </a:ln>
-        </p:spPr>
-        <p:style>
-          <a:lnRef idx="1">
-            <a:schemeClr val="accent1"/>
-          </a:lnRef>
-          <a:fillRef idx="0">
-            <a:schemeClr val="accent1"/>
-          </a:fillRef>
-          <a:effectRef idx="0">
-            <a:schemeClr val="accent1"/>
-          </a:effectRef>
-          <a:fontRef idx="minor">
-            <a:schemeClr val="tx1"/>
-          </a:fontRef>
-        </p:style>
-      </p:cxnSp>
-      <p:cxnSp>
-        <p:nvCxnSpPr>
-          <p:cNvPr id="50" name="Straight Arrow Connector 49">
-            <a:extLst>
-              <a:ext uri="{FF2B5EF4-FFF2-40B4-BE49-F238E27FC236}">
-                <a16:creationId xmlns:a16="http://schemas.microsoft.com/office/drawing/2014/main" id="{FCDA5EDA-AF50-B8D2-2147-779C4FF0DABF}"/>
-              </a:ext>
-            </a:extLst>
-          </p:cNvPr>
-          <p:cNvCxnSpPr>
-            <a:stCxn id="21" idx="2"/>
-            <a:endCxn id="25" idx="0"/>
-          </p:cNvCxnSpPr>
-          <p:nvPr/>
-        </p:nvCxnSpPr>
-        <p:spPr>
-          <a:xfrm>
-            <a:off x="5105401" y="1556658"/>
-            <a:ext cx="0" cy="1181099"/>
-          </a:xfrm>
-          <a:prstGeom prst="straightConnector1">
-            <a:avLst/>
-          </a:prstGeom>
-          <a:ln w="38100">
-            <a:solidFill>
-              <a:srgbClr val="C00000"/>
-            </a:solidFill>
-            <a:prstDash val="dash"/>
-            <a:tailEnd type="triangle"/>
-          </a:ln>
-        </p:spPr>
-        <p:style>
-          <a:lnRef idx="1">
-            <a:schemeClr val="accent1"/>
-          </a:lnRef>
-          <a:fillRef idx="0">
-            <a:schemeClr val="accent1"/>
-          </a:fillRef>
-          <a:effectRef idx="0">
-            <a:schemeClr val="accent1"/>
-          </a:effectRef>
-          <a:fontRef idx="minor">
-            <a:schemeClr val="tx1"/>
-          </a:fontRef>
-        </p:style>
-      </p:cxnSp>
-      <p:cxnSp>
-        <p:nvCxnSpPr>
-          <p:cNvPr id="52" name="Straight Arrow Connector 51">
-            <a:extLst>
-              <a:ext uri="{FF2B5EF4-FFF2-40B4-BE49-F238E27FC236}">
-                <a16:creationId xmlns:a16="http://schemas.microsoft.com/office/drawing/2014/main" id="{D2FA9BBB-61CF-7920-ECA5-7C63A4C65EF1}"/>
-              </a:ext>
-            </a:extLst>
-          </p:cNvPr>
-          <p:cNvCxnSpPr>
-            <a:stCxn id="25" idx="3"/>
-            <a:endCxn id="26" idx="1"/>
-          </p:cNvCxnSpPr>
-          <p:nvPr/>
-        </p:nvCxnSpPr>
-        <p:spPr>
-          <a:xfrm>
-            <a:off x="6096001" y="3429000"/>
-            <a:ext cx="1632858" cy="0"/>
-          </a:xfrm>
-          <a:prstGeom prst="straightConnector1">
-            <a:avLst/>
-          </a:prstGeom>
-          <a:ln w="38100">
-            <a:solidFill>
-              <a:srgbClr val="C00000"/>
-            </a:solidFill>
-            <a:tailEnd type="triangle"/>
-          </a:ln>
-        </p:spPr>
-        <p:style>
-          <a:lnRef idx="1">
-            <a:schemeClr val="accent1"/>
-          </a:lnRef>
-          <a:fillRef idx="0">
-            <a:schemeClr val="accent1"/>
-          </a:fillRef>
-          <a:effectRef idx="0">
-            <a:schemeClr val="accent1"/>
-          </a:effectRef>
-          <a:fontRef idx="minor">
-            <a:schemeClr val="tx1"/>
-          </a:fontRef>
-        </p:style>
-      </p:cxnSp>
-      <p:cxnSp>
-        <p:nvCxnSpPr>
-          <p:cNvPr id="54" name="Straight Arrow Connector 53">
-            <a:extLst>
-              <a:ext uri="{FF2B5EF4-FFF2-40B4-BE49-F238E27FC236}">
-                <a16:creationId xmlns:a16="http://schemas.microsoft.com/office/drawing/2014/main" id="{100D8950-AC1B-AD32-BAA1-1221A7CB6AD2}"/>
-              </a:ext>
-            </a:extLst>
-          </p:cNvPr>
-          <p:cNvCxnSpPr>
-            <a:stCxn id="22" idx="2"/>
-            <a:endCxn id="26" idx="0"/>
-          </p:cNvCxnSpPr>
-          <p:nvPr/>
-        </p:nvCxnSpPr>
-        <p:spPr>
-          <a:xfrm>
-            <a:off x="8719459" y="1556658"/>
-            <a:ext cx="0" cy="1181099"/>
-          </a:xfrm>
-          <a:prstGeom prst="straightConnector1">
-            <a:avLst/>
-          </a:prstGeom>
-          <a:ln w="38100">
-            <a:solidFill>
-              <a:srgbClr val="C00000"/>
-            </a:solidFill>
-            <a:tailEnd type="triangle"/>
-          </a:ln>
-        </p:spPr>
-        <p:style>
-          <a:lnRef idx="1">
-            <a:schemeClr val="accent1"/>
-          </a:lnRef>
-          <a:fillRef idx="0">
-            <a:schemeClr val="accent1"/>
-          </a:fillRef>
-          <a:effectRef idx="0">
-            <a:schemeClr val="accent1"/>
-          </a:effectRef>
-          <a:fontRef idx="minor">
-            <a:schemeClr val="tx1"/>
-          </a:fontRef>
-        </p:style>
-      </p:cxnSp>
-      <p:cxnSp>
-        <p:nvCxnSpPr>
-          <p:cNvPr id="56" name="Straight Arrow Connector 55">
-            <a:extLst>
-              <a:ext uri="{FF2B5EF4-FFF2-40B4-BE49-F238E27FC236}">
-                <a16:creationId xmlns:a16="http://schemas.microsoft.com/office/drawing/2014/main" id="{03A0CBB9-F1AE-2712-B46D-5740B1884373}"/>
-              </a:ext>
-            </a:extLst>
-          </p:cNvPr>
-          <p:cNvCxnSpPr>
-            <a:stCxn id="23" idx="2"/>
-            <a:endCxn id="26" idx="0"/>
-          </p:cNvCxnSpPr>
-          <p:nvPr/>
-        </p:nvCxnSpPr>
-        <p:spPr>
-          <a:xfrm flipH="1">
-            <a:off x="8719459" y="1556658"/>
-            <a:ext cx="3614058" cy="1181099"/>
-          </a:xfrm>
-          <a:prstGeom prst="straightConnector1">
-            <a:avLst/>
-          </a:prstGeom>
-          <a:ln w="38100">
-            <a:prstDash val="dash"/>
-            <a:tailEnd type="triangle"/>
-          </a:ln>
-        </p:spPr>
-        <p:style>
-          <a:lnRef idx="1">
-            <a:schemeClr val="accent1"/>
-          </a:lnRef>
-          <a:fillRef idx="0">
-            <a:schemeClr val="accent1"/>
-          </a:fillRef>
-          <a:effectRef idx="0">
-            <a:schemeClr val="accent1"/>
-          </a:effectRef>
-          <a:fontRef idx="minor">
-            <a:schemeClr val="tx1"/>
-          </a:fontRef>
-        </p:style>
-      </p:cxnSp>
-      <p:cxnSp>
-        <p:nvCxnSpPr>
-          <p:cNvPr id="58" name="Straight Arrow Connector 57">
-            <a:extLst>
-              <a:ext uri="{FF2B5EF4-FFF2-40B4-BE49-F238E27FC236}">
-                <a16:creationId xmlns:a16="http://schemas.microsoft.com/office/drawing/2014/main" id="{4C07D496-6CDD-6FFA-F311-3A43CC89874D}"/>
-              </a:ext>
-            </a:extLst>
-          </p:cNvPr>
-          <p:cNvCxnSpPr>
-            <a:cxnSpLocks/>
-            <a:stCxn id="26" idx="3"/>
-            <a:endCxn id="31" idx="1"/>
-          </p:cNvCxnSpPr>
-          <p:nvPr/>
-        </p:nvCxnSpPr>
-        <p:spPr>
-          <a:xfrm>
-            <a:off x="9710059" y="3429000"/>
-            <a:ext cx="1632858" cy="2563585"/>
-          </a:xfrm>
-          <a:prstGeom prst="straightConnector1">
-            <a:avLst/>
-          </a:prstGeom>
-          <a:ln w="38100">
-            <a:solidFill>
-              <a:srgbClr val="C00000"/>
-            </a:solidFill>
-            <a:prstDash val="dash"/>
-            <a:tailEnd type="triangle"/>
-          </a:ln>
-        </p:spPr>
-        <p:style>
-          <a:lnRef idx="1">
-            <a:schemeClr val="accent1"/>
-          </a:lnRef>
-          <a:fillRef idx="0">
-            <a:schemeClr val="accent1"/>
-          </a:fillRef>
-          <a:effectRef idx="0">
-            <a:schemeClr val="accent1"/>
-          </a:effectRef>
-          <a:fontRef idx="minor">
-            <a:schemeClr val="tx1"/>
-          </a:fontRef>
-        </p:style>
-      </p:cxnSp>
-      <p:cxnSp>
-        <p:nvCxnSpPr>
-          <p:cNvPr id="60" name="Straight Arrow Connector 59">
-            <a:extLst>
-              <a:ext uri="{FF2B5EF4-FFF2-40B4-BE49-F238E27FC236}">
-                <a16:creationId xmlns:a16="http://schemas.microsoft.com/office/drawing/2014/main" id="{F6383D9E-946A-23D8-3A9E-EC5FF2556E33}"/>
-              </a:ext>
-            </a:extLst>
-          </p:cNvPr>
-          <p:cNvCxnSpPr>
-            <a:stCxn id="25" idx="2"/>
-            <a:endCxn id="31" idx="1"/>
-          </p:cNvCxnSpPr>
-          <p:nvPr/>
-        </p:nvCxnSpPr>
-        <p:spPr>
-          <a:xfrm>
-            <a:off x="5105401" y="4120243"/>
-            <a:ext cx="6237516" cy="1872342"/>
-          </a:xfrm>
-          <a:prstGeom prst="straightConnector1">
-            <a:avLst/>
-          </a:prstGeom>
-          <a:ln w="17780">
-            <a:solidFill>
-              <a:srgbClr val="C00000"/>
-            </a:solidFill>
-            <a:tailEnd type="triangle"/>
-          </a:ln>
-        </p:spPr>
-        <p:style>
-          <a:lnRef idx="1">
-            <a:schemeClr val="accent1"/>
-          </a:lnRef>
-          <a:fillRef idx="0">
-            <a:schemeClr val="accent1"/>
-          </a:fillRef>
-          <a:effectRef idx="0">
-            <a:schemeClr val="accent1"/>
-          </a:effectRef>
-          <a:fontRef idx="minor">
-            <a:schemeClr val="tx1"/>
-          </a:fontRef>
-        </p:style>
-      </p:cxnSp>
-      <p:sp>
-        <p:nvSpPr>
-          <p:cNvPr id="20" name="Rectangle 19">
-            <a:extLst>
-              <a:ext uri="{FF2B5EF4-FFF2-40B4-BE49-F238E27FC236}">
-                <a16:creationId xmlns:a16="http://schemas.microsoft.com/office/drawing/2014/main" id="{8CD31D91-82FE-DEF4-C1F4-559B96EB9A75}"/>
+              <a:t>-0.431</a:t>
+            </a:r>
+          </a:p>
+        </p:txBody>
+      </p:sp>
+      <p:sp>
+        <p:nvSpPr>
+          <p:cNvPr id="21" name="Rectangle 20">
+            <a:extLst>
+              <a:ext uri="{FF2B5EF4-FFF2-40B4-BE49-F238E27FC236}">
+                <a16:creationId xmlns:a16="http://schemas.microsoft.com/office/drawing/2014/main" id="{2A451EDF-2134-D951-F607-AE0DC624C032}"/>
               </a:ext>
             </a:extLst>
           </p:cNvPr>
@@ -8088,7 +7396,7 @@
         </p:nvSpPr>
         <p:spPr>
           <a:xfrm>
-            <a:off x="500743" y="174172"/>
+            <a:off x="4114801" y="174172"/>
             <a:ext cx="1981200" cy="1382486"/>
           </a:xfrm>
           <a:prstGeom prst="rect">
@@ -8097,7 +7405,9 @@
           <a:noFill/>
           <a:ln w="38100">
             <a:solidFill>
-              <a:schemeClr val="tx1"/>
+              <a:schemeClr val="tx1">
+                <a:alpha val="75000"/>
+              </a:schemeClr>
             </a:solidFill>
           </a:ln>
         </p:spPr>
@@ -8126,1168 +7436,10 @@
           </a:p>
         </p:txBody>
       </p:sp>
-      <p:sp>
-        <p:nvSpPr>
-          <p:cNvPr id="21" name="Rectangle 20">
-            <a:extLst>
-              <a:ext uri="{FF2B5EF4-FFF2-40B4-BE49-F238E27FC236}">
-                <a16:creationId xmlns:a16="http://schemas.microsoft.com/office/drawing/2014/main" id="{2A451EDF-2134-D951-F607-AE0DC624C032}"/>
-              </a:ext>
-            </a:extLst>
-          </p:cNvPr>
-          <p:cNvSpPr/>
-          <p:nvPr/>
-        </p:nvSpPr>
-        <p:spPr>
-          <a:xfrm>
-            <a:off x="4114801" y="174172"/>
-            <a:ext cx="1981200" cy="1382486"/>
-          </a:xfrm>
-          <a:prstGeom prst="rect">
-            <a:avLst/>
-          </a:prstGeom>
-          <a:noFill/>
-          <a:ln w="38100">
-            <a:solidFill>
-              <a:schemeClr val="tx1"/>
-            </a:solidFill>
-          </a:ln>
-        </p:spPr>
-        <p:style>
-          <a:lnRef idx="2">
-            <a:schemeClr val="accent1">
-              <a:shade val="50000"/>
-            </a:schemeClr>
-          </a:lnRef>
-          <a:fillRef idx="1">
-            <a:schemeClr val="accent1"/>
-          </a:fillRef>
-          <a:effectRef idx="0">
-            <a:schemeClr val="accent1"/>
-          </a:effectRef>
-          <a:fontRef idx="minor">
-            <a:schemeClr val="lt1"/>
-          </a:fontRef>
-        </p:style>
-        <p:txBody>
-          <a:bodyPr rtlCol="0" anchor="ctr"/>
-          <a:lstStyle/>
-          <a:p>
-            <a:pPr algn="ctr"/>
-            <a:endParaRPr lang="en-US"/>
-          </a:p>
-        </p:txBody>
-      </p:sp>
-      <p:sp>
-        <p:nvSpPr>
-          <p:cNvPr id="22" name="Rectangle 21">
-            <a:extLst>
-              <a:ext uri="{FF2B5EF4-FFF2-40B4-BE49-F238E27FC236}">
-                <a16:creationId xmlns:a16="http://schemas.microsoft.com/office/drawing/2014/main" id="{295B61D5-3809-B67F-F28A-43F8F95032C1}"/>
-              </a:ext>
-            </a:extLst>
-          </p:cNvPr>
-          <p:cNvSpPr/>
-          <p:nvPr/>
-        </p:nvSpPr>
-        <p:spPr>
-          <a:xfrm>
-            <a:off x="7728859" y="174172"/>
-            <a:ext cx="1981200" cy="1382486"/>
-          </a:xfrm>
-          <a:prstGeom prst="rect">
-            <a:avLst/>
-          </a:prstGeom>
-          <a:noFill/>
-          <a:ln w="38100">
-            <a:solidFill>
-              <a:schemeClr val="tx1"/>
-            </a:solidFill>
-          </a:ln>
-        </p:spPr>
-        <p:style>
-          <a:lnRef idx="2">
-            <a:schemeClr val="accent1">
-              <a:shade val="50000"/>
-            </a:schemeClr>
-          </a:lnRef>
-          <a:fillRef idx="1">
-            <a:schemeClr val="accent1"/>
-          </a:fillRef>
-          <a:effectRef idx="0">
-            <a:schemeClr val="accent1"/>
-          </a:effectRef>
-          <a:fontRef idx="minor">
-            <a:schemeClr val="lt1"/>
-          </a:fontRef>
-        </p:style>
-        <p:txBody>
-          <a:bodyPr rtlCol="0" anchor="ctr"/>
-          <a:lstStyle/>
-          <a:p>
-            <a:pPr algn="ctr"/>
-            <a:endParaRPr lang="en-US"/>
-          </a:p>
-        </p:txBody>
-      </p:sp>
-      <p:sp>
-        <p:nvSpPr>
-          <p:cNvPr id="23" name="Rectangle 22">
-            <a:extLst>
-              <a:ext uri="{FF2B5EF4-FFF2-40B4-BE49-F238E27FC236}">
-                <a16:creationId xmlns:a16="http://schemas.microsoft.com/office/drawing/2014/main" id="{542EBF9B-B494-6BAC-662C-17157CAC7101}"/>
-              </a:ext>
-            </a:extLst>
-          </p:cNvPr>
-          <p:cNvSpPr/>
-          <p:nvPr/>
-        </p:nvSpPr>
-        <p:spPr>
-          <a:xfrm>
-            <a:off x="11342917" y="174172"/>
-            <a:ext cx="1981200" cy="1382486"/>
-          </a:xfrm>
-          <a:prstGeom prst="rect">
-            <a:avLst/>
-          </a:prstGeom>
-          <a:noFill/>
-          <a:ln w="38100">
-            <a:solidFill>
-              <a:schemeClr val="tx1"/>
-            </a:solidFill>
-          </a:ln>
-        </p:spPr>
-        <p:style>
-          <a:lnRef idx="2">
-            <a:schemeClr val="accent1">
-              <a:shade val="50000"/>
-            </a:schemeClr>
-          </a:lnRef>
-          <a:fillRef idx="1">
-            <a:schemeClr val="accent1"/>
-          </a:fillRef>
-          <a:effectRef idx="0">
-            <a:schemeClr val="accent1"/>
-          </a:effectRef>
-          <a:fontRef idx="minor">
-            <a:schemeClr val="lt1"/>
-          </a:fontRef>
-        </p:style>
-        <p:txBody>
-          <a:bodyPr rtlCol="0" anchor="ctr"/>
-          <a:lstStyle/>
-          <a:p>
-            <a:pPr algn="ctr"/>
-            <a:endParaRPr lang="en-US"/>
-          </a:p>
-        </p:txBody>
-      </p:sp>
-      <p:sp>
-        <p:nvSpPr>
-          <p:cNvPr id="25" name="Rectangle 24">
-            <a:extLst>
-              <a:ext uri="{FF2B5EF4-FFF2-40B4-BE49-F238E27FC236}">
-                <a16:creationId xmlns:a16="http://schemas.microsoft.com/office/drawing/2014/main" id="{82AC0384-6387-7D57-8EB4-896E679A9F4F}"/>
-              </a:ext>
-            </a:extLst>
-          </p:cNvPr>
-          <p:cNvSpPr/>
-          <p:nvPr/>
-        </p:nvSpPr>
-        <p:spPr>
-          <a:xfrm>
-            <a:off x="4114801" y="2737757"/>
-            <a:ext cx="1981200" cy="1382486"/>
-          </a:xfrm>
-          <a:prstGeom prst="rect">
-            <a:avLst/>
-          </a:prstGeom>
-          <a:noFill/>
-          <a:ln w="38100">
-            <a:solidFill>
-              <a:schemeClr val="tx1"/>
-            </a:solidFill>
-          </a:ln>
-        </p:spPr>
-        <p:style>
-          <a:lnRef idx="2">
-            <a:schemeClr val="accent1">
-              <a:shade val="50000"/>
-            </a:schemeClr>
-          </a:lnRef>
-          <a:fillRef idx="1">
-            <a:schemeClr val="accent1"/>
-          </a:fillRef>
-          <a:effectRef idx="0">
-            <a:schemeClr val="accent1"/>
-          </a:effectRef>
-          <a:fontRef idx="minor">
-            <a:schemeClr val="lt1"/>
-          </a:fontRef>
-        </p:style>
-        <p:txBody>
-          <a:bodyPr rtlCol="0" anchor="ctr"/>
-          <a:lstStyle/>
-          <a:p>
-            <a:pPr algn="ctr"/>
-            <a:endParaRPr lang="en-US"/>
-          </a:p>
-        </p:txBody>
-      </p:sp>
-      <p:sp>
-        <p:nvSpPr>
-          <p:cNvPr id="61" name="TextBox 60">
-            <a:extLst>
-              <a:ext uri="{FF2B5EF4-FFF2-40B4-BE49-F238E27FC236}">
-                <a16:creationId xmlns:a16="http://schemas.microsoft.com/office/drawing/2014/main" id="{B6476535-A95E-90F0-63CA-BA795134B48E}"/>
-              </a:ext>
-            </a:extLst>
-          </p:cNvPr>
-          <p:cNvSpPr txBox="1"/>
-          <p:nvPr/>
-        </p:nvSpPr>
-        <p:spPr>
-          <a:xfrm rot="980213">
-            <a:off x="7871793" y="4647571"/>
-            <a:ext cx="784189" cy="461665"/>
-          </a:xfrm>
-          <a:prstGeom prst="rect">
-            <a:avLst/>
-          </a:prstGeom>
-          <a:noFill/>
-        </p:spPr>
-        <p:txBody>
-          <a:bodyPr wrap="none" rtlCol="0">
-            <a:spAutoFit/>
-          </a:bodyPr>
-          <a:lstStyle/>
-          <a:p>
-            <a:r>
-              <a:rPr lang="en-US" sz="2400" b="1" dirty="0">
-                <a:latin typeface="Times New Roman" panose="02020603050405020304" pitchFamily="18" charset="0"/>
-                <a:cs typeface="Times New Roman" panose="02020603050405020304" pitchFamily="18" charset="0"/>
-              </a:rPr>
-              <a:t>num</a:t>
-            </a:r>
-          </a:p>
-        </p:txBody>
-      </p:sp>
-      <p:sp>
-        <p:nvSpPr>
-          <p:cNvPr id="62" name="TextBox 61">
-            <a:extLst>
-              <a:ext uri="{FF2B5EF4-FFF2-40B4-BE49-F238E27FC236}">
-                <a16:creationId xmlns:a16="http://schemas.microsoft.com/office/drawing/2014/main" id="{404C6F6B-8168-572F-555D-2085A3A08B93}"/>
-              </a:ext>
-            </a:extLst>
-          </p:cNvPr>
-          <p:cNvSpPr txBox="1"/>
-          <p:nvPr/>
-        </p:nvSpPr>
-        <p:spPr>
-          <a:xfrm rot="3415512">
-            <a:off x="10160843" y="4134396"/>
-            <a:ext cx="731290" cy="461665"/>
-          </a:xfrm>
-          <a:prstGeom prst="rect">
-            <a:avLst/>
-          </a:prstGeom>
-          <a:noFill/>
-        </p:spPr>
-        <p:txBody>
-          <a:bodyPr wrap="none" rtlCol="0">
-            <a:spAutoFit/>
-          </a:bodyPr>
-          <a:lstStyle/>
-          <a:p>
-            <a:r>
-              <a:rPr lang="en-US" sz="2400" dirty="0">
-                <a:latin typeface="Times New Roman" panose="02020603050405020304" pitchFamily="18" charset="0"/>
-                <a:cs typeface="Times New Roman" panose="02020603050405020304" pitchFamily="18" charset="0"/>
-              </a:rPr>
-              <a:t>num</a:t>
-            </a:r>
-          </a:p>
-        </p:txBody>
-      </p:sp>
-      <p:cxnSp>
-        <p:nvCxnSpPr>
-          <p:cNvPr id="64" name="Straight Arrow Connector 63">
-            <a:extLst>
-              <a:ext uri="{FF2B5EF4-FFF2-40B4-BE49-F238E27FC236}">
-                <a16:creationId xmlns:a16="http://schemas.microsoft.com/office/drawing/2014/main" id="{D3B8F594-F70C-BDE3-4E93-D81CE05CBF26}"/>
-              </a:ext>
-            </a:extLst>
-          </p:cNvPr>
-          <p:cNvCxnSpPr>
-            <a:stCxn id="28" idx="3"/>
-            <a:endCxn id="31" idx="1"/>
-          </p:cNvCxnSpPr>
-          <p:nvPr/>
-        </p:nvCxnSpPr>
-        <p:spPr>
-          <a:xfrm>
-            <a:off x="2481943" y="5992585"/>
-            <a:ext cx="8860974" cy="0"/>
-          </a:xfrm>
-          <a:prstGeom prst="straightConnector1">
-            <a:avLst/>
-          </a:prstGeom>
-          <a:ln w="38100">
-            <a:prstDash val="dash"/>
-            <a:tailEnd type="triangle"/>
-          </a:ln>
-        </p:spPr>
-        <p:style>
-          <a:lnRef idx="1">
-            <a:schemeClr val="accent1"/>
-          </a:lnRef>
-          <a:fillRef idx="0">
-            <a:schemeClr val="accent1"/>
-          </a:fillRef>
-          <a:effectRef idx="0">
-            <a:schemeClr val="accent1"/>
-          </a:effectRef>
-          <a:fontRef idx="minor">
-            <a:schemeClr val="tx1"/>
-          </a:fontRef>
-        </p:style>
-      </p:cxnSp>
-      <p:sp>
-        <p:nvSpPr>
-          <p:cNvPr id="28" name="Rectangle 27">
-            <a:extLst>
-              <a:ext uri="{FF2B5EF4-FFF2-40B4-BE49-F238E27FC236}">
-                <a16:creationId xmlns:a16="http://schemas.microsoft.com/office/drawing/2014/main" id="{CBB2489F-CBFE-304D-76D5-6A05865A7B18}"/>
-              </a:ext>
-            </a:extLst>
-          </p:cNvPr>
-          <p:cNvSpPr/>
-          <p:nvPr/>
-        </p:nvSpPr>
-        <p:spPr>
-          <a:xfrm>
-            <a:off x="500743" y="5301342"/>
-            <a:ext cx="1981200" cy="1382486"/>
-          </a:xfrm>
-          <a:prstGeom prst="rect">
-            <a:avLst/>
-          </a:prstGeom>
-          <a:noFill/>
-          <a:ln w="38100">
-            <a:solidFill>
-              <a:schemeClr val="tx1"/>
-            </a:solidFill>
-          </a:ln>
-        </p:spPr>
-        <p:style>
-          <a:lnRef idx="2">
-            <a:schemeClr val="accent1">
-              <a:shade val="50000"/>
-            </a:schemeClr>
-          </a:lnRef>
-          <a:fillRef idx="1">
-            <a:schemeClr val="accent1"/>
-          </a:fillRef>
-          <a:effectRef idx="0">
-            <a:schemeClr val="accent1"/>
-          </a:effectRef>
-          <a:fontRef idx="minor">
-            <a:schemeClr val="lt1"/>
-          </a:fontRef>
-        </p:style>
-        <p:txBody>
-          <a:bodyPr rtlCol="0" anchor="ctr"/>
-          <a:lstStyle/>
-          <a:p>
-            <a:pPr algn="ctr"/>
-            <a:endParaRPr lang="en-US"/>
-          </a:p>
-        </p:txBody>
-      </p:sp>
-      <p:sp>
-        <p:nvSpPr>
-          <p:cNvPr id="31" name="Rectangle 30">
-            <a:extLst>
-              <a:ext uri="{FF2B5EF4-FFF2-40B4-BE49-F238E27FC236}">
-                <a16:creationId xmlns:a16="http://schemas.microsoft.com/office/drawing/2014/main" id="{8B74F445-A52C-CC92-5C9F-26A6C584DFB7}"/>
-              </a:ext>
-            </a:extLst>
-          </p:cNvPr>
-          <p:cNvSpPr/>
-          <p:nvPr/>
-        </p:nvSpPr>
-        <p:spPr>
-          <a:xfrm>
-            <a:off x="11342917" y="5301342"/>
-            <a:ext cx="1981200" cy="1382486"/>
-          </a:xfrm>
-          <a:prstGeom prst="rect">
-            <a:avLst/>
-          </a:prstGeom>
-          <a:noFill/>
-          <a:ln w="38100">
-            <a:solidFill>
-              <a:schemeClr val="tx1"/>
-            </a:solidFill>
-          </a:ln>
-        </p:spPr>
-        <p:style>
-          <a:lnRef idx="2">
-            <a:schemeClr val="accent1">
-              <a:shade val="50000"/>
-            </a:schemeClr>
-          </a:lnRef>
-          <a:fillRef idx="1">
-            <a:schemeClr val="accent1"/>
-          </a:fillRef>
-          <a:effectRef idx="0">
-            <a:schemeClr val="accent1"/>
-          </a:effectRef>
-          <a:fontRef idx="minor">
-            <a:schemeClr val="lt1"/>
-          </a:fontRef>
-        </p:style>
-        <p:txBody>
-          <a:bodyPr rtlCol="0" anchor="ctr"/>
-          <a:lstStyle/>
-          <a:p>
-            <a:pPr algn="ctr"/>
-            <a:endParaRPr lang="en-US"/>
-          </a:p>
-        </p:txBody>
-      </p:sp>
-      <p:sp>
-        <p:nvSpPr>
-          <p:cNvPr id="65" name="TextBox 64">
-            <a:extLst>
-              <a:ext uri="{FF2B5EF4-FFF2-40B4-BE49-F238E27FC236}">
-                <a16:creationId xmlns:a16="http://schemas.microsoft.com/office/drawing/2014/main" id="{E3249D2D-816D-5F0E-F2BB-AF171B3C9197}"/>
-              </a:ext>
-            </a:extLst>
-          </p:cNvPr>
-          <p:cNvSpPr txBox="1"/>
-          <p:nvPr/>
-        </p:nvSpPr>
-        <p:spPr>
-          <a:xfrm>
-            <a:off x="6419418" y="5530920"/>
-            <a:ext cx="731290" cy="461665"/>
-          </a:xfrm>
-          <a:prstGeom prst="rect">
-            <a:avLst/>
-          </a:prstGeom>
-          <a:noFill/>
-        </p:spPr>
-        <p:txBody>
-          <a:bodyPr wrap="none" rtlCol="0">
-            <a:spAutoFit/>
-          </a:bodyPr>
-          <a:lstStyle/>
-          <a:p>
-            <a:r>
-              <a:rPr lang="en-US" sz="2400" dirty="0">
-                <a:latin typeface="Times New Roman" panose="02020603050405020304" pitchFamily="18" charset="0"/>
-                <a:cs typeface="Times New Roman" panose="02020603050405020304" pitchFamily="18" charset="0"/>
-              </a:rPr>
-              <a:t>num</a:t>
-            </a:r>
-          </a:p>
-        </p:txBody>
-      </p:sp>
-      <p:sp>
-        <p:nvSpPr>
-          <p:cNvPr id="66" name="TextBox 65">
-            <a:extLst>
-              <a:ext uri="{FF2B5EF4-FFF2-40B4-BE49-F238E27FC236}">
-                <a16:creationId xmlns:a16="http://schemas.microsoft.com/office/drawing/2014/main" id="{CDC511E2-E7BC-E1E3-726E-BF5800A2DFCF}"/>
-              </a:ext>
-            </a:extLst>
-          </p:cNvPr>
-          <p:cNvSpPr txBox="1"/>
-          <p:nvPr/>
-        </p:nvSpPr>
-        <p:spPr>
-          <a:xfrm>
-            <a:off x="4166208" y="1880106"/>
-            <a:ext cx="833883" cy="461665"/>
-          </a:xfrm>
-          <a:prstGeom prst="rect">
-            <a:avLst/>
-          </a:prstGeom>
-          <a:noFill/>
-        </p:spPr>
-        <p:txBody>
-          <a:bodyPr wrap="none" rtlCol="0">
-            <a:spAutoFit/>
-          </a:bodyPr>
-          <a:lstStyle/>
-          <a:p>
-            <a:r>
-              <a:rPr lang="en-US" sz="2400" dirty="0">
-                <a:latin typeface="Times New Roman" panose="02020603050405020304" pitchFamily="18" charset="0"/>
-                <a:cs typeface="Times New Roman" panose="02020603050405020304" pitchFamily="18" charset="0"/>
-              </a:rPr>
-              <a:t>-num</a:t>
-            </a:r>
-          </a:p>
-        </p:txBody>
-      </p:sp>
-      <p:sp>
-        <p:nvSpPr>
-          <p:cNvPr id="67" name="TextBox 66">
-            <a:extLst>
-              <a:ext uri="{FF2B5EF4-FFF2-40B4-BE49-F238E27FC236}">
-                <a16:creationId xmlns:a16="http://schemas.microsoft.com/office/drawing/2014/main" id="{29C6D649-5026-A7FB-331D-7FBB55BE561E}"/>
-              </a:ext>
-            </a:extLst>
-          </p:cNvPr>
-          <p:cNvSpPr txBox="1"/>
-          <p:nvPr/>
-        </p:nvSpPr>
-        <p:spPr>
-          <a:xfrm>
-            <a:off x="7707067" y="1863140"/>
-            <a:ext cx="886781" cy="461665"/>
-          </a:xfrm>
-          <a:prstGeom prst="rect">
-            <a:avLst/>
-          </a:prstGeom>
-          <a:noFill/>
-        </p:spPr>
-        <p:txBody>
-          <a:bodyPr wrap="none" rtlCol="0">
-            <a:spAutoFit/>
-          </a:bodyPr>
-          <a:lstStyle/>
-          <a:p>
-            <a:r>
-              <a:rPr lang="en-US" sz="2400" b="1" dirty="0">
-                <a:latin typeface="Times New Roman" panose="02020603050405020304" pitchFamily="18" charset="0"/>
-                <a:cs typeface="Times New Roman" panose="02020603050405020304" pitchFamily="18" charset="0"/>
-              </a:rPr>
-              <a:t>-num</a:t>
-            </a:r>
-          </a:p>
-        </p:txBody>
-      </p:sp>
-      <p:sp>
-        <p:nvSpPr>
-          <p:cNvPr id="68" name="TextBox 67">
-            <a:extLst>
-              <a:ext uri="{FF2B5EF4-FFF2-40B4-BE49-F238E27FC236}">
-                <a16:creationId xmlns:a16="http://schemas.microsoft.com/office/drawing/2014/main" id="{6430202A-4CDC-8603-E936-050364B5EB15}"/>
-              </a:ext>
-            </a:extLst>
-          </p:cNvPr>
-          <p:cNvSpPr txBox="1"/>
-          <p:nvPr/>
-        </p:nvSpPr>
-        <p:spPr>
-          <a:xfrm rot="20471706">
-            <a:off x="9874557" y="1764583"/>
-            <a:ext cx="731290" cy="461665"/>
-          </a:xfrm>
-          <a:prstGeom prst="rect">
-            <a:avLst/>
-          </a:prstGeom>
-          <a:noFill/>
-        </p:spPr>
-        <p:txBody>
-          <a:bodyPr wrap="none" rtlCol="0">
-            <a:spAutoFit/>
-          </a:bodyPr>
-          <a:lstStyle/>
-          <a:p>
-            <a:r>
-              <a:rPr lang="en-US" sz="2400" dirty="0">
-                <a:latin typeface="Times New Roman" panose="02020603050405020304" pitchFamily="18" charset="0"/>
-                <a:cs typeface="Times New Roman" panose="02020603050405020304" pitchFamily="18" charset="0"/>
-              </a:rPr>
-              <a:t>num</a:t>
-            </a:r>
-          </a:p>
-        </p:txBody>
-      </p:sp>
-      <p:sp>
-        <p:nvSpPr>
-          <p:cNvPr id="69" name="TextBox 68">
-            <a:extLst>
-              <a:ext uri="{FF2B5EF4-FFF2-40B4-BE49-F238E27FC236}">
-                <a16:creationId xmlns:a16="http://schemas.microsoft.com/office/drawing/2014/main" id="{D042879D-AA23-A303-5FF7-5CDCB1157B5A}"/>
-              </a:ext>
-            </a:extLst>
-          </p:cNvPr>
-          <p:cNvSpPr txBox="1"/>
-          <p:nvPr/>
-        </p:nvSpPr>
-        <p:spPr>
-          <a:xfrm rot="19488555">
-            <a:off x="2128316" y="4033081"/>
-            <a:ext cx="886781" cy="461665"/>
-          </a:xfrm>
-          <a:prstGeom prst="rect">
-            <a:avLst/>
-          </a:prstGeom>
-          <a:noFill/>
-        </p:spPr>
-        <p:txBody>
-          <a:bodyPr wrap="none" rtlCol="0">
-            <a:spAutoFit/>
-          </a:bodyPr>
-          <a:lstStyle/>
-          <a:p>
-            <a:r>
-              <a:rPr lang="en-US" sz="2400" b="1" dirty="0">
-                <a:latin typeface="Times New Roman" panose="02020603050405020304" pitchFamily="18" charset="0"/>
-                <a:cs typeface="Times New Roman" panose="02020603050405020304" pitchFamily="18" charset="0"/>
-              </a:rPr>
-              <a:t>-num</a:t>
-            </a:r>
-          </a:p>
-        </p:txBody>
-      </p:sp>
-      <p:sp>
-        <p:nvSpPr>
-          <p:cNvPr id="71" name="TextBox 70">
-            <a:extLst>
-              <a:ext uri="{FF2B5EF4-FFF2-40B4-BE49-F238E27FC236}">
-                <a16:creationId xmlns:a16="http://schemas.microsoft.com/office/drawing/2014/main" id="{F44F4BFA-CE4A-DC03-9C24-80E4A8CDECE9}"/>
-              </a:ext>
-            </a:extLst>
-          </p:cNvPr>
-          <p:cNvSpPr txBox="1"/>
-          <p:nvPr/>
-        </p:nvSpPr>
-        <p:spPr>
-          <a:xfrm rot="2166687">
-            <a:off x="2176182" y="1910670"/>
-            <a:ext cx="833883" cy="461665"/>
-          </a:xfrm>
-          <a:prstGeom prst="rect">
-            <a:avLst/>
-          </a:prstGeom>
-          <a:noFill/>
-        </p:spPr>
-        <p:txBody>
-          <a:bodyPr wrap="none" rtlCol="0">
-            <a:spAutoFit/>
-          </a:bodyPr>
-          <a:lstStyle/>
-          <a:p>
-            <a:r>
-              <a:rPr lang="en-US" sz="2400" dirty="0">
-                <a:latin typeface="Times New Roman" panose="02020603050405020304" pitchFamily="18" charset="0"/>
-                <a:cs typeface="Times New Roman" panose="02020603050405020304" pitchFamily="18" charset="0"/>
-              </a:rPr>
-              <a:t>-num</a:t>
-            </a:r>
-          </a:p>
-        </p:txBody>
-      </p:sp>
-      <p:sp>
-        <p:nvSpPr>
-          <p:cNvPr id="26" name="Rectangle 25">
-            <a:extLst>
-              <a:ext uri="{FF2B5EF4-FFF2-40B4-BE49-F238E27FC236}">
-                <a16:creationId xmlns:a16="http://schemas.microsoft.com/office/drawing/2014/main" id="{B55C58BF-B54E-BA2F-D111-5037A627D595}"/>
-              </a:ext>
-            </a:extLst>
-          </p:cNvPr>
-          <p:cNvSpPr/>
-          <p:nvPr/>
-        </p:nvSpPr>
-        <p:spPr>
-          <a:xfrm>
-            <a:off x="7728859" y="2737757"/>
-            <a:ext cx="1981200" cy="1382486"/>
-          </a:xfrm>
-          <a:prstGeom prst="rect">
-            <a:avLst/>
-          </a:prstGeom>
-          <a:solidFill>
-            <a:schemeClr val="bg1"/>
-          </a:solidFill>
-          <a:ln w="38100">
-            <a:solidFill>
-              <a:schemeClr val="tx1"/>
-            </a:solidFill>
-          </a:ln>
-        </p:spPr>
-        <p:style>
-          <a:lnRef idx="2">
-            <a:schemeClr val="accent1">
-              <a:shade val="50000"/>
-            </a:schemeClr>
-          </a:lnRef>
-          <a:fillRef idx="1">
-            <a:schemeClr val="accent1"/>
-          </a:fillRef>
-          <a:effectRef idx="0">
-            <a:schemeClr val="accent1"/>
-          </a:effectRef>
-          <a:fontRef idx="minor">
-            <a:schemeClr val="lt1"/>
-          </a:fontRef>
-        </p:style>
-        <p:txBody>
-          <a:bodyPr rtlCol="0" anchor="ctr"/>
-          <a:lstStyle/>
-          <a:p>
-            <a:pPr algn="ctr"/>
-            <a:endParaRPr lang="en-US"/>
-          </a:p>
-        </p:txBody>
-      </p:sp>
-      <p:sp>
-        <p:nvSpPr>
-          <p:cNvPr id="37" name="TextBox 36">
-            <a:extLst>
-              <a:ext uri="{FF2B5EF4-FFF2-40B4-BE49-F238E27FC236}">
-                <a16:creationId xmlns:a16="http://schemas.microsoft.com/office/drawing/2014/main" id="{C71CFA49-7C85-F6D0-BCFA-6674AEE1B54E}"/>
-              </a:ext>
-            </a:extLst>
-          </p:cNvPr>
-          <p:cNvSpPr txBox="1"/>
-          <p:nvPr/>
-        </p:nvSpPr>
-        <p:spPr>
-          <a:xfrm>
-            <a:off x="8536556" y="3136611"/>
-            <a:ext cx="365806" cy="584775"/>
-          </a:xfrm>
-          <a:prstGeom prst="rect">
-            <a:avLst/>
-          </a:prstGeom>
-          <a:noFill/>
-        </p:spPr>
-        <p:txBody>
-          <a:bodyPr wrap="none" rtlCol="0">
-            <a:spAutoFit/>
-          </a:bodyPr>
-          <a:lstStyle/>
-          <a:p>
-            <a:pPr algn="ctr"/>
-            <a:r>
-              <a:rPr lang="el-GR" sz="3200" i="1" dirty="0">
-                <a:latin typeface="Times New Roman" panose="02020603050405020304" pitchFamily="18" charset="0"/>
-                <a:cs typeface="Times New Roman" panose="02020603050405020304" pitchFamily="18" charset="0"/>
-              </a:rPr>
-              <a:t>χ</a:t>
-            </a:r>
-            <a:endParaRPr lang="en-US" sz="3200" i="1" dirty="0">
-              <a:latin typeface="Times New Roman" panose="02020603050405020304" pitchFamily="18" charset="0"/>
-              <a:cs typeface="Times New Roman" panose="02020603050405020304" pitchFamily="18" charset="0"/>
-            </a:endParaRPr>
-          </a:p>
-        </p:txBody>
-      </p:sp>
-      <p:sp>
-        <p:nvSpPr>
-          <p:cNvPr id="74" name="TextBox 73">
-            <a:extLst>
-              <a:ext uri="{FF2B5EF4-FFF2-40B4-BE49-F238E27FC236}">
-                <a16:creationId xmlns:a16="http://schemas.microsoft.com/office/drawing/2014/main" id="{244C02EF-F1A6-2F38-5982-D6BF1730AF46}"/>
-              </a:ext>
-            </a:extLst>
-          </p:cNvPr>
-          <p:cNvSpPr txBox="1"/>
-          <p:nvPr/>
-        </p:nvSpPr>
-        <p:spPr>
-          <a:xfrm rot="2159215">
-            <a:off x="5938941" y="2045259"/>
-            <a:ext cx="886781" cy="461665"/>
-          </a:xfrm>
-          <a:prstGeom prst="rect">
-            <a:avLst/>
-          </a:prstGeom>
-          <a:noFill/>
-        </p:spPr>
-        <p:txBody>
-          <a:bodyPr wrap="none" rtlCol="0">
-            <a:spAutoFit/>
-          </a:bodyPr>
-          <a:lstStyle/>
-          <a:p>
-            <a:r>
-              <a:rPr lang="en-US" sz="2400" b="1" dirty="0">
-                <a:latin typeface="Times New Roman" panose="02020603050405020304" pitchFamily="18" charset="0"/>
-                <a:cs typeface="Times New Roman" panose="02020603050405020304" pitchFamily="18" charset="0"/>
-              </a:rPr>
-              <a:t>-num</a:t>
-            </a:r>
-          </a:p>
-        </p:txBody>
-      </p:sp>
-      <p:sp>
-        <p:nvSpPr>
-          <p:cNvPr id="75" name="TextBox 74">
-            <a:extLst>
-              <a:ext uri="{FF2B5EF4-FFF2-40B4-BE49-F238E27FC236}">
-                <a16:creationId xmlns:a16="http://schemas.microsoft.com/office/drawing/2014/main" id="{D36FBB87-9540-A96D-DB0B-F29A669A82DE}"/>
-              </a:ext>
-            </a:extLst>
-          </p:cNvPr>
-          <p:cNvSpPr txBox="1"/>
-          <p:nvPr/>
-        </p:nvSpPr>
-        <p:spPr>
-          <a:xfrm>
-            <a:off x="6191367" y="2967335"/>
-            <a:ext cx="784189" cy="461665"/>
-          </a:xfrm>
-          <a:prstGeom prst="rect">
-            <a:avLst/>
-          </a:prstGeom>
-          <a:noFill/>
-        </p:spPr>
-        <p:txBody>
-          <a:bodyPr wrap="none" rtlCol="0">
-            <a:spAutoFit/>
-          </a:bodyPr>
-          <a:lstStyle/>
-          <a:p>
-            <a:r>
-              <a:rPr lang="en-US" sz="2400" b="1" dirty="0">
-                <a:latin typeface="Times New Roman" panose="02020603050405020304" pitchFamily="18" charset="0"/>
-                <a:cs typeface="Times New Roman" panose="02020603050405020304" pitchFamily="18" charset="0"/>
-              </a:rPr>
-              <a:t>num</a:t>
-            </a:r>
-          </a:p>
-        </p:txBody>
-      </p:sp>
-      <p:cxnSp>
-        <p:nvCxnSpPr>
-          <p:cNvPr id="77" name="Straight Arrow Connector 76">
-            <a:extLst>
-              <a:ext uri="{FF2B5EF4-FFF2-40B4-BE49-F238E27FC236}">
-                <a16:creationId xmlns:a16="http://schemas.microsoft.com/office/drawing/2014/main" id="{2CAFDABE-EBA8-F947-4A74-58528D3B89C8}"/>
-              </a:ext>
-            </a:extLst>
-          </p:cNvPr>
-          <p:cNvCxnSpPr>
-            <a:cxnSpLocks/>
-            <a:stCxn id="21" idx="3"/>
-            <a:endCxn id="26" idx="1"/>
-          </p:cNvCxnSpPr>
-          <p:nvPr/>
-        </p:nvCxnSpPr>
-        <p:spPr>
-          <a:xfrm>
-            <a:off x="6096001" y="865415"/>
-            <a:ext cx="1632858" cy="2563585"/>
-          </a:xfrm>
-          <a:prstGeom prst="straightConnector1">
-            <a:avLst/>
-          </a:prstGeom>
-          <a:ln w="38100">
-            <a:solidFill>
-              <a:srgbClr val="C00000"/>
-            </a:solidFill>
-            <a:tailEnd type="triangle"/>
-          </a:ln>
-        </p:spPr>
-        <p:style>
-          <a:lnRef idx="1">
-            <a:schemeClr val="accent1"/>
-          </a:lnRef>
-          <a:fillRef idx="0">
-            <a:schemeClr val="accent1"/>
-          </a:fillRef>
-          <a:effectRef idx="0">
-            <a:schemeClr val="accent1"/>
-          </a:effectRef>
-          <a:fontRef idx="minor">
-            <a:schemeClr val="tx1"/>
-          </a:fontRef>
-        </p:style>
-      </p:cxnSp>
-      <p:sp>
-        <p:nvSpPr>
-          <p:cNvPr id="80" name="TextBox 79">
-            <a:extLst>
-              <a:ext uri="{FF2B5EF4-FFF2-40B4-BE49-F238E27FC236}">
-                <a16:creationId xmlns:a16="http://schemas.microsoft.com/office/drawing/2014/main" id="{0FC8D521-81A9-E347-0EBC-99509681D866}"/>
-              </a:ext>
-            </a:extLst>
-          </p:cNvPr>
-          <p:cNvSpPr txBox="1"/>
-          <p:nvPr/>
-        </p:nvSpPr>
-        <p:spPr>
-          <a:xfrm rot="3447489">
-            <a:off x="6469039" y="1561551"/>
-            <a:ext cx="886781" cy="461665"/>
-          </a:xfrm>
-          <a:prstGeom prst="rect">
-            <a:avLst/>
-          </a:prstGeom>
-          <a:noFill/>
-        </p:spPr>
-        <p:txBody>
-          <a:bodyPr wrap="none" rtlCol="0">
-            <a:spAutoFit/>
-          </a:bodyPr>
-          <a:lstStyle/>
-          <a:p>
-            <a:r>
-              <a:rPr lang="en-US" sz="2400" b="1" dirty="0">
-                <a:latin typeface="Times New Roman" panose="02020603050405020304" pitchFamily="18" charset="0"/>
-                <a:cs typeface="Times New Roman" panose="02020603050405020304" pitchFamily="18" charset="0"/>
-              </a:rPr>
-              <a:t>-num</a:t>
-            </a:r>
-          </a:p>
-        </p:txBody>
-      </p:sp>
-      <p:cxnSp>
-        <p:nvCxnSpPr>
-          <p:cNvPr id="2" name="Straight Arrow Connector 1">
-            <a:extLst>
-              <a:ext uri="{FF2B5EF4-FFF2-40B4-BE49-F238E27FC236}">
-                <a16:creationId xmlns:a16="http://schemas.microsoft.com/office/drawing/2014/main" id="{82720060-A6FC-704F-8F90-E0C8FE5F764B}"/>
-              </a:ext>
-            </a:extLst>
-          </p:cNvPr>
-          <p:cNvCxnSpPr>
-            <a:cxnSpLocks/>
-          </p:cNvCxnSpPr>
-          <p:nvPr/>
-        </p:nvCxnSpPr>
-        <p:spPr>
-          <a:xfrm flipH="1">
-            <a:off x="9710059" y="865415"/>
-            <a:ext cx="1632858" cy="0"/>
-          </a:xfrm>
-          <a:prstGeom prst="straightConnector1">
-            <a:avLst/>
-          </a:prstGeom>
-          <a:ln w="38100">
-            <a:solidFill>
-              <a:srgbClr val="C00000"/>
-            </a:solidFill>
-            <a:tailEnd type="triangle"/>
-          </a:ln>
-        </p:spPr>
-        <p:style>
-          <a:lnRef idx="1">
-            <a:schemeClr val="accent1"/>
-          </a:lnRef>
-          <a:fillRef idx="0">
-            <a:schemeClr val="accent1"/>
-          </a:fillRef>
-          <a:effectRef idx="0">
-            <a:schemeClr val="accent1"/>
-          </a:effectRef>
-          <a:fontRef idx="minor">
-            <a:schemeClr val="tx1"/>
-          </a:fontRef>
-        </p:style>
-      </p:cxnSp>
-      <p:sp>
-        <p:nvSpPr>
-          <p:cNvPr id="3" name="TextBox 2">
-            <a:extLst>
-              <a:ext uri="{FF2B5EF4-FFF2-40B4-BE49-F238E27FC236}">
-                <a16:creationId xmlns:a16="http://schemas.microsoft.com/office/drawing/2014/main" id="{619B30D9-163E-1E1A-66F6-9A39C8D890EC}"/>
-              </a:ext>
-            </a:extLst>
-          </p:cNvPr>
-          <p:cNvSpPr txBox="1"/>
-          <p:nvPr/>
-        </p:nvSpPr>
-        <p:spPr>
-          <a:xfrm>
-            <a:off x="10013721" y="403750"/>
-            <a:ext cx="784189" cy="461665"/>
-          </a:xfrm>
-          <a:prstGeom prst="rect">
-            <a:avLst/>
-          </a:prstGeom>
-          <a:noFill/>
-        </p:spPr>
-        <p:txBody>
-          <a:bodyPr wrap="none" rtlCol="0">
-            <a:spAutoFit/>
-          </a:bodyPr>
-          <a:lstStyle/>
-          <a:p>
-            <a:r>
-              <a:rPr lang="en-US" sz="2400" b="1" dirty="0">
-                <a:latin typeface="Times New Roman" panose="02020603050405020304" pitchFamily="18" charset="0"/>
-                <a:cs typeface="Times New Roman" panose="02020603050405020304" pitchFamily="18" charset="0"/>
-              </a:rPr>
-              <a:t>num</a:t>
-            </a:r>
-          </a:p>
-        </p:txBody>
-      </p:sp>
-      <p:cxnSp>
-        <p:nvCxnSpPr>
-          <p:cNvPr id="5" name="Straight Arrow Connector 4">
-            <a:extLst>
-              <a:ext uri="{FF2B5EF4-FFF2-40B4-BE49-F238E27FC236}">
-                <a16:creationId xmlns:a16="http://schemas.microsoft.com/office/drawing/2014/main" id="{38BCDA20-54E4-0205-FE26-C2E14D06C037}"/>
-              </a:ext>
-            </a:extLst>
-          </p:cNvPr>
-          <p:cNvCxnSpPr>
-            <a:stCxn id="21" idx="1"/>
-            <a:endCxn id="20" idx="3"/>
-          </p:cNvCxnSpPr>
-          <p:nvPr/>
-        </p:nvCxnSpPr>
-        <p:spPr>
-          <a:xfrm flipH="1">
-            <a:off x="2481943" y="865415"/>
-            <a:ext cx="1632858" cy="0"/>
-          </a:xfrm>
-          <a:prstGeom prst="straightConnector1">
-            <a:avLst/>
-          </a:prstGeom>
-          <a:ln w="38100">
-            <a:tailEnd type="triangle"/>
-          </a:ln>
-        </p:spPr>
-        <p:style>
-          <a:lnRef idx="1">
-            <a:schemeClr val="accent1"/>
-          </a:lnRef>
-          <a:fillRef idx="0">
-            <a:schemeClr val="accent1"/>
-          </a:fillRef>
-          <a:effectRef idx="0">
-            <a:schemeClr val="accent1"/>
-          </a:effectRef>
-          <a:fontRef idx="minor">
-            <a:schemeClr val="tx1"/>
-          </a:fontRef>
-        </p:style>
-      </p:cxnSp>
-      <p:cxnSp>
-        <p:nvCxnSpPr>
-          <p:cNvPr id="7" name="Straight Arrow Connector 6">
-            <a:extLst>
-              <a:ext uri="{FF2B5EF4-FFF2-40B4-BE49-F238E27FC236}">
-                <a16:creationId xmlns:a16="http://schemas.microsoft.com/office/drawing/2014/main" id="{59CA087A-0EC5-1F87-F1A9-20C588316628}"/>
-              </a:ext>
-            </a:extLst>
-          </p:cNvPr>
-          <p:cNvCxnSpPr>
-            <a:stCxn id="21" idx="1"/>
-            <a:endCxn id="28" idx="0"/>
-          </p:cNvCxnSpPr>
-          <p:nvPr/>
-        </p:nvCxnSpPr>
-        <p:spPr>
-          <a:xfrm flipH="1">
-            <a:off x="1491343" y="865415"/>
-            <a:ext cx="2623458" cy="4435927"/>
-          </a:xfrm>
-          <a:prstGeom prst="straightConnector1">
-            <a:avLst/>
-          </a:prstGeom>
-          <a:ln w="38100">
-            <a:tailEnd type="triangle"/>
-          </a:ln>
-        </p:spPr>
-        <p:style>
-          <a:lnRef idx="1">
-            <a:schemeClr val="accent1"/>
-          </a:lnRef>
-          <a:fillRef idx="0">
-            <a:schemeClr val="accent1"/>
-          </a:fillRef>
-          <a:effectRef idx="0">
-            <a:schemeClr val="accent1"/>
-          </a:effectRef>
-          <a:fontRef idx="minor">
-            <a:schemeClr val="tx1"/>
-          </a:fontRef>
-        </p:style>
-      </p:cxnSp>
-      <p:sp>
-        <p:nvSpPr>
-          <p:cNvPr id="8" name="TextBox 7">
-            <a:extLst>
-              <a:ext uri="{FF2B5EF4-FFF2-40B4-BE49-F238E27FC236}">
-                <a16:creationId xmlns:a16="http://schemas.microsoft.com/office/drawing/2014/main" id="{D785177C-7027-4A10-E6A3-23BF911028DE}"/>
-              </a:ext>
-            </a:extLst>
-          </p:cNvPr>
-          <p:cNvSpPr txBox="1"/>
-          <p:nvPr/>
-        </p:nvSpPr>
-        <p:spPr>
-          <a:xfrm>
-            <a:off x="2850030" y="477251"/>
-            <a:ext cx="833883" cy="461665"/>
-          </a:xfrm>
-          <a:prstGeom prst="rect">
-            <a:avLst/>
-          </a:prstGeom>
-          <a:noFill/>
-        </p:spPr>
-        <p:txBody>
-          <a:bodyPr wrap="none" rtlCol="0">
-            <a:spAutoFit/>
-          </a:bodyPr>
-          <a:lstStyle/>
-          <a:p>
-            <a:r>
-              <a:rPr lang="en-US" sz="2400" dirty="0">
-                <a:latin typeface="Times New Roman" panose="02020603050405020304" pitchFamily="18" charset="0"/>
-                <a:cs typeface="Times New Roman" panose="02020603050405020304" pitchFamily="18" charset="0"/>
-              </a:rPr>
-              <a:t>-num</a:t>
-            </a:r>
-          </a:p>
-        </p:txBody>
-      </p:sp>
-      <p:sp>
-        <p:nvSpPr>
-          <p:cNvPr id="9" name="TextBox 8">
-            <a:extLst>
-              <a:ext uri="{FF2B5EF4-FFF2-40B4-BE49-F238E27FC236}">
-                <a16:creationId xmlns:a16="http://schemas.microsoft.com/office/drawing/2014/main" id="{74C95DE5-4C17-36D7-EDBD-42ABB94D66C1}"/>
-              </a:ext>
-            </a:extLst>
-          </p:cNvPr>
-          <p:cNvSpPr txBox="1"/>
-          <p:nvPr/>
-        </p:nvSpPr>
-        <p:spPr>
-          <a:xfrm rot="17968942">
-            <a:off x="1830770" y="3356092"/>
-            <a:ext cx="833883" cy="461665"/>
-          </a:xfrm>
-          <a:prstGeom prst="rect">
-            <a:avLst/>
-          </a:prstGeom>
-          <a:noFill/>
-        </p:spPr>
-        <p:txBody>
-          <a:bodyPr wrap="none" rtlCol="0">
-            <a:spAutoFit/>
-          </a:bodyPr>
-          <a:lstStyle/>
-          <a:p>
-            <a:r>
-              <a:rPr lang="en-US" sz="2400" dirty="0">
-                <a:latin typeface="Times New Roman" panose="02020603050405020304" pitchFamily="18" charset="0"/>
-                <a:cs typeface="Times New Roman" panose="02020603050405020304" pitchFamily="18" charset="0"/>
-              </a:rPr>
-              <a:t>-num</a:t>
-            </a:r>
-          </a:p>
-        </p:txBody>
-      </p:sp>
     </p:spTree>
     <p:extLst>
       <p:ext uri="{BB962C8B-B14F-4D97-AF65-F5344CB8AC3E}">
-        <p14:creationId xmlns:p14="http://schemas.microsoft.com/office/powerpoint/2010/main" val="3721105670"/>
+        <p14:creationId xmlns:p14="http://schemas.microsoft.com/office/powerpoint/2010/main" val="4056767443"/>
       </p:ext>
     </p:extLst>
   </p:cSld>

</xml_diff>

<commit_message>
add coefficient table output and update file containing SEM results
</commit_message>
<xml_diff>
--- a/working_drafts/figs/TXeco_SEM_ppt_fig.pptx
+++ b/working_drafts/figs/TXeco_SEM_ppt_fig.pptx
@@ -5,11 +5,12 @@
     <p:sldMasterId id="2147483660" r:id="rId1"/>
   </p:sldMasterIdLst>
   <p:notesMasterIdLst>
-    <p:notesMasterId r:id="rId4"/>
+    <p:notesMasterId r:id="rId5"/>
   </p:notesMasterIdLst>
   <p:sldIdLst>
     <p:sldId id="258" r:id="rId2"/>
-    <p:sldId id="260" r:id="rId3"/>
+    <p:sldId id="262" r:id="rId3"/>
+    <p:sldId id="261" r:id="rId4"/>
   </p:sldIdLst>
   <p:sldSz cx="13716000" cy="6858000"/>
   <p:notesSz cx="6858000" cy="9144000"/>
@@ -198,7 +199,7 @@
           <a:p>
             <a:fld id="{9C8338E3-F40D-F146-8D3B-4726E84D5200}" type="datetimeFigureOut">
               <a:rPr lang="en-US" smtClean="0"/>
-              <a:t>10/20/22</a:t>
+              <a:t>10/24/22</a:t>
             </a:fld>
             <a:endParaRPr lang="en-US"/>
           </a:p>
@@ -623,7 +624,91 @@
     </p:spTree>
     <p:extLst>
       <p:ext uri="{BB962C8B-B14F-4D97-AF65-F5344CB8AC3E}">
-        <p14:creationId xmlns:p14="http://schemas.microsoft.com/office/powerpoint/2010/main" val="3845071394"/>
+        <p14:creationId xmlns:p14="http://schemas.microsoft.com/office/powerpoint/2010/main" val="829252710"/>
+      </p:ext>
+    </p:extLst>
+  </p:cSld>
+  <p:clrMapOvr>
+    <a:masterClrMapping/>
+  </p:clrMapOvr>
+</p:notes>
+</file>
+
+<file path=ppt/notesSlides/notesSlide3.xml><?xml version="1.0" encoding="utf-8"?>
+<p:notes xmlns:a="http://schemas.openxmlformats.org/drawingml/2006/main" xmlns:r="http://schemas.openxmlformats.org/officeDocument/2006/relationships" xmlns:p="http://schemas.openxmlformats.org/presentationml/2006/main">
+  <p:cSld>
+    <p:spTree>
+      <p:nvGrpSpPr>
+        <p:cNvPr id="1" name=""/>
+        <p:cNvGrpSpPr/>
+        <p:nvPr/>
+      </p:nvGrpSpPr>
+      <p:grpSpPr>
+        <a:xfrm>
+          <a:off x="0" y="0"/>
+          <a:ext cx="0" cy="0"/>
+          <a:chOff x="0" y="0"/>
+          <a:chExt cx="0" cy="0"/>
+        </a:xfrm>
+      </p:grpSpPr>
+      <p:sp>
+        <p:nvSpPr>
+          <p:cNvPr id="2" name="Slide Image Placeholder 1"/>
+          <p:cNvSpPr>
+            <a:spLocks noGrp="1" noRot="1" noChangeAspect="1"/>
+          </p:cNvSpPr>
+          <p:nvPr>
+            <p:ph type="sldImg"/>
+          </p:nvPr>
+        </p:nvSpPr>
+        <p:spPr/>
+      </p:sp>
+      <p:sp>
+        <p:nvSpPr>
+          <p:cNvPr id="3" name="Notes Placeholder 2"/>
+          <p:cNvSpPr>
+            <a:spLocks noGrp="1"/>
+          </p:cNvSpPr>
+          <p:nvPr>
+            <p:ph type="body" idx="1"/>
+          </p:nvPr>
+        </p:nvSpPr>
+        <p:spPr/>
+        <p:txBody>
+          <a:bodyPr/>
+          <a:lstStyle/>
+          <a:p>
+            <a:endParaRPr lang="en-US" dirty="0"/>
+          </a:p>
+        </p:txBody>
+      </p:sp>
+      <p:sp>
+        <p:nvSpPr>
+          <p:cNvPr id="4" name="Slide Number Placeholder 3"/>
+          <p:cNvSpPr>
+            <a:spLocks noGrp="1"/>
+          </p:cNvSpPr>
+          <p:nvPr>
+            <p:ph type="sldNum" sz="quarter" idx="5"/>
+          </p:nvPr>
+        </p:nvSpPr>
+        <p:spPr/>
+        <p:txBody>
+          <a:bodyPr/>
+          <a:lstStyle/>
+          <a:p>
+            <a:fld id="{C2800238-33D2-A44F-8135-A0F534DB873D}" type="slidenum">
+              <a:rPr lang="en-US" smtClean="0"/>
+              <a:t>3</a:t>
+            </a:fld>
+            <a:endParaRPr lang="en-US"/>
+          </a:p>
+        </p:txBody>
+      </p:sp>
+    </p:spTree>
+    <p:extLst>
+      <p:ext uri="{BB962C8B-B14F-4D97-AF65-F5344CB8AC3E}">
+        <p14:creationId xmlns:p14="http://schemas.microsoft.com/office/powerpoint/2010/main" val="2037452788"/>
       </p:ext>
     </p:extLst>
   </p:cSld>
@@ -764,7 +849,7 @@
           <a:p>
             <a:fld id="{D3A28AA4-801E-B147-9E5C-6E6DBA6E23D1}" type="datetimeFigureOut">
               <a:rPr lang="en-US" smtClean="0"/>
-              <a:t>10/20/22</a:t>
+              <a:t>10/24/22</a:t>
             </a:fld>
             <a:endParaRPr lang="en-US"/>
           </a:p>
@@ -934,7 +1019,7 @@
           <a:p>
             <a:fld id="{D3A28AA4-801E-B147-9E5C-6E6DBA6E23D1}" type="datetimeFigureOut">
               <a:rPr lang="en-US" smtClean="0"/>
-              <a:t>10/20/22</a:t>
+              <a:t>10/24/22</a:t>
             </a:fld>
             <a:endParaRPr lang="en-US"/>
           </a:p>
@@ -1114,7 +1199,7 @@
           <a:p>
             <a:fld id="{D3A28AA4-801E-B147-9E5C-6E6DBA6E23D1}" type="datetimeFigureOut">
               <a:rPr lang="en-US" smtClean="0"/>
-              <a:t>10/20/22</a:t>
+              <a:t>10/24/22</a:t>
             </a:fld>
             <a:endParaRPr lang="en-US"/>
           </a:p>
@@ -1284,7 +1369,7 @@
           <a:p>
             <a:fld id="{D3A28AA4-801E-B147-9E5C-6E6DBA6E23D1}" type="datetimeFigureOut">
               <a:rPr lang="en-US" smtClean="0"/>
-              <a:t>10/20/22</a:t>
+              <a:t>10/24/22</a:t>
             </a:fld>
             <a:endParaRPr lang="en-US"/>
           </a:p>
@@ -1530,7 +1615,7 @@
           <a:p>
             <a:fld id="{D3A28AA4-801E-B147-9E5C-6E6DBA6E23D1}" type="datetimeFigureOut">
               <a:rPr lang="en-US" smtClean="0"/>
-              <a:t>10/20/22</a:t>
+              <a:t>10/24/22</a:t>
             </a:fld>
             <a:endParaRPr lang="en-US"/>
           </a:p>
@@ -1762,7 +1847,7 @@
           <a:p>
             <a:fld id="{D3A28AA4-801E-B147-9E5C-6E6DBA6E23D1}" type="datetimeFigureOut">
               <a:rPr lang="en-US" smtClean="0"/>
-              <a:t>10/20/22</a:t>
+              <a:t>10/24/22</a:t>
             </a:fld>
             <a:endParaRPr lang="en-US"/>
           </a:p>
@@ -2129,7 +2214,7 @@
           <a:p>
             <a:fld id="{D3A28AA4-801E-B147-9E5C-6E6DBA6E23D1}" type="datetimeFigureOut">
               <a:rPr lang="en-US" smtClean="0"/>
-              <a:t>10/20/22</a:t>
+              <a:t>10/24/22</a:t>
             </a:fld>
             <a:endParaRPr lang="en-US"/>
           </a:p>
@@ -2247,7 +2332,7 @@
           <a:p>
             <a:fld id="{D3A28AA4-801E-B147-9E5C-6E6DBA6E23D1}" type="datetimeFigureOut">
               <a:rPr lang="en-US" smtClean="0"/>
-              <a:t>10/20/22</a:t>
+              <a:t>10/24/22</a:t>
             </a:fld>
             <a:endParaRPr lang="en-US"/>
           </a:p>
@@ -2342,7 +2427,7 @@
           <a:p>
             <a:fld id="{D3A28AA4-801E-B147-9E5C-6E6DBA6E23D1}" type="datetimeFigureOut">
               <a:rPr lang="en-US" smtClean="0"/>
-              <a:t>10/20/22</a:t>
+              <a:t>10/24/22</a:t>
             </a:fld>
             <a:endParaRPr lang="en-US"/>
           </a:p>
@@ -2619,7 +2704,7 @@
           <a:p>
             <a:fld id="{D3A28AA4-801E-B147-9E5C-6E6DBA6E23D1}" type="datetimeFigureOut">
               <a:rPr lang="en-US" smtClean="0"/>
-              <a:t>10/20/22</a:t>
+              <a:t>10/24/22</a:t>
             </a:fld>
             <a:endParaRPr lang="en-US"/>
           </a:p>
@@ -2876,7 +2961,7 @@
           <a:p>
             <a:fld id="{D3A28AA4-801E-B147-9E5C-6E6DBA6E23D1}" type="datetimeFigureOut">
               <a:rPr lang="en-US" smtClean="0"/>
-              <a:t>10/20/22</a:t>
+              <a:t>10/24/22</a:t>
             </a:fld>
             <a:endParaRPr lang="en-US"/>
           </a:p>
@@ -3089,7 +3174,7 @@
           <a:p>
             <a:fld id="{D3A28AA4-801E-B147-9E5C-6E6DBA6E23D1}" type="datetimeFigureOut">
               <a:rPr lang="en-US" smtClean="0"/>
-              <a:t>10/20/22</a:t>
+              <a:t>10/24/22</a:t>
             </a:fld>
             <a:endParaRPr lang="en-US"/>
           </a:p>
@@ -5292,28 +5377,27 @@
       </p:sp>
       <p:cxnSp>
         <p:nvCxnSpPr>
-          <p:cNvPr id="5" name="Straight Arrow Connector 4">
-            <a:extLst>
-              <a:ext uri="{FF2B5EF4-FFF2-40B4-BE49-F238E27FC236}">
-                <a16:creationId xmlns:a16="http://schemas.microsoft.com/office/drawing/2014/main" id="{38BCDA20-54E4-0205-FE26-C2E14D06C037}"/>
+          <p:cNvPr id="4" name="Straight Arrow Connector 3">
+            <a:extLst>
+              <a:ext uri="{FF2B5EF4-FFF2-40B4-BE49-F238E27FC236}">
+                <a16:creationId xmlns:a16="http://schemas.microsoft.com/office/drawing/2014/main" id="{B54A85AB-699A-D0DA-507D-FBF24A12F347}"/>
               </a:ext>
             </a:extLst>
           </p:cNvPr>
           <p:cNvCxnSpPr>
-            <a:stCxn id="21" idx="1"/>
-            <a:endCxn id="20" idx="3"/>
+            <a:cxnSpLocks/>
           </p:cNvCxnSpPr>
           <p:nvPr/>
         </p:nvCxnSpPr>
         <p:spPr>
-          <a:xfrm flipH="1">
-            <a:off x="2481943" y="865415"/>
-            <a:ext cx="1632858" cy="0"/>
+          <a:xfrm>
+            <a:off x="1491343" y="1556658"/>
+            <a:ext cx="0" cy="3744684"/>
           </a:xfrm>
           <a:prstGeom prst="straightConnector1">
             <a:avLst/>
           </a:prstGeom>
-          <a:ln w="38100">
+          <a:ln w="82550">
             <a:tailEnd type="triangle"/>
           </a:ln>
         </p:spPr>
@@ -5332,124 +5416,6 @@
           </a:fontRef>
         </p:style>
       </p:cxnSp>
-      <p:cxnSp>
-        <p:nvCxnSpPr>
-          <p:cNvPr id="7" name="Straight Arrow Connector 6">
-            <a:extLst>
-              <a:ext uri="{FF2B5EF4-FFF2-40B4-BE49-F238E27FC236}">
-                <a16:creationId xmlns:a16="http://schemas.microsoft.com/office/drawing/2014/main" id="{59CA087A-0EC5-1F87-F1A9-20C588316628}"/>
-              </a:ext>
-            </a:extLst>
-          </p:cNvPr>
-          <p:cNvCxnSpPr>
-            <a:stCxn id="21" idx="1"/>
-            <a:endCxn id="28" idx="0"/>
-          </p:cNvCxnSpPr>
-          <p:nvPr/>
-        </p:nvCxnSpPr>
-        <p:spPr>
-          <a:xfrm flipH="1">
-            <a:off x="1491343" y="865415"/>
-            <a:ext cx="2623458" cy="4435927"/>
-          </a:xfrm>
-          <a:prstGeom prst="straightConnector1">
-            <a:avLst/>
-          </a:prstGeom>
-          <a:ln w="38100">
-            <a:tailEnd type="triangle"/>
-          </a:ln>
-        </p:spPr>
-        <p:style>
-          <a:lnRef idx="1">
-            <a:schemeClr val="accent1"/>
-          </a:lnRef>
-          <a:fillRef idx="0">
-            <a:schemeClr val="accent1"/>
-          </a:fillRef>
-          <a:effectRef idx="0">
-            <a:schemeClr val="accent1"/>
-          </a:effectRef>
-          <a:fontRef idx="minor">
-            <a:schemeClr val="tx1"/>
-          </a:fontRef>
-        </p:style>
-      </p:cxnSp>
-      <p:sp>
-        <p:nvSpPr>
-          <p:cNvPr id="8" name="TextBox 7">
-            <a:extLst>
-              <a:ext uri="{FF2B5EF4-FFF2-40B4-BE49-F238E27FC236}">
-                <a16:creationId xmlns:a16="http://schemas.microsoft.com/office/drawing/2014/main" id="{D785177C-7027-4A10-E6A3-23BF911028DE}"/>
-              </a:ext>
-            </a:extLst>
-          </p:cNvPr>
-          <p:cNvSpPr txBox="1"/>
-          <p:nvPr/>
-        </p:nvSpPr>
-        <p:spPr>
-          <a:xfrm>
-            <a:off x="2850030" y="477251"/>
-            <a:ext cx="833883" cy="461665"/>
-          </a:xfrm>
-          <a:prstGeom prst="rect">
-            <a:avLst/>
-          </a:prstGeom>
-          <a:noFill/>
-        </p:spPr>
-        <p:txBody>
-          <a:bodyPr wrap="none" rtlCol="0">
-            <a:spAutoFit/>
-          </a:bodyPr>
-          <a:lstStyle/>
-          <a:p>
-            <a:r>
-              <a:rPr lang="en-US" sz="2400" dirty="0">
-                <a:latin typeface="Times New Roman" panose="02020603050405020304" pitchFamily="18" charset="0"/>
-                <a:cs typeface="Times New Roman" panose="02020603050405020304" pitchFamily="18" charset="0"/>
-              </a:rPr>
-              <a:t>-num</a:t>
-            </a:r>
-          </a:p>
-        </p:txBody>
-      </p:sp>
-      <p:sp>
-        <p:nvSpPr>
-          <p:cNvPr id="9" name="TextBox 8">
-            <a:extLst>
-              <a:ext uri="{FF2B5EF4-FFF2-40B4-BE49-F238E27FC236}">
-                <a16:creationId xmlns:a16="http://schemas.microsoft.com/office/drawing/2014/main" id="{74C95DE5-4C17-36D7-EDBD-42ABB94D66C1}"/>
-              </a:ext>
-            </a:extLst>
-          </p:cNvPr>
-          <p:cNvSpPr txBox="1"/>
-          <p:nvPr/>
-        </p:nvSpPr>
-        <p:spPr>
-          <a:xfrm rot="17968942">
-            <a:off x="1830770" y="3356092"/>
-            <a:ext cx="833883" cy="461665"/>
-          </a:xfrm>
-          <a:prstGeom prst="rect">
-            <a:avLst/>
-          </a:prstGeom>
-          <a:noFill/>
-        </p:spPr>
-        <p:txBody>
-          <a:bodyPr wrap="none" rtlCol="0">
-            <a:spAutoFit/>
-          </a:bodyPr>
-          <a:lstStyle/>
-          <a:p>
-            <a:r>
-              <a:rPr lang="en-US" sz="2400" dirty="0">
-                <a:latin typeface="Times New Roman" panose="02020603050405020304" pitchFamily="18" charset="0"/>
-                <a:cs typeface="Times New Roman" panose="02020603050405020304" pitchFamily="18" charset="0"/>
-              </a:rPr>
-              <a:t>-num</a:t>
-            </a:r>
-          </a:p>
-        </p:txBody>
-      </p:sp>
     </p:spTree>
     <p:extLst>
       <p:ext uri="{BB962C8B-B14F-4D97-AF65-F5344CB8AC3E}">
@@ -5503,7 +5469,7 @@
           <a:prstGeom prst="straightConnector1">
             <a:avLst/>
           </a:prstGeom>
-          <a:ln w="102870">
+          <a:ln w="38100">
             <a:tailEnd type="triangle"/>
           </a:ln>
         </p:spPr>
@@ -5866,7 +5832,7 @@
           <a:prstGeom prst="straightConnector1">
             <a:avLst/>
           </a:prstGeom>
-          <a:ln w="40386">
+          <a:ln w="38100">
             <a:solidFill>
               <a:srgbClr val="C00000"/>
             </a:solidFill>
@@ -5913,7 +5879,7 @@
           <a:prstGeom prst="straightConnector1">
             <a:avLst/>
           </a:prstGeom>
-          <a:ln w="52197">
+          <a:ln w="38100">
             <a:solidFill>
               <a:srgbClr val="C00000"/>
             </a:solidFill>
@@ -5958,7 +5924,7 @@
           <a:prstGeom prst="straightConnector1">
             <a:avLst/>
           </a:prstGeom>
-          <a:ln w="32384">
+          <a:ln w="38100">
             <a:solidFill>
               <a:srgbClr val="C00000"/>
             </a:solidFill>
@@ -6004,7 +5970,7 @@
           <a:prstGeom prst="straightConnector1">
             <a:avLst/>
           </a:prstGeom>
-          <a:ln w="86106">
+          <a:ln w="38100">
             <a:solidFill>
               <a:srgbClr val="C00000"/>
             </a:solidFill>
@@ -6049,7 +6015,7 @@
           <a:prstGeom prst="straightConnector1">
             <a:avLst/>
           </a:prstGeom>
-          <a:ln w="34290">
+          <a:ln w="38100">
             <a:solidFill>
               <a:srgbClr val="C00000"/>
             </a:solidFill>
@@ -6096,7 +6062,7 @@
           <a:prstGeom prst="straightConnector1">
             <a:avLst/>
           </a:prstGeom>
-          <a:ln w="31496">
+          <a:ln w="38100">
             <a:prstDash val="dash"/>
             <a:tailEnd type="triangle"/>
           </a:ln>
@@ -6140,7 +6106,7 @@
           <a:prstGeom prst="straightConnector1">
             <a:avLst/>
           </a:prstGeom>
-          <a:ln w="30988">
+          <a:ln w="38100">
             <a:solidFill>
               <a:srgbClr val="C00000"/>
             </a:solidFill>
@@ -6264,10 +6230,10 @@
       </p:sp>
       <p:sp>
         <p:nvSpPr>
-          <p:cNvPr id="22" name="Rectangle 21">
-            <a:extLst>
-              <a:ext uri="{FF2B5EF4-FFF2-40B4-BE49-F238E27FC236}">
-                <a16:creationId xmlns:a16="http://schemas.microsoft.com/office/drawing/2014/main" id="{295B61D5-3809-B67F-F28A-43F8F95032C1}"/>
+          <p:cNvPr id="21" name="Rectangle 20">
+            <a:extLst>
+              <a:ext uri="{FF2B5EF4-FFF2-40B4-BE49-F238E27FC236}">
+                <a16:creationId xmlns:a16="http://schemas.microsoft.com/office/drawing/2014/main" id="{2A451EDF-2134-D951-F607-AE0DC624C032}"/>
               </a:ext>
             </a:extLst>
           </p:cNvPr>
@@ -6276,7 +6242,7 @@
         </p:nvSpPr>
         <p:spPr>
           <a:xfrm>
-            <a:off x="7728859" y="174172"/>
+            <a:off x="4114801" y="174172"/>
             <a:ext cx="1981200" cy="1382486"/>
           </a:xfrm>
           <a:prstGeom prst="rect">
@@ -6318,10 +6284,10 @@
       </p:sp>
       <p:sp>
         <p:nvSpPr>
-          <p:cNvPr id="23" name="Rectangle 22">
-            <a:extLst>
-              <a:ext uri="{FF2B5EF4-FFF2-40B4-BE49-F238E27FC236}">
-                <a16:creationId xmlns:a16="http://schemas.microsoft.com/office/drawing/2014/main" id="{542EBF9B-B494-6BAC-662C-17157CAC7101}"/>
+          <p:cNvPr id="22" name="Rectangle 21">
+            <a:extLst>
+              <a:ext uri="{FF2B5EF4-FFF2-40B4-BE49-F238E27FC236}">
+                <a16:creationId xmlns:a16="http://schemas.microsoft.com/office/drawing/2014/main" id="{295B61D5-3809-B67F-F28A-43F8F95032C1}"/>
               </a:ext>
             </a:extLst>
           </p:cNvPr>
@@ -6330,7 +6296,7 @@
         </p:nvSpPr>
         <p:spPr>
           <a:xfrm>
-            <a:off x="11342917" y="174172"/>
+            <a:off x="7728859" y="174172"/>
             <a:ext cx="1981200" cy="1382486"/>
           </a:xfrm>
           <a:prstGeom prst="rect">
@@ -6372,10 +6338,10 @@
       </p:sp>
       <p:sp>
         <p:nvSpPr>
-          <p:cNvPr id="25" name="Rectangle 24">
-            <a:extLst>
-              <a:ext uri="{FF2B5EF4-FFF2-40B4-BE49-F238E27FC236}">
-                <a16:creationId xmlns:a16="http://schemas.microsoft.com/office/drawing/2014/main" id="{82AC0384-6387-7D57-8EB4-896E679A9F4F}"/>
+          <p:cNvPr id="23" name="Rectangle 22">
+            <a:extLst>
+              <a:ext uri="{FF2B5EF4-FFF2-40B4-BE49-F238E27FC236}">
+                <a16:creationId xmlns:a16="http://schemas.microsoft.com/office/drawing/2014/main" id="{542EBF9B-B494-6BAC-662C-17157CAC7101}"/>
               </a:ext>
             </a:extLst>
           </p:cNvPr>
@@ -6384,7 +6350,7 @@
         </p:nvSpPr>
         <p:spPr>
           <a:xfrm>
-            <a:off x="4114801" y="2737757"/>
+            <a:off x="11342917" y="174172"/>
             <a:ext cx="1981200" cy="1382486"/>
           </a:xfrm>
           <a:prstGeom prst="rect">
@@ -6426,129 +6392,10 @@
       </p:sp>
       <p:sp>
         <p:nvSpPr>
-          <p:cNvPr id="61" name="TextBox 60">
-            <a:extLst>
-              <a:ext uri="{FF2B5EF4-FFF2-40B4-BE49-F238E27FC236}">
-                <a16:creationId xmlns:a16="http://schemas.microsoft.com/office/drawing/2014/main" id="{B6476535-A95E-90F0-63CA-BA795134B48E}"/>
-              </a:ext>
-            </a:extLst>
-          </p:cNvPr>
-          <p:cNvSpPr txBox="1"/>
-          <p:nvPr/>
-        </p:nvSpPr>
-        <p:spPr>
-          <a:xfrm rot="980213">
-            <a:off x="7774010" y="4647571"/>
-            <a:ext cx="979755" cy="461665"/>
-          </a:xfrm>
-          <a:prstGeom prst="rect">
-            <a:avLst/>
-          </a:prstGeom>
-          <a:noFill/>
-        </p:spPr>
-        <p:txBody>
-          <a:bodyPr wrap="none" rtlCol="0">
-            <a:spAutoFit/>
-          </a:bodyPr>
-          <a:lstStyle/>
-          <a:p>
-            <a:r>
-              <a:rPr lang="en-US" sz="2400" b="1" dirty="0">
-                <a:latin typeface="Times New Roman" panose="02020603050405020304" pitchFamily="18" charset="0"/>
-                <a:cs typeface="Times New Roman" panose="02020603050405020304" pitchFamily="18" charset="0"/>
-              </a:rPr>
-              <a:t>-1.901</a:t>
-            </a:r>
-          </a:p>
-        </p:txBody>
-      </p:sp>
-      <p:sp>
-        <p:nvSpPr>
-          <p:cNvPr id="62" name="TextBox 61">
-            <a:extLst>
-              <a:ext uri="{FF2B5EF4-FFF2-40B4-BE49-F238E27FC236}">
-                <a16:creationId xmlns:a16="http://schemas.microsoft.com/office/drawing/2014/main" id="{404C6F6B-8168-572F-555D-2085A3A08B93}"/>
-              </a:ext>
-            </a:extLst>
-          </p:cNvPr>
-          <p:cNvSpPr txBox="1"/>
-          <p:nvPr/>
-        </p:nvSpPr>
-        <p:spPr>
-          <a:xfrm rot="3415512">
-            <a:off x="10036611" y="4134396"/>
-            <a:ext cx="979755" cy="461665"/>
-          </a:xfrm>
-          <a:prstGeom prst="rect">
-            <a:avLst/>
-          </a:prstGeom>
-          <a:noFill/>
-        </p:spPr>
-        <p:txBody>
-          <a:bodyPr wrap="none" rtlCol="0">
-            <a:spAutoFit/>
-          </a:bodyPr>
-          <a:lstStyle/>
-          <a:p>
-            <a:r>
-              <a:rPr lang="en-US" sz="2400" dirty="0">
-                <a:latin typeface="Times New Roman" panose="02020603050405020304" pitchFamily="18" charset="0"/>
-                <a:cs typeface="Times New Roman" panose="02020603050405020304" pitchFamily="18" charset="0"/>
-              </a:rPr>
-              <a:t>-0.665</a:t>
-            </a:r>
-          </a:p>
-        </p:txBody>
-      </p:sp>
-      <p:cxnSp>
-        <p:nvCxnSpPr>
-          <p:cNvPr id="64" name="Straight Arrow Connector 63">
-            <a:extLst>
-              <a:ext uri="{FF2B5EF4-FFF2-40B4-BE49-F238E27FC236}">
-                <a16:creationId xmlns:a16="http://schemas.microsoft.com/office/drawing/2014/main" id="{D3B8F594-F70C-BDE3-4E93-D81CE05CBF26}"/>
-              </a:ext>
-            </a:extLst>
-          </p:cNvPr>
-          <p:cNvCxnSpPr>
-            <a:stCxn id="28" idx="3"/>
-            <a:endCxn id="31" idx="1"/>
-          </p:cNvCxnSpPr>
-          <p:nvPr/>
-        </p:nvCxnSpPr>
-        <p:spPr>
-          <a:xfrm>
-            <a:off x="2481943" y="5992585"/>
-            <a:ext cx="8860974" cy="0"/>
-          </a:xfrm>
-          <a:prstGeom prst="straightConnector1">
-            <a:avLst/>
-          </a:prstGeom>
-          <a:ln w="35052">
-            <a:prstDash val="dash"/>
-            <a:tailEnd type="triangle"/>
-          </a:ln>
-        </p:spPr>
-        <p:style>
-          <a:lnRef idx="1">
-            <a:schemeClr val="accent1"/>
-          </a:lnRef>
-          <a:fillRef idx="0">
-            <a:schemeClr val="accent1"/>
-          </a:fillRef>
-          <a:effectRef idx="0">
-            <a:schemeClr val="accent1"/>
-          </a:effectRef>
-          <a:fontRef idx="minor">
-            <a:schemeClr val="tx1"/>
-          </a:fontRef>
-        </p:style>
-      </p:cxnSp>
-      <p:sp>
-        <p:nvSpPr>
-          <p:cNvPr id="28" name="Rectangle 27">
-            <a:extLst>
-              <a:ext uri="{FF2B5EF4-FFF2-40B4-BE49-F238E27FC236}">
-                <a16:creationId xmlns:a16="http://schemas.microsoft.com/office/drawing/2014/main" id="{CBB2489F-CBFE-304D-76D5-6A05865A7B18}"/>
+          <p:cNvPr id="25" name="Rectangle 24">
+            <a:extLst>
+              <a:ext uri="{FF2B5EF4-FFF2-40B4-BE49-F238E27FC236}">
+                <a16:creationId xmlns:a16="http://schemas.microsoft.com/office/drawing/2014/main" id="{82AC0384-6387-7D57-8EB4-896E679A9F4F}"/>
               </a:ext>
             </a:extLst>
           </p:cNvPr>
@@ -6557,7 +6404,7 @@
         </p:nvSpPr>
         <p:spPr>
           <a:xfrm>
-            <a:off x="500743" y="5301342"/>
+            <a:off x="4114801" y="2737757"/>
             <a:ext cx="1981200" cy="1382486"/>
           </a:xfrm>
           <a:prstGeom prst="rect">
@@ -6597,12 +6444,55 @@
           </a:p>
         </p:txBody>
       </p:sp>
-      <p:sp>
-        <p:nvSpPr>
-          <p:cNvPr id="31" name="Rectangle 30">
-            <a:extLst>
-              <a:ext uri="{FF2B5EF4-FFF2-40B4-BE49-F238E27FC236}">
-                <a16:creationId xmlns:a16="http://schemas.microsoft.com/office/drawing/2014/main" id="{8B74F445-A52C-CC92-5C9F-26A6C584DFB7}"/>
+      <p:cxnSp>
+        <p:nvCxnSpPr>
+          <p:cNvPr id="64" name="Straight Arrow Connector 63">
+            <a:extLst>
+              <a:ext uri="{FF2B5EF4-FFF2-40B4-BE49-F238E27FC236}">
+                <a16:creationId xmlns:a16="http://schemas.microsoft.com/office/drawing/2014/main" id="{D3B8F594-F70C-BDE3-4E93-D81CE05CBF26}"/>
+              </a:ext>
+            </a:extLst>
+          </p:cNvPr>
+          <p:cNvCxnSpPr>
+            <a:stCxn id="28" idx="3"/>
+            <a:endCxn id="31" idx="1"/>
+          </p:cNvCxnSpPr>
+          <p:nvPr/>
+        </p:nvCxnSpPr>
+        <p:spPr>
+          <a:xfrm>
+            <a:off x="2481943" y="5992585"/>
+            <a:ext cx="8860974" cy="0"/>
+          </a:xfrm>
+          <a:prstGeom prst="straightConnector1">
+            <a:avLst/>
+          </a:prstGeom>
+          <a:ln w="38100">
+            <a:prstDash val="dash"/>
+            <a:tailEnd type="triangle"/>
+          </a:ln>
+        </p:spPr>
+        <p:style>
+          <a:lnRef idx="1">
+            <a:schemeClr val="accent1"/>
+          </a:lnRef>
+          <a:fillRef idx="0">
+            <a:schemeClr val="accent1"/>
+          </a:fillRef>
+          <a:effectRef idx="0">
+            <a:schemeClr val="accent1"/>
+          </a:effectRef>
+          <a:fontRef idx="minor">
+            <a:schemeClr val="tx1"/>
+          </a:fontRef>
+        </p:style>
+      </p:cxnSp>
+      <p:sp>
+        <p:nvSpPr>
+          <p:cNvPr id="28" name="Rectangle 27">
+            <a:extLst>
+              <a:ext uri="{FF2B5EF4-FFF2-40B4-BE49-F238E27FC236}">
+                <a16:creationId xmlns:a16="http://schemas.microsoft.com/office/drawing/2014/main" id="{CBB2489F-CBFE-304D-76D5-6A05865A7B18}"/>
               </a:ext>
             </a:extLst>
           </p:cNvPr>
@@ -6611,7 +6501,7 @@
         </p:nvSpPr>
         <p:spPr>
           <a:xfrm>
-            <a:off x="11342917" y="5301342"/>
+            <a:off x="500743" y="5301342"/>
             <a:ext cx="1981200" cy="1382486"/>
           </a:xfrm>
           <a:prstGeom prst="rect">
@@ -6653,229 +6543,55 @@
       </p:sp>
       <p:sp>
         <p:nvSpPr>
-          <p:cNvPr id="65" name="TextBox 64">
-            <a:extLst>
-              <a:ext uri="{FF2B5EF4-FFF2-40B4-BE49-F238E27FC236}">
-                <a16:creationId xmlns:a16="http://schemas.microsoft.com/office/drawing/2014/main" id="{E3249D2D-816D-5F0E-F2BB-AF171B3C9197}"/>
-              </a:ext>
-            </a:extLst>
-          </p:cNvPr>
-          <p:cNvSpPr txBox="1"/>
-          <p:nvPr/>
-        </p:nvSpPr>
-        <p:spPr>
-          <a:xfrm>
-            <a:off x="6419418" y="5530920"/>
-            <a:ext cx="877163" cy="461665"/>
+          <p:cNvPr id="31" name="Rectangle 30">
+            <a:extLst>
+              <a:ext uri="{FF2B5EF4-FFF2-40B4-BE49-F238E27FC236}">
+                <a16:creationId xmlns:a16="http://schemas.microsoft.com/office/drawing/2014/main" id="{8B74F445-A52C-CC92-5C9F-26A6C584DFB7}"/>
+              </a:ext>
+            </a:extLst>
+          </p:cNvPr>
+          <p:cNvSpPr/>
+          <p:nvPr/>
+        </p:nvSpPr>
+        <p:spPr>
+          <a:xfrm>
+            <a:off x="11342917" y="5301342"/>
+            <a:ext cx="1981200" cy="1382486"/>
           </a:xfrm>
           <a:prstGeom prst="rect">
             <a:avLst/>
           </a:prstGeom>
           <a:noFill/>
-        </p:spPr>
-        <p:txBody>
-          <a:bodyPr wrap="none" rtlCol="0">
-            <a:spAutoFit/>
-          </a:bodyPr>
-          <a:lstStyle/>
-          <a:p>
-            <a:r>
-              <a:rPr lang="en-US" sz="2400" dirty="0">
-                <a:latin typeface="Times New Roman" panose="02020603050405020304" pitchFamily="18" charset="0"/>
-                <a:cs typeface="Times New Roman" panose="02020603050405020304" pitchFamily="18" charset="0"/>
-              </a:rPr>
-              <a:t>1.401</a:t>
-            </a:r>
-          </a:p>
-        </p:txBody>
-      </p:sp>
-      <p:sp>
-        <p:nvSpPr>
-          <p:cNvPr id="66" name="TextBox 65">
-            <a:extLst>
-              <a:ext uri="{FF2B5EF4-FFF2-40B4-BE49-F238E27FC236}">
-                <a16:creationId xmlns:a16="http://schemas.microsoft.com/office/drawing/2014/main" id="{CDC511E2-E7BC-E1E3-726E-BF5800A2DFCF}"/>
-              </a:ext>
-            </a:extLst>
-          </p:cNvPr>
-          <p:cNvSpPr txBox="1"/>
-          <p:nvPr/>
-        </p:nvSpPr>
-        <p:spPr>
-          <a:xfrm>
-            <a:off x="4166208" y="1880106"/>
-            <a:ext cx="979755" cy="461665"/>
-          </a:xfrm>
-          <a:prstGeom prst="rect">
-            <a:avLst/>
-          </a:prstGeom>
-          <a:noFill/>
-        </p:spPr>
-        <p:txBody>
-          <a:bodyPr wrap="none" rtlCol="0">
-            <a:spAutoFit/>
-          </a:bodyPr>
-          <a:lstStyle/>
-          <a:p>
-            <a:r>
-              <a:rPr lang="en-US" sz="2400" dirty="0">
-                <a:latin typeface="Times New Roman" panose="02020603050405020304" pitchFamily="18" charset="0"/>
-                <a:cs typeface="Times New Roman" panose="02020603050405020304" pitchFamily="18" charset="0"/>
-              </a:rPr>
-              <a:t>-0.916</a:t>
-            </a:r>
-          </a:p>
-        </p:txBody>
-      </p:sp>
-      <p:sp>
-        <p:nvSpPr>
-          <p:cNvPr id="67" name="TextBox 66">
-            <a:extLst>
-              <a:ext uri="{FF2B5EF4-FFF2-40B4-BE49-F238E27FC236}">
-                <a16:creationId xmlns:a16="http://schemas.microsoft.com/office/drawing/2014/main" id="{29C6D649-5026-A7FB-331D-7FBB55BE561E}"/>
-              </a:ext>
-            </a:extLst>
-          </p:cNvPr>
-          <p:cNvSpPr txBox="1"/>
-          <p:nvPr/>
-        </p:nvSpPr>
-        <p:spPr>
-          <a:xfrm>
-            <a:off x="7707067" y="1863140"/>
-            <a:ext cx="979755" cy="461665"/>
-          </a:xfrm>
-          <a:prstGeom prst="rect">
-            <a:avLst/>
-          </a:prstGeom>
-          <a:noFill/>
-        </p:spPr>
-        <p:txBody>
-          <a:bodyPr wrap="none" rtlCol="0">
-            <a:spAutoFit/>
-          </a:bodyPr>
-          <a:lstStyle/>
-          <a:p>
-            <a:r>
-              <a:rPr lang="en-US" sz="2400" dirty="0">
-                <a:latin typeface="Times New Roman" panose="02020603050405020304" pitchFamily="18" charset="0"/>
-                <a:cs typeface="Times New Roman" panose="02020603050405020304" pitchFamily="18" charset="0"/>
-              </a:rPr>
-              <a:t>-1.223</a:t>
-            </a:r>
-          </a:p>
-        </p:txBody>
-      </p:sp>
-      <p:sp>
-        <p:nvSpPr>
-          <p:cNvPr id="68" name="TextBox 67">
-            <a:extLst>
-              <a:ext uri="{FF2B5EF4-FFF2-40B4-BE49-F238E27FC236}">
-                <a16:creationId xmlns:a16="http://schemas.microsoft.com/office/drawing/2014/main" id="{6430202A-4CDC-8603-E936-050364B5EB15}"/>
-              </a:ext>
-            </a:extLst>
-          </p:cNvPr>
-          <p:cNvSpPr txBox="1"/>
-          <p:nvPr/>
-        </p:nvSpPr>
-        <p:spPr>
-          <a:xfrm rot="20471706">
-            <a:off x="9801621" y="1764583"/>
-            <a:ext cx="877163" cy="461665"/>
-          </a:xfrm>
-          <a:prstGeom prst="rect">
-            <a:avLst/>
-          </a:prstGeom>
-          <a:noFill/>
-        </p:spPr>
-        <p:txBody>
-          <a:bodyPr wrap="none" rtlCol="0">
-            <a:spAutoFit/>
-          </a:bodyPr>
-          <a:lstStyle/>
-          <a:p>
-            <a:r>
-              <a:rPr lang="en-US" sz="2400" dirty="0">
-                <a:latin typeface="Times New Roman" panose="02020603050405020304" pitchFamily="18" charset="0"/>
-                <a:cs typeface="Times New Roman" panose="02020603050405020304" pitchFamily="18" charset="0"/>
-              </a:rPr>
-              <a:t>0.755</a:t>
-            </a:r>
-          </a:p>
-        </p:txBody>
-      </p:sp>
-      <p:sp>
-        <p:nvSpPr>
-          <p:cNvPr id="69" name="TextBox 68">
-            <a:extLst>
-              <a:ext uri="{FF2B5EF4-FFF2-40B4-BE49-F238E27FC236}">
-                <a16:creationId xmlns:a16="http://schemas.microsoft.com/office/drawing/2014/main" id="{D042879D-AA23-A303-5FF7-5CDCB1157B5A}"/>
-              </a:ext>
-            </a:extLst>
-          </p:cNvPr>
-          <p:cNvSpPr txBox="1"/>
-          <p:nvPr/>
-        </p:nvSpPr>
-        <p:spPr>
-          <a:xfrm rot="19488555">
-            <a:off x="2081829" y="4033081"/>
-            <a:ext cx="979755" cy="461665"/>
-          </a:xfrm>
-          <a:prstGeom prst="rect">
-            <a:avLst/>
-          </a:prstGeom>
-          <a:noFill/>
-        </p:spPr>
-        <p:txBody>
-          <a:bodyPr wrap="none" rtlCol="0">
-            <a:spAutoFit/>
-          </a:bodyPr>
-          <a:lstStyle/>
-          <a:p>
-            <a:r>
-              <a:rPr lang="en-US" sz="2400" b="1" dirty="0">
-                <a:latin typeface="Times New Roman" panose="02020603050405020304" pitchFamily="18" charset="0"/>
-                <a:cs typeface="Times New Roman" panose="02020603050405020304" pitchFamily="18" charset="0"/>
-              </a:rPr>
-              <a:t>-4.329</a:t>
-            </a:r>
-          </a:p>
-        </p:txBody>
-      </p:sp>
-      <p:sp>
-        <p:nvSpPr>
-          <p:cNvPr id="71" name="TextBox 70">
-            <a:extLst>
-              <a:ext uri="{FF2B5EF4-FFF2-40B4-BE49-F238E27FC236}">
-                <a16:creationId xmlns:a16="http://schemas.microsoft.com/office/drawing/2014/main" id="{F44F4BFA-CE4A-DC03-9C24-80E4A8CDECE9}"/>
-              </a:ext>
-            </a:extLst>
-          </p:cNvPr>
-          <p:cNvSpPr txBox="1"/>
-          <p:nvPr/>
-        </p:nvSpPr>
-        <p:spPr>
-          <a:xfrm rot="2166687">
-            <a:off x="2103246" y="1910670"/>
-            <a:ext cx="979755" cy="461665"/>
-          </a:xfrm>
-          <a:prstGeom prst="rect">
-            <a:avLst/>
-          </a:prstGeom>
-          <a:noFill/>
-        </p:spPr>
-        <p:txBody>
-          <a:bodyPr wrap="none" rtlCol="0">
-            <a:spAutoFit/>
-          </a:bodyPr>
-          <a:lstStyle/>
-          <a:p>
-            <a:r>
-              <a:rPr lang="en-US" sz="2400" b="1" dirty="0">
-                <a:latin typeface="Times New Roman" panose="02020603050405020304" pitchFamily="18" charset="0"/>
-                <a:cs typeface="Times New Roman" panose="02020603050405020304" pitchFamily="18" charset="0"/>
-              </a:rPr>
-              <a:t>-2.280</a:t>
-            </a:r>
+          <a:ln w="38100">
+            <a:solidFill>
+              <a:schemeClr val="tx1">
+                <a:alpha val="75000"/>
+              </a:schemeClr>
+            </a:solidFill>
+          </a:ln>
+        </p:spPr>
+        <p:style>
+          <a:lnRef idx="2">
+            <a:schemeClr val="accent1">
+              <a:shade val="50000"/>
+            </a:schemeClr>
+          </a:lnRef>
+          <a:fillRef idx="1">
+            <a:schemeClr val="accent1"/>
+          </a:fillRef>
+          <a:effectRef idx="0">
+            <a:schemeClr val="accent1"/>
+          </a:effectRef>
+          <a:fontRef idx="minor">
+            <a:schemeClr val="lt1"/>
+          </a:fontRef>
+        </p:style>
+        <p:txBody>
+          <a:bodyPr rtlCol="0" anchor="ctr"/>
+          <a:lstStyle/>
+          <a:p>
+            <a:pPr algn="ctr"/>
+            <a:endParaRPr lang="en-US"/>
           </a:p>
         </p:txBody>
       </p:sp>
@@ -6980,82 +6696,6 @@
           </a:p>
         </p:txBody>
       </p:sp>
-      <p:sp>
-        <p:nvSpPr>
-          <p:cNvPr id="74" name="TextBox 73">
-            <a:extLst>
-              <a:ext uri="{FF2B5EF4-FFF2-40B4-BE49-F238E27FC236}">
-                <a16:creationId xmlns:a16="http://schemas.microsoft.com/office/drawing/2014/main" id="{244C02EF-F1A6-2F38-5982-D6BF1730AF46}"/>
-              </a:ext>
-            </a:extLst>
-          </p:cNvPr>
-          <p:cNvSpPr txBox="1"/>
-          <p:nvPr/>
-        </p:nvSpPr>
-        <p:spPr>
-          <a:xfrm rot="2159215">
-            <a:off x="5815510" y="2029075"/>
-            <a:ext cx="1133644" cy="461665"/>
-          </a:xfrm>
-          <a:prstGeom prst="rect">
-            <a:avLst/>
-          </a:prstGeom>
-          <a:noFill/>
-        </p:spPr>
-        <p:txBody>
-          <a:bodyPr wrap="none" rtlCol="0">
-            <a:spAutoFit/>
-          </a:bodyPr>
-          <a:lstStyle/>
-          <a:p>
-            <a:r>
-              <a:rPr lang="en-US" sz="2400" b="1" dirty="0">
-                <a:latin typeface="Times New Roman" panose="02020603050405020304" pitchFamily="18" charset="0"/>
-                <a:cs typeface="Times New Roman" panose="02020603050405020304" pitchFamily="18" charset="0"/>
-              </a:rPr>
-              <a:t>-13.070</a:t>
-            </a:r>
-          </a:p>
-        </p:txBody>
-      </p:sp>
-      <p:sp>
-        <p:nvSpPr>
-          <p:cNvPr id="75" name="TextBox 74">
-            <a:extLst>
-              <a:ext uri="{FF2B5EF4-FFF2-40B4-BE49-F238E27FC236}">
-                <a16:creationId xmlns:a16="http://schemas.microsoft.com/office/drawing/2014/main" id="{D36FBB87-9540-A96D-DB0B-F29A669A82DE}"/>
-              </a:ext>
-            </a:extLst>
-          </p:cNvPr>
-          <p:cNvSpPr txBox="1"/>
-          <p:nvPr/>
-        </p:nvSpPr>
-        <p:spPr>
-          <a:xfrm>
-            <a:off x="6191367" y="2967335"/>
-            <a:ext cx="1031051" cy="461665"/>
-          </a:xfrm>
-          <a:prstGeom prst="rect">
-            <a:avLst/>
-          </a:prstGeom>
-          <a:noFill/>
-        </p:spPr>
-        <p:txBody>
-          <a:bodyPr wrap="none" rtlCol="0">
-            <a:spAutoFit/>
-          </a:bodyPr>
-          <a:lstStyle/>
-          <a:p>
-            <a:r>
-              <a:rPr lang="en-US" sz="2400" b="1" dirty="0">
-                <a:latin typeface="Times New Roman" panose="02020603050405020304" pitchFamily="18" charset="0"/>
-                <a:cs typeface="Times New Roman" panose="02020603050405020304" pitchFamily="18" charset="0"/>
-              </a:rPr>
-              <a:t>10.201</a:t>
-            </a:r>
-          </a:p>
-        </p:txBody>
-      </p:sp>
       <p:cxnSp>
         <p:nvCxnSpPr>
           <p:cNvPr id="77" name="Straight Arrow Connector 76">
@@ -7080,172 +6720,10 @@
           <a:prstGeom prst="straightConnector1">
             <a:avLst/>
           </a:prstGeom>
-          <a:ln w="73279">
+          <a:ln w="38100">
             <a:solidFill>
               <a:srgbClr val="C00000"/>
             </a:solidFill>
-            <a:tailEnd type="triangle"/>
-          </a:ln>
-        </p:spPr>
-        <p:style>
-          <a:lnRef idx="1">
-            <a:schemeClr val="accent1"/>
-          </a:lnRef>
-          <a:fillRef idx="0">
-            <a:schemeClr val="accent1"/>
-          </a:fillRef>
-          <a:effectRef idx="0">
-            <a:schemeClr val="accent1"/>
-          </a:effectRef>
-          <a:fontRef idx="minor">
-            <a:schemeClr val="tx1"/>
-          </a:fontRef>
-        </p:style>
-      </p:cxnSp>
-      <p:sp>
-        <p:nvSpPr>
-          <p:cNvPr id="80" name="TextBox 79">
-            <a:extLst>
-              <a:ext uri="{FF2B5EF4-FFF2-40B4-BE49-F238E27FC236}">
-                <a16:creationId xmlns:a16="http://schemas.microsoft.com/office/drawing/2014/main" id="{0FC8D521-81A9-E347-0EBC-99509681D866}"/>
-              </a:ext>
-            </a:extLst>
-          </p:cNvPr>
-          <p:cNvSpPr txBox="1"/>
-          <p:nvPr/>
-        </p:nvSpPr>
-        <p:spPr>
-          <a:xfrm rot="3447489">
-            <a:off x="6422552" y="1561551"/>
-            <a:ext cx="979755" cy="461665"/>
-          </a:xfrm>
-          <a:prstGeom prst="rect">
-            <a:avLst/>
-          </a:prstGeom>
-          <a:noFill/>
-        </p:spPr>
-        <p:txBody>
-          <a:bodyPr wrap="none" rtlCol="0">
-            <a:spAutoFit/>
-          </a:bodyPr>
-          <a:lstStyle/>
-          <a:p>
-            <a:r>
-              <a:rPr lang="en-US" sz="2400" b="1" dirty="0">
-                <a:latin typeface="Times New Roman" panose="02020603050405020304" pitchFamily="18" charset="0"/>
-                <a:cs typeface="Times New Roman" panose="02020603050405020304" pitchFamily="18" charset="0"/>
-              </a:rPr>
-              <a:t>-7.972</a:t>
-            </a:r>
-          </a:p>
-        </p:txBody>
-      </p:sp>
-      <p:cxnSp>
-        <p:nvCxnSpPr>
-          <p:cNvPr id="2" name="Straight Arrow Connector 1">
-            <a:extLst>
-              <a:ext uri="{FF2B5EF4-FFF2-40B4-BE49-F238E27FC236}">
-                <a16:creationId xmlns:a16="http://schemas.microsoft.com/office/drawing/2014/main" id="{82720060-A6FC-704F-8F90-E0C8FE5F764B}"/>
-              </a:ext>
-            </a:extLst>
-          </p:cNvPr>
-          <p:cNvCxnSpPr>
-            <a:cxnSpLocks/>
-          </p:cNvCxnSpPr>
-          <p:nvPr/>
-        </p:nvCxnSpPr>
-        <p:spPr>
-          <a:xfrm flipH="1">
-            <a:off x="9710059" y="865415"/>
-            <a:ext cx="1632858" cy="0"/>
-          </a:xfrm>
-          <a:prstGeom prst="straightConnector1">
-            <a:avLst/>
-          </a:prstGeom>
-          <a:ln w="87630">
-            <a:solidFill>
-              <a:srgbClr val="C00000"/>
-            </a:solidFill>
-            <a:tailEnd type="triangle"/>
-          </a:ln>
-        </p:spPr>
-        <p:style>
-          <a:lnRef idx="1">
-            <a:schemeClr val="accent1"/>
-          </a:lnRef>
-          <a:fillRef idx="0">
-            <a:schemeClr val="accent1"/>
-          </a:fillRef>
-          <a:effectRef idx="0">
-            <a:schemeClr val="accent1"/>
-          </a:effectRef>
-          <a:fontRef idx="minor">
-            <a:schemeClr val="tx1"/>
-          </a:fontRef>
-        </p:style>
-      </p:cxnSp>
-      <p:sp>
-        <p:nvSpPr>
-          <p:cNvPr id="3" name="TextBox 2">
-            <a:extLst>
-              <a:ext uri="{FF2B5EF4-FFF2-40B4-BE49-F238E27FC236}">
-                <a16:creationId xmlns:a16="http://schemas.microsoft.com/office/drawing/2014/main" id="{619B30D9-163E-1E1A-66F6-9A39C8D890EC}"/>
-              </a:ext>
-            </a:extLst>
-          </p:cNvPr>
-          <p:cNvSpPr txBox="1"/>
-          <p:nvPr/>
-        </p:nvSpPr>
-        <p:spPr>
-          <a:xfrm>
-            <a:off x="10013721" y="403750"/>
-            <a:ext cx="1133644" cy="461665"/>
-          </a:xfrm>
-          <a:prstGeom prst="rect">
-            <a:avLst/>
-          </a:prstGeom>
-          <a:noFill/>
-        </p:spPr>
-        <p:txBody>
-          <a:bodyPr wrap="none" rtlCol="0">
-            <a:spAutoFit/>
-          </a:bodyPr>
-          <a:lstStyle/>
-          <a:p>
-            <a:r>
-              <a:rPr lang="en-US" sz="2400" b="1" dirty="0">
-                <a:latin typeface="Times New Roman" panose="02020603050405020304" pitchFamily="18" charset="0"/>
-                <a:cs typeface="Times New Roman" panose="02020603050405020304" pitchFamily="18" charset="0"/>
-              </a:rPr>
-              <a:t>-10.541</a:t>
-            </a:r>
-          </a:p>
-        </p:txBody>
-      </p:sp>
-      <p:cxnSp>
-        <p:nvCxnSpPr>
-          <p:cNvPr id="5" name="Straight Arrow Connector 4">
-            <a:extLst>
-              <a:ext uri="{FF2B5EF4-FFF2-40B4-BE49-F238E27FC236}">
-                <a16:creationId xmlns:a16="http://schemas.microsoft.com/office/drawing/2014/main" id="{38BCDA20-54E4-0205-FE26-C2E14D06C037}"/>
-              </a:ext>
-            </a:extLst>
-          </p:cNvPr>
-          <p:cNvCxnSpPr>
-            <a:stCxn id="21" idx="1"/>
-            <a:endCxn id="20" idx="3"/>
-          </p:cNvCxnSpPr>
-          <p:nvPr/>
-        </p:nvCxnSpPr>
-        <p:spPr>
-          <a:xfrm flipH="1">
-            <a:off x="2481943" y="865415"/>
-            <a:ext cx="1632858" cy="0"/>
-          </a:xfrm>
-          <a:prstGeom prst="straightConnector1">
-            <a:avLst/>
-          </a:prstGeom>
-          <a:ln w="36195">
             <a:tailEnd type="triangle"/>
           </a:ln>
         </p:spPr>
@@ -7266,28 +6744,30 @@
       </p:cxnSp>
       <p:cxnSp>
         <p:nvCxnSpPr>
-          <p:cNvPr id="7" name="Straight Arrow Connector 6">
-            <a:extLst>
-              <a:ext uri="{FF2B5EF4-FFF2-40B4-BE49-F238E27FC236}">
-                <a16:creationId xmlns:a16="http://schemas.microsoft.com/office/drawing/2014/main" id="{59CA087A-0EC5-1F87-F1A9-20C588316628}"/>
+          <p:cNvPr id="2" name="Straight Arrow Connector 1">
+            <a:extLst>
+              <a:ext uri="{FF2B5EF4-FFF2-40B4-BE49-F238E27FC236}">
+                <a16:creationId xmlns:a16="http://schemas.microsoft.com/office/drawing/2014/main" id="{82720060-A6FC-704F-8F90-E0C8FE5F764B}"/>
               </a:ext>
             </a:extLst>
           </p:cNvPr>
           <p:cNvCxnSpPr>
-            <a:stCxn id="21" idx="1"/>
-            <a:endCxn id="28" idx="0"/>
+            <a:cxnSpLocks/>
           </p:cNvCxnSpPr>
           <p:nvPr/>
         </p:nvCxnSpPr>
         <p:spPr>
           <a:xfrm flipH="1">
-            <a:off x="1491343" y="865415"/>
-            <a:ext cx="2623458" cy="4435927"/>
+            <a:off x="9710059" y="865415"/>
+            <a:ext cx="1632858" cy="0"/>
           </a:xfrm>
           <a:prstGeom prst="straightConnector1">
             <a:avLst/>
           </a:prstGeom>
-          <a:ln w="29591">
+          <a:ln w="38100">
+            <a:solidFill>
+              <a:srgbClr val="C00000"/>
+            </a:solidFill>
             <a:tailEnd type="triangle"/>
           </a:ln>
         </p:spPr>
@@ -7308,10 +6788,10 @@
       </p:cxnSp>
       <p:sp>
         <p:nvSpPr>
-          <p:cNvPr id="8" name="TextBox 7">
-            <a:extLst>
-              <a:ext uri="{FF2B5EF4-FFF2-40B4-BE49-F238E27FC236}">
-                <a16:creationId xmlns:a16="http://schemas.microsoft.com/office/drawing/2014/main" id="{D785177C-7027-4A10-E6A3-23BF911028DE}"/>
+          <p:cNvPr id="4" name="TextBox 3">
+            <a:extLst>
+              <a:ext uri="{FF2B5EF4-FFF2-40B4-BE49-F238E27FC236}">
+                <a16:creationId xmlns:a16="http://schemas.microsoft.com/office/drawing/2014/main" id="{7B5B5484-7BFD-738A-6CDF-C9EC74D77D90}"/>
               </a:ext>
             </a:extLst>
           </p:cNvPr>
@@ -7319,8 +6799,8 @@
           <p:nvPr/>
         </p:nvSpPr>
         <p:spPr>
-          <a:xfrm>
-            <a:off x="2850030" y="477251"/>
+          <a:xfrm rot="980213">
+            <a:off x="7774010" y="4647571"/>
             <a:ext cx="979755" cy="461665"/>
           </a:xfrm>
           <a:prstGeom prst="rect">
@@ -7339,17 +6819,17 @@
                 <a:latin typeface="Times New Roman" panose="02020603050405020304" pitchFamily="18" charset="0"/>
                 <a:cs typeface="Times New Roman" panose="02020603050405020304" pitchFamily="18" charset="0"/>
               </a:rPr>
-              <a:t>-1.572</a:t>
-            </a:r>
-          </a:p>
-        </p:txBody>
-      </p:sp>
-      <p:sp>
-        <p:nvSpPr>
-          <p:cNvPr id="9" name="TextBox 8">
-            <a:extLst>
-              <a:ext uri="{FF2B5EF4-FFF2-40B4-BE49-F238E27FC236}">
-                <a16:creationId xmlns:a16="http://schemas.microsoft.com/office/drawing/2014/main" id="{74C95DE5-4C17-36D7-EDBD-42ABB94D66C1}"/>
+              <a:t>-1.947</a:t>
+            </a:r>
+          </a:p>
+        </p:txBody>
+      </p:sp>
+      <p:sp>
+        <p:nvSpPr>
+          <p:cNvPr id="5" name="TextBox 4">
+            <a:extLst>
+              <a:ext uri="{FF2B5EF4-FFF2-40B4-BE49-F238E27FC236}">
+                <a16:creationId xmlns:a16="http://schemas.microsoft.com/office/drawing/2014/main" id="{5C15E60C-786F-B0E4-702A-980DA8F9EF31}"/>
               </a:ext>
             </a:extLst>
           </p:cNvPr>
@@ -7357,8 +6837,122 @@
           <p:nvPr/>
         </p:nvSpPr>
         <p:spPr>
-          <a:xfrm rot="17933854">
-            <a:off x="1726184" y="3436275"/>
+          <a:xfrm rot="3415512">
+            <a:off x="10036612" y="4134396"/>
+            <a:ext cx="979755" cy="461665"/>
+          </a:xfrm>
+          <a:prstGeom prst="rect">
+            <a:avLst/>
+          </a:prstGeom>
+          <a:noFill/>
+        </p:spPr>
+        <p:txBody>
+          <a:bodyPr wrap="none" rtlCol="0">
+            <a:spAutoFit/>
+          </a:bodyPr>
+          <a:lstStyle/>
+          <a:p>
+            <a:r>
+              <a:rPr lang="en-US" sz="2400" dirty="0">
+                <a:latin typeface="Times New Roman" panose="02020603050405020304" pitchFamily="18" charset="0"/>
+                <a:cs typeface="Times New Roman" panose="02020603050405020304" pitchFamily="18" charset="0"/>
+              </a:rPr>
+              <a:t>-0.681</a:t>
+            </a:r>
+          </a:p>
+        </p:txBody>
+      </p:sp>
+      <p:sp>
+        <p:nvSpPr>
+          <p:cNvPr id="6" name="TextBox 5">
+            <a:extLst>
+              <a:ext uri="{FF2B5EF4-FFF2-40B4-BE49-F238E27FC236}">
+                <a16:creationId xmlns:a16="http://schemas.microsoft.com/office/drawing/2014/main" id="{88485C6C-B89E-A112-96E4-ECFD35F5D6CF}"/>
+              </a:ext>
+            </a:extLst>
+          </p:cNvPr>
+          <p:cNvSpPr txBox="1"/>
+          <p:nvPr/>
+        </p:nvSpPr>
+        <p:spPr>
+          <a:xfrm>
+            <a:off x="6419418" y="5530920"/>
+            <a:ext cx="877163" cy="461665"/>
+          </a:xfrm>
+          <a:prstGeom prst="rect">
+            <a:avLst/>
+          </a:prstGeom>
+          <a:noFill/>
+        </p:spPr>
+        <p:txBody>
+          <a:bodyPr wrap="none" rtlCol="0">
+            <a:spAutoFit/>
+          </a:bodyPr>
+          <a:lstStyle/>
+          <a:p>
+            <a:r>
+              <a:rPr lang="en-US" sz="2400" dirty="0">
+                <a:latin typeface="Times New Roman" panose="02020603050405020304" pitchFamily="18" charset="0"/>
+                <a:cs typeface="Times New Roman" panose="02020603050405020304" pitchFamily="18" charset="0"/>
+              </a:rPr>
+              <a:t>1.405</a:t>
+            </a:r>
+          </a:p>
+        </p:txBody>
+      </p:sp>
+      <p:sp>
+        <p:nvSpPr>
+          <p:cNvPr id="7" name="TextBox 6">
+            <a:extLst>
+              <a:ext uri="{FF2B5EF4-FFF2-40B4-BE49-F238E27FC236}">
+                <a16:creationId xmlns:a16="http://schemas.microsoft.com/office/drawing/2014/main" id="{7D1B418B-C3F1-D6ED-8A14-52E668769EF2}"/>
+              </a:ext>
+            </a:extLst>
+          </p:cNvPr>
+          <p:cNvSpPr txBox="1"/>
+          <p:nvPr/>
+        </p:nvSpPr>
+        <p:spPr>
+          <a:xfrm>
+            <a:off x="4118797" y="1880106"/>
+            <a:ext cx="979755" cy="461665"/>
+          </a:xfrm>
+          <a:prstGeom prst="rect">
+            <a:avLst/>
+          </a:prstGeom>
+          <a:noFill/>
+        </p:spPr>
+        <p:txBody>
+          <a:bodyPr wrap="none" rtlCol="0">
+            <a:spAutoFit/>
+          </a:bodyPr>
+          <a:lstStyle/>
+          <a:p>
+            <a:r>
+              <a:rPr lang="en-US" sz="2400" dirty="0">
+                <a:latin typeface="Times New Roman" panose="02020603050405020304" pitchFamily="18" charset="0"/>
+                <a:cs typeface="Times New Roman" panose="02020603050405020304" pitchFamily="18" charset="0"/>
+              </a:rPr>
+              <a:t>-0.860</a:t>
+            </a:r>
+          </a:p>
+        </p:txBody>
+      </p:sp>
+      <p:sp>
+        <p:nvSpPr>
+          <p:cNvPr id="8" name="TextBox 7">
+            <a:extLst>
+              <a:ext uri="{FF2B5EF4-FFF2-40B4-BE49-F238E27FC236}">
+                <a16:creationId xmlns:a16="http://schemas.microsoft.com/office/drawing/2014/main" id="{97BCA183-6879-FD37-FF21-D53BE58C94D7}"/>
+              </a:ext>
+            </a:extLst>
+          </p:cNvPr>
+          <p:cNvSpPr txBox="1"/>
+          <p:nvPr/>
+        </p:nvSpPr>
+        <p:spPr>
+          <a:xfrm>
+            <a:off x="7707067" y="1863140"/>
             <a:ext cx="979755" cy="461665"/>
           </a:xfrm>
           <a:prstGeom prst="rect">
@@ -7377,17 +6971,1131 @@
                 <a:latin typeface="Times New Roman" panose="02020603050405020304" pitchFamily="18" charset="0"/>
                 <a:cs typeface="Times New Roman" panose="02020603050405020304" pitchFamily="18" charset="0"/>
               </a:rPr>
-              <a:t>-0.431</a:t>
-            </a:r>
-          </a:p>
-        </p:txBody>
-      </p:sp>
-      <p:sp>
-        <p:nvSpPr>
-          <p:cNvPr id="21" name="Rectangle 20">
-            <a:extLst>
-              <a:ext uri="{FF2B5EF4-FFF2-40B4-BE49-F238E27FC236}">
-                <a16:creationId xmlns:a16="http://schemas.microsoft.com/office/drawing/2014/main" id="{2A451EDF-2134-D951-F607-AE0DC624C032}"/>
+              <a:t>-2.470</a:t>
+            </a:r>
+          </a:p>
+        </p:txBody>
+      </p:sp>
+      <p:sp>
+        <p:nvSpPr>
+          <p:cNvPr id="9" name="TextBox 8">
+            <a:extLst>
+              <a:ext uri="{FF2B5EF4-FFF2-40B4-BE49-F238E27FC236}">
+                <a16:creationId xmlns:a16="http://schemas.microsoft.com/office/drawing/2014/main" id="{EBE43EA0-6642-DE65-1FC8-2B2CCED5DAC3}"/>
+              </a:ext>
+            </a:extLst>
+          </p:cNvPr>
+          <p:cNvSpPr txBox="1"/>
+          <p:nvPr/>
+        </p:nvSpPr>
+        <p:spPr>
+          <a:xfrm rot="20471706">
+            <a:off x="9801621" y="1764583"/>
+            <a:ext cx="877163" cy="461665"/>
+          </a:xfrm>
+          <a:prstGeom prst="rect">
+            <a:avLst/>
+          </a:prstGeom>
+          <a:noFill/>
+        </p:spPr>
+        <p:txBody>
+          <a:bodyPr wrap="none" rtlCol="0">
+            <a:spAutoFit/>
+          </a:bodyPr>
+          <a:lstStyle/>
+          <a:p>
+            <a:r>
+              <a:rPr lang="en-US" sz="2400" dirty="0">
+                <a:latin typeface="Times New Roman" panose="02020603050405020304" pitchFamily="18" charset="0"/>
+                <a:cs typeface="Times New Roman" panose="02020603050405020304" pitchFamily="18" charset="0"/>
+              </a:rPr>
+              <a:t>0.092</a:t>
+            </a:r>
+          </a:p>
+        </p:txBody>
+      </p:sp>
+      <p:sp>
+        <p:nvSpPr>
+          <p:cNvPr id="10" name="TextBox 9">
+            <a:extLst>
+              <a:ext uri="{FF2B5EF4-FFF2-40B4-BE49-F238E27FC236}">
+                <a16:creationId xmlns:a16="http://schemas.microsoft.com/office/drawing/2014/main" id="{5F8EA069-6F0D-5CA6-BF05-D22712272A1E}"/>
+              </a:ext>
+            </a:extLst>
+          </p:cNvPr>
+          <p:cNvSpPr txBox="1"/>
+          <p:nvPr/>
+        </p:nvSpPr>
+        <p:spPr>
+          <a:xfrm rot="19488555">
+            <a:off x="2081829" y="4033081"/>
+            <a:ext cx="979755" cy="461665"/>
+          </a:xfrm>
+          <a:prstGeom prst="rect">
+            <a:avLst/>
+          </a:prstGeom>
+          <a:noFill/>
+        </p:spPr>
+        <p:txBody>
+          <a:bodyPr wrap="none" rtlCol="0">
+            <a:spAutoFit/>
+          </a:bodyPr>
+          <a:lstStyle/>
+          <a:p>
+            <a:r>
+              <a:rPr lang="en-US" sz="2400" b="1" dirty="0">
+                <a:latin typeface="Times New Roman" panose="02020603050405020304" pitchFamily="18" charset="0"/>
+                <a:cs typeface="Times New Roman" panose="02020603050405020304" pitchFamily="18" charset="0"/>
+              </a:rPr>
+              <a:t>-2.728</a:t>
+            </a:r>
+          </a:p>
+        </p:txBody>
+      </p:sp>
+      <p:sp>
+        <p:nvSpPr>
+          <p:cNvPr id="11" name="TextBox 10">
+            <a:extLst>
+              <a:ext uri="{FF2B5EF4-FFF2-40B4-BE49-F238E27FC236}">
+                <a16:creationId xmlns:a16="http://schemas.microsoft.com/office/drawing/2014/main" id="{A337C9DC-5FD7-DCF0-0804-30EF76A2D58E}"/>
+              </a:ext>
+            </a:extLst>
+          </p:cNvPr>
+          <p:cNvSpPr txBox="1"/>
+          <p:nvPr/>
+        </p:nvSpPr>
+        <p:spPr>
+          <a:xfrm rot="2166687">
+            <a:off x="2103246" y="1910670"/>
+            <a:ext cx="979755" cy="461665"/>
+          </a:xfrm>
+          <a:prstGeom prst="rect">
+            <a:avLst/>
+          </a:prstGeom>
+          <a:noFill/>
+        </p:spPr>
+        <p:txBody>
+          <a:bodyPr wrap="none" rtlCol="0">
+            <a:spAutoFit/>
+          </a:bodyPr>
+          <a:lstStyle/>
+          <a:p>
+            <a:r>
+              <a:rPr lang="en-US" sz="2400" dirty="0">
+                <a:latin typeface="Times New Roman" panose="02020603050405020304" pitchFamily="18" charset="0"/>
+                <a:cs typeface="Times New Roman" panose="02020603050405020304" pitchFamily="18" charset="0"/>
+              </a:rPr>
+              <a:t>-0.978</a:t>
+            </a:r>
+          </a:p>
+        </p:txBody>
+      </p:sp>
+      <p:sp>
+        <p:nvSpPr>
+          <p:cNvPr id="12" name="TextBox 11">
+            <a:extLst>
+              <a:ext uri="{FF2B5EF4-FFF2-40B4-BE49-F238E27FC236}">
+                <a16:creationId xmlns:a16="http://schemas.microsoft.com/office/drawing/2014/main" id="{D6BABC76-BFE8-61D1-C153-E1EAA3BD9D67}"/>
+              </a:ext>
+            </a:extLst>
+          </p:cNvPr>
+          <p:cNvSpPr txBox="1"/>
+          <p:nvPr/>
+        </p:nvSpPr>
+        <p:spPr>
+          <a:xfrm rot="2159215">
+            <a:off x="5815510" y="2045259"/>
+            <a:ext cx="1133644" cy="461665"/>
+          </a:xfrm>
+          <a:prstGeom prst="rect">
+            <a:avLst/>
+          </a:prstGeom>
+          <a:noFill/>
+        </p:spPr>
+        <p:txBody>
+          <a:bodyPr wrap="none" rtlCol="0">
+            <a:spAutoFit/>
+          </a:bodyPr>
+          <a:lstStyle/>
+          <a:p>
+            <a:r>
+              <a:rPr lang="en-US" sz="2400" b="1" dirty="0">
+                <a:latin typeface="Times New Roman" panose="02020603050405020304" pitchFamily="18" charset="0"/>
+                <a:cs typeface="Times New Roman" panose="02020603050405020304" pitchFamily="18" charset="0"/>
+              </a:rPr>
+              <a:t>-13.026</a:t>
+            </a:r>
+          </a:p>
+        </p:txBody>
+      </p:sp>
+      <p:sp>
+        <p:nvSpPr>
+          <p:cNvPr id="13" name="TextBox 12">
+            <a:extLst>
+              <a:ext uri="{FF2B5EF4-FFF2-40B4-BE49-F238E27FC236}">
+                <a16:creationId xmlns:a16="http://schemas.microsoft.com/office/drawing/2014/main" id="{28A771FF-985B-5C09-0DA4-46A5274CFD4C}"/>
+              </a:ext>
+            </a:extLst>
+          </p:cNvPr>
+          <p:cNvSpPr txBox="1"/>
+          <p:nvPr/>
+        </p:nvSpPr>
+        <p:spPr>
+          <a:xfrm>
+            <a:off x="6191367" y="2967335"/>
+            <a:ext cx="1031051" cy="461665"/>
+          </a:xfrm>
+          <a:prstGeom prst="rect">
+            <a:avLst/>
+          </a:prstGeom>
+          <a:noFill/>
+        </p:spPr>
+        <p:txBody>
+          <a:bodyPr wrap="none" rtlCol="0">
+            <a:spAutoFit/>
+          </a:bodyPr>
+          <a:lstStyle/>
+          <a:p>
+            <a:r>
+              <a:rPr lang="en-US" sz="2400" b="1" dirty="0">
+                <a:latin typeface="Times New Roman" panose="02020603050405020304" pitchFamily="18" charset="0"/>
+                <a:cs typeface="Times New Roman" panose="02020603050405020304" pitchFamily="18" charset="0"/>
+              </a:rPr>
+              <a:t>13.737</a:t>
+            </a:r>
+          </a:p>
+        </p:txBody>
+      </p:sp>
+      <p:sp>
+        <p:nvSpPr>
+          <p:cNvPr id="14" name="TextBox 13">
+            <a:extLst>
+              <a:ext uri="{FF2B5EF4-FFF2-40B4-BE49-F238E27FC236}">
+                <a16:creationId xmlns:a16="http://schemas.microsoft.com/office/drawing/2014/main" id="{4F80FAB0-93F0-BB5A-A4EA-A033C546A8AD}"/>
+              </a:ext>
+            </a:extLst>
+          </p:cNvPr>
+          <p:cNvSpPr txBox="1"/>
+          <p:nvPr/>
+        </p:nvSpPr>
+        <p:spPr>
+          <a:xfrm rot="3447489">
+            <a:off x="6422552" y="1561551"/>
+            <a:ext cx="979755" cy="461665"/>
+          </a:xfrm>
+          <a:prstGeom prst="rect">
+            <a:avLst/>
+          </a:prstGeom>
+          <a:noFill/>
+        </p:spPr>
+        <p:txBody>
+          <a:bodyPr wrap="none" rtlCol="0">
+            <a:spAutoFit/>
+          </a:bodyPr>
+          <a:lstStyle/>
+          <a:p>
+            <a:r>
+              <a:rPr lang="en-US" sz="2400" b="1" dirty="0">
+                <a:latin typeface="Times New Roman" panose="02020603050405020304" pitchFamily="18" charset="0"/>
+                <a:cs typeface="Times New Roman" panose="02020603050405020304" pitchFamily="18" charset="0"/>
+              </a:rPr>
+              <a:t>-9.297</a:t>
+            </a:r>
+          </a:p>
+        </p:txBody>
+      </p:sp>
+      <p:sp>
+        <p:nvSpPr>
+          <p:cNvPr id="15" name="TextBox 14">
+            <a:extLst>
+              <a:ext uri="{FF2B5EF4-FFF2-40B4-BE49-F238E27FC236}">
+                <a16:creationId xmlns:a16="http://schemas.microsoft.com/office/drawing/2014/main" id="{4D3FBF7B-3333-F357-14E6-233A28F06C10}"/>
+              </a:ext>
+            </a:extLst>
+          </p:cNvPr>
+          <p:cNvSpPr txBox="1"/>
+          <p:nvPr/>
+        </p:nvSpPr>
+        <p:spPr>
+          <a:xfrm>
+            <a:off x="10013721" y="403750"/>
+            <a:ext cx="1133644" cy="461665"/>
+          </a:xfrm>
+          <a:prstGeom prst="rect">
+            <a:avLst/>
+          </a:prstGeom>
+          <a:noFill/>
+        </p:spPr>
+        <p:txBody>
+          <a:bodyPr wrap="none" rtlCol="0">
+            <a:spAutoFit/>
+          </a:bodyPr>
+          <a:lstStyle/>
+          <a:p>
+            <a:r>
+              <a:rPr lang="en-US" sz="2400" b="1" dirty="0">
+                <a:latin typeface="Times New Roman" panose="02020603050405020304" pitchFamily="18" charset="0"/>
+                <a:cs typeface="Times New Roman" panose="02020603050405020304" pitchFamily="18" charset="0"/>
+              </a:rPr>
+              <a:t>-15.762</a:t>
+            </a:r>
+          </a:p>
+        </p:txBody>
+      </p:sp>
+      <p:cxnSp>
+        <p:nvCxnSpPr>
+          <p:cNvPr id="16" name="Straight Arrow Connector 15">
+            <a:extLst>
+              <a:ext uri="{FF2B5EF4-FFF2-40B4-BE49-F238E27FC236}">
+                <a16:creationId xmlns:a16="http://schemas.microsoft.com/office/drawing/2014/main" id="{2087452E-DB16-CF81-2E40-C4946563FBB2}"/>
+              </a:ext>
+            </a:extLst>
+          </p:cNvPr>
+          <p:cNvCxnSpPr>
+            <a:cxnSpLocks/>
+          </p:cNvCxnSpPr>
+          <p:nvPr/>
+        </p:nvCxnSpPr>
+        <p:spPr>
+          <a:xfrm>
+            <a:off x="1491343" y="1556658"/>
+            <a:ext cx="0" cy="3744684"/>
+          </a:xfrm>
+          <a:prstGeom prst="straightConnector1">
+            <a:avLst/>
+          </a:prstGeom>
+          <a:ln w="82550">
+            <a:tailEnd type="triangle"/>
+          </a:ln>
+        </p:spPr>
+        <p:style>
+          <a:lnRef idx="1">
+            <a:schemeClr val="accent1"/>
+          </a:lnRef>
+          <a:fillRef idx="0">
+            <a:schemeClr val="accent1"/>
+          </a:fillRef>
+          <a:effectRef idx="0">
+            <a:schemeClr val="accent1"/>
+          </a:effectRef>
+          <a:fontRef idx="minor">
+            <a:schemeClr val="tx1"/>
+          </a:fontRef>
+        </p:style>
+      </p:cxnSp>
+      <p:sp>
+        <p:nvSpPr>
+          <p:cNvPr id="17" name="TextBox 16">
+            <a:extLst>
+              <a:ext uri="{FF2B5EF4-FFF2-40B4-BE49-F238E27FC236}">
+                <a16:creationId xmlns:a16="http://schemas.microsoft.com/office/drawing/2014/main" id="{BD4F5F98-2E8A-7D49-1332-119EF772EBD9}"/>
+              </a:ext>
+            </a:extLst>
+          </p:cNvPr>
+          <p:cNvSpPr txBox="1"/>
+          <p:nvPr/>
+        </p:nvSpPr>
+        <p:spPr>
+          <a:xfrm>
+            <a:off x="441304" y="3198167"/>
+            <a:ext cx="1031051" cy="461665"/>
+          </a:xfrm>
+          <a:prstGeom prst="rect">
+            <a:avLst/>
+          </a:prstGeom>
+          <a:noFill/>
+        </p:spPr>
+        <p:txBody>
+          <a:bodyPr wrap="none" rtlCol="0">
+            <a:spAutoFit/>
+          </a:bodyPr>
+          <a:lstStyle/>
+          <a:p>
+            <a:r>
+              <a:rPr lang="en-US" sz="2400" b="1" dirty="0">
+                <a:latin typeface="Times New Roman" panose="02020603050405020304" pitchFamily="18" charset="0"/>
+                <a:cs typeface="Times New Roman" panose="02020603050405020304" pitchFamily="18" charset="0"/>
+              </a:rPr>
+              <a:t>13.512</a:t>
+            </a:r>
+          </a:p>
+        </p:txBody>
+      </p:sp>
+    </p:spTree>
+    <p:extLst>
+      <p:ext uri="{BB962C8B-B14F-4D97-AF65-F5344CB8AC3E}">
+        <p14:creationId xmlns:p14="http://schemas.microsoft.com/office/powerpoint/2010/main" val="3047400984"/>
+      </p:ext>
+    </p:extLst>
+  </p:cSld>
+  <p:clrMapOvr>
+    <a:masterClrMapping/>
+  </p:clrMapOvr>
+</p:sld>
+</file>
+
+<file path=ppt/slides/slide3.xml><?xml version="1.0" encoding="utf-8"?>
+<p:sld xmlns:a="http://schemas.openxmlformats.org/drawingml/2006/main" xmlns:r="http://schemas.openxmlformats.org/officeDocument/2006/relationships" xmlns:p="http://schemas.openxmlformats.org/presentationml/2006/main">
+  <p:cSld>
+    <p:spTree>
+      <p:nvGrpSpPr>
+        <p:cNvPr id="1" name=""/>
+        <p:cNvGrpSpPr/>
+        <p:nvPr/>
+      </p:nvGrpSpPr>
+      <p:grpSpPr>
+        <a:xfrm>
+          <a:off x="0" y="0"/>
+          <a:ext cx="0" cy="0"/>
+          <a:chOff x="0" y="0"/>
+          <a:chExt cx="0" cy="0"/>
+        </a:xfrm>
+      </p:grpSpPr>
+      <p:cxnSp>
+        <p:nvCxnSpPr>
+          <p:cNvPr id="73" name="Straight Arrow Connector 72">
+            <a:extLst>
+              <a:ext uri="{FF2B5EF4-FFF2-40B4-BE49-F238E27FC236}">
+                <a16:creationId xmlns:a16="http://schemas.microsoft.com/office/drawing/2014/main" id="{61C7B4CB-3474-D72A-9F80-BB683CD500B5}"/>
+              </a:ext>
+            </a:extLst>
+          </p:cNvPr>
+          <p:cNvCxnSpPr>
+            <a:stCxn id="21" idx="2"/>
+            <a:endCxn id="31" idx="1"/>
+          </p:cNvCxnSpPr>
+          <p:nvPr/>
+        </p:nvCxnSpPr>
+        <p:spPr>
+          <a:xfrm>
+            <a:off x="5105401" y="1556658"/>
+            <a:ext cx="6237516" cy="4435927"/>
+          </a:xfrm>
+          <a:prstGeom prst="straightConnector1">
+            <a:avLst/>
+          </a:prstGeom>
+          <a:ln w="80518">
+            <a:tailEnd type="triangle"/>
+          </a:ln>
+        </p:spPr>
+        <p:style>
+          <a:lnRef idx="1">
+            <a:schemeClr val="accent1"/>
+          </a:lnRef>
+          <a:fillRef idx="0">
+            <a:schemeClr val="accent1"/>
+          </a:fillRef>
+          <a:effectRef idx="0">
+            <a:schemeClr val="accent1"/>
+          </a:effectRef>
+          <a:fontRef idx="minor">
+            <a:schemeClr val="tx1"/>
+          </a:fontRef>
+        </p:style>
+      </p:cxnSp>
+      <p:sp>
+        <p:nvSpPr>
+          <p:cNvPr id="34" name="TextBox 33">
+            <a:extLst>
+              <a:ext uri="{FF2B5EF4-FFF2-40B4-BE49-F238E27FC236}">
+                <a16:creationId xmlns:a16="http://schemas.microsoft.com/office/drawing/2014/main" id="{B6CFD367-96BB-5333-BB7D-2A376BBD254A}"/>
+              </a:ext>
+            </a:extLst>
+          </p:cNvPr>
+          <p:cNvSpPr txBox="1"/>
+          <p:nvPr/>
+        </p:nvSpPr>
+        <p:spPr>
+          <a:xfrm>
+            <a:off x="629568" y="326806"/>
+            <a:ext cx="1723549" cy="1077218"/>
+          </a:xfrm>
+          <a:prstGeom prst="rect">
+            <a:avLst/>
+          </a:prstGeom>
+          <a:noFill/>
+        </p:spPr>
+        <p:txBody>
+          <a:bodyPr wrap="none" rtlCol="0">
+            <a:spAutoFit/>
+          </a:bodyPr>
+          <a:lstStyle/>
+          <a:p>
+            <a:pPr algn="ctr"/>
+            <a:r>
+              <a:rPr lang="en-US" sz="3200" i="1" dirty="0">
+                <a:latin typeface="Times New Roman" panose="02020603050405020304" pitchFamily="18" charset="0"/>
+                <a:cs typeface="Times New Roman" panose="02020603050405020304" pitchFamily="18" charset="0"/>
+              </a:rPr>
+              <a:t>Soil </a:t>
+            </a:r>
+          </a:p>
+          <a:p>
+            <a:pPr algn="ctr"/>
+            <a:r>
+              <a:rPr lang="en-US" sz="3200" i="1" dirty="0">
+                <a:latin typeface="Times New Roman" panose="02020603050405020304" pitchFamily="18" charset="0"/>
+                <a:cs typeface="Times New Roman" panose="02020603050405020304" pitchFamily="18" charset="0"/>
+              </a:rPr>
+              <a:t>moisture </a:t>
+            </a:r>
+          </a:p>
+        </p:txBody>
+      </p:sp>
+      <p:sp>
+        <p:nvSpPr>
+          <p:cNvPr id="35" name="TextBox 34">
+            <a:extLst>
+              <a:ext uri="{FF2B5EF4-FFF2-40B4-BE49-F238E27FC236}">
+                <a16:creationId xmlns:a16="http://schemas.microsoft.com/office/drawing/2014/main" id="{6C89A079-ABD7-0D73-12B2-BAE34517A0DC}"/>
+              </a:ext>
+            </a:extLst>
+          </p:cNvPr>
+          <p:cNvSpPr txBox="1"/>
+          <p:nvPr/>
+        </p:nvSpPr>
+        <p:spPr>
+          <a:xfrm>
+            <a:off x="766625" y="5453976"/>
+            <a:ext cx="1449436" cy="1077218"/>
+          </a:xfrm>
+          <a:prstGeom prst="rect">
+            <a:avLst/>
+          </a:prstGeom>
+          <a:noFill/>
+        </p:spPr>
+        <p:txBody>
+          <a:bodyPr wrap="none" rtlCol="0">
+            <a:spAutoFit/>
+          </a:bodyPr>
+          <a:lstStyle/>
+          <a:p>
+            <a:pPr algn="ctr"/>
+            <a:r>
+              <a:rPr lang="en-US" sz="3200" i="1" dirty="0">
+                <a:latin typeface="Times New Roman" panose="02020603050405020304" pitchFamily="18" charset="0"/>
+                <a:cs typeface="Times New Roman" panose="02020603050405020304" pitchFamily="18" charset="0"/>
+              </a:rPr>
+              <a:t>Soil </a:t>
+            </a:r>
+          </a:p>
+          <a:p>
+            <a:pPr algn="ctr"/>
+            <a:r>
+              <a:rPr lang="en-US" sz="3200" i="1" dirty="0">
+                <a:latin typeface="Times New Roman" panose="02020603050405020304" pitchFamily="18" charset="0"/>
+                <a:cs typeface="Times New Roman" panose="02020603050405020304" pitchFamily="18" charset="0"/>
+              </a:rPr>
+              <a:t>NO</a:t>
+            </a:r>
+            <a:r>
+              <a:rPr lang="en-US" sz="3200" i="1" baseline="-25000" dirty="0">
+                <a:latin typeface="Times New Roman" panose="02020603050405020304" pitchFamily="18" charset="0"/>
+                <a:cs typeface="Times New Roman" panose="02020603050405020304" pitchFamily="18" charset="0"/>
+              </a:rPr>
+              <a:t>3</a:t>
+            </a:r>
+            <a:r>
+              <a:rPr lang="en-US" sz="3200" i="1" dirty="0">
+                <a:latin typeface="Times New Roman" panose="02020603050405020304" pitchFamily="18" charset="0"/>
+                <a:cs typeface="Times New Roman" panose="02020603050405020304" pitchFamily="18" charset="0"/>
+              </a:rPr>
+              <a:t>-N </a:t>
+            </a:r>
+          </a:p>
+        </p:txBody>
+      </p:sp>
+      <p:sp>
+        <p:nvSpPr>
+          <p:cNvPr id="36" name="TextBox 35">
+            <a:extLst>
+              <a:ext uri="{FF2B5EF4-FFF2-40B4-BE49-F238E27FC236}">
+                <a16:creationId xmlns:a16="http://schemas.microsoft.com/office/drawing/2014/main" id="{3E1B6594-EF86-7605-E52C-34BEFF337746}"/>
+              </a:ext>
+            </a:extLst>
+          </p:cNvPr>
+          <p:cNvSpPr txBox="1"/>
+          <p:nvPr/>
+        </p:nvSpPr>
+        <p:spPr>
+          <a:xfrm>
+            <a:off x="4910475" y="3136612"/>
+            <a:ext cx="389851" cy="584775"/>
+          </a:xfrm>
+          <a:prstGeom prst="rect">
+            <a:avLst/>
+          </a:prstGeom>
+          <a:noFill/>
+        </p:spPr>
+        <p:txBody>
+          <a:bodyPr wrap="none" rtlCol="0">
+            <a:spAutoFit/>
+          </a:bodyPr>
+          <a:lstStyle/>
+          <a:p>
+            <a:pPr algn="ctr"/>
+            <a:r>
+              <a:rPr lang="el-GR" sz="3200" i="1" dirty="0">
+                <a:latin typeface="Times New Roman" panose="02020603050405020304" pitchFamily="18" charset="0"/>
+                <a:cs typeface="Times New Roman" panose="02020603050405020304" pitchFamily="18" charset="0"/>
+              </a:rPr>
+              <a:t>β</a:t>
+            </a:r>
+            <a:endParaRPr lang="en-US" sz="3200" i="1" dirty="0">
+              <a:latin typeface="Times New Roman" panose="02020603050405020304" pitchFamily="18" charset="0"/>
+              <a:cs typeface="Times New Roman" panose="02020603050405020304" pitchFamily="18" charset="0"/>
+            </a:endParaRPr>
+          </a:p>
+        </p:txBody>
+      </p:sp>
+      <p:sp>
+        <p:nvSpPr>
+          <p:cNvPr id="38" name="TextBox 37">
+            <a:extLst>
+              <a:ext uri="{FF2B5EF4-FFF2-40B4-BE49-F238E27FC236}">
+                <a16:creationId xmlns:a16="http://schemas.microsoft.com/office/drawing/2014/main" id="{DEE8EFC0-1B48-8EC0-A5FB-9B65CBC229DB}"/>
+              </a:ext>
+            </a:extLst>
+          </p:cNvPr>
+          <p:cNvSpPr txBox="1"/>
+          <p:nvPr/>
+        </p:nvSpPr>
+        <p:spPr>
+          <a:xfrm>
+            <a:off x="11553111" y="5453976"/>
+            <a:ext cx="1560812" cy="1077218"/>
+          </a:xfrm>
+          <a:prstGeom prst="rect">
+            <a:avLst/>
+          </a:prstGeom>
+          <a:noFill/>
+        </p:spPr>
+        <p:txBody>
+          <a:bodyPr wrap="none" rtlCol="0">
+            <a:spAutoFit/>
+          </a:bodyPr>
+          <a:lstStyle/>
+          <a:p>
+            <a:pPr algn="ctr"/>
+            <a:r>
+              <a:rPr lang="en-US" sz="3200" i="1" dirty="0">
+                <a:latin typeface="Times New Roman" panose="02020603050405020304" pitchFamily="18" charset="0"/>
+                <a:cs typeface="Times New Roman" panose="02020603050405020304" pitchFamily="18" charset="0"/>
+              </a:rPr>
+              <a:t>Leaf</a:t>
+            </a:r>
+          </a:p>
+          <a:p>
+            <a:pPr algn="ctr"/>
+            <a:r>
+              <a:rPr lang="en-US" sz="3200" i="1" dirty="0">
+                <a:latin typeface="Times New Roman" panose="02020603050405020304" pitchFamily="18" charset="0"/>
+                <a:cs typeface="Times New Roman" panose="02020603050405020304" pitchFamily="18" charset="0"/>
+              </a:rPr>
+              <a:t>nitrogen</a:t>
+            </a:r>
+          </a:p>
+        </p:txBody>
+      </p:sp>
+      <p:sp>
+        <p:nvSpPr>
+          <p:cNvPr id="39" name="TextBox 38">
+            <a:extLst>
+              <a:ext uri="{FF2B5EF4-FFF2-40B4-BE49-F238E27FC236}">
+                <a16:creationId xmlns:a16="http://schemas.microsoft.com/office/drawing/2014/main" id="{3128AFF3-5CF2-6DE3-9D59-64189657E6DC}"/>
+              </a:ext>
+            </a:extLst>
+          </p:cNvPr>
+          <p:cNvSpPr txBox="1"/>
+          <p:nvPr/>
+        </p:nvSpPr>
+        <p:spPr>
+          <a:xfrm>
+            <a:off x="4649185" y="573027"/>
+            <a:ext cx="912430" cy="584775"/>
+          </a:xfrm>
+          <a:prstGeom prst="rect">
+            <a:avLst/>
+          </a:prstGeom>
+          <a:noFill/>
+        </p:spPr>
+        <p:txBody>
+          <a:bodyPr wrap="none" rtlCol="0">
+            <a:spAutoFit/>
+          </a:bodyPr>
+          <a:lstStyle/>
+          <a:p>
+            <a:pPr algn="ctr"/>
+            <a:r>
+              <a:rPr lang="en-US" sz="3200" i="1" dirty="0">
+                <a:latin typeface="Times New Roman" panose="02020603050405020304" pitchFamily="18" charset="0"/>
+                <a:cs typeface="Times New Roman" panose="02020603050405020304" pitchFamily="18" charset="0"/>
+              </a:rPr>
+              <a:t>PFT</a:t>
+            </a:r>
+          </a:p>
+        </p:txBody>
+      </p:sp>
+      <p:sp>
+        <p:nvSpPr>
+          <p:cNvPr id="40" name="TextBox 39">
+            <a:extLst>
+              <a:ext uri="{FF2B5EF4-FFF2-40B4-BE49-F238E27FC236}">
+                <a16:creationId xmlns:a16="http://schemas.microsoft.com/office/drawing/2014/main" id="{67E72C8D-3F29-25F3-F215-C1259A782E46}"/>
+              </a:ext>
+            </a:extLst>
+          </p:cNvPr>
+          <p:cNvSpPr txBox="1"/>
+          <p:nvPr/>
+        </p:nvSpPr>
+        <p:spPr>
+          <a:xfrm>
+            <a:off x="8228780" y="573026"/>
+            <a:ext cx="981359" cy="584775"/>
+          </a:xfrm>
+          <a:prstGeom prst="rect">
+            <a:avLst/>
+          </a:prstGeom>
+          <a:noFill/>
+        </p:spPr>
+        <p:txBody>
+          <a:bodyPr wrap="none" rtlCol="0">
+            <a:spAutoFit/>
+          </a:bodyPr>
+          <a:lstStyle/>
+          <a:p>
+            <a:pPr algn="ctr"/>
+            <a:r>
+              <a:rPr lang="en-US" sz="3200" i="1" dirty="0">
+                <a:latin typeface="Times New Roman" panose="02020603050405020304" pitchFamily="18" charset="0"/>
+                <a:cs typeface="Times New Roman" panose="02020603050405020304" pitchFamily="18" charset="0"/>
+              </a:rPr>
+              <a:t>VPD</a:t>
+            </a:r>
+          </a:p>
+        </p:txBody>
+      </p:sp>
+      <p:sp>
+        <p:nvSpPr>
+          <p:cNvPr id="41" name="TextBox 40">
+            <a:extLst>
+              <a:ext uri="{FF2B5EF4-FFF2-40B4-BE49-F238E27FC236}">
+                <a16:creationId xmlns:a16="http://schemas.microsoft.com/office/drawing/2014/main" id="{2C5B99C0-6E49-7B08-0180-3027C6FCE83B}"/>
+              </a:ext>
+            </a:extLst>
+          </p:cNvPr>
+          <p:cNvSpPr txBox="1"/>
+          <p:nvPr/>
+        </p:nvSpPr>
+        <p:spPr>
+          <a:xfrm>
+            <a:off x="11272137" y="573025"/>
+            <a:ext cx="2122761" cy="553998"/>
+          </a:xfrm>
+          <a:prstGeom prst="rect">
+            <a:avLst/>
+          </a:prstGeom>
+          <a:noFill/>
+        </p:spPr>
+        <p:txBody>
+          <a:bodyPr wrap="none" rtlCol="0">
+            <a:spAutoFit/>
+          </a:bodyPr>
+          <a:lstStyle/>
+          <a:p>
+            <a:pPr algn="ctr"/>
+            <a:r>
+              <a:rPr lang="en-US" sz="3000" i="1" dirty="0">
+                <a:latin typeface="Times New Roman" panose="02020603050405020304" pitchFamily="18" charset="0"/>
+                <a:cs typeface="Times New Roman" panose="02020603050405020304" pitchFamily="18" charset="0"/>
+              </a:rPr>
+              <a:t>Temperature</a:t>
+            </a:r>
+          </a:p>
+        </p:txBody>
+      </p:sp>
+      <p:cxnSp>
+        <p:nvCxnSpPr>
+          <p:cNvPr id="43" name="Straight Arrow Connector 42">
+            <a:extLst>
+              <a:ext uri="{FF2B5EF4-FFF2-40B4-BE49-F238E27FC236}">
+                <a16:creationId xmlns:a16="http://schemas.microsoft.com/office/drawing/2014/main" id="{647874A4-A342-A17B-1543-7EFDBE4BCA48}"/>
+              </a:ext>
+            </a:extLst>
+          </p:cNvPr>
+          <p:cNvCxnSpPr>
+            <a:stCxn id="20" idx="2"/>
+            <a:endCxn id="25" idx="1"/>
+          </p:cNvCxnSpPr>
+          <p:nvPr/>
+        </p:nvCxnSpPr>
+        <p:spPr>
+          <a:xfrm>
+            <a:off x="1491343" y="1556658"/>
+            <a:ext cx="2623458" cy="1872342"/>
+          </a:xfrm>
+          <a:prstGeom prst="straightConnector1">
+            <a:avLst/>
+          </a:prstGeom>
+          <a:ln w="30353">
+            <a:solidFill>
+              <a:schemeClr val="bg1">
+                <a:lumMod val="65000"/>
+              </a:schemeClr>
+            </a:solidFill>
+            <a:prstDash val="dash"/>
+            <a:tailEnd type="triangle"/>
+          </a:ln>
+        </p:spPr>
+        <p:style>
+          <a:lnRef idx="1">
+            <a:schemeClr val="accent1"/>
+          </a:lnRef>
+          <a:fillRef idx="0">
+            <a:schemeClr val="accent1"/>
+          </a:fillRef>
+          <a:effectRef idx="0">
+            <a:schemeClr val="accent1"/>
+          </a:effectRef>
+          <a:fontRef idx="minor">
+            <a:schemeClr val="tx1"/>
+          </a:fontRef>
+        </p:style>
+      </p:cxnSp>
+      <p:cxnSp>
+        <p:nvCxnSpPr>
+          <p:cNvPr id="44" name="Straight Arrow Connector 43">
+            <a:extLst>
+              <a:ext uri="{FF2B5EF4-FFF2-40B4-BE49-F238E27FC236}">
+                <a16:creationId xmlns:a16="http://schemas.microsoft.com/office/drawing/2014/main" id="{A2E1161F-B387-5957-D318-027516E16EAC}"/>
+              </a:ext>
+            </a:extLst>
+          </p:cNvPr>
+          <p:cNvCxnSpPr>
+            <a:cxnSpLocks/>
+            <a:stCxn id="28" idx="0"/>
+            <a:endCxn id="25" idx="1"/>
+          </p:cNvCxnSpPr>
+          <p:nvPr/>
+        </p:nvCxnSpPr>
+        <p:spPr>
+          <a:xfrm flipV="1">
+            <a:off x="1491343" y="3429000"/>
+            <a:ext cx="2623458" cy="1872342"/>
+          </a:xfrm>
+          <a:prstGeom prst="straightConnector1">
+            <a:avLst/>
+          </a:prstGeom>
+          <a:ln w="37719">
+            <a:solidFill>
+              <a:srgbClr val="C00000"/>
+            </a:solidFill>
+            <a:tailEnd type="triangle"/>
+          </a:ln>
+        </p:spPr>
+        <p:style>
+          <a:lnRef idx="1">
+            <a:schemeClr val="accent1"/>
+          </a:lnRef>
+          <a:fillRef idx="0">
+            <a:schemeClr val="accent1"/>
+          </a:fillRef>
+          <a:effectRef idx="0">
+            <a:schemeClr val="accent1"/>
+          </a:effectRef>
+          <a:fontRef idx="minor">
+            <a:schemeClr val="tx1"/>
+          </a:fontRef>
+        </p:style>
+      </p:cxnSp>
+      <p:cxnSp>
+        <p:nvCxnSpPr>
+          <p:cNvPr id="50" name="Straight Arrow Connector 49">
+            <a:extLst>
+              <a:ext uri="{FF2B5EF4-FFF2-40B4-BE49-F238E27FC236}">
+                <a16:creationId xmlns:a16="http://schemas.microsoft.com/office/drawing/2014/main" id="{FCDA5EDA-AF50-B8D2-2147-779C4FF0DABF}"/>
+              </a:ext>
+            </a:extLst>
+          </p:cNvPr>
+          <p:cNvCxnSpPr>
+            <a:stCxn id="21" idx="2"/>
+            <a:endCxn id="25" idx="0"/>
+          </p:cNvCxnSpPr>
+          <p:nvPr/>
+        </p:nvCxnSpPr>
+        <p:spPr>
+          <a:xfrm>
+            <a:off x="5105401" y="1556658"/>
+            <a:ext cx="0" cy="1181099"/>
+          </a:xfrm>
+          <a:prstGeom prst="straightConnector1">
+            <a:avLst/>
+          </a:prstGeom>
+          <a:ln w="29845">
+            <a:solidFill>
+              <a:schemeClr val="bg1">
+                <a:lumMod val="65000"/>
+              </a:schemeClr>
+            </a:solidFill>
+            <a:prstDash val="dash"/>
+            <a:tailEnd type="triangle"/>
+          </a:ln>
+        </p:spPr>
+        <p:style>
+          <a:lnRef idx="1">
+            <a:schemeClr val="accent1"/>
+          </a:lnRef>
+          <a:fillRef idx="0">
+            <a:schemeClr val="accent1"/>
+          </a:fillRef>
+          <a:effectRef idx="0">
+            <a:schemeClr val="accent1"/>
+          </a:effectRef>
+          <a:fontRef idx="minor">
+            <a:schemeClr val="tx1"/>
+          </a:fontRef>
+        </p:style>
+      </p:cxnSp>
+      <p:cxnSp>
+        <p:nvCxnSpPr>
+          <p:cNvPr id="52" name="Straight Arrow Connector 51">
+            <a:extLst>
+              <a:ext uri="{FF2B5EF4-FFF2-40B4-BE49-F238E27FC236}">
+                <a16:creationId xmlns:a16="http://schemas.microsoft.com/office/drawing/2014/main" id="{D2FA9BBB-61CF-7920-ECA5-7C63A4C65EF1}"/>
+              </a:ext>
+            </a:extLst>
+          </p:cNvPr>
+          <p:cNvCxnSpPr>
+            <a:stCxn id="25" idx="3"/>
+            <a:endCxn id="26" idx="1"/>
+          </p:cNvCxnSpPr>
+          <p:nvPr/>
+        </p:nvCxnSpPr>
+        <p:spPr>
+          <a:xfrm>
+            <a:off x="6096001" y="3429000"/>
+            <a:ext cx="1632858" cy="0"/>
+          </a:xfrm>
+          <a:prstGeom prst="straightConnector1">
+            <a:avLst/>
+          </a:prstGeom>
+          <a:ln w="83439">
+            <a:solidFill>
+              <a:srgbClr val="C00000"/>
+            </a:solidFill>
+            <a:tailEnd type="triangle"/>
+          </a:ln>
+        </p:spPr>
+        <p:style>
+          <a:lnRef idx="1">
+            <a:schemeClr val="accent1"/>
+          </a:lnRef>
+          <a:fillRef idx="0">
+            <a:schemeClr val="accent1"/>
+          </a:fillRef>
+          <a:effectRef idx="0">
+            <a:schemeClr val="accent1"/>
+          </a:effectRef>
+          <a:fontRef idx="minor">
+            <a:schemeClr val="tx1"/>
+          </a:fontRef>
+        </p:style>
+      </p:cxnSp>
+      <p:cxnSp>
+        <p:nvCxnSpPr>
+          <p:cNvPr id="54" name="Straight Arrow Connector 53">
+            <a:extLst>
+              <a:ext uri="{FF2B5EF4-FFF2-40B4-BE49-F238E27FC236}">
+                <a16:creationId xmlns:a16="http://schemas.microsoft.com/office/drawing/2014/main" id="{100D8950-AC1B-AD32-BAA1-1221A7CB6AD2}"/>
+              </a:ext>
+            </a:extLst>
+          </p:cNvPr>
+          <p:cNvCxnSpPr>
+            <a:stCxn id="22" idx="2"/>
+            <a:endCxn id="26" idx="0"/>
+          </p:cNvCxnSpPr>
+          <p:nvPr/>
+        </p:nvCxnSpPr>
+        <p:spPr>
+          <a:xfrm>
+            <a:off x="8719459" y="1556658"/>
+            <a:ext cx="0" cy="1181099"/>
+          </a:xfrm>
+          <a:prstGeom prst="straightConnector1">
+            <a:avLst/>
+          </a:prstGeom>
+          <a:ln w="36576">
+            <a:solidFill>
+              <a:srgbClr val="C00000"/>
+            </a:solidFill>
+            <a:prstDash val="solid"/>
+            <a:tailEnd type="triangle"/>
+          </a:ln>
+        </p:spPr>
+        <p:style>
+          <a:lnRef idx="1">
+            <a:schemeClr val="accent1"/>
+          </a:lnRef>
+          <a:fillRef idx="0">
+            <a:schemeClr val="accent1"/>
+          </a:fillRef>
+          <a:effectRef idx="0">
+            <a:schemeClr val="accent1"/>
+          </a:effectRef>
+          <a:fontRef idx="minor">
+            <a:schemeClr val="tx1"/>
+          </a:fontRef>
+        </p:style>
+      </p:cxnSp>
+      <p:cxnSp>
+        <p:nvCxnSpPr>
+          <p:cNvPr id="56" name="Straight Arrow Connector 55">
+            <a:extLst>
+              <a:ext uri="{FF2B5EF4-FFF2-40B4-BE49-F238E27FC236}">
+                <a16:creationId xmlns:a16="http://schemas.microsoft.com/office/drawing/2014/main" id="{03A0CBB9-F1AE-2712-B46D-5740B1884373}"/>
+              </a:ext>
+            </a:extLst>
+          </p:cNvPr>
+          <p:cNvCxnSpPr>
+            <a:cxnSpLocks/>
+            <a:stCxn id="23" idx="2"/>
+            <a:endCxn id="26" idx="0"/>
+          </p:cNvCxnSpPr>
+          <p:nvPr/>
+        </p:nvCxnSpPr>
+        <p:spPr>
+          <a:xfrm flipH="1">
+            <a:off x="8719459" y="1556658"/>
+            <a:ext cx="3614058" cy="1181099"/>
+          </a:xfrm>
+          <a:prstGeom prst="straightConnector1">
+            <a:avLst/>
+          </a:prstGeom>
+          <a:ln w="26670">
+            <a:solidFill>
+              <a:schemeClr val="bg1">
+                <a:lumMod val="65000"/>
+              </a:schemeClr>
+            </a:solidFill>
+            <a:prstDash val="dash"/>
+            <a:tailEnd type="triangle"/>
+          </a:ln>
+        </p:spPr>
+        <p:style>
+          <a:lnRef idx="1">
+            <a:schemeClr val="accent1"/>
+          </a:lnRef>
+          <a:fillRef idx="0">
+            <a:schemeClr val="accent1"/>
+          </a:fillRef>
+          <a:effectRef idx="0">
+            <a:schemeClr val="accent1"/>
+          </a:effectRef>
+          <a:fontRef idx="minor">
+            <a:schemeClr val="tx1"/>
+          </a:fontRef>
+        </p:style>
+      </p:cxnSp>
+      <p:cxnSp>
+        <p:nvCxnSpPr>
+          <p:cNvPr id="58" name="Straight Arrow Connector 57">
+            <a:extLst>
+              <a:ext uri="{FF2B5EF4-FFF2-40B4-BE49-F238E27FC236}">
+                <a16:creationId xmlns:a16="http://schemas.microsoft.com/office/drawing/2014/main" id="{4C07D496-6CDD-6FFA-F311-3A43CC89874D}"/>
+              </a:ext>
+            </a:extLst>
+          </p:cNvPr>
+          <p:cNvCxnSpPr>
+            <a:cxnSpLocks/>
+            <a:stCxn id="26" idx="3"/>
+            <a:endCxn id="31" idx="1"/>
+          </p:cNvCxnSpPr>
+          <p:nvPr/>
+        </p:nvCxnSpPr>
+        <p:spPr>
+          <a:xfrm>
+            <a:off x="9710059" y="3429000"/>
+            <a:ext cx="1632858" cy="2563585"/>
+          </a:xfrm>
+          <a:prstGeom prst="straightConnector1">
+            <a:avLst/>
+          </a:prstGeom>
+          <a:ln w="29209">
+            <a:solidFill>
+              <a:schemeClr val="bg1">
+                <a:lumMod val="65000"/>
+              </a:schemeClr>
+            </a:solidFill>
+            <a:prstDash val="dash"/>
+            <a:tailEnd type="triangle"/>
+          </a:ln>
+        </p:spPr>
+        <p:style>
+          <a:lnRef idx="1">
+            <a:schemeClr val="accent1"/>
+          </a:lnRef>
+          <a:fillRef idx="0">
+            <a:schemeClr val="accent1"/>
+          </a:fillRef>
+          <a:effectRef idx="0">
+            <a:schemeClr val="accent1"/>
+          </a:effectRef>
+          <a:fontRef idx="minor">
+            <a:schemeClr val="tx1"/>
+          </a:fontRef>
+        </p:style>
+      </p:cxnSp>
+      <p:cxnSp>
+        <p:nvCxnSpPr>
+          <p:cNvPr id="60" name="Straight Arrow Connector 59">
+            <a:extLst>
+              <a:ext uri="{FF2B5EF4-FFF2-40B4-BE49-F238E27FC236}">
+                <a16:creationId xmlns:a16="http://schemas.microsoft.com/office/drawing/2014/main" id="{F6383D9E-946A-23D8-3A9E-EC5FF2556E33}"/>
+              </a:ext>
+            </a:extLst>
+          </p:cNvPr>
+          <p:cNvCxnSpPr>
+            <a:stCxn id="25" idx="2"/>
+            <a:endCxn id="31" idx="1"/>
+          </p:cNvCxnSpPr>
+          <p:nvPr/>
+        </p:nvCxnSpPr>
+        <p:spPr>
+          <a:xfrm>
+            <a:off x="5105401" y="4120243"/>
+            <a:ext cx="6237516" cy="1872342"/>
+          </a:xfrm>
+          <a:prstGeom prst="straightConnector1">
+            <a:avLst/>
+          </a:prstGeom>
+          <a:ln w="34417">
+            <a:solidFill>
+              <a:srgbClr val="C00000"/>
+            </a:solidFill>
+            <a:tailEnd type="triangle"/>
+          </a:ln>
+        </p:spPr>
+        <p:style>
+          <a:lnRef idx="1">
+            <a:schemeClr val="accent1"/>
+          </a:lnRef>
+          <a:fillRef idx="0">
+            <a:schemeClr val="accent1"/>
+          </a:fillRef>
+          <a:effectRef idx="0">
+            <a:schemeClr val="accent1"/>
+          </a:effectRef>
+          <a:fontRef idx="minor">
+            <a:schemeClr val="tx1"/>
+          </a:fontRef>
+        </p:style>
+      </p:cxnSp>
+      <p:sp>
+        <p:nvSpPr>
+          <p:cNvPr id="20" name="Rectangle 19">
+            <a:extLst>
+              <a:ext uri="{FF2B5EF4-FFF2-40B4-BE49-F238E27FC236}">
+                <a16:creationId xmlns:a16="http://schemas.microsoft.com/office/drawing/2014/main" id="{8CD31D91-82FE-DEF4-C1F4-559B96EB9A75}"/>
               </a:ext>
             </a:extLst>
           </p:cNvPr>
@@ -7396,7 +8104,7 @@
         </p:nvSpPr>
         <p:spPr>
           <a:xfrm>
-            <a:off x="4114801" y="174172"/>
+            <a:off x="500743" y="174172"/>
             <a:ext cx="1981200" cy="1382486"/>
           </a:xfrm>
           <a:prstGeom prst="rect">
@@ -7436,10 +8144,1108 @@
           </a:p>
         </p:txBody>
       </p:sp>
+      <p:sp>
+        <p:nvSpPr>
+          <p:cNvPr id="21" name="Rectangle 20">
+            <a:extLst>
+              <a:ext uri="{FF2B5EF4-FFF2-40B4-BE49-F238E27FC236}">
+                <a16:creationId xmlns:a16="http://schemas.microsoft.com/office/drawing/2014/main" id="{2A451EDF-2134-D951-F607-AE0DC624C032}"/>
+              </a:ext>
+            </a:extLst>
+          </p:cNvPr>
+          <p:cNvSpPr/>
+          <p:nvPr/>
+        </p:nvSpPr>
+        <p:spPr>
+          <a:xfrm>
+            <a:off x="4114801" y="174172"/>
+            <a:ext cx="1981200" cy="1382486"/>
+          </a:xfrm>
+          <a:prstGeom prst="rect">
+            <a:avLst/>
+          </a:prstGeom>
+          <a:noFill/>
+          <a:ln w="38100">
+            <a:solidFill>
+              <a:schemeClr val="tx1">
+                <a:alpha val="75000"/>
+              </a:schemeClr>
+            </a:solidFill>
+          </a:ln>
+        </p:spPr>
+        <p:style>
+          <a:lnRef idx="2">
+            <a:schemeClr val="accent1">
+              <a:shade val="50000"/>
+            </a:schemeClr>
+          </a:lnRef>
+          <a:fillRef idx="1">
+            <a:schemeClr val="accent1"/>
+          </a:fillRef>
+          <a:effectRef idx="0">
+            <a:schemeClr val="accent1"/>
+          </a:effectRef>
+          <a:fontRef idx="minor">
+            <a:schemeClr val="lt1"/>
+          </a:fontRef>
+        </p:style>
+        <p:txBody>
+          <a:bodyPr rtlCol="0" anchor="ctr"/>
+          <a:lstStyle/>
+          <a:p>
+            <a:pPr algn="ctr"/>
+            <a:endParaRPr lang="en-US"/>
+          </a:p>
+        </p:txBody>
+      </p:sp>
+      <p:sp>
+        <p:nvSpPr>
+          <p:cNvPr id="22" name="Rectangle 21">
+            <a:extLst>
+              <a:ext uri="{FF2B5EF4-FFF2-40B4-BE49-F238E27FC236}">
+                <a16:creationId xmlns:a16="http://schemas.microsoft.com/office/drawing/2014/main" id="{295B61D5-3809-B67F-F28A-43F8F95032C1}"/>
+              </a:ext>
+            </a:extLst>
+          </p:cNvPr>
+          <p:cNvSpPr/>
+          <p:nvPr/>
+        </p:nvSpPr>
+        <p:spPr>
+          <a:xfrm>
+            <a:off x="7728859" y="174172"/>
+            <a:ext cx="1981200" cy="1382486"/>
+          </a:xfrm>
+          <a:prstGeom prst="rect">
+            <a:avLst/>
+          </a:prstGeom>
+          <a:noFill/>
+          <a:ln w="38100">
+            <a:solidFill>
+              <a:schemeClr val="tx1">
+                <a:alpha val="75000"/>
+              </a:schemeClr>
+            </a:solidFill>
+          </a:ln>
+        </p:spPr>
+        <p:style>
+          <a:lnRef idx="2">
+            <a:schemeClr val="accent1">
+              <a:shade val="50000"/>
+            </a:schemeClr>
+          </a:lnRef>
+          <a:fillRef idx="1">
+            <a:schemeClr val="accent1"/>
+          </a:fillRef>
+          <a:effectRef idx="0">
+            <a:schemeClr val="accent1"/>
+          </a:effectRef>
+          <a:fontRef idx="minor">
+            <a:schemeClr val="lt1"/>
+          </a:fontRef>
+        </p:style>
+        <p:txBody>
+          <a:bodyPr rtlCol="0" anchor="ctr"/>
+          <a:lstStyle/>
+          <a:p>
+            <a:pPr algn="ctr"/>
+            <a:endParaRPr lang="en-US"/>
+          </a:p>
+        </p:txBody>
+      </p:sp>
+      <p:sp>
+        <p:nvSpPr>
+          <p:cNvPr id="23" name="Rectangle 22">
+            <a:extLst>
+              <a:ext uri="{FF2B5EF4-FFF2-40B4-BE49-F238E27FC236}">
+                <a16:creationId xmlns:a16="http://schemas.microsoft.com/office/drawing/2014/main" id="{542EBF9B-B494-6BAC-662C-17157CAC7101}"/>
+              </a:ext>
+            </a:extLst>
+          </p:cNvPr>
+          <p:cNvSpPr/>
+          <p:nvPr/>
+        </p:nvSpPr>
+        <p:spPr>
+          <a:xfrm>
+            <a:off x="11342917" y="174172"/>
+            <a:ext cx="1981200" cy="1382486"/>
+          </a:xfrm>
+          <a:prstGeom prst="rect">
+            <a:avLst/>
+          </a:prstGeom>
+          <a:noFill/>
+          <a:ln w="38100">
+            <a:solidFill>
+              <a:schemeClr val="tx1">
+                <a:alpha val="75000"/>
+              </a:schemeClr>
+            </a:solidFill>
+          </a:ln>
+        </p:spPr>
+        <p:style>
+          <a:lnRef idx="2">
+            <a:schemeClr val="accent1">
+              <a:shade val="50000"/>
+            </a:schemeClr>
+          </a:lnRef>
+          <a:fillRef idx="1">
+            <a:schemeClr val="accent1"/>
+          </a:fillRef>
+          <a:effectRef idx="0">
+            <a:schemeClr val="accent1"/>
+          </a:effectRef>
+          <a:fontRef idx="minor">
+            <a:schemeClr val="lt1"/>
+          </a:fontRef>
+        </p:style>
+        <p:txBody>
+          <a:bodyPr rtlCol="0" anchor="ctr"/>
+          <a:lstStyle/>
+          <a:p>
+            <a:pPr algn="ctr"/>
+            <a:endParaRPr lang="en-US"/>
+          </a:p>
+        </p:txBody>
+      </p:sp>
+      <p:sp>
+        <p:nvSpPr>
+          <p:cNvPr id="25" name="Rectangle 24">
+            <a:extLst>
+              <a:ext uri="{FF2B5EF4-FFF2-40B4-BE49-F238E27FC236}">
+                <a16:creationId xmlns:a16="http://schemas.microsoft.com/office/drawing/2014/main" id="{82AC0384-6387-7D57-8EB4-896E679A9F4F}"/>
+              </a:ext>
+            </a:extLst>
+          </p:cNvPr>
+          <p:cNvSpPr/>
+          <p:nvPr/>
+        </p:nvSpPr>
+        <p:spPr>
+          <a:xfrm>
+            <a:off x="4114801" y="2737757"/>
+            <a:ext cx="1981200" cy="1382486"/>
+          </a:xfrm>
+          <a:prstGeom prst="rect">
+            <a:avLst/>
+          </a:prstGeom>
+          <a:noFill/>
+          <a:ln w="38100">
+            <a:solidFill>
+              <a:schemeClr val="tx1">
+                <a:alpha val="75000"/>
+              </a:schemeClr>
+            </a:solidFill>
+          </a:ln>
+        </p:spPr>
+        <p:style>
+          <a:lnRef idx="2">
+            <a:schemeClr val="accent1">
+              <a:shade val="50000"/>
+            </a:schemeClr>
+          </a:lnRef>
+          <a:fillRef idx="1">
+            <a:schemeClr val="accent1"/>
+          </a:fillRef>
+          <a:effectRef idx="0">
+            <a:schemeClr val="accent1"/>
+          </a:effectRef>
+          <a:fontRef idx="minor">
+            <a:schemeClr val="lt1"/>
+          </a:fontRef>
+        </p:style>
+        <p:txBody>
+          <a:bodyPr rtlCol="0" anchor="ctr"/>
+          <a:lstStyle/>
+          <a:p>
+            <a:pPr algn="ctr"/>
+            <a:endParaRPr lang="en-US"/>
+          </a:p>
+        </p:txBody>
+      </p:sp>
+      <p:sp>
+        <p:nvSpPr>
+          <p:cNvPr id="61" name="TextBox 60">
+            <a:extLst>
+              <a:ext uri="{FF2B5EF4-FFF2-40B4-BE49-F238E27FC236}">
+                <a16:creationId xmlns:a16="http://schemas.microsoft.com/office/drawing/2014/main" id="{B6476535-A95E-90F0-63CA-BA795134B48E}"/>
+              </a:ext>
+            </a:extLst>
+          </p:cNvPr>
+          <p:cNvSpPr txBox="1"/>
+          <p:nvPr/>
+        </p:nvSpPr>
+        <p:spPr>
+          <a:xfrm rot="980213">
+            <a:off x="7774010" y="4647571"/>
+            <a:ext cx="979755" cy="461665"/>
+          </a:xfrm>
+          <a:prstGeom prst="rect">
+            <a:avLst/>
+          </a:prstGeom>
+          <a:noFill/>
+        </p:spPr>
+        <p:txBody>
+          <a:bodyPr wrap="none" rtlCol="0">
+            <a:spAutoFit/>
+          </a:bodyPr>
+          <a:lstStyle/>
+          <a:p>
+            <a:r>
+              <a:rPr lang="en-US" sz="2400" b="1" dirty="0">
+                <a:latin typeface="Times New Roman" panose="02020603050405020304" pitchFamily="18" charset="0"/>
+                <a:cs typeface="Times New Roman" panose="02020603050405020304" pitchFamily="18" charset="0"/>
+              </a:rPr>
+              <a:t>-1.947</a:t>
+            </a:r>
+          </a:p>
+        </p:txBody>
+      </p:sp>
+      <p:sp>
+        <p:nvSpPr>
+          <p:cNvPr id="62" name="TextBox 61">
+            <a:extLst>
+              <a:ext uri="{FF2B5EF4-FFF2-40B4-BE49-F238E27FC236}">
+                <a16:creationId xmlns:a16="http://schemas.microsoft.com/office/drawing/2014/main" id="{404C6F6B-8168-572F-555D-2085A3A08B93}"/>
+              </a:ext>
+            </a:extLst>
+          </p:cNvPr>
+          <p:cNvSpPr txBox="1"/>
+          <p:nvPr/>
+        </p:nvSpPr>
+        <p:spPr>
+          <a:xfrm rot="3415512">
+            <a:off x="10036612" y="4134396"/>
+            <a:ext cx="979755" cy="461665"/>
+          </a:xfrm>
+          <a:prstGeom prst="rect">
+            <a:avLst/>
+          </a:prstGeom>
+          <a:noFill/>
+        </p:spPr>
+        <p:txBody>
+          <a:bodyPr wrap="none" rtlCol="0">
+            <a:spAutoFit/>
+          </a:bodyPr>
+          <a:lstStyle/>
+          <a:p>
+            <a:r>
+              <a:rPr lang="en-US" sz="2400" dirty="0">
+                <a:latin typeface="Times New Roman" panose="02020603050405020304" pitchFamily="18" charset="0"/>
+                <a:cs typeface="Times New Roman" panose="02020603050405020304" pitchFamily="18" charset="0"/>
+              </a:rPr>
+              <a:t>-0.681</a:t>
+            </a:r>
+          </a:p>
+        </p:txBody>
+      </p:sp>
+      <p:cxnSp>
+        <p:nvCxnSpPr>
+          <p:cNvPr id="64" name="Straight Arrow Connector 63">
+            <a:extLst>
+              <a:ext uri="{FF2B5EF4-FFF2-40B4-BE49-F238E27FC236}">
+                <a16:creationId xmlns:a16="http://schemas.microsoft.com/office/drawing/2014/main" id="{D3B8F594-F70C-BDE3-4E93-D81CE05CBF26}"/>
+              </a:ext>
+            </a:extLst>
+          </p:cNvPr>
+          <p:cNvCxnSpPr>
+            <a:stCxn id="28" idx="3"/>
+            <a:endCxn id="31" idx="1"/>
+          </p:cNvCxnSpPr>
+          <p:nvPr/>
+        </p:nvCxnSpPr>
+        <p:spPr>
+          <a:xfrm>
+            <a:off x="2481943" y="5992585"/>
+            <a:ext cx="8860974" cy="0"/>
+          </a:xfrm>
+          <a:prstGeom prst="straightConnector1">
+            <a:avLst/>
+          </a:prstGeom>
+          <a:ln w="32130">
+            <a:solidFill>
+              <a:schemeClr val="bg1">
+                <a:lumMod val="65000"/>
+              </a:schemeClr>
+            </a:solidFill>
+            <a:prstDash val="dash"/>
+            <a:tailEnd type="triangle"/>
+          </a:ln>
+        </p:spPr>
+        <p:style>
+          <a:lnRef idx="1">
+            <a:schemeClr val="accent1"/>
+          </a:lnRef>
+          <a:fillRef idx="0">
+            <a:schemeClr val="accent1"/>
+          </a:fillRef>
+          <a:effectRef idx="0">
+            <a:schemeClr val="accent1"/>
+          </a:effectRef>
+          <a:fontRef idx="minor">
+            <a:schemeClr val="tx1"/>
+          </a:fontRef>
+        </p:style>
+      </p:cxnSp>
+      <p:sp>
+        <p:nvSpPr>
+          <p:cNvPr id="28" name="Rectangle 27">
+            <a:extLst>
+              <a:ext uri="{FF2B5EF4-FFF2-40B4-BE49-F238E27FC236}">
+                <a16:creationId xmlns:a16="http://schemas.microsoft.com/office/drawing/2014/main" id="{CBB2489F-CBFE-304D-76D5-6A05865A7B18}"/>
+              </a:ext>
+            </a:extLst>
+          </p:cNvPr>
+          <p:cNvSpPr/>
+          <p:nvPr/>
+        </p:nvSpPr>
+        <p:spPr>
+          <a:xfrm>
+            <a:off x="500743" y="5301342"/>
+            <a:ext cx="1981200" cy="1382486"/>
+          </a:xfrm>
+          <a:prstGeom prst="rect">
+            <a:avLst/>
+          </a:prstGeom>
+          <a:noFill/>
+          <a:ln w="38100">
+            <a:solidFill>
+              <a:schemeClr val="tx1">
+                <a:alpha val="75000"/>
+              </a:schemeClr>
+            </a:solidFill>
+          </a:ln>
+        </p:spPr>
+        <p:style>
+          <a:lnRef idx="2">
+            <a:schemeClr val="accent1">
+              <a:shade val="50000"/>
+            </a:schemeClr>
+          </a:lnRef>
+          <a:fillRef idx="1">
+            <a:schemeClr val="accent1"/>
+          </a:fillRef>
+          <a:effectRef idx="0">
+            <a:schemeClr val="accent1"/>
+          </a:effectRef>
+          <a:fontRef idx="minor">
+            <a:schemeClr val="lt1"/>
+          </a:fontRef>
+        </p:style>
+        <p:txBody>
+          <a:bodyPr rtlCol="0" anchor="ctr"/>
+          <a:lstStyle/>
+          <a:p>
+            <a:pPr algn="ctr"/>
+            <a:endParaRPr lang="en-US"/>
+          </a:p>
+        </p:txBody>
+      </p:sp>
+      <p:sp>
+        <p:nvSpPr>
+          <p:cNvPr id="31" name="Rectangle 30">
+            <a:extLst>
+              <a:ext uri="{FF2B5EF4-FFF2-40B4-BE49-F238E27FC236}">
+                <a16:creationId xmlns:a16="http://schemas.microsoft.com/office/drawing/2014/main" id="{8B74F445-A52C-CC92-5C9F-26A6C584DFB7}"/>
+              </a:ext>
+            </a:extLst>
+          </p:cNvPr>
+          <p:cNvSpPr/>
+          <p:nvPr/>
+        </p:nvSpPr>
+        <p:spPr>
+          <a:xfrm>
+            <a:off x="11342917" y="5301342"/>
+            <a:ext cx="1981200" cy="1382486"/>
+          </a:xfrm>
+          <a:prstGeom prst="rect">
+            <a:avLst/>
+          </a:prstGeom>
+          <a:noFill/>
+          <a:ln w="38100">
+            <a:solidFill>
+              <a:schemeClr val="tx1">
+                <a:alpha val="75000"/>
+              </a:schemeClr>
+            </a:solidFill>
+          </a:ln>
+        </p:spPr>
+        <p:style>
+          <a:lnRef idx="2">
+            <a:schemeClr val="accent1">
+              <a:shade val="50000"/>
+            </a:schemeClr>
+          </a:lnRef>
+          <a:fillRef idx="1">
+            <a:schemeClr val="accent1"/>
+          </a:fillRef>
+          <a:effectRef idx="0">
+            <a:schemeClr val="accent1"/>
+          </a:effectRef>
+          <a:fontRef idx="minor">
+            <a:schemeClr val="lt1"/>
+          </a:fontRef>
+        </p:style>
+        <p:txBody>
+          <a:bodyPr rtlCol="0" anchor="ctr"/>
+          <a:lstStyle/>
+          <a:p>
+            <a:pPr algn="ctr"/>
+            <a:endParaRPr lang="en-US"/>
+          </a:p>
+        </p:txBody>
+      </p:sp>
+      <p:sp>
+        <p:nvSpPr>
+          <p:cNvPr id="65" name="TextBox 64">
+            <a:extLst>
+              <a:ext uri="{FF2B5EF4-FFF2-40B4-BE49-F238E27FC236}">
+                <a16:creationId xmlns:a16="http://schemas.microsoft.com/office/drawing/2014/main" id="{E3249D2D-816D-5F0E-F2BB-AF171B3C9197}"/>
+              </a:ext>
+            </a:extLst>
+          </p:cNvPr>
+          <p:cNvSpPr txBox="1"/>
+          <p:nvPr/>
+        </p:nvSpPr>
+        <p:spPr>
+          <a:xfrm>
+            <a:off x="6419418" y="5530920"/>
+            <a:ext cx="877163" cy="461665"/>
+          </a:xfrm>
+          <a:prstGeom prst="rect">
+            <a:avLst/>
+          </a:prstGeom>
+          <a:noFill/>
+        </p:spPr>
+        <p:txBody>
+          <a:bodyPr wrap="none" rtlCol="0">
+            <a:spAutoFit/>
+          </a:bodyPr>
+          <a:lstStyle/>
+          <a:p>
+            <a:r>
+              <a:rPr lang="en-US" sz="2400" dirty="0">
+                <a:latin typeface="Times New Roman" panose="02020603050405020304" pitchFamily="18" charset="0"/>
+                <a:cs typeface="Times New Roman" panose="02020603050405020304" pitchFamily="18" charset="0"/>
+              </a:rPr>
+              <a:t>1.405</a:t>
+            </a:r>
+          </a:p>
+        </p:txBody>
+      </p:sp>
+      <p:sp>
+        <p:nvSpPr>
+          <p:cNvPr id="66" name="TextBox 65">
+            <a:extLst>
+              <a:ext uri="{FF2B5EF4-FFF2-40B4-BE49-F238E27FC236}">
+                <a16:creationId xmlns:a16="http://schemas.microsoft.com/office/drawing/2014/main" id="{CDC511E2-E7BC-E1E3-726E-BF5800A2DFCF}"/>
+              </a:ext>
+            </a:extLst>
+          </p:cNvPr>
+          <p:cNvSpPr txBox="1"/>
+          <p:nvPr/>
+        </p:nvSpPr>
+        <p:spPr>
+          <a:xfrm>
+            <a:off x="4118797" y="1880106"/>
+            <a:ext cx="979755" cy="461665"/>
+          </a:xfrm>
+          <a:prstGeom prst="rect">
+            <a:avLst/>
+          </a:prstGeom>
+          <a:noFill/>
+        </p:spPr>
+        <p:txBody>
+          <a:bodyPr wrap="none" rtlCol="0">
+            <a:spAutoFit/>
+          </a:bodyPr>
+          <a:lstStyle/>
+          <a:p>
+            <a:r>
+              <a:rPr lang="en-US" sz="2400" dirty="0">
+                <a:latin typeface="Times New Roman" panose="02020603050405020304" pitchFamily="18" charset="0"/>
+                <a:cs typeface="Times New Roman" panose="02020603050405020304" pitchFamily="18" charset="0"/>
+              </a:rPr>
+              <a:t>-0.860</a:t>
+            </a:r>
+          </a:p>
+        </p:txBody>
+      </p:sp>
+      <p:sp>
+        <p:nvSpPr>
+          <p:cNvPr id="67" name="TextBox 66">
+            <a:extLst>
+              <a:ext uri="{FF2B5EF4-FFF2-40B4-BE49-F238E27FC236}">
+                <a16:creationId xmlns:a16="http://schemas.microsoft.com/office/drawing/2014/main" id="{29C6D649-5026-A7FB-331D-7FBB55BE561E}"/>
+              </a:ext>
+            </a:extLst>
+          </p:cNvPr>
+          <p:cNvSpPr txBox="1"/>
+          <p:nvPr/>
+        </p:nvSpPr>
+        <p:spPr>
+          <a:xfrm>
+            <a:off x="7707067" y="1863140"/>
+            <a:ext cx="979755" cy="461665"/>
+          </a:xfrm>
+          <a:prstGeom prst="rect">
+            <a:avLst/>
+          </a:prstGeom>
+          <a:noFill/>
+        </p:spPr>
+        <p:txBody>
+          <a:bodyPr wrap="none" rtlCol="0">
+            <a:spAutoFit/>
+          </a:bodyPr>
+          <a:lstStyle/>
+          <a:p>
+            <a:r>
+              <a:rPr lang="en-US" sz="2400" b="1" dirty="0">
+                <a:latin typeface="Times New Roman" panose="02020603050405020304" pitchFamily="18" charset="0"/>
+                <a:cs typeface="Times New Roman" panose="02020603050405020304" pitchFamily="18" charset="0"/>
+              </a:rPr>
+              <a:t>-2.470</a:t>
+            </a:r>
+          </a:p>
+        </p:txBody>
+      </p:sp>
+      <p:sp>
+        <p:nvSpPr>
+          <p:cNvPr id="68" name="TextBox 67">
+            <a:extLst>
+              <a:ext uri="{FF2B5EF4-FFF2-40B4-BE49-F238E27FC236}">
+                <a16:creationId xmlns:a16="http://schemas.microsoft.com/office/drawing/2014/main" id="{6430202A-4CDC-8603-E936-050364B5EB15}"/>
+              </a:ext>
+            </a:extLst>
+          </p:cNvPr>
+          <p:cNvSpPr txBox="1"/>
+          <p:nvPr/>
+        </p:nvSpPr>
+        <p:spPr>
+          <a:xfrm rot="20471706">
+            <a:off x="9801621" y="1764583"/>
+            <a:ext cx="877163" cy="461665"/>
+          </a:xfrm>
+          <a:prstGeom prst="rect">
+            <a:avLst/>
+          </a:prstGeom>
+          <a:noFill/>
+        </p:spPr>
+        <p:txBody>
+          <a:bodyPr wrap="none" rtlCol="0">
+            <a:spAutoFit/>
+          </a:bodyPr>
+          <a:lstStyle/>
+          <a:p>
+            <a:r>
+              <a:rPr lang="en-US" sz="2400" dirty="0">
+                <a:latin typeface="Times New Roman" panose="02020603050405020304" pitchFamily="18" charset="0"/>
+                <a:cs typeface="Times New Roman" panose="02020603050405020304" pitchFamily="18" charset="0"/>
+              </a:rPr>
+              <a:t>0.092</a:t>
+            </a:r>
+          </a:p>
+        </p:txBody>
+      </p:sp>
+      <p:sp>
+        <p:nvSpPr>
+          <p:cNvPr id="69" name="TextBox 68">
+            <a:extLst>
+              <a:ext uri="{FF2B5EF4-FFF2-40B4-BE49-F238E27FC236}">
+                <a16:creationId xmlns:a16="http://schemas.microsoft.com/office/drawing/2014/main" id="{D042879D-AA23-A303-5FF7-5CDCB1157B5A}"/>
+              </a:ext>
+            </a:extLst>
+          </p:cNvPr>
+          <p:cNvSpPr txBox="1"/>
+          <p:nvPr/>
+        </p:nvSpPr>
+        <p:spPr>
+          <a:xfrm rot="19488555">
+            <a:off x="2081829" y="4033081"/>
+            <a:ext cx="979755" cy="461665"/>
+          </a:xfrm>
+          <a:prstGeom prst="rect">
+            <a:avLst/>
+          </a:prstGeom>
+          <a:noFill/>
+        </p:spPr>
+        <p:txBody>
+          <a:bodyPr wrap="none" rtlCol="0">
+            <a:spAutoFit/>
+          </a:bodyPr>
+          <a:lstStyle/>
+          <a:p>
+            <a:r>
+              <a:rPr lang="en-US" sz="2400" b="1" dirty="0">
+                <a:latin typeface="Times New Roman" panose="02020603050405020304" pitchFamily="18" charset="0"/>
+                <a:cs typeface="Times New Roman" panose="02020603050405020304" pitchFamily="18" charset="0"/>
+              </a:rPr>
+              <a:t>-2.728</a:t>
+            </a:r>
+          </a:p>
+        </p:txBody>
+      </p:sp>
+      <p:sp>
+        <p:nvSpPr>
+          <p:cNvPr id="71" name="TextBox 70">
+            <a:extLst>
+              <a:ext uri="{FF2B5EF4-FFF2-40B4-BE49-F238E27FC236}">
+                <a16:creationId xmlns:a16="http://schemas.microsoft.com/office/drawing/2014/main" id="{F44F4BFA-CE4A-DC03-9C24-80E4A8CDECE9}"/>
+              </a:ext>
+            </a:extLst>
+          </p:cNvPr>
+          <p:cNvSpPr txBox="1"/>
+          <p:nvPr/>
+        </p:nvSpPr>
+        <p:spPr>
+          <a:xfrm rot="2166687">
+            <a:off x="2103246" y="1910670"/>
+            <a:ext cx="979755" cy="461665"/>
+          </a:xfrm>
+          <a:prstGeom prst="rect">
+            <a:avLst/>
+          </a:prstGeom>
+          <a:noFill/>
+        </p:spPr>
+        <p:txBody>
+          <a:bodyPr wrap="none" rtlCol="0">
+            <a:spAutoFit/>
+          </a:bodyPr>
+          <a:lstStyle/>
+          <a:p>
+            <a:r>
+              <a:rPr lang="en-US" sz="2400" dirty="0">
+                <a:latin typeface="Times New Roman" panose="02020603050405020304" pitchFamily="18" charset="0"/>
+                <a:cs typeface="Times New Roman" panose="02020603050405020304" pitchFamily="18" charset="0"/>
+              </a:rPr>
+              <a:t>-0.978</a:t>
+            </a:r>
+          </a:p>
+        </p:txBody>
+      </p:sp>
+      <p:sp>
+        <p:nvSpPr>
+          <p:cNvPr id="26" name="Rectangle 25">
+            <a:extLst>
+              <a:ext uri="{FF2B5EF4-FFF2-40B4-BE49-F238E27FC236}">
+                <a16:creationId xmlns:a16="http://schemas.microsoft.com/office/drawing/2014/main" id="{B55C58BF-B54E-BA2F-D111-5037A627D595}"/>
+              </a:ext>
+            </a:extLst>
+          </p:cNvPr>
+          <p:cNvSpPr/>
+          <p:nvPr/>
+        </p:nvSpPr>
+        <p:spPr>
+          <a:xfrm>
+            <a:off x="7728859" y="2737757"/>
+            <a:ext cx="1981200" cy="1382486"/>
+          </a:xfrm>
+          <a:prstGeom prst="rect">
+            <a:avLst/>
+          </a:prstGeom>
+          <a:solidFill>
+            <a:schemeClr val="bg1">
+              <a:alpha val="75000"/>
+            </a:schemeClr>
+          </a:solidFill>
+          <a:ln w="38100">
+            <a:solidFill>
+              <a:schemeClr val="tx1">
+                <a:alpha val="75000"/>
+              </a:schemeClr>
+            </a:solidFill>
+          </a:ln>
+        </p:spPr>
+        <p:style>
+          <a:lnRef idx="2">
+            <a:schemeClr val="accent1">
+              <a:shade val="50000"/>
+            </a:schemeClr>
+          </a:lnRef>
+          <a:fillRef idx="1">
+            <a:schemeClr val="accent1"/>
+          </a:fillRef>
+          <a:effectRef idx="0">
+            <a:schemeClr val="accent1"/>
+          </a:effectRef>
+          <a:fontRef idx="minor">
+            <a:schemeClr val="lt1"/>
+          </a:fontRef>
+        </p:style>
+        <p:txBody>
+          <a:bodyPr rtlCol="0" anchor="ctr"/>
+          <a:lstStyle/>
+          <a:p>
+            <a:pPr algn="ctr"/>
+            <a:endParaRPr lang="en-US"/>
+          </a:p>
+        </p:txBody>
+      </p:sp>
+      <p:sp>
+        <p:nvSpPr>
+          <p:cNvPr id="37" name="TextBox 36">
+            <a:extLst>
+              <a:ext uri="{FF2B5EF4-FFF2-40B4-BE49-F238E27FC236}">
+                <a16:creationId xmlns:a16="http://schemas.microsoft.com/office/drawing/2014/main" id="{C71CFA49-7C85-F6D0-BCFA-6674AEE1B54E}"/>
+              </a:ext>
+            </a:extLst>
+          </p:cNvPr>
+          <p:cNvSpPr txBox="1"/>
+          <p:nvPr/>
+        </p:nvSpPr>
+        <p:spPr>
+          <a:xfrm>
+            <a:off x="8536556" y="3136611"/>
+            <a:ext cx="365806" cy="584775"/>
+          </a:xfrm>
+          <a:prstGeom prst="rect">
+            <a:avLst/>
+          </a:prstGeom>
+          <a:noFill/>
+        </p:spPr>
+        <p:txBody>
+          <a:bodyPr wrap="none" rtlCol="0">
+            <a:spAutoFit/>
+          </a:bodyPr>
+          <a:lstStyle/>
+          <a:p>
+            <a:pPr algn="ctr"/>
+            <a:r>
+              <a:rPr lang="el-GR" sz="3200" i="1" dirty="0">
+                <a:latin typeface="Times New Roman" panose="02020603050405020304" pitchFamily="18" charset="0"/>
+                <a:cs typeface="Times New Roman" panose="02020603050405020304" pitchFamily="18" charset="0"/>
+              </a:rPr>
+              <a:t>χ</a:t>
+            </a:r>
+            <a:endParaRPr lang="en-US" sz="3200" i="1" dirty="0">
+              <a:latin typeface="Times New Roman" panose="02020603050405020304" pitchFamily="18" charset="0"/>
+              <a:cs typeface="Times New Roman" panose="02020603050405020304" pitchFamily="18" charset="0"/>
+            </a:endParaRPr>
+          </a:p>
+        </p:txBody>
+      </p:sp>
+      <p:sp>
+        <p:nvSpPr>
+          <p:cNvPr id="74" name="TextBox 73">
+            <a:extLst>
+              <a:ext uri="{FF2B5EF4-FFF2-40B4-BE49-F238E27FC236}">
+                <a16:creationId xmlns:a16="http://schemas.microsoft.com/office/drawing/2014/main" id="{244C02EF-F1A6-2F38-5982-D6BF1730AF46}"/>
+              </a:ext>
+            </a:extLst>
+          </p:cNvPr>
+          <p:cNvSpPr txBox="1"/>
+          <p:nvPr/>
+        </p:nvSpPr>
+        <p:spPr>
+          <a:xfrm rot="2159215">
+            <a:off x="5815510" y="2045259"/>
+            <a:ext cx="1133644" cy="461665"/>
+          </a:xfrm>
+          <a:prstGeom prst="rect">
+            <a:avLst/>
+          </a:prstGeom>
+          <a:noFill/>
+        </p:spPr>
+        <p:txBody>
+          <a:bodyPr wrap="none" rtlCol="0">
+            <a:spAutoFit/>
+          </a:bodyPr>
+          <a:lstStyle/>
+          <a:p>
+            <a:r>
+              <a:rPr lang="en-US" sz="2400" b="1" dirty="0">
+                <a:latin typeface="Times New Roman" panose="02020603050405020304" pitchFamily="18" charset="0"/>
+                <a:cs typeface="Times New Roman" panose="02020603050405020304" pitchFamily="18" charset="0"/>
+              </a:rPr>
+              <a:t>-13.026</a:t>
+            </a:r>
+          </a:p>
+        </p:txBody>
+      </p:sp>
+      <p:sp>
+        <p:nvSpPr>
+          <p:cNvPr id="75" name="TextBox 74">
+            <a:extLst>
+              <a:ext uri="{FF2B5EF4-FFF2-40B4-BE49-F238E27FC236}">
+                <a16:creationId xmlns:a16="http://schemas.microsoft.com/office/drawing/2014/main" id="{D36FBB87-9540-A96D-DB0B-F29A669A82DE}"/>
+              </a:ext>
+            </a:extLst>
+          </p:cNvPr>
+          <p:cNvSpPr txBox="1"/>
+          <p:nvPr/>
+        </p:nvSpPr>
+        <p:spPr>
+          <a:xfrm>
+            <a:off x="6191367" y="2967335"/>
+            <a:ext cx="1031051" cy="461665"/>
+          </a:xfrm>
+          <a:prstGeom prst="rect">
+            <a:avLst/>
+          </a:prstGeom>
+          <a:noFill/>
+        </p:spPr>
+        <p:txBody>
+          <a:bodyPr wrap="none" rtlCol="0">
+            <a:spAutoFit/>
+          </a:bodyPr>
+          <a:lstStyle/>
+          <a:p>
+            <a:r>
+              <a:rPr lang="en-US" sz="2400" b="1" dirty="0">
+                <a:latin typeface="Times New Roman" panose="02020603050405020304" pitchFamily="18" charset="0"/>
+                <a:cs typeface="Times New Roman" panose="02020603050405020304" pitchFamily="18" charset="0"/>
+              </a:rPr>
+              <a:t>13.737</a:t>
+            </a:r>
+          </a:p>
+        </p:txBody>
+      </p:sp>
+      <p:cxnSp>
+        <p:nvCxnSpPr>
+          <p:cNvPr id="77" name="Straight Arrow Connector 76">
+            <a:extLst>
+              <a:ext uri="{FF2B5EF4-FFF2-40B4-BE49-F238E27FC236}">
+                <a16:creationId xmlns:a16="http://schemas.microsoft.com/office/drawing/2014/main" id="{2CAFDABE-EBA8-F947-4A74-58528D3B89C8}"/>
+              </a:ext>
+            </a:extLst>
+          </p:cNvPr>
+          <p:cNvCxnSpPr>
+            <a:cxnSpLocks/>
+            <a:stCxn id="21" idx="3"/>
+            <a:endCxn id="26" idx="1"/>
+          </p:cNvCxnSpPr>
+          <p:nvPr/>
+        </p:nvCxnSpPr>
+        <p:spPr>
+          <a:xfrm>
+            <a:off x="6096001" y="865415"/>
+            <a:ext cx="1632858" cy="2563585"/>
+          </a:xfrm>
+          <a:prstGeom prst="straightConnector1">
+            <a:avLst/>
+          </a:prstGeom>
+          <a:ln w="65024">
+            <a:solidFill>
+              <a:srgbClr val="C00000"/>
+            </a:solidFill>
+            <a:tailEnd type="triangle"/>
+          </a:ln>
+        </p:spPr>
+        <p:style>
+          <a:lnRef idx="1">
+            <a:schemeClr val="accent1"/>
+          </a:lnRef>
+          <a:fillRef idx="0">
+            <a:schemeClr val="accent1"/>
+          </a:fillRef>
+          <a:effectRef idx="0">
+            <a:schemeClr val="accent1"/>
+          </a:effectRef>
+          <a:fontRef idx="minor">
+            <a:schemeClr val="tx1"/>
+          </a:fontRef>
+        </p:style>
+      </p:cxnSp>
+      <p:sp>
+        <p:nvSpPr>
+          <p:cNvPr id="80" name="TextBox 79">
+            <a:extLst>
+              <a:ext uri="{FF2B5EF4-FFF2-40B4-BE49-F238E27FC236}">
+                <a16:creationId xmlns:a16="http://schemas.microsoft.com/office/drawing/2014/main" id="{0FC8D521-81A9-E347-0EBC-99509681D866}"/>
+              </a:ext>
+            </a:extLst>
+          </p:cNvPr>
+          <p:cNvSpPr txBox="1"/>
+          <p:nvPr/>
+        </p:nvSpPr>
+        <p:spPr>
+          <a:xfrm rot="3447489">
+            <a:off x="6422552" y="1561551"/>
+            <a:ext cx="979755" cy="461665"/>
+          </a:xfrm>
+          <a:prstGeom prst="rect">
+            <a:avLst/>
+          </a:prstGeom>
+          <a:noFill/>
+        </p:spPr>
+        <p:txBody>
+          <a:bodyPr wrap="none" rtlCol="0">
+            <a:spAutoFit/>
+          </a:bodyPr>
+          <a:lstStyle/>
+          <a:p>
+            <a:r>
+              <a:rPr lang="en-US" sz="2400" b="1" dirty="0">
+                <a:latin typeface="Times New Roman" panose="02020603050405020304" pitchFamily="18" charset="0"/>
+                <a:cs typeface="Times New Roman" panose="02020603050405020304" pitchFamily="18" charset="0"/>
+              </a:rPr>
+              <a:t>-9.297</a:t>
+            </a:r>
+          </a:p>
+        </p:txBody>
+      </p:sp>
+      <p:cxnSp>
+        <p:nvCxnSpPr>
+          <p:cNvPr id="2" name="Straight Arrow Connector 1">
+            <a:extLst>
+              <a:ext uri="{FF2B5EF4-FFF2-40B4-BE49-F238E27FC236}">
+                <a16:creationId xmlns:a16="http://schemas.microsoft.com/office/drawing/2014/main" id="{82720060-A6FC-704F-8F90-E0C8FE5F764B}"/>
+              </a:ext>
+            </a:extLst>
+          </p:cNvPr>
+          <p:cNvCxnSpPr>
+            <a:cxnSpLocks/>
+          </p:cNvCxnSpPr>
+          <p:nvPr/>
+        </p:nvCxnSpPr>
+        <p:spPr>
+          <a:xfrm flipH="1">
+            <a:off x="9710059" y="865415"/>
+            <a:ext cx="1632858" cy="0"/>
+          </a:xfrm>
+          <a:prstGeom prst="straightConnector1">
+            <a:avLst/>
+          </a:prstGeom>
+          <a:ln w="91948">
+            <a:solidFill>
+              <a:srgbClr val="C00000"/>
+            </a:solidFill>
+            <a:tailEnd type="triangle"/>
+          </a:ln>
+        </p:spPr>
+        <p:style>
+          <a:lnRef idx="1">
+            <a:schemeClr val="accent1"/>
+          </a:lnRef>
+          <a:fillRef idx="0">
+            <a:schemeClr val="accent1"/>
+          </a:fillRef>
+          <a:effectRef idx="0">
+            <a:schemeClr val="accent1"/>
+          </a:effectRef>
+          <a:fontRef idx="minor">
+            <a:schemeClr val="tx1"/>
+          </a:fontRef>
+        </p:style>
+      </p:cxnSp>
+      <p:sp>
+        <p:nvSpPr>
+          <p:cNvPr id="3" name="TextBox 2">
+            <a:extLst>
+              <a:ext uri="{FF2B5EF4-FFF2-40B4-BE49-F238E27FC236}">
+                <a16:creationId xmlns:a16="http://schemas.microsoft.com/office/drawing/2014/main" id="{619B30D9-163E-1E1A-66F6-9A39C8D890EC}"/>
+              </a:ext>
+            </a:extLst>
+          </p:cNvPr>
+          <p:cNvSpPr txBox="1"/>
+          <p:nvPr/>
+        </p:nvSpPr>
+        <p:spPr>
+          <a:xfrm>
+            <a:off x="10013721" y="403750"/>
+            <a:ext cx="1133644" cy="461665"/>
+          </a:xfrm>
+          <a:prstGeom prst="rect">
+            <a:avLst/>
+          </a:prstGeom>
+          <a:noFill/>
+        </p:spPr>
+        <p:txBody>
+          <a:bodyPr wrap="none" rtlCol="0">
+            <a:spAutoFit/>
+          </a:bodyPr>
+          <a:lstStyle/>
+          <a:p>
+            <a:r>
+              <a:rPr lang="en-US" sz="2400" b="1" dirty="0">
+                <a:latin typeface="Times New Roman" panose="02020603050405020304" pitchFamily="18" charset="0"/>
+                <a:cs typeface="Times New Roman" panose="02020603050405020304" pitchFamily="18" charset="0"/>
+              </a:rPr>
+              <a:t>-15.762</a:t>
+            </a:r>
+          </a:p>
+        </p:txBody>
+      </p:sp>
+      <p:cxnSp>
+        <p:nvCxnSpPr>
+          <p:cNvPr id="5" name="Straight Arrow Connector 4">
+            <a:extLst>
+              <a:ext uri="{FF2B5EF4-FFF2-40B4-BE49-F238E27FC236}">
+                <a16:creationId xmlns:a16="http://schemas.microsoft.com/office/drawing/2014/main" id="{98560825-4009-754E-3EDF-FE54248BDDB9}"/>
+              </a:ext>
+            </a:extLst>
+          </p:cNvPr>
+          <p:cNvCxnSpPr>
+            <a:cxnSpLocks/>
+          </p:cNvCxnSpPr>
+          <p:nvPr/>
+        </p:nvCxnSpPr>
+        <p:spPr>
+          <a:xfrm>
+            <a:off x="1491343" y="1556658"/>
+            <a:ext cx="0" cy="3744684"/>
+          </a:xfrm>
+          <a:prstGeom prst="straightConnector1">
+            <a:avLst/>
+          </a:prstGeom>
+          <a:ln w="82550">
+            <a:tailEnd type="triangle"/>
+          </a:ln>
+        </p:spPr>
+        <p:style>
+          <a:lnRef idx="1">
+            <a:schemeClr val="accent1"/>
+          </a:lnRef>
+          <a:fillRef idx="0">
+            <a:schemeClr val="accent1"/>
+          </a:fillRef>
+          <a:effectRef idx="0">
+            <a:schemeClr val="accent1"/>
+          </a:effectRef>
+          <a:fontRef idx="minor">
+            <a:schemeClr val="tx1"/>
+          </a:fontRef>
+        </p:style>
+      </p:cxnSp>
+      <p:sp>
+        <p:nvSpPr>
+          <p:cNvPr id="6" name="TextBox 5">
+            <a:extLst>
+              <a:ext uri="{FF2B5EF4-FFF2-40B4-BE49-F238E27FC236}">
+                <a16:creationId xmlns:a16="http://schemas.microsoft.com/office/drawing/2014/main" id="{D04A3995-1950-731D-ED58-DCE2432291DF}"/>
+              </a:ext>
+            </a:extLst>
+          </p:cNvPr>
+          <p:cNvSpPr txBox="1"/>
+          <p:nvPr/>
+        </p:nvSpPr>
+        <p:spPr>
+          <a:xfrm>
+            <a:off x="441304" y="3198167"/>
+            <a:ext cx="1031051" cy="461665"/>
+          </a:xfrm>
+          <a:prstGeom prst="rect">
+            <a:avLst/>
+          </a:prstGeom>
+          <a:noFill/>
+        </p:spPr>
+        <p:txBody>
+          <a:bodyPr wrap="none" rtlCol="0">
+            <a:spAutoFit/>
+          </a:bodyPr>
+          <a:lstStyle/>
+          <a:p>
+            <a:r>
+              <a:rPr lang="en-US" sz="2400" b="1" dirty="0">
+                <a:latin typeface="Times New Roman" panose="02020603050405020304" pitchFamily="18" charset="0"/>
+                <a:cs typeface="Times New Roman" panose="02020603050405020304" pitchFamily="18" charset="0"/>
+              </a:rPr>
+              <a:t>13.512</a:t>
+            </a:r>
+          </a:p>
+        </p:txBody>
+      </p:sp>
     </p:spTree>
     <p:extLst>
       <p:ext uri="{BB962C8B-B14F-4D97-AF65-F5344CB8AC3E}">
-        <p14:creationId xmlns:p14="http://schemas.microsoft.com/office/powerpoint/2010/main" val="4056767443"/>
+        <p14:creationId xmlns:p14="http://schemas.microsoft.com/office/powerpoint/2010/main" val="3422366186"/>
       </p:ext>
     </p:extLst>
   </p:cSld>

</xml_diff>

<commit_message>
add table 4 (complete) and incorporate SEM results into supplemental table
</commit_message>
<xml_diff>
--- a/working_drafts/figs/TXeco_SEM_ppt_fig.pptx
+++ b/working_drafts/figs/TXeco_SEM_ppt_fig.pptx
@@ -199,7 +199,7 @@
           <a:p>
             <a:fld id="{9C8338E3-F40D-F146-8D3B-4726E84D5200}" type="datetimeFigureOut">
               <a:rPr lang="en-US" smtClean="0"/>
-              <a:t>10/24/22</a:t>
+              <a:t>10/26/22</a:t>
             </a:fld>
             <a:endParaRPr lang="en-US"/>
           </a:p>
@@ -849,7 +849,7 @@
           <a:p>
             <a:fld id="{D3A28AA4-801E-B147-9E5C-6E6DBA6E23D1}" type="datetimeFigureOut">
               <a:rPr lang="en-US" smtClean="0"/>
-              <a:t>10/24/22</a:t>
+              <a:t>10/26/22</a:t>
             </a:fld>
             <a:endParaRPr lang="en-US"/>
           </a:p>
@@ -1019,7 +1019,7 @@
           <a:p>
             <a:fld id="{D3A28AA4-801E-B147-9E5C-6E6DBA6E23D1}" type="datetimeFigureOut">
               <a:rPr lang="en-US" smtClean="0"/>
-              <a:t>10/24/22</a:t>
+              <a:t>10/26/22</a:t>
             </a:fld>
             <a:endParaRPr lang="en-US"/>
           </a:p>
@@ -1199,7 +1199,7 @@
           <a:p>
             <a:fld id="{D3A28AA4-801E-B147-9E5C-6E6DBA6E23D1}" type="datetimeFigureOut">
               <a:rPr lang="en-US" smtClean="0"/>
-              <a:t>10/24/22</a:t>
+              <a:t>10/26/22</a:t>
             </a:fld>
             <a:endParaRPr lang="en-US"/>
           </a:p>
@@ -1369,7 +1369,7 @@
           <a:p>
             <a:fld id="{D3A28AA4-801E-B147-9E5C-6E6DBA6E23D1}" type="datetimeFigureOut">
               <a:rPr lang="en-US" smtClean="0"/>
-              <a:t>10/24/22</a:t>
+              <a:t>10/26/22</a:t>
             </a:fld>
             <a:endParaRPr lang="en-US"/>
           </a:p>
@@ -1615,7 +1615,7 @@
           <a:p>
             <a:fld id="{D3A28AA4-801E-B147-9E5C-6E6DBA6E23D1}" type="datetimeFigureOut">
               <a:rPr lang="en-US" smtClean="0"/>
-              <a:t>10/24/22</a:t>
+              <a:t>10/26/22</a:t>
             </a:fld>
             <a:endParaRPr lang="en-US"/>
           </a:p>
@@ -1847,7 +1847,7 @@
           <a:p>
             <a:fld id="{D3A28AA4-801E-B147-9E5C-6E6DBA6E23D1}" type="datetimeFigureOut">
               <a:rPr lang="en-US" smtClean="0"/>
-              <a:t>10/24/22</a:t>
+              <a:t>10/26/22</a:t>
             </a:fld>
             <a:endParaRPr lang="en-US"/>
           </a:p>
@@ -2214,7 +2214,7 @@
           <a:p>
             <a:fld id="{D3A28AA4-801E-B147-9E5C-6E6DBA6E23D1}" type="datetimeFigureOut">
               <a:rPr lang="en-US" smtClean="0"/>
-              <a:t>10/24/22</a:t>
+              <a:t>10/26/22</a:t>
             </a:fld>
             <a:endParaRPr lang="en-US"/>
           </a:p>
@@ -2332,7 +2332,7 @@
           <a:p>
             <a:fld id="{D3A28AA4-801E-B147-9E5C-6E6DBA6E23D1}" type="datetimeFigureOut">
               <a:rPr lang="en-US" smtClean="0"/>
-              <a:t>10/24/22</a:t>
+              <a:t>10/26/22</a:t>
             </a:fld>
             <a:endParaRPr lang="en-US"/>
           </a:p>
@@ -2427,7 +2427,7 @@
           <a:p>
             <a:fld id="{D3A28AA4-801E-B147-9E5C-6E6DBA6E23D1}" type="datetimeFigureOut">
               <a:rPr lang="en-US" smtClean="0"/>
-              <a:t>10/24/22</a:t>
+              <a:t>10/26/22</a:t>
             </a:fld>
             <a:endParaRPr lang="en-US"/>
           </a:p>
@@ -2704,7 +2704,7 @@
           <a:p>
             <a:fld id="{D3A28AA4-801E-B147-9E5C-6E6DBA6E23D1}" type="datetimeFigureOut">
               <a:rPr lang="en-US" smtClean="0"/>
-              <a:t>10/24/22</a:t>
+              <a:t>10/26/22</a:t>
             </a:fld>
             <a:endParaRPr lang="en-US"/>
           </a:p>
@@ -2961,7 +2961,7 @@
           <a:p>
             <a:fld id="{D3A28AA4-801E-B147-9E5C-6E6DBA6E23D1}" type="datetimeFigureOut">
               <a:rPr lang="en-US" smtClean="0"/>
-              <a:t>10/24/22</a:t>
+              <a:t>10/26/22</a:t>
             </a:fld>
             <a:endParaRPr lang="en-US"/>
           </a:p>
@@ -3174,7 +3174,7 @@
           <a:p>
             <a:fld id="{D3A28AA4-801E-B147-9E5C-6E6DBA6E23D1}" type="datetimeFigureOut">
               <a:rPr lang="en-US" smtClean="0"/>
-              <a:t>10/24/22</a:t>
+              <a:t>10/26/22</a:t>
             </a:fld>
             <a:endParaRPr lang="en-US"/>
           </a:p>
@@ -7375,6 +7375,9 @@
             <a:avLst/>
           </a:prstGeom>
           <a:ln w="80518">
+            <a:solidFill>
+              <a:srgbClr val="C00000"/>
+            </a:solidFill>
             <a:tailEnd type="triangle"/>
           </a:ln>
         </p:spPr>
@@ -7881,7 +7884,7 @@
           </a:prstGeom>
           <a:ln w="83439">
             <a:solidFill>
-              <a:srgbClr val="C00000"/>
+              <a:schemeClr val="accent1"/>
             </a:solidFill>
             <a:tailEnd type="triangle"/>
           </a:ln>

</xml_diff>

<commit_message>
add structural equation model verbiage
</commit_message>
<xml_diff>
--- a/working_drafts/figs/TXeco_SEM_ppt_fig.pptx
+++ b/working_drafts/figs/TXeco_SEM_ppt_fig.pptx
@@ -5,12 +5,13 @@
     <p:sldMasterId id="2147483660" r:id="rId1"/>
   </p:sldMasterIdLst>
   <p:notesMasterIdLst>
-    <p:notesMasterId r:id="rId5"/>
+    <p:notesMasterId r:id="rId6"/>
   </p:notesMasterIdLst>
   <p:sldIdLst>
     <p:sldId id="258" r:id="rId2"/>
-    <p:sldId id="262" r:id="rId3"/>
-    <p:sldId id="261" r:id="rId4"/>
+    <p:sldId id="263" r:id="rId3"/>
+    <p:sldId id="262" r:id="rId4"/>
+    <p:sldId id="261" r:id="rId5"/>
   </p:sldIdLst>
   <p:sldSz cx="13716000" cy="6858000"/>
   <p:notesSz cx="6858000" cy="9144000"/>
@@ -199,7 +200,7 @@
           <a:p>
             <a:fld id="{9C8338E3-F40D-F146-8D3B-4726E84D5200}" type="datetimeFigureOut">
               <a:rPr lang="en-US" smtClean="0"/>
-              <a:t>10/26/22</a:t>
+              <a:t>11/9/22</a:t>
             </a:fld>
             <a:endParaRPr lang="en-US"/>
           </a:p>
@@ -624,7 +625,7 @@
     </p:spTree>
     <p:extLst>
       <p:ext uri="{BB962C8B-B14F-4D97-AF65-F5344CB8AC3E}">
-        <p14:creationId xmlns:p14="http://schemas.microsoft.com/office/powerpoint/2010/main" val="829252710"/>
+        <p14:creationId xmlns:p14="http://schemas.microsoft.com/office/powerpoint/2010/main" val="2176317076"/>
       </p:ext>
     </p:extLst>
   </p:cSld>
@@ -700,6 +701,90 @@
             <a:fld id="{C2800238-33D2-A44F-8135-A0F534DB873D}" type="slidenum">
               <a:rPr lang="en-US" smtClean="0"/>
               <a:t>3</a:t>
+            </a:fld>
+            <a:endParaRPr lang="en-US"/>
+          </a:p>
+        </p:txBody>
+      </p:sp>
+    </p:spTree>
+    <p:extLst>
+      <p:ext uri="{BB962C8B-B14F-4D97-AF65-F5344CB8AC3E}">
+        <p14:creationId xmlns:p14="http://schemas.microsoft.com/office/powerpoint/2010/main" val="829252710"/>
+      </p:ext>
+    </p:extLst>
+  </p:cSld>
+  <p:clrMapOvr>
+    <a:masterClrMapping/>
+  </p:clrMapOvr>
+</p:notes>
+</file>
+
+<file path=ppt/notesSlides/notesSlide4.xml><?xml version="1.0" encoding="utf-8"?>
+<p:notes xmlns:a="http://schemas.openxmlformats.org/drawingml/2006/main" xmlns:r="http://schemas.openxmlformats.org/officeDocument/2006/relationships" xmlns:p="http://schemas.openxmlformats.org/presentationml/2006/main">
+  <p:cSld>
+    <p:spTree>
+      <p:nvGrpSpPr>
+        <p:cNvPr id="1" name=""/>
+        <p:cNvGrpSpPr/>
+        <p:nvPr/>
+      </p:nvGrpSpPr>
+      <p:grpSpPr>
+        <a:xfrm>
+          <a:off x="0" y="0"/>
+          <a:ext cx="0" cy="0"/>
+          <a:chOff x="0" y="0"/>
+          <a:chExt cx="0" cy="0"/>
+        </a:xfrm>
+      </p:grpSpPr>
+      <p:sp>
+        <p:nvSpPr>
+          <p:cNvPr id="2" name="Slide Image Placeholder 1"/>
+          <p:cNvSpPr>
+            <a:spLocks noGrp="1" noRot="1" noChangeAspect="1"/>
+          </p:cNvSpPr>
+          <p:nvPr>
+            <p:ph type="sldImg"/>
+          </p:nvPr>
+        </p:nvSpPr>
+        <p:spPr/>
+      </p:sp>
+      <p:sp>
+        <p:nvSpPr>
+          <p:cNvPr id="3" name="Notes Placeholder 2"/>
+          <p:cNvSpPr>
+            <a:spLocks noGrp="1"/>
+          </p:cNvSpPr>
+          <p:nvPr>
+            <p:ph type="body" idx="1"/>
+          </p:nvPr>
+        </p:nvSpPr>
+        <p:spPr/>
+        <p:txBody>
+          <a:bodyPr/>
+          <a:lstStyle/>
+          <a:p>
+            <a:endParaRPr lang="en-US" dirty="0"/>
+          </a:p>
+        </p:txBody>
+      </p:sp>
+      <p:sp>
+        <p:nvSpPr>
+          <p:cNvPr id="4" name="Slide Number Placeholder 3"/>
+          <p:cNvSpPr>
+            <a:spLocks noGrp="1"/>
+          </p:cNvSpPr>
+          <p:nvPr>
+            <p:ph type="sldNum" sz="quarter" idx="5"/>
+          </p:nvPr>
+        </p:nvSpPr>
+        <p:spPr/>
+        <p:txBody>
+          <a:bodyPr/>
+          <a:lstStyle/>
+          <a:p>
+            <a:fld id="{C2800238-33D2-A44F-8135-A0F534DB873D}" type="slidenum">
+              <a:rPr lang="en-US" smtClean="0"/>
+              <a:t>4</a:t>
             </a:fld>
             <a:endParaRPr lang="en-US"/>
           </a:p>
@@ -849,7 +934,7 @@
           <a:p>
             <a:fld id="{D3A28AA4-801E-B147-9E5C-6E6DBA6E23D1}" type="datetimeFigureOut">
               <a:rPr lang="en-US" smtClean="0"/>
-              <a:t>10/26/22</a:t>
+              <a:t>11/9/22</a:t>
             </a:fld>
             <a:endParaRPr lang="en-US"/>
           </a:p>
@@ -1019,7 +1104,7 @@
           <a:p>
             <a:fld id="{D3A28AA4-801E-B147-9E5C-6E6DBA6E23D1}" type="datetimeFigureOut">
               <a:rPr lang="en-US" smtClean="0"/>
-              <a:t>10/26/22</a:t>
+              <a:t>11/9/22</a:t>
             </a:fld>
             <a:endParaRPr lang="en-US"/>
           </a:p>
@@ -1199,7 +1284,7 @@
           <a:p>
             <a:fld id="{D3A28AA4-801E-B147-9E5C-6E6DBA6E23D1}" type="datetimeFigureOut">
               <a:rPr lang="en-US" smtClean="0"/>
-              <a:t>10/26/22</a:t>
+              <a:t>11/9/22</a:t>
             </a:fld>
             <a:endParaRPr lang="en-US"/>
           </a:p>
@@ -1369,7 +1454,7 @@
           <a:p>
             <a:fld id="{D3A28AA4-801E-B147-9E5C-6E6DBA6E23D1}" type="datetimeFigureOut">
               <a:rPr lang="en-US" smtClean="0"/>
-              <a:t>10/26/22</a:t>
+              <a:t>11/9/22</a:t>
             </a:fld>
             <a:endParaRPr lang="en-US"/>
           </a:p>
@@ -1615,7 +1700,7 @@
           <a:p>
             <a:fld id="{D3A28AA4-801E-B147-9E5C-6E6DBA6E23D1}" type="datetimeFigureOut">
               <a:rPr lang="en-US" smtClean="0"/>
-              <a:t>10/26/22</a:t>
+              <a:t>11/9/22</a:t>
             </a:fld>
             <a:endParaRPr lang="en-US"/>
           </a:p>
@@ -1847,7 +1932,7 @@
           <a:p>
             <a:fld id="{D3A28AA4-801E-B147-9E5C-6E6DBA6E23D1}" type="datetimeFigureOut">
               <a:rPr lang="en-US" smtClean="0"/>
-              <a:t>10/26/22</a:t>
+              <a:t>11/9/22</a:t>
             </a:fld>
             <a:endParaRPr lang="en-US"/>
           </a:p>
@@ -2214,7 +2299,7 @@
           <a:p>
             <a:fld id="{D3A28AA4-801E-B147-9E5C-6E6DBA6E23D1}" type="datetimeFigureOut">
               <a:rPr lang="en-US" smtClean="0"/>
-              <a:t>10/26/22</a:t>
+              <a:t>11/9/22</a:t>
             </a:fld>
             <a:endParaRPr lang="en-US"/>
           </a:p>
@@ -2332,7 +2417,7 @@
           <a:p>
             <a:fld id="{D3A28AA4-801E-B147-9E5C-6E6DBA6E23D1}" type="datetimeFigureOut">
               <a:rPr lang="en-US" smtClean="0"/>
-              <a:t>10/26/22</a:t>
+              <a:t>11/9/22</a:t>
             </a:fld>
             <a:endParaRPr lang="en-US"/>
           </a:p>
@@ -2427,7 +2512,7 @@
           <a:p>
             <a:fld id="{D3A28AA4-801E-B147-9E5C-6E6DBA6E23D1}" type="datetimeFigureOut">
               <a:rPr lang="en-US" smtClean="0"/>
-              <a:t>10/26/22</a:t>
+              <a:t>11/9/22</a:t>
             </a:fld>
             <a:endParaRPr lang="en-US"/>
           </a:p>
@@ -2704,7 +2789,7 @@
           <a:p>
             <a:fld id="{D3A28AA4-801E-B147-9E5C-6E6DBA6E23D1}" type="datetimeFigureOut">
               <a:rPr lang="en-US" smtClean="0"/>
-              <a:t>10/26/22</a:t>
+              <a:t>11/9/22</a:t>
             </a:fld>
             <a:endParaRPr lang="en-US"/>
           </a:p>
@@ -2961,7 +3046,7 @@
           <a:p>
             <a:fld id="{D3A28AA4-801E-B147-9E5C-6E6DBA6E23D1}" type="datetimeFigureOut">
               <a:rPr lang="en-US" smtClean="0"/>
-              <a:t>10/26/22</a:t>
+              <a:t>11/9/22</a:t>
             </a:fld>
             <a:endParaRPr lang="en-US"/>
           </a:p>
@@ -3174,7 +3259,7 @@
           <a:p>
             <a:fld id="{D3A28AA4-801E-B147-9E5C-6E6DBA6E23D1}" type="datetimeFigureOut">
               <a:rPr lang="en-US" smtClean="0"/>
-              <a:t>10/26/22</a:t>
+              <a:t>11/9/22</a:t>
             </a:fld>
             <a:endParaRPr lang="en-US"/>
           </a:p>
@@ -5470,18 +5555,21 @@
             <a:avLst/>
           </a:prstGeom>
           <a:ln w="38100">
+            <a:solidFill>
+              <a:srgbClr val="C00000"/>
+            </a:solidFill>
             <a:tailEnd type="triangle"/>
           </a:ln>
         </p:spPr>
         <p:style>
           <a:lnRef idx="1">
-            <a:schemeClr val="accent1"/>
+            <a:schemeClr val="dk1"/>
           </a:lnRef>
           <a:fillRef idx="0">
-            <a:schemeClr val="accent1"/>
+            <a:schemeClr val="dk1"/>
           </a:fillRef>
           <a:effectRef idx="0">
-            <a:schemeClr val="accent1"/>
+            <a:schemeClr val="dk1"/>
           </a:effectRef>
           <a:fontRef idx="minor">
             <a:schemeClr val="tx1"/>
@@ -5834,21 +5922,23 @@
           </a:prstGeom>
           <a:ln w="38100">
             <a:solidFill>
-              <a:srgbClr val="C00000"/>
+              <a:schemeClr val="bg2">
+                <a:lumMod val="75000"/>
+              </a:schemeClr>
             </a:solidFill>
-            <a:prstDash val="solid"/>
+            <a:prstDash val="dash"/>
             <a:tailEnd type="triangle"/>
           </a:ln>
         </p:spPr>
         <p:style>
           <a:lnRef idx="1">
-            <a:schemeClr val="accent1"/>
+            <a:schemeClr val="dk1"/>
           </a:lnRef>
           <a:fillRef idx="0">
-            <a:schemeClr val="accent1"/>
+            <a:schemeClr val="dk1"/>
           </a:fillRef>
           <a:effectRef idx="0">
-            <a:schemeClr val="accent1"/>
+            <a:schemeClr val="dk1"/>
           </a:effectRef>
           <a:fontRef idx="minor">
             <a:schemeClr val="tx1"/>
@@ -5888,13 +5978,13 @@
         </p:spPr>
         <p:style>
           <a:lnRef idx="1">
-            <a:schemeClr val="accent1"/>
+            <a:schemeClr val="dk1"/>
           </a:lnRef>
           <a:fillRef idx="0">
-            <a:schemeClr val="accent1"/>
+            <a:schemeClr val="dk1"/>
           </a:fillRef>
           <a:effectRef idx="0">
-            <a:schemeClr val="accent1"/>
+            <a:schemeClr val="dk1"/>
           </a:effectRef>
           <a:fontRef idx="minor">
             <a:schemeClr val="tx1"/>
@@ -5926,7 +6016,9 @@
           </a:prstGeom>
           <a:ln w="38100">
             <a:solidFill>
-              <a:srgbClr val="C00000"/>
+              <a:schemeClr val="bg2">
+                <a:lumMod val="75000"/>
+              </a:schemeClr>
             </a:solidFill>
             <a:prstDash val="dash"/>
             <a:tailEnd type="triangle"/>
@@ -5972,7 +6064,7 @@
           </a:prstGeom>
           <a:ln w="38100">
             <a:solidFill>
-              <a:srgbClr val="C00000"/>
+              <a:schemeClr val="accent5"/>
             </a:solidFill>
             <a:tailEnd type="triangle"/>
           </a:ln>
@@ -6017,7 +6109,9 @@
           </a:prstGeom>
           <a:ln w="38100">
             <a:solidFill>
-              <a:srgbClr val="C00000"/>
+              <a:schemeClr val="bg2">
+                <a:lumMod val="75000"/>
+              </a:schemeClr>
             </a:solidFill>
             <a:prstDash val="dash"/>
             <a:tailEnd type="triangle"/>
@@ -6025,13 +6119,13 @@
         </p:spPr>
         <p:style>
           <a:lnRef idx="1">
-            <a:schemeClr val="accent1"/>
+            <a:schemeClr val="dk1"/>
           </a:lnRef>
           <a:fillRef idx="0">
-            <a:schemeClr val="accent1"/>
+            <a:schemeClr val="dk1"/>
           </a:fillRef>
           <a:effectRef idx="0">
-            <a:schemeClr val="accent1"/>
+            <a:schemeClr val="dk1"/>
           </a:effectRef>
           <a:fontRef idx="minor">
             <a:schemeClr val="tx1"/>
@@ -6063,19 +6157,24 @@
             <a:avLst/>
           </a:prstGeom>
           <a:ln w="38100">
+            <a:solidFill>
+              <a:schemeClr val="bg2">
+                <a:lumMod val="75000"/>
+              </a:schemeClr>
+            </a:solidFill>
             <a:prstDash val="dash"/>
             <a:tailEnd type="triangle"/>
           </a:ln>
         </p:spPr>
         <p:style>
           <a:lnRef idx="1">
-            <a:schemeClr val="accent1"/>
+            <a:schemeClr val="dk1"/>
           </a:lnRef>
           <a:fillRef idx="0">
-            <a:schemeClr val="accent1"/>
+            <a:schemeClr val="dk1"/>
           </a:fillRef>
           <a:effectRef idx="0">
-            <a:schemeClr val="accent1"/>
+            <a:schemeClr val="dk1"/>
           </a:effectRef>
           <a:fontRef idx="minor">
             <a:schemeClr val="tx1"/>
@@ -6108,7 +6207,9 @@
           </a:prstGeom>
           <a:ln w="38100">
             <a:solidFill>
-              <a:srgbClr val="C00000"/>
+              <a:schemeClr val="bg2">
+                <a:lumMod val="75000"/>
+              </a:schemeClr>
             </a:solidFill>
             <a:prstDash val="dash"/>
             <a:tailEnd type="triangle"/>
@@ -6116,13 +6217,13 @@
         </p:spPr>
         <p:style>
           <a:lnRef idx="1">
-            <a:schemeClr val="accent1"/>
+            <a:schemeClr val="dk1"/>
           </a:lnRef>
           <a:fillRef idx="0">
-            <a:schemeClr val="accent1"/>
+            <a:schemeClr val="dk1"/>
           </a:fillRef>
           <a:effectRef idx="0">
-            <a:schemeClr val="accent1"/>
+            <a:schemeClr val="dk1"/>
           </a:effectRef>
           <a:fontRef idx="minor">
             <a:schemeClr val="tx1"/>
@@ -6161,13 +6262,13 @@
         </p:spPr>
         <p:style>
           <a:lnRef idx="1">
-            <a:schemeClr val="accent1"/>
+            <a:schemeClr val="dk1"/>
           </a:lnRef>
           <a:fillRef idx="0">
-            <a:schemeClr val="accent1"/>
+            <a:schemeClr val="dk1"/>
           </a:fillRef>
           <a:effectRef idx="0">
-            <a:schemeClr val="accent1"/>
+            <a:schemeClr val="dk1"/>
           </a:effectRef>
           <a:fontRef idx="minor">
             <a:schemeClr val="tx1"/>
@@ -6444,6 +6545,82 @@
           </a:p>
         </p:txBody>
       </p:sp>
+      <p:sp>
+        <p:nvSpPr>
+          <p:cNvPr id="61" name="TextBox 60">
+            <a:extLst>
+              <a:ext uri="{FF2B5EF4-FFF2-40B4-BE49-F238E27FC236}">
+                <a16:creationId xmlns:a16="http://schemas.microsoft.com/office/drawing/2014/main" id="{B6476535-A95E-90F0-63CA-BA795134B48E}"/>
+              </a:ext>
+            </a:extLst>
+          </p:cNvPr>
+          <p:cNvSpPr txBox="1"/>
+          <p:nvPr/>
+        </p:nvSpPr>
+        <p:spPr>
+          <a:xfrm rot="980213">
+            <a:off x="7774010" y="4647571"/>
+            <a:ext cx="979755" cy="461665"/>
+          </a:xfrm>
+          <a:prstGeom prst="rect">
+            <a:avLst/>
+          </a:prstGeom>
+          <a:noFill/>
+        </p:spPr>
+        <p:txBody>
+          <a:bodyPr wrap="none" rtlCol="0">
+            <a:spAutoFit/>
+          </a:bodyPr>
+          <a:lstStyle/>
+          <a:p>
+            <a:r>
+              <a:rPr lang="en-US" sz="2400" b="1" dirty="0">
+                <a:latin typeface="Times New Roman" panose="02020603050405020304" pitchFamily="18" charset="0"/>
+                <a:cs typeface="Times New Roman" panose="02020603050405020304" pitchFamily="18" charset="0"/>
+              </a:rPr>
+              <a:t>-1.993</a:t>
+            </a:r>
+          </a:p>
+        </p:txBody>
+      </p:sp>
+      <p:sp>
+        <p:nvSpPr>
+          <p:cNvPr id="62" name="TextBox 61">
+            <a:extLst>
+              <a:ext uri="{FF2B5EF4-FFF2-40B4-BE49-F238E27FC236}">
+                <a16:creationId xmlns:a16="http://schemas.microsoft.com/office/drawing/2014/main" id="{404C6F6B-8168-572F-555D-2085A3A08B93}"/>
+              </a:ext>
+            </a:extLst>
+          </p:cNvPr>
+          <p:cNvSpPr txBox="1"/>
+          <p:nvPr/>
+        </p:nvSpPr>
+        <p:spPr>
+          <a:xfrm rot="3415512">
+            <a:off x="10036611" y="4134396"/>
+            <a:ext cx="979755" cy="461665"/>
+          </a:xfrm>
+          <a:prstGeom prst="rect">
+            <a:avLst/>
+          </a:prstGeom>
+          <a:noFill/>
+        </p:spPr>
+        <p:txBody>
+          <a:bodyPr wrap="none" rtlCol="0">
+            <a:spAutoFit/>
+          </a:bodyPr>
+          <a:lstStyle/>
+          <a:p>
+            <a:r>
+              <a:rPr lang="en-US" sz="2400" dirty="0">
+                <a:latin typeface="Times New Roman" panose="02020603050405020304" pitchFamily="18" charset="0"/>
+                <a:cs typeface="Times New Roman" panose="02020603050405020304" pitchFamily="18" charset="0"/>
+              </a:rPr>
+              <a:t>-0.568</a:t>
+            </a:r>
+          </a:p>
+        </p:txBody>
+      </p:sp>
       <p:cxnSp>
         <p:nvCxnSpPr>
           <p:cNvPr id="64" name="Straight Arrow Connector 63">
@@ -6468,19 +6645,24 @@
             <a:avLst/>
           </a:prstGeom>
           <a:ln w="38100">
+            <a:solidFill>
+              <a:schemeClr val="bg2">
+                <a:lumMod val="75000"/>
+              </a:schemeClr>
+            </a:solidFill>
             <a:prstDash val="dash"/>
             <a:tailEnd type="triangle"/>
           </a:ln>
         </p:spPr>
         <p:style>
           <a:lnRef idx="1">
-            <a:schemeClr val="accent1"/>
+            <a:schemeClr val="dk1"/>
           </a:lnRef>
           <a:fillRef idx="0">
-            <a:schemeClr val="accent1"/>
+            <a:schemeClr val="dk1"/>
           </a:fillRef>
           <a:effectRef idx="0">
-            <a:schemeClr val="accent1"/>
+            <a:schemeClr val="dk1"/>
           </a:effectRef>
           <a:fontRef idx="minor">
             <a:schemeClr val="tx1"/>
@@ -6592,6 +6774,234 @@
           <a:p>
             <a:pPr algn="ctr"/>
             <a:endParaRPr lang="en-US"/>
+          </a:p>
+        </p:txBody>
+      </p:sp>
+      <p:sp>
+        <p:nvSpPr>
+          <p:cNvPr id="65" name="TextBox 64">
+            <a:extLst>
+              <a:ext uri="{FF2B5EF4-FFF2-40B4-BE49-F238E27FC236}">
+                <a16:creationId xmlns:a16="http://schemas.microsoft.com/office/drawing/2014/main" id="{E3249D2D-816D-5F0E-F2BB-AF171B3C9197}"/>
+              </a:ext>
+            </a:extLst>
+          </p:cNvPr>
+          <p:cNvSpPr txBox="1"/>
+          <p:nvPr/>
+        </p:nvSpPr>
+        <p:spPr>
+          <a:xfrm>
+            <a:off x="6419418" y="5530920"/>
+            <a:ext cx="877163" cy="461665"/>
+          </a:xfrm>
+          <a:prstGeom prst="rect">
+            <a:avLst/>
+          </a:prstGeom>
+          <a:noFill/>
+        </p:spPr>
+        <p:txBody>
+          <a:bodyPr wrap="none" rtlCol="0">
+            <a:spAutoFit/>
+          </a:bodyPr>
+          <a:lstStyle/>
+          <a:p>
+            <a:r>
+              <a:rPr lang="en-US" sz="2400" dirty="0">
+                <a:latin typeface="Times New Roman" panose="02020603050405020304" pitchFamily="18" charset="0"/>
+                <a:cs typeface="Times New Roman" panose="02020603050405020304" pitchFamily="18" charset="0"/>
+              </a:rPr>
+              <a:t>0.856</a:t>
+            </a:r>
+          </a:p>
+        </p:txBody>
+      </p:sp>
+      <p:sp>
+        <p:nvSpPr>
+          <p:cNvPr id="66" name="TextBox 65">
+            <a:extLst>
+              <a:ext uri="{FF2B5EF4-FFF2-40B4-BE49-F238E27FC236}">
+                <a16:creationId xmlns:a16="http://schemas.microsoft.com/office/drawing/2014/main" id="{CDC511E2-E7BC-E1E3-726E-BF5800A2DFCF}"/>
+              </a:ext>
+            </a:extLst>
+          </p:cNvPr>
+          <p:cNvSpPr txBox="1"/>
+          <p:nvPr/>
+        </p:nvSpPr>
+        <p:spPr>
+          <a:xfrm>
+            <a:off x="4166208" y="1880106"/>
+            <a:ext cx="979755" cy="461665"/>
+          </a:xfrm>
+          <a:prstGeom prst="rect">
+            <a:avLst/>
+          </a:prstGeom>
+          <a:noFill/>
+        </p:spPr>
+        <p:txBody>
+          <a:bodyPr wrap="none" rtlCol="0">
+            <a:spAutoFit/>
+          </a:bodyPr>
+          <a:lstStyle/>
+          <a:p>
+            <a:r>
+              <a:rPr lang="en-US" sz="2400" dirty="0">
+                <a:latin typeface="Times New Roman" panose="02020603050405020304" pitchFamily="18" charset="0"/>
+                <a:cs typeface="Times New Roman" panose="02020603050405020304" pitchFamily="18" charset="0"/>
+              </a:rPr>
+              <a:t>-0.538</a:t>
+            </a:r>
+          </a:p>
+        </p:txBody>
+      </p:sp>
+      <p:sp>
+        <p:nvSpPr>
+          <p:cNvPr id="67" name="TextBox 66">
+            <a:extLst>
+              <a:ext uri="{FF2B5EF4-FFF2-40B4-BE49-F238E27FC236}">
+                <a16:creationId xmlns:a16="http://schemas.microsoft.com/office/drawing/2014/main" id="{29C6D649-5026-A7FB-331D-7FBB55BE561E}"/>
+              </a:ext>
+            </a:extLst>
+          </p:cNvPr>
+          <p:cNvSpPr txBox="1"/>
+          <p:nvPr/>
+        </p:nvSpPr>
+        <p:spPr>
+          <a:xfrm>
+            <a:off x="7707067" y="1863140"/>
+            <a:ext cx="979755" cy="461665"/>
+          </a:xfrm>
+          <a:prstGeom prst="rect">
+            <a:avLst/>
+          </a:prstGeom>
+          <a:noFill/>
+        </p:spPr>
+        <p:txBody>
+          <a:bodyPr wrap="none" rtlCol="0">
+            <a:spAutoFit/>
+          </a:bodyPr>
+          <a:lstStyle/>
+          <a:p>
+            <a:r>
+              <a:rPr lang="en-US" sz="2400" dirty="0">
+                <a:latin typeface="Times New Roman" panose="02020603050405020304" pitchFamily="18" charset="0"/>
+                <a:cs typeface="Times New Roman" panose="02020603050405020304" pitchFamily="18" charset="0"/>
+              </a:rPr>
+              <a:t>-0.802</a:t>
+            </a:r>
+          </a:p>
+        </p:txBody>
+      </p:sp>
+      <p:sp>
+        <p:nvSpPr>
+          <p:cNvPr id="68" name="TextBox 67">
+            <a:extLst>
+              <a:ext uri="{FF2B5EF4-FFF2-40B4-BE49-F238E27FC236}">
+                <a16:creationId xmlns:a16="http://schemas.microsoft.com/office/drawing/2014/main" id="{6430202A-4CDC-8603-E936-050364B5EB15}"/>
+              </a:ext>
+            </a:extLst>
+          </p:cNvPr>
+          <p:cNvSpPr txBox="1"/>
+          <p:nvPr/>
+        </p:nvSpPr>
+        <p:spPr>
+          <a:xfrm rot="20471706">
+            <a:off x="9801621" y="1764583"/>
+            <a:ext cx="877163" cy="461665"/>
+          </a:xfrm>
+          <a:prstGeom prst="rect">
+            <a:avLst/>
+          </a:prstGeom>
+          <a:noFill/>
+        </p:spPr>
+        <p:txBody>
+          <a:bodyPr wrap="none" rtlCol="0">
+            <a:spAutoFit/>
+          </a:bodyPr>
+          <a:lstStyle/>
+          <a:p>
+            <a:r>
+              <a:rPr lang="en-US" sz="2400" dirty="0">
+                <a:latin typeface="Times New Roman" panose="02020603050405020304" pitchFamily="18" charset="0"/>
+                <a:cs typeface="Times New Roman" panose="02020603050405020304" pitchFamily="18" charset="0"/>
+              </a:rPr>
+              <a:t>0.423</a:t>
+            </a:r>
+          </a:p>
+        </p:txBody>
+      </p:sp>
+      <p:sp>
+        <p:nvSpPr>
+          <p:cNvPr id="69" name="TextBox 68">
+            <a:extLst>
+              <a:ext uri="{FF2B5EF4-FFF2-40B4-BE49-F238E27FC236}">
+                <a16:creationId xmlns:a16="http://schemas.microsoft.com/office/drawing/2014/main" id="{D042879D-AA23-A303-5FF7-5CDCB1157B5A}"/>
+              </a:ext>
+            </a:extLst>
+          </p:cNvPr>
+          <p:cNvSpPr txBox="1"/>
+          <p:nvPr/>
+        </p:nvSpPr>
+        <p:spPr>
+          <a:xfrm rot="19488555">
+            <a:off x="2081829" y="4033081"/>
+            <a:ext cx="979755" cy="461665"/>
+          </a:xfrm>
+          <a:prstGeom prst="rect">
+            <a:avLst/>
+          </a:prstGeom>
+          <a:noFill/>
+        </p:spPr>
+        <p:txBody>
+          <a:bodyPr wrap="none" rtlCol="0">
+            <a:spAutoFit/>
+          </a:bodyPr>
+          <a:lstStyle/>
+          <a:p>
+            <a:r>
+              <a:rPr lang="en-US" sz="2400" b="1" dirty="0">
+                <a:latin typeface="Times New Roman" panose="02020603050405020304" pitchFamily="18" charset="0"/>
+                <a:cs typeface="Times New Roman" panose="02020603050405020304" pitchFamily="18" charset="0"/>
+              </a:rPr>
+              <a:t>-3.837</a:t>
+            </a:r>
+          </a:p>
+        </p:txBody>
+      </p:sp>
+      <p:sp>
+        <p:nvSpPr>
+          <p:cNvPr id="71" name="TextBox 70">
+            <a:extLst>
+              <a:ext uri="{FF2B5EF4-FFF2-40B4-BE49-F238E27FC236}">
+                <a16:creationId xmlns:a16="http://schemas.microsoft.com/office/drawing/2014/main" id="{F44F4BFA-CE4A-DC03-9C24-80E4A8CDECE9}"/>
+              </a:ext>
+            </a:extLst>
+          </p:cNvPr>
+          <p:cNvSpPr txBox="1"/>
+          <p:nvPr/>
+        </p:nvSpPr>
+        <p:spPr>
+          <a:xfrm rot="2166687">
+            <a:off x="2103246" y="1910670"/>
+            <a:ext cx="979755" cy="461665"/>
+          </a:xfrm>
+          <a:prstGeom prst="rect">
+            <a:avLst/>
+          </a:prstGeom>
+          <a:noFill/>
+        </p:spPr>
+        <p:txBody>
+          <a:bodyPr wrap="none" rtlCol="0">
+            <a:spAutoFit/>
+          </a:bodyPr>
+          <a:lstStyle/>
+          <a:p>
+            <a:r>
+              <a:rPr lang="en-US" sz="2400" dirty="0">
+                <a:latin typeface="Times New Roman" panose="02020603050405020304" pitchFamily="18" charset="0"/>
+                <a:cs typeface="Times New Roman" panose="02020603050405020304" pitchFamily="18" charset="0"/>
+              </a:rPr>
+              <a:t>-1.733</a:t>
+            </a:r>
           </a:p>
         </p:txBody>
       </p:sp>
@@ -6696,6 +7106,82 @@
           </a:p>
         </p:txBody>
       </p:sp>
+      <p:sp>
+        <p:nvSpPr>
+          <p:cNvPr id="74" name="TextBox 73">
+            <a:extLst>
+              <a:ext uri="{FF2B5EF4-FFF2-40B4-BE49-F238E27FC236}">
+                <a16:creationId xmlns:a16="http://schemas.microsoft.com/office/drawing/2014/main" id="{244C02EF-F1A6-2F38-5982-D6BF1730AF46}"/>
+              </a:ext>
+            </a:extLst>
+          </p:cNvPr>
+          <p:cNvSpPr txBox="1"/>
+          <p:nvPr/>
+        </p:nvSpPr>
+        <p:spPr>
+          <a:xfrm rot="2159215">
+            <a:off x="5815510" y="2045259"/>
+            <a:ext cx="1133644" cy="461665"/>
+          </a:xfrm>
+          <a:prstGeom prst="rect">
+            <a:avLst/>
+          </a:prstGeom>
+          <a:noFill/>
+        </p:spPr>
+        <p:txBody>
+          <a:bodyPr wrap="none" rtlCol="0">
+            <a:spAutoFit/>
+          </a:bodyPr>
+          <a:lstStyle/>
+          <a:p>
+            <a:r>
+              <a:rPr lang="en-US" sz="2400" b="1" dirty="0">
+                <a:latin typeface="Times New Roman" panose="02020603050405020304" pitchFamily="18" charset="0"/>
+                <a:cs typeface="Times New Roman" panose="02020603050405020304" pitchFamily="18" charset="0"/>
+              </a:rPr>
+              <a:t>-12.977</a:t>
+            </a:r>
+          </a:p>
+        </p:txBody>
+      </p:sp>
+      <p:sp>
+        <p:nvSpPr>
+          <p:cNvPr id="75" name="TextBox 74">
+            <a:extLst>
+              <a:ext uri="{FF2B5EF4-FFF2-40B4-BE49-F238E27FC236}">
+                <a16:creationId xmlns:a16="http://schemas.microsoft.com/office/drawing/2014/main" id="{D36FBB87-9540-A96D-DB0B-F29A669A82DE}"/>
+              </a:ext>
+            </a:extLst>
+          </p:cNvPr>
+          <p:cNvSpPr txBox="1"/>
+          <p:nvPr/>
+        </p:nvSpPr>
+        <p:spPr>
+          <a:xfrm>
+            <a:off x="6191367" y="2967335"/>
+            <a:ext cx="1031051" cy="461665"/>
+          </a:xfrm>
+          <a:prstGeom prst="rect">
+            <a:avLst/>
+          </a:prstGeom>
+          <a:noFill/>
+        </p:spPr>
+        <p:txBody>
+          <a:bodyPr wrap="none" rtlCol="0">
+            <a:spAutoFit/>
+          </a:bodyPr>
+          <a:lstStyle/>
+          <a:p>
+            <a:r>
+              <a:rPr lang="en-US" sz="2400" b="1" dirty="0">
+                <a:latin typeface="Times New Roman" panose="02020603050405020304" pitchFamily="18" charset="0"/>
+                <a:cs typeface="Times New Roman" panose="02020603050405020304" pitchFamily="18" charset="0"/>
+              </a:rPr>
+              <a:t>10.395</a:t>
+            </a:r>
+          </a:p>
+        </p:txBody>
+      </p:sp>
       <p:cxnSp>
         <p:nvCxnSpPr>
           <p:cNvPr id="77" name="Straight Arrow Connector 76">
@@ -6729,19 +7215,57 @@
         </p:spPr>
         <p:style>
           <a:lnRef idx="1">
-            <a:schemeClr val="accent1"/>
+            <a:schemeClr val="dk1"/>
           </a:lnRef>
           <a:fillRef idx="0">
-            <a:schemeClr val="accent1"/>
+            <a:schemeClr val="dk1"/>
           </a:fillRef>
           <a:effectRef idx="0">
-            <a:schemeClr val="accent1"/>
+            <a:schemeClr val="dk1"/>
           </a:effectRef>
           <a:fontRef idx="minor">
             <a:schemeClr val="tx1"/>
           </a:fontRef>
         </p:style>
       </p:cxnSp>
+      <p:sp>
+        <p:nvSpPr>
+          <p:cNvPr id="80" name="TextBox 79">
+            <a:extLst>
+              <a:ext uri="{FF2B5EF4-FFF2-40B4-BE49-F238E27FC236}">
+                <a16:creationId xmlns:a16="http://schemas.microsoft.com/office/drawing/2014/main" id="{0FC8D521-81A9-E347-0EBC-99509681D866}"/>
+              </a:ext>
+            </a:extLst>
+          </p:cNvPr>
+          <p:cNvSpPr txBox="1"/>
+          <p:nvPr/>
+        </p:nvSpPr>
+        <p:spPr>
+          <a:xfrm rot="3447489">
+            <a:off x="6422552" y="1561551"/>
+            <a:ext cx="979755" cy="461665"/>
+          </a:xfrm>
+          <a:prstGeom prst="rect">
+            <a:avLst/>
+          </a:prstGeom>
+          <a:noFill/>
+        </p:spPr>
+        <p:txBody>
+          <a:bodyPr wrap="none" rtlCol="0">
+            <a:spAutoFit/>
+          </a:bodyPr>
+          <a:lstStyle/>
+          <a:p>
+            <a:r>
+              <a:rPr lang="en-US" sz="2400" b="1" dirty="0">
+                <a:latin typeface="Times New Roman" panose="02020603050405020304" pitchFamily="18" charset="0"/>
+                <a:cs typeface="Times New Roman" panose="02020603050405020304" pitchFamily="18" charset="0"/>
+              </a:rPr>
+              <a:t>-8.460</a:t>
+            </a:r>
+          </a:p>
+        </p:txBody>
+      </p:sp>
       <p:cxnSp>
         <p:nvCxnSpPr>
           <p:cNvPr id="2" name="Straight Arrow Connector 1">
@@ -6766,20 +7290,20 @@
           </a:prstGeom>
           <a:ln w="38100">
             <a:solidFill>
-              <a:srgbClr val="C00000"/>
+              <a:schemeClr val="accent5"/>
             </a:solidFill>
             <a:tailEnd type="triangle"/>
           </a:ln>
         </p:spPr>
         <p:style>
           <a:lnRef idx="1">
-            <a:schemeClr val="accent1"/>
+            <a:schemeClr val="dk1"/>
           </a:lnRef>
           <a:fillRef idx="0">
-            <a:schemeClr val="accent1"/>
+            <a:schemeClr val="dk1"/>
           </a:fillRef>
           <a:effectRef idx="0">
-            <a:schemeClr val="accent1"/>
+            <a:schemeClr val="dk1"/>
           </a:effectRef>
           <a:fontRef idx="minor">
             <a:schemeClr val="tx1"/>
@@ -6788,10 +7312,10 @@
       </p:cxnSp>
       <p:sp>
         <p:nvSpPr>
-          <p:cNvPr id="4" name="TextBox 3">
-            <a:extLst>
-              <a:ext uri="{FF2B5EF4-FFF2-40B4-BE49-F238E27FC236}">
-                <a16:creationId xmlns:a16="http://schemas.microsoft.com/office/drawing/2014/main" id="{7B5B5484-7BFD-738A-6CDF-C9EC74D77D90}"/>
+          <p:cNvPr id="3" name="TextBox 2">
+            <a:extLst>
+              <a:ext uri="{FF2B5EF4-FFF2-40B4-BE49-F238E27FC236}">
+                <a16:creationId xmlns:a16="http://schemas.microsoft.com/office/drawing/2014/main" id="{619B30D9-163E-1E1A-66F6-9A39C8D890EC}"/>
               </a:ext>
             </a:extLst>
           </p:cNvPr>
@@ -6799,9 +7323,9 @@
           <p:nvPr/>
         </p:nvSpPr>
         <p:spPr>
-          <a:xfrm rot="980213">
-            <a:off x="7774010" y="4647571"/>
-            <a:ext cx="979755" cy="461665"/>
+          <a:xfrm>
+            <a:off x="10013721" y="403750"/>
+            <a:ext cx="1133644" cy="461665"/>
           </a:xfrm>
           <a:prstGeom prst="rect">
             <a:avLst/>
@@ -6819,435 +7343,17 @@
                 <a:latin typeface="Times New Roman" panose="02020603050405020304" pitchFamily="18" charset="0"/>
                 <a:cs typeface="Times New Roman" panose="02020603050405020304" pitchFamily="18" charset="0"/>
               </a:rPr>
-              <a:t>-1.947</a:t>
-            </a:r>
-          </a:p>
-        </p:txBody>
-      </p:sp>
-      <p:sp>
-        <p:nvSpPr>
-          <p:cNvPr id="5" name="TextBox 4">
-            <a:extLst>
-              <a:ext uri="{FF2B5EF4-FFF2-40B4-BE49-F238E27FC236}">
-                <a16:creationId xmlns:a16="http://schemas.microsoft.com/office/drawing/2014/main" id="{5C15E60C-786F-B0E4-702A-980DA8F9EF31}"/>
-              </a:ext>
-            </a:extLst>
-          </p:cNvPr>
-          <p:cNvSpPr txBox="1"/>
-          <p:nvPr/>
-        </p:nvSpPr>
-        <p:spPr>
-          <a:xfrm rot="3415512">
-            <a:off x="10036612" y="4134396"/>
-            <a:ext cx="979755" cy="461665"/>
-          </a:xfrm>
-          <a:prstGeom prst="rect">
-            <a:avLst/>
-          </a:prstGeom>
-          <a:noFill/>
-        </p:spPr>
-        <p:txBody>
-          <a:bodyPr wrap="none" rtlCol="0">
-            <a:spAutoFit/>
-          </a:bodyPr>
-          <a:lstStyle/>
-          <a:p>
-            <a:r>
-              <a:rPr lang="en-US" sz="2400" dirty="0">
-                <a:latin typeface="Times New Roman" panose="02020603050405020304" pitchFamily="18" charset="0"/>
-                <a:cs typeface="Times New Roman" panose="02020603050405020304" pitchFamily="18" charset="0"/>
-              </a:rPr>
-              <a:t>-0.681</a:t>
-            </a:r>
-          </a:p>
-        </p:txBody>
-      </p:sp>
-      <p:sp>
-        <p:nvSpPr>
-          <p:cNvPr id="6" name="TextBox 5">
-            <a:extLst>
-              <a:ext uri="{FF2B5EF4-FFF2-40B4-BE49-F238E27FC236}">
-                <a16:creationId xmlns:a16="http://schemas.microsoft.com/office/drawing/2014/main" id="{88485C6C-B89E-A112-96E4-ECFD35F5D6CF}"/>
-              </a:ext>
-            </a:extLst>
-          </p:cNvPr>
-          <p:cNvSpPr txBox="1"/>
-          <p:nvPr/>
-        </p:nvSpPr>
-        <p:spPr>
-          <a:xfrm>
-            <a:off x="6419418" y="5530920"/>
-            <a:ext cx="877163" cy="461665"/>
-          </a:xfrm>
-          <a:prstGeom prst="rect">
-            <a:avLst/>
-          </a:prstGeom>
-          <a:noFill/>
-        </p:spPr>
-        <p:txBody>
-          <a:bodyPr wrap="none" rtlCol="0">
-            <a:spAutoFit/>
-          </a:bodyPr>
-          <a:lstStyle/>
-          <a:p>
-            <a:r>
-              <a:rPr lang="en-US" sz="2400" dirty="0">
-                <a:latin typeface="Times New Roman" panose="02020603050405020304" pitchFamily="18" charset="0"/>
-                <a:cs typeface="Times New Roman" panose="02020603050405020304" pitchFamily="18" charset="0"/>
-              </a:rPr>
-              <a:t>1.405</a:t>
-            </a:r>
-          </a:p>
-        </p:txBody>
-      </p:sp>
-      <p:sp>
-        <p:nvSpPr>
-          <p:cNvPr id="7" name="TextBox 6">
-            <a:extLst>
-              <a:ext uri="{FF2B5EF4-FFF2-40B4-BE49-F238E27FC236}">
-                <a16:creationId xmlns:a16="http://schemas.microsoft.com/office/drawing/2014/main" id="{7D1B418B-C3F1-D6ED-8A14-52E668769EF2}"/>
-              </a:ext>
-            </a:extLst>
-          </p:cNvPr>
-          <p:cNvSpPr txBox="1"/>
-          <p:nvPr/>
-        </p:nvSpPr>
-        <p:spPr>
-          <a:xfrm>
-            <a:off x="4118797" y="1880106"/>
-            <a:ext cx="979755" cy="461665"/>
-          </a:xfrm>
-          <a:prstGeom prst="rect">
-            <a:avLst/>
-          </a:prstGeom>
-          <a:noFill/>
-        </p:spPr>
-        <p:txBody>
-          <a:bodyPr wrap="none" rtlCol="0">
-            <a:spAutoFit/>
-          </a:bodyPr>
-          <a:lstStyle/>
-          <a:p>
-            <a:r>
-              <a:rPr lang="en-US" sz="2400" dirty="0">
-                <a:latin typeface="Times New Roman" panose="02020603050405020304" pitchFamily="18" charset="0"/>
-                <a:cs typeface="Times New Roman" panose="02020603050405020304" pitchFamily="18" charset="0"/>
-              </a:rPr>
-              <a:t>-0.860</a:t>
-            </a:r>
-          </a:p>
-        </p:txBody>
-      </p:sp>
-      <p:sp>
-        <p:nvSpPr>
-          <p:cNvPr id="8" name="TextBox 7">
-            <a:extLst>
-              <a:ext uri="{FF2B5EF4-FFF2-40B4-BE49-F238E27FC236}">
-                <a16:creationId xmlns:a16="http://schemas.microsoft.com/office/drawing/2014/main" id="{97BCA183-6879-FD37-FF21-D53BE58C94D7}"/>
-              </a:ext>
-            </a:extLst>
-          </p:cNvPr>
-          <p:cNvSpPr txBox="1"/>
-          <p:nvPr/>
-        </p:nvSpPr>
-        <p:spPr>
-          <a:xfrm>
-            <a:off x="7707067" y="1863140"/>
-            <a:ext cx="979755" cy="461665"/>
-          </a:xfrm>
-          <a:prstGeom prst="rect">
-            <a:avLst/>
-          </a:prstGeom>
-          <a:noFill/>
-        </p:spPr>
-        <p:txBody>
-          <a:bodyPr wrap="none" rtlCol="0">
-            <a:spAutoFit/>
-          </a:bodyPr>
-          <a:lstStyle/>
-          <a:p>
-            <a:r>
-              <a:rPr lang="en-US" sz="2400" b="1" dirty="0">
-                <a:latin typeface="Times New Roman" panose="02020603050405020304" pitchFamily="18" charset="0"/>
-                <a:cs typeface="Times New Roman" panose="02020603050405020304" pitchFamily="18" charset="0"/>
-              </a:rPr>
-              <a:t>-2.470</a:t>
-            </a:r>
-          </a:p>
-        </p:txBody>
-      </p:sp>
-      <p:sp>
-        <p:nvSpPr>
-          <p:cNvPr id="9" name="TextBox 8">
-            <a:extLst>
-              <a:ext uri="{FF2B5EF4-FFF2-40B4-BE49-F238E27FC236}">
-                <a16:creationId xmlns:a16="http://schemas.microsoft.com/office/drawing/2014/main" id="{EBE43EA0-6642-DE65-1FC8-2B2CCED5DAC3}"/>
-              </a:ext>
-            </a:extLst>
-          </p:cNvPr>
-          <p:cNvSpPr txBox="1"/>
-          <p:nvPr/>
-        </p:nvSpPr>
-        <p:spPr>
-          <a:xfrm rot="20471706">
-            <a:off x="9801621" y="1764583"/>
-            <a:ext cx="877163" cy="461665"/>
-          </a:xfrm>
-          <a:prstGeom prst="rect">
-            <a:avLst/>
-          </a:prstGeom>
-          <a:noFill/>
-        </p:spPr>
-        <p:txBody>
-          <a:bodyPr wrap="none" rtlCol="0">
-            <a:spAutoFit/>
-          </a:bodyPr>
-          <a:lstStyle/>
-          <a:p>
-            <a:r>
-              <a:rPr lang="en-US" sz="2400" dirty="0">
-                <a:latin typeface="Times New Roman" panose="02020603050405020304" pitchFamily="18" charset="0"/>
-                <a:cs typeface="Times New Roman" panose="02020603050405020304" pitchFamily="18" charset="0"/>
-              </a:rPr>
-              <a:t>0.092</a:t>
-            </a:r>
-          </a:p>
-        </p:txBody>
-      </p:sp>
-      <p:sp>
-        <p:nvSpPr>
-          <p:cNvPr id="10" name="TextBox 9">
-            <a:extLst>
-              <a:ext uri="{FF2B5EF4-FFF2-40B4-BE49-F238E27FC236}">
-                <a16:creationId xmlns:a16="http://schemas.microsoft.com/office/drawing/2014/main" id="{5F8EA069-6F0D-5CA6-BF05-D22712272A1E}"/>
-              </a:ext>
-            </a:extLst>
-          </p:cNvPr>
-          <p:cNvSpPr txBox="1"/>
-          <p:nvPr/>
-        </p:nvSpPr>
-        <p:spPr>
-          <a:xfrm rot="19488555">
-            <a:off x="2081829" y="4033081"/>
-            <a:ext cx="979755" cy="461665"/>
-          </a:xfrm>
-          <a:prstGeom prst="rect">
-            <a:avLst/>
-          </a:prstGeom>
-          <a:noFill/>
-        </p:spPr>
-        <p:txBody>
-          <a:bodyPr wrap="none" rtlCol="0">
-            <a:spAutoFit/>
-          </a:bodyPr>
-          <a:lstStyle/>
-          <a:p>
-            <a:r>
-              <a:rPr lang="en-US" sz="2400" b="1" dirty="0">
-                <a:latin typeface="Times New Roman" panose="02020603050405020304" pitchFamily="18" charset="0"/>
-                <a:cs typeface="Times New Roman" panose="02020603050405020304" pitchFamily="18" charset="0"/>
-              </a:rPr>
-              <a:t>-2.728</a:t>
-            </a:r>
-          </a:p>
-        </p:txBody>
-      </p:sp>
-      <p:sp>
-        <p:nvSpPr>
-          <p:cNvPr id="11" name="TextBox 10">
-            <a:extLst>
-              <a:ext uri="{FF2B5EF4-FFF2-40B4-BE49-F238E27FC236}">
-                <a16:creationId xmlns:a16="http://schemas.microsoft.com/office/drawing/2014/main" id="{A337C9DC-5FD7-DCF0-0804-30EF76A2D58E}"/>
-              </a:ext>
-            </a:extLst>
-          </p:cNvPr>
-          <p:cNvSpPr txBox="1"/>
-          <p:nvPr/>
-        </p:nvSpPr>
-        <p:spPr>
-          <a:xfrm rot="2166687">
-            <a:off x="2103246" y="1910670"/>
-            <a:ext cx="979755" cy="461665"/>
-          </a:xfrm>
-          <a:prstGeom prst="rect">
-            <a:avLst/>
-          </a:prstGeom>
-          <a:noFill/>
-        </p:spPr>
-        <p:txBody>
-          <a:bodyPr wrap="none" rtlCol="0">
-            <a:spAutoFit/>
-          </a:bodyPr>
-          <a:lstStyle/>
-          <a:p>
-            <a:r>
-              <a:rPr lang="en-US" sz="2400" dirty="0">
-                <a:latin typeface="Times New Roman" panose="02020603050405020304" pitchFamily="18" charset="0"/>
-                <a:cs typeface="Times New Roman" panose="02020603050405020304" pitchFamily="18" charset="0"/>
-              </a:rPr>
-              <a:t>-0.978</a:t>
-            </a:r>
-          </a:p>
-        </p:txBody>
-      </p:sp>
-      <p:sp>
-        <p:nvSpPr>
-          <p:cNvPr id="12" name="TextBox 11">
-            <a:extLst>
-              <a:ext uri="{FF2B5EF4-FFF2-40B4-BE49-F238E27FC236}">
-                <a16:creationId xmlns:a16="http://schemas.microsoft.com/office/drawing/2014/main" id="{D6BABC76-BFE8-61D1-C153-E1EAA3BD9D67}"/>
-              </a:ext>
-            </a:extLst>
-          </p:cNvPr>
-          <p:cNvSpPr txBox="1"/>
-          <p:nvPr/>
-        </p:nvSpPr>
-        <p:spPr>
-          <a:xfrm rot="2159215">
-            <a:off x="5815510" y="2045259"/>
-            <a:ext cx="1133644" cy="461665"/>
-          </a:xfrm>
-          <a:prstGeom prst="rect">
-            <a:avLst/>
-          </a:prstGeom>
-          <a:noFill/>
-        </p:spPr>
-        <p:txBody>
-          <a:bodyPr wrap="none" rtlCol="0">
-            <a:spAutoFit/>
-          </a:bodyPr>
-          <a:lstStyle/>
-          <a:p>
-            <a:r>
-              <a:rPr lang="en-US" sz="2400" b="1" dirty="0">
-                <a:latin typeface="Times New Roman" panose="02020603050405020304" pitchFamily="18" charset="0"/>
-                <a:cs typeface="Times New Roman" panose="02020603050405020304" pitchFamily="18" charset="0"/>
-              </a:rPr>
-              <a:t>-13.026</a:t>
-            </a:r>
-          </a:p>
-        </p:txBody>
-      </p:sp>
-      <p:sp>
-        <p:nvSpPr>
-          <p:cNvPr id="13" name="TextBox 12">
-            <a:extLst>
-              <a:ext uri="{FF2B5EF4-FFF2-40B4-BE49-F238E27FC236}">
-                <a16:creationId xmlns:a16="http://schemas.microsoft.com/office/drawing/2014/main" id="{28A771FF-985B-5C09-0DA4-46A5274CFD4C}"/>
-              </a:ext>
-            </a:extLst>
-          </p:cNvPr>
-          <p:cNvSpPr txBox="1"/>
-          <p:nvPr/>
-        </p:nvSpPr>
-        <p:spPr>
-          <a:xfrm>
-            <a:off x="6191367" y="2967335"/>
-            <a:ext cx="1031051" cy="461665"/>
-          </a:xfrm>
-          <a:prstGeom prst="rect">
-            <a:avLst/>
-          </a:prstGeom>
-          <a:noFill/>
-        </p:spPr>
-        <p:txBody>
-          <a:bodyPr wrap="none" rtlCol="0">
-            <a:spAutoFit/>
-          </a:bodyPr>
-          <a:lstStyle/>
-          <a:p>
-            <a:r>
-              <a:rPr lang="en-US" sz="2400" b="1" dirty="0">
-                <a:latin typeface="Times New Roman" panose="02020603050405020304" pitchFamily="18" charset="0"/>
-                <a:cs typeface="Times New Roman" panose="02020603050405020304" pitchFamily="18" charset="0"/>
-              </a:rPr>
-              <a:t>13.737</a:t>
-            </a:r>
-          </a:p>
-        </p:txBody>
-      </p:sp>
-      <p:sp>
-        <p:nvSpPr>
-          <p:cNvPr id="14" name="TextBox 13">
-            <a:extLst>
-              <a:ext uri="{FF2B5EF4-FFF2-40B4-BE49-F238E27FC236}">
-                <a16:creationId xmlns:a16="http://schemas.microsoft.com/office/drawing/2014/main" id="{4F80FAB0-93F0-BB5A-A4EA-A033C546A8AD}"/>
-              </a:ext>
-            </a:extLst>
-          </p:cNvPr>
-          <p:cNvSpPr txBox="1"/>
-          <p:nvPr/>
-        </p:nvSpPr>
-        <p:spPr>
-          <a:xfrm rot="3447489">
-            <a:off x="6422552" y="1561551"/>
-            <a:ext cx="979755" cy="461665"/>
-          </a:xfrm>
-          <a:prstGeom prst="rect">
-            <a:avLst/>
-          </a:prstGeom>
-          <a:noFill/>
-        </p:spPr>
-        <p:txBody>
-          <a:bodyPr wrap="none" rtlCol="0">
-            <a:spAutoFit/>
-          </a:bodyPr>
-          <a:lstStyle/>
-          <a:p>
-            <a:r>
-              <a:rPr lang="en-US" sz="2400" b="1" dirty="0">
-                <a:latin typeface="Times New Roman" panose="02020603050405020304" pitchFamily="18" charset="0"/>
-                <a:cs typeface="Times New Roman" panose="02020603050405020304" pitchFamily="18" charset="0"/>
-              </a:rPr>
-              <a:t>-9.297</a:t>
-            </a:r>
-          </a:p>
-        </p:txBody>
-      </p:sp>
-      <p:sp>
-        <p:nvSpPr>
-          <p:cNvPr id="15" name="TextBox 14">
-            <a:extLst>
-              <a:ext uri="{FF2B5EF4-FFF2-40B4-BE49-F238E27FC236}">
-                <a16:creationId xmlns:a16="http://schemas.microsoft.com/office/drawing/2014/main" id="{4D3FBF7B-3333-F357-14E6-233A28F06C10}"/>
-              </a:ext>
-            </a:extLst>
-          </p:cNvPr>
-          <p:cNvSpPr txBox="1"/>
-          <p:nvPr/>
-        </p:nvSpPr>
-        <p:spPr>
-          <a:xfrm>
-            <a:off x="10013721" y="403750"/>
-            <a:ext cx="1133644" cy="461665"/>
-          </a:xfrm>
-          <a:prstGeom prst="rect">
-            <a:avLst/>
-          </a:prstGeom>
-          <a:noFill/>
-        </p:spPr>
-        <p:txBody>
-          <a:bodyPr wrap="none" rtlCol="0">
-            <a:spAutoFit/>
-          </a:bodyPr>
-          <a:lstStyle/>
-          <a:p>
-            <a:r>
-              <a:rPr lang="en-US" sz="2400" b="1" dirty="0">
-                <a:latin typeface="Times New Roman" panose="02020603050405020304" pitchFamily="18" charset="0"/>
-                <a:cs typeface="Times New Roman" panose="02020603050405020304" pitchFamily="18" charset="0"/>
-              </a:rPr>
-              <a:t>-15.762</a:t>
+              <a:t>-15.690</a:t>
             </a:r>
           </a:p>
         </p:txBody>
       </p:sp>
       <p:cxnSp>
         <p:nvCxnSpPr>
-          <p:cNvPr id="16" name="Straight Arrow Connector 15">
-            <a:extLst>
-              <a:ext uri="{FF2B5EF4-FFF2-40B4-BE49-F238E27FC236}">
-                <a16:creationId xmlns:a16="http://schemas.microsoft.com/office/drawing/2014/main" id="{2087452E-DB16-CF81-2E40-C4946563FBB2}"/>
+          <p:cNvPr id="4" name="Straight Arrow Connector 3">
+            <a:extLst>
+              <a:ext uri="{FF2B5EF4-FFF2-40B4-BE49-F238E27FC236}">
+                <a16:creationId xmlns:a16="http://schemas.microsoft.com/office/drawing/2014/main" id="{B54A85AB-699A-D0DA-507D-FBF24A12F347}"/>
               </a:ext>
             </a:extLst>
           </p:cNvPr>
@@ -7264,19 +7370,22 @@
           <a:prstGeom prst="straightConnector1">
             <a:avLst/>
           </a:prstGeom>
-          <a:ln w="82550">
+          <a:ln w="38100">
+            <a:solidFill>
+              <a:schemeClr val="accent5"/>
+            </a:solidFill>
             <a:tailEnd type="triangle"/>
           </a:ln>
         </p:spPr>
         <p:style>
           <a:lnRef idx="1">
-            <a:schemeClr val="accent1"/>
+            <a:schemeClr val="dk1"/>
           </a:lnRef>
           <a:fillRef idx="0">
-            <a:schemeClr val="accent1"/>
+            <a:schemeClr val="dk1"/>
           </a:fillRef>
           <a:effectRef idx="0">
-            <a:schemeClr val="accent1"/>
+            <a:schemeClr val="dk1"/>
           </a:effectRef>
           <a:fontRef idx="minor">
             <a:schemeClr val="tx1"/>
@@ -7285,10 +7394,10 @@
       </p:cxnSp>
       <p:sp>
         <p:nvSpPr>
-          <p:cNvPr id="17" name="TextBox 16">
-            <a:extLst>
-              <a:ext uri="{FF2B5EF4-FFF2-40B4-BE49-F238E27FC236}">
-                <a16:creationId xmlns:a16="http://schemas.microsoft.com/office/drawing/2014/main" id="{BD4F5F98-2E8A-7D49-1332-119EF772EBD9}"/>
+          <p:cNvPr id="5" name="TextBox 4">
+            <a:extLst>
+              <a:ext uri="{FF2B5EF4-FFF2-40B4-BE49-F238E27FC236}">
+                <a16:creationId xmlns:a16="http://schemas.microsoft.com/office/drawing/2014/main" id="{78BADE21-13A2-B6EA-A2B2-9E5B75F9F850}"/>
               </a:ext>
             </a:extLst>
           </p:cNvPr>
@@ -7316,7 +7425,42 @@
                 <a:latin typeface="Times New Roman" panose="02020603050405020304" pitchFamily="18" charset="0"/>
                 <a:cs typeface="Times New Roman" panose="02020603050405020304" pitchFamily="18" charset="0"/>
               </a:rPr>
-              <a:t>13.512</a:t>
+              <a:t>13.395</a:t>
+            </a:r>
+          </a:p>
+        </p:txBody>
+      </p:sp>
+      <p:sp>
+        <p:nvSpPr>
+          <p:cNvPr id="6" name="TextBox 5">
+            <a:extLst>
+              <a:ext uri="{FF2B5EF4-FFF2-40B4-BE49-F238E27FC236}">
+                <a16:creationId xmlns:a16="http://schemas.microsoft.com/office/drawing/2014/main" id="{02DD008C-7648-65AE-D60A-AD2926E889BF}"/>
+              </a:ext>
+            </a:extLst>
+          </p:cNvPr>
+          <p:cNvSpPr txBox="1"/>
+          <p:nvPr/>
+        </p:nvSpPr>
+        <p:spPr>
+          <a:xfrm>
+            <a:off x="5010411" y="6475956"/>
+            <a:ext cx="4141070" cy="369332"/>
+          </a:xfrm>
+          <a:prstGeom prst="rect">
+            <a:avLst/>
+          </a:prstGeom>
+          <a:noFill/>
+        </p:spPr>
+        <p:txBody>
+          <a:bodyPr wrap="none" rtlCol="0">
+            <a:spAutoFit/>
+          </a:bodyPr>
+          <a:lstStyle/>
+          <a:p>
+            <a:r>
+              <a:rPr lang="en-US" dirty="0"/>
+              <a:t>Note: should change z-score to fitted coef.</a:t>
             </a:r>
           </a:p>
         </p:txBody>
@@ -7324,7 +7468,7 @@
     </p:spTree>
     <p:extLst>
       <p:ext uri="{BB962C8B-B14F-4D97-AF65-F5344CB8AC3E}">
-        <p14:creationId xmlns:p14="http://schemas.microsoft.com/office/powerpoint/2010/main" val="3047400984"/>
+        <p14:creationId xmlns:p14="http://schemas.microsoft.com/office/powerpoint/2010/main" val="4036811566"/>
       </p:ext>
     </p:extLst>
   </p:cSld>
@@ -7374,6 +7518,1911 @@
           <a:prstGeom prst="straightConnector1">
             <a:avLst/>
           </a:prstGeom>
+          <a:ln w="38100">
+            <a:tailEnd type="triangle"/>
+          </a:ln>
+        </p:spPr>
+        <p:style>
+          <a:lnRef idx="1">
+            <a:schemeClr val="accent1"/>
+          </a:lnRef>
+          <a:fillRef idx="0">
+            <a:schemeClr val="accent1"/>
+          </a:fillRef>
+          <a:effectRef idx="0">
+            <a:schemeClr val="accent1"/>
+          </a:effectRef>
+          <a:fontRef idx="minor">
+            <a:schemeClr val="tx1"/>
+          </a:fontRef>
+        </p:style>
+      </p:cxnSp>
+      <p:sp>
+        <p:nvSpPr>
+          <p:cNvPr id="34" name="TextBox 33">
+            <a:extLst>
+              <a:ext uri="{FF2B5EF4-FFF2-40B4-BE49-F238E27FC236}">
+                <a16:creationId xmlns:a16="http://schemas.microsoft.com/office/drawing/2014/main" id="{B6CFD367-96BB-5333-BB7D-2A376BBD254A}"/>
+              </a:ext>
+            </a:extLst>
+          </p:cNvPr>
+          <p:cNvSpPr txBox="1"/>
+          <p:nvPr/>
+        </p:nvSpPr>
+        <p:spPr>
+          <a:xfrm>
+            <a:off x="629568" y="326806"/>
+            <a:ext cx="1723549" cy="1077218"/>
+          </a:xfrm>
+          <a:prstGeom prst="rect">
+            <a:avLst/>
+          </a:prstGeom>
+          <a:noFill/>
+        </p:spPr>
+        <p:txBody>
+          <a:bodyPr wrap="none" rtlCol="0">
+            <a:spAutoFit/>
+          </a:bodyPr>
+          <a:lstStyle/>
+          <a:p>
+            <a:pPr algn="ctr"/>
+            <a:r>
+              <a:rPr lang="en-US" sz="3200" i="1" dirty="0">
+                <a:latin typeface="Times New Roman" panose="02020603050405020304" pitchFamily="18" charset="0"/>
+                <a:cs typeface="Times New Roman" panose="02020603050405020304" pitchFamily="18" charset="0"/>
+              </a:rPr>
+              <a:t>Soil </a:t>
+            </a:r>
+          </a:p>
+          <a:p>
+            <a:pPr algn="ctr"/>
+            <a:r>
+              <a:rPr lang="en-US" sz="3200" i="1" dirty="0">
+                <a:latin typeface="Times New Roman" panose="02020603050405020304" pitchFamily="18" charset="0"/>
+                <a:cs typeface="Times New Roman" panose="02020603050405020304" pitchFamily="18" charset="0"/>
+              </a:rPr>
+              <a:t>moisture </a:t>
+            </a:r>
+          </a:p>
+        </p:txBody>
+      </p:sp>
+      <p:sp>
+        <p:nvSpPr>
+          <p:cNvPr id="35" name="TextBox 34">
+            <a:extLst>
+              <a:ext uri="{FF2B5EF4-FFF2-40B4-BE49-F238E27FC236}">
+                <a16:creationId xmlns:a16="http://schemas.microsoft.com/office/drawing/2014/main" id="{6C89A079-ABD7-0D73-12B2-BAE34517A0DC}"/>
+              </a:ext>
+            </a:extLst>
+          </p:cNvPr>
+          <p:cNvSpPr txBox="1"/>
+          <p:nvPr/>
+        </p:nvSpPr>
+        <p:spPr>
+          <a:xfrm>
+            <a:off x="766625" y="5453976"/>
+            <a:ext cx="1449436" cy="1077218"/>
+          </a:xfrm>
+          <a:prstGeom prst="rect">
+            <a:avLst/>
+          </a:prstGeom>
+          <a:noFill/>
+        </p:spPr>
+        <p:txBody>
+          <a:bodyPr wrap="none" rtlCol="0">
+            <a:spAutoFit/>
+          </a:bodyPr>
+          <a:lstStyle/>
+          <a:p>
+            <a:pPr algn="ctr"/>
+            <a:r>
+              <a:rPr lang="en-US" sz="3200" i="1" dirty="0">
+                <a:latin typeface="Times New Roman" panose="02020603050405020304" pitchFamily="18" charset="0"/>
+                <a:cs typeface="Times New Roman" panose="02020603050405020304" pitchFamily="18" charset="0"/>
+              </a:rPr>
+              <a:t>Soil </a:t>
+            </a:r>
+          </a:p>
+          <a:p>
+            <a:pPr algn="ctr"/>
+            <a:r>
+              <a:rPr lang="en-US" sz="3200" i="1" dirty="0">
+                <a:latin typeface="Times New Roman" panose="02020603050405020304" pitchFamily="18" charset="0"/>
+                <a:cs typeface="Times New Roman" panose="02020603050405020304" pitchFamily="18" charset="0"/>
+              </a:rPr>
+              <a:t>NO</a:t>
+            </a:r>
+            <a:r>
+              <a:rPr lang="en-US" sz="3200" i="1" baseline="-25000" dirty="0">
+                <a:latin typeface="Times New Roman" panose="02020603050405020304" pitchFamily="18" charset="0"/>
+                <a:cs typeface="Times New Roman" panose="02020603050405020304" pitchFamily="18" charset="0"/>
+              </a:rPr>
+              <a:t>3</a:t>
+            </a:r>
+            <a:r>
+              <a:rPr lang="en-US" sz="3200" i="1" dirty="0">
+                <a:latin typeface="Times New Roman" panose="02020603050405020304" pitchFamily="18" charset="0"/>
+                <a:cs typeface="Times New Roman" panose="02020603050405020304" pitchFamily="18" charset="0"/>
+              </a:rPr>
+              <a:t>-N </a:t>
+            </a:r>
+          </a:p>
+        </p:txBody>
+      </p:sp>
+      <p:sp>
+        <p:nvSpPr>
+          <p:cNvPr id="36" name="TextBox 35">
+            <a:extLst>
+              <a:ext uri="{FF2B5EF4-FFF2-40B4-BE49-F238E27FC236}">
+                <a16:creationId xmlns:a16="http://schemas.microsoft.com/office/drawing/2014/main" id="{3E1B6594-EF86-7605-E52C-34BEFF337746}"/>
+              </a:ext>
+            </a:extLst>
+          </p:cNvPr>
+          <p:cNvSpPr txBox="1"/>
+          <p:nvPr/>
+        </p:nvSpPr>
+        <p:spPr>
+          <a:xfrm>
+            <a:off x="4910475" y="3136612"/>
+            <a:ext cx="389851" cy="584775"/>
+          </a:xfrm>
+          <a:prstGeom prst="rect">
+            <a:avLst/>
+          </a:prstGeom>
+          <a:noFill/>
+        </p:spPr>
+        <p:txBody>
+          <a:bodyPr wrap="none" rtlCol="0">
+            <a:spAutoFit/>
+          </a:bodyPr>
+          <a:lstStyle/>
+          <a:p>
+            <a:pPr algn="ctr"/>
+            <a:r>
+              <a:rPr lang="el-GR" sz="3200" i="1" dirty="0">
+                <a:latin typeface="Times New Roman" panose="02020603050405020304" pitchFamily="18" charset="0"/>
+                <a:cs typeface="Times New Roman" panose="02020603050405020304" pitchFamily="18" charset="0"/>
+              </a:rPr>
+              <a:t>β</a:t>
+            </a:r>
+            <a:endParaRPr lang="en-US" sz="3200" i="1" dirty="0">
+              <a:latin typeface="Times New Roman" panose="02020603050405020304" pitchFamily="18" charset="0"/>
+              <a:cs typeface="Times New Roman" panose="02020603050405020304" pitchFamily="18" charset="0"/>
+            </a:endParaRPr>
+          </a:p>
+        </p:txBody>
+      </p:sp>
+      <p:sp>
+        <p:nvSpPr>
+          <p:cNvPr id="38" name="TextBox 37">
+            <a:extLst>
+              <a:ext uri="{FF2B5EF4-FFF2-40B4-BE49-F238E27FC236}">
+                <a16:creationId xmlns:a16="http://schemas.microsoft.com/office/drawing/2014/main" id="{DEE8EFC0-1B48-8EC0-A5FB-9B65CBC229DB}"/>
+              </a:ext>
+            </a:extLst>
+          </p:cNvPr>
+          <p:cNvSpPr txBox="1"/>
+          <p:nvPr/>
+        </p:nvSpPr>
+        <p:spPr>
+          <a:xfrm>
+            <a:off x="11553111" y="5453976"/>
+            <a:ext cx="1560812" cy="1077218"/>
+          </a:xfrm>
+          <a:prstGeom prst="rect">
+            <a:avLst/>
+          </a:prstGeom>
+          <a:noFill/>
+        </p:spPr>
+        <p:txBody>
+          <a:bodyPr wrap="none" rtlCol="0">
+            <a:spAutoFit/>
+          </a:bodyPr>
+          <a:lstStyle/>
+          <a:p>
+            <a:pPr algn="ctr"/>
+            <a:r>
+              <a:rPr lang="en-US" sz="3200" i="1" dirty="0">
+                <a:latin typeface="Times New Roman" panose="02020603050405020304" pitchFamily="18" charset="0"/>
+                <a:cs typeface="Times New Roman" panose="02020603050405020304" pitchFamily="18" charset="0"/>
+              </a:rPr>
+              <a:t>Leaf</a:t>
+            </a:r>
+          </a:p>
+          <a:p>
+            <a:pPr algn="ctr"/>
+            <a:r>
+              <a:rPr lang="en-US" sz="3200" i="1" dirty="0">
+                <a:latin typeface="Times New Roman" panose="02020603050405020304" pitchFamily="18" charset="0"/>
+                <a:cs typeface="Times New Roman" panose="02020603050405020304" pitchFamily="18" charset="0"/>
+              </a:rPr>
+              <a:t>nitrogen</a:t>
+            </a:r>
+          </a:p>
+        </p:txBody>
+      </p:sp>
+      <p:sp>
+        <p:nvSpPr>
+          <p:cNvPr id="39" name="TextBox 38">
+            <a:extLst>
+              <a:ext uri="{FF2B5EF4-FFF2-40B4-BE49-F238E27FC236}">
+                <a16:creationId xmlns:a16="http://schemas.microsoft.com/office/drawing/2014/main" id="{3128AFF3-5CF2-6DE3-9D59-64189657E6DC}"/>
+              </a:ext>
+            </a:extLst>
+          </p:cNvPr>
+          <p:cNvSpPr txBox="1"/>
+          <p:nvPr/>
+        </p:nvSpPr>
+        <p:spPr>
+          <a:xfrm>
+            <a:off x="4649185" y="573027"/>
+            <a:ext cx="912430" cy="584775"/>
+          </a:xfrm>
+          <a:prstGeom prst="rect">
+            <a:avLst/>
+          </a:prstGeom>
+          <a:noFill/>
+        </p:spPr>
+        <p:txBody>
+          <a:bodyPr wrap="none" rtlCol="0">
+            <a:spAutoFit/>
+          </a:bodyPr>
+          <a:lstStyle/>
+          <a:p>
+            <a:pPr algn="ctr"/>
+            <a:r>
+              <a:rPr lang="en-US" sz="3200" i="1" dirty="0">
+                <a:latin typeface="Times New Roman" panose="02020603050405020304" pitchFamily="18" charset="0"/>
+                <a:cs typeface="Times New Roman" panose="02020603050405020304" pitchFamily="18" charset="0"/>
+              </a:rPr>
+              <a:t>PFT</a:t>
+            </a:r>
+          </a:p>
+        </p:txBody>
+      </p:sp>
+      <p:sp>
+        <p:nvSpPr>
+          <p:cNvPr id="40" name="TextBox 39">
+            <a:extLst>
+              <a:ext uri="{FF2B5EF4-FFF2-40B4-BE49-F238E27FC236}">
+                <a16:creationId xmlns:a16="http://schemas.microsoft.com/office/drawing/2014/main" id="{67E72C8D-3F29-25F3-F215-C1259A782E46}"/>
+              </a:ext>
+            </a:extLst>
+          </p:cNvPr>
+          <p:cNvSpPr txBox="1"/>
+          <p:nvPr/>
+        </p:nvSpPr>
+        <p:spPr>
+          <a:xfrm>
+            <a:off x="8228780" y="573026"/>
+            <a:ext cx="981359" cy="584775"/>
+          </a:xfrm>
+          <a:prstGeom prst="rect">
+            <a:avLst/>
+          </a:prstGeom>
+          <a:noFill/>
+        </p:spPr>
+        <p:txBody>
+          <a:bodyPr wrap="none" rtlCol="0">
+            <a:spAutoFit/>
+          </a:bodyPr>
+          <a:lstStyle/>
+          <a:p>
+            <a:pPr algn="ctr"/>
+            <a:r>
+              <a:rPr lang="en-US" sz="3200" i="1" dirty="0">
+                <a:latin typeface="Times New Roman" panose="02020603050405020304" pitchFamily="18" charset="0"/>
+                <a:cs typeface="Times New Roman" panose="02020603050405020304" pitchFamily="18" charset="0"/>
+              </a:rPr>
+              <a:t>VPD</a:t>
+            </a:r>
+          </a:p>
+        </p:txBody>
+      </p:sp>
+      <p:sp>
+        <p:nvSpPr>
+          <p:cNvPr id="41" name="TextBox 40">
+            <a:extLst>
+              <a:ext uri="{FF2B5EF4-FFF2-40B4-BE49-F238E27FC236}">
+                <a16:creationId xmlns:a16="http://schemas.microsoft.com/office/drawing/2014/main" id="{2C5B99C0-6E49-7B08-0180-3027C6FCE83B}"/>
+              </a:ext>
+            </a:extLst>
+          </p:cNvPr>
+          <p:cNvSpPr txBox="1"/>
+          <p:nvPr/>
+        </p:nvSpPr>
+        <p:spPr>
+          <a:xfrm>
+            <a:off x="11272137" y="573025"/>
+            <a:ext cx="2122761" cy="553998"/>
+          </a:xfrm>
+          <a:prstGeom prst="rect">
+            <a:avLst/>
+          </a:prstGeom>
+          <a:noFill/>
+        </p:spPr>
+        <p:txBody>
+          <a:bodyPr wrap="none" rtlCol="0">
+            <a:spAutoFit/>
+          </a:bodyPr>
+          <a:lstStyle/>
+          <a:p>
+            <a:pPr algn="ctr"/>
+            <a:r>
+              <a:rPr lang="en-US" sz="3000" i="1" dirty="0">
+                <a:latin typeface="Times New Roman" panose="02020603050405020304" pitchFamily="18" charset="0"/>
+                <a:cs typeface="Times New Roman" panose="02020603050405020304" pitchFamily="18" charset="0"/>
+              </a:rPr>
+              <a:t>Temperature</a:t>
+            </a:r>
+          </a:p>
+        </p:txBody>
+      </p:sp>
+      <p:cxnSp>
+        <p:nvCxnSpPr>
+          <p:cNvPr id="43" name="Straight Arrow Connector 42">
+            <a:extLst>
+              <a:ext uri="{FF2B5EF4-FFF2-40B4-BE49-F238E27FC236}">
+                <a16:creationId xmlns:a16="http://schemas.microsoft.com/office/drawing/2014/main" id="{647874A4-A342-A17B-1543-7EFDBE4BCA48}"/>
+              </a:ext>
+            </a:extLst>
+          </p:cNvPr>
+          <p:cNvCxnSpPr>
+            <a:stCxn id="20" idx="2"/>
+            <a:endCxn id="25" idx="1"/>
+          </p:cNvCxnSpPr>
+          <p:nvPr/>
+        </p:nvCxnSpPr>
+        <p:spPr>
+          <a:xfrm>
+            <a:off x="1491343" y="1556658"/>
+            <a:ext cx="2623458" cy="1872342"/>
+          </a:xfrm>
+          <a:prstGeom prst="straightConnector1">
+            <a:avLst/>
+          </a:prstGeom>
+          <a:ln w="38100">
+            <a:solidFill>
+              <a:srgbClr val="C00000"/>
+            </a:solidFill>
+            <a:prstDash val="solid"/>
+            <a:tailEnd type="triangle"/>
+          </a:ln>
+        </p:spPr>
+        <p:style>
+          <a:lnRef idx="1">
+            <a:schemeClr val="accent1"/>
+          </a:lnRef>
+          <a:fillRef idx="0">
+            <a:schemeClr val="accent1"/>
+          </a:fillRef>
+          <a:effectRef idx="0">
+            <a:schemeClr val="accent1"/>
+          </a:effectRef>
+          <a:fontRef idx="minor">
+            <a:schemeClr val="tx1"/>
+          </a:fontRef>
+        </p:style>
+      </p:cxnSp>
+      <p:cxnSp>
+        <p:nvCxnSpPr>
+          <p:cNvPr id="44" name="Straight Arrow Connector 43">
+            <a:extLst>
+              <a:ext uri="{FF2B5EF4-FFF2-40B4-BE49-F238E27FC236}">
+                <a16:creationId xmlns:a16="http://schemas.microsoft.com/office/drawing/2014/main" id="{A2E1161F-B387-5957-D318-027516E16EAC}"/>
+              </a:ext>
+            </a:extLst>
+          </p:cNvPr>
+          <p:cNvCxnSpPr>
+            <a:cxnSpLocks/>
+            <a:stCxn id="28" idx="0"/>
+            <a:endCxn id="25" idx="1"/>
+          </p:cNvCxnSpPr>
+          <p:nvPr/>
+        </p:nvCxnSpPr>
+        <p:spPr>
+          <a:xfrm flipV="1">
+            <a:off x="1491343" y="3429000"/>
+            <a:ext cx="2623458" cy="1872342"/>
+          </a:xfrm>
+          <a:prstGeom prst="straightConnector1">
+            <a:avLst/>
+          </a:prstGeom>
+          <a:ln w="38100">
+            <a:solidFill>
+              <a:srgbClr val="C00000"/>
+            </a:solidFill>
+            <a:tailEnd type="triangle"/>
+          </a:ln>
+        </p:spPr>
+        <p:style>
+          <a:lnRef idx="1">
+            <a:schemeClr val="accent1"/>
+          </a:lnRef>
+          <a:fillRef idx="0">
+            <a:schemeClr val="accent1"/>
+          </a:fillRef>
+          <a:effectRef idx="0">
+            <a:schemeClr val="accent1"/>
+          </a:effectRef>
+          <a:fontRef idx="minor">
+            <a:schemeClr val="tx1"/>
+          </a:fontRef>
+        </p:style>
+      </p:cxnSp>
+      <p:cxnSp>
+        <p:nvCxnSpPr>
+          <p:cNvPr id="50" name="Straight Arrow Connector 49">
+            <a:extLst>
+              <a:ext uri="{FF2B5EF4-FFF2-40B4-BE49-F238E27FC236}">
+                <a16:creationId xmlns:a16="http://schemas.microsoft.com/office/drawing/2014/main" id="{FCDA5EDA-AF50-B8D2-2147-779C4FF0DABF}"/>
+              </a:ext>
+            </a:extLst>
+          </p:cNvPr>
+          <p:cNvCxnSpPr>
+            <a:stCxn id="21" idx="2"/>
+            <a:endCxn id="25" idx="0"/>
+          </p:cNvCxnSpPr>
+          <p:nvPr/>
+        </p:nvCxnSpPr>
+        <p:spPr>
+          <a:xfrm>
+            <a:off x="5105401" y="1556658"/>
+            <a:ext cx="0" cy="1181099"/>
+          </a:xfrm>
+          <a:prstGeom prst="straightConnector1">
+            <a:avLst/>
+          </a:prstGeom>
+          <a:ln w="38100">
+            <a:solidFill>
+              <a:srgbClr val="C00000"/>
+            </a:solidFill>
+            <a:prstDash val="dash"/>
+            <a:tailEnd type="triangle"/>
+          </a:ln>
+        </p:spPr>
+        <p:style>
+          <a:lnRef idx="1">
+            <a:schemeClr val="accent1"/>
+          </a:lnRef>
+          <a:fillRef idx="0">
+            <a:schemeClr val="accent1"/>
+          </a:fillRef>
+          <a:effectRef idx="0">
+            <a:schemeClr val="accent1"/>
+          </a:effectRef>
+          <a:fontRef idx="minor">
+            <a:schemeClr val="tx1"/>
+          </a:fontRef>
+        </p:style>
+      </p:cxnSp>
+      <p:cxnSp>
+        <p:nvCxnSpPr>
+          <p:cNvPr id="52" name="Straight Arrow Connector 51">
+            <a:extLst>
+              <a:ext uri="{FF2B5EF4-FFF2-40B4-BE49-F238E27FC236}">
+                <a16:creationId xmlns:a16="http://schemas.microsoft.com/office/drawing/2014/main" id="{D2FA9BBB-61CF-7920-ECA5-7C63A4C65EF1}"/>
+              </a:ext>
+            </a:extLst>
+          </p:cNvPr>
+          <p:cNvCxnSpPr>
+            <a:stCxn id="25" idx="3"/>
+            <a:endCxn id="26" idx="1"/>
+          </p:cNvCxnSpPr>
+          <p:nvPr/>
+        </p:nvCxnSpPr>
+        <p:spPr>
+          <a:xfrm>
+            <a:off x="6096001" y="3429000"/>
+            <a:ext cx="1632858" cy="0"/>
+          </a:xfrm>
+          <a:prstGeom prst="straightConnector1">
+            <a:avLst/>
+          </a:prstGeom>
+          <a:ln w="38100">
+            <a:solidFill>
+              <a:srgbClr val="C00000"/>
+            </a:solidFill>
+            <a:tailEnd type="triangle"/>
+          </a:ln>
+        </p:spPr>
+        <p:style>
+          <a:lnRef idx="1">
+            <a:schemeClr val="accent1"/>
+          </a:lnRef>
+          <a:fillRef idx="0">
+            <a:schemeClr val="accent1"/>
+          </a:fillRef>
+          <a:effectRef idx="0">
+            <a:schemeClr val="accent1"/>
+          </a:effectRef>
+          <a:fontRef idx="minor">
+            <a:schemeClr val="tx1"/>
+          </a:fontRef>
+        </p:style>
+      </p:cxnSp>
+      <p:cxnSp>
+        <p:nvCxnSpPr>
+          <p:cNvPr id="54" name="Straight Arrow Connector 53">
+            <a:extLst>
+              <a:ext uri="{FF2B5EF4-FFF2-40B4-BE49-F238E27FC236}">
+                <a16:creationId xmlns:a16="http://schemas.microsoft.com/office/drawing/2014/main" id="{100D8950-AC1B-AD32-BAA1-1221A7CB6AD2}"/>
+              </a:ext>
+            </a:extLst>
+          </p:cNvPr>
+          <p:cNvCxnSpPr>
+            <a:stCxn id="22" idx="2"/>
+            <a:endCxn id="26" idx="0"/>
+          </p:cNvCxnSpPr>
+          <p:nvPr/>
+        </p:nvCxnSpPr>
+        <p:spPr>
+          <a:xfrm>
+            <a:off x="8719459" y="1556658"/>
+            <a:ext cx="0" cy="1181099"/>
+          </a:xfrm>
+          <a:prstGeom prst="straightConnector1">
+            <a:avLst/>
+          </a:prstGeom>
+          <a:ln w="38100">
+            <a:solidFill>
+              <a:srgbClr val="C00000"/>
+            </a:solidFill>
+            <a:prstDash val="dash"/>
+            <a:tailEnd type="triangle"/>
+          </a:ln>
+        </p:spPr>
+        <p:style>
+          <a:lnRef idx="1">
+            <a:schemeClr val="accent1"/>
+          </a:lnRef>
+          <a:fillRef idx="0">
+            <a:schemeClr val="accent1"/>
+          </a:fillRef>
+          <a:effectRef idx="0">
+            <a:schemeClr val="accent1"/>
+          </a:effectRef>
+          <a:fontRef idx="minor">
+            <a:schemeClr val="tx1"/>
+          </a:fontRef>
+        </p:style>
+      </p:cxnSp>
+      <p:cxnSp>
+        <p:nvCxnSpPr>
+          <p:cNvPr id="56" name="Straight Arrow Connector 55">
+            <a:extLst>
+              <a:ext uri="{FF2B5EF4-FFF2-40B4-BE49-F238E27FC236}">
+                <a16:creationId xmlns:a16="http://schemas.microsoft.com/office/drawing/2014/main" id="{03A0CBB9-F1AE-2712-B46D-5740B1884373}"/>
+              </a:ext>
+            </a:extLst>
+          </p:cNvPr>
+          <p:cNvCxnSpPr>
+            <a:cxnSpLocks/>
+            <a:stCxn id="23" idx="2"/>
+            <a:endCxn id="26" idx="0"/>
+          </p:cNvCxnSpPr>
+          <p:nvPr/>
+        </p:nvCxnSpPr>
+        <p:spPr>
+          <a:xfrm flipH="1">
+            <a:off x="8719459" y="1556658"/>
+            <a:ext cx="3614058" cy="1181099"/>
+          </a:xfrm>
+          <a:prstGeom prst="straightConnector1">
+            <a:avLst/>
+          </a:prstGeom>
+          <a:ln w="38100">
+            <a:prstDash val="dash"/>
+            <a:tailEnd type="triangle"/>
+          </a:ln>
+        </p:spPr>
+        <p:style>
+          <a:lnRef idx="1">
+            <a:schemeClr val="accent1"/>
+          </a:lnRef>
+          <a:fillRef idx="0">
+            <a:schemeClr val="accent1"/>
+          </a:fillRef>
+          <a:effectRef idx="0">
+            <a:schemeClr val="accent1"/>
+          </a:effectRef>
+          <a:fontRef idx="minor">
+            <a:schemeClr val="tx1"/>
+          </a:fontRef>
+        </p:style>
+      </p:cxnSp>
+      <p:cxnSp>
+        <p:nvCxnSpPr>
+          <p:cNvPr id="58" name="Straight Arrow Connector 57">
+            <a:extLst>
+              <a:ext uri="{FF2B5EF4-FFF2-40B4-BE49-F238E27FC236}">
+                <a16:creationId xmlns:a16="http://schemas.microsoft.com/office/drawing/2014/main" id="{4C07D496-6CDD-6FFA-F311-3A43CC89874D}"/>
+              </a:ext>
+            </a:extLst>
+          </p:cNvPr>
+          <p:cNvCxnSpPr>
+            <a:cxnSpLocks/>
+            <a:stCxn id="26" idx="3"/>
+            <a:endCxn id="31" idx="1"/>
+          </p:cNvCxnSpPr>
+          <p:nvPr/>
+        </p:nvCxnSpPr>
+        <p:spPr>
+          <a:xfrm>
+            <a:off x="9710059" y="3429000"/>
+            <a:ext cx="1632858" cy="2563585"/>
+          </a:xfrm>
+          <a:prstGeom prst="straightConnector1">
+            <a:avLst/>
+          </a:prstGeom>
+          <a:ln w="38100">
+            <a:solidFill>
+              <a:srgbClr val="C00000"/>
+            </a:solidFill>
+            <a:prstDash val="dash"/>
+            <a:tailEnd type="triangle"/>
+          </a:ln>
+        </p:spPr>
+        <p:style>
+          <a:lnRef idx="1">
+            <a:schemeClr val="accent1"/>
+          </a:lnRef>
+          <a:fillRef idx="0">
+            <a:schemeClr val="accent1"/>
+          </a:fillRef>
+          <a:effectRef idx="0">
+            <a:schemeClr val="accent1"/>
+          </a:effectRef>
+          <a:fontRef idx="minor">
+            <a:schemeClr val="tx1"/>
+          </a:fontRef>
+        </p:style>
+      </p:cxnSp>
+      <p:cxnSp>
+        <p:nvCxnSpPr>
+          <p:cNvPr id="60" name="Straight Arrow Connector 59">
+            <a:extLst>
+              <a:ext uri="{FF2B5EF4-FFF2-40B4-BE49-F238E27FC236}">
+                <a16:creationId xmlns:a16="http://schemas.microsoft.com/office/drawing/2014/main" id="{F6383D9E-946A-23D8-3A9E-EC5FF2556E33}"/>
+              </a:ext>
+            </a:extLst>
+          </p:cNvPr>
+          <p:cNvCxnSpPr>
+            <a:stCxn id="25" idx="2"/>
+            <a:endCxn id="31" idx="1"/>
+          </p:cNvCxnSpPr>
+          <p:nvPr/>
+        </p:nvCxnSpPr>
+        <p:spPr>
+          <a:xfrm>
+            <a:off x="5105401" y="4120243"/>
+            <a:ext cx="6237516" cy="1872342"/>
+          </a:xfrm>
+          <a:prstGeom prst="straightConnector1">
+            <a:avLst/>
+          </a:prstGeom>
+          <a:ln w="38100">
+            <a:solidFill>
+              <a:srgbClr val="C00000"/>
+            </a:solidFill>
+            <a:tailEnd type="triangle"/>
+          </a:ln>
+        </p:spPr>
+        <p:style>
+          <a:lnRef idx="1">
+            <a:schemeClr val="accent1"/>
+          </a:lnRef>
+          <a:fillRef idx="0">
+            <a:schemeClr val="accent1"/>
+          </a:fillRef>
+          <a:effectRef idx="0">
+            <a:schemeClr val="accent1"/>
+          </a:effectRef>
+          <a:fontRef idx="minor">
+            <a:schemeClr val="tx1"/>
+          </a:fontRef>
+        </p:style>
+      </p:cxnSp>
+      <p:sp>
+        <p:nvSpPr>
+          <p:cNvPr id="20" name="Rectangle 19">
+            <a:extLst>
+              <a:ext uri="{FF2B5EF4-FFF2-40B4-BE49-F238E27FC236}">
+                <a16:creationId xmlns:a16="http://schemas.microsoft.com/office/drawing/2014/main" id="{8CD31D91-82FE-DEF4-C1F4-559B96EB9A75}"/>
+              </a:ext>
+            </a:extLst>
+          </p:cNvPr>
+          <p:cNvSpPr/>
+          <p:nvPr/>
+        </p:nvSpPr>
+        <p:spPr>
+          <a:xfrm>
+            <a:off x="500743" y="174172"/>
+            <a:ext cx="1981200" cy="1382486"/>
+          </a:xfrm>
+          <a:prstGeom prst="rect">
+            <a:avLst/>
+          </a:prstGeom>
+          <a:noFill/>
+          <a:ln w="38100">
+            <a:solidFill>
+              <a:schemeClr val="tx1">
+                <a:alpha val="75000"/>
+              </a:schemeClr>
+            </a:solidFill>
+          </a:ln>
+        </p:spPr>
+        <p:style>
+          <a:lnRef idx="2">
+            <a:schemeClr val="accent1">
+              <a:shade val="50000"/>
+            </a:schemeClr>
+          </a:lnRef>
+          <a:fillRef idx="1">
+            <a:schemeClr val="accent1"/>
+          </a:fillRef>
+          <a:effectRef idx="0">
+            <a:schemeClr val="accent1"/>
+          </a:effectRef>
+          <a:fontRef idx="minor">
+            <a:schemeClr val="lt1"/>
+          </a:fontRef>
+        </p:style>
+        <p:txBody>
+          <a:bodyPr rtlCol="0" anchor="ctr"/>
+          <a:lstStyle/>
+          <a:p>
+            <a:pPr algn="ctr"/>
+            <a:endParaRPr lang="en-US"/>
+          </a:p>
+        </p:txBody>
+      </p:sp>
+      <p:sp>
+        <p:nvSpPr>
+          <p:cNvPr id="21" name="Rectangle 20">
+            <a:extLst>
+              <a:ext uri="{FF2B5EF4-FFF2-40B4-BE49-F238E27FC236}">
+                <a16:creationId xmlns:a16="http://schemas.microsoft.com/office/drawing/2014/main" id="{2A451EDF-2134-D951-F607-AE0DC624C032}"/>
+              </a:ext>
+            </a:extLst>
+          </p:cNvPr>
+          <p:cNvSpPr/>
+          <p:nvPr/>
+        </p:nvSpPr>
+        <p:spPr>
+          <a:xfrm>
+            <a:off x="4114801" y="174172"/>
+            <a:ext cx="1981200" cy="1382486"/>
+          </a:xfrm>
+          <a:prstGeom prst="rect">
+            <a:avLst/>
+          </a:prstGeom>
+          <a:noFill/>
+          <a:ln w="38100">
+            <a:solidFill>
+              <a:schemeClr val="tx1">
+                <a:alpha val="75000"/>
+              </a:schemeClr>
+            </a:solidFill>
+          </a:ln>
+        </p:spPr>
+        <p:style>
+          <a:lnRef idx="2">
+            <a:schemeClr val="accent1">
+              <a:shade val="50000"/>
+            </a:schemeClr>
+          </a:lnRef>
+          <a:fillRef idx="1">
+            <a:schemeClr val="accent1"/>
+          </a:fillRef>
+          <a:effectRef idx="0">
+            <a:schemeClr val="accent1"/>
+          </a:effectRef>
+          <a:fontRef idx="minor">
+            <a:schemeClr val="lt1"/>
+          </a:fontRef>
+        </p:style>
+        <p:txBody>
+          <a:bodyPr rtlCol="0" anchor="ctr"/>
+          <a:lstStyle/>
+          <a:p>
+            <a:pPr algn="ctr"/>
+            <a:endParaRPr lang="en-US"/>
+          </a:p>
+        </p:txBody>
+      </p:sp>
+      <p:sp>
+        <p:nvSpPr>
+          <p:cNvPr id="22" name="Rectangle 21">
+            <a:extLst>
+              <a:ext uri="{FF2B5EF4-FFF2-40B4-BE49-F238E27FC236}">
+                <a16:creationId xmlns:a16="http://schemas.microsoft.com/office/drawing/2014/main" id="{295B61D5-3809-B67F-F28A-43F8F95032C1}"/>
+              </a:ext>
+            </a:extLst>
+          </p:cNvPr>
+          <p:cNvSpPr/>
+          <p:nvPr/>
+        </p:nvSpPr>
+        <p:spPr>
+          <a:xfrm>
+            <a:off x="7728859" y="174172"/>
+            <a:ext cx="1981200" cy="1382486"/>
+          </a:xfrm>
+          <a:prstGeom prst="rect">
+            <a:avLst/>
+          </a:prstGeom>
+          <a:noFill/>
+          <a:ln w="38100">
+            <a:solidFill>
+              <a:schemeClr val="tx1">
+                <a:alpha val="75000"/>
+              </a:schemeClr>
+            </a:solidFill>
+          </a:ln>
+        </p:spPr>
+        <p:style>
+          <a:lnRef idx="2">
+            <a:schemeClr val="accent1">
+              <a:shade val="50000"/>
+            </a:schemeClr>
+          </a:lnRef>
+          <a:fillRef idx="1">
+            <a:schemeClr val="accent1"/>
+          </a:fillRef>
+          <a:effectRef idx="0">
+            <a:schemeClr val="accent1"/>
+          </a:effectRef>
+          <a:fontRef idx="minor">
+            <a:schemeClr val="lt1"/>
+          </a:fontRef>
+        </p:style>
+        <p:txBody>
+          <a:bodyPr rtlCol="0" anchor="ctr"/>
+          <a:lstStyle/>
+          <a:p>
+            <a:pPr algn="ctr"/>
+            <a:endParaRPr lang="en-US"/>
+          </a:p>
+        </p:txBody>
+      </p:sp>
+      <p:sp>
+        <p:nvSpPr>
+          <p:cNvPr id="23" name="Rectangle 22">
+            <a:extLst>
+              <a:ext uri="{FF2B5EF4-FFF2-40B4-BE49-F238E27FC236}">
+                <a16:creationId xmlns:a16="http://schemas.microsoft.com/office/drawing/2014/main" id="{542EBF9B-B494-6BAC-662C-17157CAC7101}"/>
+              </a:ext>
+            </a:extLst>
+          </p:cNvPr>
+          <p:cNvSpPr/>
+          <p:nvPr/>
+        </p:nvSpPr>
+        <p:spPr>
+          <a:xfrm>
+            <a:off x="11342917" y="174172"/>
+            <a:ext cx="1981200" cy="1382486"/>
+          </a:xfrm>
+          <a:prstGeom prst="rect">
+            <a:avLst/>
+          </a:prstGeom>
+          <a:noFill/>
+          <a:ln w="38100">
+            <a:solidFill>
+              <a:schemeClr val="tx1">
+                <a:alpha val="75000"/>
+              </a:schemeClr>
+            </a:solidFill>
+          </a:ln>
+        </p:spPr>
+        <p:style>
+          <a:lnRef idx="2">
+            <a:schemeClr val="accent1">
+              <a:shade val="50000"/>
+            </a:schemeClr>
+          </a:lnRef>
+          <a:fillRef idx="1">
+            <a:schemeClr val="accent1"/>
+          </a:fillRef>
+          <a:effectRef idx="0">
+            <a:schemeClr val="accent1"/>
+          </a:effectRef>
+          <a:fontRef idx="minor">
+            <a:schemeClr val="lt1"/>
+          </a:fontRef>
+        </p:style>
+        <p:txBody>
+          <a:bodyPr rtlCol="0" anchor="ctr"/>
+          <a:lstStyle/>
+          <a:p>
+            <a:pPr algn="ctr"/>
+            <a:endParaRPr lang="en-US"/>
+          </a:p>
+        </p:txBody>
+      </p:sp>
+      <p:sp>
+        <p:nvSpPr>
+          <p:cNvPr id="25" name="Rectangle 24">
+            <a:extLst>
+              <a:ext uri="{FF2B5EF4-FFF2-40B4-BE49-F238E27FC236}">
+                <a16:creationId xmlns:a16="http://schemas.microsoft.com/office/drawing/2014/main" id="{82AC0384-6387-7D57-8EB4-896E679A9F4F}"/>
+              </a:ext>
+            </a:extLst>
+          </p:cNvPr>
+          <p:cNvSpPr/>
+          <p:nvPr/>
+        </p:nvSpPr>
+        <p:spPr>
+          <a:xfrm>
+            <a:off x="4114801" y="2737757"/>
+            <a:ext cx="1981200" cy="1382486"/>
+          </a:xfrm>
+          <a:prstGeom prst="rect">
+            <a:avLst/>
+          </a:prstGeom>
+          <a:noFill/>
+          <a:ln w="38100">
+            <a:solidFill>
+              <a:schemeClr val="tx1">
+                <a:alpha val="75000"/>
+              </a:schemeClr>
+            </a:solidFill>
+          </a:ln>
+        </p:spPr>
+        <p:style>
+          <a:lnRef idx="2">
+            <a:schemeClr val="accent1">
+              <a:shade val="50000"/>
+            </a:schemeClr>
+          </a:lnRef>
+          <a:fillRef idx="1">
+            <a:schemeClr val="accent1"/>
+          </a:fillRef>
+          <a:effectRef idx="0">
+            <a:schemeClr val="accent1"/>
+          </a:effectRef>
+          <a:fontRef idx="minor">
+            <a:schemeClr val="lt1"/>
+          </a:fontRef>
+        </p:style>
+        <p:txBody>
+          <a:bodyPr rtlCol="0" anchor="ctr"/>
+          <a:lstStyle/>
+          <a:p>
+            <a:pPr algn="ctr"/>
+            <a:endParaRPr lang="en-US"/>
+          </a:p>
+        </p:txBody>
+      </p:sp>
+      <p:cxnSp>
+        <p:nvCxnSpPr>
+          <p:cNvPr id="64" name="Straight Arrow Connector 63">
+            <a:extLst>
+              <a:ext uri="{FF2B5EF4-FFF2-40B4-BE49-F238E27FC236}">
+                <a16:creationId xmlns:a16="http://schemas.microsoft.com/office/drawing/2014/main" id="{D3B8F594-F70C-BDE3-4E93-D81CE05CBF26}"/>
+              </a:ext>
+            </a:extLst>
+          </p:cNvPr>
+          <p:cNvCxnSpPr>
+            <a:stCxn id="28" idx="3"/>
+            <a:endCxn id="31" idx="1"/>
+          </p:cNvCxnSpPr>
+          <p:nvPr/>
+        </p:nvCxnSpPr>
+        <p:spPr>
+          <a:xfrm>
+            <a:off x="2481943" y="5992585"/>
+            <a:ext cx="8860974" cy="0"/>
+          </a:xfrm>
+          <a:prstGeom prst="straightConnector1">
+            <a:avLst/>
+          </a:prstGeom>
+          <a:ln w="38100">
+            <a:prstDash val="dash"/>
+            <a:tailEnd type="triangle"/>
+          </a:ln>
+        </p:spPr>
+        <p:style>
+          <a:lnRef idx="1">
+            <a:schemeClr val="accent1"/>
+          </a:lnRef>
+          <a:fillRef idx="0">
+            <a:schemeClr val="accent1"/>
+          </a:fillRef>
+          <a:effectRef idx="0">
+            <a:schemeClr val="accent1"/>
+          </a:effectRef>
+          <a:fontRef idx="minor">
+            <a:schemeClr val="tx1"/>
+          </a:fontRef>
+        </p:style>
+      </p:cxnSp>
+      <p:sp>
+        <p:nvSpPr>
+          <p:cNvPr id="28" name="Rectangle 27">
+            <a:extLst>
+              <a:ext uri="{FF2B5EF4-FFF2-40B4-BE49-F238E27FC236}">
+                <a16:creationId xmlns:a16="http://schemas.microsoft.com/office/drawing/2014/main" id="{CBB2489F-CBFE-304D-76D5-6A05865A7B18}"/>
+              </a:ext>
+            </a:extLst>
+          </p:cNvPr>
+          <p:cNvSpPr/>
+          <p:nvPr/>
+        </p:nvSpPr>
+        <p:spPr>
+          <a:xfrm>
+            <a:off x="500743" y="5301342"/>
+            <a:ext cx="1981200" cy="1382486"/>
+          </a:xfrm>
+          <a:prstGeom prst="rect">
+            <a:avLst/>
+          </a:prstGeom>
+          <a:noFill/>
+          <a:ln w="38100">
+            <a:solidFill>
+              <a:schemeClr val="tx1">
+                <a:alpha val="75000"/>
+              </a:schemeClr>
+            </a:solidFill>
+          </a:ln>
+        </p:spPr>
+        <p:style>
+          <a:lnRef idx="2">
+            <a:schemeClr val="accent1">
+              <a:shade val="50000"/>
+            </a:schemeClr>
+          </a:lnRef>
+          <a:fillRef idx="1">
+            <a:schemeClr val="accent1"/>
+          </a:fillRef>
+          <a:effectRef idx="0">
+            <a:schemeClr val="accent1"/>
+          </a:effectRef>
+          <a:fontRef idx="minor">
+            <a:schemeClr val="lt1"/>
+          </a:fontRef>
+        </p:style>
+        <p:txBody>
+          <a:bodyPr rtlCol="0" anchor="ctr"/>
+          <a:lstStyle/>
+          <a:p>
+            <a:pPr algn="ctr"/>
+            <a:endParaRPr lang="en-US"/>
+          </a:p>
+        </p:txBody>
+      </p:sp>
+      <p:sp>
+        <p:nvSpPr>
+          <p:cNvPr id="31" name="Rectangle 30">
+            <a:extLst>
+              <a:ext uri="{FF2B5EF4-FFF2-40B4-BE49-F238E27FC236}">
+                <a16:creationId xmlns:a16="http://schemas.microsoft.com/office/drawing/2014/main" id="{8B74F445-A52C-CC92-5C9F-26A6C584DFB7}"/>
+              </a:ext>
+            </a:extLst>
+          </p:cNvPr>
+          <p:cNvSpPr/>
+          <p:nvPr/>
+        </p:nvSpPr>
+        <p:spPr>
+          <a:xfrm>
+            <a:off x="11342917" y="5301342"/>
+            <a:ext cx="1981200" cy="1382486"/>
+          </a:xfrm>
+          <a:prstGeom prst="rect">
+            <a:avLst/>
+          </a:prstGeom>
+          <a:noFill/>
+          <a:ln w="38100">
+            <a:solidFill>
+              <a:schemeClr val="tx1">
+                <a:alpha val="75000"/>
+              </a:schemeClr>
+            </a:solidFill>
+          </a:ln>
+        </p:spPr>
+        <p:style>
+          <a:lnRef idx="2">
+            <a:schemeClr val="accent1">
+              <a:shade val="50000"/>
+            </a:schemeClr>
+          </a:lnRef>
+          <a:fillRef idx="1">
+            <a:schemeClr val="accent1"/>
+          </a:fillRef>
+          <a:effectRef idx="0">
+            <a:schemeClr val="accent1"/>
+          </a:effectRef>
+          <a:fontRef idx="minor">
+            <a:schemeClr val="lt1"/>
+          </a:fontRef>
+        </p:style>
+        <p:txBody>
+          <a:bodyPr rtlCol="0" anchor="ctr"/>
+          <a:lstStyle/>
+          <a:p>
+            <a:pPr algn="ctr"/>
+            <a:endParaRPr lang="en-US"/>
+          </a:p>
+        </p:txBody>
+      </p:sp>
+      <p:sp>
+        <p:nvSpPr>
+          <p:cNvPr id="26" name="Rectangle 25">
+            <a:extLst>
+              <a:ext uri="{FF2B5EF4-FFF2-40B4-BE49-F238E27FC236}">
+                <a16:creationId xmlns:a16="http://schemas.microsoft.com/office/drawing/2014/main" id="{B55C58BF-B54E-BA2F-D111-5037A627D595}"/>
+              </a:ext>
+            </a:extLst>
+          </p:cNvPr>
+          <p:cNvSpPr/>
+          <p:nvPr/>
+        </p:nvSpPr>
+        <p:spPr>
+          <a:xfrm>
+            <a:off x="7728859" y="2737757"/>
+            <a:ext cx="1981200" cy="1382486"/>
+          </a:xfrm>
+          <a:prstGeom prst="rect">
+            <a:avLst/>
+          </a:prstGeom>
+          <a:solidFill>
+            <a:schemeClr val="bg1">
+              <a:alpha val="75000"/>
+            </a:schemeClr>
+          </a:solidFill>
+          <a:ln w="38100">
+            <a:solidFill>
+              <a:schemeClr val="tx1">
+                <a:alpha val="75000"/>
+              </a:schemeClr>
+            </a:solidFill>
+          </a:ln>
+        </p:spPr>
+        <p:style>
+          <a:lnRef idx="2">
+            <a:schemeClr val="accent1">
+              <a:shade val="50000"/>
+            </a:schemeClr>
+          </a:lnRef>
+          <a:fillRef idx="1">
+            <a:schemeClr val="accent1"/>
+          </a:fillRef>
+          <a:effectRef idx="0">
+            <a:schemeClr val="accent1"/>
+          </a:effectRef>
+          <a:fontRef idx="minor">
+            <a:schemeClr val="lt1"/>
+          </a:fontRef>
+        </p:style>
+        <p:txBody>
+          <a:bodyPr rtlCol="0" anchor="ctr"/>
+          <a:lstStyle/>
+          <a:p>
+            <a:pPr algn="ctr"/>
+            <a:endParaRPr lang="en-US"/>
+          </a:p>
+        </p:txBody>
+      </p:sp>
+      <p:sp>
+        <p:nvSpPr>
+          <p:cNvPr id="37" name="TextBox 36">
+            <a:extLst>
+              <a:ext uri="{FF2B5EF4-FFF2-40B4-BE49-F238E27FC236}">
+                <a16:creationId xmlns:a16="http://schemas.microsoft.com/office/drawing/2014/main" id="{C71CFA49-7C85-F6D0-BCFA-6674AEE1B54E}"/>
+              </a:ext>
+            </a:extLst>
+          </p:cNvPr>
+          <p:cNvSpPr txBox="1"/>
+          <p:nvPr/>
+        </p:nvSpPr>
+        <p:spPr>
+          <a:xfrm>
+            <a:off x="8536556" y="3136611"/>
+            <a:ext cx="365806" cy="584775"/>
+          </a:xfrm>
+          <a:prstGeom prst="rect">
+            <a:avLst/>
+          </a:prstGeom>
+          <a:noFill/>
+        </p:spPr>
+        <p:txBody>
+          <a:bodyPr wrap="none" rtlCol="0">
+            <a:spAutoFit/>
+          </a:bodyPr>
+          <a:lstStyle/>
+          <a:p>
+            <a:pPr algn="ctr"/>
+            <a:r>
+              <a:rPr lang="el-GR" sz="3200" i="1" dirty="0">
+                <a:latin typeface="Times New Roman" panose="02020603050405020304" pitchFamily="18" charset="0"/>
+                <a:cs typeface="Times New Roman" panose="02020603050405020304" pitchFamily="18" charset="0"/>
+              </a:rPr>
+              <a:t>χ</a:t>
+            </a:r>
+            <a:endParaRPr lang="en-US" sz="3200" i="1" dirty="0">
+              <a:latin typeface="Times New Roman" panose="02020603050405020304" pitchFamily="18" charset="0"/>
+              <a:cs typeface="Times New Roman" panose="02020603050405020304" pitchFamily="18" charset="0"/>
+            </a:endParaRPr>
+          </a:p>
+        </p:txBody>
+      </p:sp>
+      <p:cxnSp>
+        <p:nvCxnSpPr>
+          <p:cNvPr id="77" name="Straight Arrow Connector 76">
+            <a:extLst>
+              <a:ext uri="{FF2B5EF4-FFF2-40B4-BE49-F238E27FC236}">
+                <a16:creationId xmlns:a16="http://schemas.microsoft.com/office/drawing/2014/main" id="{2CAFDABE-EBA8-F947-4A74-58528D3B89C8}"/>
+              </a:ext>
+            </a:extLst>
+          </p:cNvPr>
+          <p:cNvCxnSpPr>
+            <a:cxnSpLocks/>
+            <a:stCxn id="21" idx="3"/>
+            <a:endCxn id="26" idx="1"/>
+          </p:cNvCxnSpPr>
+          <p:nvPr/>
+        </p:nvCxnSpPr>
+        <p:spPr>
+          <a:xfrm>
+            <a:off x="6096001" y="865415"/>
+            <a:ext cx="1632858" cy="2563585"/>
+          </a:xfrm>
+          <a:prstGeom prst="straightConnector1">
+            <a:avLst/>
+          </a:prstGeom>
+          <a:ln w="38100">
+            <a:solidFill>
+              <a:srgbClr val="C00000"/>
+            </a:solidFill>
+            <a:tailEnd type="triangle"/>
+          </a:ln>
+        </p:spPr>
+        <p:style>
+          <a:lnRef idx="1">
+            <a:schemeClr val="accent1"/>
+          </a:lnRef>
+          <a:fillRef idx="0">
+            <a:schemeClr val="accent1"/>
+          </a:fillRef>
+          <a:effectRef idx="0">
+            <a:schemeClr val="accent1"/>
+          </a:effectRef>
+          <a:fontRef idx="minor">
+            <a:schemeClr val="tx1"/>
+          </a:fontRef>
+        </p:style>
+      </p:cxnSp>
+      <p:cxnSp>
+        <p:nvCxnSpPr>
+          <p:cNvPr id="2" name="Straight Arrow Connector 1">
+            <a:extLst>
+              <a:ext uri="{FF2B5EF4-FFF2-40B4-BE49-F238E27FC236}">
+                <a16:creationId xmlns:a16="http://schemas.microsoft.com/office/drawing/2014/main" id="{82720060-A6FC-704F-8F90-E0C8FE5F764B}"/>
+              </a:ext>
+            </a:extLst>
+          </p:cNvPr>
+          <p:cNvCxnSpPr>
+            <a:cxnSpLocks/>
+          </p:cNvCxnSpPr>
+          <p:nvPr/>
+        </p:nvCxnSpPr>
+        <p:spPr>
+          <a:xfrm flipH="1">
+            <a:off x="9710059" y="865415"/>
+            <a:ext cx="1632858" cy="0"/>
+          </a:xfrm>
+          <a:prstGeom prst="straightConnector1">
+            <a:avLst/>
+          </a:prstGeom>
+          <a:ln w="38100">
+            <a:solidFill>
+              <a:srgbClr val="C00000"/>
+            </a:solidFill>
+            <a:tailEnd type="triangle"/>
+          </a:ln>
+        </p:spPr>
+        <p:style>
+          <a:lnRef idx="1">
+            <a:schemeClr val="accent1"/>
+          </a:lnRef>
+          <a:fillRef idx="0">
+            <a:schemeClr val="accent1"/>
+          </a:fillRef>
+          <a:effectRef idx="0">
+            <a:schemeClr val="accent1"/>
+          </a:effectRef>
+          <a:fontRef idx="minor">
+            <a:schemeClr val="tx1"/>
+          </a:fontRef>
+        </p:style>
+      </p:cxnSp>
+      <p:sp>
+        <p:nvSpPr>
+          <p:cNvPr id="4" name="TextBox 3">
+            <a:extLst>
+              <a:ext uri="{FF2B5EF4-FFF2-40B4-BE49-F238E27FC236}">
+                <a16:creationId xmlns:a16="http://schemas.microsoft.com/office/drawing/2014/main" id="{7B5B5484-7BFD-738A-6CDF-C9EC74D77D90}"/>
+              </a:ext>
+            </a:extLst>
+          </p:cNvPr>
+          <p:cNvSpPr txBox="1"/>
+          <p:nvPr/>
+        </p:nvSpPr>
+        <p:spPr>
+          <a:xfrm rot="980213">
+            <a:off x="7774010" y="4647571"/>
+            <a:ext cx="979755" cy="461665"/>
+          </a:xfrm>
+          <a:prstGeom prst="rect">
+            <a:avLst/>
+          </a:prstGeom>
+          <a:noFill/>
+        </p:spPr>
+        <p:txBody>
+          <a:bodyPr wrap="none" rtlCol="0">
+            <a:spAutoFit/>
+          </a:bodyPr>
+          <a:lstStyle/>
+          <a:p>
+            <a:r>
+              <a:rPr lang="en-US" sz="2400" b="1" dirty="0">
+                <a:latin typeface="Times New Roman" panose="02020603050405020304" pitchFamily="18" charset="0"/>
+                <a:cs typeface="Times New Roman" panose="02020603050405020304" pitchFamily="18" charset="0"/>
+              </a:rPr>
+              <a:t>-1.947</a:t>
+            </a:r>
+          </a:p>
+        </p:txBody>
+      </p:sp>
+      <p:sp>
+        <p:nvSpPr>
+          <p:cNvPr id="5" name="TextBox 4">
+            <a:extLst>
+              <a:ext uri="{FF2B5EF4-FFF2-40B4-BE49-F238E27FC236}">
+                <a16:creationId xmlns:a16="http://schemas.microsoft.com/office/drawing/2014/main" id="{5C15E60C-786F-B0E4-702A-980DA8F9EF31}"/>
+              </a:ext>
+            </a:extLst>
+          </p:cNvPr>
+          <p:cNvSpPr txBox="1"/>
+          <p:nvPr/>
+        </p:nvSpPr>
+        <p:spPr>
+          <a:xfrm rot="3415512">
+            <a:off x="10036612" y="4134396"/>
+            <a:ext cx="979755" cy="461665"/>
+          </a:xfrm>
+          <a:prstGeom prst="rect">
+            <a:avLst/>
+          </a:prstGeom>
+          <a:noFill/>
+        </p:spPr>
+        <p:txBody>
+          <a:bodyPr wrap="none" rtlCol="0">
+            <a:spAutoFit/>
+          </a:bodyPr>
+          <a:lstStyle/>
+          <a:p>
+            <a:r>
+              <a:rPr lang="en-US" sz="2400" dirty="0">
+                <a:latin typeface="Times New Roman" panose="02020603050405020304" pitchFamily="18" charset="0"/>
+                <a:cs typeface="Times New Roman" panose="02020603050405020304" pitchFamily="18" charset="0"/>
+              </a:rPr>
+              <a:t>-0.681</a:t>
+            </a:r>
+          </a:p>
+        </p:txBody>
+      </p:sp>
+      <p:sp>
+        <p:nvSpPr>
+          <p:cNvPr id="6" name="TextBox 5">
+            <a:extLst>
+              <a:ext uri="{FF2B5EF4-FFF2-40B4-BE49-F238E27FC236}">
+                <a16:creationId xmlns:a16="http://schemas.microsoft.com/office/drawing/2014/main" id="{88485C6C-B89E-A112-96E4-ECFD35F5D6CF}"/>
+              </a:ext>
+            </a:extLst>
+          </p:cNvPr>
+          <p:cNvSpPr txBox="1"/>
+          <p:nvPr/>
+        </p:nvSpPr>
+        <p:spPr>
+          <a:xfrm>
+            <a:off x="6419418" y="5530920"/>
+            <a:ext cx="877163" cy="461665"/>
+          </a:xfrm>
+          <a:prstGeom prst="rect">
+            <a:avLst/>
+          </a:prstGeom>
+          <a:noFill/>
+        </p:spPr>
+        <p:txBody>
+          <a:bodyPr wrap="none" rtlCol="0">
+            <a:spAutoFit/>
+          </a:bodyPr>
+          <a:lstStyle/>
+          <a:p>
+            <a:r>
+              <a:rPr lang="en-US" sz="2400" dirty="0">
+                <a:latin typeface="Times New Roman" panose="02020603050405020304" pitchFamily="18" charset="0"/>
+                <a:cs typeface="Times New Roman" panose="02020603050405020304" pitchFamily="18" charset="0"/>
+              </a:rPr>
+              <a:t>1.405</a:t>
+            </a:r>
+          </a:p>
+        </p:txBody>
+      </p:sp>
+      <p:sp>
+        <p:nvSpPr>
+          <p:cNvPr id="7" name="TextBox 6">
+            <a:extLst>
+              <a:ext uri="{FF2B5EF4-FFF2-40B4-BE49-F238E27FC236}">
+                <a16:creationId xmlns:a16="http://schemas.microsoft.com/office/drawing/2014/main" id="{7D1B418B-C3F1-D6ED-8A14-52E668769EF2}"/>
+              </a:ext>
+            </a:extLst>
+          </p:cNvPr>
+          <p:cNvSpPr txBox="1"/>
+          <p:nvPr/>
+        </p:nvSpPr>
+        <p:spPr>
+          <a:xfrm>
+            <a:off x="4118797" y="1880106"/>
+            <a:ext cx="979755" cy="461665"/>
+          </a:xfrm>
+          <a:prstGeom prst="rect">
+            <a:avLst/>
+          </a:prstGeom>
+          <a:noFill/>
+        </p:spPr>
+        <p:txBody>
+          <a:bodyPr wrap="none" rtlCol="0">
+            <a:spAutoFit/>
+          </a:bodyPr>
+          <a:lstStyle/>
+          <a:p>
+            <a:r>
+              <a:rPr lang="en-US" sz="2400" dirty="0">
+                <a:latin typeface="Times New Roman" panose="02020603050405020304" pitchFamily="18" charset="0"/>
+                <a:cs typeface="Times New Roman" panose="02020603050405020304" pitchFamily="18" charset="0"/>
+              </a:rPr>
+              <a:t>-0.860</a:t>
+            </a:r>
+          </a:p>
+        </p:txBody>
+      </p:sp>
+      <p:sp>
+        <p:nvSpPr>
+          <p:cNvPr id="8" name="TextBox 7">
+            <a:extLst>
+              <a:ext uri="{FF2B5EF4-FFF2-40B4-BE49-F238E27FC236}">
+                <a16:creationId xmlns:a16="http://schemas.microsoft.com/office/drawing/2014/main" id="{97BCA183-6879-FD37-FF21-D53BE58C94D7}"/>
+              </a:ext>
+            </a:extLst>
+          </p:cNvPr>
+          <p:cNvSpPr txBox="1"/>
+          <p:nvPr/>
+        </p:nvSpPr>
+        <p:spPr>
+          <a:xfrm>
+            <a:off x="7707067" y="1863140"/>
+            <a:ext cx="979755" cy="461665"/>
+          </a:xfrm>
+          <a:prstGeom prst="rect">
+            <a:avLst/>
+          </a:prstGeom>
+          <a:noFill/>
+        </p:spPr>
+        <p:txBody>
+          <a:bodyPr wrap="none" rtlCol="0">
+            <a:spAutoFit/>
+          </a:bodyPr>
+          <a:lstStyle/>
+          <a:p>
+            <a:r>
+              <a:rPr lang="en-US" sz="2400" b="1" dirty="0">
+                <a:latin typeface="Times New Roman" panose="02020603050405020304" pitchFamily="18" charset="0"/>
+                <a:cs typeface="Times New Roman" panose="02020603050405020304" pitchFamily="18" charset="0"/>
+              </a:rPr>
+              <a:t>-2.470</a:t>
+            </a:r>
+          </a:p>
+        </p:txBody>
+      </p:sp>
+      <p:sp>
+        <p:nvSpPr>
+          <p:cNvPr id="9" name="TextBox 8">
+            <a:extLst>
+              <a:ext uri="{FF2B5EF4-FFF2-40B4-BE49-F238E27FC236}">
+                <a16:creationId xmlns:a16="http://schemas.microsoft.com/office/drawing/2014/main" id="{EBE43EA0-6642-DE65-1FC8-2B2CCED5DAC3}"/>
+              </a:ext>
+            </a:extLst>
+          </p:cNvPr>
+          <p:cNvSpPr txBox="1"/>
+          <p:nvPr/>
+        </p:nvSpPr>
+        <p:spPr>
+          <a:xfrm rot="20471706">
+            <a:off x="9801621" y="1764583"/>
+            <a:ext cx="877163" cy="461665"/>
+          </a:xfrm>
+          <a:prstGeom prst="rect">
+            <a:avLst/>
+          </a:prstGeom>
+          <a:noFill/>
+        </p:spPr>
+        <p:txBody>
+          <a:bodyPr wrap="none" rtlCol="0">
+            <a:spAutoFit/>
+          </a:bodyPr>
+          <a:lstStyle/>
+          <a:p>
+            <a:r>
+              <a:rPr lang="en-US" sz="2400" dirty="0">
+                <a:latin typeface="Times New Roman" panose="02020603050405020304" pitchFamily="18" charset="0"/>
+                <a:cs typeface="Times New Roman" panose="02020603050405020304" pitchFamily="18" charset="0"/>
+              </a:rPr>
+              <a:t>0.092</a:t>
+            </a:r>
+          </a:p>
+        </p:txBody>
+      </p:sp>
+      <p:sp>
+        <p:nvSpPr>
+          <p:cNvPr id="10" name="TextBox 9">
+            <a:extLst>
+              <a:ext uri="{FF2B5EF4-FFF2-40B4-BE49-F238E27FC236}">
+                <a16:creationId xmlns:a16="http://schemas.microsoft.com/office/drawing/2014/main" id="{5F8EA069-6F0D-5CA6-BF05-D22712272A1E}"/>
+              </a:ext>
+            </a:extLst>
+          </p:cNvPr>
+          <p:cNvSpPr txBox="1"/>
+          <p:nvPr/>
+        </p:nvSpPr>
+        <p:spPr>
+          <a:xfrm rot="19488555">
+            <a:off x="2081829" y="4033081"/>
+            <a:ext cx="979755" cy="461665"/>
+          </a:xfrm>
+          <a:prstGeom prst="rect">
+            <a:avLst/>
+          </a:prstGeom>
+          <a:noFill/>
+        </p:spPr>
+        <p:txBody>
+          <a:bodyPr wrap="none" rtlCol="0">
+            <a:spAutoFit/>
+          </a:bodyPr>
+          <a:lstStyle/>
+          <a:p>
+            <a:r>
+              <a:rPr lang="en-US" sz="2400" b="1" dirty="0">
+                <a:latin typeface="Times New Roman" panose="02020603050405020304" pitchFamily="18" charset="0"/>
+                <a:cs typeface="Times New Roman" panose="02020603050405020304" pitchFamily="18" charset="0"/>
+              </a:rPr>
+              <a:t>-2.728</a:t>
+            </a:r>
+          </a:p>
+        </p:txBody>
+      </p:sp>
+      <p:sp>
+        <p:nvSpPr>
+          <p:cNvPr id="11" name="TextBox 10">
+            <a:extLst>
+              <a:ext uri="{FF2B5EF4-FFF2-40B4-BE49-F238E27FC236}">
+                <a16:creationId xmlns:a16="http://schemas.microsoft.com/office/drawing/2014/main" id="{A337C9DC-5FD7-DCF0-0804-30EF76A2D58E}"/>
+              </a:ext>
+            </a:extLst>
+          </p:cNvPr>
+          <p:cNvSpPr txBox="1"/>
+          <p:nvPr/>
+        </p:nvSpPr>
+        <p:spPr>
+          <a:xfrm rot="2166687">
+            <a:off x="2103246" y="1910670"/>
+            <a:ext cx="979755" cy="461665"/>
+          </a:xfrm>
+          <a:prstGeom prst="rect">
+            <a:avLst/>
+          </a:prstGeom>
+          <a:noFill/>
+        </p:spPr>
+        <p:txBody>
+          <a:bodyPr wrap="none" rtlCol="0">
+            <a:spAutoFit/>
+          </a:bodyPr>
+          <a:lstStyle/>
+          <a:p>
+            <a:r>
+              <a:rPr lang="en-US" sz="2400" dirty="0">
+                <a:latin typeface="Times New Roman" panose="02020603050405020304" pitchFamily="18" charset="0"/>
+                <a:cs typeface="Times New Roman" panose="02020603050405020304" pitchFamily="18" charset="0"/>
+              </a:rPr>
+              <a:t>-0.978</a:t>
+            </a:r>
+          </a:p>
+        </p:txBody>
+      </p:sp>
+      <p:sp>
+        <p:nvSpPr>
+          <p:cNvPr id="12" name="TextBox 11">
+            <a:extLst>
+              <a:ext uri="{FF2B5EF4-FFF2-40B4-BE49-F238E27FC236}">
+                <a16:creationId xmlns:a16="http://schemas.microsoft.com/office/drawing/2014/main" id="{D6BABC76-BFE8-61D1-C153-E1EAA3BD9D67}"/>
+              </a:ext>
+            </a:extLst>
+          </p:cNvPr>
+          <p:cNvSpPr txBox="1"/>
+          <p:nvPr/>
+        </p:nvSpPr>
+        <p:spPr>
+          <a:xfrm rot="2159215">
+            <a:off x="5815510" y="2045259"/>
+            <a:ext cx="1133644" cy="461665"/>
+          </a:xfrm>
+          <a:prstGeom prst="rect">
+            <a:avLst/>
+          </a:prstGeom>
+          <a:noFill/>
+        </p:spPr>
+        <p:txBody>
+          <a:bodyPr wrap="none" rtlCol="0">
+            <a:spAutoFit/>
+          </a:bodyPr>
+          <a:lstStyle/>
+          <a:p>
+            <a:r>
+              <a:rPr lang="en-US" sz="2400" b="1" dirty="0">
+                <a:latin typeface="Times New Roman" panose="02020603050405020304" pitchFamily="18" charset="0"/>
+                <a:cs typeface="Times New Roman" panose="02020603050405020304" pitchFamily="18" charset="0"/>
+              </a:rPr>
+              <a:t>-13.026</a:t>
+            </a:r>
+          </a:p>
+        </p:txBody>
+      </p:sp>
+      <p:sp>
+        <p:nvSpPr>
+          <p:cNvPr id="13" name="TextBox 12">
+            <a:extLst>
+              <a:ext uri="{FF2B5EF4-FFF2-40B4-BE49-F238E27FC236}">
+                <a16:creationId xmlns:a16="http://schemas.microsoft.com/office/drawing/2014/main" id="{28A771FF-985B-5C09-0DA4-46A5274CFD4C}"/>
+              </a:ext>
+            </a:extLst>
+          </p:cNvPr>
+          <p:cNvSpPr txBox="1"/>
+          <p:nvPr/>
+        </p:nvSpPr>
+        <p:spPr>
+          <a:xfrm>
+            <a:off x="6191367" y="2967335"/>
+            <a:ext cx="1031051" cy="461665"/>
+          </a:xfrm>
+          <a:prstGeom prst="rect">
+            <a:avLst/>
+          </a:prstGeom>
+          <a:noFill/>
+        </p:spPr>
+        <p:txBody>
+          <a:bodyPr wrap="none" rtlCol="0">
+            <a:spAutoFit/>
+          </a:bodyPr>
+          <a:lstStyle/>
+          <a:p>
+            <a:r>
+              <a:rPr lang="en-US" sz="2400" b="1" dirty="0">
+                <a:latin typeface="Times New Roman" panose="02020603050405020304" pitchFamily="18" charset="0"/>
+                <a:cs typeface="Times New Roman" panose="02020603050405020304" pitchFamily="18" charset="0"/>
+              </a:rPr>
+              <a:t>13.737</a:t>
+            </a:r>
+          </a:p>
+        </p:txBody>
+      </p:sp>
+      <p:sp>
+        <p:nvSpPr>
+          <p:cNvPr id="14" name="TextBox 13">
+            <a:extLst>
+              <a:ext uri="{FF2B5EF4-FFF2-40B4-BE49-F238E27FC236}">
+                <a16:creationId xmlns:a16="http://schemas.microsoft.com/office/drawing/2014/main" id="{4F80FAB0-93F0-BB5A-A4EA-A033C546A8AD}"/>
+              </a:ext>
+            </a:extLst>
+          </p:cNvPr>
+          <p:cNvSpPr txBox="1"/>
+          <p:nvPr/>
+        </p:nvSpPr>
+        <p:spPr>
+          <a:xfrm rot="3447489">
+            <a:off x="6422552" y="1561551"/>
+            <a:ext cx="979755" cy="461665"/>
+          </a:xfrm>
+          <a:prstGeom prst="rect">
+            <a:avLst/>
+          </a:prstGeom>
+          <a:noFill/>
+        </p:spPr>
+        <p:txBody>
+          <a:bodyPr wrap="none" rtlCol="0">
+            <a:spAutoFit/>
+          </a:bodyPr>
+          <a:lstStyle/>
+          <a:p>
+            <a:r>
+              <a:rPr lang="en-US" sz="2400" b="1" dirty="0">
+                <a:latin typeface="Times New Roman" panose="02020603050405020304" pitchFamily="18" charset="0"/>
+                <a:cs typeface="Times New Roman" panose="02020603050405020304" pitchFamily="18" charset="0"/>
+              </a:rPr>
+              <a:t>-9.297</a:t>
+            </a:r>
+          </a:p>
+        </p:txBody>
+      </p:sp>
+      <p:sp>
+        <p:nvSpPr>
+          <p:cNvPr id="15" name="TextBox 14">
+            <a:extLst>
+              <a:ext uri="{FF2B5EF4-FFF2-40B4-BE49-F238E27FC236}">
+                <a16:creationId xmlns:a16="http://schemas.microsoft.com/office/drawing/2014/main" id="{4D3FBF7B-3333-F357-14E6-233A28F06C10}"/>
+              </a:ext>
+            </a:extLst>
+          </p:cNvPr>
+          <p:cNvSpPr txBox="1"/>
+          <p:nvPr/>
+        </p:nvSpPr>
+        <p:spPr>
+          <a:xfrm>
+            <a:off x="10013721" y="403750"/>
+            <a:ext cx="1133644" cy="461665"/>
+          </a:xfrm>
+          <a:prstGeom prst="rect">
+            <a:avLst/>
+          </a:prstGeom>
+          <a:noFill/>
+        </p:spPr>
+        <p:txBody>
+          <a:bodyPr wrap="none" rtlCol="0">
+            <a:spAutoFit/>
+          </a:bodyPr>
+          <a:lstStyle/>
+          <a:p>
+            <a:r>
+              <a:rPr lang="en-US" sz="2400" b="1" dirty="0">
+                <a:latin typeface="Times New Roman" panose="02020603050405020304" pitchFamily="18" charset="0"/>
+                <a:cs typeface="Times New Roman" panose="02020603050405020304" pitchFamily="18" charset="0"/>
+              </a:rPr>
+              <a:t>-15.762</a:t>
+            </a:r>
+          </a:p>
+        </p:txBody>
+      </p:sp>
+      <p:cxnSp>
+        <p:nvCxnSpPr>
+          <p:cNvPr id="16" name="Straight Arrow Connector 15">
+            <a:extLst>
+              <a:ext uri="{FF2B5EF4-FFF2-40B4-BE49-F238E27FC236}">
+                <a16:creationId xmlns:a16="http://schemas.microsoft.com/office/drawing/2014/main" id="{2087452E-DB16-CF81-2E40-C4946563FBB2}"/>
+              </a:ext>
+            </a:extLst>
+          </p:cNvPr>
+          <p:cNvCxnSpPr>
+            <a:cxnSpLocks/>
+          </p:cNvCxnSpPr>
+          <p:nvPr/>
+        </p:nvCxnSpPr>
+        <p:spPr>
+          <a:xfrm>
+            <a:off x="1491343" y="1556658"/>
+            <a:ext cx="0" cy="3744684"/>
+          </a:xfrm>
+          <a:prstGeom prst="straightConnector1">
+            <a:avLst/>
+          </a:prstGeom>
+          <a:ln w="82550">
+            <a:tailEnd type="triangle"/>
+          </a:ln>
+        </p:spPr>
+        <p:style>
+          <a:lnRef idx="1">
+            <a:schemeClr val="accent1"/>
+          </a:lnRef>
+          <a:fillRef idx="0">
+            <a:schemeClr val="accent1"/>
+          </a:fillRef>
+          <a:effectRef idx="0">
+            <a:schemeClr val="accent1"/>
+          </a:effectRef>
+          <a:fontRef idx="minor">
+            <a:schemeClr val="tx1"/>
+          </a:fontRef>
+        </p:style>
+      </p:cxnSp>
+      <p:sp>
+        <p:nvSpPr>
+          <p:cNvPr id="17" name="TextBox 16">
+            <a:extLst>
+              <a:ext uri="{FF2B5EF4-FFF2-40B4-BE49-F238E27FC236}">
+                <a16:creationId xmlns:a16="http://schemas.microsoft.com/office/drawing/2014/main" id="{BD4F5F98-2E8A-7D49-1332-119EF772EBD9}"/>
+              </a:ext>
+            </a:extLst>
+          </p:cNvPr>
+          <p:cNvSpPr txBox="1"/>
+          <p:nvPr/>
+        </p:nvSpPr>
+        <p:spPr>
+          <a:xfrm>
+            <a:off x="441304" y="3198167"/>
+            <a:ext cx="1031051" cy="461665"/>
+          </a:xfrm>
+          <a:prstGeom prst="rect">
+            <a:avLst/>
+          </a:prstGeom>
+          <a:noFill/>
+        </p:spPr>
+        <p:txBody>
+          <a:bodyPr wrap="none" rtlCol="0">
+            <a:spAutoFit/>
+          </a:bodyPr>
+          <a:lstStyle/>
+          <a:p>
+            <a:r>
+              <a:rPr lang="en-US" sz="2400" b="1" dirty="0">
+                <a:latin typeface="Times New Roman" panose="02020603050405020304" pitchFamily="18" charset="0"/>
+                <a:cs typeface="Times New Roman" panose="02020603050405020304" pitchFamily="18" charset="0"/>
+              </a:rPr>
+              <a:t>13.512</a:t>
+            </a:r>
+          </a:p>
+        </p:txBody>
+      </p:sp>
+    </p:spTree>
+    <p:extLst>
+      <p:ext uri="{BB962C8B-B14F-4D97-AF65-F5344CB8AC3E}">
+        <p14:creationId xmlns:p14="http://schemas.microsoft.com/office/powerpoint/2010/main" val="3047400984"/>
+      </p:ext>
+    </p:extLst>
+  </p:cSld>
+  <p:clrMapOvr>
+    <a:masterClrMapping/>
+  </p:clrMapOvr>
+</p:sld>
+</file>
+
+<file path=ppt/slides/slide4.xml><?xml version="1.0" encoding="utf-8"?>
+<p:sld xmlns:a="http://schemas.openxmlformats.org/drawingml/2006/main" xmlns:r="http://schemas.openxmlformats.org/officeDocument/2006/relationships" xmlns:p="http://schemas.openxmlformats.org/presentationml/2006/main">
+  <p:cSld>
+    <p:spTree>
+      <p:nvGrpSpPr>
+        <p:cNvPr id="1" name=""/>
+        <p:cNvGrpSpPr/>
+        <p:nvPr/>
+      </p:nvGrpSpPr>
+      <p:grpSpPr>
+        <a:xfrm>
+          <a:off x="0" y="0"/>
+          <a:ext cx="0" cy="0"/>
+          <a:chOff x="0" y="0"/>
+          <a:chExt cx="0" cy="0"/>
+        </a:xfrm>
+      </p:grpSpPr>
+      <p:cxnSp>
+        <p:nvCxnSpPr>
+          <p:cNvPr id="73" name="Straight Arrow Connector 72">
+            <a:extLst>
+              <a:ext uri="{FF2B5EF4-FFF2-40B4-BE49-F238E27FC236}">
+                <a16:creationId xmlns:a16="http://schemas.microsoft.com/office/drawing/2014/main" id="{61C7B4CB-3474-D72A-9F80-BB683CD500B5}"/>
+              </a:ext>
+            </a:extLst>
+          </p:cNvPr>
+          <p:cNvCxnSpPr>
+            <a:stCxn id="21" idx="2"/>
+            <a:endCxn id="31" idx="1"/>
+          </p:cNvCxnSpPr>
+          <p:nvPr/>
+        </p:nvCxnSpPr>
+        <p:spPr>
+          <a:xfrm>
+            <a:off x="5105401" y="1556658"/>
+            <a:ext cx="6237516" cy="4435927"/>
+          </a:xfrm>
+          <a:prstGeom prst="straightConnector1">
+            <a:avLst/>
+          </a:prstGeom>
           <a:ln w="80518">
             <a:solidFill>
               <a:srgbClr val="C00000"/>
@@ -8799,8 +10848,8 @@
         </p:nvSpPr>
         <p:spPr>
           <a:xfrm rot="2166687">
-            <a:off x="2103246" y="1910670"/>
-            <a:ext cx="979755" cy="461665"/>
+            <a:off x="2295606" y="1910670"/>
+            <a:ext cx="595035" cy="461665"/>
           </a:xfrm>
           <a:prstGeom prst="rect">
             <a:avLst/>
@@ -8818,7 +10867,7 @@
                 <a:latin typeface="Times New Roman" panose="02020603050405020304" pitchFamily="18" charset="0"/>
                 <a:cs typeface="Times New Roman" panose="02020603050405020304" pitchFamily="18" charset="0"/>
               </a:rPr>
-              <a:t>-0.978</a:t>
+              <a:t>-nu</a:t>
             </a:r>
           </a:p>
         </p:txBody>

</xml_diff>

<commit_message>
add fresh SEM table layout
</commit_message>
<xml_diff>
--- a/working_drafts/figs/TXeco_SEM_ppt_fig.pptx
+++ b/working_drafts/figs/TXeco_SEM_ppt_fig.pptx
@@ -197,7 +197,7 @@
           <a:p>
             <a:fld id="{9C8338E3-F40D-F146-8D3B-4726E84D5200}" type="datetimeFigureOut">
               <a:rPr lang="en-US" smtClean="0"/>
-              <a:t>11/10/22</a:t>
+              <a:t>11/21/22</a:t>
             </a:fld>
             <a:endParaRPr lang="en-US"/>
           </a:p>
@@ -679,7 +679,7 @@
           <a:p>
             <a:fld id="{D3A28AA4-801E-B147-9E5C-6E6DBA6E23D1}" type="datetimeFigureOut">
               <a:rPr lang="en-US" smtClean="0"/>
-              <a:t>11/10/22</a:t>
+              <a:t>11/21/22</a:t>
             </a:fld>
             <a:endParaRPr lang="en-US"/>
           </a:p>
@@ -849,7 +849,7 @@
           <a:p>
             <a:fld id="{D3A28AA4-801E-B147-9E5C-6E6DBA6E23D1}" type="datetimeFigureOut">
               <a:rPr lang="en-US" smtClean="0"/>
-              <a:t>11/10/22</a:t>
+              <a:t>11/21/22</a:t>
             </a:fld>
             <a:endParaRPr lang="en-US"/>
           </a:p>
@@ -1029,7 +1029,7 @@
           <a:p>
             <a:fld id="{D3A28AA4-801E-B147-9E5C-6E6DBA6E23D1}" type="datetimeFigureOut">
               <a:rPr lang="en-US" smtClean="0"/>
-              <a:t>11/10/22</a:t>
+              <a:t>11/21/22</a:t>
             </a:fld>
             <a:endParaRPr lang="en-US"/>
           </a:p>
@@ -1199,7 +1199,7 @@
           <a:p>
             <a:fld id="{D3A28AA4-801E-B147-9E5C-6E6DBA6E23D1}" type="datetimeFigureOut">
               <a:rPr lang="en-US" smtClean="0"/>
-              <a:t>11/10/22</a:t>
+              <a:t>11/21/22</a:t>
             </a:fld>
             <a:endParaRPr lang="en-US"/>
           </a:p>
@@ -1445,7 +1445,7 @@
           <a:p>
             <a:fld id="{D3A28AA4-801E-B147-9E5C-6E6DBA6E23D1}" type="datetimeFigureOut">
               <a:rPr lang="en-US" smtClean="0"/>
-              <a:t>11/10/22</a:t>
+              <a:t>11/21/22</a:t>
             </a:fld>
             <a:endParaRPr lang="en-US"/>
           </a:p>
@@ -1677,7 +1677,7 @@
           <a:p>
             <a:fld id="{D3A28AA4-801E-B147-9E5C-6E6DBA6E23D1}" type="datetimeFigureOut">
               <a:rPr lang="en-US" smtClean="0"/>
-              <a:t>11/10/22</a:t>
+              <a:t>11/21/22</a:t>
             </a:fld>
             <a:endParaRPr lang="en-US"/>
           </a:p>
@@ -2044,7 +2044,7 @@
           <a:p>
             <a:fld id="{D3A28AA4-801E-B147-9E5C-6E6DBA6E23D1}" type="datetimeFigureOut">
               <a:rPr lang="en-US" smtClean="0"/>
-              <a:t>11/10/22</a:t>
+              <a:t>11/21/22</a:t>
             </a:fld>
             <a:endParaRPr lang="en-US"/>
           </a:p>
@@ -2162,7 +2162,7 @@
           <a:p>
             <a:fld id="{D3A28AA4-801E-B147-9E5C-6E6DBA6E23D1}" type="datetimeFigureOut">
               <a:rPr lang="en-US" smtClean="0"/>
-              <a:t>11/10/22</a:t>
+              <a:t>11/21/22</a:t>
             </a:fld>
             <a:endParaRPr lang="en-US"/>
           </a:p>
@@ -2257,7 +2257,7 @@
           <a:p>
             <a:fld id="{D3A28AA4-801E-B147-9E5C-6E6DBA6E23D1}" type="datetimeFigureOut">
               <a:rPr lang="en-US" smtClean="0"/>
-              <a:t>11/10/22</a:t>
+              <a:t>11/21/22</a:t>
             </a:fld>
             <a:endParaRPr lang="en-US"/>
           </a:p>
@@ -2534,7 +2534,7 @@
           <a:p>
             <a:fld id="{D3A28AA4-801E-B147-9E5C-6E6DBA6E23D1}" type="datetimeFigureOut">
               <a:rPr lang="en-US" smtClean="0"/>
-              <a:t>11/10/22</a:t>
+              <a:t>11/21/22</a:t>
             </a:fld>
             <a:endParaRPr lang="en-US"/>
           </a:p>
@@ -2791,7 +2791,7 @@
           <a:p>
             <a:fld id="{D3A28AA4-801E-B147-9E5C-6E6DBA6E23D1}" type="datetimeFigureOut">
               <a:rPr lang="en-US" smtClean="0"/>
-              <a:t>11/10/22</a:t>
+              <a:t>11/21/22</a:t>
             </a:fld>
             <a:endParaRPr lang="en-US"/>
           </a:p>
@@ -3004,7 +3004,7 @@
           <a:p>
             <a:fld id="{D3A28AA4-801E-B147-9E5C-6E6DBA6E23D1}" type="datetimeFigureOut">
               <a:rPr lang="en-US" smtClean="0"/>
-              <a:t>11/10/22</a:t>
+              <a:t>11/21/22</a:t>
             </a:fld>
             <a:endParaRPr lang="en-US"/>
           </a:p>
@@ -4340,7 +4340,7 @@
                 <a:latin typeface="Times New Roman" panose="02020603050405020304" pitchFamily="18" charset="0"/>
                 <a:cs typeface="Times New Roman" panose="02020603050405020304" pitchFamily="18" charset="0"/>
               </a:rPr>
-              <a:t>-0.129</a:t>
+              <a:t>-0.079</a:t>
             </a:r>
           </a:p>
         </p:txBody>
@@ -4388,7 +4388,7 @@
                 <a:latin typeface="Times New Roman" panose="02020603050405020304" pitchFamily="18" charset="0"/>
                 <a:cs typeface="Times New Roman" panose="02020603050405020304" pitchFamily="18" charset="0"/>
               </a:rPr>
-              <a:t>-0.039</a:t>
+              <a:t>-0.022</a:t>
             </a:r>
           </a:p>
         </p:txBody>
@@ -4592,7 +4592,7 @@
                 <a:latin typeface="Times New Roman" panose="02020603050405020304" pitchFamily="18" charset="0"/>
                 <a:cs typeface="Times New Roman" panose="02020603050405020304" pitchFamily="18" charset="0"/>
               </a:rPr>
-              <a:t>0.046</a:t>
+              <a:t>0.026</a:t>
             </a:r>
           </a:p>
         </p:txBody>
@@ -4640,7 +4640,7 @@
                 <a:latin typeface="Times New Roman" panose="02020603050405020304" pitchFamily="18" charset="0"/>
                 <a:cs typeface="Times New Roman" panose="02020603050405020304" pitchFamily="18" charset="0"/>
               </a:rPr>
-              <a:t>-0.052</a:t>
+              <a:t>-0.059</a:t>
             </a:r>
           </a:p>
         </p:txBody>
@@ -4688,7 +4688,7 @@
                 <a:latin typeface="Times New Roman" panose="02020603050405020304" pitchFamily="18" charset="0"/>
                 <a:cs typeface="Times New Roman" panose="02020603050405020304" pitchFamily="18" charset="0"/>
               </a:rPr>
-              <a:t>-0.037</a:t>
+              <a:t>-0.039</a:t>
             </a:r>
           </a:p>
         </p:txBody>
@@ -4736,7 +4736,7 @@
                 <a:latin typeface="Times New Roman" panose="02020603050405020304" pitchFamily="18" charset="0"/>
                 <a:cs typeface="Times New Roman" panose="02020603050405020304" pitchFamily="18" charset="0"/>
               </a:rPr>
-              <a:t>0.019</a:t>
+              <a:t>0.020</a:t>
             </a:r>
           </a:p>
         </p:txBody>
@@ -4781,7 +4781,7 @@
                 <a:latin typeface="Times New Roman" panose="02020603050405020304" pitchFamily="18" charset="0"/>
                 <a:cs typeface="Times New Roman" panose="02020603050405020304" pitchFamily="18" charset="0"/>
               </a:rPr>
-              <a:t>-0.176</a:t>
+              <a:t>-0.173</a:t>
             </a:r>
           </a:p>
         </p:txBody>
@@ -4829,7 +4829,7 @@
                 <a:latin typeface="Times New Roman" panose="02020603050405020304" pitchFamily="18" charset="0"/>
                 <a:cs typeface="Times New Roman" panose="02020603050405020304" pitchFamily="18" charset="0"/>
               </a:rPr>
-              <a:t>-0.080</a:t>
+              <a:t>-0.081</a:t>
             </a:r>
           </a:p>
         </p:txBody>
@@ -4975,7 +4975,7 @@
                 <a:latin typeface="Times New Roman" panose="02020603050405020304" pitchFamily="18" charset="0"/>
                 <a:cs typeface="Times New Roman" panose="02020603050405020304" pitchFamily="18" charset="0"/>
               </a:rPr>
-              <a:t>-1.515</a:t>
+              <a:t>-0.902</a:t>
             </a:r>
           </a:p>
         </p:txBody>
@@ -5066,7 +5066,7 @@
                 <a:latin typeface="Times New Roman" panose="02020603050405020304" pitchFamily="18" charset="0"/>
                 <a:cs typeface="Times New Roman" panose="02020603050405020304" pitchFamily="18" charset="0"/>
               </a:rPr>
-              <a:t>-0.775</a:t>
+              <a:t>-0.774</a:t>
             </a:r>
           </a:p>
         </p:txBody>
@@ -5155,7 +5155,7 @@
                 <a:latin typeface="Times New Roman" panose="02020603050405020304" pitchFamily="18" charset="0"/>
                 <a:cs typeface="Times New Roman" panose="02020603050405020304" pitchFamily="18" charset="0"/>
               </a:rPr>
-              <a:t>-0.597</a:t>
+              <a:t>-0.602</a:t>
             </a:r>
           </a:p>
         </p:txBody>
@@ -5244,7 +5244,7 @@
                 <a:latin typeface="Times New Roman" panose="02020603050405020304" pitchFamily="18" charset="0"/>
                 <a:cs typeface="Times New Roman" panose="02020603050405020304" pitchFamily="18" charset="0"/>
               </a:rPr>
-              <a:t>-0.544</a:t>
+              <a:t>-0.540</a:t>
             </a:r>
           </a:p>
         </p:txBody>
@@ -5447,7 +5447,7 @@
                 <a:latin typeface="Times New Roman" panose="02020603050405020304" pitchFamily="18" charset="0"/>
                 <a:cs typeface="Times New Roman" panose="02020603050405020304" pitchFamily="18" charset="0"/>
               </a:rPr>
-              <a:t>0.528</a:t>
+              <a:t>0.527</a:t>
             </a:r>
           </a:p>
         </p:txBody>

</xml_diff>

<commit_message>
update manuscript, tables, figs with new soil moisture measures
</commit_message>
<xml_diff>
--- a/working_drafts/figs/TXeco_SEM_ppt_fig.pptx
+++ b/working_drafts/figs/TXeco_SEM_ppt_fig.pptx
@@ -197,7 +197,7 @@
           <a:p>
             <a:fld id="{9C8338E3-F40D-F146-8D3B-4726E84D5200}" type="datetimeFigureOut">
               <a:rPr lang="en-US" smtClean="0"/>
-              <a:t>11/21/22</a:t>
+              <a:t>11/26/22</a:t>
             </a:fld>
             <a:endParaRPr lang="en-US"/>
           </a:p>
@@ -679,7 +679,7 @@
           <a:p>
             <a:fld id="{D3A28AA4-801E-B147-9E5C-6E6DBA6E23D1}" type="datetimeFigureOut">
               <a:rPr lang="en-US" smtClean="0"/>
-              <a:t>11/21/22</a:t>
+              <a:t>11/26/22</a:t>
             </a:fld>
             <a:endParaRPr lang="en-US"/>
           </a:p>
@@ -849,7 +849,7 @@
           <a:p>
             <a:fld id="{D3A28AA4-801E-B147-9E5C-6E6DBA6E23D1}" type="datetimeFigureOut">
               <a:rPr lang="en-US" smtClean="0"/>
-              <a:t>11/21/22</a:t>
+              <a:t>11/26/22</a:t>
             </a:fld>
             <a:endParaRPr lang="en-US"/>
           </a:p>
@@ -1029,7 +1029,7 @@
           <a:p>
             <a:fld id="{D3A28AA4-801E-B147-9E5C-6E6DBA6E23D1}" type="datetimeFigureOut">
               <a:rPr lang="en-US" smtClean="0"/>
-              <a:t>11/21/22</a:t>
+              <a:t>11/26/22</a:t>
             </a:fld>
             <a:endParaRPr lang="en-US"/>
           </a:p>
@@ -1199,7 +1199,7 @@
           <a:p>
             <a:fld id="{D3A28AA4-801E-B147-9E5C-6E6DBA6E23D1}" type="datetimeFigureOut">
               <a:rPr lang="en-US" smtClean="0"/>
-              <a:t>11/21/22</a:t>
+              <a:t>11/26/22</a:t>
             </a:fld>
             <a:endParaRPr lang="en-US"/>
           </a:p>
@@ -1445,7 +1445,7 @@
           <a:p>
             <a:fld id="{D3A28AA4-801E-B147-9E5C-6E6DBA6E23D1}" type="datetimeFigureOut">
               <a:rPr lang="en-US" smtClean="0"/>
-              <a:t>11/21/22</a:t>
+              <a:t>11/26/22</a:t>
             </a:fld>
             <a:endParaRPr lang="en-US"/>
           </a:p>
@@ -1677,7 +1677,7 @@
           <a:p>
             <a:fld id="{D3A28AA4-801E-B147-9E5C-6E6DBA6E23D1}" type="datetimeFigureOut">
               <a:rPr lang="en-US" smtClean="0"/>
-              <a:t>11/21/22</a:t>
+              <a:t>11/26/22</a:t>
             </a:fld>
             <a:endParaRPr lang="en-US"/>
           </a:p>
@@ -2044,7 +2044,7 @@
           <a:p>
             <a:fld id="{D3A28AA4-801E-B147-9E5C-6E6DBA6E23D1}" type="datetimeFigureOut">
               <a:rPr lang="en-US" smtClean="0"/>
-              <a:t>11/21/22</a:t>
+              <a:t>11/26/22</a:t>
             </a:fld>
             <a:endParaRPr lang="en-US"/>
           </a:p>
@@ -2162,7 +2162,7 @@
           <a:p>
             <a:fld id="{D3A28AA4-801E-B147-9E5C-6E6DBA6E23D1}" type="datetimeFigureOut">
               <a:rPr lang="en-US" smtClean="0"/>
-              <a:t>11/21/22</a:t>
+              <a:t>11/26/22</a:t>
             </a:fld>
             <a:endParaRPr lang="en-US"/>
           </a:p>
@@ -2257,7 +2257,7 @@
           <a:p>
             <a:fld id="{D3A28AA4-801E-B147-9E5C-6E6DBA6E23D1}" type="datetimeFigureOut">
               <a:rPr lang="en-US" smtClean="0"/>
-              <a:t>11/21/22</a:t>
+              <a:t>11/26/22</a:t>
             </a:fld>
             <a:endParaRPr lang="en-US"/>
           </a:p>
@@ -2534,7 +2534,7 @@
           <a:p>
             <a:fld id="{D3A28AA4-801E-B147-9E5C-6E6DBA6E23D1}" type="datetimeFigureOut">
               <a:rPr lang="en-US" smtClean="0"/>
-              <a:t>11/21/22</a:t>
+              <a:t>11/26/22</a:t>
             </a:fld>
             <a:endParaRPr lang="en-US"/>
           </a:p>
@@ -2791,7 +2791,7 @@
           <a:p>
             <a:fld id="{D3A28AA4-801E-B147-9E5C-6E6DBA6E23D1}" type="datetimeFigureOut">
               <a:rPr lang="en-US" smtClean="0"/>
-              <a:t>11/21/22</a:t>
+              <a:t>11/26/22</a:t>
             </a:fld>
             <a:endParaRPr lang="en-US"/>
           </a:p>
@@ -3004,7 +3004,7 @@
           <a:p>
             <a:fld id="{D3A28AA4-801E-B147-9E5C-6E6DBA6E23D1}" type="datetimeFigureOut">
               <a:rPr lang="en-US" smtClean="0"/>
-              <a:t>11/21/22</a:t>
+              <a:t>11/26/22</a:t>
             </a:fld>
             <a:endParaRPr lang="en-US"/>
           </a:p>
@@ -3432,7 +3432,7 @@
           <a:prstGeom prst="straightConnector1">
             <a:avLst/>
           </a:prstGeom>
-          <a:ln w="118491">
+          <a:ln w="120777">
             <a:solidFill>
               <a:srgbClr val="C00000"/>
             </a:solidFill>
@@ -3775,7 +3775,7 @@
           <a:prstGeom prst="straightConnector1">
             <a:avLst/>
           </a:prstGeom>
-          <a:ln w="35306">
+          <a:ln w="36449">
             <a:solidFill>
               <a:schemeClr val="bg2">
                 <a:lumMod val="75000"/>
@@ -3822,7 +3822,7 @@
           <a:prstGeom prst="straightConnector1">
             <a:avLst/>
           </a:prstGeom>
-          <a:ln w="38862">
+          <a:ln w="48133">
             <a:solidFill>
               <a:srgbClr val="C00000"/>
             </a:solidFill>
@@ -3867,7 +3867,7 @@
           <a:prstGeom prst="straightConnector1">
             <a:avLst/>
           </a:prstGeom>
-          <a:ln w="34036">
+          <a:ln w="42037">
             <a:solidFill>
               <a:schemeClr val="bg2">
                 <a:lumMod val="75000"/>
@@ -3915,13 +3915,11 @@
           <a:prstGeom prst="straightConnector1">
             <a:avLst/>
           </a:prstGeom>
-          <a:ln w="31623">
+          <a:ln w="40513">
             <a:solidFill>
-              <a:schemeClr val="bg2">
-                <a:lumMod val="75000"/>
-              </a:schemeClr>
+              <a:srgbClr val="C00000"/>
             </a:solidFill>
-            <a:prstDash val="dash"/>
+            <a:prstDash val="solid"/>
             <a:tailEnd type="triangle"/>
           </a:ln>
         </p:spPr>
@@ -3964,7 +3962,7 @@
           <a:prstGeom prst="straightConnector1">
             <a:avLst/>
           </a:prstGeom>
-          <a:ln w="33147">
+          <a:ln w="35433">
             <a:solidFill>
               <a:schemeClr val="bg2">
                 <a:lumMod val="75000"/>
@@ -4013,7 +4011,7 @@
           <a:prstGeom prst="straightConnector1">
             <a:avLst/>
           </a:prstGeom>
-          <a:ln w="33528">
+          <a:ln w="36830">
             <a:solidFill>
               <a:schemeClr val="bg2">
                 <a:lumMod val="75000"/>
@@ -4062,7 +4060,7 @@
           <a:prstGeom prst="straightConnector1">
             <a:avLst/>
           </a:prstGeom>
-          <a:ln w="38608">
+          <a:ln w="40767">
             <a:solidFill>
               <a:srgbClr val="C00000"/>
             </a:solidFill>
@@ -4314,7 +4312,7 @@
         </p:nvSpPr>
         <p:spPr>
           <a:xfrm>
-            <a:off x="7556801" y="4760608"/>
+            <a:off x="7556801" y="4771625"/>
             <a:ext cx="979755" cy="461665"/>
           </a:xfrm>
           <a:prstGeom prst="rect">
@@ -4323,7 +4321,7 @@
           <a:solidFill>
             <a:schemeClr val="bg1"/>
           </a:solidFill>
-          <a:ln w="38608">
+          <a:ln w="40767">
             <a:solidFill>
               <a:srgbClr val="C00000"/>
             </a:solidFill>
@@ -4340,7 +4338,7 @@
                 <a:latin typeface="Times New Roman" panose="02020603050405020304" pitchFamily="18" charset="0"/>
                 <a:cs typeface="Times New Roman" panose="02020603050405020304" pitchFamily="18" charset="0"/>
               </a:rPr>
-              <a:t>-0.079</a:t>
+              <a:t>-0.109</a:t>
             </a:r>
           </a:p>
         </p:txBody>
@@ -4368,7 +4366,7 @@
           <a:solidFill>
             <a:schemeClr val="bg1"/>
           </a:solidFill>
-          <a:ln w="33528">
+          <a:ln w="36830">
             <a:solidFill>
               <a:schemeClr val="bg2">
                 <a:lumMod val="75000"/>
@@ -4388,7 +4386,7 @@
                 <a:latin typeface="Times New Roman" panose="02020603050405020304" pitchFamily="18" charset="0"/>
                 <a:cs typeface="Times New Roman" panose="02020603050405020304" pitchFamily="18" charset="0"/>
               </a:rPr>
-              <a:t>-0.022</a:t>
+              <a:t>-0.051</a:t>
             </a:r>
           </a:p>
         </p:txBody>
@@ -4416,7 +4414,7 @@
           <a:prstGeom prst="straightConnector1">
             <a:avLst/>
           </a:prstGeom>
-          <a:ln w="33909">
+          <a:ln w="35687">
             <a:solidFill>
               <a:schemeClr val="bg2">
                 <a:lumMod val="75000"/>
@@ -4572,7 +4570,7 @@
           <a:solidFill>
             <a:schemeClr val="bg1"/>
           </a:solidFill>
-          <a:ln w="33909">
+          <a:ln w="35687">
             <a:solidFill>
               <a:schemeClr val="bg2">
                 <a:lumMod val="75000"/>
@@ -4592,7 +4590,7 @@
                 <a:latin typeface="Times New Roman" panose="02020603050405020304" pitchFamily="18" charset="0"/>
                 <a:cs typeface="Times New Roman" panose="02020603050405020304" pitchFamily="18" charset="0"/>
               </a:rPr>
-              <a:t>0.026</a:t>
+              <a:t>0.036</a:t>
             </a:r>
           </a:p>
         </p:txBody>
@@ -4620,7 +4618,7 @@
           <a:solidFill>
             <a:schemeClr val="bg1"/>
           </a:solidFill>
-          <a:ln w="33655">
+          <a:ln w="42037">
             <a:solidFill>
               <a:schemeClr val="bg2">
                 <a:lumMod val="75000"/>
@@ -4640,7 +4638,7 @@
                 <a:latin typeface="Times New Roman" panose="02020603050405020304" pitchFamily="18" charset="0"/>
                 <a:cs typeface="Times New Roman" panose="02020603050405020304" pitchFamily="18" charset="0"/>
               </a:rPr>
-              <a:t>-0.059</a:t>
+              <a:t>-0.127</a:t>
             </a:r>
           </a:p>
         </p:txBody>
@@ -4668,13 +4666,11 @@
           <a:solidFill>
             <a:schemeClr val="bg1"/>
           </a:solidFill>
-          <a:ln w="31623">
+          <a:ln w="40513">
             <a:solidFill>
-              <a:schemeClr val="bg2">
-                <a:lumMod val="75000"/>
-              </a:schemeClr>
+              <a:srgbClr val="C00000"/>
             </a:solidFill>
-            <a:prstDash val="dash"/>
+            <a:prstDash val="solid"/>
           </a:ln>
         </p:spPr>
         <p:txBody>
@@ -4684,11 +4680,11 @@
           <a:lstStyle/>
           <a:p>
             <a:r>
-              <a:rPr lang="en-US" sz="2400" dirty="0">
+              <a:rPr lang="en-US" sz="2400" b="1" dirty="0">
                 <a:latin typeface="Times New Roman" panose="02020603050405020304" pitchFamily="18" charset="0"/>
                 <a:cs typeface="Times New Roman" panose="02020603050405020304" pitchFamily="18" charset="0"/>
               </a:rPr>
-              <a:t>-0.039</a:t>
+              <a:t>-0.104</a:t>
             </a:r>
           </a:p>
         </p:txBody>
@@ -4716,7 +4712,7 @@
           <a:solidFill>
             <a:schemeClr val="bg1"/>
           </a:solidFill>
-          <a:ln w="33147">
+          <a:ln w="35433">
             <a:solidFill>
               <a:schemeClr val="bg2">
                 <a:lumMod val="75000"/>
@@ -4736,7 +4732,7 @@
                 <a:latin typeface="Times New Roman" panose="02020603050405020304" pitchFamily="18" charset="0"/>
                 <a:cs typeface="Times New Roman" panose="02020603050405020304" pitchFamily="18" charset="0"/>
               </a:rPr>
-              <a:t>0.020</a:t>
+              <a:t>0.032</a:t>
             </a:r>
           </a:p>
         </p:txBody>
@@ -4764,7 +4760,7 @@
           <a:solidFill>
             <a:schemeClr val="bg1"/>
           </a:solidFill>
-          <a:ln w="38862">
+          <a:ln w="48133">
             <a:solidFill>
               <a:srgbClr val="C00000"/>
             </a:solidFill>
@@ -4781,7 +4777,7 @@
                 <a:latin typeface="Times New Roman" panose="02020603050405020304" pitchFamily="18" charset="0"/>
                 <a:cs typeface="Times New Roman" panose="02020603050405020304" pitchFamily="18" charset="0"/>
               </a:rPr>
-              <a:t>-0.173</a:t>
+              <a:t>-0.214</a:t>
             </a:r>
           </a:p>
         </p:txBody>
@@ -4809,7 +4805,7 @@
           <a:solidFill>
             <a:schemeClr val="bg1"/>
           </a:solidFill>
-          <a:ln w="35306">
+          <a:ln w="36449">
             <a:solidFill>
               <a:schemeClr val="bg2">
                 <a:lumMod val="75000"/>
@@ -4829,7 +4825,7 @@
                 <a:latin typeface="Times New Roman" panose="02020603050405020304" pitchFamily="18" charset="0"/>
                 <a:cs typeface="Times New Roman" panose="02020603050405020304" pitchFamily="18" charset="0"/>
               </a:rPr>
-              <a:t>-0.081</a:t>
+              <a:t>-0.046</a:t>
             </a:r>
           </a:p>
         </p:txBody>
@@ -4958,7 +4954,7 @@
           <a:solidFill>
             <a:schemeClr val="bg1"/>
           </a:solidFill>
-          <a:ln w="118491">
+          <a:ln w="120777">
             <a:solidFill>
               <a:srgbClr val="C00000"/>
             </a:solidFill>
@@ -4975,7 +4971,7 @@
                 <a:latin typeface="Times New Roman" panose="02020603050405020304" pitchFamily="18" charset="0"/>
                 <a:cs typeface="Times New Roman" panose="02020603050405020304" pitchFamily="18" charset="0"/>
               </a:rPr>
-              <a:t>-0.902</a:t>
+              <a:t>-1.254</a:t>
             </a:r>
           </a:p>
         </p:txBody>
@@ -5004,7 +5000,7 @@
           <a:prstGeom prst="straightConnector1">
             <a:avLst/>
           </a:prstGeom>
-          <a:ln w="76454">
+          <a:ln w="92329">
             <a:solidFill>
               <a:srgbClr val="C00000"/>
             </a:solidFill>
@@ -5049,7 +5045,7 @@
           <a:solidFill>
             <a:schemeClr val="bg1"/>
           </a:solidFill>
-          <a:ln w="76454">
+          <a:ln w="92329">
             <a:solidFill>
               <a:srgbClr val="C00000"/>
             </a:solidFill>
@@ -5066,7 +5062,7 @@
                 <a:latin typeface="Times New Roman" panose="02020603050405020304" pitchFamily="18" charset="0"/>
                 <a:cs typeface="Times New Roman" panose="02020603050405020304" pitchFamily="18" charset="0"/>
               </a:rPr>
-              <a:t>-0.774</a:t>
+              <a:t>-0.848</a:t>
             </a:r>
           </a:p>
         </p:txBody>
@@ -5093,7 +5089,7 @@
           <a:prstGeom prst="straightConnector1">
             <a:avLst/>
           </a:prstGeom>
-          <a:ln w="65659">
+          <a:ln w="74168">
             <a:solidFill>
               <a:srgbClr val="C00000"/>
             </a:solidFill>
@@ -5138,7 +5134,7 @@
           <a:solidFill>
             <a:schemeClr val="bg1"/>
           </a:solidFill>
-          <a:ln w="65659">
+          <a:ln w="74168">
             <a:solidFill>
               <a:srgbClr val="C00000"/>
             </a:solidFill>
@@ -5155,7 +5151,7 @@
                 <a:latin typeface="Times New Roman" panose="02020603050405020304" pitchFamily="18" charset="0"/>
                 <a:cs typeface="Times New Roman" panose="02020603050405020304" pitchFamily="18" charset="0"/>
               </a:rPr>
-              <a:t>-0.602</a:t>
+              <a:t>-0.587</a:t>
             </a:r>
           </a:p>
         </p:txBody>
@@ -5182,10 +5178,13 @@
           <a:prstGeom prst="straightConnector1">
             <a:avLst/>
           </a:prstGeom>
-          <a:ln w="62102">
+          <a:ln w="38608">
             <a:solidFill>
-              <a:schemeClr val="accent1"/>
+              <a:schemeClr val="bg2">
+                <a:lumMod val="75000"/>
+              </a:schemeClr>
             </a:solidFill>
+            <a:prstDash val="dash"/>
             <a:tailEnd type="triangle"/>
           </a:ln>
         </p:spPr>
@@ -5219,7 +5218,7 @@
         <p:spPr>
           <a:xfrm>
             <a:off x="1001464" y="3198165"/>
-            <a:ext cx="979755" cy="461665"/>
+            <a:ext cx="877163" cy="461665"/>
           </a:xfrm>
           <a:prstGeom prst="rect">
             <a:avLst/>
@@ -5227,10 +5226,13 @@
           <a:solidFill>
             <a:schemeClr val="bg1"/>
           </a:solidFill>
-          <a:ln w="62102">
+          <a:ln w="38608">
             <a:solidFill>
-              <a:schemeClr val="accent1"/>
+              <a:schemeClr val="bg2">
+                <a:lumMod val="75000"/>
+              </a:schemeClr>
             </a:solidFill>
+            <a:prstDash val="dash"/>
           </a:ln>
         </p:spPr>
         <p:txBody>
@@ -5240,11 +5242,11 @@
           <a:lstStyle/>
           <a:p>
             <a:r>
-              <a:rPr lang="en-US" sz="2400" b="1" dirty="0">
+              <a:rPr lang="en-US" sz="2400" dirty="0">
                 <a:latin typeface="Times New Roman" panose="02020603050405020304" pitchFamily="18" charset="0"/>
                 <a:cs typeface="Times New Roman" panose="02020603050405020304" pitchFamily="18" charset="0"/>
               </a:rPr>
-              <a:t>-0.540</a:t>
+              <a:t>0.078</a:t>
             </a:r>
           </a:p>
         </p:txBody>
@@ -5328,7 +5330,7 @@
           <a:prstGeom prst="straightConnector1">
             <a:avLst/>
           </a:prstGeom>
-          <a:ln w="65659">
+          <a:ln w="69342">
             <a:headEnd type="triangle"/>
             <a:tailEnd type="triangle"/>
           </a:ln>
@@ -5430,7 +5432,7 @@
           <a:solidFill>
             <a:schemeClr val="bg1"/>
           </a:solidFill>
-          <a:ln w="65659">
+          <a:ln w="69342">
             <a:solidFill>
               <a:schemeClr val="accent1"/>
             </a:solidFill>
@@ -5447,7 +5449,7 @@
                 <a:latin typeface="Times New Roman" panose="02020603050405020304" pitchFamily="18" charset="0"/>
                 <a:cs typeface="Times New Roman" panose="02020603050405020304" pitchFamily="18" charset="0"/>
               </a:rPr>
-              <a:t>0.527</a:t>
+              <a:t>0.517</a:t>
             </a:r>
           </a:p>
         </p:txBody>

</xml_diff>

<commit_message>
start working through discussion bad draft; modify WHC due to incorrect OM units
</commit_message>
<xml_diff>
--- a/working_drafts/figs/TXeco_SEM_ppt_fig.pptx
+++ b/working_drafts/figs/TXeco_SEM_ppt_fig.pptx
@@ -5,10 +5,11 @@
     <p:sldMasterId id="2147483672" r:id="rId1"/>
   </p:sldMasterIdLst>
   <p:notesMasterIdLst>
-    <p:notesMasterId r:id="rId3"/>
+    <p:notesMasterId r:id="rId4"/>
   </p:notesMasterIdLst>
   <p:sldIdLst>
     <p:sldId id="258" r:id="rId2"/>
+    <p:sldId id="260" r:id="rId3"/>
   </p:sldIdLst>
   <p:sldSz cx="18288000" cy="10972800"/>
   <p:notesSz cx="6858000" cy="9144000"/>
@@ -197,7 +198,7 @@
           <a:p>
             <a:fld id="{9C8338E3-F40D-F146-8D3B-4726E84D5200}" type="datetimeFigureOut">
               <a:rPr lang="en-US" smtClean="0"/>
-              <a:t>11/29/22</a:t>
+              <a:t>11/30/22</a:t>
             </a:fld>
             <a:endParaRPr lang="en-US"/>
           </a:p>
@@ -553,6 +554,95 @@
 </p:notes>
 </file>
 
+<file path=ppt/notesSlides/notesSlide2.xml><?xml version="1.0" encoding="utf-8"?>
+<p:notes xmlns:a="http://schemas.openxmlformats.org/drawingml/2006/main" xmlns:r="http://schemas.openxmlformats.org/officeDocument/2006/relationships" xmlns:p="http://schemas.openxmlformats.org/presentationml/2006/main">
+  <p:cSld>
+    <p:spTree>
+      <p:nvGrpSpPr>
+        <p:cNvPr id="1" name=""/>
+        <p:cNvGrpSpPr/>
+        <p:nvPr/>
+      </p:nvGrpSpPr>
+      <p:grpSpPr>
+        <a:xfrm>
+          <a:off x="0" y="0"/>
+          <a:ext cx="0" cy="0"/>
+          <a:chOff x="0" y="0"/>
+          <a:chExt cx="0" cy="0"/>
+        </a:xfrm>
+      </p:grpSpPr>
+      <p:sp>
+        <p:nvSpPr>
+          <p:cNvPr id="2" name="Slide Image Placeholder 1"/>
+          <p:cNvSpPr>
+            <a:spLocks noGrp="1" noRot="1" noChangeAspect="1"/>
+          </p:cNvSpPr>
+          <p:nvPr>
+            <p:ph type="sldImg"/>
+          </p:nvPr>
+        </p:nvSpPr>
+        <p:spPr>
+          <a:xfrm>
+            <a:off x="857250" y="1143000"/>
+            <a:ext cx="5143500" cy="3086100"/>
+          </a:xfrm>
+        </p:spPr>
+      </p:sp>
+      <p:sp>
+        <p:nvSpPr>
+          <p:cNvPr id="3" name="Notes Placeholder 2"/>
+          <p:cNvSpPr>
+            <a:spLocks noGrp="1"/>
+          </p:cNvSpPr>
+          <p:nvPr>
+            <p:ph type="body" idx="1"/>
+          </p:nvPr>
+        </p:nvSpPr>
+        <p:spPr/>
+        <p:txBody>
+          <a:bodyPr/>
+          <a:lstStyle/>
+          <a:p>
+            <a:endParaRPr lang="en-US" dirty="0"/>
+          </a:p>
+        </p:txBody>
+      </p:sp>
+      <p:sp>
+        <p:nvSpPr>
+          <p:cNvPr id="4" name="Slide Number Placeholder 3"/>
+          <p:cNvSpPr>
+            <a:spLocks noGrp="1"/>
+          </p:cNvSpPr>
+          <p:nvPr>
+            <p:ph type="sldNum" sz="quarter" idx="5"/>
+          </p:nvPr>
+        </p:nvSpPr>
+        <p:spPr/>
+        <p:txBody>
+          <a:bodyPr/>
+          <a:lstStyle/>
+          <a:p>
+            <a:fld id="{C2800238-33D2-A44F-8135-A0F534DB873D}" type="slidenum">
+              <a:rPr lang="en-US" smtClean="0"/>
+              <a:t>2</a:t>
+            </a:fld>
+            <a:endParaRPr lang="en-US"/>
+          </a:p>
+        </p:txBody>
+      </p:sp>
+    </p:spTree>
+    <p:extLst>
+      <p:ext uri="{BB962C8B-B14F-4D97-AF65-F5344CB8AC3E}">
+        <p14:creationId xmlns:p14="http://schemas.microsoft.com/office/powerpoint/2010/main" val="3917144414"/>
+      </p:ext>
+    </p:extLst>
+  </p:cSld>
+  <p:clrMapOvr>
+    <a:masterClrMapping/>
+  </p:clrMapOvr>
+</p:notes>
+</file>
+
 <file path=ppt/slideLayouts/slideLayout1.xml><?xml version="1.0" encoding="utf-8"?>
 <p:sldLayout xmlns:a="http://schemas.openxmlformats.org/drawingml/2006/main" xmlns:r="http://schemas.openxmlformats.org/officeDocument/2006/relationships" xmlns:p="http://schemas.openxmlformats.org/presentationml/2006/main" type="title" preserve="1">
   <p:cSld name="Title Slide">
@@ -684,7 +774,7 @@
           <a:p>
             <a:fld id="{D3A28AA4-801E-B147-9E5C-6E6DBA6E23D1}" type="datetimeFigureOut">
               <a:rPr lang="en-US" smtClean="0"/>
-              <a:t>11/29/22</a:t>
+              <a:t>11/30/22</a:t>
             </a:fld>
             <a:endParaRPr lang="en-US"/>
           </a:p>
@@ -854,7 +944,7 @@
           <a:p>
             <a:fld id="{D3A28AA4-801E-B147-9E5C-6E6DBA6E23D1}" type="datetimeFigureOut">
               <a:rPr lang="en-US" smtClean="0"/>
-              <a:t>11/29/22</a:t>
+              <a:t>11/30/22</a:t>
             </a:fld>
             <a:endParaRPr lang="en-US"/>
           </a:p>
@@ -1034,7 +1124,7 @@
           <a:p>
             <a:fld id="{D3A28AA4-801E-B147-9E5C-6E6DBA6E23D1}" type="datetimeFigureOut">
               <a:rPr lang="en-US" smtClean="0"/>
-              <a:t>11/29/22</a:t>
+              <a:t>11/30/22</a:t>
             </a:fld>
             <a:endParaRPr lang="en-US"/>
           </a:p>
@@ -1204,7 +1294,7 @@
           <a:p>
             <a:fld id="{D3A28AA4-801E-B147-9E5C-6E6DBA6E23D1}" type="datetimeFigureOut">
               <a:rPr lang="en-US" smtClean="0"/>
-              <a:t>11/29/22</a:t>
+              <a:t>11/30/22</a:t>
             </a:fld>
             <a:endParaRPr lang="en-US"/>
           </a:p>
@@ -1450,7 +1540,7 @@
           <a:p>
             <a:fld id="{D3A28AA4-801E-B147-9E5C-6E6DBA6E23D1}" type="datetimeFigureOut">
               <a:rPr lang="en-US" smtClean="0"/>
-              <a:t>11/29/22</a:t>
+              <a:t>11/30/22</a:t>
             </a:fld>
             <a:endParaRPr lang="en-US"/>
           </a:p>
@@ -1682,7 +1772,7 @@
           <a:p>
             <a:fld id="{D3A28AA4-801E-B147-9E5C-6E6DBA6E23D1}" type="datetimeFigureOut">
               <a:rPr lang="en-US" smtClean="0"/>
-              <a:t>11/29/22</a:t>
+              <a:t>11/30/22</a:t>
             </a:fld>
             <a:endParaRPr lang="en-US"/>
           </a:p>
@@ -2049,7 +2139,7 @@
           <a:p>
             <a:fld id="{D3A28AA4-801E-B147-9E5C-6E6DBA6E23D1}" type="datetimeFigureOut">
               <a:rPr lang="en-US" smtClean="0"/>
-              <a:t>11/29/22</a:t>
+              <a:t>11/30/22</a:t>
             </a:fld>
             <a:endParaRPr lang="en-US"/>
           </a:p>
@@ -2167,7 +2257,7 @@
           <a:p>
             <a:fld id="{D3A28AA4-801E-B147-9E5C-6E6DBA6E23D1}" type="datetimeFigureOut">
               <a:rPr lang="en-US" smtClean="0"/>
-              <a:t>11/29/22</a:t>
+              <a:t>11/30/22</a:t>
             </a:fld>
             <a:endParaRPr lang="en-US"/>
           </a:p>
@@ -2262,7 +2352,7 @@
           <a:p>
             <a:fld id="{D3A28AA4-801E-B147-9E5C-6E6DBA6E23D1}" type="datetimeFigureOut">
               <a:rPr lang="en-US" smtClean="0"/>
-              <a:t>11/29/22</a:t>
+              <a:t>11/30/22</a:t>
             </a:fld>
             <a:endParaRPr lang="en-US"/>
           </a:p>
@@ -2539,7 +2629,7 @@
           <a:p>
             <a:fld id="{D3A28AA4-801E-B147-9E5C-6E6DBA6E23D1}" type="datetimeFigureOut">
               <a:rPr lang="en-US" smtClean="0"/>
-              <a:t>11/29/22</a:t>
+              <a:t>11/30/22</a:t>
             </a:fld>
             <a:endParaRPr lang="en-US"/>
           </a:p>
@@ -2796,7 +2886,7 @@
           <a:p>
             <a:fld id="{D3A28AA4-801E-B147-9E5C-6E6DBA6E23D1}" type="datetimeFigureOut">
               <a:rPr lang="en-US" smtClean="0"/>
-              <a:t>11/29/22</a:t>
+              <a:t>11/30/22</a:t>
             </a:fld>
             <a:endParaRPr lang="en-US"/>
           </a:p>
@@ -3009,7 +3099,7 @@
           <a:p>
             <a:fld id="{D3A28AA4-801E-B147-9E5C-6E6DBA6E23D1}" type="datetimeFigureOut">
               <a:rPr lang="en-US" smtClean="0"/>
-              <a:t>11/29/22</a:t>
+              <a:t>11/30/22</a:t>
             </a:fld>
             <a:endParaRPr lang="en-US"/>
           </a:p>
@@ -3416,408 +3506,6 @@
       </p:grpSpPr>
       <p:cxnSp>
         <p:nvCxnSpPr>
-          <p:cNvPr id="103" name="Straight Connector 102">
-            <a:extLst>
-              <a:ext uri="{FF2B5EF4-FFF2-40B4-BE49-F238E27FC236}">
-                <a16:creationId xmlns:a16="http://schemas.microsoft.com/office/drawing/2014/main" id="{3615E4DF-6A91-8C3B-FFB2-7194B63E7197}"/>
-              </a:ext>
-            </a:extLst>
-          </p:cNvPr>
-          <p:cNvCxnSpPr>
-            <a:cxnSpLocks/>
-          </p:cNvCxnSpPr>
-          <p:nvPr/>
-        </p:nvCxnSpPr>
-        <p:spPr>
-          <a:xfrm>
-            <a:off x="11996059" y="5857443"/>
-            <a:ext cx="2635311" cy="2461"/>
-          </a:xfrm>
-          <a:prstGeom prst="line">
-            <a:avLst/>
-          </a:prstGeom>
-          <a:ln w="35560">
-            <a:solidFill>
-              <a:schemeClr val="bg2">
-                <a:lumMod val="75000"/>
-              </a:schemeClr>
-            </a:solidFill>
-            <a:prstDash val="dash"/>
-          </a:ln>
-        </p:spPr>
-        <p:style>
-          <a:lnRef idx="1">
-            <a:schemeClr val="accent1"/>
-          </a:lnRef>
-          <a:fillRef idx="0">
-            <a:schemeClr val="accent1"/>
-          </a:fillRef>
-          <a:effectRef idx="0">
-            <a:schemeClr val="accent1"/>
-          </a:effectRef>
-          <a:fontRef idx="minor">
-            <a:schemeClr val="tx1"/>
-          </a:fontRef>
-        </p:style>
-      </p:cxnSp>
-      <p:sp>
-        <p:nvSpPr>
-          <p:cNvPr id="25" name="Rectangle 24">
-            <a:extLst>
-              <a:ext uri="{FF2B5EF4-FFF2-40B4-BE49-F238E27FC236}">
-                <a16:creationId xmlns:a16="http://schemas.microsoft.com/office/drawing/2014/main" id="{82AC0384-6387-7D57-8EB4-896E679A9F4F}"/>
-              </a:ext>
-            </a:extLst>
-          </p:cNvPr>
-          <p:cNvSpPr/>
-          <p:nvPr/>
-        </p:nvSpPr>
-        <p:spPr>
-          <a:xfrm>
-            <a:off x="6400801" y="4795159"/>
-            <a:ext cx="1981200" cy="1382486"/>
-          </a:xfrm>
-          <a:prstGeom prst="rect">
-            <a:avLst/>
-          </a:prstGeom>
-          <a:solidFill>
-            <a:schemeClr val="bg1">
-              <a:alpha val="75000"/>
-            </a:schemeClr>
-          </a:solidFill>
-          <a:ln w="38100">
-            <a:solidFill>
-              <a:schemeClr val="tx1">
-                <a:alpha val="75000"/>
-              </a:schemeClr>
-            </a:solidFill>
-          </a:ln>
-        </p:spPr>
-        <p:style>
-          <a:lnRef idx="2">
-            <a:schemeClr val="accent1">
-              <a:shade val="50000"/>
-            </a:schemeClr>
-          </a:lnRef>
-          <a:fillRef idx="1">
-            <a:schemeClr val="accent1"/>
-          </a:fillRef>
-          <a:effectRef idx="0">
-            <a:schemeClr val="accent1"/>
-          </a:effectRef>
-          <a:fontRef idx="minor">
-            <a:schemeClr val="lt1"/>
-          </a:fontRef>
-        </p:style>
-        <p:txBody>
-          <a:bodyPr rtlCol="0" anchor="ctr"/>
-          <a:lstStyle/>
-          <a:p>
-            <a:pPr algn="ctr"/>
-            <a:endParaRPr lang="en-US" sz="2400"/>
-          </a:p>
-        </p:txBody>
-      </p:sp>
-      <p:sp>
-        <p:nvSpPr>
-          <p:cNvPr id="34" name="TextBox 33">
-            <a:extLst>
-              <a:ext uri="{FF2B5EF4-FFF2-40B4-BE49-F238E27FC236}">
-                <a16:creationId xmlns:a16="http://schemas.microsoft.com/office/drawing/2014/main" id="{B6CFD367-96BB-5333-BB7D-2A376BBD254A}"/>
-              </a:ext>
-            </a:extLst>
-          </p:cNvPr>
-          <p:cNvSpPr txBox="1"/>
-          <p:nvPr/>
-        </p:nvSpPr>
-        <p:spPr>
-          <a:xfrm>
-            <a:off x="2922398" y="2384206"/>
-            <a:ext cx="1709892" cy="1077218"/>
-          </a:xfrm>
-          <a:prstGeom prst="rect">
-            <a:avLst/>
-          </a:prstGeom>
-          <a:noFill/>
-        </p:spPr>
-        <p:txBody>
-          <a:bodyPr wrap="none" rtlCol="0">
-            <a:spAutoFit/>
-          </a:bodyPr>
-          <a:lstStyle/>
-          <a:p>
-            <a:pPr algn="ctr"/>
-            <a:r>
-              <a:rPr lang="en-US" sz="3200" i="1" dirty="0">
-                <a:latin typeface="Times New Roman" panose="02020603050405020304" pitchFamily="18" charset="0"/>
-                <a:cs typeface="Times New Roman" panose="02020603050405020304" pitchFamily="18" charset="0"/>
-              </a:rPr>
-              <a:t>Soil </a:t>
-            </a:r>
-          </a:p>
-          <a:p>
-            <a:pPr algn="ctr"/>
-            <a:r>
-              <a:rPr lang="en-US" sz="3200" i="1" dirty="0">
-                <a:latin typeface="Times New Roman" panose="02020603050405020304" pitchFamily="18" charset="0"/>
-                <a:cs typeface="Times New Roman" panose="02020603050405020304" pitchFamily="18" charset="0"/>
-              </a:rPr>
-              <a:t>moisture </a:t>
-            </a:r>
-          </a:p>
-        </p:txBody>
-      </p:sp>
-      <p:sp>
-        <p:nvSpPr>
-          <p:cNvPr id="35" name="TextBox 34">
-            <a:extLst>
-              <a:ext uri="{FF2B5EF4-FFF2-40B4-BE49-F238E27FC236}">
-                <a16:creationId xmlns:a16="http://schemas.microsoft.com/office/drawing/2014/main" id="{6C89A079-ABD7-0D73-12B2-BAE34517A0DC}"/>
-              </a:ext>
-            </a:extLst>
-          </p:cNvPr>
-          <p:cNvSpPr txBox="1"/>
-          <p:nvPr/>
-        </p:nvSpPr>
-        <p:spPr>
-          <a:xfrm>
-            <a:off x="2945641" y="7511377"/>
-            <a:ext cx="1663404" cy="1077218"/>
-          </a:xfrm>
-          <a:prstGeom prst="rect">
-            <a:avLst/>
-          </a:prstGeom>
-          <a:noFill/>
-        </p:spPr>
-        <p:txBody>
-          <a:bodyPr wrap="none" rtlCol="0">
-            <a:spAutoFit/>
-          </a:bodyPr>
-          <a:lstStyle/>
-          <a:p>
-            <a:pPr algn="ctr"/>
-            <a:r>
-              <a:rPr lang="en-US" sz="3200" i="1" dirty="0">
-                <a:latin typeface="Times New Roman" panose="02020603050405020304" pitchFamily="18" charset="0"/>
-                <a:cs typeface="Times New Roman" panose="02020603050405020304" pitchFamily="18" charset="0"/>
-              </a:rPr>
-              <a:t>Soil </a:t>
-            </a:r>
-          </a:p>
-          <a:p>
-            <a:pPr algn="ctr"/>
-            <a:r>
-              <a:rPr lang="en-US" sz="3200" i="1" dirty="0">
-                <a:latin typeface="Times New Roman" panose="02020603050405020304" pitchFamily="18" charset="0"/>
-                <a:cs typeface="Times New Roman" panose="02020603050405020304" pitchFamily="18" charset="0"/>
-              </a:rPr>
-              <a:t>nitrogen </a:t>
-            </a:r>
-          </a:p>
-        </p:txBody>
-      </p:sp>
-      <p:sp>
-        <p:nvSpPr>
-          <p:cNvPr id="36" name="TextBox 35">
-            <a:extLst>
-              <a:ext uri="{FF2B5EF4-FFF2-40B4-BE49-F238E27FC236}">
-                <a16:creationId xmlns:a16="http://schemas.microsoft.com/office/drawing/2014/main" id="{3E1B6594-EF86-7605-E52C-34BEFF337746}"/>
-              </a:ext>
-            </a:extLst>
-          </p:cNvPr>
-          <p:cNvSpPr txBox="1"/>
-          <p:nvPr/>
-        </p:nvSpPr>
-        <p:spPr>
-          <a:xfrm>
-            <a:off x="7196476" y="5194013"/>
-            <a:ext cx="389850" cy="584775"/>
-          </a:xfrm>
-          <a:prstGeom prst="rect">
-            <a:avLst/>
-          </a:prstGeom>
-          <a:noFill/>
-        </p:spPr>
-        <p:txBody>
-          <a:bodyPr wrap="none" rtlCol="0">
-            <a:spAutoFit/>
-          </a:bodyPr>
-          <a:lstStyle/>
-          <a:p>
-            <a:pPr algn="ctr"/>
-            <a:r>
-              <a:rPr lang="el-GR" sz="3200" i="1" dirty="0">
-                <a:latin typeface="Times New Roman" panose="02020603050405020304" pitchFamily="18" charset="0"/>
-                <a:cs typeface="Times New Roman" panose="02020603050405020304" pitchFamily="18" charset="0"/>
-              </a:rPr>
-              <a:t>β</a:t>
-            </a:r>
-            <a:endParaRPr lang="en-US" sz="3200" i="1" dirty="0">
-              <a:latin typeface="Times New Roman" panose="02020603050405020304" pitchFamily="18" charset="0"/>
-              <a:cs typeface="Times New Roman" panose="02020603050405020304" pitchFamily="18" charset="0"/>
-            </a:endParaRPr>
-          </a:p>
-        </p:txBody>
-      </p:sp>
-      <p:sp>
-        <p:nvSpPr>
-          <p:cNvPr id="38" name="TextBox 37">
-            <a:extLst>
-              <a:ext uri="{FF2B5EF4-FFF2-40B4-BE49-F238E27FC236}">
-                <a16:creationId xmlns:a16="http://schemas.microsoft.com/office/drawing/2014/main" id="{DEE8EFC0-1B48-8EC0-A5FB-9B65CBC229DB}"/>
-              </a:ext>
-            </a:extLst>
-          </p:cNvPr>
-          <p:cNvSpPr txBox="1"/>
-          <p:nvPr/>
-        </p:nvSpPr>
-        <p:spPr>
-          <a:xfrm>
-            <a:off x="13839114" y="7511377"/>
-            <a:ext cx="1560812" cy="1077218"/>
-          </a:xfrm>
-          <a:prstGeom prst="rect">
-            <a:avLst/>
-          </a:prstGeom>
-          <a:noFill/>
-        </p:spPr>
-        <p:txBody>
-          <a:bodyPr wrap="none" rtlCol="0">
-            <a:spAutoFit/>
-          </a:bodyPr>
-          <a:lstStyle/>
-          <a:p>
-            <a:pPr algn="ctr"/>
-            <a:r>
-              <a:rPr lang="en-US" sz="3200" i="1" dirty="0">
-                <a:latin typeface="Times New Roman" panose="02020603050405020304" pitchFamily="18" charset="0"/>
-                <a:cs typeface="Times New Roman" panose="02020603050405020304" pitchFamily="18" charset="0"/>
-              </a:rPr>
-              <a:t>Leaf</a:t>
-            </a:r>
-          </a:p>
-          <a:p>
-            <a:pPr algn="ctr"/>
-            <a:r>
-              <a:rPr lang="en-US" sz="3200" i="1" dirty="0">
-                <a:latin typeface="Times New Roman" panose="02020603050405020304" pitchFamily="18" charset="0"/>
-                <a:cs typeface="Times New Roman" panose="02020603050405020304" pitchFamily="18" charset="0"/>
-              </a:rPr>
-              <a:t>nitrogen</a:t>
-            </a:r>
-          </a:p>
-        </p:txBody>
-      </p:sp>
-      <p:sp>
-        <p:nvSpPr>
-          <p:cNvPr id="40" name="TextBox 39">
-            <a:extLst>
-              <a:ext uri="{FF2B5EF4-FFF2-40B4-BE49-F238E27FC236}">
-                <a16:creationId xmlns:a16="http://schemas.microsoft.com/office/drawing/2014/main" id="{67E72C8D-3F29-25F3-F215-C1259A782E46}"/>
-              </a:ext>
-            </a:extLst>
-          </p:cNvPr>
-          <p:cNvSpPr txBox="1"/>
-          <p:nvPr/>
-        </p:nvSpPr>
-        <p:spPr>
-          <a:xfrm>
-            <a:off x="10236027" y="2148299"/>
-            <a:ext cx="1576330" cy="1477328"/>
-          </a:xfrm>
-          <a:prstGeom prst="rect">
-            <a:avLst/>
-          </a:prstGeom>
-          <a:noFill/>
-        </p:spPr>
-        <p:txBody>
-          <a:bodyPr wrap="none" rtlCol="0">
-            <a:spAutoFit/>
-          </a:bodyPr>
-          <a:lstStyle/>
-          <a:p>
-            <a:pPr algn="ctr"/>
-            <a:r>
-              <a:rPr lang="en-US" sz="3000" i="1" dirty="0">
-                <a:latin typeface="Times New Roman" panose="02020603050405020304" pitchFamily="18" charset="0"/>
-                <a:cs typeface="Times New Roman" panose="02020603050405020304" pitchFamily="18" charset="0"/>
-              </a:rPr>
-              <a:t>Vapor </a:t>
-            </a:r>
-          </a:p>
-          <a:p>
-            <a:pPr algn="ctr"/>
-            <a:r>
-              <a:rPr lang="en-US" sz="3000" i="1" dirty="0">
-                <a:latin typeface="Times New Roman" panose="02020603050405020304" pitchFamily="18" charset="0"/>
-                <a:cs typeface="Times New Roman" panose="02020603050405020304" pitchFamily="18" charset="0"/>
-              </a:rPr>
-              <a:t>pressure </a:t>
-            </a:r>
-          </a:p>
-          <a:p>
-            <a:pPr algn="ctr"/>
-            <a:r>
-              <a:rPr lang="en-US" sz="3000" i="1" dirty="0">
-                <a:latin typeface="Times New Roman" panose="02020603050405020304" pitchFamily="18" charset="0"/>
-                <a:cs typeface="Times New Roman" panose="02020603050405020304" pitchFamily="18" charset="0"/>
-              </a:rPr>
-              <a:t>deficit</a:t>
-            </a:r>
-          </a:p>
-        </p:txBody>
-      </p:sp>
-      <p:sp>
-        <p:nvSpPr>
-          <p:cNvPr id="41" name="TextBox 40">
-            <a:extLst>
-              <a:ext uri="{FF2B5EF4-FFF2-40B4-BE49-F238E27FC236}">
-                <a16:creationId xmlns:a16="http://schemas.microsoft.com/office/drawing/2014/main" id="{2C5B99C0-6E49-7B08-0180-3027C6FCE83B}"/>
-              </a:ext>
-            </a:extLst>
-          </p:cNvPr>
-          <p:cNvSpPr txBox="1"/>
-          <p:nvPr/>
-        </p:nvSpPr>
-        <p:spPr>
-          <a:xfrm>
-            <a:off x="13558140" y="2392746"/>
-            <a:ext cx="2122762" cy="1015663"/>
-          </a:xfrm>
-          <a:prstGeom prst="rect">
-            <a:avLst/>
-          </a:prstGeom>
-          <a:noFill/>
-        </p:spPr>
-        <p:txBody>
-          <a:bodyPr wrap="none" rtlCol="0">
-            <a:spAutoFit/>
-          </a:bodyPr>
-          <a:lstStyle/>
-          <a:p>
-            <a:pPr algn="ctr"/>
-            <a:r>
-              <a:rPr lang="en-US" sz="3000" i="1" dirty="0">
-                <a:latin typeface="Times New Roman" panose="02020603050405020304" pitchFamily="18" charset="0"/>
-                <a:cs typeface="Times New Roman" panose="02020603050405020304" pitchFamily="18" charset="0"/>
-              </a:rPr>
-              <a:t>Air</a:t>
-            </a:r>
-          </a:p>
-          <a:p>
-            <a:pPr algn="ctr"/>
-            <a:r>
-              <a:rPr lang="en-US" sz="3000" i="1" dirty="0">
-                <a:latin typeface="Times New Roman" panose="02020603050405020304" pitchFamily="18" charset="0"/>
-                <a:cs typeface="Times New Roman" panose="02020603050405020304" pitchFamily="18" charset="0"/>
-              </a:rPr>
-              <a:t>Temperature</a:t>
-            </a:r>
-          </a:p>
-        </p:txBody>
-      </p:sp>
-      <p:cxnSp>
-        <p:nvCxnSpPr>
           <p:cNvPr id="43" name="Straight Arrow Connector 42">
             <a:extLst>
               <a:ext uri="{FF2B5EF4-FFF2-40B4-BE49-F238E27FC236}">
@@ -3846,50 +3534,6 @@
               </a:schemeClr>
             </a:solidFill>
             <a:prstDash val="dash"/>
-            <a:tailEnd type="triangle"/>
-          </a:ln>
-        </p:spPr>
-        <p:style>
-          <a:lnRef idx="1">
-            <a:schemeClr val="accent1"/>
-          </a:lnRef>
-          <a:fillRef idx="0">
-            <a:schemeClr val="accent1"/>
-          </a:fillRef>
-          <a:effectRef idx="0">
-            <a:schemeClr val="accent1"/>
-          </a:effectRef>
-          <a:fontRef idx="minor">
-            <a:schemeClr val="tx1"/>
-          </a:fontRef>
-        </p:style>
-      </p:cxnSp>
-      <p:cxnSp>
-        <p:nvCxnSpPr>
-          <p:cNvPr id="44" name="Straight Arrow Connector 43">
-            <a:extLst>
-              <a:ext uri="{FF2B5EF4-FFF2-40B4-BE49-F238E27FC236}">
-                <a16:creationId xmlns:a16="http://schemas.microsoft.com/office/drawing/2014/main" id="{A2E1161F-B387-5957-D318-027516E16EAC}"/>
-              </a:ext>
-            </a:extLst>
-          </p:cNvPr>
-          <p:cNvCxnSpPr>
-            <a:cxnSpLocks/>
-          </p:cNvCxnSpPr>
-          <p:nvPr/>
-        </p:nvCxnSpPr>
-        <p:spPr>
-          <a:xfrm flipV="1">
-            <a:off x="6668591" y="6177641"/>
-            <a:ext cx="0" cy="1475068"/>
-          </a:xfrm>
-          <a:prstGeom prst="straightConnector1">
-            <a:avLst/>
-          </a:prstGeom>
-          <a:ln w="47498">
-            <a:solidFill>
-              <a:srgbClr val="C00000"/>
-            </a:solidFill>
             <a:tailEnd type="triangle"/>
           </a:ln>
         </p:spPr>
@@ -4004,145 +3648,6 @@
           </a:fontRef>
         </p:style>
       </p:cxnSp>
-      <p:cxnSp>
-        <p:nvCxnSpPr>
-          <p:cNvPr id="56" name="Straight Arrow Connector 55">
-            <a:extLst>
-              <a:ext uri="{FF2B5EF4-FFF2-40B4-BE49-F238E27FC236}">
-                <a16:creationId xmlns:a16="http://schemas.microsoft.com/office/drawing/2014/main" id="{03A0CBB9-F1AE-2712-B46D-5740B1884373}"/>
-              </a:ext>
-            </a:extLst>
-          </p:cNvPr>
-          <p:cNvCxnSpPr>
-            <a:cxnSpLocks/>
-            <a:stCxn id="68" idx="3"/>
-          </p:cNvCxnSpPr>
-          <p:nvPr/>
-        </p:nvCxnSpPr>
-        <p:spPr>
-          <a:xfrm flipH="1">
-            <a:off x="12021406" y="5180348"/>
-            <a:ext cx="2971788" cy="28929"/>
-          </a:xfrm>
-          <a:prstGeom prst="straightConnector1">
-            <a:avLst/>
-          </a:prstGeom>
-          <a:ln w="37211">
-            <a:solidFill>
-              <a:schemeClr val="bg2">
-                <a:lumMod val="75000"/>
-              </a:schemeClr>
-            </a:solidFill>
-            <a:prstDash val="dash"/>
-            <a:tailEnd type="triangle"/>
-          </a:ln>
-        </p:spPr>
-        <p:style>
-          <a:lnRef idx="1">
-            <a:schemeClr val="accent1"/>
-          </a:lnRef>
-          <a:fillRef idx="0">
-            <a:schemeClr val="accent1"/>
-          </a:fillRef>
-          <a:effectRef idx="0">
-            <a:schemeClr val="accent1"/>
-          </a:effectRef>
-          <a:fontRef idx="minor">
-            <a:schemeClr val="tx1"/>
-          </a:fontRef>
-        </p:style>
-      </p:cxnSp>
-      <p:cxnSp>
-        <p:nvCxnSpPr>
-          <p:cNvPr id="58" name="Straight Arrow Connector 57">
-            <a:extLst>
-              <a:ext uri="{FF2B5EF4-FFF2-40B4-BE49-F238E27FC236}">
-                <a16:creationId xmlns:a16="http://schemas.microsoft.com/office/drawing/2014/main" id="{4C07D496-6CDD-6FFA-F311-3A43CC89874D}"/>
-              </a:ext>
-            </a:extLst>
-          </p:cNvPr>
-          <p:cNvCxnSpPr>
-            <a:cxnSpLocks/>
-          </p:cNvCxnSpPr>
-          <p:nvPr/>
-        </p:nvCxnSpPr>
-        <p:spPr>
-          <a:xfrm>
-            <a:off x="14576626" y="5707083"/>
-            <a:ext cx="11194" cy="1637290"/>
-          </a:xfrm>
-          <a:prstGeom prst="straightConnector1">
-            <a:avLst/>
-          </a:prstGeom>
-          <a:ln w="35560">
-            <a:solidFill>
-              <a:schemeClr val="bg2">
-                <a:lumMod val="75000"/>
-              </a:schemeClr>
-            </a:solidFill>
-            <a:prstDash val="dash"/>
-            <a:tailEnd type="triangle"/>
-          </a:ln>
-        </p:spPr>
-        <p:style>
-          <a:lnRef idx="1">
-            <a:schemeClr val="accent1"/>
-          </a:lnRef>
-          <a:fillRef idx="0">
-            <a:schemeClr val="accent1"/>
-          </a:fillRef>
-          <a:effectRef idx="0">
-            <a:schemeClr val="accent1"/>
-          </a:effectRef>
-          <a:fontRef idx="minor">
-            <a:schemeClr val="tx1"/>
-          </a:fontRef>
-        </p:style>
-      </p:cxnSp>
-      <p:cxnSp>
-        <p:nvCxnSpPr>
-          <p:cNvPr id="60" name="Straight Arrow Connector 59">
-            <a:extLst>
-              <a:ext uri="{FF2B5EF4-FFF2-40B4-BE49-F238E27FC236}">
-                <a16:creationId xmlns:a16="http://schemas.microsoft.com/office/drawing/2014/main" id="{F6383D9E-946A-23D8-3A9E-EC5FF2556E33}"/>
-              </a:ext>
-            </a:extLst>
-          </p:cNvPr>
-          <p:cNvCxnSpPr>
-            <a:cxnSpLocks/>
-          </p:cNvCxnSpPr>
-          <p:nvPr/>
-        </p:nvCxnSpPr>
-        <p:spPr>
-          <a:xfrm>
-            <a:off x="7586326" y="7875221"/>
-            <a:ext cx="6042591" cy="28461"/>
-          </a:xfrm>
-          <a:prstGeom prst="straightConnector1">
-            <a:avLst/>
-          </a:prstGeom>
-          <a:ln w="40767">
-            <a:solidFill>
-              <a:srgbClr val="C00000"/>
-            </a:solidFill>
-            <a:tailEnd type="triangle"/>
-          </a:ln>
-        </p:spPr>
-        <p:style>
-          <a:lnRef idx="1">
-            <a:schemeClr val="accent1"/>
-          </a:lnRef>
-          <a:fillRef idx="0">
-            <a:schemeClr val="accent1"/>
-          </a:fillRef>
-          <a:effectRef idx="0">
-            <a:schemeClr val="accent1"/>
-          </a:effectRef>
-          <a:fontRef idx="minor">
-            <a:schemeClr val="tx1"/>
-          </a:fontRef>
-        </p:style>
-      </p:cxnSp>
       <p:sp>
         <p:nvSpPr>
           <p:cNvPr id="22" name="Rectangle 21">
@@ -4193,7 +3698,16 @@
           <a:lstStyle/>
           <a:p>
             <a:pPr algn="ctr"/>
-            <a:endParaRPr lang="en-US" sz="2400"/>
+            <a:r>
+              <a:rPr lang="en-US" sz="3000" i="1" dirty="0">
+                <a:solidFill>
+                  <a:schemeClr val="tx1"/>
+                </a:solidFill>
+                <a:latin typeface="Times New Roman" panose="02020603050405020304" pitchFamily="18" charset="0"/>
+                <a:cs typeface="Times New Roman" panose="02020603050405020304" pitchFamily="18" charset="0"/>
+              </a:rPr>
+              <a:t>Vapor pressure deficit</a:t>
+            </a:r>
           </a:p>
         </p:txBody>
       </p:sp>
@@ -4247,51 +3761,25 @@
           <a:lstStyle/>
           <a:p>
             <a:pPr algn="ctr"/>
-            <a:endParaRPr lang="en-US" sz="2400"/>
-          </a:p>
-        </p:txBody>
-      </p:sp>
-      <p:sp>
-        <p:nvSpPr>
-          <p:cNvPr id="61" name="TextBox 60">
-            <a:extLst>
-              <a:ext uri="{FF2B5EF4-FFF2-40B4-BE49-F238E27FC236}">
-                <a16:creationId xmlns:a16="http://schemas.microsoft.com/office/drawing/2014/main" id="{B6476535-A95E-90F0-63CA-BA795134B48E}"/>
-              </a:ext>
-            </a:extLst>
-          </p:cNvPr>
-          <p:cNvSpPr txBox="1"/>
-          <p:nvPr/>
-        </p:nvSpPr>
-        <p:spPr>
-          <a:xfrm>
-            <a:off x="8654121" y="7635240"/>
-            <a:ext cx="979755" cy="461665"/>
-          </a:xfrm>
-          <a:prstGeom prst="rect">
-            <a:avLst/>
-          </a:prstGeom>
-          <a:solidFill>
-            <a:schemeClr val="bg1"/>
-          </a:solidFill>
-          <a:ln w="40767">
-            <a:solidFill>
-              <a:srgbClr val="C00000"/>
-            </a:solidFill>
-          </a:ln>
-        </p:spPr>
-        <p:txBody>
-          <a:bodyPr wrap="none" rtlCol="0">
-            <a:spAutoFit/>
-          </a:bodyPr>
-          <a:lstStyle/>
-          <a:p>
-            <a:r>
-              <a:rPr lang="en-US" sz="2400" b="1" dirty="0">
+            <a:r>
+              <a:rPr lang="en-US" sz="3000" i="1" dirty="0">
+                <a:solidFill>
+                  <a:schemeClr val="tx1"/>
+                </a:solidFill>
                 <a:latin typeface="Times New Roman" panose="02020603050405020304" pitchFamily="18" charset="0"/>
                 <a:cs typeface="Times New Roman" panose="02020603050405020304" pitchFamily="18" charset="0"/>
               </a:rPr>
-              <a:t>-0.107</a:t>
+              <a:t>Air </a:t>
+            </a:r>
+            <a:r>
+              <a:rPr lang="en-US" sz="2900" i="1" dirty="0">
+                <a:solidFill>
+                  <a:schemeClr val="tx1"/>
+                </a:solidFill>
+                <a:latin typeface="Times New Roman" panose="02020603050405020304" pitchFamily="18" charset="0"/>
+                <a:cs typeface="Times New Roman" panose="02020603050405020304" pitchFamily="18" charset="0"/>
+              </a:rPr>
+              <a:t>temperature</a:t>
             </a:r>
           </a:p>
         </p:txBody>
@@ -4393,61 +3881,16 @@
           <a:lstStyle/>
           <a:p>
             <a:pPr algn="ctr"/>
-            <a:endParaRPr lang="en-US" sz="2400"/>
-          </a:p>
-        </p:txBody>
-      </p:sp>
-      <p:sp>
-        <p:nvSpPr>
-          <p:cNvPr id="31" name="Rectangle 30">
-            <a:extLst>
-              <a:ext uri="{FF2B5EF4-FFF2-40B4-BE49-F238E27FC236}">
-                <a16:creationId xmlns:a16="http://schemas.microsoft.com/office/drawing/2014/main" id="{8B74F445-A52C-CC92-5C9F-26A6C584DFB7}"/>
-              </a:ext>
-            </a:extLst>
-          </p:cNvPr>
-          <p:cNvSpPr/>
-          <p:nvPr/>
-        </p:nvSpPr>
-        <p:spPr>
-          <a:xfrm>
-            <a:off x="13628917" y="7358743"/>
-            <a:ext cx="1981200" cy="1382486"/>
-          </a:xfrm>
-          <a:prstGeom prst="rect">
-            <a:avLst/>
-          </a:prstGeom>
-          <a:noFill/>
-          <a:ln w="38100">
-            <a:solidFill>
-              <a:schemeClr val="tx1">
-                <a:alpha val="75000"/>
-              </a:schemeClr>
-            </a:solidFill>
-          </a:ln>
-        </p:spPr>
-        <p:style>
-          <a:lnRef idx="2">
-            <a:schemeClr val="accent1">
-              <a:shade val="50000"/>
-            </a:schemeClr>
-          </a:lnRef>
-          <a:fillRef idx="1">
-            <a:schemeClr val="accent1"/>
-          </a:fillRef>
-          <a:effectRef idx="0">
-            <a:schemeClr val="accent1"/>
-          </a:effectRef>
-          <a:fontRef idx="minor">
-            <a:schemeClr val="lt1"/>
-          </a:fontRef>
-        </p:style>
-        <p:txBody>
-          <a:bodyPr rtlCol="0" anchor="ctr"/>
-          <a:lstStyle/>
-          <a:p>
-            <a:pPr algn="ctr"/>
-            <a:endParaRPr lang="en-US" sz="2400"/>
+            <a:r>
+              <a:rPr lang="en-US" sz="3000" i="1" dirty="0">
+                <a:solidFill>
+                  <a:schemeClr val="tx1"/>
+                </a:solidFill>
+                <a:latin typeface="Times New Roman" panose="02020603050405020304" pitchFamily="18" charset="0"/>
+                <a:cs typeface="Times New Roman" panose="02020603050405020304" pitchFamily="18" charset="0"/>
+              </a:rPr>
+              <a:t>Soil nitrogen</a:t>
+            </a:r>
           </a:p>
         </p:txBody>
       </p:sp>
@@ -4494,7 +3937,7 @@
                 <a:latin typeface="Times New Roman" panose="02020603050405020304" pitchFamily="18" charset="0"/>
                 <a:cs typeface="Times New Roman" panose="02020603050405020304" pitchFamily="18" charset="0"/>
               </a:rPr>
-              <a:t>0.025</a:t>
+              <a:t>0.026</a:t>
             </a:r>
           </a:p>
         </p:txBody>
@@ -4549,51 +3992,6 @@
       </p:sp>
       <p:sp>
         <p:nvSpPr>
-          <p:cNvPr id="69" name="TextBox 68">
-            <a:extLst>
-              <a:ext uri="{FF2B5EF4-FFF2-40B4-BE49-F238E27FC236}">
-                <a16:creationId xmlns:a16="http://schemas.microsoft.com/office/drawing/2014/main" id="{D042879D-AA23-A303-5FF7-5CDCB1157B5A}"/>
-              </a:ext>
-            </a:extLst>
-          </p:cNvPr>
-          <p:cNvSpPr txBox="1"/>
-          <p:nvPr/>
-        </p:nvSpPr>
-        <p:spPr>
-          <a:xfrm>
-            <a:off x="6155029" y="6724647"/>
-            <a:ext cx="979755" cy="461665"/>
-          </a:xfrm>
-          <a:prstGeom prst="rect">
-            <a:avLst/>
-          </a:prstGeom>
-          <a:solidFill>
-            <a:schemeClr val="bg1"/>
-          </a:solidFill>
-          <a:ln w="47498">
-            <a:solidFill>
-              <a:srgbClr val="C00000"/>
-            </a:solidFill>
-          </a:ln>
-        </p:spPr>
-        <p:txBody>
-          <a:bodyPr wrap="none" rtlCol="0">
-            <a:spAutoFit/>
-          </a:bodyPr>
-          <a:lstStyle/>
-          <a:p>
-            <a:r>
-              <a:rPr lang="en-US" sz="2400" b="1" dirty="0">
-                <a:latin typeface="Times New Roman" panose="02020603050405020304" pitchFamily="18" charset="0"/>
-                <a:cs typeface="Times New Roman" panose="02020603050405020304" pitchFamily="18" charset="0"/>
-              </a:rPr>
-              <a:t>-0.198</a:t>
-            </a:r>
-          </a:p>
-        </p:txBody>
-      </p:sp>
-      <p:sp>
-        <p:nvSpPr>
           <p:cNvPr id="71" name="TextBox 70">
             <a:extLst>
               <a:ext uri="{FF2B5EF4-FFF2-40B4-BE49-F238E27FC236}">
@@ -4635,7 +4033,7 @@
                 <a:latin typeface="Times New Roman" panose="02020603050405020304" pitchFamily="18" charset="0"/>
                 <a:cs typeface="Times New Roman" panose="02020603050405020304" pitchFamily="18" charset="0"/>
               </a:rPr>
-              <a:t>-0.049</a:t>
+              <a:t>-0.050</a:t>
             </a:r>
           </a:p>
         </p:txBody>
@@ -4692,47 +4090,20 @@
           <a:lstStyle/>
           <a:p>
             <a:pPr algn="ctr"/>
-            <a:endParaRPr lang="en-US" sz="2400" dirty="0"/>
-          </a:p>
-        </p:txBody>
-      </p:sp>
-      <p:sp>
-        <p:nvSpPr>
-          <p:cNvPr id="37" name="TextBox 36">
-            <a:extLst>
-              <a:ext uri="{FF2B5EF4-FFF2-40B4-BE49-F238E27FC236}">
-                <a16:creationId xmlns:a16="http://schemas.microsoft.com/office/drawing/2014/main" id="{C71CFA49-7C85-F6D0-BCFA-6674AEE1B54E}"/>
-              </a:ext>
-            </a:extLst>
-          </p:cNvPr>
-          <p:cNvSpPr txBox="1"/>
-          <p:nvPr/>
-        </p:nvSpPr>
-        <p:spPr>
-          <a:xfrm>
-            <a:off x="10822558" y="5194013"/>
-            <a:ext cx="365806" cy="584775"/>
-          </a:xfrm>
-          <a:prstGeom prst="rect">
-            <a:avLst/>
-          </a:prstGeom>
-          <a:noFill/>
-        </p:spPr>
-        <p:txBody>
-          <a:bodyPr wrap="none" rtlCol="0">
-            <a:spAutoFit/>
-          </a:bodyPr>
-          <a:lstStyle/>
-          <a:p>
-            <a:pPr algn="ctr"/>
-            <a:r>
-              <a:rPr lang="el-GR" sz="3200" i="1" dirty="0">
+            <a:r>
+              <a:rPr lang="el-GR" sz="3000" i="1" dirty="0">
+                <a:solidFill>
+                  <a:schemeClr val="tx1"/>
+                </a:solidFill>
                 <a:latin typeface="Times New Roman" panose="02020603050405020304" pitchFamily="18" charset="0"/>
                 <a:cs typeface="Times New Roman" panose="02020603050405020304" pitchFamily="18" charset="0"/>
               </a:rPr>
               <a:t>χ</a:t>
             </a:r>
-            <a:endParaRPr lang="en-US" sz="3200" i="1" dirty="0">
+            <a:endParaRPr lang="en-US" sz="3000" i="1" dirty="0">
+              <a:solidFill>
+                <a:schemeClr val="tx1"/>
+              </a:solidFill>
               <a:latin typeface="Times New Roman" panose="02020603050405020304" pitchFamily="18" charset="0"/>
               <a:cs typeface="Times New Roman" panose="02020603050405020304" pitchFamily="18" charset="0"/>
             </a:endParaRPr>
@@ -4958,64 +4329,8 @@
                 <a:latin typeface="Times New Roman" panose="02020603050405020304" pitchFamily="18" charset="0"/>
                 <a:cs typeface="Times New Roman" panose="02020603050405020304" pitchFamily="18" charset="0"/>
               </a:rPr>
-              <a:t>0.420</a:t>
-            </a:r>
-          </a:p>
-        </p:txBody>
-      </p:sp>
-      <p:sp>
-        <p:nvSpPr>
-          <p:cNvPr id="21" name="Rectangle 20">
-            <a:extLst>
-              <a:ext uri="{FF2B5EF4-FFF2-40B4-BE49-F238E27FC236}">
-                <a16:creationId xmlns:a16="http://schemas.microsoft.com/office/drawing/2014/main" id="{2A451EDF-2134-D951-F607-AE0DC624C032}"/>
-              </a:ext>
-            </a:extLst>
-          </p:cNvPr>
-          <p:cNvSpPr/>
-          <p:nvPr/>
-        </p:nvSpPr>
-        <p:spPr>
-          <a:xfrm>
-            <a:off x="6400801" y="2231572"/>
-            <a:ext cx="1981200" cy="1382486"/>
-          </a:xfrm>
-          <a:prstGeom prst="rect">
-            <a:avLst/>
-          </a:prstGeom>
-          <a:solidFill>
-            <a:schemeClr val="bg1"/>
-          </a:solidFill>
-          <a:ln w="38100">
-            <a:solidFill>
-              <a:schemeClr val="tx1">
-                <a:alpha val="75000"/>
-              </a:schemeClr>
-            </a:solidFill>
-          </a:ln>
-        </p:spPr>
-        <p:style>
-          <a:lnRef idx="2">
-            <a:schemeClr val="accent1">
-              <a:shade val="50000"/>
-            </a:schemeClr>
-          </a:lnRef>
-          <a:fillRef idx="1">
-            <a:schemeClr val="accent1"/>
-          </a:fillRef>
-          <a:effectRef idx="0">
-            <a:schemeClr val="accent1"/>
-          </a:effectRef>
-          <a:fontRef idx="minor">
-            <a:schemeClr val="lt1"/>
-          </a:fontRef>
-        </p:style>
-        <p:txBody>
-          <a:bodyPr rtlCol="0" anchor="ctr"/>
-          <a:lstStyle/>
-          <a:p>
-            <a:pPr algn="ctr"/>
-            <a:endParaRPr lang="en-US" sz="2400"/>
+              <a:t>0.423</a:t>
+            </a:r>
           </a:p>
         </p:txBody>
       </p:sp>
@@ -5064,65 +4379,6 @@
       </p:cxnSp>
       <p:sp>
         <p:nvSpPr>
-          <p:cNvPr id="39" name="TextBox 38">
-            <a:extLst>
-              <a:ext uri="{FF2B5EF4-FFF2-40B4-BE49-F238E27FC236}">
-                <a16:creationId xmlns:a16="http://schemas.microsoft.com/office/drawing/2014/main" id="{3128AFF3-5CF2-6DE3-9D59-64189657E6DC}"/>
-              </a:ext>
-            </a:extLst>
-          </p:cNvPr>
-          <p:cNvSpPr txBox="1"/>
-          <p:nvPr/>
-        </p:nvSpPr>
-        <p:spPr>
-          <a:xfrm>
-            <a:off x="6469031" y="2164787"/>
-            <a:ext cx="1843774" cy="1477328"/>
-          </a:xfrm>
-          <a:prstGeom prst="rect">
-            <a:avLst/>
-          </a:prstGeom>
-          <a:noFill/>
-        </p:spPr>
-        <p:txBody>
-          <a:bodyPr wrap="none" rtlCol="0">
-            <a:spAutoFit/>
-          </a:bodyPr>
-          <a:lstStyle/>
-          <a:p>
-            <a:pPr algn="ctr"/>
-            <a:r>
-              <a:rPr lang="en-US" sz="3000" i="1" dirty="0">
-                <a:latin typeface="Times New Roman" panose="02020603050405020304" pitchFamily="18" charset="0"/>
-                <a:cs typeface="Times New Roman" panose="02020603050405020304" pitchFamily="18" charset="0"/>
-              </a:rPr>
-              <a:t>Plant </a:t>
-            </a:r>
-          </a:p>
-          <a:p>
-            <a:pPr algn="ctr"/>
-            <a:r>
-              <a:rPr lang="en-US" sz="3000" i="1" dirty="0">
-                <a:latin typeface="Times New Roman" panose="02020603050405020304" pitchFamily="18" charset="0"/>
-                <a:cs typeface="Times New Roman" panose="02020603050405020304" pitchFamily="18" charset="0"/>
-              </a:rPr>
-              <a:t>functional </a:t>
-            </a:r>
-          </a:p>
-          <a:p>
-            <a:pPr algn="ctr"/>
-            <a:r>
-              <a:rPr lang="en-US" sz="3000" i="1" dirty="0">
-                <a:latin typeface="Times New Roman" panose="02020603050405020304" pitchFamily="18" charset="0"/>
-                <a:cs typeface="Times New Roman" panose="02020603050405020304" pitchFamily="18" charset="0"/>
-              </a:rPr>
-              <a:t>group</a:t>
-            </a:r>
-          </a:p>
-        </p:txBody>
-      </p:sp>
-      <p:sp>
-        <p:nvSpPr>
           <p:cNvPr id="75" name="TextBox 74">
             <a:extLst>
               <a:ext uri="{FF2B5EF4-FFF2-40B4-BE49-F238E27FC236}">
@@ -5187,9 +4443,7 @@
             <a:avLst/>
           </a:prstGeom>
           <a:solidFill>
-            <a:schemeClr val="bg1">
-              <a:alpha val="75000"/>
-            </a:schemeClr>
+            <a:schemeClr val="bg1"/>
           </a:solidFill>
           <a:ln w="37465">
             <a:solidFill>
@@ -5216,27 +4470,182 @@
           </a:p>
         </p:txBody>
       </p:sp>
+      <p:sp>
+        <p:nvSpPr>
+          <p:cNvPr id="20" name="Rectangle 19">
+            <a:extLst>
+              <a:ext uri="{FF2B5EF4-FFF2-40B4-BE49-F238E27FC236}">
+                <a16:creationId xmlns:a16="http://schemas.microsoft.com/office/drawing/2014/main" id="{8CD31D91-82FE-DEF4-C1F4-559B96EB9A75}"/>
+              </a:ext>
+            </a:extLst>
+          </p:cNvPr>
+          <p:cNvSpPr/>
+          <p:nvPr/>
+        </p:nvSpPr>
+        <p:spPr>
+          <a:xfrm>
+            <a:off x="2786743" y="2231572"/>
+            <a:ext cx="1981200" cy="1382486"/>
+          </a:xfrm>
+          <a:prstGeom prst="rect">
+            <a:avLst/>
+          </a:prstGeom>
+          <a:noFill/>
+          <a:ln w="38100">
+            <a:solidFill>
+              <a:schemeClr val="tx1">
+                <a:alpha val="75000"/>
+              </a:schemeClr>
+            </a:solidFill>
+          </a:ln>
+        </p:spPr>
+        <p:style>
+          <a:lnRef idx="2">
+            <a:schemeClr val="accent1">
+              <a:shade val="50000"/>
+            </a:schemeClr>
+          </a:lnRef>
+          <a:fillRef idx="1">
+            <a:schemeClr val="accent1"/>
+          </a:fillRef>
+          <a:effectRef idx="0">
+            <a:schemeClr val="accent1"/>
+          </a:effectRef>
+          <a:fontRef idx="minor">
+            <a:schemeClr val="lt1"/>
+          </a:fontRef>
+        </p:style>
+        <p:txBody>
+          <a:bodyPr rtlCol="0" anchor="ctr"/>
+          <a:lstStyle/>
+          <a:p>
+            <a:pPr algn="ctr"/>
+            <a:r>
+              <a:rPr lang="en-US" sz="3000" i="1" dirty="0">
+                <a:solidFill>
+                  <a:schemeClr val="tx1"/>
+                </a:solidFill>
+                <a:latin typeface="Times New Roman" panose="02020603050405020304" pitchFamily="18" charset="0"/>
+                <a:cs typeface="Times New Roman" panose="02020603050405020304" pitchFamily="18" charset="0"/>
+              </a:rPr>
+              <a:t>Soil moisture</a:t>
+            </a:r>
+          </a:p>
+        </p:txBody>
+      </p:sp>
       <p:cxnSp>
         <p:nvCxnSpPr>
-          <p:cNvPr id="9" name="Straight Connector 8">
+          <p:cNvPr id="29" name="Elbow Connector 28">
             <a:extLst>
               <a:ext uri="{FF2B5EF4-FFF2-40B4-BE49-F238E27FC236}">
-                <a16:creationId xmlns:a16="http://schemas.microsoft.com/office/drawing/2014/main" id="{D6BC3641-1022-8E23-835A-BB7AAB710545}"/>
+                <a16:creationId xmlns:a16="http://schemas.microsoft.com/office/drawing/2014/main" id="{AB04B289-C4DF-3DCE-6A6F-A2577780B32F}"/>
               </a:ext>
             </a:extLst>
           </p:cNvPr>
           <p:cNvCxnSpPr>
-            <a:stCxn id="20" idx="1"/>
+            <a:cxnSpLocks/>
           </p:cNvCxnSpPr>
           <p:nvPr/>
         </p:nvCxnSpPr>
         <p:spPr>
-          <a:xfrm flipH="1">
-            <a:off x="2460661" y="2922815"/>
-            <a:ext cx="326082" cy="0"/>
-          </a:xfrm>
-          <a:prstGeom prst="line">
+          <a:xfrm>
+            <a:off x="7789600" y="3581391"/>
+            <a:ext cx="2476568" cy="590085"/>
+          </a:xfrm>
+          <a:prstGeom prst="bentConnector3">
+            <a:avLst>
+              <a:gd name="adj1" fmla="val -176"/>
+            </a:avLst>
+          </a:prstGeom>
+          <a:ln w="87249">
+            <a:solidFill>
+              <a:srgbClr val="C00000"/>
+            </a:solidFill>
+          </a:ln>
+        </p:spPr>
+        <p:style>
+          <a:lnRef idx="1">
+            <a:schemeClr val="accent1"/>
+          </a:lnRef>
+          <a:fillRef idx="0">
+            <a:schemeClr val="accent1"/>
+          </a:fillRef>
+          <a:effectRef idx="0">
+            <a:schemeClr val="accent1"/>
+          </a:effectRef>
+          <a:fontRef idx="minor">
+            <a:schemeClr val="tx1"/>
+          </a:fontRef>
+        </p:style>
+      </p:cxnSp>
+      <p:sp>
+        <p:nvSpPr>
+          <p:cNvPr id="80" name="TextBox 79">
+            <a:extLst>
+              <a:ext uri="{FF2B5EF4-FFF2-40B4-BE49-F238E27FC236}">
+                <a16:creationId xmlns:a16="http://schemas.microsoft.com/office/drawing/2014/main" id="{0FC8D521-81A9-E347-0EBC-99509681D866}"/>
+              </a:ext>
+            </a:extLst>
+          </p:cNvPr>
+          <p:cNvSpPr txBox="1"/>
+          <p:nvPr/>
+        </p:nvSpPr>
+        <p:spPr>
+          <a:xfrm>
+            <a:off x="8670324" y="3897561"/>
+            <a:ext cx="979755" cy="461665"/>
+          </a:xfrm>
+          <a:prstGeom prst="rect">
             <a:avLst/>
+          </a:prstGeom>
+          <a:solidFill>
+            <a:schemeClr val="bg1"/>
+          </a:solidFill>
+          <a:ln w="87249">
+            <a:solidFill>
+              <a:srgbClr val="C00000"/>
+            </a:solidFill>
+          </a:ln>
+        </p:spPr>
+        <p:txBody>
+          <a:bodyPr wrap="none" rtlCol="0">
+            <a:spAutoFit/>
+          </a:bodyPr>
+          <a:lstStyle/>
+          <a:p>
+            <a:r>
+              <a:rPr lang="en-US" sz="2400" b="1" dirty="0">
+                <a:latin typeface="Times New Roman" panose="02020603050405020304" pitchFamily="18" charset="0"/>
+                <a:cs typeface="Times New Roman" panose="02020603050405020304" pitchFamily="18" charset="0"/>
+              </a:rPr>
+              <a:t>-0.733</a:t>
+            </a:r>
+          </a:p>
+        </p:txBody>
+      </p:sp>
+      <p:cxnSp>
+        <p:nvCxnSpPr>
+          <p:cNvPr id="55" name="Elbow Connector 54">
+            <a:extLst>
+              <a:ext uri="{FF2B5EF4-FFF2-40B4-BE49-F238E27FC236}">
+                <a16:creationId xmlns:a16="http://schemas.microsoft.com/office/drawing/2014/main" id="{6FC21C27-BC27-8183-25C3-DF930D67AE13}"/>
+              </a:ext>
+            </a:extLst>
+          </p:cNvPr>
+          <p:cNvCxnSpPr>
+            <a:cxnSpLocks/>
+          </p:cNvCxnSpPr>
+          <p:nvPr/>
+        </p:nvCxnSpPr>
+        <p:spPr>
+          <a:xfrm rot="5400000">
+            <a:off x="-807566" y="5811264"/>
+            <a:ext cx="6470306" cy="675119"/>
+          </a:xfrm>
+          <a:prstGeom prst="bentConnector3">
+            <a:avLst>
+              <a:gd name="adj1" fmla="val 157"/>
+            </a:avLst>
           </a:prstGeom>
           <a:ln w="34036">
             <a:solidFill>
@@ -5264,116 +4673,25 @@
       </p:cxnSp>
       <p:cxnSp>
         <p:nvCxnSpPr>
-          <p:cNvPr id="11" name="Straight Connector 10">
+          <p:cNvPr id="81" name="Elbow Connector 80">
             <a:extLst>
               <a:ext uri="{FF2B5EF4-FFF2-40B4-BE49-F238E27FC236}">
-                <a16:creationId xmlns:a16="http://schemas.microsoft.com/office/drawing/2014/main" id="{0056DC34-6F1C-38C2-50E7-428E594167A3}"/>
+                <a16:creationId xmlns:a16="http://schemas.microsoft.com/office/drawing/2014/main" id="{79A5E40B-2992-DDF4-6B55-1F29490E726F}"/>
               </a:ext>
             </a:extLst>
           </p:cNvPr>
           <p:cNvCxnSpPr>
             <a:cxnSpLocks/>
+            <a:endCxn id="31" idx="2"/>
           </p:cNvCxnSpPr>
           <p:nvPr/>
         </p:nvCxnSpPr>
         <p:spPr>
-          <a:xfrm>
-            <a:off x="2460661" y="2922817"/>
-            <a:ext cx="0" cy="6221183"/>
-          </a:xfrm>
-          <a:prstGeom prst="line">
-            <a:avLst/>
-          </a:prstGeom>
-          <a:ln w="34036">
-            <a:solidFill>
-              <a:schemeClr val="bg2">
-                <a:lumMod val="75000"/>
-              </a:schemeClr>
-            </a:solidFill>
-            <a:prstDash val="dash"/>
-          </a:ln>
-        </p:spPr>
-        <p:style>
-          <a:lnRef idx="1">
-            <a:schemeClr val="accent1"/>
-          </a:lnRef>
-          <a:fillRef idx="0">
-            <a:schemeClr val="accent1"/>
-          </a:fillRef>
-          <a:effectRef idx="0">
-            <a:schemeClr val="accent1"/>
-          </a:effectRef>
-          <a:fontRef idx="minor">
-            <a:schemeClr val="tx1"/>
-          </a:fontRef>
-        </p:style>
-      </p:cxnSp>
-      <p:cxnSp>
-        <p:nvCxnSpPr>
-          <p:cNvPr id="13" name="Straight Connector 12">
-            <a:extLst>
-              <a:ext uri="{FF2B5EF4-FFF2-40B4-BE49-F238E27FC236}">
-                <a16:creationId xmlns:a16="http://schemas.microsoft.com/office/drawing/2014/main" id="{AC6A7A23-3F3B-FDBF-5E41-020E31EA1366}"/>
-              </a:ext>
-            </a:extLst>
-          </p:cNvPr>
-          <p:cNvCxnSpPr>
-            <a:cxnSpLocks/>
-          </p:cNvCxnSpPr>
-          <p:nvPr/>
-        </p:nvCxnSpPr>
-        <p:spPr>
-          <a:xfrm>
-            <a:off x="2446082" y="9144000"/>
-            <a:ext cx="12173435" cy="0"/>
-          </a:xfrm>
-          <a:prstGeom prst="line">
-            <a:avLst/>
-          </a:prstGeom>
-          <a:ln w="34036">
-            <a:solidFill>
-              <a:schemeClr val="bg2">
-                <a:lumMod val="75000"/>
-              </a:schemeClr>
-            </a:solidFill>
-            <a:prstDash val="dash"/>
-          </a:ln>
-        </p:spPr>
-        <p:style>
-          <a:lnRef idx="1">
-            <a:schemeClr val="accent1"/>
-          </a:lnRef>
-          <a:fillRef idx="0">
-            <a:schemeClr val="accent1"/>
-          </a:fillRef>
-          <a:effectRef idx="0">
-            <a:schemeClr val="accent1"/>
-          </a:effectRef>
-          <a:fontRef idx="minor">
-            <a:schemeClr val="tx1"/>
-          </a:fontRef>
-        </p:style>
-      </p:cxnSp>
-      <p:cxnSp>
-        <p:nvCxnSpPr>
-          <p:cNvPr id="16" name="Straight Arrow Connector 15">
-            <a:extLst>
-              <a:ext uri="{FF2B5EF4-FFF2-40B4-BE49-F238E27FC236}">
-                <a16:creationId xmlns:a16="http://schemas.microsoft.com/office/drawing/2014/main" id="{2D1D650A-A85F-F4B7-EEA9-AA7E712E75A5}"/>
-              </a:ext>
-            </a:extLst>
-          </p:cNvPr>
-          <p:cNvCxnSpPr>
-            <a:cxnSpLocks/>
-          </p:cNvCxnSpPr>
-          <p:nvPr/>
-        </p:nvCxnSpPr>
-        <p:spPr>
           <a:xfrm flipV="1">
-            <a:off x="14619517" y="8750373"/>
-            <a:ext cx="0" cy="402771"/>
-          </a:xfrm>
-          <a:prstGeom prst="straightConnector1">
+            <a:off x="2073856" y="8724101"/>
+            <a:ext cx="12545661" cy="550251"/>
+          </a:xfrm>
+          <a:prstGeom prst="bentConnector2">
             <a:avLst/>
           </a:prstGeom>
           <a:ln w="34036">
@@ -5415,8 +4733,8 @@
         </p:nvSpPr>
         <p:spPr>
           <a:xfrm>
-            <a:off x="8654122" y="8922311"/>
-            <a:ext cx="979755" cy="461665"/>
+            <a:off x="8705420" y="9041612"/>
+            <a:ext cx="877163" cy="461665"/>
           </a:xfrm>
           <a:prstGeom prst="rect">
             <a:avLst/>
@@ -5444,91 +4762,42 @@
                 <a:latin typeface="Times New Roman" panose="02020603050405020304" pitchFamily="18" charset="0"/>
                 <a:cs typeface="Times New Roman" panose="02020603050405020304" pitchFamily="18" charset="0"/>
               </a:rPr>
-              <a:t>-0.016</a:t>
-            </a:r>
-          </a:p>
-        </p:txBody>
-      </p:sp>
-      <p:sp>
-        <p:nvSpPr>
-          <p:cNvPr id="20" name="Rectangle 19">
+              <a:t>0.016</a:t>
+            </a:r>
+          </a:p>
+        </p:txBody>
+      </p:sp>
+      <p:cxnSp>
+        <p:nvCxnSpPr>
+          <p:cNvPr id="84" name="Elbow Connector 83">
             <a:extLst>
               <a:ext uri="{FF2B5EF4-FFF2-40B4-BE49-F238E27FC236}">
-                <a16:creationId xmlns:a16="http://schemas.microsoft.com/office/drawing/2014/main" id="{8CD31D91-82FE-DEF4-C1F4-559B96EB9A75}"/>
-              </a:ext>
-            </a:extLst>
-          </p:cNvPr>
-          <p:cNvSpPr/>
-          <p:nvPr/>
-        </p:nvSpPr>
-        <p:spPr>
-          <a:xfrm>
-            <a:off x="2786743" y="2231572"/>
-            <a:ext cx="1981200" cy="1382486"/>
-          </a:xfrm>
-          <a:prstGeom prst="rect">
-            <a:avLst/>
-          </a:prstGeom>
-          <a:noFill/>
-          <a:ln w="38100">
-            <a:solidFill>
-              <a:schemeClr val="tx1">
-                <a:alpha val="75000"/>
-              </a:schemeClr>
-            </a:solidFill>
-          </a:ln>
-        </p:spPr>
-        <p:style>
-          <a:lnRef idx="2">
-            <a:schemeClr val="accent1">
-              <a:shade val="50000"/>
-            </a:schemeClr>
-          </a:lnRef>
-          <a:fillRef idx="1">
-            <a:schemeClr val="accent1"/>
-          </a:fillRef>
-          <a:effectRef idx="0">
-            <a:schemeClr val="accent1"/>
-          </a:effectRef>
-          <a:fontRef idx="minor">
-            <a:schemeClr val="lt1"/>
-          </a:fontRef>
-        </p:style>
-        <p:txBody>
-          <a:bodyPr rtlCol="0" anchor="ctr"/>
-          <a:lstStyle/>
-          <a:p>
-            <a:pPr algn="ctr"/>
-            <a:endParaRPr lang="en-US" sz="2400"/>
-          </a:p>
-        </p:txBody>
-      </p:sp>
-      <p:cxnSp>
-        <p:nvCxnSpPr>
-          <p:cNvPr id="48" name="Straight Connector 47">
-            <a:extLst>
-              <a:ext uri="{FF2B5EF4-FFF2-40B4-BE49-F238E27FC236}">
-                <a16:creationId xmlns:a16="http://schemas.microsoft.com/office/drawing/2014/main" id="{3511CDDC-05BD-6F81-7008-BD25CC125633}"/>
+                <a16:creationId xmlns:a16="http://schemas.microsoft.com/office/drawing/2014/main" id="{A8CB227D-9F33-3188-7D2D-297A420A2374}"/>
               </a:ext>
             </a:extLst>
           </p:cNvPr>
           <p:cNvCxnSpPr>
             <a:cxnSpLocks/>
+            <a:stCxn id="20" idx="3"/>
+            <a:endCxn id="71" idx="0"/>
           </p:cNvCxnSpPr>
           <p:nvPr/>
         </p:nvCxnSpPr>
         <p:spPr>
           <a:xfrm>
-            <a:off x="7391401" y="1911096"/>
-            <a:ext cx="0" cy="320476"/>
-          </a:xfrm>
-          <a:prstGeom prst="line">
+            <a:off x="4767943" y="2922815"/>
+            <a:ext cx="654073" cy="2314069"/>
+          </a:xfrm>
+          <a:prstGeom prst="bentConnector2">
             <a:avLst/>
           </a:prstGeom>
-          <a:ln w="122301">
+          <a:ln w="36449">
             <a:solidFill>
-              <a:srgbClr val="C00000"/>
+              <a:schemeClr val="bg2">
+                <a:lumMod val="75000"/>
+              </a:schemeClr>
             </a:solidFill>
+            <a:prstDash val="dash"/>
           </a:ln>
         </p:spPr>
         <p:style>
@@ -5548,383 +4817,34 @@
       </p:cxnSp>
       <p:cxnSp>
         <p:nvCxnSpPr>
-          <p:cNvPr id="52" name="Straight Connector 51">
+          <p:cNvPr id="91" name="Elbow Connector 90">
             <a:extLst>
               <a:ext uri="{FF2B5EF4-FFF2-40B4-BE49-F238E27FC236}">
-                <a16:creationId xmlns:a16="http://schemas.microsoft.com/office/drawing/2014/main" id="{5163E622-6B20-83E0-ADBB-C0E5E010604D}"/>
+                <a16:creationId xmlns:a16="http://schemas.microsoft.com/office/drawing/2014/main" id="{5AD33F12-96A6-536E-64F5-ADA6991EC508}"/>
               </a:ext>
             </a:extLst>
           </p:cNvPr>
           <p:cNvCxnSpPr>
-            <a:cxnSpLocks/>
+            <a:stCxn id="23" idx="2"/>
           </p:cNvCxnSpPr>
           <p:nvPr/>
         </p:nvCxnSpPr>
         <p:spPr>
-          <a:xfrm>
-            <a:off x="7327393" y="1911096"/>
-            <a:ext cx="8903207" cy="0"/>
-          </a:xfrm>
-          <a:prstGeom prst="line">
+          <a:xfrm rot="5400000">
+            <a:off x="12517811" y="3092306"/>
+            <a:ext cx="1579955" cy="2623458"/>
+          </a:xfrm>
+          <a:prstGeom prst="bentConnector2">
             <a:avLst/>
           </a:prstGeom>
-          <a:ln w="122301">
-            <a:solidFill>
-              <a:srgbClr val="C00000"/>
-            </a:solidFill>
-          </a:ln>
-        </p:spPr>
-        <p:style>
-          <a:lnRef idx="1">
-            <a:schemeClr val="accent1"/>
-          </a:lnRef>
-          <a:fillRef idx="0">
-            <a:schemeClr val="accent1"/>
-          </a:fillRef>
-          <a:effectRef idx="0">
-            <a:schemeClr val="accent1"/>
-          </a:effectRef>
-          <a:fontRef idx="minor">
-            <a:schemeClr val="tx1"/>
-          </a:fontRef>
-        </p:style>
-      </p:cxnSp>
-      <p:cxnSp>
-        <p:nvCxnSpPr>
-          <p:cNvPr id="57" name="Straight Connector 56">
-            <a:extLst>
-              <a:ext uri="{FF2B5EF4-FFF2-40B4-BE49-F238E27FC236}">
-                <a16:creationId xmlns:a16="http://schemas.microsoft.com/office/drawing/2014/main" id="{97EFA07A-8AD4-DF29-0973-1F0996AE0F12}"/>
-              </a:ext>
-            </a:extLst>
-          </p:cNvPr>
-          <p:cNvCxnSpPr>
-            <a:cxnSpLocks/>
-          </p:cNvCxnSpPr>
-          <p:nvPr/>
-        </p:nvCxnSpPr>
-        <p:spPr>
-          <a:xfrm>
-            <a:off x="16166592" y="1911096"/>
-            <a:ext cx="0" cy="6187005"/>
-          </a:xfrm>
-          <a:prstGeom prst="line">
-            <a:avLst/>
-          </a:prstGeom>
-          <a:ln w="122301">
-            <a:solidFill>
-              <a:srgbClr val="C00000"/>
-            </a:solidFill>
-          </a:ln>
-        </p:spPr>
-        <p:style>
-          <a:lnRef idx="1">
-            <a:schemeClr val="accent1"/>
-          </a:lnRef>
-          <a:fillRef idx="0">
-            <a:schemeClr val="accent1"/>
-          </a:fillRef>
-          <a:effectRef idx="0">
-            <a:schemeClr val="accent1"/>
-          </a:effectRef>
-          <a:fontRef idx="minor">
-            <a:schemeClr val="tx1"/>
-          </a:fontRef>
-        </p:style>
-      </p:cxnSp>
-      <p:cxnSp>
-        <p:nvCxnSpPr>
-          <p:cNvPr id="78" name="Straight Arrow Connector 77">
-            <a:extLst>
-              <a:ext uri="{FF2B5EF4-FFF2-40B4-BE49-F238E27FC236}">
-                <a16:creationId xmlns:a16="http://schemas.microsoft.com/office/drawing/2014/main" id="{96621821-FF41-016E-A350-FCC089091811}"/>
-              </a:ext>
-            </a:extLst>
-          </p:cNvPr>
-          <p:cNvCxnSpPr>
-            <a:cxnSpLocks/>
-            <a:endCxn id="31" idx="3"/>
-          </p:cNvCxnSpPr>
-          <p:nvPr/>
-        </p:nvCxnSpPr>
-        <p:spPr>
-          <a:xfrm flipH="1">
-            <a:off x="15610117" y="8049985"/>
-            <a:ext cx="620483" cy="1"/>
-          </a:xfrm>
-          <a:prstGeom prst="straightConnector1">
-            <a:avLst/>
-          </a:prstGeom>
-          <a:ln w="122301">
-            <a:solidFill>
-              <a:srgbClr val="C00000"/>
-            </a:solidFill>
-            <a:tailEnd type="triangle"/>
-          </a:ln>
-        </p:spPr>
-        <p:style>
-          <a:lnRef idx="1">
-            <a:schemeClr val="accent1"/>
-          </a:lnRef>
-          <a:fillRef idx="0">
-            <a:schemeClr val="accent1"/>
-          </a:fillRef>
-          <a:effectRef idx="0">
-            <a:schemeClr val="accent1"/>
-          </a:effectRef>
-          <a:fontRef idx="minor">
-            <a:schemeClr val="tx1"/>
-          </a:fontRef>
-        </p:style>
-      </p:cxnSp>
-      <p:sp>
-        <p:nvSpPr>
-          <p:cNvPr id="74" name="TextBox 73">
-            <a:extLst>
-              <a:ext uri="{FF2B5EF4-FFF2-40B4-BE49-F238E27FC236}">
-                <a16:creationId xmlns:a16="http://schemas.microsoft.com/office/drawing/2014/main" id="{244C02EF-F1A6-2F38-5982-D6BF1730AF46}"/>
-              </a:ext>
-            </a:extLst>
-          </p:cNvPr>
-          <p:cNvSpPr txBox="1"/>
-          <p:nvPr/>
-        </p:nvSpPr>
-        <p:spPr>
-          <a:xfrm>
-            <a:off x="15676714" y="5255567"/>
-            <a:ext cx="979755" cy="461665"/>
-          </a:xfrm>
-          <a:prstGeom prst="rect">
-            <a:avLst/>
-          </a:prstGeom>
-          <a:solidFill>
-            <a:schemeClr val="bg1"/>
-          </a:solidFill>
-          <a:ln w="122301">
-            <a:solidFill>
-              <a:srgbClr val="C00000"/>
-            </a:solidFill>
-          </a:ln>
-        </p:spPr>
-        <p:txBody>
-          <a:bodyPr wrap="none" rtlCol="0">
-            <a:spAutoFit/>
-          </a:bodyPr>
-          <a:lstStyle/>
-          <a:p>
-            <a:r>
-              <a:rPr lang="en-US" sz="2400" b="1" dirty="0">
-                <a:latin typeface="Times New Roman" panose="02020603050405020304" pitchFamily="18" charset="0"/>
-                <a:cs typeface="Times New Roman" panose="02020603050405020304" pitchFamily="18" charset="0"/>
-              </a:rPr>
-              <a:t>-1.203</a:t>
-            </a:r>
-          </a:p>
-        </p:txBody>
-      </p:sp>
-      <p:cxnSp>
-        <p:nvCxnSpPr>
-          <p:cNvPr id="87" name="Straight Connector 86">
-            <a:extLst>
-              <a:ext uri="{FF2B5EF4-FFF2-40B4-BE49-F238E27FC236}">
-                <a16:creationId xmlns:a16="http://schemas.microsoft.com/office/drawing/2014/main" id="{6CE5CEBF-EA6A-7D2C-50EC-59E972B8EFCB}"/>
-              </a:ext>
-            </a:extLst>
-          </p:cNvPr>
-          <p:cNvCxnSpPr>
-            <a:cxnSpLocks/>
-          </p:cNvCxnSpPr>
-          <p:nvPr/>
-        </p:nvCxnSpPr>
-        <p:spPr>
-          <a:xfrm>
-            <a:off x="4786231" y="2922815"/>
-            <a:ext cx="635784" cy="0"/>
-          </a:xfrm>
-          <a:prstGeom prst="line">
-            <a:avLst/>
-          </a:prstGeom>
-          <a:ln w="36449">
+          <a:ln w="35941">
             <a:solidFill>
               <a:schemeClr val="bg2">
                 <a:lumMod val="75000"/>
               </a:schemeClr>
             </a:solidFill>
             <a:prstDash val="dash"/>
-          </a:ln>
-        </p:spPr>
-        <p:style>
-          <a:lnRef idx="1">
-            <a:schemeClr val="accent1"/>
-          </a:lnRef>
-          <a:fillRef idx="0">
-            <a:schemeClr val="accent1"/>
-          </a:fillRef>
-          <a:effectRef idx="0">
-            <a:schemeClr val="accent1"/>
-          </a:effectRef>
-          <a:fontRef idx="minor">
-            <a:schemeClr val="tx1"/>
-          </a:fontRef>
-        </p:style>
-      </p:cxnSp>
-      <p:cxnSp>
-        <p:nvCxnSpPr>
-          <p:cNvPr id="89" name="Straight Connector 88">
-            <a:extLst>
-              <a:ext uri="{FF2B5EF4-FFF2-40B4-BE49-F238E27FC236}">
-                <a16:creationId xmlns:a16="http://schemas.microsoft.com/office/drawing/2014/main" id="{2954A03A-1000-AF3F-4F1B-8E024EF56E1D}"/>
-              </a:ext>
-            </a:extLst>
-          </p:cNvPr>
-          <p:cNvCxnSpPr>
-            <a:endCxn id="71" idx="0"/>
-          </p:cNvCxnSpPr>
-          <p:nvPr/>
-        </p:nvCxnSpPr>
-        <p:spPr>
-          <a:xfrm>
-            <a:off x="5422015" y="2904438"/>
-            <a:ext cx="1" cy="2332446"/>
-          </a:xfrm>
-          <a:prstGeom prst="line">
-            <a:avLst/>
-          </a:prstGeom>
-          <a:ln w="36449">
-            <a:solidFill>
-              <a:schemeClr val="bg2">
-                <a:lumMod val="75000"/>
-              </a:schemeClr>
-            </a:solidFill>
-            <a:prstDash val="dash"/>
-          </a:ln>
-        </p:spPr>
-        <p:style>
-          <a:lnRef idx="1">
-            <a:schemeClr val="accent1"/>
-          </a:lnRef>
-          <a:fillRef idx="0">
-            <a:schemeClr val="accent1"/>
-          </a:fillRef>
-          <a:effectRef idx="0">
-            <a:schemeClr val="accent1"/>
-          </a:effectRef>
-          <a:fontRef idx="minor">
-            <a:schemeClr val="tx1"/>
-          </a:fontRef>
-        </p:style>
-      </p:cxnSp>
-      <p:cxnSp>
-        <p:nvCxnSpPr>
-          <p:cNvPr id="95" name="Straight Connector 94">
-            <a:extLst>
-              <a:ext uri="{FF2B5EF4-FFF2-40B4-BE49-F238E27FC236}">
-                <a16:creationId xmlns:a16="http://schemas.microsoft.com/office/drawing/2014/main" id="{2AA1EBD2-5FF0-FD4C-E402-C87FC054298F}"/>
-              </a:ext>
-            </a:extLst>
-          </p:cNvPr>
-          <p:cNvCxnSpPr/>
-          <p:nvPr/>
-        </p:nvCxnSpPr>
-        <p:spPr>
-          <a:xfrm>
-            <a:off x="4795375" y="7635240"/>
-            <a:ext cx="1878506" cy="0"/>
-          </a:xfrm>
-          <a:prstGeom prst="line">
-            <a:avLst/>
-          </a:prstGeom>
-          <a:ln w="47498">
-            <a:solidFill>
-              <a:srgbClr val="C00000"/>
-            </a:solidFill>
-          </a:ln>
-        </p:spPr>
-        <p:style>
-          <a:lnRef idx="1">
-            <a:schemeClr val="accent1"/>
-          </a:lnRef>
-          <a:fillRef idx="0">
-            <a:schemeClr val="accent1"/>
-          </a:fillRef>
-          <a:effectRef idx="0">
-            <a:schemeClr val="accent1"/>
-          </a:effectRef>
-          <a:fontRef idx="minor">
-            <a:schemeClr val="tx1"/>
-          </a:fontRef>
-        </p:style>
-      </p:cxnSp>
-      <p:cxnSp>
-        <p:nvCxnSpPr>
-          <p:cNvPr id="100" name="Straight Connector 99">
-            <a:extLst>
-              <a:ext uri="{FF2B5EF4-FFF2-40B4-BE49-F238E27FC236}">
-                <a16:creationId xmlns:a16="http://schemas.microsoft.com/office/drawing/2014/main" id="{8C41E77F-6D03-C886-ACFD-1912B384BCFF}"/>
-              </a:ext>
-            </a:extLst>
-          </p:cNvPr>
-          <p:cNvCxnSpPr/>
-          <p:nvPr/>
-        </p:nvCxnSpPr>
-        <p:spPr>
-          <a:xfrm flipV="1">
-            <a:off x="7586326" y="6170481"/>
-            <a:ext cx="0" cy="1704365"/>
-          </a:xfrm>
-          <a:prstGeom prst="line">
-            <a:avLst/>
-          </a:prstGeom>
-          <a:ln w="40767">
-            <a:solidFill>
-              <a:srgbClr val="C00000"/>
-            </a:solidFill>
-          </a:ln>
-        </p:spPr>
-        <p:style>
-          <a:lnRef idx="1">
-            <a:schemeClr val="accent1"/>
-          </a:lnRef>
-          <a:fillRef idx="0">
-            <a:schemeClr val="accent1"/>
-          </a:fillRef>
-          <a:effectRef idx="0">
-            <a:schemeClr val="accent1"/>
-          </a:effectRef>
-          <a:fontRef idx="minor">
-            <a:schemeClr val="tx1"/>
-          </a:fontRef>
-        </p:style>
-      </p:cxnSp>
-      <p:cxnSp>
-        <p:nvCxnSpPr>
-          <p:cNvPr id="110" name="Straight Connector 109">
-            <a:extLst>
-              <a:ext uri="{FF2B5EF4-FFF2-40B4-BE49-F238E27FC236}">
-                <a16:creationId xmlns:a16="http://schemas.microsoft.com/office/drawing/2014/main" id="{35835B13-4EBA-3851-3FF9-E88E442E0D67}"/>
-              </a:ext>
-            </a:extLst>
-          </p:cNvPr>
-          <p:cNvCxnSpPr>
-            <a:cxnSpLocks/>
-          </p:cNvCxnSpPr>
-          <p:nvPr/>
-        </p:nvCxnSpPr>
-        <p:spPr>
-          <a:xfrm>
-            <a:off x="14608629" y="3614058"/>
-            <a:ext cx="0" cy="1579955"/>
-          </a:xfrm>
-          <a:prstGeom prst="line">
-            <a:avLst/>
-          </a:prstGeom>
-          <a:ln w="36449">
-            <a:solidFill>
-              <a:schemeClr val="bg2">
-                <a:lumMod val="75000"/>
-              </a:schemeClr>
-            </a:solidFill>
-            <a:prstDash val="dash"/>
+            <a:tailEnd type="triangle"/>
           </a:ln>
         </p:spPr>
         <p:style>
@@ -5956,7 +4876,7 @@
         </p:nvSpPr>
         <p:spPr>
           <a:xfrm>
-            <a:off x="14116031" y="4949515"/>
+            <a:off x="14180935" y="4959540"/>
             <a:ext cx="877163" cy="461665"/>
           </a:xfrm>
           <a:prstGeom prst="rect">
@@ -5990,6 +4910,116 @@
           </a:p>
         </p:txBody>
       </p:sp>
+      <p:cxnSp>
+        <p:nvCxnSpPr>
+          <p:cNvPr id="92" name="Elbow Connector 91">
+            <a:extLst>
+              <a:ext uri="{FF2B5EF4-FFF2-40B4-BE49-F238E27FC236}">
+                <a16:creationId xmlns:a16="http://schemas.microsoft.com/office/drawing/2014/main" id="{851902D1-F9E1-4E49-977A-B542F709358A}"/>
+              </a:ext>
+            </a:extLst>
+          </p:cNvPr>
+          <p:cNvCxnSpPr>
+            <a:cxnSpLocks/>
+          </p:cNvCxnSpPr>
+          <p:nvPr/>
+        </p:nvCxnSpPr>
+        <p:spPr>
+          <a:xfrm rot="16200000" flipV="1">
+            <a:off x="12524383" y="5317173"/>
+            <a:ext cx="1579955" cy="2623458"/>
+          </a:xfrm>
+          <a:prstGeom prst="bentConnector2">
+            <a:avLst/>
+          </a:prstGeom>
+          <a:ln w="35941">
+            <a:solidFill>
+              <a:schemeClr val="bg2">
+                <a:lumMod val="75000"/>
+              </a:schemeClr>
+            </a:solidFill>
+            <a:prstDash val="dash"/>
+            <a:tailEnd type="triangle"/>
+          </a:ln>
+        </p:spPr>
+        <p:style>
+          <a:lnRef idx="1">
+            <a:schemeClr val="accent1"/>
+          </a:lnRef>
+          <a:fillRef idx="0">
+            <a:schemeClr val="accent1"/>
+          </a:fillRef>
+          <a:effectRef idx="0">
+            <a:schemeClr val="accent1"/>
+          </a:effectRef>
+          <a:fontRef idx="minor">
+            <a:schemeClr val="tx1"/>
+          </a:fontRef>
+        </p:style>
+      </p:cxnSp>
+      <p:sp>
+        <p:nvSpPr>
+          <p:cNvPr id="31" name="Rectangle 30">
+            <a:extLst>
+              <a:ext uri="{FF2B5EF4-FFF2-40B4-BE49-F238E27FC236}">
+                <a16:creationId xmlns:a16="http://schemas.microsoft.com/office/drawing/2014/main" id="{8B74F445-A52C-CC92-5C9F-26A6C584DFB7}"/>
+              </a:ext>
+            </a:extLst>
+          </p:cNvPr>
+          <p:cNvSpPr/>
+          <p:nvPr/>
+        </p:nvSpPr>
+        <p:spPr>
+          <a:xfrm>
+            <a:off x="13628917" y="7341615"/>
+            <a:ext cx="1981200" cy="1382486"/>
+          </a:xfrm>
+          <a:prstGeom prst="rect">
+            <a:avLst/>
+          </a:prstGeom>
+          <a:solidFill>
+            <a:schemeClr val="bg1"/>
+          </a:solidFill>
+          <a:ln w="38100">
+            <a:solidFill>
+              <a:schemeClr val="tx1"/>
+            </a:solidFill>
+          </a:ln>
+        </p:spPr>
+        <p:style>
+          <a:lnRef idx="2">
+            <a:schemeClr val="accent1">
+              <a:shade val="50000"/>
+            </a:schemeClr>
+          </a:lnRef>
+          <a:fillRef idx="1">
+            <a:schemeClr val="accent1"/>
+          </a:fillRef>
+          <a:effectRef idx="0">
+            <a:schemeClr val="accent1"/>
+          </a:effectRef>
+          <a:fontRef idx="minor">
+            <a:schemeClr val="lt1"/>
+          </a:fontRef>
+        </p:style>
+        <p:txBody>
+          <a:bodyPr rtlCol="0" anchor="ctr"/>
+          <a:lstStyle/>
+          <a:p>
+            <a:pPr algn="ctr"/>
+            <a:r>
+              <a:rPr lang="en-US" sz="3000" i="1" dirty="0">
+                <a:solidFill>
+                  <a:schemeClr val="tx1"/>
+                </a:solidFill>
+                <a:latin typeface="Times New Roman" panose="02020603050405020304" pitchFamily="18" charset="0"/>
+                <a:cs typeface="Times New Roman" panose="02020603050405020304" pitchFamily="18" charset="0"/>
+              </a:rPr>
+              <a:t>Leaf nitrogen</a:t>
+            </a:r>
+          </a:p>
+        </p:txBody>
+      </p:sp>
       <p:sp>
         <p:nvSpPr>
           <p:cNvPr id="62" name="TextBox 61">
@@ -6004,7 +5034,7 @@
         </p:nvSpPr>
         <p:spPr>
           <a:xfrm>
-            <a:off x="14064734" y="5630251"/>
+            <a:off x="14129640" y="5623182"/>
             <a:ext cx="979755" cy="461665"/>
           </a:xfrm>
           <a:prstGeom prst="rect">
@@ -6040,25 +5070,189 @@
       </p:sp>
       <p:cxnSp>
         <p:nvCxnSpPr>
-          <p:cNvPr id="116" name="Straight Connector 115">
+          <p:cNvPr id="98" name="Elbow Connector 97">
             <a:extLst>
               <a:ext uri="{FF2B5EF4-FFF2-40B4-BE49-F238E27FC236}">
-                <a16:creationId xmlns:a16="http://schemas.microsoft.com/office/drawing/2014/main" id="{D0511C7C-A4BB-1B81-3C07-46BC0B0A4AA6}"/>
+                <a16:creationId xmlns:a16="http://schemas.microsoft.com/office/drawing/2014/main" id="{EF444A78-F531-B01C-E9A9-9C3AD791A386}"/>
               </a:ext>
             </a:extLst>
           </p:cNvPr>
-          <p:cNvCxnSpPr/>
+          <p:cNvCxnSpPr>
+            <a:cxnSpLocks/>
+          </p:cNvCxnSpPr>
           <p:nvPr/>
         </p:nvCxnSpPr>
         <p:spPr>
-          <a:xfrm flipH="1">
-            <a:off x="8055864" y="4128393"/>
-            <a:ext cx="2180163" cy="0"/>
-          </a:xfrm>
-          <a:prstGeom prst="line">
+          <a:xfrm>
+            <a:off x="8131277" y="6148149"/>
+            <a:ext cx="5497640" cy="1595411"/>
+          </a:xfrm>
+          <a:prstGeom prst="bentConnector3">
+            <a:avLst>
+              <a:gd name="adj1" fmla="val 102"/>
+            </a:avLst>
+          </a:prstGeom>
+          <a:ln w="40767">
+            <a:solidFill>
+              <a:srgbClr val="C00000"/>
+            </a:solidFill>
+            <a:tailEnd type="triangle"/>
+          </a:ln>
+        </p:spPr>
+        <p:style>
+          <a:lnRef idx="1">
+            <a:schemeClr val="accent1"/>
+          </a:lnRef>
+          <a:fillRef idx="0">
+            <a:schemeClr val="accent1"/>
+          </a:fillRef>
+          <a:effectRef idx="0">
+            <a:schemeClr val="accent1"/>
+          </a:effectRef>
+          <a:fontRef idx="minor">
+            <a:schemeClr val="tx1"/>
+          </a:fontRef>
+        </p:style>
+      </p:cxnSp>
+      <p:sp>
+        <p:nvSpPr>
+          <p:cNvPr id="61" name="TextBox 60">
+            <a:extLst>
+              <a:ext uri="{FF2B5EF4-FFF2-40B4-BE49-F238E27FC236}">
+                <a16:creationId xmlns:a16="http://schemas.microsoft.com/office/drawing/2014/main" id="{B6476535-A95E-90F0-63CA-BA795134B48E}"/>
+              </a:ext>
+            </a:extLst>
+          </p:cNvPr>
+          <p:cNvSpPr txBox="1"/>
+          <p:nvPr/>
+        </p:nvSpPr>
+        <p:spPr>
+          <a:xfrm>
+            <a:off x="8650120" y="7505559"/>
+            <a:ext cx="979755" cy="461665"/>
+          </a:xfrm>
+          <a:prstGeom prst="rect">
             <a:avLst/>
           </a:prstGeom>
-          <a:ln w="87249">
+          <a:solidFill>
+            <a:schemeClr val="bg1"/>
+          </a:solidFill>
+          <a:ln w="40767">
+            <a:solidFill>
+              <a:srgbClr val="C00000"/>
+            </a:solidFill>
+          </a:ln>
+        </p:spPr>
+        <p:txBody>
+          <a:bodyPr wrap="none" rtlCol="0">
+            <a:spAutoFit/>
+          </a:bodyPr>
+          <a:lstStyle/>
+          <a:p>
+            <a:r>
+              <a:rPr lang="en-US" sz="2400" b="1" dirty="0">
+                <a:latin typeface="Times New Roman" panose="02020603050405020304" pitchFamily="18" charset="0"/>
+                <a:cs typeface="Times New Roman" panose="02020603050405020304" pitchFamily="18" charset="0"/>
+              </a:rPr>
+              <a:t>-0.108</a:t>
+            </a:r>
+          </a:p>
+        </p:txBody>
+      </p:sp>
+      <p:sp>
+        <p:nvSpPr>
+          <p:cNvPr id="25" name="Rectangle 24">
+            <a:extLst>
+              <a:ext uri="{FF2B5EF4-FFF2-40B4-BE49-F238E27FC236}">
+                <a16:creationId xmlns:a16="http://schemas.microsoft.com/office/drawing/2014/main" id="{82AC0384-6387-7D57-8EB4-896E679A9F4F}"/>
+              </a:ext>
+            </a:extLst>
+          </p:cNvPr>
+          <p:cNvSpPr/>
+          <p:nvPr/>
+        </p:nvSpPr>
+        <p:spPr>
+          <a:xfrm>
+            <a:off x="6400801" y="4795159"/>
+            <a:ext cx="1981200" cy="1382486"/>
+          </a:xfrm>
+          <a:prstGeom prst="rect">
+            <a:avLst/>
+          </a:prstGeom>
+          <a:solidFill>
+            <a:schemeClr val="bg1"/>
+          </a:solidFill>
+          <a:ln w="38100">
+            <a:solidFill>
+              <a:schemeClr val="tx1"/>
+            </a:solidFill>
+          </a:ln>
+        </p:spPr>
+        <p:style>
+          <a:lnRef idx="2">
+            <a:schemeClr val="accent1">
+              <a:shade val="50000"/>
+            </a:schemeClr>
+          </a:lnRef>
+          <a:fillRef idx="1">
+            <a:schemeClr val="accent1"/>
+          </a:fillRef>
+          <a:effectRef idx="0">
+            <a:schemeClr val="accent1"/>
+          </a:effectRef>
+          <a:fontRef idx="minor">
+            <a:schemeClr val="lt1"/>
+          </a:fontRef>
+        </p:style>
+        <p:txBody>
+          <a:bodyPr rtlCol="0" anchor="ctr"/>
+          <a:lstStyle/>
+          <a:p>
+            <a:pPr algn="ctr"/>
+            <a:r>
+              <a:rPr lang="el-GR" sz="3000" i="1" dirty="0">
+                <a:solidFill>
+                  <a:schemeClr val="tx1"/>
+                </a:solidFill>
+                <a:latin typeface="Times New Roman" panose="02020603050405020304" pitchFamily="18" charset="0"/>
+                <a:cs typeface="Times New Roman" panose="02020603050405020304" pitchFamily="18" charset="0"/>
+              </a:rPr>
+              <a:t>β</a:t>
+            </a:r>
+            <a:endParaRPr lang="en-US" sz="3000" i="1" dirty="0">
+              <a:solidFill>
+                <a:schemeClr val="tx1"/>
+              </a:solidFill>
+              <a:latin typeface="Times New Roman" panose="02020603050405020304" pitchFamily="18" charset="0"/>
+              <a:cs typeface="Times New Roman" panose="02020603050405020304" pitchFamily="18" charset="0"/>
+            </a:endParaRPr>
+          </a:p>
+        </p:txBody>
+      </p:sp>
+      <p:cxnSp>
+        <p:nvCxnSpPr>
+          <p:cNvPr id="109" name="Elbow Connector 108">
+            <a:extLst>
+              <a:ext uri="{FF2B5EF4-FFF2-40B4-BE49-F238E27FC236}">
+                <a16:creationId xmlns:a16="http://schemas.microsoft.com/office/drawing/2014/main" id="{4EE9E4CF-100A-CA5D-D0E5-696DDBA83C32}"/>
+              </a:ext>
+            </a:extLst>
+          </p:cNvPr>
+          <p:cNvCxnSpPr>
+            <a:cxnSpLocks/>
+            <a:stCxn id="21" idx="0"/>
+          </p:cNvCxnSpPr>
+          <p:nvPr/>
+        </p:nvCxnSpPr>
+        <p:spPr>
+          <a:xfrm rot="5400000" flipH="1" flipV="1">
+            <a:off x="11541034" y="-2534191"/>
+            <a:ext cx="616130" cy="8915396"/>
+          </a:xfrm>
+          <a:prstGeom prst="bentConnector2">
+            <a:avLst/>
+          </a:prstGeom>
+          <a:ln w="122301">
             <a:solidFill>
               <a:srgbClr val="C00000"/>
             </a:solidFill>
@@ -6081,10 +5275,163 @@
       </p:cxnSp>
       <p:cxnSp>
         <p:nvCxnSpPr>
-          <p:cNvPr id="117" name="Straight Connector 116">
+          <p:cNvPr id="112" name="Elbow Connector 111">
             <a:extLst>
               <a:ext uri="{FF2B5EF4-FFF2-40B4-BE49-F238E27FC236}">
-                <a16:creationId xmlns:a16="http://schemas.microsoft.com/office/drawing/2014/main" id="{3361E75F-6DAC-8B1C-F443-B1E9D9F76B16}"/>
+                <a16:creationId xmlns:a16="http://schemas.microsoft.com/office/drawing/2014/main" id="{8993980C-8611-047D-2B61-6DE24FAC2F23}"/>
+              </a:ext>
+            </a:extLst>
+          </p:cNvPr>
+          <p:cNvCxnSpPr>
+            <a:cxnSpLocks/>
+            <a:endCxn id="31" idx="3"/>
+          </p:cNvCxnSpPr>
+          <p:nvPr/>
+        </p:nvCxnSpPr>
+        <p:spPr>
+          <a:xfrm rot="5400000">
+            <a:off x="12723191" y="4442677"/>
+            <a:ext cx="6477108" cy="703255"/>
+          </a:xfrm>
+          <a:prstGeom prst="bentConnector2">
+            <a:avLst/>
+          </a:prstGeom>
+          <a:ln w="122301">
+            <a:solidFill>
+              <a:srgbClr val="C00000"/>
+            </a:solidFill>
+            <a:tailEnd type="triangle"/>
+          </a:ln>
+        </p:spPr>
+        <p:style>
+          <a:lnRef idx="1">
+            <a:schemeClr val="accent1"/>
+          </a:lnRef>
+          <a:fillRef idx="0">
+            <a:schemeClr val="accent1"/>
+          </a:fillRef>
+          <a:effectRef idx="0">
+            <a:schemeClr val="accent1"/>
+          </a:effectRef>
+          <a:fontRef idx="minor">
+            <a:schemeClr val="tx1"/>
+          </a:fontRef>
+        </p:style>
+      </p:cxnSp>
+      <p:sp>
+        <p:nvSpPr>
+          <p:cNvPr id="74" name="TextBox 73">
+            <a:extLst>
+              <a:ext uri="{FF2B5EF4-FFF2-40B4-BE49-F238E27FC236}">
+                <a16:creationId xmlns:a16="http://schemas.microsoft.com/office/drawing/2014/main" id="{244C02EF-F1A6-2F38-5982-D6BF1730AF46}"/>
+              </a:ext>
+            </a:extLst>
+          </p:cNvPr>
+          <p:cNvSpPr txBox="1"/>
+          <p:nvPr/>
+        </p:nvSpPr>
+        <p:spPr>
+          <a:xfrm>
+            <a:off x="15823495" y="5260347"/>
+            <a:ext cx="979755" cy="461665"/>
+          </a:xfrm>
+          <a:prstGeom prst="rect">
+            <a:avLst/>
+          </a:prstGeom>
+          <a:solidFill>
+            <a:schemeClr val="bg1"/>
+          </a:solidFill>
+          <a:ln w="122301">
+            <a:solidFill>
+              <a:srgbClr val="C00000"/>
+            </a:solidFill>
+          </a:ln>
+        </p:spPr>
+        <p:txBody>
+          <a:bodyPr wrap="none" rtlCol="0">
+            <a:spAutoFit/>
+          </a:bodyPr>
+          <a:lstStyle/>
+          <a:p>
+            <a:r>
+              <a:rPr lang="en-US" sz="2400" b="1" dirty="0">
+                <a:latin typeface="Times New Roman" panose="02020603050405020304" pitchFamily="18" charset="0"/>
+                <a:cs typeface="Times New Roman" panose="02020603050405020304" pitchFamily="18" charset="0"/>
+              </a:rPr>
+              <a:t>-1.203</a:t>
+            </a:r>
+          </a:p>
+        </p:txBody>
+      </p:sp>
+      <p:sp>
+        <p:nvSpPr>
+          <p:cNvPr id="21" name="Rectangle 20">
+            <a:extLst>
+              <a:ext uri="{FF2B5EF4-FFF2-40B4-BE49-F238E27FC236}">
+                <a16:creationId xmlns:a16="http://schemas.microsoft.com/office/drawing/2014/main" id="{2A451EDF-2134-D951-F607-AE0DC624C032}"/>
+              </a:ext>
+            </a:extLst>
+          </p:cNvPr>
+          <p:cNvSpPr/>
+          <p:nvPr/>
+        </p:nvSpPr>
+        <p:spPr>
+          <a:xfrm>
+            <a:off x="6400801" y="2231572"/>
+            <a:ext cx="1981200" cy="1382486"/>
+          </a:xfrm>
+          <a:prstGeom prst="rect">
+            <a:avLst/>
+          </a:prstGeom>
+          <a:solidFill>
+            <a:schemeClr val="bg1"/>
+          </a:solidFill>
+          <a:ln w="38100">
+            <a:solidFill>
+              <a:schemeClr val="tx1"/>
+            </a:solidFill>
+          </a:ln>
+        </p:spPr>
+        <p:style>
+          <a:lnRef idx="2">
+            <a:schemeClr val="accent1">
+              <a:shade val="50000"/>
+            </a:schemeClr>
+          </a:lnRef>
+          <a:fillRef idx="1">
+            <a:schemeClr val="accent1"/>
+          </a:fillRef>
+          <a:effectRef idx="0">
+            <a:schemeClr val="accent1"/>
+          </a:effectRef>
+          <a:fontRef idx="minor">
+            <a:schemeClr val="lt1"/>
+          </a:fontRef>
+        </p:style>
+        <p:txBody>
+          <a:bodyPr rtlCol="0" anchor="ctr"/>
+          <a:lstStyle/>
+          <a:p>
+            <a:pPr algn="ctr"/>
+            <a:r>
+              <a:rPr lang="en-US" sz="3000" i="1" dirty="0">
+                <a:solidFill>
+                  <a:schemeClr val="tx1"/>
+                </a:solidFill>
+                <a:latin typeface="Times New Roman" panose="02020603050405020304" pitchFamily="18" charset="0"/>
+                <a:cs typeface="Times New Roman" panose="02020603050405020304" pitchFamily="18" charset="0"/>
+              </a:rPr>
+              <a:t>Plant functional group</a:t>
+            </a:r>
+          </a:p>
+        </p:txBody>
+      </p:sp>
+      <p:cxnSp>
+        <p:nvCxnSpPr>
+          <p:cNvPr id="123" name="Elbow Connector 122">
+            <a:extLst>
+              <a:ext uri="{FF2B5EF4-FFF2-40B4-BE49-F238E27FC236}">
+                <a16:creationId xmlns:a16="http://schemas.microsoft.com/office/drawing/2014/main" id="{C8A835FD-2540-3B1A-986A-08E038E771F0}"/>
               </a:ext>
             </a:extLst>
           </p:cNvPr>
@@ -6095,10 +5442,445 @@
         </p:nvCxnSpPr>
         <p:spPr>
           <a:xfrm flipV="1">
-            <a:off x="8055864" y="3642115"/>
-            <a:ext cx="0" cy="486278"/>
-          </a:xfrm>
-          <a:prstGeom prst="line">
+            <a:off x="4767943" y="6177645"/>
+            <a:ext cx="1900977" cy="1565915"/>
+          </a:xfrm>
+          <a:prstGeom prst="bentConnector3">
+            <a:avLst>
+              <a:gd name="adj1" fmla="val 99861"/>
+            </a:avLst>
+          </a:prstGeom>
+          <a:ln w="47498">
+            <a:solidFill>
+              <a:srgbClr val="C00000"/>
+            </a:solidFill>
+            <a:tailEnd type="triangle"/>
+          </a:ln>
+        </p:spPr>
+        <p:style>
+          <a:lnRef idx="1">
+            <a:schemeClr val="accent1"/>
+          </a:lnRef>
+          <a:fillRef idx="0">
+            <a:schemeClr val="accent1"/>
+          </a:fillRef>
+          <a:effectRef idx="0">
+            <a:schemeClr val="accent1"/>
+          </a:effectRef>
+          <a:fontRef idx="minor">
+            <a:schemeClr val="tx1"/>
+          </a:fontRef>
+        </p:style>
+      </p:cxnSp>
+      <p:sp>
+        <p:nvSpPr>
+          <p:cNvPr id="69" name="TextBox 68">
+            <a:extLst>
+              <a:ext uri="{FF2B5EF4-FFF2-40B4-BE49-F238E27FC236}">
+                <a16:creationId xmlns:a16="http://schemas.microsoft.com/office/drawing/2014/main" id="{D042879D-AA23-A303-5FF7-5CDCB1157B5A}"/>
+              </a:ext>
+            </a:extLst>
+          </p:cNvPr>
+          <p:cNvSpPr txBox="1"/>
+          <p:nvPr/>
+        </p:nvSpPr>
+        <p:spPr>
+          <a:xfrm>
+            <a:off x="6174855" y="6739725"/>
+            <a:ext cx="979755" cy="461665"/>
+          </a:xfrm>
+          <a:prstGeom prst="rect">
+            <a:avLst/>
+          </a:prstGeom>
+          <a:solidFill>
+            <a:schemeClr val="bg1"/>
+          </a:solidFill>
+          <a:ln w="47498">
+            <a:solidFill>
+              <a:srgbClr val="C00000"/>
+            </a:solidFill>
+          </a:ln>
+        </p:spPr>
+        <p:txBody>
+          <a:bodyPr wrap="none" rtlCol="0">
+            <a:spAutoFit/>
+          </a:bodyPr>
+          <a:lstStyle/>
+          <a:p>
+            <a:r>
+              <a:rPr lang="en-US" sz="2400" b="1" dirty="0">
+                <a:latin typeface="Times New Roman" panose="02020603050405020304" pitchFamily="18" charset="0"/>
+                <a:cs typeface="Times New Roman" panose="02020603050405020304" pitchFamily="18" charset="0"/>
+              </a:rPr>
+              <a:t>-0.198</a:t>
+            </a:r>
+          </a:p>
+        </p:txBody>
+      </p:sp>
+    </p:spTree>
+    <p:extLst>
+      <p:ext uri="{BB962C8B-B14F-4D97-AF65-F5344CB8AC3E}">
+        <p14:creationId xmlns:p14="http://schemas.microsoft.com/office/powerpoint/2010/main" val="3515727378"/>
+      </p:ext>
+    </p:extLst>
+  </p:cSld>
+  <p:clrMapOvr>
+    <a:masterClrMapping/>
+  </p:clrMapOvr>
+</p:sld>
+</file>
+
+<file path=ppt/slides/slide2.xml><?xml version="1.0" encoding="utf-8"?>
+<p:sld xmlns:a="http://schemas.openxmlformats.org/drawingml/2006/main" xmlns:r="http://schemas.openxmlformats.org/officeDocument/2006/relationships" xmlns:p="http://schemas.openxmlformats.org/presentationml/2006/main">
+  <p:cSld>
+    <p:spTree>
+      <p:nvGrpSpPr>
+        <p:cNvPr id="1" name=""/>
+        <p:cNvGrpSpPr/>
+        <p:nvPr/>
+      </p:nvGrpSpPr>
+      <p:grpSpPr>
+        <a:xfrm>
+          <a:off x="0" y="0"/>
+          <a:ext cx="0" cy="0"/>
+          <a:chOff x="0" y="0"/>
+          <a:chExt cx="0" cy="0"/>
+        </a:xfrm>
+      </p:grpSpPr>
+      <p:cxnSp>
+        <p:nvCxnSpPr>
+          <p:cNvPr id="77" name="Straight Arrow Connector 76">
+            <a:extLst>
+              <a:ext uri="{FF2B5EF4-FFF2-40B4-BE49-F238E27FC236}">
+                <a16:creationId xmlns:a16="http://schemas.microsoft.com/office/drawing/2014/main" id="{2CAFDABE-EBA8-F947-4A74-58528D3B89C8}"/>
+              </a:ext>
+            </a:extLst>
+          </p:cNvPr>
+          <p:cNvCxnSpPr>
+            <a:cxnSpLocks/>
+            <a:endCxn id="26" idx="0"/>
+          </p:cNvCxnSpPr>
+          <p:nvPr/>
+        </p:nvCxnSpPr>
+        <p:spPr>
+          <a:xfrm>
+            <a:off x="11005459" y="4171476"/>
+            <a:ext cx="0" cy="623683"/>
+          </a:xfrm>
+          <a:prstGeom prst="straightConnector1">
+            <a:avLst/>
+          </a:prstGeom>
+          <a:ln w="87249">
+            <a:solidFill>
+              <a:srgbClr val="C00000"/>
+            </a:solidFill>
+            <a:tailEnd type="triangle"/>
+          </a:ln>
+        </p:spPr>
+        <p:style>
+          <a:lnRef idx="1">
+            <a:schemeClr val="accent1"/>
+          </a:lnRef>
+          <a:fillRef idx="0">
+            <a:schemeClr val="accent1"/>
+          </a:fillRef>
+          <a:effectRef idx="0">
+            <a:schemeClr val="accent1"/>
+          </a:effectRef>
+          <a:fontRef idx="minor">
+            <a:schemeClr val="tx1"/>
+          </a:fontRef>
+        </p:style>
+      </p:cxnSp>
+      <p:cxnSp>
+        <p:nvCxnSpPr>
+          <p:cNvPr id="2" name="Straight Arrow Connector 1">
+            <a:extLst>
+              <a:ext uri="{FF2B5EF4-FFF2-40B4-BE49-F238E27FC236}">
+                <a16:creationId xmlns:a16="http://schemas.microsoft.com/office/drawing/2014/main" id="{82720060-A6FC-704F-8F90-E0C8FE5F764B}"/>
+              </a:ext>
+            </a:extLst>
+          </p:cNvPr>
+          <p:cNvCxnSpPr>
+            <a:cxnSpLocks/>
+          </p:cNvCxnSpPr>
+          <p:nvPr/>
+        </p:nvCxnSpPr>
+        <p:spPr>
+          <a:xfrm flipH="1">
+            <a:off x="11996059" y="2922815"/>
+            <a:ext cx="1632858" cy="0"/>
+          </a:xfrm>
+          <a:prstGeom prst="straightConnector1">
+            <a:avLst/>
+          </a:prstGeom>
+          <a:ln w="76962">
+            <a:solidFill>
+              <a:srgbClr val="C00000"/>
+            </a:solidFill>
+            <a:tailEnd type="triangle"/>
+          </a:ln>
+        </p:spPr>
+        <p:style>
+          <a:lnRef idx="1">
+            <a:schemeClr val="accent1"/>
+          </a:lnRef>
+          <a:fillRef idx="0">
+            <a:schemeClr val="accent1"/>
+          </a:fillRef>
+          <a:effectRef idx="0">
+            <a:schemeClr val="accent1"/>
+          </a:effectRef>
+          <a:fontRef idx="minor">
+            <a:schemeClr val="tx1"/>
+          </a:fontRef>
+        </p:style>
+      </p:cxnSp>
+      <p:sp>
+        <p:nvSpPr>
+          <p:cNvPr id="3" name="TextBox 2">
+            <a:extLst>
+              <a:ext uri="{FF2B5EF4-FFF2-40B4-BE49-F238E27FC236}">
+                <a16:creationId xmlns:a16="http://schemas.microsoft.com/office/drawing/2014/main" id="{619B30D9-163E-1E1A-66F6-9A39C8D890EC}"/>
+              </a:ext>
+            </a:extLst>
+          </p:cNvPr>
+          <p:cNvSpPr txBox="1"/>
+          <p:nvPr/>
+        </p:nvSpPr>
+        <p:spPr>
+          <a:xfrm>
+            <a:off x="12399206" y="2669746"/>
+            <a:ext cx="979755" cy="461665"/>
+          </a:xfrm>
+          <a:prstGeom prst="rect">
+            <a:avLst/>
+          </a:prstGeom>
+          <a:solidFill>
+            <a:schemeClr val="bg1"/>
+          </a:solidFill>
+          <a:ln w="76962">
+            <a:solidFill>
+              <a:srgbClr val="C00000"/>
+            </a:solidFill>
+          </a:ln>
+        </p:spPr>
+        <p:txBody>
+          <a:bodyPr wrap="none" rtlCol="0">
+            <a:spAutoFit/>
+          </a:bodyPr>
+          <a:lstStyle/>
+          <a:p>
+            <a:r>
+              <a:rPr lang="en-US" sz="2400" b="1" dirty="0">
+                <a:latin typeface="Times New Roman" panose="02020603050405020304" pitchFamily="18" charset="0"/>
+                <a:cs typeface="Times New Roman" panose="02020603050405020304" pitchFamily="18" charset="0"/>
+              </a:rPr>
+              <a:t>-0.593</a:t>
+            </a:r>
+          </a:p>
+        </p:txBody>
+      </p:sp>
+      <p:cxnSp>
+        <p:nvCxnSpPr>
+          <p:cNvPr id="4" name="Straight Arrow Connector 3">
+            <a:extLst>
+              <a:ext uri="{FF2B5EF4-FFF2-40B4-BE49-F238E27FC236}">
+                <a16:creationId xmlns:a16="http://schemas.microsoft.com/office/drawing/2014/main" id="{B54A85AB-699A-D0DA-507D-FBF24A12F347}"/>
+              </a:ext>
+            </a:extLst>
+          </p:cNvPr>
+          <p:cNvCxnSpPr>
+            <a:cxnSpLocks/>
+          </p:cNvCxnSpPr>
+          <p:nvPr/>
+        </p:nvCxnSpPr>
+        <p:spPr>
+          <a:xfrm>
+            <a:off x="3777343" y="3614058"/>
+            <a:ext cx="0" cy="3744684"/>
+          </a:xfrm>
+          <a:prstGeom prst="straightConnector1">
+            <a:avLst/>
+          </a:prstGeom>
+          <a:ln w="64135">
+            <a:solidFill>
+              <a:schemeClr val="accent1"/>
+            </a:solidFill>
+            <a:prstDash val="solid"/>
+            <a:tailEnd type="triangle"/>
+          </a:ln>
+        </p:spPr>
+        <p:style>
+          <a:lnRef idx="1">
+            <a:schemeClr val="accent1"/>
+          </a:lnRef>
+          <a:fillRef idx="0">
+            <a:schemeClr val="accent1"/>
+          </a:fillRef>
+          <a:effectRef idx="0">
+            <a:schemeClr val="accent1"/>
+          </a:effectRef>
+          <a:fontRef idx="minor">
+            <a:schemeClr val="tx1"/>
+          </a:fontRef>
+        </p:style>
+      </p:cxnSp>
+      <p:sp>
+        <p:nvSpPr>
+          <p:cNvPr id="24" name="TextBox 23">
+            <a:extLst>
+              <a:ext uri="{FF2B5EF4-FFF2-40B4-BE49-F238E27FC236}">
+                <a16:creationId xmlns:a16="http://schemas.microsoft.com/office/drawing/2014/main" id="{9C892ED5-3440-8C9B-344D-BBFF61B01708}"/>
+              </a:ext>
+            </a:extLst>
+          </p:cNvPr>
+          <p:cNvSpPr txBox="1"/>
+          <p:nvPr/>
+        </p:nvSpPr>
+        <p:spPr>
+          <a:xfrm>
+            <a:off x="3338761" y="5255567"/>
+            <a:ext cx="877163" cy="461665"/>
+          </a:xfrm>
+          <a:prstGeom prst="rect">
+            <a:avLst/>
+          </a:prstGeom>
+          <a:solidFill>
+            <a:schemeClr val="bg1"/>
+          </a:solidFill>
+          <a:ln w="64135">
+            <a:solidFill>
+              <a:schemeClr val="accent1"/>
+            </a:solidFill>
+            <a:prstDash val="solid"/>
+          </a:ln>
+        </p:spPr>
+        <p:txBody>
+          <a:bodyPr wrap="none" rtlCol="0">
+            <a:spAutoFit/>
+          </a:bodyPr>
+          <a:lstStyle/>
+          <a:p>
+            <a:r>
+              <a:rPr lang="en-US" sz="2400" b="1" dirty="0">
+                <a:latin typeface="Times New Roman" panose="02020603050405020304" pitchFamily="18" charset="0"/>
+                <a:cs typeface="Times New Roman" panose="02020603050405020304" pitchFamily="18" charset="0"/>
+              </a:rPr>
+              <a:t>0.423</a:t>
+            </a:r>
+          </a:p>
+        </p:txBody>
+      </p:sp>
+      <p:cxnSp>
+        <p:nvCxnSpPr>
+          <p:cNvPr id="30" name="Straight Arrow Connector 29">
+            <a:extLst>
+              <a:ext uri="{FF2B5EF4-FFF2-40B4-BE49-F238E27FC236}">
+                <a16:creationId xmlns:a16="http://schemas.microsoft.com/office/drawing/2014/main" id="{5E0C0211-B9AC-F53A-DD8F-97ACC4DE8030}"/>
+              </a:ext>
+            </a:extLst>
+          </p:cNvPr>
+          <p:cNvCxnSpPr>
+            <a:cxnSpLocks/>
+            <a:stCxn id="26" idx="1"/>
+          </p:cNvCxnSpPr>
+          <p:nvPr/>
+        </p:nvCxnSpPr>
+        <p:spPr>
+          <a:xfrm flipH="1" flipV="1">
+            <a:off x="8382001" y="5486400"/>
+            <a:ext cx="1632858" cy="3"/>
+          </a:xfrm>
+          <a:prstGeom prst="straightConnector1">
+            <a:avLst/>
+          </a:prstGeom>
+          <a:ln w="72390">
+            <a:headEnd type="triangle"/>
+            <a:tailEnd type="triangle"/>
+          </a:ln>
+        </p:spPr>
+        <p:style>
+          <a:lnRef idx="1">
+            <a:schemeClr val="accent1"/>
+          </a:lnRef>
+          <a:fillRef idx="0">
+            <a:schemeClr val="accent1"/>
+          </a:fillRef>
+          <a:effectRef idx="0">
+            <a:schemeClr val="accent1"/>
+          </a:effectRef>
+          <a:fontRef idx="minor">
+            <a:schemeClr val="tx1"/>
+          </a:fontRef>
+        </p:style>
+      </p:cxnSp>
+      <p:sp>
+        <p:nvSpPr>
+          <p:cNvPr id="75" name="TextBox 74">
+            <a:extLst>
+              <a:ext uri="{FF2B5EF4-FFF2-40B4-BE49-F238E27FC236}">
+                <a16:creationId xmlns:a16="http://schemas.microsoft.com/office/drawing/2014/main" id="{D36FBB87-9540-A96D-DB0B-F29A669A82DE}"/>
+              </a:ext>
+            </a:extLst>
+          </p:cNvPr>
+          <p:cNvSpPr txBox="1"/>
+          <p:nvPr/>
+        </p:nvSpPr>
+        <p:spPr>
+          <a:xfrm>
+            <a:off x="8759831" y="5260347"/>
+            <a:ext cx="877163" cy="461665"/>
+          </a:xfrm>
+          <a:prstGeom prst="rect">
+            <a:avLst/>
+          </a:prstGeom>
+          <a:solidFill>
+            <a:schemeClr val="bg1"/>
+          </a:solidFill>
+          <a:ln w="72390">
+            <a:solidFill>
+              <a:schemeClr val="accent1"/>
+            </a:solidFill>
+          </a:ln>
+        </p:spPr>
+        <p:txBody>
+          <a:bodyPr wrap="none" rtlCol="0">
+            <a:spAutoFit/>
+          </a:bodyPr>
+          <a:lstStyle/>
+          <a:p>
+            <a:r>
+              <a:rPr lang="en-US" sz="2400" b="1" dirty="0">
+                <a:latin typeface="Times New Roman" panose="02020603050405020304" pitchFamily="18" charset="0"/>
+                <a:cs typeface="Times New Roman" panose="02020603050405020304" pitchFamily="18" charset="0"/>
+              </a:rPr>
+              <a:t>0.533</a:t>
+            </a:r>
+          </a:p>
+        </p:txBody>
+      </p:sp>
+      <p:cxnSp>
+        <p:nvCxnSpPr>
+          <p:cNvPr id="29" name="Elbow Connector 28">
+            <a:extLst>
+              <a:ext uri="{FF2B5EF4-FFF2-40B4-BE49-F238E27FC236}">
+                <a16:creationId xmlns:a16="http://schemas.microsoft.com/office/drawing/2014/main" id="{AB04B289-C4DF-3DCE-6A6F-A2577780B32F}"/>
+              </a:ext>
+            </a:extLst>
+          </p:cNvPr>
+          <p:cNvCxnSpPr>
+            <a:cxnSpLocks/>
+            <a:stCxn id="21" idx="2"/>
+          </p:cNvCxnSpPr>
+          <p:nvPr/>
+        </p:nvCxnSpPr>
+        <p:spPr>
+          <a:xfrm rot="16200000" flipH="1">
+            <a:off x="8941491" y="2063967"/>
+            <a:ext cx="557418" cy="3657599"/>
+          </a:xfrm>
+          <a:prstGeom prst="bentConnector2">
             <a:avLst/>
           </a:prstGeom>
           <a:ln w="87249">
@@ -6136,7 +5918,7 @@
         </p:nvSpPr>
         <p:spPr>
           <a:xfrm>
-            <a:off x="8670324" y="3897561"/>
+            <a:off x="8657239" y="3940643"/>
             <a:ext cx="979755" cy="461665"/>
           </a:xfrm>
           <a:prstGeom prst="rect">
@@ -6167,10 +5949,855 @@
           </a:p>
         </p:txBody>
       </p:sp>
+      <p:cxnSp>
+        <p:nvCxnSpPr>
+          <p:cNvPr id="98" name="Elbow Connector 97">
+            <a:extLst>
+              <a:ext uri="{FF2B5EF4-FFF2-40B4-BE49-F238E27FC236}">
+                <a16:creationId xmlns:a16="http://schemas.microsoft.com/office/drawing/2014/main" id="{EF444A78-F531-B01C-E9A9-9C3AD791A386}"/>
+              </a:ext>
+            </a:extLst>
+          </p:cNvPr>
+          <p:cNvCxnSpPr>
+            <a:cxnSpLocks/>
+            <a:stCxn id="25" idx="2"/>
+            <a:endCxn id="31" idx="1"/>
+          </p:cNvCxnSpPr>
+          <p:nvPr/>
+        </p:nvCxnSpPr>
+        <p:spPr>
+          <a:xfrm rot="16200000" flipH="1">
+            <a:off x="9582553" y="3986493"/>
+            <a:ext cx="1855213" cy="6237516"/>
+          </a:xfrm>
+          <a:prstGeom prst="bentConnector2">
+            <a:avLst/>
+          </a:prstGeom>
+          <a:ln w="40767">
+            <a:solidFill>
+              <a:srgbClr val="C00000"/>
+            </a:solidFill>
+            <a:tailEnd type="triangle"/>
+          </a:ln>
+        </p:spPr>
+        <p:style>
+          <a:lnRef idx="1">
+            <a:schemeClr val="accent1"/>
+          </a:lnRef>
+          <a:fillRef idx="0">
+            <a:schemeClr val="accent1"/>
+          </a:fillRef>
+          <a:effectRef idx="0">
+            <a:schemeClr val="accent1"/>
+          </a:effectRef>
+          <a:fontRef idx="minor">
+            <a:schemeClr val="tx1"/>
+          </a:fontRef>
+        </p:style>
+      </p:cxnSp>
+      <p:sp>
+        <p:nvSpPr>
+          <p:cNvPr id="61" name="TextBox 60">
+            <a:extLst>
+              <a:ext uri="{FF2B5EF4-FFF2-40B4-BE49-F238E27FC236}">
+                <a16:creationId xmlns:a16="http://schemas.microsoft.com/office/drawing/2014/main" id="{B6476535-A95E-90F0-63CA-BA795134B48E}"/>
+              </a:ext>
+            </a:extLst>
+          </p:cNvPr>
+          <p:cNvSpPr txBox="1"/>
+          <p:nvPr/>
+        </p:nvSpPr>
+        <p:spPr>
+          <a:xfrm>
+            <a:off x="10025704" y="7803151"/>
+            <a:ext cx="979755" cy="461665"/>
+          </a:xfrm>
+          <a:prstGeom prst="rect">
+            <a:avLst/>
+          </a:prstGeom>
+          <a:solidFill>
+            <a:schemeClr val="bg1"/>
+          </a:solidFill>
+          <a:ln w="40767">
+            <a:solidFill>
+              <a:srgbClr val="C00000"/>
+            </a:solidFill>
+          </a:ln>
+        </p:spPr>
+        <p:txBody>
+          <a:bodyPr wrap="none" rtlCol="0">
+            <a:spAutoFit/>
+          </a:bodyPr>
+          <a:lstStyle/>
+          <a:p>
+            <a:r>
+              <a:rPr lang="en-US" sz="2400" b="1" dirty="0">
+                <a:latin typeface="Times New Roman" panose="02020603050405020304" pitchFamily="18" charset="0"/>
+                <a:cs typeface="Times New Roman" panose="02020603050405020304" pitchFamily="18" charset="0"/>
+              </a:rPr>
+              <a:t>-0.108</a:t>
+            </a:r>
+          </a:p>
+        </p:txBody>
+      </p:sp>
+      <p:cxnSp>
+        <p:nvCxnSpPr>
+          <p:cNvPr id="109" name="Elbow Connector 108">
+            <a:extLst>
+              <a:ext uri="{FF2B5EF4-FFF2-40B4-BE49-F238E27FC236}">
+                <a16:creationId xmlns:a16="http://schemas.microsoft.com/office/drawing/2014/main" id="{4EE9E4CF-100A-CA5D-D0E5-696DDBA83C32}"/>
+              </a:ext>
+            </a:extLst>
+          </p:cNvPr>
+          <p:cNvCxnSpPr>
+            <a:cxnSpLocks/>
+            <a:stCxn id="21" idx="0"/>
+          </p:cNvCxnSpPr>
+          <p:nvPr/>
+        </p:nvCxnSpPr>
+        <p:spPr>
+          <a:xfrm rot="5400000" flipH="1" flipV="1">
+            <a:off x="11541034" y="-2534191"/>
+            <a:ext cx="616130" cy="8915396"/>
+          </a:xfrm>
+          <a:prstGeom prst="bentConnector2">
+            <a:avLst/>
+          </a:prstGeom>
+          <a:ln w="122301">
+            <a:solidFill>
+              <a:srgbClr val="C00000"/>
+            </a:solidFill>
+          </a:ln>
+        </p:spPr>
+        <p:style>
+          <a:lnRef idx="1">
+            <a:schemeClr val="accent1"/>
+          </a:lnRef>
+          <a:fillRef idx="0">
+            <a:schemeClr val="accent1"/>
+          </a:fillRef>
+          <a:effectRef idx="0">
+            <a:schemeClr val="accent1"/>
+          </a:effectRef>
+          <a:fontRef idx="minor">
+            <a:schemeClr val="tx1"/>
+          </a:fontRef>
+        </p:style>
+      </p:cxnSp>
+      <p:cxnSp>
+        <p:nvCxnSpPr>
+          <p:cNvPr id="112" name="Elbow Connector 111">
+            <a:extLst>
+              <a:ext uri="{FF2B5EF4-FFF2-40B4-BE49-F238E27FC236}">
+                <a16:creationId xmlns:a16="http://schemas.microsoft.com/office/drawing/2014/main" id="{8993980C-8611-047D-2B61-6DE24FAC2F23}"/>
+              </a:ext>
+            </a:extLst>
+          </p:cNvPr>
+          <p:cNvCxnSpPr>
+            <a:cxnSpLocks/>
+            <a:endCxn id="31" idx="3"/>
+          </p:cNvCxnSpPr>
+          <p:nvPr/>
+        </p:nvCxnSpPr>
+        <p:spPr>
+          <a:xfrm rot="5400000">
+            <a:off x="12723191" y="4442677"/>
+            <a:ext cx="6477108" cy="703255"/>
+          </a:xfrm>
+          <a:prstGeom prst="bentConnector2">
+            <a:avLst/>
+          </a:prstGeom>
+          <a:ln w="122301">
+            <a:solidFill>
+              <a:srgbClr val="C00000"/>
+            </a:solidFill>
+            <a:tailEnd type="triangle"/>
+          </a:ln>
+        </p:spPr>
+        <p:style>
+          <a:lnRef idx="1">
+            <a:schemeClr val="accent1"/>
+          </a:lnRef>
+          <a:fillRef idx="0">
+            <a:schemeClr val="accent1"/>
+          </a:fillRef>
+          <a:effectRef idx="0">
+            <a:schemeClr val="accent1"/>
+          </a:effectRef>
+          <a:fontRef idx="minor">
+            <a:schemeClr val="tx1"/>
+          </a:fontRef>
+        </p:style>
+      </p:cxnSp>
+      <p:sp>
+        <p:nvSpPr>
+          <p:cNvPr id="74" name="TextBox 73">
+            <a:extLst>
+              <a:ext uri="{FF2B5EF4-FFF2-40B4-BE49-F238E27FC236}">
+                <a16:creationId xmlns:a16="http://schemas.microsoft.com/office/drawing/2014/main" id="{244C02EF-F1A6-2F38-5982-D6BF1730AF46}"/>
+              </a:ext>
+            </a:extLst>
+          </p:cNvPr>
+          <p:cNvSpPr txBox="1"/>
+          <p:nvPr/>
+        </p:nvSpPr>
+        <p:spPr>
+          <a:xfrm>
+            <a:off x="15823495" y="5260347"/>
+            <a:ext cx="979755" cy="461665"/>
+          </a:xfrm>
+          <a:prstGeom prst="rect">
+            <a:avLst/>
+          </a:prstGeom>
+          <a:solidFill>
+            <a:schemeClr val="bg1"/>
+          </a:solidFill>
+          <a:ln w="122301">
+            <a:solidFill>
+              <a:srgbClr val="C00000"/>
+            </a:solidFill>
+          </a:ln>
+        </p:spPr>
+        <p:txBody>
+          <a:bodyPr wrap="none" rtlCol="0">
+            <a:spAutoFit/>
+          </a:bodyPr>
+          <a:lstStyle/>
+          <a:p>
+            <a:r>
+              <a:rPr lang="en-US" sz="2400" b="1" dirty="0">
+                <a:latin typeface="Times New Roman" panose="02020603050405020304" pitchFamily="18" charset="0"/>
+                <a:cs typeface="Times New Roman" panose="02020603050405020304" pitchFamily="18" charset="0"/>
+              </a:rPr>
+              <a:t>-1.203</a:t>
+            </a:r>
+          </a:p>
+        </p:txBody>
+      </p:sp>
+      <p:cxnSp>
+        <p:nvCxnSpPr>
+          <p:cNvPr id="16" name="Elbow Connector 15">
+            <a:extLst>
+              <a:ext uri="{FF2B5EF4-FFF2-40B4-BE49-F238E27FC236}">
+                <a16:creationId xmlns:a16="http://schemas.microsoft.com/office/drawing/2014/main" id="{CD678C82-F73A-A2F9-49F0-EEB5BD67A2B1}"/>
+              </a:ext>
+            </a:extLst>
+          </p:cNvPr>
+          <p:cNvCxnSpPr>
+            <a:stCxn id="28" idx="3"/>
+            <a:endCxn id="25" idx="1"/>
+          </p:cNvCxnSpPr>
+          <p:nvPr/>
+        </p:nvCxnSpPr>
+        <p:spPr>
+          <a:xfrm flipV="1">
+            <a:off x="4767943" y="5486402"/>
+            <a:ext cx="1632858" cy="2563584"/>
+          </a:xfrm>
+          <a:prstGeom prst="bentConnector3">
+            <a:avLst/>
+          </a:prstGeom>
+          <a:ln w="47498">
+            <a:solidFill>
+              <a:srgbClr val="C00000"/>
+            </a:solidFill>
+            <a:tailEnd type="triangle"/>
+          </a:ln>
+        </p:spPr>
+        <p:style>
+          <a:lnRef idx="1">
+            <a:schemeClr val="accent1"/>
+          </a:lnRef>
+          <a:fillRef idx="0">
+            <a:schemeClr val="accent1"/>
+          </a:fillRef>
+          <a:effectRef idx="0">
+            <a:schemeClr val="accent1"/>
+          </a:effectRef>
+          <a:fontRef idx="minor">
+            <a:schemeClr val="tx1"/>
+          </a:fontRef>
+        </p:style>
+      </p:cxnSp>
+      <p:sp>
+        <p:nvSpPr>
+          <p:cNvPr id="69" name="TextBox 68">
+            <a:extLst>
+              <a:ext uri="{FF2B5EF4-FFF2-40B4-BE49-F238E27FC236}">
+                <a16:creationId xmlns:a16="http://schemas.microsoft.com/office/drawing/2014/main" id="{D042879D-AA23-A303-5FF7-5CDCB1157B5A}"/>
+              </a:ext>
+            </a:extLst>
+          </p:cNvPr>
+          <p:cNvSpPr txBox="1"/>
+          <p:nvPr/>
+        </p:nvSpPr>
+        <p:spPr>
+          <a:xfrm>
+            <a:off x="5112608" y="6537361"/>
+            <a:ext cx="979755" cy="461665"/>
+          </a:xfrm>
+          <a:prstGeom prst="rect">
+            <a:avLst/>
+          </a:prstGeom>
+          <a:solidFill>
+            <a:schemeClr val="bg1"/>
+          </a:solidFill>
+          <a:ln w="47498">
+            <a:solidFill>
+              <a:srgbClr val="C00000"/>
+            </a:solidFill>
+          </a:ln>
+        </p:spPr>
+        <p:txBody>
+          <a:bodyPr wrap="none" rtlCol="0">
+            <a:spAutoFit/>
+          </a:bodyPr>
+          <a:lstStyle/>
+          <a:p>
+            <a:r>
+              <a:rPr lang="en-US" sz="2400" b="1" dirty="0">
+                <a:latin typeface="Times New Roman" panose="02020603050405020304" pitchFamily="18" charset="0"/>
+                <a:cs typeface="Times New Roman" panose="02020603050405020304" pitchFamily="18" charset="0"/>
+              </a:rPr>
+              <a:t>-0.198</a:t>
+            </a:r>
+          </a:p>
+        </p:txBody>
+      </p:sp>
+      <p:sp>
+        <p:nvSpPr>
+          <p:cNvPr id="22" name="Rectangle 21">
+            <a:extLst>
+              <a:ext uri="{FF2B5EF4-FFF2-40B4-BE49-F238E27FC236}">
+                <a16:creationId xmlns:a16="http://schemas.microsoft.com/office/drawing/2014/main" id="{295B61D5-3809-B67F-F28A-43F8F95032C1}"/>
+              </a:ext>
+            </a:extLst>
+          </p:cNvPr>
+          <p:cNvSpPr/>
+          <p:nvPr/>
+        </p:nvSpPr>
+        <p:spPr>
+          <a:xfrm>
+            <a:off x="10014859" y="2231572"/>
+            <a:ext cx="1981200" cy="1382486"/>
+          </a:xfrm>
+          <a:prstGeom prst="rect">
+            <a:avLst/>
+          </a:prstGeom>
+          <a:noFill/>
+          <a:ln w="38100">
+            <a:solidFill>
+              <a:schemeClr val="tx1">
+                <a:alpha val="75000"/>
+              </a:schemeClr>
+            </a:solidFill>
+          </a:ln>
+        </p:spPr>
+        <p:style>
+          <a:lnRef idx="2">
+            <a:schemeClr val="accent1">
+              <a:shade val="50000"/>
+            </a:schemeClr>
+          </a:lnRef>
+          <a:fillRef idx="1">
+            <a:schemeClr val="accent1"/>
+          </a:fillRef>
+          <a:effectRef idx="0">
+            <a:schemeClr val="accent1"/>
+          </a:effectRef>
+          <a:fontRef idx="minor">
+            <a:schemeClr val="lt1"/>
+          </a:fontRef>
+        </p:style>
+        <p:txBody>
+          <a:bodyPr rtlCol="0" anchor="ctr"/>
+          <a:lstStyle/>
+          <a:p>
+            <a:pPr algn="ctr"/>
+            <a:r>
+              <a:rPr lang="en-US" sz="3000" i="1" dirty="0">
+                <a:solidFill>
+                  <a:schemeClr val="tx1"/>
+                </a:solidFill>
+                <a:latin typeface="Times New Roman" panose="02020603050405020304" pitchFamily="18" charset="0"/>
+                <a:cs typeface="Times New Roman" panose="02020603050405020304" pitchFamily="18" charset="0"/>
+              </a:rPr>
+              <a:t>Vapor pressure deficit</a:t>
+            </a:r>
+          </a:p>
+        </p:txBody>
+      </p:sp>
+      <p:sp>
+        <p:nvSpPr>
+          <p:cNvPr id="23" name="Rectangle 22">
+            <a:extLst>
+              <a:ext uri="{FF2B5EF4-FFF2-40B4-BE49-F238E27FC236}">
+                <a16:creationId xmlns:a16="http://schemas.microsoft.com/office/drawing/2014/main" id="{542EBF9B-B494-6BAC-662C-17157CAC7101}"/>
+              </a:ext>
+            </a:extLst>
+          </p:cNvPr>
+          <p:cNvSpPr/>
+          <p:nvPr/>
+        </p:nvSpPr>
+        <p:spPr>
+          <a:xfrm>
+            <a:off x="13628917" y="2231572"/>
+            <a:ext cx="1981200" cy="1382486"/>
+          </a:xfrm>
+          <a:prstGeom prst="rect">
+            <a:avLst/>
+          </a:prstGeom>
+          <a:noFill/>
+          <a:ln w="38100">
+            <a:solidFill>
+              <a:schemeClr val="tx1">
+                <a:alpha val="75000"/>
+              </a:schemeClr>
+            </a:solidFill>
+          </a:ln>
+        </p:spPr>
+        <p:style>
+          <a:lnRef idx="2">
+            <a:schemeClr val="accent1">
+              <a:shade val="50000"/>
+            </a:schemeClr>
+          </a:lnRef>
+          <a:fillRef idx="1">
+            <a:schemeClr val="accent1"/>
+          </a:fillRef>
+          <a:effectRef idx="0">
+            <a:schemeClr val="accent1"/>
+          </a:effectRef>
+          <a:fontRef idx="minor">
+            <a:schemeClr val="lt1"/>
+          </a:fontRef>
+        </p:style>
+        <p:txBody>
+          <a:bodyPr rtlCol="0" anchor="ctr"/>
+          <a:lstStyle/>
+          <a:p>
+            <a:pPr algn="ctr"/>
+            <a:r>
+              <a:rPr lang="en-US" sz="3000" i="1" dirty="0">
+                <a:solidFill>
+                  <a:schemeClr val="tx1"/>
+                </a:solidFill>
+                <a:latin typeface="Times New Roman" panose="02020603050405020304" pitchFamily="18" charset="0"/>
+                <a:cs typeface="Times New Roman" panose="02020603050405020304" pitchFamily="18" charset="0"/>
+              </a:rPr>
+              <a:t>Air </a:t>
+            </a:r>
+            <a:r>
+              <a:rPr lang="en-US" sz="2900" i="1" dirty="0">
+                <a:solidFill>
+                  <a:schemeClr val="tx1"/>
+                </a:solidFill>
+                <a:latin typeface="Times New Roman" panose="02020603050405020304" pitchFamily="18" charset="0"/>
+                <a:cs typeface="Times New Roman" panose="02020603050405020304" pitchFamily="18" charset="0"/>
+              </a:rPr>
+              <a:t>temperature</a:t>
+            </a:r>
+          </a:p>
+        </p:txBody>
+      </p:sp>
+      <p:sp>
+        <p:nvSpPr>
+          <p:cNvPr id="28" name="Rectangle 27">
+            <a:extLst>
+              <a:ext uri="{FF2B5EF4-FFF2-40B4-BE49-F238E27FC236}">
+                <a16:creationId xmlns:a16="http://schemas.microsoft.com/office/drawing/2014/main" id="{CBB2489F-CBFE-304D-76D5-6A05865A7B18}"/>
+              </a:ext>
+            </a:extLst>
+          </p:cNvPr>
+          <p:cNvSpPr/>
+          <p:nvPr/>
+        </p:nvSpPr>
+        <p:spPr>
+          <a:xfrm>
+            <a:off x="2786743" y="7358743"/>
+            <a:ext cx="1981200" cy="1382486"/>
+          </a:xfrm>
+          <a:prstGeom prst="rect">
+            <a:avLst/>
+          </a:prstGeom>
+          <a:noFill/>
+          <a:ln w="38100">
+            <a:solidFill>
+              <a:schemeClr val="tx1">
+                <a:alpha val="75000"/>
+              </a:schemeClr>
+            </a:solidFill>
+          </a:ln>
+        </p:spPr>
+        <p:style>
+          <a:lnRef idx="2">
+            <a:schemeClr val="accent1">
+              <a:shade val="50000"/>
+            </a:schemeClr>
+          </a:lnRef>
+          <a:fillRef idx="1">
+            <a:schemeClr val="accent1"/>
+          </a:fillRef>
+          <a:effectRef idx="0">
+            <a:schemeClr val="accent1"/>
+          </a:effectRef>
+          <a:fontRef idx="minor">
+            <a:schemeClr val="lt1"/>
+          </a:fontRef>
+        </p:style>
+        <p:txBody>
+          <a:bodyPr rtlCol="0" anchor="ctr"/>
+          <a:lstStyle/>
+          <a:p>
+            <a:pPr algn="ctr"/>
+            <a:r>
+              <a:rPr lang="en-US" sz="3000" i="1" dirty="0">
+                <a:solidFill>
+                  <a:schemeClr val="tx1"/>
+                </a:solidFill>
+                <a:latin typeface="Times New Roman" panose="02020603050405020304" pitchFamily="18" charset="0"/>
+                <a:cs typeface="Times New Roman" panose="02020603050405020304" pitchFamily="18" charset="0"/>
+              </a:rPr>
+              <a:t>Soil nitrogen</a:t>
+            </a:r>
+          </a:p>
+        </p:txBody>
+      </p:sp>
+      <p:sp>
+        <p:nvSpPr>
+          <p:cNvPr id="26" name="Rectangle 25">
+            <a:extLst>
+              <a:ext uri="{FF2B5EF4-FFF2-40B4-BE49-F238E27FC236}">
+                <a16:creationId xmlns:a16="http://schemas.microsoft.com/office/drawing/2014/main" id="{B55C58BF-B54E-BA2F-D111-5037A627D595}"/>
+              </a:ext>
+            </a:extLst>
+          </p:cNvPr>
+          <p:cNvSpPr/>
+          <p:nvPr/>
+        </p:nvSpPr>
+        <p:spPr>
+          <a:xfrm>
+            <a:off x="10014859" y="4795159"/>
+            <a:ext cx="1981200" cy="1382486"/>
+          </a:xfrm>
+          <a:prstGeom prst="rect">
+            <a:avLst/>
+          </a:prstGeom>
+          <a:solidFill>
+            <a:schemeClr val="bg1">
+              <a:alpha val="75000"/>
+            </a:schemeClr>
+          </a:solidFill>
+          <a:ln w="38100">
+            <a:solidFill>
+              <a:schemeClr val="tx1"/>
+            </a:solidFill>
+          </a:ln>
+        </p:spPr>
+        <p:style>
+          <a:lnRef idx="2">
+            <a:schemeClr val="accent1">
+              <a:shade val="50000"/>
+            </a:schemeClr>
+          </a:lnRef>
+          <a:fillRef idx="1">
+            <a:schemeClr val="accent1"/>
+          </a:fillRef>
+          <a:effectRef idx="0">
+            <a:schemeClr val="accent1"/>
+          </a:effectRef>
+          <a:fontRef idx="minor">
+            <a:schemeClr val="lt1"/>
+          </a:fontRef>
+        </p:style>
+        <p:txBody>
+          <a:bodyPr rtlCol="0" anchor="ctr"/>
+          <a:lstStyle/>
+          <a:p>
+            <a:pPr algn="ctr"/>
+            <a:r>
+              <a:rPr lang="el-GR" sz="3000" i="1" dirty="0">
+                <a:solidFill>
+                  <a:schemeClr val="tx1"/>
+                </a:solidFill>
+                <a:latin typeface="Times New Roman" panose="02020603050405020304" pitchFamily="18" charset="0"/>
+                <a:cs typeface="Times New Roman" panose="02020603050405020304" pitchFamily="18" charset="0"/>
+              </a:rPr>
+              <a:t>χ</a:t>
+            </a:r>
+            <a:endParaRPr lang="en-US" sz="3000" i="1" dirty="0">
+              <a:solidFill>
+                <a:schemeClr val="tx1"/>
+              </a:solidFill>
+              <a:latin typeface="Times New Roman" panose="02020603050405020304" pitchFamily="18" charset="0"/>
+              <a:cs typeface="Times New Roman" panose="02020603050405020304" pitchFamily="18" charset="0"/>
+            </a:endParaRPr>
+          </a:p>
+        </p:txBody>
+      </p:sp>
+      <p:sp>
+        <p:nvSpPr>
+          <p:cNvPr id="20" name="Rectangle 19">
+            <a:extLst>
+              <a:ext uri="{FF2B5EF4-FFF2-40B4-BE49-F238E27FC236}">
+                <a16:creationId xmlns:a16="http://schemas.microsoft.com/office/drawing/2014/main" id="{8CD31D91-82FE-DEF4-C1F4-559B96EB9A75}"/>
+              </a:ext>
+            </a:extLst>
+          </p:cNvPr>
+          <p:cNvSpPr/>
+          <p:nvPr/>
+        </p:nvSpPr>
+        <p:spPr>
+          <a:xfrm>
+            <a:off x="2786743" y="2231572"/>
+            <a:ext cx="1981200" cy="1382486"/>
+          </a:xfrm>
+          <a:prstGeom prst="rect">
+            <a:avLst/>
+          </a:prstGeom>
+          <a:noFill/>
+          <a:ln w="38100">
+            <a:solidFill>
+              <a:schemeClr val="tx1">
+                <a:alpha val="75000"/>
+              </a:schemeClr>
+            </a:solidFill>
+          </a:ln>
+        </p:spPr>
+        <p:style>
+          <a:lnRef idx="2">
+            <a:schemeClr val="accent1">
+              <a:shade val="50000"/>
+            </a:schemeClr>
+          </a:lnRef>
+          <a:fillRef idx="1">
+            <a:schemeClr val="accent1"/>
+          </a:fillRef>
+          <a:effectRef idx="0">
+            <a:schemeClr val="accent1"/>
+          </a:effectRef>
+          <a:fontRef idx="minor">
+            <a:schemeClr val="lt1"/>
+          </a:fontRef>
+        </p:style>
+        <p:txBody>
+          <a:bodyPr rtlCol="0" anchor="ctr"/>
+          <a:lstStyle/>
+          <a:p>
+            <a:pPr algn="ctr"/>
+            <a:r>
+              <a:rPr lang="en-US" sz="3000" i="1" dirty="0">
+                <a:solidFill>
+                  <a:schemeClr val="tx1"/>
+                </a:solidFill>
+                <a:latin typeface="Times New Roman" panose="02020603050405020304" pitchFamily="18" charset="0"/>
+                <a:cs typeface="Times New Roman" panose="02020603050405020304" pitchFamily="18" charset="0"/>
+              </a:rPr>
+              <a:t>Soil moisture</a:t>
+            </a:r>
+          </a:p>
+        </p:txBody>
+      </p:sp>
+      <p:sp>
+        <p:nvSpPr>
+          <p:cNvPr id="31" name="Rectangle 30">
+            <a:extLst>
+              <a:ext uri="{FF2B5EF4-FFF2-40B4-BE49-F238E27FC236}">
+                <a16:creationId xmlns:a16="http://schemas.microsoft.com/office/drawing/2014/main" id="{8B74F445-A52C-CC92-5C9F-26A6C584DFB7}"/>
+              </a:ext>
+            </a:extLst>
+          </p:cNvPr>
+          <p:cNvSpPr/>
+          <p:nvPr/>
+        </p:nvSpPr>
+        <p:spPr>
+          <a:xfrm>
+            <a:off x="13628917" y="7341615"/>
+            <a:ext cx="1981200" cy="1382486"/>
+          </a:xfrm>
+          <a:prstGeom prst="rect">
+            <a:avLst/>
+          </a:prstGeom>
+          <a:solidFill>
+            <a:schemeClr val="bg1"/>
+          </a:solidFill>
+          <a:ln w="38100">
+            <a:solidFill>
+              <a:schemeClr val="tx1"/>
+            </a:solidFill>
+          </a:ln>
+        </p:spPr>
+        <p:style>
+          <a:lnRef idx="2">
+            <a:schemeClr val="accent1">
+              <a:shade val="50000"/>
+            </a:schemeClr>
+          </a:lnRef>
+          <a:fillRef idx="1">
+            <a:schemeClr val="accent1"/>
+          </a:fillRef>
+          <a:effectRef idx="0">
+            <a:schemeClr val="accent1"/>
+          </a:effectRef>
+          <a:fontRef idx="minor">
+            <a:schemeClr val="lt1"/>
+          </a:fontRef>
+        </p:style>
+        <p:txBody>
+          <a:bodyPr rtlCol="0" anchor="ctr"/>
+          <a:lstStyle/>
+          <a:p>
+            <a:pPr algn="ctr"/>
+            <a:r>
+              <a:rPr lang="en-US" sz="3000" i="1" dirty="0">
+                <a:solidFill>
+                  <a:schemeClr val="tx1"/>
+                </a:solidFill>
+                <a:latin typeface="Times New Roman" panose="02020603050405020304" pitchFamily="18" charset="0"/>
+                <a:cs typeface="Times New Roman" panose="02020603050405020304" pitchFamily="18" charset="0"/>
+              </a:rPr>
+              <a:t>Leaf nitrogen</a:t>
+            </a:r>
+          </a:p>
+        </p:txBody>
+      </p:sp>
+      <p:sp>
+        <p:nvSpPr>
+          <p:cNvPr id="25" name="Rectangle 24">
+            <a:extLst>
+              <a:ext uri="{FF2B5EF4-FFF2-40B4-BE49-F238E27FC236}">
+                <a16:creationId xmlns:a16="http://schemas.microsoft.com/office/drawing/2014/main" id="{82AC0384-6387-7D57-8EB4-896E679A9F4F}"/>
+              </a:ext>
+            </a:extLst>
+          </p:cNvPr>
+          <p:cNvSpPr/>
+          <p:nvPr/>
+        </p:nvSpPr>
+        <p:spPr>
+          <a:xfrm>
+            <a:off x="6400801" y="4795159"/>
+            <a:ext cx="1981200" cy="1382486"/>
+          </a:xfrm>
+          <a:prstGeom prst="rect">
+            <a:avLst/>
+          </a:prstGeom>
+          <a:solidFill>
+            <a:schemeClr val="bg1"/>
+          </a:solidFill>
+          <a:ln w="38100">
+            <a:solidFill>
+              <a:schemeClr val="tx1"/>
+            </a:solidFill>
+          </a:ln>
+        </p:spPr>
+        <p:style>
+          <a:lnRef idx="2">
+            <a:schemeClr val="accent1">
+              <a:shade val="50000"/>
+            </a:schemeClr>
+          </a:lnRef>
+          <a:fillRef idx="1">
+            <a:schemeClr val="accent1"/>
+          </a:fillRef>
+          <a:effectRef idx="0">
+            <a:schemeClr val="accent1"/>
+          </a:effectRef>
+          <a:fontRef idx="minor">
+            <a:schemeClr val="lt1"/>
+          </a:fontRef>
+        </p:style>
+        <p:txBody>
+          <a:bodyPr rtlCol="0" anchor="ctr"/>
+          <a:lstStyle/>
+          <a:p>
+            <a:pPr algn="ctr"/>
+            <a:r>
+              <a:rPr lang="el-GR" sz="3000" i="1" dirty="0">
+                <a:solidFill>
+                  <a:schemeClr val="tx1"/>
+                </a:solidFill>
+                <a:latin typeface="Times New Roman" panose="02020603050405020304" pitchFamily="18" charset="0"/>
+                <a:cs typeface="Times New Roman" panose="02020603050405020304" pitchFamily="18" charset="0"/>
+              </a:rPr>
+              <a:t>β</a:t>
+            </a:r>
+            <a:endParaRPr lang="en-US" sz="3000" i="1" dirty="0">
+              <a:solidFill>
+                <a:schemeClr val="tx1"/>
+              </a:solidFill>
+              <a:latin typeface="Times New Roman" panose="02020603050405020304" pitchFamily="18" charset="0"/>
+              <a:cs typeface="Times New Roman" panose="02020603050405020304" pitchFamily="18" charset="0"/>
+            </a:endParaRPr>
+          </a:p>
+        </p:txBody>
+      </p:sp>
+      <p:sp>
+        <p:nvSpPr>
+          <p:cNvPr id="21" name="Rectangle 20">
+            <a:extLst>
+              <a:ext uri="{FF2B5EF4-FFF2-40B4-BE49-F238E27FC236}">
+                <a16:creationId xmlns:a16="http://schemas.microsoft.com/office/drawing/2014/main" id="{2A451EDF-2134-D951-F607-AE0DC624C032}"/>
+              </a:ext>
+            </a:extLst>
+          </p:cNvPr>
+          <p:cNvSpPr/>
+          <p:nvPr/>
+        </p:nvSpPr>
+        <p:spPr>
+          <a:xfrm>
+            <a:off x="6400801" y="2231572"/>
+            <a:ext cx="1981200" cy="1382486"/>
+          </a:xfrm>
+          <a:prstGeom prst="rect">
+            <a:avLst/>
+          </a:prstGeom>
+          <a:solidFill>
+            <a:schemeClr val="bg1"/>
+          </a:solidFill>
+          <a:ln w="38100">
+            <a:solidFill>
+              <a:schemeClr val="tx1"/>
+            </a:solidFill>
+          </a:ln>
+        </p:spPr>
+        <p:style>
+          <a:lnRef idx="2">
+            <a:schemeClr val="accent1">
+              <a:shade val="50000"/>
+            </a:schemeClr>
+          </a:lnRef>
+          <a:fillRef idx="1">
+            <a:schemeClr val="accent1"/>
+          </a:fillRef>
+          <a:effectRef idx="0">
+            <a:schemeClr val="accent1"/>
+          </a:effectRef>
+          <a:fontRef idx="minor">
+            <a:schemeClr val="lt1"/>
+          </a:fontRef>
+        </p:style>
+        <p:txBody>
+          <a:bodyPr rtlCol="0" anchor="ctr"/>
+          <a:lstStyle/>
+          <a:p>
+            <a:pPr algn="ctr"/>
+            <a:r>
+              <a:rPr lang="en-US" sz="3000" i="1" dirty="0">
+                <a:solidFill>
+                  <a:schemeClr val="tx1"/>
+                </a:solidFill>
+                <a:latin typeface="Times New Roman" panose="02020603050405020304" pitchFamily="18" charset="0"/>
+                <a:cs typeface="Times New Roman" panose="02020603050405020304" pitchFamily="18" charset="0"/>
+              </a:rPr>
+              <a:t>Plant functional group</a:t>
+            </a:r>
+          </a:p>
+        </p:txBody>
+      </p:sp>
     </p:spTree>
     <p:extLst>
       <p:ext uri="{BB962C8B-B14F-4D97-AF65-F5344CB8AC3E}">
-        <p14:creationId xmlns:p14="http://schemas.microsoft.com/office/powerpoint/2010/main" val="3515727378"/>
+        <p14:creationId xmlns:p14="http://schemas.microsoft.com/office/powerpoint/2010/main" val="3543374083"/>
       </p:ext>
     </p:extLst>
   </p:cSld>

</xml_diff>

<commit_message>
update SEM plot with new results (includes VPD-beta covariate)
</commit_message>
<xml_diff>
--- a/working_drafts/figs/TXeco_SEM_ppt_fig.pptx
+++ b/working_drafts/figs/TXeco_SEM_ppt_fig.pptx
@@ -3527,13 +3527,11 @@
           <a:prstGeom prst="straightConnector1">
             <a:avLst/>
           </a:prstGeom>
-          <a:ln w="36449">
+          <a:ln w="41021">
             <a:solidFill>
-              <a:schemeClr val="bg2">
-                <a:lumMod val="75000"/>
-              </a:schemeClr>
+              <a:srgbClr val="C00000"/>
             </a:solidFill>
-            <a:prstDash val="dash"/>
+            <a:prstDash val="solid"/>
             <a:tailEnd type="triangle"/>
           </a:ln>
         </p:spPr>
@@ -3574,7 +3572,7 @@
           <a:prstGeom prst="straightConnector1">
             <a:avLst/>
           </a:prstGeom>
-          <a:ln w="37465">
+          <a:ln w="39878">
             <a:solidFill>
               <a:schemeClr val="bg2">
                 <a:lumMod val="75000"/>
@@ -3623,11 +3621,9 @@
           <a:prstGeom prst="straightConnector1">
             <a:avLst/>
           </a:prstGeom>
-          <a:ln w="35814">
+          <a:ln w="41148">
             <a:solidFill>
-              <a:schemeClr val="bg2">
-                <a:lumMod val="75000"/>
-              </a:schemeClr>
+              <a:srgbClr val="C00000"/>
             </a:solidFill>
             <a:prstDash val="dash"/>
             <a:tailEnd type="triangle"/>
@@ -3671,9 +3667,7 @@
           <a:noFill/>
           <a:ln w="38100">
             <a:solidFill>
-              <a:schemeClr val="tx1">
-                <a:alpha val="75000"/>
-              </a:schemeClr>
+              <a:schemeClr val="tx1"/>
             </a:solidFill>
           </a:ln>
         </p:spPr>
@@ -3734,9 +3728,7 @@
           <a:noFill/>
           <a:ln w="38100">
             <a:solidFill>
-              <a:schemeClr val="tx1">
-                <a:alpha val="75000"/>
-              </a:schemeClr>
+              <a:schemeClr val="tx1"/>
             </a:solidFill>
           </a:ln>
         </p:spPr>
@@ -3854,9 +3846,7 @@
           <a:noFill/>
           <a:ln w="38100">
             <a:solidFill>
-              <a:schemeClr val="tx1">
-                <a:alpha val="75000"/>
-              </a:schemeClr>
+              <a:schemeClr val="tx1"/>
             </a:solidFill>
           </a:ln>
         </p:spPr>
@@ -3908,8 +3898,8 @@
         </p:nvSpPr>
         <p:spPr>
           <a:xfrm>
-            <a:off x="8705420" y="8277617"/>
-            <a:ext cx="877163" cy="461665"/>
+            <a:off x="8650120" y="8277617"/>
+            <a:ext cx="979755" cy="461665"/>
           </a:xfrm>
           <a:prstGeom prst="rect">
             <a:avLst/>
@@ -3927,11 +3917,12 @@
           </a:ln>
         </p:spPr>
         <p:txBody>
-          <a:bodyPr wrap="none" rtlCol="0">
+          <a:bodyPr wrap="square" rtlCol="0">
             <a:spAutoFit/>
           </a:bodyPr>
           <a:lstStyle/>
           <a:p>
+            <a:pPr algn="ctr"/>
             <a:r>
               <a:rPr lang="en-US" sz="2400" dirty="0">
                 <a:latin typeface="Times New Roman" panose="02020603050405020304" pitchFamily="18" charset="0"/>
@@ -3965,11 +3956,9 @@
           <a:solidFill>
             <a:schemeClr val="bg1"/>
           </a:solidFill>
-          <a:ln w="35814">
+          <a:ln w="41148">
             <a:solidFill>
-              <a:schemeClr val="bg2">
-                <a:lumMod val="75000"/>
-              </a:schemeClr>
+              <a:srgbClr val="C00000"/>
             </a:solidFill>
             <a:prstDash val="dash"/>
           </a:ln>
@@ -3985,7 +3974,7 @@
                 <a:latin typeface="Times New Roman" panose="02020603050405020304" pitchFamily="18" charset="0"/>
                 <a:cs typeface="Times New Roman" panose="02020603050405020304" pitchFamily="18" charset="0"/>
               </a:rPr>
-              <a:t>-0.040</a:t>
+              <a:t>-0.101</a:t>
             </a:r>
           </a:p>
         </p:txBody>
@@ -4013,13 +4002,11 @@
           <a:solidFill>
             <a:schemeClr val="bg1"/>
           </a:solidFill>
-          <a:ln w="36449">
+          <a:ln w="41021">
             <a:solidFill>
-              <a:schemeClr val="bg2">
-                <a:lumMod val="75000"/>
-              </a:schemeClr>
+              <a:srgbClr val="C00000"/>
             </a:solidFill>
-            <a:prstDash val="dash"/>
+            <a:prstDash val="solid"/>
           </a:ln>
         </p:spPr>
         <p:txBody>
@@ -4029,84 +4016,12 @@
           <a:lstStyle/>
           <a:p>
             <a:r>
-              <a:rPr lang="en-US" sz="2400" dirty="0">
+              <a:rPr lang="en-US" sz="2400" b="1" dirty="0">
                 <a:latin typeface="Times New Roman" panose="02020603050405020304" pitchFamily="18" charset="0"/>
                 <a:cs typeface="Times New Roman" panose="02020603050405020304" pitchFamily="18" charset="0"/>
               </a:rPr>
-              <a:t>-0.050</a:t>
-            </a:r>
-          </a:p>
-        </p:txBody>
-      </p:sp>
-      <p:sp>
-        <p:nvSpPr>
-          <p:cNvPr id="26" name="Rectangle 25">
-            <a:extLst>
-              <a:ext uri="{FF2B5EF4-FFF2-40B4-BE49-F238E27FC236}">
-                <a16:creationId xmlns:a16="http://schemas.microsoft.com/office/drawing/2014/main" id="{B55C58BF-B54E-BA2F-D111-5037A627D595}"/>
-              </a:ext>
-            </a:extLst>
-          </p:cNvPr>
-          <p:cNvSpPr/>
-          <p:nvPr/>
-        </p:nvSpPr>
-        <p:spPr>
-          <a:xfrm>
-            <a:off x="10014859" y="4795159"/>
-            <a:ext cx="1981200" cy="1382486"/>
-          </a:xfrm>
-          <a:prstGeom prst="rect">
-            <a:avLst/>
-          </a:prstGeom>
-          <a:solidFill>
-            <a:schemeClr val="bg1">
-              <a:alpha val="75000"/>
-            </a:schemeClr>
-          </a:solidFill>
-          <a:ln w="38100">
-            <a:solidFill>
-              <a:schemeClr val="tx1"/>
-            </a:solidFill>
-          </a:ln>
-        </p:spPr>
-        <p:style>
-          <a:lnRef idx="2">
-            <a:schemeClr val="accent1">
-              <a:shade val="50000"/>
-            </a:schemeClr>
-          </a:lnRef>
-          <a:fillRef idx="1">
-            <a:schemeClr val="accent1"/>
-          </a:fillRef>
-          <a:effectRef idx="0">
-            <a:schemeClr val="accent1"/>
-          </a:effectRef>
-          <a:fontRef idx="minor">
-            <a:schemeClr val="lt1"/>
-          </a:fontRef>
-        </p:style>
-        <p:txBody>
-          <a:bodyPr rtlCol="0" anchor="ctr"/>
-          <a:lstStyle/>
-          <a:p>
-            <a:pPr algn="ctr"/>
-            <a:r>
-              <a:rPr lang="el-GR" sz="3000" i="1" dirty="0">
-                <a:solidFill>
-                  <a:schemeClr val="tx1"/>
-                </a:solidFill>
-                <a:latin typeface="Times New Roman" panose="02020603050405020304" pitchFamily="18" charset="0"/>
-                <a:cs typeface="Times New Roman" panose="02020603050405020304" pitchFamily="18" charset="0"/>
-              </a:rPr>
-              <a:t>χ</a:t>
-            </a:r>
-            <a:endParaRPr lang="en-US" sz="3000" i="1" dirty="0">
-              <a:solidFill>
-                <a:schemeClr val="tx1"/>
-              </a:solidFill>
-              <a:latin typeface="Times New Roman" panose="02020603050405020304" pitchFamily="18" charset="0"/>
-              <a:cs typeface="Times New Roman" panose="02020603050405020304" pitchFamily="18" charset="0"/>
-            </a:endParaRPr>
+              <a:t>-0.099</a:t>
+            </a:r>
           </a:p>
         </p:txBody>
       </p:sp>
@@ -4132,7 +4047,7 @@
           <a:prstGeom prst="straightConnector1">
             <a:avLst/>
           </a:prstGeom>
-          <a:ln w="87249">
+          <a:ln w="92456">
             <a:solidFill>
               <a:srgbClr val="C00000"/>
             </a:solidFill>
@@ -4176,7 +4091,7 @@
           <a:prstGeom prst="straightConnector1">
             <a:avLst/>
           </a:prstGeom>
-          <a:ln w="76962">
+          <a:ln w="80010">
             <a:solidFill>
               <a:srgbClr val="C00000"/>
             </a:solidFill>
@@ -4221,7 +4136,7 @@
           <a:solidFill>
             <a:schemeClr val="bg1"/>
           </a:solidFill>
-          <a:ln w="76962">
+          <a:ln w="80010">
             <a:solidFill>
               <a:srgbClr val="C00000"/>
             </a:solidFill>
@@ -4238,7 +4153,7 @@
                 <a:latin typeface="Times New Roman" panose="02020603050405020304" pitchFamily="18" charset="0"/>
                 <a:cs typeface="Times New Roman" panose="02020603050405020304" pitchFamily="18" charset="0"/>
               </a:rPr>
-              <a:t>-0.593</a:t>
+              <a:t>-0.586</a:t>
             </a:r>
           </a:p>
         </p:txBody>
@@ -4265,7 +4180,7 @@
           <a:prstGeom prst="straightConnector1">
             <a:avLst/>
           </a:prstGeom>
-          <a:ln w="64135">
+          <a:ln w="66929">
             <a:solidFill>
               <a:schemeClr val="accent1"/>
             </a:solidFill>
@@ -4311,7 +4226,7 @@
           <a:solidFill>
             <a:schemeClr val="bg1"/>
           </a:solidFill>
-          <a:ln w="64135">
+          <a:ln w="66929">
             <a:solidFill>
               <a:schemeClr val="accent1"/>
             </a:solidFill>
@@ -4325,7 +4240,7 @@
           <a:lstStyle/>
           <a:p>
             <a:r>
-              <a:rPr lang="en-US" sz="2400" dirty="0">
+              <a:rPr lang="en-US" sz="2400" b="1" dirty="0">
                 <a:latin typeface="Times New Roman" panose="02020603050405020304" pitchFamily="18" charset="0"/>
                 <a:cs typeface="Times New Roman" panose="02020603050405020304" pitchFamily="18" charset="0"/>
               </a:rPr>
@@ -4357,7 +4272,7 @@
           <a:prstGeom prst="straightConnector1">
             <a:avLst/>
           </a:prstGeom>
-          <a:ln w="72390">
+          <a:ln w="75438">
             <a:headEnd type="triangle"/>
             <a:tailEnd type="triangle"/>
           </a:ln>
@@ -4400,7 +4315,7 @@
           <a:solidFill>
             <a:schemeClr val="bg1"/>
           </a:solidFill>
-          <a:ln w="72390">
+          <a:ln w="75438">
             <a:solidFill>
               <a:schemeClr val="accent1"/>
             </a:solidFill>
@@ -4417,7 +4332,7 @@
                 <a:latin typeface="Times New Roman" panose="02020603050405020304" pitchFamily="18" charset="0"/>
                 <a:cs typeface="Times New Roman" panose="02020603050405020304" pitchFamily="18" charset="0"/>
               </a:rPr>
-              <a:t>0.533</a:t>
+              <a:t>0.529</a:t>
             </a:r>
           </a:p>
         </p:txBody>
@@ -4445,7 +4360,7 @@
           <a:solidFill>
             <a:schemeClr val="bg1"/>
           </a:solidFill>
-          <a:ln w="37465">
+          <a:ln w="39878">
             <a:solidFill>
               <a:schemeClr val="bg2">
                 <a:lumMod val="75000"/>
@@ -4465,70 +4380,7 @@
                 <a:latin typeface="Times New Roman" panose="02020603050405020304" pitchFamily="18" charset="0"/>
                 <a:cs typeface="Times New Roman" panose="02020603050405020304" pitchFamily="18" charset="0"/>
               </a:rPr>
-              <a:t>-0.063</a:t>
-            </a:r>
-          </a:p>
-        </p:txBody>
-      </p:sp>
-      <p:sp>
-        <p:nvSpPr>
-          <p:cNvPr id="20" name="Rectangle 19">
-            <a:extLst>
-              <a:ext uri="{FF2B5EF4-FFF2-40B4-BE49-F238E27FC236}">
-                <a16:creationId xmlns:a16="http://schemas.microsoft.com/office/drawing/2014/main" id="{8CD31D91-82FE-DEF4-C1F4-559B96EB9A75}"/>
-              </a:ext>
-            </a:extLst>
-          </p:cNvPr>
-          <p:cNvSpPr/>
-          <p:nvPr/>
-        </p:nvSpPr>
-        <p:spPr>
-          <a:xfrm>
-            <a:off x="2786743" y="2231572"/>
-            <a:ext cx="1981200" cy="1382486"/>
-          </a:xfrm>
-          <a:prstGeom prst="rect">
-            <a:avLst/>
-          </a:prstGeom>
-          <a:noFill/>
-          <a:ln w="38100">
-            <a:solidFill>
-              <a:schemeClr val="tx1">
-                <a:alpha val="75000"/>
-              </a:schemeClr>
-            </a:solidFill>
-          </a:ln>
-        </p:spPr>
-        <p:style>
-          <a:lnRef idx="2">
-            <a:schemeClr val="accent1">
-              <a:shade val="50000"/>
-            </a:schemeClr>
-          </a:lnRef>
-          <a:fillRef idx="1">
-            <a:schemeClr val="accent1"/>
-          </a:fillRef>
-          <a:effectRef idx="0">
-            <a:schemeClr val="accent1"/>
-          </a:effectRef>
-          <a:fontRef idx="minor">
-            <a:schemeClr val="lt1"/>
-          </a:fontRef>
-        </p:style>
-        <p:txBody>
-          <a:bodyPr rtlCol="0" anchor="ctr"/>
-          <a:lstStyle/>
-          <a:p>
-            <a:pPr algn="ctr"/>
-            <a:r>
-              <a:rPr lang="en-US" sz="3000" i="1" dirty="0">
-                <a:solidFill>
-                  <a:schemeClr val="tx1"/>
-                </a:solidFill>
-                <a:latin typeface="Times New Roman" panose="02020603050405020304" pitchFamily="18" charset="0"/>
-                <a:cs typeface="Times New Roman" panose="02020603050405020304" pitchFamily="18" charset="0"/>
-              </a:rPr>
-              <a:t>Soil moisture</a:t>
+              <a:t>-0.086</a:t>
             </a:r>
           </a:p>
         </p:txBody>
@@ -4557,7 +4409,7 @@
               <a:gd name="adj1" fmla="val -176"/>
             </a:avLst>
           </a:prstGeom>
-          <a:ln w="87249">
+          <a:ln w="92456">
             <a:solidFill>
               <a:srgbClr val="C00000"/>
             </a:solidFill>
@@ -4601,7 +4453,7 @@
           <a:solidFill>
             <a:schemeClr val="bg1"/>
           </a:solidFill>
-          <a:ln w="87249">
+          <a:ln w="92456">
             <a:solidFill>
               <a:srgbClr val="C00000"/>
             </a:solidFill>
@@ -4618,7 +4470,7 @@
                 <a:latin typeface="Times New Roman" panose="02020603050405020304" pitchFamily="18" charset="0"/>
                 <a:cs typeface="Times New Roman" panose="02020603050405020304" pitchFamily="18" charset="0"/>
               </a:rPr>
-              <a:t>-0.733</a:t>
+              <a:t>-0.742</a:t>
             </a:r>
           </a:p>
         </p:txBody>
@@ -4639,15 +4491,15 @@
         </p:nvCxnSpPr>
         <p:spPr>
           <a:xfrm rot="5400000">
-            <a:off x="-807566" y="5811264"/>
-            <a:ext cx="6470306" cy="675119"/>
+            <a:off x="-775546" y="5763074"/>
+            <a:ext cx="6390097" cy="691291"/>
           </a:xfrm>
           <a:prstGeom prst="bentConnector3">
             <a:avLst>
-              <a:gd name="adj1" fmla="val 157"/>
+              <a:gd name="adj1" fmla="val 49"/>
             </a:avLst>
           </a:prstGeom>
-          <a:ln w="34036">
+          <a:ln w="34290">
             <a:solidFill>
               <a:schemeClr val="bg2">
                 <a:lumMod val="75000"/>
@@ -4694,7 +4546,7 @@
           <a:prstGeom prst="bentConnector2">
             <a:avLst/>
           </a:prstGeom>
-          <a:ln w="34036">
+          <a:ln w="34290">
             <a:solidFill>
               <a:schemeClr val="bg2">
                 <a:lumMod val="75000"/>
@@ -4733,8 +4585,8 @@
         </p:nvSpPr>
         <p:spPr>
           <a:xfrm>
-            <a:off x="8705420" y="9041612"/>
-            <a:ext cx="877163" cy="461665"/>
+            <a:off x="8650120" y="9041612"/>
+            <a:ext cx="986874" cy="461665"/>
           </a:xfrm>
           <a:prstGeom prst="rect">
             <a:avLst/>
@@ -4742,7 +4594,7 @@
           <a:solidFill>
             <a:schemeClr val="bg1"/>
           </a:solidFill>
-          <a:ln w="34036">
+          <a:ln w="34290">
             <a:solidFill>
               <a:schemeClr val="bg2">
                 <a:lumMod val="75000"/>
@@ -4752,11 +4604,12 @@
           </a:ln>
         </p:spPr>
         <p:txBody>
-          <a:bodyPr wrap="none" rtlCol="0">
+          <a:bodyPr wrap="square" rtlCol="0">
             <a:spAutoFit/>
           </a:bodyPr>
           <a:lstStyle/>
           <a:p>
+            <a:pPr algn="ctr"/>
             <a:r>
               <a:rPr lang="en-US" sz="2400" dirty="0">
                 <a:latin typeface="Times New Roman" panose="02020603050405020304" pitchFamily="18" charset="0"/>
@@ -4791,13 +4644,11 @@
           <a:prstGeom prst="bentConnector2">
             <a:avLst/>
           </a:prstGeom>
-          <a:ln w="36449">
+          <a:ln w="41021">
             <a:solidFill>
-              <a:schemeClr val="bg2">
-                <a:lumMod val="75000"/>
-              </a:schemeClr>
+              <a:srgbClr val="C00000"/>
             </a:solidFill>
-            <a:prstDash val="dash"/>
+            <a:prstDash val="solid"/>
           </a:ln>
         </p:spPr>
         <p:style>
@@ -4837,7 +4688,7 @@
           <a:prstGeom prst="bentConnector2">
             <a:avLst/>
           </a:prstGeom>
-          <a:ln w="35941">
+          <a:ln w="33274">
             <a:solidFill>
               <a:schemeClr val="bg2">
                 <a:lumMod val="75000"/>
@@ -4876,8 +4727,8 @@
         </p:nvSpPr>
         <p:spPr>
           <a:xfrm>
-            <a:off x="14180935" y="4959540"/>
-            <a:ext cx="877163" cy="461665"/>
+            <a:off x="14129641" y="4959540"/>
+            <a:ext cx="979754" cy="461665"/>
           </a:xfrm>
           <a:prstGeom prst="rect">
             <a:avLst/>
@@ -4885,7 +4736,7 @@
           <a:solidFill>
             <a:schemeClr val="bg1"/>
           </a:solidFill>
-          <a:ln w="35941">
+          <a:ln w="33274">
             <a:solidFill>
               <a:schemeClr val="bg2">
                 <a:lumMod val="75000"/>
@@ -4895,17 +4746,18 @@
           </a:ln>
         </p:spPr>
         <p:txBody>
-          <a:bodyPr wrap="none" rtlCol="0">
+          <a:bodyPr wrap="square" rtlCol="0">
             <a:spAutoFit/>
           </a:bodyPr>
           <a:lstStyle/>
           <a:p>
+            <a:pPr algn="ctr"/>
             <a:r>
               <a:rPr lang="en-US" sz="2400" dirty="0">
                 <a:latin typeface="Times New Roman" panose="02020603050405020304" pitchFamily="18" charset="0"/>
                 <a:cs typeface="Times New Roman" panose="02020603050405020304" pitchFamily="18" charset="0"/>
               </a:rPr>
-              <a:t>0.044</a:t>
+              <a:t>0.002</a:t>
             </a:r>
           </a:p>
         </p:txBody>
@@ -4921,18 +4773,19 @@
           </p:cNvPr>
           <p:cNvCxnSpPr>
             <a:cxnSpLocks/>
+            <a:endCxn id="31" idx="0"/>
           </p:cNvCxnSpPr>
           <p:nvPr/>
         </p:nvCxnSpPr>
         <p:spPr>
-          <a:xfrm rot="16200000" flipV="1">
-            <a:off x="12524383" y="5317173"/>
-            <a:ext cx="1579955" cy="2623458"/>
+          <a:xfrm>
+            <a:off x="11996059" y="5850374"/>
+            <a:ext cx="2623458" cy="1491241"/>
           </a:xfrm>
           <a:prstGeom prst="bentConnector2">
             <a:avLst/>
           </a:prstGeom>
-          <a:ln w="35941">
+          <a:ln w="35179">
             <a:solidFill>
               <a:schemeClr val="bg2">
                 <a:lumMod val="75000"/>
@@ -5043,7 +4896,7 @@
           <a:solidFill>
             <a:schemeClr val="bg1"/>
           </a:solidFill>
-          <a:ln w="35560">
+          <a:ln w="35179">
             <a:solidFill>
               <a:schemeClr val="bg2">
                 <a:lumMod val="75000"/>
@@ -5058,6 +4911,7 @@
           </a:bodyPr>
           <a:lstStyle/>
           <a:p>
+            <a:pPr algn="ctr"/>
             <a:r>
               <a:rPr lang="en-US" sz="2400" dirty="0">
                 <a:latin typeface="Times New Roman" panose="02020603050405020304" pitchFamily="18" charset="0"/>
@@ -5079,20 +4933,19 @@
           </p:cNvPr>
           <p:cNvCxnSpPr>
             <a:cxnSpLocks/>
+            <a:stCxn id="25" idx="2"/>
           </p:cNvCxnSpPr>
           <p:nvPr/>
         </p:nvCxnSpPr>
         <p:spPr>
-          <a:xfrm>
-            <a:off x="8131277" y="6148149"/>
-            <a:ext cx="5497640" cy="1595411"/>
-          </a:xfrm>
-          <a:prstGeom prst="bentConnector3">
-            <a:avLst>
-              <a:gd name="adj1" fmla="val 102"/>
-            </a:avLst>
-          </a:prstGeom>
-          <a:ln w="40767">
+          <a:xfrm rot="16200000" flipH="1">
+            <a:off x="9727202" y="3841844"/>
+            <a:ext cx="1565914" cy="6237516"/>
+          </a:xfrm>
+          <a:prstGeom prst="bentConnector2">
+            <a:avLst/>
+          </a:prstGeom>
+          <a:ln w="41656">
             <a:solidFill>
               <a:srgbClr val="C00000"/>
             </a:solidFill>
@@ -5137,7 +4990,7 @@
           <a:solidFill>
             <a:schemeClr val="bg1"/>
           </a:solidFill>
-          <a:ln w="40767">
+          <a:ln w="41656">
             <a:solidFill>
               <a:srgbClr val="C00000"/>
             </a:solidFill>
@@ -5252,7 +5105,7 @@
           <a:prstGeom prst="bentConnector2">
             <a:avLst/>
           </a:prstGeom>
-          <a:ln w="122301">
+          <a:ln w="129286">
             <a:solidFill>
               <a:srgbClr val="C00000"/>
             </a:solidFill>
@@ -5296,7 +5149,7 @@
           <a:prstGeom prst="bentConnector2">
             <a:avLst/>
           </a:prstGeom>
-          <a:ln w="122301">
+          <a:ln w="129286">
             <a:solidFill>
               <a:srgbClr val="C00000"/>
             </a:solidFill>
@@ -5341,7 +5194,7 @@
           <a:solidFill>
             <a:schemeClr val="bg1"/>
           </a:solidFill>
-          <a:ln w="122301">
+          <a:ln w="129286">
             <a:solidFill>
               <a:srgbClr val="C00000"/>
             </a:solidFill>
@@ -5450,7 +5303,7 @@
               <a:gd name="adj1" fmla="val 99861"/>
             </a:avLst>
           </a:prstGeom>
-          <a:ln w="47498">
+          <a:ln w="48641">
             <a:solidFill>
               <a:srgbClr val="C00000"/>
             </a:solidFill>
@@ -5495,7 +5348,7 @@
           <a:solidFill>
             <a:schemeClr val="bg1"/>
           </a:solidFill>
-          <a:ln w="47498">
+          <a:ln w="48641">
             <a:solidFill>
               <a:srgbClr val="C00000"/>
             </a:solidFill>
@@ -5512,7 +5365,277 @@
                 <a:latin typeface="Times New Roman" panose="02020603050405020304" pitchFamily="18" charset="0"/>
                 <a:cs typeface="Times New Roman" panose="02020603050405020304" pitchFamily="18" charset="0"/>
               </a:rPr>
-              <a:t>-0.198</a:t>
+              <a:t>-0.195</a:t>
+            </a:r>
+          </a:p>
+        </p:txBody>
+      </p:sp>
+      <p:cxnSp>
+        <p:nvCxnSpPr>
+          <p:cNvPr id="5" name="Elbow Connector 4">
+            <a:extLst>
+              <a:ext uri="{FF2B5EF4-FFF2-40B4-BE49-F238E27FC236}">
+                <a16:creationId xmlns:a16="http://schemas.microsoft.com/office/drawing/2014/main" id="{D8F7AF37-F510-49A9-7246-1A0FA610A3EF}"/>
+              </a:ext>
+            </a:extLst>
+          </p:cNvPr>
+          <p:cNvCxnSpPr>
+            <a:cxnSpLocks/>
+          </p:cNvCxnSpPr>
+          <p:nvPr/>
+        </p:nvCxnSpPr>
+        <p:spPr>
+          <a:xfrm rot="16200000" flipV="1">
+            <a:off x="10492296" y="4882142"/>
+            <a:ext cx="3345501" cy="809331"/>
+          </a:xfrm>
+          <a:prstGeom prst="bentConnector3">
+            <a:avLst>
+              <a:gd name="adj1" fmla="val 84165"/>
+            </a:avLst>
+          </a:prstGeom>
+          <a:ln w="40132">
+            <a:solidFill>
+              <a:srgbClr val="C00000"/>
+            </a:solidFill>
+            <a:tailEnd type="triangle"/>
+          </a:ln>
+        </p:spPr>
+        <p:style>
+          <a:lnRef idx="1">
+            <a:schemeClr val="accent1"/>
+          </a:lnRef>
+          <a:fillRef idx="0">
+            <a:schemeClr val="accent1"/>
+          </a:fillRef>
+          <a:effectRef idx="0">
+            <a:schemeClr val="accent1"/>
+          </a:effectRef>
+          <a:fontRef idx="minor">
+            <a:schemeClr val="tx1"/>
+          </a:fontRef>
+        </p:style>
+      </p:cxnSp>
+      <p:cxnSp>
+        <p:nvCxnSpPr>
+          <p:cNvPr id="6" name="Elbow Connector 5">
+            <a:extLst>
+              <a:ext uri="{FF2B5EF4-FFF2-40B4-BE49-F238E27FC236}">
+                <a16:creationId xmlns:a16="http://schemas.microsoft.com/office/drawing/2014/main" id="{5E9E69F4-261A-63C8-0266-3A36FA0C927E}"/>
+              </a:ext>
+            </a:extLst>
+          </p:cNvPr>
+          <p:cNvCxnSpPr>
+            <a:cxnSpLocks/>
+          </p:cNvCxnSpPr>
+          <p:nvPr/>
+        </p:nvCxnSpPr>
+        <p:spPr>
+          <a:xfrm rot="10800000">
+            <a:off x="8075832" y="6212532"/>
+            <a:ext cx="4500456" cy="734782"/>
+          </a:xfrm>
+          <a:prstGeom prst="bentConnector3">
+            <a:avLst>
+              <a:gd name="adj1" fmla="val 99948"/>
+            </a:avLst>
+          </a:prstGeom>
+          <a:ln w="40132">
+            <a:solidFill>
+              <a:srgbClr val="C00000"/>
+            </a:solidFill>
+            <a:tailEnd type="triangle"/>
+          </a:ln>
+        </p:spPr>
+        <p:style>
+          <a:lnRef idx="1">
+            <a:schemeClr val="accent1"/>
+          </a:lnRef>
+          <a:fillRef idx="0">
+            <a:schemeClr val="accent1"/>
+          </a:fillRef>
+          <a:effectRef idx="0">
+            <a:schemeClr val="accent1"/>
+          </a:effectRef>
+          <a:fontRef idx="minor">
+            <a:schemeClr val="tx1"/>
+          </a:fontRef>
+        </p:style>
+      </p:cxnSp>
+      <p:sp>
+        <p:nvSpPr>
+          <p:cNvPr id="8" name="TextBox 7">
+            <a:extLst>
+              <a:ext uri="{FF2B5EF4-FFF2-40B4-BE49-F238E27FC236}">
+                <a16:creationId xmlns:a16="http://schemas.microsoft.com/office/drawing/2014/main" id="{966805CF-9204-CD5A-8364-2D35BFC14F1F}"/>
+              </a:ext>
+            </a:extLst>
+          </p:cNvPr>
+          <p:cNvSpPr txBox="1"/>
+          <p:nvPr/>
+        </p:nvSpPr>
+        <p:spPr>
+          <a:xfrm>
+            <a:off x="8654122" y="6713748"/>
+            <a:ext cx="979755" cy="461665"/>
+          </a:xfrm>
+          <a:prstGeom prst="rect">
+            <a:avLst/>
+          </a:prstGeom>
+          <a:solidFill>
+            <a:schemeClr val="bg1"/>
+          </a:solidFill>
+          <a:ln w="40132">
+            <a:solidFill>
+              <a:srgbClr val="C00000"/>
+            </a:solidFill>
+          </a:ln>
+        </p:spPr>
+        <p:txBody>
+          <a:bodyPr wrap="square" rtlCol="0">
+            <a:spAutoFit/>
+          </a:bodyPr>
+          <a:lstStyle/>
+          <a:p>
+            <a:r>
+              <a:rPr lang="en-US" sz="2400" b="1" dirty="0">
+                <a:latin typeface="Times New Roman" panose="02020603050405020304" pitchFamily="18" charset="0"/>
+                <a:cs typeface="Times New Roman" panose="02020603050405020304" pitchFamily="18" charset="0"/>
+              </a:rPr>
+              <a:t>-0.088</a:t>
+            </a:r>
+          </a:p>
+        </p:txBody>
+      </p:sp>
+      <p:sp>
+        <p:nvSpPr>
+          <p:cNvPr id="26" name="Rectangle 25">
+            <a:extLst>
+              <a:ext uri="{FF2B5EF4-FFF2-40B4-BE49-F238E27FC236}">
+                <a16:creationId xmlns:a16="http://schemas.microsoft.com/office/drawing/2014/main" id="{B55C58BF-B54E-BA2F-D111-5037A627D595}"/>
+              </a:ext>
+            </a:extLst>
+          </p:cNvPr>
+          <p:cNvSpPr/>
+          <p:nvPr/>
+        </p:nvSpPr>
+        <p:spPr>
+          <a:xfrm>
+            <a:off x="10014859" y="4795159"/>
+            <a:ext cx="1981200" cy="1382486"/>
+          </a:xfrm>
+          <a:prstGeom prst="rect">
+            <a:avLst/>
+          </a:prstGeom>
+          <a:solidFill>
+            <a:schemeClr val="bg1">
+              <a:alpha val="75000"/>
+            </a:schemeClr>
+          </a:solidFill>
+          <a:ln w="38100">
+            <a:solidFill>
+              <a:schemeClr val="tx1"/>
+            </a:solidFill>
+          </a:ln>
+        </p:spPr>
+        <p:style>
+          <a:lnRef idx="2">
+            <a:schemeClr val="accent1">
+              <a:shade val="50000"/>
+            </a:schemeClr>
+          </a:lnRef>
+          <a:fillRef idx="1">
+            <a:schemeClr val="accent1"/>
+          </a:fillRef>
+          <a:effectRef idx="0">
+            <a:schemeClr val="accent1"/>
+          </a:effectRef>
+          <a:fontRef idx="minor">
+            <a:schemeClr val="lt1"/>
+          </a:fontRef>
+        </p:style>
+        <p:txBody>
+          <a:bodyPr rtlCol="0" anchor="ctr"/>
+          <a:lstStyle/>
+          <a:p>
+            <a:pPr algn="ctr"/>
+            <a:r>
+              <a:rPr lang="el-GR" sz="3000" i="1" dirty="0">
+                <a:solidFill>
+                  <a:schemeClr val="tx1"/>
+                </a:solidFill>
+                <a:latin typeface="Times New Roman" panose="02020603050405020304" pitchFamily="18" charset="0"/>
+                <a:cs typeface="Times New Roman" panose="02020603050405020304" pitchFamily="18" charset="0"/>
+              </a:rPr>
+              <a:t>χ</a:t>
+            </a:r>
+            <a:endParaRPr lang="en-US" sz="3000" i="1" dirty="0">
+              <a:solidFill>
+                <a:schemeClr val="tx1"/>
+              </a:solidFill>
+              <a:latin typeface="Times New Roman" panose="02020603050405020304" pitchFamily="18" charset="0"/>
+              <a:cs typeface="Times New Roman" panose="02020603050405020304" pitchFamily="18" charset="0"/>
+            </a:endParaRPr>
+          </a:p>
+        </p:txBody>
+      </p:sp>
+      <p:sp>
+        <p:nvSpPr>
+          <p:cNvPr id="20" name="Rectangle 19">
+            <a:extLst>
+              <a:ext uri="{FF2B5EF4-FFF2-40B4-BE49-F238E27FC236}">
+                <a16:creationId xmlns:a16="http://schemas.microsoft.com/office/drawing/2014/main" id="{8CD31D91-82FE-DEF4-C1F4-559B96EB9A75}"/>
+              </a:ext>
+            </a:extLst>
+          </p:cNvPr>
+          <p:cNvSpPr/>
+          <p:nvPr/>
+        </p:nvSpPr>
+        <p:spPr>
+          <a:xfrm>
+            <a:off x="2786743" y="2231572"/>
+            <a:ext cx="1981200" cy="1382486"/>
+          </a:xfrm>
+          <a:prstGeom prst="rect">
+            <a:avLst/>
+          </a:prstGeom>
+          <a:noFill/>
+          <a:ln w="38100">
+            <a:solidFill>
+              <a:schemeClr val="tx1"/>
+            </a:solidFill>
+          </a:ln>
+        </p:spPr>
+        <p:style>
+          <a:lnRef idx="2">
+            <a:schemeClr val="accent1">
+              <a:shade val="50000"/>
+            </a:schemeClr>
+          </a:lnRef>
+          <a:fillRef idx="1">
+            <a:schemeClr val="accent1"/>
+          </a:fillRef>
+          <a:effectRef idx="0">
+            <a:schemeClr val="accent1"/>
+          </a:effectRef>
+          <a:fontRef idx="minor">
+            <a:schemeClr val="lt1"/>
+          </a:fontRef>
+        </p:style>
+        <p:txBody>
+          <a:bodyPr rtlCol="0" anchor="ctr"/>
+          <a:lstStyle/>
+          <a:p>
+            <a:pPr algn="ctr"/>
+            <a:r>
+              <a:rPr lang="en-US" sz="3000" i="1" dirty="0">
+                <a:solidFill>
+                  <a:schemeClr val="tx1"/>
+                </a:solidFill>
+                <a:latin typeface="Times New Roman" panose="02020603050405020304" pitchFamily="18" charset="0"/>
+                <a:cs typeface="Times New Roman" panose="02020603050405020304" pitchFamily="18" charset="0"/>
+              </a:rPr>
+              <a:t>Soil moisture</a:t>
             </a:r>
           </a:p>
         </p:txBody>
@@ -5549,51 +5672,6 @@
       </p:grpSpPr>
       <p:cxnSp>
         <p:nvCxnSpPr>
-          <p:cNvPr id="77" name="Straight Arrow Connector 76">
-            <a:extLst>
-              <a:ext uri="{FF2B5EF4-FFF2-40B4-BE49-F238E27FC236}">
-                <a16:creationId xmlns:a16="http://schemas.microsoft.com/office/drawing/2014/main" id="{2CAFDABE-EBA8-F947-4A74-58528D3B89C8}"/>
-              </a:ext>
-            </a:extLst>
-          </p:cNvPr>
-          <p:cNvCxnSpPr>
-            <a:cxnSpLocks/>
-            <a:endCxn id="26" idx="0"/>
-          </p:cNvCxnSpPr>
-          <p:nvPr/>
-        </p:nvCxnSpPr>
-        <p:spPr>
-          <a:xfrm>
-            <a:off x="11005459" y="4171476"/>
-            <a:ext cx="0" cy="623683"/>
-          </a:xfrm>
-          <a:prstGeom prst="straightConnector1">
-            <a:avLst/>
-          </a:prstGeom>
-          <a:ln w="87249">
-            <a:solidFill>
-              <a:srgbClr val="C00000"/>
-            </a:solidFill>
-            <a:tailEnd type="triangle"/>
-          </a:ln>
-        </p:spPr>
-        <p:style>
-          <a:lnRef idx="1">
-            <a:schemeClr val="accent1"/>
-          </a:lnRef>
-          <a:fillRef idx="0">
-            <a:schemeClr val="accent1"/>
-          </a:fillRef>
-          <a:effectRef idx="0">
-            <a:schemeClr val="accent1"/>
-          </a:effectRef>
-          <a:fontRef idx="minor">
-            <a:schemeClr val="tx1"/>
-          </a:fontRef>
-        </p:style>
-      </p:cxnSp>
-      <p:cxnSp>
-        <p:nvCxnSpPr>
           <p:cNvPr id="2" name="Straight Arrow Connector 1">
             <a:extLst>
               <a:ext uri="{FF2B5EF4-FFF2-40B4-BE49-F238E27FC236}">
@@ -5614,7 +5692,7 @@
           <a:prstGeom prst="straightConnector1">
             <a:avLst/>
           </a:prstGeom>
-          <a:ln w="76962">
+          <a:ln w="80010">
             <a:solidFill>
               <a:srgbClr val="C00000"/>
             </a:solidFill>
@@ -5659,7 +5737,7 @@
           <a:solidFill>
             <a:schemeClr val="bg1"/>
           </a:solidFill>
-          <a:ln w="76962">
+          <a:ln w="80010">
             <a:solidFill>
               <a:srgbClr val="C00000"/>
             </a:solidFill>
@@ -5676,98 +5754,7 @@
                 <a:latin typeface="Times New Roman" panose="02020603050405020304" pitchFamily="18" charset="0"/>
                 <a:cs typeface="Times New Roman" panose="02020603050405020304" pitchFamily="18" charset="0"/>
               </a:rPr>
-              <a:t>-0.593</a:t>
-            </a:r>
-          </a:p>
-        </p:txBody>
-      </p:sp>
-      <p:cxnSp>
-        <p:nvCxnSpPr>
-          <p:cNvPr id="4" name="Straight Arrow Connector 3">
-            <a:extLst>
-              <a:ext uri="{FF2B5EF4-FFF2-40B4-BE49-F238E27FC236}">
-                <a16:creationId xmlns:a16="http://schemas.microsoft.com/office/drawing/2014/main" id="{B54A85AB-699A-D0DA-507D-FBF24A12F347}"/>
-              </a:ext>
-            </a:extLst>
-          </p:cNvPr>
-          <p:cNvCxnSpPr>
-            <a:cxnSpLocks/>
-          </p:cNvCxnSpPr>
-          <p:nvPr/>
-        </p:nvCxnSpPr>
-        <p:spPr>
-          <a:xfrm>
-            <a:off x="3777343" y="3614058"/>
-            <a:ext cx="0" cy="3744684"/>
-          </a:xfrm>
-          <a:prstGeom prst="straightConnector1">
-            <a:avLst/>
-          </a:prstGeom>
-          <a:ln w="64135">
-            <a:solidFill>
-              <a:schemeClr val="accent1"/>
-            </a:solidFill>
-            <a:prstDash val="solid"/>
-            <a:tailEnd type="triangle"/>
-          </a:ln>
-        </p:spPr>
-        <p:style>
-          <a:lnRef idx="1">
-            <a:schemeClr val="accent1"/>
-          </a:lnRef>
-          <a:fillRef idx="0">
-            <a:schemeClr val="accent1"/>
-          </a:fillRef>
-          <a:effectRef idx="0">
-            <a:schemeClr val="accent1"/>
-          </a:effectRef>
-          <a:fontRef idx="minor">
-            <a:schemeClr val="tx1"/>
-          </a:fontRef>
-        </p:style>
-      </p:cxnSp>
-      <p:sp>
-        <p:nvSpPr>
-          <p:cNvPr id="24" name="TextBox 23">
-            <a:extLst>
-              <a:ext uri="{FF2B5EF4-FFF2-40B4-BE49-F238E27FC236}">
-                <a16:creationId xmlns:a16="http://schemas.microsoft.com/office/drawing/2014/main" id="{9C892ED5-3440-8C9B-344D-BBFF61B01708}"/>
-              </a:ext>
-            </a:extLst>
-          </p:cNvPr>
-          <p:cNvSpPr txBox="1"/>
-          <p:nvPr/>
-        </p:nvSpPr>
-        <p:spPr>
-          <a:xfrm>
-            <a:off x="3338761" y="5255567"/>
-            <a:ext cx="877163" cy="461665"/>
-          </a:xfrm>
-          <a:prstGeom prst="rect">
-            <a:avLst/>
-          </a:prstGeom>
-          <a:solidFill>
-            <a:schemeClr val="bg1"/>
-          </a:solidFill>
-          <a:ln w="64135">
-            <a:solidFill>
-              <a:schemeClr val="accent1"/>
-            </a:solidFill>
-            <a:prstDash val="solid"/>
-          </a:ln>
-        </p:spPr>
-        <p:txBody>
-          <a:bodyPr wrap="none" rtlCol="0">
-            <a:spAutoFit/>
-          </a:bodyPr>
-          <a:lstStyle/>
-          <a:p>
-            <a:r>
-              <a:rPr lang="en-US" sz="2400" b="1" dirty="0">
-                <a:latin typeface="Times New Roman" panose="02020603050405020304" pitchFamily="18" charset="0"/>
-                <a:cs typeface="Times New Roman" panose="02020603050405020304" pitchFamily="18" charset="0"/>
-              </a:rPr>
-              <a:t>0.423</a:t>
+              <a:t>-0.586</a:t>
             </a:r>
           </a:p>
         </p:txBody>
@@ -5795,7 +5782,7 @@
           <a:prstGeom prst="straightConnector1">
             <a:avLst/>
           </a:prstGeom>
-          <a:ln w="72390">
+          <a:ln w="75438">
             <a:headEnd type="triangle"/>
             <a:tailEnd type="triangle"/>
           </a:ln>
@@ -5838,7 +5825,7 @@
           <a:solidFill>
             <a:schemeClr val="bg1"/>
           </a:solidFill>
-          <a:ln w="72390">
+          <a:ln w="75438">
             <a:solidFill>
               <a:schemeClr val="accent1"/>
             </a:solidFill>
@@ -5855,187 +5842,7 @@
                 <a:latin typeface="Times New Roman" panose="02020603050405020304" pitchFamily="18" charset="0"/>
                 <a:cs typeface="Times New Roman" panose="02020603050405020304" pitchFamily="18" charset="0"/>
               </a:rPr>
-              <a:t>0.533</a:t>
-            </a:r>
-          </a:p>
-        </p:txBody>
-      </p:sp>
-      <p:cxnSp>
-        <p:nvCxnSpPr>
-          <p:cNvPr id="29" name="Elbow Connector 28">
-            <a:extLst>
-              <a:ext uri="{FF2B5EF4-FFF2-40B4-BE49-F238E27FC236}">
-                <a16:creationId xmlns:a16="http://schemas.microsoft.com/office/drawing/2014/main" id="{AB04B289-C4DF-3DCE-6A6F-A2577780B32F}"/>
-              </a:ext>
-            </a:extLst>
-          </p:cNvPr>
-          <p:cNvCxnSpPr>
-            <a:cxnSpLocks/>
-            <a:stCxn id="21" idx="2"/>
-          </p:cNvCxnSpPr>
-          <p:nvPr/>
-        </p:nvCxnSpPr>
-        <p:spPr>
-          <a:xfrm rot="16200000" flipH="1">
-            <a:off x="8941491" y="2063967"/>
-            <a:ext cx="557418" cy="3657599"/>
-          </a:xfrm>
-          <a:prstGeom prst="bentConnector2">
-            <a:avLst/>
-          </a:prstGeom>
-          <a:ln w="87249">
-            <a:solidFill>
-              <a:srgbClr val="C00000"/>
-            </a:solidFill>
-          </a:ln>
-        </p:spPr>
-        <p:style>
-          <a:lnRef idx="1">
-            <a:schemeClr val="accent1"/>
-          </a:lnRef>
-          <a:fillRef idx="0">
-            <a:schemeClr val="accent1"/>
-          </a:fillRef>
-          <a:effectRef idx="0">
-            <a:schemeClr val="accent1"/>
-          </a:effectRef>
-          <a:fontRef idx="minor">
-            <a:schemeClr val="tx1"/>
-          </a:fontRef>
-        </p:style>
-      </p:cxnSp>
-      <p:sp>
-        <p:nvSpPr>
-          <p:cNvPr id="80" name="TextBox 79">
-            <a:extLst>
-              <a:ext uri="{FF2B5EF4-FFF2-40B4-BE49-F238E27FC236}">
-                <a16:creationId xmlns:a16="http://schemas.microsoft.com/office/drawing/2014/main" id="{0FC8D521-81A9-E347-0EBC-99509681D866}"/>
-              </a:ext>
-            </a:extLst>
-          </p:cNvPr>
-          <p:cNvSpPr txBox="1"/>
-          <p:nvPr/>
-        </p:nvSpPr>
-        <p:spPr>
-          <a:xfrm>
-            <a:off x="8657239" y="3940643"/>
-            <a:ext cx="979755" cy="461665"/>
-          </a:xfrm>
-          <a:prstGeom prst="rect">
-            <a:avLst/>
-          </a:prstGeom>
-          <a:solidFill>
-            <a:schemeClr val="bg1"/>
-          </a:solidFill>
-          <a:ln w="87249">
-            <a:solidFill>
-              <a:srgbClr val="C00000"/>
-            </a:solidFill>
-          </a:ln>
-        </p:spPr>
-        <p:txBody>
-          <a:bodyPr wrap="none" rtlCol="0">
-            <a:spAutoFit/>
-          </a:bodyPr>
-          <a:lstStyle/>
-          <a:p>
-            <a:r>
-              <a:rPr lang="en-US" sz="2400" b="1" dirty="0">
-                <a:latin typeface="Times New Roman" panose="02020603050405020304" pitchFamily="18" charset="0"/>
-                <a:cs typeface="Times New Roman" panose="02020603050405020304" pitchFamily="18" charset="0"/>
-              </a:rPr>
-              <a:t>-0.733</a:t>
-            </a:r>
-          </a:p>
-        </p:txBody>
-      </p:sp>
-      <p:cxnSp>
-        <p:nvCxnSpPr>
-          <p:cNvPr id="98" name="Elbow Connector 97">
-            <a:extLst>
-              <a:ext uri="{FF2B5EF4-FFF2-40B4-BE49-F238E27FC236}">
-                <a16:creationId xmlns:a16="http://schemas.microsoft.com/office/drawing/2014/main" id="{EF444A78-F531-B01C-E9A9-9C3AD791A386}"/>
-              </a:ext>
-            </a:extLst>
-          </p:cNvPr>
-          <p:cNvCxnSpPr>
-            <a:cxnSpLocks/>
-            <a:stCxn id="25" idx="2"/>
-            <a:endCxn id="31" idx="1"/>
-          </p:cNvCxnSpPr>
-          <p:nvPr/>
-        </p:nvCxnSpPr>
-        <p:spPr>
-          <a:xfrm rot="16200000" flipH="1">
-            <a:off x="9582553" y="3986493"/>
-            <a:ext cx="1855213" cy="6237516"/>
-          </a:xfrm>
-          <a:prstGeom prst="bentConnector2">
-            <a:avLst/>
-          </a:prstGeom>
-          <a:ln w="40767">
-            <a:solidFill>
-              <a:srgbClr val="C00000"/>
-            </a:solidFill>
-            <a:tailEnd type="triangle"/>
-          </a:ln>
-        </p:spPr>
-        <p:style>
-          <a:lnRef idx="1">
-            <a:schemeClr val="accent1"/>
-          </a:lnRef>
-          <a:fillRef idx="0">
-            <a:schemeClr val="accent1"/>
-          </a:fillRef>
-          <a:effectRef idx="0">
-            <a:schemeClr val="accent1"/>
-          </a:effectRef>
-          <a:fontRef idx="minor">
-            <a:schemeClr val="tx1"/>
-          </a:fontRef>
-        </p:style>
-      </p:cxnSp>
-      <p:sp>
-        <p:nvSpPr>
-          <p:cNvPr id="61" name="TextBox 60">
-            <a:extLst>
-              <a:ext uri="{FF2B5EF4-FFF2-40B4-BE49-F238E27FC236}">
-                <a16:creationId xmlns:a16="http://schemas.microsoft.com/office/drawing/2014/main" id="{B6476535-A95E-90F0-63CA-BA795134B48E}"/>
-              </a:ext>
-            </a:extLst>
-          </p:cNvPr>
-          <p:cNvSpPr txBox="1"/>
-          <p:nvPr/>
-        </p:nvSpPr>
-        <p:spPr>
-          <a:xfrm>
-            <a:off x="10025704" y="7803151"/>
-            <a:ext cx="979755" cy="461665"/>
-          </a:xfrm>
-          <a:prstGeom prst="rect">
-            <a:avLst/>
-          </a:prstGeom>
-          <a:solidFill>
-            <a:schemeClr val="bg1"/>
-          </a:solidFill>
-          <a:ln w="40767">
-            <a:solidFill>
-              <a:srgbClr val="C00000"/>
-            </a:solidFill>
-          </a:ln>
-        </p:spPr>
-        <p:txBody>
-          <a:bodyPr wrap="none" rtlCol="0">
-            <a:spAutoFit/>
-          </a:bodyPr>
-          <a:lstStyle/>
-          <a:p>
-            <a:r>
-              <a:rPr lang="en-US" sz="2400" b="1" dirty="0">
-                <a:latin typeface="Times New Roman" panose="02020603050405020304" pitchFamily="18" charset="0"/>
-                <a:cs typeface="Times New Roman" panose="02020603050405020304" pitchFamily="18" charset="0"/>
-              </a:rPr>
-              <a:t>-0.108</a:t>
+              <a:t>0.529</a:t>
             </a:r>
           </a:p>
         </p:txBody>
@@ -6057,13 +5864,13 @@
         </p:nvCxnSpPr>
         <p:spPr>
           <a:xfrm rot="5400000" flipH="1" flipV="1">
-            <a:off x="11541034" y="-2534191"/>
-            <a:ext cx="616130" cy="8915396"/>
+            <a:off x="11572784" y="-2565941"/>
+            <a:ext cx="616130" cy="8978896"/>
           </a:xfrm>
           <a:prstGeom prst="bentConnector2">
             <a:avLst/>
           </a:prstGeom>
-          <a:ln w="122301">
+          <a:ln w="129286">
             <a:solidFill>
               <a:srgbClr val="C00000"/>
             </a:solidFill>
@@ -6107,7 +5914,7 @@
           <a:prstGeom prst="bentConnector2">
             <a:avLst/>
           </a:prstGeom>
-          <a:ln w="122301">
+          <a:ln w="129286">
             <a:solidFill>
               <a:srgbClr val="C00000"/>
             </a:solidFill>
@@ -6152,7 +5959,7 @@
           <a:solidFill>
             <a:schemeClr val="bg1"/>
           </a:solidFill>
-          <a:ln w="122301">
+          <a:ln w="129286">
             <a:solidFill>
               <a:srgbClr val="C00000"/>
             </a:solidFill>
@@ -6184,6 +5991,7 @@
             </a:extLst>
           </p:cNvPr>
           <p:cNvCxnSpPr>
+            <a:cxnSpLocks/>
             <a:stCxn id="28" idx="3"/>
             <a:endCxn id="25" idx="1"/>
           </p:cNvCxnSpPr>
@@ -6197,7 +6005,7 @@
           <a:prstGeom prst="bentConnector3">
             <a:avLst/>
           </a:prstGeom>
-          <a:ln w="47498">
+          <a:ln w="48641">
             <a:solidFill>
               <a:srgbClr val="C00000"/>
             </a:solidFill>
@@ -6242,7 +6050,7 @@
           <a:solidFill>
             <a:schemeClr val="bg1"/>
           </a:solidFill>
-          <a:ln w="47498">
+          <a:ln w="48641">
             <a:solidFill>
               <a:srgbClr val="C00000"/>
             </a:solidFill>
@@ -6259,7 +6067,7 @@
                 <a:latin typeface="Times New Roman" panose="02020603050405020304" pitchFamily="18" charset="0"/>
                 <a:cs typeface="Times New Roman" panose="02020603050405020304" pitchFamily="18" charset="0"/>
               </a:rPr>
-              <a:t>-0.198</a:t>
+              <a:t>-0.195</a:t>
             </a:r>
           </a:p>
         </p:txBody>
@@ -6287,9 +6095,7 @@
           <a:noFill/>
           <a:ln w="38100">
             <a:solidFill>
-              <a:schemeClr val="tx1">
-                <a:alpha val="75000"/>
-              </a:schemeClr>
+              <a:schemeClr val="tx1"/>
             </a:solidFill>
           </a:ln>
         </p:spPr>
@@ -6350,9 +6156,7 @@
           <a:noFill/>
           <a:ln w="38100">
             <a:solidFill>
-              <a:schemeClr val="tx1">
-                <a:alpha val="75000"/>
-              </a:schemeClr>
+              <a:schemeClr val="tx1"/>
             </a:solidFill>
           </a:ln>
         </p:spPr>
@@ -6423,9 +6227,7 @@
           <a:noFill/>
           <a:ln w="38100">
             <a:solidFill>
-              <a:schemeClr val="tx1">
-                <a:alpha val="75000"/>
-              </a:schemeClr>
+              <a:schemeClr val="tx1"/>
             </a:solidFill>
           </a:ln>
         </p:spPr>
@@ -6558,9 +6360,7 @@
           <a:noFill/>
           <a:ln w="38100">
             <a:solidFill>
-              <a:schemeClr val="tx1">
-                <a:alpha val="75000"/>
-              </a:schemeClr>
+              <a:schemeClr val="tx1"/>
             </a:solidFill>
           </a:ln>
         </p:spPr>
@@ -6731,6 +6531,504 @@
           </a:p>
         </p:txBody>
       </p:sp>
+      <p:cxnSp>
+        <p:nvCxnSpPr>
+          <p:cNvPr id="6" name="Elbow Connector 5">
+            <a:extLst>
+              <a:ext uri="{FF2B5EF4-FFF2-40B4-BE49-F238E27FC236}">
+                <a16:creationId xmlns:a16="http://schemas.microsoft.com/office/drawing/2014/main" id="{6957D6D0-2735-FE8F-F1EE-01584CCADE24}"/>
+              </a:ext>
+            </a:extLst>
+          </p:cNvPr>
+          <p:cNvCxnSpPr>
+            <a:cxnSpLocks/>
+          </p:cNvCxnSpPr>
+          <p:nvPr/>
+        </p:nvCxnSpPr>
+        <p:spPr>
+          <a:xfrm>
+            <a:off x="4785381" y="2922815"/>
+            <a:ext cx="2606019" cy="1558010"/>
+          </a:xfrm>
+          <a:prstGeom prst="bentConnector3">
+            <a:avLst>
+              <a:gd name="adj1" fmla="val 31847"/>
+            </a:avLst>
+          </a:prstGeom>
+          <a:ln w="41021">
+            <a:solidFill>
+              <a:srgbClr val="C00000"/>
+            </a:solidFill>
+            <a:prstDash val="solid"/>
+          </a:ln>
+        </p:spPr>
+        <p:style>
+          <a:lnRef idx="1">
+            <a:schemeClr val="accent1"/>
+          </a:lnRef>
+          <a:fillRef idx="0">
+            <a:schemeClr val="accent1"/>
+          </a:fillRef>
+          <a:effectRef idx="0">
+            <a:schemeClr val="accent1"/>
+          </a:effectRef>
+          <a:fontRef idx="minor">
+            <a:schemeClr val="tx1"/>
+          </a:fontRef>
+        </p:style>
+      </p:cxnSp>
+      <p:sp>
+        <p:nvSpPr>
+          <p:cNvPr id="5" name="TextBox 4">
+            <a:extLst>
+              <a:ext uri="{FF2B5EF4-FFF2-40B4-BE49-F238E27FC236}">
+                <a16:creationId xmlns:a16="http://schemas.microsoft.com/office/drawing/2014/main" id="{934F001A-93EA-C666-879E-F44014401A78}"/>
+              </a:ext>
+            </a:extLst>
+          </p:cNvPr>
+          <p:cNvSpPr txBox="1"/>
+          <p:nvPr/>
+        </p:nvSpPr>
+        <p:spPr>
+          <a:xfrm>
+            <a:off x="5115096" y="3383224"/>
+            <a:ext cx="979755" cy="461665"/>
+          </a:xfrm>
+          <a:prstGeom prst="rect">
+            <a:avLst/>
+          </a:prstGeom>
+          <a:solidFill>
+            <a:schemeClr val="bg1"/>
+          </a:solidFill>
+          <a:ln w="41021">
+            <a:solidFill>
+              <a:srgbClr val="C00000"/>
+            </a:solidFill>
+            <a:prstDash val="solid"/>
+          </a:ln>
+        </p:spPr>
+        <p:txBody>
+          <a:bodyPr wrap="none" rtlCol="0">
+            <a:spAutoFit/>
+          </a:bodyPr>
+          <a:lstStyle/>
+          <a:p>
+            <a:r>
+              <a:rPr lang="en-US" sz="2400" b="1" dirty="0">
+                <a:latin typeface="Times New Roman" panose="02020603050405020304" pitchFamily="18" charset="0"/>
+                <a:cs typeface="Times New Roman" panose="02020603050405020304" pitchFamily="18" charset="0"/>
+              </a:rPr>
+              <a:t>-0.099</a:t>
+            </a:r>
+          </a:p>
+        </p:txBody>
+      </p:sp>
+      <p:cxnSp>
+        <p:nvCxnSpPr>
+          <p:cNvPr id="34" name="Straight Arrow Connector 33">
+            <a:extLst>
+              <a:ext uri="{FF2B5EF4-FFF2-40B4-BE49-F238E27FC236}">
+                <a16:creationId xmlns:a16="http://schemas.microsoft.com/office/drawing/2014/main" id="{C036EC9D-8A9A-2A6E-F031-7BF5975C1DC7}"/>
+              </a:ext>
+            </a:extLst>
+          </p:cNvPr>
+          <p:cNvCxnSpPr>
+            <a:cxnSpLocks/>
+          </p:cNvCxnSpPr>
+          <p:nvPr/>
+        </p:nvCxnSpPr>
+        <p:spPr>
+          <a:xfrm>
+            <a:off x="7391400" y="4462458"/>
+            <a:ext cx="1" cy="316826"/>
+          </a:xfrm>
+          <a:prstGeom prst="straightConnector1">
+            <a:avLst/>
+          </a:prstGeom>
+          <a:ln w="41021">
+            <a:solidFill>
+              <a:srgbClr val="C00000"/>
+            </a:solidFill>
+            <a:tailEnd type="triangle"/>
+          </a:ln>
+        </p:spPr>
+        <p:style>
+          <a:lnRef idx="1">
+            <a:schemeClr val="accent1"/>
+          </a:lnRef>
+          <a:fillRef idx="0">
+            <a:schemeClr val="accent1"/>
+          </a:fillRef>
+          <a:effectRef idx="0">
+            <a:schemeClr val="accent1"/>
+          </a:effectRef>
+          <a:fontRef idx="minor">
+            <a:schemeClr val="tx1"/>
+          </a:fontRef>
+        </p:style>
+      </p:cxnSp>
+      <p:cxnSp>
+        <p:nvCxnSpPr>
+          <p:cNvPr id="85" name="Straight Arrow Connector 84">
+            <a:extLst>
+              <a:ext uri="{FF2B5EF4-FFF2-40B4-BE49-F238E27FC236}">
+                <a16:creationId xmlns:a16="http://schemas.microsoft.com/office/drawing/2014/main" id="{92B164B9-A50A-47DE-A139-4B180760D3A8}"/>
+              </a:ext>
+            </a:extLst>
+          </p:cNvPr>
+          <p:cNvCxnSpPr>
+            <a:cxnSpLocks/>
+          </p:cNvCxnSpPr>
+          <p:nvPr/>
+        </p:nvCxnSpPr>
+        <p:spPr>
+          <a:xfrm>
+            <a:off x="11005459" y="3614061"/>
+            <a:ext cx="0" cy="1181099"/>
+          </a:xfrm>
+          <a:prstGeom prst="straightConnector1">
+            <a:avLst/>
+          </a:prstGeom>
+          <a:ln w="41148">
+            <a:solidFill>
+              <a:srgbClr val="C00000"/>
+            </a:solidFill>
+            <a:prstDash val="dash"/>
+            <a:tailEnd type="triangle"/>
+          </a:ln>
+        </p:spPr>
+        <p:style>
+          <a:lnRef idx="1">
+            <a:schemeClr val="accent1"/>
+          </a:lnRef>
+          <a:fillRef idx="0">
+            <a:schemeClr val="accent1"/>
+          </a:fillRef>
+          <a:effectRef idx="0">
+            <a:schemeClr val="accent1"/>
+          </a:effectRef>
+          <a:fontRef idx="minor">
+            <a:schemeClr val="tx1"/>
+          </a:fontRef>
+        </p:style>
+      </p:cxnSp>
+      <p:sp>
+        <p:nvSpPr>
+          <p:cNvPr id="86" name="TextBox 85">
+            <a:extLst>
+              <a:ext uri="{FF2B5EF4-FFF2-40B4-BE49-F238E27FC236}">
+                <a16:creationId xmlns:a16="http://schemas.microsoft.com/office/drawing/2014/main" id="{285CEDD4-C3B6-E1D6-45B2-E98535E9A81E}"/>
+              </a:ext>
+            </a:extLst>
+          </p:cNvPr>
+          <p:cNvSpPr txBox="1"/>
+          <p:nvPr/>
+        </p:nvSpPr>
+        <p:spPr>
+          <a:xfrm>
+            <a:off x="10498401" y="3920542"/>
+            <a:ext cx="979755" cy="461665"/>
+          </a:xfrm>
+          <a:prstGeom prst="rect">
+            <a:avLst/>
+          </a:prstGeom>
+          <a:solidFill>
+            <a:schemeClr val="bg1"/>
+          </a:solidFill>
+          <a:ln w="41148">
+            <a:solidFill>
+              <a:srgbClr val="C00000"/>
+            </a:solidFill>
+            <a:prstDash val="dash"/>
+          </a:ln>
+        </p:spPr>
+        <p:txBody>
+          <a:bodyPr wrap="none" rtlCol="0">
+            <a:spAutoFit/>
+          </a:bodyPr>
+          <a:lstStyle/>
+          <a:p>
+            <a:r>
+              <a:rPr lang="en-US" sz="2400" dirty="0">
+                <a:latin typeface="Times New Roman" panose="02020603050405020304" pitchFamily="18" charset="0"/>
+                <a:cs typeface="Times New Roman" panose="02020603050405020304" pitchFamily="18" charset="0"/>
+              </a:rPr>
+              <a:t>-0.101</a:t>
+            </a:r>
+          </a:p>
+        </p:txBody>
+      </p:sp>
+      <p:cxnSp>
+        <p:nvCxnSpPr>
+          <p:cNvPr id="87" name="Straight Arrow Connector 86">
+            <a:extLst>
+              <a:ext uri="{FF2B5EF4-FFF2-40B4-BE49-F238E27FC236}">
+                <a16:creationId xmlns:a16="http://schemas.microsoft.com/office/drawing/2014/main" id="{8182FBF4-009D-169B-D220-74A34B69DF7C}"/>
+              </a:ext>
+            </a:extLst>
+          </p:cNvPr>
+          <p:cNvCxnSpPr>
+            <a:cxnSpLocks/>
+          </p:cNvCxnSpPr>
+          <p:nvPr/>
+        </p:nvCxnSpPr>
+        <p:spPr>
+          <a:xfrm>
+            <a:off x="10223731" y="4128393"/>
+            <a:ext cx="0" cy="656707"/>
+          </a:xfrm>
+          <a:prstGeom prst="straightConnector1">
+            <a:avLst/>
+          </a:prstGeom>
+          <a:ln w="92456">
+            <a:solidFill>
+              <a:srgbClr val="C00000"/>
+            </a:solidFill>
+            <a:tailEnd type="triangle"/>
+          </a:ln>
+        </p:spPr>
+        <p:style>
+          <a:lnRef idx="1">
+            <a:schemeClr val="accent1"/>
+          </a:lnRef>
+          <a:fillRef idx="0">
+            <a:schemeClr val="accent1"/>
+          </a:fillRef>
+          <a:effectRef idx="0">
+            <a:schemeClr val="accent1"/>
+          </a:effectRef>
+          <a:fontRef idx="minor">
+            <a:schemeClr val="tx1"/>
+          </a:fontRef>
+        </p:style>
+      </p:cxnSp>
+      <p:cxnSp>
+        <p:nvCxnSpPr>
+          <p:cNvPr id="88" name="Elbow Connector 87">
+            <a:extLst>
+              <a:ext uri="{FF2B5EF4-FFF2-40B4-BE49-F238E27FC236}">
+                <a16:creationId xmlns:a16="http://schemas.microsoft.com/office/drawing/2014/main" id="{8779EED6-33BE-D6C8-974C-5759BF97A935}"/>
+              </a:ext>
+            </a:extLst>
+          </p:cNvPr>
+          <p:cNvCxnSpPr>
+            <a:cxnSpLocks/>
+          </p:cNvCxnSpPr>
+          <p:nvPr/>
+        </p:nvCxnSpPr>
+        <p:spPr>
+          <a:xfrm>
+            <a:off x="7789600" y="3581391"/>
+            <a:ext cx="2476568" cy="590085"/>
+          </a:xfrm>
+          <a:prstGeom prst="bentConnector3">
+            <a:avLst>
+              <a:gd name="adj1" fmla="val -176"/>
+            </a:avLst>
+          </a:prstGeom>
+          <a:ln w="92456">
+            <a:solidFill>
+              <a:srgbClr val="C00000"/>
+            </a:solidFill>
+          </a:ln>
+        </p:spPr>
+        <p:style>
+          <a:lnRef idx="1">
+            <a:schemeClr val="accent1"/>
+          </a:lnRef>
+          <a:fillRef idx="0">
+            <a:schemeClr val="accent1"/>
+          </a:fillRef>
+          <a:effectRef idx="0">
+            <a:schemeClr val="accent1"/>
+          </a:effectRef>
+          <a:fontRef idx="minor">
+            <a:schemeClr val="tx1"/>
+          </a:fontRef>
+        </p:style>
+      </p:cxnSp>
+      <p:sp>
+        <p:nvSpPr>
+          <p:cNvPr id="89" name="TextBox 88">
+            <a:extLst>
+              <a:ext uri="{FF2B5EF4-FFF2-40B4-BE49-F238E27FC236}">
+                <a16:creationId xmlns:a16="http://schemas.microsoft.com/office/drawing/2014/main" id="{1450BAE8-F881-504A-1CBC-66BA03258109}"/>
+              </a:ext>
+            </a:extLst>
+          </p:cNvPr>
+          <p:cNvSpPr txBox="1"/>
+          <p:nvPr/>
+        </p:nvSpPr>
+        <p:spPr>
+          <a:xfrm>
+            <a:off x="8670324" y="3897561"/>
+            <a:ext cx="979755" cy="461665"/>
+          </a:xfrm>
+          <a:prstGeom prst="rect">
+            <a:avLst/>
+          </a:prstGeom>
+          <a:solidFill>
+            <a:schemeClr val="bg1"/>
+          </a:solidFill>
+          <a:ln w="92456">
+            <a:solidFill>
+              <a:srgbClr val="C00000"/>
+            </a:solidFill>
+          </a:ln>
+        </p:spPr>
+        <p:txBody>
+          <a:bodyPr wrap="none" rtlCol="0">
+            <a:spAutoFit/>
+          </a:bodyPr>
+          <a:lstStyle/>
+          <a:p>
+            <a:r>
+              <a:rPr lang="en-US" sz="2400" b="1" dirty="0">
+                <a:latin typeface="Times New Roman" panose="02020603050405020304" pitchFamily="18" charset="0"/>
+                <a:cs typeface="Times New Roman" panose="02020603050405020304" pitchFamily="18" charset="0"/>
+              </a:rPr>
+              <a:t>-0.742</a:t>
+            </a:r>
+          </a:p>
+        </p:txBody>
+      </p:sp>
+      <p:cxnSp>
+        <p:nvCxnSpPr>
+          <p:cNvPr id="90" name="Elbow Connector 89">
+            <a:extLst>
+              <a:ext uri="{FF2B5EF4-FFF2-40B4-BE49-F238E27FC236}">
+                <a16:creationId xmlns:a16="http://schemas.microsoft.com/office/drawing/2014/main" id="{9652DBD5-66F6-0939-858D-89475A5195DD}"/>
+              </a:ext>
+            </a:extLst>
+          </p:cNvPr>
+          <p:cNvCxnSpPr>
+            <a:cxnSpLocks/>
+          </p:cNvCxnSpPr>
+          <p:nvPr/>
+        </p:nvCxnSpPr>
+        <p:spPr>
+          <a:xfrm rot="16200000" flipV="1">
+            <a:off x="10492296" y="4882142"/>
+            <a:ext cx="3345501" cy="809331"/>
+          </a:xfrm>
+          <a:prstGeom prst="bentConnector3">
+            <a:avLst>
+              <a:gd name="adj1" fmla="val 84165"/>
+            </a:avLst>
+          </a:prstGeom>
+          <a:ln w="40132">
+            <a:solidFill>
+              <a:srgbClr val="C00000"/>
+            </a:solidFill>
+            <a:tailEnd type="triangle"/>
+          </a:ln>
+        </p:spPr>
+        <p:style>
+          <a:lnRef idx="1">
+            <a:schemeClr val="accent1"/>
+          </a:lnRef>
+          <a:fillRef idx="0">
+            <a:schemeClr val="accent1"/>
+          </a:fillRef>
+          <a:effectRef idx="0">
+            <a:schemeClr val="accent1"/>
+          </a:effectRef>
+          <a:fontRef idx="minor">
+            <a:schemeClr val="tx1"/>
+          </a:fontRef>
+        </p:style>
+      </p:cxnSp>
+      <p:cxnSp>
+        <p:nvCxnSpPr>
+          <p:cNvPr id="91" name="Elbow Connector 90">
+            <a:extLst>
+              <a:ext uri="{FF2B5EF4-FFF2-40B4-BE49-F238E27FC236}">
+                <a16:creationId xmlns:a16="http://schemas.microsoft.com/office/drawing/2014/main" id="{2873E212-6544-A7EB-20B1-513A294EA676}"/>
+              </a:ext>
+            </a:extLst>
+          </p:cNvPr>
+          <p:cNvCxnSpPr>
+            <a:cxnSpLocks/>
+          </p:cNvCxnSpPr>
+          <p:nvPr/>
+        </p:nvCxnSpPr>
+        <p:spPr>
+          <a:xfrm rot="10800000">
+            <a:off x="8075832" y="6212532"/>
+            <a:ext cx="4500456" cy="734782"/>
+          </a:xfrm>
+          <a:prstGeom prst="bentConnector3">
+            <a:avLst>
+              <a:gd name="adj1" fmla="val 99948"/>
+            </a:avLst>
+          </a:prstGeom>
+          <a:ln w="40132">
+            <a:solidFill>
+              <a:srgbClr val="C00000"/>
+            </a:solidFill>
+            <a:tailEnd type="triangle"/>
+          </a:ln>
+        </p:spPr>
+        <p:style>
+          <a:lnRef idx="1">
+            <a:schemeClr val="accent1"/>
+          </a:lnRef>
+          <a:fillRef idx="0">
+            <a:schemeClr val="accent1"/>
+          </a:fillRef>
+          <a:effectRef idx="0">
+            <a:schemeClr val="accent1"/>
+          </a:effectRef>
+          <a:fontRef idx="minor">
+            <a:schemeClr val="tx1"/>
+          </a:fontRef>
+        </p:style>
+      </p:cxnSp>
+      <p:sp>
+        <p:nvSpPr>
+          <p:cNvPr id="92" name="TextBox 91">
+            <a:extLst>
+              <a:ext uri="{FF2B5EF4-FFF2-40B4-BE49-F238E27FC236}">
+                <a16:creationId xmlns:a16="http://schemas.microsoft.com/office/drawing/2014/main" id="{CB3001D1-C117-34D9-4DEB-81E021717A68}"/>
+              </a:ext>
+            </a:extLst>
+          </p:cNvPr>
+          <p:cNvSpPr txBox="1"/>
+          <p:nvPr/>
+        </p:nvSpPr>
+        <p:spPr>
+          <a:xfrm>
+            <a:off x="8654122" y="6713748"/>
+            <a:ext cx="979755" cy="461665"/>
+          </a:xfrm>
+          <a:prstGeom prst="rect">
+            <a:avLst/>
+          </a:prstGeom>
+          <a:solidFill>
+            <a:schemeClr val="bg1"/>
+          </a:solidFill>
+          <a:ln w="40132">
+            <a:solidFill>
+              <a:srgbClr val="C00000"/>
+            </a:solidFill>
+          </a:ln>
+        </p:spPr>
+        <p:txBody>
+          <a:bodyPr wrap="square" rtlCol="0">
+            <a:spAutoFit/>
+          </a:bodyPr>
+          <a:lstStyle/>
+          <a:p>
+            <a:r>
+              <a:rPr lang="en-US" sz="2400" b="1" dirty="0">
+                <a:latin typeface="Times New Roman" panose="02020603050405020304" pitchFamily="18" charset="0"/>
+                <a:cs typeface="Times New Roman" panose="02020603050405020304" pitchFamily="18" charset="0"/>
+              </a:rPr>
+              <a:t>-0.088</a:t>
+            </a:r>
+          </a:p>
+        </p:txBody>
+      </p:sp>
       <p:sp>
         <p:nvSpPr>
           <p:cNvPr id="21" name="Rectangle 20">
@@ -6790,6 +7088,189 @@
                 <a:cs typeface="Times New Roman" panose="02020603050405020304" pitchFamily="18" charset="0"/>
               </a:rPr>
               <a:t>Plant functional group</a:t>
+            </a:r>
+          </a:p>
+        </p:txBody>
+      </p:sp>
+      <p:cxnSp>
+        <p:nvCxnSpPr>
+          <p:cNvPr id="94" name="Elbow Connector 93">
+            <a:extLst>
+              <a:ext uri="{FF2B5EF4-FFF2-40B4-BE49-F238E27FC236}">
+                <a16:creationId xmlns:a16="http://schemas.microsoft.com/office/drawing/2014/main" id="{B0118859-642D-6DD8-75FC-4597F5A1CDB7}"/>
+              </a:ext>
+            </a:extLst>
+          </p:cNvPr>
+          <p:cNvCxnSpPr>
+            <a:cxnSpLocks/>
+            <a:endCxn id="31" idx="1"/>
+          </p:cNvCxnSpPr>
+          <p:nvPr/>
+        </p:nvCxnSpPr>
+        <p:spPr>
+          <a:xfrm>
+            <a:off x="7391401" y="6177645"/>
+            <a:ext cx="6237516" cy="1855213"/>
+          </a:xfrm>
+          <a:prstGeom prst="bentConnector3">
+            <a:avLst>
+              <a:gd name="adj1" fmla="val -87"/>
+            </a:avLst>
+          </a:prstGeom>
+          <a:ln w="41656">
+            <a:solidFill>
+              <a:srgbClr val="C00000"/>
+            </a:solidFill>
+            <a:tailEnd type="triangle"/>
+          </a:ln>
+        </p:spPr>
+        <p:style>
+          <a:lnRef idx="1">
+            <a:schemeClr val="accent1"/>
+          </a:lnRef>
+          <a:fillRef idx="0">
+            <a:schemeClr val="accent1"/>
+          </a:fillRef>
+          <a:effectRef idx="0">
+            <a:schemeClr val="accent1"/>
+          </a:effectRef>
+          <a:fontRef idx="minor">
+            <a:schemeClr val="tx1"/>
+          </a:fontRef>
+        </p:style>
+      </p:cxnSp>
+      <p:sp>
+        <p:nvSpPr>
+          <p:cNvPr id="95" name="TextBox 94">
+            <a:extLst>
+              <a:ext uri="{FF2B5EF4-FFF2-40B4-BE49-F238E27FC236}">
+                <a16:creationId xmlns:a16="http://schemas.microsoft.com/office/drawing/2014/main" id="{C6C14567-54DA-EDA2-B9DC-5C3B701B5E7C}"/>
+              </a:ext>
+            </a:extLst>
+          </p:cNvPr>
+          <p:cNvSpPr txBox="1"/>
+          <p:nvPr/>
+        </p:nvSpPr>
+        <p:spPr>
+          <a:xfrm>
+            <a:off x="8650120" y="7772259"/>
+            <a:ext cx="979755" cy="461665"/>
+          </a:xfrm>
+          <a:prstGeom prst="rect">
+            <a:avLst/>
+          </a:prstGeom>
+          <a:solidFill>
+            <a:schemeClr val="bg1"/>
+          </a:solidFill>
+          <a:ln w="41656">
+            <a:solidFill>
+              <a:srgbClr val="C00000"/>
+            </a:solidFill>
+          </a:ln>
+        </p:spPr>
+        <p:txBody>
+          <a:bodyPr wrap="none" rtlCol="0">
+            <a:spAutoFit/>
+          </a:bodyPr>
+          <a:lstStyle/>
+          <a:p>
+            <a:r>
+              <a:rPr lang="en-US" sz="2400" b="1" dirty="0">
+                <a:latin typeface="Times New Roman" panose="02020603050405020304" pitchFamily="18" charset="0"/>
+                <a:cs typeface="Times New Roman" panose="02020603050405020304" pitchFamily="18" charset="0"/>
+              </a:rPr>
+              <a:t>-0.108</a:t>
+            </a:r>
+          </a:p>
+        </p:txBody>
+      </p:sp>
+      <p:cxnSp>
+        <p:nvCxnSpPr>
+          <p:cNvPr id="99" name="Straight Arrow Connector 98">
+            <a:extLst>
+              <a:ext uri="{FF2B5EF4-FFF2-40B4-BE49-F238E27FC236}">
+                <a16:creationId xmlns:a16="http://schemas.microsoft.com/office/drawing/2014/main" id="{742F46F9-8EE3-EFE0-821E-477BE31E07FA}"/>
+              </a:ext>
+            </a:extLst>
+          </p:cNvPr>
+          <p:cNvCxnSpPr>
+            <a:cxnSpLocks/>
+          </p:cNvCxnSpPr>
+          <p:nvPr/>
+        </p:nvCxnSpPr>
+        <p:spPr>
+          <a:xfrm>
+            <a:off x="3777343" y="3614058"/>
+            <a:ext cx="0" cy="3744684"/>
+          </a:xfrm>
+          <a:prstGeom prst="straightConnector1">
+            <a:avLst/>
+          </a:prstGeom>
+          <a:ln w="66929">
+            <a:solidFill>
+              <a:schemeClr val="accent1"/>
+            </a:solidFill>
+            <a:prstDash val="solid"/>
+            <a:tailEnd type="triangle"/>
+          </a:ln>
+        </p:spPr>
+        <p:style>
+          <a:lnRef idx="1">
+            <a:schemeClr val="accent1"/>
+          </a:lnRef>
+          <a:fillRef idx="0">
+            <a:schemeClr val="accent1"/>
+          </a:fillRef>
+          <a:effectRef idx="0">
+            <a:schemeClr val="accent1"/>
+          </a:effectRef>
+          <a:fontRef idx="minor">
+            <a:schemeClr val="tx1"/>
+          </a:fontRef>
+        </p:style>
+      </p:cxnSp>
+      <p:sp>
+        <p:nvSpPr>
+          <p:cNvPr id="100" name="TextBox 99">
+            <a:extLst>
+              <a:ext uri="{FF2B5EF4-FFF2-40B4-BE49-F238E27FC236}">
+                <a16:creationId xmlns:a16="http://schemas.microsoft.com/office/drawing/2014/main" id="{80781956-160A-DE85-2C0B-C27F56E0ED45}"/>
+              </a:ext>
+            </a:extLst>
+          </p:cNvPr>
+          <p:cNvSpPr txBox="1"/>
+          <p:nvPr/>
+        </p:nvSpPr>
+        <p:spPr>
+          <a:xfrm>
+            <a:off x="3338762" y="5236884"/>
+            <a:ext cx="877163" cy="461665"/>
+          </a:xfrm>
+          <a:prstGeom prst="rect">
+            <a:avLst/>
+          </a:prstGeom>
+          <a:solidFill>
+            <a:schemeClr val="bg1"/>
+          </a:solidFill>
+          <a:ln w="66929">
+            <a:solidFill>
+              <a:schemeClr val="accent1"/>
+            </a:solidFill>
+            <a:prstDash val="solid"/>
+          </a:ln>
+        </p:spPr>
+        <p:txBody>
+          <a:bodyPr wrap="none" rtlCol="0">
+            <a:spAutoFit/>
+          </a:bodyPr>
+          <a:lstStyle/>
+          <a:p>
+            <a:r>
+              <a:rPr lang="en-US" sz="2400" b="1" dirty="0">
+                <a:latin typeface="Times New Roman" panose="02020603050405020304" pitchFamily="18" charset="0"/>
+                <a:cs typeface="Times New Roman" panose="02020603050405020304" pitchFamily="18" charset="0"/>
+              </a:rPr>
+              <a:t>0.423</a:t>
             </a:r>
           </a:p>
         </p:txBody>

</xml_diff>

<commit_message>
update SEM with piecewise SEM results. still need to compile line thickness
</commit_message>
<xml_diff>
--- a/working_drafts/figs/TXeco_SEM_ppt_fig.pptx
+++ b/working_drafts/figs/TXeco_SEM_ppt_fig.pptx
@@ -5,11 +5,13 @@
     <p:sldMasterId id="2147483672" r:id="rId1"/>
   </p:sldMasterIdLst>
   <p:notesMasterIdLst>
-    <p:notesMasterId r:id="rId4"/>
+    <p:notesMasterId r:id="rId6"/>
   </p:notesMasterIdLst>
   <p:sldIdLst>
     <p:sldId id="258" r:id="rId2"/>
-    <p:sldId id="260" r:id="rId3"/>
+    <p:sldId id="262" r:id="rId3"/>
+    <p:sldId id="263" r:id="rId4"/>
+    <p:sldId id="260" r:id="rId5"/>
   </p:sldIdLst>
   <p:sldSz cx="18288000" cy="10972800"/>
   <p:notesSz cx="6858000" cy="9144000"/>
@@ -198,7 +200,7 @@
           <a:p>
             <a:fld id="{9C8338E3-F40D-F146-8D3B-4726E84D5200}" type="datetimeFigureOut">
               <a:rPr lang="en-US" smtClean="0"/>
-              <a:t>11/30/22</a:t>
+              <a:t>12/1/22</a:t>
             </a:fld>
             <a:endParaRPr lang="en-US"/>
           </a:p>
@@ -633,6 +635,184 @@
     </p:spTree>
     <p:extLst>
       <p:ext uri="{BB962C8B-B14F-4D97-AF65-F5344CB8AC3E}">
+        <p14:creationId xmlns:p14="http://schemas.microsoft.com/office/powerpoint/2010/main" val="1238060064"/>
+      </p:ext>
+    </p:extLst>
+  </p:cSld>
+  <p:clrMapOvr>
+    <a:masterClrMapping/>
+  </p:clrMapOvr>
+</p:notes>
+</file>
+
+<file path=ppt/notesSlides/notesSlide3.xml><?xml version="1.0" encoding="utf-8"?>
+<p:notes xmlns:a="http://schemas.openxmlformats.org/drawingml/2006/main" xmlns:r="http://schemas.openxmlformats.org/officeDocument/2006/relationships" xmlns:p="http://schemas.openxmlformats.org/presentationml/2006/main">
+  <p:cSld>
+    <p:spTree>
+      <p:nvGrpSpPr>
+        <p:cNvPr id="1" name=""/>
+        <p:cNvGrpSpPr/>
+        <p:nvPr/>
+      </p:nvGrpSpPr>
+      <p:grpSpPr>
+        <a:xfrm>
+          <a:off x="0" y="0"/>
+          <a:ext cx="0" cy="0"/>
+          <a:chOff x="0" y="0"/>
+          <a:chExt cx="0" cy="0"/>
+        </a:xfrm>
+      </p:grpSpPr>
+      <p:sp>
+        <p:nvSpPr>
+          <p:cNvPr id="2" name="Slide Image Placeholder 1"/>
+          <p:cNvSpPr>
+            <a:spLocks noGrp="1" noRot="1" noChangeAspect="1"/>
+          </p:cNvSpPr>
+          <p:nvPr>
+            <p:ph type="sldImg"/>
+          </p:nvPr>
+        </p:nvSpPr>
+        <p:spPr>
+          <a:xfrm>
+            <a:off x="857250" y="1143000"/>
+            <a:ext cx="5143500" cy="3086100"/>
+          </a:xfrm>
+        </p:spPr>
+      </p:sp>
+      <p:sp>
+        <p:nvSpPr>
+          <p:cNvPr id="3" name="Notes Placeholder 2"/>
+          <p:cNvSpPr>
+            <a:spLocks noGrp="1"/>
+          </p:cNvSpPr>
+          <p:nvPr>
+            <p:ph type="body" idx="1"/>
+          </p:nvPr>
+        </p:nvSpPr>
+        <p:spPr/>
+        <p:txBody>
+          <a:bodyPr/>
+          <a:lstStyle/>
+          <a:p>
+            <a:endParaRPr lang="en-US" dirty="0"/>
+          </a:p>
+        </p:txBody>
+      </p:sp>
+      <p:sp>
+        <p:nvSpPr>
+          <p:cNvPr id="4" name="Slide Number Placeholder 3"/>
+          <p:cNvSpPr>
+            <a:spLocks noGrp="1"/>
+          </p:cNvSpPr>
+          <p:nvPr>
+            <p:ph type="sldNum" sz="quarter" idx="5"/>
+          </p:nvPr>
+        </p:nvSpPr>
+        <p:spPr/>
+        <p:txBody>
+          <a:bodyPr/>
+          <a:lstStyle/>
+          <a:p>
+            <a:fld id="{C2800238-33D2-A44F-8135-A0F534DB873D}" type="slidenum">
+              <a:rPr lang="en-US" smtClean="0"/>
+              <a:t>3</a:t>
+            </a:fld>
+            <a:endParaRPr lang="en-US"/>
+          </a:p>
+        </p:txBody>
+      </p:sp>
+    </p:spTree>
+    <p:extLst>
+      <p:ext uri="{BB962C8B-B14F-4D97-AF65-F5344CB8AC3E}">
+        <p14:creationId xmlns:p14="http://schemas.microsoft.com/office/powerpoint/2010/main" val="309317405"/>
+      </p:ext>
+    </p:extLst>
+  </p:cSld>
+  <p:clrMapOvr>
+    <a:masterClrMapping/>
+  </p:clrMapOvr>
+</p:notes>
+</file>
+
+<file path=ppt/notesSlides/notesSlide4.xml><?xml version="1.0" encoding="utf-8"?>
+<p:notes xmlns:a="http://schemas.openxmlformats.org/drawingml/2006/main" xmlns:r="http://schemas.openxmlformats.org/officeDocument/2006/relationships" xmlns:p="http://schemas.openxmlformats.org/presentationml/2006/main">
+  <p:cSld>
+    <p:spTree>
+      <p:nvGrpSpPr>
+        <p:cNvPr id="1" name=""/>
+        <p:cNvGrpSpPr/>
+        <p:nvPr/>
+      </p:nvGrpSpPr>
+      <p:grpSpPr>
+        <a:xfrm>
+          <a:off x="0" y="0"/>
+          <a:ext cx="0" cy="0"/>
+          <a:chOff x="0" y="0"/>
+          <a:chExt cx="0" cy="0"/>
+        </a:xfrm>
+      </p:grpSpPr>
+      <p:sp>
+        <p:nvSpPr>
+          <p:cNvPr id="2" name="Slide Image Placeholder 1"/>
+          <p:cNvSpPr>
+            <a:spLocks noGrp="1" noRot="1" noChangeAspect="1"/>
+          </p:cNvSpPr>
+          <p:nvPr>
+            <p:ph type="sldImg"/>
+          </p:nvPr>
+        </p:nvSpPr>
+        <p:spPr>
+          <a:xfrm>
+            <a:off x="857250" y="1143000"/>
+            <a:ext cx="5143500" cy="3086100"/>
+          </a:xfrm>
+        </p:spPr>
+      </p:sp>
+      <p:sp>
+        <p:nvSpPr>
+          <p:cNvPr id="3" name="Notes Placeholder 2"/>
+          <p:cNvSpPr>
+            <a:spLocks noGrp="1"/>
+          </p:cNvSpPr>
+          <p:nvPr>
+            <p:ph type="body" idx="1"/>
+          </p:nvPr>
+        </p:nvSpPr>
+        <p:spPr/>
+        <p:txBody>
+          <a:bodyPr/>
+          <a:lstStyle/>
+          <a:p>
+            <a:endParaRPr lang="en-US" dirty="0"/>
+          </a:p>
+        </p:txBody>
+      </p:sp>
+      <p:sp>
+        <p:nvSpPr>
+          <p:cNvPr id="4" name="Slide Number Placeholder 3"/>
+          <p:cNvSpPr>
+            <a:spLocks noGrp="1"/>
+          </p:cNvSpPr>
+          <p:nvPr>
+            <p:ph type="sldNum" sz="quarter" idx="5"/>
+          </p:nvPr>
+        </p:nvSpPr>
+        <p:spPr/>
+        <p:txBody>
+          <a:bodyPr/>
+          <a:lstStyle/>
+          <a:p>
+            <a:fld id="{C2800238-33D2-A44F-8135-A0F534DB873D}" type="slidenum">
+              <a:rPr lang="en-US" smtClean="0"/>
+              <a:t>4</a:t>
+            </a:fld>
+            <a:endParaRPr lang="en-US"/>
+          </a:p>
+        </p:txBody>
+      </p:sp>
+    </p:spTree>
+    <p:extLst>
+      <p:ext uri="{BB962C8B-B14F-4D97-AF65-F5344CB8AC3E}">
         <p14:creationId xmlns:p14="http://schemas.microsoft.com/office/powerpoint/2010/main" val="3917144414"/>
       </p:ext>
     </p:extLst>
@@ -774,7 +954,7 @@
           <a:p>
             <a:fld id="{D3A28AA4-801E-B147-9E5C-6E6DBA6E23D1}" type="datetimeFigureOut">
               <a:rPr lang="en-US" smtClean="0"/>
-              <a:t>11/30/22</a:t>
+              <a:t>12/1/22</a:t>
             </a:fld>
             <a:endParaRPr lang="en-US"/>
           </a:p>
@@ -944,7 +1124,7 @@
           <a:p>
             <a:fld id="{D3A28AA4-801E-B147-9E5C-6E6DBA6E23D1}" type="datetimeFigureOut">
               <a:rPr lang="en-US" smtClean="0"/>
-              <a:t>11/30/22</a:t>
+              <a:t>12/1/22</a:t>
             </a:fld>
             <a:endParaRPr lang="en-US"/>
           </a:p>
@@ -1124,7 +1304,7 @@
           <a:p>
             <a:fld id="{D3A28AA4-801E-B147-9E5C-6E6DBA6E23D1}" type="datetimeFigureOut">
               <a:rPr lang="en-US" smtClean="0"/>
-              <a:t>11/30/22</a:t>
+              <a:t>12/1/22</a:t>
             </a:fld>
             <a:endParaRPr lang="en-US"/>
           </a:p>
@@ -1294,7 +1474,7 @@
           <a:p>
             <a:fld id="{D3A28AA4-801E-B147-9E5C-6E6DBA6E23D1}" type="datetimeFigureOut">
               <a:rPr lang="en-US" smtClean="0"/>
-              <a:t>11/30/22</a:t>
+              <a:t>12/1/22</a:t>
             </a:fld>
             <a:endParaRPr lang="en-US"/>
           </a:p>
@@ -1540,7 +1720,7 @@
           <a:p>
             <a:fld id="{D3A28AA4-801E-B147-9E5C-6E6DBA6E23D1}" type="datetimeFigureOut">
               <a:rPr lang="en-US" smtClean="0"/>
-              <a:t>11/30/22</a:t>
+              <a:t>12/1/22</a:t>
             </a:fld>
             <a:endParaRPr lang="en-US"/>
           </a:p>
@@ -1772,7 +1952,7 @@
           <a:p>
             <a:fld id="{D3A28AA4-801E-B147-9E5C-6E6DBA6E23D1}" type="datetimeFigureOut">
               <a:rPr lang="en-US" smtClean="0"/>
-              <a:t>11/30/22</a:t>
+              <a:t>12/1/22</a:t>
             </a:fld>
             <a:endParaRPr lang="en-US"/>
           </a:p>
@@ -2139,7 +2319,7 @@
           <a:p>
             <a:fld id="{D3A28AA4-801E-B147-9E5C-6E6DBA6E23D1}" type="datetimeFigureOut">
               <a:rPr lang="en-US" smtClean="0"/>
-              <a:t>11/30/22</a:t>
+              <a:t>12/1/22</a:t>
             </a:fld>
             <a:endParaRPr lang="en-US"/>
           </a:p>
@@ -2257,7 +2437,7 @@
           <a:p>
             <a:fld id="{D3A28AA4-801E-B147-9E5C-6E6DBA6E23D1}" type="datetimeFigureOut">
               <a:rPr lang="en-US" smtClean="0"/>
-              <a:t>11/30/22</a:t>
+              <a:t>12/1/22</a:t>
             </a:fld>
             <a:endParaRPr lang="en-US"/>
           </a:p>
@@ -2352,7 +2532,7 @@
           <a:p>
             <a:fld id="{D3A28AA4-801E-B147-9E5C-6E6DBA6E23D1}" type="datetimeFigureOut">
               <a:rPr lang="en-US" smtClean="0"/>
-              <a:t>11/30/22</a:t>
+              <a:t>12/1/22</a:t>
             </a:fld>
             <a:endParaRPr lang="en-US"/>
           </a:p>
@@ -2629,7 +2809,7 @@
           <a:p>
             <a:fld id="{D3A28AA4-801E-B147-9E5C-6E6DBA6E23D1}" type="datetimeFigureOut">
               <a:rPr lang="en-US" smtClean="0"/>
-              <a:t>11/30/22</a:t>
+              <a:t>12/1/22</a:t>
             </a:fld>
             <a:endParaRPr lang="en-US"/>
           </a:p>
@@ -2886,7 +3066,7 @@
           <a:p>
             <a:fld id="{D3A28AA4-801E-B147-9E5C-6E6DBA6E23D1}" type="datetimeFigureOut">
               <a:rPr lang="en-US" smtClean="0"/>
-              <a:t>11/30/22</a:t>
+              <a:t>12/1/22</a:t>
             </a:fld>
             <a:endParaRPr lang="en-US"/>
           </a:p>
@@ -3099,7 +3279,7 @@
           <a:p>
             <a:fld id="{D3A28AA4-801E-B147-9E5C-6E6DBA6E23D1}" type="datetimeFigureOut">
               <a:rPr lang="en-US" smtClean="0"/>
-              <a:t>11/30/22</a:t>
+              <a:t>12/1/22</a:t>
             </a:fld>
             <a:endParaRPr lang="en-US"/>
           </a:p>
@@ -3928,7 +4108,7 @@
                 <a:latin typeface="Times New Roman" panose="02020603050405020304" pitchFamily="18" charset="0"/>
                 <a:cs typeface="Times New Roman" panose="02020603050405020304" pitchFamily="18" charset="0"/>
               </a:rPr>
-              <a:t>0.026</a:t>
+              <a:t>0.049</a:t>
             </a:r>
           </a:p>
         </p:txBody>
@@ -4615,7 +4795,7 @@
                 <a:latin typeface="Times New Roman" panose="02020603050405020304" pitchFamily="18" charset="0"/>
                 <a:cs typeface="Times New Roman" panose="02020603050405020304" pitchFamily="18" charset="0"/>
               </a:rPr>
-              <a:t>0.016</a:t>
+              <a:t>-0.047</a:t>
             </a:r>
           </a:p>
         </p:txBody>
@@ -4888,7 +5068,7 @@
         <p:spPr>
           <a:xfrm>
             <a:off x="14129640" y="5623182"/>
-            <a:ext cx="979755" cy="461665"/>
+            <a:ext cx="979756" cy="461665"/>
           </a:xfrm>
           <a:prstGeom prst="rect">
             <a:avLst/>
@@ -4917,7 +5097,7 @@
                 <a:latin typeface="Times New Roman" panose="02020603050405020304" pitchFamily="18" charset="0"/>
                 <a:cs typeface="Times New Roman" panose="02020603050405020304" pitchFamily="18" charset="0"/>
               </a:rPr>
-              <a:t>-0.037</a:t>
+              <a:t>-0.058</a:t>
             </a:r>
           </a:p>
         </p:txBody>
@@ -5007,7 +5187,7 @@
                 <a:latin typeface="Times New Roman" panose="02020603050405020304" pitchFamily="18" charset="0"/>
                 <a:cs typeface="Times New Roman" panose="02020603050405020304" pitchFamily="18" charset="0"/>
               </a:rPr>
-              <a:t>-0.108</a:t>
+              <a:t>-0.178</a:t>
             </a:r>
           </a:p>
         </p:txBody>
@@ -5654,6 +5834,4037 @@
 </file>
 
 <file path=ppt/slides/slide2.xml><?xml version="1.0" encoding="utf-8"?>
+<p:sld xmlns:a="http://schemas.openxmlformats.org/drawingml/2006/main" xmlns:r="http://schemas.openxmlformats.org/officeDocument/2006/relationships" xmlns:p="http://schemas.openxmlformats.org/presentationml/2006/main">
+  <p:cSld>
+    <p:spTree>
+      <p:nvGrpSpPr>
+        <p:cNvPr id="1" name=""/>
+        <p:cNvGrpSpPr/>
+        <p:nvPr/>
+      </p:nvGrpSpPr>
+      <p:grpSpPr>
+        <a:xfrm>
+          <a:off x="0" y="0"/>
+          <a:ext cx="0" cy="0"/>
+          <a:chOff x="0" y="0"/>
+          <a:chExt cx="0" cy="0"/>
+        </a:xfrm>
+      </p:grpSpPr>
+      <p:sp>
+        <p:nvSpPr>
+          <p:cNvPr id="9" name="TextBox 8">
+            <a:extLst>
+              <a:ext uri="{FF2B5EF4-FFF2-40B4-BE49-F238E27FC236}">
+                <a16:creationId xmlns:a16="http://schemas.microsoft.com/office/drawing/2014/main" id="{AD61E7F5-9D4B-CBE8-3394-162FEB2D0120}"/>
+              </a:ext>
+            </a:extLst>
+          </p:cNvPr>
+          <p:cNvSpPr txBox="1"/>
+          <p:nvPr/>
+        </p:nvSpPr>
+        <p:spPr>
+          <a:xfrm>
+            <a:off x="329784" y="329784"/>
+            <a:ext cx="3676648" cy="646331"/>
+          </a:xfrm>
+          <a:prstGeom prst="rect">
+            <a:avLst/>
+          </a:prstGeom>
+          <a:noFill/>
+        </p:spPr>
+        <p:txBody>
+          <a:bodyPr wrap="none" rtlCol="0">
+            <a:spAutoFit/>
+          </a:bodyPr>
+          <a:lstStyle/>
+          <a:p>
+            <a:r>
+              <a:rPr lang="en-US" dirty="0"/>
+              <a:t>new structure with </a:t>
+            </a:r>
+            <a:r>
+              <a:rPr lang="en-US" dirty="0" err="1"/>
+              <a:t>pft</a:t>
+            </a:r>
+            <a:r>
+              <a:rPr lang="en-US" dirty="0"/>
+              <a:t> parsed out by </a:t>
+            </a:r>
+          </a:p>
+          <a:p>
+            <a:r>
+              <a:rPr lang="en-US" dirty="0"/>
+              <a:t>c3/c4 and n fixation</a:t>
+            </a:r>
+          </a:p>
+        </p:txBody>
+      </p:sp>
+      <p:cxnSp>
+        <p:nvCxnSpPr>
+          <p:cNvPr id="27" name="Straight Arrow Connector 26">
+            <a:extLst>
+              <a:ext uri="{FF2B5EF4-FFF2-40B4-BE49-F238E27FC236}">
+                <a16:creationId xmlns:a16="http://schemas.microsoft.com/office/drawing/2014/main" id="{05E0B5AA-B426-A909-BDA5-9069156E8664}"/>
+              </a:ext>
+            </a:extLst>
+          </p:cNvPr>
+          <p:cNvCxnSpPr>
+            <a:cxnSpLocks/>
+          </p:cNvCxnSpPr>
+          <p:nvPr/>
+        </p:nvCxnSpPr>
+        <p:spPr>
+          <a:xfrm>
+            <a:off x="5053454" y="5486398"/>
+            <a:ext cx="1347347" cy="4"/>
+          </a:xfrm>
+          <a:prstGeom prst="straightConnector1">
+            <a:avLst/>
+          </a:prstGeom>
+          <a:ln w="41021">
+            <a:solidFill>
+              <a:srgbClr val="C00000"/>
+            </a:solidFill>
+            <a:prstDash val="solid"/>
+            <a:tailEnd type="triangle"/>
+          </a:ln>
+        </p:spPr>
+        <p:style>
+          <a:lnRef idx="1">
+            <a:schemeClr val="accent1"/>
+          </a:lnRef>
+          <a:fillRef idx="0">
+            <a:schemeClr val="accent1"/>
+          </a:fillRef>
+          <a:effectRef idx="0">
+            <a:schemeClr val="accent1"/>
+          </a:effectRef>
+          <a:fontRef idx="minor">
+            <a:schemeClr val="tx1"/>
+          </a:fontRef>
+        </p:style>
+      </p:cxnSp>
+      <p:sp>
+        <p:nvSpPr>
+          <p:cNvPr id="33" name="TextBox 32">
+            <a:extLst>
+              <a:ext uri="{FF2B5EF4-FFF2-40B4-BE49-F238E27FC236}">
+                <a16:creationId xmlns:a16="http://schemas.microsoft.com/office/drawing/2014/main" id="{0C980C1F-2151-7A30-A5ED-9C759223F4F6}"/>
+              </a:ext>
+            </a:extLst>
+          </p:cNvPr>
+          <p:cNvSpPr txBox="1"/>
+          <p:nvPr/>
+        </p:nvSpPr>
+        <p:spPr>
+          <a:xfrm>
+            <a:off x="4932138" y="5236884"/>
+            <a:ext cx="979755" cy="461665"/>
+          </a:xfrm>
+          <a:prstGeom prst="rect">
+            <a:avLst/>
+          </a:prstGeom>
+          <a:solidFill>
+            <a:schemeClr val="bg1"/>
+          </a:solidFill>
+          <a:ln w="38100">
+            <a:solidFill>
+              <a:srgbClr val="C00000"/>
+            </a:solidFill>
+            <a:prstDash val="solid"/>
+          </a:ln>
+        </p:spPr>
+        <p:txBody>
+          <a:bodyPr wrap="none" rtlCol="0">
+            <a:spAutoFit/>
+          </a:bodyPr>
+          <a:lstStyle/>
+          <a:p>
+            <a:r>
+              <a:rPr lang="en-US" sz="2400" b="1" dirty="0">
+                <a:latin typeface="Times New Roman" panose="02020603050405020304" pitchFamily="18" charset="0"/>
+                <a:cs typeface="Times New Roman" panose="02020603050405020304" pitchFamily="18" charset="0"/>
+              </a:rPr>
+              <a:t>-0.077</a:t>
+            </a:r>
+          </a:p>
+        </p:txBody>
+      </p:sp>
+      <p:cxnSp>
+        <p:nvCxnSpPr>
+          <p:cNvPr id="34" name="Straight Arrow Connector 33">
+            <a:extLst>
+              <a:ext uri="{FF2B5EF4-FFF2-40B4-BE49-F238E27FC236}">
+                <a16:creationId xmlns:a16="http://schemas.microsoft.com/office/drawing/2014/main" id="{9E300821-93A1-20EC-8836-2C0408F2277D}"/>
+              </a:ext>
+            </a:extLst>
+          </p:cNvPr>
+          <p:cNvCxnSpPr>
+            <a:cxnSpLocks/>
+          </p:cNvCxnSpPr>
+          <p:nvPr/>
+        </p:nvCxnSpPr>
+        <p:spPr>
+          <a:xfrm>
+            <a:off x="3777343" y="3614058"/>
+            <a:ext cx="0" cy="3744684"/>
+          </a:xfrm>
+          <a:prstGeom prst="straightConnector1">
+            <a:avLst/>
+          </a:prstGeom>
+          <a:ln w="38100">
+            <a:solidFill>
+              <a:schemeClr val="accent1"/>
+            </a:solidFill>
+            <a:prstDash val="solid"/>
+            <a:tailEnd type="triangle"/>
+          </a:ln>
+        </p:spPr>
+        <p:style>
+          <a:lnRef idx="1">
+            <a:schemeClr val="accent1"/>
+          </a:lnRef>
+          <a:fillRef idx="0">
+            <a:schemeClr val="accent1"/>
+          </a:fillRef>
+          <a:effectRef idx="0">
+            <a:schemeClr val="accent1"/>
+          </a:effectRef>
+          <a:fontRef idx="minor">
+            <a:schemeClr val="tx1"/>
+          </a:fontRef>
+        </p:style>
+      </p:cxnSp>
+      <p:sp>
+        <p:nvSpPr>
+          <p:cNvPr id="35" name="TextBox 34">
+            <a:extLst>
+              <a:ext uri="{FF2B5EF4-FFF2-40B4-BE49-F238E27FC236}">
+                <a16:creationId xmlns:a16="http://schemas.microsoft.com/office/drawing/2014/main" id="{DBEDC2CC-31C8-86F9-A7D8-9AA1FF8C6344}"/>
+              </a:ext>
+            </a:extLst>
+          </p:cNvPr>
+          <p:cNvSpPr txBox="1"/>
+          <p:nvPr/>
+        </p:nvSpPr>
+        <p:spPr>
+          <a:xfrm>
+            <a:off x="3338762" y="5236884"/>
+            <a:ext cx="877163" cy="461665"/>
+          </a:xfrm>
+          <a:prstGeom prst="rect">
+            <a:avLst/>
+          </a:prstGeom>
+          <a:solidFill>
+            <a:schemeClr val="bg1"/>
+          </a:solidFill>
+          <a:ln w="38100">
+            <a:solidFill>
+              <a:schemeClr val="accent1"/>
+            </a:solidFill>
+            <a:prstDash val="solid"/>
+          </a:ln>
+        </p:spPr>
+        <p:txBody>
+          <a:bodyPr wrap="none" rtlCol="0">
+            <a:spAutoFit/>
+          </a:bodyPr>
+          <a:lstStyle/>
+          <a:p>
+            <a:r>
+              <a:rPr lang="en-US" sz="2400" b="1" dirty="0">
+                <a:latin typeface="Times New Roman" panose="02020603050405020304" pitchFamily="18" charset="0"/>
+                <a:cs typeface="Times New Roman" panose="02020603050405020304" pitchFamily="18" charset="0"/>
+              </a:rPr>
+              <a:t>0.409</a:t>
+            </a:r>
+          </a:p>
+        </p:txBody>
+      </p:sp>
+      <p:cxnSp>
+        <p:nvCxnSpPr>
+          <p:cNvPr id="36" name="Elbow Connector 35">
+            <a:extLst>
+              <a:ext uri="{FF2B5EF4-FFF2-40B4-BE49-F238E27FC236}">
+                <a16:creationId xmlns:a16="http://schemas.microsoft.com/office/drawing/2014/main" id="{858AC7B6-8584-D511-4746-711374F925C5}"/>
+              </a:ext>
+            </a:extLst>
+          </p:cNvPr>
+          <p:cNvCxnSpPr>
+            <a:cxnSpLocks/>
+          </p:cNvCxnSpPr>
+          <p:nvPr/>
+        </p:nvCxnSpPr>
+        <p:spPr>
+          <a:xfrm rot="5400000">
+            <a:off x="-775546" y="5763074"/>
+            <a:ext cx="6390097" cy="691291"/>
+          </a:xfrm>
+          <a:prstGeom prst="bentConnector3">
+            <a:avLst>
+              <a:gd name="adj1" fmla="val 49"/>
+            </a:avLst>
+          </a:prstGeom>
+          <a:ln w="38100">
+            <a:solidFill>
+              <a:schemeClr val="bg2">
+                <a:lumMod val="75000"/>
+              </a:schemeClr>
+            </a:solidFill>
+            <a:prstDash val="dash"/>
+          </a:ln>
+        </p:spPr>
+        <p:style>
+          <a:lnRef idx="1">
+            <a:schemeClr val="accent1"/>
+          </a:lnRef>
+          <a:fillRef idx="0">
+            <a:schemeClr val="accent1"/>
+          </a:fillRef>
+          <a:effectRef idx="0">
+            <a:schemeClr val="accent1"/>
+          </a:effectRef>
+          <a:fontRef idx="minor">
+            <a:schemeClr val="tx1"/>
+          </a:fontRef>
+        </p:style>
+      </p:cxnSp>
+      <p:cxnSp>
+        <p:nvCxnSpPr>
+          <p:cNvPr id="37" name="Elbow Connector 36">
+            <a:extLst>
+              <a:ext uri="{FF2B5EF4-FFF2-40B4-BE49-F238E27FC236}">
+                <a16:creationId xmlns:a16="http://schemas.microsoft.com/office/drawing/2014/main" id="{56C1BD30-41DE-924A-B150-3688E456355B}"/>
+              </a:ext>
+            </a:extLst>
+          </p:cNvPr>
+          <p:cNvCxnSpPr>
+            <a:cxnSpLocks/>
+            <a:stCxn id="39" idx="3"/>
+            <a:endCxn id="33" idx="0"/>
+          </p:cNvCxnSpPr>
+          <p:nvPr/>
+        </p:nvCxnSpPr>
+        <p:spPr>
+          <a:xfrm>
+            <a:off x="4767943" y="2922815"/>
+            <a:ext cx="654073" cy="2314069"/>
+          </a:xfrm>
+          <a:prstGeom prst="bentConnector2">
+            <a:avLst/>
+          </a:prstGeom>
+          <a:ln w="38100">
+            <a:solidFill>
+              <a:srgbClr val="C00000"/>
+            </a:solidFill>
+            <a:prstDash val="solid"/>
+          </a:ln>
+        </p:spPr>
+        <p:style>
+          <a:lnRef idx="1">
+            <a:schemeClr val="accent1"/>
+          </a:lnRef>
+          <a:fillRef idx="0">
+            <a:schemeClr val="accent1"/>
+          </a:fillRef>
+          <a:effectRef idx="0">
+            <a:schemeClr val="accent1"/>
+          </a:effectRef>
+          <a:fontRef idx="minor">
+            <a:schemeClr val="tx1"/>
+          </a:fontRef>
+        </p:style>
+      </p:cxnSp>
+      <p:cxnSp>
+        <p:nvCxnSpPr>
+          <p:cNvPr id="38" name="Elbow Connector 37">
+            <a:extLst>
+              <a:ext uri="{FF2B5EF4-FFF2-40B4-BE49-F238E27FC236}">
+                <a16:creationId xmlns:a16="http://schemas.microsoft.com/office/drawing/2014/main" id="{6A040BB4-503A-C7A6-4819-4E9E1C85AA6B}"/>
+              </a:ext>
+            </a:extLst>
+          </p:cNvPr>
+          <p:cNvCxnSpPr>
+            <a:cxnSpLocks/>
+          </p:cNvCxnSpPr>
+          <p:nvPr/>
+        </p:nvCxnSpPr>
+        <p:spPr>
+          <a:xfrm flipV="1">
+            <a:off x="4767943" y="6177645"/>
+            <a:ext cx="1900977" cy="1565915"/>
+          </a:xfrm>
+          <a:prstGeom prst="bentConnector3">
+            <a:avLst>
+              <a:gd name="adj1" fmla="val 99861"/>
+            </a:avLst>
+          </a:prstGeom>
+          <a:ln w="38100">
+            <a:solidFill>
+              <a:srgbClr val="C00000"/>
+            </a:solidFill>
+            <a:tailEnd type="triangle"/>
+          </a:ln>
+        </p:spPr>
+        <p:style>
+          <a:lnRef idx="1">
+            <a:schemeClr val="accent1"/>
+          </a:lnRef>
+          <a:fillRef idx="0">
+            <a:schemeClr val="accent1"/>
+          </a:fillRef>
+          <a:effectRef idx="0">
+            <a:schemeClr val="accent1"/>
+          </a:effectRef>
+          <a:fontRef idx="minor">
+            <a:schemeClr val="tx1"/>
+          </a:fontRef>
+        </p:style>
+      </p:cxnSp>
+      <p:cxnSp>
+        <p:nvCxnSpPr>
+          <p:cNvPr id="40" name="Elbow Connector 39">
+            <a:extLst>
+              <a:ext uri="{FF2B5EF4-FFF2-40B4-BE49-F238E27FC236}">
+                <a16:creationId xmlns:a16="http://schemas.microsoft.com/office/drawing/2014/main" id="{3B97EC1E-A658-7F0A-F057-769C12DF2A1F}"/>
+              </a:ext>
+            </a:extLst>
+          </p:cNvPr>
+          <p:cNvCxnSpPr>
+            <a:cxnSpLocks/>
+            <a:endCxn id="31" idx="2"/>
+          </p:cNvCxnSpPr>
+          <p:nvPr/>
+        </p:nvCxnSpPr>
+        <p:spPr>
+          <a:xfrm flipV="1">
+            <a:off x="2073857" y="8737813"/>
+            <a:ext cx="12557477" cy="570195"/>
+          </a:xfrm>
+          <a:prstGeom prst="bentConnector2">
+            <a:avLst/>
+          </a:prstGeom>
+          <a:ln w="38100">
+            <a:solidFill>
+              <a:schemeClr val="bg2">
+                <a:lumMod val="75000"/>
+              </a:schemeClr>
+            </a:solidFill>
+            <a:prstDash val="dash"/>
+            <a:tailEnd type="triangle"/>
+          </a:ln>
+        </p:spPr>
+        <p:style>
+          <a:lnRef idx="1">
+            <a:schemeClr val="accent1"/>
+          </a:lnRef>
+          <a:fillRef idx="0">
+            <a:schemeClr val="accent1"/>
+          </a:fillRef>
+          <a:effectRef idx="0">
+            <a:schemeClr val="accent1"/>
+          </a:effectRef>
+          <a:fontRef idx="minor">
+            <a:schemeClr val="tx1"/>
+          </a:fontRef>
+        </p:style>
+      </p:cxnSp>
+      <p:sp>
+        <p:nvSpPr>
+          <p:cNvPr id="41" name="TextBox 40">
+            <a:extLst>
+              <a:ext uri="{FF2B5EF4-FFF2-40B4-BE49-F238E27FC236}">
+                <a16:creationId xmlns:a16="http://schemas.microsoft.com/office/drawing/2014/main" id="{CA6C1F97-6788-8ECD-B2E5-2019E0339224}"/>
+              </a:ext>
+            </a:extLst>
+          </p:cNvPr>
+          <p:cNvSpPr txBox="1"/>
+          <p:nvPr/>
+        </p:nvSpPr>
+        <p:spPr>
+          <a:xfrm>
+            <a:off x="8874603" y="9072935"/>
+            <a:ext cx="986874" cy="461665"/>
+          </a:xfrm>
+          <a:prstGeom prst="rect">
+            <a:avLst/>
+          </a:prstGeom>
+          <a:solidFill>
+            <a:schemeClr val="bg1"/>
+          </a:solidFill>
+          <a:ln w="38100">
+            <a:solidFill>
+              <a:schemeClr val="bg2">
+                <a:lumMod val="75000"/>
+              </a:schemeClr>
+            </a:solidFill>
+            <a:prstDash val="dash"/>
+          </a:ln>
+        </p:spPr>
+        <p:txBody>
+          <a:bodyPr wrap="square" rtlCol="0">
+            <a:spAutoFit/>
+          </a:bodyPr>
+          <a:lstStyle/>
+          <a:p>
+            <a:pPr algn="ctr"/>
+            <a:r>
+              <a:rPr lang="en-US" sz="2400" dirty="0">
+                <a:latin typeface="Times New Roman" panose="02020603050405020304" pitchFamily="18" charset="0"/>
+                <a:cs typeface="Times New Roman" panose="02020603050405020304" pitchFamily="18" charset="0"/>
+              </a:rPr>
+              <a:t>-0.047</a:t>
+            </a:r>
+          </a:p>
+        </p:txBody>
+      </p:sp>
+      <p:cxnSp>
+        <p:nvCxnSpPr>
+          <p:cNvPr id="49" name="Elbow Connector 48">
+            <a:extLst>
+              <a:ext uri="{FF2B5EF4-FFF2-40B4-BE49-F238E27FC236}">
+                <a16:creationId xmlns:a16="http://schemas.microsoft.com/office/drawing/2014/main" id="{F94D5161-6720-2B41-BAF0-87962AE695E7}"/>
+              </a:ext>
+            </a:extLst>
+          </p:cNvPr>
+          <p:cNvCxnSpPr>
+            <a:cxnSpLocks/>
+          </p:cNvCxnSpPr>
+          <p:nvPr/>
+        </p:nvCxnSpPr>
+        <p:spPr>
+          <a:xfrm flipV="1">
+            <a:off x="7359319" y="1114279"/>
+            <a:ext cx="9779715" cy="1121810"/>
+          </a:xfrm>
+          <a:prstGeom prst="bentConnector3">
+            <a:avLst>
+              <a:gd name="adj1" fmla="val 134"/>
+            </a:avLst>
+          </a:prstGeom>
+          <a:ln w="38100">
+            <a:solidFill>
+              <a:schemeClr val="accent1"/>
+            </a:solidFill>
+          </a:ln>
+        </p:spPr>
+        <p:style>
+          <a:lnRef idx="1">
+            <a:schemeClr val="accent1"/>
+          </a:lnRef>
+          <a:fillRef idx="0">
+            <a:schemeClr val="accent1"/>
+          </a:fillRef>
+          <a:effectRef idx="0">
+            <a:schemeClr val="accent1"/>
+          </a:effectRef>
+          <a:fontRef idx="minor">
+            <a:schemeClr val="tx1"/>
+          </a:fontRef>
+        </p:style>
+      </p:cxnSp>
+      <p:cxnSp>
+        <p:nvCxnSpPr>
+          <p:cNvPr id="51" name="Elbow Connector 50">
+            <a:extLst>
+              <a:ext uri="{FF2B5EF4-FFF2-40B4-BE49-F238E27FC236}">
+                <a16:creationId xmlns:a16="http://schemas.microsoft.com/office/drawing/2014/main" id="{60382CB4-5571-73B5-7F06-229DD260EF01}"/>
+              </a:ext>
+            </a:extLst>
+          </p:cNvPr>
+          <p:cNvCxnSpPr>
+            <a:cxnSpLocks/>
+            <a:endCxn id="31" idx="3"/>
+          </p:cNvCxnSpPr>
+          <p:nvPr/>
+        </p:nvCxnSpPr>
+        <p:spPr>
+          <a:xfrm rot="5400000">
+            <a:off x="12914339" y="3821874"/>
+            <a:ext cx="6932291" cy="1517100"/>
+          </a:xfrm>
+          <a:prstGeom prst="bentConnector2">
+            <a:avLst/>
+          </a:prstGeom>
+          <a:ln w="38100">
+            <a:solidFill>
+              <a:schemeClr val="accent1"/>
+            </a:solidFill>
+            <a:tailEnd type="triangle"/>
+          </a:ln>
+        </p:spPr>
+        <p:style>
+          <a:lnRef idx="1">
+            <a:schemeClr val="accent1"/>
+          </a:lnRef>
+          <a:fillRef idx="0">
+            <a:schemeClr val="accent1"/>
+          </a:fillRef>
+          <a:effectRef idx="0">
+            <a:schemeClr val="accent1"/>
+          </a:effectRef>
+          <a:fontRef idx="minor">
+            <a:schemeClr val="tx1"/>
+          </a:fontRef>
+        </p:style>
+      </p:cxnSp>
+      <p:sp>
+        <p:nvSpPr>
+          <p:cNvPr id="52" name="TextBox 51">
+            <a:extLst>
+              <a:ext uri="{FF2B5EF4-FFF2-40B4-BE49-F238E27FC236}">
+                <a16:creationId xmlns:a16="http://schemas.microsoft.com/office/drawing/2014/main" id="{5FFFD8BE-0973-7554-4EC6-01C3519BD211}"/>
+              </a:ext>
+            </a:extLst>
+          </p:cNvPr>
+          <p:cNvSpPr txBox="1"/>
+          <p:nvPr/>
+        </p:nvSpPr>
+        <p:spPr>
+          <a:xfrm>
+            <a:off x="16694823" y="3569728"/>
+            <a:ext cx="877163" cy="461665"/>
+          </a:xfrm>
+          <a:prstGeom prst="rect">
+            <a:avLst/>
+          </a:prstGeom>
+          <a:solidFill>
+            <a:schemeClr val="bg1"/>
+          </a:solidFill>
+          <a:ln w="38100">
+            <a:solidFill>
+              <a:schemeClr val="accent1"/>
+            </a:solidFill>
+          </a:ln>
+        </p:spPr>
+        <p:txBody>
+          <a:bodyPr wrap="none" rtlCol="0">
+            <a:spAutoFit/>
+          </a:bodyPr>
+          <a:lstStyle/>
+          <a:p>
+            <a:r>
+              <a:rPr lang="en-US" sz="2400" b="1" dirty="0">
+                <a:latin typeface="Times New Roman" panose="02020603050405020304" pitchFamily="18" charset="0"/>
+                <a:cs typeface="Times New Roman" panose="02020603050405020304" pitchFamily="18" charset="0"/>
+              </a:rPr>
+              <a:t>0.400</a:t>
+            </a:r>
+          </a:p>
+        </p:txBody>
+      </p:sp>
+      <p:cxnSp>
+        <p:nvCxnSpPr>
+          <p:cNvPr id="70" name="Elbow Connector 69">
+            <a:extLst>
+              <a:ext uri="{FF2B5EF4-FFF2-40B4-BE49-F238E27FC236}">
+                <a16:creationId xmlns:a16="http://schemas.microsoft.com/office/drawing/2014/main" id="{0141E55B-F0B5-C76A-443D-E6B1EBBA03B4}"/>
+              </a:ext>
+            </a:extLst>
+          </p:cNvPr>
+          <p:cNvCxnSpPr>
+            <a:cxnSpLocks/>
+          </p:cNvCxnSpPr>
+          <p:nvPr/>
+        </p:nvCxnSpPr>
+        <p:spPr>
+          <a:xfrm rot="5400000" flipH="1" flipV="1">
+            <a:off x="13351753" y="-839863"/>
+            <a:ext cx="691242" cy="5438750"/>
+          </a:xfrm>
+          <a:prstGeom prst="bentConnector2">
+            <a:avLst/>
+          </a:prstGeom>
+          <a:ln w="38100">
+            <a:solidFill>
+              <a:schemeClr val="accent1"/>
+            </a:solidFill>
+          </a:ln>
+        </p:spPr>
+        <p:style>
+          <a:lnRef idx="1">
+            <a:schemeClr val="accent1"/>
+          </a:lnRef>
+          <a:fillRef idx="0">
+            <a:schemeClr val="accent1"/>
+          </a:fillRef>
+          <a:effectRef idx="0">
+            <a:schemeClr val="accent1"/>
+          </a:effectRef>
+          <a:fontRef idx="minor">
+            <a:schemeClr val="tx1"/>
+          </a:fontRef>
+        </p:style>
+      </p:cxnSp>
+      <p:cxnSp>
+        <p:nvCxnSpPr>
+          <p:cNvPr id="78" name="Elbow Connector 77">
+            <a:extLst>
+              <a:ext uri="{FF2B5EF4-FFF2-40B4-BE49-F238E27FC236}">
+                <a16:creationId xmlns:a16="http://schemas.microsoft.com/office/drawing/2014/main" id="{0CCD4069-EA92-FB6E-7F5D-315697DEDB13}"/>
+              </a:ext>
+            </a:extLst>
+          </p:cNvPr>
+          <p:cNvCxnSpPr>
+            <a:cxnSpLocks/>
+          </p:cNvCxnSpPr>
+          <p:nvPr/>
+        </p:nvCxnSpPr>
+        <p:spPr>
+          <a:xfrm rot="5400000">
+            <a:off x="13002332" y="4173270"/>
+            <a:ext cx="6053796" cy="775038"/>
+          </a:xfrm>
+          <a:prstGeom prst="bentConnector3">
+            <a:avLst>
+              <a:gd name="adj1" fmla="val 99929"/>
+            </a:avLst>
+          </a:prstGeom>
+          <a:ln w="38100">
+            <a:solidFill>
+              <a:schemeClr val="accent1"/>
+            </a:solidFill>
+            <a:tailEnd type="triangle"/>
+          </a:ln>
+        </p:spPr>
+        <p:style>
+          <a:lnRef idx="1">
+            <a:schemeClr val="accent1"/>
+          </a:lnRef>
+          <a:fillRef idx="0">
+            <a:schemeClr val="accent1"/>
+          </a:fillRef>
+          <a:effectRef idx="0">
+            <a:schemeClr val="accent1"/>
+          </a:effectRef>
+          <a:fontRef idx="minor">
+            <a:schemeClr val="tx1"/>
+          </a:fontRef>
+        </p:style>
+      </p:cxnSp>
+      <p:sp>
+        <p:nvSpPr>
+          <p:cNvPr id="94" name="TextBox 93">
+            <a:extLst>
+              <a:ext uri="{FF2B5EF4-FFF2-40B4-BE49-F238E27FC236}">
+                <a16:creationId xmlns:a16="http://schemas.microsoft.com/office/drawing/2014/main" id="{0C646415-FDF9-9D16-30D9-83B3C7A05D12}"/>
+              </a:ext>
+            </a:extLst>
+          </p:cNvPr>
+          <p:cNvSpPr txBox="1"/>
+          <p:nvPr/>
+        </p:nvSpPr>
+        <p:spPr>
+          <a:xfrm>
+            <a:off x="15997945" y="6729769"/>
+            <a:ext cx="877163" cy="461665"/>
+          </a:xfrm>
+          <a:prstGeom prst="rect">
+            <a:avLst/>
+          </a:prstGeom>
+          <a:solidFill>
+            <a:schemeClr val="bg1"/>
+          </a:solidFill>
+          <a:ln w="38100">
+            <a:solidFill>
+              <a:schemeClr val="accent1"/>
+            </a:solidFill>
+          </a:ln>
+        </p:spPr>
+        <p:txBody>
+          <a:bodyPr wrap="none" rtlCol="0">
+            <a:spAutoFit/>
+          </a:bodyPr>
+          <a:lstStyle/>
+          <a:p>
+            <a:r>
+              <a:rPr lang="en-US" sz="2400" b="1" dirty="0">
+                <a:latin typeface="Times New Roman" panose="02020603050405020304" pitchFamily="18" charset="0"/>
+                <a:cs typeface="Times New Roman" panose="02020603050405020304" pitchFamily="18" charset="0"/>
+              </a:rPr>
+              <a:t>0.419</a:t>
+            </a:r>
+          </a:p>
+        </p:txBody>
+      </p:sp>
+      <p:cxnSp>
+        <p:nvCxnSpPr>
+          <p:cNvPr id="99" name="Elbow Connector 98">
+            <a:extLst>
+              <a:ext uri="{FF2B5EF4-FFF2-40B4-BE49-F238E27FC236}">
+                <a16:creationId xmlns:a16="http://schemas.microsoft.com/office/drawing/2014/main" id="{65331E5B-8B10-E2E0-078C-02DFC8B1F7B4}"/>
+              </a:ext>
+            </a:extLst>
+          </p:cNvPr>
+          <p:cNvCxnSpPr>
+            <a:cxnSpLocks/>
+            <a:endCxn id="31" idx="1"/>
+          </p:cNvCxnSpPr>
+          <p:nvPr/>
+        </p:nvCxnSpPr>
+        <p:spPr>
+          <a:xfrm>
+            <a:off x="7403218" y="5482158"/>
+            <a:ext cx="6237516" cy="2564412"/>
+          </a:xfrm>
+          <a:prstGeom prst="bentConnector3">
+            <a:avLst>
+              <a:gd name="adj1" fmla="val 320"/>
+            </a:avLst>
+          </a:prstGeom>
+          <a:ln w="38100">
+            <a:solidFill>
+              <a:srgbClr val="C00000"/>
+            </a:solidFill>
+            <a:tailEnd type="triangle"/>
+          </a:ln>
+        </p:spPr>
+        <p:style>
+          <a:lnRef idx="1">
+            <a:schemeClr val="accent1"/>
+          </a:lnRef>
+          <a:fillRef idx="0">
+            <a:schemeClr val="accent1"/>
+          </a:fillRef>
+          <a:effectRef idx="0">
+            <a:schemeClr val="accent1"/>
+          </a:effectRef>
+          <a:fontRef idx="minor">
+            <a:schemeClr val="tx1"/>
+          </a:fontRef>
+        </p:style>
+      </p:cxnSp>
+      <p:sp>
+        <p:nvSpPr>
+          <p:cNvPr id="100" name="TextBox 99">
+            <a:extLst>
+              <a:ext uri="{FF2B5EF4-FFF2-40B4-BE49-F238E27FC236}">
+                <a16:creationId xmlns:a16="http://schemas.microsoft.com/office/drawing/2014/main" id="{D14BF808-B0AB-2936-D1B5-E97E66CBECFB}"/>
+              </a:ext>
+            </a:extLst>
+          </p:cNvPr>
+          <p:cNvSpPr txBox="1"/>
+          <p:nvPr/>
+        </p:nvSpPr>
+        <p:spPr>
+          <a:xfrm>
+            <a:off x="6958148" y="6650442"/>
+            <a:ext cx="979755" cy="461665"/>
+          </a:xfrm>
+          <a:prstGeom prst="rect">
+            <a:avLst/>
+          </a:prstGeom>
+          <a:solidFill>
+            <a:schemeClr val="bg1"/>
+          </a:solidFill>
+          <a:ln w="41656">
+            <a:solidFill>
+              <a:srgbClr val="C00000"/>
+            </a:solidFill>
+          </a:ln>
+        </p:spPr>
+        <p:txBody>
+          <a:bodyPr wrap="none" rtlCol="0">
+            <a:spAutoFit/>
+          </a:bodyPr>
+          <a:lstStyle/>
+          <a:p>
+            <a:r>
+              <a:rPr lang="en-US" sz="2400" b="1" dirty="0">
+                <a:latin typeface="Times New Roman" panose="02020603050405020304" pitchFamily="18" charset="0"/>
+                <a:cs typeface="Times New Roman" panose="02020603050405020304" pitchFamily="18" charset="0"/>
+              </a:rPr>
+              <a:t>-0.178</a:t>
+            </a:r>
+          </a:p>
+        </p:txBody>
+      </p:sp>
+      <p:cxnSp>
+        <p:nvCxnSpPr>
+          <p:cNvPr id="106" name="Elbow Connector 105">
+            <a:extLst>
+              <a:ext uri="{FF2B5EF4-FFF2-40B4-BE49-F238E27FC236}">
+                <a16:creationId xmlns:a16="http://schemas.microsoft.com/office/drawing/2014/main" id="{601B0E9D-1DDC-4179-E5B2-9AF4D51F692D}"/>
+              </a:ext>
+            </a:extLst>
+          </p:cNvPr>
+          <p:cNvCxnSpPr>
+            <a:cxnSpLocks/>
+          </p:cNvCxnSpPr>
+          <p:nvPr/>
+        </p:nvCxnSpPr>
+        <p:spPr>
+          <a:xfrm rot="16200000" flipH="1">
+            <a:off x="8421909" y="3308489"/>
+            <a:ext cx="4007" cy="10370457"/>
+          </a:xfrm>
+          <a:prstGeom prst="bentConnector2">
+            <a:avLst/>
+          </a:prstGeom>
+          <a:ln w="38100">
+            <a:solidFill>
+              <a:schemeClr val="bg2">
+                <a:lumMod val="75000"/>
+              </a:schemeClr>
+            </a:solidFill>
+            <a:prstDash val="dash"/>
+            <a:tailEnd type="triangle"/>
+          </a:ln>
+        </p:spPr>
+        <p:style>
+          <a:lnRef idx="1">
+            <a:schemeClr val="accent1"/>
+          </a:lnRef>
+          <a:fillRef idx="0">
+            <a:schemeClr val="accent1"/>
+          </a:fillRef>
+          <a:effectRef idx="0">
+            <a:schemeClr val="accent1"/>
+          </a:effectRef>
+          <a:fontRef idx="minor">
+            <a:schemeClr val="tx1"/>
+          </a:fontRef>
+        </p:style>
+      </p:cxnSp>
+      <p:sp>
+        <p:nvSpPr>
+          <p:cNvPr id="97" name="TextBox 96">
+            <a:extLst>
+              <a:ext uri="{FF2B5EF4-FFF2-40B4-BE49-F238E27FC236}">
+                <a16:creationId xmlns:a16="http://schemas.microsoft.com/office/drawing/2014/main" id="{2BF7936F-913B-1D6C-0710-9A047E3CAD73}"/>
+              </a:ext>
+            </a:extLst>
+          </p:cNvPr>
+          <p:cNvSpPr txBox="1"/>
+          <p:nvPr/>
+        </p:nvSpPr>
+        <p:spPr>
+          <a:xfrm>
+            <a:off x="8874603" y="8233732"/>
+            <a:ext cx="979755" cy="461665"/>
+          </a:xfrm>
+          <a:prstGeom prst="rect">
+            <a:avLst/>
+          </a:prstGeom>
+          <a:solidFill>
+            <a:schemeClr val="bg1"/>
+          </a:solidFill>
+          <a:ln w="38100">
+            <a:solidFill>
+              <a:schemeClr val="bg2">
+                <a:lumMod val="75000"/>
+              </a:schemeClr>
+            </a:solidFill>
+            <a:prstDash val="dash"/>
+          </a:ln>
+        </p:spPr>
+        <p:txBody>
+          <a:bodyPr wrap="square" rtlCol="0">
+            <a:spAutoFit/>
+          </a:bodyPr>
+          <a:lstStyle/>
+          <a:p>
+            <a:pPr algn="ctr"/>
+            <a:r>
+              <a:rPr lang="en-US" sz="2400" dirty="0">
+                <a:latin typeface="Times New Roman" panose="02020603050405020304" pitchFamily="18" charset="0"/>
+                <a:cs typeface="Times New Roman" panose="02020603050405020304" pitchFamily="18" charset="0"/>
+              </a:rPr>
+              <a:t>0.049</a:t>
+            </a:r>
+          </a:p>
+        </p:txBody>
+      </p:sp>
+      <p:cxnSp>
+        <p:nvCxnSpPr>
+          <p:cNvPr id="115" name="Elbow Connector 114">
+            <a:extLst>
+              <a:ext uri="{FF2B5EF4-FFF2-40B4-BE49-F238E27FC236}">
+                <a16:creationId xmlns:a16="http://schemas.microsoft.com/office/drawing/2014/main" id="{4C16B26D-1880-46D0-26F6-8993300638D6}"/>
+              </a:ext>
+            </a:extLst>
+          </p:cNvPr>
+          <p:cNvCxnSpPr>
+            <a:cxnSpLocks/>
+            <a:stCxn id="26" idx="2"/>
+            <a:endCxn id="31" idx="0"/>
+          </p:cNvCxnSpPr>
+          <p:nvPr/>
+        </p:nvCxnSpPr>
+        <p:spPr>
+          <a:xfrm rot="16200000" flipH="1">
+            <a:off x="12229555" y="4953548"/>
+            <a:ext cx="1177682" cy="3625875"/>
+          </a:xfrm>
+          <a:prstGeom prst="bentConnector3">
+            <a:avLst>
+              <a:gd name="adj1" fmla="val 50000"/>
+            </a:avLst>
+          </a:prstGeom>
+          <a:ln w="38100">
+            <a:solidFill>
+              <a:schemeClr val="bg2">
+                <a:lumMod val="75000"/>
+              </a:schemeClr>
+            </a:solidFill>
+            <a:prstDash val="dash"/>
+            <a:tailEnd type="triangle"/>
+          </a:ln>
+        </p:spPr>
+        <p:style>
+          <a:lnRef idx="1">
+            <a:schemeClr val="accent1"/>
+          </a:lnRef>
+          <a:fillRef idx="0">
+            <a:schemeClr val="accent1"/>
+          </a:fillRef>
+          <a:effectRef idx="0">
+            <a:schemeClr val="accent1"/>
+          </a:effectRef>
+          <a:fontRef idx="minor">
+            <a:schemeClr val="tx1"/>
+          </a:fontRef>
+        </p:style>
+      </p:cxnSp>
+      <p:sp>
+        <p:nvSpPr>
+          <p:cNvPr id="116" name="TextBox 115">
+            <a:extLst>
+              <a:ext uri="{FF2B5EF4-FFF2-40B4-BE49-F238E27FC236}">
+                <a16:creationId xmlns:a16="http://schemas.microsoft.com/office/drawing/2014/main" id="{96D206C9-BE77-83F8-F69A-4F4CEDB7C8F0}"/>
+              </a:ext>
+            </a:extLst>
+          </p:cNvPr>
+          <p:cNvSpPr txBox="1"/>
+          <p:nvPr/>
+        </p:nvSpPr>
+        <p:spPr>
+          <a:xfrm>
+            <a:off x="12249176" y="6526363"/>
+            <a:ext cx="979756" cy="461665"/>
+          </a:xfrm>
+          <a:prstGeom prst="rect">
+            <a:avLst/>
+          </a:prstGeom>
+          <a:solidFill>
+            <a:schemeClr val="bg1"/>
+          </a:solidFill>
+          <a:ln w="38100">
+            <a:solidFill>
+              <a:schemeClr val="bg2">
+                <a:lumMod val="75000"/>
+              </a:schemeClr>
+            </a:solidFill>
+            <a:prstDash val="dash"/>
+          </a:ln>
+        </p:spPr>
+        <p:txBody>
+          <a:bodyPr wrap="square" rtlCol="0">
+            <a:spAutoFit/>
+          </a:bodyPr>
+          <a:lstStyle/>
+          <a:p>
+            <a:pPr algn="ctr"/>
+            <a:r>
+              <a:rPr lang="en-US" sz="2400" dirty="0">
+                <a:latin typeface="Times New Roman" panose="02020603050405020304" pitchFamily="18" charset="0"/>
+                <a:cs typeface="Times New Roman" panose="02020603050405020304" pitchFamily="18" charset="0"/>
+              </a:rPr>
+              <a:t>-0.058</a:t>
+            </a:r>
+          </a:p>
+        </p:txBody>
+      </p:sp>
+      <p:cxnSp>
+        <p:nvCxnSpPr>
+          <p:cNvPr id="124" name="Straight Arrow Connector 123">
+            <a:extLst>
+              <a:ext uri="{FF2B5EF4-FFF2-40B4-BE49-F238E27FC236}">
+                <a16:creationId xmlns:a16="http://schemas.microsoft.com/office/drawing/2014/main" id="{B203D618-5076-9892-5C0D-A178A8150F2D}"/>
+              </a:ext>
+            </a:extLst>
+          </p:cNvPr>
+          <p:cNvCxnSpPr>
+            <a:cxnSpLocks/>
+          </p:cNvCxnSpPr>
+          <p:nvPr/>
+        </p:nvCxnSpPr>
+        <p:spPr>
+          <a:xfrm>
+            <a:off x="11004974" y="2913671"/>
+            <a:ext cx="0" cy="1874002"/>
+          </a:xfrm>
+          <a:prstGeom prst="straightConnector1">
+            <a:avLst/>
+          </a:prstGeom>
+          <a:ln w="38100">
+            <a:solidFill>
+              <a:schemeClr val="accent1"/>
+            </a:solidFill>
+            <a:prstDash val="solid"/>
+            <a:tailEnd type="triangle"/>
+          </a:ln>
+        </p:spPr>
+        <p:style>
+          <a:lnRef idx="1">
+            <a:schemeClr val="accent1"/>
+          </a:lnRef>
+          <a:fillRef idx="0">
+            <a:schemeClr val="accent1"/>
+          </a:fillRef>
+          <a:effectRef idx="0">
+            <a:schemeClr val="accent1"/>
+          </a:effectRef>
+          <a:fontRef idx="minor">
+            <a:schemeClr val="tx1"/>
+          </a:fontRef>
+        </p:style>
+      </p:cxnSp>
+      <p:sp>
+        <p:nvSpPr>
+          <p:cNvPr id="125" name="TextBox 124">
+            <a:extLst>
+              <a:ext uri="{FF2B5EF4-FFF2-40B4-BE49-F238E27FC236}">
+                <a16:creationId xmlns:a16="http://schemas.microsoft.com/office/drawing/2014/main" id="{66CC9E99-4165-01CD-F030-91153B3233BC}"/>
+              </a:ext>
+            </a:extLst>
+          </p:cNvPr>
+          <p:cNvSpPr txBox="1"/>
+          <p:nvPr/>
+        </p:nvSpPr>
+        <p:spPr>
+          <a:xfrm>
+            <a:off x="10589181" y="3936013"/>
+            <a:ext cx="877163" cy="461665"/>
+          </a:xfrm>
+          <a:prstGeom prst="rect">
+            <a:avLst/>
+          </a:prstGeom>
+          <a:solidFill>
+            <a:schemeClr val="bg1"/>
+          </a:solidFill>
+          <a:ln w="38100">
+            <a:solidFill>
+              <a:schemeClr val="accent1"/>
+            </a:solidFill>
+            <a:prstDash val="solid"/>
+          </a:ln>
+        </p:spPr>
+        <p:txBody>
+          <a:bodyPr wrap="none" rtlCol="0">
+            <a:spAutoFit/>
+          </a:bodyPr>
+          <a:lstStyle/>
+          <a:p>
+            <a:r>
+              <a:rPr lang="en-US" sz="2400" b="1" dirty="0">
+                <a:latin typeface="Times New Roman" panose="02020603050405020304" pitchFamily="18" charset="0"/>
+                <a:cs typeface="Times New Roman" panose="02020603050405020304" pitchFamily="18" charset="0"/>
+              </a:rPr>
+              <a:t>0.892</a:t>
+            </a:r>
+          </a:p>
+        </p:txBody>
+      </p:sp>
+      <p:cxnSp>
+        <p:nvCxnSpPr>
+          <p:cNvPr id="134" name="Straight Arrow Connector 133">
+            <a:extLst>
+              <a:ext uri="{FF2B5EF4-FFF2-40B4-BE49-F238E27FC236}">
+                <a16:creationId xmlns:a16="http://schemas.microsoft.com/office/drawing/2014/main" id="{D19E97EF-9DD5-2F0B-130D-6D2388183F3F}"/>
+              </a:ext>
+            </a:extLst>
+          </p:cNvPr>
+          <p:cNvCxnSpPr/>
+          <p:nvPr/>
+        </p:nvCxnSpPr>
+        <p:spPr>
+          <a:xfrm flipH="1">
+            <a:off x="11996059" y="5486398"/>
+            <a:ext cx="1632858" cy="0"/>
+          </a:xfrm>
+          <a:prstGeom prst="straightConnector1">
+            <a:avLst/>
+          </a:prstGeom>
+          <a:ln w="38100">
+            <a:solidFill>
+              <a:schemeClr val="bg2">
+                <a:lumMod val="75000"/>
+              </a:schemeClr>
+            </a:solidFill>
+            <a:prstDash val="dash"/>
+            <a:tailEnd type="triangle"/>
+          </a:ln>
+        </p:spPr>
+        <p:style>
+          <a:lnRef idx="1">
+            <a:schemeClr val="accent1"/>
+          </a:lnRef>
+          <a:fillRef idx="0">
+            <a:schemeClr val="accent1"/>
+          </a:fillRef>
+          <a:effectRef idx="0">
+            <a:schemeClr val="accent1"/>
+          </a:effectRef>
+          <a:fontRef idx="minor">
+            <a:schemeClr val="tx1"/>
+          </a:fontRef>
+        </p:style>
+      </p:cxnSp>
+      <p:cxnSp>
+        <p:nvCxnSpPr>
+          <p:cNvPr id="147" name="Straight Arrow Connector 146">
+            <a:extLst>
+              <a:ext uri="{FF2B5EF4-FFF2-40B4-BE49-F238E27FC236}">
+                <a16:creationId xmlns:a16="http://schemas.microsoft.com/office/drawing/2014/main" id="{984AC8F7-3822-46E8-1139-BD5738E776DD}"/>
+              </a:ext>
+            </a:extLst>
+          </p:cNvPr>
+          <p:cNvCxnSpPr>
+            <a:stCxn id="26" idx="1"/>
+            <a:endCxn id="25" idx="3"/>
+          </p:cNvCxnSpPr>
+          <p:nvPr/>
+        </p:nvCxnSpPr>
+        <p:spPr>
+          <a:xfrm flipH="1">
+            <a:off x="8382001" y="5486402"/>
+            <a:ext cx="1632858" cy="0"/>
+          </a:xfrm>
+          <a:prstGeom prst="straightConnector1">
+            <a:avLst/>
+          </a:prstGeom>
+          <a:ln w="38100">
+            <a:tailEnd type="triangle"/>
+          </a:ln>
+        </p:spPr>
+        <p:style>
+          <a:lnRef idx="1">
+            <a:schemeClr val="accent1"/>
+          </a:lnRef>
+          <a:fillRef idx="0">
+            <a:schemeClr val="accent1"/>
+          </a:fillRef>
+          <a:effectRef idx="0">
+            <a:schemeClr val="accent1"/>
+          </a:effectRef>
+          <a:fontRef idx="minor">
+            <a:schemeClr val="tx1"/>
+          </a:fontRef>
+        </p:style>
+      </p:cxnSp>
+      <p:sp>
+        <p:nvSpPr>
+          <p:cNvPr id="25" name="Rectangle 24">
+            <a:extLst>
+              <a:ext uri="{FF2B5EF4-FFF2-40B4-BE49-F238E27FC236}">
+                <a16:creationId xmlns:a16="http://schemas.microsoft.com/office/drawing/2014/main" id="{82AC0384-6387-7D57-8EB4-896E679A9F4F}"/>
+              </a:ext>
+            </a:extLst>
+          </p:cNvPr>
+          <p:cNvSpPr/>
+          <p:nvPr/>
+        </p:nvSpPr>
+        <p:spPr>
+          <a:xfrm>
+            <a:off x="6400801" y="4795159"/>
+            <a:ext cx="1981200" cy="1382486"/>
+          </a:xfrm>
+          <a:prstGeom prst="rect">
+            <a:avLst/>
+          </a:prstGeom>
+          <a:solidFill>
+            <a:schemeClr val="bg1"/>
+          </a:solidFill>
+          <a:ln w="38100">
+            <a:solidFill>
+              <a:schemeClr val="tx1"/>
+            </a:solidFill>
+          </a:ln>
+        </p:spPr>
+        <p:style>
+          <a:lnRef idx="2">
+            <a:schemeClr val="accent1">
+              <a:shade val="50000"/>
+            </a:schemeClr>
+          </a:lnRef>
+          <a:fillRef idx="1">
+            <a:schemeClr val="accent1"/>
+          </a:fillRef>
+          <a:effectRef idx="0">
+            <a:schemeClr val="accent1"/>
+          </a:effectRef>
+          <a:fontRef idx="minor">
+            <a:schemeClr val="lt1"/>
+          </a:fontRef>
+        </p:style>
+        <p:txBody>
+          <a:bodyPr rtlCol="0" anchor="ctr"/>
+          <a:lstStyle/>
+          <a:p>
+            <a:pPr algn="ctr"/>
+            <a:r>
+              <a:rPr lang="el-GR" sz="3000" i="1" dirty="0">
+                <a:solidFill>
+                  <a:schemeClr val="tx1"/>
+                </a:solidFill>
+                <a:latin typeface="Times New Roman" panose="02020603050405020304" pitchFamily="18" charset="0"/>
+                <a:cs typeface="Times New Roman" panose="02020603050405020304" pitchFamily="18" charset="0"/>
+              </a:rPr>
+              <a:t>β</a:t>
+            </a:r>
+            <a:endParaRPr lang="en-US" sz="3000" i="1" dirty="0">
+              <a:solidFill>
+                <a:schemeClr val="tx1"/>
+              </a:solidFill>
+              <a:latin typeface="Times New Roman" panose="02020603050405020304" pitchFamily="18" charset="0"/>
+              <a:cs typeface="Times New Roman" panose="02020603050405020304" pitchFamily="18" charset="0"/>
+            </a:endParaRPr>
+          </a:p>
+        </p:txBody>
+      </p:sp>
+      <p:cxnSp>
+        <p:nvCxnSpPr>
+          <p:cNvPr id="171" name="Straight Arrow Connector 170">
+            <a:extLst>
+              <a:ext uri="{FF2B5EF4-FFF2-40B4-BE49-F238E27FC236}">
+                <a16:creationId xmlns:a16="http://schemas.microsoft.com/office/drawing/2014/main" id="{2238A3F4-8CA1-F6F2-6595-B45F5C5551D2}"/>
+              </a:ext>
+            </a:extLst>
+          </p:cNvPr>
+          <p:cNvCxnSpPr>
+            <a:cxnSpLocks/>
+          </p:cNvCxnSpPr>
+          <p:nvPr/>
+        </p:nvCxnSpPr>
+        <p:spPr>
+          <a:xfrm>
+            <a:off x="7359319" y="2913671"/>
+            <a:ext cx="0" cy="1874002"/>
+          </a:xfrm>
+          <a:prstGeom prst="straightConnector1">
+            <a:avLst/>
+          </a:prstGeom>
+          <a:ln w="38100">
+            <a:solidFill>
+              <a:schemeClr val="bg2">
+                <a:lumMod val="75000"/>
+              </a:schemeClr>
+            </a:solidFill>
+            <a:prstDash val="dash"/>
+            <a:tailEnd type="triangle"/>
+          </a:ln>
+        </p:spPr>
+        <p:style>
+          <a:lnRef idx="1">
+            <a:schemeClr val="accent1"/>
+          </a:lnRef>
+          <a:fillRef idx="0">
+            <a:schemeClr val="accent1"/>
+          </a:fillRef>
+          <a:effectRef idx="0">
+            <a:schemeClr val="accent1"/>
+          </a:effectRef>
+          <a:fontRef idx="minor">
+            <a:schemeClr val="tx1"/>
+          </a:fontRef>
+        </p:style>
+      </p:cxnSp>
+      <p:sp>
+        <p:nvSpPr>
+          <p:cNvPr id="23" name="Rectangle 22">
+            <a:extLst>
+              <a:ext uri="{FF2B5EF4-FFF2-40B4-BE49-F238E27FC236}">
+                <a16:creationId xmlns:a16="http://schemas.microsoft.com/office/drawing/2014/main" id="{542EBF9B-B494-6BAC-662C-17157CAC7101}"/>
+              </a:ext>
+            </a:extLst>
+          </p:cNvPr>
+          <p:cNvSpPr/>
+          <p:nvPr/>
+        </p:nvSpPr>
+        <p:spPr>
+          <a:xfrm>
+            <a:off x="13628917" y="4794743"/>
+            <a:ext cx="1981200" cy="1382486"/>
+          </a:xfrm>
+          <a:prstGeom prst="rect">
+            <a:avLst/>
+          </a:prstGeom>
+          <a:noFill/>
+          <a:ln w="38100">
+            <a:solidFill>
+              <a:schemeClr val="tx1"/>
+            </a:solidFill>
+          </a:ln>
+        </p:spPr>
+        <p:style>
+          <a:lnRef idx="2">
+            <a:schemeClr val="accent1">
+              <a:shade val="50000"/>
+            </a:schemeClr>
+          </a:lnRef>
+          <a:fillRef idx="1">
+            <a:schemeClr val="accent1"/>
+          </a:fillRef>
+          <a:effectRef idx="0">
+            <a:schemeClr val="accent1"/>
+          </a:effectRef>
+          <a:fontRef idx="minor">
+            <a:schemeClr val="lt1"/>
+          </a:fontRef>
+        </p:style>
+        <p:txBody>
+          <a:bodyPr rtlCol="0" anchor="ctr"/>
+          <a:lstStyle/>
+          <a:p>
+            <a:pPr algn="ctr"/>
+            <a:r>
+              <a:rPr lang="en-US" sz="3000" i="1" dirty="0">
+                <a:solidFill>
+                  <a:schemeClr val="tx1"/>
+                </a:solidFill>
+                <a:latin typeface="Times New Roman" panose="02020603050405020304" pitchFamily="18" charset="0"/>
+                <a:cs typeface="Times New Roman" panose="02020603050405020304" pitchFamily="18" charset="0"/>
+              </a:rPr>
+              <a:t>Air </a:t>
+            </a:r>
+            <a:r>
+              <a:rPr lang="en-US" sz="2900" i="1" dirty="0">
+                <a:solidFill>
+                  <a:schemeClr val="tx1"/>
+                </a:solidFill>
+                <a:latin typeface="Times New Roman" panose="02020603050405020304" pitchFamily="18" charset="0"/>
+                <a:cs typeface="Times New Roman" panose="02020603050405020304" pitchFamily="18" charset="0"/>
+              </a:rPr>
+              <a:t>temperature</a:t>
+            </a:r>
+          </a:p>
+        </p:txBody>
+      </p:sp>
+      <p:sp>
+        <p:nvSpPr>
+          <p:cNvPr id="31" name="Rectangle 30">
+            <a:extLst>
+              <a:ext uri="{FF2B5EF4-FFF2-40B4-BE49-F238E27FC236}">
+                <a16:creationId xmlns:a16="http://schemas.microsoft.com/office/drawing/2014/main" id="{8B74F445-A52C-CC92-5C9F-26A6C584DFB7}"/>
+              </a:ext>
+            </a:extLst>
+          </p:cNvPr>
+          <p:cNvSpPr/>
+          <p:nvPr/>
+        </p:nvSpPr>
+        <p:spPr>
+          <a:xfrm>
+            <a:off x="13640734" y="7355327"/>
+            <a:ext cx="1981200" cy="1382486"/>
+          </a:xfrm>
+          <a:prstGeom prst="rect">
+            <a:avLst/>
+          </a:prstGeom>
+          <a:solidFill>
+            <a:schemeClr val="bg1"/>
+          </a:solidFill>
+          <a:ln w="38100">
+            <a:solidFill>
+              <a:schemeClr val="tx1"/>
+            </a:solidFill>
+          </a:ln>
+        </p:spPr>
+        <p:style>
+          <a:lnRef idx="2">
+            <a:schemeClr val="accent1">
+              <a:shade val="50000"/>
+            </a:schemeClr>
+          </a:lnRef>
+          <a:fillRef idx="1">
+            <a:schemeClr val="accent1"/>
+          </a:fillRef>
+          <a:effectRef idx="0">
+            <a:schemeClr val="accent1"/>
+          </a:effectRef>
+          <a:fontRef idx="minor">
+            <a:schemeClr val="lt1"/>
+          </a:fontRef>
+        </p:style>
+        <p:txBody>
+          <a:bodyPr rtlCol="0" anchor="ctr"/>
+          <a:lstStyle/>
+          <a:p>
+            <a:pPr algn="ctr"/>
+            <a:r>
+              <a:rPr lang="en-US" sz="3000" i="1" dirty="0">
+                <a:solidFill>
+                  <a:schemeClr val="tx1"/>
+                </a:solidFill>
+                <a:latin typeface="Times New Roman" panose="02020603050405020304" pitchFamily="18" charset="0"/>
+                <a:cs typeface="Times New Roman" panose="02020603050405020304" pitchFamily="18" charset="0"/>
+              </a:rPr>
+              <a:t>Leaf nitrogen</a:t>
+            </a:r>
+          </a:p>
+        </p:txBody>
+      </p:sp>
+      <p:sp>
+        <p:nvSpPr>
+          <p:cNvPr id="32" name="Rectangle 31">
+            <a:extLst>
+              <a:ext uri="{FF2B5EF4-FFF2-40B4-BE49-F238E27FC236}">
+                <a16:creationId xmlns:a16="http://schemas.microsoft.com/office/drawing/2014/main" id="{0AFF0E83-3D3A-DE04-9CB6-1D10465ADD2C}"/>
+              </a:ext>
+            </a:extLst>
+          </p:cNvPr>
+          <p:cNvSpPr/>
+          <p:nvPr/>
+        </p:nvSpPr>
+        <p:spPr>
+          <a:xfrm>
+            <a:off x="2786743" y="7358743"/>
+            <a:ext cx="1981200" cy="1382486"/>
+          </a:xfrm>
+          <a:prstGeom prst="rect">
+            <a:avLst/>
+          </a:prstGeom>
+          <a:solidFill>
+            <a:schemeClr val="bg1"/>
+          </a:solidFill>
+          <a:ln w="38100">
+            <a:solidFill>
+              <a:schemeClr val="tx1"/>
+            </a:solidFill>
+          </a:ln>
+        </p:spPr>
+        <p:style>
+          <a:lnRef idx="2">
+            <a:schemeClr val="accent1">
+              <a:shade val="50000"/>
+            </a:schemeClr>
+          </a:lnRef>
+          <a:fillRef idx="1">
+            <a:schemeClr val="accent1"/>
+          </a:fillRef>
+          <a:effectRef idx="0">
+            <a:schemeClr val="accent1"/>
+          </a:effectRef>
+          <a:fontRef idx="minor">
+            <a:schemeClr val="lt1"/>
+          </a:fontRef>
+        </p:style>
+        <p:txBody>
+          <a:bodyPr rtlCol="0" anchor="ctr"/>
+          <a:lstStyle/>
+          <a:p>
+            <a:pPr algn="ctr"/>
+            <a:r>
+              <a:rPr lang="en-US" sz="3000" i="1" dirty="0">
+                <a:solidFill>
+                  <a:schemeClr val="tx1"/>
+                </a:solidFill>
+                <a:latin typeface="Times New Roman" panose="02020603050405020304" pitchFamily="18" charset="0"/>
+                <a:cs typeface="Times New Roman" panose="02020603050405020304" pitchFamily="18" charset="0"/>
+              </a:rPr>
+              <a:t>Soil nitrogen</a:t>
+            </a:r>
+          </a:p>
+        </p:txBody>
+      </p:sp>
+      <p:sp>
+        <p:nvSpPr>
+          <p:cNvPr id="39" name="Rectangle 38">
+            <a:extLst>
+              <a:ext uri="{FF2B5EF4-FFF2-40B4-BE49-F238E27FC236}">
+                <a16:creationId xmlns:a16="http://schemas.microsoft.com/office/drawing/2014/main" id="{4A8AC9D3-A0FE-BAD6-937E-7D5A2722D60C}"/>
+              </a:ext>
+            </a:extLst>
+          </p:cNvPr>
+          <p:cNvSpPr/>
+          <p:nvPr/>
+        </p:nvSpPr>
+        <p:spPr>
+          <a:xfrm>
+            <a:off x="2786743" y="2231572"/>
+            <a:ext cx="1981200" cy="1382486"/>
+          </a:xfrm>
+          <a:prstGeom prst="rect">
+            <a:avLst/>
+          </a:prstGeom>
+          <a:noFill/>
+          <a:ln w="38100">
+            <a:solidFill>
+              <a:schemeClr val="tx1"/>
+            </a:solidFill>
+          </a:ln>
+        </p:spPr>
+        <p:style>
+          <a:lnRef idx="2">
+            <a:schemeClr val="accent1">
+              <a:shade val="50000"/>
+            </a:schemeClr>
+          </a:lnRef>
+          <a:fillRef idx="1">
+            <a:schemeClr val="accent1"/>
+          </a:fillRef>
+          <a:effectRef idx="0">
+            <a:schemeClr val="accent1"/>
+          </a:effectRef>
+          <a:fontRef idx="minor">
+            <a:schemeClr val="lt1"/>
+          </a:fontRef>
+        </p:style>
+        <p:txBody>
+          <a:bodyPr rtlCol="0" anchor="ctr"/>
+          <a:lstStyle/>
+          <a:p>
+            <a:pPr algn="ctr"/>
+            <a:r>
+              <a:rPr lang="en-US" sz="3000" i="1" dirty="0">
+                <a:solidFill>
+                  <a:schemeClr val="tx1"/>
+                </a:solidFill>
+                <a:latin typeface="Times New Roman" panose="02020603050405020304" pitchFamily="18" charset="0"/>
+                <a:cs typeface="Times New Roman" panose="02020603050405020304" pitchFamily="18" charset="0"/>
+              </a:rPr>
+              <a:t>Soil moisture</a:t>
+            </a:r>
+          </a:p>
+        </p:txBody>
+      </p:sp>
+      <p:sp>
+        <p:nvSpPr>
+          <p:cNvPr id="10" name="Rectangle 9">
+            <a:extLst>
+              <a:ext uri="{FF2B5EF4-FFF2-40B4-BE49-F238E27FC236}">
+                <a16:creationId xmlns:a16="http://schemas.microsoft.com/office/drawing/2014/main" id="{BDB2735C-7F63-29A4-69B1-67E4D8E0C79C}"/>
+              </a:ext>
+            </a:extLst>
+          </p:cNvPr>
+          <p:cNvSpPr/>
+          <p:nvPr/>
+        </p:nvSpPr>
+        <p:spPr>
+          <a:xfrm>
+            <a:off x="6412615" y="2234987"/>
+            <a:ext cx="1981200" cy="1382486"/>
+          </a:xfrm>
+          <a:prstGeom prst="rect">
+            <a:avLst/>
+          </a:prstGeom>
+          <a:solidFill>
+            <a:schemeClr val="bg1"/>
+          </a:solidFill>
+          <a:ln w="38100">
+            <a:solidFill>
+              <a:schemeClr val="tx1"/>
+            </a:solidFill>
+          </a:ln>
+        </p:spPr>
+        <p:style>
+          <a:lnRef idx="2">
+            <a:schemeClr val="accent1">
+              <a:shade val="50000"/>
+            </a:schemeClr>
+          </a:lnRef>
+          <a:fillRef idx="1">
+            <a:schemeClr val="accent1"/>
+          </a:fillRef>
+          <a:effectRef idx="0">
+            <a:schemeClr val="accent1"/>
+          </a:effectRef>
+          <a:fontRef idx="minor">
+            <a:schemeClr val="lt1"/>
+          </a:fontRef>
+        </p:style>
+        <p:txBody>
+          <a:bodyPr rtlCol="0" anchor="ctr"/>
+          <a:lstStyle/>
+          <a:p>
+            <a:pPr algn="ctr"/>
+            <a:r>
+              <a:rPr lang="en-US" sz="3000" i="1" dirty="0">
+                <a:solidFill>
+                  <a:schemeClr val="tx1"/>
+                </a:solidFill>
+                <a:latin typeface="Times New Roman" panose="02020603050405020304" pitchFamily="18" charset="0"/>
+                <a:cs typeface="Times New Roman" panose="02020603050405020304" pitchFamily="18" charset="0"/>
+              </a:rPr>
+              <a:t>N fixation ability</a:t>
+            </a:r>
+          </a:p>
+        </p:txBody>
+      </p:sp>
+      <p:sp>
+        <p:nvSpPr>
+          <p:cNvPr id="21" name="Rectangle 20">
+            <a:extLst>
+              <a:ext uri="{FF2B5EF4-FFF2-40B4-BE49-F238E27FC236}">
+                <a16:creationId xmlns:a16="http://schemas.microsoft.com/office/drawing/2014/main" id="{2A451EDF-2134-D951-F607-AE0DC624C032}"/>
+              </a:ext>
+            </a:extLst>
+          </p:cNvPr>
+          <p:cNvSpPr/>
+          <p:nvPr/>
+        </p:nvSpPr>
+        <p:spPr>
+          <a:xfrm>
+            <a:off x="10014859" y="2227564"/>
+            <a:ext cx="1981200" cy="1382486"/>
+          </a:xfrm>
+          <a:prstGeom prst="rect">
+            <a:avLst/>
+          </a:prstGeom>
+          <a:solidFill>
+            <a:schemeClr val="bg1"/>
+          </a:solidFill>
+          <a:ln w="38100">
+            <a:solidFill>
+              <a:schemeClr val="tx1"/>
+            </a:solidFill>
+          </a:ln>
+        </p:spPr>
+        <p:style>
+          <a:lnRef idx="2">
+            <a:schemeClr val="accent1">
+              <a:shade val="50000"/>
+            </a:schemeClr>
+          </a:lnRef>
+          <a:fillRef idx="1">
+            <a:schemeClr val="accent1"/>
+          </a:fillRef>
+          <a:effectRef idx="0">
+            <a:schemeClr val="accent1"/>
+          </a:effectRef>
+          <a:fontRef idx="minor">
+            <a:schemeClr val="lt1"/>
+          </a:fontRef>
+        </p:style>
+        <p:txBody>
+          <a:bodyPr rtlCol="0" anchor="ctr"/>
+          <a:lstStyle/>
+          <a:p>
+            <a:pPr algn="ctr"/>
+            <a:r>
+              <a:rPr lang="en-US" sz="3000" i="1" dirty="0">
+                <a:solidFill>
+                  <a:schemeClr val="tx1"/>
+                </a:solidFill>
+                <a:latin typeface="Times New Roman" panose="02020603050405020304" pitchFamily="18" charset="0"/>
+                <a:cs typeface="Times New Roman" panose="02020603050405020304" pitchFamily="18" charset="0"/>
+              </a:rPr>
+              <a:t>Photo. pathway</a:t>
+            </a:r>
+          </a:p>
+        </p:txBody>
+      </p:sp>
+      <p:sp>
+        <p:nvSpPr>
+          <p:cNvPr id="26" name="Rectangle 25">
+            <a:extLst>
+              <a:ext uri="{FF2B5EF4-FFF2-40B4-BE49-F238E27FC236}">
+                <a16:creationId xmlns:a16="http://schemas.microsoft.com/office/drawing/2014/main" id="{B55C58BF-B54E-BA2F-D111-5037A627D595}"/>
+              </a:ext>
+            </a:extLst>
+          </p:cNvPr>
+          <p:cNvSpPr/>
+          <p:nvPr/>
+        </p:nvSpPr>
+        <p:spPr>
+          <a:xfrm>
+            <a:off x="10014859" y="4795159"/>
+            <a:ext cx="1981200" cy="1382486"/>
+          </a:xfrm>
+          <a:prstGeom prst="rect">
+            <a:avLst/>
+          </a:prstGeom>
+          <a:solidFill>
+            <a:schemeClr val="bg1">
+              <a:alpha val="75000"/>
+            </a:schemeClr>
+          </a:solidFill>
+          <a:ln w="38100">
+            <a:solidFill>
+              <a:schemeClr val="tx1"/>
+            </a:solidFill>
+          </a:ln>
+        </p:spPr>
+        <p:style>
+          <a:lnRef idx="2">
+            <a:schemeClr val="accent1">
+              <a:shade val="50000"/>
+            </a:schemeClr>
+          </a:lnRef>
+          <a:fillRef idx="1">
+            <a:schemeClr val="accent1"/>
+          </a:fillRef>
+          <a:effectRef idx="0">
+            <a:schemeClr val="accent1"/>
+          </a:effectRef>
+          <a:fontRef idx="minor">
+            <a:schemeClr val="lt1"/>
+          </a:fontRef>
+        </p:style>
+        <p:txBody>
+          <a:bodyPr rtlCol="0" anchor="ctr"/>
+          <a:lstStyle/>
+          <a:p>
+            <a:pPr algn="ctr"/>
+            <a:r>
+              <a:rPr lang="el-GR" sz="3000" i="1" dirty="0">
+                <a:solidFill>
+                  <a:schemeClr val="tx1"/>
+                </a:solidFill>
+                <a:latin typeface="Times New Roman" panose="02020603050405020304" pitchFamily="18" charset="0"/>
+                <a:cs typeface="Times New Roman" panose="02020603050405020304" pitchFamily="18" charset="0"/>
+              </a:rPr>
+              <a:t>χ</a:t>
+            </a:r>
+            <a:endParaRPr lang="en-US" sz="3000" i="1" dirty="0">
+              <a:solidFill>
+                <a:schemeClr val="tx1"/>
+              </a:solidFill>
+              <a:latin typeface="Times New Roman" panose="02020603050405020304" pitchFamily="18" charset="0"/>
+              <a:cs typeface="Times New Roman" panose="02020603050405020304" pitchFamily="18" charset="0"/>
+            </a:endParaRPr>
+          </a:p>
+        </p:txBody>
+      </p:sp>
+      <p:sp>
+        <p:nvSpPr>
+          <p:cNvPr id="45" name="TextBox 44">
+            <a:extLst>
+              <a:ext uri="{FF2B5EF4-FFF2-40B4-BE49-F238E27FC236}">
+                <a16:creationId xmlns:a16="http://schemas.microsoft.com/office/drawing/2014/main" id="{BEF88868-3332-0348-FFC7-7E644FA84D13}"/>
+              </a:ext>
+            </a:extLst>
+          </p:cNvPr>
+          <p:cNvSpPr txBox="1"/>
+          <p:nvPr/>
+        </p:nvSpPr>
+        <p:spPr>
+          <a:xfrm>
+            <a:off x="6901038" y="3938765"/>
+            <a:ext cx="877163" cy="461665"/>
+          </a:xfrm>
+          <a:prstGeom prst="rect">
+            <a:avLst/>
+          </a:prstGeom>
+          <a:solidFill>
+            <a:schemeClr val="bg1"/>
+          </a:solidFill>
+          <a:ln w="39878">
+            <a:solidFill>
+              <a:schemeClr val="bg2">
+                <a:lumMod val="75000"/>
+              </a:schemeClr>
+            </a:solidFill>
+            <a:prstDash val="dash"/>
+          </a:ln>
+        </p:spPr>
+        <p:txBody>
+          <a:bodyPr wrap="none" rtlCol="0">
+            <a:spAutoFit/>
+          </a:bodyPr>
+          <a:lstStyle/>
+          <a:p>
+            <a:r>
+              <a:rPr lang="en-US" sz="2400" dirty="0">
+                <a:latin typeface="Times New Roman" panose="02020603050405020304" pitchFamily="18" charset="0"/>
+                <a:cs typeface="Times New Roman" panose="02020603050405020304" pitchFamily="18" charset="0"/>
+              </a:rPr>
+              <a:t>0.073</a:t>
+            </a:r>
+          </a:p>
+        </p:txBody>
+      </p:sp>
+      <p:cxnSp>
+        <p:nvCxnSpPr>
+          <p:cNvPr id="172" name="Straight Arrow Connector 171">
+            <a:extLst>
+              <a:ext uri="{FF2B5EF4-FFF2-40B4-BE49-F238E27FC236}">
+                <a16:creationId xmlns:a16="http://schemas.microsoft.com/office/drawing/2014/main" id="{96C963D3-A037-AA03-21EE-F9FD4D30904A}"/>
+              </a:ext>
+            </a:extLst>
+          </p:cNvPr>
+          <p:cNvCxnSpPr>
+            <a:cxnSpLocks/>
+          </p:cNvCxnSpPr>
+          <p:nvPr/>
+        </p:nvCxnSpPr>
+        <p:spPr>
+          <a:xfrm flipH="1" flipV="1">
+            <a:off x="14598340" y="3627100"/>
+            <a:ext cx="934" cy="1127214"/>
+          </a:xfrm>
+          <a:prstGeom prst="straightConnector1">
+            <a:avLst/>
+          </a:prstGeom>
+          <a:ln w="38100">
+            <a:solidFill>
+              <a:srgbClr val="C00000"/>
+            </a:solidFill>
+            <a:prstDash val="solid"/>
+            <a:tailEnd type="triangle"/>
+          </a:ln>
+        </p:spPr>
+        <p:style>
+          <a:lnRef idx="1">
+            <a:schemeClr val="accent1"/>
+          </a:lnRef>
+          <a:fillRef idx="0">
+            <a:schemeClr val="accent1"/>
+          </a:fillRef>
+          <a:effectRef idx="0">
+            <a:schemeClr val="accent1"/>
+          </a:effectRef>
+          <a:fontRef idx="minor">
+            <a:schemeClr val="tx1"/>
+          </a:fontRef>
+        </p:style>
+      </p:cxnSp>
+      <p:sp>
+        <p:nvSpPr>
+          <p:cNvPr id="173" name="TextBox 172">
+            <a:extLst>
+              <a:ext uri="{FF2B5EF4-FFF2-40B4-BE49-F238E27FC236}">
+                <a16:creationId xmlns:a16="http://schemas.microsoft.com/office/drawing/2014/main" id="{12BFA210-1EF0-9547-4715-BA37CF7BD3EB}"/>
+              </a:ext>
+            </a:extLst>
+          </p:cNvPr>
+          <p:cNvSpPr txBox="1"/>
+          <p:nvPr/>
+        </p:nvSpPr>
+        <p:spPr>
+          <a:xfrm>
+            <a:off x="14096691" y="3935283"/>
+            <a:ext cx="979755" cy="461665"/>
+          </a:xfrm>
+          <a:prstGeom prst="rect">
+            <a:avLst/>
+          </a:prstGeom>
+          <a:solidFill>
+            <a:schemeClr val="bg1"/>
+          </a:solidFill>
+          <a:ln w="39878">
+            <a:solidFill>
+              <a:srgbClr val="C00000"/>
+            </a:solidFill>
+            <a:prstDash val="solid"/>
+          </a:ln>
+        </p:spPr>
+        <p:txBody>
+          <a:bodyPr wrap="none" rtlCol="0">
+            <a:spAutoFit/>
+          </a:bodyPr>
+          <a:lstStyle/>
+          <a:p>
+            <a:r>
+              <a:rPr lang="en-US" sz="2400" b="1" dirty="0">
+                <a:latin typeface="Times New Roman" panose="02020603050405020304" pitchFamily="18" charset="0"/>
+                <a:cs typeface="Times New Roman" panose="02020603050405020304" pitchFamily="18" charset="0"/>
+              </a:rPr>
+              <a:t>-0.547</a:t>
+            </a:r>
+          </a:p>
+        </p:txBody>
+      </p:sp>
+      <p:sp>
+        <p:nvSpPr>
+          <p:cNvPr id="22" name="Rectangle 21">
+            <a:extLst>
+              <a:ext uri="{FF2B5EF4-FFF2-40B4-BE49-F238E27FC236}">
+                <a16:creationId xmlns:a16="http://schemas.microsoft.com/office/drawing/2014/main" id="{295B61D5-3809-B67F-F28A-43F8F95032C1}"/>
+              </a:ext>
+            </a:extLst>
+          </p:cNvPr>
+          <p:cNvSpPr/>
+          <p:nvPr/>
+        </p:nvSpPr>
+        <p:spPr>
+          <a:xfrm>
+            <a:off x="13609141" y="2234987"/>
+            <a:ext cx="1981200" cy="1382486"/>
+          </a:xfrm>
+          <a:prstGeom prst="rect">
+            <a:avLst/>
+          </a:prstGeom>
+          <a:solidFill>
+            <a:schemeClr val="bg1"/>
+          </a:solidFill>
+          <a:ln w="38100">
+            <a:solidFill>
+              <a:schemeClr val="tx1"/>
+            </a:solidFill>
+          </a:ln>
+        </p:spPr>
+        <p:style>
+          <a:lnRef idx="2">
+            <a:schemeClr val="accent1">
+              <a:shade val="50000"/>
+            </a:schemeClr>
+          </a:lnRef>
+          <a:fillRef idx="1">
+            <a:schemeClr val="accent1"/>
+          </a:fillRef>
+          <a:effectRef idx="0">
+            <a:schemeClr val="accent1"/>
+          </a:effectRef>
+          <a:fontRef idx="minor">
+            <a:schemeClr val="lt1"/>
+          </a:fontRef>
+        </p:style>
+        <p:txBody>
+          <a:bodyPr rtlCol="0" anchor="ctr"/>
+          <a:lstStyle/>
+          <a:p>
+            <a:pPr algn="ctr"/>
+            <a:r>
+              <a:rPr lang="en-US" sz="3000" i="1" dirty="0">
+                <a:solidFill>
+                  <a:schemeClr val="tx1"/>
+                </a:solidFill>
+                <a:latin typeface="Times New Roman" panose="02020603050405020304" pitchFamily="18" charset="0"/>
+                <a:cs typeface="Times New Roman" panose="02020603050405020304" pitchFamily="18" charset="0"/>
+              </a:rPr>
+              <a:t>Vapor pressure deficit</a:t>
+            </a:r>
+          </a:p>
+        </p:txBody>
+      </p:sp>
+      <p:cxnSp>
+        <p:nvCxnSpPr>
+          <p:cNvPr id="175" name="Elbow Connector 174">
+            <a:extLst>
+              <a:ext uri="{FF2B5EF4-FFF2-40B4-BE49-F238E27FC236}">
+                <a16:creationId xmlns:a16="http://schemas.microsoft.com/office/drawing/2014/main" id="{629DB861-A3E9-4840-7238-A52E0BFB937F}"/>
+              </a:ext>
+            </a:extLst>
+          </p:cNvPr>
+          <p:cNvCxnSpPr>
+            <a:stCxn id="22" idx="1"/>
+          </p:cNvCxnSpPr>
+          <p:nvPr/>
+        </p:nvCxnSpPr>
+        <p:spPr>
+          <a:xfrm rot="10800000" flipV="1">
+            <a:off x="12812489" y="2926230"/>
+            <a:ext cx="796653" cy="2039470"/>
+          </a:xfrm>
+          <a:prstGeom prst="bentConnector2">
+            <a:avLst/>
+          </a:prstGeom>
+          <a:ln w="38100">
+            <a:solidFill>
+              <a:srgbClr val="C00000"/>
+            </a:solidFill>
+          </a:ln>
+        </p:spPr>
+        <p:style>
+          <a:lnRef idx="1">
+            <a:schemeClr val="accent1"/>
+          </a:lnRef>
+          <a:fillRef idx="0">
+            <a:schemeClr val="accent1"/>
+          </a:fillRef>
+          <a:effectRef idx="0">
+            <a:schemeClr val="accent1"/>
+          </a:effectRef>
+          <a:fontRef idx="minor">
+            <a:schemeClr val="tx1"/>
+          </a:fontRef>
+        </p:style>
+      </p:cxnSp>
+      <p:cxnSp>
+        <p:nvCxnSpPr>
+          <p:cNvPr id="177" name="Straight Arrow Connector 176">
+            <a:extLst>
+              <a:ext uri="{FF2B5EF4-FFF2-40B4-BE49-F238E27FC236}">
+                <a16:creationId xmlns:a16="http://schemas.microsoft.com/office/drawing/2014/main" id="{0A4B64FD-2DE2-AF98-FA08-FD9285A71FA9}"/>
+              </a:ext>
+            </a:extLst>
+          </p:cNvPr>
+          <p:cNvCxnSpPr/>
+          <p:nvPr/>
+        </p:nvCxnSpPr>
+        <p:spPr>
+          <a:xfrm flipH="1">
+            <a:off x="12021459" y="4965700"/>
+            <a:ext cx="816429" cy="0"/>
+          </a:xfrm>
+          <a:prstGeom prst="straightConnector1">
+            <a:avLst/>
+          </a:prstGeom>
+          <a:ln w="38100">
+            <a:solidFill>
+              <a:srgbClr val="C00000"/>
+            </a:solidFill>
+            <a:tailEnd type="triangle"/>
+          </a:ln>
+        </p:spPr>
+        <p:style>
+          <a:lnRef idx="1">
+            <a:schemeClr val="accent1"/>
+          </a:lnRef>
+          <a:fillRef idx="0">
+            <a:schemeClr val="accent1"/>
+          </a:fillRef>
+          <a:effectRef idx="0">
+            <a:schemeClr val="accent1"/>
+          </a:effectRef>
+          <a:fontRef idx="minor">
+            <a:schemeClr val="tx1"/>
+          </a:fontRef>
+        </p:style>
+      </p:cxnSp>
+      <p:sp>
+        <p:nvSpPr>
+          <p:cNvPr id="178" name="TextBox 177">
+            <a:extLst>
+              <a:ext uri="{FF2B5EF4-FFF2-40B4-BE49-F238E27FC236}">
+                <a16:creationId xmlns:a16="http://schemas.microsoft.com/office/drawing/2014/main" id="{591DC4B8-EF7C-9623-380E-8EC9F506BCC0}"/>
+              </a:ext>
+            </a:extLst>
+          </p:cNvPr>
+          <p:cNvSpPr txBox="1"/>
+          <p:nvPr/>
+        </p:nvSpPr>
+        <p:spPr>
+          <a:xfrm>
+            <a:off x="12320211" y="3935283"/>
+            <a:ext cx="979755" cy="461665"/>
+          </a:xfrm>
+          <a:prstGeom prst="rect">
+            <a:avLst/>
+          </a:prstGeom>
+          <a:solidFill>
+            <a:schemeClr val="bg1"/>
+          </a:solidFill>
+          <a:ln w="39878">
+            <a:solidFill>
+              <a:srgbClr val="C00000"/>
+            </a:solidFill>
+            <a:prstDash val="solid"/>
+          </a:ln>
+        </p:spPr>
+        <p:txBody>
+          <a:bodyPr wrap="none" rtlCol="0">
+            <a:spAutoFit/>
+          </a:bodyPr>
+          <a:lstStyle/>
+          <a:p>
+            <a:r>
+              <a:rPr lang="en-US" sz="2400" b="1" dirty="0">
+                <a:latin typeface="Times New Roman" panose="02020603050405020304" pitchFamily="18" charset="0"/>
+                <a:cs typeface="Times New Roman" panose="02020603050405020304" pitchFamily="18" charset="0"/>
+              </a:rPr>
+              <a:t>-0.121</a:t>
+            </a:r>
+          </a:p>
+        </p:txBody>
+      </p:sp>
+      <p:sp>
+        <p:nvSpPr>
+          <p:cNvPr id="179" name="TextBox 178">
+            <a:extLst>
+              <a:ext uri="{FF2B5EF4-FFF2-40B4-BE49-F238E27FC236}">
+                <a16:creationId xmlns:a16="http://schemas.microsoft.com/office/drawing/2014/main" id="{B11C760C-61F6-67EC-6506-15BF0738E43E}"/>
+              </a:ext>
+            </a:extLst>
+          </p:cNvPr>
+          <p:cNvSpPr txBox="1"/>
+          <p:nvPr/>
+        </p:nvSpPr>
+        <p:spPr>
+          <a:xfrm>
+            <a:off x="8723316" y="5242661"/>
+            <a:ext cx="979756" cy="461665"/>
+          </a:xfrm>
+          <a:prstGeom prst="rect">
+            <a:avLst/>
+          </a:prstGeom>
+          <a:solidFill>
+            <a:schemeClr val="bg1"/>
+          </a:solidFill>
+          <a:ln w="38100">
+            <a:solidFill>
+              <a:schemeClr val="accent1"/>
+            </a:solidFill>
+            <a:prstDash val="solid"/>
+          </a:ln>
+        </p:spPr>
+        <p:txBody>
+          <a:bodyPr wrap="square" rtlCol="0">
+            <a:spAutoFit/>
+          </a:bodyPr>
+          <a:lstStyle/>
+          <a:p>
+            <a:pPr algn="ctr"/>
+            <a:r>
+              <a:rPr lang="en-US" sz="2400" b="1" dirty="0">
+                <a:latin typeface="Times New Roman" panose="02020603050405020304" pitchFamily="18" charset="0"/>
+                <a:cs typeface="Times New Roman" panose="02020603050405020304" pitchFamily="18" charset="0"/>
+              </a:rPr>
+              <a:t>-0.686</a:t>
+            </a:r>
+          </a:p>
+        </p:txBody>
+      </p:sp>
+      <p:sp>
+        <p:nvSpPr>
+          <p:cNvPr id="180" name="TextBox 179">
+            <a:extLst>
+              <a:ext uri="{FF2B5EF4-FFF2-40B4-BE49-F238E27FC236}">
+                <a16:creationId xmlns:a16="http://schemas.microsoft.com/office/drawing/2014/main" id="{7E3B6DEE-336F-3561-BA7E-405736118315}"/>
+              </a:ext>
+            </a:extLst>
+          </p:cNvPr>
+          <p:cNvSpPr txBox="1"/>
+          <p:nvPr/>
+        </p:nvSpPr>
+        <p:spPr>
+          <a:xfrm>
+            <a:off x="12399306" y="5230118"/>
+            <a:ext cx="877163" cy="461665"/>
+          </a:xfrm>
+          <a:prstGeom prst="rect">
+            <a:avLst/>
+          </a:prstGeom>
+          <a:solidFill>
+            <a:schemeClr val="bg1"/>
+          </a:solidFill>
+          <a:ln w="38100">
+            <a:solidFill>
+              <a:schemeClr val="bg2">
+                <a:lumMod val="75000"/>
+              </a:schemeClr>
+            </a:solidFill>
+            <a:prstDash val="dash"/>
+          </a:ln>
+        </p:spPr>
+        <p:txBody>
+          <a:bodyPr wrap="none" rtlCol="0">
+            <a:spAutoFit/>
+          </a:bodyPr>
+          <a:lstStyle/>
+          <a:p>
+            <a:r>
+              <a:rPr lang="en-US" sz="2400" dirty="0">
+                <a:latin typeface="Times New Roman" panose="02020603050405020304" pitchFamily="18" charset="0"/>
+                <a:cs typeface="Times New Roman" panose="02020603050405020304" pitchFamily="18" charset="0"/>
+              </a:rPr>
+              <a:t>0.065</a:t>
+            </a:r>
+          </a:p>
+        </p:txBody>
+      </p:sp>
+      <p:sp>
+        <p:nvSpPr>
+          <p:cNvPr id="181" name="TextBox 180">
+            <a:extLst>
+              <a:ext uri="{FF2B5EF4-FFF2-40B4-BE49-F238E27FC236}">
+                <a16:creationId xmlns:a16="http://schemas.microsoft.com/office/drawing/2014/main" id="{8037C4D7-0637-788E-3DEA-747A3177AA37}"/>
+              </a:ext>
+            </a:extLst>
+          </p:cNvPr>
+          <p:cNvSpPr txBox="1"/>
+          <p:nvPr/>
+        </p:nvSpPr>
+        <p:spPr>
+          <a:xfrm>
+            <a:off x="5228553" y="7511080"/>
+            <a:ext cx="979755" cy="461665"/>
+          </a:xfrm>
+          <a:prstGeom prst="rect">
+            <a:avLst/>
+          </a:prstGeom>
+          <a:solidFill>
+            <a:schemeClr val="bg1"/>
+          </a:solidFill>
+          <a:ln w="38100">
+            <a:solidFill>
+              <a:srgbClr val="C00000"/>
+            </a:solidFill>
+            <a:prstDash val="solid"/>
+          </a:ln>
+        </p:spPr>
+        <p:txBody>
+          <a:bodyPr wrap="none" rtlCol="0">
+            <a:spAutoFit/>
+          </a:bodyPr>
+          <a:lstStyle/>
+          <a:p>
+            <a:r>
+              <a:rPr lang="en-US" sz="2400" b="1" dirty="0">
+                <a:latin typeface="Times New Roman" panose="02020603050405020304" pitchFamily="18" charset="0"/>
+                <a:cs typeface="Times New Roman" panose="02020603050405020304" pitchFamily="18" charset="0"/>
+              </a:rPr>
+              <a:t>-0.169</a:t>
+            </a:r>
+          </a:p>
+        </p:txBody>
+      </p:sp>
+    </p:spTree>
+    <p:extLst>
+      <p:ext uri="{BB962C8B-B14F-4D97-AF65-F5344CB8AC3E}">
+        <p14:creationId xmlns:p14="http://schemas.microsoft.com/office/powerpoint/2010/main" val="3143554168"/>
+      </p:ext>
+    </p:extLst>
+  </p:cSld>
+  <p:clrMapOvr>
+    <a:masterClrMapping/>
+  </p:clrMapOvr>
+</p:sld>
+</file>
+
+<file path=ppt/slides/slide3.xml><?xml version="1.0" encoding="utf-8"?>
+<p:sld xmlns:a="http://schemas.openxmlformats.org/drawingml/2006/main" xmlns:r="http://schemas.openxmlformats.org/officeDocument/2006/relationships" xmlns:p="http://schemas.openxmlformats.org/presentationml/2006/main">
+  <p:cSld>
+    <p:spTree>
+      <p:nvGrpSpPr>
+        <p:cNvPr id="1" name=""/>
+        <p:cNvGrpSpPr/>
+        <p:nvPr/>
+      </p:nvGrpSpPr>
+      <p:grpSpPr>
+        <a:xfrm>
+          <a:off x="0" y="0"/>
+          <a:ext cx="0" cy="0"/>
+          <a:chOff x="0" y="0"/>
+          <a:chExt cx="0" cy="0"/>
+        </a:xfrm>
+      </p:grpSpPr>
+      <p:sp>
+        <p:nvSpPr>
+          <p:cNvPr id="9" name="TextBox 8">
+            <a:extLst>
+              <a:ext uri="{FF2B5EF4-FFF2-40B4-BE49-F238E27FC236}">
+                <a16:creationId xmlns:a16="http://schemas.microsoft.com/office/drawing/2014/main" id="{AD61E7F5-9D4B-CBE8-3394-162FEB2D0120}"/>
+              </a:ext>
+            </a:extLst>
+          </p:cNvPr>
+          <p:cNvSpPr txBox="1"/>
+          <p:nvPr/>
+        </p:nvSpPr>
+        <p:spPr>
+          <a:xfrm>
+            <a:off x="329784" y="329784"/>
+            <a:ext cx="3676648" cy="646331"/>
+          </a:xfrm>
+          <a:prstGeom prst="rect">
+            <a:avLst/>
+          </a:prstGeom>
+          <a:noFill/>
+        </p:spPr>
+        <p:txBody>
+          <a:bodyPr wrap="none" rtlCol="0">
+            <a:spAutoFit/>
+          </a:bodyPr>
+          <a:lstStyle/>
+          <a:p>
+            <a:r>
+              <a:rPr lang="en-US" dirty="0"/>
+              <a:t>new structure with </a:t>
+            </a:r>
+            <a:r>
+              <a:rPr lang="en-US" dirty="0" err="1"/>
+              <a:t>pft</a:t>
+            </a:r>
+            <a:r>
+              <a:rPr lang="en-US" dirty="0"/>
+              <a:t> parsed out by </a:t>
+            </a:r>
+          </a:p>
+          <a:p>
+            <a:r>
+              <a:rPr lang="en-US" dirty="0"/>
+              <a:t>c3/c4 and n fixation</a:t>
+            </a:r>
+          </a:p>
+        </p:txBody>
+      </p:sp>
+      <p:cxnSp>
+        <p:nvCxnSpPr>
+          <p:cNvPr id="27" name="Straight Arrow Connector 26">
+            <a:extLst>
+              <a:ext uri="{FF2B5EF4-FFF2-40B4-BE49-F238E27FC236}">
+                <a16:creationId xmlns:a16="http://schemas.microsoft.com/office/drawing/2014/main" id="{05E0B5AA-B426-A909-BDA5-9069156E8664}"/>
+              </a:ext>
+            </a:extLst>
+          </p:cNvPr>
+          <p:cNvCxnSpPr>
+            <a:cxnSpLocks/>
+          </p:cNvCxnSpPr>
+          <p:nvPr/>
+        </p:nvCxnSpPr>
+        <p:spPr>
+          <a:xfrm>
+            <a:off x="5053454" y="5486398"/>
+            <a:ext cx="1347347" cy="4"/>
+          </a:xfrm>
+          <a:prstGeom prst="straightConnector1">
+            <a:avLst/>
+          </a:prstGeom>
+          <a:ln w="41021">
+            <a:solidFill>
+              <a:srgbClr val="C00000"/>
+            </a:solidFill>
+            <a:prstDash val="solid"/>
+            <a:tailEnd type="triangle"/>
+          </a:ln>
+        </p:spPr>
+        <p:style>
+          <a:lnRef idx="1">
+            <a:schemeClr val="accent1"/>
+          </a:lnRef>
+          <a:fillRef idx="0">
+            <a:schemeClr val="accent1"/>
+          </a:fillRef>
+          <a:effectRef idx="0">
+            <a:schemeClr val="accent1"/>
+          </a:effectRef>
+          <a:fontRef idx="minor">
+            <a:schemeClr val="tx1"/>
+          </a:fontRef>
+        </p:style>
+      </p:cxnSp>
+      <p:sp>
+        <p:nvSpPr>
+          <p:cNvPr id="33" name="TextBox 32">
+            <a:extLst>
+              <a:ext uri="{FF2B5EF4-FFF2-40B4-BE49-F238E27FC236}">
+                <a16:creationId xmlns:a16="http://schemas.microsoft.com/office/drawing/2014/main" id="{0C980C1F-2151-7A30-A5ED-9C759223F4F6}"/>
+              </a:ext>
+            </a:extLst>
+          </p:cNvPr>
+          <p:cNvSpPr txBox="1"/>
+          <p:nvPr/>
+        </p:nvSpPr>
+        <p:spPr>
+          <a:xfrm>
+            <a:off x="4932138" y="5236884"/>
+            <a:ext cx="979755" cy="461665"/>
+          </a:xfrm>
+          <a:prstGeom prst="rect">
+            <a:avLst/>
+          </a:prstGeom>
+          <a:solidFill>
+            <a:schemeClr val="bg1"/>
+          </a:solidFill>
+          <a:ln w="38100">
+            <a:solidFill>
+              <a:srgbClr val="C00000"/>
+            </a:solidFill>
+            <a:prstDash val="solid"/>
+          </a:ln>
+        </p:spPr>
+        <p:txBody>
+          <a:bodyPr wrap="none" rtlCol="0">
+            <a:spAutoFit/>
+          </a:bodyPr>
+          <a:lstStyle/>
+          <a:p>
+            <a:r>
+              <a:rPr lang="en-US" sz="2400" b="1" dirty="0">
+                <a:latin typeface="Times New Roman" panose="02020603050405020304" pitchFamily="18" charset="0"/>
+                <a:cs typeface="Times New Roman" panose="02020603050405020304" pitchFamily="18" charset="0"/>
+              </a:rPr>
+              <a:t>-0.077</a:t>
+            </a:r>
+          </a:p>
+        </p:txBody>
+      </p:sp>
+      <p:cxnSp>
+        <p:nvCxnSpPr>
+          <p:cNvPr id="34" name="Straight Arrow Connector 33">
+            <a:extLst>
+              <a:ext uri="{FF2B5EF4-FFF2-40B4-BE49-F238E27FC236}">
+                <a16:creationId xmlns:a16="http://schemas.microsoft.com/office/drawing/2014/main" id="{9E300821-93A1-20EC-8836-2C0408F2277D}"/>
+              </a:ext>
+            </a:extLst>
+          </p:cNvPr>
+          <p:cNvCxnSpPr>
+            <a:cxnSpLocks/>
+          </p:cNvCxnSpPr>
+          <p:nvPr/>
+        </p:nvCxnSpPr>
+        <p:spPr>
+          <a:xfrm>
+            <a:off x="3777343" y="3614058"/>
+            <a:ext cx="0" cy="3744684"/>
+          </a:xfrm>
+          <a:prstGeom prst="straightConnector1">
+            <a:avLst/>
+          </a:prstGeom>
+          <a:ln w="38100">
+            <a:solidFill>
+              <a:schemeClr val="accent1"/>
+            </a:solidFill>
+            <a:prstDash val="solid"/>
+            <a:tailEnd type="triangle"/>
+          </a:ln>
+        </p:spPr>
+        <p:style>
+          <a:lnRef idx="1">
+            <a:schemeClr val="accent1"/>
+          </a:lnRef>
+          <a:fillRef idx="0">
+            <a:schemeClr val="accent1"/>
+          </a:fillRef>
+          <a:effectRef idx="0">
+            <a:schemeClr val="accent1"/>
+          </a:effectRef>
+          <a:fontRef idx="minor">
+            <a:schemeClr val="tx1"/>
+          </a:fontRef>
+        </p:style>
+      </p:cxnSp>
+      <p:sp>
+        <p:nvSpPr>
+          <p:cNvPr id="35" name="TextBox 34">
+            <a:extLst>
+              <a:ext uri="{FF2B5EF4-FFF2-40B4-BE49-F238E27FC236}">
+                <a16:creationId xmlns:a16="http://schemas.microsoft.com/office/drawing/2014/main" id="{DBEDC2CC-31C8-86F9-A7D8-9AA1FF8C6344}"/>
+              </a:ext>
+            </a:extLst>
+          </p:cNvPr>
+          <p:cNvSpPr txBox="1"/>
+          <p:nvPr/>
+        </p:nvSpPr>
+        <p:spPr>
+          <a:xfrm>
+            <a:off x="3338762" y="5236884"/>
+            <a:ext cx="877163" cy="461665"/>
+          </a:xfrm>
+          <a:prstGeom prst="rect">
+            <a:avLst/>
+          </a:prstGeom>
+          <a:solidFill>
+            <a:schemeClr val="bg1"/>
+          </a:solidFill>
+          <a:ln w="38100">
+            <a:solidFill>
+              <a:schemeClr val="accent1"/>
+            </a:solidFill>
+            <a:prstDash val="solid"/>
+          </a:ln>
+        </p:spPr>
+        <p:txBody>
+          <a:bodyPr wrap="none" rtlCol="0">
+            <a:spAutoFit/>
+          </a:bodyPr>
+          <a:lstStyle/>
+          <a:p>
+            <a:r>
+              <a:rPr lang="en-US" sz="2400" b="1" dirty="0">
+                <a:latin typeface="Times New Roman" panose="02020603050405020304" pitchFamily="18" charset="0"/>
+                <a:cs typeface="Times New Roman" panose="02020603050405020304" pitchFamily="18" charset="0"/>
+              </a:rPr>
+              <a:t>0.409</a:t>
+            </a:r>
+          </a:p>
+        </p:txBody>
+      </p:sp>
+      <p:cxnSp>
+        <p:nvCxnSpPr>
+          <p:cNvPr id="37" name="Elbow Connector 36">
+            <a:extLst>
+              <a:ext uri="{FF2B5EF4-FFF2-40B4-BE49-F238E27FC236}">
+                <a16:creationId xmlns:a16="http://schemas.microsoft.com/office/drawing/2014/main" id="{56C1BD30-41DE-924A-B150-3688E456355B}"/>
+              </a:ext>
+            </a:extLst>
+          </p:cNvPr>
+          <p:cNvCxnSpPr>
+            <a:cxnSpLocks/>
+            <a:stCxn id="39" idx="3"/>
+            <a:endCxn id="33" idx="0"/>
+          </p:cNvCxnSpPr>
+          <p:nvPr/>
+        </p:nvCxnSpPr>
+        <p:spPr>
+          <a:xfrm>
+            <a:off x="4767943" y="2922815"/>
+            <a:ext cx="654073" cy="2314069"/>
+          </a:xfrm>
+          <a:prstGeom prst="bentConnector2">
+            <a:avLst/>
+          </a:prstGeom>
+          <a:ln w="38100">
+            <a:solidFill>
+              <a:srgbClr val="C00000"/>
+            </a:solidFill>
+            <a:prstDash val="solid"/>
+          </a:ln>
+        </p:spPr>
+        <p:style>
+          <a:lnRef idx="1">
+            <a:schemeClr val="accent1"/>
+          </a:lnRef>
+          <a:fillRef idx="0">
+            <a:schemeClr val="accent1"/>
+          </a:fillRef>
+          <a:effectRef idx="0">
+            <a:schemeClr val="accent1"/>
+          </a:effectRef>
+          <a:fontRef idx="minor">
+            <a:schemeClr val="tx1"/>
+          </a:fontRef>
+        </p:style>
+      </p:cxnSp>
+      <p:cxnSp>
+        <p:nvCxnSpPr>
+          <p:cNvPr id="38" name="Elbow Connector 37">
+            <a:extLst>
+              <a:ext uri="{FF2B5EF4-FFF2-40B4-BE49-F238E27FC236}">
+                <a16:creationId xmlns:a16="http://schemas.microsoft.com/office/drawing/2014/main" id="{6A040BB4-503A-C7A6-4819-4E9E1C85AA6B}"/>
+              </a:ext>
+            </a:extLst>
+          </p:cNvPr>
+          <p:cNvCxnSpPr>
+            <a:cxnSpLocks/>
+          </p:cNvCxnSpPr>
+          <p:nvPr/>
+        </p:nvCxnSpPr>
+        <p:spPr>
+          <a:xfrm flipV="1">
+            <a:off x="4767943" y="6177645"/>
+            <a:ext cx="1900977" cy="1565915"/>
+          </a:xfrm>
+          <a:prstGeom prst="bentConnector3">
+            <a:avLst>
+              <a:gd name="adj1" fmla="val 99861"/>
+            </a:avLst>
+          </a:prstGeom>
+          <a:ln w="38100">
+            <a:solidFill>
+              <a:srgbClr val="C00000"/>
+            </a:solidFill>
+            <a:tailEnd type="triangle"/>
+          </a:ln>
+        </p:spPr>
+        <p:style>
+          <a:lnRef idx="1">
+            <a:schemeClr val="accent1"/>
+          </a:lnRef>
+          <a:fillRef idx="0">
+            <a:schemeClr val="accent1"/>
+          </a:fillRef>
+          <a:effectRef idx="0">
+            <a:schemeClr val="accent1"/>
+          </a:effectRef>
+          <a:fontRef idx="minor">
+            <a:schemeClr val="tx1"/>
+          </a:fontRef>
+        </p:style>
+      </p:cxnSp>
+      <p:cxnSp>
+        <p:nvCxnSpPr>
+          <p:cNvPr id="49" name="Elbow Connector 48">
+            <a:extLst>
+              <a:ext uri="{FF2B5EF4-FFF2-40B4-BE49-F238E27FC236}">
+                <a16:creationId xmlns:a16="http://schemas.microsoft.com/office/drawing/2014/main" id="{F94D5161-6720-2B41-BAF0-87962AE695E7}"/>
+              </a:ext>
+            </a:extLst>
+          </p:cNvPr>
+          <p:cNvCxnSpPr>
+            <a:cxnSpLocks/>
+          </p:cNvCxnSpPr>
+          <p:nvPr/>
+        </p:nvCxnSpPr>
+        <p:spPr>
+          <a:xfrm flipV="1">
+            <a:off x="7359319" y="1114279"/>
+            <a:ext cx="9779715" cy="1121810"/>
+          </a:xfrm>
+          <a:prstGeom prst="bentConnector3">
+            <a:avLst>
+              <a:gd name="adj1" fmla="val 134"/>
+            </a:avLst>
+          </a:prstGeom>
+          <a:ln w="38100">
+            <a:solidFill>
+              <a:schemeClr val="accent1"/>
+            </a:solidFill>
+          </a:ln>
+        </p:spPr>
+        <p:style>
+          <a:lnRef idx="1">
+            <a:schemeClr val="accent1"/>
+          </a:lnRef>
+          <a:fillRef idx="0">
+            <a:schemeClr val="accent1"/>
+          </a:fillRef>
+          <a:effectRef idx="0">
+            <a:schemeClr val="accent1"/>
+          </a:effectRef>
+          <a:fontRef idx="minor">
+            <a:schemeClr val="tx1"/>
+          </a:fontRef>
+        </p:style>
+      </p:cxnSp>
+      <p:cxnSp>
+        <p:nvCxnSpPr>
+          <p:cNvPr id="51" name="Elbow Connector 50">
+            <a:extLst>
+              <a:ext uri="{FF2B5EF4-FFF2-40B4-BE49-F238E27FC236}">
+                <a16:creationId xmlns:a16="http://schemas.microsoft.com/office/drawing/2014/main" id="{60382CB4-5571-73B5-7F06-229DD260EF01}"/>
+              </a:ext>
+            </a:extLst>
+          </p:cNvPr>
+          <p:cNvCxnSpPr>
+            <a:cxnSpLocks/>
+            <a:endCxn id="31" idx="3"/>
+          </p:cNvCxnSpPr>
+          <p:nvPr/>
+        </p:nvCxnSpPr>
+        <p:spPr>
+          <a:xfrm rot="5400000">
+            <a:off x="12914339" y="3821874"/>
+            <a:ext cx="6932291" cy="1517100"/>
+          </a:xfrm>
+          <a:prstGeom prst="bentConnector2">
+            <a:avLst/>
+          </a:prstGeom>
+          <a:ln w="38100">
+            <a:solidFill>
+              <a:schemeClr val="accent1"/>
+            </a:solidFill>
+            <a:tailEnd type="triangle"/>
+          </a:ln>
+        </p:spPr>
+        <p:style>
+          <a:lnRef idx="1">
+            <a:schemeClr val="accent1"/>
+          </a:lnRef>
+          <a:fillRef idx="0">
+            <a:schemeClr val="accent1"/>
+          </a:fillRef>
+          <a:effectRef idx="0">
+            <a:schemeClr val="accent1"/>
+          </a:effectRef>
+          <a:fontRef idx="minor">
+            <a:schemeClr val="tx1"/>
+          </a:fontRef>
+        </p:style>
+      </p:cxnSp>
+      <p:sp>
+        <p:nvSpPr>
+          <p:cNvPr id="52" name="TextBox 51">
+            <a:extLst>
+              <a:ext uri="{FF2B5EF4-FFF2-40B4-BE49-F238E27FC236}">
+                <a16:creationId xmlns:a16="http://schemas.microsoft.com/office/drawing/2014/main" id="{5FFFD8BE-0973-7554-4EC6-01C3519BD211}"/>
+              </a:ext>
+            </a:extLst>
+          </p:cNvPr>
+          <p:cNvSpPr txBox="1"/>
+          <p:nvPr/>
+        </p:nvSpPr>
+        <p:spPr>
+          <a:xfrm>
+            <a:off x="16694823" y="3569728"/>
+            <a:ext cx="877163" cy="461665"/>
+          </a:xfrm>
+          <a:prstGeom prst="rect">
+            <a:avLst/>
+          </a:prstGeom>
+          <a:solidFill>
+            <a:schemeClr val="bg1"/>
+          </a:solidFill>
+          <a:ln w="38100">
+            <a:solidFill>
+              <a:schemeClr val="accent1"/>
+            </a:solidFill>
+          </a:ln>
+        </p:spPr>
+        <p:txBody>
+          <a:bodyPr wrap="none" rtlCol="0">
+            <a:spAutoFit/>
+          </a:bodyPr>
+          <a:lstStyle/>
+          <a:p>
+            <a:r>
+              <a:rPr lang="en-US" sz="2400" b="1" dirty="0">
+                <a:latin typeface="Times New Roman" panose="02020603050405020304" pitchFamily="18" charset="0"/>
+                <a:cs typeface="Times New Roman" panose="02020603050405020304" pitchFamily="18" charset="0"/>
+              </a:rPr>
+              <a:t>0.400</a:t>
+            </a:r>
+          </a:p>
+        </p:txBody>
+      </p:sp>
+      <p:cxnSp>
+        <p:nvCxnSpPr>
+          <p:cNvPr id="70" name="Elbow Connector 69">
+            <a:extLst>
+              <a:ext uri="{FF2B5EF4-FFF2-40B4-BE49-F238E27FC236}">
+                <a16:creationId xmlns:a16="http://schemas.microsoft.com/office/drawing/2014/main" id="{0141E55B-F0B5-C76A-443D-E6B1EBBA03B4}"/>
+              </a:ext>
+            </a:extLst>
+          </p:cNvPr>
+          <p:cNvCxnSpPr>
+            <a:cxnSpLocks/>
+          </p:cNvCxnSpPr>
+          <p:nvPr/>
+        </p:nvCxnSpPr>
+        <p:spPr>
+          <a:xfrm rot="5400000" flipH="1" flipV="1">
+            <a:off x="13351753" y="-839863"/>
+            <a:ext cx="691242" cy="5438750"/>
+          </a:xfrm>
+          <a:prstGeom prst="bentConnector2">
+            <a:avLst/>
+          </a:prstGeom>
+          <a:ln w="38100">
+            <a:solidFill>
+              <a:schemeClr val="accent1"/>
+            </a:solidFill>
+          </a:ln>
+        </p:spPr>
+        <p:style>
+          <a:lnRef idx="1">
+            <a:schemeClr val="accent1"/>
+          </a:lnRef>
+          <a:fillRef idx="0">
+            <a:schemeClr val="accent1"/>
+          </a:fillRef>
+          <a:effectRef idx="0">
+            <a:schemeClr val="accent1"/>
+          </a:effectRef>
+          <a:fontRef idx="minor">
+            <a:schemeClr val="tx1"/>
+          </a:fontRef>
+        </p:style>
+      </p:cxnSp>
+      <p:cxnSp>
+        <p:nvCxnSpPr>
+          <p:cNvPr id="78" name="Elbow Connector 77">
+            <a:extLst>
+              <a:ext uri="{FF2B5EF4-FFF2-40B4-BE49-F238E27FC236}">
+                <a16:creationId xmlns:a16="http://schemas.microsoft.com/office/drawing/2014/main" id="{0CCD4069-EA92-FB6E-7F5D-315697DEDB13}"/>
+              </a:ext>
+            </a:extLst>
+          </p:cNvPr>
+          <p:cNvCxnSpPr>
+            <a:cxnSpLocks/>
+          </p:cNvCxnSpPr>
+          <p:nvPr/>
+        </p:nvCxnSpPr>
+        <p:spPr>
+          <a:xfrm rot="5400000">
+            <a:off x="13002332" y="4173270"/>
+            <a:ext cx="6053796" cy="775038"/>
+          </a:xfrm>
+          <a:prstGeom prst="bentConnector3">
+            <a:avLst>
+              <a:gd name="adj1" fmla="val 99929"/>
+            </a:avLst>
+          </a:prstGeom>
+          <a:ln w="38100">
+            <a:solidFill>
+              <a:schemeClr val="accent1"/>
+            </a:solidFill>
+            <a:tailEnd type="triangle"/>
+          </a:ln>
+        </p:spPr>
+        <p:style>
+          <a:lnRef idx="1">
+            <a:schemeClr val="accent1"/>
+          </a:lnRef>
+          <a:fillRef idx="0">
+            <a:schemeClr val="accent1"/>
+          </a:fillRef>
+          <a:effectRef idx="0">
+            <a:schemeClr val="accent1"/>
+          </a:effectRef>
+          <a:fontRef idx="minor">
+            <a:schemeClr val="tx1"/>
+          </a:fontRef>
+        </p:style>
+      </p:cxnSp>
+      <p:sp>
+        <p:nvSpPr>
+          <p:cNvPr id="94" name="TextBox 93">
+            <a:extLst>
+              <a:ext uri="{FF2B5EF4-FFF2-40B4-BE49-F238E27FC236}">
+                <a16:creationId xmlns:a16="http://schemas.microsoft.com/office/drawing/2014/main" id="{0C646415-FDF9-9D16-30D9-83B3C7A05D12}"/>
+              </a:ext>
+            </a:extLst>
+          </p:cNvPr>
+          <p:cNvSpPr txBox="1"/>
+          <p:nvPr/>
+        </p:nvSpPr>
+        <p:spPr>
+          <a:xfrm>
+            <a:off x="15997945" y="6729769"/>
+            <a:ext cx="877163" cy="461665"/>
+          </a:xfrm>
+          <a:prstGeom prst="rect">
+            <a:avLst/>
+          </a:prstGeom>
+          <a:solidFill>
+            <a:schemeClr val="bg1"/>
+          </a:solidFill>
+          <a:ln w="38100">
+            <a:solidFill>
+              <a:schemeClr val="accent1"/>
+            </a:solidFill>
+          </a:ln>
+        </p:spPr>
+        <p:txBody>
+          <a:bodyPr wrap="none" rtlCol="0">
+            <a:spAutoFit/>
+          </a:bodyPr>
+          <a:lstStyle/>
+          <a:p>
+            <a:r>
+              <a:rPr lang="en-US" sz="2400" b="1" dirty="0">
+                <a:latin typeface="Times New Roman" panose="02020603050405020304" pitchFamily="18" charset="0"/>
+                <a:cs typeface="Times New Roman" panose="02020603050405020304" pitchFamily="18" charset="0"/>
+              </a:rPr>
+              <a:t>0.419</a:t>
+            </a:r>
+          </a:p>
+        </p:txBody>
+      </p:sp>
+      <p:cxnSp>
+        <p:nvCxnSpPr>
+          <p:cNvPr id="99" name="Elbow Connector 98">
+            <a:extLst>
+              <a:ext uri="{FF2B5EF4-FFF2-40B4-BE49-F238E27FC236}">
+                <a16:creationId xmlns:a16="http://schemas.microsoft.com/office/drawing/2014/main" id="{65331E5B-8B10-E2E0-078C-02DFC8B1F7B4}"/>
+              </a:ext>
+            </a:extLst>
+          </p:cNvPr>
+          <p:cNvCxnSpPr>
+            <a:cxnSpLocks/>
+            <a:endCxn id="31" idx="1"/>
+          </p:cNvCxnSpPr>
+          <p:nvPr/>
+        </p:nvCxnSpPr>
+        <p:spPr>
+          <a:xfrm>
+            <a:off x="7403218" y="5482158"/>
+            <a:ext cx="6237516" cy="2564412"/>
+          </a:xfrm>
+          <a:prstGeom prst="bentConnector3">
+            <a:avLst>
+              <a:gd name="adj1" fmla="val 320"/>
+            </a:avLst>
+          </a:prstGeom>
+          <a:ln w="38100">
+            <a:solidFill>
+              <a:srgbClr val="C00000"/>
+            </a:solidFill>
+            <a:tailEnd type="triangle"/>
+          </a:ln>
+        </p:spPr>
+        <p:style>
+          <a:lnRef idx="1">
+            <a:schemeClr val="accent1"/>
+          </a:lnRef>
+          <a:fillRef idx="0">
+            <a:schemeClr val="accent1"/>
+          </a:fillRef>
+          <a:effectRef idx="0">
+            <a:schemeClr val="accent1"/>
+          </a:effectRef>
+          <a:fontRef idx="minor">
+            <a:schemeClr val="tx1"/>
+          </a:fontRef>
+        </p:style>
+      </p:cxnSp>
+      <p:sp>
+        <p:nvSpPr>
+          <p:cNvPr id="100" name="TextBox 99">
+            <a:extLst>
+              <a:ext uri="{FF2B5EF4-FFF2-40B4-BE49-F238E27FC236}">
+                <a16:creationId xmlns:a16="http://schemas.microsoft.com/office/drawing/2014/main" id="{D14BF808-B0AB-2936-D1B5-E97E66CBECFB}"/>
+              </a:ext>
+            </a:extLst>
+          </p:cNvPr>
+          <p:cNvSpPr txBox="1"/>
+          <p:nvPr/>
+        </p:nvSpPr>
+        <p:spPr>
+          <a:xfrm>
+            <a:off x="6958148" y="6650442"/>
+            <a:ext cx="979755" cy="461665"/>
+          </a:xfrm>
+          <a:prstGeom prst="rect">
+            <a:avLst/>
+          </a:prstGeom>
+          <a:solidFill>
+            <a:schemeClr val="bg1"/>
+          </a:solidFill>
+          <a:ln w="41656">
+            <a:solidFill>
+              <a:srgbClr val="C00000"/>
+            </a:solidFill>
+          </a:ln>
+        </p:spPr>
+        <p:txBody>
+          <a:bodyPr wrap="none" rtlCol="0">
+            <a:spAutoFit/>
+          </a:bodyPr>
+          <a:lstStyle/>
+          <a:p>
+            <a:r>
+              <a:rPr lang="en-US" sz="2400" b="1" dirty="0">
+                <a:latin typeface="Times New Roman" panose="02020603050405020304" pitchFamily="18" charset="0"/>
+                <a:cs typeface="Times New Roman" panose="02020603050405020304" pitchFamily="18" charset="0"/>
+              </a:rPr>
+              <a:t>-0.178</a:t>
+            </a:r>
+          </a:p>
+        </p:txBody>
+      </p:sp>
+      <p:cxnSp>
+        <p:nvCxnSpPr>
+          <p:cNvPr id="124" name="Straight Arrow Connector 123">
+            <a:extLst>
+              <a:ext uri="{FF2B5EF4-FFF2-40B4-BE49-F238E27FC236}">
+                <a16:creationId xmlns:a16="http://schemas.microsoft.com/office/drawing/2014/main" id="{B203D618-5076-9892-5C0D-A178A8150F2D}"/>
+              </a:ext>
+            </a:extLst>
+          </p:cNvPr>
+          <p:cNvCxnSpPr>
+            <a:cxnSpLocks/>
+          </p:cNvCxnSpPr>
+          <p:nvPr/>
+        </p:nvCxnSpPr>
+        <p:spPr>
+          <a:xfrm>
+            <a:off x="11004974" y="2913671"/>
+            <a:ext cx="0" cy="1874002"/>
+          </a:xfrm>
+          <a:prstGeom prst="straightConnector1">
+            <a:avLst/>
+          </a:prstGeom>
+          <a:ln w="38100">
+            <a:solidFill>
+              <a:schemeClr val="accent1"/>
+            </a:solidFill>
+            <a:prstDash val="solid"/>
+            <a:tailEnd type="triangle"/>
+          </a:ln>
+        </p:spPr>
+        <p:style>
+          <a:lnRef idx="1">
+            <a:schemeClr val="accent1"/>
+          </a:lnRef>
+          <a:fillRef idx="0">
+            <a:schemeClr val="accent1"/>
+          </a:fillRef>
+          <a:effectRef idx="0">
+            <a:schemeClr val="accent1"/>
+          </a:effectRef>
+          <a:fontRef idx="minor">
+            <a:schemeClr val="tx1"/>
+          </a:fontRef>
+        </p:style>
+      </p:cxnSp>
+      <p:sp>
+        <p:nvSpPr>
+          <p:cNvPr id="125" name="TextBox 124">
+            <a:extLst>
+              <a:ext uri="{FF2B5EF4-FFF2-40B4-BE49-F238E27FC236}">
+                <a16:creationId xmlns:a16="http://schemas.microsoft.com/office/drawing/2014/main" id="{66CC9E99-4165-01CD-F030-91153B3233BC}"/>
+              </a:ext>
+            </a:extLst>
+          </p:cNvPr>
+          <p:cNvSpPr txBox="1"/>
+          <p:nvPr/>
+        </p:nvSpPr>
+        <p:spPr>
+          <a:xfrm>
+            <a:off x="10589181" y="3936013"/>
+            <a:ext cx="877163" cy="461665"/>
+          </a:xfrm>
+          <a:prstGeom prst="rect">
+            <a:avLst/>
+          </a:prstGeom>
+          <a:solidFill>
+            <a:schemeClr val="bg1"/>
+          </a:solidFill>
+          <a:ln w="38100">
+            <a:solidFill>
+              <a:schemeClr val="accent1"/>
+            </a:solidFill>
+            <a:prstDash val="solid"/>
+          </a:ln>
+        </p:spPr>
+        <p:txBody>
+          <a:bodyPr wrap="none" rtlCol="0">
+            <a:spAutoFit/>
+          </a:bodyPr>
+          <a:lstStyle/>
+          <a:p>
+            <a:r>
+              <a:rPr lang="en-US" sz="2400" b="1" dirty="0">
+                <a:latin typeface="Times New Roman" panose="02020603050405020304" pitchFamily="18" charset="0"/>
+                <a:cs typeface="Times New Roman" panose="02020603050405020304" pitchFamily="18" charset="0"/>
+              </a:rPr>
+              <a:t>0.892</a:t>
+            </a:r>
+          </a:p>
+        </p:txBody>
+      </p:sp>
+      <p:cxnSp>
+        <p:nvCxnSpPr>
+          <p:cNvPr id="147" name="Straight Arrow Connector 146">
+            <a:extLst>
+              <a:ext uri="{FF2B5EF4-FFF2-40B4-BE49-F238E27FC236}">
+                <a16:creationId xmlns:a16="http://schemas.microsoft.com/office/drawing/2014/main" id="{984AC8F7-3822-46E8-1139-BD5738E776DD}"/>
+              </a:ext>
+            </a:extLst>
+          </p:cNvPr>
+          <p:cNvCxnSpPr>
+            <a:stCxn id="26" idx="1"/>
+            <a:endCxn id="25" idx="3"/>
+          </p:cNvCxnSpPr>
+          <p:nvPr/>
+        </p:nvCxnSpPr>
+        <p:spPr>
+          <a:xfrm flipH="1">
+            <a:off x="8382001" y="5486402"/>
+            <a:ext cx="1632858" cy="0"/>
+          </a:xfrm>
+          <a:prstGeom prst="straightConnector1">
+            <a:avLst/>
+          </a:prstGeom>
+          <a:ln w="38100">
+            <a:tailEnd type="triangle"/>
+          </a:ln>
+        </p:spPr>
+        <p:style>
+          <a:lnRef idx="1">
+            <a:schemeClr val="accent1"/>
+          </a:lnRef>
+          <a:fillRef idx="0">
+            <a:schemeClr val="accent1"/>
+          </a:fillRef>
+          <a:effectRef idx="0">
+            <a:schemeClr val="accent1"/>
+          </a:effectRef>
+          <a:fontRef idx="minor">
+            <a:schemeClr val="tx1"/>
+          </a:fontRef>
+        </p:style>
+      </p:cxnSp>
+      <p:sp>
+        <p:nvSpPr>
+          <p:cNvPr id="25" name="Rectangle 24">
+            <a:extLst>
+              <a:ext uri="{FF2B5EF4-FFF2-40B4-BE49-F238E27FC236}">
+                <a16:creationId xmlns:a16="http://schemas.microsoft.com/office/drawing/2014/main" id="{82AC0384-6387-7D57-8EB4-896E679A9F4F}"/>
+              </a:ext>
+            </a:extLst>
+          </p:cNvPr>
+          <p:cNvSpPr/>
+          <p:nvPr/>
+        </p:nvSpPr>
+        <p:spPr>
+          <a:xfrm>
+            <a:off x="6400801" y="4795159"/>
+            <a:ext cx="1981200" cy="1382486"/>
+          </a:xfrm>
+          <a:prstGeom prst="rect">
+            <a:avLst/>
+          </a:prstGeom>
+          <a:solidFill>
+            <a:schemeClr val="bg1"/>
+          </a:solidFill>
+          <a:ln w="38100">
+            <a:solidFill>
+              <a:schemeClr val="tx1"/>
+            </a:solidFill>
+          </a:ln>
+        </p:spPr>
+        <p:style>
+          <a:lnRef idx="2">
+            <a:schemeClr val="accent1">
+              <a:shade val="50000"/>
+            </a:schemeClr>
+          </a:lnRef>
+          <a:fillRef idx="1">
+            <a:schemeClr val="accent1"/>
+          </a:fillRef>
+          <a:effectRef idx="0">
+            <a:schemeClr val="accent1"/>
+          </a:effectRef>
+          <a:fontRef idx="minor">
+            <a:schemeClr val="lt1"/>
+          </a:fontRef>
+        </p:style>
+        <p:txBody>
+          <a:bodyPr rtlCol="0" anchor="ctr"/>
+          <a:lstStyle/>
+          <a:p>
+            <a:pPr algn="ctr"/>
+            <a:r>
+              <a:rPr lang="el-GR" sz="3000" i="1" dirty="0">
+                <a:solidFill>
+                  <a:schemeClr val="tx1"/>
+                </a:solidFill>
+                <a:latin typeface="Times New Roman" panose="02020603050405020304" pitchFamily="18" charset="0"/>
+                <a:cs typeface="Times New Roman" panose="02020603050405020304" pitchFamily="18" charset="0"/>
+              </a:rPr>
+              <a:t>β</a:t>
+            </a:r>
+            <a:endParaRPr lang="en-US" sz="3000" i="1" dirty="0">
+              <a:solidFill>
+                <a:schemeClr val="tx1"/>
+              </a:solidFill>
+              <a:latin typeface="Times New Roman" panose="02020603050405020304" pitchFamily="18" charset="0"/>
+              <a:cs typeface="Times New Roman" panose="02020603050405020304" pitchFamily="18" charset="0"/>
+            </a:endParaRPr>
+          </a:p>
+        </p:txBody>
+      </p:sp>
+      <p:sp>
+        <p:nvSpPr>
+          <p:cNvPr id="23" name="Rectangle 22">
+            <a:extLst>
+              <a:ext uri="{FF2B5EF4-FFF2-40B4-BE49-F238E27FC236}">
+                <a16:creationId xmlns:a16="http://schemas.microsoft.com/office/drawing/2014/main" id="{542EBF9B-B494-6BAC-662C-17157CAC7101}"/>
+              </a:ext>
+            </a:extLst>
+          </p:cNvPr>
+          <p:cNvSpPr/>
+          <p:nvPr/>
+        </p:nvSpPr>
+        <p:spPr>
+          <a:xfrm>
+            <a:off x="13628917" y="4794743"/>
+            <a:ext cx="1981200" cy="1382486"/>
+          </a:xfrm>
+          <a:prstGeom prst="rect">
+            <a:avLst/>
+          </a:prstGeom>
+          <a:noFill/>
+          <a:ln w="38100">
+            <a:solidFill>
+              <a:schemeClr val="tx1"/>
+            </a:solidFill>
+          </a:ln>
+        </p:spPr>
+        <p:style>
+          <a:lnRef idx="2">
+            <a:schemeClr val="accent1">
+              <a:shade val="50000"/>
+            </a:schemeClr>
+          </a:lnRef>
+          <a:fillRef idx="1">
+            <a:schemeClr val="accent1"/>
+          </a:fillRef>
+          <a:effectRef idx="0">
+            <a:schemeClr val="accent1"/>
+          </a:effectRef>
+          <a:fontRef idx="minor">
+            <a:schemeClr val="lt1"/>
+          </a:fontRef>
+        </p:style>
+        <p:txBody>
+          <a:bodyPr rtlCol="0" anchor="ctr"/>
+          <a:lstStyle/>
+          <a:p>
+            <a:pPr algn="ctr"/>
+            <a:r>
+              <a:rPr lang="en-US" sz="3000" i="1" dirty="0">
+                <a:solidFill>
+                  <a:schemeClr val="tx1"/>
+                </a:solidFill>
+                <a:latin typeface="Times New Roman" panose="02020603050405020304" pitchFamily="18" charset="0"/>
+                <a:cs typeface="Times New Roman" panose="02020603050405020304" pitchFamily="18" charset="0"/>
+              </a:rPr>
+              <a:t>Air </a:t>
+            </a:r>
+            <a:r>
+              <a:rPr lang="en-US" sz="2900" i="1" dirty="0">
+                <a:solidFill>
+                  <a:schemeClr val="tx1"/>
+                </a:solidFill>
+                <a:latin typeface="Times New Roman" panose="02020603050405020304" pitchFamily="18" charset="0"/>
+                <a:cs typeface="Times New Roman" panose="02020603050405020304" pitchFamily="18" charset="0"/>
+              </a:rPr>
+              <a:t>temperature</a:t>
+            </a:r>
+          </a:p>
+        </p:txBody>
+      </p:sp>
+      <p:sp>
+        <p:nvSpPr>
+          <p:cNvPr id="31" name="Rectangle 30">
+            <a:extLst>
+              <a:ext uri="{FF2B5EF4-FFF2-40B4-BE49-F238E27FC236}">
+                <a16:creationId xmlns:a16="http://schemas.microsoft.com/office/drawing/2014/main" id="{8B74F445-A52C-CC92-5C9F-26A6C584DFB7}"/>
+              </a:ext>
+            </a:extLst>
+          </p:cNvPr>
+          <p:cNvSpPr/>
+          <p:nvPr/>
+        </p:nvSpPr>
+        <p:spPr>
+          <a:xfrm>
+            <a:off x="13640734" y="7355327"/>
+            <a:ext cx="1981200" cy="1382486"/>
+          </a:xfrm>
+          <a:prstGeom prst="rect">
+            <a:avLst/>
+          </a:prstGeom>
+          <a:solidFill>
+            <a:schemeClr val="bg1"/>
+          </a:solidFill>
+          <a:ln w="38100">
+            <a:solidFill>
+              <a:schemeClr val="tx1"/>
+            </a:solidFill>
+          </a:ln>
+        </p:spPr>
+        <p:style>
+          <a:lnRef idx="2">
+            <a:schemeClr val="accent1">
+              <a:shade val="50000"/>
+            </a:schemeClr>
+          </a:lnRef>
+          <a:fillRef idx="1">
+            <a:schemeClr val="accent1"/>
+          </a:fillRef>
+          <a:effectRef idx="0">
+            <a:schemeClr val="accent1"/>
+          </a:effectRef>
+          <a:fontRef idx="minor">
+            <a:schemeClr val="lt1"/>
+          </a:fontRef>
+        </p:style>
+        <p:txBody>
+          <a:bodyPr rtlCol="0" anchor="ctr"/>
+          <a:lstStyle/>
+          <a:p>
+            <a:pPr algn="ctr"/>
+            <a:r>
+              <a:rPr lang="en-US" sz="3000" i="1" dirty="0">
+                <a:solidFill>
+                  <a:schemeClr val="tx1"/>
+                </a:solidFill>
+                <a:latin typeface="Times New Roman" panose="02020603050405020304" pitchFamily="18" charset="0"/>
+                <a:cs typeface="Times New Roman" panose="02020603050405020304" pitchFamily="18" charset="0"/>
+              </a:rPr>
+              <a:t>Leaf nitrogen</a:t>
+            </a:r>
+          </a:p>
+        </p:txBody>
+      </p:sp>
+      <p:sp>
+        <p:nvSpPr>
+          <p:cNvPr id="32" name="Rectangle 31">
+            <a:extLst>
+              <a:ext uri="{FF2B5EF4-FFF2-40B4-BE49-F238E27FC236}">
+                <a16:creationId xmlns:a16="http://schemas.microsoft.com/office/drawing/2014/main" id="{0AFF0E83-3D3A-DE04-9CB6-1D10465ADD2C}"/>
+              </a:ext>
+            </a:extLst>
+          </p:cNvPr>
+          <p:cNvSpPr/>
+          <p:nvPr/>
+        </p:nvSpPr>
+        <p:spPr>
+          <a:xfrm>
+            <a:off x="2786743" y="7358743"/>
+            <a:ext cx="1981200" cy="1382486"/>
+          </a:xfrm>
+          <a:prstGeom prst="rect">
+            <a:avLst/>
+          </a:prstGeom>
+          <a:solidFill>
+            <a:schemeClr val="bg1"/>
+          </a:solidFill>
+          <a:ln w="38100">
+            <a:solidFill>
+              <a:schemeClr val="tx1"/>
+            </a:solidFill>
+          </a:ln>
+        </p:spPr>
+        <p:style>
+          <a:lnRef idx="2">
+            <a:schemeClr val="accent1">
+              <a:shade val="50000"/>
+            </a:schemeClr>
+          </a:lnRef>
+          <a:fillRef idx="1">
+            <a:schemeClr val="accent1"/>
+          </a:fillRef>
+          <a:effectRef idx="0">
+            <a:schemeClr val="accent1"/>
+          </a:effectRef>
+          <a:fontRef idx="minor">
+            <a:schemeClr val="lt1"/>
+          </a:fontRef>
+        </p:style>
+        <p:txBody>
+          <a:bodyPr rtlCol="0" anchor="ctr"/>
+          <a:lstStyle/>
+          <a:p>
+            <a:pPr algn="ctr"/>
+            <a:r>
+              <a:rPr lang="en-US" sz="3000" i="1" dirty="0">
+                <a:solidFill>
+                  <a:schemeClr val="tx1"/>
+                </a:solidFill>
+                <a:latin typeface="Times New Roman" panose="02020603050405020304" pitchFamily="18" charset="0"/>
+                <a:cs typeface="Times New Roman" panose="02020603050405020304" pitchFamily="18" charset="0"/>
+              </a:rPr>
+              <a:t>Soil nitrogen</a:t>
+            </a:r>
+          </a:p>
+        </p:txBody>
+      </p:sp>
+      <p:sp>
+        <p:nvSpPr>
+          <p:cNvPr id="39" name="Rectangle 38">
+            <a:extLst>
+              <a:ext uri="{FF2B5EF4-FFF2-40B4-BE49-F238E27FC236}">
+                <a16:creationId xmlns:a16="http://schemas.microsoft.com/office/drawing/2014/main" id="{4A8AC9D3-A0FE-BAD6-937E-7D5A2722D60C}"/>
+              </a:ext>
+            </a:extLst>
+          </p:cNvPr>
+          <p:cNvSpPr/>
+          <p:nvPr/>
+        </p:nvSpPr>
+        <p:spPr>
+          <a:xfrm>
+            <a:off x="2786743" y="2231572"/>
+            <a:ext cx="1981200" cy="1382486"/>
+          </a:xfrm>
+          <a:prstGeom prst="rect">
+            <a:avLst/>
+          </a:prstGeom>
+          <a:noFill/>
+          <a:ln w="38100">
+            <a:solidFill>
+              <a:schemeClr val="tx1"/>
+            </a:solidFill>
+          </a:ln>
+        </p:spPr>
+        <p:style>
+          <a:lnRef idx="2">
+            <a:schemeClr val="accent1">
+              <a:shade val="50000"/>
+            </a:schemeClr>
+          </a:lnRef>
+          <a:fillRef idx="1">
+            <a:schemeClr val="accent1"/>
+          </a:fillRef>
+          <a:effectRef idx="0">
+            <a:schemeClr val="accent1"/>
+          </a:effectRef>
+          <a:fontRef idx="minor">
+            <a:schemeClr val="lt1"/>
+          </a:fontRef>
+        </p:style>
+        <p:txBody>
+          <a:bodyPr rtlCol="0" anchor="ctr"/>
+          <a:lstStyle/>
+          <a:p>
+            <a:pPr algn="ctr"/>
+            <a:r>
+              <a:rPr lang="en-US" sz="3000" i="1" dirty="0">
+                <a:solidFill>
+                  <a:schemeClr val="tx1"/>
+                </a:solidFill>
+                <a:latin typeface="Times New Roman" panose="02020603050405020304" pitchFamily="18" charset="0"/>
+                <a:cs typeface="Times New Roman" panose="02020603050405020304" pitchFamily="18" charset="0"/>
+              </a:rPr>
+              <a:t>Soil moisture</a:t>
+            </a:r>
+          </a:p>
+        </p:txBody>
+      </p:sp>
+      <p:sp>
+        <p:nvSpPr>
+          <p:cNvPr id="10" name="Rectangle 9">
+            <a:extLst>
+              <a:ext uri="{FF2B5EF4-FFF2-40B4-BE49-F238E27FC236}">
+                <a16:creationId xmlns:a16="http://schemas.microsoft.com/office/drawing/2014/main" id="{BDB2735C-7F63-29A4-69B1-67E4D8E0C79C}"/>
+              </a:ext>
+            </a:extLst>
+          </p:cNvPr>
+          <p:cNvSpPr/>
+          <p:nvPr/>
+        </p:nvSpPr>
+        <p:spPr>
+          <a:xfrm>
+            <a:off x="6412615" y="2234987"/>
+            <a:ext cx="1981200" cy="1382486"/>
+          </a:xfrm>
+          <a:prstGeom prst="rect">
+            <a:avLst/>
+          </a:prstGeom>
+          <a:solidFill>
+            <a:schemeClr val="bg1"/>
+          </a:solidFill>
+          <a:ln w="38100">
+            <a:solidFill>
+              <a:schemeClr val="tx1"/>
+            </a:solidFill>
+          </a:ln>
+        </p:spPr>
+        <p:style>
+          <a:lnRef idx="2">
+            <a:schemeClr val="accent1">
+              <a:shade val="50000"/>
+            </a:schemeClr>
+          </a:lnRef>
+          <a:fillRef idx="1">
+            <a:schemeClr val="accent1"/>
+          </a:fillRef>
+          <a:effectRef idx="0">
+            <a:schemeClr val="accent1"/>
+          </a:effectRef>
+          <a:fontRef idx="minor">
+            <a:schemeClr val="lt1"/>
+          </a:fontRef>
+        </p:style>
+        <p:txBody>
+          <a:bodyPr rtlCol="0" anchor="ctr"/>
+          <a:lstStyle/>
+          <a:p>
+            <a:pPr algn="ctr"/>
+            <a:r>
+              <a:rPr lang="en-US" sz="3000" i="1" dirty="0">
+                <a:solidFill>
+                  <a:schemeClr val="tx1"/>
+                </a:solidFill>
+                <a:latin typeface="Times New Roman" panose="02020603050405020304" pitchFamily="18" charset="0"/>
+                <a:cs typeface="Times New Roman" panose="02020603050405020304" pitchFamily="18" charset="0"/>
+              </a:rPr>
+              <a:t>N fixation ability</a:t>
+            </a:r>
+          </a:p>
+        </p:txBody>
+      </p:sp>
+      <p:sp>
+        <p:nvSpPr>
+          <p:cNvPr id="21" name="Rectangle 20">
+            <a:extLst>
+              <a:ext uri="{FF2B5EF4-FFF2-40B4-BE49-F238E27FC236}">
+                <a16:creationId xmlns:a16="http://schemas.microsoft.com/office/drawing/2014/main" id="{2A451EDF-2134-D951-F607-AE0DC624C032}"/>
+              </a:ext>
+            </a:extLst>
+          </p:cNvPr>
+          <p:cNvSpPr/>
+          <p:nvPr/>
+        </p:nvSpPr>
+        <p:spPr>
+          <a:xfrm>
+            <a:off x="10014859" y="2227564"/>
+            <a:ext cx="1981200" cy="1382486"/>
+          </a:xfrm>
+          <a:prstGeom prst="rect">
+            <a:avLst/>
+          </a:prstGeom>
+          <a:solidFill>
+            <a:schemeClr val="bg1"/>
+          </a:solidFill>
+          <a:ln w="38100">
+            <a:solidFill>
+              <a:schemeClr val="tx1"/>
+            </a:solidFill>
+          </a:ln>
+        </p:spPr>
+        <p:style>
+          <a:lnRef idx="2">
+            <a:schemeClr val="accent1">
+              <a:shade val="50000"/>
+            </a:schemeClr>
+          </a:lnRef>
+          <a:fillRef idx="1">
+            <a:schemeClr val="accent1"/>
+          </a:fillRef>
+          <a:effectRef idx="0">
+            <a:schemeClr val="accent1"/>
+          </a:effectRef>
+          <a:fontRef idx="minor">
+            <a:schemeClr val="lt1"/>
+          </a:fontRef>
+        </p:style>
+        <p:txBody>
+          <a:bodyPr rtlCol="0" anchor="ctr"/>
+          <a:lstStyle/>
+          <a:p>
+            <a:pPr algn="ctr"/>
+            <a:r>
+              <a:rPr lang="en-US" sz="3000" i="1" dirty="0">
+                <a:solidFill>
+                  <a:schemeClr val="tx1"/>
+                </a:solidFill>
+                <a:latin typeface="Times New Roman" panose="02020603050405020304" pitchFamily="18" charset="0"/>
+                <a:cs typeface="Times New Roman" panose="02020603050405020304" pitchFamily="18" charset="0"/>
+              </a:rPr>
+              <a:t>Photo. pathway</a:t>
+            </a:r>
+          </a:p>
+        </p:txBody>
+      </p:sp>
+      <p:sp>
+        <p:nvSpPr>
+          <p:cNvPr id="26" name="Rectangle 25">
+            <a:extLst>
+              <a:ext uri="{FF2B5EF4-FFF2-40B4-BE49-F238E27FC236}">
+                <a16:creationId xmlns:a16="http://schemas.microsoft.com/office/drawing/2014/main" id="{B55C58BF-B54E-BA2F-D111-5037A627D595}"/>
+              </a:ext>
+            </a:extLst>
+          </p:cNvPr>
+          <p:cNvSpPr/>
+          <p:nvPr/>
+        </p:nvSpPr>
+        <p:spPr>
+          <a:xfrm>
+            <a:off x="10014859" y="4795159"/>
+            <a:ext cx="1981200" cy="1382486"/>
+          </a:xfrm>
+          <a:prstGeom prst="rect">
+            <a:avLst/>
+          </a:prstGeom>
+          <a:solidFill>
+            <a:schemeClr val="bg1">
+              <a:alpha val="75000"/>
+            </a:schemeClr>
+          </a:solidFill>
+          <a:ln w="38100">
+            <a:solidFill>
+              <a:schemeClr val="tx1"/>
+            </a:solidFill>
+          </a:ln>
+        </p:spPr>
+        <p:style>
+          <a:lnRef idx="2">
+            <a:schemeClr val="accent1">
+              <a:shade val="50000"/>
+            </a:schemeClr>
+          </a:lnRef>
+          <a:fillRef idx="1">
+            <a:schemeClr val="accent1"/>
+          </a:fillRef>
+          <a:effectRef idx="0">
+            <a:schemeClr val="accent1"/>
+          </a:effectRef>
+          <a:fontRef idx="minor">
+            <a:schemeClr val="lt1"/>
+          </a:fontRef>
+        </p:style>
+        <p:txBody>
+          <a:bodyPr rtlCol="0" anchor="ctr"/>
+          <a:lstStyle/>
+          <a:p>
+            <a:pPr algn="ctr"/>
+            <a:r>
+              <a:rPr lang="el-GR" sz="3000" i="1" dirty="0">
+                <a:solidFill>
+                  <a:schemeClr val="tx1"/>
+                </a:solidFill>
+                <a:latin typeface="Times New Roman" panose="02020603050405020304" pitchFamily="18" charset="0"/>
+                <a:cs typeface="Times New Roman" panose="02020603050405020304" pitchFamily="18" charset="0"/>
+              </a:rPr>
+              <a:t>χ</a:t>
+            </a:r>
+            <a:endParaRPr lang="en-US" sz="3000" i="1" dirty="0">
+              <a:solidFill>
+                <a:schemeClr val="tx1"/>
+              </a:solidFill>
+              <a:latin typeface="Times New Roman" panose="02020603050405020304" pitchFamily="18" charset="0"/>
+              <a:cs typeface="Times New Roman" panose="02020603050405020304" pitchFamily="18" charset="0"/>
+            </a:endParaRPr>
+          </a:p>
+        </p:txBody>
+      </p:sp>
+      <p:cxnSp>
+        <p:nvCxnSpPr>
+          <p:cNvPr id="172" name="Straight Arrow Connector 171">
+            <a:extLst>
+              <a:ext uri="{FF2B5EF4-FFF2-40B4-BE49-F238E27FC236}">
+                <a16:creationId xmlns:a16="http://schemas.microsoft.com/office/drawing/2014/main" id="{96C963D3-A037-AA03-21EE-F9FD4D30904A}"/>
+              </a:ext>
+            </a:extLst>
+          </p:cNvPr>
+          <p:cNvCxnSpPr>
+            <a:cxnSpLocks/>
+          </p:cNvCxnSpPr>
+          <p:nvPr/>
+        </p:nvCxnSpPr>
+        <p:spPr>
+          <a:xfrm flipH="1" flipV="1">
+            <a:off x="14598340" y="3627100"/>
+            <a:ext cx="934" cy="1127214"/>
+          </a:xfrm>
+          <a:prstGeom prst="straightConnector1">
+            <a:avLst/>
+          </a:prstGeom>
+          <a:ln w="38100">
+            <a:solidFill>
+              <a:srgbClr val="C00000"/>
+            </a:solidFill>
+            <a:prstDash val="solid"/>
+            <a:tailEnd type="triangle"/>
+          </a:ln>
+        </p:spPr>
+        <p:style>
+          <a:lnRef idx="1">
+            <a:schemeClr val="accent1"/>
+          </a:lnRef>
+          <a:fillRef idx="0">
+            <a:schemeClr val="accent1"/>
+          </a:fillRef>
+          <a:effectRef idx="0">
+            <a:schemeClr val="accent1"/>
+          </a:effectRef>
+          <a:fontRef idx="minor">
+            <a:schemeClr val="tx1"/>
+          </a:fontRef>
+        </p:style>
+      </p:cxnSp>
+      <p:sp>
+        <p:nvSpPr>
+          <p:cNvPr id="173" name="TextBox 172">
+            <a:extLst>
+              <a:ext uri="{FF2B5EF4-FFF2-40B4-BE49-F238E27FC236}">
+                <a16:creationId xmlns:a16="http://schemas.microsoft.com/office/drawing/2014/main" id="{12BFA210-1EF0-9547-4715-BA37CF7BD3EB}"/>
+              </a:ext>
+            </a:extLst>
+          </p:cNvPr>
+          <p:cNvSpPr txBox="1"/>
+          <p:nvPr/>
+        </p:nvSpPr>
+        <p:spPr>
+          <a:xfrm>
+            <a:off x="14096691" y="3935283"/>
+            <a:ext cx="979755" cy="461665"/>
+          </a:xfrm>
+          <a:prstGeom prst="rect">
+            <a:avLst/>
+          </a:prstGeom>
+          <a:solidFill>
+            <a:schemeClr val="bg1"/>
+          </a:solidFill>
+          <a:ln w="39878">
+            <a:solidFill>
+              <a:srgbClr val="C00000"/>
+            </a:solidFill>
+            <a:prstDash val="solid"/>
+          </a:ln>
+        </p:spPr>
+        <p:txBody>
+          <a:bodyPr wrap="none" rtlCol="0">
+            <a:spAutoFit/>
+          </a:bodyPr>
+          <a:lstStyle/>
+          <a:p>
+            <a:r>
+              <a:rPr lang="en-US" sz="2400" b="1" dirty="0">
+                <a:latin typeface="Times New Roman" panose="02020603050405020304" pitchFamily="18" charset="0"/>
+                <a:cs typeface="Times New Roman" panose="02020603050405020304" pitchFamily="18" charset="0"/>
+              </a:rPr>
+              <a:t>-0.547</a:t>
+            </a:r>
+          </a:p>
+        </p:txBody>
+      </p:sp>
+      <p:sp>
+        <p:nvSpPr>
+          <p:cNvPr id="22" name="Rectangle 21">
+            <a:extLst>
+              <a:ext uri="{FF2B5EF4-FFF2-40B4-BE49-F238E27FC236}">
+                <a16:creationId xmlns:a16="http://schemas.microsoft.com/office/drawing/2014/main" id="{295B61D5-3809-B67F-F28A-43F8F95032C1}"/>
+              </a:ext>
+            </a:extLst>
+          </p:cNvPr>
+          <p:cNvSpPr/>
+          <p:nvPr/>
+        </p:nvSpPr>
+        <p:spPr>
+          <a:xfrm>
+            <a:off x="13609141" y="2234987"/>
+            <a:ext cx="1981200" cy="1382486"/>
+          </a:xfrm>
+          <a:prstGeom prst="rect">
+            <a:avLst/>
+          </a:prstGeom>
+          <a:solidFill>
+            <a:schemeClr val="bg1"/>
+          </a:solidFill>
+          <a:ln w="38100">
+            <a:solidFill>
+              <a:schemeClr val="tx1"/>
+            </a:solidFill>
+          </a:ln>
+        </p:spPr>
+        <p:style>
+          <a:lnRef idx="2">
+            <a:schemeClr val="accent1">
+              <a:shade val="50000"/>
+            </a:schemeClr>
+          </a:lnRef>
+          <a:fillRef idx="1">
+            <a:schemeClr val="accent1"/>
+          </a:fillRef>
+          <a:effectRef idx="0">
+            <a:schemeClr val="accent1"/>
+          </a:effectRef>
+          <a:fontRef idx="minor">
+            <a:schemeClr val="lt1"/>
+          </a:fontRef>
+        </p:style>
+        <p:txBody>
+          <a:bodyPr rtlCol="0" anchor="ctr"/>
+          <a:lstStyle/>
+          <a:p>
+            <a:pPr algn="ctr"/>
+            <a:r>
+              <a:rPr lang="en-US" sz="3000" i="1" dirty="0">
+                <a:solidFill>
+                  <a:schemeClr val="tx1"/>
+                </a:solidFill>
+                <a:latin typeface="Times New Roman" panose="02020603050405020304" pitchFamily="18" charset="0"/>
+                <a:cs typeface="Times New Roman" panose="02020603050405020304" pitchFamily="18" charset="0"/>
+              </a:rPr>
+              <a:t>Vapor pressure deficit</a:t>
+            </a:r>
+          </a:p>
+        </p:txBody>
+      </p:sp>
+      <p:cxnSp>
+        <p:nvCxnSpPr>
+          <p:cNvPr id="175" name="Elbow Connector 174">
+            <a:extLst>
+              <a:ext uri="{FF2B5EF4-FFF2-40B4-BE49-F238E27FC236}">
+                <a16:creationId xmlns:a16="http://schemas.microsoft.com/office/drawing/2014/main" id="{629DB861-A3E9-4840-7238-A52E0BFB937F}"/>
+              </a:ext>
+            </a:extLst>
+          </p:cNvPr>
+          <p:cNvCxnSpPr>
+            <a:stCxn id="22" idx="1"/>
+          </p:cNvCxnSpPr>
+          <p:nvPr/>
+        </p:nvCxnSpPr>
+        <p:spPr>
+          <a:xfrm rot="10800000" flipV="1">
+            <a:off x="12812489" y="2926230"/>
+            <a:ext cx="796653" cy="2039470"/>
+          </a:xfrm>
+          <a:prstGeom prst="bentConnector2">
+            <a:avLst/>
+          </a:prstGeom>
+          <a:ln w="38100">
+            <a:solidFill>
+              <a:srgbClr val="C00000"/>
+            </a:solidFill>
+          </a:ln>
+        </p:spPr>
+        <p:style>
+          <a:lnRef idx="1">
+            <a:schemeClr val="accent1"/>
+          </a:lnRef>
+          <a:fillRef idx="0">
+            <a:schemeClr val="accent1"/>
+          </a:fillRef>
+          <a:effectRef idx="0">
+            <a:schemeClr val="accent1"/>
+          </a:effectRef>
+          <a:fontRef idx="minor">
+            <a:schemeClr val="tx1"/>
+          </a:fontRef>
+        </p:style>
+      </p:cxnSp>
+      <p:cxnSp>
+        <p:nvCxnSpPr>
+          <p:cNvPr id="177" name="Straight Arrow Connector 176">
+            <a:extLst>
+              <a:ext uri="{FF2B5EF4-FFF2-40B4-BE49-F238E27FC236}">
+                <a16:creationId xmlns:a16="http://schemas.microsoft.com/office/drawing/2014/main" id="{0A4B64FD-2DE2-AF98-FA08-FD9285A71FA9}"/>
+              </a:ext>
+            </a:extLst>
+          </p:cNvPr>
+          <p:cNvCxnSpPr/>
+          <p:nvPr/>
+        </p:nvCxnSpPr>
+        <p:spPr>
+          <a:xfrm flipH="1">
+            <a:off x="12021459" y="4965700"/>
+            <a:ext cx="816429" cy="0"/>
+          </a:xfrm>
+          <a:prstGeom prst="straightConnector1">
+            <a:avLst/>
+          </a:prstGeom>
+          <a:ln w="38100">
+            <a:solidFill>
+              <a:srgbClr val="C00000"/>
+            </a:solidFill>
+            <a:tailEnd type="triangle"/>
+          </a:ln>
+        </p:spPr>
+        <p:style>
+          <a:lnRef idx="1">
+            <a:schemeClr val="accent1"/>
+          </a:lnRef>
+          <a:fillRef idx="0">
+            <a:schemeClr val="accent1"/>
+          </a:fillRef>
+          <a:effectRef idx="0">
+            <a:schemeClr val="accent1"/>
+          </a:effectRef>
+          <a:fontRef idx="minor">
+            <a:schemeClr val="tx1"/>
+          </a:fontRef>
+        </p:style>
+      </p:cxnSp>
+      <p:sp>
+        <p:nvSpPr>
+          <p:cNvPr id="178" name="TextBox 177">
+            <a:extLst>
+              <a:ext uri="{FF2B5EF4-FFF2-40B4-BE49-F238E27FC236}">
+                <a16:creationId xmlns:a16="http://schemas.microsoft.com/office/drawing/2014/main" id="{591DC4B8-EF7C-9623-380E-8EC9F506BCC0}"/>
+              </a:ext>
+            </a:extLst>
+          </p:cNvPr>
+          <p:cNvSpPr txBox="1"/>
+          <p:nvPr/>
+        </p:nvSpPr>
+        <p:spPr>
+          <a:xfrm>
+            <a:off x="12320211" y="3935283"/>
+            <a:ext cx="979755" cy="461665"/>
+          </a:xfrm>
+          <a:prstGeom prst="rect">
+            <a:avLst/>
+          </a:prstGeom>
+          <a:solidFill>
+            <a:schemeClr val="bg1"/>
+          </a:solidFill>
+          <a:ln w="39878">
+            <a:solidFill>
+              <a:srgbClr val="C00000"/>
+            </a:solidFill>
+            <a:prstDash val="solid"/>
+          </a:ln>
+        </p:spPr>
+        <p:txBody>
+          <a:bodyPr wrap="none" rtlCol="0">
+            <a:spAutoFit/>
+          </a:bodyPr>
+          <a:lstStyle/>
+          <a:p>
+            <a:r>
+              <a:rPr lang="en-US" sz="2400" b="1" dirty="0">
+                <a:latin typeface="Times New Roman" panose="02020603050405020304" pitchFamily="18" charset="0"/>
+                <a:cs typeface="Times New Roman" panose="02020603050405020304" pitchFamily="18" charset="0"/>
+              </a:rPr>
+              <a:t>-0.121</a:t>
+            </a:r>
+          </a:p>
+        </p:txBody>
+      </p:sp>
+      <p:sp>
+        <p:nvSpPr>
+          <p:cNvPr id="179" name="TextBox 178">
+            <a:extLst>
+              <a:ext uri="{FF2B5EF4-FFF2-40B4-BE49-F238E27FC236}">
+                <a16:creationId xmlns:a16="http://schemas.microsoft.com/office/drawing/2014/main" id="{B11C760C-61F6-67EC-6506-15BF0738E43E}"/>
+              </a:ext>
+            </a:extLst>
+          </p:cNvPr>
+          <p:cNvSpPr txBox="1"/>
+          <p:nvPr/>
+        </p:nvSpPr>
+        <p:spPr>
+          <a:xfrm>
+            <a:off x="8723316" y="5242661"/>
+            <a:ext cx="979756" cy="461665"/>
+          </a:xfrm>
+          <a:prstGeom prst="rect">
+            <a:avLst/>
+          </a:prstGeom>
+          <a:solidFill>
+            <a:schemeClr val="bg1"/>
+          </a:solidFill>
+          <a:ln w="38100">
+            <a:solidFill>
+              <a:schemeClr val="accent1"/>
+            </a:solidFill>
+            <a:prstDash val="solid"/>
+          </a:ln>
+        </p:spPr>
+        <p:txBody>
+          <a:bodyPr wrap="square" rtlCol="0">
+            <a:spAutoFit/>
+          </a:bodyPr>
+          <a:lstStyle/>
+          <a:p>
+            <a:pPr algn="ctr"/>
+            <a:r>
+              <a:rPr lang="en-US" sz="2400" b="1" dirty="0">
+                <a:latin typeface="Times New Roman" panose="02020603050405020304" pitchFamily="18" charset="0"/>
+                <a:cs typeface="Times New Roman" panose="02020603050405020304" pitchFamily="18" charset="0"/>
+              </a:rPr>
+              <a:t>-0.686</a:t>
+            </a:r>
+          </a:p>
+        </p:txBody>
+      </p:sp>
+      <p:sp>
+        <p:nvSpPr>
+          <p:cNvPr id="181" name="TextBox 180">
+            <a:extLst>
+              <a:ext uri="{FF2B5EF4-FFF2-40B4-BE49-F238E27FC236}">
+                <a16:creationId xmlns:a16="http://schemas.microsoft.com/office/drawing/2014/main" id="{8037C4D7-0637-788E-3DEA-747A3177AA37}"/>
+              </a:ext>
+            </a:extLst>
+          </p:cNvPr>
+          <p:cNvSpPr txBox="1"/>
+          <p:nvPr/>
+        </p:nvSpPr>
+        <p:spPr>
+          <a:xfrm>
+            <a:off x="5228553" y="7511080"/>
+            <a:ext cx="979755" cy="461665"/>
+          </a:xfrm>
+          <a:prstGeom prst="rect">
+            <a:avLst/>
+          </a:prstGeom>
+          <a:solidFill>
+            <a:schemeClr val="bg1"/>
+          </a:solidFill>
+          <a:ln w="38100">
+            <a:solidFill>
+              <a:srgbClr val="C00000"/>
+            </a:solidFill>
+            <a:prstDash val="solid"/>
+          </a:ln>
+        </p:spPr>
+        <p:txBody>
+          <a:bodyPr wrap="none" rtlCol="0">
+            <a:spAutoFit/>
+          </a:bodyPr>
+          <a:lstStyle/>
+          <a:p>
+            <a:r>
+              <a:rPr lang="en-US" sz="2400" b="1" dirty="0">
+                <a:latin typeface="Times New Roman" panose="02020603050405020304" pitchFamily="18" charset="0"/>
+                <a:cs typeface="Times New Roman" panose="02020603050405020304" pitchFamily="18" charset="0"/>
+              </a:rPr>
+              <a:t>-0.169</a:t>
+            </a:r>
+          </a:p>
+        </p:txBody>
+      </p:sp>
+    </p:spTree>
+    <p:extLst>
+      <p:ext uri="{BB962C8B-B14F-4D97-AF65-F5344CB8AC3E}">
+        <p14:creationId xmlns:p14="http://schemas.microsoft.com/office/powerpoint/2010/main" val="1152737995"/>
+      </p:ext>
+    </p:extLst>
+  </p:cSld>
+  <p:clrMapOvr>
+    <a:masterClrMapping/>
+  </p:clrMapOvr>
+</p:sld>
+</file>
+
+<file path=ppt/slides/slide4.xml><?xml version="1.0" encoding="utf-8"?>
 <p:sld xmlns:a="http://schemas.openxmlformats.org/drawingml/2006/main" xmlns:r="http://schemas.openxmlformats.org/officeDocument/2006/relationships" xmlns:p="http://schemas.openxmlformats.org/presentationml/2006/main">
   <p:cSld>
     <p:spTree>

</xml_diff>

<commit_message>
revisions to introduction and rationale for SEM
</commit_message>
<xml_diff>
--- a/working_drafts/figs/TXeco_SEM_ppt_fig.pptx
+++ b/working_drafts/figs/TXeco_SEM_ppt_fig.pptx
@@ -204,7 +204,7 @@
           <a:p>
             <a:fld id="{9C8338E3-F40D-F146-8D3B-4726E84D5200}" type="datetimeFigureOut">
               <a:rPr lang="en-US" smtClean="0"/>
-              <a:t>12/6/22</a:t>
+              <a:t>12/12/22</a:t>
             </a:fld>
             <a:endParaRPr lang="en-US"/>
           </a:p>
@@ -1225,7 +1225,7 @@
           <a:p>
             <a:fld id="{D3A28AA4-801E-B147-9E5C-6E6DBA6E23D1}" type="datetimeFigureOut">
               <a:rPr lang="en-US" smtClean="0"/>
-              <a:t>12/6/22</a:t>
+              <a:t>12/12/22</a:t>
             </a:fld>
             <a:endParaRPr lang="en-US"/>
           </a:p>
@@ -1395,7 +1395,7 @@
           <a:p>
             <a:fld id="{D3A28AA4-801E-B147-9E5C-6E6DBA6E23D1}" type="datetimeFigureOut">
               <a:rPr lang="en-US" smtClean="0"/>
-              <a:t>12/6/22</a:t>
+              <a:t>12/12/22</a:t>
             </a:fld>
             <a:endParaRPr lang="en-US"/>
           </a:p>
@@ -1575,7 +1575,7 @@
           <a:p>
             <a:fld id="{D3A28AA4-801E-B147-9E5C-6E6DBA6E23D1}" type="datetimeFigureOut">
               <a:rPr lang="en-US" smtClean="0"/>
-              <a:t>12/6/22</a:t>
+              <a:t>12/12/22</a:t>
             </a:fld>
             <a:endParaRPr lang="en-US"/>
           </a:p>
@@ -1745,7 +1745,7 @@
           <a:p>
             <a:fld id="{D3A28AA4-801E-B147-9E5C-6E6DBA6E23D1}" type="datetimeFigureOut">
               <a:rPr lang="en-US" smtClean="0"/>
-              <a:t>12/6/22</a:t>
+              <a:t>12/12/22</a:t>
             </a:fld>
             <a:endParaRPr lang="en-US"/>
           </a:p>
@@ -1989,7 +1989,7 @@
           <a:p>
             <a:fld id="{D3A28AA4-801E-B147-9E5C-6E6DBA6E23D1}" type="datetimeFigureOut">
               <a:rPr lang="en-US" smtClean="0"/>
-              <a:t>12/6/22</a:t>
+              <a:t>12/12/22</a:t>
             </a:fld>
             <a:endParaRPr lang="en-US"/>
           </a:p>
@@ -2221,7 +2221,7 @@
           <a:p>
             <a:fld id="{D3A28AA4-801E-B147-9E5C-6E6DBA6E23D1}" type="datetimeFigureOut">
               <a:rPr lang="en-US" smtClean="0"/>
-              <a:t>12/6/22</a:t>
+              <a:t>12/12/22</a:t>
             </a:fld>
             <a:endParaRPr lang="en-US"/>
           </a:p>
@@ -2588,7 +2588,7 @@
           <a:p>
             <a:fld id="{D3A28AA4-801E-B147-9E5C-6E6DBA6E23D1}" type="datetimeFigureOut">
               <a:rPr lang="en-US" smtClean="0"/>
-              <a:t>12/6/22</a:t>
+              <a:t>12/12/22</a:t>
             </a:fld>
             <a:endParaRPr lang="en-US"/>
           </a:p>
@@ -2706,7 +2706,7 @@
           <a:p>
             <a:fld id="{D3A28AA4-801E-B147-9E5C-6E6DBA6E23D1}" type="datetimeFigureOut">
               <a:rPr lang="en-US" smtClean="0"/>
-              <a:t>12/6/22</a:t>
+              <a:t>12/12/22</a:t>
             </a:fld>
             <a:endParaRPr lang="en-US"/>
           </a:p>
@@ -2801,7 +2801,7 @@
           <a:p>
             <a:fld id="{D3A28AA4-801E-B147-9E5C-6E6DBA6E23D1}" type="datetimeFigureOut">
               <a:rPr lang="en-US" smtClean="0"/>
-              <a:t>12/6/22</a:t>
+              <a:t>12/12/22</a:t>
             </a:fld>
             <a:endParaRPr lang="en-US"/>
           </a:p>
@@ -3078,7 +3078,7 @@
           <a:p>
             <a:fld id="{D3A28AA4-801E-B147-9E5C-6E6DBA6E23D1}" type="datetimeFigureOut">
               <a:rPr lang="en-US" smtClean="0"/>
-              <a:t>12/6/22</a:t>
+              <a:t>12/12/22</a:t>
             </a:fld>
             <a:endParaRPr lang="en-US"/>
           </a:p>
@@ -3335,7 +3335,7 @@
           <a:p>
             <a:fld id="{D3A28AA4-801E-B147-9E5C-6E6DBA6E23D1}" type="datetimeFigureOut">
               <a:rPr lang="en-US" smtClean="0"/>
-              <a:t>12/6/22</a:t>
+              <a:t>12/12/22</a:t>
             </a:fld>
             <a:endParaRPr lang="en-US"/>
           </a:p>
@@ -3548,7 +3548,7 @@
           <a:p>
             <a:fld id="{D3A28AA4-801E-B147-9E5C-6E6DBA6E23D1}" type="datetimeFigureOut">
               <a:rPr lang="en-US" smtClean="0"/>
-              <a:t>12/6/22</a:t>
+              <a:t>12/12/22</a:t>
             </a:fld>
             <a:endParaRPr lang="en-US"/>
           </a:p>
@@ -4347,7 +4347,7 @@
           <a:p>
             <a:pPr algn="ctr"/>
             <a:r>
-              <a:rPr lang="en-US" sz="3000" i="1" dirty="0" err="1">
+              <a:rPr lang="en-US" sz="3000" i="1" dirty="0">
                 <a:solidFill>
                   <a:schemeClr val="tx1"/>
                 </a:solidFill>
@@ -4357,7 +4357,7 @@
               <a:t>N</a:t>
             </a:r>
             <a:r>
-              <a:rPr lang="en-US" sz="3000" baseline="-25000" dirty="0" err="1">
+              <a:rPr lang="en-US" sz="3000" baseline="-25000" dirty="0">
                 <a:solidFill>
                   <a:schemeClr val="tx1"/>
                 </a:solidFill>
@@ -4841,12 +4841,8 @@
           <a:lstStyle/>
           <a:p>
             <a:r>
-              <a:rPr lang="en-US" dirty="0" err="1"/>
-              <a:t>Nmass</a:t>
-            </a:r>
-            <a:r>
               <a:rPr lang="en-US" dirty="0"/>
-              <a:t> only SEM</a:t>
+              <a:t>Nmass only SEM</a:t>
             </a:r>
           </a:p>
         </p:txBody>
@@ -5685,7 +5681,7 @@
           <a:p>
             <a:pPr algn="ctr"/>
             <a:r>
-              <a:rPr lang="en-US" sz="3000" i="1" dirty="0" err="1">
+              <a:rPr lang="en-US" sz="3000" i="1" dirty="0">
                 <a:solidFill>
                   <a:schemeClr val="tx1"/>
                 </a:solidFill>
@@ -5695,7 +5691,7 @@
               <a:t>M</a:t>
             </a:r>
             <a:r>
-              <a:rPr lang="en-US" sz="3000" baseline="-25000" dirty="0" err="1">
+              <a:rPr lang="en-US" sz="3000" baseline="-25000" dirty="0">
                 <a:solidFill>
                   <a:schemeClr val="tx1"/>
                 </a:solidFill>
@@ -7122,12 +7118,8 @@
           <a:lstStyle/>
           <a:p>
             <a:r>
-              <a:rPr lang="en-US" dirty="0" err="1"/>
-              <a:t>Marea</a:t>
-            </a:r>
-            <a:r>
               <a:rPr lang="en-US" dirty="0"/>
-              <a:t> only model</a:t>
+              <a:t>Marea only model</a:t>
             </a:r>
           </a:p>
         </p:txBody>
@@ -7179,13 +7171,13 @@
         </p:nvCxnSpPr>
         <p:spPr>
           <a:xfrm flipV="1">
-            <a:off x="12339700" y="7775635"/>
+            <a:off x="9607702" y="7488765"/>
             <a:ext cx="3675001" cy="15355"/>
           </a:xfrm>
           <a:prstGeom prst="straightConnector1">
             <a:avLst/>
           </a:prstGeom>
-          <a:ln w="50927">
+          <a:ln w="46863">
             <a:solidFill>
               <a:srgbClr val="C00000"/>
             </a:solidFill>
@@ -7223,13 +7215,13 @@
         </p:nvCxnSpPr>
         <p:spPr>
           <a:xfrm>
-            <a:off x="12339698" y="5466842"/>
+            <a:off x="9607700" y="5179972"/>
             <a:ext cx="3675002" cy="1853160"/>
           </a:xfrm>
           <a:prstGeom prst="straightConnector1">
             <a:avLst/>
           </a:prstGeom>
-          <a:ln w="57911">
+          <a:ln w="40259">
             <a:tailEnd type="triangle"/>
           </a:ln>
         </p:spPr>
@@ -7265,13 +7257,13 @@
         </p:nvCxnSpPr>
         <p:spPr>
           <a:xfrm>
-            <a:off x="5909170" y="5466844"/>
+            <a:off x="3177172" y="5179974"/>
             <a:ext cx="0" cy="1853158"/>
           </a:xfrm>
           <a:prstGeom prst="straightConnector1">
             <a:avLst/>
           </a:prstGeom>
-          <a:ln w="69088">
+          <a:ln w="58039">
             <a:tailEnd type="triangle"/>
           </a:ln>
         </p:spPr>
@@ -7307,13 +7299,13 @@
         </p:nvCxnSpPr>
         <p:spPr>
           <a:xfrm>
-            <a:off x="6818869" y="7785366"/>
+            <a:off x="4086871" y="7498496"/>
             <a:ext cx="3674506" cy="5623"/>
           </a:xfrm>
           <a:prstGeom prst="straightConnector1">
             <a:avLst/>
           </a:prstGeom>
-          <a:ln w="53721">
+          <a:ln w="53975">
             <a:tailEnd type="triangle"/>
           </a:ln>
         </p:spPr>
@@ -7349,13 +7341,13 @@
         </p:nvCxnSpPr>
         <p:spPr>
           <a:xfrm flipH="1" flipV="1">
-            <a:off x="11429998" y="8264526"/>
+            <a:off x="8698000" y="7977656"/>
             <a:ext cx="2" cy="1812971"/>
           </a:xfrm>
           <a:prstGeom prst="straightConnector1">
             <a:avLst/>
           </a:prstGeom>
-          <a:ln w="88138">
+          <a:ln w="73406">
             <a:tailEnd type="triangle"/>
           </a:ln>
         </p:spPr>
@@ -7391,13 +7383,13 @@
         </p:nvCxnSpPr>
         <p:spPr>
           <a:xfrm>
-            <a:off x="5909170" y="10929999"/>
+            <a:off x="3177172" y="10643129"/>
             <a:ext cx="0" cy="1862076"/>
           </a:xfrm>
           <a:prstGeom prst="straightConnector1">
             <a:avLst/>
           </a:prstGeom>
-          <a:ln w="77216">
+          <a:ln w="69469">
             <a:solidFill>
               <a:srgbClr val="C00000"/>
             </a:solidFill>
@@ -7435,13 +7427,13 @@
         </p:nvCxnSpPr>
         <p:spPr>
           <a:xfrm flipV="1">
-            <a:off x="6818869" y="10971881"/>
+            <a:off x="4086871" y="10685011"/>
             <a:ext cx="3674506" cy="1856107"/>
           </a:xfrm>
           <a:prstGeom prst="straightConnector1">
             <a:avLst/>
           </a:prstGeom>
-          <a:ln w="49911">
+          <a:ln w="50673">
             <a:solidFill>
               <a:srgbClr val="C00000"/>
             </a:solidFill>
@@ -7479,13 +7471,13 @@
         </p:nvCxnSpPr>
         <p:spPr>
           <a:xfrm flipH="1" flipV="1">
-            <a:off x="12366625" y="10971881"/>
+            <a:off x="9634627" y="10685011"/>
             <a:ext cx="3762242" cy="1925469"/>
           </a:xfrm>
           <a:prstGeom prst="straightConnector1">
             <a:avLst/>
           </a:prstGeom>
-          <a:ln w="102743">
+          <a:ln w="85852">
             <a:tailEnd type="triangle"/>
           </a:ln>
         </p:spPr>
@@ -7506,6 +7498,677 @@
       </p:cxnSp>
       <p:sp>
         <p:nvSpPr>
+          <p:cNvPr id="19" name="TextBox 18">
+            <a:extLst>
+              <a:ext uri="{FF2B5EF4-FFF2-40B4-BE49-F238E27FC236}">
+                <a16:creationId xmlns:a16="http://schemas.microsoft.com/office/drawing/2014/main" id="{F515B11B-79E4-1B49-E1DD-A29E02290822}"/>
+              </a:ext>
+            </a:extLst>
+          </p:cNvPr>
+          <p:cNvSpPr txBox="1"/>
+          <p:nvPr/>
+        </p:nvSpPr>
+        <p:spPr>
+          <a:xfrm>
+            <a:off x="10867550" y="7216881"/>
+            <a:ext cx="1178528" cy="553998"/>
+          </a:xfrm>
+          <a:prstGeom prst="rect">
+            <a:avLst/>
+          </a:prstGeom>
+          <a:solidFill>
+            <a:schemeClr val="bg1"/>
+          </a:solidFill>
+          <a:ln w="46863">
+            <a:solidFill>
+              <a:srgbClr val="C00000"/>
+            </a:solidFill>
+          </a:ln>
+        </p:spPr>
+        <p:txBody>
+          <a:bodyPr wrap="none" rtlCol="0">
+            <a:spAutoFit/>
+          </a:bodyPr>
+          <a:lstStyle/>
+          <a:p>
+            <a:r>
+              <a:rPr lang="en-US" sz="3000" b="1" dirty="0">
+                <a:latin typeface="Times New Roman" panose="02020603050405020304" pitchFamily="18" charset="0"/>
+                <a:cs typeface="Times New Roman" panose="02020603050405020304" pitchFamily="18" charset="0"/>
+              </a:rPr>
+              <a:t>-0.044</a:t>
+            </a:r>
+          </a:p>
+        </p:txBody>
+      </p:sp>
+      <p:sp>
+        <p:nvSpPr>
+          <p:cNvPr id="62" name="TextBox 61">
+            <a:extLst>
+              <a:ext uri="{FF2B5EF4-FFF2-40B4-BE49-F238E27FC236}">
+                <a16:creationId xmlns:a16="http://schemas.microsoft.com/office/drawing/2014/main" id="{92EF7EE4-65A8-CBF1-9AA6-7647063CE02B}"/>
+              </a:ext>
+            </a:extLst>
+          </p:cNvPr>
+          <p:cNvSpPr txBox="1"/>
+          <p:nvPr/>
+        </p:nvSpPr>
+        <p:spPr>
+          <a:xfrm>
+            <a:off x="2574290" y="5842929"/>
+            <a:ext cx="1179576" cy="553998"/>
+          </a:xfrm>
+          <a:prstGeom prst="rect">
+            <a:avLst/>
+          </a:prstGeom>
+          <a:solidFill>
+            <a:schemeClr val="bg1"/>
+          </a:solidFill>
+          <a:ln w="58039">
+            <a:solidFill>
+              <a:schemeClr val="accent1"/>
+            </a:solidFill>
+          </a:ln>
+        </p:spPr>
+        <p:txBody>
+          <a:bodyPr wrap="none" rtlCol="0">
+            <a:spAutoFit/>
+          </a:bodyPr>
+          <a:lstStyle/>
+          <a:p>
+            <a:pPr algn="ctr"/>
+            <a:r>
+              <a:rPr lang="en-US" sz="3000" b="1" dirty="0">
+                <a:latin typeface="Times New Roman" panose="02020603050405020304" pitchFamily="18" charset="0"/>
+                <a:cs typeface="Times New Roman" panose="02020603050405020304" pitchFamily="18" charset="0"/>
+              </a:rPr>
+              <a:t>0.408</a:t>
+            </a:r>
+          </a:p>
+        </p:txBody>
+      </p:sp>
+      <p:sp>
+        <p:nvSpPr>
+          <p:cNvPr id="65" name="TextBox 64">
+            <a:extLst>
+              <a:ext uri="{FF2B5EF4-FFF2-40B4-BE49-F238E27FC236}">
+                <a16:creationId xmlns:a16="http://schemas.microsoft.com/office/drawing/2014/main" id="{BD81BF56-3883-BFB8-69D6-2533D9F7EBC9}"/>
+              </a:ext>
+            </a:extLst>
+          </p:cNvPr>
+          <p:cNvSpPr txBox="1"/>
+          <p:nvPr/>
+        </p:nvSpPr>
+        <p:spPr>
+          <a:xfrm>
+            <a:off x="5348322" y="7241329"/>
+            <a:ext cx="1178529" cy="553998"/>
+          </a:xfrm>
+          <a:prstGeom prst="rect">
+            <a:avLst/>
+          </a:prstGeom>
+          <a:solidFill>
+            <a:schemeClr val="bg1"/>
+          </a:solidFill>
+          <a:ln w="53975">
+            <a:solidFill>
+              <a:schemeClr val="accent1"/>
+            </a:solidFill>
+          </a:ln>
+        </p:spPr>
+        <p:txBody>
+          <a:bodyPr wrap="none" rtlCol="0">
+            <a:spAutoFit/>
+          </a:bodyPr>
+          <a:lstStyle/>
+          <a:p>
+            <a:pPr algn="ctr"/>
+            <a:r>
+              <a:rPr lang="en-US" sz="3000" b="1" dirty="0">
+                <a:latin typeface="Times New Roman" panose="02020603050405020304" pitchFamily="18" charset="0"/>
+                <a:cs typeface="Times New Roman" panose="02020603050405020304" pitchFamily="18" charset="0"/>
+              </a:rPr>
+              <a:t>-0.174</a:t>
+            </a:r>
+          </a:p>
+        </p:txBody>
+      </p:sp>
+      <p:sp>
+        <p:nvSpPr>
+          <p:cNvPr id="68" name="TextBox 67">
+            <a:extLst>
+              <a:ext uri="{FF2B5EF4-FFF2-40B4-BE49-F238E27FC236}">
+                <a16:creationId xmlns:a16="http://schemas.microsoft.com/office/drawing/2014/main" id="{BD3CF3C9-AA70-2C2C-1FC6-A9BB7E526592}"/>
+              </a:ext>
+            </a:extLst>
+          </p:cNvPr>
+          <p:cNvSpPr txBox="1"/>
+          <p:nvPr/>
+        </p:nvSpPr>
+        <p:spPr>
+          <a:xfrm>
+            <a:off x="8172857" y="8589678"/>
+            <a:ext cx="1050289" cy="553998"/>
+          </a:xfrm>
+          <a:prstGeom prst="rect">
+            <a:avLst/>
+          </a:prstGeom>
+          <a:solidFill>
+            <a:schemeClr val="bg1"/>
+          </a:solidFill>
+          <a:ln w="73406">
+            <a:solidFill>
+              <a:schemeClr val="accent1"/>
+            </a:solidFill>
+          </a:ln>
+        </p:spPr>
+        <p:txBody>
+          <a:bodyPr wrap="none" rtlCol="0">
+            <a:spAutoFit/>
+          </a:bodyPr>
+          <a:lstStyle/>
+          <a:p>
+            <a:pPr algn="ctr"/>
+            <a:r>
+              <a:rPr lang="en-US" sz="3000" b="1" dirty="0">
+                <a:latin typeface="Times New Roman" panose="02020603050405020304" pitchFamily="18" charset="0"/>
+                <a:cs typeface="Times New Roman" panose="02020603050405020304" pitchFamily="18" charset="0"/>
+              </a:rPr>
+              <a:t>0.605</a:t>
+            </a:r>
+          </a:p>
+        </p:txBody>
+      </p:sp>
+      <p:sp>
+        <p:nvSpPr>
+          <p:cNvPr id="72" name="TextBox 71">
+            <a:extLst>
+              <a:ext uri="{FF2B5EF4-FFF2-40B4-BE49-F238E27FC236}">
+                <a16:creationId xmlns:a16="http://schemas.microsoft.com/office/drawing/2014/main" id="{6B7A766A-3D4C-34AE-FF50-45494D21A356}"/>
+              </a:ext>
+            </a:extLst>
+          </p:cNvPr>
+          <p:cNvSpPr txBox="1"/>
+          <p:nvPr/>
+        </p:nvSpPr>
+        <p:spPr>
+          <a:xfrm>
+            <a:off x="2574290" y="11315124"/>
+            <a:ext cx="1181734" cy="553998"/>
+          </a:xfrm>
+          <a:prstGeom prst="rect">
+            <a:avLst/>
+          </a:prstGeom>
+          <a:solidFill>
+            <a:schemeClr val="bg1"/>
+          </a:solidFill>
+          <a:ln w="69469">
+            <a:solidFill>
+              <a:srgbClr val="C00000"/>
+            </a:solidFill>
+          </a:ln>
+        </p:spPr>
+        <p:txBody>
+          <a:bodyPr wrap="none" rtlCol="0">
+            <a:spAutoFit/>
+          </a:bodyPr>
+          <a:lstStyle/>
+          <a:p>
+            <a:pPr algn="ctr"/>
+            <a:r>
+              <a:rPr lang="en-US" sz="3000" b="1" dirty="0">
+                <a:latin typeface="Times New Roman" panose="02020603050405020304" pitchFamily="18" charset="0"/>
+                <a:cs typeface="Times New Roman" panose="02020603050405020304" pitchFamily="18" charset="0"/>
+              </a:rPr>
+              <a:t>-0.547</a:t>
+            </a:r>
+          </a:p>
+        </p:txBody>
+      </p:sp>
+      <p:sp>
+        <p:nvSpPr>
+          <p:cNvPr id="75" name="TextBox 74">
+            <a:extLst>
+              <a:ext uri="{FF2B5EF4-FFF2-40B4-BE49-F238E27FC236}">
+                <a16:creationId xmlns:a16="http://schemas.microsoft.com/office/drawing/2014/main" id="{8F8148C7-7D3D-B6F6-54CC-9DFA0F534589}"/>
+              </a:ext>
+            </a:extLst>
+          </p:cNvPr>
+          <p:cNvSpPr txBox="1"/>
+          <p:nvPr/>
+        </p:nvSpPr>
+        <p:spPr>
+          <a:xfrm>
+            <a:off x="5346720" y="11336064"/>
+            <a:ext cx="1181734" cy="553998"/>
+          </a:xfrm>
+          <a:prstGeom prst="rect">
+            <a:avLst/>
+          </a:prstGeom>
+          <a:solidFill>
+            <a:schemeClr val="bg1"/>
+          </a:solidFill>
+          <a:ln w="50673">
+            <a:solidFill>
+              <a:srgbClr val="C00000"/>
+            </a:solidFill>
+          </a:ln>
+        </p:spPr>
+        <p:txBody>
+          <a:bodyPr wrap="none" rtlCol="0">
+            <a:spAutoFit/>
+          </a:bodyPr>
+          <a:lstStyle/>
+          <a:p>
+            <a:pPr algn="ctr"/>
+            <a:r>
+              <a:rPr lang="en-US" sz="3000" b="1" dirty="0">
+                <a:latin typeface="Times New Roman" panose="02020603050405020304" pitchFamily="18" charset="0"/>
+                <a:cs typeface="Times New Roman" panose="02020603050405020304" pitchFamily="18" charset="0"/>
+              </a:rPr>
+              <a:t>-0.100</a:t>
+            </a:r>
+          </a:p>
+        </p:txBody>
+      </p:sp>
+      <p:sp>
+        <p:nvSpPr>
+          <p:cNvPr id="89" name="TextBox 88">
+            <a:extLst>
+              <a:ext uri="{FF2B5EF4-FFF2-40B4-BE49-F238E27FC236}">
+                <a16:creationId xmlns:a16="http://schemas.microsoft.com/office/drawing/2014/main" id="{CEA51897-E52D-9C81-B8BB-780C741F830D}"/>
+              </a:ext>
+            </a:extLst>
+          </p:cNvPr>
+          <p:cNvSpPr txBox="1"/>
+          <p:nvPr/>
+        </p:nvSpPr>
+        <p:spPr>
+          <a:xfrm>
+            <a:off x="10855413" y="11336064"/>
+            <a:ext cx="1179576" cy="553998"/>
+          </a:xfrm>
+          <a:prstGeom prst="rect">
+            <a:avLst/>
+          </a:prstGeom>
+          <a:solidFill>
+            <a:schemeClr val="bg1"/>
+          </a:solidFill>
+          <a:ln w="85852">
+            <a:solidFill>
+              <a:schemeClr val="accent1"/>
+            </a:solidFill>
+          </a:ln>
+        </p:spPr>
+        <p:txBody>
+          <a:bodyPr wrap="none" rtlCol="0">
+            <a:spAutoFit/>
+          </a:bodyPr>
+          <a:lstStyle/>
+          <a:p>
+            <a:pPr algn="ctr"/>
+            <a:r>
+              <a:rPr lang="en-US" sz="3000" b="1" dirty="0">
+                <a:latin typeface="Times New Roman" panose="02020603050405020304" pitchFamily="18" charset="0"/>
+                <a:cs typeface="Times New Roman" panose="02020603050405020304" pitchFamily="18" charset="0"/>
+              </a:rPr>
+              <a:t>0.846</a:t>
+            </a:r>
+          </a:p>
+        </p:txBody>
+      </p:sp>
+      <p:sp>
+        <p:nvSpPr>
+          <p:cNvPr id="56" name="TextBox 55">
+            <a:extLst>
+              <a:ext uri="{FF2B5EF4-FFF2-40B4-BE49-F238E27FC236}">
+                <a16:creationId xmlns:a16="http://schemas.microsoft.com/office/drawing/2014/main" id="{9BF0B091-AE15-EA82-6D84-C11B22D76D84}"/>
+              </a:ext>
+            </a:extLst>
+          </p:cNvPr>
+          <p:cNvSpPr txBox="1"/>
+          <p:nvPr/>
+        </p:nvSpPr>
+        <p:spPr>
+          <a:xfrm>
+            <a:off x="10944965" y="5842929"/>
+            <a:ext cx="1029064" cy="553998"/>
+          </a:xfrm>
+          <a:prstGeom prst="rect">
+            <a:avLst/>
+          </a:prstGeom>
+          <a:solidFill>
+            <a:schemeClr val="bg1"/>
+          </a:solidFill>
+          <a:ln w="40259">
+            <a:solidFill>
+              <a:schemeClr val="accent1"/>
+            </a:solidFill>
+          </a:ln>
+        </p:spPr>
+        <p:txBody>
+          <a:bodyPr wrap="none" rtlCol="0">
+            <a:spAutoFit/>
+          </a:bodyPr>
+          <a:lstStyle/>
+          <a:p>
+            <a:pPr algn="ctr"/>
+            <a:r>
+              <a:rPr lang="en-US" sz="3000" b="1" dirty="0">
+                <a:latin typeface="Times New Roman" panose="02020603050405020304" pitchFamily="18" charset="0"/>
+                <a:cs typeface="Times New Roman" panose="02020603050405020304" pitchFamily="18" charset="0"/>
+              </a:rPr>
+              <a:t>0.113</a:t>
+            </a:r>
+          </a:p>
+        </p:txBody>
+      </p:sp>
+      <p:sp>
+        <p:nvSpPr>
+          <p:cNvPr id="2" name="TextBox 1">
+            <a:extLst>
+              <a:ext uri="{FF2B5EF4-FFF2-40B4-BE49-F238E27FC236}">
+                <a16:creationId xmlns:a16="http://schemas.microsoft.com/office/drawing/2014/main" id="{8A9E0DEB-C92D-782F-D752-AE63983864B6}"/>
+              </a:ext>
+            </a:extLst>
+          </p:cNvPr>
+          <p:cNvSpPr txBox="1"/>
+          <p:nvPr/>
+        </p:nvSpPr>
+        <p:spPr>
+          <a:xfrm>
+            <a:off x="417095" y="17453811"/>
+            <a:ext cx="1850378" cy="369332"/>
+          </a:xfrm>
+          <a:prstGeom prst="rect">
+            <a:avLst/>
+          </a:prstGeom>
+          <a:noFill/>
+        </p:spPr>
+        <p:txBody>
+          <a:bodyPr wrap="none" rtlCol="0">
+            <a:spAutoFit/>
+          </a:bodyPr>
+          <a:lstStyle/>
+          <a:p>
+            <a:r>
+              <a:rPr lang="en-US" dirty="0" err="1"/>
+              <a:t>Narea</a:t>
+            </a:r>
+            <a:r>
+              <a:rPr lang="en-US" dirty="0"/>
+              <a:t> only model</a:t>
+            </a:r>
+          </a:p>
+        </p:txBody>
+      </p:sp>
+      <p:cxnSp>
+        <p:nvCxnSpPr>
+          <p:cNvPr id="11" name="Straight Arrow Connector 10">
+            <a:extLst>
+              <a:ext uri="{FF2B5EF4-FFF2-40B4-BE49-F238E27FC236}">
+                <a16:creationId xmlns:a16="http://schemas.microsoft.com/office/drawing/2014/main" id="{D7C54319-9E34-8DD0-26C5-533CFFB410A8}"/>
+              </a:ext>
+            </a:extLst>
+          </p:cNvPr>
+          <p:cNvCxnSpPr>
+            <a:cxnSpLocks/>
+            <a:stCxn id="10" idx="0"/>
+            <a:endCxn id="5" idx="2"/>
+          </p:cNvCxnSpPr>
+          <p:nvPr/>
+        </p:nvCxnSpPr>
+        <p:spPr>
+          <a:xfrm flipV="1">
+            <a:off x="14216301" y="7932493"/>
+            <a:ext cx="2531" cy="1856432"/>
+          </a:xfrm>
+          <a:prstGeom prst="straightConnector1">
+            <a:avLst/>
+          </a:prstGeom>
+          <a:ln w="153416">
+            <a:tailEnd type="triangle"/>
+          </a:ln>
+        </p:spPr>
+        <p:style>
+          <a:lnRef idx="1">
+            <a:schemeClr val="accent1"/>
+          </a:lnRef>
+          <a:fillRef idx="0">
+            <a:schemeClr val="accent1"/>
+          </a:fillRef>
+          <a:effectRef idx="0">
+            <a:schemeClr val="accent1"/>
+          </a:effectRef>
+          <a:fontRef idx="minor">
+            <a:schemeClr val="tx1"/>
+          </a:fontRef>
+        </p:style>
+      </p:cxnSp>
+      <p:cxnSp>
+        <p:nvCxnSpPr>
+          <p:cNvPr id="21" name="Straight Arrow Connector 20">
+            <a:extLst>
+              <a:ext uri="{FF2B5EF4-FFF2-40B4-BE49-F238E27FC236}">
+                <a16:creationId xmlns:a16="http://schemas.microsoft.com/office/drawing/2014/main" id="{331828D3-0371-65B5-832F-9F917FC1D571}"/>
+              </a:ext>
+            </a:extLst>
+          </p:cNvPr>
+          <p:cNvCxnSpPr>
+            <a:cxnSpLocks/>
+            <a:stCxn id="6" idx="2"/>
+            <a:endCxn id="5" idx="0"/>
+          </p:cNvCxnSpPr>
+          <p:nvPr/>
+        </p:nvCxnSpPr>
+        <p:spPr>
+          <a:xfrm>
+            <a:off x="14218832" y="5179972"/>
+            <a:ext cx="0" cy="1875298"/>
+          </a:xfrm>
+          <a:prstGeom prst="straightConnector1">
+            <a:avLst/>
+          </a:prstGeom>
+          <a:ln w="83058">
+            <a:tailEnd type="triangle"/>
+          </a:ln>
+        </p:spPr>
+        <p:style>
+          <a:lnRef idx="1">
+            <a:schemeClr val="accent1"/>
+          </a:lnRef>
+          <a:fillRef idx="0">
+            <a:schemeClr val="accent1"/>
+          </a:fillRef>
+          <a:effectRef idx="0">
+            <a:schemeClr val="accent1"/>
+          </a:effectRef>
+          <a:fontRef idx="minor">
+            <a:schemeClr val="tx1"/>
+          </a:fontRef>
+        </p:style>
+      </p:cxnSp>
+      <p:sp>
+        <p:nvSpPr>
+          <p:cNvPr id="22" name="TextBox 21">
+            <a:extLst>
+              <a:ext uri="{FF2B5EF4-FFF2-40B4-BE49-F238E27FC236}">
+                <a16:creationId xmlns:a16="http://schemas.microsoft.com/office/drawing/2014/main" id="{365180E0-0AC2-05A3-9B62-BC70871D756D}"/>
+              </a:ext>
+            </a:extLst>
+          </p:cNvPr>
+          <p:cNvSpPr txBox="1"/>
+          <p:nvPr/>
+        </p:nvSpPr>
+        <p:spPr>
+          <a:xfrm>
+            <a:off x="13693688" y="5829553"/>
+            <a:ext cx="1050289" cy="553998"/>
+          </a:xfrm>
+          <a:prstGeom prst="rect">
+            <a:avLst/>
+          </a:prstGeom>
+          <a:solidFill>
+            <a:schemeClr val="bg1"/>
+          </a:solidFill>
+          <a:ln w="83058">
+            <a:solidFill>
+              <a:schemeClr val="accent1"/>
+            </a:solidFill>
+          </a:ln>
+        </p:spPr>
+        <p:txBody>
+          <a:bodyPr wrap="none" rtlCol="0">
+            <a:spAutoFit/>
+          </a:bodyPr>
+          <a:lstStyle/>
+          <a:p>
+            <a:pPr algn="ctr"/>
+            <a:r>
+              <a:rPr lang="en-US" sz="3000" b="1" dirty="0">
+                <a:latin typeface="Times New Roman" panose="02020603050405020304" pitchFamily="18" charset="0"/>
+                <a:cs typeface="Times New Roman" panose="02020603050405020304" pitchFamily="18" charset="0"/>
+              </a:rPr>
+              <a:t>0.588</a:t>
+            </a:r>
+          </a:p>
+        </p:txBody>
+      </p:sp>
+      <p:sp>
+        <p:nvSpPr>
+          <p:cNvPr id="25" name="TextBox 24">
+            <a:extLst>
+              <a:ext uri="{FF2B5EF4-FFF2-40B4-BE49-F238E27FC236}">
+                <a16:creationId xmlns:a16="http://schemas.microsoft.com/office/drawing/2014/main" id="{42D0FFDE-56BB-B381-FB99-059837A735ED}"/>
+              </a:ext>
+            </a:extLst>
+          </p:cNvPr>
+          <p:cNvSpPr txBox="1"/>
+          <p:nvPr/>
+        </p:nvSpPr>
+        <p:spPr>
+          <a:xfrm>
+            <a:off x="13701501" y="8607142"/>
+            <a:ext cx="1050289" cy="553998"/>
+          </a:xfrm>
+          <a:prstGeom prst="rect">
+            <a:avLst/>
+          </a:prstGeom>
+          <a:solidFill>
+            <a:schemeClr val="bg1"/>
+          </a:solidFill>
+          <a:ln w="153416">
+            <a:solidFill>
+              <a:schemeClr val="accent1"/>
+            </a:solidFill>
+          </a:ln>
+        </p:spPr>
+        <p:txBody>
+          <a:bodyPr wrap="none" rtlCol="0">
+            <a:spAutoFit/>
+          </a:bodyPr>
+          <a:lstStyle/>
+          <a:p>
+            <a:pPr algn="ctr"/>
+            <a:r>
+              <a:rPr lang="en-US" sz="3000" b="1" dirty="0">
+                <a:latin typeface="Times New Roman" panose="02020603050405020304" pitchFamily="18" charset="0"/>
+                <a:cs typeface="Times New Roman" panose="02020603050405020304" pitchFamily="18" charset="0"/>
+              </a:rPr>
+              <a:t>1.716</a:t>
+            </a:r>
+          </a:p>
+        </p:txBody>
+      </p:sp>
+      <p:cxnSp>
+        <p:nvCxnSpPr>
+          <p:cNvPr id="3" name="Straight Arrow Connector 2">
+            <a:extLst>
+              <a:ext uri="{FF2B5EF4-FFF2-40B4-BE49-F238E27FC236}">
+                <a16:creationId xmlns:a16="http://schemas.microsoft.com/office/drawing/2014/main" id="{E8249700-7515-2967-823B-5310C13E5F57}"/>
+              </a:ext>
+            </a:extLst>
+          </p:cNvPr>
+          <p:cNvCxnSpPr>
+            <a:cxnSpLocks/>
+          </p:cNvCxnSpPr>
+          <p:nvPr/>
+        </p:nvCxnSpPr>
+        <p:spPr>
+          <a:xfrm>
+            <a:off x="9578203" y="7913022"/>
+            <a:ext cx="3675002" cy="1853160"/>
+          </a:xfrm>
+          <a:prstGeom prst="straightConnector1">
+            <a:avLst/>
+          </a:prstGeom>
+          <a:ln w="46609">
+            <a:tailEnd type="triangle"/>
+          </a:ln>
+        </p:spPr>
+        <p:style>
+          <a:lnRef idx="1">
+            <a:schemeClr val="accent1"/>
+          </a:lnRef>
+          <a:fillRef idx="0">
+            <a:schemeClr val="accent1"/>
+          </a:fillRef>
+          <a:effectRef idx="0">
+            <a:schemeClr val="accent1"/>
+          </a:effectRef>
+          <a:fontRef idx="minor">
+            <a:schemeClr val="tx1"/>
+          </a:fontRef>
+        </p:style>
+      </p:cxnSp>
+      <p:sp>
+        <p:nvSpPr>
+          <p:cNvPr id="12" name="TextBox 11">
+            <a:extLst>
+              <a:ext uri="{FF2B5EF4-FFF2-40B4-BE49-F238E27FC236}">
+                <a16:creationId xmlns:a16="http://schemas.microsoft.com/office/drawing/2014/main" id="{C3C861D2-D12D-3CE2-1361-40BFBF0C0148}"/>
+              </a:ext>
+            </a:extLst>
+          </p:cNvPr>
+          <p:cNvSpPr txBox="1"/>
+          <p:nvPr/>
+        </p:nvSpPr>
+        <p:spPr>
+          <a:xfrm>
+            <a:off x="10840736" y="8575979"/>
+            <a:ext cx="1178529" cy="553998"/>
+          </a:xfrm>
+          <a:prstGeom prst="rect">
+            <a:avLst/>
+          </a:prstGeom>
+          <a:solidFill>
+            <a:schemeClr val="bg1"/>
+          </a:solidFill>
+          <a:ln w="46609">
+            <a:solidFill>
+              <a:schemeClr val="accent1"/>
+            </a:solidFill>
+          </a:ln>
+        </p:spPr>
+        <p:txBody>
+          <a:bodyPr wrap="none" rtlCol="0">
+            <a:spAutoFit/>
+          </a:bodyPr>
+          <a:lstStyle/>
+          <a:p>
+            <a:pPr algn="ctr"/>
+            <a:r>
+              <a:rPr lang="en-US" sz="3000" b="1" dirty="0">
+                <a:latin typeface="Times New Roman" panose="02020603050405020304" pitchFamily="18" charset="0"/>
+                <a:cs typeface="Times New Roman" panose="02020603050405020304" pitchFamily="18" charset="0"/>
+              </a:rPr>
+              <a:t>-0.048</a:t>
+            </a:r>
+          </a:p>
+        </p:txBody>
+      </p:sp>
+      <p:sp>
+        <p:nvSpPr>
           <p:cNvPr id="4" name="Rectangle 3">
             <a:extLst>
               <a:ext uri="{FF2B5EF4-FFF2-40B4-BE49-F238E27FC236}">
@@ -7518,7 +8181,7 @@
         </p:nvSpPr>
         <p:spPr>
           <a:xfrm>
-            <a:off x="10520301" y="7352378"/>
+            <a:off x="7788303" y="7065508"/>
             <a:ext cx="1819398" cy="877223"/>
           </a:xfrm>
           <a:prstGeom prst="rect">
@@ -7588,7 +8251,7 @@
         </p:nvSpPr>
         <p:spPr>
           <a:xfrm>
-            <a:off x="16041131" y="7342140"/>
+            <a:off x="13309133" y="7055270"/>
             <a:ext cx="1819398" cy="877223"/>
           </a:xfrm>
           <a:prstGeom prst="rect">
@@ -7668,7 +8331,7 @@
         </p:nvSpPr>
         <p:spPr>
           <a:xfrm>
-            <a:off x="10520301" y="10077497"/>
+            <a:off x="7788303" y="9790627"/>
             <a:ext cx="1819398" cy="877223"/>
           </a:xfrm>
           <a:prstGeom prst="rect">
@@ -7731,7 +8394,7 @@
         </p:nvSpPr>
         <p:spPr>
           <a:xfrm>
-            <a:off x="4999471" y="12827988"/>
+            <a:off x="2267473" y="12541118"/>
             <a:ext cx="1819398" cy="877223"/>
           </a:xfrm>
           <a:prstGeom prst="rect">
@@ -7811,7 +8474,7 @@
         </p:nvSpPr>
         <p:spPr>
           <a:xfrm>
-            <a:off x="4999471" y="10052777"/>
+            <a:off x="2267473" y="9765907"/>
             <a:ext cx="1819398" cy="877223"/>
           </a:xfrm>
           <a:prstGeom prst="rect">
@@ -7891,7 +8554,7 @@
         </p:nvSpPr>
         <p:spPr>
           <a:xfrm>
-            <a:off x="4999471" y="7346754"/>
+            <a:off x="2267473" y="7059884"/>
             <a:ext cx="1819398" cy="877223"/>
           </a:xfrm>
           <a:prstGeom prst="rect">
@@ -7961,7 +8624,7 @@
         </p:nvSpPr>
         <p:spPr>
           <a:xfrm>
-            <a:off x="4999471" y="4589622"/>
+            <a:off x="2267473" y="4302752"/>
             <a:ext cx="1819398" cy="877223"/>
           </a:xfrm>
           <a:prstGeom prst="rect">
@@ -8029,281 +8692,6 @@
       </p:sp>
       <p:sp>
         <p:nvSpPr>
-          <p:cNvPr id="19" name="TextBox 18">
-            <a:extLst>
-              <a:ext uri="{FF2B5EF4-FFF2-40B4-BE49-F238E27FC236}">
-                <a16:creationId xmlns:a16="http://schemas.microsoft.com/office/drawing/2014/main" id="{F515B11B-79E4-1B49-E1DD-A29E02290822}"/>
-              </a:ext>
-            </a:extLst>
-          </p:cNvPr>
-          <p:cNvSpPr txBox="1"/>
-          <p:nvPr/>
-        </p:nvSpPr>
-        <p:spPr>
-          <a:xfrm>
-            <a:off x="13599548" y="7503751"/>
-            <a:ext cx="1181734" cy="553998"/>
-          </a:xfrm>
-          <a:prstGeom prst="rect">
-            <a:avLst/>
-          </a:prstGeom>
-          <a:solidFill>
-            <a:schemeClr val="bg1"/>
-          </a:solidFill>
-          <a:ln w="50927">
-            <a:solidFill>
-              <a:srgbClr val="C00000"/>
-            </a:solidFill>
-          </a:ln>
-        </p:spPr>
-        <p:txBody>
-          <a:bodyPr wrap="none" rtlCol="0">
-            <a:spAutoFit/>
-          </a:bodyPr>
-          <a:lstStyle/>
-          <a:p>
-            <a:r>
-              <a:rPr lang="en-US" sz="3000" b="1" dirty="0">
-                <a:latin typeface="Times New Roman" panose="02020603050405020304" pitchFamily="18" charset="0"/>
-                <a:cs typeface="Times New Roman" panose="02020603050405020304" pitchFamily="18" charset="0"/>
-              </a:rPr>
-              <a:t>-0.131</a:t>
-            </a:r>
-          </a:p>
-        </p:txBody>
-      </p:sp>
-      <p:sp>
-        <p:nvSpPr>
-          <p:cNvPr id="62" name="TextBox 61">
-            <a:extLst>
-              <a:ext uri="{FF2B5EF4-FFF2-40B4-BE49-F238E27FC236}">
-                <a16:creationId xmlns:a16="http://schemas.microsoft.com/office/drawing/2014/main" id="{92EF7EE4-65A8-CBF1-9AA6-7647063CE02B}"/>
-              </a:ext>
-            </a:extLst>
-          </p:cNvPr>
-          <p:cNvSpPr txBox="1"/>
-          <p:nvPr/>
-        </p:nvSpPr>
-        <p:spPr>
-          <a:xfrm>
-            <a:off x="5306288" y="6129799"/>
-            <a:ext cx="1179576" cy="553998"/>
-          </a:xfrm>
-          <a:prstGeom prst="rect">
-            <a:avLst/>
-          </a:prstGeom>
-          <a:solidFill>
-            <a:schemeClr val="bg1"/>
-          </a:solidFill>
-          <a:ln w="69088">
-            <a:solidFill>
-              <a:schemeClr val="accent1"/>
-            </a:solidFill>
-          </a:ln>
-        </p:spPr>
-        <p:txBody>
-          <a:bodyPr wrap="none" rtlCol="0">
-            <a:spAutoFit/>
-          </a:bodyPr>
-          <a:lstStyle/>
-          <a:p>
-            <a:pPr algn="ctr"/>
-            <a:r>
-              <a:rPr lang="en-US" sz="3000" b="1" dirty="0">
-                <a:latin typeface="Times New Roman" panose="02020603050405020304" pitchFamily="18" charset="0"/>
-                <a:cs typeface="Times New Roman" panose="02020603050405020304" pitchFamily="18" charset="0"/>
-              </a:rPr>
-              <a:t>0.408</a:t>
-            </a:r>
-          </a:p>
-        </p:txBody>
-      </p:sp>
-      <p:sp>
-        <p:nvSpPr>
-          <p:cNvPr id="65" name="TextBox 64">
-            <a:extLst>
-              <a:ext uri="{FF2B5EF4-FFF2-40B4-BE49-F238E27FC236}">
-                <a16:creationId xmlns:a16="http://schemas.microsoft.com/office/drawing/2014/main" id="{BD81BF56-3883-BFB8-69D6-2533D9F7EBC9}"/>
-              </a:ext>
-            </a:extLst>
-          </p:cNvPr>
-          <p:cNvSpPr txBox="1"/>
-          <p:nvPr/>
-        </p:nvSpPr>
-        <p:spPr>
-          <a:xfrm>
-            <a:off x="8080320" y="7528199"/>
-            <a:ext cx="1178529" cy="553998"/>
-          </a:xfrm>
-          <a:prstGeom prst="rect">
-            <a:avLst/>
-          </a:prstGeom>
-          <a:solidFill>
-            <a:schemeClr val="bg1"/>
-          </a:solidFill>
-          <a:ln w="53721">
-            <a:solidFill>
-              <a:schemeClr val="accent1"/>
-            </a:solidFill>
-          </a:ln>
-        </p:spPr>
-        <p:txBody>
-          <a:bodyPr wrap="none" rtlCol="0">
-            <a:spAutoFit/>
-          </a:bodyPr>
-          <a:lstStyle/>
-          <a:p>
-            <a:pPr algn="ctr"/>
-            <a:r>
-              <a:rPr lang="en-US" sz="3000" b="1" dirty="0">
-                <a:latin typeface="Times New Roman" panose="02020603050405020304" pitchFamily="18" charset="0"/>
-                <a:cs typeface="Times New Roman" panose="02020603050405020304" pitchFamily="18" charset="0"/>
-              </a:rPr>
-              <a:t>-0.174</a:t>
-            </a:r>
-          </a:p>
-        </p:txBody>
-      </p:sp>
-      <p:sp>
-        <p:nvSpPr>
-          <p:cNvPr id="68" name="TextBox 67">
-            <a:extLst>
-              <a:ext uri="{FF2B5EF4-FFF2-40B4-BE49-F238E27FC236}">
-                <a16:creationId xmlns:a16="http://schemas.microsoft.com/office/drawing/2014/main" id="{BD3CF3C9-AA70-2C2C-1FC6-A9BB7E526592}"/>
-              </a:ext>
-            </a:extLst>
-          </p:cNvPr>
-          <p:cNvSpPr txBox="1"/>
-          <p:nvPr/>
-        </p:nvSpPr>
-        <p:spPr>
-          <a:xfrm>
-            <a:off x="10904855" y="8876548"/>
-            <a:ext cx="1050289" cy="553998"/>
-          </a:xfrm>
-          <a:prstGeom prst="rect">
-            <a:avLst/>
-          </a:prstGeom>
-          <a:solidFill>
-            <a:schemeClr val="bg1"/>
-          </a:solidFill>
-          <a:ln w="88138">
-            <a:solidFill>
-              <a:schemeClr val="accent1"/>
-            </a:solidFill>
-          </a:ln>
-        </p:spPr>
-        <p:txBody>
-          <a:bodyPr wrap="none" rtlCol="0">
-            <a:spAutoFit/>
-          </a:bodyPr>
-          <a:lstStyle/>
-          <a:p>
-            <a:pPr algn="ctr"/>
-            <a:r>
-              <a:rPr lang="en-US" sz="3000" b="1" dirty="0">
-                <a:latin typeface="Times New Roman" panose="02020603050405020304" pitchFamily="18" charset="0"/>
-                <a:cs typeface="Times New Roman" panose="02020603050405020304" pitchFamily="18" charset="0"/>
-              </a:rPr>
-              <a:t>0.605</a:t>
-            </a:r>
-          </a:p>
-        </p:txBody>
-      </p:sp>
-      <p:sp>
-        <p:nvSpPr>
-          <p:cNvPr id="72" name="TextBox 71">
-            <a:extLst>
-              <a:ext uri="{FF2B5EF4-FFF2-40B4-BE49-F238E27FC236}">
-                <a16:creationId xmlns:a16="http://schemas.microsoft.com/office/drawing/2014/main" id="{6B7A766A-3D4C-34AE-FF50-45494D21A356}"/>
-              </a:ext>
-            </a:extLst>
-          </p:cNvPr>
-          <p:cNvSpPr txBox="1"/>
-          <p:nvPr/>
-        </p:nvSpPr>
-        <p:spPr>
-          <a:xfrm>
-            <a:off x="5306288" y="11601994"/>
-            <a:ext cx="1181734" cy="553998"/>
-          </a:xfrm>
-          <a:prstGeom prst="rect">
-            <a:avLst/>
-          </a:prstGeom>
-          <a:solidFill>
-            <a:schemeClr val="bg1"/>
-          </a:solidFill>
-          <a:ln w="64389">
-            <a:solidFill>
-              <a:srgbClr val="C00000"/>
-            </a:solidFill>
-          </a:ln>
-        </p:spPr>
-        <p:txBody>
-          <a:bodyPr wrap="none" rtlCol="0">
-            <a:spAutoFit/>
-          </a:bodyPr>
-          <a:lstStyle/>
-          <a:p>
-            <a:pPr algn="ctr"/>
-            <a:r>
-              <a:rPr lang="en-US" sz="3000" b="1" dirty="0">
-                <a:latin typeface="Times New Roman" panose="02020603050405020304" pitchFamily="18" charset="0"/>
-                <a:cs typeface="Times New Roman" panose="02020603050405020304" pitchFamily="18" charset="0"/>
-              </a:rPr>
-              <a:t>-0.547</a:t>
-            </a:r>
-          </a:p>
-        </p:txBody>
-      </p:sp>
-      <p:sp>
-        <p:nvSpPr>
-          <p:cNvPr id="75" name="TextBox 74">
-            <a:extLst>
-              <a:ext uri="{FF2B5EF4-FFF2-40B4-BE49-F238E27FC236}">
-                <a16:creationId xmlns:a16="http://schemas.microsoft.com/office/drawing/2014/main" id="{8F8148C7-7D3D-B6F6-54CC-9DFA0F534589}"/>
-              </a:ext>
-            </a:extLst>
-          </p:cNvPr>
-          <p:cNvSpPr txBox="1"/>
-          <p:nvPr/>
-        </p:nvSpPr>
-        <p:spPr>
-          <a:xfrm>
-            <a:off x="8078718" y="11622934"/>
-            <a:ext cx="1181734" cy="553998"/>
-          </a:xfrm>
-          <a:prstGeom prst="rect">
-            <a:avLst/>
-          </a:prstGeom>
-          <a:solidFill>
-            <a:schemeClr val="bg1"/>
-          </a:solidFill>
-          <a:ln w="49911">
-            <a:solidFill>
-              <a:srgbClr val="C00000"/>
-            </a:solidFill>
-          </a:ln>
-        </p:spPr>
-        <p:txBody>
-          <a:bodyPr wrap="none" rtlCol="0">
-            <a:spAutoFit/>
-          </a:bodyPr>
-          <a:lstStyle/>
-          <a:p>
-            <a:pPr algn="ctr"/>
-            <a:r>
-              <a:rPr lang="en-US" sz="3000" b="1" dirty="0">
-                <a:latin typeface="Times New Roman" panose="02020603050405020304" pitchFamily="18" charset="0"/>
-                <a:cs typeface="Times New Roman" panose="02020603050405020304" pitchFamily="18" charset="0"/>
-              </a:rPr>
-              <a:t>-0.100</a:t>
-            </a:r>
-          </a:p>
-        </p:txBody>
-      </p:sp>
-      <p:sp>
-        <p:nvSpPr>
           <p:cNvPr id="16" name="Rectangle 15">
             <a:extLst>
               <a:ext uri="{FF2B5EF4-FFF2-40B4-BE49-F238E27FC236}">
@@ -8316,7 +8704,7 @@
         </p:nvSpPr>
         <p:spPr>
           <a:xfrm>
-            <a:off x="16041131" y="12847178"/>
+            <a:off x="13309133" y="12560308"/>
             <a:ext cx="1819398" cy="877223"/>
           </a:xfrm>
           <a:prstGeom prst="rect">
@@ -8367,52 +8755,6 @@
       </p:sp>
       <p:sp>
         <p:nvSpPr>
-          <p:cNvPr id="89" name="TextBox 88">
-            <a:extLst>
-              <a:ext uri="{FF2B5EF4-FFF2-40B4-BE49-F238E27FC236}">
-                <a16:creationId xmlns:a16="http://schemas.microsoft.com/office/drawing/2014/main" id="{CEA51897-E52D-9C81-B8BB-780C741F830D}"/>
-              </a:ext>
-            </a:extLst>
-          </p:cNvPr>
-          <p:cNvSpPr txBox="1"/>
-          <p:nvPr/>
-        </p:nvSpPr>
-        <p:spPr>
-          <a:xfrm>
-            <a:off x="13587411" y="11622934"/>
-            <a:ext cx="1179576" cy="553998"/>
-          </a:xfrm>
-          <a:prstGeom prst="rect">
-            <a:avLst/>
-          </a:prstGeom>
-          <a:solidFill>
-            <a:schemeClr val="bg1"/>
-          </a:solidFill>
-          <a:ln w="102743">
-            <a:solidFill>
-              <a:schemeClr val="accent1"/>
-            </a:solidFill>
-          </a:ln>
-        </p:spPr>
-        <p:txBody>
-          <a:bodyPr wrap="none" rtlCol="0">
-            <a:spAutoFit/>
-          </a:bodyPr>
-          <a:lstStyle/>
-          <a:p>
-            <a:pPr algn="ctr"/>
-            <a:r>
-              <a:rPr lang="en-US" sz="3000" b="1" dirty="0">
-                <a:latin typeface="Times New Roman" panose="02020603050405020304" pitchFamily="18" charset="0"/>
-                <a:cs typeface="Times New Roman" panose="02020603050405020304" pitchFamily="18" charset="0"/>
-              </a:rPr>
-              <a:t>0.846</a:t>
-            </a:r>
-          </a:p>
-        </p:txBody>
-      </p:sp>
-      <p:sp>
-        <p:nvSpPr>
           <p:cNvPr id="13" name="Rectangle 12">
             <a:extLst>
               <a:ext uri="{FF2B5EF4-FFF2-40B4-BE49-F238E27FC236}">
@@ -8425,7 +8767,7 @@
         </p:nvSpPr>
         <p:spPr>
           <a:xfrm>
-            <a:off x="10520301" y="4610746"/>
+            <a:off x="7788303" y="4323876"/>
             <a:ext cx="1819398" cy="877223"/>
           </a:xfrm>
           <a:prstGeom prst="rect">
@@ -8493,20 +8835,20 @@
       </p:sp>
       <p:sp>
         <p:nvSpPr>
-          <p:cNvPr id="56" name="TextBox 55">
-            <a:extLst>
-              <a:ext uri="{FF2B5EF4-FFF2-40B4-BE49-F238E27FC236}">
-                <a16:creationId xmlns:a16="http://schemas.microsoft.com/office/drawing/2014/main" id="{9BF0B091-AE15-EA82-6D84-C11B22D76D84}"/>
-              </a:ext>
-            </a:extLst>
-          </p:cNvPr>
-          <p:cNvSpPr txBox="1"/>
-          <p:nvPr/>
-        </p:nvSpPr>
-        <p:spPr>
-          <a:xfrm>
-            <a:off x="13601706" y="6129799"/>
-            <a:ext cx="1179576" cy="553998"/>
+          <p:cNvPr id="6" name="Rectangle 5">
+            <a:extLst>
+              <a:ext uri="{FF2B5EF4-FFF2-40B4-BE49-F238E27FC236}">
+                <a16:creationId xmlns:a16="http://schemas.microsoft.com/office/drawing/2014/main" id="{82098DFB-3E26-4855-1059-F871B3625B79}"/>
+              </a:ext>
+            </a:extLst>
+          </p:cNvPr>
+          <p:cNvSpPr/>
+          <p:nvPr/>
+        </p:nvSpPr>
+        <p:spPr>
+          <a:xfrm>
+            <a:off x="13309133" y="4302749"/>
+            <a:ext cx="1819398" cy="877223"/>
           </a:xfrm>
           <a:prstGeom prst="rect">
             <a:avLst/>
@@ -8514,127 +8856,79 @@
           <a:solidFill>
             <a:schemeClr val="bg1"/>
           </a:solidFill>
-          <a:ln w="57911">
-            <a:solidFill>
-              <a:schemeClr val="accent1"/>
-            </a:solidFill>
-          </a:ln>
-        </p:spPr>
-        <p:txBody>
-          <a:bodyPr wrap="none" rtlCol="0">
-            <a:spAutoFit/>
-          </a:bodyPr>
+          <a:ln w="38100">
+            <a:solidFill>
+              <a:schemeClr val="tx1"/>
+            </a:solidFill>
+          </a:ln>
+        </p:spPr>
+        <p:style>
+          <a:lnRef idx="2">
+            <a:schemeClr val="accent1">
+              <a:shade val="50000"/>
+            </a:schemeClr>
+          </a:lnRef>
+          <a:fillRef idx="1">
+            <a:schemeClr val="accent1"/>
+          </a:fillRef>
+          <a:effectRef idx="0">
+            <a:schemeClr val="accent1"/>
+          </a:effectRef>
+          <a:fontRef idx="minor">
+            <a:schemeClr val="lt1"/>
+          </a:fontRef>
+        </p:style>
+        <p:txBody>
+          <a:bodyPr rtlCol="0" anchor="ctr"/>
           <a:lstStyle/>
           <a:p>
             <a:pPr algn="ctr"/>
             <a:r>
-              <a:rPr lang="en-US" sz="3000" b="1" dirty="0">
+              <a:rPr lang="en-US" sz="3000" i="1" dirty="0">
+                <a:solidFill>
+                  <a:schemeClr val="tx1"/>
+                </a:solidFill>
                 <a:latin typeface="Times New Roman" panose="02020603050405020304" pitchFamily="18" charset="0"/>
                 <a:cs typeface="Times New Roman" panose="02020603050405020304" pitchFamily="18" charset="0"/>
               </a:rPr>
-              <a:t>0.310</a:t>
-            </a:r>
-          </a:p>
-        </p:txBody>
-      </p:sp>
-      <p:sp>
-        <p:nvSpPr>
-          <p:cNvPr id="2" name="TextBox 1">
-            <a:extLst>
-              <a:ext uri="{FF2B5EF4-FFF2-40B4-BE49-F238E27FC236}">
-                <a16:creationId xmlns:a16="http://schemas.microsoft.com/office/drawing/2014/main" id="{8A9E0DEB-C92D-782F-D752-AE63983864B6}"/>
-              </a:ext>
-            </a:extLst>
-          </p:cNvPr>
-          <p:cNvSpPr txBox="1"/>
-          <p:nvPr/>
-        </p:nvSpPr>
-        <p:spPr>
-          <a:xfrm>
-            <a:off x="417095" y="17453811"/>
-            <a:ext cx="1850378" cy="369332"/>
-          </a:xfrm>
-          <a:prstGeom prst="rect">
-            <a:avLst/>
-          </a:prstGeom>
-          <a:noFill/>
-        </p:spPr>
-        <p:txBody>
-          <a:bodyPr wrap="none" rtlCol="0">
-            <a:spAutoFit/>
-          </a:bodyPr>
-          <a:lstStyle/>
-          <a:p>
-            <a:r>
-              <a:rPr lang="en-US" dirty="0" err="1"/>
-              <a:t>Narea</a:t>
-            </a:r>
-            <a:r>
-              <a:rPr lang="en-US" dirty="0"/>
-              <a:t> only model</a:t>
-            </a:r>
-          </a:p>
-        </p:txBody>
-      </p:sp>
-      <p:cxnSp>
-        <p:nvCxnSpPr>
-          <p:cNvPr id="3" name="Straight Arrow Connector 2">
-            <a:extLst>
-              <a:ext uri="{FF2B5EF4-FFF2-40B4-BE49-F238E27FC236}">
-                <a16:creationId xmlns:a16="http://schemas.microsoft.com/office/drawing/2014/main" id="{FD7BABED-EBA4-EBB1-C4D9-44053EB3BB3F}"/>
-              </a:ext>
-            </a:extLst>
-          </p:cNvPr>
-          <p:cNvCxnSpPr>
-            <a:cxnSpLocks/>
-            <a:stCxn id="16" idx="0"/>
-            <a:endCxn id="5" idx="2"/>
-          </p:cNvCxnSpPr>
-          <p:nvPr/>
-        </p:nvCxnSpPr>
-        <p:spPr>
-          <a:xfrm flipV="1">
-            <a:off x="16950830" y="8219363"/>
-            <a:ext cx="0" cy="4627815"/>
-          </a:xfrm>
-          <a:prstGeom prst="straightConnector1">
-            <a:avLst/>
-          </a:prstGeom>
-          <a:ln w="55372">
-            <a:tailEnd type="triangle"/>
-          </a:ln>
-        </p:spPr>
-        <p:style>
-          <a:lnRef idx="1">
-            <a:schemeClr val="accent1"/>
-          </a:lnRef>
-          <a:fillRef idx="0">
-            <a:schemeClr val="accent1"/>
-          </a:fillRef>
-          <a:effectRef idx="0">
-            <a:schemeClr val="accent1"/>
-          </a:effectRef>
-          <a:fontRef idx="minor">
-            <a:schemeClr val="tx1"/>
-          </a:fontRef>
-        </p:style>
-      </p:cxnSp>
-      <p:sp>
-        <p:nvSpPr>
-          <p:cNvPr id="17" name="TextBox 16">
-            <a:extLst>
-              <a:ext uri="{FF2B5EF4-FFF2-40B4-BE49-F238E27FC236}">
-                <a16:creationId xmlns:a16="http://schemas.microsoft.com/office/drawing/2014/main" id="{5E4D9EED-0544-A392-6563-E92B8C61F01F}"/>
-              </a:ext>
-            </a:extLst>
-          </p:cNvPr>
-          <p:cNvSpPr txBox="1"/>
-          <p:nvPr/>
-        </p:nvSpPr>
-        <p:spPr>
-          <a:xfrm>
-            <a:off x="16418472" y="10239109"/>
-            <a:ext cx="1064715" cy="553998"/>
+              <a:t>N</a:t>
+            </a:r>
+            <a:r>
+              <a:rPr lang="en-US" sz="3000" baseline="-25000" dirty="0">
+                <a:solidFill>
+                  <a:schemeClr val="tx1"/>
+                </a:solidFill>
+                <a:latin typeface="Times New Roman" panose="02020603050405020304" pitchFamily="18" charset="0"/>
+                <a:cs typeface="Times New Roman" panose="02020603050405020304" pitchFamily="18" charset="0"/>
+              </a:rPr>
+              <a:t>mass</a:t>
+            </a:r>
+            <a:endParaRPr lang="en-US" sz="3000" i="1" dirty="0">
+              <a:solidFill>
+                <a:schemeClr val="tx1"/>
+              </a:solidFill>
+              <a:latin typeface="Times New Roman" panose="02020603050405020304" pitchFamily="18" charset="0"/>
+              <a:cs typeface="Times New Roman" panose="02020603050405020304" pitchFamily="18" charset="0"/>
+            </a:endParaRPr>
+          </a:p>
+        </p:txBody>
+      </p:sp>
+      <p:sp>
+        <p:nvSpPr>
+          <p:cNvPr id="10" name="Rectangle 9">
+            <a:extLst>
+              <a:ext uri="{FF2B5EF4-FFF2-40B4-BE49-F238E27FC236}">
+                <a16:creationId xmlns:a16="http://schemas.microsoft.com/office/drawing/2014/main" id="{BE8EA6ED-AFB7-FCE3-419B-30CF6ED05DB7}"/>
+              </a:ext>
+            </a:extLst>
+          </p:cNvPr>
+          <p:cNvSpPr/>
+          <p:nvPr/>
+        </p:nvSpPr>
+        <p:spPr>
+          <a:xfrm>
+            <a:off x="13306602" y="9788925"/>
+            <a:ext cx="1819398" cy="877223"/>
           </a:xfrm>
           <a:prstGeom prst="rect">
             <a:avLst/>
@@ -8642,26 +8936,60 @@
           <a:solidFill>
             <a:schemeClr val="bg1"/>
           </a:solidFill>
-          <a:ln w="55372">
-            <a:solidFill>
-              <a:schemeClr val="accent1"/>
-            </a:solidFill>
-          </a:ln>
-        </p:spPr>
-        <p:txBody>
-          <a:bodyPr wrap="none" rtlCol="0">
-            <a:spAutoFit/>
-          </a:bodyPr>
+          <a:ln w="38100">
+            <a:solidFill>
+              <a:schemeClr val="tx1"/>
+            </a:solidFill>
+          </a:ln>
+        </p:spPr>
+        <p:style>
+          <a:lnRef idx="2">
+            <a:schemeClr val="accent1">
+              <a:shade val="50000"/>
+            </a:schemeClr>
+          </a:lnRef>
+          <a:fillRef idx="1">
+            <a:schemeClr val="accent1"/>
+          </a:fillRef>
+          <a:effectRef idx="0">
+            <a:schemeClr val="accent1"/>
+          </a:effectRef>
+          <a:fontRef idx="minor">
+            <a:schemeClr val="lt1"/>
+          </a:fontRef>
+        </p:style>
+        <p:txBody>
+          <a:bodyPr rtlCol="0" anchor="ctr"/>
           <a:lstStyle/>
           <a:p>
             <a:pPr algn="ctr"/>
             <a:r>
-              <a:rPr lang="en-US" sz="3000" b="1" dirty="0">
+              <a:rPr lang="en-US" sz="3000" i="1" dirty="0">
+                <a:solidFill>
+                  <a:schemeClr val="tx1"/>
+                </a:solidFill>
                 <a:latin typeface="Times New Roman" panose="02020603050405020304" pitchFamily="18" charset="0"/>
                 <a:cs typeface="Times New Roman" panose="02020603050405020304" pitchFamily="18" charset="0"/>
               </a:rPr>
-              <a:t>0.289</a:t>
-            </a:r>
+              <a:t>M</a:t>
+            </a:r>
+            <a:r>
+              <a:rPr lang="en-US" sz="3000" baseline="-25000" dirty="0">
+                <a:solidFill>
+                  <a:schemeClr val="tx1"/>
+                </a:solidFill>
+                <a:latin typeface="Times New Roman" panose="02020603050405020304" pitchFamily="18" charset="0"/>
+                <a:cs typeface="Times New Roman" panose="02020603050405020304" pitchFamily="18" charset="0"/>
+              </a:rPr>
+              <a:t>area</a:t>
+            </a:r>
+            <a:endParaRPr lang="en-US" sz="3000" i="1" dirty="0">
+              <a:solidFill>
+                <a:schemeClr val="tx1"/>
+              </a:solidFill>
+              <a:latin typeface="Times New Roman" panose="02020603050405020304" pitchFamily="18" charset="0"/>
+              <a:cs typeface="Times New Roman" panose="02020603050405020304" pitchFamily="18" charset="0"/>
+            </a:endParaRPr>
           </a:p>
         </p:txBody>
       </p:sp>
@@ -8746,7 +9074,7 @@
           <a:p>
             <a:pPr algn="ctr"/>
             <a:r>
-              <a:rPr lang="en-US" sz="3000" i="1" dirty="0" err="1">
+              <a:rPr lang="en-US" sz="3000" i="1" dirty="0">
                 <a:solidFill>
                   <a:schemeClr val="tx1"/>
                 </a:solidFill>
@@ -8756,7 +9084,7 @@
               <a:t>M</a:t>
             </a:r>
             <a:r>
-              <a:rPr lang="en-US" sz="3000" baseline="-25000" dirty="0" err="1">
+              <a:rPr lang="en-US" sz="3000" baseline="-25000" dirty="0">
                 <a:solidFill>
                   <a:schemeClr val="tx1"/>
                 </a:solidFill>
@@ -10374,7 +10702,7 @@
           <a:p>
             <a:pPr algn="ctr"/>
             <a:r>
-              <a:rPr lang="en-US" sz="3000" i="1" dirty="0" err="1">
+              <a:rPr lang="en-US" sz="3000" i="1" dirty="0">
                 <a:solidFill>
                   <a:schemeClr val="tx1"/>
                 </a:solidFill>
@@ -10384,7 +10712,7 @@
               <a:t>N</a:t>
             </a:r>
             <a:r>
-              <a:rPr lang="en-US" sz="3000" baseline="-25000" dirty="0" err="1">
+              <a:rPr lang="en-US" sz="3000" baseline="-25000" dirty="0">
                 <a:solidFill>
                   <a:schemeClr val="tx1"/>
                 </a:solidFill>
@@ -11214,7 +11542,7 @@
           <a:p>
             <a:pPr algn="ctr"/>
             <a:r>
-              <a:rPr lang="en-US" sz="3000" i="1" dirty="0" err="1">
+              <a:rPr lang="en-US" sz="3000" i="1" dirty="0">
                 <a:solidFill>
                   <a:schemeClr val="tx1"/>
                 </a:solidFill>
@@ -11224,7 +11552,7 @@
               <a:t>M</a:t>
             </a:r>
             <a:r>
-              <a:rPr lang="en-US" sz="3000" baseline="-25000" dirty="0" err="1">
+              <a:rPr lang="en-US" sz="3000" baseline="-25000" dirty="0">
                 <a:solidFill>
                   <a:schemeClr val="tx1"/>
                 </a:solidFill>
@@ -12842,7 +13170,7 @@
           <a:p>
             <a:pPr algn="ctr"/>
             <a:r>
-              <a:rPr lang="en-US" sz="3000" i="1" dirty="0" err="1">
+              <a:rPr lang="en-US" sz="3000" i="1" dirty="0">
                 <a:solidFill>
                   <a:schemeClr val="tx1"/>
                 </a:solidFill>
@@ -12852,7 +13180,7 @@
               <a:t>N</a:t>
             </a:r>
             <a:r>
-              <a:rPr lang="en-US" sz="3000" baseline="-25000" dirty="0" err="1">
+              <a:rPr lang="en-US" sz="3000" baseline="-25000" dirty="0">
                 <a:solidFill>
                   <a:schemeClr val="tx1"/>
                 </a:solidFill>

</xml_diff>

<commit_message>
add introduction edits; namely, revised hypotheses and added expected effects of PFT on beta and Narea
</commit_message>
<xml_diff>
--- a/working_drafts/figs/TXeco_SEM_ppt_fig.pptx
+++ b/working_drafts/figs/TXeco_SEM_ppt_fig.pptx
@@ -204,7 +204,7 @@
           <a:p>
             <a:fld id="{9C8338E3-F40D-F146-8D3B-4726E84D5200}" type="datetimeFigureOut">
               <a:rPr lang="en-US" smtClean="0"/>
-              <a:t>12/12/22</a:t>
+              <a:t>12/15/22</a:t>
             </a:fld>
             <a:endParaRPr lang="en-US"/>
           </a:p>
@@ -1225,7 +1225,7 @@
           <a:p>
             <a:fld id="{D3A28AA4-801E-B147-9E5C-6E6DBA6E23D1}" type="datetimeFigureOut">
               <a:rPr lang="en-US" smtClean="0"/>
-              <a:t>12/12/22</a:t>
+              <a:t>12/15/22</a:t>
             </a:fld>
             <a:endParaRPr lang="en-US"/>
           </a:p>
@@ -1395,7 +1395,7 @@
           <a:p>
             <a:fld id="{D3A28AA4-801E-B147-9E5C-6E6DBA6E23D1}" type="datetimeFigureOut">
               <a:rPr lang="en-US" smtClean="0"/>
-              <a:t>12/12/22</a:t>
+              <a:t>12/15/22</a:t>
             </a:fld>
             <a:endParaRPr lang="en-US"/>
           </a:p>
@@ -1575,7 +1575,7 @@
           <a:p>
             <a:fld id="{D3A28AA4-801E-B147-9E5C-6E6DBA6E23D1}" type="datetimeFigureOut">
               <a:rPr lang="en-US" smtClean="0"/>
-              <a:t>12/12/22</a:t>
+              <a:t>12/15/22</a:t>
             </a:fld>
             <a:endParaRPr lang="en-US"/>
           </a:p>
@@ -1745,7 +1745,7 @@
           <a:p>
             <a:fld id="{D3A28AA4-801E-B147-9E5C-6E6DBA6E23D1}" type="datetimeFigureOut">
               <a:rPr lang="en-US" smtClean="0"/>
-              <a:t>12/12/22</a:t>
+              <a:t>12/15/22</a:t>
             </a:fld>
             <a:endParaRPr lang="en-US"/>
           </a:p>
@@ -1989,7 +1989,7 @@
           <a:p>
             <a:fld id="{D3A28AA4-801E-B147-9E5C-6E6DBA6E23D1}" type="datetimeFigureOut">
               <a:rPr lang="en-US" smtClean="0"/>
-              <a:t>12/12/22</a:t>
+              <a:t>12/15/22</a:t>
             </a:fld>
             <a:endParaRPr lang="en-US"/>
           </a:p>
@@ -2221,7 +2221,7 @@
           <a:p>
             <a:fld id="{D3A28AA4-801E-B147-9E5C-6E6DBA6E23D1}" type="datetimeFigureOut">
               <a:rPr lang="en-US" smtClean="0"/>
-              <a:t>12/12/22</a:t>
+              <a:t>12/15/22</a:t>
             </a:fld>
             <a:endParaRPr lang="en-US"/>
           </a:p>
@@ -2588,7 +2588,7 @@
           <a:p>
             <a:fld id="{D3A28AA4-801E-B147-9E5C-6E6DBA6E23D1}" type="datetimeFigureOut">
               <a:rPr lang="en-US" smtClean="0"/>
-              <a:t>12/12/22</a:t>
+              <a:t>12/15/22</a:t>
             </a:fld>
             <a:endParaRPr lang="en-US"/>
           </a:p>
@@ -2706,7 +2706,7 @@
           <a:p>
             <a:fld id="{D3A28AA4-801E-B147-9E5C-6E6DBA6E23D1}" type="datetimeFigureOut">
               <a:rPr lang="en-US" smtClean="0"/>
-              <a:t>12/12/22</a:t>
+              <a:t>12/15/22</a:t>
             </a:fld>
             <a:endParaRPr lang="en-US"/>
           </a:p>
@@ -2801,7 +2801,7 @@
           <a:p>
             <a:fld id="{D3A28AA4-801E-B147-9E5C-6E6DBA6E23D1}" type="datetimeFigureOut">
               <a:rPr lang="en-US" smtClean="0"/>
-              <a:t>12/12/22</a:t>
+              <a:t>12/15/22</a:t>
             </a:fld>
             <a:endParaRPr lang="en-US"/>
           </a:p>
@@ -3078,7 +3078,7 @@
           <a:p>
             <a:fld id="{D3A28AA4-801E-B147-9E5C-6E6DBA6E23D1}" type="datetimeFigureOut">
               <a:rPr lang="en-US" smtClean="0"/>
-              <a:t>12/12/22</a:t>
+              <a:t>12/15/22</a:t>
             </a:fld>
             <a:endParaRPr lang="en-US"/>
           </a:p>
@@ -3335,7 +3335,7 @@
           <a:p>
             <a:fld id="{D3A28AA4-801E-B147-9E5C-6E6DBA6E23D1}" type="datetimeFigureOut">
               <a:rPr lang="en-US" smtClean="0"/>
-              <a:t>12/12/22</a:t>
+              <a:t>12/15/22</a:t>
             </a:fld>
             <a:endParaRPr lang="en-US"/>
           </a:p>
@@ -3548,7 +3548,7 @@
           <a:p>
             <a:fld id="{D3A28AA4-801E-B147-9E5C-6E6DBA6E23D1}" type="datetimeFigureOut">
               <a:rPr lang="en-US" smtClean="0"/>
-              <a:t>12/12/22</a:t>
+              <a:t>12/15/22</a:t>
             </a:fld>
             <a:endParaRPr lang="en-US"/>
           </a:p>
@@ -7177,7 +7177,7 @@
           <a:prstGeom prst="straightConnector1">
             <a:avLst/>
           </a:prstGeom>
-          <a:ln w="46863">
+          <a:ln w="53848">
             <a:solidFill>
               <a:srgbClr val="C00000"/>
             </a:solidFill>
@@ -7221,7 +7221,7 @@
           <a:prstGeom prst="straightConnector1">
             <a:avLst/>
           </a:prstGeom>
-          <a:ln w="40259">
+          <a:ln w="40640">
             <a:tailEnd type="triangle"/>
           </a:ln>
         </p:spPr>
@@ -7263,7 +7263,1763 @@
           <a:prstGeom prst="straightConnector1">
             <a:avLst/>
           </a:prstGeom>
-          <a:ln w="58039">
+          <a:ln w="60198">
+            <a:tailEnd type="triangle"/>
+          </a:ln>
+        </p:spPr>
+        <p:style>
+          <a:lnRef idx="1">
+            <a:schemeClr val="accent1"/>
+          </a:lnRef>
+          <a:fillRef idx="0">
+            <a:schemeClr val="accent1"/>
+          </a:fillRef>
+          <a:effectRef idx="0">
+            <a:schemeClr val="accent1"/>
+          </a:effectRef>
+          <a:fontRef idx="minor">
+            <a:schemeClr val="tx1"/>
+          </a:fontRef>
+        </p:style>
+      </p:cxnSp>
+      <p:cxnSp>
+        <p:nvCxnSpPr>
+          <p:cNvPr id="67" name="Straight Arrow Connector 66">
+            <a:extLst>
+              <a:ext uri="{FF2B5EF4-FFF2-40B4-BE49-F238E27FC236}">
+                <a16:creationId xmlns:a16="http://schemas.microsoft.com/office/drawing/2014/main" id="{4C86A50F-12A6-A917-05DA-9E0DD295FA1D}"/>
+              </a:ext>
+            </a:extLst>
+          </p:cNvPr>
+          <p:cNvCxnSpPr>
+            <a:cxnSpLocks/>
+            <a:stCxn id="7" idx="0"/>
+          </p:cNvCxnSpPr>
+          <p:nvPr/>
+        </p:nvCxnSpPr>
+        <p:spPr>
+          <a:xfrm flipH="1" flipV="1">
+            <a:off x="8698000" y="7977656"/>
+            <a:ext cx="2" cy="1812971"/>
+          </a:xfrm>
+          <a:prstGeom prst="straightConnector1">
+            <a:avLst/>
+          </a:prstGeom>
+          <a:ln w="76581">
+            <a:tailEnd type="triangle"/>
+          </a:ln>
+        </p:spPr>
+        <p:style>
+          <a:lnRef idx="1">
+            <a:schemeClr val="accent1"/>
+          </a:lnRef>
+          <a:fillRef idx="0">
+            <a:schemeClr val="accent1"/>
+          </a:fillRef>
+          <a:effectRef idx="0">
+            <a:schemeClr val="accent1"/>
+          </a:effectRef>
+          <a:fontRef idx="minor">
+            <a:schemeClr val="tx1"/>
+          </a:fontRef>
+        </p:style>
+      </p:cxnSp>
+      <p:cxnSp>
+        <p:nvCxnSpPr>
+          <p:cNvPr id="71" name="Straight Arrow Connector 70">
+            <a:extLst>
+              <a:ext uri="{FF2B5EF4-FFF2-40B4-BE49-F238E27FC236}">
+                <a16:creationId xmlns:a16="http://schemas.microsoft.com/office/drawing/2014/main" id="{1CF16A07-D494-F3DF-6F9B-0D35FDBA3B7D}"/>
+              </a:ext>
+            </a:extLst>
+          </p:cNvPr>
+          <p:cNvCxnSpPr>
+            <a:cxnSpLocks/>
+            <a:stCxn id="9" idx="2"/>
+          </p:cNvCxnSpPr>
+          <p:nvPr/>
+        </p:nvCxnSpPr>
+        <p:spPr>
+          <a:xfrm>
+            <a:off x="3177172" y="10643129"/>
+            <a:ext cx="0" cy="1862076"/>
+          </a:xfrm>
+          <a:prstGeom prst="straightConnector1">
+            <a:avLst/>
+          </a:prstGeom>
+          <a:ln w="95758">
+            <a:solidFill>
+              <a:srgbClr val="C00000"/>
+            </a:solidFill>
+            <a:tailEnd type="triangle"/>
+          </a:ln>
+        </p:spPr>
+        <p:style>
+          <a:lnRef idx="1">
+            <a:schemeClr val="accent1"/>
+          </a:lnRef>
+          <a:fillRef idx="0">
+            <a:schemeClr val="accent1"/>
+          </a:fillRef>
+          <a:effectRef idx="0">
+            <a:schemeClr val="accent1"/>
+          </a:effectRef>
+          <a:fontRef idx="minor">
+            <a:schemeClr val="tx1"/>
+          </a:fontRef>
+        </p:style>
+      </p:cxnSp>
+      <p:cxnSp>
+        <p:nvCxnSpPr>
+          <p:cNvPr id="74" name="Straight Arrow Connector 73">
+            <a:extLst>
+              <a:ext uri="{FF2B5EF4-FFF2-40B4-BE49-F238E27FC236}">
+                <a16:creationId xmlns:a16="http://schemas.microsoft.com/office/drawing/2014/main" id="{979A89F4-05C0-2792-DD78-DA760D62EFD6}"/>
+              </a:ext>
+            </a:extLst>
+          </p:cNvPr>
+          <p:cNvCxnSpPr>
+            <a:cxnSpLocks/>
+          </p:cNvCxnSpPr>
+          <p:nvPr/>
+        </p:nvCxnSpPr>
+        <p:spPr>
+          <a:xfrm flipV="1">
+            <a:off x="4086871" y="10685011"/>
+            <a:ext cx="3674506" cy="1856107"/>
+          </a:xfrm>
+          <a:prstGeom prst="straightConnector1">
+            <a:avLst/>
+          </a:prstGeom>
+          <a:ln w="62992">
+            <a:solidFill>
+              <a:srgbClr val="C00000"/>
+            </a:solidFill>
+            <a:tailEnd type="triangle"/>
+          </a:ln>
+        </p:spPr>
+        <p:style>
+          <a:lnRef idx="1">
+            <a:schemeClr val="accent1"/>
+          </a:lnRef>
+          <a:fillRef idx="0">
+            <a:schemeClr val="accent1"/>
+          </a:fillRef>
+          <a:effectRef idx="0">
+            <a:schemeClr val="accent1"/>
+          </a:effectRef>
+          <a:fontRef idx="minor">
+            <a:schemeClr val="tx1"/>
+          </a:fontRef>
+        </p:style>
+      </p:cxnSp>
+      <p:cxnSp>
+        <p:nvCxnSpPr>
+          <p:cNvPr id="86" name="Straight Arrow Connector 85">
+            <a:extLst>
+              <a:ext uri="{FF2B5EF4-FFF2-40B4-BE49-F238E27FC236}">
+                <a16:creationId xmlns:a16="http://schemas.microsoft.com/office/drawing/2014/main" id="{CF406CEF-7F3A-29CA-2619-A04B9AD83AEF}"/>
+              </a:ext>
+            </a:extLst>
+          </p:cNvPr>
+          <p:cNvCxnSpPr>
+            <a:cxnSpLocks/>
+          </p:cNvCxnSpPr>
+          <p:nvPr/>
+        </p:nvCxnSpPr>
+        <p:spPr>
+          <a:xfrm flipH="1" flipV="1">
+            <a:off x="9634627" y="10685011"/>
+            <a:ext cx="3762242" cy="1925469"/>
+          </a:xfrm>
+          <a:prstGeom prst="straightConnector1">
+            <a:avLst/>
+          </a:prstGeom>
+          <a:ln w="97536">
+            <a:tailEnd type="triangle"/>
+          </a:ln>
+        </p:spPr>
+        <p:style>
+          <a:lnRef idx="1">
+            <a:schemeClr val="accent1"/>
+          </a:lnRef>
+          <a:fillRef idx="0">
+            <a:schemeClr val="accent1"/>
+          </a:fillRef>
+          <a:effectRef idx="0">
+            <a:schemeClr val="accent1"/>
+          </a:effectRef>
+          <a:fontRef idx="minor">
+            <a:schemeClr val="tx1"/>
+          </a:fontRef>
+        </p:style>
+      </p:cxnSp>
+      <p:sp>
+        <p:nvSpPr>
+          <p:cNvPr id="19" name="TextBox 18">
+            <a:extLst>
+              <a:ext uri="{FF2B5EF4-FFF2-40B4-BE49-F238E27FC236}">
+                <a16:creationId xmlns:a16="http://schemas.microsoft.com/office/drawing/2014/main" id="{F515B11B-79E4-1B49-E1DD-A29E02290822}"/>
+              </a:ext>
+            </a:extLst>
+          </p:cNvPr>
+          <p:cNvSpPr txBox="1"/>
+          <p:nvPr/>
+        </p:nvSpPr>
+        <p:spPr>
+          <a:xfrm>
+            <a:off x="10867550" y="7216881"/>
+            <a:ext cx="1178528" cy="553998"/>
+          </a:xfrm>
+          <a:prstGeom prst="rect">
+            <a:avLst/>
+          </a:prstGeom>
+          <a:solidFill>
+            <a:schemeClr val="bg1"/>
+          </a:solidFill>
+          <a:ln w="53848">
+            <a:solidFill>
+              <a:srgbClr val="C00000"/>
+            </a:solidFill>
+          </a:ln>
+        </p:spPr>
+        <p:txBody>
+          <a:bodyPr wrap="none" rtlCol="0">
+            <a:spAutoFit/>
+          </a:bodyPr>
+          <a:lstStyle/>
+          <a:p>
+            <a:r>
+              <a:rPr lang="en-US" sz="3000" b="1" dirty="0">
+                <a:latin typeface="Times New Roman" panose="02020603050405020304" pitchFamily="18" charset="0"/>
+                <a:cs typeface="Times New Roman" panose="02020603050405020304" pitchFamily="18" charset="0"/>
+              </a:rPr>
+              <a:t>-0.044</a:t>
+            </a:r>
+          </a:p>
+        </p:txBody>
+      </p:sp>
+      <p:sp>
+        <p:nvSpPr>
+          <p:cNvPr id="62" name="TextBox 61">
+            <a:extLst>
+              <a:ext uri="{FF2B5EF4-FFF2-40B4-BE49-F238E27FC236}">
+                <a16:creationId xmlns:a16="http://schemas.microsoft.com/office/drawing/2014/main" id="{92EF7EE4-65A8-CBF1-9AA6-7647063CE02B}"/>
+              </a:ext>
+            </a:extLst>
+          </p:cNvPr>
+          <p:cNvSpPr txBox="1"/>
+          <p:nvPr/>
+        </p:nvSpPr>
+        <p:spPr>
+          <a:xfrm>
+            <a:off x="2574290" y="5842929"/>
+            <a:ext cx="1179576" cy="553998"/>
+          </a:xfrm>
+          <a:prstGeom prst="rect">
+            <a:avLst/>
+          </a:prstGeom>
+          <a:solidFill>
+            <a:schemeClr val="bg1"/>
+          </a:solidFill>
+          <a:ln w="60198">
+            <a:solidFill>
+              <a:schemeClr val="accent1"/>
+            </a:solidFill>
+          </a:ln>
+        </p:spPr>
+        <p:txBody>
+          <a:bodyPr wrap="none" rtlCol="0">
+            <a:spAutoFit/>
+          </a:bodyPr>
+          <a:lstStyle/>
+          <a:p>
+            <a:pPr algn="ctr"/>
+            <a:r>
+              <a:rPr lang="en-US" sz="3000" b="1" dirty="0">
+                <a:latin typeface="Times New Roman" panose="02020603050405020304" pitchFamily="18" charset="0"/>
+                <a:cs typeface="Times New Roman" panose="02020603050405020304" pitchFamily="18" charset="0"/>
+              </a:rPr>
+              <a:t>0.408</a:t>
+            </a:r>
+          </a:p>
+        </p:txBody>
+      </p:sp>
+      <p:sp>
+        <p:nvSpPr>
+          <p:cNvPr id="68" name="TextBox 67">
+            <a:extLst>
+              <a:ext uri="{FF2B5EF4-FFF2-40B4-BE49-F238E27FC236}">
+                <a16:creationId xmlns:a16="http://schemas.microsoft.com/office/drawing/2014/main" id="{BD3CF3C9-AA70-2C2C-1FC6-A9BB7E526592}"/>
+              </a:ext>
+            </a:extLst>
+          </p:cNvPr>
+          <p:cNvSpPr txBox="1"/>
+          <p:nvPr/>
+        </p:nvSpPr>
+        <p:spPr>
+          <a:xfrm>
+            <a:off x="8172857" y="8589678"/>
+            <a:ext cx="1050289" cy="553998"/>
+          </a:xfrm>
+          <a:prstGeom prst="rect">
+            <a:avLst/>
+          </a:prstGeom>
+          <a:solidFill>
+            <a:schemeClr val="bg1"/>
+          </a:solidFill>
+          <a:ln w="76581">
+            <a:solidFill>
+              <a:schemeClr val="accent1"/>
+            </a:solidFill>
+          </a:ln>
+        </p:spPr>
+        <p:txBody>
+          <a:bodyPr wrap="none" rtlCol="0">
+            <a:spAutoFit/>
+          </a:bodyPr>
+          <a:lstStyle/>
+          <a:p>
+            <a:pPr algn="ctr"/>
+            <a:r>
+              <a:rPr lang="en-US" sz="3000" b="1" dirty="0">
+                <a:latin typeface="Times New Roman" panose="02020603050405020304" pitchFamily="18" charset="0"/>
+                <a:cs typeface="Times New Roman" panose="02020603050405020304" pitchFamily="18" charset="0"/>
+              </a:rPr>
+              <a:t>0.605</a:t>
+            </a:r>
+          </a:p>
+        </p:txBody>
+      </p:sp>
+      <p:sp>
+        <p:nvSpPr>
+          <p:cNvPr id="72" name="TextBox 71">
+            <a:extLst>
+              <a:ext uri="{FF2B5EF4-FFF2-40B4-BE49-F238E27FC236}">
+                <a16:creationId xmlns:a16="http://schemas.microsoft.com/office/drawing/2014/main" id="{6B7A766A-3D4C-34AE-FF50-45494D21A356}"/>
+              </a:ext>
+            </a:extLst>
+          </p:cNvPr>
+          <p:cNvSpPr txBox="1"/>
+          <p:nvPr/>
+        </p:nvSpPr>
+        <p:spPr>
+          <a:xfrm>
+            <a:off x="2574290" y="11315124"/>
+            <a:ext cx="1181734" cy="553998"/>
+          </a:xfrm>
+          <a:prstGeom prst="rect">
+            <a:avLst/>
+          </a:prstGeom>
+          <a:solidFill>
+            <a:schemeClr val="bg1"/>
+          </a:solidFill>
+          <a:ln w="95758">
+            <a:solidFill>
+              <a:srgbClr val="C00000"/>
+            </a:solidFill>
+          </a:ln>
+        </p:spPr>
+        <p:txBody>
+          <a:bodyPr wrap="none" rtlCol="0">
+            <a:spAutoFit/>
+          </a:bodyPr>
+          <a:lstStyle/>
+          <a:p>
+            <a:pPr algn="ctr"/>
+            <a:r>
+              <a:rPr lang="en-US" sz="3000" b="1" dirty="0">
+                <a:latin typeface="Times New Roman" panose="02020603050405020304" pitchFamily="18" charset="0"/>
+                <a:cs typeface="Times New Roman" panose="02020603050405020304" pitchFamily="18" charset="0"/>
+              </a:rPr>
+              <a:t>-0.547</a:t>
+            </a:r>
+          </a:p>
+        </p:txBody>
+      </p:sp>
+      <p:sp>
+        <p:nvSpPr>
+          <p:cNvPr id="75" name="TextBox 74">
+            <a:extLst>
+              <a:ext uri="{FF2B5EF4-FFF2-40B4-BE49-F238E27FC236}">
+                <a16:creationId xmlns:a16="http://schemas.microsoft.com/office/drawing/2014/main" id="{8F8148C7-7D3D-B6F6-54CC-9DFA0F534589}"/>
+              </a:ext>
+            </a:extLst>
+          </p:cNvPr>
+          <p:cNvSpPr txBox="1"/>
+          <p:nvPr/>
+        </p:nvSpPr>
+        <p:spPr>
+          <a:xfrm>
+            <a:off x="5348322" y="11336064"/>
+            <a:ext cx="1178529" cy="553998"/>
+          </a:xfrm>
+          <a:prstGeom prst="rect">
+            <a:avLst/>
+          </a:prstGeom>
+          <a:solidFill>
+            <a:schemeClr val="bg1"/>
+          </a:solidFill>
+          <a:ln w="62992">
+            <a:solidFill>
+              <a:srgbClr val="C00000"/>
+            </a:solidFill>
+          </a:ln>
+        </p:spPr>
+        <p:txBody>
+          <a:bodyPr wrap="none" rtlCol="0">
+            <a:spAutoFit/>
+          </a:bodyPr>
+          <a:lstStyle/>
+          <a:p>
+            <a:pPr algn="ctr"/>
+            <a:r>
+              <a:rPr lang="en-US" sz="3000" b="1" dirty="0">
+                <a:latin typeface="Times New Roman" panose="02020603050405020304" pitchFamily="18" charset="0"/>
+                <a:cs typeface="Times New Roman" panose="02020603050405020304" pitchFamily="18" charset="0"/>
+              </a:rPr>
+              <a:t>-0.154</a:t>
+            </a:r>
+          </a:p>
+        </p:txBody>
+      </p:sp>
+      <p:sp>
+        <p:nvSpPr>
+          <p:cNvPr id="89" name="TextBox 88">
+            <a:extLst>
+              <a:ext uri="{FF2B5EF4-FFF2-40B4-BE49-F238E27FC236}">
+                <a16:creationId xmlns:a16="http://schemas.microsoft.com/office/drawing/2014/main" id="{CEA51897-E52D-9C81-B8BB-780C741F830D}"/>
+              </a:ext>
+            </a:extLst>
+          </p:cNvPr>
+          <p:cNvSpPr txBox="1"/>
+          <p:nvPr/>
+        </p:nvSpPr>
+        <p:spPr>
+          <a:xfrm>
+            <a:off x="10920056" y="11336064"/>
+            <a:ext cx="1050289" cy="553998"/>
+          </a:xfrm>
+          <a:prstGeom prst="rect">
+            <a:avLst/>
+          </a:prstGeom>
+          <a:solidFill>
+            <a:schemeClr val="bg1"/>
+          </a:solidFill>
+          <a:ln w="97536">
+            <a:solidFill>
+              <a:schemeClr val="accent1"/>
+            </a:solidFill>
+          </a:ln>
+        </p:spPr>
+        <p:txBody>
+          <a:bodyPr wrap="none" rtlCol="0">
+            <a:spAutoFit/>
+          </a:bodyPr>
+          <a:lstStyle/>
+          <a:p>
+            <a:pPr algn="ctr"/>
+            <a:r>
+              <a:rPr lang="en-US" sz="3000" b="1" dirty="0">
+                <a:latin typeface="Times New Roman" panose="02020603050405020304" pitchFamily="18" charset="0"/>
+                <a:cs typeface="Times New Roman" panose="02020603050405020304" pitchFamily="18" charset="0"/>
+              </a:rPr>
+              <a:t>0.856</a:t>
+            </a:r>
+          </a:p>
+        </p:txBody>
+      </p:sp>
+      <p:sp>
+        <p:nvSpPr>
+          <p:cNvPr id="56" name="TextBox 55">
+            <a:extLst>
+              <a:ext uri="{FF2B5EF4-FFF2-40B4-BE49-F238E27FC236}">
+                <a16:creationId xmlns:a16="http://schemas.microsoft.com/office/drawing/2014/main" id="{9BF0B091-AE15-EA82-6D84-C11B22D76D84}"/>
+              </a:ext>
+            </a:extLst>
+          </p:cNvPr>
+          <p:cNvSpPr txBox="1"/>
+          <p:nvPr/>
+        </p:nvSpPr>
+        <p:spPr>
+          <a:xfrm>
+            <a:off x="10944965" y="5842929"/>
+            <a:ext cx="1029064" cy="553998"/>
+          </a:xfrm>
+          <a:prstGeom prst="rect">
+            <a:avLst/>
+          </a:prstGeom>
+          <a:solidFill>
+            <a:schemeClr val="bg1"/>
+          </a:solidFill>
+          <a:ln w="40640">
+            <a:solidFill>
+              <a:schemeClr val="accent1"/>
+            </a:solidFill>
+          </a:ln>
+        </p:spPr>
+        <p:txBody>
+          <a:bodyPr wrap="none" rtlCol="0">
+            <a:spAutoFit/>
+          </a:bodyPr>
+          <a:lstStyle/>
+          <a:p>
+            <a:pPr algn="ctr"/>
+            <a:r>
+              <a:rPr lang="en-US" sz="3000" b="1" dirty="0">
+                <a:latin typeface="Times New Roman" panose="02020603050405020304" pitchFamily="18" charset="0"/>
+                <a:cs typeface="Times New Roman" panose="02020603050405020304" pitchFamily="18" charset="0"/>
+              </a:rPr>
+              <a:t>0.113</a:t>
+            </a:r>
+          </a:p>
+        </p:txBody>
+      </p:sp>
+      <p:sp>
+        <p:nvSpPr>
+          <p:cNvPr id="2" name="TextBox 1">
+            <a:extLst>
+              <a:ext uri="{FF2B5EF4-FFF2-40B4-BE49-F238E27FC236}">
+                <a16:creationId xmlns:a16="http://schemas.microsoft.com/office/drawing/2014/main" id="{8A9E0DEB-C92D-782F-D752-AE63983864B6}"/>
+              </a:ext>
+            </a:extLst>
+          </p:cNvPr>
+          <p:cNvSpPr txBox="1"/>
+          <p:nvPr/>
+        </p:nvSpPr>
+        <p:spPr>
+          <a:xfrm>
+            <a:off x="417095" y="17453811"/>
+            <a:ext cx="1850378" cy="369332"/>
+          </a:xfrm>
+          <a:prstGeom prst="rect">
+            <a:avLst/>
+          </a:prstGeom>
+          <a:noFill/>
+        </p:spPr>
+        <p:txBody>
+          <a:bodyPr wrap="none" rtlCol="0">
+            <a:spAutoFit/>
+          </a:bodyPr>
+          <a:lstStyle/>
+          <a:p>
+            <a:r>
+              <a:rPr lang="en-US" dirty="0" err="1"/>
+              <a:t>Narea</a:t>
+            </a:r>
+            <a:r>
+              <a:rPr lang="en-US" dirty="0"/>
+              <a:t> only model</a:t>
+            </a:r>
+          </a:p>
+        </p:txBody>
+      </p:sp>
+      <p:cxnSp>
+        <p:nvCxnSpPr>
+          <p:cNvPr id="11" name="Straight Arrow Connector 10">
+            <a:extLst>
+              <a:ext uri="{FF2B5EF4-FFF2-40B4-BE49-F238E27FC236}">
+                <a16:creationId xmlns:a16="http://schemas.microsoft.com/office/drawing/2014/main" id="{D7C54319-9E34-8DD0-26C5-533CFFB410A8}"/>
+              </a:ext>
+            </a:extLst>
+          </p:cNvPr>
+          <p:cNvCxnSpPr>
+            <a:cxnSpLocks/>
+            <a:stCxn id="10" idx="0"/>
+            <a:endCxn id="5" idx="2"/>
+          </p:cNvCxnSpPr>
+          <p:nvPr/>
+        </p:nvCxnSpPr>
+        <p:spPr>
+          <a:xfrm flipV="1">
+            <a:off x="14216301" y="7932493"/>
+            <a:ext cx="2531" cy="1856432"/>
+          </a:xfrm>
+          <a:prstGeom prst="straightConnector1">
+            <a:avLst/>
+          </a:prstGeom>
+          <a:ln w="169291">
+            <a:tailEnd type="triangle"/>
+          </a:ln>
+        </p:spPr>
+        <p:style>
+          <a:lnRef idx="1">
+            <a:schemeClr val="accent1"/>
+          </a:lnRef>
+          <a:fillRef idx="0">
+            <a:schemeClr val="accent1"/>
+          </a:fillRef>
+          <a:effectRef idx="0">
+            <a:schemeClr val="accent1"/>
+          </a:effectRef>
+          <a:fontRef idx="minor">
+            <a:schemeClr val="tx1"/>
+          </a:fontRef>
+        </p:style>
+      </p:cxnSp>
+      <p:cxnSp>
+        <p:nvCxnSpPr>
+          <p:cNvPr id="21" name="Straight Arrow Connector 20">
+            <a:extLst>
+              <a:ext uri="{FF2B5EF4-FFF2-40B4-BE49-F238E27FC236}">
+                <a16:creationId xmlns:a16="http://schemas.microsoft.com/office/drawing/2014/main" id="{331828D3-0371-65B5-832F-9F917FC1D571}"/>
+              </a:ext>
+            </a:extLst>
+          </p:cNvPr>
+          <p:cNvCxnSpPr>
+            <a:cxnSpLocks/>
+            <a:stCxn id="6" idx="2"/>
+            <a:endCxn id="5" idx="0"/>
+          </p:cNvCxnSpPr>
+          <p:nvPr/>
+        </p:nvCxnSpPr>
+        <p:spPr>
+          <a:xfrm>
+            <a:off x="14218832" y="5179972"/>
+            <a:ext cx="0" cy="1875298"/>
+          </a:xfrm>
+          <a:prstGeom prst="straightConnector1">
+            <a:avLst/>
+          </a:prstGeom>
+          <a:ln w="75057">
+            <a:tailEnd type="triangle"/>
+          </a:ln>
+        </p:spPr>
+        <p:style>
+          <a:lnRef idx="1">
+            <a:schemeClr val="accent1"/>
+          </a:lnRef>
+          <a:fillRef idx="0">
+            <a:schemeClr val="accent1"/>
+          </a:fillRef>
+          <a:effectRef idx="0">
+            <a:schemeClr val="accent1"/>
+          </a:effectRef>
+          <a:fontRef idx="minor">
+            <a:schemeClr val="tx1"/>
+          </a:fontRef>
+        </p:style>
+      </p:cxnSp>
+      <p:sp>
+        <p:nvSpPr>
+          <p:cNvPr id="22" name="TextBox 21">
+            <a:extLst>
+              <a:ext uri="{FF2B5EF4-FFF2-40B4-BE49-F238E27FC236}">
+                <a16:creationId xmlns:a16="http://schemas.microsoft.com/office/drawing/2014/main" id="{365180E0-0AC2-05A3-9B62-BC70871D756D}"/>
+              </a:ext>
+            </a:extLst>
+          </p:cNvPr>
+          <p:cNvSpPr txBox="1"/>
+          <p:nvPr/>
+        </p:nvSpPr>
+        <p:spPr>
+          <a:xfrm>
+            <a:off x="13693688" y="5829553"/>
+            <a:ext cx="1050289" cy="553998"/>
+          </a:xfrm>
+          <a:prstGeom prst="rect">
+            <a:avLst/>
+          </a:prstGeom>
+          <a:solidFill>
+            <a:schemeClr val="bg1"/>
+          </a:solidFill>
+          <a:ln w="75057">
+            <a:solidFill>
+              <a:schemeClr val="accent1"/>
+            </a:solidFill>
+          </a:ln>
+        </p:spPr>
+        <p:txBody>
+          <a:bodyPr wrap="none" rtlCol="0">
+            <a:spAutoFit/>
+          </a:bodyPr>
+          <a:lstStyle/>
+          <a:p>
+            <a:pPr algn="ctr"/>
+            <a:r>
+              <a:rPr lang="en-US" sz="3000" b="1" dirty="0">
+                <a:latin typeface="Times New Roman" panose="02020603050405020304" pitchFamily="18" charset="0"/>
+                <a:cs typeface="Times New Roman" panose="02020603050405020304" pitchFamily="18" charset="0"/>
+              </a:rPr>
+              <a:t>0.588</a:t>
+            </a:r>
+          </a:p>
+        </p:txBody>
+      </p:sp>
+      <p:sp>
+        <p:nvSpPr>
+          <p:cNvPr id="25" name="TextBox 24">
+            <a:extLst>
+              <a:ext uri="{FF2B5EF4-FFF2-40B4-BE49-F238E27FC236}">
+                <a16:creationId xmlns:a16="http://schemas.microsoft.com/office/drawing/2014/main" id="{42D0FFDE-56BB-B381-FB99-059837A735ED}"/>
+              </a:ext>
+            </a:extLst>
+          </p:cNvPr>
+          <p:cNvSpPr txBox="1"/>
+          <p:nvPr/>
+        </p:nvSpPr>
+        <p:spPr>
+          <a:xfrm>
+            <a:off x="13701501" y="8607142"/>
+            <a:ext cx="1050289" cy="553998"/>
+          </a:xfrm>
+          <a:prstGeom prst="rect">
+            <a:avLst/>
+          </a:prstGeom>
+          <a:solidFill>
+            <a:schemeClr val="bg1"/>
+          </a:solidFill>
+          <a:ln w="169291">
+            <a:solidFill>
+              <a:schemeClr val="accent1"/>
+            </a:solidFill>
+          </a:ln>
+        </p:spPr>
+        <p:txBody>
+          <a:bodyPr wrap="none" rtlCol="0">
+            <a:spAutoFit/>
+          </a:bodyPr>
+          <a:lstStyle/>
+          <a:p>
+            <a:pPr algn="ctr"/>
+            <a:r>
+              <a:rPr lang="en-US" sz="3000" b="1" dirty="0">
+                <a:latin typeface="Times New Roman" panose="02020603050405020304" pitchFamily="18" charset="0"/>
+                <a:cs typeface="Times New Roman" panose="02020603050405020304" pitchFamily="18" charset="0"/>
+              </a:rPr>
+              <a:t>1.716</a:t>
+            </a:r>
+          </a:p>
+        </p:txBody>
+      </p:sp>
+      <p:cxnSp>
+        <p:nvCxnSpPr>
+          <p:cNvPr id="3" name="Straight Arrow Connector 2">
+            <a:extLst>
+              <a:ext uri="{FF2B5EF4-FFF2-40B4-BE49-F238E27FC236}">
+                <a16:creationId xmlns:a16="http://schemas.microsoft.com/office/drawing/2014/main" id="{E8249700-7515-2967-823B-5310C13E5F57}"/>
+              </a:ext>
+            </a:extLst>
+          </p:cNvPr>
+          <p:cNvCxnSpPr>
+            <a:cxnSpLocks/>
+          </p:cNvCxnSpPr>
+          <p:nvPr/>
+        </p:nvCxnSpPr>
+        <p:spPr>
+          <a:xfrm>
+            <a:off x="9578203" y="7913022"/>
+            <a:ext cx="3675002" cy="1853160"/>
+          </a:xfrm>
+          <a:prstGeom prst="straightConnector1">
+            <a:avLst/>
+          </a:prstGeom>
+          <a:ln w="54102">
+            <a:tailEnd type="triangle"/>
+          </a:ln>
+        </p:spPr>
+        <p:style>
+          <a:lnRef idx="1">
+            <a:schemeClr val="accent1"/>
+          </a:lnRef>
+          <a:fillRef idx="0">
+            <a:schemeClr val="accent1"/>
+          </a:fillRef>
+          <a:effectRef idx="0">
+            <a:schemeClr val="accent1"/>
+          </a:effectRef>
+          <a:fontRef idx="minor">
+            <a:schemeClr val="tx1"/>
+          </a:fontRef>
+        </p:style>
+      </p:cxnSp>
+      <p:sp>
+        <p:nvSpPr>
+          <p:cNvPr id="12" name="TextBox 11">
+            <a:extLst>
+              <a:ext uri="{FF2B5EF4-FFF2-40B4-BE49-F238E27FC236}">
+                <a16:creationId xmlns:a16="http://schemas.microsoft.com/office/drawing/2014/main" id="{C3C861D2-D12D-3CE2-1361-40BFBF0C0148}"/>
+              </a:ext>
+            </a:extLst>
+          </p:cNvPr>
+          <p:cNvSpPr txBox="1"/>
+          <p:nvPr/>
+        </p:nvSpPr>
+        <p:spPr>
+          <a:xfrm>
+            <a:off x="10840736" y="8575979"/>
+            <a:ext cx="1178529" cy="553998"/>
+          </a:xfrm>
+          <a:prstGeom prst="rect">
+            <a:avLst/>
+          </a:prstGeom>
+          <a:solidFill>
+            <a:schemeClr val="bg1"/>
+          </a:solidFill>
+          <a:ln w="54102">
+            <a:solidFill>
+              <a:schemeClr val="accent1"/>
+            </a:solidFill>
+          </a:ln>
+        </p:spPr>
+        <p:txBody>
+          <a:bodyPr wrap="none" rtlCol="0">
+            <a:spAutoFit/>
+          </a:bodyPr>
+          <a:lstStyle/>
+          <a:p>
+            <a:pPr algn="ctr"/>
+            <a:r>
+              <a:rPr lang="en-US" sz="3000" b="1" dirty="0">
+                <a:latin typeface="Times New Roman" panose="02020603050405020304" pitchFamily="18" charset="0"/>
+                <a:cs typeface="Times New Roman" panose="02020603050405020304" pitchFamily="18" charset="0"/>
+              </a:rPr>
+              <a:t>-0.048</a:t>
+            </a:r>
+          </a:p>
+        </p:txBody>
+      </p:sp>
+      <p:sp>
+        <p:nvSpPr>
+          <p:cNvPr id="4" name="Rectangle 3">
+            <a:extLst>
+              <a:ext uri="{FF2B5EF4-FFF2-40B4-BE49-F238E27FC236}">
+                <a16:creationId xmlns:a16="http://schemas.microsoft.com/office/drawing/2014/main" id="{5BD2205E-EC6F-A811-EFCB-4F49F1FEF4E3}"/>
+              </a:ext>
+            </a:extLst>
+          </p:cNvPr>
+          <p:cNvSpPr/>
+          <p:nvPr/>
+        </p:nvSpPr>
+        <p:spPr>
+          <a:xfrm>
+            <a:off x="7788303" y="7065508"/>
+            <a:ext cx="1819398" cy="877223"/>
+          </a:xfrm>
+          <a:prstGeom prst="rect">
+            <a:avLst/>
+          </a:prstGeom>
+          <a:solidFill>
+            <a:schemeClr val="bg1"/>
+          </a:solidFill>
+          <a:ln w="38100">
+            <a:solidFill>
+              <a:schemeClr val="tx1"/>
+            </a:solidFill>
+          </a:ln>
+        </p:spPr>
+        <p:style>
+          <a:lnRef idx="2">
+            <a:schemeClr val="accent1">
+              <a:shade val="50000"/>
+            </a:schemeClr>
+          </a:lnRef>
+          <a:fillRef idx="1">
+            <a:schemeClr val="accent1"/>
+          </a:fillRef>
+          <a:effectRef idx="0">
+            <a:schemeClr val="accent1"/>
+          </a:effectRef>
+          <a:fontRef idx="minor">
+            <a:schemeClr val="lt1"/>
+          </a:fontRef>
+        </p:style>
+        <p:txBody>
+          <a:bodyPr rtlCol="0" anchor="ctr"/>
+          <a:lstStyle/>
+          <a:p>
+            <a:pPr algn="ctr"/>
+            <a:r>
+              <a:rPr lang="el-GR" sz="3000" i="1" dirty="0">
+                <a:solidFill>
+                  <a:schemeClr val="tx1"/>
+                </a:solidFill>
+                <a:latin typeface="Times New Roman" panose="02020603050405020304" pitchFamily="18" charset="0"/>
+                <a:cs typeface="Times New Roman" panose="02020603050405020304" pitchFamily="18" charset="0"/>
+              </a:rPr>
+              <a:t>β</a:t>
+            </a:r>
+            <a:endParaRPr lang="en-US" sz="3000" i="1" dirty="0">
+              <a:solidFill>
+                <a:schemeClr val="tx1"/>
+              </a:solidFill>
+              <a:latin typeface="Times New Roman" panose="02020603050405020304" pitchFamily="18" charset="0"/>
+              <a:cs typeface="Times New Roman" panose="02020603050405020304" pitchFamily="18" charset="0"/>
+            </a:endParaRPr>
+          </a:p>
+        </p:txBody>
+      </p:sp>
+      <p:sp>
+        <p:nvSpPr>
+          <p:cNvPr id="5" name="Rectangle 4">
+            <a:extLst>
+              <a:ext uri="{FF2B5EF4-FFF2-40B4-BE49-F238E27FC236}">
+                <a16:creationId xmlns:a16="http://schemas.microsoft.com/office/drawing/2014/main" id="{EC51CBA0-750B-23EC-1DBD-58EA55754A98}"/>
+              </a:ext>
+            </a:extLst>
+          </p:cNvPr>
+          <p:cNvSpPr/>
+          <p:nvPr/>
+        </p:nvSpPr>
+        <p:spPr>
+          <a:xfrm>
+            <a:off x="13309133" y="7055270"/>
+            <a:ext cx="1819398" cy="877223"/>
+          </a:xfrm>
+          <a:prstGeom prst="rect">
+            <a:avLst/>
+          </a:prstGeom>
+          <a:solidFill>
+            <a:schemeClr val="bg1"/>
+          </a:solidFill>
+          <a:ln w="38100">
+            <a:solidFill>
+              <a:schemeClr val="tx1"/>
+            </a:solidFill>
+          </a:ln>
+        </p:spPr>
+        <p:style>
+          <a:lnRef idx="2">
+            <a:schemeClr val="accent1">
+              <a:shade val="50000"/>
+            </a:schemeClr>
+          </a:lnRef>
+          <a:fillRef idx="1">
+            <a:schemeClr val="accent1"/>
+          </a:fillRef>
+          <a:effectRef idx="0">
+            <a:schemeClr val="accent1"/>
+          </a:effectRef>
+          <a:fontRef idx="minor">
+            <a:schemeClr val="lt1"/>
+          </a:fontRef>
+        </p:style>
+        <p:txBody>
+          <a:bodyPr rtlCol="0" anchor="ctr"/>
+          <a:lstStyle/>
+          <a:p>
+            <a:pPr algn="ctr"/>
+            <a:r>
+              <a:rPr lang="el-GR" sz="3000" i="1" dirty="0">
+                <a:solidFill>
+                  <a:schemeClr val="tx1"/>
+                </a:solidFill>
+                <a:latin typeface="Times New Roman" panose="02020603050405020304" pitchFamily="18" charset="0"/>
+                <a:cs typeface="Times New Roman" panose="02020603050405020304" pitchFamily="18" charset="0"/>
+              </a:rPr>
+              <a:t>Ν</a:t>
+            </a:r>
+            <a:r>
+              <a:rPr lang="en-US" sz="3000" baseline="-25000" dirty="0">
+                <a:solidFill>
+                  <a:schemeClr val="tx1"/>
+                </a:solidFill>
+                <a:latin typeface="Times New Roman" panose="02020603050405020304" pitchFamily="18" charset="0"/>
+                <a:cs typeface="Times New Roman" panose="02020603050405020304" pitchFamily="18" charset="0"/>
+              </a:rPr>
+              <a:t>area</a:t>
+            </a:r>
+            <a:endParaRPr lang="en-US" sz="3000" i="1" dirty="0">
+              <a:solidFill>
+                <a:schemeClr val="tx1"/>
+              </a:solidFill>
+              <a:latin typeface="Times New Roman" panose="02020603050405020304" pitchFamily="18" charset="0"/>
+              <a:cs typeface="Times New Roman" panose="02020603050405020304" pitchFamily="18" charset="0"/>
+            </a:endParaRPr>
+          </a:p>
+        </p:txBody>
+      </p:sp>
+      <p:sp>
+        <p:nvSpPr>
+          <p:cNvPr id="7" name="Rectangle 6">
+            <a:extLst>
+              <a:ext uri="{FF2B5EF4-FFF2-40B4-BE49-F238E27FC236}">
+                <a16:creationId xmlns:a16="http://schemas.microsoft.com/office/drawing/2014/main" id="{1E286FB5-C312-9430-876A-F1E6D3A2AB7E}"/>
+              </a:ext>
+            </a:extLst>
+          </p:cNvPr>
+          <p:cNvSpPr/>
+          <p:nvPr/>
+        </p:nvSpPr>
+        <p:spPr>
+          <a:xfrm>
+            <a:off x="7788303" y="9790627"/>
+            <a:ext cx="1819398" cy="877223"/>
+          </a:xfrm>
+          <a:prstGeom prst="rect">
+            <a:avLst/>
+          </a:prstGeom>
+          <a:solidFill>
+            <a:schemeClr val="bg1"/>
+          </a:solidFill>
+          <a:ln w="38100">
+            <a:solidFill>
+              <a:schemeClr val="tx1"/>
+            </a:solidFill>
+          </a:ln>
+        </p:spPr>
+        <p:style>
+          <a:lnRef idx="2">
+            <a:schemeClr val="accent1">
+              <a:shade val="50000"/>
+            </a:schemeClr>
+          </a:lnRef>
+          <a:fillRef idx="1">
+            <a:schemeClr val="accent1"/>
+          </a:fillRef>
+          <a:effectRef idx="0">
+            <a:schemeClr val="accent1"/>
+          </a:effectRef>
+          <a:fontRef idx="minor">
+            <a:schemeClr val="lt1"/>
+          </a:fontRef>
+        </p:style>
+        <p:txBody>
+          <a:bodyPr rtlCol="0" anchor="ctr"/>
+          <a:lstStyle/>
+          <a:p>
+            <a:pPr algn="ctr"/>
+            <a:r>
+              <a:rPr lang="en-US" sz="3000" i="1" dirty="0">
+                <a:solidFill>
+                  <a:schemeClr val="tx1"/>
+                </a:solidFill>
+                <a:latin typeface="Times New Roman" panose="02020603050405020304" pitchFamily="18" charset="0"/>
+                <a:cs typeface="Times New Roman" panose="02020603050405020304" pitchFamily="18" charset="0"/>
+              </a:rPr>
+              <a:t>Leaf Ci:Ca</a:t>
+            </a:r>
+          </a:p>
+        </p:txBody>
+      </p:sp>
+      <p:sp>
+        <p:nvSpPr>
+          <p:cNvPr id="8" name="Rectangle 7">
+            <a:extLst>
+              <a:ext uri="{FF2B5EF4-FFF2-40B4-BE49-F238E27FC236}">
+                <a16:creationId xmlns:a16="http://schemas.microsoft.com/office/drawing/2014/main" id="{876853D0-E144-E856-C806-EC1B2C7ABFDC}"/>
+              </a:ext>
+            </a:extLst>
+          </p:cNvPr>
+          <p:cNvSpPr/>
+          <p:nvPr/>
+        </p:nvSpPr>
+        <p:spPr>
+          <a:xfrm>
+            <a:off x="2267473" y="12541118"/>
+            <a:ext cx="1819398" cy="877223"/>
+          </a:xfrm>
+          <a:prstGeom prst="rect">
+            <a:avLst/>
+          </a:prstGeom>
+          <a:solidFill>
+            <a:schemeClr val="bg1"/>
+          </a:solidFill>
+          <a:ln w="38100">
+            <a:solidFill>
+              <a:schemeClr val="tx1"/>
+            </a:solidFill>
+          </a:ln>
+        </p:spPr>
+        <p:style>
+          <a:lnRef idx="2">
+            <a:schemeClr val="accent1">
+              <a:shade val="50000"/>
+            </a:schemeClr>
+          </a:lnRef>
+          <a:fillRef idx="1">
+            <a:schemeClr val="accent1"/>
+          </a:fillRef>
+          <a:effectRef idx="0">
+            <a:schemeClr val="accent1"/>
+          </a:effectRef>
+          <a:fontRef idx="minor">
+            <a:schemeClr val="lt1"/>
+          </a:fontRef>
+        </p:style>
+        <p:txBody>
+          <a:bodyPr rtlCol="0" anchor="ctr"/>
+          <a:lstStyle/>
+          <a:p>
+            <a:pPr algn="ctr"/>
+            <a:r>
+              <a:rPr lang="en-US" sz="3000" i="1" dirty="0">
+                <a:solidFill>
+                  <a:schemeClr val="tx1"/>
+                </a:solidFill>
+                <a:latin typeface="Times New Roman" panose="02020603050405020304" pitchFamily="18" charset="0"/>
+                <a:cs typeface="Times New Roman" panose="02020603050405020304" pitchFamily="18" charset="0"/>
+              </a:rPr>
+              <a:t>VPD</a:t>
+            </a:r>
+            <a:r>
+              <a:rPr lang="en-US" sz="3000" baseline="-25000" dirty="0">
+                <a:solidFill>
+                  <a:schemeClr val="tx1"/>
+                </a:solidFill>
+                <a:latin typeface="Times New Roman" panose="02020603050405020304" pitchFamily="18" charset="0"/>
+                <a:cs typeface="Times New Roman" panose="02020603050405020304" pitchFamily="18" charset="0"/>
+              </a:rPr>
+              <a:t>4</a:t>
+            </a:r>
+            <a:endParaRPr lang="en-US" sz="3000" dirty="0">
+              <a:solidFill>
+                <a:schemeClr val="tx1"/>
+              </a:solidFill>
+              <a:latin typeface="Times New Roman" panose="02020603050405020304" pitchFamily="18" charset="0"/>
+              <a:cs typeface="Times New Roman" panose="02020603050405020304" pitchFamily="18" charset="0"/>
+            </a:endParaRPr>
+          </a:p>
+        </p:txBody>
+      </p:sp>
+      <p:sp>
+        <p:nvSpPr>
+          <p:cNvPr id="14" name="Rectangle 13">
+            <a:extLst>
+              <a:ext uri="{FF2B5EF4-FFF2-40B4-BE49-F238E27FC236}">
+                <a16:creationId xmlns:a16="http://schemas.microsoft.com/office/drawing/2014/main" id="{D1E0C4A2-76D9-A904-18D5-0C30C816B437}"/>
+              </a:ext>
+            </a:extLst>
+          </p:cNvPr>
+          <p:cNvSpPr/>
+          <p:nvPr/>
+        </p:nvSpPr>
+        <p:spPr>
+          <a:xfrm>
+            <a:off x="2267473" y="7059884"/>
+            <a:ext cx="1819398" cy="877223"/>
+          </a:xfrm>
+          <a:prstGeom prst="rect">
+            <a:avLst/>
+          </a:prstGeom>
+          <a:solidFill>
+            <a:schemeClr val="bg1"/>
+          </a:solidFill>
+          <a:ln w="38100">
+            <a:solidFill>
+              <a:schemeClr val="tx1"/>
+            </a:solidFill>
+          </a:ln>
+        </p:spPr>
+        <p:style>
+          <a:lnRef idx="2">
+            <a:schemeClr val="accent1">
+              <a:shade val="50000"/>
+            </a:schemeClr>
+          </a:lnRef>
+          <a:fillRef idx="1">
+            <a:schemeClr val="accent1"/>
+          </a:fillRef>
+          <a:effectRef idx="0">
+            <a:schemeClr val="accent1"/>
+          </a:effectRef>
+          <a:fontRef idx="minor">
+            <a:schemeClr val="lt1"/>
+          </a:fontRef>
+        </p:style>
+        <p:txBody>
+          <a:bodyPr rtlCol="0" anchor="ctr"/>
+          <a:lstStyle/>
+          <a:p>
+            <a:pPr algn="ctr"/>
+            <a:r>
+              <a:rPr lang="en-US" sz="3000" i="1" dirty="0">
+                <a:solidFill>
+                  <a:schemeClr val="tx1"/>
+                </a:solidFill>
+                <a:latin typeface="Times New Roman" panose="02020603050405020304" pitchFamily="18" charset="0"/>
+                <a:cs typeface="Times New Roman" panose="02020603050405020304" pitchFamily="18" charset="0"/>
+              </a:rPr>
+              <a:t>Soil N</a:t>
+            </a:r>
+            <a:endParaRPr lang="en-US" sz="3000" dirty="0">
+              <a:solidFill>
+                <a:schemeClr val="tx1"/>
+              </a:solidFill>
+              <a:latin typeface="Times New Roman" panose="02020603050405020304" pitchFamily="18" charset="0"/>
+              <a:cs typeface="Times New Roman" panose="02020603050405020304" pitchFamily="18" charset="0"/>
+            </a:endParaRPr>
+          </a:p>
+        </p:txBody>
+      </p:sp>
+      <p:sp>
+        <p:nvSpPr>
+          <p:cNvPr id="16" name="Rectangle 15">
+            <a:extLst>
+              <a:ext uri="{FF2B5EF4-FFF2-40B4-BE49-F238E27FC236}">
+                <a16:creationId xmlns:a16="http://schemas.microsoft.com/office/drawing/2014/main" id="{D6B1DC0A-A409-5946-E004-EF6482E21DAA}"/>
+              </a:ext>
+            </a:extLst>
+          </p:cNvPr>
+          <p:cNvSpPr/>
+          <p:nvPr/>
+        </p:nvSpPr>
+        <p:spPr>
+          <a:xfrm>
+            <a:off x="13309133" y="12560308"/>
+            <a:ext cx="1819398" cy="877223"/>
+          </a:xfrm>
+          <a:prstGeom prst="rect">
+            <a:avLst/>
+          </a:prstGeom>
+          <a:solidFill>
+            <a:schemeClr val="bg1"/>
+          </a:solidFill>
+          <a:ln w="38100">
+            <a:solidFill>
+              <a:schemeClr val="tx1"/>
+            </a:solidFill>
+          </a:ln>
+        </p:spPr>
+        <p:style>
+          <a:lnRef idx="2">
+            <a:schemeClr val="accent1">
+              <a:shade val="50000"/>
+            </a:schemeClr>
+          </a:lnRef>
+          <a:fillRef idx="1">
+            <a:schemeClr val="accent1"/>
+          </a:fillRef>
+          <a:effectRef idx="0">
+            <a:schemeClr val="accent1"/>
+          </a:effectRef>
+          <a:fontRef idx="minor">
+            <a:schemeClr val="lt1"/>
+          </a:fontRef>
+        </p:style>
+        <p:txBody>
+          <a:bodyPr rtlCol="0" anchor="ctr"/>
+          <a:lstStyle/>
+          <a:p>
+            <a:pPr algn="ctr"/>
+            <a:r>
+              <a:rPr lang="en-US" sz="3000" i="1" dirty="0">
+                <a:solidFill>
+                  <a:schemeClr val="tx1"/>
+                </a:solidFill>
+                <a:latin typeface="Times New Roman" panose="02020603050405020304" pitchFamily="18" charset="0"/>
+                <a:cs typeface="Times New Roman" panose="02020603050405020304" pitchFamily="18" charset="0"/>
+              </a:rPr>
+              <a:t>Photo. pathway</a:t>
+            </a:r>
+          </a:p>
+        </p:txBody>
+      </p:sp>
+      <p:sp>
+        <p:nvSpPr>
+          <p:cNvPr id="13" name="Rectangle 12">
+            <a:extLst>
+              <a:ext uri="{FF2B5EF4-FFF2-40B4-BE49-F238E27FC236}">
+                <a16:creationId xmlns:a16="http://schemas.microsoft.com/office/drawing/2014/main" id="{B2A257A9-99B8-1A9F-6581-99A62F06BE43}"/>
+              </a:ext>
+            </a:extLst>
+          </p:cNvPr>
+          <p:cNvSpPr/>
+          <p:nvPr/>
+        </p:nvSpPr>
+        <p:spPr>
+          <a:xfrm>
+            <a:off x="7788303" y="4323876"/>
+            <a:ext cx="1819398" cy="877223"/>
+          </a:xfrm>
+          <a:prstGeom prst="rect">
+            <a:avLst/>
+          </a:prstGeom>
+          <a:solidFill>
+            <a:schemeClr val="bg1"/>
+          </a:solidFill>
+          <a:ln w="38100">
+            <a:solidFill>
+              <a:schemeClr val="tx1"/>
+            </a:solidFill>
+          </a:ln>
+        </p:spPr>
+        <p:style>
+          <a:lnRef idx="2">
+            <a:schemeClr val="accent1">
+              <a:shade val="50000"/>
+            </a:schemeClr>
+          </a:lnRef>
+          <a:fillRef idx="1">
+            <a:schemeClr val="accent1"/>
+          </a:fillRef>
+          <a:effectRef idx="0">
+            <a:schemeClr val="accent1"/>
+          </a:effectRef>
+          <a:fontRef idx="minor">
+            <a:schemeClr val="lt1"/>
+          </a:fontRef>
+        </p:style>
+        <p:txBody>
+          <a:bodyPr rtlCol="0" anchor="ctr"/>
+          <a:lstStyle/>
+          <a:p>
+            <a:pPr algn="ctr"/>
+            <a:r>
+              <a:rPr lang="en-US" sz="3000" i="1" dirty="0">
+                <a:solidFill>
+                  <a:schemeClr val="tx1"/>
+                </a:solidFill>
+                <a:latin typeface="Times New Roman" panose="02020603050405020304" pitchFamily="18" charset="0"/>
+                <a:cs typeface="Times New Roman" panose="02020603050405020304" pitchFamily="18" charset="0"/>
+              </a:rPr>
+              <a:t>N</a:t>
+            </a:r>
+            <a:r>
+              <a:rPr lang="en-US" sz="3000" baseline="-25000" dirty="0">
+                <a:solidFill>
+                  <a:schemeClr val="tx1"/>
+                </a:solidFill>
+                <a:latin typeface="Times New Roman" panose="02020603050405020304" pitchFamily="18" charset="0"/>
+                <a:cs typeface="Times New Roman" panose="02020603050405020304" pitchFamily="18" charset="0"/>
+              </a:rPr>
+              <a:t>fixer</a:t>
+            </a:r>
+            <a:endParaRPr lang="en-US" sz="3000" i="1" dirty="0">
+              <a:solidFill>
+                <a:schemeClr val="tx1"/>
+              </a:solidFill>
+              <a:latin typeface="Times New Roman" panose="02020603050405020304" pitchFamily="18" charset="0"/>
+              <a:cs typeface="Times New Roman" panose="02020603050405020304" pitchFamily="18" charset="0"/>
+            </a:endParaRPr>
+          </a:p>
+        </p:txBody>
+      </p:sp>
+      <p:sp>
+        <p:nvSpPr>
+          <p:cNvPr id="6" name="Rectangle 5">
+            <a:extLst>
+              <a:ext uri="{FF2B5EF4-FFF2-40B4-BE49-F238E27FC236}">
+                <a16:creationId xmlns:a16="http://schemas.microsoft.com/office/drawing/2014/main" id="{82098DFB-3E26-4855-1059-F871B3625B79}"/>
+              </a:ext>
+            </a:extLst>
+          </p:cNvPr>
+          <p:cNvSpPr/>
+          <p:nvPr/>
+        </p:nvSpPr>
+        <p:spPr>
+          <a:xfrm>
+            <a:off x="13309133" y="4302749"/>
+            <a:ext cx="1819398" cy="877223"/>
+          </a:xfrm>
+          <a:prstGeom prst="rect">
+            <a:avLst/>
+          </a:prstGeom>
+          <a:solidFill>
+            <a:schemeClr val="bg1"/>
+          </a:solidFill>
+          <a:ln w="38100">
+            <a:solidFill>
+              <a:schemeClr val="tx1"/>
+            </a:solidFill>
+          </a:ln>
+        </p:spPr>
+        <p:style>
+          <a:lnRef idx="2">
+            <a:schemeClr val="accent1">
+              <a:shade val="50000"/>
+            </a:schemeClr>
+          </a:lnRef>
+          <a:fillRef idx="1">
+            <a:schemeClr val="accent1"/>
+          </a:fillRef>
+          <a:effectRef idx="0">
+            <a:schemeClr val="accent1"/>
+          </a:effectRef>
+          <a:fontRef idx="minor">
+            <a:schemeClr val="lt1"/>
+          </a:fontRef>
+        </p:style>
+        <p:txBody>
+          <a:bodyPr rtlCol="0" anchor="ctr"/>
+          <a:lstStyle/>
+          <a:p>
+            <a:pPr algn="ctr"/>
+            <a:r>
+              <a:rPr lang="en-US" sz="3000" i="1" dirty="0">
+                <a:solidFill>
+                  <a:schemeClr val="tx1"/>
+                </a:solidFill>
+                <a:latin typeface="Times New Roman" panose="02020603050405020304" pitchFamily="18" charset="0"/>
+                <a:cs typeface="Times New Roman" panose="02020603050405020304" pitchFamily="18" charset="0"/>
+              </a:rPr>
+              <a:t>N</a:t>
+            </a:r>
+            <a:r>
+              <a:rPr lang="en-US" sz="3000" baseline="-25000" dirty="0">
+                <a:solidFill>
+                  <a:schemeClr val="tx1"/>
+                </a:solidFill>
+                <a:latin typeface="Times New Roman" panose="02020603050405020304" pitchFamily="18" charset="0"/>
+                <a:cs typeface="Times New Roman" panose="02020603050405020304" pitchFamily="18" charset="0"/>
+              </a:rPr>
+              <a:t>mass</a:t>
+            </a:r>
+            <a:endParaRPr lang="en-US" sz="3000" i="1" dirty="0">
+              <a:solidFill>
+                <a:schemeClr val="tx1"/>
+              </a:solidFill>
+              <a:latin typeface="Times New Roman" panose="02020603050405020304" pitchFamily="18" charset="0"/>
+              <a:cs typeface="Times New Roman" panose="02020603050405020304" pitchFamily="18" charset="0"/>
+            </a:endParaRPr>
+          </a:p>
+        </p:txBody>
+      </p:sp>
+      <p:sp>
+        <p:nvSpPr>
+          <p:cNvPr id="10" name="Rectangle 9">
+            <a:extLst>
+              <a:ext uri="{FF2B5EF4-FFF2-40B4-BE49-F238E27FC236}">
+                <a16:creationId xmlns:a16="http://schemas.microsoft.com/office/drawing/2014/main" id="{BE8EA6ED-AFB7-FCE3-419B-30CF6ED05DB7}"/>
+              </a:ext>
+            </a:extLst>
+          </p:cNvPr>
+          <p:cNvSpPr/>
+          <p:nvPr/>
+        </p:nvSpPr>
+        <p:spPr>
+          <a:xfrm>
+            <a:off x="13306602" y="9788925"/>
+            <a:ext cx="1819398" cy="877223"/>
+          </a:xfrm>
+          <a:prstGeom prst="rect">
+            <a:avLst/>
+          </a:prstGeom>
+          <a:solidFill>
+            <a:schemeClr val="bg1"/>
+          </a:solidFill>
+          <a:ln w="38100">
+            <a:solidFill>
+              <a:schemeClr val="tx1"/>
+            </a:solidFill>
+          </a:ln>
+        </p:spPr>
+        <p:style>
+          <a:lnRef idx="2">
+            <a:schemeClr val="accent1">
+              <a:shade val="50000"/>
+            </a:schemeClr>
+          </a:lnRef>
+          <a:fillRef idx="1">
+            <a:schemeClr val="accent1"/>
+          </a:fillRef>
+          <a:effectRef idx="0">
+            <a:schemeClr val="accent1"/>
+          </a:effectRef>
+          <a:fontRef idx="minor">
+            <a:schemeClr val="lt1"/>
+          </a:fontRef>
+        </p:style>
+        <p:txBody>
+          <a:bodyPr rtlCol="0" anchor="ctr"/>
+          <a:lstStyle/>
+          <a:p>
+            <a:pPr algn="ctr"/>
+            <a:r>
+              <a:rPr lang="en-US" sz="3000" i="1" dirty="0">
+                <a:solidFill>
+                  <a:schemeClr val="tx1"/>
+                </a:solidFill>
+                <a:latin typeface="Times New Roman" panose="02020603050405020304" pitchFamily="18" charset="0"/>
+                <a:cs typeface="Times New Roman" panose="02020603050405020304" pitchFamily="18" charset="0"/>
+              </a:rPr>
+              <a:t>M</a:t>
+            </a:r>
+            <a:r>
+              <a:rPr lang="en-US" sz="3000" baseline="-25000" dirty="0">
+                <a:solidFill>
+                  <a:schemeClr val="tx1"/>
+                </a:solidFill>
+                <a:latin typeface="Times New Roman" panose="02020603050405020304" pitchFamily="18" charset="0"/>
+                <a:cs typeface="Times New Roman" panose="02020603050405020304" pitchFamily="18" charset="0"/>
+              </a:rPr>
+              <a:t>area</a:t>
+            </a:r>
+            <a:endParaRPr lang="en-US" sz="3000" i="1" dirty="0">
+              <a:solidFill>
+                <a:schemeClr val="tx1"/>
+              </a:solidFill>
+              <a:latin typeface="Times New Roman" panose="02020603050405020304" pitchFamily="18" charset="0"/>
+              <a:cs typeface="Times New Roman" panose="02020603050405020304" pitchFamily="18" charset="0"/>
+            </a:endParaRPr>
+          </a:p>
+        </p:txBody>
+      </p:sp>
+      <p:cxnSp>
+        <p:nvCxnSpPr>
+          <p:cNvPr id="20" name="Straight Arrow Connector 19">
+            <a:extLst>
+              <a:ext uri="{FF2B5EF4-FFF2-40B4-BE49-F238E27FC236}">
+                <a16:creationId xmlns:a16="http://schemas.microsoft.com/office/drawing/2014/main" id="{302AB16A-042B-8811-D34E-DF1427D4FA80}"/>
+              </a:ext>
+            </a:extLst>
+          </p:cNvPr>
+          <p:cNvCxnSpPr>
+            <a:stCxn id="9" idx="3"/>
+            <a:endCxn id="7" idx="1"/>
+          </p:cNvCxnSpPr>
+          <p:nvPr/>
+        </p:nvCxnSpPr>
+        <p:spPr>
+          <a:xfrm>
+            <a:off x="4086871" y="10204519"/>
+            <a:ext cx="3701432" cy="24720"/>
+          </a:xfrm>
+          <a:prstGeom prst="straightConnector1">
+            <a:avLst/>
+          </a:prstGeom>
+          <a:ln w="44196">
+            <a:prstDash val="sysDot"/>
+            <a:tailEnd type="triangle"/>
+          </a:ln>
+        </p:spPr>
+        <p:style>
+          <a:lnRef idx="1">
+            <a:schemeClr val="accent1"/>
+          </a:lnRef>
+          <a:fillRef idx="0">
+            <a:schemeClr val="accent1"/>
+          </a:fillRef>
+          <a:effectRef idx="0">
+            <a:schemeClr val="accent1"/>
+          </a:effectRef>
+          <a:fontRef idx="minor">
+            <a:schemeClr val="tx1"/>
+          </a:fontRef>
+        </p:style>
+      </p:cxnSp>
+      <p:sp>
+        <p:nvSpPr>
+          <p:cNvPr id="23" name="TextBox 22">
+            <a:extLst>
+              <a:ext uri="{FF2B5EF4-FFF2-40B4-BE49-F238E27FC236}">
+                <a16:creationId xmlns:a16="http://schemas.microsoft.com/office/drawing/2014/main" id="{FE853AFB-9DB5-3D9A-F7E4-7818AFA0C044}"/>
+              </a:ext>
+            </a:extLst>
+          </p:cNvPr>
+          <p:cNvSpPr txBox="1"/>
+          <p:nvPr/>
+        </p:nvSpPr>
+        <p:spPr>
+          <a:xfrm>
+            <a:off x="5412442" y="9903127"/>
+            <a:ext cx="1050288" cy="553998"/>
+          </a:xfrm>
+          <a:prstGeom prst="rect">
+            <a:avLst/>
+          </a:prstGeom>
+          <a:solidFill>
+            <a:schemeClr val="bg1"/>
+          </a:solidFill>
+          <a:ln w="44196">
+            <a:solidFill>
+              <a:schemeClr val="accent1"/>
+            </a:solidFill>
+            <a:prstDash val="sysDot"/>
+          </a:ln>
+        </p:spPr>
+        <p:txBody>
+          <a:bodyPr wrap="none" rtlCol="0">
+            <a:spAutoFit/>
+          </a:bodyPr>
+          <a:lstStyle/>
+          <a:p>
+            <a:pPr algn="ctr"/>
+            <a:r>
+              <a:rPr lang="en-US" sz="3000" i="1" dirty="0">
+                <a:latin typeface="Times New Roman" panose="02020603050405020304" pitchFamily="18" charset="0"/>
+                <a:cs typeface="Times New Roman" panose="02020603050405020304" pitchFamily="18" charset="0"/>
+              </a:rPr>
+              <a:t>0.071</a:t>
+            </a:r>
+          </a:p>
+        </p:txBody>
+      </p:sp>
+      <p:sp>
+        <p:nvSpPr>
+          <p:cNvPr id="9" name="Rectangle 8">
+            <a:extLst>
+              <a:ext uri="{FF2B5EF4-FFF2-40B4-BE49-F238E27FC236}">
+                <a16:creationId xmlns:a16="http://schemas.microsoft.com/office/drawing/2014/main" id="{4D8FA927-0A7C-F469-F19B-443076679806}"/>
+              </a:ext>
+            </a:extLst>
+          </p:cNvPr>
+          <p:cNvSpPr/>
+          <p:nvPr/>
+        </p:nvSpPr>
+        <p:spPr>
+          <a:xfrm>
+            <a:off x="2267473" y="9765907"/>
+            <a:ext cx="1819398" cy="877223"/>
+          </a:xfrm>
+          <a:prstGeom prst="rect">
+            <a:avLst/>
+          </a:prstGeom>
+          <a:solidFill>
+            <a:schemeClr val="bg1"/>
+          </a:solidFill>
+          <a:ln w="38100">
+            <a:solidFill>
+              <a:schemeClr val="tx1"/>
+            </a:solidFill>
+          </a:ln>
+        </p:spPr>
+        <p:style>
+          <a:lnRef idx="2">
+            <a:schemeClr val="accent1">
+              <a:shade val="50000"/>
+            </a:schemeClr>
+          </a:lnRef>
+          <a:fillRef idx="1">
+            <a:schemeClr val="accent1"/>
+          </a:fillRef>
+          <a:effectRef idx="0">
+            <a:schemeClr val="accent1"/>
+          </a:effectRef>
+          <a:fontRef idx="minor">
+            <a:schemeClr val="lt1"/>
+          </a:fontRef>
+        </p:style>
+        <p:txBody>
+          <a:bodyPr rtlCol="0" anchor="ctr"/>
+          <a:lstStyle/>
+          <a:p>
+            <a:pPr algn="ctr"/>
+            <a:r>
+              <a:rPr lang="en-US" sz="3000" i="1" dirty="0">
+                <a:solidFill>
+                  <a:schemeClr val="tx1"/>
+                </a:solidFill>
+                <a:latin typeface="Times New Roman" panose="02020603050405020304" pitchFamily="18" charset="0"/>
+                <a:cs typeface="Times New Roman" panose="02020603050405020304" pitchFamily="18" charset="0"/>
+              </a:rPr>
+              <a:t>T</a:t>
+            </a:r>
+            <a:r>
+              <a:rPr lang="en-US" sz="3000" baseline="-25000" dirty="0">
+                <a:solidFill>
+                  <a:schemeClr val="tx1"/>
+                </a:solidFill>
+                <a:latin typeface="Times New Roman" panose="02020603050405020304" pitchFamily="18" charset="0"/>
+                <a:cs typeface="Times New Roman" panose="02020603050405020304" pitchFamily="18" charset="0"/>
+              </a:rPr>
+              <a:t>avg4</a:t>
+            </a:r>
+            <a:endParaRPr lang="en-US" sz="3000" i="1" dirty="0">
+              <a:solidFill>
+                <a:schemeClr val="tx1"/>
+              </a:solidFill>
+              <a:latin typeface="Times New Roman" panose="02020603050405020304" pitchFamily="18" charset="0"/>
+              <a:cs typeface="Times New Roman" panose="02020603050405020304" pitchFamily="18" charset="0"/>
+            </a:endParaRPr>
+          </a:p>
+        </p:txBody>
+      </p:sp>
+      <p:sp>
+        <p:nvSpPr>
+          <p:cNvPr id="15" name="Rectangle 14">
+            <a:extLst>
+              <a:ext uri="{FF2B5EF4-FFF2-40B4-BE49-F238E27FC236}">
+                <a16:creationId xmlns:a16="http://schemas.microsoft.com/office/drawing/2014/main" id="{3477DEF7-1C60-48CD-D30B-3C9B5CAB6140}"/>
+              </a:ext>
+            </a:extLst>
+          </p:cNvPr>
+          <p:cNvSpPr/>
+          <p:nvPr/>
+        </p:nvSpPr>
+        <p:spPr>
+          <a:xfrm>
+            <a:off x="2267473" y="4302752"/>
+            <a:ext cx="1819398" cy="877223"/>
+          </a:xfrm>
+          <a:prstGeom prst="rect">
+            <a:avLst/>
+          </a:prstGeom>
+          <a:solidFill>
+            <a:schemeClr val="bg1"/>
+          </a:solidFill>
+          <a:ln w="38100">
+            <a:solidFill>
+              <a:schemeClr val="tx1"/>
+            </a:solidFill>
+          </a:ln>
+        </p:spPr>
+        <p:style>
+          <a:lnRef idx="2">
+            <a:schemeClr val="accent1">
+              <a:shade val="50000"/>
+            </a:schemeClr>
+          </a:lnRef>
+          <a:fillRef idx="1">
+            <a:schemeClr val="accent1"/>
+          </a:fillRef>
+          <a:effectRef idx="0">
+            <a:schemeClr val="accent1"/>
+          </a:effectRef>
+          <a:fontRef idx="minor">
+            <a:schemeClr val="lt1"/>
+          </a:fontRef>
+        </p:style>
+        <p:txBody>
+          <a:bodyPr rtlCol="0" anchor="ctr"/>
+          <a:lstStyle/>
+          <a:p>
+            <a:pPr algn="ctr"/>
+            <a:r>
+              <a:rPr lang="en-US" sz="3000" i="1" dirty="0">
+                <a:solidFill>
+                  <a:schemeClr val="tx1"/>
+                </a:solidFill>
+                <a:latin typeface="Times New Roman" panose="02020603050405020304" pitchFamily="18" charset="0"/>
+                <a:cs typeface="Times New Roman" panose="02020603050405020304" pitchFamily="18" charset="0"/>
+              </a:rPr>
+              <a:t>SM</a:t>
+            </a:r>
+            <a:r>
+              <a:rPr lang="en-US" sz="3000" baseline="-25000" dirty="0">
+                <a:solidFill>
+                  <a:schemeClr val="tx1"/>
+                </a:solidFill>
+                <a:latin typeface="Times New Roman" panose="02020603050405020304" pitchFamily="18" charset="0"/>
+                <a:cs typeface="Times New Roman" panose="02020603050405020304" pitchFamily="18" charset="0"/>
+              </a:rPr>
+              <a:t>3</a:t>
+            </a:r>
+            <a:endParaRPr lang="en-US" sz="3000" dirty="0">
+              <a:solidFill>
+                <a:schemeClr val="tx1"/>
+              </a:solidFill>
+              <a:latin typeface="Times New Roman" panose="02020603050405020304" pitchFamily="18" charset="0"/>
+              <a:cs typeface="Times New Roman" panose="02020603050405020304" pitchFamily="18" charset="0"/>
+            </a:endParaRPr>
+          </a:p>
+        </p:txBody>
+      </p:sp>
+      <p:cxnSp>
+        <p:nvCxnSpPr>
+          <p:cNvPr id="78" name="Straight Arrow Connector 77">
+            <a:extLst>
+              <a:ext uri="{FF2B5EF4-FFF2-40B4-BE49-F238E27FC236}">
+                <a16:creationId xmlns:a16="http://schemas.microsoft.com/office/drawing/2014/main" id="{461C8B97-42CD-308E-8BB7-CFB37F7FA28D}"/>
+              </a:ext>
+            </a:extLst>
+          </p:cNvPr>
+          <p:cNvCxnSpPr/>
+          <p:nvPr/>
+        </p:nvCxnSpPr>
+        <p:spPr>
+          <a:xfrm>
+            <a:off x="4086871" y="5201099"/>
+            <a:ext cx="3674506" cy="4564808"/>
+          </a:xfrm>
+          <a:prstGeom prst="straightConnector1">
+            <a:avLst/>
+          </a:prstGeom>
+          <a:ln w="57911">
+            <a:solidFill>
+              <a:srgbClr val="C00000"/>
+            </a:solidFill>
+            <a:prstDash val="sysDot"/>
             <a:tailEnd type="triangle"/>
           </a:ln>
         </p:spPr>
@@ -7305,7 +9061,10 @@
           <a:prstGeom prst="straightConnector1">
             <a:avLst/>
           </a:prstGeom>
-          <a:ln w="53975">
+          <a:ln w="64643">
+            <a:solidFill>
+              <a:srgbClr val="C00000"/>
+            </a:solidFill>
             <a:tailEnd type="triangle"/>
           </a:ln>
         </p:spPr>
@@ -7324,30 +9083,124 @@
           </a:fontRef>
         </p:style>
       </p:cxnSp>
+      <p:sp>
+        <p:nvSpPr>
+          <p:cNvPr id="65" name="TextBox 64">
+            <a:extLst>
+              <a:ext uri="{FF2B5EF4-FFF2-40B4-BE49-F238E27FC236}">
+                <a16:creationId xmlns:a16="http://schemas.microsoft.com/office/drawing/2014/main" id="{BD81BF56-3883-BFB8-69D6-2533D9F7EBC9}"/>
+              </a:ext>
+            </a:extLst>
+          </p:cNvPr>
+          <p:cNvSpPr txBox="1"/>
+          <p:nvPr/>
+        </p:nvSpPr>
+        <p:spPr>
+          <a:xfrm>
+            <a:off x="5348322" y="7241329"/>
+            <a:ext cx="1178529" cy="553998"/>
+          </a:xfrm>
+          <a:prstGeom prst="rect">
+            <a:avLst/>
+          </a:prstGeom>
+          <a:solidFill>
+            <a:schemeClr val="bg1"/>
+          </a:solidFill>
+          <a:ln w="64643">
+            <a:solidFill>
+              <a:srgbClr val="C00000"/>
+            </a:solidFill>
+          </a:ln>
+        </p:spPr>
+        <p:txBody>
+          <a:bodyPr wrap="none" rtlCol="0">
+            <a:spAutoFit/>
+          </a:bodyPr>
+          <a:lstStyle/>
+          <a:p>
+            <a:pPr algn="ctr"/>
+            <a:r>
+              <a:rPr lang="en-US" sz="3000" b="1" dirty="0">
+                <a:latin typeface="Times New Roman" panose="02020603050405020304" pitchFamily="18" charset="0"/>
+                <a:cs typeface="Times New Roman" panose="02020603050405020304" pitchFamily="18" charset="0"/>
+              </a:rPr>
+              <a:t>-0.174</a:t>
+            </a:r>
+          </a:p>
+        </p:txBody>
+      </p:sp>
+      <p:sp>
+        <p:nvSpPr>
+          <p:cNvPr id="33" name="TextBox 32">
+            <a:extLst>
+              <a:ext uri="{FF2B5EF4-FFF2-40B4-BE49-F238E27FC236}">
+                <a16:creationId xmlns:a16="http://schemas.microsoft.com/office/drawing/2014/main" id="{B201EA33-737C-A1EA-6031-B81BFC9F0844}"/>
+              </a:ext>
+            </a:extLst>
+          </p:cNvPr>
+          <p:cNvSpPr txBox="1"/>
+          <p:nvPr/>
+        </p:nvSpPr>
+        <p:spPr>
+          <a:xfrm>
+            <a:off x="6433684" y="8589678"/>
+            <a:ext cx="1178529" cy="553998"/>
+          </a:xfrm>
+          <a:prstGeom prst="rect">
+            <a:avLst/>
+          </a:prstGeom>
+          <a:solidFill>
+            <a:schemeClr val="bg1"/>
+          </a:solidFill>
+          <a:ln w="57911">
+            <a:solidFill>
+              <a:srgbClr val="C00000"/>
+            </a:solidFill>
+            <a:prstDash val="sysDot"/>
+          </a:ln>
+        </p:spPr>
+        <p:txBody>
+          <a:bodyPr wrap="none" rtlCol="0">
+            <a:spAutoFit/>
+          </a:bodyPr>
+          <a:lstStyle/>
+          <a:p>
+            <a:pPr algn="ctr"/>
+            <a:r>
+              <a:rPr lang="en-US" sz="3000" i="1" dirty="0">
+                <a:latin typeface="Times New Roman" panose="02020603050405020304" pitchFamily="18" charset="0"/>
+                <a:cs typeface="Times New Roman" panose="02020603050405020304" pitchFamily="18" charset="0"/>
+              </a:rPr>
+              <a:t>-0.093</a:t>
+            </a:r>
+          </a:p>
+        </p:txBody>
+      </p:sp>
       <p:cxnSp>
         <p:nvCxnSpPr>
-          <p:cNvPr id="67" name="Straight Arrow Connector 66">
-            <a:extLst>
-              <a:ext uri="{FF2B5EF4-FFF2-40B4-BE49-F238E27FC236}">
-                <a16:creationId xmlns:a16="http://schemas.microsoft.com/office/drawing/2014/main" id="{4C86A50F-12A6-A917-05DA-9E0DD295FA1D}"/>
-              </a:ext>
-            </a:extLst>
-          </p:cNvPr>
-          <p:cNvCxnSpPr>
-            <a:cxnSpLocks/>
-            <a:stCxn id="7" idx="0"/>
-          </p:cNvCxnSpPr>
+          <p:cNvPr id="80" name="Straight Arrow Connector 79">
+            <a:extLst>
+              <a:ext uri="{FF2B5EF4-FFF2-40B4-BE49-F238E27FC236}">
+                <a16:creationId xmlns:a16="http://schemas.microsoft.com/office/drawing/2014/main" id="{CADC1627-C84F-A5AE-212B-1B3C2D6F5B14}"/>
+              </a:ext>
+            </a:extLst>
+          </p:cNvPr>
+          <p:cNvCxnSpPr/>
           <p:nvPr/>
         </p:nvCxnSpPr>
         <p:spPr>
-          <a:xfrm flipH="1" flipV="1">
-            <a:off x="8698000" y="7977656"/>
-            <a:ext cx="2" cy="1812971"/>
+          <a:xfrm>
+            <a:off x="4086871" y="5179972"/>
+            <a:ext cx="3674506" cy="1853160"/>
           </a:xfrm>
           <a:prstGeom prst="straightConnector1">
             <a:avLst/>
           </a:prstGeom>
-          <a:ln w="73406">
+          <a:ln w="64643">
+            <a:solidFill>
+              <a:srgbClr val="C00000"/>
+            </a:solidFill>
+            <a:prstDash val="sysDot"/>
             <a:tailEnd type="triangle"/>
           </a:ln>
         </p:spPr>
@@ -7366,142 +9219,12 @@
           </a:fontRef>
         </p:style>
       </p:cxnSp>
-      <p:cxnSp>
-        <p:nvCxnSpPr>
-          <p:cNvPr id="71" name="Straight Arrow Connector 70">
-            <a:extLst>
-              <a:ext uri="{FF2B5EF4-FFF2-40B4-BE49-F238E27FC236}">
-                <a16:creationId xmlns:a16="http://schemas.microsoft.com/office/drawing/2014/main" id="{1CF16A07-D494-F3DF-6F9B-0D35FDBA3B7D}"/>
-              </a:ext>
-            </a:extLst>
-          </p:cNvPr>
-          <p:cNvCxnSpPr>
-            <a:cxnSpLocks/>
-            <a:stCxn id="9" idx="2"/>
-          </p:cNvCxnSpPr>
-          <p:nvPr/>
-        </p:nvCxnSpPr>
-        <p:spPr>
-          <a:xfrm>
-            <a:off x="3177172" y="10643129"/>
-            <a:ext cx="0" cy="1862076"/>
-          </a:xfrm>
-          <a:prstGeom prst="straightConnector1">
-            <a:avLst/>
-          </a:prstGeom>
-          <a:ln w="69469">
-            <a:solidFill>
-              <a:srgbClr val="C00000"/>
-            </a:solidFill>
-            <a:tailEnd type="triangle"/>
-          </a:ln>
-        </p:spPr>
-        <p:style>
-          <a:lnRef idx="1">
-            <a:schemeClr val="accent1"/>
-          </a:lnRef>
-          <a:fillRef idx="0">
-            <a:schemeClr val="accent1"/>
-          </a:fillRef>
-          <a:effectRef idx="0">
-            <a:schemeClr val="accent1"/>
-          </a:effectRef>
-          <a:fontRef idx="minor">
-            <a:schemeClr val="tx1"/>
-          </a:fontRef>
-        </p:style>
-      </p:cxnSp>
-      <p:cxnSp>
-        <p:nvCxnSpPr>
-          <p:cNvPr id="74" name="Straight Arrow Connector 73">
-            <a:extLst>
-              <a:ext uri="{FF2B5EF4-FFF2-40B4-BE49-F238E27FC236}">
-                <a16:creationId xmlns:a16="http://schemas.microsoft.com/office/drawing/2014/main" id="{979A89F4-05C0-2792-DD78-DA760D62EFD6}"/>
-              </a:ext>
-            </a:extLst>
-          </p:cNvPr>
-          <p:cNvCxnSpPr>
-            <a:cxnSpLocks/>
-          </p:cNvCxnSpPr>
-          <p:nvPr/>
-        </p:nvCxnSpPr>
-        <p:spPr>
-          <a:xfrm flipV="1">
-            <a:off x="4086871" y="10685011"/>
-            <a:ext cx="3674506" cy="1856107"/>
-          </a:xfrm>
-          <a:prstGeom prst="straightConnector1">
-            <a:avLst/>
-          </a:prstGeom>
-          <a:ln w="50673">
-            <a:solidFill>
-              <a:srgbClr val="C00000"/>
-            </a:solidFill>
-            <a:tailEnd type="triangle"/>
-          </a:ln>
-        </p:spPr>
-        <p:style>
-          <a:lnRef idx="1">
-            <a:schemeClr val="accent1"/>
-          </a:lnRef>
-          <a:fillRef idx="0">
-            <a:schemeClr val="accent1"/>
-          </a:fillRef>
-          <a:effectRef idx="0">
-            <a:schemeClr val="accent1"/>
-          </a:effectRef>
-          <a:fontRef idx="minor">
-            <a:schemeClr val="tx1"/>
-          </a:fontRef>
-        </p:style>
-      </p:cxnSp>
-      <p:cxnSp>
-        <p:nvCxnSpPr>
-          <p:cNvPr id="86" name="Straight Arrow Connector 85">
-            <a:extLst>
-              <a:ext uri="{FF2B5EF4-FFF2-40B4-BE49-F238E27FC236}">
-                <a16:creationId xmlns:a16="http://schemas.microsoft.com/office/drawing/2014/main" id="{CF406CEF-7F3A-29CA-2619-A04B9AD83AEF}"/>
-              </a:ext>
-            </a:extLst>
-          </p:cNvPr>
-          <p:cNvCxnSpPr>
-            <a:cxnSpLocks/>
-          </p:cNvCxnSpPr>
-          <p:nvPr/>
-        </p:nvCxnSpPr>
-        <p:spPr>
-          <a:xfrm flipH="1" flipV="1">
-            <a:off x="9634627" y="10685011"/>
-            <a:ext cx="3762242" cy="1925469"/>
-          </a:xfrm>
-          <a:prstGeom prst="straightConnector1">
-            <a:avLst/>
-          </a:prstGeom>
-          <a:ln w="85852">
-            <a:tailEnd type="triangle"/>
-          </a:ln>
-        </p:spPr>
-        <p:style>
-          <a:lnRef idx="1">
-            <a:schemeClr val="accent1"/>
-          </a:lnRef>
-          <a:fillRef idx="0">
-            <a:schemeClr val="accent1"/>
-          </a:fillRef>
-          <a:effectRef idx="0">
-            <a:schemeClr val="accent1"/>
-          </a:effectRef>
-          <a:fontRef idx="minor">
-            <a:schemeClr val="tx1"/>
-          </a:fontRef>
-        </p:style>
-      </p:cxnSp>
-      <p:sp>
-        <p:nvSpPr>
-          <p:cNvPr id="19" name="TextBox 18">
-            <a:extLst>
-              <a:ext uri="{FF2B5EF4-FFF2-40B4-BE49-F238E27FC236}">
-                <a16:creationId xmlns:a16="http://schemas.microsoft.com/office/drawing/2014/main" id="{F515B11B-79E4-1B49-E1DD-A29E02290822}"/>
+      <p:sp>
+        <p:nvSpPr>
+          <p:cNvPr id="52" name="TextBox 51">
+            <a:extLst>
+              <a:ext uri="{FF2B5EF4-FFF2-40B4-BE49-F238E27FC236}">
+                <a16:creationId xmlns:a16="http://schemas.microsoft.com/office/drawing/2014/main" id="{293771F3-0A4C-E0FB-3B62-0C5C51C42680}"/>
               </a:ext>
             </a:extLst>
           </p:cNvPr>
@@ -7510,8 +9233,8 @@
         </p:nvSpPr>
         <p:spPr>
           <a:xfrm>
-            <a:off x="10867550" y="7216881"/>
-            <a:ext cx="1178528" cy="553998"/>
+            <a:off x="5799868" y="6055752"/>
+            <a:ext cx="1178529" cy="553998"/>
           </a:xfrm>
           <a:prstGeom prst="rect">
             <a:avLst/>
@@ -7519,10 +9242,11 @@
           <a:solidFill>
             <a:schemeClr val="bg1"/>
           </a:solidFill>
-          <a:ln w="46863">
+          <a:ln w="64643">
             <a:solidFill>
               <a:srgbClr val="C00000"/>
             </a:solidFill>
+            <a:prstDash val="sysDot"/>
           </a:ln>
         </p:spPr>
         <p:txBody>
@@ -7531,1465 +9255,14 @@
           </a:bodyPr>
           <a:lstStyle/>
           <a:p>
-            <a:r>
-              <a:rPr lang="en-US" sz="3000" b="1" dirty="0">
+            <a:pPr algn="ctr"/>
+            <a:r>
+              <a:rPr lang="en-US" sz="3000" i="1" dirty="0">
                 <a:latin typeface="Times New Roman" panose="02020603050405020304" pitchFamily="18" charset="0"/>
                 <a:cs typeface="Times New Roman" panose="02020603050405020304" pitchFamily="18" charset="0"/>
               </a:rPr>
-              <a:t>-0.044</a:t>
-            </a:r>
-          </a:p>
-        </p:txBody>
-      </p:sp>
-      <p:sp>
-        <p:nvSpPr>
-          <p:cNvPr id="62" name="TextBox 61">
-            <a:extLst>
-              <a:ext uri="{FF2B5EF4-FFF2-40B4-BE49-F238E27FC236}">
-                <a16:creationId xmlns:a16="http://schemas.microsoft.com/office/drawing/2014/main" id="{92EF7EE4-65A8-CBF1-9AA6-7647063CE02B}"/>
-              </a:ext>
-            </a:extLst>
-          </p:cNvPr>
-          <p:cNvSpPr txBox="1"/>
-          <p:nvPr/>
-        </p:nvSpPr>
-        <p:spPr>
-          <a:xfrm>
-            <a:off x="2574290" y="5842929"/>
-            <a:ext cx="1179576" cy="553998"/>
-          </a:xfrm>
-          <a:prstGeom prst="rect">
-            <a:avLst/>
-          </a:prstGeom>
-          <a:solidFill>
-            <a:schemeClr val="bg1"/>
-          </a:solidFill>
-          <a:ln w="58039">
-            <a:solidFill>
-              <a:schemeClr val="accent1"/>
-            </a:solidFill>
-          </a:ln>
-        </p:spPr>
-        <p:txBody>
-          <a:bodyPr wrap="none" rtlCol="0">
-            <a:spAutoFit/>
-          </a:bodyPr>
-          <a:lstStyle/>
-          <a:p>
-            <a:pPr algn="ctr"/>
-            <a:r>
-              <a:rPr lang="en-US" sz="3000" b="1" dirty="0">
-                <a:latin typeface="Times New Roman" panose="02020603050405020304" pitchFamily="18" charset="0"/>
-                <a:cs typeface="Times New Roman" panose="02020603050405020304" pitchFamily="18" charset="0"/>
-              </a:rPr>
-              <a:t>0.408</a:t>
-            </a:r>
-          </a:p>
-        </p:txBody>
-      </p:sp>
-      <p:sp>
-        <p:nvSpPr>
-          <p:cNvPr id="65" name="TextBox 64">
-            <a:extLst>
-              <a:ext uri="{FF2B5EF4-FFF2-40B4-BE49-F238E27FC236}">
-                <a16:creationId xmlns:a16="http://schemas.microsoft.com/office/drawing/2014/main" id="{BD81BF56-3883-BFB8-69D6-2533D9F7EBC9}"/>
-              </a:ext>
-            </a:extLst>
-          </p:cNvPr>
-          <p:cNvSpPr txBox="1"/>
-          <p:nvPr/>
-        </p:nvSpPr>
-        <p:spPr>
-          <a:xfrm>
-            <a:off x="5348322" y="7241329"/>
-            <a:ext cx="1178529" cy="553998"/>
-          </a:xfrm>
-          <a:prstGeom prst="rect">
-            <a:avLst/>
-          </a:prstGeom>
-          <a:solidFill>
-            <a:schemeClr val="bg1"/>
-          </a:solidFill>
-          <a:ln w="53975">
-            <a:solidFill>
-              <a:schemeClr val="accent1"/>
-            </a:solidFill>
-          </a:ln>
-        </p:spPr>
-        <p:txBody>
-          <a:bodyPr wrap="none" rtlCol="0">
-            <a:spAutoFit/>
-          </a:bodyPr>
-          <a:lstStyle/>
-          <a:p>
-            <a:pPr algn="ctr"/>
-            <a:r>
-              <a:rPr lang="en-US" sz="3000" b="1" dirty="0">
-                <a:latin typeface="Times New Roman" panose="02020603050405020304" pitchFamily="18" charset="0"/>
-                <a:cs typeface="Times New Roman" panose="02020603050405020304" pitchFamily="18" charset="0"/>
-              </a:rPr>
-              <a:t>-0.174</a:t>
-            </a:r>
-          </a:p>
-        </p:txBody>
-      </p:sp>
-      <p:sp>
-        <p:nvSpPr>
-          <p:cNvPr id="68" name="TextBox 67">
-            <a:extLst>
-              <a:ext uri="{FF2B5EF4-FFF2-40B4-BE49-F238E27FC236}">
-                <a16:creationId xmlns:a16="http://schemas.microsoft.com/office/drawing/2014/main" id="{BD3CF3C9-AA70-2C2C-1FC6-A9BB7E526592}"/>
-              </a:ext>
-            </a:extLst>
-          </p:cNvPr>
-          <p:cNvSpPr txBox="1"/>
-          <p:nvPr/>
-        </p:nvSpPr>
-        <p:spPr>
-          <a:xfrm>
-            <a:off x="8172857" y="8589678"/>
-            <a:ext cx="1050289" cy="553998"/>
-          </a:xfrm>
-          <a:prstGeom prst="rect">
-            <a:avLst/>
-          </a:prstGeom>
-          <a:solidFill>
-            <a:schemeClr val="bg1"/>
-          </a:solidFill>
-          <a:ln w="73406">
-            <a:solidFill>
-              <a:schemeClr val="accent1"/>
-            </a:solidFill>
-          </a:ln>
-        </p:spPr>
-        <p:txBody>
-          <a:bodyPr wrap="none" rtlCol="0">
-            <a:spAutoFit/>
-          </a:bodyPr>
-          <a:lstStyle/>
-          <a:p>
-            <a:pPr algn="ctr"/>
-            <a:r>
-              <a:rPr lang="en-US" sz="3000" b="1" dirty="0">
-                <a:latin typeface="Times New Roman" panose="02020603050405020304" pitchFamily="18" charset="0"/>
-                <a:cs typeface="Times New Roman" panose="02020603050405020304" pitchFamily="18" charset="0"/>
-              </a:rPr>
-              <a:t>0.605</a:t>
-            </a:r>
-          </a:p>
-        </p:txBody>
-      </p:sp>
-      <p:sp>
-        <p:nvSpPr>
-          <p:cNvPr id="72" name="TextBox 71">
-            <a:extLst>
-              <a:ext uri="{FF2B5EF4-FFF2-40B4-BE49-F238E27FC236}">
-                <a16:creationId xmlns:a16="http://schemas.microsoft.com/office/drawing/2014/main" id="{6B7A766A-3D4C-34AE-FF50-45494D21A356}"/>
-              </a:ext>
-            </a:extLst>
-          </p:cNvPr>
-          <p:cNvSpPr txBox="1"/>
-          <p:nvPr/>
-        </p:nvSpPr>
-        <p:spPr>
-          <a:xfrm>
-            <a:off x="2574290" y="11315124"/>
-            <a:ext cx="1181734" cy="553998"/>
-          </a:xfrm>
-          <a:prstGeom prst="rect">
-            <a:avLst/>
-          </a:prstGeom>
-          <a:solidFill>
-            <a:schemeClr val="bg1"/>
-          </a:solidFill>
-          <a:ln w="69469">
-            <a:solidFill>
-              <a:srgbClr val="C00000"/>
-            </a:solidFill>
-          </a:ln>
-        </p:spPr>
-        <p:txBody>
-          <a:bodyPr wrap="none" rtlCol="0">
-            <a:spAutoFit/>
-          </a:bodyPr>
-          <a:lstStyle/>
-          <a:p>
-            <a:pPr algn="ctr"/>
-            <a:r>
-              <a:rPr lang="en-US" sz="3000" b="1" dirty="0">
-                <a:latin typeface="Times New Roman" panose="02020603050405020304" pitchFamily="18" charset="0"/>
-                <a:cs typeface="Times New Roman" panose="02020603050405020304" pitchFamily="18" charset="0"/>
-              </a:rPr>
-              <a:t>-0.547</a:t>
-            </a:r>
-          </a:p>
-        </p:txBody>
-      </p:sp>
-      <p:sp>
-        <p:nvSpPr>
-          <p:cNvPr id="75" name="TextBox 74">
-            <a:extLst>
-              <a:ext uri="{FF2B5EF4-FFF2-40B4-BE49-F238E27FC236}">
-                <a16:creationId xmlns:a16="http://schemas.microsoft.com/office/drawing/2014/main" id="{8F8148C7-7D3D-B6F6-54CC-9DFA0F534589}"/>
-              </a:ext>
-            </a:extLst>
-          </p:cNvPr>
-          <p:cNvSpPr txBox="1"/>
-          <p:nvPr/>
-        </p:nvSpPr>
-        <p:spPr>
-          <a:xfrm>
-            <a:off x="5346720" y="11336064"/>
-            <a:ext cx="1181734" cy="553998"/>
-          </a:xfrm>
-          <a:prstGeom prst="rect">
-            <a:avLst/>
-          </a:prstGeom>
-          <a:solidFill>
-            <a:schemeClr val="bg1"/>
-          </a:solidFill>
-          <a:ln w="50673">
-            <a:solidFill>
-              <a:srgbClr val="C00000"/>
-            </a:solidFill>
-          </a:ln>
-        </p:spPr>
-        <p:txBody>
-          <a:bodyPr wrap="none" rtlCol="0">
-            <a:spAutoFit/>
-          </a:bodyPr>
-          <a:lstStyle/>
-          <a:p>
-            <a:pPr algn="ctr"/>
-            <a:r>
-              <a:rPr lang="en-US" sz="3000" b="1" dirty="0">
-                <a:latin typeface="Times New Roman" panose="02020603050405020304" pitchFamily="18" charset="0"/>
-                <a:cs typeface="Times New Roman" panose="02020603050405020304" pitchFamily="18" charset="0"/>
-              </a:rPr>
-              <a:t>-0.100</a:t>
-            </a:r>
-          </a:p>
-        </p:txBody>
-      </p:sp>
-      <p:sp>
-        <p:nvSpPr>
-          <p:cNvPr id="89" name="TextBox 88">
-            <a:extLst>
-              <a:ext uri="{FF2B5EF4-FFF2-40B4-BE49-F238E27FC236}">
-                <a16:creationId xmlns:a16="http://schemas.microsoft.com/office/drawing/2014/main" id="{CEA51897-E52D-9C81-B8BB-780C741F830D}"/>
-              </a:ext>
-            </a:extLst>
-          </p:cNvPr>
-          <p:cNvSpPr txBox="1"/>
-          <p:nvPr/>
-        </p:nvSpPr>
-        <p:spPr>
-          <a:xfrm>
-            <a:off x="10855413" y="11336064"/>
-            <a:ext cx="1179576" cy="553998"/>
-          </a:xfrm>
-          <a:prstGeom prst="rect">
-            <a:avLst/>
-          </a:prstGeom>
-          <a:solidFill>
-            <a:schemeClr val="bg1"/>
-          </a:solidFill>
-          <a:ln w="85852">
-            <a:solidFill>
-              <a:schemeClr val="accent1"/>
-            </a:solidFill>
-          </a:ln>
-        </p:spPr>
-        <p:txBody>
-          <a:bodyPr wrap="none" rtlCol="0">
-            <a:spAutoFit/>
-          </a:bodyPr>
-          <a:lstStyle/>
-          <a:p>
-            <a:pPr algn="ctr"/>
-            <a:r>
-              <a:rPr lang="en-US" sz="3000" b="1" dirty="0">
-                <a:latin typeface="Times New Roman" panose="02020603050405020304" pitchFamily="18" charset="0"/>
-                <a:cs typeface="Times New Roman" panose="02020603050405020304" pitchFamily="18" charset="0"/>
-              </a:rPr>
-              <a:t>0.846</a:t>
-            </a:r>
-          </a:p>
-        </p:txBody>
-      </p:sp>
-      <p:sp>
-        <p:nvSpPr>
-          <p:cNvPr id="56" name="TextBox 55">
-            <a:extLst>
-              <a:ext uri="{FF2B5EF4-FFF2-40B4-BE49-F238E27FC236}">
-                <a16:creationId xmlns:a16="http://schemas.microsoft.com/office/drawing/2014/main" id="{9BF0B091-AE15-EA82-6D84-C11B22D76D84}"/>
-              </a:ext>
-            </a:extLst>
-          </p:cNvPr>
-          <p:cNvSpPr txBox="1"/>
-          <p:nvPr/>
-        </p:nvSpPr>
-        <p:spPr>
-          <a:xfrm>
-            <a:off x="10944965" y="5842929"/>
-            <a:ext cx="1029064" cy="553998"/>
-          </a:xfrm>
-          <a:prstGeom prst="rect">
-            <a:avLst/>
-          </a:prstGeom>
-          <a:solidFill>
-            <a:schemeClr val="bg1"/>
-          </a:solidFill>
-          <a:ln w="40259">
-            <a:solidFill>
-              <a:schemeClr val="accent1"/>
-            </a:solidFill>
-          </a:ln>
-        </p:spPr>
-        <p:txBody>
-          <a:bodyPr wrap="none" rtlCol="0">
-            <a:spAutoFit/>
-          </a:bodyPr>
-          <a:lstStyle/>
-          <a:p>
-            <a:pPr algn="ctr"/>
-            <a:r>
-              <a:rPr lang="en-US" sz="3000" b="1" dirty="0">
-                <a:latin typeface="Times New Roman" panose="02020603050405020304" pitchFamily="18" charset="0"/>
-                <a:cs typeface="Times New Roman" panose="02020603050405020304" pitchFamily="18" charset="0"/>
-              </a:rPr>
-              <a:t>0.113</a:t>
-            </a:r>
-          </a:p>
-        </p:txBody>
-      </p:sp>
-      <p:sp>
-        <p:nvSpPr>
-          <p:cNvPr id="2" name="TextBox 1">
-            <a:extLst>
-              <a:ext uri="{FF2B5EF4-FFF2-40B4-BE49-F238E27FC236}">
-                <a16:creationId xmlns:a16="http://schemas.microsoft.com/office/drawing/2014/main" id="{8A9E0DEB-C92D-782F-D752-AE63983864B6}"/>
-              </a:ext>
-            </a:extLst>
-          </p:cNvPr>
-          <p:cNvSpPr txBox="1"/>
-          <p:nvPr/>
-        </p:nvSpPr>
-        <p:spPr>
-          <a:xfrm>
-            <a:off x="417095" y="17453811"/>
-            <a:ext cx="1850378" cy="369332"/>
-          </a:xfrm>
-          <a:prstGeom prst="rect">
-            <a:avLst/>
-          </a:prstGeom>
-          <a:noFill/>
-        </p:spPr>
-        <p:txBody>
-          <a:bodyPr wrap="none" rtlCol="0">
-            <a:spAutoFit/>
-          </a:bodyPr>
-          <a:lstStyle/>
-          <a:p>
-            <a:r>
-              <a:rPr lang="en-US" dirty="0" err="1"/>
-              <a:t>Narea</a:t>
-            </a:r>
-            <a:r>
-              <a:rPr lang="en-US" dirty="0"/>
-              <a:t> only model</a:t>
-            </a:r>
-          </a:p>
-        </p:txBody>
-      </p:sp>
-      <p:cxnSp>
-        <p:nvCxnSpPr>
-          <p:cNvPr id="11" name="Straight Arrow Connector 10">
-            <a:extLst>
-              <a:ext uri="{FF2B5EF4-FFF2-40B4-BE49-F238E27FC236}">
-                <a16:creationId xmlns:a16="http://schemas.microsoft.com/office/drawing/2014/main" id="{D7C54319-9E34-8DD0-26C5-533CFFB410A8}"/>
-              </a:ext>
-            </a:extLst>
-          </p:cNvPr>
-          <p:cNvCxnSpPr>
-            <a:cxnSpLocks/>
-            <a:stCxn id="10" idx="0"/>
-            <a:endCxn id="5" idx="2"/>
-          </p:cNvCxnSpPr>
-          <p:nvPr/>
-        </p:nvCxnSpPr>
-        <p:spPr>
-          <a:xfrm flipV="1">
-            <a:off x="14216301" y="7932493"/>
-            <a:ext cx="2531" cy="1856432"/>
-          </a:xfrm>
-          <a:prstGeom prst="straightConnector1">
-            <a:avLst/>
-          </a:prstGeom>
-          <a:ln w="153416">
-            <a:tailEnd type="triangle"/>
-          </a:ln>
-        </p:spPr>
-        <p:style>
-          <a:lnRef idx="1">
-            <a:schemeClr val="accent1"/>
-          </a:lnRef>
-          <a:fillRef idx="0">
-            <a:schemeClr val="accent1"/>
-          </a:fillRef>
-          <a:effectRef idx="0">
-            <a:schemeClr val="accent1"/>
-          </a:effectRef>
-          <a:fontRef idx="minor">
-            <a:schemeClr val="tx1"/>
-          </a:fontRef>
-        </p:style>
-      </p:cxnSp>
-      <p:cxnSp>
-        <p:nvCxnSpPr>
-          <p:cNvPr id="21" name="Straight Arrow Connector 20">
-            <a:extLst>
-              <a:ext uri="{FF2B5EF4-FFF2-40B4-BE49-F238E27FC236}">
-                <a16:creationId xmlns:a16="http://schemas.microsoft.com/office/drawing/2014/main" id="{331828D3-0371-65B5-832F-9F917FC1D571}"/>
-              </a:ext>
-            </a:extLst>
-          </p:cNvPr>
-          <p:cNvCxnSpPr>
-            <a:cxnSpLocks/>
-            <a:stCxn id="6" idx="2"/>
-            <a:endCxn id="5" idx="0"/>
-          </p:cNvCxnSpPr>
-          <p:nvPr/>
-        </p:nvCxnSpPr>
-        <p:spPr>
-          <a:xfrm>
-            <a:off x="14218832" y="5179972"/>
-            <a:ext cx="0" cy="1875298"/>
-          </a:xfrm>
-          <a:prstGeom prst="straightConnector1">
-            <a:avLst/>
-          </a:prstGeom>
-          <a:ln w="83058">
-            <a:tailEnd type="triangle"/>
-          </a:ln>
-        </p:spPr>
-        <p:style>
-          <a:lnRef idx="1">
-            <a:schemeClr val="accent1"/>
-          </a:lnRef>
-          <a:fillRef idx="0">
-            <a:schemeClr val="accent1"/>
-          </a:fillRef>
-          <a:effectRef idx="0">
-            <a:schemeClr val="accent1"/>
-          </a:effectRef>
-          <a:fontRef idx="minor">
-            <a:schemeClr val="tx1"/>
-          </a:fontRef>
-        </p:style>
-      </p:cxnSp>
-      <p:sp>
-        <p:nvSpPr>
-          <p:cNvPr id="22" name="TextBox 21">
-            <a:extLst>
-              <a:ext uri="{FF2B5EF4-FFF2-40B4-BE49-F238E27FC236}">
-                <a16:creationId xmlns:a16="http://schemas.microsoft.com/office/drawing/2014/main" id="{365180E0-0AC2-05A3-9B62-BC70871D756D}"/>
-              </a:ext>
-            </a:extLst>
-          </p:cNvPr>
-          <p:cNvSpPr txBox="1"/>
-          <p:nvPr/>
-        </p:nvSpPr>
-        <p:spPr>
-          <a:xfrm>
-            <a:off x="13693688" y="5829553"/>
-            <a:ext cx="1050289" cy="553998"/>
-          </a:xfrm>
-          <a:prstGeom prst="rect">
-            <a:avLst/>
-          </a:prstGeom>
-          <a:solidFill>
-            <a:schemeClr val="bg1"/>
-          </a:solidFill>
-          <a:ln w="83058">
-            <a:solidFill>
-              <a:schemeClr val="accent1"/>
-            </a:solidFill>
-          </a:ln>
-        </p:spPr>
-        <p:txBody>
-          <a:bodyPr wrap="none" rtlCol="0">
-            <a:spAutoFit/>
-          </a:bodyPr>
-          <a:lstStyle/>
-          <a:p>
-            <a:pPr algn="ctr"/>
-            <a:r>
-              <a:rPr lang="en-US" sz="3000" b="1" dirty="0">
-                <a:latin typeface="Times New Roman" panose="02020603050405020304" pitchFamily="18" charset="0"/>
-                <a:cs typeface="Times New Roman" panose="02020603050405020304" pitchFamily="18" charset="0"/>
-              </a:rPr>
-              <a:t>0.588</a:t>
-            </a:r>
-          </a:p>
-        </p:txBody>
-      </p:sp>
-      <p:sp>
-        <p:nvSpPr>
-          <p:cNvPr id="25" name="TextBox 24">
-            <a:extLst>
-              <a:ext uri="{FF2B5EF4-FFF2-40B4-BE49-F238E27FC236}">
-                <a16:creationId xmlns:a16="http://schemas.microsoft.com/office/drawing/2014/main" id="{42D0FFDE-56BB-B381-FB99-059837A735ED}"/>
-              </a:ext>
-            </a:extLst>
-          </p:cNvPr>
-          <p:cNvSpPr txBox="1"/>
-          <p:nvPr/>
-        </p:nvSpPr>
-        <p:spPr>
-          <a:xfrm>
-            <a:off x="13701501" y="8607142"/>
-            <a:ext cx="1050289" cy="553998"/>
-          </a:xfrm>
-          <a:prstGeom prst="rect">
-            <a:avLst/>
-          </a:prstGeom>
-          <a:solidFill>
-            <a:schemeClr val="bg1"/>
-          </a:solidFill>
-          <a:ln w="153416">
-            <a:solidFill>
-              <a:schemeClr val="accent1"/>
-            </a:solidFill>
-          </a:ln>
-        </p:spPr>
-        <p:txBody>
-          <a:bodyPr wrap="none" rtlCol="0">
-            <a:spAutoFit/>
-          </a:bodyPr>
-          <a:lstStyle/>
-          <a:p>
-            <a:pPr algn="ctr"/>
-            <a:r>
-              <a:rPr lang="en-US" sz="3000" b="1" dirty="0">
-                <a:latin typeface="Times New Roman" panose="02020603050405020304" pitchFamily="18" charset="0"/>
-                <a:cs typeface="Times New Roman" panose="02020603050405020304" pitchFamily="18" charset="0"/>
-              </a:rPr>
-              <a:t>1.716</a:t>
-            </a:r>
-          </a:p>
-        </p:txBody>
-      </p:sp>
-      <p:cxnSp>
-        <p:nvCxnSpPr>
-          <p:cNvPr id="3" name="Straight Arrow Connector 2">
-            <a:extLst>
-              <a:ext uri="{FF2B5EF4-FFF2-40B4-BE49-F238E27FC236}">
-                <a16:creationId xmlns:a16="http://schemas.microsoft.com/office/drawing/2014/main" id="{E8249700-7515-2967-823B-5310C13E5F57}"/>
-              </a:ext>
-            </a:extLst>
-          </p:cNvPr>
-          <p:cNvCxnSpPr>
-            <a:cxnSpLocks/>
-          </p:cNvCxnSpPr>
-          <p:nvPr/>
-        </p:nvCxnSpPr>
-        <p:spPr>
-          <a:xfrm>
-            <a:off x="9578203" y="7913022"/>
-            <a:ext cx="3675002" cy="1853160"/>
-          </a:xfrm>
-          <a:prstGeom prst="straightConnector1">
-            <a:avLst/>
-          </a:prstGeom>
-          <a:ln w="46609">
-            <a:tailEnd type="triangle"/>
-          </a:ln>
-        </p:spPr>
-        <p:style>
-          <a:lnRef idx="1">
-            <a:schemeClr val="accent1"/>
-          </a:lnRef>
-          <a:fillRef idx="0">
-            <a:schemeClr val="accent1"/>
-          </a:fillRef>
-          <a:effectRef idx="0">
-            <a:schemeClr val="accent1"/>
-          </a:effectRef>
-          <a:fontRef idx="minor">
-            <a:schemeClr val="tx1"/>
-          </a:fontRef>
-        </p:style>
-      </p:cxnSp>
-      <p:sp>
-        <p:nvSpPr>
-          <p:cNvPr id="12" name="TextBox 11">
-            <a:extLst>
-              <a:ext uri="{FF2B5EF4-FFF2-40B4-BE49-F238E27FC236}">
-                <a16:creationId xmlns:a16="http://schemas.microsoft.com/office/drawing/2014/main" id="{C3C861D2-D12D-3CE2-1361-40BFBF0C0148}"/>
-              </a:ext>
-            </a:extLst>
-          </p:cNvPr>
-          <p:cNvSpPr txBox="1"/>
-          <p:nvPr/>
-        </p:nvSpPr>
-        <p:spPr>
-          <a:xfrm>
-            <a:off x="10840736" y="8575979"/>
-            <a:ext cx="1178529" cy="553998"/>
-          </a:xfrm>
-          <a:prstGeom prst="rect">
-            <a:avLst/>
-          </a:prstGeom>
-          <a:solidFill>
-            <a:schemeClr val="bg1"/>
-          </a:solidFill>
-          <a:ln w="46609">
-            <a:solidFill>
-              <a:schemeClr val="accent1"/>
-            </a:solidFill>
-          </a:ln>
-        </p:spPr>
-        <p:txBody>
-          <a:bodyPr wrap="none" rtlCol="0">
-            <a:spAutoFit/>
-          </a:bodyPr>
-          <a:lstStyle/>
-          <a:p>
-            <a:pPr algn="ctr"/>
-            <a:r>
-              <a:rPr lang="en-US" sz="3000" b="1" dirty="0">
-                <a:latin typeface="Times New Roman" panose="02020603050405020304" pitchFamily="18" charset="0"/>
-                <a:cs typeface="Times New Roman" panose="02020603050405020304" pitchFamily="18" charset="0"/>
-              </a:rPr>
-              <a:t>-0.048</a:t>
-            </a:r>
-          </a:p>
-        </p:txBody>
-      </p:sp>
-      <p:sp>
-        <p:nvSpPr>
-          <p:cNvPr id="4" name="Rectangle 3">
-            <a:extLst>
-              <a:ext uri="{FF2B5EF4-FFF2-40B4-BE49-F238E27FC236}">
-                <a16:creationId xmlns:a16="http://schemas.microsoft.com/office/drawing/2014/main" id="{5BD2205E-EC6F-A811-EFCB-4F49F1FEF4E3}"/>
-              </a:ext>
-            </a:extLst>
-          </p:cNvPr>
-          <p:cNvSpPr/>
-          <p:nvPr/>
-        </p:nvSpPr>
-        <p:spPr>
-          <a:xfrm>
-            <a:off x="7788303" y="7065508"/>
-            <a:ext cx="1819398" cy="877223"/>
-          </a:xfrm>
-          <a:prstGeom prst="rect">
-            <a:avLst/>
-          </a:prstGeom>
-          <a:solidFill>
-            <a:schemeClr val="bg1"/>
-          </a:solidFill>
-          <a:ln w="38100">
-            <a:solidFill>
-              <a:schemeClr val="tx1"/>
-            </a:solidFill>
-          </a:ln>
-        </p:spPr>
-        <p:style>
-          <a:lnRef idx="2">
-            <a:schemeClr val="accent1">
-              <a:shade val="50000"/>
-            </a:schemeClr>
-          </a:lnRef>
-          <a:fillRef idx="1">
-            <a:schemeClr val="accent1"/>
-          </a:fillRef>
-          <a:effectRef idx="0">
-            <a:schemeClr val="accent1"/>
-          </a:effectRef>
-          <a:fontRef idx="minor">
-            <a:schemeClr val="lt1"/>
-          </a:fontRef>
-        </p:style>
-        <p:txBody>
-          <a:bodyPr rtlCol="0" anchor="ctr"/>
-          <a:lstStyle/>
-          <a:p>
-            <a:pPr algn="ctr"/>
-            <a:r>
-              <a:rPr lang="el-GR" sz="3000" i="1" dirty="0">
-                <a:solidFill>
-                  <a:schemeClr val="tx1"/>
-                </a:solidFill>
-                <a:latin typeface="Times New Roman" panose="02020603050405020304" pitchFamily="18" charset="0"/>
-                <a:cs typeface="Times New Roman" panose="02020603050405020304" pitchFamily="18" charset="0"/>
-              </a:rPr>
-              <a:t>β</a:t>
-            </a:r>
-            <a:endParaRPr lang="en-US" sz="3000" i="1" dirty="0">
-              <a:solidFill>
-                <a:schemeClr val="tx1"/>
-              </a:solidFill>
-              <a:latin typeface="Times New Roman" panose="02020603050405020304" pitchFamily="18" charset="0"/>
-              <a:cs typeface="Times New Roman" panose="02020603050405020304" pitchFamily="18" charset="0"/>
-            </a:endParaRPr>
-          </a:p>
-        </p:txBody>
-      </p:sp>
-      <p:sp>
-        <p:nvSpPr>
-          <p:cNvPr id="5" name="Rectangle 4">
-            <a:extLst>
-              <a:ext uri="{FF2B5EF4-FFF2-40B4-BE49-F238E27FC236}">
-                <a16:creationId xmlns:a16="http://schemas.microsoft.com/office/drawing/2014/main" id="{EC51CBA0-750B-23EC-1DBD-58EA55754A98}"/>
-              </a:ext>
-            </a:extLst>
-          </p:cNvPr>
-          <p:cNvSpPr/>
-          <p:nvPr/>
-        </p:nvSpPr>
-        <p:spPr>
-          <a:xfrm>
-            <a:off x="13309133" y="7055270"/>
-            <a:ext cx="1819398" cy="877223"/>
-          </a:xfrm>
-          <a:prstGeom prst="rect">
-            <a:avLst/>
-          </a:prstGeom>
-          <a:solidFill>
-            <a:schemeClr val="bg1"/>
-          </a:solidFill>
-          <a:ln w="38100">
-            <a:solidFill>
-              <a:schemeClr val="tx1"/>
-            </a:solidFill>
-          </a:ln>
-        </p:spPr>
-        <p:style>
-          <a:lnRef idx="2">
-            <a:schemeClr val="accent1">
-              <a:shade val="50000"/>
-            </a:schemeClr>
-          </a:lnRef>
-          <a:fillRef idx="1">
-            <a:schemeClr val="accent1"/>
-          </a:fillRef>
-          <a:effectRef idx="0">
-            <a:schemeClr val="accent1"/>
-          </a:effectRef>
-          <a:fontRef idx="minor">
-            <a:schemeClr val="lt1"/>
-          </a:fontRef>
-        </p:style>
-        <p:txBody>
-          <a:bodyPr rtlCol="0" anchor="ctr"/>
-          <a:lstStyle/>
-          <a:p>
-            <a:pPr algn="ctr"/>
-            <a:r>
-              <a:rPr lang="el-GR" sz="3000" i="1" dirty="0">
-                <a:solidFill>
-                  <a:schemeClr val="tx1"/>
-                </a:solidFill>
-                <a:latin typeface="Times New Roman" panose="02020603050405020304" pitchFamily="18" charset="0"/>
-                <a:cs typeface="Times New Roman" panose="02020603050405020304" pitchFamily="18" charset="0"/>
-              </a:rPr>
-              <a:t>Ν</a:t>
-            </a:r>
-            <a:r>
-              <a:rPr lang="en-US" sz="3000" baseline="-25000" dirty="0">
-                <a:solidFill>
-                  <a:schemeClr val="tx1"/>
-                </a:solidFill>
-                <a:latin typeface="Times New Roman" panose="02020603050405020304" pitchFamily="18" charset="0"/>
-                <a:cs typeface="Times New Roman" panose="02020603050405020304" pitchFamily="18" charset="0"/>
-              </a:rPr>
-              <a:t>area</a:t>
-            </a:r>
-            <a:endParaRPr lang="en-US" sz="3000" i="1" dirty="0">
-              <a:solidFill>
-                <a:schemeClr val="tx1"/>
-              </a:solidFill>
-              <a:latin typeface="Times New Roman" panose="02020603050405020304" pitchFamily="18" charset="0"/>
-              <a:cs typeface="Times New Roman" panose="02020603050405020304" pitchFamily="18" charset="0"/>
-            </a:endParaRPr>
-          </a:p>
-        </p:txBody>
-      </p:sp>
-      <p:sp>
-        <p:nvSpPr>
-          <p:cNvPr id="7" name="Rectangle 6">
-            <a:extLst>
-              <a:ext uri="{FF2B5EF4-FFF2-40B4-BE49-F238E27FC236}">
-                <a16:creationId xmlns:a16="http://schemas.microsoft.com/office/drawing/2014/main" id="{1E286FB5-C312-9430-876A-F1E6D3A2AB7E}"/>
-              </a:ext>
-            </a:extLst>
-          </p:cNvPr>
-          <p:cNvSpPr/>
-          <p:nvPr/>
-        </p:nvSpPr>
-        <p:spPr>
-          <a:xfrm>
-            <a:off x="7788303" y="9790627"/>
-            <a:ext cx="1819398" cy="877223"/>
-          </a:xfrm>
-          <a:prstGeom prst="rect">
-            <a:avLst/>
-          </a:prstGeom>
-          <a:solidFill>
-            <a:schemeClr val="bg1"/>
-          </a:solidFill>
-          <a:ln w="38100">
-            <a:solidFill>
-              <a:schemeClr val="tx1"/>
-            </a:solidFill>
-          </a:ln>
-        </p:spPr>
-        <p:style>
-          <a:lnRef idx="2">
-            <a:schemeClr val="accent1">
-              <a:shade val="50000"/>
-            </a:schemeClr>
-          </a:lnRef>
-          <a:fillRef idx="1">
-            <a:schemeClr val="accent1"/>
-          </a:fillRef>
-          <a:effectRef idx="0">
-            <a:schemeClr val="accent1"/>
-          </a:effectRef>
-          <a:fontRef idx="minor">
-            <a:schemeClr val="lt1"/>
-          </a:fontRef>
-        </p:style>
-        <p:txBody>
-          <a:bodyPr rtlCol="0" anchor="ctr"/>
-          <a:lstStyle/>
-          <a:p>
-            <a:pPr algn="ctr"/>
-            <a:r>
-              <a:rPr lang="en-US" sz="3000" i="1" dirty="0">
-                <a:solidFill>
-                  <a:schemeClr val="tx1"/>
-                </a:solidFill>
-                <a:latin typeface="Times New Roman" panose="02020603050405020304" pitchFamily="18" charset="0"/>
-                <a:cs typeface="Times New Roman" panose="02020603050405020304" pitchFamily="18" charset="0"/>
-              </a:rPr>
-              <a:t>Leaf Ci:Ca</a:t>
-            </a:r>
-          </a:p>
-        </p:txBody>
-      </p:sp>
-      <p:sp>
-        <p:nvSpPr>
-          <p:cNvPr id="8" name="Rectangle 7">
-            <a:extLst>
-              <a:ext uri="{FF2B5EF4-FFF2-40B4-BE49-F238E27FC236}">
-                <a16:creationId xmlns:a16="http://schemas.microsoft.com/office/drawing/2014/main" id="{876853D0-E144-E856-C806-EC1B2C7ABFDC}"/>
-              </a:ext>
-            </a:extLst>
-          </p:cNvPr>
-          <p:cNvSpPr/>
-          <p:nvPr/>
-        </p:nvSpPr>
-        <p:spPr>
-          <a:xfrm>
-            <a:off x="2267473" y="12541118"/>
-            <a:ext cx="1819398" cy="877223"/>
-          </a:xfrm>
-          <a:prstGeom prst="rect">
-            <a:avLst/>
-          </a:prstGeom>
-          <a:solidFill>
-            <a:schemeClr val="bg1"/>
-          </a:solidFill>
-          <a:ln w="38100">
-            <a:solidFill>
-              <a:schemeClr val="tx1"/>
-            </a:solidFill>
-          </a:ln>
-        </p:spPr>
-        <p:style>
-          <a:lnRef idx="2">
-            <a:schemeClr val="accent1">
-              <a:shade val="50000"/>
-            </a:schemeClr>
-          </a:lnRef>
-          <a:fillRef idx="1">
-            <a:schemeClr val="accent1"/>
-          </a:fillRef>
-          <a:effectRef idx="0">
-            <a:schemeClr val="accent1"/>
-          </a:effectRef>
-          <a:fontRef idx="minor">
-            <a:schemeClr val="lt1"/>
-          </a:fontRef>
-        </p:style>
-        <p:txBody>
-          <a:bodyPr rtlCol="0" anchor="ctr"/>
-          <a:lstStyle/>
-          <a:p>
-            <a:pPr algn="ctr"/>
-            <a:r>
-              <a:rPr lang="en-US" sz="3000" i="1" dirty="0">
-                <a:solidFill>
-                  <a:schemeClr val="tx1"/>
-                </a:solidFill>
-                <a:latin typeface="Times New Roman" panose="02020603050405020304" pitchFamily="18" charset="0"/>
-                <a:cs typeface="Times New Roman" panose="02020603050405020304" pitchFamily="18" charset="0"/>
-              </a:rPr>
-              <a:t>VPD</a:t>
-            </a:r>
-            <a:r>
-              <a:rPr lang="en-US" sz="3000" baseline="-25000" dirty="0">
-                <a:solidFill>
-                  <a:schemeClr val="tx1"/>
-                </a:solidFill>
-                <a:latin typeface="Times New Roman" panose="02020603050405020304" pitchFamily="18" charset="0"/>
-                <a:cs typeface="Times New Roman" panose="02020603050405020304" pitchFamily="18" charset="0"/>
-              </a:rPr>
-              <a:t>4</a:t>
-            </a:r>
-            <a:endParaRPr lang="en-US" sz="3000" dirty="0">
-              <a:solidFill>
-                <a:schemeClr val="tx1"/>
-              </a:solidFill>
-              <a:latin typeface="Times New Roman" panose="02020603050405020304" pitchFamily="18" charset="0"/>
-              <a:cs typeface="Times New Roman" panose="02020603050405020304" pitchFamily="18" charset="0"/>
-            </a:endParaRPr>
-          </a:p>
-        </p:txBody>
-      </p:sp>
-      <p:sp>
-        <p:nvSpPr>
-          <p:cNvPr id="9" name="Rectangle 8">
-            <a:extLst>
-              <a:ext uri="{FF2B5EF4-FFF2-40B4-BE49-F238E27FC236}">
-                <a16:creationId xmlns:a16="http://schemas.microsoft.com/office/drawing/2014/main" id="{4D8FA927-0A7C-F469-F19B-443076679806}"/>
-              </a:ext>
-            </a:extLst>
-          </p:cNvPr>
-          <p:cNvSpPr/>
-          <p:nvPr/>
-        </p:nvSpPr>
-        <p:spPr>
-          <a:xfrm>
-            <a:off x="2267473" y="9765907"/>
-            <a:ext cx="1819398" cy="877223"/>
-          </a:xfrm>
-          <a:prstGeom prst="rect">
-            <a:avLst/>
-          </a:prstGeom>
-          <a:solidFill>
-            <a:schemeClr val="bg1"/>
-          </a:solidFill>
-          <a:ln w="38100">
-            <a:solidFill>
-              <a:schemeClr val="tx1"/>
-            </a:solidFill>
-          </a:ln>
-        </p:spPr>
-        <p:style>
-          <a:lnRef idx="2">
-            <a:schemeClr val="accent1">
-              <a:shade val="50000"/>
-            </a:schemeClr>
-          </a:lnRef>
-          <a:fillRef idx="1">
-            <a:schemeClr val="accent1"/>
-          </a:fillRef>
-          <a:effectRef idx="0">
-            <a:schemeClr val="accent1"/>
-          </a:effectRef>
-          <a:fontRef idx="minor">
-            <a:schemeClr val="lt1"/>
-          </a:fontRef>
-        </p:style>
-        <p:txBody>
-          <a:bodyPr rtlCol="0" anchor="ctr"/>
-          <a:lstStyle/>
-          <a:p>
-            <a:pPr algn="ctr"/>
-            <a:r>
-              <a:rPr lang="en-US" sz="3000" i="1" dirty="0">
-                <a:solidFill>
-                  <a:schemeClr val="tx1"/>
-                </a:solidFill>
-                <a:latin typeface="Times New Roman" panose="02020603050405020304" pitchFamily="18" charset="0"/>
-                <a:cs typeface="Times New Roman" panose="02020603050405020304" pitchFamily="18" charset="0"/>
-              </a:rPr>
-              <a:t>T</a:t>
-            </a:r>
-            <a:r>
-              <a:rPr lang="en-US" sz="3000" baseline="-25000" dirty="0">
-                <a:solidFill>
-                  <a:schemeClr val="tx1"/>
-                </a:solidFill>
-                <a:latin typeface="Times New Roman" panose="02020603050405020304" pitchFamily="18" charset="0"/>
-                <a:cs typeface="Times New Roman" panose="02020603050405020304" pitchFamily="18" charset="0"/>
-              </a:rPr>
-              <a:t>avg4</a:t>
-            </a:r>
-            <a:endParaRPr lang="en-US" sz="3000" i="1" dirty="0">
-              <a:solidFill>
-                <a:schemeClr val="tx1"/>
-              </a:solidFill>
-              <a:latin typeface="Times New Roman" panose="02020603050405020304" pitchFamily="18" charset="0"/>
-              <a:cs typeface="Times New Roman" panose="02020603050405020304" pitchFamily="18" charset="0"/>
-            </a:endParaRPr>
-          </a:p>
-        </p:txBody>
-      </p:sp>
-      <p:sp>
-        <p:nvSpPr>
-          <p:cNvPr id="14" name="Rectangle 13">
-            <a:extLst>
-              <a:ext uri="{FF2B5EF4-FFF2-40B4-BE49-F238E27FC236}">
-                <a16:creationId xmlns:a16="http://schemas.microsoft.com/office/drawing/2014/main" id="{D1E0C4A2-76D9-A904-18D5-0C30C816B437}"/>
-              </a:ext>
-            </a:extLst>
-          </p:cNvPr>
-          <p:cNvSpPr/>
-          <p:nvPr/>
-        </p:nvSpPr>
-        <p:spPr>
-          <a:xfrm>
-            <a:off x="2267473" y="7059884"/>
-            <a:ext cx="1819398" cy="877223"/>
-          </a:xfrm>
-          <a:prstGeom prst="rect">
-            <a:avLst/>
-          </a:prstGeom>
-          <a:solidFill>
-            <a:schemeClr val="bg1"/>
-          </a:solidFill>
-          <a:ln w="38100">
-            <a:solidFill>
-              <a:schemeClr val="tx1"/>
-            </a:solidFill>
-          </a:ln>
-        </p:spPr>
-        <p:style>
-          <a:lnRef idx="2">
-            <a:schemeClr val="accent1">
-              <a:shade val="50000"/>
-            </a:schemeClr>
-          </a:lnRef>
-          <a:fillRef idx="1">
-            <a:schemeClr val="accent1"/>
-          </a:fillRef>
-          <a:effectRef idx="0">
-            <a:schemeClr val="accent1"/>
-          </a:effectRef>
-          <a:fontRef idx="minor">
-            <a:schemeClr val="lt1"/>
-          </a:fontRef>
-        </p:style>
-        <p:txBody>
-          <a:bodyPr rtlCol="0" anchor="ctr"/>
-          <a:lstStyle/>
-          <a:p>
-            <a:pPr algn="ctr"/>
-            <a:r>
-              <a:rPr lang="en-US" sz="3000" i="1" dirty="0">
-                <a:solidFill>
-                  <a:schemeClr val="tx1"/>
-                </a:solidFill>
-                <a:latin typeface="Times New Roman" panose="02020603050405020304" pitchFamily="18" charset="0"/>
-                <a:cs typeface="Times New Roman" panose="02020603050405020304" pitchFamily="18" charset="0"/>
-              </a:rPr>
-              <a:t>Soil N</a:t>
-            </a:r>
-            <a:endParaRPr lang="en-US" sz="3000" dirty="0">
-              <a:solidFill>
-                <a:schemeClr val="tx1"/>
-              </a:solidFill>
-              <a:latin typeface="Times New Roman" panose="02020603050405020304" pitchFamily="18" charset="0"/>
-              <a:cs typeface="Times New Roman" panose="02020603050405020304" pitchFamily="18" charset="0"/>
-            </a:endParaRPr>
-          </a:p>
-        </p:txBody>
-      </p:sp>
-      <p:sp>
-        <p:nvSpPr>
-          <p:cNvPr id="15" name="Rectangle 14">
-            <a:extLst>
-              <a:ext uri="{FF2B5EF4-FFF2-40B4-BE49-F238E27FC236}">
-                <a16:creationId xmlns:a16="http://schemas.microsoft.com/office/drawing/2014/main" id="{3477DEF7-1C60-48CD-D30B-3C9B5CAB6140}"/>
-              </a:ext>
-            </a:extLst>
-          </p:cNvPr>
-          <p:cNvSpPr/>
-          <p:nvPr/>
-        </p:nvSpPr>
-        <p:spPr>
-          <a:xfrm>
-            <a:off x="2267473" y="4302752"/>
-            <a:ext cx="1819398" cy="877223"/>
-          </a:xfrm>
-          <a:prstGeom prst="rect">
-            <a:avLst/>
-          </a:prstGeom>
-          <a:solidFill>
-            <a:schemeClr val="bg1"/>
-          </a:solidFill>
-          <a:ln w="38100">
-            <a:solidFill>
-              <a:schemeClr val="tx1"/>
-            </a:solidFill>
-          </a:ln>
-        </p:spPr>
-        <p:style>
-          <a:lnRef idx="2">
-            <a:schemeClr val="accent1">
-              <a:shade val="50000"/>
-            </a:schemeClr>
-          </a:lnRef>
-          <a:fillRef idx="1">
-            <a:schemeClr val="accent1"/>
-          </a:fillRef>
-          <a:effectRef idx="0">
-            <a:schemeClr val="accent1"/>
-          </a:effectRef>
-          <a:fontRef idx="minor">
-            <a:schemeClr val="lt1"/>
-          </a:fontRef>
-        </p:style>
-        <p:txBody>
-          <a:bodyPr rtlCol="0" anchor="ctr"/>
-          <a:lstStyle/>
-          <a:p>
-            <a:pPr algn="ctr"/>
-            <a:r>
-              <a:rPr lang="en-US" sz="3000" i="1" dirty="0">
-                <a:solidFill>
-                  <a:schemeClr val="tx1"/>
-                </a:solidFill>
-                <a:latin typeface="Times New Roman" panose="02020603050405020304" pitchFamily="18" charset="0"/>
-                <a:cs typeface="Times New Roman" panose="02020603050405020304" pitchFamily="18" charset="0"/>
-              </a:rPr>
-              <a:t>SM</a:t>
-            </a:r>
-            <a:r>
-              <a:rPr lang="en-US" sz="3000" baseline="-25000" dirty="0">
-                <a:solidFill>
-                  <a:schemeClr val="tx1"/>
-                </a:solidFill>
-                <a:latin typeface="Times New Roman" panose="02020603050405020304" pitchFamily="18" charset="0"/>
-                <a:cs typeface="Times New Roman" panose="02020603050405020304" pitchFamily="18" charset="0"/>
-              </a:rPr>
-              <a:t>3</a:t>
-            </a:r>
-            <a:endParaRPr lang="en-US" sz="3000" dirty="0">
-              <a:solidFill>
-                <a:schemeClr val="tx1"/>
-              </a:solidFill>
-              <a:latin typeface="Times New Roman" panose="02020603050405020304" pitchFamily="18" charset="0"/>
-              <a:cs typeface="Times New Roman" panose="02020603050405020304" pitchFamily="18" charset="0"/>
-            </a:endParaRPr>
-          </a:p>
-        </p:txBody>
-      </p:sp>
-      <p:sp>
-        <p:nvSpPr>
-          <p:cNvPr id="16" name="Rectangle 15">
-            <a:extLst>
-              <a:ext uri="{FF2B5EF4-FFF2-40B4-BE49-F238E27FC236}">
-                <a16:creationId xmlns:a16="http://schemas.microsoft.com/office/drawing/2014/main" id="{D6B1DC0A-A409-5946-E004-EF6482E21DAA}"/>
-              </a:ext>
-            </a:extLst>
-          </p:cNvPr>
-          <p:cNvSpPr/>
-          <p:nvPr/>
-        </p:nvSpPr>
-        <p:spPr>
-          <a:xfrm>
-            <a:off x="13309133" y="12560308"/>
-            <a:ext cx="1819398" cy="877223"/>
-          </a:xfrm>
-          <a:prstGeom prst="rect">
-            <a:avLst/>
-          </a:prstGeom>
-          <a:solidFill>
-            <a:schemeClr val="bg1"/>
-          </a:solidFill>
-          <a:ln w="38100">
-            <a:solidFill>
-              <a:schemeClr val="tx1"/>
-            </a:solidFill>
-          </a:ln>
-        </p:spPr>
-        <p:style>
-          <a:lnRef idx="2">
-            <a:schemeClr val="accent1">
-              <a:shade val="50000"/>
-            </a:schemeClr>
-          </a:lnRef>
-          <a:fillRef idx="1">
-            <a:schemeClr val="accent1"/>
-          </a:fillRef>
-          <a:effectRef idx="0">
-            <a:schemeClr val="accent1"/>
-          </a:effectRef>
-          <a:fontRef idx="minor">
-            <a:schemeClr val="lt1"/>
-          </a:fontRef>
-        </p:style>
-        <p:txBody>
-          <a:bodyPr rtlCol="0" anchor="ctr"/>
-          <a:lstStyle/>
-          <a:p>
-            <a:pPr algn="ctr"/>
-            <a:r>
-              <a:rPr lang="en-US" sz="3000" i="1" dirty="0">
-                <a:solidFill>
-                  <a:schemeClr val="tx1"/>
-                </a:solidFill>
-                <a:latin typeface="Times New Roman" panose="02020603050405020304" pitchFamily="18" charset="0"/>
-                <a:cs typeface="Times New Roman" panose="02020603050405020304" pitchFamily="18" charset="0"/>
-              </a:rPr>
-              <a:t>Photo. pathway</a:t>
-            </a:r>
-          </a:p>
-        </p:txBody>
-      </p:sp>
-      <p:sp>
-        <p:nvSpPr>
-          <p:cNvPr id="13" name="Rectangle 12">
-            <a:extLst>
-              <a:ext uri="{FF2B5EF4-FFF2-40B4-BE49-F238E27FC236}">
-                <a16:creationId xmlns:a16="http://schemas.microsoft.com/office/drawing/2014/main" id="{B2A257A9-99B8-1A9F-6581-99A62F06BE43}"/>
-              </a:ext>
-            </a:extLst>
-          </p:cNvPr>
-          <p:cNvSpPr/>
-          <p:nvPr/>
-        </p:nvSpPr>
-        <p:spPr>
-          <a:xfrm>
-            <a:off x="7788303" y="4323876"/>
-            <a:ext cx="1819398" cy="877223"/>
-          </a:xfrm>
-          <a:prstGeom prst="rect">
-            <a:avLst/>
-          </a:prstGeom>
-          <a:solidFill>
-            <a:schemeClr val="bg1"/>
-          </a:solidFill>
-          <a:ln w="38100">
-            <a:solidFill>
-              <a:schemeClr val="tx1"/>
-            </a:solidFill>
-          </a:ln>
-        </p:spPr>
-        <p:style>
-          <a:lnRef idx="2">
-            <a:schemeClr val="accent1">
-              <a:shade val="50000"/>
-            </a:schemeClr>
-          </a:lnRef>
-          <a:fillRef idx="1">
-            <a:schemeClr val="accent1"/>
-          </a:fillRef>
-          <a:effectRef idx="0">
-            <a:schemeClr val="accent1"/>
-          </a:effectRef>
-          <a:fontRef idx="minor">
-            <a:schemeClr val="lt1"/>
-          </a:fontRef>
-        </p:style>
-        <p:txBody>
-          <a:bodyPr rtlCol="0" anchor="ctr"/>
-          <a:lstStyle/>
-          <a:p>
-            <a:pPr algn="ctr"/>
-            <a:r>
-              <a:rPr lang="en-US" sz="3000" i="1" dirty="0">
-                <a:solidFill>
-                  <a:schemeClr val="tx1"/>
-                </a:solidFill>
-                <a:latin typeface="Times New Roman" panose="02020603050405020304" pitchFamily="18" charset="0"/>
-                <a:cs typeface="Times New Roman" panose="02020603050405020304" pitchFamily="18" charset="0"/>
-              </a:rPr>
-              <a:t>N</a:t>
-            </a:r>
-            <a:r>
-              <a:rPr lang="en-US" sz="3000" baseline="-25000" dirty="0">
-                <a:solidFill>
-                  <a:schemeClr val="tx1"/>
-                </a:solidFill>
-                <a:latin typeface="Times New Roman" panose="02020603050405020304" pitchFamily="18" charset="0"/>
-                <a:cs typeface="Times New Roman" panose="02020603050405020304" pitchFamily="18" charset="0"/>
-              </a:rPr>
-              <a:t>fixer</a:t>
-            </a:r>
-            <a:endParaRPr lang="en-US" sz="3000" i="1" dirty="0">
-              <a:solidFill>
-                <a:schemeClr val="tx1"/>
-              </a:solidFill>
-              <a:latin typeface="Times New Roman" panose="02020603050405020304" pitchFamily="18" charset="0"/>
-              <a:cs typeface="Times New Roman" panose="02020603050405020304" pitchFamily="18" charset="0"/>
-            </a:endParaRPr>
-          </a:p>
-        </p:txBody>
-      </p:sp>
-      <p:sp>
-        <p:nvSpPr>
-          <p:cNvPr id="6" name="Rectangle 5">
-            <a:extLst>
-              <a:ext uri="{FF2B5EF4-FFF2-40B4-BE49-F238E27FC236}">
-                <a16:creationId xmlns:a16="http://schemas.microsoft.com/office/drawing/2014/main" id="{82098DFB-3E26-4855-1059-F871B3625B79}"/>
-              </a:ext>
-            </a:extLst>
-          </p:cNvPr>
-          <p:cNvSpPr/>
-          <p:nvPr/>
-        </p:nvSpPr>
-        <p:spPr>
-          <a:xfrm>
-            <a:off x="13309133" y="4302749"/>
-            <a:ext cx="1819398" cy="877223"/>
-          </a:xfrm>
-          <a:prstGeom prst="rect">
-            <a:avLst/>
-          </a:prstGeom>
-          <a:solidFill>
-            <a:schemeClr val="bg1"/>
-          </a:solidFill>
-          <a:ln w="38100">
-            <a:solidFill>
-              <a:schemeClr val="tx1"/>
-            </a:solidFill>
-          </a:ln>
-        </p:spPr>
-        <p:style>
-          <a:lnRef idx="2">
-            <a:schemeClr val="accent1">
-              <a:shade val="50000"/>
-            </a:schemeClr>
-          </a:lnRef>
-          <a:fillRef idx="1">
-            <a:schemeClr val="accent1"/>
-          </a:fillRef>
-          <a:effectRef idx="0">
-            <a:schemeClr val="accent1"/>
-          </a:effectRef>
-          <a:fontRef idx="minor">
-            <a:schemeClr val="lt1"/>
-          </a:fontRef>
-        </p:style>
-        <p:txBody>
-          <a:bodyPr rtlCol="0" anchor="ctr"/>
-          <a:lstStyle/>
-          <a:p>
-            <a:pPr algn="ctr"/>
-            <a:r>
-              <a:rPr lang="en-US" sz="3000" i="1" dirty="0">
-                <a:solidFill>
-                  <a:schemeClr val="tx1"/>
-                </a:solidFill>
-                <a:latin typeface="Times New Roman" panose="02020603050405020304" pitchFamily="18" charset="0"/>
-                <a:cs typeface="Times New Roman" panose="02020603050405020304" pitchFamily="18" charset="0"/>
-              </a:rPr>
-              <a:t>N</a:t>
-            </a:r>
-            <a:r>
-              <a:rPr lang="en-US" sz="3000" baseline="-25000" dirty="0">
-                <a:solidFill>
-                  <a:schemeClr val="tx1"/>
-                </a:solidFill>
-                <a:latin typeface="Times New Roman" panose="02020603050405020304" pitchFamily="18" charset="0"/>
-                <a:cs typeface="Times New Roman" panose="02020603050405020304" pitchFamily="18" charset="0"/>
-              </a:rPr>
-              <a:t>mass</a:t>
-            </a:r>
-            <a:endParaRPr lang="en-US" sz="3000" i="1" dirty="0">
-              <a:solidFill>
-                <a:schemeClr val="tx1"/>
-              </a:solidFill>
-              <a:latin typeface="Times New Roman" panose="02020603050405020304" pitchFamily="18" charset="0"/>
-              <a:cs typeface="Times New Roman" panose="02020603050405020304" pitchFamily="18" charset="0"/>
-            </a:endParaRPr>
-          </a:p>
-        </p:txBody>
-      </p:sp>
-      <p:sp>
-        <p:nvSpPr>
-          <p:cNvPr id="10" name="Rectangle 9">
-            <a:extLst>
-              <a:ext uri="{FF2B5EF4-FFF2-40B4-BE49-F238E27FC236}">
-                <a16:creationId xmlns:a16="http://schemas.microsoft.com/office/drawing/2014/main" id="{BE8EA6ED-AFB7-FCE3-419B-30CF6ED05DB7}"/>
-              </a:ext>
-            </a:extLst>
-          </p:cNvPr>
-          <p:cNvSpPr/>
-          <p:nvPr/>
-        </p:nvSpPr>
-        <p:spPr>
-          <a:xfrm>
-            <a:off x="13306602" y="9788925"/>
-            <a:ext cx="1819398" cy="877223"/>
-          </a:xfrm>
-          <a:prstGeom prst="rect">
-            <a:avLst/>
-          </a:prstGeom>
-          <a:solidFill>
-            <a:schemeClr val="bg1"/>
-          </a:solidFill>
-          <a:ln w="38100">
-            <a:solidFill>
-              <a:schemeClr val="tx1"/>
-            </a:solidFill>
-          </a:ln>
-        </p:spPr>
-        <p:style>
-          <a:lnRef idx="2">
-            <a:schemeClr val="accent1">
-              <a:shade val="50000"/>
-            </a:schemeClr>
-          </a:lnRef>
-          <a:fillRef idx="1">
-            <a:schemeClr val="accent1"/>
-          </a:fillRef>
-          <a:effectRef idx="0">
-            <a:schemeClr val="accent1"/>
-          </a:effectRef>
-          <a:fontRef idx="minor">
-            <a:schemeClr val="lt1"/>
-          </a:fontRef>
-        </p:style>
-        <p:txBody>
-          <a:bodyPr rtlCol="0" anchor="ctr"/>
-          <a:lstStyle/>
-          <a:p>
-            <a:pPr algn="ctr"/>
-            <a:r>
-              <a:rPr lang="en-US" sz="3000" i="1" dirty="0">
-                <a:solidFill>
-                  <a:schemeClr val="tx1"/>
-                </a:solidFill>
-                <a:latin typeface="Times New Roman" panose="02020603050405020304" pitchFamily="18" charset="0"/>
-                <a:cs typeface="Times New Roman" panose="02020603050405020304" pitchFamily="18" charset="0"/>
-              </a:rPr>
-              <a:t>M</a:t>
-            </a:r>
-            <a:r>
-              <a:rPr lang="en-US" sz="3000" baseline="-25000" dirty="0">
-                <a:solidFill>
-                  <a:schemeClr val="tx1"/>
-                </a:solidFill>
-                <a:latin typeface="Times New Roman" panose="02020603050405020304" pitchFamily="18" charset="0"/>
-                <a:cs typeface="Times New Roman" panose="02020603050405020304" pitchFamily="18" charset="0"/>
-              </a:rPr>
-              <a:t>area</a:t>
-            </a:r>
-            <a:endParaRPr lang="en-US" sz="3000" i="1" dirty="0">
-              <a:solidFill>
-                <a:schemeClr val="tx1"/>
-              </a:solidFill>
-              <a:latin typeface="Times New Roman" panose="02020603050405020304" pitchFamily="18" charset="0"/>
-              <a:cs typeface="Times New Roman" panose="02020603050405020304" pitchFamily="18" charset="0"/>
-            </a:endParaRPr>
+              <a:t>-0.089</a:t>
+            </a:r>
           </a:p>
         </p:txBody>
       </p:sp>

</xml_diff>

<commit_message>
finished working through soil N and soil moisture sections of the discussion
</commit_message>
<xml_diff>
--- a/working_drafts/figs/TXeco_SEM_ppt_fig.pptx
+++ b/working_drafts/figs/TXeco_SEM_ppt_fig.pptx
@@ -198,7 +198,7 @@
           <a:p>
             <a:fld id="{9C8338E3-F40D-F146-8D3B-4726E84D5200}" type="datetimeFigureOut">
               <a:rPr lang="en-US" smtClean="0"/>
-              <a:t>12/19/22</a:t>
+              <a:t>12/20/22</a:t>
             </a:fld>
             <a:endParaRPr lang="en-US"/>
           </a:p>
@@ -774,7 +774,7 @@
           <a:p>
             <a:fld id="{D3A28AA4-801E-B147-9E5C-6E6DBA6E23D1}" type="datetimeFigureOut">
               <a:rPr lang="en-US" smtClean="0"/>
-              <a:t>12/19/22</a:t>
+              <a:t>12/20/22</a:t>
             </a:fld>
             <a:endParaRPr lang="en-US"/>
           </a:p>
@@ -944,7 +944,7 @@
           <a:p>
             <a:fld id="{D3A28AA4-801E-B147-9E5C-6E6DBA6E23D1}" type="datetimeFigureOut">
               <a:rPr lang="en-US" smtClean="0"/>
-              <a:t>12/19/22</a:t>
+              <a:t>12/20/22</a:t>
             </a:fld>
             <a:endParaRPr lang="en-US"/>
           </a:p>
@@ -1124,7 +1124,7 @@
           <a:p>
             <a:fld id="{D3A28AA4-801E-B147-9E5C-6E6DBA6E23D1}" type="datetimeFigureOut">
               <a:rPr lang="en-US" smtClean="0"/>
-              <a:t>12/19/22</a:t>
+              <a:t>12/20/22</a:t>
             </a:fld>
             <a:endParaRPr lang="en-US"/>
           </a:p>
@@ -1294,7 +1294,7 @@
           <a:p>
             <a:fld id="{D3A28AA4-801E-B147-9E5C-6E6DBA6E23D1}" type="datetimeFigureOut">
               <a:rPr lang="en-US" smtClean="0"/>
-              <a:t>12/19/22</a:t>
+              <a:t>12/20/22</a:t>
             </a:fld>
             <a:endParaRPr lang="en-US"/>
           </a:p>
@@ -1538,7 +1538,7 @@
           <a:p>
             <a:fld id="{D3A28AA4-801E-B147-9E5C-6E6DBA6E23D1}" type="datetimeFigureOut">
               <a:rPr lang="en-US" smtClean="0"/>
-              <a:t>12/19/22</a:t>
+              <a:t>12/20/22</a:t>
             </a:fld>
             <a:endParaRPr lang="en-US"/>
           </a:p>
@@ -1770,7 +1770,7 @@
           <a:p>
             <a:fld id="{D3A28AA4-801E-B147-9E5C-6E6DBA6E23D1}" type="datetimeFigureOut">
               <a:rPr lang="en-US" smtClean="0"/>
-              <a:t>12/19/22</a:t>
+              <a:t>12/20/22</a:t>
             </a:fld>
             <a:endParaRPr lang="en-US"/>
           </a:p>
@@ -2137,7 +2137,7 @@
           <a:p>
             <a:fld id="{D3A28AA4-801E-B147-9E5C-6E6DBA6E23D1}" type="datetimeFigureOut">
               <a:rPr lang="en-US" smtClean="0"/>
-              <a:t>12/19/22</a:t>
+              <a:t>12/20/22</a:t>
             </a:fld>
             <a:endParaRPr lang="en-US"/>
           </a:p>
@@ -2255,7 +2255,7 @@
           <a:p>
             <a:fld id="{D3A28AA4-801E-B147-9E5C-6E6DBA6E23D1}" type="datetimeFigureOut">
               <a:rPr lang="en-US" smtClean="0"/>
-              <a:t>12/19/22</a:t>
+              <a:t>12/20/22</a:t>
             </a:fld>
             <a:endParaRPr lang="en-US"/>
           </a:p>
@@ -2350,7 +2350,7 @@
           <a:p>
             <a:fld id="{D3A28AA4-801E-B147-9E5C-6E6DBA6E23D1}" type="datetimeFigureOut">
               <a:rPr lang="en-US" smtClean="0"/>
-              <a:t>12/19/22</a:t>
+              <a:t>12/20/22</a:t>
             </a:fld>
             <a:endParaRPr lang="en-US"/>
           </a:p>
@@ -2627,7 +2627,7 @@
           <a:p>
             <a:fld id="{D3A28AA4-801E-B147-9E5C-6E6DBA6E23D1}" type="datetimeFigureOut">
               <a:rPr lang="en-US" smtClean="0"/>
-              <a:t>12/19/22</a:t>
+              <a:t>12/20/22</a:t>
             </a:fld>
             <a:endParaRPr lang="en-US"/>
           </a:p>
@@ -2884,7 +2884,7 @@
           <a:p>
             <a:fld id="{D3A28AA4-801E-B147-9E5C-6E6DBA6E23D1}" type="datetimeFigureOut">
               <a:rPr lang="en-US" smtClean="0"/>
-              <a:t>12/19/22</a:t>
+              <a:t>12/20/22</a:t>
             </a:fld>
             <a:endParaRPr lang="en-US"/>
           </a:p>
@@ -3097,7 +3097,7 @@
           <a:p>
             <a:fld id="{D3A28AA4-801E-B147-9E5C-6E6DBA6E23D1}" type="datetimeFigureOut">
               <a:rPr lang="en-US" smtClean="0"/>
-              <a:t>12/19/22</a:t>
+              <a:t>12/20/22</a:t>
             </a:fld>
             <a:endParaRPr lang="en-US"/>
           </a:p>
@@ -6863,7 +6863,7 @@
                 <a:latin typeface="Times New Roman" panose="02020603050405020304" pitchFamily="18" charset="0"/>
                 <a:cs typeface="Times New Roman" panose="02020603050405020304" pitchFamily="18" charset="0"/>
               </a:rPr>
-              <a:t>= 32.903</a:t>
+              <a:t>= 31.114</a:t>
             </a:r>
           </a:p>
           <a:p>
@@ -6877,7 +6877,7 @@
                 <a:latin typeface="Times New Roman" panose="02020603050405020304" pitchFamily="18" charset="0"/>
                 <a:cs typeface="Times New Roman" panose="02020603050405020304" pitchFamily="18" charset="0"/>
               </a:rPr>
-              <a:t>p-value = 0.239</a:t>
+              <a:t>p-value = 0.312</a:t>
             </a:r>
           </a:p>
           <a:p>
@@ -6891,7 +6891,7 @@
                 <a:latin typeface="Times New Roman" panose="02020603050405020304" pitchFamily="18" charset="0"/>
                 <a:cs typeface="Times New Roman" panose="02020603050405020304" pitchFamily="18" charset="0"/>
               </a:rPr>
-              <a:t>AIC = 144.903</a:t>
+              <a:t>AIC = 141.114</a:t>
             </a:r>
           </a:p>
           <a:p>
@@ -6905,7 +6905,7 @@
                 <a:latin typeface="Times New Roman" panose="02020603050405020304" pitchFamily="18" charset="0"/>
                 <a:cs typeface="Times New Roman" panose="02020603050405020304" pitchFamily="18" charset="0"/>
               </a:rPr>
-              <a:t>BIC = 368.843</a:t>
+              <a:t>BIC = 361.056</a:t>
             </a:r>
           </a:p>
           <a:p>
@@ -7380,54 +7380,6 @@
           </a:fontRef>
         </p:style>
       </p:cxnSp>
-      <p:cxnSp>
-        <p:nvCxnSpPr>
-          <p:cNvPr id="83" name="Elbow Connector 82">
-            <a:extLst>
-              <a:ext uri="{FF2B5EF4-FFF2-40B4-BE49-F238E27FC236}">
-                <a16:creationId xmlns:a16="http://schemas.microsoft.com/office/drawing/2014/main" id="{EEE95AEA-7BA2-C667-EF08-AD180D636636}"/>
-              </a:ext>
-            </a:extLst>
-          </p:cNvPr>
-          <p:cNvCxnSpPr>
-            <a:cxnSpLocks/>
-            <a:stCxn id="15" idx="1"/>
-            <a:endCxn id="8" idx="1"/>
-          </p:cNvCxnSpPr>
-          <p:nvPr/>
-        </p:nvCxnSpPr>
-        <p:spPr>
-          <a:xfrm rot="10800000" flipV="1">
-            <a:off x="4938333" y="4582087"/>
-            <a:ext cx="12700" cy="8238366"/>
-          </a:xfrm>
-          <a:prstGeom prst="bentConnector3">
-            <a:avLst>
-              <a:gd name="adj1" fmla="val 7111472"/>
-            </a:avLst>
-          </a:prstGeom>
-          <a:ln w="152400">
-            <a:solidFill>
-              <a:srgbClr val="C00000"/>
-            </a:solidFill>
-            <a:tailEnd type="triangle"/>
-          </a:ln>
-        </p:spPr>
-        <p:style>
-          <a:lnRef idx="1">
-            <a:schemeClr val="accent1"/>
-          </a:lnRef>
-          <a:fillRef idx="0">
-            <a:schemeClr val="accent1"/>
-          </a:fillRef>
-          <a:effectRef idx="0">
-            <a:schemeClr val="accent1"/>
-          </a:effectRef>
-          <a:fontRef idx="minor">
-            <a:schemeClr val="tx1"/>
-          </a:fontRef>
-        </p:style>
-      </p:cxnSp>
       <p:sp>
         <p:nvSpPr>
           <p:cNvPr id="17" name="TextBox 16">
@@ -7629,7 +7581,7 @@
           <a:prstGeom prst="bentConnector2">
             <a:avLst/>
           </a:prstGeom>
-          <a:ln w="101600">
+          <a:ln w="152400">
             <a:solidFill>
               <a:srgbClr val="C00000"/>
             </a:solidFill>
@@ -7672,7 +7624,7 @@
           <a:prstGeom prst="bentConnector2">
             <a:avLst/>
           </a:prstGeom>
-          <a:ln w="101600">
+          <a:ln w="152400">
             <a:solidFill>
               <a:srgbClr val="C00000"/>
             </a:solidFill>
@@ -7710,13 +7662,13 @@
         </p:nvCxnSpPr>
         <p:spPr>
           <a:xfrm>
-            <a:off x="19624399" y="2301875"/>
-            <a:ext cx="0" cy="9229725"/>
+            <a:off x="19624399" y="2276475"/>
+            <a:ext cx="22501" cy="9277350"/>
           </a:xfrm>
           <a:prstGeom prst="line">
             <a:avLst/>
           </a:prstGeom>
-          <a:ln w="101600">
+          <a:ln w="152400">
             <a:solidFill>
               <a:srgbClr val="C00000"/>
             </a:solidFill>
@@ -8746,6 +8698,54 @@
           </a:p>
         </p:txBody>
       </p:sp>
+      <p:cxnSp>
+        <p:nvCxnSpPr>
+          <p:cNvPr id="25" name="Elbow Connector 24">
+            <a:extLst>
+              <a:ext uri="{FF2B5EF4-FFF2-40B4-BE49-F238E27FC236}">
+                <a16:creationId xmlns:a16="http://schemas.microsoft.com/office/drawing/2014/main" id="{738B18EF-6C84-B560-A3C8-802A740E18F5}"/>
+              </a:ext>
+            </a:extLst>
+          </p:cNvPr>
+          <p:cNvCxnSpPr>
+            <a:cxnSpLocks/>
+            <a:stCxn id="15" idx="1"/>
+            <a:endCxn id="8" idx="1"/>
+          </p:cNvCxnSpPr>
+          <p:nvPr/>
+        </p:nvCxnSpPr>
+        <p:spPr>
+          <a:xfrm rot="10800000" flipV="1">
+            <a:off x="4938333" y="4582087"/>
+            <a:ext cx="12700" cy="8238366"/>
+          </a:xfrm>
+          <a:prstGeom prst="bentConnector3">
+            <a:avLst>
+              <a:gd name="adj1" fmla="val 7400000"/>
+            </a:avLst>
+          </a:prstGeom>
+          <a:ln w="152400">
+            <a:solidFill>
+              <a:srgbClr val="C00000"/>
+            </a:solidFill>
+            <a:tailEnd type="triangle"/>
+          </a:ln>
+        </p:spPr>
+        <p:style>
+          <a:lnRef idx="1">
+            <a:schemeClr val="accent1"/>
+          </a:lnRef>
+          <a:fillRef idx="0">
+            <a:schemeClr val="accent1"/>
+          </a:fillRef>
+          <a:effectRef idx="0">
+            <a:schemeClr val="accent1"/>
+          </a:effectRef>
+          <a:fontRef idx="minor">
+            <a:schemeClr val="tx1"/>
+          </a:fontRef>
+        </p:style>
+      </p:cxnSp>
     </p:spTree>
     <p:extLst>
       <p:ext uri="{BB962C8B-B14F-4D97-AF65-F5344CB8AC3E}">

</xml_diff>

<commit_message>
work through climate portion of discussion
</commit_message>
<xml_diff>
--- a/working_drafts/figs/TXeco_SEM_ppt_fig.pptx
+++ b/working_drafts/figs/TXeco_SEM_ppt_fig.pptx
@@ -198,7 +198,7 @@
           <a:p>
             <a:fld id="{9C8338E3-F40D-F146-8D3B-4726E84D5200}" type="datetimeFigureOut">
               <a:rPr lang="en-US" smtClean="0"/>
-              <a:t>12/20/22</a:t>
+              <a:t>12/21/22</a:t>
             </a:fld>
             <a:endParaRPr lang="en-US"/>
           </a:p>
@@ -774,7 +774,7 @@
           <a:p>
             <a:fld id="{D3A28AA4-801E-B147-9E5C-6E6DBA6E23D1}" type="datetimeFigureOut">
               <a:rPr lang="en-US" smtClean="0"/>
-              <a:t>12/20/22</a:t>
+              <a:t>12/21/22</a:t>
             </a:fld>
             <a:endParaRPr lang="en-US"/>
           </a:p>
@@ -944,7 +944,7 @@
           <a:p>
             <a:fld id="{D3A28AA4-801E-B147-9E5C-6E6DBA6E23D1}" type="datetimeFigureOut">
               <a:rPr lang="en-US" smtClean="0"/>
-              <a:t>12/20/22</a:t>
+              <a:t>12/21/22</a:t>
             </a:fld>
             <a:endParaRPr lang="en-US"/>
           </a:p>
@@ -1124,7 +1124,7 @@
           <a:p>
             <a:fld id="{D3A28AA4-801E-B147-9E5C-6E6DBA6E23D1}" type="datetimeFigureOut">
               <a:rPr lang="en-US" smtClean="0"/>
-              <a:t>12/20/22</a:t>
+              <a:t>12/21/22</a:t>
             </a:fld>
             <a:endParaRPr lang="en-US"/>
           </a:p>
@@ -1294,7 +1294,7 @@
           <a:p>
             <a:fld id="{D3A28AA4-801E-B147-9E5C-6E6DBA6E23D1}" type="datetimeFigureOut">
               <a:rPr lang="en-US" smtClean="0"/>
-              <a:t>12/20/22</a:t>
+              <a:t>12/21/22</a:t>
             </a:fld>
             <a:endParaRPr lang="en-US"/>
           </a:p>
@@ -1538,7 +1538,7 @@
           <a:p>
             <a:fld id="{D3A28AA4-801E-B147-9E5C-6E6DBA6E23D1}" type="datetimeFigureOut">
               <a:rPr lang="en-US" smtClean="0"/>
-              <a:t>12/20/22</a:t>
+              <a:t>12/21/22</a:t>
             </a:fld>
             <a:endParaRPr lang="en-US"/>
           </a:p>
@@ -1770,7 +1770,7 @@
           <a:p>
             <a:fld id="{D3A28AA4-801E-B147-9E5C-6E6DBA6E23D1}" type="datetimeFigureOut">
               <a:rPr lang="en-US" smtClean="0"/>
-              <a:t>12/20/22</a:t>
+              <a:t>12/21/22</a:t>
             </a:fld>
             <a:endParaRPr lang="en-US"/>
           </a:p>
@@ -2137,7 +2137,7 @@
           <a:p>
             <a:fld id="{D3A28AA4-801E-B147-9E5C-6E6DBA6E23D1}" type="datetimeFigureOut">
               <a:rPr lang="en-US" smtClean="0"/>
-              <a:t>12/20/22</a:t>
+              <a:t>12/21/22</a:t>
             </a:fld>
             <a:endParaRPr lang="en-US"/>
           </a:p>
@@ -2255,7 +2255,7 @@
           <a:p>
             <a:fld id="{D3A28AA4-801E-B147-9E5C-6E6DBA6E23D1}" type="datetimeFigureOut">
               <a:rPr lang="en-US" smtClean="0"/>
-              <a:t>12/20/22</a:t>
+              <a:t>12/21/22</a:t>
             </a:fld>
             <a:endParaRPr lang="en-US"/>
           </a:p>
@@ -2350,7 +2350,7 @@
           <a:p>
             <a:fld id="{D3A28AA4-801E-B147-9E5C-6E6DBA6E23D1}" type="datetimeFigureOut">
               <a:rPr lang="en-US" smtClean="0"/>
-              <a:t>12/20/22</a:t>
+              <a:t>12/21/22</a:t>
             </a:fld>
             <a:endParaRPr lang="en-US"/>
           </a:p>
@@ -2627,7 +2627,7 @@
           <a:p>
             <a:fld id="{D3A28AA4-801E-B147-9E5C-6E6DBA6E23D1}" type="datetimeFigureOut">
               <a:rPr lang="en-US" smtClean="0"/>
-              <a:t>12/20/22</a:t>
+              <a:t>12/21/22</a:t>
             </a:fld>
             <a:endParaRPr lang="en-US"/>
           </a:p>
@@ -2884,7 +2884,7 @@
           <a:p>
             <a:fld id="{D3A28AA4-801E-B147-9E5C-6E6DBA6E23D1}" type="datetimeFigureOut">
               <a:rPr lang="en-US" smtClean="0"/>
-              <a:t>12/20/22</a:t>
+              <a:t>12/21/22</a:t>
             </a:fld>
             <a:endParaRPr lang="en-US"/>
           </a:p>
@@ -3097,7 +3097,7 @@
           <a:p>
             <a:fld id="{D3A28AA4-801E-B147-9E5C-6E6DBA6E23D1}" type="datetimeFigureOut">
               <a:rPr lang="en-US" smtClean="0"/>
-              <a:t>12/20/22</a:t>
+              <a:t>12/21/22</a:t>
             </a:fld>
             <a:endParaRPr lang="en-US"/>
           </a:p>
@@ -6294,6 +6294,53 @@
       </p:grpSpPr>
       <p:cxnSp>
         <p:nvCxnSpPr>
+          <p:cNvPr id="20" name="Straight Arrow Connector 19">
+            <a:extLst>
+              <a:ext uri="{FF2B5EF4-FFF2-40B4-BE49-F238E27FC236}">
+                <a16:creationId xmlns:a16="http://schemas.microsoft.com/office/drawing/2014/main" id="{17F3BC12-F83E-1ECF-ECCC-397D12B3C755}"/>
+              </a:ext>
+            </a:extLst>
+          </p:cNvPr>
+          <p:cNvCxnSpPr>
+            <a:cxnSpLocks/>
+            <a:stCxn id="13" idx="0"/>
+          </p:cNvCxnSpPr>
+          <p:nvPr/>
+        </p:nvCxnSpPr>
+        <p:spPr>
+          <a:xfrm>
+            <a:off x="11368862" y="4164599"/>
+            <a:ext cx="4584700" cy="2709255"/>
+          </a:xfrm>
+          <a:prstGeom prst="straightConnector1">
+            <a:avLst/>
+          </a:prstGeom>
+          <a:ln w="50800">
+            <a:solidFill>
+              <a:schemeClr val="accent1">
+                <a:lumMod val="75000"/>
+              </a:schemeClr>
+            </a:solidFill>
+            <a:tailEnd type="triangle"/>
+          </a:ln>
+        </p:spPr>
+        <p:style>
+          <a:lnRef idx="1">
+            <a:schemeClr val="accent1"/>
+          </a:lnRef>
+          <a:fillRef idx="0">
+            <a:schemeClr val="accent1"/>
+          </a:fillRef>
+          <a:effectRef idx="0">
+            <a:schemeClr val="accent1"/>
+          </a:effectRef>
+          <a:fontRef idx="minor">
+            <a:schemeClr val="tx1"/>
+          </a:fontRef>
+        </p:style>
+      </p:cxnSp>
+      <p:cxnSp>
+        <p:nvCxnSpPr>
           <p:cNvPr id="23" name="Straight Arrow Connector 22">
             <a:extLst>
               <a:ext uri="{FF2B5EF4-FFF2-40B4-BE49-F238E27FC236}">
@@ -6318,52 +6365,6 @@
           <a:ln w="152400">
             <a:solidFill>
               <a:srgbClr val="C00000"/>
-            </a:solidFill>
-            <a:tailEnd type="triangle"/>
-          </a:ln>
-        </p:spPr>
-        <p:style>
-          <a:lnRef idx="1">
-            <a:schemeClr val="accent1"/>
-          </a:lnRef>
-          <a:fillRef idx="0">
-            <a:schemeClr val="accent1"/>
-          </a:fillRef>
-          <a:effectRef idx="0">
-            <a:schemeClr val="accent1"/>
-          </a:effectRef>
-          <a:fontRef idx="minor">
-            <a:schemeClr val="tx1"/>
-          </a:fontRef>
-        </p:style>
-      </p:cxnSp>
-      <p:cxnSp>
-        <p:nvCxnSpPr>
-          <p:cNvPr id="44" name="Straight Arrow Connector 43">
-            <a:extLst>
-              <a:ext uri="{FF2B5EF4-FFF2-40B4-BE49-F238E27FC236}">
-                <a16:creationId xmlns:a16="http://schemas.microsoft.com/office/drawing/2014/main" id="{65C46E7D-C926-6C3A-1F47-1E8D7B5CFED1}"/>
-              </a:ext>
-            </a:extLst>
-          </p:cNvPr>
-          <p:cNvCxnSpPr>
-            <a:cxnSpLocks/>
-          </p:cNvCxnSpPr>
-          <p:nvPr/>
-        </p:nvCxnSpPr>
-        <p:spPr>
-          <a:xfrm flipV="1">
-            <a:off x="6601810" y="7773216"/>
-            <a:ext cx="9351753" cy="1882579"/>
-          </a:xfrm>
-          <a:prstGeom prst="straightConnector1">
-            <a:avLst/>
-          </a:prstGeom>
-          <a:ln w="101600">
-            <a:solidFill>
-              <a:schemeClr val="accent1">
-                <a:lumMod val="75000"/>
-              </a:schemeClr>
             </a:solidFill>
             <a:tailEnd type="triangle"/>
           </a:ln>
@@ -6863,7 +6864,7 @@
                 <a:latin typeface="Times New Roman" panose="02020603050405020304" pitchFamily="18" charset="0"/>
                 <a:cs typeface="Times New Roman" panose="02020603050405020304" pitchFamily="18" charset="0"/>
               </a:rPr>
-              <a:t>= 31.114</a:t>
+              <a:t>= 43.220</a:t>
             </a:r>
           </a:p>
           <a:p>
@@ -6877,7 +6878,7 @@
                 <a:latin typeface="Times New Roman" panose="02020603050405020304" pitchFamily="18" charset="0"/>
                 <a:cs typeface="Times New Roman" panose="02020603050405020304" pitchFamily="18" charset="0"/>
               </a:rPr>
-              <a:t>p-value = 0.312</a:t>
+              <a:t>p-value = 0.056</a:t>
             </a:r>
           </a:p>
           <a:p>
@@ -6891,7 +6892,7 @@
                 <a:latin typeface="Times New Roman" panose="02020603050405020304" pitchFamily="18" charset="0"/>
                 <a:cs typeface="Times New Roman" panose="02020603050405020304" pitchFamily="18" charset="0"/>
               </a:rPr>
-              <a:t>AIC = 141.114</a:t>
+              <a:t>AIC = 153.220</a:t>
             </a:r>
           </a:p>
           <a:p>
@@ -6905,7 +6906,7 @@
                 <a:latin typeface="Times New Roman" panose="02020603050405020304" pitchFamily="18" charset="0"/>
                 <a:cs typeface="Times New Roman" panose="02020603050405020304" pitchFamily="18" charset="0"/>
               </a:rPr>
-              <a:t>BIC = 361.056</a:t>
+              <a:t>BIC = 373.162</a:t>
             </a:r>
           </a:p>
           <a:p>
@@ -6919,7 +6920,7 @@
                 <a:latin typeface="Times New Roman" panose="02020603050405020304" pitchFamily="18" charset="0"/>
                 <a:cs typeface="Times New Roman" panose="02020603050405020304" pitchFamily="18" charset="0"/>
               </a:rPr>
-              <a:t>df = 28</a:t>
+              <a:t>df = 30</a:t>
             </a:r>
           </a:p>
         </p:txBody>
@@ -7819,86 +7820,6 @@
       </p:sp>
       <p:sp>
         <p:nvSpPr>
-          <p:cNvPr id="8" name="Rectangle 7">
-            <a:extLst>
-              <a:ext uri="{FF2B5EF4-FFF2-40B4-BE49-F238E27FC236}">
-                <a16:creationId xmlns:a16="http://schemas.microsoft.com/office/drawing/2014/main" id="{876853D0-E144-E856-C806-EC1B2C7ABFDC}"/>
-              </a:ext>
-            </a:extLst>
-          </p:cNvPr>
-          <p:cNvSpPr/>
-          <p:nvPr/>
-        </p:nvSpPr>
-        <p:spPr>
-          <a:xfrm>
-            <a:off x="4938333" y="12381841"/>
-            <a:ext cx="1819398" cy="877223"/>
-          </a:xfrm>
-          <a:prstGeom prst="rect">
-            <a:avLst/>
-          </a:prstGeom>
-          <a:solidFill>
-            <a:schemeClr val="bg1"/>
-          </a:solidFill>
-          <a:ln w="38100">
-            <a:solidFill>
-              <a:schemeClr val="tx1"/>
-            </a:solidFill>
-          </a:ln>
-        </p:spPr>
-        <p:style>
-          <a:lnRef idx="2">
-            <a:schemeClr val="accent1">
-              <a:shade val="50000"/>
-            </a:schemeClr>
-          </a:lnRef>
-          <a:fillRef idx="1">
-            <a:schemeClr val="accent1"/>
-          </a:fillRef>
-          <a:effectRef idx="0">
-            <a:schemeClr val="accent1"/>
-          </a:effectRef>
-          <a:fontRef idx="minor">
-            <a:schemeClr val="lt1"/>
-          </a:fontRef>
-        </p:style>
-        <p:txBody>
-          <a:bodyPr rtlCol="0" anchor="ctr"/>
-          <a:lstStyle/>
-          <a:p>
-            <a:pPr algn="ctr"/>
-            <a:r>
-              <a:rPr lang="en-US" sz="3000" i="1" dirty="0">
-                <a:solidFill>
-                  <a:schemeClr val="tx1"/>
-                </a:solidFill>
-                <a:latin typeface="Times New Roman" panose="02020603050405020304" pitchFamily="18" charset="0"/>
-                <a:cs typeface="Times New Roman" panose="02020603050405020304" pitchFamily="18" charset="0"/>
-              </a:rPr>
-              <a:t>VPD</a:t>
-            </a:r>
-            <a:r>
-              <a:rPr lang="en-US" sz="3000" baseline="-25000" dirty="0">
-                <a:solidFill>
-                  <a:schemeClr val="tx1"/>
-                </a:solidFill>
-                <a:latin typeface="Times New Roman" panose="02020603050405020304" pitchFamily="18" charset="0"/>
-                <a:cs typeface="Times New Roman" panose="02020603050405020304" pitchFamily="18" charset="0"/>
-              </a:rPr>
-              <a:t>4</a:t>
-            </a:r>
-            <a:endParaRPr lang="en-US" sz="3000" dirty="0">
-              <a:solidFill>
-                <a:schemeClr val="tx1"/>
-              </a:solidFill>
-              <a:latin typeface="Times New Roman" panose="02020603050405020304" pitchFamily="18" charset="0"/>
-              <a:cs typeface="Times New Roman" panose="02020603050405020304" pitchFamily="18" charset="0"/>
-            </a:endParaRPr>
-          </a:p>
-        </p:txBody>
-      </p:sp>
-      <p:sp>
-        <p:nvSpPr>
           <p:cNvPr id="14" name="Rectangle 13">
             <a:extLst>
               <a:ext uri="{FF2B5EF4-FFF2-40B4-BE49-F238E27FC236}">
@@ -7958,86 +7879,6 @@
               <a:t>Soil N</a:t>
             </a:r>
             <a:endParaRPr lang="en-US" sz="3000" dirty="0">
-              <a:solidFill>
-                <a:schemeClr val="tx1"/>
-              </a:solidFill>
-              <a:latin typeface="Times New Roman" panose="02020603050405020304" pitchFamily="18" charset="0"/>
-              <a:cs typeface="Times New Roman" panose="02020603050405020304" pitchFamily="18" charset="0"/>
-            </a:endParaRPr>
-          </a:p>
-        </p:txBody>
-      </p:sp>
-      <p:sp>
-        <p:nvSpPr>
-          <p:cNvPr id="13" name="Rectangle 12">
-            <a:extLst>
-              <a:ext uri="{FF2B5EF4-FFF2-40B4-BE49-F238E27FC236}">
-                <a16:creationId xmlns:a16="http://schemas.microsoft.com/office/drawing/2014/main" id="{B2A257A9-99B8-1A9F-6581-99A62F06BE43}"/>
-              </a:ext>
-            </a:extLst>
-          </p:cNvPr>
-          <p:cNvSpPr/>
-          <p:nvPr/>
-        </p:nvSpPr>
-        <p:spPr>
-          <a:xfrm>
-            <a:off x="10459163" y="4164599"/>
-            <a:ext cx="1819398" cy="877223"/>
-          </a:xfrm>
-          <a:prstGeom prst="rect">
-            <a:avLst/>
-          </a:prstGeom>
-          <a:solidFill>
-            <a:schemeClr val="bg1"/>
-          </a:solidFill>
-          <a:ln w="38100">
-            <a:solidFill>
-              <a:schemeClr val="tx1"/>
-            </a:solidFill>
-          </a:ln>
-        </p:spPr>
-        <p:style>
-          <a:lnRef idx="2">
-            <a:schemeClr val="accent1">
-              <a:shade val="50000"/>
-            </a:schemeClr>
-          </a:lnRef>
-          <a:fillRef idx="1">
-            <a:schemeClr val="accent1"/>
-          </a:fillRef>
-          <a:effectRef idx="0">
-            <a:schemeClr val="accent1"/>
-          </a:effectRef>
-          <a:fontRef idx="minor">
-            <a:schemeClr val="lt1"/>
-          </a:fontRef>
-        </p:style>
-        <p:txBody>
-          <a:bodyPr rtlCol="0" anchor="ctr"/>
-          <a:lstStyle/>
-          <a:p>
-            <a:pPr algn="ctr"/>
-            <a:r>
-              <a:rPr lang="en-US" sz="3000" i="1" dirty="0">
-                <a:solidFill>
-                  <a:schemeClr val="tx1"/>
-                </a:solidFill>
-                <a:latin typeface="Times New Roman" panose="02020603050405020304" pitchFamily="18" charset="0"/>
-                <a:cs typeface="Times New Roman" panose="02020603050405020304" pitchFamily="18" charset="0"/>
-              </a:rPr>
-              <a:t>N</a:t>
-            </a:r>
-            <a:r>
-              <a:rPr lang="en-US" sz="3000" baseline="-25000" dirty="0">
-                <a:solidFill>
-                  <a:schemeClr val="tx1"/>
-                </a:solidFill>
-                <a:latin typeface="Times New Roman" panose="02020603050405020304" pitchFamily="18" charset="0"/>
-                <a:cs typeface="Times New Roman" panose="02020603050405020304" pitchFamily="18" charset="0"/>
-              </a:rPr>
-              <a:t>fixer</a:t>
-            </a:r>
-            <a:endParaRPr lang="en-US" sz="3000" i="1" dirty="0">
               <a:solidFill>
                 <a:schemeClr val="tx1"/>
               </a:solidFill>
@@ -8557,86 +8398,6 @@
       </p:cxnSp>
       <p:sp>
         <p:nvSpPr>
-          <p:cNvPr id="15" name="Rectangle 14">
-            <a:extLst>
-              <a:ext uri="{FF2B5EF4-FFF2-40B4-BE49-F238E27FC236}">
-                <a16:creationId xmlns:a16="http://schemas.microsoft.com/office/drawing/2014/main" id="{3477DEF7-1C60-48CD-D30B-3C9B5CAB6140}"/>
-              </a:ext>
-            </a:extLst>
-          </p:cNvPr>
-          <p:cNvSpPr/>
-          <p:nvPr/>
-        </p:nvSpPr>
-        <p:spPr>
-          <a:xfrm>
-            <a:off x="4938333" y="4143475"/>
-            <a:ext cx="1819398" cy="877223"/>
-          </a:xfrm>
-          <a:prstGeom prst="rect">
-            <a:avLst/>
-          </a:prstGeom>
-          <a:solidFill>
-            <a:schemeClr val="bg1"/>
-          </a:solidFill>
-          <a:ln w="38100">
-            <a:solidFill>
-              <a:schemeClr val="tx1"/>
-            </a:solidFill>
-          </a:ln>
-        </p:spPr>
-        <p:style>
-          <a:lnRef idx="2">
-            <a:schemeClr val="accent1">
-              <a:shade val="50000"/>
-            </a:schemeClr>
-          </a:lnRef>
-          <a:fillRef idx="1">
-            <a:schemeClr val="accent1"/>
-          </a:fillRef>
-          <a:effectRef idx="0">
-            <a:schemeClr val="accent1"/>
-          </a:effectRef>
-          <a:fontRef idx="minor">
-            <a:schemeClr val="lt1"/>
-          </a:fontRef>
-        </p:style>
-        <p:txBody>
-          <a:bodyPr rtlCol="0" anchor="ctr"/>
-          <a:lstStyle/>
-          <a:p>
-            <a:pPr algn="ctr"/>
-            <a:r>
-              <a:rPr lang="en-US" sz="3000" i="1" dirty="0">
-                <a:solidFill>
-                  <a:schemeClr val="tx1"/>
-                </a:solidFill>
-                <a:latin typeface="Times New Roman" panose="02020603050405020304" pitchFamily="18" charset="0"/>
-                <a:cs typeface="Times New Roman" panose="02020603050405020304" pitchFamily="18" charset="0"/>
-              </a:rPr>
-              <a:t>SM</a:t>
-            </a:r>
-            <a:r>
-              <a:rPr lang="en-US" sz="3000" baseline="-25000" dirty="0">
-                <a:solidFill>
-                  <a:schemeClr val="tx1"/>
-                </a:solidFill>
-                <a:latin typeface="Times New Roman" panose="02020603050405020304" pitchFamily="18" charset="0"/>
-                <a:cs typeface="Times New Roman" panose="02020603050405020304" pitchFamily="18" charset="0"/>
-              </a:rPr>
-              <a:t>3</a:t>
-            </a:r>
-            <a:endParaRPr lang="en-US" sz="3000" dirty="0">
-              <a:solidFill>
-                <a:schemeClr val="tx1"/>
-              </a:solidFill>
-              <a:latin typeface="Times New Roman" panose="02020603050405020304" pitchFamily="18" charset="0"/>
-              <a:cs typeface="Times New Roman" panose="02020603050405020304" pitchFamily="18" charset="0"/>
-            </a:endParaRPr>
-          </a:p>
-        </p:txBody>
-      </p:sp>
-      <p:sp>
-        <p:nvSpPr>
           <p:cNvPr id="7" name="Rectangle 6">
             <a:extLst>
               <a:ext uri="{FF2B5EF4-FFF2-40B4-BE49-F238E27FC236}">
@@ -8746,6 +8507,246 @@
           </a:fontRef>
         </p:style>
       </p:cxnSp>
+      <p:sp>
+        <p:nvSpPr>
+          <p:cNvPr id="15" name="Rectangle 14">
+            <a:extLst>
+              <a:ext uri="{FF2B5EF4-FFF2-40B4-BE49-F238E27FC236}">
+                <a16:creationId xmlns:a16="http://schemas.microsoft.com/office/drawing/2014/main" id="{3477DEF7-1C60-48CD-D30B-3C9B5CAB6140}"/>
+              </a:ext>
+            </a:extLst>
+          </p:cNvPr>
+          <p:cNvSpPr/>
+          <p:nvPr/>
+        </p:nvSpPr>
+        <p:spPr>
+          <a:xfrm>
+            <a:off x="4938333" y="4143475"/>
+            <a:ext cx="1819398" cy="877223"/>
+          </a:xfrm>
+          <a:prstGeom prst="rect">
+            <a:avLst/>
+          </a:prstGeom>
+          <a:solidFill>
+            <a:schemeClr val="bg1"/>
+          </a:solidFill>
+          <a:ln w="38100">
+            <a:solidFill>
+              <a:schemeClr val="tx1"/>
+            </a:solidFill>
+          </a:ln>
+        </p:spPr>
+        <p:style>
+          <a:lnRef idx="2">
+            <a:schemeClr val="accent1">
+              <a:shade val="50000"/>
+            </a:schemeClr>
+          </a:lnRef>
+          <a:fillRef idx="1">
+            <a:schemeClr val="accent1"/>
+          </a:fillRef>
+          <a:effectRef idx="0">
+            <a:schemeClr val="accent1"/>
+          </a:effectRef>
+          <a:fontRef idx="minor">
+            <a:schemeClr val="lt1"/>
+          </a:fontRef>
+        </p:style>
+        <p:txBody>
+          <a:bodyPr rtlCol="0" anchor="ctr"/>
+          <a:lstStyle/>
+          <a:p>
+            <a:pPr algn="ctr"/>
+            <a:r>
+              <a:rPr lang="en-US" sz="3000" i="1" dirty="0">
+                <a:solidFill>
+                  <a:schemeClr val="tx1"/>
+                </a:solidFill>
+                <a:latin typeface="Times New Roman" panose="02020603050405020304" pitchFamily="18" charset="0"/>
+                <a:cs typeface="Times New Roman" panose="02020603050405020304" pitchFamily="18" charset="0"/>
+              </a:rPr>
+              <a:t>SM</a:t>
+            </a:r>
+            <a:r>
+              <a:rPr lang="en-US" sz="3000" baseline="-25000" dirty="0">
+                <a:solidFill>
+                  <a:schemeClr val="tx1"/>
+                </a:solidFill>
+                <a:latin typeface="Times New Roman" panose="02020603050405020304" pitchFamily="18" charset="0"/>
+                <a:cs typeface="Times New Roman" panose="02020603050405020304" pitchFamily="18" charset="0"/>
+              </a:rPr>
+              <a:t>3</a:t>
+            </a:r>
+            <a:endParaRPr lang="en-US" sz="3000" dirty="0">
+              <a:solidFill>
+                <a:schemeClr val="tx1"/>
+              </a:solidFill>
+              <a:latin typeface="Times New Roman" panose="02020603050405020304" pitchFamily="18" charset="0"/>
+              <a:cs typeface="Times New Roman" panose="02020603050405020304" pitchFamily="18" charset="0"/>
+            </a:endParaRPr>
+          </a:p>
+        </p:txBody>
+      </p:sp>
+      <p:sp>
+        <p:nvSpPr>
+          <p:cNvPr id="8" name="Rectangle 7">
+            <a:extLst>
+              <a:ext uri="{FF2B5EF4-FFF2-40B4-BE49-F238E27FC236}">
+                <a16:creationId xmlns:a16="http://schemas.microsoft.com/office/drawing/2014/main" id="{876853D0-E144-E856-C806-EC1B2C7ABFDC}"/>
+              </a:ext>
+            </a:extLst>
+          </p:cNvPr>
+          <p:cNvSpPr/>
+          <p:nvPr/>
+        </p:nvSpPr>
+        <p:spPr>
+          <a:xfrm>
+            <a:off x="4938333" y="12381841"/>
+            <a:ext cx="1819398" cy="877223"/>
+          </a:xfrm>
+          <a:prstGeom prst="rect">
+            <a:avLst/>
+          </a:prstGeom>
+          <a:solidFill>
+            <a:schemeClr val="bg1"/>
+          </a:solidFill>
+          <a:ln w="38100">
+            <a:solidFill>
+              <a:schemeClr val="tx1"/>
+            </a:solidFill>
+          </a:ln>
+        </p:spPr>
+        <p:style>
+          <a:lnRef idx="2">
+            <a:schemeClr val="accent1">
+              <a:shade val="50000"/>
+            </a:schemeClr>
+          </a:lnRef>
+          <a:fillRef idx="1">
+            <a:schemeClr val="accent1"/>
+          </a:fillRef>
+          <a:effectRef idx="0">
+            <a:schemeClr val="accent1"/>
+          </a:effectRef>
+          <a:fontRef idx="minor">
+            <a:schemeClr val="lt1"/>
+          </a:fontRef>
+        </p:style>
+        <p:txBody>
+          <a:bodyPr rtlCol="0" anchor="ctr"/>
+          <a:lstStyle/>
+          <a:p>
+            <a:pPr algn="ctr"/>
+            <a:r>
+              <a:rPr lang="en-US" sz="3000" i="1" dirty="0">
+                <a:solidFill>
+                  <a:schemeClr val="tx1"/>
+                </a:solidFill>
+                <a:latin typeface="Times New Roman" panose="02020603050405020304" pitchFamily="18" charset="0"/>
+                <a:cs typeface="Times New Roman" panose="02020603050405020304" pitchFamily="18" charset="0"/>
+              </a:rPr>
+              <a:t>VPD</a:t>
+            </a:r>
+            <a:r>
+              <a:rPr lang="en-US" sz="3000" baseline="-25000" dirty="0">
+                <a:solidFill>
+                  <a:schemeClr val="tx1"/>
+                </a:solidFill>
+                <a:latin typeface="Times New Roman" panose="02020603050405020304" pitchFamily="18" charset="0"/>
+                <a:cs typeface="Times New Roman" panose="02020603050405020304" pitchFamily="18" charset="0"/>
+              </a:rPr>
+              <a:t>4</a:t>
+            </a:r>
+            <a:endParaRPr lang="en-US" sz="3000" dirty="0">
+              <a:solidFill>
+                <a:schemeClr val="tx1"/>
+              </a:solidFill>
+              <a:latin typeface="Times New Roman" panose="02020603050405020304" pitchFamily="18" charset="0"/>
+              <a:cs typeface="Times New Roman" panose="02020603050405020304" pitchFamily="18" charset="0"/>
+            </a:endParaRPr>
+          </a:p>
+        </p:txBody>
+      </p:sp>
+      <p:sp>
+        <p:nvSpPr>
+          <p:cNvPr id="13" name="Rectangle 12">
+            <a:extLst>
+              <a:ext uri="{FF2B5EF4-FFF2-40B4-BE49-F238E27FC236}">
+                <a16:creationId xmlns:a16="http://schemas.microsoft.com/office/drawing/2014/main" id="{B2A257A9-99B8-1A9F-6581-99A62F06BE43}"/>
+              </a:ext>
+            </a:extLst>
+          </p:cNvPr>
+          <p:cNvSpPr/>
+          <p:nvPr/>
+        </p:nvSpPr>
+        <p:spPr>
+          <a:xfrm>
+            <a:off x="10459163" y="4164599"/>
+            <a:ext cx="1819398" cy="877223"/>
+          </a:xfrm>
+          <a:prstGeom prst="rect">
+            <a:avLst/>
+          </a:prstGeom>
+          <a:solidFill>
+            <a:schemeClr val="bg1"/>
+          </a:solidFill>
+          <a:ln w="38100">
+            <a:solidFill>
+              <a:schemeClr val="tx1"/>
+            </a:solidFill>
+          </a:ln>
+        </p:spPr>
+        <p:style>
+          <a:lnRef idx="2">
+            <a:schemeClr val="accent1">
+              <a:shade val="50000"/>
+            </a:schemeClr>
+          </a:lnRef>
+          <a:fillRef idx="1">
+            <a:schemeClr val="accent1"/>
+          </a:fillRef>
+          <a:effectRef idx="0">
+            <a:schemeClr val="accent1"/>
+          </a:effectRef>
+          <a:fontRef idx="minor">
+            <a:schemeClr val="lt1"/>
+          </a:fontRef>
+        </p:style>
+        <p:txBody>
+          <a:bodyPr rtlCol="0" anchor="ctr"/>
+          <a:lstStyle/>
+          <a:p>
+            <a:pPr algn="ctr"/>
+            <a:r>
+              <a:rPr lang="en-US" sz="3000" i="1" dirty="0">
+                <a:solidFill>
+                  <a:schemeClr val="tx1"/>
+                </a:solidFill>
+                <a:latin typeface="Times New Roman" panose="02020603050405020304" pitchFamily="18" charset="0"/>
+                <a:cs typeface="Times New Roman" panose="02020603050405020304" pitchFamily="18" charset="0"/>
+              </a:rPr>
+              <a:t>N</a:t>
+            </a:r>
+            <a:r>
+              <a:rPr lang="en-US" sz="3000" baseline="-25000" dirty="0">
+                <a:solidFill>
+                  <a:schemeClr val="tx1"/>
+                </a:solidFill>
+                <a:latin typeface="Times New Roman" panose="02020603050405020304" pitchFamily="18" charset="0"/>
+                <a:cs typeface="Times New Roman" panose="02020603050405020304" pitchFamily="18" charset="0"/>
+              </a:rPr>
+              <a:t>fixer</a:t>
+            </a:r>
+            <a:endParaRPr lang="en-US" sz="3000" i="1" dirty="0">
+              <a:solidFill>
+                <a:schemeClr val="tx1"/>
+              </a:solidFill>
+              <a:latin typeface="Times New Roman" panose="02020603050405020304" pitchFamily="18" charset="0"/>
+              <a:cs typeface="Times New Roman" panose="02020603050405020304" pitchFamily="18" charset="0"/>
+            </a:endParaRPr>
+          </a:p>
+        </p:txBody>
+      </p:sp>
     </p:spTree>
     <p:extLst>
       <p:ext uri="{BB962C8B-B14F-4D97-AF65-F5344CB8AC3E}">

</xml_diff>

<commit_message>
revise chi calculation and redo all of stats with revised chi and beta values
</commit_message>
<xml_diff>
--- a/working_drafts/figs/TXeco_SEM_ppt_fig.pptx
+++ b/working_drafts/figs/TXeco_SEM_ppt_fig.pptx
@@ -5,11 +5,13 @@
     <p:sldMasterId id="2147483708" r:id="rId1"/>
   </p:sldMasterIdLst>
   <p:notesMasterIdLst>
-    <p:notesMasterId r:id="rId4"/>
+    <p:notesMasterId r:id="rId6"/>
   </p:notesMasterIdLst>
   <p:sldIdLst>
     <p:sldId id="274" r:id="rId2"/>
     <p:sldId id="276" r:id="rId3"/>
+    <p:sldId id="277" r:id="rId4"/>
+    <p:sldId id="278" r:id="rId5"/>
   </p:sldIdLst>
   <p:sldSz cx="27432000" cy="18288000"/>
   <p:notesSz cx="6858000" cy="9144000"/>
@@ -198,7 +200,7 @@
           <a:p>
             <a:fld id="{9C8338E3-F40D-F146-8D3B-4726E84D5200}" type="datetimeFigureOut">
               <a:rPr lang="en-US" smtClean="0"/>
-              <a:t>12/21/22</a:t>
+              <a:t>1/4/23</a:t>
             </a:fld>
             <a:endParaRPr lang="en-US"/>
           </a:p>
@@ -774,7 +776,7 @@
           <a:p>
             <a:fld id="{D3A28AA4-801E-B147-9E5C-6E6DBA6E23D1}" type="datetimeFigureOut">
               <a:rPr lang="en-US" smtClean="0"/>
-              <a:t>12/21/22</a:t>
+              <a:t>1/4/23</a:t>
             </a:fld>
             <a:endParaRPr lang="en-US"/>
           </a:p>
@@ -944,7 +946,7 @@
           <a:p>
             <a:fld id="{D3A28AA4-801E-B147-9E5C-6E6DBA6E23D1}" type="datetimeFigureOut">
               <a:rPr lang="en-US" smtClean="0"/>
-              <a:t>12/21/22</a:t>
+              <a:t>1/4/23</a:t>
             </a:fld>
             <a:endParaRPr lang="en-US"/>
           </a:p>
@@ -1124,7 +1126,7 @@
           <a:p>
             <a:fld id="{D3A28AA4-801E-B147-9E5C-6E6DBA6E23D1}" type="datetimeFigureOut">
               <a:rPr lang="en-US" smtClean="0"/>
-              <a:t>12/21/22</a:t>
+              <a:t>1/4/23</a:t>
             </a:fld>
             <a:endParaRPr lang="en-US"/>
           </a:p>
@@ -1294,7 +1296,7 @@
           <a:p>
             <a:fld id="{D3A28AA4-801E-B147-9E5C-6E6DBA6E23D1}" type="datetimeFigureOut">
               <a:rPr lang="en-US" smtClean="0"/>
-              <a:t>12/21/22</a:t>
+              <a:t>1/4/23</a:t>
             </a:fld>
             <a:endParaRPr lang="en-US"/>
           </a:p>
@@ -1538,7 +1540,7 @@
           <a:p>
             <a:fld id="{D3A28AA4-801E-B147-9E5C-6E6DBA6E23D1}" type="datetimeFigureOut">
               <a:rPr lang="en-US" smtClean="0"/>
-              <a:t>12/21/22</a:t>
+              <a:t>1/4/23</a:t>
             </a:fld>
             <a:endParaRPr lang="en-US"/>
           </a:p>
@@ -1770,7 +1772,7 @@
           <a:p>
             <a:fld id="{D3A28AA4-801E-B147-9E5C-6E6DBA6E23D1}" type="datetimeFigureOut">
               <a:rPr lang="en-US" smtClean="0"/>
-              <a:t>12/21/22</a:t>
+              <a:t>1/4/23</a:t>
             </a:fld>
             <a:endParaRPr lang="en-US"/>
           </a:p>
@@ -2137,7 +2139,7 @@
           <a:p>
             <a:fld id="{D3A28AA4-801E-B147-9E5C-6E6DBA6E23D1}" type="datetimeFigureOut">
               <a:rPr lang="en-US" smtClean="0"/>
-              <a:t>12/21/22</a:t>
+              <a:t>1/4/23</a:t>
             </a:fld>
             <a:endParaRPr lang="en-US"/>
           </a:p>
@@ -2255,7 +2257,7 @@
           <a:p>
             <a:fld id="{D3A28AA4-801E-B147-9E5C-6E6DBA6E23D1}" type="datetimeFigureOut">
               <a:rPr lang="en-US" smtClean="0"/>
-              <a:t>12/21/22</a:t>
+              <a:t>1/4/23</a:t>
             </a:fld>
             <a:endParaRPr lang="en-US"/>
           </a:p>
@@ -2350,7 +2352,7 @@
           <a:p>
             <a:fld id="{D3A28AA4-801E-B147-9E5C-6E6DBA6E23D1}" type="datetimeFigureOut">
               <a:rPr lang="en-US" smtClean="0"/>
-              <a:t>12/21/22</a:t>
+              <a:t>1/4/23</a:t>
             </a:fld>
             <a:endParaRPr lang="en-US"/>
           </a:p>
@@ -2627,7 +2629,7 @@
           <a:p>
             <a:fld id="{D3A28AA4-801E-B147-9E5C-6E6DBA6E23D1}" type="datetimeFigureOut">
               <a:rPr lang="en-US" smtClean="0"/>
-              <a:t>12/21/22</a:t>
+              <a:t>1/4/23</a:t>
             </a:fld>
             <a:endParaRPr lang="en-US"/>
           </a:p>
@@ -2884,7 +2886,7 @@
           <a:p>
             <a:fld id="{D3A28AA4-801E-B147-9E5C-6E6DBA6E23D1}" type="datetimeFigureOut">
               <a:rPr lang="en-US" smtClean="0"/>
-              <a:t>12/21/22</a:t>
+              <a:t>1/4/23</a:t>
             </a:fld>
             <a:endParaRPr lang="en-US"/>
           </a:p>
@@ -3097,7 +3099,7 @@
           <a:p>
             <a:fld id="{D3A28AA4-801E-B147-9E5C-6E6DBA6E23D1}" type="datetimeFigureOut">
               <a:rPr lang="en-US" smtClean="0"/>
-              <a:t>12/21/22</a:t>
+              <a:t>1/4/23</a:t>
             </a:fld>
             <a:endParaRPr lang="en-US"/>
           </a:p>
@@ -6478,51 +6480,6 @@
       </p:cxnSp>
       <p:cxnSp>
         <p:nvCxnSpPr>
-          <p:cNvPr id="71" name="Straight Arrow Connector 70">
-            <a:extLst>
-              <a:ext uri="{FF2B5EF4-FFF2-40B4-BE49-F238E27FC236}">
-                <a16:creationId xmlns:a16="http://schemas.microsoft.com/office/drawing/2014/main" id="{1CF16A07-D494-F3DF-6F9B-0D35FDBA3B7D}"/>
-              </a:ext>
-            </a:extLst>
-          </p:cNvPr>
-          <p:cNvCxnSpPr>
-            <a:cxnSpLocks/>
-            <a:stCxn id="9" idx="2"/>
-          </p:cNvCxnSpPr>
-          <p:nvPr/>
-        </p:nvCxnSpPr>
-        <p:spPr>
-          <a:xfrm>
-            <a:off x="5848032" y="10483851"/>
-            <a:ext cx="0" cy="1862076"/>
-          </a:xfrm>
-          <a:prstGeom prst="straightConnector1">
-            <a:avLst/>
-          </a:prstGeom>
-          <a:ln w="152400">
-            <a:solidFill>
-              <a:srgbClr val="C00000"/>
-            </a:solidFill>
-            <a:tailEnd type="triangle"/>
-          </a:ln>
-        </p:spPr>
-        <p:style>
-          <a:lnRef idx="1">
-            <a:schemeClr val="accent1"/>
-          </a:lnRef>
-          <a:fillRef idx="0">
-            <a:schemeClr val="accent1"/>
-          </a:fillRef>
-          <a:effectRef idx="0">
-            <a:schemeClr val="accent1"/>
-          </a:effectRef>
-          <a:fontRef idx="minor">
-            <a:schemeClr val="tx1"/>
-          </a:fontRef>
-        </p:style>
-      </p:cxnSp>
-      <p:cxnSp>
-        <p:nvCxnSpPr>
           <p:cNvPr id="74" name="Straight Arrow Connector 73">
             <a:extLst>
               <a:ext uri="{FF2B5EF4-FFF2-40B4-BE49-F238E27FC236}">
@@ -7335,52 +7292,6 @@
           </a:fontRef>
         </p:style>
       </p:cxnSp>
-      <p:cxnSp>
-        <p:nvCxnSpPr>
-          <p:cNvPr id="79" name="Straight Arrow Connector 78">
-            <a:extLst>
-              <a:ext uri="{FF2B5EF4-FFF2-40B4-BE49-F238E27FC236}">
-                <a16:creationId xmlns:a16="http://schemas.microsoft.com/office/drawing/2014/main" id="{E93204CF-56D4-CEB5-E77A-43C161ACC8A1}"/>
-              </a:ext>
-            </a:extLst>
-          </p:cNvPr>
-          <p:cNvCxnSpPr>
-            <a:cxnSpLocks/>
-            <a:stCxn id="9" idx="0"/>
-            <a:endCxn id="14" idx="2"/>
-          </p:cNvCxnSpPr>
-          <p:nvPr/>
-        </p:nvCxnSpPr>
-        <p:spPr>
-          <a:xfrm flipV="1">
-            <a:off x="5848032" y="7777829"/>
-            <a:ext cx="0" cy="1828800"/>
-          </a:xfrm>
-          <a:prstGeom prst="straightConnector1">
-            <a:avLst/>
-          </a:prstGeom>
-          <a:ln w="152400">
-            <a:solidFill>
-              <a:srgbClr val="C00000"/>
-            </a:solidFill>
-            <a:tailEnd type="triangle"/>
-          </a:ln>
-        </p:spPr>
-        <p:style>
-          <a:lnRef idx="1">
-            <a:schemeClr val="accent1"/>
-          </a:lnRef>
-          <a:fillRef idx="0">
-            <a:schemeClr val="accent1"/>
-          </a:fillRef>
-          <a:effectRef idx="0">
-            <a:schemeClr val="accent1"/>
-          </a:effectRef>
-          <a:fontRef idx="minor">
-            <a:schemeClr val="tx1"/>
-          </a:fontRef>
-        </p:style>
-      </p:cxnSp>
       <p:sp>
         <p:nvSpPr>
           <p:cNvPr id="17" name="TextBox 16">
@@ -8050,86 +7961,6 @@
       </p:sp>
       <p:sp>
         <p:nvSpPr>
-          <p:cNvPr id="9" name="Rectangle 8">
-            <a:extLst>
-              <a:ext uri="{FF2B5EF4-FFF2-40B4-BE49-F238E27FC236}">
-                <a16:creationId xmlns:a16="http://schemas.microsoft.com/office/drawing/2014/main" id="{4D8FA927-0A7C-F469-F19B-443076679806}"/>
-              </a:ext>
-            </a:extLst>
-          </p:cNvPr>
-          <p:cNvSpPr/>
-          <p:nvPr/>
-        </p:nvSpPr>
-        <p:spPr>
-          <a:xfrm>
-            <a:off x="4938333" y="9606630"/>
-            <a:ext cx="1819398" cy="877223"/>
-          </a:xfrm>
-          <a:prstGeom prst="rect">
-            <a:avLst/>
-          </a:prstGeom>
-          <a:solidFill>
-            <a:schemeClr val="bg1"/>
-          </a:solidFill>
-          <a:ln w="38100">
-            <a:solidFill>
-              <a:schemeClr val="tx1"/>
-            </a:solidFill>
-          </a:ln>
-        </p:spPr>
-        <p:style>
-          <a:lnRef idx="2">
-            <a:schemeClr val="accent1">
-              <a:shade val="50000"/>
-            </a:schemeClr>
-          </a:lnRef>
-          <a:fillRef idx="1">
-            <a:schemeClr val="accent1"/>
-          </a:fillRef>
-          <a:effectRef idx="0">
-            <a:schemeClr val="accent1"/>
-          </a:effectRef>
-          <a:fontRef idx="minor">
-            <a:schemeClr val="lt1"/>
-          </a:fontRef>
-        </p:style>
-        <p:txBody>
-          <a:bodyPr rtlCol="0" anchor="ctr"/>
-          <a:lstStyle/>
-          <a:p>
-            <a:pPr algn="ctr"/>
-            <a:r>
-              <a:rPr lang="en-US" sz="3000" i="1" dirty="0">
-                <a:solidFill>
-                  <a:schemeClr val="tx1"/>
-                </a:solidFill>
-                <a:latin typeface="Times New Roman" panose="02020603050405020304" pitchFamily="18" charset="0"/>
-                <a:cs typeface="Times New Roman" panose="02020603050405020304" pitchFamily="18" charset="0"/>
-              </a:rPr>
-              <a:t>T</a:t>
-            </a:r>
-            <a:r>
-              <a:rPr lang="en-US" sz="3000" baseline="-25000" dirty="0">
-                <a:solidFill>
-                  <a:schemeClr val="tx1"/>
-                </a:solidFill>
-                <a:latin typeface="Times New Roman" panose="02020603050405020304" pitchFamily="18" charset="0"/>
-                <a:cs typeface="Times New Roman" panose="02020603050405020304" pitchFamily="18" charset="0"/>
-              </a:rPr>
-              <a:t>avg4</a:t>
-            </a:r>
-            <a:endParaRPr lang="en-US" sz="3000" i="1" dirty="0">
-              <a:solidFill>
-                <a:schemeClr val="tx1"/>
-              </a:solidFill>
-              <a:latin typeface="Times New Roman" panose="02020603050405020304" pitchFamily="18" charset="0"/>
-              <a:cs typeface="Times New Roman" panose="02020603050405020304" pitchFamily="18" charset="0"/>
-            </a:endParaRPr>
-          </a:p>
-        </p:txBody>
-      </p:sp>
-      <p:sp>
-        <p:nvSpPr>
           <p:cNvPr id="16" name="Rectangle 15">
             <a:extLst>
               <a:ext uri="{FF2B5EF4-FFF2-40B4-BE49-F238E27FC236}">
@@ -8751,6 +8582,4331 @@
     <p:extLst>
       <p:ext uri="{BB962C8B-B14F-4D97-AF65-F5344CB8AC3E}">
         <p14:creationId xmlns:p14="http://schemas.microsoft.com/office/powerpoint/2010/main" val="2401118049"/>
+      </p:ext>
+    </p:extLst>
+  </p:cSld>
+  <p:clrMapOvr>
+    <a:masterClrMapping/>
+  </p:clrMapOvr>
+</p:sld>
+</file>
+
+<file path=ppt/slides/slide3.xml><?xml version="1.0" encoding="utf-8"?>
+<p:sld xmlns:a="http://schemas.openxmlformats.org/drawingml/2006/main" xmlns:r="http://schemas.openxmlformats.org/officeDocument/2006/relationships" xmlns:p="http://schemas.openxmlformats.org/presentationml/2006/main">
+  <p:cSld>
+    <p:spTree>
+      <p:nvGrpSpPr>
+        <p:cNvPr id="1" name=""/>
+        <p:cNvGrpSpPr/>
+        <p:nvPr/>
+      </p:nvGrpSpPr>
+      <p:grpSpPr>
+        <a:xfrm>
+          <a:off x="0" y="0"/>
+          <a:ext cx="0" cy="0"/>
+          <a:chOff x="0" y="0"/>
+          <a:chExt cx="0" cy="0"/>
+        </a:xfrm>
+      </p:grpSpPr>
+      <p:sp>
+        <p:nvSpPr>
+          <p:cNvPr id="143" name="Rectangle 142">
+            <a:extLst>
+              <a:ext uri="{FF2B5EF4-FFF2-40B4-BE49-F238E27FC236}">
+                <a16:creationId xmlns:a16="http://schemas.microsoft.com/office/drawing/2014/main" id="{23213933-7EA2-A749-1F7B-2F2186FA569E}"/>
+              </a:ext>
+            </a:extLst>
+          </p:cNvPr>
+          <p:cNvSpPr/>
+          <p:nvPr/>
+        </p:nvSpPr>
+        <p:spPr>
+          <a:xfrm>
+            <a:off x="15530050" y="7325461"/>
+            <a:ext cx="1819398" cy="877223"/>
+          </a:xfrm>
+          <a:prstGeom prst="rect">
+            <a:avLst/>
+          </a:prstGeom>
+          <a:solidFill>
+            <a:schemeClr val="bg1"/>
+          </a:solidFill>
+          <a:ln w="38100">
+            <a:solidFill>
+              <a:schemeClr val="tx1"/>
+            </a:solidFill>
+          </a:ln>
+        </p:spPr>
+        <p:style>
+          <a:lnRef idx="2">
+            <a:schemeClr val="accent1">
+              <a:shade val="50000"/>
+            </a:schemeClr>
+          </a:lnRef>
+          <a:fillRef idx="1">
+            <a:schemeClr val="accent1"/>
+          </a:fillRef>
+          <a:effectRef idx="0">
+            <a:schemeClr val="accent1"/>
+          </a:effectRef>
+          <a:fontRef idx="minor">
+            <a:schemeClr val="lt1"/>
+          </a:fontRef>
+        </p:style>
+        <p:txBody>
+          <a:bodyPr rtlCol="0" anchor="ctr"/>
+          <a:lstStyle/>
+          <a:p>
+            <a:pPr algn="ctr"/>
+            <a:r>
+              <a:rPr lang="el-GR" sz="3000" i="1" dirty="0">
+                <a:solidFill>
+                  <a:schemeClr val="tx1"/>
+                </a:solidFill>
+                <a:latin typeface="Times New Roman" panose="02020603050405020304" pitchFamily="18" charset="0"/>
+                <a:cs typeface="Times New Roman" panose="02020603050405020304" pitchFamily="18" charset="0"/>
+              </a:rPr>
+              <a:t>Ν</a:t>
+            </a:r>
+            <a:r>
+              <a:rPr lang="en-US" sz="3000" baseline="-25000" dirty="0">
+                <a:solidFill>
+                  <a:schemeClr val="tx1"/>
+                </a:solidFill>
+                <a:latin typeface="Times New Roman" panose="02020603050405020304" pitchFamily="18" charset="0"/>
+                <a:cs typeface="Times New Roman" panose="02020603050405020304" pitchFamily="18" charset="0"/>
+              </a:rPr>
+              <a:t>area</a:t>
+            </a:r>
+            <a:endParaRPr lang="en-US" sz="3000" i="1" dirty="0">
+              <a:solidFill>
+                <a:schemeClr val="tx1"/>
+              </a:solidFill>
+              <a:latin typeface="Times New Roman" panose="02020603050405020304" pitchFamily="18" charset="0"/>
+              <a:cs typeface="Times New Roman" panose="02020603050405020304" pitchFamily="18" charset="0"/>
+            </a:endParaRPr>
+          </a:p>
+        </p:txBody>
+      </p:sp>
+      <p:sp>
+        <p:nvSpPr>
+          <p:cNvPr id="148" name="Rectangle 147">
+            <a:extLst>
+              <a:ext uri="{FF2B5EF4-FFF2-40B4-BE49-F238E27FC236}">
+                <a16:creationId xmlns:a16="http://schemas.microsoft.com/office/drawing/2014/main" id="{CAEEF86E-BF80-675F-3FA2-55D6B97D4497}"/>
+              </a:ext>
+            </a:extLst>
+          </p:cNvPr>
+          <p:cNvSpPr/>
+          <p:nvPr/>
+        </p:nvSpPr>
+        <p:spPr>
+          <a:xfrm>
+            <a:off x="6415678" y="7339372"/>
+            <a:ext cx="1819398" cy="877223"/>
+          </a:xfrm>
+          <a:prstGeom prst="rect">
+            <a:avLst/>
+          </a:prstGeom>
+          <a:solidFill>
+            <a:schemeClr val="bg1"/>
+          </a:solidFill>
+          <a:ln w="38100">
+            <a:solidFill>
+              <a:schemeClr val="tx1"/>
+            </a:solidFill>
+          </a:ln>
+        </p:spPr>
+        <p:style>
+          <a:lnRef idx="2">
+            <a:schemeClr val="accent1">
+              <a:shade val="50000"/>
+            </a:schemeClr>
+          </a:lnRef>
+          <a:fillRef idx="1">
+            <a:schemeClr val="accent1"/>
+          </a:fillRef>
+          <a:effectRef idx="0">
+            <a:schemeClr val="accent1"/>
+          </a:effectRef>
+          <a:fontRef idx="minor">
+            <a:schemeClr val="lt1"/>
+          </a:fontRef>
+        </p:style>
+        <p:txBody>
+          <a:bodyPr rtlCol="0" anchor="ctr"/>
+          <a:lstStyle/>
+          <a:p>
+            <a:pPr algn="ctr"/>
+            <a:r>
+              <a:rPr lang="el-GR" sz="3000" i="1" dirty="0">
+                <a:solidFill>
+                  <a:schemeClr val="tx1"/>
+                </a:solidFill>
+                <a:latin typeface="Times New Roman" panose="02020603050405020304" pitchFamily="18" charset="0"/>
+                <a:cs typeface="Times New Roman" panose="02020603050405020304" pitchFamily="18" charset="0"/>
+              </a:rPr>
+              <a:t>β</a:t>
+            </a:r>
+            <a:endParaRPr lang="en-US" sz="3000" i="1" dirty="0">
+              <a:solidFill>
+                <a:schemeClr val="tx1"/>
+              </a:solidFill>
+              <a:latin typeface="Times New Roman" panose="02020603050405020304" pitchFamily="18" charset="0"/>
+              <a:cs typeface="Times New Roman" panose="02020603050405020304" pitchFamily="18" charset="0"/>
+            </a:endParaRPr>
+          </a:p>
+        </p:txBody>
+      </p:sp>
+      <p:cxnSp>
+        <p:nvCxnSpPr>
+          <p:cNvPr id="154" name="Straight Arrow Connector 153">
+            <a:extLst>
+              <a:ext uri="{FF2B5EF4-FFF2-40B4-BE49-F238E27FC236}">
+                <a16:creationId xmlns:a16="http://schemas.microsoft.com/office/drawing/2014/main" id="{706FE09F-1166-D3EA-09AE-6462ACA90433}"/>
+              </a:ext>
+            </a:extLst>
+          </p:cNvPr>
+          <p:cNvCxnSpPr>
+            <a:cxnSpLocks/>
+            <a:stCxn id="151" idx="1"/>
+            <a:endCxn id="150" idx="3"/>
+          </p:cNvCxnSpPr>
+          <p:nvPr/>
+        </p:nvCxnSpPr>
+        <p:spPr>
+          <a:xfrm flipH="1" flipV="1">
+            <a:off x="3666929" y="5030891"/>
+            <a:ext cx="2707333" cy="7531"/>
+          </a:xfrm>
+          <a:prstGeom prst="straightConnector1">
+            <a:avLst/>
+          </a:prstGeom>
+          <a:ln w="118237">
+            <a:solidFill>
+              <a:srgbClr val="C00000"/>
+            </a:solidFill>
+            <a:tailEnd type="triangle"/>
+          </a:ln>
+        </p:spPr>
+        <p:style>
+          <a:lnRef idx="1">
+            <a:schemeClr val="accent1"/>
+          </a:lnRef>
+          <a:fillRef idx="0">
+            <a:schemeClr val="accent1"/>
+          </a:fillRef>
+          <a:effectRef idx="0">
+            <a:schemeClr val="accent1"/>
+          </a:effectRef>
+          <a:fontRef idx="minor">
+            <a:schemeClr val="tx1"/>
+          </a:fontRef>
+        </p:style>
+      </p:cxnSp>
+      <p:cxnSp>
+        <p:nvCxnSpPr>
+          <p:cNvPr id="155" name="Straight Arrow Connector 154">
+            <a:extLst>
+              <a:ext uri="{FF2B5EF4-FFF2-40B4-BE49-F238E27FC236}">
+                <a16:creationId xmlns:a16="http://schemas.microsoft.com/office/drawing/2014/main" id="{E3174060-880C-85BE-973E-5A3CB9A219CC}"/>
+              </a:ext>
+            </a:extLst>
+          </p:cNvPr>
+          <p:cNvCxnSpPr>
+            <a:cxnSpLocks/>
+            <a:stCxn id="150" idx="2"/>
+            <a:endCxn id="144" idx="0"/>
+          </p:cNvCxnSpPr>
+          <p:nvPr/>
+        </p:nvCxnSpPr>
+        <p:spPr>
+          <a:xfrm>
+            <a:off x="2757230" y="5469502"/>
+            <a:ext cx="0" cy="4596703"/>
+          </a:xfrm>
+          <a:prstGeom prst="straightConnector1">
+            <a:avLst/>
+          </a:prstGeom>
+          <a:ln w="77597">
+            <a:solidFill>
+              <a:schemeClr val="accent1">
+                <a:lumMod val="75000"/>
+              </a:schemeClr>
+            </a:solidFill>
+            <a:tailEnd type="triangle"/>
+          </a:ln>
+        </p:spPr>
+        <p:style>
+          <a:lnRef idx="1">
+            <a:schemeClr val="accent1"/>
+          </a:lnRef>
+          <a:fillRef idx="0">
+            <a:schemeClr val="accent1"/>
+          </a:fillRef>
+          <a:effectRef idx="0">
+            <a:schemeClr val="accent1"/>
+          </a:effectRef>
+          <a:fontRef idx="minor">
+            <a:schemeClr val="tx1"/>
+          </a:fontRef>
+        </p:style>
+      </p:cxnSp>
+      <p:cxnSp>
+        <p:nvCxnSpPr>
+          <p:cNvPr id="159" name="Straight Arrow Connector 158">
+            <a:extLst>
+              <a:ext uri="{FF2B5EF4-FFF2-40B4-BE49-F238E27FC236}">
+                <a16:creationId xmlns:a16="http://schemas.microsoft.com/office/drawing/2014/main" id="{390A7192-0F6D-E061-2173-EF54A80A8533}"/>
+              </a:ext>
+            </a:extLst>
+          </p:cNvPr>
+          <p:cNvCxnSpPr>
+            <a:cxnSpLocks/>
+          </p:cNvCxnSpPr>
+          <p:nvPr/>
+        </p:nvCxnSpPr>
+        <p:spPr>
+          <a:xfrm flipH="1">
+            <a:off x="8264187" y="4794920"/>
+            <a:ext cx="2915090" cy="2517812"/>
+          </a:xfrm>
+          <a:prstGeom prst="straightConnector1">
+            <a:avLst/>
+          </a:prstGeom>
+          <a:ln w="92710">
+            <a:solidFill>
+              <a:schemeClr val="accent1">
+                <a:lumMod val="75000"/>
+              </a:schemeClr>
+            </a:solidFill>
+            <a:tailEnd type="triangle"/>
+          </a:ln>
+        </p:spPr>
+        <p:style>
+          <a:lnRef idx="1">
+            <a:schemeClr val="accent1"/>
+          </a:lnRef>
+          <a:fillRef idx="0">
+            <a:schemeClr val="accent1"/>
+          </a:fillRef>
+          <a:effectRef idx="0">
+            <a:schemeClr val="accent1"/>
+          </a:effectRef>
+          <a:fontRef idx="minor">
+            <a:schemeClr val="tx1"/>
+          </a:fontRef>
+        </p:style>
+      </p:cxnSp>
+      <p:cxnSp>
+        <p:nvCxnSpPr>
+          <p:cNvPr id="162" name="Straight Arrow Connector 161">
+            <a:extLst>
+              <a:ext uri="{FF2B5EF4-FFF2-40B4-BE49-F238E27FC236}">
+                <a16:creationId xmlns:a16="http://schemas.microsoft.com/office/drawing/2014/main" id="{71E57B4B-E988-43AE-3D45-43FD109A5FB7}"/>
+              </a:ext>
+            </a:extLst>
+          </p:cNvPr>
+          <p:cNvCxnSpPr>
+            <a:cxnSpLocks/>
+            <a:endCxn id="148" idx="1"/>
+          </p:cNvCxnSpPr>
+          <p:nvPr/>
+        </p:nvCxnSpPr>
+        <p:spPr>
+          <a:xfrm flipV="1">
+            <a:off x="3409756" y="7777984"/>
+            <a:ext cx="3005922" cy="2477973"/>
+          </a:xfrm>
+          <a:prstGeom prst="straightConnector1">
+            <a:avLst/>
+          </a:prstGeom>
+          <a:ln w="38100">
+            <a:solidFill>
+              <a:srgbClr val="C00000"/>
+            </a:solidFill>
+            <a:tailEnd type="triangle"/>
+          </a:ln>
+        </p:spPr>
+        <p:style>
+          <a:lnRef idx="1">
+            <a:schemeClr val="accent1"/>
+          </a:lnRef>
+          <a:fillRef idx="0">
+            <a:schemeClr val="accent1"/>
+          </a:fillRef>
+          <a:effectRef idx="0">
+            <a:schemeClr val="accent1"/>
+          </a:effectRef>
+          <a:fontRef idx="minor">
+            <a:schemeClr val="tx1"/>
+          </a:fontRef>
+        </p:style>
+      </p:cxnSp>
+      <p:cxnSp>
+        <p:nvCxnSpPr>
+          <p:cNvPr id="165" name="Straight Arrow Connector 164">
+            <a:extLst>
+              <a:ext uri="{FF2B5EF4-FFF2-40B4-BE49-F238E27FC236}">
+                <a16:creationId xmlns:a16="http://schemas.microsoft.com/office/drawing/2014/main" id="{04CC1E2A-0496-1BB7-936C-437D17351894}"/>
+              </a:ext>
+            </a:extLst>
+          </p:cNvPr>
+          <p:cNvCxnSpPr>
+            <a:cxnSpLocks/>
+          </p:cNvCxnSpPr>
+          <p:nvPr/>
+        </p:nvCxnSpPr>
+        <p:spPr>
+          <a:xfrm>
+            <a:off x="8212813" y="7777983"/>
+            <a:ext cx="2731297" cy="2"/>
+          </a:xfrm>
+          <a:prstGeom prst="straightConnector1">
+            <a:avLst/>
+          </a:prstGeom>
+          <a:ln w="49276">
+            <a:solidFill>
+              <a:schemeClr val="accent1">
+                <a:lumMod val="75000"/>
+              </a:schemeClr>
+            </a:solidFill>
+            <a:tailEnd type="triangle"/>
+          </a:ln>
+        </p:spPr>
+        <p:style>
+          <a:lnRef idx="1">
+            <a:schemeClr val="accent1"/>
+          </a:lnRef>
+          <a:fillRef idx="0">
+            <a:schemeClr val="accent1"/>
+          </a:fillRef>
+          <a:effectRef idx="0">
+            <a:schemeClr val="accent1"/>
+          </a:effectRef>
+          <a:fontRef idx="minor">
+            <a:schemeClr val="tx1"/>
+          </a:fontRef>
+        </p:style>
+      </p:cxnSp>
+      <p:cxnSp>
+        <p:nvCxnSpPr>
+          <p:cNvPr id="174" name="Straight Arrow Connector 173">
+            <a:extLst>
+              <a:ext uri="{FF2B5EF4-FFF2-40B4-BE49-F238E27FC236}">
+                <a16:creationId xmlns:a16="http://schemas.microsoft.com/office/drawing/2014/main" id="{10084160-D7B3-7E90-B5E9-8786D36CA910}"/>
+              </a:ext>
+            </a:extLst>
+          </p:cNvPr>
+          <p:cNvCxnSpPr>
+            <a:cxnSpLocks/>
+            <a:stCxn id="149" idx="3"/>
+            <a:endCxn id="143" idx="1"/>
+          </p:cNvCxnSpPr>
+          <p:nvPr/>
+        </p:nvCxnSpPr>
+        <p:spPr>
+          <a:xfrm flipV="1">
+            <a:off x="12785771" y="7764073"/>
+            <a:ext cx="2744279" cy="13913"/>
+          </a:xfrm>
+          <a:prstGeom prst="straightConnector1">
+            <a:avLst/>
+          </a:prstGeom>
+          <a:ln w="34798">
+            <a:solidFill>
+              <a:srgbClr val="C00000"/>
+            </a:solidFill>
+            <a:tailEnd type="triangle"/>
+          </a:ln>
+        </p:spPr>
+        <p:style>
+          <a:lnRef idx="1">
+            <a:schemeClr val="accent1"/>
+          </a:lnRef>
+          <a:fillRef idx="0">
+            <a:schemeClr val="accent1"/>
+          </a:fillRef>
+          <a:effectRef idx="0">
+            <a:schemeClr val="accent1"/>
+          </a:effectRef>
+          <a:fontRef idx="minor">
+            <a:schemeClr val="tx1"/>
+          </a:fontRef>
+        </p:style>
+      </p:cxnSp>
+      <p:cxnSp>
+        <p:nvCxnSpPr>
+          <p:cNvPr id="178" name="Straight Arrow Connector 177">
+            <a:extLst>
+              <a:ext uri="{FF2B5EF4-FFF2-40B4-BE49-F238E27FC236}">
+                <a16:creationId xmlns:a16="http://schemas.microsoft.com/office/drawing/2014/main" id="{AD58EF09-8B95-4F31-0758-52C1BD1A684D}"/>
+              </a:ext>
+            </a:extLst>
+          </p:cNvPr>
+          <p:cNvCxnSpPr>
+            <a:cxnSpLocks/>
+            <a:stCxn id="145" idx="2"/>
+            <a:endCxn id="143" idx="0"/>
+          </p:cNvCxnSpPr>
+          <p:nvPr/>
+        </p:nvCxnSpPr>
+        <p:spPr>
+          <a:xfrm flipH="1">
+            <a:off x="16439749" y="5469502"/>
+            <a:ext cx="19454" cy="1855959"/>
+          </a:xfrm>
+          <a:prstGeom prst="straightConnector1">
+            <a:avLst/>
+          </a:prstGeom>
+          <a:ln w="147447">
+            <a:solidFill>
+              <a:schemeClr val="accent1">
+                <a:lumMod val="75000"/>
+              </a:schemeClr>
+            </a:solidFill>
+            <a:tailEnd type="triangle"/>
+          </a:ln>
+        </p:spPr>
+        <p:style>
+          <a:lnRef idx="1">
+            <a:schemeClr val="accent1"/>
+          </a:lnRef>
+          <a:fillRef idx="0">
+            <a:schemeClr val="accent1"/>
+          </a:fillRef>
+          <a:effectRef idx="0">
+            <a:schemeClr val="accent1"/>
+          </a:effectRef>
+          <a:fontRef idx="minor">
+            <a:schemeClr val="tx1"/>
+          </a:fontRef>
+        </p:style>
+      </p:cxnSp>
+      <p:cxnSp>
+        <p:nvCxnSpPr>
+          <p:cNvPr id="179" name="Straight Arrow Connector 178">
+            <a:extLst>
+              <a:ext uri="{FF2B5EF4-FFF2-40B4-BE49-F238E27FC236}">
+                <a16:creationId xmlns:a16="http://schemas.microsoft.com/office/drawing/2014/main" id="{64137A6B-9D81-CC04-4A56-CB43F3FBE38A}"/>
+              </a:ext>
+            </a:extLst>
+          </p:cNvPr>
+          <p:cNvCxnSpPr>
+            <a:cxnSpLocks/>
+            <a:stCxn id="146" idx="0"/>
+            <a:endCxn id="143" idx="2"/>
+          </p:cNvCxnSpPr>
+          <p:nvPr/>
+        </p:nvCxnSpPr>
+        <p:spPr>
+          <a:xfrm flipH="1" flipV="1">
+            <a:off x="16439749" y="8202684"/>
+            <a:ext cx="5166" cy="1863521"/>
+          </a:xfrm>
+          <a:prstGeom prst="straightConnector1">
+            <a:avLst/>
+          </a:prstGeom>
+          <a:ln w="150495">
+            <a:solidFill>
+              <a:schemeClr val="accent1">
+                <a:lumMod val="75000"/>
+              </a:schemeClr>
+            </a:solidFill>
+            <a:tailEnd type="triangle"/>
+          </a:ln>
+        </p:spPr>
+        <p:style>
+          <a:lnRef idx="1">
+            <a:schemeClr val="accent1"/>
+          </a:lnRef>
+          <a:fillRef idx="0">
+            <a:schemeClr val="accent1"/>
+          </a:fillRef>
+          <a:effectRef idx="0">
+            <a:schemeClr val="accent1"/>
+          </a:effectRef>
+          <a:fontRef idx="minor">
+            <a:schemeClr val="tx1"/>
+          </a:fontRef>
+        </p:style>
+      </p:cxnSp>
+      <p:sp>
+        <p:nvSpPr>
+          <p:cNvPr id="145" name="Rectangle 144">
+            <a:extLst>
+              <a:ext uri="{FF2B5EF4-FFF2-40B4-BE49-F238E27FC236}">
+                <a16:creationId xmlns:a16="http://schemas.microsoft.com/office/drawing/2014/main" id="{196DCF3C-1E9F-84BF-A1CB-74EFF6943139}"/>
+              </a:ext>
+            </a:extLst>
+          </p:cNvPr>
+          <p:cNvSpPr/>
+          <p:nvPr/>
+        </p:nvSpPr>
+        <p:spPr>
+          <a:xfrm>
+            <a:off x="15549504" y="4592279"/>
+            <a:ext cx="1819398" cy="877223"/>
+          </a:xfrm>
+          <a:prstGeom prst="rect">
+            <a:avLst/>
+          </a:prstGeom>
+          <a:solidFill>
+            <a:schemeClr val="bg1"/>
+          </a:solidFill>
+          <a:ln w="38100">
+            <a:solidFill>
+              <a:schemeClr val="tx1"/>
+            </a:solidFill>
+          </a:ln>
+        </p:spPr>
+        <p:style>
+          <a:lnRef idx="2">
+            <a:schemeClr val="accent1">
+              <a:shade val="50000"/>
+            </a:schemeClr>
+          </a:lnRef>
+          <a:fillRef idx="1">
+            <a:schemeClr val="accent1"/>
+          </a:fillRef>
+          <a:effectRef idx="0">
+            <a:schemeClr val="accent1"/>
+          </a:effectRef>
+          <a:fontRef idx="minor">
+            <a:schemeClr val="lt1"/>
+          </a:fontRef>
+        </p:style>
+        <p:txBody>
+          <a:bodyPr rtlCol="0" anchor="ctr"/>
+          <a:lstStyle/>
+          <a:p>
+            <a:pPr algn="ctr"/>
+            <a:r>
+              <a:rPr lang="en-US" sz="3000" i="1" dirty="0">
+                <a:solidFill>
+                  <a:schemeClr val="tx1"/>
+                </a:solidFill>
+                <a:latin typeface="Times New Roman" panose="02020603050405020304" pitchFamily="18" charset="0"/>
+                <a:cs typeface="Times New Roman" panose="02020603050405020304" pitchFamily="18" charset="0"/>
+              </a:rPr>
+              <a:t>N</a:t>
+            </a:r>
+            <a:r>
+              <a:rPr lang="en-US" sz="3000" baseline="-25000" dirty="0">
+                <a:solidFill>
+                  <a:schemeClr val="tx1"/>
+                </a:solidFill>
+                <a:latin typeface="Times New Roman" panose="02020603050405020304" pitchFamily="18" charset="0"/>
+                <a:cs typeface="Times New Roman" panose="02020603050405020304" pitchFamily="18" charset="0"/>
+              </a:rPr>
+              <a:t>mass</a:t>
+            </a:r>
+            <a:endParaRPr lang="en-US" sz="3000" i="1" dirty="0">
+              <a:solidFill>
+                <a:schemeClr val="tx1"/>
+              </a:solidFill>
+              <a:latin typeface="Times New Roman" panose="02020603050405020304" pitchFamily="18" charset="0"/>
+              <a:cs typeface="Times New Roman" panose="02020603050405020304" pitchFamily="18" charset="0"/>
+            </a:endParaRPr>
+          </a:p>
+        </p:txBody>
+      </p:sp>
+      <p:sp>
+        <p:nvSpPr>
+          <p:cNvPr id="146" name="Rectangle 145">
+            <a:extLst>
+              <a:ext uri="{FF2B5EF4-FFF2-40B4-BE49-F238E27FC236}">
+                <a16:creationId xmlns:a16="http://schemas.microsoft.com/office/drawing/2014/main" id="{831EFE87-5954-79FB-5410-F4BC8563FCDF}"/>
+              </a:ext>
+            </a:extLst>
+          </p:cNvPr>
+          <p:cNvSpPr/>
+          <p:nvPr/>
+        </p:nvSpPr>
+        <p:spPr>
+          <a:xfrm>
+            <a:off x="15535216" y="10066205"/>
+            <a:ext cx="1819398" cy="877223"/>
+          </a:xfrm>
+          <a:prstGeom prst="rect">
+            <a:avLst/>
+          </a:prstGeom>
+          <a:solidFill>
+            <a:schemeClr val="bg1"/>
+          </a:solidFill>
+          <a:ln w="38100">
+            <a:solidFill>
+              <a:schemeClr val="tx1"/>
+            </a:solidFill>
+          </a:ln>
+        </p:spPr>
+        <p:style>
+          <a:lnRef idx="2">
+            <a:schemeClr val="accent1">
+              <a:shade val="50000"/>
+            </a:schemeClr>
+          </a:lnRef>
+          <a:fillRef idx="1">
+            <a:schemeClr val="accent1"/>
+          </a:fillRef>
+          <a:effectRef idx="0">
+            <a:schemeClr val="accent1"/>
+          </a:effectRef>
+          <a:fontRef idx="minor">
+            <a:schemeClr val="lt1"/>
+          </a:fontRef>
+        </p:style>
+        <p:txBody>
+          <a:bodyPr rtlCol="0" anchor="ctr"/>
+          <a:lstStyle/>
+          <a:p>
+            <a:pPr algn="ctr"/>
+            <a:r>
+              <a:rPr lang="en-US" sz="3000" i="1" dirty="0">
+                <a:solidFill>
+                  <a:schemeClr val="tx1"/>
+                </a:solidFill>
+                <a:latin typeface="Times New Roman" panose="02020603050405020304" pitchFamily="18" charset="0"/>
+                <a:cs typeface="Times New Roman" panose="02020603050405020304" pitchFamily="18" charset="0"/>
+              </a:rPr>
+              <a:t>M</a:t>
+            </a:r>
+            <a:r>
+              <a:rPr lang="en-US" sz="3000" baseline="-25000" dirty="0">
+                <a:solidFill>
+                  <a:schemeClr val="tx1"/>
+                </a:solidFill>
+                <a:latin typeface="Times New Roman" panose="02020603050405020304" pitchFamily="18" charset="0"/>
+                <a:cs typeface="Times New Roman" panose="02020603050405020304" pitchFamily="18" charset="0"/>
+              </a:rPr>
+              <a:t>area</a:t>
+            </a:r>
+            <a:endParaRPr lang="en-US" sz="3000" i="1" dirty="0">
+              <a:solidFill>
+                <a:schemeClr val="tx1"/>
+              </a:solidFill>
+              <a:latin typeface="Times New Roman" panose="02020603050405020304" pitchFamily="18" charset="0"/>
+              <a:cs typeface="Times New Roman" panose="02020603050405020304" pitchFamily="18" charset="0"/>
+            </a:endParaRPr>
+          </a:p>
+        </p:txBody>
+      </p:sp>
+      <p:cxnSp>
+        <p:nvCxnSpPr>
+          <p:cNvPr id="185" name="Straight Arrow Connector 184">
+            <a:extLst>
+              <a:ext uri="{FF2B5EF4-FFF2-40B4-BE49-F238E27FC236}">
+                <a16:creationId xmlns:a16="http://schemas.microsoft.com/office/drawing/2014/main" id="{258C187C-B6A3-5852-85DF-896F3B7E817C}"/>
+              </a:ext>
+            </a:extLst>
+          </p:cNvPr>
+          <p:cNvCxnSpPr>
+            <a:cxnSpLocks/>
+            <a:endCxn id="146" idx="1"/>
+          </p:cNvCxnSpPr>
+          <p:nvPr/>
+        </p:nvCxnSpPr>
+        <p:spPr>
+          <a:xfrm>
+            <a:off x="11618898" y="8043863"/>
+            <a:ext cx="3916318" cy="2460954"/>
+          </a:xfrm>
+          <a:prstGeom prst="straightConnector1">
+            <a:avLst/>
+          </a:prstGeom>
+          <a:ln w="75311">
+            <a:solidFill>
+              <a:srgbClr val="C00000"/>
+            </a:solidFill>
+            <a:tailEnd type="triangle"/>
+          </a:ln>
+        </p:spPr>
+        <p:style>
+          <a:lnRef idx="1">
+            <a:schemeClr val="accent1"/>
+          </a:lnRef>
+          <a:fillRef idx="0">
+            <a:schemeClr val="accent1"/>
+          </a:fillRef>
+          <a:effectRef idx="0">
+            <a:schemeClr val="accent1"/>
+          </a:effectRef>
+          <a:fontRef idx="minor">
+            <a:schemeClr val="tx1"/>
+          </a:fontRef>
+        </p:style>
+      </p:cxnSp>
+      <p:cxnSp>
+        <p:nvCxnSpPr>
+          <p:cNvPr id="186" name="Straight Arrow Connector 185">
+            <a:extLst>
+              <a:ext uri="{FF2B5EF4-FFF2-40B4-BE49-F238E27FC236}">
+                <a16:creationId xmlns:a16="http://schemas.microsoft.com/office/drawing/2014/main" id="{8F9CC82C-68F6-632C-D6BC-9D720D68E3E7}"/>
+              </a:ext>
+            </a:extLst>
+          </p:cNvPr>
+          <p:cNvCxnSpPr>
+            <a:cxnSpLocks/>
+          </p:cNvCxnSpPr>
+          <p:nvPr/>
+        </p:nvCxnSpPr>
+        <p:spPr>
+          <a:xfrm>
+            <a:off x="3666929" y="10833441"/>
+            <a:ext cx="11868287" cy="0"/>
+          </a:xfrm>
+          <a:prstGeom prst="straightConnector1">
+            <a:avLst/>
+          </a:prstGeom>
+          <a:ln w="25400">
+            <a:solidFill>
+              <a:srgbClr val="C00000"/>
+            </a:solidFill>
+            <a:tailEnd type="triangle"/>
+          </a:ln>
+        </p:spPr>
+        <p:style>
+          <a:lnRef idx="1">
+            <a:schemeClr val="accent1"/>
+          </a:lnRef>
+          <a:fillRef idx="0">
+            <a:schemeClr val="accent1"/>
+          </a:fillRef>
+          <a:effectRef idx="0">
+            <a:schemeClr val="accent1"/>
+          </a:effectRef>
+          <a:fontRef idx="minor">
+            <a:schemeClr val="tx1"/>
+          </a:fontRef>
+        </p:style>
+      </p:cxnSp>
+      <p:cxnSp>
+        <p:nvCxnSpPr>
+          <p:cNvPr id="192" name="Elbow Connector 191">
+            <a:extLst>
+              <a:ext uri="{FF2B5EF4-FFF2-40B4-BE49-F238E27FC236}">
+                <a16:creationId xmlns:a16="http://schemas.microsoft.com/office/drawing/2014/main" id="{70E41ED9-E24C-CA45-C448-4A15D4E18233}"/>
+              </a:ext>
+            </a:extLst>
+          </p:cNvPr>
+          <p:cNvCxnSpPr>
+            <a:cxnSpLocks/>
+            <a:stCxn id="150" idx="1"/>
+            <a:endCxn id="146" idx="2"/>
+          </p:cNvCxnSpPr>
+          <p:nvPr/>
+        </p:nvCxnSpPr>
+        <p:spPr>
+          <a:xfrm rot="10800000" flipH="1" flipV="1">
+            <a:off x="1847531" y="5030890"/>
+            <a:ext cx="14597384" cy="5912537"/>
+          </a:xfrm>
+          <a:prstGeom prst="bentConnector4">
+            <a:avLst>
+              <a:gd name="adj1" fmla="val -6460"/>
+              <a:gd name="adj2" fmla="val 115948"/>
+            </a:avLst>
+          </a:prstGeom>
+          <a:ln w="24638">
+            <a:solidFill>
+              <a:srgbClr val="C00000"/>
+            </a:solidFill>
+            <a:tailEnd type="triangle"/>
+          </a:ln>
+        </p:spPr>
+        <p:style>
+          <a:lnRef idx="1">
+            <a:schemeClr val="accent1"/>
+          </a:lnRef>
+          <a:fillRef idx="0">
+            <a:schemeClr val="accent1"/>
+          </a:fillRef>
+          <a:effectRef idx="0">
+            <a:schemeClr val="accent1"/>
+          </a:effectRef>
+          <a:fontRef idx="minor">
+            <a:schemeClr val="tx1"/>
+          </a:fontRef>
+        </p:style>
+      </p:cxnSp>
+      <p:cxnSp>
+        <p:nvCxnSpPr>
+          <p:cNvPr id="196" name="Straight Arrow Connector 195">
+            <a:extLst>
+              <a:ext uri="{FF2B5EF4-FFF2-40B4-BE49-F238E27FC236}">
+                <a16:creationId xmlns:a16="http://schemas.microsoft.com/office/drawing/2014/main" id="{D3D39525-618A-0E5E-5962-FA061AF403E3}"/>
+              </a:ext>
+            </a:extLst>
+          </p:cNvPr>
+          <p:cNvCxnSpPr>
+            <a:cxnSpLocks/>
+          </p:cNvCxnSpPr>
+          <p:nvPr/>
+        </p:nvCxnSpPr>
+        <p:spPr>
+          <a:xfrm flipV="1">
+            <a:off x="3480283" y="5477126"/>
+            <a:ext cx="12040183" cy="5027690"/>
+          </a:xfrm>
+          <a:prstGeom prst="straightConnector1">
+            <a:avLst/>
+          </a:prstGeom>
+          <a:ln w="45593">
+            <a:solidFill>
+              <a:schemeClr val="accent1">
+                <a:lumMod val="75000"/>
+              </a:schemeClr>
+            </a:solidFill>
+            <a:tailEnd type="triangle"/>
+          </a:ln>
+        </p:spPr>
+        <p:style>
+          <a:lnRef idx="1">
+            <a:schemeClr val="accent1"/>
+          </a:lnRef>
+          <a:fillRef idx="0">
+            <a:schemeClr val="accent1"/>
+          </a:fillRef>
+          <a:effectRef idx="0">
+            <a:schemeClr val="accent1"/>
+          </a:effectRef>
+          <a:fontRef idx="minor">
+            <a:schemeClr val="tx1"/>
+          </a:fontRef>
+        </p:style>
+      </p:cxnSp>
+      <p:cxnSp>
+        <p:nvCxnSpPr>
+          <p:cNvPr id="168" name="Straight Arrow Connector 167">
+            <a:extLst>
+              <a:ext uri="{FF2B5EF4-FFF2-40B4-BE49-F238E27FC236}">
+                <a16:creationId xmlns:a16="http://schemas.microsoft.com/office/drawing/2014/main" id="{1EF4A41A-5F73-8BC5-33B7-31C8F1EBE768}"/>
+              </a:ext>
+            </a:extLst>
+          </p:cNvPr>
+          <p:cNvCxnSpPr>
+            <a:cxnSpLocks/>
+          </p:cNvCxnSpPr>
+          <p:nvPr/>
+        </p:nvCxnSpPr>
+        <p:spPr>
+          <a:xfrm>
+            <a:off x="7829550" y="5233051"/>
+            <a:ext cx="3114560" cy="2079681"/>
+          </a:xfrm>
+          <a:prstGeom prst="straightConnector1">
+            <a:avLst/>
+          </a:prstGeom>
+          <a:ln w="23114">
+            <a:solidFill>
+              <a:srgbClr val="C00000"/>
+            </a:solidFill>
+            <a:tailEnd type="triangle"/>
+          </a:ln>
+        </p:spPr>
+        <p:style>
+          <a:lnRef idx="1">
+            <a:schemeClr val="accent1"/>
+          </a:lnRef>
+          <a:fillRef idx="0">
+            <a:schemeClr val="accent1"/>
+          </a:fillRef>
+          <a:effectRef idx="0">
+            <a:schemeClr val="accent1"/>
+          </a:effectRef>
+          <a:fontRef idx="minor">
+            <a:schemeClr val="tx1"/>
+          </a:fontRef>
+        </p:style>
+      </p:cxnSp>
+      <p:sp>
+        <p:nvSpPr>
+          <p:cNvPr id="151" name="Rectangle 150">
+            <a:extLst>
+              <a:ext uri="{FF2B5EF4-FFF2-40B4-BE49-F238E27FC236}">
+                <a16:creationId xmlns:a16="http://schemas.microsoft.com/office/drawing/2014/main" id="{52423B29-35B5-9B6F-567C-E9C20E59598B}"/>
+              </a:ext>
+            </a:extLst>
+          </p:cNvPr>
+          <p:cNvSpPr/>
+          <p:nvPr/>
+        </p:nvSpPr>
+        <p:spPr>
+          <a:xfrm>
+            <a:off x="6374262" y="4599810"/>
+            <a:ext cx="1819398" cy="877223"/>
+          </a:xfrm>
+          <a:prstGeom prst="rect">
+            <a:avLst/>
+          </a:prstGeom>
+          <a:solidFill>
+            <a:schemeClr val="bg1"/>
+          </a:solidFill>
+          <a:ln w="38100">
+            <a:solidFill>
+              <a:schemeClr val="tx1"/>
+            </a:solidFill>
+          </a:ln>
+        </p:spPr>
+        <p:style>
+          <a:lnRef idx="2">
+            <a:schemeClr val="accent1">
+              <a:shade val="50000"/>
+            </a:schemeClr>
+          </a:lnRef>
+          <a:fillRef idx="1">
+            <a:schemeClr val="accent1"/>
+          </a:fillRef>
+          <a:effectRef idx="0">
+            <a:schemeClr val="accent1"/>
+          </a:effectRef>
+          <a:fontRef idx="minor">
+            <a:schemeClr val="lt1"/>
+          </a:fontRef>
+        </p:style>
+        <p:txBody>
+          <a:bodyPr rtlCol="0" anchor="ctr"/>
+          <a:lstStyle/>
+          <a:p>
+            <a:pPr algn="ctr"/>
+            <a:r>
+              <a:rPr lang="en-US" sz="3000" i="1" dirty="0">
+                <a:solidFill>
+                  <a:schemeClr val="tx1"/>
+                </a:solidFill>
+                <a:latin typeface="Times New Roman" panose="02020603050405020304" pitchFamily="18" charset="0"/>
+                <a:cs typeface="Times New Roman" panose="02020603050405020304" pitchFamily="18" charset="0"/>
+              </a:rPr>
+              <a:t>VPD</a:t>
+            </a:r>
+            <a:r>
+              <a:rPr lang="en-US" sz="3000" baseline="-25000" dirty="0">
+                <a:solidFill>
+                  <a:schemeClr val="tx1"/>
+                </a:solidFill>
+                <a:latin typeface="Times New Roman" panose="02020603050405020304" pitchFamily="18" charset="0"/>
+                <a:cs typeface="Times New Roman" panose="02020603050405020304" pitchFamily="18" charset="0"/>
+              </a:rPr>
+              <a:t>4</a:t>
+            </a:r>
+            <a:endParaRPr lang="en-US" sz="3000" dirty="0">
+              <a:solidFill>
+                <a:schemeClr val="tx1"/>
+              </a:solidFill>
+              <a:latin typeface="Times New Roman" panose="02020603050405020304" pitchFamily="18" charset="0"/>
+              <a:cs typeface="Times New Roman" panose="02020603050405020304" pitchFamily="18" charset="0"/>
+            </a:endParaRPr>
+          </a:p>
+        </p:txBody>
+      </p:sp>
+      <p:cxnSp>
+        <p:nvCxnSpPr>
+          <p:cNvPr id="211" name="Straight Arrow Connector 210">
+            <a:extLst>
+              <a:ext uri="{FF2B5EF4-FFF2-40B4-BE49-F238E27FC236}">
+                <a16:creationId xmlns:a16="http://schemas.microsoft.com/office/drawing/2014/main" id="{4110BDE9-8908-F5D6-4156-0F3FAA1D6E32}"/>
+              </a:ext>
+            </a:extLst>
+          </p:cNvPr>
+          <p:cNvCxnSpPr>
+            <a:cxnSpLocks/>
+          </p:cNvCxnSpPr>
+          <p:nvPr/>
+        </p:nvCxnSpPr>
+        <p:spPr>
+          <a:xfrm flipV="1">
+            <a:off x="12727499" y="5022043"/>
+            <a:ext cx="2785996" cy="7531"/>
+          </a:xfrm>
+          <a:prstGeom prst="straightConnector1">
+            <a:avLst/>
+          </a:prstGeom>
+          <a:ln w="62357">
+            <a:solidFill>
+              <a:schemeClr val="accent1">
+                <a:lumMod val="75000"/>
+              </a:schemeClr>
+            </a:solidFill>
+            <a:tailEnd type="triangle"/>
+          </a:ln>
+        </p:spPr>
+        <p:style>
+          <a:lnRef idx="1">
+            <a:schemeClr val="accent1"/>
+          </a:lnRef>
+          <a:fillRef idx="0">
+            <a:schemeClr val="accent1"/>
+          </a:fillRef>
+          <a:effectRef idx="0">
+            <a:schemeClr val="accent1"/>
+          </a:effectRef>
+          <a:fontRef idx="minor">
+            <a:schemeClr val="tx1"/>
+          </a:fontRef>
+        </p:style>
+      </p:cxnSp>
+      <p:sp>
+        <p:nvSpPr>
+          <p:cNvPr id="152" name="Rectangle 151">
+            <a:extLst>
+              <a:ext uri="{FF2B5EF4-FFF2-40B4-BE49-F238E27FC236}">
+                <a16:creationId xmlns:a16="http://schemas.microsoft.com/office/drawing/2014/main" id="{2D17192C-937C-49F2-AB55-CCF25B817752}"/>
+              </a:ext>
+            </a:extLst>
+          </p:cNvPr>
+          <p:cNvSpPr/>
+          <p:nvPr/>
+        </p:nvSpPr>
+        <p:spPr>
+          <a:xfrm>
+            <a:off x="18744160" y="7103401"/>
+            <a:ext cx="1819398" cy="877223"/>
+          </a:xfrm>
+          <a:prstGeom prst="rect">
+            <a:avLst/>
+          </a:prstGeom>
+          <a:solidFill>
+            <a:schemeClr val="bg1"/>
+          </a:solidFill>
+          <a:ln w="38100">
+            <a:solidFill>
+              <a:schemeClr val="tx1"/>
+            </a:solidFill>
+          </a:ln>
+        </p:spPr>
+        <p:style>
+          <a:lnRef idx="2">
+            <a:schemeClr val="accent1">
+              <a:shade val="50000"/>
+            </a:schemeClr>
+          </a:lnRef>
+          <a:fillRef idx="1">
+            <a:schemeClr val="accent1"/>
+          </a:fillRef>
+          <a:effectRef idx="0">
+            <a:schemeClr val="accent1"/>
+          </a:effectRef>
+          <a:fontRef idx="minor">
+            <a:schemeClr val="lt1"/>
+          </a:fontRef>
+        </p:style>
+        <p:txBody>
+          <a:bodyPr rtlCol="0" anchor="ctr"/>
+          <a:lstStyle/>
+          <a:p>
+            <a:pPr algn="ctr"/>
+            <a:r>
+              <a:rPr lang="en-US" sz="3000" i="1" dirty="0">
+                <a:solidFill>
+                  <a:schemeClr val="tx1"/>
+                </a:solidFill>
+                <a:latin typeface="Times New Roman" panose="02020603050405020304" pitchFamily="18" charset="0"/>
+                <a:cs typeface="Times New Roman" panose="02020603050405020304" pitchFamily="18" charset="0"/>
+              </a:rPr>
+              <a:t>N</a:t>
+            </a:r>
+            <a:r>
+              <a:rPr lang="en-US" sz="3000" baseline="-25000" dirty="0">
+                <a:solidFill>
+                  <a:schemeClr val="tx1"/>
+                </a:solidFill>
+                <a:latin typeface="Times New Roman" panose="02020603050405020304" pitchFamily="18" charset="0"/>
+                <a:cs typeface="Times New Roman" panose="02020603050405020304" pitchFamily="18" charset="0"/>
+              </a:rPr>
+              <a:t>fixer</a:t>
+            </a:r>
+            <a:endParaRPr lang="en-US" sz="3000" i="1" dirty="0">
+              <a:solidFill>
+                <a:schemeClr val="tx1"/>
+              </a:solidFill>
+              <a:latin typeface="Times New Roman" panose="02020603050405020304" pitchFamily="18" charset="0"/>
+              <a:cs typeface="Times New Roman" panose="02020603050405020304" pitchFamily="18" charset="0"/>
+            </a:endParaRPr>
+          </a:p>
+        </p:txBody>
+      </p:sp>
+      <p:cxnSp>
+        <p:nvCxnSpPr>
+          <p:cNvPr id="267" name="Straight Arrow Connector 266">
+            <a:extLst>
+              <a:ext uri="{FF2B5EF4-FFF2-40B4-BE49-F238E27FC236}">
+                <a16:creationId xmlns:a16="http://schemas.microsoft.com/office/drawing/2014/main" id="{82DEA27F-935B-D94A-2D5F-8264EAC3FDDF}"/>
+              </a:ext>
+            </a:extLst>
+          </p:cNvPr>
+          <p:cNvCxnSpPr>
+            <a:cxnSpLocks/>
+          </p:cNvCxnSpPr>
+          <p:nvPr/>
+        </p:nvCxnSpPr>
+        <p:spPr>
+          <a:xfrm>
+            <a:off x="11744765" y="5311103"/>
+            <a:ext cx="3829455" cy="4762633"/>
+          </a:xfrm>
+          <a:prstGeom prst="straightConnector1">
+            <a:avLst/>
+          </a:prstGeom>
+          <a:ln w="98425">
+            <a:solidFill>
+              <a:schemeClr val="accent1">
+                <a:lumMod val="75000"/>
+              </a:schemeClr>
+            </a:solidFill>
+            <a:tailEnd type="triangle"/>
+          </a:ln>
+        </p:spPr>
+        <p:style>
+          <a:lnRef idx="1">
+            <a:schemeClr val="accent1"/>
+          </a:lnRef>
+          <a:fillRef idx="0">
+            <a:schemeClr val="accent1"/>
+          </a:fillRef>
+          <a:effectRef idx="0">
+            <a:schemeClr val="accent1"/>
+          </a:effectRef>
+          <a:fontRef idx="minor">
+            <a:schemeClr val="tx1"/>
+          </a:fontRef>
+        </p:style>
+      </p:cxnSp>
+      <p:sp>
+        <p:nvSpPr>
+          <p:cNvPr id="144" name="Rectangle 143">
+            <a:extLst>
+              <a:ext uri="{FF2B5EF4-FFF2-40B4-BE49-F238E27FC236}">
+                <a16:creationId xmlns:a16="http://schemas.microsoft.com/office/drawing/2014/main" id="{A78B38F8-81B3-D1FA-0AD1-5773256590EC}"/>
+              </a:ext>
+            </a:extLst>
+          </p:cNvPr>
+          <p:cNvSpPr/>
+          <p:nvPr/>
+        </p:nvSpPr>
+        <p:spPr>
+          <a:xfrm>
+            <a:off x="1847531" y="10066205"/>
+            <a:ext cx="1819398" cy="877223"/>
+          </a:xfrm>
+          <a:prstGeom prst="rect">
+            <a:avLst/>
+          </a:prstGeom>
+          <a:solidFill>
+            <a:schemeClr val="bg1"/>
+          </a:solidFill>
+          <a:ln w="38100">
+            <a:solidFill>
+              <a:schemeClr val="tx1"/>
+            </a:solidFill>
+          </a:ln>
+        </p:spPr>
+        <p:style>
+          <a:lnRef idx="2">
+            <a:schemeClr val="accent1">
+              <a:shade val="50000"/>
+            </a:schemeClr>
+          </a:lnRef>
+          <a:fillRef idx="1">
+            <a:schemeClr val="accent1"/>
+          </a:fillRef>
+          <a:effectRef idx="0">
+            <a:schemeClr val="accent1"/>
+          </a:effectRef>
+          <a:fontRef idx="minor">
+            <a:schemeClr val="lt1"/>
+          </a:fontRef>
+        </p:style>
+        <p:txBody>
+          <a:bodyPr rtlCol="0" anchor="ctr"/>
+          <a:lstStyle/>
+          <a:p>
+            <a:pPr algn="ctr"/>
+            <a:r>
+              <a:rPr lang="en-US" sz="3000" i="1" dirty="0">
+                <a:solidFill>
+                  <a:schemeClr val="tx1"/>
+                </a:solidFill>
+                <a:latin typeface="Times New Roman" panose="02020603050405020304" pitchFamily="18" charset="0"/>
+                <a:cs typeface="Times New Roman" panose="02020603050405020304" pitchFamily="18" charset="0"/>
+              </a:rPr>
+              <a:t>Soil N</a:t>
+            </a:r>
+            <a:endParaRPr lang="en-US" sz="3000" dirty="0">
+              <a:solidFill>
+                <a:schemeClr val="tx1"/>
+              </a:solidFill>
+              <a:latin typeface="Times New Roman" panose="02020603050405020304" pitchFamily="18" charset="0"/>
+              <a:cs typeface="Times New Roman" panose="02020603050405020304" pitchFamily="18" charset="0"/>
+            </a:endParaRPr>
+          </a:p>
+        </p:txBody>
+      </p:sp>
+      <p:sp>
+        <p:nvSpPr>
+          <p:cNvPr id="149" name="Rectangle 148">
+            <a:extLst>
+              <a:ext uri="{FF2B5EF4-FFF2-40B4-BE49-F238E27FC236}">
+                <a16:creationId xmlns:a16="http://schemas.microsoft.com/office/drawing/2014/main" id="{37E4791A-A4FE-F459-D539-AC5C8696DD32}"/>
+              </a:ext>
+            </a:extLst>
+          </p:cNvPr>
+          <p:cNvSpPr/>
+          <p:nvPr/>
+        </p:nvSpPr>
+        <p:spPr>
+          <a:xfrm>
+            <a:off x="10966373" y="7339374"/>
+            <a:ext cx="1819398" cy="877223"/>
+          </a:xfrm>
+          <a:prstGeom prst="rect">
+            <a:avLst/>
+          </a:prstGeom>
+          <a:solidFill>
+            <a:schemeClr val="bg1"/>
+          </a:solidFill>
+          <a:ln w="38100">
+            <a:solidFill>
+              <a:schemeClr val="tx1"/>
+            </a:solidFill>
+          </a:ln>
+        </p:spPr>
+        <p:style>
+          <a:lnRef idx="2">
+            <a:schemeClr val="accent1">
+              <a:shade val="50000"/>
+            </a:schemeClr>
+          </a:lnRef>
+          <a:fillRef idx="1">
+            <a:schemeClr val="accent1"/>
+          </a:fillRef>
+          <a:effectRef idx="0">
+            <a:schemeClr val="accent1"/>
+          </a:effectRef>
+          <a:fontRef idx="minor">
+            <a:schemeClr val="lt1"/>
+          </a:fontRef>
+        </p:style>
+        <p:txBody>
+          <a:bodyPr rtlCol="0" anchor="ctr"/>
+          <a:lstStyle/>
+          <a:p>
+            <a:pPr algn="ctr"/>
+            <a:r>
+              <a:rPr lang="en-US" sz="3000" i="1" dirty="0">
+                <a:solidFill>
+                  <a:schemeClr val="tx1"/>
+                </a:solidFill>
+                <a:latin typeface="Times New Roman" panose="02020603050405020304" pitchFamily="18" charset="0"/>
+                <a:cs typeface="Times New Roman" panose="02020603050405020304" pitchFamily="18" charset="0"/>
+              </a:rPr>
+              <a:t>Leaf Ci:Ca</a:t>
+            </a:r>
+          </a:p>
+        </p:txBody>
+      </p:sp>
+      <p:cxnSp>
+        <p:nvCxnSpPr>
+          <p:cNvPr id="276" name="Elbow Connector 275">
+            <a:extLst>
+              <a:ext uri="{FF2B5EF4-FFF2-40B4-BE49-F238E27FC236}">
+                <a16:creationId xmlns:a16="http://schemas.microsoft.com/office/drawing/2014/main" id="{A30ACE67-B7B9-B0CA-D90B-859AF06A0A79}"/>
+              </a:ext>
+            </a:extLst>
+          </p:cNvPr>
+          <p:cNvCxnSpPr>
+            <a:cxnSpLocks/>
+          </p:cNvCxnSpPr>
+          <p:nvPr/>
+        </p:nvCxnSpPr>
+        <p:spPr>
+          <a:xfrm flipV="1">
+            <a:off x="17354614" y="5311103"/>
+            <a:ext cx="14288" cy="5473926"/>
+          </a:xfrm>
+          <a:prstGeom prst="bentConnector3">
+            <a:avLst>
+              <a:gd name="adj1" fmla="val 6499776"/>
+            </a:avLst>
+          </a:prstGeom>
+          <a:ln w="80264">
+            <a:solidFill>
+              <a:schemeClr val="accent1">
+                <a:lumMod val="75000"/>
+              </a:schemeClr>
+            </a:solidFill>
+            <a:tailEnd type="triangle"/>
+          </a:ln>
+        </p:spPr>
+        <p:style>
+          <a:lnRef idx="1">
+            <a:schemeClr val="accent1"/>
+          </a:lnRef>
+          <a:fillRef idx="0">
+            <a:schemeClr val="accent1"/>
+          </a:fillRef>
+          <a:effectRef idx="0">
+            <a:schemeClr val="accent1"/>
+          </a:effectRef>
+          <a:fontRef idx="minor">
+            <a:schemeClr val="tx1"/>
+          </a:fontRef>
+        </p:style>
+      </p:cxnSp>
+      <p:sp>
+        <p:nvSpPr>
+          <p:cNvPr id="147" name="Rectangle 146">
+            <a:extLst>
+              <a:ext uri="{FF2B5EF4-FFF2-40B4-BE49-F238E27FC236}">
+                <a16:creationId xmlns:a16="http://schemas.microsoft.com/office/drawing/2014/main" id="{C5E78A6B-70A3-51B7-4E35-61DC0344F209}"/>
+              </a:ext>
+            </a:extLst>
+          </p:cNvPr>
+          <p:cNvSpPr/>
+          <p:nvPr/>
+        </p:nvSpPr>
+        <p:spPr>
+          <a:xfrm>
+            <a:off x="10944110" y="4599810"/>
+            <a:ext cx="1819398" cy="877223"/>
+          </a:xfrm>
+          <a:prstGeom prst="rect">
+            <a:avLst/>
+          </a:prstGeom>
+          <a:solidFill>
+            <a:schemeClr val="bg1"/>
+          </a:solidFill>
+          <a:ln w="38100">
+            <a:solidFill>
+              <a:schemeClr val="tx1"/>
+            </a:solidFill>
+          </a:ln>
+        </p:spPr>
+        <p:style>
+          <a:lnRef idx="2">
+            <a:schemeClr val="accent1">
+              <a:shade val="50000"/>
+            </a:schemeClr>
+          </a:lnRef>
+          <a:fillRef idx="1">
+            <a:schemeClr val="accent1"/>
+          </a:fillRef>
+          <a:effectRef idx="0">
+            <a:schemeClr val="accent1"/>
+          </a:effectRef>
+          <a:fontRef idx="minor">
+            <a:schemeClr val="lt1"/>
+          </a:fontRef>
+        </p:style>
+        <p:txBody>
+          <a:bodyPr rtlCol="0" anchor="ctr"/>
+          <a:lstStyle/>
+          <a:p>
+            <a:pPr algn="ctr"/>
+            <a:r>
+              <a:rPr lang="en-US" sz="3000" b="1" dirty="0">
+                <a:solidFill>
+                  <a:schemeClr val="accent1">
+                    <a:lumMod val="75000"/>
+                  </a:schemeClr>
+                </a:solidFill>
+                <a:latin typeface="Times New Roman" panose="02020603050405020304" pitchFamily="18" charset="0"/>
+                <a:cs typeface="Times New Roman" panose="02020603050405020304" pitchFamily="18" charset="0"/>
+              </a:rPr>
+              <a:t>C</a:t>
+            </a:r>
+            <a:r>
+              <a:rPr lang="en-US" sz="3000" b="1" baseline="-25000" dirty="0">
+                <a:solidFill>
+                  <a:schemeClr val="accent1">
+                    <a:lumMod val="75000"/>
+                  </a:schemeClr>
+                </a:solidFill>
+                <a:latin typeface="Times New Roman" panose="02020603050405020304" pitchFamily="18" charset="0"/>
+                <a:cs typeface="Times New Roman" panose="02020603050405020304" pitchFamily="18" charset="0"/>
+              </a:rPr>
+              <a:t>3</a:t>
+            </a:r>
+            <a:r>
+              <a:rPr lang="en-US" sz="3000" b="1" dirty="0">
+                <a:solidFill>
+                  <a:schemeClr val="tx1"/>
+                </a:solidFill>
+                <a:latin typeface="Times New Roman" panose="02020603050405020304" pitchFamily="18" charset="0"/>
+                <a:cs typeface="Times New Roman" panose="02020603050405020304" pitchFamily="18" charset="0"/>
+              </a:rPr>
+              <a:t>/</a:t>
+            </a:r>
+            <a:r>
+              <a:rPr lang="en-US" sz="3000" b="1" dirty="0">
+                <a:solidFill>
+                  <a:srgbClr val="C00000"/>
+                </a:solidFill>
+                <a:latin typeface="Times New Roman" panose="02020603050405020304" pitchFamily="18" charset="0"/>
+                <a:cs typeface="Times New Roman" panose="02020603050405020304" pitchFamily="18" charset="0"/>
+              </a:rPr>
+              <a:t>C</a:t>
+            </a:r>
+            <a:r>
+              <a:rPr lang="en-US" sz="3000" b="1" baseline="-25000" dirty="0">
+                <a:solidFill>
+                  <a:srgbClr val="C00000"/>
+                </a:solidFill>
+                <a:latin typeface="Times New Roman" panose="02020603050405020304" pitchFamily="18" charset="0"/>
+                <a:cs typeface="Times New Roman" panose="02020603050405020304" pitchFamily="18" charset="0"/>
+              </a:rPr>
+              <a:t>4</a:t>
+            </a:r>
+            <a:endParaRPr lang="en-US" sz="3000" b="1" dirty="0">
+              <a:solidFill>
+                <a:srgbClr val="C00000"/>
+              </a:solidFill>
+              <a:latin typeface="Times New Roman" panose="02020603050405020304" pitchFamily="18" charset="0"/>
+              <a:cs typeface="Times New Roman" panose="02020603050405020304" pitchFamily="18" charset="0"/>
+            </a:endParaRPr>
+          </a:p>
+        </p:txBody>
+      </p:sp>
+      <p:sp>
+        <p:nvSpPr>
+          <p:cNvPr id="150" name="Rectangle 149">
+            <a:extLst>
+              <a:ext uri="{FF2B5EF4-FFF2-40B4-BE49-F238E27FC236}">
+                <a16:creationId xmlns:a16="http://schemas.microsoft.com/office/drawing/2014/main" id="{EC6E95A2-A99B-1EAD-2343-C2D4995139F9}"/>
+              </a:ext>
+            </a:extLst>
+          </p:cNvPr>
+          <p:cNvSpPr/>
+          <p:nvPr/>
+        </p:nvSpPr>
+        <p:spPr>
+          <a:xfrm>
+            <a:off x="1847531" y="4592279"/>
+            <a:ext cx="1819398" cy="877223"/>
+          </a:xfrm>
+          <a:prstGeom prst="rect">
+            <a:avLst/>
+          </a:prstGeom>
+          <a:solidFill>
+            <a:schemeClr val="bg1"/>
+          </a:solidFill>
+          <a:ln w="38100">
+            <a:solidFill>
+              <a:schemeClr val="tx1"/>
+            </a:solidFill>
+          </a:ln>
+        </p:spPr>
+        <p:style>
+          <a:lnRef idx="2">
+            <a:schemeClr val="accent1">
+              <a:shade val="50000"/>
+            </a:schemeClr>
+          </a:lnRef>
+          <a:fillRef idx="1">
+            <a:schemeClr val="accent1"/>
+          </a:fillRef>
+          <a:effectRef idx="0">
+            <a:schemeClr val="accent1"/>
+          </a:effectRef>
+          <a:fontRef idx="minor">
+            <a:schemeClr val="lt1"/>
+          </a:fontRef>
+        </p:style>
+        <p:txBody>
+          <a:bodyPr rtlCol="0" anchor="ctr"/>
+          <a:lstStyle/>
+          <a:p>
+            <a:pPr algn="ctr"/>
+            <a:r>
+              <a:rPr lang="en-US" sz="3000" i="1" dirty="0">
+                <a:solidFill>
+                  <a:schemeClr val="tx1"/>
+                </a:solidFill>
+                <a:latin typeface="Times New Roman" panose="02020603050405020304" pitchFamily="18" charset="0"/>
+                <a:cs typeface="Times New Roman" panose="02020603050405020304" pitchFamily="18" charset="0"/>
+              </a:rPr>
+              <a:t>SM</a:t>
+            </a:r>
+            <a:r>
+              <a:rPr lang="en-US" sz="3000" baseline="-25000" dirty="0">
+                <a:solidFill>
+                  <a:schemeClr val="tx1"/>
+                </a:solidFill>
+                <a:latin typeface="Times New Roman" panose="02020603050405020304" pitchFamily="18" charset="0"/>
+                <a:cs typeface="Times New Roman" panose="02020603050405020304" pitchFamily="18" charset="0"/>
+              </a:rPr>
+              <a:t>2</a:t>
+            </a:r>
+            <a:endParaRPr lang="en-US" sz="3000" dirty="0">
+              <a:solidFill>
+                <a:schemeClr val="tx1"/>
+              </a:solidFill>
+              <a:latin typeface="Times New Roman" panose="02020603050405020304" pitchFamily="18" charset="0"/>
+              <a:cs typeface="Times New Roman" panose="02020603050405020304" pitchFamily="18" charset="0"/>
+            </a:endParaRPr>
+          </a:p>
+        </p:txBody>
+      </p:sp>
+      <p:cxnSp>
+        <p:nvCxnSpPr>
+          <p:cNvPr id="299" name="Elbow Connector 298">
+            <a:extLst>
+              <a:ext uri="{FF2B5EF4-FFF2-40B4-BE49-F238E27FC236}">
+                <a16:creationId xmlns:a16="http://schemas.microsoft.com/office/drawing/2014/main" id="{056E95C4-C923-6172-ED5A-038375542915}"/>
+              </a:ext>
+            </a:extLst>
+          </p:cNvPr>
+          <p:cNvCxnSpPr>
+            <a:stCxn id="150" idx="0"/>
+            <a:endCxn id="145" idx="0"/>
+          </p:cNvCxnSpPr>
+          <p:nvPr/>
+        </p:nvCxnSpPr>
+        <p:spPr>
+          <a:xfrm rot="5400000" flipH="1" flipV="1">
+            <a:off x="9608216" y="-2258707"/>
+            <a:ext cx="12700" cy="13701973"/>
+          </a:xfrm>
+          <a:prstGeom prst="bentConnector3">
+            <a:avLst>
+              <a:gd name="adj1" fmla="val 7312504"/>
+            </a:avLst>
+          </a:prstGeom>
+          <a:ln w="26416">
+            <a:solidFill>
+              <a:schemeClr val="accent1">
+                <a:lumMod val="75000"/>
+              </a:schemeClr>
+            </a:solidFill>
+            <a:tailEnd type="triangle"/>
+          </a:ln>
+        </p:spPr>
+        <p:style>
+          <a:lnRef idx="1">
+            <a:schemeClr val="accent1"/>
+          </a:lnRef>
+          <a:fillRef idx="0">
+            <a:schemeClr val="accent1"/>
+          </a:fillRef>
+          <a:effectRef idx="0">
+            <a:schemeClr val="accent1"/>
+          </a:effectRef>
+          <a:fontRef idx="minor">
+            <a:schemeClr val="tx1"/>
+          </a:fontRef>
+        </p:style>
+      </p:cxnSp>
+      <p:grpSp>
+        <p:nvGrpSpPr>
+          <p:cNvPr id="329" name="Group 328">
+            <a:extLst>
+              <a:ext uri="{FF2B5EF4-FFF2-40B4-BE49-F238E27FC236}">
+                <a16:creationId xmlns:a16="http://schemas.microsoft.com/office/drawing/2014/main" id="{14D39D2C-EBC1-5027-45B3-836F55B976D1}"/>
+              </a:ext>
+            </a:extLst>
+          </p:cNvPr>
+          <p:cNvGrpSpPr/>
+          <p:nvPr/>
+        </p:nvGrpSpPr>
+        <p:grpSpPr>
+          <a:xfrm>
+            <a:off x="6777233" y="12805674"/>
+            <a:ext cx="5674665" cy="1494114"/>
+            <a:chOff x="6781209" y="12978518"/>
+            <a:chExt cx="5674665" cy="1494114"/>
+          </a:xfrm>
+        </p:grpSpPr>
+        <p:cxnSp>
+          <p:nvCxnSpPr>
+            <p:cNvPr id="304" name="Straight Connector 303">
+              <a:extLst>
+                <a:ext uri="{FF2B5EF4-FFF2-40B4-BE49-F238E27FC236}">
+                  <a16:creationId xmlns:a16="http://schemas.microsoft.com/office/drawing/2014/main" id="{BCE3271A-5208-23E5-DCE3-3408CD77B59D}"/>
+                </a:ext>
+              </a:extLst>
+            </p:cNvPr>
+            <p:cNvCxnSpPr>
+              <a:cxnSpLocks/>
+            </p:cNvCxnSpPr>
+            <p:nvPr/>
+          </p:nvCxnSpPr>
+          <p:spPr>
+            <a:xfrm>
+              <a:off x="7714281" y="13016619"/>
+              <a:ext cx="951115" cy="0"/>
+            </a:xfrm>
+            <a:prstGeom prst="line">
+              <a:avLst/>
+            </a:prstGeom>
+            <a:ln w="76200">
+              <a:solidFill>
+                <a:srgbClr val="C00000"/>
+              </a:solidFill>
+            </a:ln>
+          </p:spPr>
+          <p:style>
+            <a:lnRef idx="1">
+              <a:schemeClr val="accent1"/>
+            </a:lnRef>
+            <a:fillRef idx="0">
+              <a:schemeClr val="accent1"/>
+            </a:fillRef>
+            <a:effectRef idx="0">
+              <a:schemeClr val="accent1"/>
+            </a:effectRef>
+            <a:fontRef idx="minor">
+              <a:schemeClr val="tx1"/>
+            </a:fontRef>
+          </p:style>
+        </p:cxnSp>
+        <p:cxnSp>
+          <p:nvCxnSpPr>
+            <p:cNvPr id="306" name="Straight Connector 305">
+              <a:extLst>
+                <a:ext uri="{FF2B5EF4-FFF2-40B4-BE49-F238E27FC236}">
+                  <a16:creationId xmlns:a16="http://schemas.microsoft.com/office/drawing/2014/main" id="{D1A9DA54-E777-BA6D-9268-2E5E984EB1E2}"/>
+                </a:ext>
+              </a:extLst>
+            </p:cNvPr>
+            <p:cNvCxnSpPr>
+              <a:cxnSpLocks/>
+            </p:cNvCxnSpPr>
+            <p:nvPr/>
+          </p:nvCxnSpPr>
+          <p:spPr>
+            <a:xfrm>
+              <a:off x="8657458" y="12978518"/>
+              <a:ext cx="951115" cy="0"/>
+            </a:xfrm>
+            <a:prstGeom prst="line">
+              <a:avLst/>
+            </a:prstGeom>
+            <a:ln w="152400">
+              <a:solidFill>
+                <a:srgbClr val="C00000"/>
+              </a:solidFill>
+            </a:ln>
+          </p:spPr>
+          <p:style>
+            <a:lnRef idx="1">
+              <a:schemeClr val="accent1"/>
+            </a:lnRef>
+            <a:fillRef idx="0">
+              <a:schemeClr val="accent1"/>
+            </a:fillRef>
+            <a:effectRef idx="0">
+              <a:schemeClr val="accent1"/>
+            </a:effectRef>
+            <a:fontRef idx="minor">
+              <a:schemeClr val="tx1"/>
+            </a:fontRef>
+          </p:style>
+        </p:cxnSp>
+        <p:cxnSp>
+          <p:nvCxnSpPr>
+            <p:cNvPr id="307" name="Straight Connector 306">
+              <a:extLst>
+                <a:ext uri="{FF2B5EF4-FFF2-40B4-BE49-F238E27FC236}">
+                  <a16:creationId xmlns:a16="http://schemas.microsoft.com/office/drawing/2014/main" id="{EA94A156-E109-774D-5FDF-8043EC42050A}"/>
+                </a:ext>
+              </a:extLst>
+            </p:cNvPr>
+            <p:cNvCxnSpPr>
+              <a:cxnSpLocks/>
+            </p:cNvCxnSpPr>
+            <p:nvPr/>
+          </p:nvCxnSpPr>
+          <p:spPr>
+            <a:xfrm>
+              <a:off x="6781209" y="13034082"/>
+              <a:ext cx="951115" cy="0"/>
+            </a:xfrm>
+            <a:prstGeom prst="line">
+              <a:avLst/>
+            </a:prstGeom>
+            <a:ln w="38100">
+              <a:solidFill>
+                <a:srgbClr val="C00000"/>
+              </a:solidFill>
+            </a:ln>
+          </p:spPr>
+          <p:style>
+            <a:lnRef idx="1">
+              <a:schemeClr val="accent1"/>
+            </a:lnRef>
+            <a:fillRef idx="0">
+              <a:schemeClr val="accent1"/>
+            </a:fillRef>
+            <a:effectRef idx="0">
+              <a:schemeClr val="accent1"/>
+            </a:effectRef>
+            <a:fontRef idx="minor">
+              <a:schemeClr val="tx1"/>
+            </a:fontRef>
+          </p:style>
+        </p:cxnSp>
+        <p:cxnSp>
+          <p:nvCxnSpPr>
+            <p:cNvPr id="308" name="Straight Connector 307">
+              <a:extLst>
+                <a:ext uri="{FF2B5EF4-FFF2-40B4-BE49-F238E27FC236}">
+                  <a16:creationId xmlns:a16="http://schemas.microsoft.com/office/drawing/2014/main" id="{58FCCEEE-319F-0DEB-6973-1CFE1856B2B0}"/>
+                </a:ext>
+              </a:extLst>
+            </p:cNvPr>
+            <p:cNvCxnSpPr>
+              <a:cxnSpLocks/>
+            </p:cNvCxnSpPr>
+            <p:nvPr/>
+          </p:nvCxnSpPr>
+          <p:spPr>
+            <a:xfrm>
+              <a:off x="9605398" y="12981084"/>
+              <a:ext cx="951115" cy="0"/>
+            </a:xfrm>
+            <a:prstGeom prst="line">
+              <a:avLst/>
+            </a:prstGeom>
+            <a:ln w="152400">
+              <a:solidFill>
+                <a:schemeClr val="accent1">
+                  <a:lumMod val="75000"/>
+                </a:schemeClr>
+              </a:solidFill>
+            </a:ln>
+          </p:spPr>
+          <p:style>
+            <a:lnRef idx="1">
+              <a:schemeClr val="accent1"/>
+            </a:lnRef>
+            <a:fillRef idx="0">
+              <a:schemeClr val="accent1"/>
+            </a:fillRef>
+            <a:effectRef idx="0">
+              <a:schemeClr val="accent1"/>
+            </a:effectRef>
+            <a:fontRef idx="minor">
+              <a:schemeClr val="tx1"/>
+            </a:fontRef>
+          </p:style>
+        </p:cxnSp>
+        <p:cxnSp>
+          <p:nvCxnSpPr>
+            <p:cNvPr id="309" name="Straight Connector 308">
+              <a:extLst>
+                <a:ext uri="{FF2B5EF4-FFF2-40B4-BE49-F238E27FC236}">
+                  <a16:creationId xmlns:a16="http://schemas.microsoft.com/office/drawing/2014/main" id="{01368AB0-6FEC-4E40-EF20-C123FBCFFF29}"/>
+                </a:ext>
+              </a:extLst>
+            </p:cNvPr>
+            <p:cNvCxnSpPr>
+              <a:cxnSpLocks/>
+            </p:cNvCxnSpPr>
+            <p:nvPr/>
+          </p:nvCxnSpPr>
+          <p:spPr>
+            <a:xfrm>
+              <a:off x="10553644" y="13019794"/>
+              <a:ext cx="951115" cy="0"/>
+            </a:xfrm>
+            <a:prstGeom prst="line">
+              <a:avLst/>
+            </a:prstGeom>
+            <a:ln w="76200">
+              <a:solidFill>
+                <a:schemeClr val="accent1">
+                  <a:lumMod val="75000"/>
+                </a:schemeClr>
+              </a:solidFill>
+            </a:ln>
+          </p:spPr>
+          <p:style>
+            <a:lnRef idx="1">
+              <a:schemeClr val="accent1"/>
+            </a:lnRef>
+            <a:fillRef idx="0">
+              <a:schemeClr val="accent1"/>
+            </a:fillRef>
+            <a:effectRef idx="0">
+              <a:schemeClr val="accent1"/>
+            </a:effectRef>
+            <a:fontRef idx="minor">
+              <a:schemeClr val="tx1"/>
+            </a:fontRef>
+          </p:style>
+        </p:cxnSp>
+        <p:cxnSp>
+          <p:nvCxnSpPr>
+            <p:cNvPr id="310" name="Straight Connector 309">
+              <a:extLst>
+                <a:ext uri="{FF2B5EF4-FFF2-40B4-BE49-F238E27FC236}">
+                  <a16:creationId xmlns:a16="http://schemas.microsoft.com/office/drawing/2014/main" id="{5459AFEF-BF27-F9DA-C489-E82435FED1A2}"/>
+                </a:ext>
+              </a:extLst>
+            </p:cNvPr>
+            <p:cNvCxnSpPr>
+              <a:cxnSpLocks/>
+            </p:cNvCxnSpPr>
+            <p:nvPr/>
+          </p:nvCxnSpPr>
+          <p:spPr>
+            <a:xfrm>
+              <a:off x="11504759" y="13038236"/>
+              <a:ext cx="951115" cy="0"/>
+            </a:xfrm>
+            <a:prstGeom prst="line">
+              <a:avLst/>
+            </a:prstGeom>
+            <a:ln w="38100">
+              <a:solidFill>
+                <a:schemeClr val="accent1">
+                  <a:lumMod val="75000"/>
+                </a:schemeClr>
+              </a:solidFill>
+            </a:ln>
+          </p:spPr>
+          <p:style>
+            <a:lnRef idx="1">
+              <a:schemeClr val="accent1"/>
+            </a:lnRef>
+            <a:fillRef idx="0">
+              <a:schemeClr val="accent1"/>
+            </a:fillRef>
+            <a:effectRef idx="0">
+              <a:schemeClr val="accent1"/>
+            </a:effectRef>
+            <a:fontRef idx="minor">
+              <a:schemeClr val="tx1"/>
+            </a:fontRef>
+          </p:style>
+        </p:cxnSp>
+        <p:sp>
+          <p:nvSpPr>
+            <p:cNvPr id="311" name="TextBox 310">
+              <a:extLst>
+                <a:ext uri="{FF2B5EF4-FFF2-40B4-BE49-F238E27FC236}">
+                  <a16:creationId xmlns:a16="http://schemas.microsoft.com/office/drawing/2014/main" id="{405F3348-AF82-CF3A-4B6F-13F81E3AE869}"/>
+                </a:ext>
+              </a:extLst>
+            </p:cNvPr>
+            <p:cNvSpPr txBox="1"/>
+            <p:nvPr/>
+          </p:nvSpPr>
+          <p:spPr>
+            <a:xfrm>
+              <a:off x="8737714" y="13035061"/>
+              <a:ext cx="790601" cy="553998"/>
+            </a:xfrm>
+            <a:prstGeom prst="rect">
+              <a:avLst/>
+            </a:prstGeom>
+            <a:noFill/>
+          </p:spPr>
+          <p:txBody>
+            <a:bodyPr wrap="none" rtlCol="0">
+              <a:spAutoFit/>
+            </a:bodyPr>
+            <a:lstStyle/>
+            <a:p>
+              <a:r>
+                <a:rPr lang="en-US" sz="3000" b="1" dirty="0">
+                  <a:latin typeface="Times New Roman" panose="02020603050405020304" pitchFamily="18" charset="0"/>
+                  <a:cs typeface="Times New Roman" panose="02020603050405020304" pitchFamily="18" charset="0"/>
+                </a:rPr>
+                <a:t>-0.8</a:t>
+              </a:r>
+            </a:p>
+          </p:txBody>
+        </p:sp>
+        <p:sp>
+          <p:nvSpPr>
+            <p:cNvPr id="312" name="TextBox 311">
+              <a:extLst>
+                <a:ext uri="{FF2B5EF4-FFF2-40B4-BE49-F238E27FC236}">
+                  <a16:creationId xmlns:a16="http://schemas.microsoft.com/office/drawing/2014/main" id="{03905A61-A4AE-A9C3-7600-29CDFA24E9CE}"/>
+                </a:ext>
+              </a:extLst>
+            </p:cNvPr>
+            <p:cNvSpPr txBox="1"/>
+            <p:nvPr/>
+          </p:nvSpPr>
+          <p:spPr>
+            <a:xfrm>
+              <a:off x="9744164" y="13042103"/>
+              <a:ext cx="673582" cy="553998"/>
+            </a:xfrm>
+            <a:prstGeom prst="rect">
+              <a:avLst/>
+            </a:prstGeom>
+            <a:noFill/>
+          </p:spPr>
+          <p:txBody>
+            <a:bodyPr wrap="none" rtlCol="0">
+              <a:spAutoFit/>
+            </a:bodyPr>
+            <a:lstStyle/>
+            <a:p>
+              <a:r>
+                <a:rPr lang="en-US" sz="3000" b="1" dirty="0">
+                  <a:latin typeface="Times New Roman" panose="02020603050405020304" pitchFamily="18" charset="0"/>
+                  <a:cs typeface="Times New Roman" panose="02020603050405020304" pitchFamily="18" charset="0"/>
+                </a:rPr>
+                <a:t>0.8</a:t>
+              </a:r>
+            </a:p>
+          </p:txBody>
+        </p:sp>
+        <p:sp>
+          <p:nvSpPr>
+            <p:cNvPr id="313" name="TextBox 312">
+              <a:extLst>
+                <a:ext uri="{FF2B5EF4-FFF2-40B4-BE49-F238E27FC236}">
+                  <a16:creationId xmlns:a16="http://schemas.microsoft.com/office/drawing/2014/main" id="{A5185E2D-DB4F-1D37-75C3-0550DED89ED4}"/>
+                </a:ext>
+              </a:extLst>
+            </p:cNvPr>
+            <p:cNvSpPr txBox="1"/>
+            <p:nvPr/>
+          </p:nvSpPr>
+          <p:spPr>
+            <a:xfrm>
+              <a:off x="7794537" y="13042103"/>
+              <a:ext cx="790601" cy="553998"/>
+            </a:xfrm>
+            <a:prstGeom prst="rect">
+              <a:avLst/>
+            </a:prstGeom>
+            <a:noFill/>
+          </p:spPr>
+          <p:txBody>
+            <a:bodyPr wrap="none" rtlCol="0">
+              <a:spAutoFit/>
+            </a:bodyPr>
+            <a:lstStyle/>
+            <a:p>
+              <a:r>
+                <a:rPr lang="en-US" sz="3000" b="1" dirty="0">
+                  <a:latin typeface="Times New Roman" panose="02020603050405020304" pitchFamily="18" charset="0"/>
+                  <a:cs typeface="Times New Roman" panose="02020603050405020304" pitchFamily="18" charset="0"/>
+                </a:rPr>
+                <a:t>-0.4</a:t>
+              </a:r>
+            </a:p>
+          </p:txBody>
+        </p:sp>
+        <p:sp>
+          <p:nvSpPr>
+            <p:cNvPr id="314" name="TextBox 313">
+              <a:extLst>
+                <a:ext uri="{FF2B5EF4-FFF2-40B4-BE49-F238E27FC236}">
+                  <a16:creationId xmlns:a16="http://schemas.microsoft.com/office/drawing/2014/main" id="{336C6BA1-652E-4332-3874-0C406AC32821}"/>
+                </a:ext>
+              </a:extLst>
+            </p:cNvPr>
+            <p:cNvSpPr txBox="1"/>
+            <p:nvPr/>
+          </p:nvSpPr>
+          <p:spPr>
+            <a:xfrm>
+              <a:off x="10687341" y="13045556"/>
+              <a:ext cx="673582" cy="553998"/>
+            </a:xfrm>
+            <a:prstGeom prst="rect">
+              <a:avLst/>
+            </a:prstGeom>
+            <a:noFill/>
+          </p:spPr>
+          <p:txBody>
+            <a:bodyPr wrap="none" rtlCol="0">
+              <a:spAutoFit/>
+            </a:bodyPr>
+            <a:lstStyle/>
+            <a:p>
+              <a:r>
+                <a:rPr lang="en-US" sz="3000" b="1" dirty="0">
+                  <a:latin typeface="Times New Roman" panose="02020603050405020304" pitchFamily="18" charset="0"/>
+                  <a:cs typeface="Times New Roman" panose="02020603050405020304" pitchFamily="18" charset="0"/>
+                </a:rPr>
+                <a:t>0.4</a:t>
+              </a:r>
+            </a:p>
+          </p:txBody>
+        </p:sp>
+        <p:sp>
+          <p:nvSpPr>
+            <p:cNvPr id="315" name="TextBox 314">
+              <a:extLst>
+                <a:ext uri="{FF2B5EF4-FFF2-40B4-BE49-F238E27FC236}">
+                  <a16:creationId xmlns:a16="http://schemas.microsoft.com/office/drawing/2014/main" id="{0A735BE5-8F12-20AC-B7DA-99178782D0A5}"/>
+                </a:ext>
+              </a:extLst>
+            </p:cNvPr>
+            <p:cNvSpPr txBox="1"/>
+            <p:nvPr/>
+          </p:nvSpPr>
+          <p:spPr>
+            <a:xfrm>
+              <a:off x="11643525" y="13027732"/>
+              <a:ext cx="673582" cy="553998"/>
+            </a:xfrm>
+            <a:prstGeom prst="rect">
+              <a:avLst/>
+            </a:prstGeom>
+            <a:noFill/>
+          </p:spPr>
+          <p:txBody>
+            <a:bodyPr wrap="none" rtlCol="0">
+              <a:spAutoFit/>
+            </a:bodyPr>
+            <a:lstStyle/>
+            <a:p>
+              <a:r>
+                <a:rPr lang="en-US" sz="3000" b="1" dirty="0">
+                  <a:latin typeface="Times New Roman" panose="02020603050405020304" pitchFamily="18" charset="0"/>
+                  <a:cs typeface="Times New Roman" panose="02020603050405020304" pitchFamily="18" charset="0"/>
+                </a:rPr>
+                <a:t>0.2</a:t>
+              </a:r>
+            </a:p>
+          </p:txBody>
+        </p:sp>
+        <p:sp>
+          <p:nvSpPr>
+            <p:cNvPr id="317" name="TextBox 316">
+              <a:extLst>
+                <a:ext uri="{FF2B5EF4-FFF2-40B4-BE49-F238E27FC236}">
+                  <a16:creationId xmlns:a16="http://schemas.microsoft.com/office/drawing/2014/main" id="{E5B0E893-4292-A9DA-E31F-4F434D6BA189}"/>
+                </a:ext>
+              </a:extLst>
+            </p:cNvPr>
+            <p:cNvSpPr txBox="1"/>
+            <p:nvPr/>
+          </p:nvSpPr>
+          <p:spPr>
+            <a:xfrm>
+              <a:off x="6897777" y="13047157"/>
+              <a:ext cx="790601" cy="553998"/>
+            </a:xfrm>
+            <a:prstGeom prst="rect">
+              <a:avLst/>
+            </a:prstGeom>
+            <a:noFill/>
+          </p:spPr>
+          <p:txBody>
+            <a:bodyPr wrap="none" rtlCol="0">
+              <a:spAutoFit/>
+            </a:bodyPr>
+            <a:lstStyle/>
+            <a:p>
+              <a:r>
+                <a:rPr lang="en-US" sz="3000" b="1" dirty="0">
+                  <a:latin typeface="Times New Roman" panose="02020603050405020304" pitchFamily="18" charset="0"/>
+                  <a:cs typeface="Times New Roman" panose="02020603050405020304" pitchFamily="18" charset="0"/>
+                </a:rPr>
+                <a:t>-0.2</a:t>
+              </a:r>
+            </a:p>
+          </p:txBody>
+        </p:sp>
+        <p:sp>
+          <p:nvSpPr>
+            <p:cNvPr id="318" name="TextBox 317">
+              <a:extLst>
+                <a:ext uri="{FF2B5EF4-FFF2-40B4-BE49-F238E27FC236}">
+                  <a16:creationId xmlns:a16="http://schemas.microsoft.com/office/drawing/2014/main" id="{381CB219-7134-E7DD-E806-9373BDC6B8E3}"/>
+                </a:ext>
+              </a:extLst>
+            </p:cNvPr>
+            <p:cNvSpPr txBox="1"/>
+            <p:nvPr/>
+          </p:nvSpPr>
+          <p:spPr>
+            <a:xfrm>
+              <a:off x="7466030" y="13918634"/>
+              <a:ext cx="4278735" cy="553998"/>
+            </a:xfrm>
+            <a:prstGeom prst="rect">
+              <a:avLst/>
+            </a:prstGeom>
+            <a:noFill/>
+          </p:spPr>
+          <p:txBody>
+            <a:bodyPr wrap="none" rtlCol="0">
+              <a:spAutoFit/>
+            </a:bodyPr>
+            <a:lstStyle/>
+            <a:p>
+              <a:r>
+                <a:rPr lang="en-US" sz="3000" b="1" dirty="0">
+                  <a:latin typeface="Times New Roman" panose="02020603050405020304" pitchFamily="18" charset="0"/>
+                  <a:cs typeface="Times New Roman" panose="02020603050405020304" pitchFamily="18" charset="0"/>
+                </a:rPr>
+                <a:t>Standardized Coefficient</a:t>
+              </a:r>
+            </a:p>
+          </p:txBody>
+        </p:sp>
+      </p:grpSp>
+      <p:cxnSp>
+        <p:nvCxnSpPr>
+          <p:cNvPr id="322" name="Elbow Connector 321">
+            <a:extLst>
+              <a:ext uri="{FF2B5EF4-FFF2-40B4-BE49-F238E27FC236}">
+                <a16:creationId xmlns:a16="http://schemas.microsoft.com/office/drawing/2014/main" id="{439C9AB0-1DA9-E50D-981B-3798293AD17D}"/>
+              </a:ext>
+            </a:extLst>
+          </p:cNvPr>
+          <p:cNvCxnSpPr>
+            <a:cxnSpLocks/>
+            <a:stCxn id="152" idx="0"/>
+          </p:cNvCxnSpPr>
+          <p:nvPr/>
+        </p:nvCxnSpPr>
+        <p:spPr>
+          <a:xfrm rot="16200000" flipV="1">
+            <a:off x="17357141" y="4806682"/>
+            <a:ext cx="2308481" cy="2284957"/>
+          </a:xfrm>
+          <a:prstGeom prst="bentConnector2">
+            <a:avLst/>
+          </a:prstGeom>
+          <a:ln w="50292">
+            <a:solidFill>
+              <a:schemeClr val="accent1">
+                <a:lumMod val="75000"/>
+              </a:schemeClr>
+            </a:solidFill>
+            <a:tailEnd type="triangle"/>
+          </a:ln>
+        </p:spPr>
+        <p:style>
+          <a:lnRef idx="1">
+            <a:schemeClr val="accent1"/>
+          </a:lnRef>
+          <a:fillRef idx="0">
+            <a:schemeClr val="accent1"/>
+          </a:fillRef>
+          <a:effectRef idx="0">
+            <a:schemeClr val="accent1"/>
+          </a:effectRef>
+          <a:fontRef idx="minor">
+            <a:schemeClr val="tx1"/>
+          </a:fontRef>
+        </p:style>
+      </p:cxnSp>
+    </p:spTree>
+    <p:extLst>
+      <p:ext uri="{BB962C8B-B14F-4D97-AF65-F5344CB8AC3E}">
+        <p14:creationId xmlns:p14="http://schemas.microsoft.com/office/powerpoint/2010/main" val="14914278"/>
+      </p:ext>
+    </p:extLst>
+  </p:cSld>
+  <p:clrMapOvr>
+    <a:masterClrMapping/>
+  </p:clrMapOvr>
+</p:sld>
+</file>
+
+<file path=ppt/slides/slide4.xml><?xml version="1.0" encoding="utf-8"?>
+<p:sld xmlns:a="http://schemas.openxmlformats.org/drawingml/2006/main" xmlns:r="http://schemas.openxmlformats.org/officeDocument/2006/relationships" xmlns:p="http://schemas.openxmlformats.org/presentationml/2006/main">
+  <p:cSld>
+    <p:spTree>
+      <p:nvGrpSpPr>
+        <p:cNvPr id="1" name=""/>
+        <p:cNvGrpSpPr/>
+        <p:nvPr/>
+      </p:nvGrpSpPr>
+      <p:grpSpPr>
+        <a:xfrm>
+          <a:off x="0" y="0"/>
+          <a:ext cx="0" cy="0"/>
+          <a:chOff x="0" y="0"/>
+          <a:chExt cx="0" cy="0"/>
+        </a:xfrm>
+      </p:grpSpPr>
+      <p:sp>
+        <p:nvSpPr>
+          <p:cNvPr id="143" name="Rectangle 142">
+            <a:extLst>
+              <a:ext uri="{FF2B5EF4-FFF2-40B4-BE49-F238E27FC236}">
+                <a16:creationId xmlns:a16="http://schemas.microsoft.com/office/drawing/2014/main" id="{23213933-7EA2-A749-1F7B-2F2186FA569E}"/>
+              </a:ext>
+            </a:extLst>
+          </p:cNvPr>
+          <p:cNvSpPr/>
+          <p:nvPr/>
+        </p:nvSpPr>
+        <p:spPr>
+          <a:xfrm>
+            <a:off x="15530050" y="7325461"/>
+            <a:ext cx="1819398" cy="877223"/>
+          </a:xfrm>
+          <a:prstGeom prst="rect">
+            <a:avLst/>
+          </a:prstGeom>
+          <a:solidFill>
+            <a:schemeClr val="bg1"/>
+          </a:solidFill>
+          <a:ln w="38100">
+            <a:solidFill>
+              <a:schemeClr val="tx1"/>
+            </a:solidFill>
+          </a:ln>
+        </p:spPr>
+        <p:style>
+          <a:lnRef idx="2">
+            <a:schemeClr val="accent1">
+              <a:shade val="50000"/>
+            </a:schemeClr>
+          </a:lnRef>
+          <a:fillRef idx="1">
+            <a:schemeClr val="accent1"/>
+          </a:fillRef>
+          <a:effectRef idx="0">
+            <a:schemeClr val="accent1"/>
+          </a:effectRef>
+          <a:fontRef idx="minor">
+            <a:schemeClr val="lt1"/>
+          </a:fontRef>
+        </p:style>
+        <p:txBody>
+          <a:bodyPr rtlCol="0" anchor="ctr"/>
+          <a:lstStyle/>
+          <a:p>
+            <a:pPr algn="ctr"/>
+            <a:r>
+              <a:rPr lang="el-GR" sz="3000" i="1" dirty="0">
+                <a:solidFill>
+                  <a:schemeClr val="tx1"/>
+                </a:solidFill>
+                <a:latin typeface="Times New Roman" panose="02020603050405020304" pitchFamily="18" charset="0"/>
+                <a:cs typeface="Times New Roman" panose="02020603050405020304" pitchFamily="18" charset="0"/>
+              </a:rPr>
+              <a:t>Ν</a:t>
+            </a:r>
+            <a:r>
+              <a:rPr lang="en-US" sz="3000" baseline="-25000" dirty="0">
+                <a:solidFill>
+                  <a:schemeClr val="tx1"/>
+                </a:solidFill>
+                <a:latin typeface="Times New Roman" panose="02020603050405020304" pitchFamily="18" charset="0"/>
+                <a:cs typeface="Times New Roman" panose="02020603050405020304" pitchFamily="18" charset="0"/>
+              </a:rPr>
+              <a:t>area</a:t>
+            </a:r>
+            <a:endParaRPr lang="en-US" sz="3000" i="1" dirty="0">
+              <a:solidFill>
+                <a:schemeClr val="tx1"/>
+              </a:solidFill>
+              <a:latin typeface="Times New Roman" panose="02020603050405020304" pitchFamily="18" charset="0"/>
+              <a:cs typeface="Times New Roman" panose="02020603050405020304" pitchFamily="18" charset="0"/>
+            </a:endParaRPr>
+          </a:p>
+        </p:txBody>
+      </p:sp>
+      <p:sp>
+        <p:nvSpPr>
+          <p:cNvPr id="148" name="Rectangle 147">
+            <a:extLst>
+              <a:ext uri="{FF2B5EF4-FFF2-40B4-BE49-F238E27FC236}">
+                <a16:creationId xmlns:a16="http://schemas.microsoft.com/office/drawing/2014/main" id="{CAEEF86E-BF80-675F-3FA2-55D6B97D4497}"/>
+              </a:ext>
+            </a:extLst>
+          </p:cNvPr>
+          <p:cNvSpPr/>
+          <p:nvPr/>
+        </p:nvSpPr>
+        <p:spPr>
+          <a:xfrm>
+            <a:off x="6415678" y="7339372"/>
+            <a:ext cx="1819398" cy="877223"/>
+          </a:xfrm>
+          <a:prstGeom prst="rect">
+            <a:avLst/>
+          </a:prstGeom>
+          <a:solidFill>
+            <a:schemeClr val="bg1"/>
+          </a:solidFill>
+          <a:ln w="38100">
+            <a:solidFill>
+              <a:schemeClr val="tx1"/>
+            </a:solidFill>
+          </a:ln>
+        </p:spPr>
+        <p:style>
+          <a:lnRef idx="2">
+            <a:schemeClr val="accent1">
+              <a:shade val="50000"/>
+            </a:schemeClr>
+          </a:lnRef>
+          <a:fillRef idx="1">
+            <a:schemeClr val="accent1"/>
+          </a:fillRef>
+          <a:effectRef idx="0">
+            <a:schemeClr val="accent1"/>
+          </a:effectRef>
+          <a:fontRef idx="minor">
+            <a:schemeClr val="lt1"/>
+          </a:fontRef>
+        </p:style>
+        <p:txBody>
+          <a:bodyPr rtlCol="0" anchor="ctr"/>
+          <a:lstStyle/>
+          <a:p>
+            <a:pPr algn="ctr"/>
+            <a:r>
+              <a:rPr lang="el-GR" sz="3000" i="1" dirty="0">
+                <a:solidFill>
+                  <a:schemeClr val="tx1"/>
+                </a:solidFill>
+                <a:latin typeface="Times New Roman" panose="02020603050405020304" pitchFamily="18" charset="0"/>
+                <a:cs typeface="Times New Roman" panose="02020603050405020304" pitchFamily="18" charset="0"/>
+              </a:rPr>
+              <a:t>β</a:t>
+            </a:r>
+            <a:endParaRPr lang="en-US" sz="3000" i="1" dirty="0">
+              <a:solidFill>
+                <a:schemeClr val="tx1"/>
+              </a:solidFill>
+              <a:latin typeface="Times New Roman" panose="02020603050405020304" pitchFamily="18" charset="0"/>
+              <a:cs typeface="Times New Roman" panose="02020603050405020304" pitchFamily="18" charset="0"/>
+            </a:endParaRPr>
+          </a:p>
+        </p:txBody>
+      </p:sp>
+      <p:sp>
+        <p:nvSpPr>
+          <p:cNvPr id="150" name="Rectangle 149">
+            <a:extLst>
+              <a:ext uri="{FF2B5EF4-FFF2-40B4-BE49-F238E27FC236}">
+                <a16:creationId xmlns:a16="http://schemas.microsoft.com/office/drawing/2014/main" id="{EC6E95A2-A99B-1EAD-2343-C2D4995139F9}"/>
+              </a:ext>
+            </a:extLst>
+          </p:cNvPr>
+          <p:cNvSpPr/>
+          <p:nvPr/>
+        </p:nvSpPr>
+        <p:spPr>
+          <a:xfrm>
+            <a:off x="1847531" y="4592279"/>
+            <a:ext cx="1819398" cy="877223"/>
+          </a:xfrm>
+          <a:prstGeom prst="rect">
+            <a:avLst/>
+          </a:prstGeom>
+          <a:solidFill>
+            <a:schemeClr val="bg1"/>
+          </a:solidFill>
+          <a:ln w="38100">
+            <a:solidFill>
+              <a:schemeClr val="tx1"/>
+            </a:solidFill>
+          </a:ln>
+        </p:spPr>
+        <p:style>
+          <a:lnRef idx="2">
+            <a:schemeClr val="accent1">
+              <a:shade val="50000"/>
+            </a:schemeClr>
+          </a:lnRef>
+          <a:fillRef idx="1">
+            <a:schemeClr val="accent1"/>
+          </a:fillRef>
+          <a:effectRef idx="0">
+            <a:schemeClr val="accent1"/>
+          </a:effectRef>
+          <a:fontRef idx="minor">
+            <a:schemeClr val="lt1"/>
+          </a:fontRef>
+        </p:style>
+        <p:txBody>
+          <a:bodyPr rtlCol="0" anchor="ctr"/>
+          <a:lstStyle/>
+          <a:p>
+            <a:pPr algn="ctr"/>
+            <a:r>
+              <a:rPr lang="en-US" sz="3000" i="1" dirty="0">
+                <a:solidFill>
+                  <a:schemeClr val="tx1"/>
+                </a:solidFill>
+                <a:latin typeface="Times New Roman" panose="02020603050405020304" pitchFamily="18" charset="0"/>
+                <a:cs typeface="Times New Roman" panose="02020603050405020304" pitchFamily="18" charset="0"/>
+              </a:rPr>
+              <a:t>SM</a:t>
+            </a:r>
+            <a:r>
+              <a:rPr lang="en-US" sz="3000" baseline="-25000" dirty="0">
+                <a:solidFill>
+                  <a:schemeClr val="tx1"/>
+                </a:solidFill>
+                <a:latin typeface="Times New Roman" panose="02020603050405020304" pitchFamily="18" charset="0"/>
+                <a:cs typeface="Times New Roman" panose="02020603050405020304" pitchFamily="18" charset="0"/>
+              </a:rPr>
+              <a:t>3</a:t>
+            </a:r>
+            <a:endParaRPr lang="en-US" sz="3000" dirty="0">
+              <a:solidFill>
+                <a:schemeClr val="tx1"/>
+              </a:solidFill>
+              <a:latin typeface="Times New Roman" panose="02020603050405020304" pitchFamily="18" charset="0"/>
+              <a:cs typeface="Times New Roman" panose="02020603050405020304" pitchFamily="18" charset="0"/>
+            </a:endParaRPr>
+          </a:p>
+        </p:txBody>
+      </p:sp>
+      <p:cxnSp>
+        <p:nvCxnSpPr>
+          <p:cNvPr id="154" name="Straight Arrow Connector 153">
+            <a:extLst>
+              <a:ext uri="{FF2B5EF4-FFF2-40B4-BE49-F238E27FC236}">
+                <a16:creationId xmlns:a16="http://schemas.microsoft.com/office/drawing/2014/main" id="{706FE09F-1166-D3EA-09AE-6462ACA90433}"/>
+              </a:ext>
+            </a:extLst>
+          </p:cNvPr>
+          <p:cNvCxnSpPr>
+            <a:stCxn id="151" idx="1"/>
+            <a:endCxn id="150" idx="3"/>
+          </p:cNvCxnSpPr>
+          <p:nvPr/>
+        </p:nvCxnSpPr>
+        <p:spPr>
+          <a:xfrm flipH="1" flipV="1">
+            <a:off x="3666929" y="5030891"/>
+            <a:ext cx="2707333" cy="7531"/>
+          </a:xfrm>
+          <a:prstGeom prst="straightConnector1">
+            <a:avLst/>
+          </a:prstGeom>
+          <a:ln w="152400">
+            <a:solidFill>
+              <a:srgbClr val="C00000"/>
+            </a:solidFill>
+            <a:tailEnd type="triangle"/>
+          </a:ln>
+        </p:spPr>
+        <p:style>
+          <a:lnRef idx="1">
+            <a:schemeClr val="accent1"/>
+          </a:lnRef>
+          <a:fillRef idx="0">
+            <a:schemeClr val="accent1"/>
+          </a:fillRef>
+          <a:effectRef idx="0">
+            <a:schemeClr val="accent1"/>
+          </a:effectRef>
+          <a:fontRef idx="minor">
+            <a:schemeClr val="tx1"/>
+          </a:fontRef>
+        </p:style>
+      </p:cxnSp>
+      <p:cxnSp>
+        <p:nvCxnSpPr>
+          <p:cNvPr id="155" name="Straight Arrow Connector 154">
+            <a:extLst>
+              <a:ext uri="{FF2B5EF4-FFF2-40B4-BE49-F238E27FC236}">
+                <a16:creationId xmlns:a16="http://schemas.microsoft.com/office/drawing/2014/main" id="{E3174060-880C-85BE-973E-5A3CB9A219CC}"/>
+              </a:ext>
+            </a:extLst>
+          </p:cNvPr>
+          <p:cNvCxnSpPr>
+            <a:cxnSpLocks/>
+            <a:stCxn id="150" idx="2"/>
+            <a:endCxn id="144" idx="0"/>
+          </p:cNvCxnSpPr>
+          <p:nvPr/>
+        </p:nvCxnSpPr>
+        <p:spPr>
+          <a:xfrm>
+            <a:off x="2757230" y="5469502"/>
+            <a:ext cx="0" cy="4596703"/>
+          </a:xfrm>
+          <a:prstGeom prst="straightConnector1">
+            <a:avLst/>
+          </a:prstGeom>
+          <a:ln w="152400">
+            <a:solidFill>
+              <a:schemeClr val="accent1">
+                <a:lumMod val="75000"/>
+              </a:schemeClr>
+            </a:solidFill>
+            <a:tailEnd type="triangle"/>
+          </a:ln>
+        </p:spPr>
+        <p:style>
+          <a:lnRef idx="1">
+            <a:schemeClr val="accent1"/>
+          </a:lnRef>
+          <a:fillRef idx="0">
+            <a:schemeClr val="accent1"/>
+          </a:fillRef>
+          <a:effectRef idx="0">
+            <a:schemeClr val="accent1"/>
+          </a:effectRef>
+          <a:fontRef idx="minor">
+            <a:schemeClr val="tx1"/>
+          </a:fontRef>
+        </p:style>
+      </p:cxnSp>
+      <p:cxnSp>
+        <p:nvCxnSpPr>
+          <p:cNvPr id="159" name="Straight Arrow Connector 158">
+            <a:extLst>
+              <a:ext uri="{FF2B5EF4-FFF2-40B4-BE49-F238E27FC236}">
+                <a16:creationId xmlns:a16="http://schemas.microsoft.com/office/drawing/2014/main" id="{390A7192-0F6D-E061-2173-EF54A80A8533}"/>
+              </a:ext>
+            </a:extLst>
+          </p:cNvPr>
+          <p:cNvCxnSpPr>
+            <a:cxnSpLocks/>
+          </p:cNvCxnSpPr>
+          <p:nvPr/>
+        </p:nvCxnSpPr>
+        <p:spPr>
+          <a:xfrm flipH="1">
+            <a:off x="8149934" y="4926986"/>
+            <a:ext cx="2956155" cy="2398475"/>
+          </a:xfrm>
+          <a:prstGeom prst="straightConnector1">
+            <a:avLst/>
+          </a:prstGeom>
+          <a:ln w="152400">
+            <a:solidFill>
+              <a:schemeClr val="accent1">
+                <a:lumMod val="75000"/>
+              </a:schemeClr>
+            </a:solidFill>
+            <a:tailEnd type="triangle"/>
+          </a:ln>
+        </p:spPr>
+        <p:style>
+          <a:lnRef idx="1">
+            <a:schemeClr val="accent1"/>
+          </a:lnRef>
+          <a:fillRef idx="0">
+            <a:schemeClr val="accent1"/>
+          </a:fillRef>
+          <a:effectRef idx="0">
+            <a:schemeClr val="accent1"/>
+          </a:effectRef>
+          <a:fontRef idx="minor">
+            <a:schemeClr val="tx1"/>
+          </a:fontRef>
+        </p:style>
+      </p:cxnSp>
+      <p:cxnSp>
+        <p:nvCxnSpPr>
+          <p:cNvPr id="162" name="Straight Arrow Connector 161">
+            <a:extLst>
+              <a:ext uri="{FF2B5EF4-FFF2-40B4-BE49-F238E27FC236}">
+                <a16:creationId xmlns:a16="http://schemas.microsoft.com/office/drawing/2014/main" id="{71E57B4B-E988-43AE-3D45-43FD109A5FB7}"/>
+              </a:ext>
+            </a:extLst>
+          </p:cNvPr>
+          <p:cNvCxnSpPr>
+            <a:cxnSpLocks/>
+            <a:endCxn id="148" idx="1"/>
+          </p:cNvCxnSpPr>
+          <p:nvPr/>
+        </p:nvCxnSpPr>
+        <p:spPr>
+          <a:xfrm flipV="1">
+            <a:off x="3500438" y="7777984"/>
+            <a:ext cx="2915240" cy="2899565"/>
+          </a:xfrm>
+          <a:prstGeom prst="straightConnector1">
+            <a:avLst/>
+          </a:prstGeom>
+          <a:ln w="152400">
+            <a:solidFill>
+              <a:srgbClr val="C00000"/>
+            </a:solidFill>
+            <a:tailEnd type="triangle"/>
+          </a:ln>
+        </p:spPr>
+        <p:style>
+          <a:lnRef idx="1">
+            <a:schemeClr val="accent1"/>
+          </a:lnRef>
+          <a:fillRef idx="0">
+            <a:schemeClr val="accent1"/>
+          </a:fillRef>
+          <a:effectRef idx="0">
+            <a:schemeClr val="accent1"/>
+          </a:effectRef>
+          <a:fontRef idx="minor">
+            <a:schemeClr val="tx1"/>
+          </a:fontRef>
+        </p:style>
+      </p:cxnSp>
+      <p:sp>
+        <p:nvSpPr>
+          <p:cNvPr id="144" name="Rectangle 143">
+            <a:extLst>
+              <a:ext uri="{FF2B5EF4-FFF2-40B4-BE49-F238E27FC236}">
+                <a16:creationId xmlns:a16="http://schemas.microsoft.com/office/drawing/2014/main" id="{A78B38F8-81B3-D1FA-0AD1-5773256590EC}"/>
+              </a:ext>
+            </a:extLst>
+          </p:cNvPr>
+          <p:cNvSpPr/>
+          <p:nvPr/>
+        </p:nvSpPr>
+        <p:spPr>
+          <a:xfrm>
+            <a:off x="1847531" y="10066205"/>
+            <a:ext cx="1819398" cy="877223"/>
+          </a:xfrm>
+          <a:prstGeom prst="rect">
+            <a:avLst/>
+          </a:prstGeom>
+          <a:solidFill>
+            <a:schemeClr val="bg1"/>
+          </a:solidFill>
+          <a:ln w="38100">
+            <a:solidFill>
+              <a:schemeClr val="tx1"/>
+            </a:solidFill>
+          </a:ln>
+        </p:spPr>
+        <p:style>
+          <a:lnRef idx="2">
+            <a:schemeClr val="accent1">
+              <a:shade val="50000"/>
+            </a:schemeClr>
+          </a:lnRef>
+          <a:fillRef idx="1">
+            <a:schemeClr val="accent1"/>
+          </a:fillRef>
+          <a:effectRef idx="0">
+            <a:schemeClr val="accent1"/>
+          </a:effectRef>
+          <a:fontRef idx="minor">
+            <a:schemeClr val="lt1"/>
+          </a:fontRef>
+        </p:style>
+        <p:txBody>
+          <a:bodyPr rtlCol="0" anchor="ctr"/>
+          <a:lstStyle/>
+          <a:p>
+            <a:pPr algn="ctr"/>
+            <a:r>
+              <a:rPr lang="en-US" sz="3000" i="1" dirty="0">
+                <a:solidFill>
+                  <a:schemeClr val="tx1"/>
+                </a:solidFill>
+                <a:latin typeface="Times New Roman" panose="02020603050405020304" pitchFamily="18" charset="0"/>
+                <a:cs typeface="Times New Roman" panose="02020603050405020304" pitchFamily="18" charset="0"/>
+              </a:rPr>
+              <a:t>Soil N</a:t>
+            </a:r>
+            <a:endParaRPr lang="en-US" sz="3000" dirty="0">
+              <a:solidFill>
+                <a:schemeClr val="tx1"/>
+              </a:solidFill>
+              <a:latin typeface="Times New Roman" panose="02020603050405020304" pitchFamily="18" charset="0"/>
+              <a:cs typeface="Times New Roman" panose="02020603050405020304" pitchFamily="18" charset="0"/>
+            </a:endParaRPr>
+          </a:p>
+        </p:txBody>
+      </p:sp>
+      <p:cxnSp>
+        <p:nvCxnSpPr>
+          <p:cNvPr id="165" name="Straight Arrow Connector 164">
+            <a:extLst>
+              <a:ext uri="{FF2B5EF4-FFF2-40B4-BE49-F238E27FC236}">
+                <a16:creationId xmlns:a16="http://schemas.microsoft.com/office/drawing/2014/main" id="{04CC1E2A-0496-1BB7-936C-437D17351894}"/>
+              </a:ext>
+            </a:extLst>
+          </p:cNvPr>
+          <p:cNvCxnSpPr>
+            <a:stCxn id="148" idx="3"/>
+            <a:endCxn id="149" idx="1"/>
+          </p:cNvCxnSpPr>
+          <p:nvPr/>
+        </p:nvCxnSpPr>
+        <p:spPr>
+          <a:xfrm>
+            <a:off x="8235076" y="7777984"/>
+            <a:ext cx="2731297" cy="2"/>
+          </a:xfrm>
+          <a:prstGeom prst="straightConnector1">
+            <a:avLst/>
+          </a:prstGeom>
+          <a:ln w="152400">
+            <a:solidFill>
+              <a:schemeClr val="accent1">
+                <a:lumMod val="75000"/>
+              </a:schemeClr>
+            </a:solidFill>
+            <a:tailEnd type="triangle"/>
+          </a:ln>
+        </p:spPr>
+        <p:style>
+          <a:lnRef idx="1">
+            <a:schemeClr val="accent1"/>
+          </a:lnRef>
+          <a:fillRef idx="0">
+            <a:schemeClr val="accent1"/>
+          </a:fillRef>
+          <a:effectRef idx="0">
+            <a:schemeClr val="accent1"/>
+          </a:effectRef>
+          <a:fontRef idx="minor">
+            <a:schemeClr val="tx1"/>
+          </a:fontRef>
+        </p:style>
+      </p:cxnSp>
+      <p:cxnSp>
+        <p:nvCxnSpPr>
+          <p:cNvPr id="174" name="Straight Arrow Connector 173">
+            <a:extLst>
+              <a:ext uri="{FF2B5EF4-FFF2-40B4-BE49-F238E27FC236}">
+                <a16:creationId xmlns:a16="http://schemas.microsoft.com/office/drawing/2014/main" id="{10084160-D7B3-7E90-B5E9-8786D36CA910}"/>
+              </a:ext>
+            </a:extLst>
+          </p:cNvPr>
+          <p:cNvCxnSpPr>
+            <a:cxnSpLocks/>
+            <a:stCxn id="149" idx="3"/>
+          </p:cNvCxnSpPr>
+          <p:nvPr/>
+        </p:nvCxnSpPr>
+        <p:spPr>
+          <a:xfrm flipV="1">
+            <a:off x="12785771" y="7757722"/>
+            <a:ext cx="2788449" cy="20264"/>
+          </a:xfrm>
+          <a:prstGeom prst="straightConnector1">
+            <a:avLst/>
+          </a:prstGeom>
+          <a:ln w="152400">
+            <a:solidFill>
+              <a:srgbClr val="C00000"/>
+            </a:solidFill>
+            <a:tailEnd type="triangle"/>
+          </a:ln>
+        </p:spPr>
+        <p:style>
+          <a:lnRef idx="1">
+            <a:schemeClr val="accent1"/>
+          </a:lnRef>
+          <a:fillRef idx="0">
+            <a:schemeClr val="accent1"/>
+          </a:fillRef>
+          <a:effectRef idx="0">
+            <a:schemeClr val="accent1"/>
+          </a:effectRef>
+          <a:fontRef idx="minor">
+            <a:schemeClr val="tx1"/>
+          </a:fontRef>
+        </p:style>
+      </p:cxnSp>
+      <p:cxnSp>
+        <p:nvCxnSpPr>
+          <p:cNvPr id="178" name="Straight Arrow Connector 177">
+            <a:extLst>
+              <a:ext uri="{FF2B5EF4-FFF2-40B4-BE49-F238E27FC236}">
+                <a16:creationId xmlns:a16="http://schemas.microsoft.com/office/drawing/2014/main" id="{AD58EF09-8B95-4F31-0758-52C1BD1A684D}"/>
+              </a:ext>
+            </a:extLst>
+          </p:cNvPr>
+          <p:cNvCxnSpPr>
+            <a:cxnSpLocks/>
+            <a:stCxn id="145" idx="2"/>
+            <a:endCxn id="143" idx="0"/>
+          </p:cNvCxnSpPr>
+          <p:nvPr/>
+        </p:nvCxnSpPr>
+        <p:spPr>
+          <a:xfrm flipH="1">
+            <a:off x="16439749" y="5469502"/>
+            <a:ext cx="19454" cy="1855959"/>
+          </a:xfrm>
+          <a:prstGeom prst="straightConnector1">
+            <a:avLst/>
+          </a:prstGeom>
+          <a:ln w="152400">
+            <a:solidFill>
+              <a:schemeClr val="accent1">
+                <a:lumMod val="75000"/>
+              </a:schemeClr>
+            </a:solidFill>
+            <a:tailEnd type="triangle"/>
+          </a:ln>
+        </p:spPr>
+        <p:style>
+          <a:lnRef idx="1">
+            <a:schemeClr val="accent1"/>
+          </a:lnRef>
+          <a:fillRef idx="0">
+            <a:schemeClr val="accent1"/>
+          </a:fillRef>
+          <a:effectRef idx="0">
+            <a:schemeClr val="accent1"/>
+          </a:effectRef>
+          <a:fontRef idx="minor">
+            <a:schemeClr val="tx1"/>
+          </a:fontRef>
+        </p:style>
+      </p:cxnSp>
+      <p:cxnSp>
+        <p:nvCxnSpPr>
+          <p:cNvPr id="179" name="Straight Arrow Connector 178">
+            <a:extLst>
+              <a:ext uri="{FF2B5EF4-FFF2-40B4-BE49-F238E27FC236}">
+                <a16:creationId xmlns:a16="http://schemas.microsoft.com/office/drawing/2014/main" id="{64137A6B-9D81-CC04-4A56-CB43F3FBE38A}"/>
+              </a:ext>
+            </a:extLst>
+          </p:cNvPr>
+          <p:cNvCxnSpPr>
+            <a:cxnSpLocks/>
+            <a:stCxn id="146" idx="0"/>
+            <a:endCxn id="143" idx="2"/>
+          </p:cNvCxnSpPr>
+          <p:nvPr/>
+        </p:nvCxnSpPr>
+        <p:spPr>
+          <a:xfrm flipH="1" flipV="1">
+            <a:off x="16439749" y="8202684"/>
+            <a:ext cx="5166" cy="1863521"/>
+          </a:xfrm>
+          <a:prstGeom prst="straightConnector1">
+            <a:avLst/>
+          </a:prstGeom>
+          <a:ln w="152400">
+            <a:solidFill>
+              <a:schemeClr val="accent1">
+                <a:lumMod val="75000"/>
+              </a:schemeClr>
+            </a:solidFill>
+            <a:tailEnd type="triangle"/>
+          </a:ln>
+        </p:spPr>
+        <p:style>
+          <a:lnRef idx="1">
+            <a:schemeClr val="accent1"/>
+          </a:lnRef>
+          <a:fillRef idx="0">
+            <a:schemeClr val="accent1"/>
+          </a:fillRef>
+          <a:effectRef idx="0">
+            <a:schemeClr val="accent1"/>
+          </a:effectRef>
+          <a:fontRef idx="minor">
+            <a:schemeClr val="tx1"/>
+          </a:fontRef>
+        </p:style>
+      </p:cxnSp>
+      <p:sp>
+        <p:nvSpPr>
+          <p:cNvPr id="145" name="Rectangle 144">
+            <a:extLst>
+              <a:ext uri="{FF2B5EF4-FFF2-40B4-BE49-F238E27FC236}">
+                <a16:creationId xmlns:a16="http://schemas.microsoft.com/office/drawing/2014/main" id="{196DCF3C-1E9F-84BF-A1CB-74EFF6943139}"/>
+              </a:ext>
+            </a:extLst>
+          </p:cNvPr>
+          <p:cNvSpPr/>
+          <p:nvPr/>
+        </p:nvSpPr>
+        <p:spPr>
+          <a:xfrm>
+            <a:off x="15549504" y="4592279"/>
+            <a:ext cx="1819398" cy="877223"/>
+          </a:xfrm>
+          <a:prstGeom prst="rect">
+            <a:avLst/>
+          </a:prstGeom>
+          <a:solidFill>
+            <a:schemeClr val="bg1"/>
+          </a:solidFill>
+          <a:ln w="38100">
+            <a:solidFill>
+              <a:schemeClr val="tx1"/>
+            </a:solidFill>
+          </a:ln>
+        </p:spPr>
+        <p:style>
+          <a:lnRef idx="2">
+            <a:schemeClr val="accent1">
+              <a:shade val="50000"/>
+            </a:schemeClr>
+          </a:lnRef>
+          <a:fillRef idx="1">
+            <a:schemeClr val="accent1"/>
+          </a:fillRef>
+          <a:effectRef idx="0">
+            <a:schemeClr val="accent1"/>
+          </a:effectRef>
+          <a:fontRef idx="minor">
+            <a:schemeClr val="lt1"/>
+          </a:fontRef>
+        </p:style>
+        <p:txBody>
+          <a:bodyPr rtlCol="0" anchor="ctr"/>
+          <a:lstStyle/>
+          <a:p>
+            <a:pPr algn="ctr"/>
+            <a:r>
+              <a:rPr lang="en-US" sz="3000" i="1" dirty="0">
+                <a:solidFill>
+                  <a:schemeClr val="tx1"/>
+                </a:solidFill>
+                <a:latin typeface="Times New Roman" panose="02020603050405020304" pitchFamily="18" charset="0"/>
+                <a:cs typeface="Times New Roman" panose="02020603050405020304" pitchFamily="18" charset="0"/>
+              </a:rPr>
+              <a:t>N</a:t>
+            </a:r>
+            <a:r>
+              <a:rPr lang="en-US" sz="3000" baseline="-25000" dirty="0">
+                <a:solidFill>
+                  <a:schemeClr val="tx1"/>
+                </a:solidFill>
+                <a:latin typeface="Times New Roman" panose="02020603050405020304" pitchFamily="18" charset="0"/>
+                <a:cs typeface="Times New Roman" panose="02020603050405020304" pitchFamily="18" charset="0"/>
+              </a:rPr>
+              <a:t>mass</a:t>
+            </a:r>
+            <a:endParaRPr lang="en-US" sz="3000" i="1" dirty="0">
+              <a:solidFill>
+                <a:schemeClr val="tx1"/>
+              </a:solidFill>
+              <a:latin typeface="Times New Roman" panose="02020603050405020304" pitchFamily="18" charset="0"/>
+              <a:cs typeface="Times New Roman" panose="02020603050405020304" pitchFamily="18" charset="0"/>
+            </a:endParaRPr>
+          </a:p>
+        </p:txBody>
+      </p:sp>
+      <p:sp>
+        <p:nvSpPr>
+          <p:cNvPr id="146" name="Rectangle 145">
+            <a:extLst>
+              <a:ext uri="{FF2B5EF4-FFF2-40B4-BE49-F238E27FC236}">
+                <a16:creationId xmlns:a16="http://schemas.microsoft.com/office/drawing/2014/main" id="{831EFE87-5954-79FB-5410-F4BC8563FCDF}"/>
+              </a:ext>
+            </a:extLst>
+          </p:cNvPr>
+          <p:cNvSpPr/>
+          <p:nvPr/>
+        </p:nvSpPr>
+        <p:spPr>
+          <a:xfrm>
+            <a:off x="15535216" y="10066205"/>
+            <a:ext cx="1819398" cy="877223"/>
+          </a:xfrm>
+          <a:prstGeom prst="rect">
+            <a:avLst/>
+          </a:prstGeom>
+          <a:solidFill>
+            <a:schemeClr val="bg1"/>
+          </a:solidFill>
+          <a:ln w="38100">
+            <a:solidFill>
+              <a:schemeClr val="tx1"/>
+            </a:solidFill>
+          </a:ln>
+        </p:spPr>
+        <p:style>
+          <a:lnRef idx="2">
+            <a:schemeClr val="accent1">
+              <a:shade val="50000"/>
+            </a:schemeClr>
+          </a:lnRef>
+          <a:fillRef idx="1">
+            <a:schemeClr val="accent1"/>
+          </a:fillRef>
+          <a:effectRef idx="0">
+            <a:schemeClr val="accent1"/>
+          </a:effectRef>
+          <a:fontRef idx="minor">
+            <a:schemeClr val="lt1"/>
+          </a:fontRef>
+        </p:style>
+        <p:txBody>
+          <a:bodyPr rtlCol="0" anchor="ctr"/>
+          <a:lstStyle/>
+          <a:p>
+            <a:pPr algn="ctr"/>
+            <a:r>
+              <a:rPr lang="en-US" sz="3000" i="1" dirty="0">
+                <a:solidFill>
+                  <a:schemeClr val="tx1"/>
+                </a:solidFill>
+                <a:latin typeface="Times New Roman" panose="02020603050405020304" pitchFamily="18" charset="0"/>
+                <a:cs typeface="Times New Roman" panose="02020603050405020304" pitchFamily="18" charset="0"/>
+              </a:rPr>
+              <a:t>M</a:t>
+            </a:r>
+            <a:r>
+              <a:rPr lang="en-US" sz="3000" baseline="-25000" dirty="0">
+                <a:solidFill>
+                  <a:schemeClr val="tx1"/>
+                </a:solidFill>
+                <a:latin typeface="Times New Roman" panose="02020603050405020304" pitchFamily="18" charset="0"/>
+                <a:cs typeface="Times New Roman" panose="02020603050405020304" pitchFamily="18" charset="0"/>
+              </a:rPr>
+              <a:t>area</a:t>
+            </a:r>
+            <a:endParaRPr lang="en-US" sz="3000" i="1" dirty="0">
+              <a:solidFill>
+                <a:schemeClr val="tx1"/>
+              </a:solidFill>
+              <a:latin typeface="Times New Roman" panose="02020603050405020304" pitchFamily="18" charset="0"/>
+              <a:cs typeface="Times New Roman" panose="02020603050405020304" pitchFamily="18" charset="0"/>
+            </a:endParaRPr>
+          </a:p>
+        </p:txBody>
+      </p:sp>
+      <p:cxnSp>
+        <p:nvCxnSpPr>
+          <p:cNvPr id="185" name="Straight Arrow Connector 184">
+            <a:extLst>
+              <a:ext uri="{FF2B5EF4-FFF2-40B4-BE49-F238E27FC236}">
+                <a16:creationId xmlns:a16="http://schemas.microsoft.com/office/drawing/2014/main" id="{258C187C-B6A3-5852-85DF-896F3B7E817C}"/>
+              </a:ext>
+            </a:extLst>
+          </p:cNvPr>
+          <p:cNvCxnSpPr>
+            <a:cxnSpLocks/>
+            <a:endCxn id="146" idx="1"/>
+          </p:cNvCxnSpPr>
+          <p:nvPr/>
+        </p:nvCxnSpPr>
+        <p:spPr>
+          <a:xfrm>
+            <a:off x="11618898" y="8043863"/>
+            <a:ext cx="3916318" cy="2460954"/>
+          </a:xfrm>
+          <a:prstGeom prst="straightConnector1">
+            <a:avLst/>
+          </a:prstGeom>
+          <a:ln w="152400">
+            <a:solidFill>
+              <a:srgbClr val="C00000"/>
+            </a:solidFill>
+            <a:tailEnd type="triangle"/>
+          </a:ln>
+        </p:spPr>
+        <p:style>
+          <a:lnRef idx="1">
+            <a:schemeClr val="accent1"/>
+          </a:lnRef>
+          <a:fillRef idx="0">
+            <a:schemeClr val="accent1"/>
+          </a:fillRef>
+          <a:effectRef idx="0">
+            <a:schemeClr val="accent1"/>
+          </a:effectRef>
+          <a:fontRef idx="minor">
+            <a:schemeClr val="tx1"/>
+          </a:fontRef>
+        </p:style>
+      </p:cxnSp>
+      <p:cxnSp>
+        <p:nvCxnSpPr>
+          <p:cNvPr id="186" name="Straight Arrow Connector 185">
+            <a:extLst>
+              <a:ext uri="{FF2B5EF4-FFF2-40B4-BE49-F238E27FC236}">
+                <a16:creationId xmlns:a16="http://schemas.microsoft.com/office/drawing/2014/main" id="{8F9CC82C-68F6-632C-D6BC-9D720D68E3E7}"/>
+              </a:ext>
+            </a:extLst>
+          </p:cNvPr>
+          <p:cNvCxnSpPr>
+            <a:cxnSpLocks/>
+            <a:stCxn id="144" idx="3"/>
+            <a:endCxn id="146" idx="1"/>
+          </p:cNvCxnSpPr>
+          <p:nvPr/>
+        </p:nvCxnSpPr>
+        <p:spPr>
+          <a:xfrm>
+            <a:off x="3666929" y="10504817"/>
+            <a:ext cx="11868287" cy="0"/>
+          </a:xfrm>
+          <a:prstGeom prst="straightConnector1">
+            <a:avLst/>
+          </a:prstGeom>
+          <a:ln w="152400">
+            <a:solidFill>
+              <a:srgbClr val="C00000"/>
+            </a:solidFill>
+            <a:tailEnd type="triangle"/>
+          </a:ln>
+        </p:spPr>
+        <p:style>
+          <a:lnRef idx="1">
+            <a:schemeClr val="accent1"/>
+          </a:lnRef>
+          <a:fillRef idx="0">
+            <a:schemeClr val="accent1"/>
+          </a:fillRef>
+          <a:effectRef idx="0">
+            <a:schemeClr val="accent1"/>
+          </a:effectRef>
+          <a:fontRef idx="minor">
+            <a:schemeClr val="tx1"/>
+          </a:fontRef>
+        </p:style>
+      </p:cxnSp>
+      <p:sp>
+        <p:nvSpPr>
+          <p:cNvPr id="149" name="Rectangle 148">
+            <a:extLst>
+              <a:ext uri="{FF2B5EF4-FFF2-40B4-BE49-F238E27FC236}">
+                <a16:creationId xmlns:a16="http://schemas.microsoft.com/office/drawing/2014/main" id="{37E4791A-A4FE-F459-D539-AC5C8696DD32}"/>
+              </a:ext>
+            </a:extLst>
+          </p:cNvPr>
+          <p:cNvSpPr/>
+          <p:nvPr/>
+        </p:nvSpPr>
+        <p:spPr>
+          <a:xfrm>
+            <a:off x="10966373" y="7339374"/>
+            <a:ext cx="1819398" cy="877223"/>
+          </a:xfrm>
+          <a:prstGeom prst="rect">
+            <a:avLst/>
+          </a:prstGeom>
+          <a:solidFill>
+            <a:schemeClr val="bg1"/>
+          </a:solidFill>
+          <a:ln w="38100">
+            <a:solidFill>
+              <a:schemeClr val="tx1"/>
+            </a:solidFill>
+          </a:ln>
+        </p:spPr>
+        <p:style>
+          <a:lnRef idx="2">
+            <a:schemeClr val="accent1">
+              <a:shade val="50000"/>
+            </a:schemeClr>
+          </a:lnRef>
+          <a:fillRef idx="1">
+            <a:schemeClr val="accent1"/>
+          </a:fillRef>
+          <a:effectRef idx="0">
+            <a:schemeClr val="accent1"/>
+          </a:effectRef>
+          <a:fontRef idx="minor">
+            <a:schemeClr val="lt1"/>
+          </a:fontRef>
+        </p:style>
+        <p:txBody>
+          <a:bodyPr rtlCol="0" anchor="ctr"/>
+          <a:lstStyle/>
+          <a:p>
+            <a:pPr algn="ctr"/>
+            <a:r>
+              <a:rPr lang="en-US" sz="3000" i="1" dirty="0">
+                <a:solidFill>
+                  <a:schemeClr val="tx1"/>
+                </a:solidFill>
+                <a:latin typeface="Times New Roman" panose="02020603050405020304" pitchFamily="18" charset="0"/>
+                <a:cs typeface="Times New Roman" panose="02020603050405020304" pitchFamily="18" charset="0"/>
+              </a:rPr>
+              <a:t>Leaf Ci:Ca</a:t>
+            </a:r>
+          </a:p>
+        </p:txBody>
+      </p:sp>
+      <p:cxnSp>
+        <p:nvCxnSpPr>
+          <p:cNvPr id="192" name="Elbow Connector 191">
+            <a:extLst>
+              <a:ext uri="{FF2B5EF4-FFF2-40B4-BE49-F238E27FC236}">
+                <a16:creationId xmlns:a16="http://schemas.microsoft.com/office/drawing/2014/main" id="{70E41ED9-E24C-CA45-C448-4A15D4E18233}"/>
+              </a:ext>
+            </a:extLst>
+          </p:cNvPr>
+          <p:cNvCxnSpPr>
+            <a:stCxn id="150" idx="1"/>
+            <a:endCxn id="146" idx="2"/>
+          </p:cNvCxnSpPr>
+          <p:nvPr/>
+        </p:nvCxnSpPr>
+        <p:spPr>
+          <a:xfrm rot="10800000" flipH="1" flipV="1">
+            <a:off x="1847531" y="5030890"/>
+            <a:ext cx="14597384" cy="5912537"/>
+          </a:xfrm>
+          <a:prstGeom prst="bentConnector4">
+            <a:avLst>
+              <a:gd name="adj1" fmla="val -6460"/>
+              <a:gd name="adj2" fmla="val 115948"/>
+            </a:avLst>
+          </a:prstGeom>
+          <a:ln w="152400">
+            <a:solidFill>
+              <a:srgbClr val="C00000"/>
+            </a:solidFill>
+            <a:tailEnd type="triangle"/>
+          </a:ln>
+        </p:spPr>
+        <p:style>
+          <a:lnRef idx="1">
+            <a:schemeClr val="accent1"/>
+          </a:lnRef>
+          <a:fillRef idx="0">
+            <a:schemeClr val="accent1"/>
+          </a:fillRef>
+          <a:effectRef idx="0">
+            <a:schemeClr val="accent1"/>
+          </a:effectRef>
+          <a:fontRef idx="minor">
+            <a:schemeClr val="tx1"/>
+          </a:fontRef>
+        </p:style>
+      </p:cxnSp>
+      <p:cxnSp>
+        <p:nvCxnSpPr>
+          <p:cNvPr id="196" name="Straight Arrow Connector 195">
+            <a:extLst>
+              <a:ext uri="{FF2B5EF4-FFF2-40B4-BE49-F238E27FC236}">
+                <a16:creationId xmlns:a16="http://schemas.microsoft.com/office/drawing/2014/main" id="{D3D39525-618A-0E5E-5962-FA061AF403E3}"/>
+              </a:ext>
+            </a:extLst>
+          </p:cNvPr>
+          <p:cNvCxnSpPr>
+            <a:cxnSpLocks/>
+            <a:stCxn id="144" idx="3"/>
+            <a:endCxn id="145" idx="1"/>
+          </p:cNvCxnSpPr>
+          <p:nvPr/>
+        </p:nvCxnSpPr>
+        <p:spPr>
+          <a:xfrm flipV="1">
+            <a:off x="3666929" y="5030891"/>
+            <a:ext cx="11882575" cy="5473926"/>
+          </a:xfrm>
+          <a:prstGeom prst="straightConnector1">
+            <a:avLst/>
+          </a:prstGeom>
+          <a:ln w="152400">
+            <a:solidFill>
+              <a:schemeClr val="accent1">
+                <a:lumMod val="75000"/>
+              </a:schemeClr>
+            </a:solidFill>
+            <a:tailEnd type="triangle"/>
+          </a:ln>
+        </p:spPr>
+        <p:style>
+          <a:lnRef idx="1">
+            <a:schemeClr val="accent1"/>
+          </a:lnRef>
+          <a:fillRef idx="0">
+            <a:schemeClr val="accent1"/>
+          </a:fillRef>
+          <a:effectRef idx="0">
+            <a:schemeClr val="accent1"/>
+          </a:effectRef>
+          <a:fontRef idx="minor">
+            <a:schemeClr val="tx1"/>
+          </a:fontRef>
+        </p:style>
+      </p:cxnSp>
+      <p:cxnSp>
+        <p:nvCxnSpPr>
+          <p:cNvPr id="168" name="Straight Arrow Connector 167">
+            <a:extLst>
+              <a:ext uri="{FF2B5EF4-FFF2-40B4-BE49-F238E27FC236}">
+                <a16:creationId xmlns:a16="http://schemas.microsoft.com/office/drawing/2014/main" id="{1EF4A41A-5F73-8BC5-33B7-31C8F1EBE768}"/>
+              </a:ext>
+            </a:extLst>
+          </p:cNvPr>
+          <p:cNvCxnSpPr>
+            <a:cxnSpLocks/>
+          </p:cNvCxnSpPr>
+          <p:nvPr/>
+        </p:nvCxnSpPr>
+        <p:spPr>
+          <a:xfrm>
+            <a:off x="7829550" y="5233051"/>
+            <a:ext cx="3159084" cy="2092410"/>
+          </a:xfrm>
+          <a:prstGeom prst="straightConnector1">
+            <a:avLst/>
+          </a:prstGeom>
+          <a:ln w="152400">
+            <a:solidFill>
+              <a:srgbClr val="C00000"/>
+            </a:solidFill>
+            <a:tailEnd type="triangle"/>
+          </a:ln>
+        </p:spPr>
+        <p:style>
+          <a:lnRef idx="1">
+            <a:schemeClr val="accent1"/>
+          </a:lnRef>
+          <a:fillRef idx="0">
+            <a:schemeClr val="accent1"/>
+          </a:fillRef>
+          <a:effectRef idx="0">
+            <a:schemeClr val="accent1"/>
+          </a:effectRef>
+          <a:fontRef idx="minor">
+            <a:schemeClr val="tx1"/>
+          </a:fontRef>
+        </p:style>
+      </p:cxnSp>
+      <p:sp>
+        <p:nvSpPr>
+          <p:cNvPr id="151" name="Rectangle 150">
+            <a:extLst>
+              <a:ext uri="{FF2B5EF4-FFF2-40B4-BE49-F238E27FC236}">
+                <a16:creationId xmlns:a16="http://schemas.microsoft.com/office/drawing/2014/main" id="{52423B29-35B5-9B6F-567C-E9C20E59598B}"/>
+              </a:ext>
+            </a:extLst>
+          </p:cNvPr>
+          <p:cNvSpPr/>
+          <p:nvPr/>
+        </p:nvSpPr>
+        <p:spPr>
+          <a:xfrm>
+            <a:off x="6374262" y="4599810"/>
+            <a:ext cx="1819398" cy="877223"/>
+          </a:xfrm>
+          <a:prstGeom prst="rect">
+            <a:avLst/>
+          </a:prstGeom>
+          <a:solidFill>
+            <a:schemeClr val="bg1"/>
+          </a:solidFill>
+          <a:ln w="38100">
+            <a:solidFill>
+              <a:schemeClr val="tx1"/>
+            </a:solidFill>
+          </a:ln>
+        </p:spPr>
+        <p:style>
+          <a:lnRef idx="2">
+            <a:schemeClr val="accent1">
+              <a:shade val="50000"/>
+            </a:schemeClr>
+          </a:lnRef>
+          <a:fillRef idx="1">
+            <a:schemeClr val="accent1"/>
+          </a:fillRef>
+          <a:effectRef idx="0">
+            <a:schemeClr val="accent1"/>
+          </a:effectRef>
+          <a:fontRef idx="minor">
+            <a:schemeClr val="lt1"/>
+          </a:fontRef>
+        </p:style>
+        <p:txBody>
+          <a:bodyPr rtlCol="0" anchor="ctr"/>
+          <a:lstStyle/>
+          <a:p>
+            <a:pPr algn="ctr"/>
+            <a:r>
+              <a:rPr lang="en-US" sz="3000" i="1" dirty="0">
+                <a:solidFill>
+                  <a:schemeClr val="tx1"/>
+                </a:solidFill>
+                <a:latin typeface="Times New Roman" panose="02020603050405020304" pitchFamily="18" charset="0"/>
+                <a:cs typeface="Times New Roman" panose="02020603050405020304" pitchFamily="18" charset="0"/>
+              </a:rPr>
+              <a:t>VPD</a:t>
+            </a:r>
+            <a:r>
+              <a:rPr lang="en-US" sz="3000" baseline="-25000" dirty="0">
+                <a:solidFill>
+                  <a:schemeClr val="tx1"/>
+                </a:solidFill>
+                <a:latin typeface="Times New Roman" panose="02020603050405020304" pitchFamily="18" charset="0"/>
+                <a:cs typeface="Times New Roman" panose="02020603050405020304" pitchFamily="18" charset="0"/>
+              </a:rPr>
+              <a:t>4</a:t>
+            </a:r>
+            <a:endParaRPr lang="en-US" sz="3000" dirty="0">
+              <a:solidFill>
+                <a:schemeClr val="tx1"/>
+              </a:solidFill>
+              <a:latin typeface="Times New Roman" panose="02020603050405020304" pitchFamily="18" charset="0"/>
+              <a:cs typeface="Times New Roman" panose="02020603050405020304" pitchFamily="18" charset="0"/>
+            </a:endParaRPr>
+          </a:p>
+        </p:txBody>
+      </p:sp>
+      <p:cxnSp>
+        <p:nvCxnSpPr>
+          <p:cNvPr id="202" name="Elbow Connector 201">
+            <a:extLst>
+              <a:ext uri="{FF2B5EF4-FFF2-40B4-BE49-F238E27FC236}">
+                <a16:creationId xmlns:a16="http://schemas.microsoft.com/office/drawing/2014/main" id="{E1F0AD5C-E721-50A7-83F5-7F8A4BC5FE9B}"/>
+              </a:ext>
+            </a:extLst>
+          </p:cNvPr>
+          <p:cNvCxnSpPr>
+            <a:stCxn id="150" idx="0"/>
+            <a:endCxn id="145" idx="0"/>
+          </p:cNvCxnSpPr>
+          <p:nvPr/>
+        </p:nvCxnSpPr>
+        <p:spPr>
+          <a:xfrm rot="5400000" flipH="1" flipV="1">
+            <a:off x="9608216" y="-2258707"/>
+            <a:ext cx="12700" cy="13701973"/>
+          </a:xfrm>
+          <a:prstGeom prst="bentConnector3">
+            <a:avLst>
+              <a:gd name="adj1" fmla="val 7312496"/>
+            </a:avLst>
+          </a:prstGeom>
+          <a:ln w="152400">
+            <a:solidFill>
+              <a:schemeClr val="accent1">
+                <a:lumMod val="75000"/>
+              </a:schemeClr>
+            </a:solidFill>
+            <a:tailEnd type="triangle"/>
+          </a:ln>
+        </p:spPr>
+        <p:style>
+          <a:lnRef idx="1">
+            <a:schemeClr val="accent1"/>
+          </a:lnRef>
+          <a:fillRef idx="0">
+            <a:schemeClr val="accent1"/>
+          </a:fillRef>
+          <a:effectRef idx="0">
+            <a:schemeClr val="accent1"/>
+          </a:effectRef>
+          <a:fontRef idx="minor">
+            <a:schemeClr val="tx1"/>
+          </a:fontRef>
+        </p:style>
+      </p:cxnSp>
+      <p:cxnSp>
+        <p:nvCxnSpPr>
+          <p:cNvPr id="211" name="Straight Arrow Connector 210">
+            <a:extLst>
+              <a:ext uri="{FF2B5EF4-FFF2-40B4-BE49-F238E27FC236}">
+                <a16:creationId xmlns:a16="http://schemas.microsoft.com/office/drawing/2014/main" id="{4110BDE9-8908-F5D6-4156-0F3FAA1D6E32}"/>
+              </a:ext>
+            </a:extLst>
+          </p:cNvPr>
+          <p:cNvCxnSpPr>
+            <a:stCxn id="147" idx="3"/>
+            <a:endCxn id="145" idx="1"/>
+          </p:cNvCxnSpPr>
+          <p:nvPr/>
+        </p:nvCxnSpPr>
+        <p:spPr>
+          <a:xfrm flipV="1">
+            <a:off x="12763508" y="5030891"/>
+            <a:ext cx="2785996" cy="7531"/>
+          </a:xfrm>
+          <a:prstGeom prst="straightConnector1">
+            <a:avLst/>
+          </a:prstGeom>
+          <a:ln w="152400">
+            <a:solidFill>
+              <a:schemeClr val="accent1">
+                <a:lumMod val="75000"/>
+              </a:schemeClr>
+            </a:solidFill>
+            <a:tailEnd type="triangle"/>
+          </a:ln>
+        </p:spPr>
+        <p:style>
+          <a:lnRef idx="1">
+            <a:schemeClr val="accent1"/>
+          </a:lnRef>
+          <a:fillRef idx="0">
+            <a:schemeClr val="accent1"/>
+          </a:fillRef>
+          <a:effectRef idx="0">
+            <a:schemeClr val="accent1"/>
+          </a:effectRef>
+          <a:fontRef idx="minor">
+            <a:schemeClr val="tx1"/>
+          </a:fontRef>
+        </p:style>
+      </p:cxnSp>
+      <p:cxnSp>
+        <p:nvCxnSpPr>
+          <p:cNvPr id="220" name="Straight Arrow Connector 219">
+            <a:extLst>
+              <a:ext uri="{FF2B5EF4-FFF2-40B4-BE49-F238E27FC236}">
+                <a16:creationId xmlns:a16="http://schemas.microsoft.com/office/drawing/2014/main" id="{1A8BFAA7-8AE7-71B6-901E-BFD793B7B0E6}"/>
+              </a:ext>
+            </a:extLst>
+          </p:cNvPr>
+          <p:cNvCxnSpPr>
+            <a:cxnSpLocks/>
+          </p:cNvCxnSpPr>
+          <p:nvPr/>
+        </p:nvCxnSpPr>
+        <p:spPr>
+          <a:xfrm flipV="1">
+            <a:off x="14258925" y="5471919"/>
+            <a:ext cx="1288229" cy="1286252"/>
+          </a:xfrm>
+          <a:prstGeom prst="straightConnector1">
+            <a:avLst/>
+          </a:prstGeom>
+          <a:ln w="152400">
+            <a:solidFill>
+              <a:schemeClr val="accent1">
+                <a:lumMod val="75000"/>
+              </a:schemeClr>
+            </a:solidFill>
+            <a:tailEnd type="triangle"/>
+          </a:ln>
+        </p:spPr>
+        <p:style>
+          <a:lnRef idx="1">
+            <a:schemeClr val="accent1"/>
+          </a:lnRef>
+          <a:fillRef idx="0">
+            <a:schemeClr val="accent1"/>
+          </a:fillRef>
+          <a:effectRef idx="0">
+            <a:schemeClr val="accent1"/>
+          </a:effectRef>
+          <a:fontRef idx="minor">
+            <a:schemeClr val="tx1"/>
+          </a:fontRef>
+        </p:style>
+      </p:cxnSp>
+      <p:sp>
+        <p:nvSpPr>
+          <p:cNvPr id="152" name="Rectangle 151">
+            <a:extLst>
+              <a:ext uri="{FF2B5EF4-FFF2-40B4-BE49-F238E27FC236}">
+                <a16:creationId xmlns:a16="http://schemas.microsoft.com/office/drawing/2014/main" id="{2D17192C-937C-49F2-AB55-CCF25B817752}"/>
+              </a:ext>
+            </a:extLst>
+          </p:cNvPr>
+          <p:cNvSpPr/>
+          <p:nvPr/>
+        </p:nvSpPr>
+        <p:spPr>
+          <a:xfrm>
+            <a:off x="12771342" y="6400066"/>
+            <a:ext cx="1819398" cy="877223"/>
+          </a:xfrm>
+          <a:prstGeom prst="rect">
+            <a:avLst/>
+          </a:prstGeom>
+          <a:solidFill>
+            <a:schemeClr val="bg1"/>
+          </a:solidFill>
+          <a:ln w="38100">
+            <a:solidFill>
+              <a:schemeClr val="tx1"/>
+            </a:solidFill>
+          </a:ln>
+        </p:spPr>
+        <p:style>
+          <a:lnRef idx="2">
+            <a:schemeClr val="accent1">
+              <a:shade val="50000"/>
+            </a:schemeClr>
+          </a:lnRef>
+          <a:fillRef idx="1">
+            <a:schemeClr val="accent1"/>
+          </a:fillRef>
+          <a:effectRef idx="0">
+            <a:schemeClr val="accent1"/>
+          </a:effectRef>
+          <a:fontRef idx="minor">
+            <a:schemeClr val="lt1"/>
+          </a:fontRef>
+        </p:style>
+        <p:txBody>
+          <a:bodyPr rtlCol="0" anchor="ctr"/>
+          <a:lstStyle/>
+          <a:p>
+            <a:pPr algn="ctr"/>
+            <a:r>
+              <a:rPr lang="en-US" sz="3000" i="1" dirty="0">
+                <a:solidFill>
+                  <a:schemeClr val="tx1"/>
+                </a:solidFill>
+                <a:latin typeface="Times New Roman" panose="02020603050405020304" pitchFamily="18" charset="0"/>
+                <a:cs typeface="Times New Roman" panose="02020603050405020304" pitchFamily="18" charset="0"/>
+              </a:rPr>
+              <a:t>N</a:t>
+            </a:r>
+            <a:r>
+              <a:rPr lang="en-US" sz="3000" baseline="-25000" dirty="0">
+                <a:solidFill>
+                  <a:schemeClr val="tx1"/>
+                </a:solidFill>
+                <a:latin typeface="Times New Roman" panose="02020603050405020304" pitchFamily="18" charset="0"/>
+                <a:cs typeface="Times New Roman" panose="02020603050405020304" pitchFamily="18" charset="0"/>
+              </a:rPr>
+              <a:t>fixer</a:t>
+            </a:r>
+            <a:endParaRPr lang="en-US" sz="3000" i="1" dirty="0">
+              <a:solidFill>
+                <a:schemeClr val="tx1"/>
+              </a:solidFill>
+              <a:latin typeface="Times New Roman" panose="02020603050405020304" pitchFamily="18" charset="0"/>
+              <a:cs typeface="Times New Roman" panose="02020603050405020304" pitchFamily="18" charset="0"/>
+            </a:endParaRPr>
+          </a:p>
+        </p:txBody>
+      </p:sp>
+      <p:sp>
+        <p:nvSpPr>
+          <p:cNvPr id="232" name="TextBox 231">
+            <a:extLst>
+              <a:ext uri="{FF2B5EF4-FFF2-40B4-BE49-F238E27FC236}">
+                <a16:creationId xmlns:a16="http://schemas.microsoft.com/office/drawing/2014/main" id="{EA675FC9-4ECE-77CE-D937-51141764E2C0}"/>
+              </a:ext>
+            </a:extLst>
+          </p:cNvPr>
+          <p:cNvSpPr txBox="1"/>
+          <p:nvPr/>
+        </p:nvSpPr>
+        <p:spPr>
+          <a:xfrm>
+            <a:off x="18103183" y="7471580"/>
+            <a:ext cx="3409145" cy="3471848"/>
+          </a:xfrm>
+          <a:prstGeom prst="rect">
+            <a:avLst/>
+          </a:prstGeom>
+          <a:ln w="50800"/>
+        </p:spPr>
+        <p:style>
+          <a:lnRef idx="2">
+            <a:schemeClr val="dk1"/>
+          </a:lnRef>
+          <a:fillRef idx="1">
+            <a:schemeClr val="lt1"/>
+          </a:fillRef>
+          <a:effectRef idx="0">
+            <a:schemeClr val="dk1"/>
+          </a:effectRef>
+          <a:fontRef idx="minor">
+            <a:schemeClr val="dk1"/>
+          </a:fontRef>
+        </p:style>
+        <p:txBody>
+          <a:bodyPr wrap="square" rtlCol="0">
+            <a:spAutoFit/>
+          </a:bodyPr>
+          <a:lstStyle/>
+          <a:p>
+            <a:pPr>
+              <a:lnSpc>
+                <a:spcPct val="150000"/>
+              </a:lnSpc>
+            </a:pPr>
+            <a:r>
+              <a:rPr lang="en-US" sz="3000" dirty="0">
+                <a:latin typeface="Times New Roman" panose="02020603050405020304" pitchFamily="18" charset="0"/>
+                <a:cs typeface="Times New Roman" panose="02020603050405020304" pitchFamily="18" charset="0"/>
+              </a:rPr>
+              <a:t>Fisher’s </a:t>
+            </a:r>
+            <a:r>
+              <a:rPr lang="en-US" sz="3000" i="1" dirty="0">
+                <a:latin typeface="Times New Roman" panose="02020603050405020304" pitchFamily="18" charset="0"/>
+                <a:cs typeface="Times New Roman" panose="02020603050405020304" pitchFamily="18" charset="0"/>
+              </a:rPr>
+              <a:t>C </a:t>
+            </a:r>
+            <a:r>
+              <a:rPr lang="en-US" sz="3000" dirty="0">
+                <a:latin typeface="Times New Roman" panose="02020603050405020304" pitchFamily="18" charset="0"/>
+                <a:cs typeface="Times New Roman" panose="02020603050405020304" pitchFamily="18" charset="0"/>
+              </a:rPr>
+              <a:t>= 43.220</a:t>
+            </a:r>
+          </a:p>
+          <a:p>
+            <a:pPr>
+              <a:lnSpc>
+                <a:spcPct val="150000"/>
+              </a:lnSpc>
+            </a:pPr>
+            <a:r>
+              <a:rPr lang="en-US" sz="3000" dirty="0">
+                <a:latin typeface="Times New Roman" panose="02020603050405020304" pitchFamily="18" charset="0"/>
+                <a:cs typeface="Times New Roman" panose="02020603050405020304" pitchFamily="18" charset="0"/>
+              </a:rPr>
+              <a:t>p-value = 0.056</a:t>
+            </a:r>
+          </a:p>
+          <a:p>
+            <a:pPr>
+              <a:lnSpc>
+                <a:spcPct val="150000"/>
+              </a:lnSpc>
+            </a:pPr>
+            <a:r>
+              <a:rPr lang="en-US" sz="3000" dirty="0">
+                <a:latin typeface="Times New Roman" panose="02020603050405020304" pitchFamily="18" charset="0"/>
+                <a:cs typeface="Times New Roman" panose="02020603050405020304" pitchFamily="18" charset="0"/>
+              </a:rPr>
+              <a:t>AIC = 153.220</a:t>
+            </a:r>
+          </a:p>
+          <a:p>
+            <a:pPr>
+              <a:lnSpc>
+                <a:spcPct val="150000"/>
+              </a:lnSpc>
+            </a:pPr>
+            <a:r>
+              <a:rPr lang="en-US" sz="3000" dirty="0">
+                <a:latin typeface="Times New Roman" panose="02020603050405020304" pitchFamily="18" charset="0"/>
+                <a:cs typeface="Times New Roman" panose="02020603050405020304" pitchFamily="18" charset="0"/>
+              </a:rPr>
+              <a:t>BIC = 373.162</a:t>
+            </a:r>
+          </a:p>
+          <a:p>
+            <a:pPr>
+              <a:lnSpc>
+                <a:spcPct val="150000"/>
+              </a:lnSpc>
+            </a:pPr>
+            <a:r>
+              <a:rPr lang="en-US" sz="3000" dirty="0">
+                <a:latin typeface="Times New Roman" panose="02020603050405020304" pitchFamily="18" charset="0"/>
+                <a:cs typeface="Times New Roman" panose="02020603050405020304" pitchFamily="18" charset="0"/>
+              </a:rPr>
+              <a:t>df = 30</a:t>
+            </a:r>
+          </a:p>
+        </p:txBody>
+      </p:sp>
+      <p:grpSp>
+        <p:nvGrpSpPr>
+          <p:cNvPr id="233" name="Group 232">
+            <a:extLst>
+              <a:ext uri="{FF2B5EF4-FFF2-40B4-BE49-F238E27FC236}">
+                <a16:creationId xmlns:a16="http://schemas.microsoft.com/office/drawing/2014/main" id="{7D6FFB3B-C135-4574-E2E0-9E3A5B886CCB}"/>
+              </a:ext>
+            </a:extLst>
+          </p:cNvPr>
+          <p:cNvGrpSpPr/>
+          <p:nvPr/>
+        </p:nvGrpSpPr>
+        <p:grpSpPr>
+          <a:xfrm>
+            <a:off x="18102334" y="4260507"/>
+            <a:ext cx="3404081" cy="2716263"/>
+            <a:chOff x="17640885" y="4497656"/>
+            <a:chExt cx="3404081" cy="2716263"/>
+          </a:xfrm>
+        </p:grpSpPr>
+        <p:cxnSp>
+          <p:nvCxnSpPr>
+            <p:cNvPr id="234" name="Straight Connector 233">
+              <a:extLst>
+                <a:ext uri="{FF2B5EF4-FFF2-40B4-BE49-F238E27FC236}">
+                  <a16:creationId xmlns:a16="http://schemas.microsoft.com/office/drawing/2014/main" id="{7D8B7EE7-86A2-1D97-AB87-1A5E66BE7FEA}"/>
+                </a:ext>
+              </a:extLst>
+            </p:cNvPr>
+            <p:cNvCxnSpPr>
+              <a:cxnSpLocks/>
+            </p:cNvCxnSpPr>
+            <p:nvPr/>
+          </p:nvCxnSpPr>
+          <p:spPr>
+            <a:xfrm>
+              <a:off x="17861805" y="4996675"/>
+              <a:ext cx="1207698" cy="0"/>
+            </a:xfrm>
+            <a:prstGeom prst="line">
+              <a:avLst/>
+            </a:prstGeom>
+            <a:ln w="152400">
+              <a:solidFill>
+                <a:schemeClr val="bg1">
+                  <a:lumMod val="50000"/>
+                </a:schemeClr>
+              </a:solidFill>
+            </a:ln>
+          </p:spPr>
+          <p:style>
+            <a:lnRef idx="1">
+              <a:schemeClr val="accent1"/>
+            </a:lnRef>
+            <a:fillRef idx="0">
+              <a:schemeClr val="accent1"/>
+            </a:fillRef>
+            <a:effectRef idx="0">
+              <a:schemeClr val="accent1"/>
+            </a:effectRef>
+            <a:fontRef idx="minor">
+              <a:schemeClr val="tx1"/>
+            </a:fontRef>
+          </p:style>
+        </p:cxnSp>
+        <p:cxnSp>
+          <p:nvCxnSpPr>
+            <p:cNvPr id="235" name="Straight Connector 234">
+              <a:extLst>
+                <a:ext uri="{FF2B5EF4-FFF2-40B4-BE49-F238E27FC236}">
+                  <a16:creationId xmlns:a16="http://schemas.microsoft.com/office/drawing/2014/main" id="{6CECC1BE-8FF2-2C30-C2BF-6F6FC0BD8E14}"/>
+                </a:ext>
+              </a:extLst>
+            </p:cNvPr>
+            <p:cNvCxnSpPr>
+              <a:cxnSpLocks/>
+            </p:cNvCxnSpPr>
+            <p:nvPr/>
+          </p:nvCxnSpPr>
+          <p:spPr>
+            <a:xfrm>
+              <a:off x="17864980" y="5935650"/>
+              <a:ext cx="1207698" cy="0"/>
+            </a:xfrm>
+            <a:prstGeom prst="line">
+              <a:avLst/>
+            </a:prstGeom>
+            <a:ln w="101600">
+              <a:solidFill>
+                <a:schemeClr val="bg1">
+                  <a:lumMod val="50000"/>
+                </a:schemeClr>
+              </a:solidFill>
+            </a:ln>
+          </p:spPr>
+          <p:style>
+            <a:lnRef idx="1">
+              <a:schemeClr val="accent1"/>
+            </a:lnRef>
+            <a:fillRef idx="0">
+              <a:schemeClr val="accent1"/>
+            </a:fillRef>
+            <a:effectRef idx="0">
+              <a:schemeClr val="accent1"/>
+            </a:effectRef>
+            <a:fontRef idx="minor">
+              <a:schemeClr val="tx1"/>
+            </a:fontRef>
+          </p:style>
+        </p:cxnSp>
+        <p:cxnSp>
+          <p:nvCxnSpPr>
+            <p:cNvPr id="236" name="Straight Connector 235">
+              <a:extLst>
+                <a:ext uri="{FF2B5EF4-FFF2-40B4-BE49-F238E27FC236}">
+                  <a16:creationId xmlns:a16="http://schemas.microsoft.com/office/drawing/2014/main" id="{A4DED3D0-C652-DA9F-232B-32BC0FB1ECA9}"/>
+                </a:ext>
+              </a:extLst>
+            </p:cNvPr>
+            <p:cNvCxnSpPr>
+              <a:cxnSpLocks/>
+            </p:cNvCxnSpPr>
+            <p:nvPr/>
+          </p:nvCxnSpPr>
+          <p:spPr>
+            <a:xfrm>
+              <a:off x="17861805" y="6873877"/>
+              <a:ext cx="1207698" cy="0"/>
+            </a:xfrm>
+            <a:prstGeom prst="line">
+              <a:avLst/>
+            </a:prstGeom>
+            <a:ln w="50800">
+              <a:solidFill>
+                <a:schemeClr val="bg1">
+                  <a:lumMod val="50000"/>
+                </a:schemeClr>
+              </a:solidFill>
+            </a:ln>
+          </p:spPr>
+          <p:style>
+            <a:lnRef idx="1">
+              <a:schemeClr val="accent1"/>
+            </a:lnRef>
+            <a:fillRef idx="0">
+              <a:schemeClr val="accent1"/>
+            </a:fillRef>
+            <a:effectRef idx="0">
+              <a:schemeClr val="accent1"/>
+            </a:effectRef>
+            <a:fontRef idx="minor">
+              <a:schemeClr val="tx1"/>
+            </a:fontRef>
+          </p:style>
+        </p:cxnSp>
+        <p:sp>
+          <p:nvSpPr>
+            <p:cNvPr id="237" name="TextBox 236">
+              <a:extLst>
+                <a:ext uri="{FF2B5EF4-FFF2-40B4-BE49-F238E27FC236}">
+                  <a16:creationId xmlns:a16="http://schemas.microsoft.com/office/drawing/2014/main" id="{9CFF49E7-8D25-3AB1-F4C2-9CF0D45A1A5B}"/>
+                </a:ext>
+              </a:extLst>
+            </p:cNvPr>
+            <p:cNvSpPr txBox="1"/>
+            <p:nvPr/>
+          </p:nvSpPr>
+          <p:spPr>
+            <a:xfrm>
+              <a:off x="19225425" y="4674873"/>
+              <a:ext cx="1646605" cy="553998"/>
+            </a:xfrm>
+            <a:prstGeom prst="rect">
+              <a:avLst/>
+            </a:prstGeom>
+            <a:noFill/>
+          </p:spPr>
+          <p:txBody>
+            <a:bodyPr wrap="none" rtlCol="0">
+              <a:spAutoFit/>
+            </a:bodyPr>
+            <a:lstStyle/>
+            <a:p>
+              <a:r>
+                <a:rPr lang="en-US" sz="3000" dirty="0">
+                  <a:latin typeface="Times New Roman" panose="02020603050405020304" pitchFamily="18" charset="0"/>
+                  <a:cs typeface="Times New Roman" panose="02020603050405020304" pitchFamily="18" charset="0"/>
+                </a:rPr>
+                <a:t>p ≤ 0.001</a:t>
+              </a:r>
+            </a:p>
+          </p:txBody>
+        </p:sp>
+        <p:sp>
+          <p:nvSpPr>
+            <p:cNvPr id="238" name="TextBox 237">
+              <a:extLst>
+                <a:ext uri="{FF2B5EF4-FFF2-40B4-BE49-F238E27FC236}">
+                  <a16:creationId xmlns:a16="http://schemas.microsoft.com/office/drawing/2014/main" id="{A7236769-E773-09EF-61A0-8C41317E8981}"/>
+                </a:ext>
+              </a:extLst>
+            </p:cNvPr>
+            <p:cNvSpPr txBox="1"/>
+            <p:nvPr/>
+          </p:nvSpPr>
+          <p:spPr>
+            <a:xfrm>
+              <a:off x="19226427" y="5591743"/>
+              <a:ext cx="1646605" cy="553998"/>
+            </a:xfrm>
+            <a:prstGeom prst="rect">
+              <a:avLst/>
+            </a:prstGeom>
+            <a:noFill/>
+          </p:spPr>
+          <p:txBody>
+            <a:bodyPr wrap="none" rtlCol="0">
+              <a:spAutoFit/>
+            </a:bodyPr>
+            <a:lstStyle/>
+            <a:p>
+              <a:r>
+                <a:rPr lang="en-US" sz="3000" dirty="0">
+                  <a:latin typeface="Times New Roman" panose="02020603050405020304" pitchFamily="18" charset="0"/>
+                  <a:cs typeface="Times New Roman" panose="02020603050405020304" pitchFamily="18" charset="0"/>
+                </a:rPr>
+                <a:t>p ≤ 0.010</a:t>
+              </a:r>
+            </a:p>
+          </p:txBody>
+        </p:sp>
+        <p:sp>
+          <p:nvSpPr>
+            <p:cNvPr id="239" name="TextBox 238">
+              <a:extLst>
+                <a:ext uri="{FF2B5EF4-FFF2-40B4-BE49-F238E27FC236}">
+                  <a16:creationId xmlns:a16="http://schemas.microsoft.com/office/drawing/2014/main" id="{5FDF0DB0-1B64-2214-A5CE-5E8FB72C9799}"/>
+                </a:ext>
+              </a:extLst>
+            </p:cNvPr>
+            <p:cNvSpPr txBox="1"/>
+            <p:nvPr/>
+          </p:nvSpPr>
+          <p:spPr>
+            <a:xfrm>
+              <a:off x="19225425" y="6508613"/>
+              <a:ext cx="1646605" cy="553998"/>
+            </a:xfrm>
+            <a:prstGeom prst="rect">
+              <a:avLst/>
+            </a:prstGeom>
+            <a:noFill/>
+          </p:spPr>
+          <p:txBody>
+            <a:bodyPr wrap="none" rtlCol="0">
+              <a:spAutoFit/>
+            </a:bodyPr>
+            <a:lstStyle/>
+            <a:p>
+              <a:r>
+                <a:rPr lang="en-US" sz="3000" dirty="0">
+                  <a:latin typeface="Times New Roman" panose="02020603050405020304" pitchFamily="18" charset="0"/>
+                  <a:cs typeface="Times New Roman" panose="02020603050405020304" pitchFamily="18" charset="0"/>
+                </a:rPr>
+                <a:t>p ≤ 0.050</a:t>
+              </a:r>
+            </a:p>
+          </p:txBody>
+        </p:sp>
+        <p:sp>
+          <p:nvSpPr>
+            <p:cNvPr id="240" name="Rectangle 239">
+              <a:extLst>
+                <a:ext uri="{FF2B5EF4-FFF2-40B4-BE49-F238E27FC236}">
+                  <a16:creationId xmlns:a16="http://schemas.microsoft.com/office/drawing/2014/main" id="{5D10A088-0895-D700-DF77-99732A6961D8}"/>
+                </a:ext>
+              </a:extLst>
+            </p:cNvPr>
+            <p:cNvSpPr/>
+            <p:nvPr/>
+          </p:nvSpPr>
+          <p:spPr>
+            <a:xfrm>
+              <a:off x="17640885" y="4497656"/>
+              <a:ext cx="3404081" cy="2716263"/>
+            </a:xfrm>
+            <a:prstGeom prst="rect">
+              <a:avLst/>
+            </a:prstGeom>
+            <a:noFill/>
+            <a:ln w="50800">
+              <a:solidFill>
+                <a:schemeClr val="tx1"/>
+              </a:solidFill>
+            </a:ln>
+          </p:spPr>
+          <p:style>
+            <a:lnRef idx="2">
+              <a:schemeClr val="accent1">
+                <a:shade val="50000"/>
+              </a:schemeClr>
+            </a:lnRef>
+            <a:fillRef idx="1">
+              <a:schemeClr val="accent1"/>
+            </a:fillRef>
+            <a:effectRef idx="0">
+              <a:schemeClr val="accent1"/>
+            </a:effectRef>
+            <a:fontRef idx="minor">
+              <a:schemeClr val="lt1"/>
+            </a:fontRef>
+          </p:style>
+          <p:txBody>
+            <a:bodyPr rtlCol="0" anchor="ctr"/>
+            <a:lstStyle/>
+            <a:p>
+              <a:pPr algn="ctr"/>
+              <a:endParaRPr lang="en-US"/>
+            </a:p>
+          </p:txBody>
+        </p:sp>
+      </p:grpSp>
+      <p:cxnSp>
+        <p:nvCxnSpPr>
+          <p:cNvPr id="242" name="Straight Arrow Connector 241">
+            <a:extLst>
+              <a:ext uri="{FF2B5EF4-FFF2-40B4-BE49-F238E27FC236}">
+                <a16:creationId xmlns:a16="http://schemas.microsoft.com/office/drawing/2014/main" id="{AA750669-BE99-8A39-229C-CAC31114E1F3}"/>
+              </a:ext>
+            </a:extLst>
+          </p:cNvPr>
+          <p:cNvCxnSpPr>
+            <a:cxnSpLocks/>
+          </p:cNvCxnSpPr>
+          <p:nvPr/>
+        </p:nvCxnSpPr>
+        <p:spPr>
+          <a:xfrm>
+            <a:off x="3433133" y="5399631"/>
+            <a:ext cx="7508524" cy="2099745"/>
+          </a:xfrm>
+          <a:prstGeom prst="straightConnector1">
+            <a:avLst/>
+          </a:prstGeom>
+          <a:ln w="152400">
+            <a:solidFill>
+              <a:schemeClr val="bg1">
+                <a:lumMod val="50000"/>
+              </a:schemeClr>
+            </a:solidFill>
+            <a:tailEnd type="triangle"/>
+          </a:ln>
+        </p:spPr>
+        <p:style>
+          <a:lnRef idx="1">
+            <a:schemeClr val="accent1"/>
+          </a:lnRef>
+          <a:fillRef idx="0">
+            <a:schemeClr val="accent1"/>
+          </a:fillRef>
+          <a:effectRef idx="0">
+            <a:schemeClr val="accent1"/>
+          </a:effectRef>
+          <a:fontRef idx="minor">
+            <a:schemeClr val="tx1"/>
+          </a:fontRef>
+        </p:style>
+      </p:cxnSp>
+      <p:cxnSp>
+        <p:nvCxnSpPr>
+          <p:cNvPr id="243" name="Straight Arrow Connector 242">
+            <a:extLst>
+              <a:ext uri="{FF2B5EF4-FFF2-40B4-BE49-F238E27FC236}">
+                <a16:creationId xmlns:a16="http://schemas.microsoft.com/office/drawing/2014/main" id="{FF39F6D3-1FFD-F3AE-B112-456BC7E4F953}"/>
+              </a:ext>
+            </a:extLst>
+          </p:cNvPr>
+          <p:cNvCxnSpPr>
+            <a:cxnSpLocks/>
+            <a:endCxn id="149" idx="0"/>
+          </p:cNvCxnSpPr>
+          <p:nvPr/>
+        </p:nvCxnSpPr>
+        <p:spPr>
+          <a:xfrm>
+            <a:off x="11876070" y="5303119"/>
+            <a:ext cx="2" cy="2036255"/>
+          </a:xfrm>
+          <a:prstGeom prst="straightConnector1">
+            <a:avLst/>
+          </a:prstGeom>
+          <a:ln w="152400">
+            <a:solidFill>
+              <a:schemeClr val="bg1">
+                <a:lumMod val="50000"/>
+              </a:schemeClr>
+            </a:solidFill>
+            <a:tailEnd type="triangle"/>
+          </a:ln>
+        </p:spPr>
+        <p:style>
+          <a:lnRef idx="1">
+            <a:schemeClr val="accent1"/>
+          </a:lnRef>
+          <a:fillRef idx="0">
+            <a:schemeClr val="accent1"/>
+          </a:fillRef>
+          <a:effectRef idx="0">
+            <a:schemeClr val="accent1"/>
+          </a:effectRef>
+          <a:fontRef idx="minor">
+            <a:schemeClr val="tx1"/>
+          </a:fontRef>
+        </p:style>
+      </p:cxnSp>
+      <p:sp>
+        <p:nvSpPr>
+          <p:cNvPr id="147" name="Rectangle 146">
+            <a:extLst>
+              <a:ext uri="{FF2B5EF4-FFF2-40B4-BE49-F238E27FC236}">
+                <a16:creationId xmlns:a16="http://schemas.microsoft.com/office/drawing/2014/main" id="{C5E78A6B-70A3-51B7-4E35-61DC0344F209}"/>
+              </a:ext>
+            </a:extLst>
+          </p:cNvPr>
+          <p:cNvSpPr/>
+          <p:nvPr/>
+        </p:nvSpPr>
+        <p:spPr>
+          <a:xfrm>
+            <a:off x="10944110" y="4599810"/>
+            <a:ext cx="1819398" cy="877223"/>
+          </a:xfrm>
+          <a:prstGeom prst="rect">
+            <a:avLst/>
+          </a:prstGeom>
+          <a:solidFill>
+            <a:schemeClr val="bg1"/>
+          </a:solidFill>
+          <a:ln w="38100">
+            <a:solidFill>
+              <a:schemeClr val="tx1"/>
+            </a:solidFill>
+          </a:ln>
+        </p:spPr>
+        <p:style>
+          <a:lnRef idx="2">
+            <a:schemeClr val="accent1">
+              <a:shade val="50000"/>
+            </a:schemeClr>
+          </a:lnRef>
+          <a:fillRef idx="1">
+            <a:schemeClr val="accent1"/>
+          </a:fillRef>
+          <a:effectRef idx="0">
+            <a:schemeClr val="accent1"/>
+          </a:effectRef>
+          <a:fontRef idx="minor">
+            <a:schemeClr val="lt1"/>
+          </a:fontRef>
+        </p:style>
+        <p:txBody>
+          <a:bodyPr rtlCol="0" anchor="ctr"/>
+          <a:lstStyle/>
+          <a:p>
+            <a:pPr algn="ctr"/>
+            <a:r>
+              <a:rPr lang="en-US" sz="3000" i="1" dirty="0">
+                <a:solidFill>
+                  <a:schemeClr val="tx1"/>
+                </a:solidFill>
+                <a:latin typeface="Times New Roman" panose="02020603050405020304" pitchFamily="18" charset="0"/>
+                <a:cs typeface="Times New Roman" panose="02020603050405020304" pitchFamily="18" charset="0"/>
+              </a:rPr>
+              <a:t>Photo. pathway</a:t>
+            </a:r>
+          </a:p>
+        </p:txBody>
+      </p:sp>
+      <p:cxnSp>
+        <p:nvCxnSpPr>
+          <p:cNvPr id="253" name="Straight Arrow Connector 252">
+            <a:extLst>
+              <a:ext uri="{FF2B5EF4-FFF2-40B4-BE49-F238E27FC236}">
+                <a16:creationId xmlns:a16="http://schemas.microsoft.com/office/drawing/2014/main" id="{62482A44-8A36-3A18-8E70-0957E968DD76}"/>
+              </a:ext>
+            </a:extLst>
+          </p:cNvPr>
+          <p:cNvCxnSpPr>
+            <a:cxnSpLocks/>
+            <a:stCxn id="144" idx="3"/>
+          </p:cNvCxnSpPr>
+          <p:nvPr/>
+        </p:nvCxnSpPr>
+        <p:spPr>
+          <a:xfrm flipV="1">
+            <a:off x="3666929" y="8230506"/>
+            <a:ext cx="7274728" cy="2274311"/>
+          </a:xfrm>
+          <a:prstGeom prst="straightConnector1">
+            <a:avLst/>
+          </a:prstGeom>
+          <a:ln w="152400">
+            <a:solidFill>
+              <a:schemeClr val="bg1">
+                <a:lumMod val="50000"/>
+              </a:schemeClr>
+            </a:solidFill>
+            <a:tailEnd type="triangle"/>
+          </a:ln>
+        </p:spPr>
+        <p:style>
+          <a:lnRef idx="1">
+            <a:schemeClr val="accent1"/>
+          </a:lnRef>
+          <a:fillRef idx="0">
+            <a:schemeClr val="accent1"/>
+          </a:fillRef>
+          <a:effectRef idx="0">
+            <a:schemeClr val="accent1"/>
+          </a:effectRef>
+          <a:fontRef idx="minor">
+            <a:schemeClr val="tx1"/>
+          </a:fontRef>
+        </p:style>
+      </p:cxnSp>
+    </p:spTree>
+    <p:extLst>
+      <p:ext uri="{BB962C8B-B14F-4D97-AF65-F5344CB8AC3E}">
+        <p14:creationId xmlns:p14="http://schemas.microsoft.com/office/powerpoint/2010/main" val="1732071468"/>
       </p:ext>
     </p:extLst>
   </p:cSld>

</xml_diff>

<commit_message>
work through rest of introduction and finalize sem results
</commit_message>
<xml_diff>
--- a/working_drafts/figs/TXeco_SEM_ppt_fig.pptx
+++ b/working_drafts/figs/TXeco_SEM_ppt_fig.pptx
@@ -200,7 +200,7 @@
           <a:p>
             <a:fld id="{9C8338E3-F40D-F146-8D3B-4726E84D5200}" type="datetimeFigureOut">
               <a:rPr lang="en-US" smtClean="0"/>
-              <a:t>1/4/23</a:t>
+              <a:t>1/12/23</a:t>
             </a:fld>
             <a:endParaRPr lang="en-US"/>
           </a:p>
@@ -645,6 +645,90 @@
 </p:notes>
 </file>
 
+<file path=ppt/notesSlides/notesSlide3.xml><?xml version="1.0" encoding="utf-8"?>
+<p:notes xmlns:a="http://schemas.openxmlformats.org/drawingml/2006/main" xmlns:r="http://schemas.openxmlformats.org/officeDocument/2006/relationships" xmlns:p="http://schemas.openxmlformats.org/presentationml/2006/main">
+  <p:cSld>
+    <p:spTree>
+      <p:nvGrpSpPr>
+        <p:cNvPr id="1" name=""/>
+        <p:cNvGrpSpPr/>
+        <p:nvPr/>
+      </p:nvGrpSpPr>
+      <p:grpSpPr>
+        <a:xfrm>
+          <a:off x="0" y="0"/>
+          <a:ext cx="0" cy="0"/>
+          <a:chOff x="0" y="0"/>
+          <a:chExt cx="0" cy="0"/>
+        </a:xfrm>
+      </p:grpSpPr>
+      <p:sp>
+        <p:nvSpPr>
+          <p:cNvPr id="2" name="Slide Image Placeholder 1"/>
+          <p:cNvSpPr>
+            <a:spLocks noGrp="1" noRot="1" noChangeAspect="1"/>
+          </p:cNvSpPr>
+          <p:nvPr>
+            <p:ph type="sldImg"/>
+          </p:nvPr>
+        </p:nvSpPr>
+        <p:spPr/>
+      </p:sp>
+      <p:sp>
+        <p:nvSpPr>
+          <p:cNvPr id="3" name="Notes Placeholder 2"/>
+          <p:cNvSpPr>
+            <a:spLocks noGrp="1"/>
+          </p:cNvSpPr>
+          <p:nvPr>
+            <p:ph type="body" idx="1"/>
+          </p:nvPr>
+        </p:nvSpPr>
+        <p:spPr/>
+        <p:txBody>
+          <a:bodyPr/>
+          <a:lstStyle/>
+          <a:p>
+            <a:endParaRPr lang="en-US" dirty="0"/>
+          </a:p>
+        </p:txBody>
+      </p:sp>
+      <p:sp>
+        <p:nvSpPr>
+          <p:cNvPr id="4" name="Slide Number Placeholder 3"/>
+          <p:cNvSpPr>
+            <a:spLocks noGrp="1"/>
+          </p:cNvSpPr>
+          <p:nvPr>
+            <p:ph type="sldNum" sz="quarter" idx="5"/>
+          </p:nvPr>
+        </p:nvSpPr>
+        <p:spPr/>
+        <p:txBody>
+          <a:bodyPr/>
+          <a:lstStyle/>
+          <a:p>
+            <a:fld id="{C2800238-33D2-A44F-8135-A0F534DB873D}" type="slidenum">
+              <a:rPr lang="en-US" smtClean="0"/>
+              <a:t>3</a:t>
+            </a:fld>
+            <a:endParaRPr lang="en-US"/>
+          </a:p>
+        </p:txBody>
+      </p:sp>
+    </p:spTree>
+    <p:extLst>
+      <p:ext uri="{BB962C8B-B14F-4D97-AF65-F5344CB8AC3E}">
+        <p14:creationId xmlns:p14="http://schemas.microsoft.com/office/powerpoint/2010/main" val="3251322014"/>
+      </p:ext>
+    </p:extLst>
+  </p:cSld>
+  <p:clrMapOvr>
+    <a:masterClrMapping/>
+  </p:clrMapOvr>
+</p:notes>
+</file>
+
 <file path=ppt/slideLayouts/slideLayout1.xml><?xml version="1.0" encoding="utf-8"?>
 <p:sldLayout xmlns:a="http://schemas.openxmlformats.org/drawingml/2006/main" xmlns:r="http://schemas.openxmlformats.org/officeDocument/2006/relationships" xmlns:p="http://schemas.openxmlformats.org/presentationml/2006/main" type="title" preserve="1">
   <p:cSld name="Title Slide">
@@ -776,7 +860,7 @@
           <a:p>
             <a:fld id="{D3A28AA4-801E-B147-9E5C-6E6DBA6E23D1}" type="datetimeFigureOut">
               <a:rPr lang="en-US" smtClean="0"/>
-              <a:t>1/4/23</a:t>
+              <a:t>1/12/23</a:t>
             </a:fld>
             <a:endParaRPr lang="en-US"/>
           </a:p>
@@ -946,7 +1030,7 @@
           <a:p>
             <a:fld id="{D3A28AA4-801E-B147-9E5C-6E6DBA6E23D1}" type="datetimeFigureOut">
               <a:rPr lang="en-US" smtClean="0"/>
-              <a:t>1/4/23</a:t>
+              <a:t>1/12/23</a:t>
             </a:fld>
             <a:endParaRPr lang="en-US"/>
           </a:p>
@@ -1126,7 +1210,7 @@
           <a:p>
             <a:fld id="{D3A28AA4-801E-B147-9E5C-6E6DBA6E23D1}" type="datetimeFigureOut">
               <a:rPr lang="en-US" smtClean="0"/>
-              <a:t>1/4/23</a:t>
+              <a:t>1/12/23</a:t>
             </a:fld>
             <a:endParaRPr lang="en-US"/>
           </a:p>
@@ -1296,7 +1380,7 @@
           <a:p>
             <a:fld id="{D3A28AA4-801E-B147-9E5C-6E6DBA6E23D1}" type="datetimeFigureOut">
               <a:rPr lang="en-US" smtClean="0"/>
-              <a:t>1/4/23</a:t>
+              <a:t>1/12/23</a:t>
             </a:fld>
             <a:endParaRPr lang="en-US"/>
           </a:p>
@@ -1540,7 +1624,7 @@
           <a:p>
             <a:fld id="{D3A28AA4-801E-B147-9E5C-6E6DBA6E23D1}" type="datetimeFigureOut">
               <a:rPr lang="en-US" smtClean="0"/>
-              <a:t>1/4/23</a:t>
+              <a:t>1/12/23</a:t>
             </a:fld>
             <a:endParaRPr lang="en-US"/>
           </a:p>
@@ -1772,7 +1856,7 @@
           <a:p>
             <a:fld id="{D3A28AA4-801E-B147-9E5C-6E6DBA6E23D1}" type="datetimeFigureOut">
               <a:rPr lang="en-US" smtClean="0"/>
-              <a:t>1/4/23</a:t>
+              <a:t>1/12/23</a:t>
             </a:fld>
             <a:endParaRPr lang="en-US"/>
           </a:p>
@@ -2139,7 +2223,7 @@
           <a:p>
             <a:fld id="{D3A28AA4-801E-B147-9E5C-6E6DBA6E23D1}" type="datetimeFigureOut">
               <a:rPr lang="en-US" smtClean="0"/>
-              <a:t>1/4/23</a:t>
+              <a:t>1/12/23</a:t>
             </a:fld>
             <a:endParaRPr lang="en-US"/>
           </a:p>
@@ -2257,7 +2341,7 @@
           <a:p>
             <a:fld id="{D3A28AA4-801E-B147-9E5C-6E6DBA6E23D1}" type="datetimeFigureOut">
               <a:rPr lang="en-US" smtClean="0"/>
-              <a:t>1/4/23</a:t>
+              <a:t>1/12/23</a:t>
             </a:fld>
             <a:endParaRPr lang="en-US"/>
           </a:p>
@@ -2352,7 +2436,7 @@
           <a:p>
             <a:fld id="{D3A28AA4-801E-B147-9E5C-6E6DBA6E23D1}" type="datetimeFigureOut">
               <a:rPr lang="en-US" smtClean="0"/>
-              <a:t>1/4/23</a:t>
+              <a:t>1/12/23</a:t>
             </a:fld>
             <a:endParaRPr lang="en-US"/>
           </a:p>
@@ -2629,7 +2713,7 @@
           <a:p>
             <a:fld id="{D3A28AA4-801E-B147-9E5C-6E6DBA6E23D1}" type="datetimeFigureOut">
               <a:rPr lang="en-US" smtClean="0"/>
-              <a:t>1/4/23</a:t>
+              <a:t>1/12/23</a:t>
             </a:fld>
             <a:endParaRPr lang="en-US"/>
           </a:p>
@@ -2886,7 +2970,7 @@
           <a:p>
             <a:fld id="{D3A28AA4-801E-B147-9E5C-6E6DBA6E23D1}" type="datetimeFigureOut">
               <a:rPr lang="en-US" smtClean="0"/>
-              <a:t>1/4/23</a:t>
+              <a:t>1/12/23</a:t>
             </a:fld>
             <a:endParaRPr lang="en-US"/>
           </a:p>
@@ -3099,7 +3183,7 @@
           <a:p>
             <a:fld id="{D3A28AA4-801E-B147-9E5C-6E6DBA6E23D1}" type="datetimeFigureOut">
               <a:rPr lang="en-US" smtClean="0"/>
-              <a:t>1/4/23</a:t>
+              <a:t>1/12/23</a:t>
             </a:fld>
             <a:endParaRPr lang="en-US"/>
           </a:p>
@@ -8622,7 +8706,7 @@
         </p:nvSpPr>
         <p:spPr>
           <a:xfrm>
-            <a:off x="15530050" y="7325461"/>
+            <a:off x="18822094" y="7019165"/>
             <a:ext cx="1819398" cy="877223"/>
           </a:xfrm>
           <a:prstGeom prst="rect">
@@ -8659,7 +8743,7 @@
           <a:p>
             <a:pPr algn="ctr"/>
             <a:r>
-              <a:rPr lang="el-GR" sz="3000" i="1" dirty="0">
+              <a:rPr lang="el-GR" sz="3000" b="1" i="1" dirty="0">
                 <a:solidFill>
                   <a:schemeClr val="tx1"/>
                 </a:solidFill>
@@ -8669,7 +8753,7 @@
               <a:t>Ν</a:t>
             </a:r>
             <a:r>
-              <a:rPr lang="en-US" sz="3000" baseline="-25000" dirty="0">
+              <a:rPr lang="en-US" sz="3000" b="1" baseline="-25000" dirty="0">
                 <a:solidFill>
                   <a:schemeClr val="tx1"/>
                 </a:solidFill>
@@ -8678,7 +8762,7 @@
               </a:rPr>
               <a:t>area</a:t>
             </a:r>
-            <a:endParaRPr lang="en-US" sz="3000" i="1" dirty="0">
+            <a:endParaRPr lang="en-US" sz="3000" b="1" i="1" dirty="0">
               <a:solidFill>
                 <a:schemeClr val="tx1"/>
               </a:solidFill>
@@ -8688,76 +8772,6 @@
           </a:p>
         </p:txBody>
       </p:sp>
-      <p:sp>
-        <p:nvSpPr>
-          <p:cNvPr id="148" name="Rectangle 147">
-            <a:extLst>
-              <a:ext uri="{FF2B5EF4-FFF2-40B4-BE49-F238E27FC236}">
-                <a16:creationId xmlns:a16="http://schemas.microsoft.com/office/drawing/2014/main" id="{CAEEF86E-BF80-675F-3FA2-55D6B97D4497}"/>
-              </a:ext>
-            </a:extLst>
-          </p:cNvPr>
-          <p:cNvSpPr/>
-          <p:nvPr/>
-        </p:nvSpPr>
-        <p:spPr>
-          <a:xfrm>
-            <a:off x="6415678" y="7339372"/>
-            <a:ext cx="1819398" cy="877223"/>
-          </a:xfrm>
-          <a:prstGeom prst="rect">
-            <a:avLst/>
-          </a:prstGeom>
-          <a:solidFill>
-            <a:schemeClr val="bg1"/>
-          </a:solidFill>
-          <a:ln w="38100">
-            <a:solidFill>
-              <a:schemeClr val="tx1"/>
-            </a:solidFill>
-          </a:ln>
-        </p:spPr>
-        <p:style>
-          <a:lnRef idx="2">
-            <a:schemeClr val="accent1">
-              <a:shade val="50000"/>
-            </a:schemeClr>
-          </a:lnRef>
-          <a:fillRef idx="1">
-            <a:schemeClr val="accent1"/>
-          </a:fillRef>
-          <a:effectRef idx="0">
-            <a:schemeClr val="accent1"/>
-          </a:effectRef>
-          <a:fontRef idx="minor">
-            <a:schemeClr val="lt1"/>
-          </a:fontRef>
-        </p:style>
-        <p:txBody>
-          <a:bodyPr rtlCol="0" anchor="ctr"/>
-          <a:lstStyle/>
-          <a:p>
-            <a:pPr algn="ctr"/>
-            <a:r>
-              <a:rPr lang="el-GR" sz="3000" i="1" dirty="0">
-                <a:solidFill>
-                  <a:schemeClr val="tx1"/>
-                </a:solidFill>
-                <a:latin typeface="Times New Roman" panose="02020603050405020304" pitchFamily="18" charset="0"/>
-                <a:cs typeface="Times New Roman" panose="02020603050405020304" pitchFamily="18" charset="0"/>
-              </a:rPr>
-              <a:t>β</a:t>
-            </a:r>
-            <a:endParaRPr lang="en-US" sz="3000" i="1" dirty="0">
-              <a:solidFill>
-                <a:schemeClr val="tx1"/>
-              </a:solidFill>
-              <a:latin typeface="Times New Roman" panose="02020603050405020304" pitchFamily="18" charset="0"/>
-              <a:cs typeface="Times New Roman" panose="02020603050405020304" pitchFamily="18" charset="0"/>
-            </a:endParaRPr>
-          </a:p>
-        </p:txBody>
-      </p:sp>
       <p:cxnSp>
         <p:nvCxnSpPr>
           <p:cNvPr id="154" name="Straight Arrow Connector 153">
@@ -8776,13 +8790,13 @@
         </p:nvCxnSpPr>
         <p:spPr>
           <a:xfrm flipH="1" flipV="1">
-            <a:off x="3666929" y="5030891"/>
+            <a:off x="6958973" y="4724595"/>
             <a:ext cx="2707333" cy="7531"/>
           </a:xfrm>
           <a:prstGeom prst="straightConnector1">
             <a:avLst/>
           </a:prstGeom>
-          <a:ln w="118237">
+          <a:ln w="149098">
             <a:solidFill>
               <a:srgbClr val="C00000"/>
             </a:solidFill>
@@ -8822,59 +8836,13 @@
         </p:nvCxnSpPr>
         <p:spPr>
           <a:xfrm>
-            <a:off x="2757230" y="5469502"/>
+            <a:off x="6049274" y="5163206"/>
             <a:ext cx="0" cy="4596703"/>
           </a:xfrm>
           <a:prstGeom prst="straightConnector1">
             <a:avLst/>
           </a:prstGeom>
-          <a:ln w="77597">
-            <a:solidFill>
-              <a:schemeClr val="accent1">
-                <a:lumMod val="75000"/>
-              </a:schemeClr>
-            </a:solidFill>
-            <a:tailEnd type="triangle"/>
-          </a:ln>
-        </p:spPr>
-        <p:style>
-          <a:lnRef idx="1">
-            <a:schemeClr val="accent1"/>
-          </a:lnRef>
-          <a:fillRef idx="0">
-            <a:schemeClr val="accent1"/>
-          </a:fillRef>
-          <a:effectRef idx="0">
-            <a:schemeClr val="accent1"/>
-          </a:effectRef>
-          <a:fontRef idx="minor">
-            <a:schemeClr val="tx1"/>
-          </a:fontRef>
-        </p:style>
-      </p:cxnSp>
-      <p:cxnSp>
-        <p:nvCxnSpPr>
-          <p:cNvPr id="159" name="Straight Arrow Connector 158">
-            <a:extLst>
-              <a:ext uri="{FF2B5EF4-FFF2-40B4-BE49-F238E27FC236}">
-                <a16:creationId xmlns:a16="http://schemas.microsoft.com/office/drawing/2014/main" id="{390A7192-0F6D-E061-2173-EF54A80A8533}"/>
-              </a:ext>
-            </a:extLst>
-          </p:cNvPr>
-          <p:cNvCxnSpPr>
-            <a:cxnSpLocks/>
-          </p:cNvCxnSpPr>
-          <p:nvPr/>
-        </p:nvCxnSpPr>
-        <p:spPr>
-          <a:xfrm flipH="1">
-            <a:off x="8264187" y="4794920"/>
-            <a:ext cx="2915090" cy="2517812"/>
-          </a:xfrm>
-          <a:prstGeom prst="straightConnector1">
-            <a:avLst/>
-          </a:prstGeom>
-          <a:ln w="92710">
+          <a:ln w="97790">
             <a:solidFill>
               <a:schemeClr val="accent1">
                 <a:lumMod val="75000"/>
@@ -8915,13 +8883,13 @@
         </p:nvCxnSpPr>
         <p:spPr>
           <a:xfrm flipV="1">
-            <a:off x="3409756" y="7777984"/>
+            <a:off x="6701800" y="7471688"/>
             <a:ext cx="3005922" cy="2477973"/>
           </a:xfrm>
           <a:prstGeom prst="straightConnector1">
             <a:avLst/>
           </a:prstGeom>
-          <a:ln w="38100">
+          <a:ln w="48006">
             <a:solidFill>
               <a:srgbClr val="C00000"/>
             </a:solidFill>
@@ -8959,13 +8927,1105 @@
         </p:nvCxnSpPr>
         <p:spPr>
           <a:xfrm>
-            <a:off x="8212813" y="7777983"/>
+            <a:off x="11504857" y="7471687"/>
             <a:ext cx="2731297" cy="2"/>
           </a:xfrm>
           <a:prstGeom prst="straightConnector1">
             <a:avLst/>
           </a:prstGeom>
-          <a:ln w="49276">
+          <a:ln w="62102">
+            <a:solidFill>
+              <a:schemeClr val="accent1">
+                <a:lumMod val="75000"/>
+              </a:schemeClr>
+            </a:solidFill>
+            <a:tailEnd type="triangle"/>
+          </a:ln>
+        </p:spPr>
+        <p:style>
+          <a:lnRef idx="1">
+            <a:schemeClr val="accent1"/>
+          </a:lnRef>
+          <a:fillRef idx="0">
+            <a:schemeClr val="accent1"/>
+          </a:fillRef>
+          <a:effectRef idx="0">
+            <a:schemeClr val="accent1"/>
+          </a:effectRef>
+          <a:fontRef idx="minor">
+            <a:schemeClr val="tx1"/>
+          </a:fontRef>
+        </p:style>
+      </p:cxnSp>
+      <p:cxnSp>
+        <p:nvCxnSpPr>
+          <p:cNvPr id="178" name="Straight Arrow Connector 177">
+            <a:extLst>
+              <a:ext uri="{FF2B5EF4-FFF2-40B4-BE49-F238E27FC236}">
+                <a16:creationId xmlns:a16="http://schemas.microsoft.com/office/drawing/2014/main" id="{AD58EF09-8B95-4F31-0758-52C1BD1A684D}"/>
+              </a:ext>
+            </a:extLst>
+          </p:cNvPr>
+          <p:cNvCxnSpPr>
+            <a:cxnSpLocks/>
+            <a:stCxn id="145" idx="2"/>
+            <a:endCxn id="143" idx="0"/>
+          </p:cNvCxnSpPr>
+          <p:nvPr/>
+        </p:nvCxnSpPr>
+        <p:spPr>
+          <a:xfrm flipH="1">
+            <a:off x="19731793" y="5163206"/>
+            <a:ext cx="19454" cy="1855959"/>
+          </a:xfrm>
+          <a:prstGeom prst="straightConnector1">
+            <a:avLst/>
+          </a:prstGeom>
+          <a:ln w="185928">
+            <a:solidFill>
+              <a:schemeClr val="accent1">
+                <a:lumMod val="75000"/>
+              </a:schemeClr>
+            </a:solidFill>
+            <a:tailEnd type="triangle"/>
+          </a:ln>
+        </p:spPr>
+        <p:style>
+          <a:lnRef idx="1">
+            <a:schemeClr val="accent1"/>
+          </a:lnRef>
+          <a:fillRef idx="0">
+            <a:schemeClr val="accent1"/>
+          </a:fillRef>
+          <a:effectRef idx="0">
+            <a:schemeClr val="accent1"/>
+          </a:effectRef>
+          <a:fontRef idx="minor">
+            <a:schemeClr val="tx1"/>
+          </a:fontRef>
+        </p:style>
+      </p:cxnSp>
+      <p:cxnSp>
+        <p:nvCxnSpPr>
+          <p:cNvPr id="179" name="Straight Arrow Connector 178">
+            <a:extLst>
+              <a:ext uri="{FF2B5EF4-FFF2-40B4-BE49-F238E27FC236}">
+                <a16:creationId xmlns:a16="http://schemas.microsoft.com/office/drawing/2014/main" id="{64137A6B-9D81-CC04-4A56-CB43F3FBE38A}"/>
+              </a:ext>
+            </a:extLst>
+          </p:cNvPr>
+          <p:cNvCxnSpPr>
+            <a:cxnSpLocks/>
+            <a:stCxn id="146" idx="0"/>
+            <a:endCxn id="143" idx="2"/>
+          </p:cNvCxnSpPr>
+          <p:nvPr/>
+        </p:nvCxnSpPr>
+        <p:spPr>
+          <a:xfrm flipH="1" flipV="1">
+            <a:off x="19731793" y="7896388"/>
+            <a:ext cx="5166" cy="1863521"/>
+          </a:xfrm>
+          <a:prstGeom prst="straightConnector1">
+            <a:avLst/>
+          </a:prstGeom>
+          <a:ln w="189738">
+            <a:solidFill>
+              <a:schemeClr val="accent1">
+                <a:lumMod val="75000"/>
+              </a:schemeClr>
+            </a:solidFill>
+            <a:tailEnd type="triangle"/>
+          </a:ln>
+        </p:spPr>
+        <p:style>
+          <a:lnRef idx="1">
+            <a:schemeClr val="accent1"/>
+          </a:lnRef>
+          <a:fillRef idx="0">
+            <a:schemeClr val="accent1"/>
+          </a:fillRef>
+          <a:effectRef idx="0">
+            <a:schemeClr val="accent1"/>
+          </a:effectRef>
+          <a:fontRef idx="minor">
+            <a:schemeClr val="tx1"/>
+          </a:fontRef>
+        </p:style>
+      </p:cxnSp>
+      <p:sp>
+        <p:nvSpPr>
+          <p:cNvPr id="145" name="Rectangle 144">
+            <a:extLst>
+              <a:ext uri="{FF2B5EF4-FFF2-40B4-BE49-F238E27FC236}">
+                <a16:creationId xmlns:a16="http://schemas.microsoft.com/office/drawing/2014/main" id="{196DCF3C-1E9F-84BF-A1CB-74EFF6943139}"/>
+              </a:ext>
+            </a:extLst>
+          </p:cNvPr>
+          <p:cNvSpPr/>
+          <p:nvPr/>
+        </p:nvSpPr>
+        <p:spPr>
+          <a:xfrm>
+            <a:off x="18841548" y="4285983"/>
+            <a:ext cx="1819398" cy="877223"/>
+          </a:xfrm>
+          <a:prstGeom prst="rect">
+            <a:avLst/>
+          </a:prstGeom>
+          <a:solidFill>
+            <a:schemeClr val="bg1"/>
+          </a:solidFill>
+          <a:ln w="38100">
+            <a:solidFill>
+              <a:schemeClr val="tx1"/>
+            </a:solidFill>
+          </a:ln>
+        </p:spPr>
+        <p:style>
+          <a:lnRef idx="2">
+            <a:schemeClr val="accent1">
+              <a:shade val="50000"/>
+            </a:schemeClr>
+          </a:lnRef>
+          <a:fillRef idx="1">
+            <a:schemeClr val="accent1"/>
+          </a:fillRef>
+          <a:effectRef idx="0">
+            <a:schemeClr val="accent1"/>
+          </a:effectRef>
+          <a:fontRef idx="minor">
+            <a:schemeClr val="lt1"/>
+          </a:fontRef>
+        </p:style>
+        <p:txBody>
+          <a:bodyPr rtlCol="0" anchor="ctr"/>
+          <a:lstStyle/>
+          <a:p>
+            <a:pPr algn="ctr"/>
+            <a:r>
+              <a:rPr lang="en-US" sz="3000" b="1" i="1" dirty="0">
+                <a:solidFill>
+                  <a:schemeClr val="tx1"/>
+                </a:solidFill>
+                <a:latin typeface="Times New Roman" panose="02020603050405020304" pitchFamily="18" charset="0"/>
+                <a:cs typeface="Times New Roman" panose="02020603050405020304" pitchFamily="18" charset="0"/>
+              </a:rPr>
+              <a:t>N</a:t>
+            </a:r>
+            <a:r>
+              <a:rPr lang="en-US" sz="3000" b="1" baseline="-25000" dirty="0">
+                <a:solidFill>
+                  <a:schemeClr val="tx1"/>
+                </a:solidFill>
+                <a:latin typeface="Times New Roman" panose="02020603050405020304" pitchFamily="18" charset="0"/>
+                <a:cs typeface="Times New Roman" panose="02020603050405020304" pitchFamily="18" charset="0"/>
+              </a:rPr>
+              <a:t>mass</a:t>
+            </a:r>
+            <a:endParaRPr lang="en-US" sz="3000" b="1" i="1" dirty="0">
+              <a:solidFill>
+                <a:schemeClr val="tx1"/>
+              </a:solidFill>
+              <a:latin typeface="Times New Roman" panose="02020603050405020304" pitchFamily="18" charset="0"/>
+              <a:cs typeface="Times New Roman" panose="02020603050405020304" pitchFamily="18" charset="0"/>
+            </a:endParaRPr>
+          </a:p>
+        </p:txBody>
+      </p:sp>
+      <p:sp>
+        <p:nvSpPr>
+          <p:cNvPr id="146" name="Rectangle 145">
+            <a:extLst>
+              <a:ext uri="{FF2B5EF4-FFF2-40B4-BE49-F238E27FC236}">
+                <a16:creationId xmlns:a16="http://schemas.microsoft.com/office/drawing/2014/main" id="{831EFE87-5954-79FB-5410-F4BC8563FCDF}"/>
+              </a:ext>
+            </a:extLst>
+          </p:cNvPr>
+          <p:cNvSpPr/>
+          <p:nvPr/>
+        </p:nvSpPr>
+        <p:spPr>
+          <a:xfrm>
+            <a:off x="18827260" y="9759909"/>
+            <a:ext cx="1819398" cy="877223"/>
+          </a:xfrm>
+          <a:prstGeom prst="rect">
+            <a:avLst/>
+          </a:prstGeom>
+          <a:solidFill>
+            <a:schemeClr val="bg1"/>
+          </a:solidFill>
+          <a:ln w="38100">
+            <a:solidFill>
+              <a:schemeClr val="tx1"/>
+            </a:solidFill>
+          </a:ln>
+        </p:spPr>
+        <p:style>
+          <a:lnRef idx="2">
+            <a:schemeClr val="accent1">
+              <a:shade val="50000"/>
+            </a:schemeClr>
+          </a:lnRef>
+          <a:fillRef idx="1">
+            <a:schemeClr val="accent1"/>
+          </a:fillRef>
+          <a:effectRef idx="0">
+            <a:schemeClr val="accent1"/>
+          </a:effectRef>
+          <a:fontRef idx="minor">
+            <a:schemeClr val="lt1"/>
+          </a:fontRef>
+        </p:style>
+        <p:txBody>
+          <a:bodyPr rtlCol="0" anchor="ctr"/>
+          <a:lstStyle/>
+          <a:p>
+            <a:pPr algn="ctr"/>
+            <a:r>
+              <a:rPr lang="en-US" sz="3000" b="1" i="1" dirty="0">
+                <a:solidFill>
+                  <a:schemeClr val="tx1"/>
+                </a:solidFill>
+                <a:latin typeface="Times New Roman" panose="02020603050405020304" pitchFamily="18" charset="0"/>
+                <a:cs typeface="Times New Roman" panose="02020603050405020304" pitchFamily="18" charset="0"/>
+              </a:rPr>
+              <a:t>M</a:t>
+            </a:r>
+            <a:r>
+              <a:rPr lang="en-US" sz="3000" b="1" baseline="-25000" dirty="0">
+                <a:solidFill>
+                  <a:schemeClr val="tx1"/>
+                </a:solidFill>
+                <a:latin typeface="Times New Roman" panose="02020603050405020304" pitchFamily="18" charset="0"/>
+                <a:cs typeface="Times New Roman" panose="02020603050405020304" pitchFamily="18" charset="0"/>
+              </a:rPr>
+              <a:t>area</a:t>
+            </a:r>
+            <a:endParaRPr lang="en-US" sz="3000" b="1" i="1" dirty="0">
+              <a:solidFill>
+                <a:schemeClr val="tx1"/>
+              </a:solidFill>
+              <a:latin typeface="Times New Roman" panose="02020603050405020304" pitchFamily="18" charset="0"/>
+              <a:cs typeface="Times New Roman" panose="02020603050405020304" pitchFamily="18" charset="0"/>
+            </a:endParaRPr>
+          </a:p>
+        </p:txBody>
+      </p:sp>
+      <p:cxnSp>
+        <p:nvCxnSpPr>
+          <p:cNvPr id="185" name="Straight Arrow Connector 184">
+            <a:extLst>
+              <a:ext uri="{FF2B5EF4-FFF2-40B4-BE49-F238E27FC236}">
+                <a16:creationId xmlns:a16="http://schemas.microsoft.com/office/drawing/2014/main" id="{258C187C-B6A3-5852-85DF-896F3B7E817C}"/>
+              </a:ext>
+            </a:extLst>
+          </p:cNvPr>
+          <p:cNvCxnSpPr>
+            <a:cxnSpLocks/>
+            <a:endCxn id="146" idx="1"/>
+          </p:cNvCxnSpPr>
+          <p:nvPr/>
+        </p:nvCxnSpPr>
+        <p:spPr>
+          <a:xfrm>
+            <a:off x="14910942" y="7737567"/>
+            <a:ext cx="3916318" cy="2460954"/>
+          </a:xfrm>
+          <a:prstGeom prst="straightConnector1">
+            <a:avLst/>
+          </a:prstGeom>
+          <a:ln w="94869">
+            <a:solidFill>
+              <a:srgbClr val="C00000"/>
+            </a:solidFill>
+            <a:tailEnd type="triangle"/>
+          </a:ln>
+        </p:spPr>
+        <p:style>
+          <a:lnRef idx="1">
+            <a:schemeClr val="accent1"/>
+          </a:lnRef>
+          <a:fillRef idx="0">
+            <a:schemeClr val="accent1"/>
+          </a:fillRef>
+          <a:effectRef idx="0">
+            <a:schemeClr val="accent1"/>
+          </a:effectRef>
+          <a:fontRef idx="minor">
+            <a:schemeClr val="tx1"/>
+          </a:fontRef>
+        </p:style>
+      </p:cxnSp>
+      <p:cxnSp>
+        <p:nvCxnSpPr>
+          <p:cNvPr id="186" name="Straight Arrow Connector 185">
+            <a:extLst>
+              <a:ext uri="{FF2B5EF4-FFF2-40B4-BE49-F238E27FC236}">
+                <a16:creationId xmlns:a16="http://schemas.microsoft.com/office/drawing/2014/main" id="{8F9CC82C-68F6-632C-D6BC-9D720D68E3E7}"/>
+              </a:ext>
+            </a:extLst>
+          </p:cNvPr>
+          <p:cNvCxnSpPr>
+            <a:cxnSpLocks/>
+          </p:cNvCxnSpPr>
+          <p:nvPr/>
+        </p:nvCxnSpPr>
+        <p:spPr>
+          <a:xfrm>
+            <a:off x="6958973" y="10527145"/>
+            <a:ext cx="11868287" cy="0"/>
+          </a:xfrm>
+          <a:prstGeom prst="straightConnector1">
+            <a:avLst/>
+          </a:prstGeom>
+          <a:ln w="32004">
+            <a:solidFill>
+              <a:srgbClr val="C00000"/>
+            </a:solidFill>
+            <a:tailEnd type="triangle"/>
+          </a:ln>
+        </p:spPr>
+        <p:style>
+          <a:lnRef idx="1">
+            <a:schemeClr val="accent1"/>
+          </a:lnRef>
+          <a:fillRef idx="0">
+            <a:schemeClr val="accent1"/>
+          </a:fillRef>
+          <a:effectRef idx="0">
+            <a:schemeClr val="accent1"/>
+          </a:effectRef>
+          <a:fontRef idx="minor">
+            <a:schemeClr val="tx1"/>
+          </a:fontRef>
+        </p:style>
+      </p:cxnSp>
+      <p:cxnSp>
+        <p:nvCxnSpPr>
+          <p:cNvPr id="192" name="Elbow Connector 191">
+            <a:extLst>
+              <a:ext uri="{FF2B5EF4-FFF2-40B4-BE49-F238E27FC236}">
+                <a16:creationId xmlns:a16="http://schemas.microsoft.com/office/drawing/2014/main" id="{70E41ED9-E24C-CA45-C448-4A15D4E18233}"/>
+              </a:ext>
+            </a:extLst>
+          </p:cNvPr>
+          <p:cNvCxnSpPr>
+            <a:cxnSpLocks/>
+            <a:stCxn id="150" idx="1"/>
+            <a:endCxn id="146" idx="2"/>
+          </p:cNvCxnSpPr>
+          <p:nvPr/>
+        </p:nvCxnSpPr>
+        <p:spPr>
+          <a:xfrm rot="10800000" flipH="1" flipV="1">
+            <a:off x="5139575" y="4724594"/>
+            <a:ext cx="14597384" cy="5912537"/>
+          </a:xfrm>
+          <a:prstGeom prst="bentConnector4">
+            <a:avLst>
+              <a:gd name="adj1" fmla="val -6460"/>
+              <a:gd name="adj2" fmla="val 115948"/>
+            </a:avLst>
+          </a:prstGeom>
+          <a:ln w="27051">
+            <a:solidFill>
+              <a:srgbClr val="C00000"/>
+            </a:solidFill>
+            <a:tailEnd type="triangle"/>
+          </a:ln>
+        </p:spPr>
+        <p:style>
+          <a:lnRef idx="1">
+            <a:schemeClr val="accent1"/>
+          </a:lnRef>
+          <a:fillRef idx="0">
+            <a:schemeClr val="accent1"/>
+          </a:fillRef>
+          <a:effectRef idx="0">
+            <a:schemeClr val="accent1"/>
+          </a:effectRef>
+          <a:fontRef idx="minor">
+            <a:schemeClr val="tx1"/>
+          </a:fontRef>
+        </p:style>
+      </p:cxnSp>
+      <p:cxnSp>
+        <p:nvCxnSpPr>
+          <p:cNvPr id="196" name="Straight Arrow Connector 195">
+            <a:extLst>
+              <a:ext uri="{FF2B5EF4-FFF2-40B4-BE49-F238E27FC236}">
+                <a16:creationId xmlns:a16="http://schemas.microsoft.com/office/drawing/2014/main" id="{D3D39525-618A-0E5E-5962-FA061AF403E3}"/>
+              </a:ext>
+            </a:extLst>
+          </p:cNvPr>
+          <p:cNvCxnSpPr>
+            <a:cxnSpLocks/>
+          </p:cNvCxnSpPr>
+          <p:nvPr/>
+        </p:nvCxnSpPr>
+        <p:spPr>
+          <a:xfrm flipV="1">
+            <a:off x="6772327" y="5170830"/>
+            <a:ext cx="12040183" cy="5027690"/>
+          </a:xfrm>
+          <a:prstGeom prst="straightConnector1">
+            <a:avLst/>
+          </a:prstGeom>
+          <a:ln w="51181">
+            <a:solidFill>
+              <a:schemeClr val="accent1">
+                <a:lumMod val="75000"/>
+              </a:schemeClr>
+            </a:solidFill>
+            <a:tailEnd type="triangle"/>
+          </a:ln>
+        </p:spPr>
+        <p:style>
+          <a:lnRef idx="1">
+            <a:schemeClr val="accent1"/>
+          </a:lnRef>
+          <a:fillRef idx="0">
+            <a:schemeClr val="accent1"/>
+          </a:fillRef>
+          <a:effectRef idx="0">
+            <a:schemeClr val="accent1"/>
+          </a:effectRef>
+          <a:fontRef idx="minor">
+            <a:schemeClr val="tx1"/>
+          </a:fontRef>
+        </p:style>
+      </p:cxnSp>
+      <p:cxnSp>
+        <p:nvCxnSpPr>
+          <p:cNvPr id="168" name="Straight Arrow Connector 167">
+            <a:extLst>
+              <a:ext uri="{FF2B5EF4-FFF2-40B4-BE49-F238E27FC236}">
+                <a16:creationId xmlns:a16="http://schemas.microsoft.com/office/drawing/2014/main" id="{1EF4A41A-5F73-8BC5-33B7-31C8F1EBE768}"/>
+              </a:ext>
+            </a:extLst>
+          </p:cNvPr>
+          <p:cNvCxnSpPr>
+            <a:cxnSpLocks/>
+          </p:cNvCxnSpPr>
+          <p:nvPr/>
+        </p:nvCxnSpPr>
+        <p:spPr>
+          <a:xfrm>
+            <a:off x="11121594" y="4926755"/>
+            <a:ext cx="3114560" cy="2079681"/>
+          </a:xfrm>
+          <a:prstGeom prst="straightConnector1">
+            <a:avLst/>
+          </a:prstGeom>
+          <a:ln w="29209">
+            <a:solidFill>
+              <a:srgbClr val="C00000"/>
+            </a:solidFill>
+            <a:tailEnd type="triangle"/>
+          </a:ln>
+        </p:spPr>
+        <p:style>
+          <a:lnRef idx="1">
+            <a:schemeClr val="accent1"/>
+          </a:lnRef>
+          <a:fillRef idx="0">
+            <a:schemeClr val="accent1"/>
+          </a:fillRef>
+          <a:effectRef idx="0">
+            <a:schemeClr val="accent1"/>
+          </a:effectRef>
+          <a:fontRef idx="minor">
+            <a:schemeClr val="tx1"/>
+          </a:fontRef>
+        </p:style>
+      </p:cxnSp>
+      <p:sp>
+        <p:nvSpPr>
+          <p:cNvPr id="151" name="Rectangle 150">
+            <a:extLst>
+              <a:ext uri="{FF2B5EF4-FFF2-40B4-BE49-F238E27FC236}">
+                <a16:creationId xmlns:a16="http://schemas.microsoft.com/office/drawing/2014/main" id="{52423B29-35B5-9B6F-567C-E9C20E59598B}"/>
+              </a:ext>
+            </a:extLst>
+          </p:cNvPr>
+          <p:cNvSpPr/>
+          <p:nvPr/>
+        </p:nvSpPr>
+        <p:spPr>
+          <a:xfrm>
+            <a:off x="9666306" y="4293514"/>
+            <a:ext cx="1819398" cy="877223"/>
+          </a:xfrm>
+          <a:prstGeom prst="rect">
+            <a:avLst/>
+          </a:prstGeom>
+          <a:solidFill>
+            <a:schemeClr val="bg1"/>
+          </a:solidFill>
+          <a:ln w="38100">
+            <a:solidFill>
+              <a:schemeClr val="tx1"/>
+            </a:solidFill>
+          </a:ln>
+        </p:spPr>
+        <p:style>
+          <a:lnRef idx="2">
+            <a:schemeClr val="accent1">
+              <a:shade val="50000"/>
+            </a:schemeClr>
+          </a:lnRef>
+          <a:fillRef idx="1">
+            <a:schemeClr val="accent1"/>
+          </a:fillRef>
+          <a:effectRef idx="0">
+            <a:schemeClr val="accent1"/>
+          </a:effectRef>
+          <a:fontRef idx="minor">
+            <a:schemeClr val="lt1"/>
+          </a:fontRef>
+        </p:style>
+        <p:txBody>
+          <a:bodyPr rtlCol="0" anchor="ctr"/>
+          <a:lstStyle/>
+          <a:p>
+            <a:pPr algn="ctr"/>
+            <a:r>
+              <a:rPr lang="en-US" sz="3000" b="1" i="1" dirty="0">
+                <a:solidFill>
+                  <a:schemeClr val="tx1"/>
+                </a:solidFill>
+                <a:latin typeface="Times New Roman" panose="02020603050405020304" pitchFamily="18" charset="0"/>
+                <a:cs typeface="Times New Roman" panose="02020603050405020304" pitchFamily="18" charset="0"/>
+              </a:rPr>
+              <a:t>VPD</a:t>
+            </a:r>
+            <a:r>
+              <a:rPr lang="en-US" sz="3000" b="1" baseline="-25000" dirty="0">
+                <a:solidFill>
+                  <a:schemeClr val="tx1"/>
+                </a:solidFill>
+                <a:latin typeface="Times New Roman" panose="02020603050405020304" pitchFamily="18" charset="0"/>
+                <a:cs typeface="Times New Roman" panose="02020603050405020304" pitchFamily="18" charset="0"/>
+              </a:rPr>
+              <a:t>4</a:t>
+            </a:r>
+            <a:endParaRPr lang="en-US" sz="3000" b="1" dirty="0">
+              <a:solidFill>
+                <a:schemeClr val="tx1"/>
+              </a:solidFill>
+              <a:latin typeface="Times New Roman" panose="02020603050405020304" pitchFamily="18" charset="0"/>
+              <a:cs typeface="Times New Roman" panose="02020603050405020304" pitchFamily="18" charset="0"/>
+            </a:endParaRPr>
+          </a:p>
+        </p:txBody>
+      </p:sp>
+      <p:cxnSp>
+        <p:nvCxnSpPr>
+          <p:cNvPr id="211" name="Straight Arrow Connector 210">
+            <a:extLst>
+              <a:ext uri="{FF2B5EF4-FFF2-40B4-BE49-F238E27FC236}">
+                <a16:creationId xmlns:a16="http://schemas.microsoft.com/office/drawing/2014/main" id="{4110BDE9-8908-F5D6-4156-0F3FAA1D6E32}"/>
+              </a:ext>
+            </a:extLst>
+          </p:cNvPr>
+          <p:cNvCxnSpPr>
+            <a:cxnSpLocks/>
+          </p:cNvCxnSpPr>
+          <p:nvPr/>
+        </p:nvCxnSpPr>
+        <p:spPr>
+          <a:xfrm flipV="1">
+            <a:off x="16019543" y="4715747"/>
+            <a:ext cx="2785996" cy="7531"/>
+          </a:xfrm>
+          <a:prstGeom prst="straightConnector1">
+            <a:avLst/>
+          </a:prstGeom>
+          <a:ln w="109728">
+            <a:solidFill>
+              <a:schemeClr val="accent1">
+                <a:lumMod val="75000"/>
+              </a:schemeClr>
+            </a:solidFill>
+            <a:tailEnd type="triangle"/>
+          </a:ln>
+        </p:spPr>
+        <p:style>
+          <a:lnRef idx="1">
+            <a:schemeClr val="accent1"/>
+          </a:lnRef>
+          <a:fillRef idx="0">
+            <a:schemeClr val="accent1"/>
+          </a:fillRef>
+          <a:effectRef idx="0">
+            <a:schemeClr val="accent1"/>
+          </a:effectRef>
+          <a:fontRef idx="minor">
+            <a:schemeClr val="tx1"/>
+          </a:fontRef>
+        </p:style>
+      </p:cxnSp>
+      <p:sp>
+        <p:nvSpPr>
+          <p:cNvPr id="152" name="Rectangle 151">
+            <a:extLst>
+              <a:ext uri="{FF2B5EF4-FFF2-40B4-BE49-F238E27FC236}">
+                <a16:creationId xmlns:a16="http://schemas.microsoft.com/office/drawing/2014/main" id="{2D17192C-937C-49F2-AB55-CCF25B817752}"/>
+              </a:ext>
+            </a:extLst>
+          </p:cNvPr>
+          <p:cNvSpPr/>
+          <p:nvPr/>
+        </p:nvSpPr>
+        <p:spPr>
+          <a:xfrm>
+            <a:off x="22468256" y="7019165"/>
+            <a:ext cx="1819398" cy="877223"/>
+          </a:xfrm>
+          <a:prstGeom prst="rect">
+            <a:avLst/>
+          </a:prstGeom>
+          <a:solidFill>
+            <a:schemeClr val="bg1"/>
+          </a:solidFill>
+          <a:ln w="38100">
+            <a:solidFill>
+              <a:schemeClr val="tx1"/>
+            </a:solidFill>
+          </a:ln>
+        </p:spPr>
+        <p:style>
+          <a:lnRef idx="2">
+            <a:schemeClr val="accent1">
+              <a:shade val="50000"/>
+            </a:schemeClr>
+          </a:lnRef>
+          <a:fillRef idx="1">
+            <a:schemeClr val="accent1"/>
+          </a:fillRef>
+          <a:effectRef idx="0">
+            <a:schemeClr val="accent1"/>
+          </a:effectRef>
+          <a:fontRef idx="minor">
+            <a:schemeClr val="lt1"/>
+          </a:fontRef>
+        </p:style>
+        <p:txBody>
+          <a:bodyPr rtlCol="0" anchor="ctr"/>
+          <a:lstStyle/>
+          <a:p>
+            <a:pPr algn="ctr"/>
+            <a:r>
+              <a:rPr lang="en-US" sz="3000" b="1" i="1" dirty="0">
+                <a:solidFill>
+                  <a:schemeClr val="tx1"/>
+                </a:solidFill>
+                <a:latin typeface="Times New Roman" panose="02020603050405020304" pitchFamily="18" charset="0"/>
+                <a:cs typeface="Times New Roman" panose="02020603050405020304" pitchFamily="18" charset="0"/>
+              </a:rPr>
+              <a:t>N</a:t>
+            </a:r>
+            <a:r>
+              <a:rPr lang="en-US" sz="3000" b="1" baseline="-25000" dirty="0">
+                <a:solidFill>
+                  <a:schemeClr val="tx1"/>
+                </a:solidFill>
+                <a:latin typeface="Times New Roman" panose="02020603050405020304" pitchFamily="18" charset="0"/>
+                <a:cs typeface="Times New Roman" panose="02020603050405020304" pitchFamily="18" charset="0"/>
+              </a:rPr>
+              <a:t>fixer</a:t>
+            </a:r>
+            <a:endParaRPr lang="en-US" sz="3000" b="1" i="1" dirty="0">
+              <a:solidFill>
+                <a:schemeClr val="tx1"/>
+              </a:solidFill>
+              <a:latin typeface="Times New Roman" panose="02020603050405020304" pitchFamily="18" charset="0"/>
+              <a:cs typeface="Times New Roman" panose="02020603050405020304" pitchFamily="18" charset="0"/>
+            </a:endParaRPr>
+          </a:p>
+        </p:txBody>
+      </p:sp>
+      <p:cxnSp>
+        <p:nvCxnSpPr>
+          <p:cNvPr id="267" name="Straight Arrow Connector 266">
+            <a:extLst>
+              <a:ext uri="{FF2B5EF4-FFF2-40B4-BE49-F238E27FC236}">
+                <a16:creationId xmlns:a16="http://schemas.microsoft.com/office/drawing/2014/main" id="{82DEA27F-935B-D94A-2D5F-8264EAC3FDDF}"/>
+              </a:ext>
+            </a:extLst>
+          </p:cNvPr>
+          <p:cNvCxnSpPr>
+            <a:cxnSpLocks/>
+          </p:cNvCxnSpPr>
+          <p:nvPr/>
+        </p:nvCxnSpPr>
+        <p:spPr>
+          <a:xfrm>
+            <a:off x="15858907" y="4842205"/>
+            <a:ext cx="2961190" cy="4917704"/>
+          </a:xfrm>
+          <a:prstGeom prst="straightConnector1">
+            <a:avLst/>
+          </a:prstGeom>
+          <a:ln w="124079">
+            <a:solidFill>
+              <a:schemeClr val="accent1">
+                <a:lumMod val="75000"/>
+              </a:schemeClr>
+            </a:solidFill>
+            <a:tailEnd type="triangle"/>
+          </a:ln>
+        </p:spPr>
+        <p:style>
+          <a:lnRef idx="1">
+            <a:schemeClr val="accent1"/>
+          </a:lnRef>
+          <a:fillRef idx="0">
+            <a:schemeClr val="accent1"/>
+          </a:fillRef>
+          <a:effectRef idx="0">
+            <a:schemeClr val="accent1"/>
+          </a:effectRef>
+          <a:fontRef idx="minor">
+            <a:schemeClr val="tx1"/>
+          </a:fontRef>
+        </p:style>
+      </p:cxnSp>
+      <p:sp>
+        <p:nvSpPr>
+          <p:cNvPr id="144" name="Rectangle 143">
+            <a:extLst>
+              <a:ext uri="{FF2B5EF4-FFF2-40B4-BE49-F238E27FC236}">
+                <a16:creationId xmlns:a16="http://schemas.microsoft.com/office/drawing/2014/main" id="{A78B38F8-81B3-D1FA-0AD1-5773256590EC}"/>
+              </a:ext>
+            </a:extLst>
+          </p:cNvPr>
+          <p:cNvSpPr/>
+          <p:nvPr/>
+        </p:nvSpPr>
+        <p:spPr>
+          <a:xfrm>
+            <a:off x="5139575" y="9759909"/>
+            <a:ext cx="1819398" cy="877223"/>
+          </a:xfrm>
+          <a:prstGeom prst="rect">
+            <a:avLst/>
+          </a:prstGeom>
+          <a:solidFill>
+            <a:schemeClr val="bg1"/>
+          </a:solidFill>
+          <a:ln w="38100">
+            <a:solidFill>
+              <a:schemeClr val="tx1"/>
+            </a:solidFill>
+          </a:ln>
+        </p:spPr>
+        <p:style>
+          <a:lnRef idx="2">
+            <a:schemeClr val="accent1">
+              <a:shade val="50000"/>
+            </a:schemeClr>
+          </a:lnRef>
+          <a:fillRef idx="1">
+            <a:schemeClr val="accent1"/>
+          </a:fillRef>
+          <a:effectRef idx="0">
+            <a:schemeClr val="accent1"/>
+          </a:effectRef>
+          <a:fontRef idx="minor">
+            <a:schemeClr val="lt1"/>
+          </a:fontRef>
+        </p:style>
+        <p:txBody>
+          <a:bodyPr rtlCol="0" anchor="ctr"/>
+          <a:lstStyle/>
+          <a:p>
+            <a:pPr algn="ctr"/>
+            <a:r>
+              <a:rPr lang="en-US" sz="3000" b="1" i="1" dirty="0">
+                <a:solidFill>
+                  <a:schemeClr val="tx1"/>
+                </a:solidFill>
+                <a:latin typeface="Times New Roman" panose="02020603050405020304" pitchFamily="18" charset="0"/>
+                <a:cs typeface="Times New Roman" panose="02020603050405020304" pitchFamily="18" charset="0"/>
+              </a:rPr>
+              <a:t>Soil N</a:t>
+            </a:r>
+            <a:endParaRPr lang="en-US" sz="3000" b="1" dirty="0">
+              <a:solidFill>
+                <a:schemeClr val="tx1"/>
+              </a:solidFill>
+              <a:latin typeface="Times New Roman" panose="02020603050405020304" pitchFamily="18" charset="0"/>
+              <a:cs typeface="Times New Roman" panose="02020603050405020304" pitchFamily="18" charset="0"/>
+            </a:endParaRPr>
+          </a:p>
+        </p:txBody>
+      </p:sp>
+      <p:sp>
+        <p:nvSpPr>
+          <p:cNvPr id="149" name="Rectangle 148">
+            <a:extLst>
+              <a:ext uri="{FF2B5EF4-FFF2-40B4-BE49-F238E27FC236}">
+                <a16:creationId xmlns:a16="http://schemas.microsoft.com/office/drawing/2014/main" id="{37E4791A-A4FE-F459-D539-AC5C8696DD32}"/>
+              </a:ext>
+            </a:extLst>
+          </p:cNvPr>
+          <p:cNvSpPr/>
+          <p:nvPr/>
+        </p:nvSpPr>
+        <p:spPr>
+          <a:xfrm>
+            <a:off x="14258417" y="7033078"/>
+            <a:ext cx="1819398" cy="877223"/>
+          </a:xfrm>
+          <a:prstGeom prst="rect">
+            <a:avLst/>
+          </a:prstGeom>
+          <a:solidFill>
+            <a:schemeClr val="bg1"/>
+          </a:solidFill>
+          <a:ln w="38100">
+            <a:solidFill>
+              <a:schemeClr val="tx1"/>
+            </a:solidFill>
+          </a:ln>
+        </p:spPr>
+        <p:style>
+          <a:lnRef idx="2">
+            <a:schemeClr val="accent1">
+              <a:shade val="50000"/>
+            </a:schemeClr>
+          </a:lnRef>
+          <a:fillRef idx="1">
+            <a:schemeClr val="accent1"/>
+          </a:fillRef>
+          <a:effectRef idx="0">
+            <a:schemeClr val="accent1"/>
+          </a:effectRef>
+          <a:fontRef idx="minor">
+            <a:schemeClr val="lt1"/>
+          </a:fontRef>
+        </p:style>
+        <p:txBody>
+          <a:bodyPr rtlCol="0" anchor="ctr"/>
+          <a:lstStyle/>
+          <a:p>
+            <a:pPr algn="ctr"/>
+            <a:r>
+              <a:rPr lang="en-US" sz="3000" b="1" i="1" dirty="0">
+                <a:solidFill>
+                  <a:schemeClr val="tx1"/>
+                </a:solidFill>
+                <a:latin typeface="Times New Roman" panose="02020603050405020304" pitchFamily="18" charset="0"/>
+                <a:cs typeface="Times New Roman" panose="02020603050405020304" pitchFamily="18" charset="0"/>
+              </a:rPr>
+              <a:t>Leaf Ci:Ca</a:t>
+            </a:r>
+          </a:p>
+        </p:txBody>
+      </p:sp>
+      <p:cxnSp>
+        <p:nvCxnSpPr>
+          <p:cNvPr id="276" name="Elbow Connector 275">
+            <a:extLst>
+              <a:ext uri="{FF2B5EF4-FFF2-40B4-BE49-F238E27FC236}">
+                <a16:creationId xmlns:a16="http://schemas.microsoft.com/office/drawing/2014/main" id="{A30ACE67-B7B9-B0CA-D90B-859AF06A0A79}"/>
+              </a:ext>
+            </a:extLst>
+          </p:cNvPr>
+          <p:cNvCxnSpPr>
+            <a:cxnSpLocks/>
+          </p:cNvCxnSpPr>
+          <p:nvPr/>
+        </p:nvCxnSpPr>
+        <p:spPr>
+          <a:xfrm flipV="1">
+            <a:off x="20646658" y="5004807"/>
+            <a:ext cx="14288" cy="5473926"/>
+          </a:xfrm>
+          <a:prstGeom prst="bentConnector3">
+            <a:avLst>
+              <a:gd name="adj1" fmla="val 6499776"/>
+            </a:avLst>
+          </a:prstGeom>
+          <a:ln w="61976">
+            <a:solidFill>
+              <a:srgbClr val="C00000"/>
+            </a:solidFill>
+            <a:tailEnd type="triangle"/>
+          </a:ln>
+        </p:spPr>
+        <p:style>
+          <a:lnRef idx="1">
+            <a:schemeClr val="accent1"/>
+          </a:lnRef>
+          <a:fillRef idx="0">
+            <a:schemeClr val="accent1"/>
+          </a:fillRef>
+          <a:effectRef idx="0">
+            <a:schemeClr val="accent1"/>
+          </a:effectRef>
+          <a:fontRef idx="minor">
+            <a:schemeClr val="tx1"/>
+          </a:fontRef>
+        </p:style>
+      </p:cxnSp>
+      <p:sp>
+        <p:nvSpPr>
+          <p:cNvPr id="150" name="Rectangle 149">
+            <a:extLst>
+              <a:ext uri="{FF2B5EF4-FFF2-40B4-BE49-F238E27FC236}">
+                <a16:creationId xmlns:a16="http://schemas.microsoft.com/office/drawing/2014/main" id="{EC6E95A2-A99B-1EAD-2343-C2D4995139F9}"/>
+              </a:ext>
+            </a:extLst>
+          </p:cNvPr>
+          <p:cNvSpPr/>
+          <p:nvPr/>
+        </p:nvSpPr>
+        <p:spPr>
+          <a:xfrm>
+            <a:off x="5139575" y="4285983"/>
+            <a:ext cx="1819398" cy="877223"/>
+          </a:xfrm>
+          <a:prstGeom prst="rect">
+            <a:avLst/>
+          </a:prstGeom>
+          <a:solidFill>
+            <a:schemeClr val="bg1"/>
+          </a:solidFill>
+          <a:ln w="38100">
+            <a:solidFill>
+              <a:schemeClr val="tx1"/>
+            </a:solidFill>
+          </a:ln>
+        </p:spPr>
+        <p:style>
+          <a:lnRef idx="2">
+            <a:schemeClr val="accent1">
+              <a:shade val="50000"/>
+            </a:schemeClr>
+          </a:lnRef>
+          <a:fillRef idx="1">
+            <a:schemeClr val="accent1"/>
+          </a:fillRef>
+          <a:effectRef idx="0">
+            <a:schemeClr val="accent1"/>
+          </a:effectRef>
+          <a:fontRef idx="minor">
+            <a:schemeClr val="lt1"/>
+          </a:fontRef>
+        </p:style>
+        <p:txBody>
+          <a:bodyPr rtlCol="0" anchor="ctr"/>
+          <a:lstStyle/>
+          <a:p>
+            <a:pPr algn="ctr"/>
+            <a:r>
+              <a:rPr lang="en-US" sz="3000" b="1" i="1" dirty="0">
+                <a:solidFill>
+                  <a:schemeClr val="tx1"/>
+                </a:solidFill>
+                <a:latin typeface="Times New Roman" panose="02020603050405020304" pitchFamily="18" charset="0"/>
+                <a:cs typeface="Times New Roman" panose="02020603050405020304" pitchFamily="18" charset="0"/>
+              </a:rPr>
+              <a:t>SM</a:t>
+            </a:r>
+            <a:r>
+              <a:rPr lang="en-US" sz="3000" b="1" baseline="-25000" dirty="0">
+                <a:solidFill>
+                  <a:schemeClr val="tx1"/>
+                </a:solidFill>
+                <a:latin typeface="Times New Roman" panose="02020603050405020304" pitchFamily="18" charset="0"/>
+                <a:cs typeface="Times New Roman" panose="02020603050405020304" pitchFamily="18" charset="0"/>
+              </a:rPr>
+              <a:t>2</a:t>
+            </a:r>
+            <a:endParaRPr lang="en-US" sz="3000" b="1" dirty="0">
+              <a:solidFill>
+                <a:schemeClr val="tx1"/>
+              </a:solidFill>
+              <a:latin typeface="Times New Roman" panose="02020603050405020304" pitchFamily="18" charset="0"/>
+              <a:cs typeface="Times New Roman" panose="02020603050405020304" pitchFamily="18" charset="0"/>
+            </a:endParaRPr>
+          </a:p>
+        </p:txBody>
+      </p:sp>
+      <p:cxnSp>
+        <p:nvCxnSpPr>
+          <p:cNvPr id="299" name="Elbow Connector 298">
+            <a:extLst>
+              <a:ext uri="{FF2B5EF4-FFF2-40B4-BE49-F238E27FC236}">
+                <a16:creationId xmlns:a16="http://schemas.microsoft.com/office/drawing/2014/main" id="{056E95C4-C923-6172-ED5A-038375542915}"/>
+              </a:ext>
+            </a:extLst>
+          </p:cNvPr>
+          <p:cNvCxnSpPr>
+            <a:stCxn id="150" idx="0"/>
+            <a:endCxn id="145" idx="0"/>
+          </p:cNvCxnSpPr>
+          <p:nvPr/>
+        </p:nvCxnSpPr>
+        <p:spPr>
+          <a:xfrm rot="5400000" flipH="1" flipV="1">
+            <a:off x="12900260" y="-2565003"/>
+            <a:ext cx="12700" cy="13701973"/>
+          </a:xfrm>
+          <a:prstGeom prst="bentConnector3">
+            <a:avLst>
+              <a:gd name="adj1" fmla="val 7312504"/>
+            </a:avLst>
+          </a:prstGeom>
+          <a:ln w="22987">
+            <a:solidFill>
+              <a:schemeClr val="accent1">
+                <a:lumMod val="75000"/>
+              </a:schemeClr>
+            </a:solidFill>
+            <a:tailEnd type="triangle"/>
+          </a:ln>
+        </p:spPr>
+        <p:style>
+          <a:lnRef idx="1">
+            <a:schemeClr val="accent1"/>
+          </a:lnRef>
+          <a:fillRef idx="0">
+            <a:schemeClr val="accent1"/>
+          </a:fillRef>
+          <a:effectRef idx="0">
+            <a:schemeClr val="accent1"/>
+          </a:effectRef>
+          <a:fontRef idx="minor">
+            <a:schemeClr val="tx1"/>
+          </a:fontRef>
+        </p:style>
+      </p:cxnSp>
+      <p:cxnSp>
+        <p:nvCxnSpPr>
+          <p:cNvPr id="322" name="Elbow Connector 321">
+            <a:extLst>
+              <a:ext uri="{FF2B5EF4-FFF2-40B4-BE49-F238E27FC236}">
+                <a16:creationId xmlns:a16="http://schemas.microsoft.com/office/drawing/2014/main" id="{439C9AB0-1DA9-E50D-981B-3798293AD17D}"/>
+              </a:ext>
+            </a:extLst>
+          </p:cNvPr>
+          <p:cNvCxnSpPr>
+            <a:cxnSpLocks/>
+            <a:stCxn id="152" idx="0"/>
+            <a:endCxn id="145" idx="3"/>
+          </p:cNvCxnSpPr>
+          <p:nvPr/>
+        </p:nvCxnSpPr>
+        <p:spPr>
+          <a:xfrm rot="16200000" flipV="1">
+            <a:off x="20872166" y="4513375"/>
+            <a:ext cx="2294570" cy="2717009"/>
+          </a:xfrm>
+          <a:prstGeom prst="bentConnector2">
+            <a:avLst/>
+          </a:prstGeom>
+          <a:ln w="66675">
             <a:solidFill>
               <a:schemeClr val="accent1">
                 <a:lumMod val="75000"/>
@@ -9007,13 +10067,13 @@
         </p:nvCxnSpPr>
         <p:spPr>
           <a:xfrm flipV="1">
-            <a:off x="12785771" y="7764073"/>
+            <a:off x="16077815" y="7457777"/>
             <a:ext cx="2744279" cy="13913"/>
           </a:xfrm>
           <a:prstGeom prst="straightConnector1">
             <a:avLst/>
           </a:prstGeom>
-          <a:ln w="34798">
+          <a:ln w="43942">
             <a:solidFill>
               <a:srgbClr val="C00000"/>
             </a:solidFill>
@@ -9035,108 +10095,12 @@
           </a:fontRef>
         </p:style>
       </p:cxnSp>
-      <p:cxnSp>
-        <p:nvCxnSpPr>
-          <p:cNvPr id="178" name="Straight Arrow Connector 177">
-            <a:extLst>
-              <a:ext uri="{FF2B5EF4-FFF2-40B4-BE49-F238E27FC236}">
-                <a16:creationId xmlns:a16="http://schemas.microsoft.com/office/drawing/2014/main" id="{AD58EF09-8B95-4F31-0758-52C1BD1A684D}"/>
-              </a:ext>
-            </a:extLst>
-          </p:cNvPr>
-          <p:cNvCxnSpPr>
-            <a:cxnSpLocks/>
-            <a:stCxn id="145" idx="2"/>
-            <a:endCxn id="143" idx="0"/>
-          </p:cNvCxnSpPr>
-          <p:nvPr/>
-        </p:nvCxnSpPr>
-        <p:spPr>
-          <a:xfrm flipH="1">
-            <a:off x="16439749" y="5469502"/>
-            <a:ext cx="19454" cy="1855959"/>
-          </a:xfrm>
-          <a:prstGeom prst="straightConnector1">
-            <a:avLst/>
-          </a:prstGeom>
-          <a:ln w="147447">
-            <a:solidFill>
-              <a:schemeClr val="accent1">
-                <a:lumMod val="75000"/>
-              </a:schemeClr>
-            </a:solidFill>
-            <a:tailEnd type="triangle"/>
-          </a:ln>
-        </p:spPr>
-        <p:style>
-          <a:lnRef idx="1">
-            <a:schemeClr val="accent1"/>
-          </a:lnRef>
-          <a:fillRef idx="0">
-            <a:schemeClr val="accent1"/>
-          </a:fillRef>
-          <a:effectRef idx="0">
-            <a:schemeClr val="accent1"/>
-          </a:effectRef>
-          <a:fontRef idx="minor">
-            <a:schemeClr val="tx1"/>
-          </a:fontRef>
-        </p:style>
-      </p:cxnSp>
-      <p:cxnSp>
-        <p:nvCxnSpPr>
-          <p:cNvPr id="179" name="Straight Arrow Connector 178">
-            <a:extLst>
-              <a:ext uri="{FF2B5EF4-FFF2-40B4-BE49-F238E27FC236}">
-                <a16:creationId xmlns:a16="http://schemas.microsoft.com/office/drawing/2014/main" id="{64137A6B-9D81-CC04-4A56-CB43F3FBE38A}"/>
-              </a:ext>
-            </a:extLst>
-          </p:cNvPr>
-          <p:cNvCxnSpPr>
-            <a:cxnSpLocks/>
-            <a:stCxn id="146" idx="0"/>
-            <a:endCxn id="143" idx="2"/>
-          </p:cNvCxnSpPr>
-          <p:nvPr/>
-        </p:nvCxnSpPr>
-        <p:spPr>
-          <a:xfrm flipH="1" flipV="1">
-            <a:off x="16439749" y="8202684"/>
-            <a:ext cx="5166" cy="1863521"/>
-          </a:xfrm>
-          <a:prstGeom prst="straightConnector1">
-            <a:avLst/>
-          </a:prstGeom>
-          <a:ln w="150495">
-            <a:solidFill>
-              <a:schemeClr val="accent1">
-                <a:lumMod val="75000"/>
-              </a:schemeClr>
-            </a:solidFill>
-            <a:tailEnd type="triangle"/>
-          </a:ln>
-        </p:spPr>
-        <p:style>
-          <a:lnRef idx="1">
-            <a:schemeClr val="accent1"/>
-          </a:lnRef>
-          <a:fillRef idx="0">
-            <a:schemeClr val="accent1"/>
-          </a:fillRef>
-          <a:effectRef idx="0">
-            <a:schemeClr val="accent1"/>
-          </a:effectRef>
-          <a:fontRef idx="minor">
-            <a:schemeClr val="tx1"/>
-          </a:fontRef>
-        </p:style>
-      </p:cxnSp>
-      <p:sp>
-        <p:nvSpPr>
-          <p:cNvPr id="145" name="Rectangle 144">
-            <a:extLst>
-              <a:ext uri="{FF2B5EF4-FFF2-40B4-BE49-F238E27FC236}">
-                <a16:creationId xmlns:a16="http://schemas.microsoft.com/office/drawing/2014/main" id="{196DCF3C-1E9F-84BF-A1CB-74EFF6943139}"/>
+      <p:sp>
+        <p:nvSpPr>
+          <p:cNvPr id="148" name="Rectangle 147">
+            <a:extLst>
+              <a:ext uri="{FF2B5EF4-FFF2-40B4-BE49-F238E27FC236}">
+                <a16:creationId xmlns:a16="http://schemas.microsoft.com/office/drawing/2014/main" id="{CAEEF86E-BF80-675F-3FA2-55D6B97D4497}"/>
               </a:ext>
             </a:extLst>
           </p:cNvPr>
@@ -9145,7 +10109,7 @@
         </p:nvSpPr>
         <p:spPr>
           <a:xfrm>
-            <a:off x="15549504" y="4592279"/>
+            <a:off x="9707722" y="7033076"/>
             <a:ext cx="1819398" cy="877223"/>
           </a:xfrm>
           <a:prstGeom prst="rect">
@@ -9182,26 +10146,16 @@
           <a:p>
             <a:pPr algn="ctr"/>
             <a:r>
-              <a:rPr lang="en-US" sz="3000" i="1" dirty="0">
+              <a:rPr lang="el-GR" sz="3000" b="1" i="1" dirty="0">
                 <a:solidFill>
                   <a:schemeClr val="tx1"/>
                 </a:solidFill>
                 <a:latin typeface="Times New Roman" panose="02020603050405020304" pitchFamily="18" charset="0"/>
                 <a:cs typeface="Times New Roman" panose="02020603050405020304" pitchFamily="18" charset="0"/>
               </a:rPr>
-              <a:t>N</a:t>
-            </a:r>
-            <a:r>
-              <a:rPr lang="en-US" sz="3000" baseline="-25000" dirty="0">
-                <a:solidFill>
-                  <a:schemeClr val="tx1"/>
-                </a:solidFill>
-                <a:latin typeface="Times New Roman" panose="02020603050405020304" pitchFamily="18" charset="0"/>
-                <a:cs typeface="Times New Roman" panose="02020603050405020304" pitchFamily="18" charset="0"/>
-              </a:rPr>
-              <a:t>mass</a:t>
-            </a:r>
-            <a:endParaRPr lang="en-US" sz="3000" i="1" dirty="0">
+              <a:t>β</a:t>
+            </a:r>
+            <a:endParaRPr lang="en-US" sz="3000" b="1" i="1" dirty="0">
               <a:solidFill>
                 <a:schemeClr val="tx1"/>
               </a:solidFill>
@@ -9211,996 +10165,12 @@
           </a:p>
         </p:txBody>
       </p:sp>
-      <p:sp>
-        <p:nvSpPr>
-          <p:cNvPr id="146" name="Rectangle 145">
-            <a:extLst>
-              <a:ext uri="{FF2B5EF4-FFF2-40B4-BE49-F238E27FC236}">
-                <a16:creationId xmlns:a16="http://schemas.microsoft.com/office/drawing/2014/main" id="{831EFE87-5954-79FB-5410-F4BC8563FCDF}"/>
-              </a:ext>
-            </a:extLst>
-          </p:cNvPr>
-          <p:cNvSpPr/>
-          <p:nvPr/>
-        </p:nvSpPr>
-        <p:spPr>
-          <a:xfrm>
-            <a:off x="15535216" y="10066205"/>
-            <a:ext cx="1819398" cy="877223"/>
-          </a:xfrm>
-          <a:prstGeom prst="rect">
-            <a:avLst/>
-          </a:prstGeom>
-          <a:solidFill>
-            <a:schemeClr val="bg1"/>
-          </a:solidFill>
-          <a:ln w="38100">
-            <a:solidFill>
-              <a:schemeClr val="tx1"/>
-            </a:solidFill>
-          </a:ln>
-        </p:spPr>
-        <p:style>
-          <a:lnRef idx="2">
-            <a:schemeClr val="accent1">
-              <a:shade val="50000"/>
-            </a:schemeClr>
-          </a:lnRef>
-          <a:fillRef idx="1">
-            <a:schemeClr val="accent1"/>
-          </a:fillRef>
-          <a:effectRef idx="0">
-            <a:schemeClr val="accent1"/>
-          </a:effectRef>
-          <a:fontRef idx="minor">
-            <a:schemeClr val="lt1"/>
-          </a:fontRef>
-        </p:style>
-        <p:txBody>
-          <a:bodyPr rtlCol="0" anchor="ctr"/>
-          <a:lstStyle/>
-          <a:p>
-            <a:pPr algn="ctr"/>
-            <a:r>
-              <a:rPr lang="en-US" sz="3000" i="1" dirty="0">
-                <a:solidFill>
-                  <a:schemeClr val="tx1"/>
-                </a:solidFill>
-                <a:latin typeface="Times New Roman" panose="02020603050405020304" pitchFamily="18" charset="0"/>
-                <a:cs typeface="Times New Roman" panose="02020603050405020304" pitchFamily="18" charset="0"/>
-              </a:rPr>
-              <a:t>M</a:t>
-            </a:r>
-            <a:r>
-              <a:rPr lang="en-US" sz="3000" baseline="-25000" dirty="0">
-                <a:solidFill>
-                  <a:schemeClr val="tx1"/>
-                </a:solidFill>
-                <a:latin typeface="Times New Roman" panose="02020603050405020304" pitchFamily="18" charset="0"/>
-                <a:cs typeface="Times New Roman" panose="02020603050405020304" pitchFamily="18" charset="0"/>
-              </a:rPr>
-              <a:t>area</a:t>
-            </a:r>
-            <a:endParaRPr lang="en-US" sz="3000" i="1" dirty="0">
-              <a:solidFill>
-                <a:schemeClr val="tx1"/>
-              </a:solidFill>
-              <a:latin typeface="Times New Roman" panose="02020603050405020304" pitchFamily="18" charset="0"/>
-              <a:cs typeface="Times New Roman" panose="02020603050405020304" pitchFamily="18" charset="0"/>
-            </a:endParaRPr>
-          </a:p>
-        </p:txBody>
-      </p:sp>
-      <p:cxnSp>
-        <p:nvCxnSpPr>
-          <p:cNvPr id="185" name="Straight Arrow Connector 184">
-            <a:extLst>
-              <a:ext uri="{FF2B5EF4-FFF2-40B4-BE49-F238E27FC236}">
-                <a16:creationId xmlns:a16="http://schemas.microsoft.com/office/drawing/2014/main" id="{258C187C-B6A3-5852-85DF-896F3B7E817C}"/>
-              </a:ext>
-            </a:extLst>
-          </p:cNvPr>
-          <p:cNvCxnSpPr>
-            <a:cxnSpLocks/>
-            <a:endCxn id="146" idx="1"/>
-          </p:cNvCxnSpPr>
-          <p:nvPr/>
-        </p:nvCxnSpPr>
-        <p:spPr>
-          <a:xfrm>
-            <a:off x="11618898" y="8043863"/>
-            <a:ext cx="3916318" cy="2460954"/>
-          </a:xfrm>
-          <a:prstGeom prst="straightConnector1">
-            <a:avLst/>
-          </a:prstGeom>
-          <a:ln w="75311">
-            <a:solidFill>
-              <a:srgbClr val="C00000"/>
-            </a:solidFill>
-            <a:tailEnd type="triangle"/>
-          </a:ln>
-        </p:spPr>
-        <p:style>
-          <a:lnRef idx="1">
-            <a:schemeClr val="accent1"/>
-          </a:lnRef>
-          <a:fillRef idx="0">
-            <a:schemeClr val="accent1"/>
-          </a:fillRef>
-          <a:effectRef idx="0">
-            <a:schemeClr val="accent1"/>
-          </a:effectRef>
-          <a:fontRef idx="minor">
-            <a:schemeClr val="tx1"/>
-          </a:fontRef>
-        </p:style>
-      </p:cxnSp>
-      <p:cxnSp>
-        <p:nvCxnSpPr>
-          <p:cNvPr id="186" name="Straight Arrow Connector 185">
-            <a:extLst>
-              <a:ext uri="{FF2B5EF4-FFF2-40B4-BE49-F238E27FC236}">
-                <a16:creationId xmlns:a16="http://schemas.microsoft.com/office/drawing/2014/main" id="{8F9CC82C-68F6-632C-D6BC-9D720D68E3E7}"/>
-              </a:ext>
-            </a:extLst>
-          </p:cNvPr>
-          <p:cNvCxnSpPr>
-            <a:cxnSpLocks/>
-          </p:cNvCxnSpPr>
-          <p:nvPr/>
-        </p:nvCxnSpPr>
-        <p:spPr>
-          <a:xfrm>
-            <a:off x="3666929" y="10833441"/>
-            <a:ext cx="11868287" cy="0"/>
-          </a:xfrm>
-          <a:prstGeom prst="straightConnector1">
-            <a:avLst/>
-          </a:prstGeom>
-          <a:ln w="25400">
-            <a:solidFill>
-              <a:srgbClr val="C00000"/>
-            </a:solidFill>
-            <a:tailEnd type="triangle"/>
-          </a:ln>
-        </p:spPr>
-        <p:style>
-          <a:lnRef idx="1">
-            <a:schemeClr val="accent1"/>
-          </a:lnRef>
-          <a:fillRef idx="0">
-            <a:schemeClr val="accent1"/>
-          </a:fillRef>
-          <a:effectRef idx="0">
-            <a:schemeClr val="accent1"/>
-          </a:effectRef>
-          <a:fontRef idx="minor">
-            <a:schemeClr val="tx1"/>
-          </a:fontRef>
-        </p:style>
-      </p:cxnSp>
-      <p:cxnSp>
-        <p:nvCxnSpPr>
-          <p:cNvPr id="192" name="Elbow Connector 191">
-            <a:extLst>
-              <a:ext uri="{FF2B5EF4-FFF2-40B4-BE49-F238E27FC236}">
-                <a16:creationId xmlns:a16="http://schemas.microsoft.com/office/drawing/2014/main" id="{70E41ED9-E24C-CA45-C448-4A15D4E18233}"/>
-              </a:ext>
-            </a:extLst>
-          </p:cNvPr>
-          <p:cNvCxnSpPr>
-            <a:cxnSpLocks/>
-            <a:stCxn id="150" idx="1"/>
-            <a:endCxn id="146" idx="2"/>
-          </p:cNvCxnSpPr>
-          <p:nvPr/>
-        </p:nvCxnSpPr>
-        <p:spPr>
-          <a:xfrm rot="10800000" flipH="1" flipV="1">
-            <a:off x="1847531" y="5030890"/>
-            <a:ext cx="14597384" cy="5912537"/>
-          </a:xfrm>
-          <a:prstGeom prst="bentConnector4">
-            <a:avLst>
-              <a:gd name="adj1" fmla="val -6460"/>
-              <a:gd name="adj2" fmla="val 115948"/>
-            </a:avLst>
-          </a:prstGeom>
-          <a:ln w="24638">
-            <a:solidFill>
-              <a:srgbClr val="C00000"/>
-            </a:solidFill>
-            <a:tailEnd type="triangle"/>
-          </a:ln>
-        </p:spPr>
-        <p:style>
-          <a:lnRef idx="1">
-            <a:schemeClr val="accent1"/>
-          </a:lnRef>
-          <a:fillRef idx="0">
-            <a:schemeClr val="accent1"/>
-          </a:fillRef>
-          <a:effectRef idx="0">
-            <a:schemeClr val="accent1"/>
-          </a:effectRef>
-          <a:fontRef idx="minor">
-            <a:schemeClr val="tx1"/>
-          </a:fontRef>
-        </p:style>
-      </p:cxnSp>
-      <p:cxnSp>
-        <p:nvCxnSpPr>
-          <p:cNvPr id="196" name="Straight Arrow Connector 195">
-            <a:extLst>
-              <a:ext uri="{FF2B5EF4-FFF2-40B4-BE49-F238E27FC236}">
-                <a16:creationId xmlns:a16="http://schemas.microsoft.com/office/drawing/2014/main" id="{D3D39525-618A-0E5E-5962-FA061AF403E3}"/>
-              </a:ext>
-            </a:extLst>
-          </p:cNvPr>
-          <p:cNvCxnSpPr>
-            <a:cxnSpLocks/>
-          </p:cNvCxnSpPr>
-          <p:nvPr/>
-        </p:nvCxnSpPr>
-        <p:spPr>
-          <a:xfrm flipV="1">
-            <a:off x="3480283" y="5477126"/>
-            <a:ext cx="12040183" cy="5027690"/>
-          </a:xfrm>
-          <a:prstGeom prst="straightConnector1">
-            <a:avLst/>
-          </a:prstGeom>
-          <a:ln w="45593">
-            <a:solidFill>
-              <a:schemeClr val="accent1">
-                <a:lumMod val="75000"/>
-              </a:schemeClr>
-            </a:solidFill>
-            <a:tailEnd type="triangle"/>
-          </a:ln>
-        </p:spPr>
-        <p:style>
-          <a:lnRef idx="1">
-            <a:schemeClr val="accent1"/>
-          </a:lnRef>
-          <a:fillRef idx="0">
-            <a:schemeClr val="accent1"/>
-          </a:fillRef>
-          <a:effectRef idx="0">
-            <a:schemeClr val="accent1"/>
-          </a:effectRef>
-          <a:fontRef idx="minor">
-            <a:schemeClr val="tx1"/>
-          </a:fontRef>
-        </p:style>
-      </p:cxnSp>
-      <p:cxnSp>
-        <p:nvCxnSpPr>
-          <p:cNvPr id="168" name="Straight Arrow Connector 167">
-            <a:extLst>
-              <a:ext uri="{FF2B5EF4-FFF2-40B4-BE49-F238E27FC236}">
-                <a16:creationId xmlns:a16="http://schemas.microsoft.com/office/drawing/2014/main" id="{1EF4A41A-5F73-8BC5-33B7-31C8F1EBE768}"/>
-              </a:ext>
-            </a:extLst>
-          </p:cNvPr>
-          <p:cNvCxnSpPr>
-            <a:cxnSpLocks/>
-          </p:cNvCxnSpPr>
-          <p:nvPr/>
-        </p:nvCxnSpPr>
-        <p:spPr>
-          <a:xfrm>
-            <a:off x="7829550" y="5233051"/>
-            <a:ext cx="3114560" cy="2079681"/>
-          </a:xfrm>
-          <a:prstGeom prst="straightConnector1">
-            <a:avLst/>
-          </a:prstGeom>
-          <a:ln w="23114">
-            <a:solidFill>
-              <a:srgbClr val="C00000"/>
-            </a:solidFill>
-            <a:tailEnd type="triangle"/>
-          </a:ln>
-        </p:spPr>
-        <p:style>
-          <a:lnRef idx="1">
-            <a:schemeClr val="accent1"/>
-          </a:lnRef>
-          <a:fillRef idx="0">
-            <a:schemeClr val="accent1"/>
-          </a:fillRef>
-          <a:effectRef idx="0">
-            <a:schemeClr val="accent1"/>
-          </a:effectRef>
-          <a:fontRef idx="minor">
-            <a:schemeClr val="tx1"/>
-          </a:fontRef>
-        </p:style>
-      </p:cxnSp>
-      <p:sp>
-        <p:nvSpPr>
-          <p:cNvPr id="151" name="Rectangle 150">
-            <a:extLst>
-              <a:ext uri="{FF2B5EF4-FFF2-40B4-BE49-F238E27FC236}">
-                <a16:creationId xmlns:a16="http://schemas.microsoft.com/office/drawing/2014/main" id="{52423B29-35B5-9B6F-567C-E9C20E59598B}"/>
-              </a:ext>
-            </a:extLst>
-          </p:cNvPr>
-          <p:cNvSpPr/>
-          <p:nvPr/>
-        </p:nvSpPr>
-        <p:spPr>
-          <a:xfrm>
-            <a:off x="6374262" y="4599810"/>
-            <a:ext cx="1819398" cy="877223"/>
-          </a:xfrm>
-          <a:prstGeom prst="rect">
-            <a:avLst/>
-          </a:prstGeom>
-          <a:solidFill>
-            <a:schemeClr val="bg1"/>
-          </a:solidFill>
-          <a:ln w="38100">
-            <a:solidFill>
-              <a:schemeClr val="tx1"/>
-            </a:solidFill>
-          </a:ln>
-        </p:spPr>
-        <p:style>
-          <a:lnRef idx="2">
-            <a:schemeClr val="accent1">
-              <a:shade val="50000"/>
-            </a:schemeClr>
-          </a:lnRef>
-          <a:fillRef idx="1">
-            <a:schemeClr val="accent1"/>
-          </a:fillRef>
-          <a:effectRef idx="0">
-            <a:schemeClr val="accent1"/>
-          </a:effectRef>
-          <a:fontRef idx="minor">
-            <a:schemeClr val="lt1"/>
-          </a:fontRef>
-        </p:style>
-        <p:txBody>
-          <a:bodyPr rtlCol="0" anchor="ctr"/>
-          <a:lstStyle/>
-          <a:p>
-            <a:pPr algn="ctr"/>
-            <a:r>
-              <a:rPr lang="en-US" sz="3000" i="1" dirty="0">
-                <a:solidFill>
-                  <a:schemeClr val="tx1"/>
-                </a:solidFill>
-                <a:latin typeface="Times New Roman" panose="02020603050405020304" pitchFamily="18" charset="0"/>
-                <a:cs typeface="Times New Roman" panose="02020603050405020304" pitchFamily="18" charset="0"/>
-              </a:rPr>
-              <a:t>VPD</a:t>
-            </a:r>
-            <a:r>
-              <a:rPr lang="en-US" sz="3000" baseline="-25000" dirty="0">
-                <a:solidFill>
-                  <a:schemeClr val="tx1"/>
-                </a:solidFill>
-                <a:latin typeface="Times New Roman" panose="02020603050405020304" pitchFamily="18" charset="0"/>
-                <a:cs typeface="Times New Roman" panose="02020603050405020304" pitchFamily="18" charset="0"/>
-              </a:rPr>
-              <a:t>4</a:t>
-            </a:r>
-            <a:endParaRPr lang="en-US" sz="3000" dirty="0">
-              <a:solidFill>
-                <a:schemeClr val="tx1"/>
-              </a:solidFill>
-              <a:latin typeface="Times New Roman" panose="02020603050405020304" pitchFamily="18" charset="0"/>
-              <a:cs typeface="Times New Roman" panose="02020603050405020304" pitchFamily="18" charset="0"/>
-            </a:endParaRPr>
-          </a:p>
-        </p:txBody>
-      </p:sp>
-      <p:cxnSp>
-        <p:nvCxnSpPr>
-          <p:cNvPr id="211" name="Straight Arrow Connector 210">
-            <a:extLst>
-              <a:ext uri="{FF2B5EF4-FFF2-40B4-BE49-F238E27FC236}">
-                <a16:creationId xmlns:a16="http://schemas.microsoft.com/office/drawing/2014/main" id="{4110BDE9-8908-F5D6-4156-0F3FAA1D6E32}"/>
-              </a:ext>
-            </a:extLst>
-          </p:cNvPr>
-          <p:cNvCxnSpPr>
-            <a:cxnSpLocks/>
-          </p:cNvCxnSpPr>
-          <p:nvPr/>
-        </p:nvCxnSpPr>
-        <p:spPr>
-          <a:xfrm flipV="1">
-            <a:off x="12727499" y="5022043"/>
-            <a:ext cx="2785996" cy="7531"/>
-          </a:xfrm>
-          <a:prstGeom prst="straightConnector1">
-            <a:avLst/>
-          </a:prstGeom>
-          <a:ln w="62357">
-            <a:solidFill>
-              <a:schemeClr val="accent1">
-                <a:lumMod val="75000"/>
-              </a:schemeClr>
-            </a:solidFill>
-            <a:tailEnd type="triangle"/>
-          </a:ln>
-        </p:spPr>
-        <p:style>
-          <a:lnRef idx="1">
-            <a:schemeClr val="accent1"/>
-          </a:lnRef>
-          <a:fillRef idx="0">
-            <a:schemeClr val="accent1"/>
-          </a:fillRef>
-          <a:effectRef idx="0">
-            <a:schemeClr val="accent1"/>
-          </a:effectRef>
-          <a:fontRef idx="minor">
-            <a:schemeClr val="tx1"/>
-          </a:fontRef>
-        </p:style>
-      </p:cxnSp>
-      <p:sp>
-        <p:nvSpPr>
-          <p:cNvPr id="152" name="Rectangle 151">
-            <a:extLst>
-              <a:ext uri="{FF2B5EF4-FFF2-40B4-BE49-F238E27FC236}">
-                <a16:creationId xmlns:a16="http://schemas.microsoft.com/office/drawing/2014/main" id="{2D17192C-937C-49F2-AB55-CCF25B817752}"/>
-              </a:ext>
-            </a:extLst>
-          </p:cNvPr>
-          <p:cNvSpPr/>
-          <p:nvPr/>
-        </p:nvSpPr>
-        <p:spPr>
-          <a:xfrm>
-            <a:off x="18744160" y="7103401"/>
-            <a:ext cx="1819398" cy="877223"/>
-          </a:xfrm>
-          <a:prstGeom prst="rect">
-            <a:avLst/>
-          </a:prstGeom>
-          <a:solidFill>
-            <a:schemeClr val="bg1"/>
-          </a:solidFill>
-          <a:ln w="38100">
-            <a:solidFill>
-              <a:schemeClr val="tx1"/>
-            </a:solidFill>
-          </a:ln>
-        </p:spPr>
-        <p:style>
-          <a:lnRef idx="2">
-            <a:schemeClr val="accent1">
-              <a:shade val="50000"/>
-            </a:schemeClr>
-          </a:lnRef>
-          <a:fillRef idx="1">
-            <a:schemeClr val="accent1"/>
-          </a:fillRef>
-          <a:effectRef idx="0">
-            <a:schemeClr val="accent1"/>
-          </a:effectRef>
-          <a:fontRef idx="minor">
-            <a:schemeClr val="lt1"/>
-          </a:fontRef>
-        </p:style>
-        <p:txBody>
-          <a:bodyPr rtlCol="0" anchor="ctr"/>
-          <a:lstStyle/>
-          <a:p>
-            <a:pPr algn="ctr"/>
-            <a:r>
-              <a:rPr lang="en-US" sz="3000" i="1" dirty="0">
-                <a:solidFill>
-                  <a:schemeClr val="tx1"/>
-                </a:solidFill>
-                <a:latin typeface="Times New Roman" panose="02020603050405020304" pitchFamily="18" charset="0"/>
-                <a:cs typeface="Times New Roman" panose="02020603050405020304" pitchFamily="18" charset="0"/>
-              </a:rPr>
-              <a:t>N</a:t>
-            </a:r>
-            <a:r>
-              <a:rPr lang="en-US" sz="3000" baseline="-25000" dirty="0">
-                <a:solidFill>
-                  <a:schemeClr val="tx1"/>
-                </a:solidFill>
-                <a:latin typeface="Times New Roman" panose="02020603050405020304" pitchFamily="18" charset="0"/>
-                <a:cs typeface="Times New Roman" panose="02020603050405020304" pitchFamily="18" charset="0"/>
-              </a:rPr>
-              <a:t>fixer</a:t>
-            </a:r>
-            <a:endParaRPr lang="en-US" sz="3000" i="1" dirty="0">
-              <a:solidFill>
-                <a:schemeClr val="tx1"/>
-              </a:solidFill>
-              <a:latin typeface="Times New Roman" panose="02020603050405020304" pitchFamily="18" charset="0"/>
-              <a:cs typeface="Times New Roman" panose="02020603050405020304" pitchFamily="18" charset="0"/>
-            </a:endParaRPr>
-          </a:p>
-        </p:txBody>
-      </p:sp>
-      <p:cxnSp>
-        <p:nvCxnSpPr>
-          <p:cNvPr id="267" name="Straight Arrow Connector 266">
-            <a:extLst>
-              <a:ext uri="{FF2B5EF4-FFF2-40B4-BE49-F238E27FC236}">
-                <a16:creationId xmlns:a16="http://schemas.microsoft.com/office/drawing/2014/main" id="{82DEA27F-935B-D94A-2D5F-8264EAC3FDDF}"/>
-              </a:ext>
-            </a:extLst>
-          </p:cNvPr>
-          <p:cNvCxnSpPr>
-            <a:cxnSpLocks/>
-          </p:cNvCxnSpPr>
-          <p:nvPr/>
-        </p:nvCxnSpPr>
-        <p:spPr>
-          <a:xfrm>
-            <a:off x="11744765" y="5311103"/>
-            <a:ext cx="3829455" cy="4762633"/>
-          </a:xfrm>
-          <a:prstGeom prst="straightConnector1">
-            <a:avLst/>
-          </a:prstGeom>
-          <a:ln w="98425">
-            <a:solidFill>
-              <a:schemeClr val="accent1">
-                <a:lumMod val="75000"/>
-              </a:schemeClr>
-            </a:solidFill>
-            <a:tailEnd type="triangle"/>
-          </a:ln>
-        </p:spPr>
-        <p:style>
-          <a:lnRef idx="1">
-            <a:schemeClr val="accent1"/>
-          </a:lnRef>
-          <a:fillRef idx="0">
-            <a:schemeClr val="accent1"/>
-          </a:fillRef>
-          <a:effectRef idx="0">
-            <a:schemeClr val="accent1"/>
-          </a:effectRef>
-          <a:fontRef idx="minor">
-            <a:schemeClr val="tx1"/>
-          </a:fontRef>
-        </p:style>
-      </p:cxnSp>
-      <p:sp>
-        <p:nvSpPr>
-          <p:cNvPr id="144" name="Rectangle 143">
-            <a:extLst>
-              <a:ext uri="{FF2B5EF4-FFF2-40B4-BE49-F238E27FC236}">
-                <a16:creationId xmlns:a16="http://schemas.microsoft.com/office/drawing/2014/main" id="{A78B38F8-81B3-D1FA-0AD1-5773256590EC}"/>
-              </a:ext>
-            </a:extLst>
-          </p:cNvPr>
-          <p:cNvSpPr/>
-          <p:nvPr/>
-        </p:nvSpPr>
-        <p:spPr>
-          <a:xfrm>
-            <a:off x="1847531" y="10066205"/>
-            <a:ext cx="1819398" cy="877223"/>
-          </a:xfrm>
-          <a:prstGeom prst="rect">
-            <a:avLst/>
-          </a:prstGeom>
-          <a:solidFill>
-            <a:schemeClr val="bg1"/>
-          </a:solidFill>
-          <a:ln w="38100">
-            <a:solidFill>
-              <a:schemeClr val="tx1"/>
-            </a:solidFill>
-          </a:ln>
-        </p:spPr>
-        <p:style>
-          <a:lnRef idx="2">
-            <a:schemeClr val="accent1">
-              <a:shade val="50000"/>
-            </a:schemeClr>
-          </a:lnRef>
-          <a:fillRef idx="1">
-            <a:schemeClr val="accent1"/>
-          </a:fillRef>
-          <a:effectRef idx="0">
-            <a:schemeClr val="accent1"/>
-          </a:effectRef>
-          <a:fontRef idx="minor">
-            <a:schemeClr val="lt1"/>
-          </a:fontRef>
-        </p:style>
-        <p:txBody>
-          <a:bodyPr rtlCol="0" anchor="ctr"/>
-          <a:lstStyle/>
-          <a:p>
-            <a:pPr algn="ctr"/>
-            <a:r>
-              <a:rPr lang="en-US" sz="3000" i="1" dirty="0">
-                <a:solidFill>
-                  <a:schemeClr val="tx1"/>
-                </a:solidFill>
-                <a:latin typeface="Times New Roman" panose="02020603050405020304" pitchFamily="18" charset="0"/>
-                <a:cs typeface="Times New Roman" panose="02020603050405020304" pitchFamily="18" charset="0"/>
-              </a:rPr>
-              <a:t>Soil N</a:t>
-            </a:r>
-            <a:endParaRPr lang="en-US" sz="3000" dirty="0">
-              <a:solidFill>
-                <a:schemeClr val="tx1"/>
-              </a:solidFill>
-              <a:latin typeface="Times New Roman" panose="02020603050405020304" pitchFamily="18" charset="0"/>
-              <a:cs typeface="Times New Roman" panose="02020603050405020304" pitchFamily="18" charset="0"/>
-            </a:endParaRPr>
-          </a:p>
-        </p:txBody>
-      </p:sp>
-      <p:sp>
-        <p:nvSpPr>
-          <p:cNvPr id="149" name="Rectangle 148">
-            <a:extLst>
-              <a:ext uri="{FF2B5EF4-FFF2-40B4-BE49-F238E27FC236}">
-                <a16:creationId xmlns:a16="http://schemas.microsoft.com/office/drawing/2014/main" id="{37E4791A-A4FE-F459-D539-AC5C8696DD32}"/>
-              </a:ext>
-            </a:extLst>
-          </p:cNvPr>
-          <p:cNvSpPr/>
-          <p:nvPr/>
-        </p:nvSpPr>
-        <p:spPr>
-          <a:xfrm>
-            <a:off x="10966373" y="7339374"/>
-            <a:ext cx="1819398" cy="877223"/>
-          </a:xfrm>
-          <a:prstGeom prst="rect">
-            <a:avLst/>
-          </a:prstGeom>
-          <a:solidFill>
-            <a:schemeClr val="bg1"/>
-          </a:solidFill>
-          <a:ln w="38100">
-            <a:solidFill>
-              <a:schemeClr val="tx1"/>
-            </a:solidFill>
-          </a:ln>
-        </p:spPr>
-        <p:style>
-          <a:lnRef idx="2">
-            <a:schemeClr val="accent1">
-              <a:shade val="50000"/>
-            </a:schemeClr>
-          </a:lnRef>
-          <a:fillRef idx="1">
-            <a:schemeClr val="accent1"/>
-          </a:fillRef>
-          <a:effectRef idx="0">
-            <a:schemeClr val="accent1"/>
-          </a:effectRef>
-          <a:fontRef idx="minor">
-            <a:schemeClr val="lt1"/>
-          </a:fontRef>
-        </p:style>
-        <p:txBody>
-          <a:bodyPr rtlCol="0" anchor="ctr"/>
-          <a:lstStyle/>
-          <a:p>
-            <a:pPr algn="ctr"/>
-            <a:r>
-              <a:rPr lang="en-US" sz="3000" i="1" dirty="0">
-                <a:solidFill>
-                  <a:schemeClr val="tx1"/>
-                </a:solidFill>
-                <a:latin typeface="Times New Roman" panose="02020603050405020304" pitchFamily="18" charset="0"/>
-                <a:cs typeface="Times New Roman" panose="02020603050405020304" pitchFamily="18" charset="0"/>
-              </a:rPr>
-              <a:t>Leaf Ci:Ca</a:t>
-            </a:r>
-          </a:p>
-        </p:txBody>
-      </p:sp>
-      <p:cxnSp>
-        <p:nvCxnSpPr>
-          <p:cNvPr id="276" name="Elbow Connector 275">
-            <a:extLst>
-              <a:ext uri="{FF2B5EF4-FFF2-40B4-BE49-F238E27FC236}">
-                <a16:creationId xmlns:a16="http://schemas.microsoft.com/office/drawing/2014/main" id="{A30ACE67-B7B9-B0CA-D90B-859AF06A0A79}"/>
-              </a:ext>
-            </a:extLst>
-          </p:cNvPr>
-          <p:cNvCxnSpPr>
-            <a:cxnSpLocks/>
-          </p:cNvCxnSpPr>
-          <p:nvPr/>
-        </p:nvCxnSpPr>
-        <p:spPr>
-          <a:xfrm flipV="1">
-            <a:off x="17354614" y="5311103"/>
-            <a:ext cx="14288" cy="5473926"/>
-          </a:xfrm>
-          <a:prstGeom prst="bentConnector3">
-            <a:avLst>
-              <a:gd name="adj1" fmla="val 6499776"/>
-            </a:avLst>
-          </a:prstGeom>
-          <a:ln w="80264">
-            <a:solidFill>
-              <a:schemeClr val="accent1">
-                <a:lumMod val="75000"/>
-              </a:schemeClr>
-            </a:solidFill>
-            <a:tailEnd type="triangle"/>
-          </a:ln>
-        </p:spPr>
-        <p:style>
-          <a:lnRef idx="1">
-            <a:schemeClr val="accent1"/>
-          </a:lnRef>
-          <a:fillRef idx="0">
-            <a:schemeClr val="accent1"/>
-          </a:fillRef>
-          <a:effectRef idx="0">
-            <a:schemeClr val="accent1"/>
-          </a:effectRef>
-          <a:fontRef idx="minor">
-            <a:schemeClr val="tx1"/>
-          </a:fontRef>
-        </p:style>
-      </p:cxnSp>
-      <p:sp>
-        <p:nvSpPr>
-          <p:cNvPr id="147" name="Rectangle 146">
-            <a:extLst>
-              <a:ext uri="{FF2B5EF4-FFF2-40B4-BE49-F238E27FC236}">
-                <a16:creationId xmlns:a16="http://schemas.microsoft.com/office/drawing/2014/main" id="{C5E78A6B-70A3-51B7-4E35-61DC0344F209}"/>
-              </a:ext>
-            </a:extLst>
-          </p:cNvPr>
-          <p:cNvSpPr/>
-          <p:nvPr/>
-        </p:nvSpPr>
-        <p:spPr>
-          <a:xfrm>
-            <a:off x="10944110" y="4599810"/>
-            <a:ext cx="1819398" cy="877223"/>
-          </a:xfrm>
-          <a:prstGeom prst="rect">
-            <a:avLst/>
-          </a:prstGeom>
-          <a:solidFill>
-            <a:schemeClr val="bg1"/>
-          </a:solidFill>
-          <a:ln w="38100">
-            <a:solidFill>
-              <a:schemeClr val="tx1"/>
-            </a:solidFill>
-          </a:ln>
-        </p:spPr>
-        <p:style>
-          <a:lnRef idx="2">
-            <a:schemeClr val="accent1">
-              <a:shade val="50000"/>
-            </a:schemeClr>
-          </a:lnRef>
-          <a:fillRef idx="1">
-            <a:schemeClr val="accent1"/>
-          </a:fillRef>
-          <a:effectRef idx="0">
-            <a:schemeClr val="accent1"/>
-          </a:effectRef>
-          <a:fontRef idx="minor">
-            <a:schemeClr val="lt1"/>
-          </a:fontRef>
-        </p:style>
-        <p:txBody>
-          <a:bodyPr rtlCol="0" anchor="ctr"/>
-          <a:lstStyle/>
-          <a:p>
-            <a:pPr algn="ctr"/>
-            <a:r>
-              <a:rPr lang="en-US" sz="3000" b="1" dirty="0">
-                <a:solidFill>
-                  <a:schemeClr val="accent1">
-                    <a:lumMod val="75000"/>
-                  </a:schemeClr>
-                </a:solidFill>
-                <a:latin typeface="Times New Roman" panose="02020603050405020304" pitchFamily="18" charset="0"/>
-                <a:cs typeface="Times New Roman" panose="02020603050405020304" pitchFamily="18" charset="0"/>
-              </a:rPr>
-              <a:t>C</a:t>
-            </a:r>
-            <a:r>
-              <a:rPr lang="en-US" sz="3000" b="1" baseline="-25000" dirty="0">
-                <a:solidFill>
-                  <a:schemeClr val="accent1">
-                    <a:lumMod val="75000"/>
-                  </a:schemeClr>
-                </a:solidFill>
-                <a:latin typeface="Times New Roman" panose="02020603050405020304" pitchFamily="18" charset="0"/>
-                <a:cs typeface="Times New Roman" panose="02020603050405020304" pitchFamily="18" charset="0"/>
-              </a:rPr>
-              <a:t>3</a:t>
-            </a:r>
-            <a:r>
-              <a:rPr lang="en-US" sz="3000" b="1" dirty="0">
-                <a:solidFill>
-                  <a:schemeClr val="tx1"/>
-                </a:solidFill>
-                <a:latin typeface="Times New Roman" panose="02020603050405020304" pitchFamily="18" charset="0"/>
-                <a:cs typeface="Times New Roman" panose="02020603050405020304" pitchFamily="18" charset="0"/>
-              </a:rPr>
-              <a:t>/</a:t>
-            </a:r>
-            <a:r>
-              <a:rPr lang="en-US" sz="3000" b="1" dirty="0">
-                <a:solidFill>
-                  <a:srgbClr val="C00000"/>
-                </a:solidFill>
-                <a:latin typeface="Times New Roman" panose="02020603050405020304" pitchFamily="18" charset="0"/>
-                <a:cs typeface="Times New Roman" panose="02020603050405020304" pitchFamily="18" charset="0"/>
-              </a:rPr>
-              <a:t>C</a:t>
-            </a:r>
-            <a:r>
-              <a:rPr lang="en-US" sz="3000" b="1" baseline="-25000" dirty="0">
-                <a:solidFill>
-                  <a:srgbClr val="C00000"/>
-                </a:solidFill>
-                <a:latin typeface="Times New Roman" panose="02020603050405020304" pitchFamily="18" charset="0"/>
-                <a:cs typeface="Times New Roman" panose="02020603050405020304" pitchFamily="18" charset="0"/>
-              </a:rPr>
-              <a:t>4</a:t>
-            </a:r>
-            <a:endParaRPr lang="en-US" sz="3000" b="1" dirty="0">
-              <a:solidFill>
-                <a:srgbClr val="C00000"/>
-              </a:solidFill>
-              <a:latin typeface="Times New Roman" panose="02020603050405020304" pitchFamily="18" charset="0"/>
-              <a:cs typeface="Times New Roman" panose="02020603050405020304" pitchFamily="18" charset="0"/>
-            </a:endParaRPr>
-          </a:p>
-        </p:txBody>
-      </p:sp>
-      <p:sp>
-        <p:nvSpPr>
-          <p:cNvPr id="150" name="Rectangle 149">
-            <a:extLst>
-              <a:ext uri="{FF2B5EF4-FFF2-40B4-BE49-F238E27FC236}">
-                <a16:creationId xmlns:a16="http://schemas.microsoft.com/office/drawing/2014/main" id="{EC6E95A2-A99B-1EAD-2343-C2D4995139F9}"/>
-              </a:ext>
-            </a:extLst>
-          </p:cNvPr>
-          <p:cNvSpPr/>
-          <p:nvPr/>
-        </p:nvSpPr>
-        <p:spPr>
-          <a:xfrm>
-            <a:off x="1847531" y="4592279"/>
-            <a:ext cx="1819398" cy="877223"/>
-          </a:xfrm>
-          <a:prstGeom prst="rect">
-            <a:avLst/>
-          </a:prstGeom>
-          <a:solidFill>
-            <a:schemeClr val="bg1"/>
-          </a:solidFill>
-          <a:ln w="38100">
-            <a:solidFill>
-              <a:schemeClr val="tx1"/>
-            </a:solidFill>
-          </a:ln>
-        </p:spPr>
-        <p:style>
-          <a:lnRef idx="2">
-            <a:schemeClr val="accent1">
-              <a:shade val="50000"/>
-            </a:schemeClr>
-          </a:lnRef>
-          <a:fillRef idx="1">
-            <a:schemeClr val="accent1"/>
-          </a:fillRef>
-          <a:effectRef idx="0">
-            <a:schemeClr val="accent1"/>
-          </a:effectRef>
-          <a:fontRef idx="minor">
-            <a:schemeClr val="lt1"/>
-          </a:fontRef>
-        </p:style>
-        <p:txBody>
-          <a:bodyPr rtlCol="0" anchor="ctr"/>
-          <a:lstStyle/>
-          <a:p>
-            <a:pPr algn="ctr"/>
-            <a:r>
-              <a:rPr lang="en-US" sz="3000" i="1" dirty="0">
-                <a:solidFill>
-                  <a:schemeClr val="tx1"/>
-                </a:solidFill>
-                <a:latin typeface="Times New Roman" panose="02020603050405020304" pitchFamily="18" charset="0"/>
-                <a:cs typeface="Times New Roman" panose="02020603050405020304" pitchFamily="18" charset="0"/>
-              </a:rPr>
-              <a:t>SM</a:t>
-            </a:r>
-            <a:r>
-              <a:rPr lang="en-US" sz="3000" baseline="-25000" dirty="0">
-                <a:solidFill>
-                  <a:schemeClr val="tx1"/>
-                </a:solidFill>
-                <a:latin typeface="Times New Roman" panose="02020603050405020304" pitchFamily="18" charset="0"/>
-                <a:cs typeface="Times New Roman" panose="02020603050405020304" pitchFamily="18" charset="0"/>
-              </a:rPr>
-              <a:t>2</a:t>
-            </a:r>
-            <a:endParaRPr lang="en-US" sz="3000" dirty="0">
-              <a:solidFill>
-                <a:schemeClr val="tx1"/>
-              </a:solidFill>
-              <a:latin typeface="Times New Roman" panose="02020603050405020304" pitchFamily="18" charset="0"/>
-              <a:cs typeface="Times New Roman" panose="02020603050405020304" pitchFamily="18" charset="0"/>
-            </a:endParaRPr>
-          </a:p>
-        </p:txBody>
-      </p:sp>
-      <p:cxnSp>
-        <p:nvCxnSpPr>
-          <p:cNvPr id="299" name="Elbow Connector 298">
-            <a:extLst>
-              <a:ext uri="{FF2B5EF4-FFF2-40B4-BE49-F238E27FC236}">
-                <a16:creationId xmlns:a16="http://schemas.microsoft.com/office/drawing/2014/main" id="{056E95C4-C923-6172-ED5A-038375542915}"/>
-              </a:ext>
-            </a:extLst>
-          </p:cNvPr>
-          <p:cNvCxnSpPr>
-            <a:stCxn id="150" idx="0"/>
-            <a:endCxn id="145" idx="0"/>
-          </p:cNvCxnSpPr>
-          <p:nvPr/>
-        </p:nvCxnSpPr>
-        <p:spPr>
-          <a:xfrm rot="5400000" flipH="1" flipV="1">
-            <a:off x="9608216" y="-2258707"/>
-            <a:ext cx="12700" cy="13701973"/>
-          </a:xfrm>
-          <a:prstGeom prst="bentConnector3">
-            <a:avLst>
-              <a:gd name="adj1" fmla="val 7312504"/>
-            </a:avLst>
-          </a:prstGeom>
-          <a:ln w="26416">
-            <a:solidFill>
-              <a:schemeClr val="accent1">
-                <a:lumMod val="75000"/>
-              </a:schemeClr>
-            </a:solidFill>
-            <a:tailEnd type="triangle"/>
-          </a:ln>
-        </p:spPr>
-        <p:style>
-          <a:lnRef idx="1">
-            <a:schemeClr val="accent1"/>
-          </a:lnRef>
-          <a:fillRef idx="0">
-            <a:schemeClr val="accent1"/>
-          </a:fillRef>
-          <a:effectRef idx="0">
-            <a:schemeClr val="accent1"/>
-          </a:effectRef>
-          <a:fontRef idx="minor">
-            <a:schemeClr val="tx1"/>
-          </a:fontRef>
-        </p:style>
-      </p:cxnSp>
       <p:grpSp>
         <p:nvGrpSpPr>
-          <p:cNvPr id="329" name="Group 328">
-            <a:extLst>
-              <a:ext uri="{FF2B5EF4-FFF2-40B4-BE49-F238E27FC236}">
-                <a16:creationId xmlns:a16="http://schemas.microsoft.com/office/drawing/2014/main" id="{14D39D2C-EBC1-5027-45B3-836F55B976D1}"/>
+          <p:cNvPr id="6" name="Group 5">
+            <a:extLst>
+              <a:ext uri="{FF2B5EF4-FFF2-40B4-BE49-F238E27FC236}">
+                <a16:creationId xmlns:a16="http://schemas.microsoft.com/office/drawing/2014/main" id="{7ACE01A2-12CB-F702-2A3E-6C2772EB6B65}"/>
               </a:ext>
             </a:extLst>
           </p:cNvPr>
@@ -10209,10 +10179,10 @@
         </p:nvGrpSpPr>
         <p:grpSpPr>
           <a:xfrm>
-            <a:off x="6777233" y="12805674"/>
-            <a:ext cx="5674665" cy="1494114"/>
-            <a:chOff x="6781209" y="12978518"/>
-            <a:chExt cx="5674665" cy="1494114"/>
+            <a:off x="9994590" y="12516819"/>
+            <a:ext cx="5751830" cy="1491548"/>
+            <a:chOff x="10433050" y="12808239"/>
+            <a:chExt cx="5751830" cy="1491548"/>
           </a:xfrm>
         </p:grpSpPr>
         <p:cxnSp>
@@ -10231,56 +10201,13 @@
           </p:nvCxnSpPr>
           <p:spPr>
             <a:xfrm>
-              <a:off x="7714281" y="13016619"/>
+              <a:off x="11403764" y="12854448"/>
               <a:ext cx="951115" cy="0"/>
             </a:xfrm>
             <a:prstGeom prst="line">
               <a:avLst/>
             </a:prstGeom>
-            <a:ln w="76200">
-              <a:solidFill>
-                <a:srgbClr val="C00000"/>
-              </a:solidFill>
-            </a:ln>
-          </p:spPr>
-          <p:style>
-            <a:lnRef idx="1">
-              <a:schemeClr val="accent1"/>
-            </a:lnRef>
-            <a:fillRef idx="0">
-              <a:schemeClr val="accent1"/>
-            </a:fillRef>
-            <a:effectRef idx="0">
-              <a:schemeClr val="accent1"/>
-            </a:effectRef>
-            <a:fontRef idx="minor">
-              <a:schemeClr val="tx1"/>
-            </a:fontRef>
-          </p:style>
-        </p:cxnSp>
-        <p:cxnSp>
-          <p:nvCxnSpPr>
-            <p:cNvPr id="306" name="Straight Connector 305">
-              <a:extLst>
-                <a:ext uri="{FF2B5EF4-FFF2-40B4-BE49-F238E27FC236}">
-                  <a16:creationId xmlns:a16="http://schemas.microsoft.com/office/drawing/2014/main" id="{D1A9DA54-E777-BA6D-9268-2E5E984EB1E2}"/>
-                </a:ext>
-              </a:extLst>
-            </p:cNvPr>
-            <p:cNvCxnSpPr>
-              <a:cxnSpLocks/>
-            </p:cNvCxnSpPr>
-            <p:nvPr/>
-          </p:nvCxnSpPr>
-          <p:spPr>
-            <a:xfrm>
-              <a:off x="8657458" y="12978518"/>
-              <a:ext cx="951115" cy="0"/>
-            </a:xfrm>
-            <a:prstGeom prst="line">
-              <a:avLst/>
-            </a:prstGeom>
-            <a:ln w="152400">
+            <a:ln w="95250">
               <a:solidFill>
                 <a:srgbClr val="C00000"/>
               </a:solidFill>
@@ -10317,60 +10244,15 @@
           </p:nvCxnSpPr>
           <p:spPr>
             <a:xfrm>
-              <a:off x="6781209" y="13034082"/>
+              <a:off x="10470692" y="12875469"/>
               <a:ext cx="951115" cy="0"/>
             </a:xfrm>
             <a:prstGeom prst="line">
               <a:avLst/>
             </a:prstGeom>
-            <a:ln w="38100">
+            <a:ln w="47625">
               <a:solidFill>
                 <a:srgbClr val="C00000"/>
-              </a:solidFill>
-            </a:ln>
-          </p:spPr>
-          <p:style>
-            <a:lnRef idx="1">
-              <a:schemeClr val="accent1"/>
-            </a:lnRef>
-            <a:fillRef idx="0">
-              <a:schemeClr val="accent1"/>
-            </a:fillRef>
-            <a:effectRef idx="0">
-              <a:schemeClr val="accent1"/>
-            </a:effectRef>
-            <a:fontRef idx="minor">
-              <a:schemeClr val="tx1"/>
-            </a:fontRef>
-          </p:style>
-        </p:cxnSp>
-        <p:cxnSp>
-          <p:nvCxnSpPr>
-            <p:cNvPr id="308" name="Straight Connector 307">
-              <a:extLst>
-                <a:ext uri="{FF2B5EF4-FFF2-40B4-BE49-F238E27FC236}">
-                  <a16:creationId xmlns:a16="http://schemas.microsoft.com/office/drawing/2014/main" id="{58FCCEEE-319F-0DEB-6973-1CFE1856B2B0}"/>
-                </a:ext>
-              </a:extLst>
-            </p:cNvPr>
-            <p:cNvCxnSpPr>
-              <a:cxnSpLocks/>
-            </p:cNvCxnSpPr>
-            <p:nvPr/>
-          </p:nvCxnSpPr>
-          <p:spPr>
-            <a:xfrm>
-              <a:off x="9605398" y="12981084"/>
-              <a:ext cx="951115" cy="0"/>
-            </a:xfrm>
-            <a:prstGeom prst="line">
-              <a:avLst/>
-            </a:prstGeom>
-            <a:ln w="152400">
-              <a:solidFill>
-                <a:schemeClr val="accent1">
-                  <a:lumMod val="75000"/>
-                </a:schemeClr>
               </a:solidFill>
             </a:ln>
           </p:spPr>
@@ -10405,13 +10287,13 @@
           </p:nvCxnSpPr>
           <p:spPr>
             <a:xfrm>
-              <a:off x="10553644" y="13019794"/>
+              <a:off x="14243127" y="12857623"/>
               <a:ext cx="951115" cy="0"/>
             </a:xfrm>
             <a:prstGeom prst="line">
               <a:avLst/>
             </a:prstGeom>
-            <a:ln w="76200">
+            <a:ln w="95250">
               <a:solidFill>
                 <a:schemeClr val="accent1">
                   <a:lumMod val="75000"/>
@@ -10450,13 +10332,13 @@
           </p:nvCxnSpPr>
           <p:spPr>
             <a:xfrm>
-              <a:off x="11504759" y="13038236"/>
+              <a:off x="15190684" y="12879623"/>
               <a:ext cx="951115" cy="0"/>
             </a:xfrm>
             <a:prstGeom prst="line">
               <a:avLst/>
             </a:prstGeom>
-            <a:ln w="38100">
+            <a:ln w="47625">
               <a:solidFill>
                 <a:schemeClr val="accent1">
                   <a:lumMod val="75000"/>
@@ -10493,7 +10375,7 @@
           </p:nvSpPr>
           <p:spPr>
             <a:xfrm>
-              <a:off x="8737714" y="13035061"/>
+              <a:off x="12427197" y="12862216"/>
               <a:ext cx="790601" cy="553998"/>
             </a:xfrm>
             <a:prstGeom prst="rect">
@@ -10531,7 +10413,7 @@
           </p:nvSpPr>
           <p:spPr>
             <a:xfrm>
-              <a:off x="9744164" y="13042103"/>
+              <a:off x="13433647" y="12869258"/>
               <a:ext cx="673582" cy="553998"/>
             </a:xfrm>
             <a:prstGeom prst="rect">
@@ -10569,7 +10451,7 @@
           </p:nvSpPr>
           <p:spPr>
             <a:xfrm>
-              <a:off x="7794537" y="13042103"/>
+              <a:off x="11484020" y="12869258"/>
               <a:ext cx="790601" cy="553998"/>
             </a:xfrm>
             <a:prstGeom prst="rect">
@@ -10607,7 +10489,7 @@
           </p:nvSpPr>
           <p:spPr>
             <a:xfrm>
-              <a:off x="10687341" y="13045556"/>
+              <a:off x="14376824" y="12872711"/>
               <a:ext cx="673582" cy="553998"/>
             </a:xfrm>
             <a:prstGeom prst="rect">
@@ -10645,7 +10527,7 @@
           </p:nvSpPr>
           <p:spPr>
             <a:xfrm>
-              <a:off x="11643525" y="13027732"/>
+              <a:off x="15333008" y="12854887"/>
               <a:ext cx="673582" cy="553998"/>
             </a:xfrm>
             <a:prstGeom prst="rect">
@@ -10683,7 +10565,7 @@
           </p:nvSpPr>
           <p:spPr>
             <a:xfrm>
-              <a:off x="6897777" y="13047157"/>
+              <a:off x="10587260" y="12874312"/>
               <a:ext cx="790601" cy="553998"/>
             </a:xfrm>
             <a:prstGeom prst="rect">
@@ -10721,7 +10603,7 @@
           </p:nvSpPr>
           <p:spPr>
             <a:xfrm>
-              <a:off x="7466030" y="13918634"/>
+              <a:off x="11155513" y="13745789"/>
               <a:ext cx="4278735" cy="553998"/>
             </a:xfrm>
             <a:prstGeom prst="rect">
@@ -10745,31 +10627,406 @@
             </a:p>
           </p:txBody>
         </p:sp>
+        <p:cxnSp>
+          <p:nvCxnSpPr>
+            <p:cNvPr id="306" name="Straight Connector 305">
+              <a:extLst>
+                <a:ext uri="{FF2B5EF4-FFF2-40B4-BE49-F238E27FC236}">
+                  <a16:creationId xmlns:a16="http://schemas.microsoft.com/office/drawing/2014/main" id="{D1A9DA54-E777-BA6D-9268-2E5E984EB1E2}"/>
+                </a:ext>
+              </a:extLst>
+            </p:cNvPr>
+            <p:cNvCxnSpPr>
+              <a:cxnSpLocks/>
+            </p:cNvCxnSpPr>
+            <p:nvPr/>
+          </p:nvCxnSpPr>
+          <p:spPr>
+            <a:xfrm>
+              <a:off x="12346941" y="12809231"/>
+              <a:ext cx="951115" cy="0"/>
+            </a:xfrm>
+            <a:prstGeom prst="line">
+              <a:avLst/>
+            </a:prstGeom>
+            <a:ln w="190500">
+              <a:solidFill>
+                <a:srgbClr val="C00000"/>
+              </a:solidFill>
+            </a:ln>
+          </p:spPr>
+          <p:style>
+            <a:lnRef idx="1">
+              <a:schemeClr val="accent1"/>
+            </a:lnRef>
+            <a:fillRef idx="0">
+              <a:schemeClr val="accent1"/>
+            </a:fillRef>
+            <a:effectRef idx="0">
+              <a:schemeClr val="accent1"/>
+            </a:effectRef>
+            <a:fontRef idx="minor">
+              <a:schemeClr val="tx1"/>
+            </a:fontRef>
+          </p:style>
+        </p:cxnSp>
+        <p:cxnSp>
+          <p:nvCxnSpPr>
+            <p:cNvPr id="308" name="Straight Connector 307">
+              <a:extLst>
+                <a:ext uri="{FF2B5EF4-FFF2-40B4-BE49-F238E27FC236}">
+                  <a16:creationId xmlns:a16="http://schemas.microsoft.com/office/drawing/2014/main" id="{58FCCEEE-319F-0DEB-6973-1CFE1856B2B0}"/>
+                </a:ext>
+              </a:extLst>
+            </p:cNvPr>
+            <p:cNvCxnSpPr>
+              <a:cxnSpLocks/>
+            </p:cNvCxnSpPr>
+            <p:nvPr/>
+          </p:nvCxnSpPr>
+          <p:spPr>
+            <a:xfrm>
+              <a:off x="13294881" y="12808239"/>
+              <a:ext cx="951115" cy="0"/>
+            </a:xfrm>
+            <a:prstGeom prst="line">
+              <a:avLst/>
+            </a:prstGeom>
+            <a:ln w="190500">
+              <a:solidFill>
+                <a:schemeClr val="accent1">
+                  <a:lumMod val="75000"/>
+                </a:schemeClr>
+              </a:solidFill>
+            </a:ln>
+          </p:spPr>
+          <p:style>
+            <a:lnRef idx="1">
+              <a:schemeClr val="accent1"/>
+            </a:lnRef>
+            <a:fillRef idx="0">
+              <a:schemeClr val="accent1"/>
+            </a:fillRef>
+            <a:effectRef idx="0">
+              <a:schemeClr val="accent1"/>
+            </a:effectRef>
+            <a:fontRef idx="minor">
+              <a:schemeClr val="tx1"/>
+            </a:fontRef>
+          </p:style>
+        </p:cxnSp>
+        <p:sp>
+          <p:nvSpPr>
+            <p:cNvPr id="2" name="Rectangle 1">
+              <a:extLst>
+                <a:ext uri="{FF2B5EF4-FFF2-40B4-BE49-F238E27FC236}">
+                  <a16:creationId xmlns:a16="http://schemas.microsoft.com/office/drawing/2014/main" id="{0505CCCA-23EC-02F8-8E02-93D20241DF45}"/>
+                </a:ext>
+              </a:extLst>
+            </p:cNvPr>
+            <p:cNvSpPr/>
+            <p:nvPr/>
+          </p:nvSpPr>
+          <p:spPr>
+            <a:xfrm>
+              <a:off x="10433050" y="12903688"/>
+              <a:ext cx="5751830" cy="56852"/>
+            </a:xfrm>
+            <a:prstGeom prst="rect">
+              <a:avLst/>
+            </a:prstGeom>
+            <a:solidFill>
+              <a:schemeClr val="bg1"/>
+            </a:solidFill>
+            <a:ln>
+              <a:noFill/>
+            </a:ln>
+          </p:spPr>
+          <p:style>
+            <a:lnRef idx="2">
+              <a:schemeClr val="accent1">
+                <a:shade val="50000"/>
+              </a:schemeClr>
+            </a:lnRef>
+            <a:fillRef idx="1">
+              <a:schemeClr val="accent1"/>
+            </a:fillRef>
+            <a:effectRef idx="0">
+              <a:schemeClr val="accent1"/>
+            </a:effectRef>
+            <a:fontRef idx="minor">
+              <a:schemeClr val="lt1"/>
+            </a:fontRef>
+          </p:style>
+          <p:txBody>
+            <a:bodyPr rtlCol="0" anchor="ctr"/>
+            <a:lstStyle/>
+            <a:p>
+              <a:pPr algn="ctr"/>
+              <a:endParaRPr lang="en-US"/>
+            </a:p>
+          </p:txBody>
+        </p:sp>
       </p:grpSp>
+      <p:sp>
+        <p:nvSpPr>
+          <p:cNvPr id="7" name="TextBox 6">
+            <a:extLst>
+              <a:ext uri="{FF2B5EF4-FFF2-40B4-BE49-F238E27FC236}">
+                <a16:creationId xmlns:a16="http://schemas.microsoft.com/office/drawing/2014/main" id="{57D6CB6B-2AB0-EAA2-7F43-80EE740A68DC}"/>
+              </a:ext>
+            </a:extLst>
+          </p:cNvPr>
+          <p:cNvSpPr txBox="1"/>
+          <p:nvPr/>
+        </p:nvSpPr>
+        <p:spPr>
+          <a:xfrm>
+            <a:off x="20000893" y="6605491"/>
+            <a:ext cx="800219" cy="461665"/>
+          </a:xfrm>
+          <a:prstGeom prst="rect">
+            <a:avLst/>
+          </a:prstGeom>
+          <a:noFill/>
+        </p:spPr>
+        <p:txBody>
+          <a:bodyPr wrap="none" rtlCol="0">
+            <a:spAutoFit/>
+          </a:bodyPr>
+          <a:lstStyle/>
+          <a:p>
+            <a:r>
+              <a:rPr lang="en-US" sz="2400" b="1" dirty="0">
+                <a:latin typeface="Times New Roman" panose="02020603050405020304" pitchFamily="18" charset="0"/>
+                <a:cs typeface="Times New Roman" panose="02020603050405020304" pitchFamily="18" charset="0"/>
+              </a:rPr>
+              <a:t>91%</a:t>
+            </a:r>
+          </a:p>
+        </p:txBody>
+      </p:sp>
+      <p:sp>
+        <p:nvSpPr>
+          <p:cNvPr id="8" name="TextBox 7">
+            <a:extLst>
+              <a:ext uri="{FF2B5EF4-FFF2-40B4-BE49-F238E27FC236}">
+                <a16:creationId xmlns:a16="http://schemas.microsoft.com/office/drawing/2014/main" id="{E73D4731-015B-1393-5949-6BDFE1D295AE}"/>
+              </a:ext>
+            </a:extLst>
+          </p:cNvPr>
+          <p:cNvSpPr txBox="1"/>
+          <p:nvPr/>
+        </p:nvSpPr>
+        <p:spPr>
+          <a:xfrm>
+            <a:off x="15439196" y="6605491"/>
+            <a:ext cx="800219" cy="461665"/>
+          </a:xfrm>
+          <a:prstGeom prst="rect">
+            <a:avLst/>
+          </a:prstGeom>
+          <a:noFill/>
+        </p:spPr>
+        <p:txBody>
+          <a:bodyPr wrap="none" rtlCol="0">
+            <a:spAutoFit/>
+          </a:bodyPr>
+          <a:lstStyle/>
+          <a:p>
+            <a:r>
+              <a:rPr lang="en-US" sz="2400" b="1" dirty="0">
+                <a:latin typeface="Times New Roman" panose="02020603050405020304" pitchFamily="18" charset="0"/>
+                <a:cs typeface="Times New Roman" panose="02020603050405020304" pitchFamily="18" charset="0"/>
+              </a:rPr>
+              <a:t>92%</a:t>
+            </a:r>
+          </a:p>
+        </p:txBody>
+      </p:sp>
+      <p:sp>
+        <p:nvSpPr>
+          <p:cNvPr id="9" name="TextBox 8">
+            <a:extLst>
+              <a:ext uri="{FF2B5EF4-FFF2-40B4-BE49-F238E27FC236}">
+                <a16:creationId xmlns:a16="http://schemas.microsoft.com/office/drawing/2014/main" id="{27C8939D-FF82-E5EA-6D69-AB10AEAE0B28}"/>
+              </a:ext>
+            </a:extLst>
+          </p:cNvPr>
+          <p:cNvSpPr txBox="1"/>
+          <p:nvPr/>
+        </p:nvSpPr>
+        <p:spPr>
+          <a:xfrm>
+            <a:off x="20000893" y="3846361"/>
+            <a:ext cx="800219" cy="461665"/>
+          </a:xfrm>
+          <a:prstGeom prst="rect">
+            <a:avLst/>
+          </a:prstGeom>
+          <a:noFill/>
+        </p:spPr>
+        <p:txBody>
+          <a:bodyPr wrap="none" rtlCol="0">
+            <a:spAutoFit/>
+          </a:bodyPr>
+          <a:lstStyle/>
+          <a:p>
+            <a:r>
+              <a:rPr lang="en-US" sz="2400" b="1" dirty="0">
+                <a:latin typeface="Times New Roman" panose="02020603050405020304" pitchFamily="18" charset="0"/>
+                <a:cs typeface="Times New Roman" panose="02020603050405020304" pitchFamily="18" charset="0"/>
+              </a:rPr>
+              <a:t>58%</a:t>
+            </a:r>
+          </a:p>
+        </p:txBody>
+      </p:sp>
+      <p:sp>
+        <p:nvSpPr>
+          <p:cNvPr id="10" name="TextBox 9">
+            <a:extLst>
+              <a:ext uri="{FF2B5EF4-FFF2-40B4-BE49-F238E27FC236}">
+                <a16:creationId xmlns:a16="http://schemas.microsoft.com/office/drawing/2014/main" id="{84AF56ED-6C10-30BE-8578-D4C573039D29}"/>
+              </a:ext>
+            </a:extLst>
+          </p:cNvPr>
+          <p:cNvSpPr txBox="1"/>
+          <p:nvPr/>
+        </p:nvSpPr>
+        <p:spPr>
+          <a:xfrm>
+            <a:off x="20000893" y="9309284"/>
+            <a:ext cx="800219" cy="461665"/>
+          </a:xfrm>
+          <a:prstGeom prst="rect">
+            <a:avLst/>
+          </a:prstGeom>
+          <a:noFill/>
+        </p:spPr>
+        <p:txBody>
+          <a:bodyPr wrap="none" rtlCol="0">
+            <a:spAutoFit/>
+          </a:bodyPr>
+          <a:lstStyle/>
+          <a:p>
+            <a:r>
+              <a:rPr lang="en-US" sz="2400" b="1" dirty="0">
+                <a:latin typeface="Times New Roman" panose="02020603050405020304" pitchFamily="18" charset="0"/>
+                <a:cs typeface="Times New Roman" panose="02020603050405020304" pitchFamily="18" charset="0"/>
+              </a:rPr>
+              <a:t>78%</a:t>
+            </a:r>
+          </a:p>
+        </p:txBody>
+      </p:sp>
+      <p:sp>
+        <p:nvSpPr>
+          <p:cNvPr id="14" name="TextBox 13">
+            <a:extLst>
+              <a:ext uri="{FF2B5EF4-FFF2-40B4-BE49-F238E27FC236}">
+                <a16:creationId xmlns:a16="http://schemas.microsoft.com/office/drawing/2014/main" id="{989BE5E6-26A2-D25C-F47A-691F4607216F}"/>
+              </a:ext>
+            </a:extLst>
+          </p:cNvPr>
+          <p:cNvSpPr txBox="1"/>
+          <p:nvPr/>
+        </p:nvSpPr>
+        <p:spPr>
+          <a:xfrm>
+            <a:off x="10874861" y="6599521"/>
+            <a:ext cx="800219" cy="461665"/>
+          </a:xfrm>
+          <a:prstGeom prst="rect">
+            <a:avLst/>
+          </a:prstGeom>
+          <a:noFill/>
+        </p:spPr>
+        <p:txBody>
+          <a:bodyPr wrap="none" rtlCol="0">
+            <a:spAutoFit/>
+          </a:bodyPr>
+          <a:lstStyle/>
+          <a:p>
+            <a:r>
+              <a:rPr lang="en-US" sz="2400" b="1" dirty="0">
+                <a:latin typeface="Times New Roman" panose="02020603050405020304" pitchFamily="18" charset="0"/>
+                <a:cs typeface="Times New Roman" panose="02020603050405020304" pitchFamily="18" charset="0"/>
+              </a:rPr>
+              <a:t>41%</a:t>
+            </a:r>
+          </a:p>
+        </p:txBody>
+      </p:sp>
       <p:cxnSp>
         <p:nvCxnSpPr>
-          <p:cNvPr id="322" name="Elbow Connector 321">
-            <a:extLst>
-              <a:ext uri="{FF2B5EF4-FFF2-40B4-BE49-F238E27FC236}">
-                <a16:creationId xmlns:a16="http://schemas.microsoft.com/office/drawing/2014/main" id="{439C9AB0-1DA9-E50D-981B-3798293AD17D}"/>
+          <p:cNvPr id="20" name="Elbow Connector 19">
+            <a:extLst>
+              <a:ext uri="{FF2B5EF4-FFF2-40B4-BE49-F238E27FC236}">
+                <a16:creationId xmlns:a16="http://schemas.microsoft.com/office/drawing/2014/main" id="{2F9630E7-B665-E4BF-AAE2-743E494E464F}"/>
               </a:ext>
             </a:extLst>
           </p:cNvPr>
           <p:cNvCxnSpPr>
             <a:cxnSpLocks/>
-            <a:stCxn id="152" idx="0"/>
+            <a:stCxn id="147" idx="1"/>
           </p:cNvCxnSpPr>
           <p:nvPr/>
         </p:nvCxnSpPr>
         <p:spPr>
-          <a:xfrm rot="16200000" flipV="1">
-            <a:off x="17357141" y="4806682"/>
-            <a:ext cx="2308481" cy="2284957"/>
-          </a:xfrm>
-          <a:prstGeom prst="bentConnector2">
-            <a:avLst/>
-          </a:prstGeom>
-          <a:ln w="50292">
+          <a:xfrm rot="10800000" flipV="1">
+            <a:off x="10544100" y="4732126"/>
+            <a:ext cx="3692054" cy="1462196"/>
+          </a:xfrm>
+          <a:prstGeom prst="bentConnector3">
+            <a:avLst/>
+          </a:prstGeom>
+          <a:ln w="116839">
+            <a:solidFill>
+              <a:schemeClr val="accent1">
+                <a:lumMod val="75000"/>
+              </a:schemeClr>
+            </a:solidFill>
+          </a:ln>
+        </p:spPr>
+        <p:style>
+          <a:lnRef idx="1">
+            <a:schemeClr val="accent1"/>
+          </a:lnRef>
+          <a:fillRef idx="0">
+            <a:schemeClr val="accent1"/>
+          </a:fillRef>
+          <a:effectRef idx="0">
+            <a:schemeClr val="accent1"/>
+          </a:effectRef>
+          <a:fontRef idx="minor">
+            <a:schemeClr val="tx1"/>
+          </a:fontRef>
+        </p:style>
+      </p:cxnSp>
+      <p:cxnSp>
+        <p:nvCxnSpPr>
+          <p:cNvPr id="22" name="Straight Arrow Connector 21">
+            <a:extLst>
+              <a:ext uri="{FF2B5EF4-FFF2-40B4-BE49-F238E27FC236}">
+                <a16:creationId xmlns:a16="http://schemas.microsoft.com/office/drawing/2014/main" id="{758CD8AA-F1B9-60EF-F311-DED381AAFB59}"/>
+              </a:ext>
+            </a:extLst>
+          </p:cNvPr>
+          <p:cNvCxnSpPr>
+            <a:endCxn id="148" idx="0"/>
+          </p:cNvCxnSpPr>
+          <p:nvPr/>
+        </p:nvCxnSpPr>
+        <p:spPr>
+          <a:xfrm>
+            <a:off x="10617421" y="6194322"/>
+            <a:ext cx="0" cy="838754"/>
+          </a:xfrm>
+          <a:prstGeom prst="straightConnector1">
+            <a:avLst/>
+          </a:prstGeom>
+          <a:ln w="116839">
             <a:solidFill>
               <a:schemeClr val="accent1">
                 <a:lumMod val="75000"/>
@@ -10793,6 +11050,172 @@
           </a:fontRef>
         </p:style>
       </p:cxnSp>
+      <p:sp>
+        <p:nvSpPr>
+          <p:cNvPr id="26" name="Rectangle 25">
+            <a:extLst>
+              <a:ext uri="{FF2B5EF4-FFF2-40B4-BE49-F238E27FC236}">
+                <a16:creationId xmlns:a16="http://schemas.microsoft.com/office/drawing/2014/main" id="{78122B79-003A-2809-E878-A39B4C455359}"/>
+              </a:ext>
+            </a:extLst>
+          </p:cNvPr>
+          <p:cNvSpPr/>
+          <p:nvPr/>
+        </p:nvSpPr>
+        <p:spPr>
+          <a:xfrm>
+            <a:off x="10398125" y="6045200"/>
+            <a:ext cx="158675" cy="225425"/>
+          </a:xfrm>
+          <a:prstGeom prst="rect">
+            <a:avLst/>
+          </a:prstGeom>
+          <a:solidFill>
+            <a:schemeClr val="bg1"/>
+          </a:solidFill>
+          <a:ln>
+            <a:noFill/>
+          </a:ln>
+        </p:spPr>
+        <p:style>
+          <a:lnRef idx="2">
+            <a:schemeClr val="accent1">
+              <a:shade val="50000"/>
+            </a:schemeClr>
+          </a:lnRef>
+          <a:fillRef idx="1">
+            <a:schemeClr val="accent1"/>
+          </a:fillRef>
+          <a:effectRef idx="0">
+            <a:schemeClr val="accent1"/>
+          </a:effectRef>
+          <a:fontRef idx="minor">
+            <a:schemeClr val="lt1"/>
+          </a:fontRef>
+        </p:style>
+        <p:txBody>
+          <a:bodyPr rtlCol="0" anchor="ctr"/>
+          <a:lstStyle/>
+          <a:p>
+            <a:pPr algn="ctr"/>
+            <a:endParaRPr lang="en-US"/>
+          </a:p>
+        </p:txBody>
+      </p:sp>
+      <p:sp>
+        <p:nvSpPr>
+          <p:cNvPr id="147" name="Rectangle 146">
+            <a:extLst>
+              <a:ext uri="{FF2B5EF4-FFF2-40B4-BE49-F238E27FC236}">
+                <a16:creationId xmlns:a16="http://schemas.microsoft.com/office/drawing/2014/main" id="{C5E78A6B-70A3-51B7-4E35-61DC0344F209}"/>
+              </a:ext>
+            </a:extLst>
+          </p:cNvPr>
+          <p:cNvSpPr/>
+          <p:nvPr/>
+        </p:nvSpPr>
+        <p:spPr>
+          <a:xfrm>
+            <a:off x="14236154" y="4293514"/>
+            <a:ext cx="1819398" cy="877223"/>
+          </a:xfrm>
+          <a:prstGeom prst="rect">
+            <a:avLst/>
+          </a:prstGeom>
+          <a:solidFill>
+            <a:schemeClr val="bg1"/>
+          </a:solidFill>
+          <a:ln w="38100">
+            <a:solidFill>
+              <a:schemeClr val="tx1"/>
+            </a:solidFill>
+          </a:ln>
+        </p:spPr>
+        <p:style>
+          <a:lnRef idx="2">
+            <a:schemeClr val="accent1">
+              <a:shade val="50000"/>
+            </a:schemeClr>
+          </a:lnRef>
+          <a:fillRef idx="1">
+            <a:schemeClr val="accent1"/>
+          </a:fillRef>
+          <a:effectRef idx="0">
+            <a:schemeClr val="accent1"/>
+          </a:effectRef>
+          <a:fontRef idx="minor">
+            <a:schemeClr val="lt1"/>
+          </a:fontRef>
+        </p:style>
+        <p:txBody>
+          <a:bodyPr rtlCol="0" anchor="ctr"/>
+          <a:lstStyle/>
+          <a:p>
+            <a:pPr algn="ctr"/>
+            <a:r>
+              <a:rPr lang="en-US" sz="3000" b="1" dirty="0">
+                <a:solidFill>
+                  <a:schemeClr val="accent1">
+                    <a:lumMod val="75000"/>
+                  </a:schemeClr>
+                </a:solidFill>
+                <a:latin typeface="Times New Roman" panose="02020603050405020304" pitchFamily="18" charset="0"/>
+                <a:cs typeface="Times New Roman" panose="02020603050405020304" pitchFamily="18" charset="0"/>
+              </a:rPr>
+              <a:t>C</a:t>
+            </a:r>
+            <a:r>
+              <a:rPr lang="en-US" sz="3000" b="1" baseline="-25000" dirty="0">
+                <a:solidFill>
+                  <a:schemeClr val="accent1">
+                    <a:lumMod val="75000"/>
+                  </a:schemeClr>
+                </a:solidFill>
+                <a:latin typeface="Times New Roman" panose="02020603050405020304" pitchFamily="18" charset="0"/>
+                <a:cs typeface="Times New Roman" panose="02020603050405020304" pitchFamily="18" charset="0"/>
+              </a:rPr>
+              <a:t>3</a:t>
+            </a:r>
+            <a:r>
+              <a:rPr lang="en-US" sz="3000" b="1" dirty="0">
+                <a:solidFill>
+                  <a:schemeClr val="tx1"/>
+                </a:solidFill>
+                <a:latin typeface="Times New Roman" panose="02020603050405020304" pitchFamily="18" charset="0"/>
+                <a:cs typeface="Times New Roman" panose="02020603050405020304" pitchFamily="18" charset="0"/>
+              </a:rPr>
+              <a:t>/</a:t>
+            </a:r>
+            <a:r>
+              <a:rPr lang="en-US" sz="3000" b="1" dirty="0">
+                <a:solidFill>
+                  <a:srgbClr val="C00000"/>
+                </a:solidFill>
+                <a:latin typeface="Times New Roman" panose="02020603050405020304" pitchFamily="18" charset="0"/>
+                <a:cs typeface="Times New Roman" panose="02020603050405020304" pitchFamily="18" charset="0"/>
+              </a:rPr>
+              <a:t>C</a:t>
+            </a:r>
+            <a:r>
+              <a:rPr lang="en-US" sz="3000" b="1" baseline="-25000" dirty="0">
+                <a:solidFill>
+                  <a:srgbClr val="C00000"/>
+                </a:solidFill>
+                <a:latin typeface="Times New Roman" panose="02020603050405020304" pitchFamily="18" charset="0"/>
+                <a:cs typeface="Times New Roman" panose="02020603050405020304" pitchFamily="18" charset="0"/>
+              </a:rPr>
+              <a:t>4</a:t>
+            </a:r>
+            <a:endParaRPr lang="en-US" sz="3000" b="1" dirty="0">
+              <a:solidFill>
+                <a:srgbClr val="C00000"/>
+              </a:solidFill>
+              <a:latin typeface="Times New Roman" panose="02020603050405020304" pitchFamily="18" charset="0"/>
+              <a:cs typeface="Times New Roman" panose="02020603050405020304" pitchFamily="18" charset="0"/>
+            </a:endParaRPr>
+          </a:p>
+        </p:txBody>
+      </p:sp>
     </p:spTree>
     <p:extLst>
       <p:ext uri="{BB962C8B-B14F-4D97-AF65-F5344CB8AC3E}">

</xml_diff>

<commit_message>
add comments from Nick, modify SEM to no longer have direct arrow between chi and Narea
</commit_message>
<xml_diff>
--- a/working_drafts/figs/TXeco_SEM_ppt_fig.pptx
+++ b/working_drafts/figs/TXeco_SEM_ppt_fig.pptx
@@ -199,7 +199,7 @@
           <a:p>
             <a:fld id="{9C8338E3-F40D-F146-8D3B-4726E84D5200}" type="datetimeFigureOut">
               <a:rPr lang="en-US" smtClean="0"/>
-              <a:t>1/18/23</a:t>
+              <a:t>1/24/23</a:t>
             </a:fld>
             <a:endParaRPr lang="en-US"/>
           </a:p>
@@ -854,7 +854,7 @@
           <a:p>
             <a:fld id="{D3A28AA4-801E-B147-9E5C-6E6DBA6E23D1}" type="datetimeFigureOut">
               <a:rPr lang="en-US" smtClean="0"/>
-              <a:t>1/18/23</a:t>
+              <a:t>1/24/23</a:t>
             </a:fld>
             <a:endParaRPr lang="en-US"/>
           </a:p>
@@ -1024,7 +1024,7 @@
           <a:p>
             <a:fld id="{D3A28AA4-801E-B147-9E5C-6E6DBA6E23D1}" type="datetimeFigureOut">
               <a:rPr lang="en-US" smtClean="0"/>
-              <a:t>1/18/23</a:t>
+              <a:t>1/24/23</a:t>
             </a:fld>
             <a:endParaRPr lang="en-US"/>
           </a:p>
@@ -1204,7 +1204,7 @@
           <a:p>
             <a:fld id="{D3A28AA4-801E-B147-9E5C-6E6DBA6E23D1}" type="datetimeFigureOut">
               <a:rPr lang="en-US" smtClean="0"/>
-              <a:t>1/18/23</a:t>
+              <a:t>1/24/23</a:t>
             </a:fld>
             <a:endParaRPr lang="en-US"/>
           </a:p>
@@ -1374,7 +1374,7 @@
           <a:p>
             <a:fld id="{D3A28AA4-801E-B147-9E5C-6E6DBA6E23D1}" type="datetimeFigureOut">
               <a:rPr lang="en-US" smtClean="0"/>
-              <a:t>1/18/23</a:t>
+              <a:t>1/24/23</a:t>
             </a:fld>
             <a:endParaRPr lang="en-US"/>
           </a:p>
@@ -1618,7 +1618,7 @@
           <a:p>
             <a:fld id="{D3A28AA4-801E-B147-9E5C-6E6DBA6E23D1}" type="datetimeFigureOut">
               <a:rPr lang="en-US" smtClean="0"/>
-              <a:t>1/18/23</a:t>
+              <a:t>1/24/23</a:t>
             </a:fld>
             <a:endParaRPr lang="en-US"/>
           </a:p>
@@ -1850,7 +1850,7 @@
           <a:p>
             <a:fld id="{D3A28AA4-801E-B147-9E5C-6E6DBA6E23D1}" type="datetimeFigureOut">
               <a:rPr lang="en-US" smtClean="0"/>
-              <a:t>1/18/23</a:t>
+              <a:t>1/24/23</a:t>
             </a:fld>
             <a:endParaRPr lang="en-US"/>
           </a:p>
@@ -2217,7 +2217,7 @@
           <a:p>
             <a:fld id="{D3A28AA4-801E-B147-9E5C-6E6DBA6E23D1}" type="datetimeFigureOut">
               <a:rPr lang="en-US" smtClean="0"/>
-              <a:t>1/18/23</a:t>
+              <a:t>1/24/23</a:t>
             </a:fld>
             <a:endParaRPr lang="en-US"/>
           </a:p>
@@ -2335,7 +2335,7 @@
           <a:p>
             <a:fld id="{D3A28AA4-801E-B147-9E5C-6E6DBA6E23D1}" type="datetimeFigureOut">
               <a:rPr lang="en-US" smtClean="0"/>
-              <a:t>1/18/23</a:t>
+              <a:t>1/24/23</a:t>
             </a:fld>
             <a:endParaRPr lang="en-US"/>
           </a:p>
@@ -2430,7 +2430,7 @@
           <a:p>
             <a:fld id="{D3A28AA4-801E-B147-9E5C-6E6DBA6E23D1}" type="datetimeFigureOut">
               <a:rPr lang="en-US" smtClean="0"/>
-              <a:t>1/18/23</a:t>
+              <a:t>1/24/23</a:t>
             </a:fld>
             <a:endParaRPr lang="en-US"/>
           </a:p>
@@ -2707,7 +2707,7 @@
           <a:p>
             <a:fld id="{D3A28AA4-801E-B147-9E5C-6E6DBA6E23D1}" type="datetimeFigureOut">
               <a:rPr lang="en-US" smtClean="0"/>
-              <a:t>1/18/23</a:t>
+              <a:t>1/24/23</a:t>
             </a:fld>
             <a:endParaRPr lang="en-US"/>
           </a:p>
@@ -2964,7 +2964,7 @@
           <a:p>
             <a:fld id="{D3A28AA4-801E-B147-9E5C-6E6DBA6E23D1}" type="datetimeFigureOut">
               <a:rPr lang="en-US" smtClean="0"/>
-              <a:t>1/18/23</a:t>
+              <a:t>1/24/23</a:t>
             </a:fld>
             <a:endParaRPr lang="en-US"/>
           </a:p>
@@ -3177,7 +3177,7 @@
           <a:p>
             <a:fld id="{D3A28AA4-801E-B147-9E5C-6E6DBA6E23D1}" type="datetimeFigureOut">
               <a:rPr lang="en-US" smtClean="0"/>
-              <a:t>1/18/23</a:t>
+              <a:t>1/24/23</a:t>
             </a:fld>
             <a:endParaRPr lang="en-US"/>
           </a:p>
@@ -8474,7 +8474,7 @@
           <a:prstGeom prst="straightConnector1">
             <a:avLst/>
           </a:prstGeom>
-          <a:ln w="192024">
+          <a:ln w="181991">
             <a:solidFill>
               <a:schemeClr val="accent1">
                 <a:lumMod val="75000"/>
@@ -9345,51 +9345,6 @@
       </p:sp>
       <p:cxnSp>
         <p:nvCxnSpPr>
-          <p:cNvPr id="11" name="Straight Arrow Connector 10">
-            <a:extLst>
-              <a:ext uri="{FF2B5EF4-FFF2-40B4-BE49-F238E27FC236}">
-                <a16:creationId xmlns:a16="http://schemas.microsoft.com/office/drawing/2014/main" id="{222EC271-B70F-8722-5F75-FD861A16A18A}"/>
-              </a:ext>
-            </a:extLst>
-          </p:cNvPr>
-          <p:cNvCxnSpPr>
-            <a:stCxn id="149" idx="3"/>
-            <a:endCxn id="143" idx="1"/>
-          </p:cNvCxnSpPr>
-          <p:nvPr/>
-        </p:nvCxnSpPr>
-        <p:spPr>
-          <a:xfrm flipV="1">
-            <a:off x="16077815" y="7457777"/>
-            <a:ext cx="2744279" cy="13913"/>
-          </a:xfrm>
-          <a:prstGeom prst="straightConnector1">
-            <a:avLst/>
-          </a:prstGeom>
-          <a:ln w="33274">
-            <a:solidFill>
-              <a:srgbClr val="C00000"/>
-            </a:solidFill>
-            <a:tailEnd type="triangle"/>
-          </a:ln>
-        </p:spPr>
-        <p:style>
-          <a:lnRef idx="1">
-            <a:schemeClr val="accent1"/>
-          </a:lnRef>
-          <a:fillRef idx="0">
-            <a:schemeClr val="accent1"/>
-          </a:fillRef>
-          <a:effectRef idx="0">
-            <a:schemeClr val="accent1"/>
-          </a:effectRef>
-          <a:fontRef idx="minor">
-            <a:schemeClr val="tx1"/>
-          </a:fontRef>
-        </p:style>
-      </p:cxnSp>
-      <p:cxnSp>
-        <p:nvCxnSpPr>
           <p:cNvPr id="13" name="Straight Arrow Connector 12">
             <a:extLst>
               <a:ext uri="{FF2B5EF4-FFF2-40B4-BE49-F238E27FC236}">
@@ -9411,7 +9366,7 @@
           <a:prstGeom prst="straightConnector1">
             <a:avLst/>
           </a:prstGeom>
-          <a:ln w="189230">
+          <a:ln w="186055">
             <a:solidFill>
               <a:schemeClr val="accent1">
                 <a:lumMod val="75000"/>
@@ -10750,6 +10705,58 @@
         <p:spPr>
           <a:xfrm>
             <a:off x="10137058" y="11719001"/>
+            <a:ext cx="7010400" cy="45719"/>
+          </a:xfrm>
+          <a:prstGeom prst="rect">
+            <a:avLst/>
+          </a:prstGeom>
+          <a:solidFill>
+            <a:schemeClr val="bg1"/>
+          </a:solidFill>
+          <a:ln>
+            <a:noFill/>
+          </a:ln>
+        </p:spPr>
+        <p:style>
+          <a:lnRef idx="2">
+            <a:schemeClr val="accent1">
+              <a:shade val="50000"/>
+            </a:schemeClr>
+          </a:lnRef>
+          <a:fillRef idx="1">
+            <a:schemeClr val="accent1"/>
+          </a:fillRef>
+          <a:effectRef idx="0">
+            <a:schemeClr val="accent1"/>
+          </a:effectRef>
+          <a:fontRef idx="minor">
+            <a:schemeClr val="lt1"/>
+          </a:fontRef>
+        </p:style>
+        <p:txBody>
+          <a:bodyPr rtlCol="0" anchor="ctr"/>
+          <a:lstStyle/>
+          <a:p>
+            <a:pPr algn="ctr"/>
+            <a:endParaRPr lang="en-US"/>
+          </a:p>
+        </p:txBody>
+      </p:sp>
+      <p:sp>
+        <p:nvSpPr>
+          <p:cNvPr id="5" name="Rectangle 4">
+            <a:extLst>
+              <a:ext uri="{FF2B5EF4-FFF2-40B4-BE49-F238E27FC236}">
+                <a16:creationId xmlns:a16="http://schemas.microsoft.com/office/drawing/2014/main" id="{AEA1F572-8465-B16E-D0EB-AE36EA9F14C4}"/>
+              </a:ext>
+            </a:extLst>
+          </p:cNvPr>
+          <p:cNvSpPr/>
+          <p:nvPr/>
+        </p:nvSpPr>
+        <p:spPr>
+          <a:xfrm>
+            <a:off x="10335482" y="11514793"/>
             <a:ext cx="7010400" cy="45719"/>
           </a:xfrm>
           <a:prstGeom prst="rect">

</xml_diff>

<commit_message>
major changes to results from closer look at isotope data
</commit_message>
<xml_diff>
--- a/working_drafts/figs/TXeco_SEM_ppt_fig.pptx
+++ b/working_drafts/figs/TXeco_SEM_ppt_fig.pptx
@@ -199,7 +199,7 @@
           <a:p>
             <a:fld id="{9C8338E3-F40D-F146-8D3B-4726E84D5200}" type="datetimeFigureOut">
               <a:rPr lang="en-US" smtClean="0"/>
-              <a:t>1/24/23</a:t>
+              <a:t>1/25/23</a:t>
             </a:fld>
             <a:endParaRPr lang="en-US"/>
           </a:p>
@@ -854,7 +854,7 @@
           <a:p>
             <a:fld id="{D3A28AA4-801E-B147-9E5C-6E6DBA6E23D1}" type="datetimeFigureOut">
               <a:rPr lang="en-US" smtClean="0"/>
-              <a:t>1/24/23</a:t>
+              <a:t>1/25/23</a:t>
             </a:fld>
             <a:endParaRPr lang="en-US"/>
           </a:p>
@@ -1024,7 +1024,7 @@
           <a:p>
             <a:fld id="{D3A28AA4-801E-B147-9E5C-6E6DBA6E23D1}" type="datetimeFigureOut">
               <a:rPr lang="en-US" smtClean="0"/>
-              <a:t>1/24/23</a:t>
+              <a:t>1/25/23</a:t>
             </a:fld>
             <a:endParaRPr lang="en-US"/>
           </a:p>
@@ -1204,7 +1204,7 @@
           <a:p>
             <a:fld id="{D3A28AA4-801E-B147-9E5C-6E6DBA6E23D1}" type="datetimeFigureOut">
               <a:rPr lang="en-US" smtClean="0"/>
-              <a:t>1/24/23</a:t>
+              <a:t>1/25/23</a:t>
             </a:fld>
             <a:endParaRPr lang="en-US"/>
           </a:p>
@@ -1374,7 +1374,7 @@
           <a:p>
             <a:fld id="{D3A28AA4-801E-B147-9E5C-6E6DBA6E23D1}" type="datetimeFigureOut">
               <a:rPr lang="en-US" smtClean="0"/>
-              <a:t>1/24/23</a:t>
+              <a:t>1/25/23</a:t>
             </a:fld>
             <a:endParaRPr lang="en-US"/>
           </a:p>
@@ -1618,7 +1618,7 @@
           <a:p>
             <a:fld id="{D3A28AA4-801E-B147-9E5C-6E6DBA6E23D1}" type="datetimeFigureOut">
               <a:rPr lang="en-US" smtClean="0"/>
-              <a:t>1/24/23</a:t>
+              <a:t>1/25/23</a:t>
             </a:fld>
             <a:endParaRPr lang="en-US"/>
           </a:p>
@@ -1850,7 +1850,7 @@
           <a:p>
             <a:fld id="{D3A28AA4-801E-B147-9E5C-6E6DBA6E23D1}" type="datetimeFigureOut">
               <a:rPr lang="en-US" smtClean="0"/>
-              <a:t>1/24/23</a:t>
+              <a:t>1/25/23</a:t>
             </a:fld>
             <a:endParaRPr lang="en-US"/>
           </a:p>
@@ -2217,7 +2217,7 @@
           <a:p>
             <a:fld id="{D3A28AA4-801E-B147-9E5C-6E6DBA6E23D1}" type="datetimeFigureOut">
               <a:rPr lang="en-US" smtClean="0"/>
-              <a:t>1/24/23</a:t>
+              <a:t>1/25/23</a:t>
             </a:fld>
             <a:endParaRPr lang="en-US"/>
           </a:p>
@@ -2335,7 +2335,7 @@
           <a:p>
             <a:fld id="{D3A28AA4-801E-B147-9E5C-6E6DBA6E23D1}" type="datetimeFigureOut">
               <a:rPr lang="en-US" smtClean="0"/>
-              <a:t>1/24/23</a:t>
+              <a:t>1/25/23</a:t>
             </a:fld>
             <a:endParaRPr lang="en-US"/>
           </a:p>
@@ -2430,7 +2430,7 @@
           <a:p>
             <a:fld id="{D3A28AA4-801E-B147-9E5C-6E6DBA6E23D1}" type="datetimeFigureOut">
               <a:rPr lang="en-US" smtClean="0"/>
-              <a:t>1/24/23</a:t>
+              <a:t>1/25/23</a:t>
             </a:fld>
             <a:endParaRPr lang="en-US"/>
           </a:p>
@@ -2707,7 +2707,7 @@
           <a:p>
             <a:fld id="{D3A28AA4-801E-B147-9E5C-6E6DBA6E23D1}" type="datetimeFigureOut">
               <a:rPr lang="en-US" smtClean="0"/>
-              <a:t>1/24/23</a:t>
+              <a:t>1/25/23</a:t>
             </a:fld>
             <a:endParaRPr lang="en-US"/>
           </a:p>
@@ -2964,7 +2964,7 @@
           <a:p>
             <a:fld id="{D3A28AA4-801E-B147-9E5C-6E6DBA6E23D1}" type="datetimeFigureOut">
               <a:rPr lang="en-US" smtClean="0"/>
-              <a:t>1/24/23</a:t>
+              <a:t>1/25/23</a:t>
             </a:fld>
             <a:endParaRPr lang="en-US"/>
           </a:p>
@@ -3177,7 +3177,7 @@
           <a:p>
             <a:fld id="{D3A28AA4-801E-B147-9E5C-6E6DBA6E23D1}" type="datetimeFigureOut">
               <a:rPr lang="en-US" smtClean="0"/>
-              <a:t>1/24/23</a:t>
+              <a:t>1/25/23</a:t>
             </a:fld>
             <a:endParaRPr lang="en-US"/>
           </a:p>
@@ -8450,6 +8450,82 @@
           <a:chExt cx="0" cy="0"/>
         </a:xfrm>
       </p:grpSpPr>
+      <p:sp>
+        <p:nvSpPr>
+          <p:cNvPr id="17" name="TextBox 16">
+            <a:extLst>
+              <a:ext uri="{FF2B5EF4-FFF2-40B4-BE49-F238E27FC236}">
+                <a16:creationId xmlns:a16="http://schemas.microsoft.com/office/drawing/2014/main" id="{43B64199-3D23-58AE-E069-F2069310001E}"/>
+              </a:ext>
+            </a:extLst>
+          </p:cNvPr>
+          <p:cNvSpPr txBox="1"/>
+          <p:nvPr/>
+        </p:nvSpPr>
+        <p:spPr>
+          <a:xfrm>
+            <a:off x="16581801" y="11674361"/>
+            <a:ext cx="885179" cy="553998"/>
+          </a:xfrm>
+          <a:prstGeom prst="rect">
+            <a:avLst/>
+          </a:prstGeom>
+          <a:noFill/>
+        </p:spPr>
+        <p:txBody>
+          <a:bodyPr wrap="none" rtlCol="0">
+            <a:spAutoFit/>
+          </a:bodyPr>
+          <a:lstStyle/>
+          <a:p>
+            <a:r>
+              <a:rPr lang="en-US" sz="3000" b="1" dirty="0">
+                <a:latin typeface="Times New Roman" panose="02020603050405020304" pitchFamily="18" charset="0"/>
+                <a:cs typeface="Times New Roman" panose="02020603050405020304" pitchFamily="18" charset="0"/>
+              </a:rPr>
+              <a:t>&lt;0.2</a:t>
+            </a:r>
+          </a:p>
+        </p:txBody>
+      </p:sp>
+      <p:sp>
+        <p:nvSpPr>
+          <p:cNvPr id="18" name="TextBox 17">
+            <a:extLst>
+              <a:ext uri="{FF2B5EF4-FFF2-40B4-BE49-F238E27FC236}">
+                <a16:creationId xmlns:a16="http://schemas.microsoft.com/office/drawing/2014/main" id="{2B1FC7C2-C68C-BA39-1068-10437B04D4B0}"/>
+              </a:ext>
+            </a:extLst>
+          </p:cNvPr>
+          <p:cNvSpPr txBox="1"/>
+          <p:nvPr/>
+        </p:nvSpPr>
+        <p:spPr>
+          <a:xfrm>
+            <a:off x="9849892" y="11674361"/>
+            <a:ext cx="1013419" cy="553998"/>
+          </a:xfrm>
+          <a:prstGeom prst="rect">
+            <a:avLst/>
+          </a:prstGeom>
+          <a:noFill/>
+        </p:spPr>
+        <p:txBody>
+          <a:bodyPr wrap="none" rtlCol="0">
+            <a:spAutoFit/>
+          </a:bodyPr>
+          <a:lstStyle/>
+          <a:p>
+            <a:r>
+              <a:rPr lang="en-US" sz="3000" b="1" dirty="0">
+                <a:latin typeface="Times New Roman" panose="02020603050405020304" pitchFamily="18" charset="0"/>
+                <a:cs typeface="Times New Roman" panose="02020603050405020304" pitchFamily="18" charset="0"/>
+              </a:rPr>
+              <a:t>&lt;-0.2</a:t>
+            </a:r>
+          </a:p>
+        </p:txBody>
+      </p:sp>
       <p:cxnSp>
         <p:nvCxnSpPr>
           <p:cNvPr id="179" name="Straight Arrow Connector 178">
@@ -8474,7 +8550,7 @@
           <a:prstGeom prst="straightConnector1">
             <a:avLst/>
           </a:prstGeom>
-          <a:ln w="181991">
+          <a:ln w="183896">
             <a:solidFill>
               <a:schemeClr val="accent1">
                 <a:lumMod val="75000"/>
@@ -8498,615 +8574,188 @@
           </a:fontRef>
         </p:style>
       </p:cxnSp>
-      <p:grpSp>
-        <p:nvGrpSpPr>
-          <p:cNvPr id="6" name="Group 5">
-            <a:extLst>
-              <a:ext uri="{FF2B5EF4-FFF2-40B4-BE49-F238E27FC236}">
-                <a16:creationId xmlns:a16="http://schemas.microsoft.com/office/drawing/2014/main" id="{7ACE01A2-12CB-F702-2A3E-6C2772EB6B65}"/>
-              </a:ext>
-            </a:extLst>
-          </p:cNvPr>
-          <p:cNvGrpSpPr/>
-          <p:nvPr/>
-        </p:nvGrpSpPr>
-        <p:grpSpPr>
-          <a:xfrm>
-            <a:off x="10840085" y="11628152"/>
-            <a:ext cx="5751830" cy="1491548"/>
-            <a:chOff x="10433050" y="12808239"/>
-            <a:chExt cx="5751830" cy="1491548"/>
-          </a:xfrm>
-        </p:grpSpPr>
-        <p:cxnSp>
-          <p:nvCxnSpPr>
-            <p:cNvPr id="304" name="Straight Connector 303">
-              <a:extLst>
-                <a:ext uri="{FF2B5EF4-FFF2-40B4-BE49-F238E27FC236}">
-                  <a16:creationId xmlns:a16="http://schemas.microsoft.com/office/drawing/2014/main" id="{BCE3271A-5208-23E5-DCE3-3408CD77B59D}"/>
-                </a:ext>
-              </a:extLst>
-            </p:cNvPr>
-            <p:cNvCxnSpPr>
-              <a:cxnSpLocks/>
-            </p:cNvCxnSpPr>
-            <p:nvPr/>
-          </p:nvCxnSpPr>
-          <p:spPr>
-            <a:xfrm>
-              <a:off x="11403764" y="12854448"/>
-              <a:ext cx="951115" cy="0"/>
-            </a:xfrm>
-            <a:prstGeom prst="line">
-              <a:avLst/>
-            </a:prstGeom>
-            <a:ln w="95250">
-              <a:solidFill>
-                <a:srgbClr val="C00000"/>
-              </a:solidFill>
-            </a:ln>
-          </p:spPr>
-          <p:style>
-            <a:lnRef idx="1">
-              <a:schemeClr val="accent1"/>
-            </a:lnRef>
-            <a:fillRef idx="0">
-              <a:schemeClr val="accent1"/>
-            </a:fillRef>
-            <a:effectRef idx="0">
-              <a:schemeClr val="accent1"/>
-            </a:effectRef>
-            <a:fontRef idx="minor">
-              <a:schemeClr val="tx1"/>
-            </a:fontRef>
-          </p:style>
-        </p:cxnSp>
-        <p:cxnSp>
-          <p:nvCxnSpPr>
-            <p:cNvPr id="307" name="Straight Connector 306">
-              <a:extLst>
-                <a:ext uri="{FF2B5EF4-FFF2-40B4-BE49-F238E27FC236}">
-                  <a16:creationId xmlns:a16="http://schemas.microsoft.com/office/drawing/2014/main" id="{EA94A156-E109-774D-5FDF-8043EC42050A}"/>
-                </a:ext>
-              </a:extLst>
-            </p:cNvPr>
-            <p:cNvCxnSpPr>
-              <a:cxnSpLocks/>
-            </p:cNvCxnSpPr>
-            <p:nvPr/>
-          </p:nvCxnSpPr>
-          <p:spPr>
-            <a:xfrm>
-              <a:off x="10470692" y="12875469"/>
-              <a:ext cx="951115" cy="0"/>
-            </a:xfrm>
-            <a:prstGeom prst="line">
-              <a:avLst/>
-            </a:prstGeom>
-            <a:ln w="47625">
-              <a:solidFill>
-                <a:srgbClr val="C00000"/>
-              </a:solidFill>
-            </a:ln>
-          </p:spPr>
-          <p:style>
-            <a:lnRef idx="1">
-              <a:schemeClr val="accent1"/>
-            </a:lnRef>
-            <a:fillRef idx="0">
-              <a:schemeClr val="accent1"/>
-            </a:fillRef>
-            <a:effectRef idx="0">
-              <a:schemeClr val="accent1"/>
-            </a:effectRef>
-            <a:fontRef idx="minor">
-              <a:schemeClr val="tx1"/>
-            </a:fontRef>
-          </p:style>
-        </p:cxnSp>
-        <p:cxnSp>
-          <p:nvCxnSpPr>
-            <p:cNvPr id="309" name="Straight Connector 308">
-              <a:extLst>
-                <a:ext uri="{FF2B5EF4-FFF2-40B4-BE49-F238E27FC236}">
-                  <a16:creationId xmlns:a16="http://schemas.microsoft.com/office/drawing/2014/main" id="{01368AB0-6FEC-4E40-EF20-C123FBCFFF29}"/>
-                </a:ext>
-              </a:extLst>
-            </p:cNvPr>
-            <p:cNvCxnSpPr>
-              <a:cxnSpLocks/>
-            </p:cNvCxnSpPr>
-            <p:nvPr/>
-          </p:nvCxnSpPr>
-          <p:spPr>
-            <a:xfrm>
-              <a:off x="14243127" y="12857623"/>
-              <a:ext cx="951115" cy="0"/>
-            </a:xfrm>
-            <a:prstGeom prst="line">
-              <a:avLst/>
-            </a:prstGeom>
-            <a:ln w="95250">
-              <a:solidFill>
-                <a:schemeClr val="accent1">
-                  <a:lumMod val="75000"/>
-                </a:schemeClr>
-              </a:solidFill>
-            </a:ln>
-          </p:spPr>
-          <p:style>
-            <a:lnRef idx="1">
-              <a:schemeClr val="accent1"/>
-            </a:lnRef>
-            <a:fillRef idx="0">
-              <a:schemeClr val="accent1"/>
-            </a:fillRef>
-            <a:effectRef idx="0">
-              <a:schemeClr val="accent1"/>
-            </a:effectRef>
-            <a:fontRef idx="minor">
-              <a:schemeClr val="tx1"/>
-            </a:fontRef>
-          </p:style>
-        </p:cxnSp>
-        <p:cxnSp>
-          <p:nvCxnSpPr>
-            <p:cNvPr id="310" name="Straight Connector 309">
-              <a:extLst>
-                <a:ext uri="{FF2B5EF4-FFF2-40B4-BE49-F238E27FC236}">
-                  <a16:creationId xmlns:a16="http://schemas.microsoft.com/office/drawing/2014/main" id="{5459AFEF-BF27-F9DA-C489-E82435FED1A2}"/>
-                </a:ext>
-              </a:extLst>
-            </p:cNvPr>
-            <p:cNvCxnSpPr>
-              <a:cxnSpLocks/>
-            </p:cNvCxnSpPr>
-            <p:nvPr/>
-          </p:nvCxnSpPr>
-          <p:spPr>
-            <a:xfrm>
-              <a:off x="15190684" y="12879623"/>
-              <a:ext cx="951115" cy="0"/>
-            </a:xfrm>
-            <a:prstGeom prst="line">
-              <a:avLst/>
-            </a:prstGeom>
-            <a:ln w="47625">
-              <a:solidFill>
-                <a:schemeClr val="accent1">
-                  <a:lumMod val="75000"/>
-                </a:schemeClr>
-              </a:solidFill>
-            </a:ln>
-          </p:spPr>
-          <p:style>
-            <a:lnRef idx="1">
-              <a:schemeClr val="accent1"/>
-            </a:lnRef>
-            <a:fillRef idx="0">
-              <a:schemeClr val="accent1"/>
-            </a:fillRef>
-            <a:effectRef idx="0">
-              <a:schemeClr val="accent1"/>
-            </a:effectRef>
-            <a:fontRef idx="minor">
-              <a:schemeClr val="tx1"/>
-            </a:fontRef>
-          </p:style>
-        </p:cxnSp>
-        <p:sp>
-          <p:nvSpPr>
-            <p:cNvPr id="311" name="TextBox 310">
-              <a:extLst>
-                <a:ext uri="{FF2B5EF4-FFF2-40B4-BE49-F238E27FC236}">
-                  <a16:creationId xmlns:a16="http://schemas.microsoft.com/office/drawing/2014/main" id="{405F3348-AF82-CF3A-4B6F-13F81E3AE869}"/>
-                </a:ext>
-              </a:extLst>
-            </p:cNvPr>
-            <p:cNvSpPr txBox="1"/>
-            <p:nvPr/>
-          </p:nvSpPr>
-          <p:spPr>
-            <a:xfrm>
-              <a:off x="12427197" y="12862216"/>
-              <a:ext cx="790601" cy="553998"/>
-            </a:xfrm>
-            <a:prstGeom prst="rect">
-              <a:avLst/>
-            </a:prstGeom>
-            <a:noFill/>
-          </p:spPr>
-          <p:txBody>
-            <a:bodyPr wrap="none" rtlCol="0">
-              <a:spAutoFit/>
-            </a:bodyPr>
-            <a:lstStyle/>
-            <a:p>
-              <a:r>
-                <a:rPr lang="en-US" sz="3000" b="1" dirty="0">
-                  <a:latin typeface="Times New Roman" panose="02020603050405020304" pitchFamily="18" charset="0"/>
-                  <a:cs typeface="Times New Roman" panose="02020603050405020304" pitchFamily="18" charset="0"/>
-                </a:rPr>
-                <a:t>-0.8</a:t>
-              </a:r>
-            </a:p>
-          </p:txBody>
-        </p:sp>
-        <p:sp>
-          <p:nvSpPr>
-            <p:cNvPr id="312" name="TextBox 311">
-              <a:extLst>
-                <a:ext uri="{FF2B5EF4-FFF2-40B4-BE49-F238E27FC236}">
-                  <a16:creationId xmlns:a16="http://schemas.microsoft.com/office/drawing/2014/main" id="{03905A61-A4AE-A9C3-7600-29CDFA24E9CE}"/>
-                </a:ext>
-              </a:extLst>
-            </p:cNvPr>
-            <p:cNvSpPr txBox="1"/>
-            <p:nvPr/>
-          </p:nvSpPr>
-          <p:spPr>
-            <a:xfrm>
-              <a:off x="13433647" y="12869258"/>
-              <a:ext cx="673582" cy="553998"/>
-            </a:xfrm>
-            <a:prstGeom prst="rect">
-              <a:avLst/>
-            </a:prstGeom>
-            <a:noFill/>
-          </p:spPr>
-          <p:txBody>
-            <a:bodyPr wrap="none" rtlCol="0">
-              <a:spAutoFit/>
-            </a:bodyPr>
-            <a:lstStyle/>
-            <a:p>
-              <a:r>
-                <a:rPr lang="en-US" sz="3000" b="1" dirty="0">
-                  <a:latin typeface="Times New Roman" panose="02020603050405020304" pitchFamily="18" charset="0"/>
-                  <a:cs typeface="Times New Roman" panose="02020603050405020304" pitchFamily="18" charset="0"/>
-                </a:rPr>
-                <a:t>0.8</a:t>
-              </a:r>
-            </a:p>
-          </p:txBody>
-        </p:sp>
-        <p:sp>
-          <p:nvSpPr>
-            <p:cNvPr id="313" name="TextBox 312">
-              <a:extLst>
-                <a:ext uri="{FF2B5EF4-FFF2-40B4-BE49-F238E27FC236}">
-                  <a16:creationId xmlns:a16="http://schemas.microsoft.com/office/drawing/2014/main" id="{A5185E2D-DB4F-1D37-75C3-0550DED89ED4}"/>
-                </a:ext>
-              </a:extLst>
-            </p:cNvPr>
-            <p:cNvSpPr txBox="1"/>
-            <p:nvPr/>
-          </p:nvSpPr>
-          <p:spPr>
-            <a:xfrm>
-              <a:off x="11484020" y="12869258"/>
-              <a:ext cx="790601" cy="553998"/>
-            </a:xfrm>
-            <a:prstGeom prst="rect">
-              <a:avLst/>
-            </a:prstGeom>
-            <a:noFill/>
-          </p:spPr>
-          <p:txBody>
-            <a:bodyPr wrap="none" rtlCol="0">
-              <a:spAutoFit/>
-            </a:bodyPr>
-            <a:lstStyle/>
-            <a:p>
-              <a:r>
-                <a:rPr lang="en-US" sz="3000" b="1" dirty="0">
-                  <a:latin typeface="Times New Roman" panose="02020603050405020304" pitchFamily="18" charset="0"/>
-                  <a:cs typeface="Times New Roman" panose="02020603050405020304" pitchFamily="18" charset="0"/>
-                </a:rPr>
-                <a:t>-0.4</a:t>
-              </a:r>
-            </a:p>
-          </p:txBody>
-        </p:sp>
-        <p:sp>
-          <p:nvSpPr>
-            <p:cNvPr id="314" name="TextBox 313">
-              <a:extLst>
-                <a:ext uri="{FF2B5EF4-FFF2-40B4-BE49-F238E27FC236}">
-                  <a16:creationId xmlns:a16="http://schemas.microsoft.com/office/drawing/2014/main" id="{336C6BA1-652E-4332-3874-0C406AC32821}"/>
-                </a:ext>
-              </a:extLst>
-            </p:cNvPr>
-            <p:cNvSpPr txBox="1"/>
-            <p:nvPr/>
-          </p:nvSpPr>
-          <p:spPr>
-            <a:xfrm>
-              <a:off x="14376824" y="12872711"/>
-              <a:ext cx="673582" cy="553998"/>
-            </a:xfrm>
-            <a:prstGeom prst="rect">
-              <a:avLst/>
-            </a:prstGeom>
-            <a:noFill/>
-          </p:spPr>
-          <p:txBody>
-            <a:bodyPr wrap="none" rtlCol="0">
-              <a:spAutoFit/>
-            </a:bodyPr>
-            <a:lstStyle/>
-            <a:p>
-              <a:r>
-                <a:rPr lang="en-US" sz="3000" b="1" dirty="0">
-                  <a:latin typeface="Times New Roman" panose="02020603050405020304" pitchFamily="18" charset="0"/>
-                  <a:cs typeface="Times New Roman" panose="02020603050405020304" pitchFamily="18" charset="0"/>
-                </a:rPr>
-                <a:t>0.4</a:t>
-              </a:r>
-            </a:p>
-          </p:txBody>
-        </p:sp>
-        <p:sp>
-          <p:nvSpPr>
-            <p:cNvPr id="315" name="TextBox 314">
-              <a:extLst>
-                <a:ext uri="{FF2B5EF4-FFF2-40B4-BE49-F238E27FC236}">
-                  <a16:creationId xmlns:a16="http://schemas.microsoft.com/office/drawing/2014/main" id="{0A735BE5-8F12-20AC-B7DA-99178782D0A5}"/>
-                </a:ext>
-              </a:extLst>
-            </p:cNvPr>
-            <p:cNvSpPr txBox="1"/>
-            <p:nvPr/>
-          </p:nvSpPr>
-          <p:spPr>
-            <a:xfrm>
-              <a:off x="15333008" y="12854887"/>
-              <a:ext cx="673582" cy="553998"/>
-            </a:xfrm>
-            <a:prstGeom prst="rect">
-              <a:avLst/>
-            </a:prstGeom>
-            <a:noFill/>
-          </p:spPr>
-          <p:txBody>
-            <a:bodyPr wrap="none" rtlCol="0">
-              <a:spAutoFit/>
-            </a:bodyPr>
-            <a:lstStyle/>
-            <a:p>
-              <a:r>
-                <a:rPr lang="en-US" sz="3000" b="1" dirty="0">
-                  <a:latin typeface="Times New Roman" panose="02020603050405020304" pitchFamily="18" charset="0"/>
-                  <a:cs typeface="Times New Roman" panose="02020603050405020304" pitchFamily="18" charset="0"/>
-                </a:rPr>
-                <a:t>0.2</a:t>
-              </a:r>
-            </a:p>
-          </p:txBody>
-        </p:sp>
-        <p:sp>
-          <p:nvSpPr>
-            <p:cNvPr id="317" name="TextBox 316">
-              <a:extLst>
-                <a:ext uri="{FF2B5EF4-FFF2-40B4-BE49-F238E27FC236}">
-                  <a16:creationId xmlns:a16="http://schemas.microsoft.com/office/drawing/2014/main" id="{E5B0E893-4292-A9DA-E31F-4F434D6BA189}"/>
-                </a:ext>
-              </a:extLst>
-            </p:cNvPr>
-            <p:cNvSpPr txBox="1"/>
-            <p:nvPr/>
-          </p:nvSpPr>
-          <p:spPr>
-            <a:xfrm>
-              <a:off x="10587260" y="12874312"/>
-              <a:ext cx="790601" cy="553998"/>
-            </a:xfrm>
-            <a:prstGeom prst="rect">
-              <a:avLst/>
-            </a:prstGeom>
-            <a:noFill/>
-          </p:spPr>
-          <p:txBody>
-            <a:bodyPr wrap="none" rtlCol="0">
-              <a:spAutoFit/>
-            </a:bodyPr>
-            <a:lstStyle/>
-            <a:p>
-              <a:r>
-                <a:rPr lang="en-US" sz="3000" b="1" dirty="0">
-                  <a:latin typeface="Times New Roman" panose="02020603050405020304" pitchFamily="18" charset="0"/>
-                  <a:cs typeface="Times New Roman" panose="02020603050405020304" pitchFamily="18" charset="0"/>
-                </a:rPr>
-                <a:t>-0.2</a:t>
-              </a:r>
-            </a:p>
-          </p:txBody>
-        </p:sp>
-        <p:sp>
-          <p:nvSpPr>
-            <p:cNvPr id="318" name="TextBox 317">
-              <a:extLst>
-                <a:ext uri="{FF2B5EF4-FFF2-40B4-BE49-F238E27FC236}">
-                  <a16:creationId xmlns:a16="http://schemas.microsoft.com/office/drawing/2014/main" id="{381CB219-7134-E7DD-E806-9373BDC6B8E3}"/>
-                </a:ext>
-              </a:extLst>
-            </p:cNvPr>
-            <p:cNvSpPr txBox="1"/>
-            <p:nvPr/>
-          </p:nvSpPr>
-          <p:spPr>
-            <a:xfrm>
-              <a:off x="11155513" y="13745789"/>
-              <a:ext cx="4278735" cy="553998"/>
-            </a:xfrm>
-            <a:prstGeom prst="rect">
-              <a:avLst/>
-            </a:prstGeom>
-            <a:noFill/>
-          </p:spPr>
-          <p:txBody>
-            <a:bodyPr wrap="none" rtlCol="0">
-              <a:spAutoFit/>
-            </a:bodyPr>
-            <a:lstStyle/>
-            <a:p>
-              <a:r>
-                <a:rPr lang="en-US" sz="3000" b="1" dirty="0">
-                  <a:latin typeface="Times New Roman" panose="02020603050405020304" pitchFamily="18" charset="0"/>
-                  <a:cs typeface="Times New Roman" panose="02020603050405020304" pitchFamily="18" charset="0"/>
-                </a:rPr>
-                <a:t>Standardized Coefficient</a:t>
-              </a:r>
-            </a:p>
-          </p:txBody>
-        </p:sp>
-        <p:cxnSp>
-          <p:nvCxnSpPr>
-            <p:cNvPr id="306" name="Straight Connector 305">
-              <a:extLst>
-                <a:ext uri="{FF2B5EF4-FFF2-40B4-BE49-F238E27FC236}">
-                  <a16:creationId xmlns:a16="http://schemas.microsoft.com/office/drawing/2014/main" id="{D1A9DA54-E777-BA6D-9268-2E5E984EB1E2}"/>
-                </a:ext>
-              </a:extLst>
-            </p:cNvPr>
-            <p:cNvCxnSpPr>
-              <a:cxnSpLocks/>
-            </p:cNvCxnSpPr>
-            <p:nvPr/>
-          </p:nvCxnSpPr>
-          <p:spPr>
-            <a:xfrm>
-              <a:off x="12346941" y="12809231"/>
-              <a:ext cx="951115" cy="0"/>
-            </a:xfrm>
-            <a:prstGeom prst="line">
-              <a:avLst/>
-            </a:prstGeom>
-            <a:ln w="190500">
-              <a:solidFill>
-                <a:srgbClr val="C00000"/>
-              </a:solidFill>
-            </a:ln>
-          </p:spPr>
-          <p:style>
-            <a:lnRef idx="1">
-              <a:schemeClr val="accent1"/>
-            </a:lnRef>
-            <a:fillRef idx="0">
-              <a:schemeClr val="accent1"/>
-            </a:fillRef>
-            <a:effectRef idx="0">
-              <a:schemeClr val="accent1"/>
-            </a:effectRef>
-            <a:fontRef idx="minor">
-              <a:schemeClr val="tx1"/>
-            </a:fontRef>
-          </p:style>
-        </p:cxnSp>
-        <p:cxnSp>
-          <p:nvCxnSpPr>
-            <p:cNvPr id="308" name="Straight Connector 307">
-              <a:extLst>
-                <a:ext uri="{FF2B5EF4-FFF2-40B4-BE49-F238E27FC236}">
-                  <a16:creationId xmlns:a16="http://schemas.microsoft.com/office/drawing/2014/main" id="{58FCCEEE-319F-0DEB-6973-1CFE1856B2B0}"/>
-                </a:ext>
-              </a:extLst>
-            </p:cNvPr>
-            <p:cNvCxnSpPr>
-              <a:cxnSpLocks/>
-            </p:cNvCxnSpPr>
-            <p:nvPr/>
-          </p:nvCxnSpPr>
-          <p:spPr>
-            <a:xfrm>
-              <a:off x="13294881" y="12808239"/>
-              <a:ext cx="951115" cy="0"/>
-            </a:xfrm>
-            <a:prstGeom prst="line">
-              <a:avLst/>
-            </a:prstGeom>
-            <a:ln w="190500">
-              <a:solidFill>
-                <a:schemeClr val="accent1">
-                  <a:lumMod val="75000"/>
-                </a:schemeClr>
-              </a:solidFill>
-            </a:ln>
-          </p:spPr>
-          <p:style>
-            <a:lnRef idx="1">
-              <a:schemeClr val="accent1"/>
-            </a:lnRef>
-            <a:fillRef idx="0">
-              <a:schemeClr val="accent1"/>
-            </a:fillRef>
-            <a:effectRef idx="0">
-              <a:schemeClr val="accent1"/>
-            </a:effectRef>
-            <a:fontRef idx="minor">
-              <a:schemeClr val="tx1"/>
-            </a:fontRef>
-          </p:style>
-        </p:cxnSp>
-        <p:sp>
-          <p:nvSpPr>
-            <p:cNvPr id="2" name="Rectangle 1">
-              <a:extLst>
-                <a:ext uri="{FF2B5EF4-FFF2-40B4-BE49-F238E27FC236}">
-                  <a16:creationId xmlns:a16="http://schemas.microsoft.com/office/drawing/2014/main" id="{0505CCCA-23EC-02F8-8E02-93D20241DF45}"/>
-                </a:ext>
-              </a:extLst>
-            </p:cNvPr>
-            <p:cNvSpPr/>
-            <p:nvPr/>
-          </p:nvSpPr>
-          <p:spPr>
-            <a:xfrm>
-              <a:off x="10433050" y="12903688"/>
-              <a:ext cx="5751830" cy="56852"/>
-            </a:xfrm>
-            <a:prstGeom prst="rect">
-              <a:avLst/>
-            </a:prstGeom>
+      <p:cxnSp>
+        <p:nvCxnSpPr>
+          <p:cNvPr id="304" name="Straight Connector 303">
+            <a:extLst>
+              <a:ext uri="{FF2B5EF4-FFF2-40B4-BE49-F238E27FC236}">
+                <a16:creationId xmlns:a16="http://schemas.microsoft.com/office/drawing/2014/main" id="{BCE3271A-5208-23E5-DCE3-3408CD77B59D}"/>
+              </a:ext>
+            </a:extLst>
+          </p:cNvPr>
+          <p:cNvCxnSpPr>
+            <a:cxnSpLocks/>
+          </p:cNvCxnSpPr>
+          <p:nvPr/>
+        </p:nvCxnSpPr>
+        <p:spPr>
+          <a:xfrm>
+            <a:off x="11810799" y="11674361"/>
+            <a:ext cx="951115" cy="0"/>
+          </a:xfrm>
+          <a:prstGeom prst="line">
+            <a:avLst/>
+          </a:prstGeom>
+          <a:ln w="95250">
             <a:solidFill>
-              <a:schemeClr val="bg1"/>
+              <a:srgbClr val="C00000"/>
             </a:solidFill>
-            <a:ln>
-              <a:noFill/>
-            </a:ln>
-          </p:spPr>
-          <p:style>
-            <a:lnRef idx="2">
+          </a:ln>
+        </p:spPr>
+        <p:style>
+          <a:lnRef idx="1">
+            <a:schemeClr val="accent1"/>
+          </a:lnRef>
+          <a:fillRef idx="0">
+            <a:schemeClr val="accent1"/>
+          </a:fillRef>
+          <a:effectRef idx="0">
+            <a:schemeClr val="accent1"/>
+          </a:effectRef>
+          <a:fontRef idx="minor">
+            <a:schemeClr val="tx1"/>
+          </a:fontRef>
+        </p:style>
+      </p:cxnSp>
+      <p:cxnSp>
+        <p:nvCxnSpPr>
+          <p:cNvPr id="307" name="Straight Connector 306">
+            <a:extLst>
+              <a:ext uri="{FF2B5EF4-FFF2-40B4-BE49-F238E27FC236}">
+                <a16:creationId xmlns:a16="http://schemas.microsoft.com/office/drawing/2014/main" id="{EA94A156-E109-774D-5FDF-8043EC42050A}"/>
+              </a:ext>
+            </a:extLst>
+          </p:cNvPr>
+          <p:cNvCxnSpPr>
+            <a:cxnSpLocks/>
+          </p:cNvCxnSpPr>
+          <p:nvPr/>
+        </p:nvCxnSpPr>
+        <p:spPr>
+          <a:xfrm>
+            <a:off x="10877727" y="11695382"/>
+            <a:ext cx="951115" cy="0"/>
+          </a:xfrm>
+          <a:prstGeom prst="line">
+            <a:avLst/>
+          </a:prstGeom>
+          <a:ln w="47625">
+            <a:solidFill>
+              <a:srgbClr val="C00000"/>
+            </a:solidFill>
+          </a:ln>
+        </p:spPr>
+        <p:style>
+          <a:lnRef idx="1">
+            <a:schemeClr val="accent1"/>
+          </a:lnRef>
+          <a:fillRef idx="0">
+            <a:schemeClr val="accent1"/>
+          </a:fillRef>
+          <a:effectRef idx="0">
+            <a:schemeClr val="accent1"/>
+          </a:effectRef>
+          <a:fontRef idx="minor">
+            <a:schemeClr val="tx1"/>
+          </a:fontRef>
+        </p:style>
+      </p:cxnSp>
+      <p:cxnSp>
+        <p:nvCxnSpPr>
+          <p:cNvPr id="309" name="Straight Connector 308">
+            <a:extLst>
+              <a:ext uri="{FF2B5EF4-FFF2-40B4-BE49-F238E27FC236}">
+                <a16:creationId xmlns:a16="http://schemas.microsoft.com/office/drawing/2014/main" id="{01368AB0-6FEC-4E40-EF20-C123FBCFFF29}"/>
+              </a:ext>
+            </a:extLst>
+          </p:cNvPr>
+          <p:cNvCxnSpPr>
+            <a:cxnSpLocks/>
+          </p:cNvCxnSpPr>
+          <p:nvPr/>
+        </p:nvCxnSpPr>
+        <p:spPr>
+          <a:xfrm>
+            <a:off x="14650162" y="11677536"/>
+            <a:ext cx="951115" cy="0"/>
+          </a:xfrm>
+          <a:prstGeom prst="line">
+            <a:avLst/>
+          </a:prstGeom>
+          <a:ln w="95250">
+            <a:solidFill>
               <a:schemeClr val="accent1">
-                <a:shade val="50000"/>
+                <a:lumMod val="75000"/>
               </a:schemeClr>
-            </a:lnRef>
-            <a:fillRef idx="1">
-              <a:schemeClr val="accent1"/>
-            </a:fillRef>
-            <a:effectRef idx="0">
-              <a:schemeClr val="accent1"/>
-            </a:effectRef>
-            <a:fontRef idx="minor">
-              <a:schemeClr val="lt1"/>
-            </a:fontRef>
-          </p:style>
-          <p:txBody>
-            <a:bodyPr rtlCol="0" anchor="ctr"/>
-            <a:lstStyle/>
-            <a:p>
-              <a:pPr algn="ctr"/>
-              <a:endParaRPr lang="en-US"/>
-            </a:p>
-          </p:txBody>
-        </p:sp>
-      </p:grpSp>
-      <p:sp>
-        <p:nvSpPr>
-          <p:cNvPr id="7" name="TextBox 6">
-            <a:extLst>
-              <a:ext uri="{FF2B5EF4-FFF2-40B4-BE49-F238E27FC236}">
-                <a16:creationId xmlns:a16="http://schemas.microsoft.com/office/drawing/2014/main" id="{57D6CB6B-2AB0-EAA2-7F43-80EE740A68DC}"/>
+            </a:solidFill>
+          </a:ln>
+        </p:spPr>
+        <p:style>
+          <a:lnRef idx="1">
+            <a:schemeClr val="accent1"/>
+          </a:lnRef>
+          <a:fillRef idx="0">
+            <a:schemeClr val="accent1"/>
+          </a:fillRef>
+          <a:effectRef idx="0">
+            <a:schemeClr val="accent1"/>
+          </a:effectRef>
+          <a:fontRef idx="minor">
+            <a:schemeClr val="tx1"/>
+          </a:fontRef>
+        </p:style>
+      </p:cxnSp>
+      <p:cxnSp>
+        <p:nvCxnSpPr>
+          <p:cNvPr id="310" name="Straight Connector 309">
+            <a:extLst>
+              <a:ext uri="{FF2B5EF4-FFF2-40B4-BE49-F238E27FC236}">
+                <a16:creationId xmlns:a16="http://schemas.microsoft.com/office/drawing/2014/main" id="{5459AFEF-BF27-F9DA-C489-E82435FED1A2}"/>
+              </a:ext>
+            </a:extLst>
+          </p:cNvPr>
+          <p:cNvCxnSpPr>
+            <a:cxnSpLocks/>
+          </p:cNvCxnSpPr>
+          <p:nvPr/>
+        </p:nvCxnSpPr>
+        <p:spPr>
+          <a:xfrm>
+            <a:off x="15597719" y="11699536"/>
+            <a:ext cx="951115" cy="0"/>
+          </a:xfrm>
+          <a:prstGeom prst="line">
+            <a:avLst/>
+          </a:prstGeom>
+          <a:ln w="47625">
+            <a:solidFill>
+              <a:schemeClr val="accent1">
+                <a:lumMod val="75000"/>
+              </a:schemeClr>
+            </a:solidFill>
+          </a:ln>
+        </p:spPr>
+        <p:style>
+          <a:lnRef idx="1">
+            <a:schemeClr val="accent1"/>
+          </a:lnRef>
+          <a:fillRef idx="0">
+            <a:schemeClr val="accent1"/>
+          </a:fillRef>
+          <a:effectRef idx="0">
+            <a:schemeClr val="accent1"/>
+          </a:effectRef>
+          <a:fontRef idx="minor">
+            <a:schemeClr val="tx1"/>
+          </a:fontRef>
+        </p:style>
+      </p:cxnSp>
+      <p:sp>
+        <p:nvSpPr>
+          <p:cNvPr id="311" name="TextBox 310">
+            <a:extLst>
+              <a:ext uri="{FF2B5EF4-FFF2-40B4-BE49-F238E27FC236}">
+                <a16:creationId xmlns:a16="http://schemas.microsoft.com/office/drawing/2014/main" id="{405F3348-AF82-CF3A-4B6F-13F81E3AE869}"/>
               </a:ext>
             </a:extLst>
           </p:cNvPr>
@@ -9115,8 +8764,8 @@
         </p:nvSpPr>
         <p:spPr>
           <a:xfrm>
-            <a:off x="20000893" y="6605491"/>
-            <a:ext cx="800219" cy="461665"/>
+            <a:off x="12834232" y="11682129"/>
+            <a:ext cx="790601" cy="553998"/>
           </a:xfrm>
           <a:prstGeom prst="rect">
             <a:avLst/>
@@ -9130,21 +8779,21 @@
           <a:lstStyle/>
           <a:p>
             <a:r>
-              <a:rPr lang="en-US" sz="2400" b="1" dirty="0">
+              <a:rPr lang="en-US" sz="3000" b="1" dirty="0">
                 <a:latin typeface="Times New Roman" panose="02020603050405020304" pitchFamily="18" charset="0"/>
                 <a:cs typeface="Times New Roman" panose="02020603050405020304" pitchFamily="18" charset="0"/>
               </a:rPr>
-              <a:t>90%</a:t>
-            </a:r>
-          </a:p>
-        </p:txBody>
-      </p:sp>
-      <p:sp>
-        <p:nvSpPr>
-          <p:cNvPr id="8" name="TextBox 7">
-            <a:extLst>
-              <a:ext uri="{FF2B5EF4-FFF2-40B4-BE49-F238E27FC236}">
-                <a16:creationId xmlns:a16="http://schemas.microsoft.com/office/drawing/2014/main" id="{E73D4731-015B-1393-5949-6BDFE1D295AE}"/>
+              <a:t>-0.8</a:t>
+            </a:r>
+          </a:p>
+        </p:txBody>
+      </p:sp>
+      <p:sp>
+        <p:nvSpPr>
+          <p:cNvPr id="312" name="TextBox 311">
+            <a:extLst>
+              <a:ext uri="{FF2B5EF4-FFF2-40B4-BE49-F238E27FC236}">
+                <a16:creationId xmlns:a16="http://schemas.microsoft.com/office/drawing/2014/main" id="{03905A61-A4AE-A9C3-7600-29CDFA24E9CE}"/>
               </a:ext>
             </a:extLst>
           </p:cNvPr>
@@ -9153,8 +8802,8 @@
         </p:nvSpPr>
         <p:spPr>
           <a:xfrm>
-            <a:off x="15439196" y="6605491"/>
-            <a:ext cx="800219" cy="461665"/>
+            <a:off x="13840682" y="11689171"/>
+            <a:ext cx="673582" cy="553998"/>
           </a:xfrm>
           <a:prstGeom prst="rect">
             <a:avLst/>
@@ -9168,21 +8817,21 @@
           <a:lstStyle/>
           <a:p>
             <a:r>
-              <a:rPr lang="en-US" sz="2400" b="1" dirty="0">
+              <a:rPr lang="en-US" sz="3000" b="1" dirty="0">
                 <a:latin typeface="Times New Roman" panose="02020603050405020304" pitchFamily="18" charset="0"/>
                 <a:cs typeface="Times New Roman" panose="02020603050405020304" pitchFamily="18" charset="0"/>
               </a:rPr>
-              <a:t>92%</a:t>
-            </a:r>
-          </a:p>
-        </p:txBody>
-      </p:sp>
-      <p:sp>
-        <p:nvSpPr>
-          <p:cNvPr id="9" name="TextBox 8">
-            <a:extLst>
-              <a:ext uri="{FF2B5EF4-FFF2-40B4-BE49-F238E27FC236}">
-                <a16:creationId xmlns:a16="http://schemas.microsoft.com/office/drawing/2014/main" id="{27C8939D-FF82-E5EA-6D69-AB10AEAE0B28}"/>
+              <a:t>0.8</a:t>
+            </a:r>
+          </a:p>
+        </p:txBody>
+      </p:sp>
+      <p:sp>
+        <p:nvSpPr>
+          <p:cNvPr id="313" name="TextBox 312">
+            <a:extLst>
+              <a:ext uri="{FF2B5EF4-FFF2-40B4-BE49-F238E27FC236}">
+                <a16:creationId xmlns:a16="http://schemas.microsoft.com/office/drawing/2014/main" id="{A5185E2D-DB4F-1D37-75C3-0550DED89ED4}"/>
               </a:ext>
             </a:extLst>
           </p:cNvPr>
@@ -9191,8 +8840,8 @@
         </p:nvSpPr>
         <p:spPr>
           <a:xfrm>
-            <a:off x="20000892" y="3852711"/>
-            <a:ext cx="800219" cy="461665"/>
+            <a:off x="11891055" y="11689171"/>
+            <a:ext cx="790601" cy="553998"/>
           </a:xfrm>
           <a:prstGeom prst="rect">
             <a:avLst/>
@@ -9206,21 +8855,21 @@
           <a:lstStyle/>
           <a:p>
             <a:r>
-              <a:rPr lang="en-US" sz="2400" b="1" dirty="0">
+              <a:rPr lang="en-US" sz="3000" b="1" dirty="0">
                 <a:latin typeface="Times New Roman" panose="02020603050405020304" pitchFamily="18" charset="0"/>
                 <a:cs typeface="Times New Roman" panose="02020603050405020304" pitchFamily="18" charset="0"/>
               </a:rPr>
-              <a:t>54%</a:t>
-            </a:r>
-          </a:p>
-        </p:txBody>
-      </p:sp>
-      <p:sp>
-        <p:nvSpPr>
-          <p:cNvPr id="10" name="TextBox 9">
-            <a:extLst>
-              <a:ext uri="{FF2B5EF4-FFF2-40B4-BE49-F238E27FC236}">
-                <a16:creationId xmlns:a16="http://schemas.microsoft.com/office/drawing/2014/main" id="{84AF56ED-6C10-30BE-8578-D4C573039D29}"/>
+              <a:t>-0.4</a:t>
+            </a:r>
+          </a:p>
+        </p:txBody>
+      </p:sp>
+      <p:sp>
+        <p:nvSpPr>
+          <p:cNvPr id="314" name="TextBox 313">
+            <a:extLst>
+              <a:ext uri="{FF2B5EF4-FFF2-40B4-BE49-F238E27FC236}">
+                <a16:creationId xmlns:a16="http://schemas.microsoft.com/office/drawing/2014/main" id="{336C6BA1-652E-4332-3874-0C406AC32821}"/>
               </a:ext>
             </a:extLst>
           </p:cNvPr>
@@ -9229,8 +8878,8 @@
         </p:nvSpPr>
         <p:spPr>
           <a:xfrm>
-            <a:off x="20000893" y="9309284"/>
-            <a:ext cx="800219" cy="461665"/>
+            <a:off x="14783859" y="11692624"/>
+            <a:ext cx="673582" cy="553998"/>
           </a:xfrm>
           <a:prstGeom prst="rect">
             <a:avLst/>
@@ -9244,21 +8893,21 @@
           <a:lstStyle/>
           <a:p>
             <a:r>
-              <a:rPr lang="en-US" sz="2400" b="1" dirty="0">
+              <a:rPr lang="en-US" sz="3000" b="1" dirty="0">
                 <a:latin typeface="Times New Roman" panose="02020603050405020304" pitchFamily="18" charset="0"/>
                 <a:cs typeface="Times New Roman" panose="02020603050405020304" pitchFamily="18" charset="0"/>
               </a:rPr>
-              <a:t>80%</a:t>
-            </a:r>
-          </a:p>
-        </p:txBody>
-      </p:sp>
-      <p:sp>
-        <p:nvSpPr>
-          <p:cNvPr id="14" name="TextBox 13">
-            <a:extLst>
-              <a:ext uri="{FF2B5EF4-FFF2-40B4-BE49-F238E27FC236}">
-                <a16:creationId xmlns:a16="http://schemas.microsoft.com/office/drawing/2014/main" id="{989BE5E6-26A2-D25C-F47A-691F4607216F}"/>
+              <a:t>0.4</a:t>
+            </a:r>
+          </a:p>
+        </p:txBody>
+      </p:sp>
+      <p:sp>
+        <p:nvSpPr>
+          <p:cNvPr id="315" name="TextBox 314">
+            <a:extLst>
+              <a:ext uri="{FF2B5EF4-FFF2-40B4-BE49-F238E27FC236}">
+                <a16:creationId xmlns:a16="http://schemas.microsoft.com/office/drawing/2014/main" id="{0A735BE5-8F12-20AC-B7DA-99178782D0A5}"/>
               </a:ext>
             </a:extLst>
           </p:cNvPr>
@@ -9267,8 +8916,8 @@
         </p:nvSpPr>
         <p:spPr>
           <a:xfrm>
-            <a:off x="10874861" y="6599521"/>
-            <a:ext cx="800219" cy="461665"/>
+            <a:off x="15740043" y="11674800"/>
+            <a:ext cx="673582" cy="553998"/>
           </a:xfrm>
           <a:prstGeom prst="rect">
             <a:avLst/>
@@ -9282,21 +8931,185 @@
           <a:lstStyle/>
           <a:p>
             <a:r>
-              <a:rPr lang="en-US" sz="2400" b="1" dirty="0">
+              <a:rPr lang="en-US" sz="3000" b="1" dirty="0">
                 <a:latin typeface="Times New Roman" panose="02020603050405020304" pitchFamily="18" charset="0"/>
                 <a:cs typeface="Times New Roman" panose="02020603050405020304" pitchFamily="18" charset="0"/>
               </a:rPr>
-              <a:t>41%</a:t>
-            </a:r>
-          </a:p>
-        </p:txBody>
-      </p:sp>
-      <p:sp>
-        <p:nvSpPr>
-          <p:cNvPr id="26" name="Rectangle 25">
-            <a:extLst>
-              <a:ext uri="{FF2B5EF4-FFF2-40B4-BE49-F238E27FC236}">
-                <a16:creationId xmlns:a16="http://schemas.microsoft.com/office/drawing/2014/main" id="{78122B79-003A-2809-E878-A39B4C455359}"/>
+              <a:t>0.2</a:t>
+            </a:r>
+          </a:p>
+        </p:txBody>
+      </p:sp>
+      <p:sp>
+        <p:nvSpPr>
+          <p:cNvPr id="317" name="TextBox 316">
+            <a:extLst>
+              <a:ext uri="{FF2B5EF4-FFF2-40B4-BE49-F238E27FC236}">
+                <a16:creationId xmlns:a16="http://schemas.microsoft.com/office/drawing/2014/main" id="{E5B0E893-4292-A9DA-E31F-4F434D6BA189}"/>
+              </a:ext>
+            </a:extLst>
+          </p:cNvPr>
+          <p:cNvSpPr txBox="1"/>
+          <p:nvPr/>
+        </p:nvSpPr>
+        <p:spPr>
+          <a:xfrm>
+            <a:off x="10994295" y="11694225"/>
+            <a:ext cx="790601" cy="553998"/>
+          </a:xfrm>
+          <a:prstGeom prst="rect">
+            <a:avLst/>
+          </a:prstGeom>
+          <a:noFill/>
+        </p:spPr>
+        <p:txBody>
+          <a:bodyPr wrap="none" rtlCol="0">
+            <a:spAutoFit/>
+          </a:bodyPr>
+          <a:lstStyle/>
+          <a:p>
+            <a:r>
+              <a:rPr lang="en-US" sz="3000" b="1" dirty="0">
+                <a:latin typeface="Times New Roman" panose="02020603050405020304" pitchFamily="18" charset="0"/>
+                <a:cs typeface="Times New Roman" panose="02020603050405020304" pitchFamily="18" charset="0"/>
+              </a:rPr>
+              <a:t>-0.2</a:t>
+            </a:r>
+          </a:p>
+        </p:txBody>
+      </p:sp>
+      <p:sp>
+        <p:nvSpPr>
+          <p:cNvPr id="318" name="TextBox 317">
+            <a:extLst>
+              <a:ext uri="{FF2B5EF4-FFF2-40B4-BE49-F238E27FC236}">
+                <a16:creationId xmlns:a16="http://schemas.microsoft.com/office/drawing/2014/main" id="{381CB219-7134-E7DD-E806-9373BDC6B8E3}"/>
+              </a:ext>
+            </a:extLst>
+          </p:cNvPr>
+          <p:cNvSpPr txBox="1"/>
+          <p:nvPr/>
+        </p:nvSpPr>
+        <p:spPr>
+          <a:xfrm>
+            <a:off x="11562548" y="12565702"/>
+            <a:ext cx="4278735" cy="553998"/>
+          </a:xfrm>
+          <a:prstGeom prst="rect">
+            <a:avLst/>
+          </a:prstGeom>
+          <a:noFill/>
+        </p:spPr>
+        <p:txBody>
+          <a:bodyPr wrap="none" rtlCol="0">
+            <a:spAutoFit/>
+          </a:bodyPr>
+          <a:lstStyle/>
+          <a:p>
+            <a:r>
+              <a:rPr lang="en-US" sz="3000" b="1" dirty="0">
+                <a:latin typeface="Times New Roman" panose="02020603050405020304" pitchFamily="18" charset="0"/>
+                <a:cs typeface="Times New Roman" panose="02020603050405020304" pitchFamily="18" charset="0"/>
+              </a:rPr>
+              <a:t>Standardized Coefficient</a:t>
+            </a:r>
+          </a:p>
+        </p:txBody>
+      </p:sp>
+      <p:cxnSp>
+        <p:nvCxnSpPr>
+          <p:cNvPr id="306" name="Straight Connector 305">
+            <a:extLst>
+              <a:ext uri="{FF2B5EF4-FFF2-40B4-BE49-F238E27FC236}">
+                <a16:creationId xmlns:a16="http://schemas.microsoft.com/office/drawing/2014/main" id="{D1A9DA54-E777-BA6D-9268-2E5E984EB1E2}"/>
+              </a:ext>
+            </a:extLst>
+          </p:cNvPr>
+          <p:cNvCxnSpPr>
+            <a:cxnSpLocks/>
+          </p:cNvCxnSpPr>
+          <p:nvPr/>
+        </p:nvCxnSpPr>
+        <p:spPr>
+          <a:xfrm>
+            <a:off x="12753976" y="11629144"/>
+            <a:ext cx="951115" cy="0"/>
+          </a:xfrm>
+          <a:prstGeom prst="line">
+            <a:avLst/>
+          </a:prstGeom>
+          <a:ln w="190500">
+            <a:solidFill>
+              <a:srgbClr val="C00000"/>
+            </a:solidFill>
+          </a:ln>
+        </p:spPr>
+        <p:style>
+          <a:lnRef idx="1">
+            <a:schemeClr val="accent1"/>
+          </a:lnRef>
+          <a:fillRef idx="0">
+            <a:schemeClr val="accent1"/>
+          </a:fillRef>
+          <a:effectRef idx="0">
+            <a:schemeClr val="accent1"/>
+          </a:effectRef>
+          <a:fontRef idx="minor">
+            <a:schemeClr val="tx1"/>
+          </a:fontRef>
+        </p:style>
+      </p:cxnSp>
+      <p:cxnSp>
+        <p:nvCxnSpPr>
+          <p:cNvPr id="308" name="Straight Connector 307">
+            <a:extLst>
+              <a:ext uri="{FF2B5EF4-FFF2-40B4-BE49-F238E27FC236}">
+                <a16:creationId xmlns:a16="http://schemas.microsoft.com/office/drawing/2014/main" id="{58FCCEEE-319F-0DEB-6973-1CFE1856B2B0}"/>
+              </a:ext>
+            </a:extLst>
+          </p:cNvPr>
+          <p:cNvCxnSpPr>
+            <a:cxnSpLocks/>
+          </p:cNvCxnSpPr>
+          <p:nvPr/>
+        </p:nvCxnSpPr>
+        <p:spPr>
+          <a:xfrm>
+            <a:off x="13701916" y="11628152"/>
+            <a:ext cx="951115" cy="0"/>
+          </a:xfrm>
+          <a:prstGeom prst="line">
+            <a:avLst/>
+          </a:prstGeom>
+          <a:ln w="190500">
+            <a:solidFill>
+              <a:schemeClr val="accent1">
+                <a:lumMod val="75000"/>
+              </a:schemeClr>
+            </a:solidFill>
+          </a:ln>
+        </p:spPr>
+        <p:style>
+          <a:lnRef idx="1">
+            <a:schemeClr val="accent1"/>
+          </a:lnRef>
+          <a:fillRef idx="0">
+            <a:schemeClr val="accent1"/>
+          </a:fillRef>
+          <a:effectRef idx="0">
+            <a:schemeClr val="accent1"/>
+          </a:effectRef>
+          <a:fontRef idx="minor">
+            <a:schemeClr val="tx1"/>
+          </a:fontRef>
+        </p:style>
+      </p:cxnSp>
+      <p:sp>
+        <p:nvSpPr>
+          <p:cNvPr id="2" name="Rectangle 1">
+            <a:extLst>
+              <a:ext uri="{FF2B5EF4-FFF2-40B4-BE49-F238E27FC236}">
+                <a16:creationId xmlns:a16="http://schemas.microsoft.com/office/drawing/2014/main" id="{0505CCCA-23EC-02F8-8E02-93D20241DF45}"/>
               </a:ext>
             </a:extLst>
           </p:cNvPr>
@@ -9305,8 +9118,8 @@
         </p:nvSpPr>
         <p:spPr>
           <a:xfrm>
-            <a:off x="10398125" y="6045200"/>
-            <a:ext cx="158675" cy="225425"/>
+            <a:off x="10840085" y="11723601"/>
+            <a:ext cx="5751830" cy="56852"/>
           </a:xfrm>
           <a:prstGeom prst="rect">
             <a:avLst/>
@@ -9343,6 +9156,248 @@
           </a:p>
         </p:txBody>
       </p:sp>
+      <p:sp>
+        <p:nvSpPr>
+          <p:cNvPr id="7" name="TextBox 6">
+            <a:extLst>
+              <a:ext uri="{FF2B5EF4-FFF2-40B4-BE49-F238E27FC236}">
+                <a16:creationId xmlns:a16="http://schemas.microsoft.com/office/drawing/2014/main" id="{57D6CB6B-2AB0-EAA2-7F43-80EE740A68DC}"/>
+              </a:ext>
+            </a:extLst>
+          </p:cNvPr>
+          <p:cNvSpPr txBox="1"/>
+          <p:nvPr/>
+        </p:nvSpPr>
+        <p:spPr>
+          <a:xfrm>
+            <a:off x="20000893" y="6605491"/>
+            <a:ext cx="800219" cy="461665"/>
+          </a:xfrm>
+          <a:prstGeom prst="rect">
+            <a:avLst/>
+          </a:prstGeom>
+          <a:noFill/>
+        </p:spPr>
+        <p:txBody>
+          <a:bodyPr wrap="none" rtlCol="0">
+            <a:spAutoFit/>
+          </a:bodyPr>
+          <a:lstStyle/>
+          <a:p>
+            <a:r>
+              <a:rPr lang="en-US" sz="2400" b="1" dirty="0">
+                <a:latin typeface="Times New Roman" panose="02020603050405020304" pitchFamily="18" charset="0"/>
+                <a:cs typeface="Times New Roman" panose="02020603050405020304" pitchFamily="18" charset="0"/>
+              </a:rPr>
+              <a:t>89%</a:t>
+            </a:r>
+          </a:p>
+        </p:txBody>
+      </p:sp>
+      <p:sp>
+        <p:nvSpPr>
+          <p:cNvPr id="8" name="TextBox 7">
+            <a:extLst>
+              <a:ext uri="{FF2B5EF4-FFF2-40B4-BE49-F238E27FC236}">
+                <a16:creationId xmlns:a16="http://schemas.microsoft.com/office/drawing/2014/main" id="{E73D4731-015B-1393-5949-6BDFE1D295AE}"/>
+              </a:ext>
+            </a:extLst>
+          </p:cNvPr>
+          <p:cNvSpPr txBox="1"/>
+          <p:nvPr/>
+        </p:nvSpPr>
+        <p:spPr>
+          <a:xfrm>
+            <a:off x="15439196" y="6605491"/>
+            <a:ext cx="800219" cy="461665"/>
+          </a:xfrm>
+          <a:prstGeom prst="rect">
+            <a:avLst/>
+          </a:prstGeom>
+          <a:noFill/>
+        </p:spPr>
+        <p:txBody>
+          <a:bodyPr wrap="none" rtlCol="0">
+            <a:spAutoFit/>
+          </a:bodyPr>
+          <a:lstStyle/>
+          <a:p>
+            <a:r>
+              <a:rPr lang="en-US" sz="2400" b="1" dirty="0">
+                <a:latin typeface="Times New Roman" panose="02020603050405020304" pitchFamily="18" charset="0"/>
+                <a:cs typeface="Times New Roman" panose="02020603050405020304" pitchFamily="18" charset="0"/>
+              </a:rPr>
+              <a:t>82%</a:t>
+            </a:r>
+          </a:p>
+        </p:txBody>
+      </p:sp>
+      <p:sp>
+        <p:nvSpPr>
+          <p:cNvPr id="9" name="TextBox 8">
+            <a:extLst>
+              <a:ext uri="{FF2B5EF4-FFF2-40B4-BE49-F238E27FC236}">
+                <a16:creationId xmlns:a16="http://schemas.microsoft.com/office/drawing/2014/main" id="{27C8939D-FF82-E5EA-6D69-AB10AEAE0B28}"/>
+              </a:ext>
+            </a:extLst>
+          </p:cNvPr>
+          <p:cNvSpPr txBox="1"/>
+          <p:nvPr/>
+        </p:nvSpPr>
+        <p:spPr>
+          <a:xfrm>
+            <a:off x="20000892" y="3852711"/>
+            <a:ext cx="800219" cy="461665"/>
+          </a:xfrm>
+          <a:prstGeom prst="rect">
+            <a:avLst/>
+          </a:prstGeom>
+          <a:noFill/>
+        </p:spPr>
+        <p:txBody>
+          <a:bodyPr wrap="none" rtlCol="0">
+            <a:spAutoFit/>
+          </a:bodyPr>
+          <a:lstStyle/>
+          <a:p>
+            <a:r>
+              <a:rPr lang="en-US" sz="2400" b="1" dirty="0">
+                <a:latin typeface="Times New Roman" panose="02020603050405020304" pitchFamily="18" charset="0"/>
+                <a:cs typeface="Times New Roman" panose="02020603050405020304" pitchFamily="18" charset="0"/>
+              </a:rPr>
+              <a:t>55%</a:t>
+            </a:r>
+          </a:p>
+        </p:txBody>
+      </p:sp>
+      <p:sp>
+        <p:nvSpPr>
+          <p:cNvPr id="10" name="TextBox 9">
+            <a:extLst>
+              <a:ext uri="{FF2B5EF4-FFF2-40B4-BE49-F238E27FC236}">
+                <a16:creationId xmlns:a16="http://schemas.microsoft.com/office/drawing/2014/main" id="{84AF56ED-6C10-30BE-8578-D4C573039D29}"/>
+              </a:ext>
+            </a:extLst>
+          </p:cNvPr>
+          <p:cNvSpPr txBox="1"/>
+          <p:nvPr/>
+        </p:nvSpPr>
+        <p:spPr>
+          <a:xfrm>
+            <a:off x="20000893" y="9309284"/>
+            <a:ext cx="800219" cy="461665"/>
+          </a:xfrm>
+          <a:prstGeom prst="rect">
+            <a:avLst/>
+          </a:prstGeom>
+          <a:noFill/>
+        </p:spPr>
+        <p:txBody>
+          <a:bodyPr wrap="none" rtlCol="0">
+            <a:spAutoFit/>
+          </a:bodyPr>
+          <a:lstStyle/>
+          <a:p>
+            <a:r>
+              <a:rPr lang="en-US" sz="2400" b="1" dirty="0">
+                <a:latin typeface="Times New Roman" panose="02020603050405020304" pitchFamily="18" charset="0"/>
+                <a:cs typeface="Times New Roman" panose="02020603050405020304" pitchFamily="18" charset="0"/>
+              </a:rPr>
+              <a:t>76%</a:t>
+            </a:r>
+          </a:p>
+        </p:txBody>
+      </p:sp>
+      <p:sp>
+        <p:nvSpPr>
+          <p:cNvPr id="14" name="TextBox 13">
+            <a:extLst>
+              <a:ext uri="{FF2B5EF4-FFF2-40B4-BE49-F238E27FC236}">
+                <a16:creationId xmlns:a16="http://schemas.microsoft.com/office/drawing/2014/main" id="{989BE5E6-26A2-D25C-F47A-691F4607216F}"/>
+              </a:ext>
+            </a:extLst>
+          </p:cNvPr>
+          <p:cNvSpPr txBox="1"/>
+          <p:nvPr/>
+        </p:nvSpPr>
+        <p:spPr>
+          <a:xfrm>
+            <a:off x="10874861" y="6599521"/>
+            <a:ext cx="800219" cy="461665"/>
+          </a:xfrm>
+          <a:prstGeom prst="rect">
+            <a:avLst/>
+          </a:prstGeom>
+          <a:noFill/>
+        </p:spPr>
+        <p:txBody>
+          <a:bodyPr wrap="none" rtlCol="0">
+            <a:spAutoFit/>
+          </a:bodyPr>
+          <a:lstStyle/>
+          <a:p>
+            <a:r>
+              <a:rPr lang="en-US" sz="2400" b="1" dirty="0">
+                <a:latin typeface="Times New Roman" panose="02020603050405020304" pitchFamily="18" charset="0"/>
+                <a:cs typeface="Times New Roman" panose="02020603050405020304" pitchFamily="18" charset="0"/>
+              </a:rPr>
+              <a:t>37%</a:t>
+            </a:r>
+          </a:p>
+        </p:txBody>
+      </p:sp>
+      <p:sp>
+        <p:nvSpPr>
+          <p:cNvPr id="26" name="Rectangle 25">
+            <a:extLst>
+              <a:ext uri="{FF2B5EF4-FFF2-40B4-BE49-F238E27FC236}">
+                <a16:creationId xmlns:a16="http://schemas.microsoft.com/office/drawing/2014/main" id="{78122B79-003A-2809-E878-A39B4C455359}"/>
+              </a:ext>
+            </a:extLst>
+          </p:cNvPr>
+          <p:cNvSpPr/>
+          <p:nvPr/>
+        </p:nvSpPr>
+        <p:spPr>
+          <a:xfrm>
+            <a:off x="10398125" y="6045200"/>
+            <a:ext cx="158675" cy="225425"/>
+          </a:xfrm>
+          <a:prstGeom prst="rect">
+            <a:avLst/>
+          </a:prstGeom>
+          <a:solidFill>
+            <a:schemeClr val="bg1"/>
+          </a:solidFill>
+          <a:ln>
+            <a:noFill/>
+          </a:ln>
+        </p:spPr>
+        <p:style>
+          <a:lnRef idx="2">
+            <a:schemeClr val="accent1">
+              <a:shade val="50000"/>
+            </a:schemeClr>
+          </a:lnRef>
+          <a:fillRef idx="1">
+            <a:schemeClr val="accent1"/>
+          </a:fillRef>
+          <a:effectRef idx="0">
+            <a:schemeClr val="accent1"/>
+          </a:effectRef>
+          <a:fontRef idx="minor">
+            <a:schemeClr val="lt1"/>
+          </a:fontRef>
+        </p:style>
+        <p:txBody>
+          <a:bodyPr rtlCol="0" anchor="ctr"/>
+          <a:lstStyle/>
+          <a:p>
+            <a:pPr algn="ctr"/>
+            <a:endParaRPr lang="en-US"/>
+          </a:p>
+        </p:txBody>
+      </p:sp>
       <p:cxnSp>
         <p:nvCxnSpPr>
           <p:cNvPr id="13" name="Straight Arrow Connector 12">
@@ -9366,7 +9421,7 @@
           <a:prstGeom prst="straightConnector1">
             <a:avLst/>
           </a:prstGeom>
-          <a:ln w="186055">
+          <a:ln w="185547">
             <a:solidFill>
               <a:schemeClr val="accent1">
                 <a:lumMod val="75000"/>
@@ -9414,7 +9469,7 @@
           <a:prstGeom prst="straightConnector1">
             <a:avLst/>
           </a:prstGeom>
-          <a:ln w="88519">
+          <a:ln w="60960">
             <a:solidFill>
               <a:srgbClr val="C00000"/>
             </a:solidFill>
@@ -9461,7 +9516,7 @@
               <a:gd name="adj1" fmla="val -16962834"/>
             </a:avLst>
           </a:prstGeom>
-          <a:ln w="72009">
+          <a:ln w="68834">
             <a:solidFill>
               <a:srgbClr val="C00000"/>
             </a:solidFill>
@@ -9506,7 +9561,7 @@
           <a:prstGeom prst="straightConnector1">
             <a:avLst/>
           </a:prstGeom>
-          <a:ln w="62102">
+          <a:ln w="73660">
             <a:solidFill>
               <a:schemeClr val="accent1">
                 <a:lumMod val="75000"/>
@@ -9553,7 +9608,7 @@
           <a:prstGeom prst="straightConnector1">
             <a:avLst/>
           </a:prstGeom>
-          <a:ln w="29209">
+          <a:ln w="26288">
             <a:solidFill>
               <a:srgbClr val="C00000"/>
             </a:solidFill>
@@ -9597,7 +9652,7 @@
           <a:prstGeom prst="straightConnector1">
             <a:avLst/>
           </a:prstGeom>
-          <a:ln w="48006">
+          <a:ln w="50673">
             <a:solidFill>
               <a:srgbClr val="C00000"/>
             </a:solidFill>
@@ -9642,7 +9697,7 @@
           <a:prstGeom prst="straightConnector1">
             <a:avLst/>
           </a:prstGeom>
-          <a:ln w="116839">
+          <a:ln w="106298">
             <a:solidFill>
               <a:schemeClr val="accent1">
                 <a:lumMod val="75000"/>
@@ -9689,7 +9744,7 @@
           <a:prstGeom prst="straightConnector1">
             <a:avLst/>
           </a:prstGeom>
-          <a:ln w="97790">
+          <a:ln w="36576">
             <a:solidFill>
               <a:schemeClr val="accent1">
                 <a:lumMod val="75000"/>
@@ -9941,79 +9996,9 @@
                 <a:latin typeface="Times New Roman" panose="02020603050405020304" pitchFamily="18" charset="0"/>
                 <a:cs typeface="Times New Roman" panose="02020603050405020304" pitchFamily="18" charset="0"/>
               </a:rPr>
-              <a:t>2</a:t>
+              <a:t>90</a:t>
             </a:r>
             <a:endParaRPr lang="en-US" sz="3000" b="1" dirty="0">
-              <a:solidFill>
-                <a:schemeClr val="tx1"/>
-              </a:solidFill>
-              <a:latin typeface="Times New Roman" panose="02020603050405020304" pitchFamily="18" charset="0"/>
-              <a:cs typeface="Times New Roman" panose="02020603050405020304" pitchFamily="18" charset="0"/>
-            </a:endParaRPr>
-          </a:p>
-        </p:txBody>
-      </p:sp>
-      <p:sp>
-        <p:nvSpPr>
-          <p:cNvPr id="148" name="Rectangle 147">
-            <a:extLst>
-              <a:ext uri="{FF2B5EF4-FFF2-40B4-BE49-F238E27FC236}">
-                <a16:creationId xmlns:a16="http://schemas.microsoft.com/office/drawing/2014/main" id="{CAEEF86E-BF80-675F-3FA2-55D6B97D4497}"/>
-              </a:ext>
-            </a:extLst>
-          </p:cNvPr>
-          <p:cNvSpPr/>
-          <p:nvPr/>
-        </p:nvSpPr>
-        <p:spPr>
-          <a:xfrm>
-            <a:off x="9707722" y="7033076"/>
-            <a:ext cx="1819398" cy="877223"/>
-          </a:xfrm>
-          <a:prstGeom prst="rect">
-            <a:avLst/>
-          </a:prstGeom>
-          <a:solidFill>
-            <a:schemeClr val="bg1"/>
-          </a:solidFill>
-          <a:ln w="38100">
-            <a:solidFill>
-              <a:schemeClr val="tx1"/>
-            </a:solidFill>
-          </a:ln>
-        </p:spPr>
-        <p:style>
-          <a:lnRef idx="2">
-            <a:schemeClr val="accent1">
-              <a:shade val="50000"/>
-            </a:schemeClr>
-          </a:lnRef>
-          <a:fillRef idx="1">
-            <a:schemeClr val="accent1"/>
-          </a:fillRef>
-          <a:effectRef idx="0">
-            <a:schemeClr val="accent1"/>
-          </a:effectRef>
-          <a:fontRef idx="minor">
-            <a:schemeClr val="lt1"/>
-          </a:fontRef>
-        </p:style>
-        <p:txBody>
-          <a:bodyPr rtlCol="0" anchor="ctr"/>
-          <a:lstStyle/>
-          <a:p>
-            <a:pPr algn="ctr"/>
-            <a:r>
-              <a:rPr lang="el-GR" sz="3000" b="1" i="1" dirty="0">
-                <a:solidFill>
-                  <a:schemeClr val="tx1"/>
-                </a:solidFill>
-                <a:latin typeface="Times New Roman" panose="02020603050405020304" pitchFamily="18" charset="0"/>
-                <a:cs typeface="Times New Roman" panose="02020603050405020304" pitchFamily="18" charset="0"/>
-              </a:rPr>
-              <a:t>β</a:t>
-            </a:r>
-            <a:endParaRPr lang="en-US" sz="3000" b="1" i="1" dirty="0">
               <a:solidFill>
                 <a:schemeClr val="tx1"/>
               </a:solidFill>
@@ -10527,6 +10512,7 @@
             </a:extLst>
           </p:cNvPr>
           <p:cNvCxnSpPr>
+            <a:cxnSpLocks/>
             <a:stCxn id="149" idx="3"/>
             <a:endCxn id="145" idx="1"/>
           </p:cNvCxnSpPr>
@@ -10540,9 +10526,202 @@
           <a:prstGeom prst="straightConnector1">
             <a:avLst/>
           </a:prstGeom>
-          <a:ln w="23114">
+          <a:ln w="12700">
+            <a:solidFill>
+              <a:schemeClr val="bg1">
+                <a:lumMod val="65000"/>
+              </a:schemeClr>
+            </a:solidFill>
             <a:prstDash val="dash"/>
             <a:tailEnd type="triangle"/>
+          </a:ln>
+        </p:spPr>
+        <p:style>
+          <a:lnRef idx="1">
+            <a:schemeClr val="accent1"/>
+          </a:lnRef>
+          <a:fillRef idx="0">
+            <a:schemeClr val="accent1"/>
+          </a:fillRef>
+          <a:effectRef idx="0">
+            <a:schemeClr val="accent1"/>
+          </a:effectRef>
+          <a:fontRef idx="minor">
+            <a:schemeClr val="tx1"/>
+          </a:fontRef>
+        </p:style>
+      </p:cxnSp>
+      <p:sp>
+        <p:nvSpPr>
+          <p:cNvPr id="3" name="TextBox 2">
+            <a:extLst>
+              <a:ext uri="{FF2B5EF4-FFF2-40B4-BE49-F238E27FC236}">
+                <a16:creationId xmlns:a16="http://schemas.microsoft.com/office/drawing/2014/main" id="{8B12FFBD-6A30-9919-ED85-1CAA2ED2B6AF}"/>
+              </a:ext>
+            </a:extLst>
+          </p:cNvPr>
+          <p:cNvSpPr txBox="1"/>
+          <p:nvPr/>
+        </p:nvSpPr>
+        <p:spPr>
+          <a:xfrm>
+            <a:off x="6246639" y="9314745"/>
+            <a:ext cx="800219" cy="461665"/>
+          </a:xfrm>
+          <a:prstGeom prst="rect">
+            <a:avLst/>
+          </a:prstGeom>
+          <a:noFill/>
+        </p:spPr>
+        <p:txBody>
+          <a:bodyPr wrap="none" rtlCol="0">
+            <a:spAutoFit/>
+          </a:bodyPr>
+          <a:lstStyle/>
+          <a:p>
+            <a:r>
+              <a:rPr lang="en-US" sz="2400" b="1" dirty="0">
+                <a:latin typeface="Times New Roman" panose="02020603050405020304" pitchFamily="18" charset="0"/>
+                <a:cs typeface="Times New Roman" panose="02020603050405020304" pitchFamily="18" charset="0"/>
+              </a:rPr>
+              <a:t>35%</a:t>
+            </a:r>
+          </a:p>
+        </p:txBody>
+      </p:sp>
+      <p:sp>
+        <p:nvSpPr>
+          <p:cNvPr id="4" name="Rectangle 3">
+            <a:extLst>
+              <a:ext uri="{FF2B5EF4-FFF2-40B4-BE49-F238E27FC236}">
+                <a16:creationId xmlns:a16="http://schemas.microsoft.com/office/drawing/2014/main" id="{02C00127-0A1A-2C99-C54F-607878A28FA7}"/>
+              </a:ext>
+            </a:extLst>
+          </p:cNvPr>
+          <p:cNvSpPr/>
+          <p:nvPr/>
+        </p:nvSpPr>
+        <p:spPr>
+          <a:xfrm>
+            <a:off x="10137058" y="11719001"/>
+            <a:ext cx="7010400" cy="45719"/>
+          </a:xfrm>
+          <a:prstGeom prst="rect">
+            <a:avLst/>
+          </a:prstGeom>
+          <a:solidFill>
+            <a:schemeClr val="bg1"/>
+          </a:solidFill>
+          <a:ln>
+            <a:noFill/>
+          </a:ln>
+        </p:spPr>
+        <p:style>
+          <a:lnRef idx="2">
+            <a:schemeClr val="accent1">
+              <a:shade val="50000"/>
+            </a:schemeClr>
+          </a:lnRef>
+          <a:fillRef idx="1">
+            <a:schemeClr val="accent1"/>
+          </a:fillRef>
+          <a:effectRef idx="0">
+            <a:schemeClr val="accent1"/>
+          </a:effectRef>
+          <a:fontRef idx="minor">
+            <a:schemeClr val="lt1"/>
+          </a:fontRef>
+        </p:style>
+        <p:txBody>
+          <a:bodyPr rtlCol="0" anchor="ctr"/>
+          <a:lstStyle/>
+          <a:p>
+            <a:pPr algn="ctr"/>
+            <a:endParaRPr lang="en-US"/>
+          </a:p>
+        </p:txBody>
+      </p:sp>
+      <p:sp>
+        <p:nvSpPr>
+          <p:cNvPr id="5" name="Rectangle 4">
+            <a:extLst>
+              <a:ext uri="{FF2B5EF4-FFF2-40B4-BE49-F238E27FC236}">
+                <a16:creationId xmlns:a16="http://schemas.microsoft.com/office/drawing/2014/main" id="{AEA1F572-8465-B16E-D0EB-AE36EA9F14C4}"/>
+              </a:ext>
+            </a:extLst>
+          </p:cNvPr>
+          <p:cNvSpPr/>
+          <p:nvPr/>
+        </p:nvSpPr>
+        <p:spPr>
+          <a:xfrm>
+            <a:off x="10335482" y="11514793"/>
+            <a:ext cx="7010400" cy="45719"/>
+          </a:xfrm>
+          <a:prstGeom prst="rect">
+            <a:avLst/>
+          </a:prstGeom>
+          <a:solidFill>
+            <a:schemeClr val="bg1"/>
+          </a:solidFill>
+          <a:ln>
+            <a:noFill/>
+          </a:ln>
+        </p:spPr>
+        <p:style>
+          <a:lnRef idx="2">
+            <a:schemeClr val="accent1">
+              <a:shade val="50000"/>
+            </a:schemeClr>
+          </a:lnRef>
+          <a:fillRef idx="1">
+            <a:schemeClr val="accent1"/>
+          </a:fillRef>
+          <a:effectRef idx="0">
+            <a:schemeClr val="accent1"/>
+          </a:effectRef>
+          <a:fontRef idx="minor">
+            <a:schemeClr val="lt1"/>
+          </a:fontRef>
+        </p:style>
+        <p:txBody>
+          <a:bodyPr rtlCol="0" anchor="ctr"/>
+          <a:lstStyle/>
+          <a:p>
+            <a:pPr algn="ctr"/>
+            <a:endParaRPr lang="en-US"/>
+          </a:p>
+        </p:txBody>
+      </p:sp>
+      <p:cxnSp>
+        <p:nvCxnSpPr>
+          <p:cNvPr id="12" name="Straight Connector 11">
+            <a:extLst>
+              <a:ext uri="{FF2B5EF4-FFF2-40B4-BE49-F238E27FC236}">
+                <a16:creationId xmlns:a16="http://schemas.microsoft.com/office/drawing/2014/main" id="{AA90B932-5758-80DF-51AD-81085E11F480}"/>
+              </a:ext>
+            </a:extLst>
+          </p:cNvPr>
+          <p:cNvCxnSpPr>
+            <a:cxnSpLocks/>
+          </p:cNvCxnSpPr>
+          <p:nvPr/>
+        </p:nvCxnSpPr>
+        <p:spPr>
+          <a:xfrm>
+            <a:off x="9920571" y="11709061"/>
+            <a:ext cx="951115" cy="0"/>
+          </a:xfrm>
+          <a:prstGeom prst="line">
+            <a:avLst/>
+          </a:prstGeom>
+          <a:ln w="12700">
+            <a:solidFill>
+              <a:schemeClr val="bg2">
+                <a:lumMod val="75000"/>
+              </a:schemeClr>
+            </a:solidFill>
+            <a:prstDash val="dash"/>
           </a:ln>
         </p:spPr>
         <p:style>
@@ -10562,33 +10741,33 @@
       </p:cxnSp>
       <p:cxnSp>
         <p:nvCxnSpPr>
-          <p:cNvPr id="47" name="Straight Arrow Connector 46">
-            <a:extLst>
-              <a:ext uri="{FF2B5EF4-FFF2-40B4-BE49-F238E27FC236}">
-                <a16:creationId xmlns:a16="http://schemas.microsoft.com/office/drawing/2014/main" id="{6CD2EE0A-976F-8D78-12CC-F2727696E430}"/>
+          <p:cNvPr id="15" name="Straight Connector 14">
+            <a:extLst>
+              <a:ext uri="{FF2B5EF4-FFF2-40B4-BE49-F238E27FC236}">
+                <a16:creationId xmlns:a16="http://schemas.microsoft.com/office/drawing/2014/main" id="{49F574BE-1AF9-E987-F987-E560963924AE}"/>
               </a:ext>
             </a:extLst>
           </p:cNvPr>
           <p:cNvCxnSpPr>
             <a:cxnSpLocks/>
-            <a:stCxn id="150" idx="3"/>
           </p:cNvCxnSpPr>
           <p:nvPr/>
         </p:nvCxnSpPr>
         <p:spPr>
           <a:xfrm>
-            <a:off x="6958973" y="4724595"/>
-            <a:ext cx="2744279" cy="2294570"/>
-          </a:xfrm>
-          <a:prstGeom prst="straightConnector1">
-            <a:avLst/>
-          </a:prstGeom>
-          <a:ln w="11557">
+            <a:off x="16548834" y="11709061"/>
+            <a:ext cx="951115" cy="0"/>
+          </a:xfrm>
+          <a:prstGeom prst="line">
+            <a:avLst/>
+          </a:prstGeom>
+          <a:ln w="12700">
             <a:solidFill>
-              <a:srgbClr val="C00000"/>
+              <a:schemeClr val="bg2">
+                <a:lumMod val="75000"/>
+              </a:schemeClr>
             </a:solidFill>
             <a:prstDash val="dash"/>
-            <a:tailEnd type="triangle"/>
           </a:ln>
         </p:spPr>
         <p:style>
@@ -10608,30 +10787,32 @@
       </p:cxnSp>
       <p:cxnSp>
         <p:nvCxnSpPr>
-          <p:cNvPr id="49" name="Straight Arrow Connector 48">
-            <a:extLst>
-              <a:ext uri="{FF2B5EF4-FFF2-40B4-BE49-F238E27FC236}">
-                <a16:creationId xmlns:a16="http://schemas.microsoft.com/office/drawing/2014/main" id="{714D2D32-E6C2-CF91-B15E-65B4F33C4C6C}"/>
+          <p:cNvPr id="19" name="Straight Arrow Connector 18">
+            <a:extLst>
+              <a:ext uri="{FF2B5EF4-FFF2-40B4-BE49-F238E27FC236}">
+                <a16:creationId xmlns:a16="http://schemas.microsoft.com/office/drawing/2014/main" id="{B00163AA-FA7F-4D84-94EE-09A28005F34D}"/>
               </a:ext>
             </a:extLst>
           </p:cNvPr>
           <p:cNvCxnSpPr>
-            <a:stCxn id="152" idx="0"/>
-            <a:endCxn id="148" idx="2"/>
+            <a:cxnSpLocks/>
+            <a:stCxn id="150" idx="3"/>
           </p:cNvCxnSpPr>
           <p:nvPr/>
         </p:nvCxnSpPr>
         <p:spPr>
-          <a:xfrm flipV="1">
-            <a:off x="10612951" y="7910299"/>
-            <a:ext cx="4470" cy="1847981"/>
+          <a:xfrm>
+            <a:off x="6958973" y="4724595"/>
+            <a:ext cx="2748749" cy="2294570"/>
           </a:xfrm>
           <a:prstGeom prst="straightConnector1">
             <a:avLst/>
           </a:prstGeom>
-          <a:ln w="12573">
+          <a:ln w="12700">
             <a:solidFill>
-              <a:srgbClr val="C00000"/>
+              <a:schemeClr val="bg1">
+                <a:lumMod val="65000"/>
+              </a:schemeClr>
             </a:solidFill>
             <a:prstDash val="dash"/>
             <a:tailEnd type="triangle"/>
@@ -10652,50 +10833,61 @@
           </a:fontRef>
         </p:style>
       </p:cxnSp>
-      <p:sp>
-        <p:nvSpPr>
-          <p:cNvPr id="3" name="TextBox 2">
-            <a:extLst>
-              <a:ext uri="{FF2B5EF4-FFF2-40B4-BE49-F238E27FC236}">
-                <a16:creationId xmlns:a16="http://schemas.microsoft.com/office/drawing/2014/main" id="{8B12FFBD-6A30-9919-ED85-1CAA2ED2B6AF}"/>
-              </a:ext>
-            </a:extLst>
-          </p:cNvPr>
-          <p:cNvSpPr txBox="1"/>
-          <p:nvPr/>
-        </p:nvSpPr>
-        <p:spPr>
-          <a:xfrm>
-            <a:off x="6246639" y="9314745"/>
-            <a:ext cx="800219" cy="461665"/>
-          </a:xfrm>
-          <a:prstGeom prst="rect">
-            <a:avLst/>
-          </a:prstGeom>
-          <a:noFill/>
-        </p:spPr>
-        <p:txBody>
-          <a:bodyPr wrap="none" rtlCol="0">
-            <a:spAutoFit/>
-          </a:bodyPr>
-          <a:lstStyle/>
-          <a:p>
-            <a:r>
-              <a:rPr lang="en-US" sz="2400" b="1" dirty="0">
-                <a:latin typeface="Times New Roman" panose="02020603050405020304" pitchFamily="18" charset="0"/>
-                <a:cs typeface="Times New Roman" panose="02020603050405020304" pitchFamily="18" charset="0"/>
-              </a:rPr>
-              <a:t>39%</a:t>
-            </a:r>
-          </a:p>
-        </p:txBody>
-      </p:sp>
-      <p:sp>
-        <p:nvSpPr>
-          <p:cNvPr id="4" name="Rectangle 3">
-            <a:extLst>
-              <a:ext uri="{FF2B5EF4-FFF2-40B4-BE49-F238E27FC236}">
-                <a16:creationId xmlns:a16="http://schemas.microsoft.com/office/drawing/2014/main" id="{02C00127-0A1A-2C99-C54F-607878A28FA7}"/>
+      <p:cxnSp>
+        <p:nvCxnSpPr>
+          <p:cNvPr id="23" name="Straight Arrow Connector 22">
+            <a:extLst>
+              <a:ext uri="{FF2B5EF4-FFF2-40B4-BE49-F238E27FC236}">
+                <a16:creationId xmlns:a16="http://schemas.microsoft.com/office/drawing/2014/main" id="{643EF788-2743-1D8C-3AF5-85DD5EDAAFDA}"/>
+              </a:ext>
+            </a:extLst>
+          </p:cNvPr>
+          <p:cNvCxnSpPr>
+            <a:cxnSpLocks/>
+            <a:stCxn id="152" idx="0"/>
+            <a:endCxn id="148" idx="2"/>
+          </p:cNvCxnSpPr>
+          <p:nvPr/>
+        </p:nvCxnSpPr>
+        <p:spPr>
+          <a:xfrm flipV="1">
+            <a:off x="10612951" y="7910299"/>
+            <a:ext cx="4470" cy="1847981"/>
+          </a:xfrm>
+          <a:prstGeom prst="straightConnector1">
+            <a:avLst/>
+          </a:prstGeom>
+          <a:ln w="12700">
+            <a:solidFill>
+              <a:schemeClr val="bg1">
+                <a:lumMod val="65000"/>
+              </a:schemeClr>
+            </a:solidFill>
+            <a:prstDash val="dash"/>
+            <a:tailEnd type="triangle"/>
+          </a:ln>
+        </p:spPr>
+        <p:style>
+          <a:lnRef idx="1">
+            <a:schemeClr val="accent1"/>
+          </a:lnRef>
+          <a:fillRef idx="0">
+            <a:schemeClr val="accent1"/>
+          </a:fillRef>
+          <a:effectRef idx="0">
+            <a:schemeClr val="accent1"/>
+          </a:effectRef>
+          <a:fontRef idx="minor">
+            <a:schemeClr val="tx1"/>
+          </a:fontRef>
+        </p:style>
+      </p:cxnSp>
+      <p:sp>
+        <p:nvSpPr>
+          <p:cNvPr id="148" name="Rectangle 147">
+            <a:extLst>
+              <a:ext uri="{FF2B5EF4-FFF2-40B4-BE49-F238E27FC236}">
+                <a16:creationId xmlns:a16="http://schemas.microsoft.com/office/drawing/2014/main" id="{CAEEF86E-BF80-675F-3FA2-55D6B97D4497}"/>
               </a:ext>
             </a:extLst>
           </p:cNvPr>
@@ -10704,8 +10896,8 @@
         </p:nvSpPr>
         <p:spPr>
           <a:xfrm>
-            <a:off x="10137058" y="11719001"/>
-            <a:ext cx="7010400" cy="45719"/>
+            <a:off x="9707722" y="7033076"/>
+            <a:ext cx="1819398" cy="877223"/>
           </a:xfrm>
           <a:prstGeom prst="rect">
             <a:avLst/>
@@ -10713,8 +10905,10 @@
           <a:solidFill>
             <a:schemeClr val="bg1"/>
           </a:solidFill>
-          <a:ln>
-            <a:noFill/>
+          <a:ln w="38100">
+            <a:solidFill>
+              <a:schemeClr val="tx1"/>
+            </a:solidFill>
           </a:ln>
         </p:spPr>
         <p:style>
@@ -10738,59 +10932,23 @@
           <a:lstStyle/>
           <a:p>
             <a:pPr algn="ctr"/>
-            <a:endParaRPr lang="en-US"/>
-          </a:p>
-        </p:txBody>
-      </p:sp>
-      <p:sp>
-        <p:nvSpPr>
-          <p:cNvPr id="5" name="Rectangle 4">
-            <a:extLst>
-              <a:ext uri="{FF2B5EF4-FFF2-40B4-BE49-F238E27FC236}">
-                <a16:creationId xmlns:a16="http://schemas.microsoft.com/office/drawing/2014/main" id="{AEA1F572-8465-B16E-D0EB-AE36EA9F14C4}"/>
-              </a:ext>
-            </a:extLst>
-          </p:cNvPr>
-          <p:cNvSpPr/>
-          <p:nvPr/>
-        </p:nvSpPr>
-        <p:spPr>
-          <a:xfrm>
-            <a:off x="10335482" y="11514793"/>
-            <a:ext cx="7010400" cy="45719"/>
-          </a:xfrm>
-          <a:prstGeom prst="rect">
-            <a:avLst/>
-          </a:prstGeom>
-          <a:solidFill>
-            <a:schemeClr val="bg1"/>
-          </a:solidFill>
-          <a:ln>
-            <a:noFill/>
-          </a:ln>
-        </p:spPr>
-        <p:style>
-          <a:lnRef idx="2">
-            <a:schemeClr val="accent1">
-              <a:shade val="50000"/>
-            </a:schemeClr>
-          </a:lnRef>
-          <a:fillRef idx="1">
-            <a:schemeClr val="accent1"/>
-          </a:fillRef>
-          <a:effectRef idx="0">
-            <a:schemeClr val="accent1"/>
-          </a:effectRef>
-          <a:fontRef idx="minor">
-            <a:schemeClr val="lt1"/>
-          </a:fontRef>
-        </p:style>
-        <p:txBody>
-          <a:bodyPr rtlCol="0" anchor="ctr"/>
-          <a:lstStyle/>
-          <a:p>
-            <a:pPr algn="ctr"/>
-            <a:endParaRPr lang="en-US"/>
+            <a:r>
+              <a:rPr lang="el-GR" sz="3000" b="1" i="1" dirty="0">
+                <a:solidFill>
+                  <a:schemeClr val="tx1"/>
+                </a:solidFill>
+                <a:latin typeface="Times New Roman" panose="02020603050405020304" pitchFamily="18" charset="0"/>
+                <a:cs typeface="Times New Roman" panose="02020603050405020304" pitchFamily="18" charset="0"/>
+              </a:rPr>
+              <a:t>β</a:t>
+            </a:r>
+            <a:endParaRPr lang="en-US" sz="3000" b="1" i="1" dirty="0">
+              <a:solidFill>
+                <a:schemeClr val="tx1"/>
+              </a:solidFill>
+              <a:latin typeface="Times New Roman" panose="02020603050405020304" pitchFamily="18" charset="0"/>
+              <a:cs typeface="Times New Roman" panose="02020603050405020304" pitchFamily="18" charset="0"/>
+            </a:endParaRPr>
           </a:p>
         </p:txBody>
       </p:sp>

</xml_diff>

<commit_message>
minor edits to statsand correct chi to leaf cica throughout manuscript draft
</commit_message>
<xml_diff>
--- a/working_drafts/figs/TXeco_SEM_ppt_fig.pptx
+++ b/working_drafts/figs/TXeco_SEM_ppt_fig.pptx
@@ -199,7 +199,7 @@
           <a:p>
             <a:fld id="{9C8338E3-F40D-F146-8D3B-4726E84D5200}" type="datetimeFigureOut">
               <a:rPr lang="en-US" smtClean="0"/>
-              <a:t>1/25/23</a:t>
+              <a:t>1/26/23</a:t>
             </a:fld>
             <a:endParaRPr lang="en-US"/>
           </a:p>
@@ -854,7 +854,7 @@
           <a:p>
             <a:fld id="{D3A28AA4-801E-B147-9E5C-6E6DBA6E23D1}" type="datetimeFigureOut">
               <a:rPr lang="en-US" smtClean="0"/>
-              <a:t>1/25/23</a:t>
+              <a:t>1/26/23</a:t>
             </a:fld>
             <a:endParaRPr lang="en-US"/>
           </a:p>
@@ -1024,7 +1024,7 @@
           <a:p>
             <a:fld id="{D3A28AA4-801E-B147-9E5C-6E6DBA6E23D1}" type="datetimeFigureOut">
               <a:rPr lang="en-US" smtClean="0"/>
-              <a:t>1/25/23</a:t>
+              <a:t>1/26/23</a:t>
             </a:fld>
             <a:endParaRPr lang="en-US"/>
           </a:p>
@@ -1204,7 +1204,7 @@
           <a:p>
             <a:fld id="{D3A28AA4-801E-B147-9E5C-6E6DBA6E23D1}" type="datetimeFigureOut">
               <a:rPr lang="en-US" smtClean="0"/>
-              <a:t>1/25/23</a:t>
+              <a:t>1/26/23</a:t>
             </a:fld>
             <a:endParaRPr lang="en-US"/>
           </a:p>
@@ -1374,7 +1374,7 @@
           <a:p>
             <a:fld id="{D3A28AA4-801E-B147-9E5C-6E6DBA6E23D1}" type="datetimeFigureOut">
               <a:rPr lang="en-US" smtClean="0"/>
-              <a:t>1/25/23</a:t>
+              <a:t>1/26/23</a:t>
             </a:fld>
             <a:endParaRPr lang="en-US"/>
           </a:p>
@@ -1618,7 +1618,7 @@
           <a:p>
             <a:fld id="{D3A28AA4-801E-B147-9E5C-6E6DBA6E23D1}" type="datetimeFigureOut">
               <a:rPr lang="en-US" smtClean="0"/>
-              <a:t>1/25/23</a:t>
+              <a:t>1/26/23</a:t>
             </a:fld>
             <a:endParaRPr lang="en-US"/>
           </a:p>
@@ -1850,7 +1850,7 @@
           <a:p>
             <a:fld id="{D3A28AA4-801E-B147-9E5C-6E6DBA6E23D1}" type="datetimeFigureOut">
               <a:rPr lang="en-US" smtClean="0"/>
-              <a:t>1/25/23</a:t>
+              <a:t>1/26/23</a:t>
             </a:fld>
             <a:endParaRPr lang="en-US"/>
           </a:p>
@@ -2217,7 +2217,7 @@
           <a:p>
             <a:fld id="{D3A28AA4-801E-B147-9E5C-6E6DBA6E23D1}" type="datetimeFigureOut">
               <a:rPr lang="en-US" smtClean="0"/>
-              <a:t>1/25/23</a:t>
+              <a:t>1/26/23</a:t>
             </a:fld>
             <a:endParaRPr lang="en-US"/>
           </a:p>
@@ -2335,7 +2335,7 @@
           <a:p>
             <a:fld id="{D3A28AA4-801E-B147-9E5C-6E6DBA6E23D1}" type="datetimeFigureOut">
               <a:rPr lang="en-US" smtClean="0"/>
-              <a:t>1/25/23</a:t>
+              <a:t>1/26/23</a:t>
             </a:fld>
             <a:endParaRPr lang="en-US"/>
           </a:p>
@@ -2430,7 +2430,7 @@
           <a:p>
             <a:fld id="{D3A28AA4-801E-B147-9E5C-6E6DBA6E23D1}" type="datetimeFigureOut">
               <a:rPr lang="en-US" smtClean="0"/>
-              <a:t>1/25/23</a:t>
+              <a:t>1/26/23</a:t>
             </a:fld>
             <a:endParaRPr lang="en-US"/>
           </a:p>
@@ -2707,7 +2707,7 @@
           <a:p>
             <a:fld id="{D3A28AA4-801E-B147-9E5C-6E6DBA6E23D1}" type="datetimeFigureOut">
               <a:rPr lang="en-US" smtClean="0"/>
-              <a:t>1/25/23</a:t>
+              <a:t>1/26/23</a:t>
             </a:fld>
             <a:endParaRPr lang="en-US"/>
           </a:p>
@@ -2964,7 +2964,7 @@
           <a:p>
             <a:fld id="{D3A28AA4-801E-B147-9E5C-6E6DBA6E23D1}" type="datetimeFigureOut">
               <a:rPr lang="en-US" smtClean="0"/>
-              <a:t>1/25/23</a:t>
+              <a:t>1/26/23</a:t>
             </a:fld>
             <a:endParaRPr lang="en-US"/>
           </a:p>
@@ -3177,7 +3177,7 @@
           <a:p>
             <a:fld id="{D3A28AA4-801E-B147-9E5C-6E6DBA6E23D1}" type="datetimeFigureOut">
               <a:rPr lang="en-US" smtClean="0"/>
-              <a:t>1/25/23</a:t>
+              <a:t>1/26/23</a:t>
             </a:fld>
             <a:endParaRPr lang="en-US"/>
           </a:p>
@@ -9265,7 +9265,7 @@
                 <a:latin typeface="Times New Roman" panose="02020603050405020304" pitchFamily="18" charset="0"/>
                 <a:cs typeface="Times New Roman" panose="02020603050405020304" pitchFamily="18" charset="0"/>
               </a:rPr>
-              <a:t>55%</a:t>
+              <a:t>56%</a:t>
             </a:r>
           </a:p>
         </p:txBody>
@@ -9303,7 +9303,7 @@
                 <a:latin typeface="Times New Roman" panose="02020603050405020304" pitchFamily="18" charset="0"/>
                 <a:cs typeface="Times New Roman" panose="02020603050405020304" pitchFamily="18" charset="0"/>
               </a:rPr>
-              <a:t>76%</a:t>
+              <a:t>77%</a:t>
             </a:r>
           </a:p>
         </p:txBody>
@@ -10333,22 +10333,45 @@
           <a:p>
             <a:pPr algn="ctr"/>
             <a:r>
-              <a:rPr lang="el-GR" sz="3000" b="1" i="1" dirty="0">
+              <a:rPr lang="en-US" sz="3000" b="1" i="1" dirty="0">
                 <a:solidFill>
                   <a:schemeClr val="tx1"/>
                 </a:solidFill>
                 <a:latin typeface="Times New Roman" panose="02020603050405020304" pitchFamily="18" charset="0"/>
                 <a:cs typeface="Times New Roman" panose="02020603050405020304" pitchFamily="18" charset="0"/>
               </a:rPr>
-              <a:t>χ</a:t>
-            </a:r>
-            <a:endParaRPr lang="en-US" sz="3000" b="1" i="1" dirty="0">
-              <a:solidFill>
-                <a:schemeClr val="tx1"/>
-              </a:solidFill>
-              <a:latin typeface="Times New Roman" panose="02020603050405020304" pitchFamily="18" charset="0"/>
-              <a:cs typeface="Times New Roman" panose="02020603050405020304" pitchFamily="18" charset="0"/>
-            </a:endParaRPr>
+              <a:t>C</a:t>
+            </a:r>
+            <a:r>
+              <a:rPr lang="en-US" sz="3000" b="1" baseline="-25000" dirty="0">
+                <a:solidFill>
+                  <a:schemeClr val="tx1"/>
+                </a:solidFill>
+                <a:latin typeface="Times New Roman" panose="02020603050405020304" pitchFamily="18" charset="0"/>
+                <a:cs typeface="Times New Roman" panose="02020603050405020304" pitchFamily="18" charset="0"/>
+              </a:rPr>
+              <a:t>i</a:t>
+            </a:r>
+            <a:r>
+              <a:rPr lang="en-US" sz="3000" b="1" i="1" dirty="0">
+                <a:solidFill>
+                  <a:schemeClr val="tx1"/>
+                </a:solidFill>
+                <a:latin typeface="Times New Roman" panose="02020603050405020304" pitchFamily="18" charset="0"/>
+                <a:cs typeface="Times New Roman" panose="02020603050405020304" pitchFamily="18" charset="0"/>
+              </a:rPr>
+              <a:t>:C</a:t>
+            </a:r>
+            <a:r>
+              <a:rPr lang="en-US" sz="3000" b="1" baseline="-25000" dirty="0">
+                <a:solidFill>
+                  <a:schemeClr val="tx1"/>
+                </a:solidFill>
+                <a:latin typeface="Times New Roman" panose="02020603050405020304" pitchFamily="18" charset="0"/>
+                <a:cs typeface="Times New Roman" panose="02020603050405020304" pitchFamily="18" charset="0"/>
+              </a:rPr>
+              <a:t>a</a:t>
+            </a:r>
           </a:p>
         </p:txBody>
       </p:sp>

</xml_diff>

<commit_message>
reduce word count, revise figs, and work on soil nitrogen discussion subsection
</commit_message>
<xml_diff>
--- a/working_drafts/figs/TXeco_SEM_ppt_fig.pptx
+++ b/working_drafts/figs/TXeco_SEM_ppt_fig.pptx
@@ -199,7 +199,7 @@
           <a:p>
             <a:fld id="{9C8338E3-F40D-F146-8D3B-4726E84D5200}" type="datetimeFigureOut">
               <a:rPr lang="en-US" smtClean="0"/>
-              <a:t>1/26/23</a:t>
+              <a:t>2/13/23</a:t>
             </a:fld>
             <a:endParaRPr lang="en-US"/>
           </a:p>
@@ -854,7 +854,7 @@
           <a:p>
             <a:fld id="{D3A28AA4-801E-B147-9E5C-6E6DBA6E23D1}" type="datetimeFigureOut">
               <a:rPr lang="en-US" smtClean="0"/>
-              <a:t>1/26/23</a:t>
+              <a:t>2/13/23</a:t>
             </a:fld>
             <a:endParaRPr lang="en-US"/>
           </a:p>
@@ -1024,7 +1024,7 @@
           <a:p>
             <a:fld id="{D3A28AA4-801E-B147-9E5C-6E6DBA6E23D1}" type="datetimeFigureOut">
               <a:rPr lang="en-US" smtClean="0"/>
-              <a:t>1/26/23</a:t>
+              <a:t>2/13/23</a:t>
             </a:fld>
             <a:endParaRPr lang="en-US"/>
           </a:p>
@@ -1204,7 +1204,7 @@
           <a:p>
             <a:fld id="{D3A28AA4-801E-B147-9E5C-6E6DBA6E23D1}" type="datetimeFigureOut">
               <a:rPr lang="en-US" smtClean="0"/>
-              <a:t>1/26/23</a:t>
+              <a:t>2/13/23</a:t>
             </a:fld>
             <a:endParaRPr lang="en-US"/>
           </a:p>
@@ -1374,7 +1374,7 @@
           <a:p>
             <a:fld id="{D3A28AA4-801E-B147-9E5C-6E6DBA6E23D1}" type="datetimeFigureOut">
               <a:rPr lang="en-US" smtClean="0"/>
-              <a:t>1/26/23</a:t>
+              <a:t>2/13/23</a:t>
             </a:fld>
             <a:endParaRPr lang="en-US"/>
           </a:p>
@@ -1618,7 +1618,7 @@
           <a:p>
             <a:fld id="{D3A28AA4-801E-B147-9E5C-6E6DBA6E23D1}" type="datetimeFigureOut">
               <a:rPr lang="en-US" smtClean="0"/>
-              <a:t>1/26/23</a:t>
+              <a:t>2/13/23</a:t>
             </a:fld>
             <a:endParaRPr lang="en-US"/>
           </a:p>
@@ -1850,7 +1850,7 @@
           <a:p>
             <a:fld id="{D3A28AA4-801E-B147-9E5C-6E6DBA6E23D1}" type="datetimeFigureOut">
               <a:rPr lang="en-US" smtClean="0"/>
-              <a:t>1/26/23</a:t>
+              <a:t>2/13/23</a:t>
             </a:fld>
             <a:endParaRPr lang="en-US"/>
           </a:p>
@@ -2217,7 +2217,7 @@
           <a:p>
             <a:fld id="{D3A28AA4-801E-B147-9E5C-6E6DBA6E23D1}" type="datetimeFigureOut">
               <a:rPr lang="en-US" smtClean="0"/>
-              <a:t>1/26/23</a:t>
+              <a:t>2/13/23</a:t>
             </a:fld>
             <a:endParaRPr lang="en-US"/>
           </a:p>
@@ -2335,7 +2335,7 @@
           <a:p>
             <a:fld id="{D3A28AA4-801E-B147-9E5C-6E6DBA6E23D1}" type="datetimeFigureOut">
               <a:rPr lang="en-US" smtClean="0"/>
-              <a:t>1/26/23</a:t>
+              <a:t>2/13/23</a:t>
             </a:fld>
             <a:endParaRPr lang="en-US"/>
           </a:p>
@@ -2430,7 +2430,7 @@
           <a:p>
             <a:fld id="{D3A28AA4-801E-B147-9E5C-6E6DBA6E23D1}" type="datetimeFigureOut">
               <a:rPr lang="en-US" smtClean="0"/>
-              <a:t>1/26/23</a:t>
+              <a:t>2/13/23</a:t>
             </a:fld>
             <a:endParaRPr lang="en-US"/>
           </a:p>
@@ -2707,7 +2707,7 @@
           <a:p>
             <a:fld id="{D3A28AA4-801E-B147-9E5C-6E6DBA6E23D1}" type="datetimeFigureOut">
               <a:rPr lang="en-US" smtClean="0"/>
-              <a:t>1/26/23</a:t>
+              <a:t>2/13/23</a:t>
             </a:fld>
             <a:endParaRPr lang="en-US"/>
           </a:p>
@@ -2964,7 +2964,7 @@
           <a:p>
             <a:fld id="{D3A28AA4-801E-B147-9E5C-6E6DBA6E23D1}" type="datetimeFigureOut">
               <a:rPr lang="en-US" smtClean="0"/>
-              <a:t>1/26/23</a:t>
+              <a:t>2/13/23</a:t>
             </a:fld>
             <a:endParaRPr lang="en-US"/>
           </a:p>
@@ -3177,7 +3177,7 @@
           <a:p>
             <a:fld id="{D3A28AA4-801E-B147-9E5C-6E6DBA6E23D1}" type="datetimeFigureOut">
               <a:rPr lang="en-US" smtClean="0"/>
-              <a:t>1/26/23</a:t>
+              <a:t>2/13/23</a:t>
             </a:fld>
             <a:endParaRPr lang="en-US"/>
           </a:p>
@@ -8550,7 +8550,7 @@
           <a:prstGeom prst="straightConnector1">
             <a:avLst/>
           </a:prstGeom>
-          <a:ln w="183896">
+          <a:ln w="169926">
             <a:solidFill>
               <a:schemeClr val="accent1">
                 <a:lumMod val="75000"/>
@@ -9265,7 +9265,7 @@
                 <a:latin typeface="Times New Roman" panose="02020603050405020304" pitchFamily="18" charset="0"/>
                 <a:cs typeface="Times New Roman" panose="02020603050405020304" pitchFamily="18" charset="0"/>
               </a:rPr>
-              <a:t>56%</a:t>
+              <a:t>55%</a:t>
             </a:r>
           </a:p>
         </p:txBody>
@@ -9303,7 +9303,7 @@
                 <a:latin typeface="Times New Roman" panose="02020603050405020304" pitchFamily="18" charset="0"/>
                 <a:cs typeface="Times New Roman" panose="02020603050405020304" pitchFamily="18" charset="0"/>
               </a:rPr>
-              <a:t>77%</a:t>
+              <a:t>57%</a:t>
             </a:r>
           </a:p>
         </p:txBody>
@@ -9341,7 +9341,7 @@
                 <a:latin typeface="Times New Roman" panose="02020603050405020304" pitchFamily="18" charset="0"/>
                 <a:cs typeface="Times New Roman" panose="02020603050405020304" pitchFamily="18" charset="0"/>
               </a:rPr>
-              <a:t>37%</a:t>
+              <a:t>38%</a:t>
             </a:r>
           </a:p>
         </p:txBody>
@@ -9421,7 +9421,7 @@
           <a:prstGeom prst="straightConnector1">
             <a:avLst/>
           </a:prstGeom>
-          <a:ln w="185547">
+          <a:ln w="185166">
             <a:solidFill>
               <a:schemeClr val="accent1">
                 <a:lumMod val="75000"/>
@@ -9469,7 +9469,7 @@
           <a:prstGeom prst="straightConnector1">
             <a:avLst/>
           </a:prstGeom>
-          <a:ln w="60960">
+          <a:ln w="59563">
             <a:solidFill>
               <a:srgbClr val="C00000"/>
             </a:solidFill>
@@ -9516,7 +9516,7 @@
               <a:gd name="adj1" fmla="val -16962834"/>
             </a:avLst>
           </a:prstGeom>
-          <a:ln w="68834">
+          <a:ln w="60833">
             <a:solidFill>
               <a:srgbClr val="C00000"/>
             </a:solidFill>
@@ -9561,7 +9561,7 @@
           <a:prstGeom prst="straightConnector1">
             <a:avLst/>
           </a:prstGeom>
-          <a:ln w="73660">
+          <a:ln w="73279">
             <a:solidFill>
               <a:schemeClr val="accent1">
                 <a:lumMod val="75000"/>
@@ -9608,7 +9608,7 @@
           <a:prstGeom prst="straightConnector1">
             <a:avLst/>
           </a:prstGeom>
-          <a:ln w="26288">
+          <a:ln w="26416">
             <a:solidFill>
               <a:srgbClr val="C00000"/>
             </a:solidFill>
@@ -9652,7 +9652,7 @@
           <a:prstGeom prst="straightConnector1">
             <a:avLst/>
           </a:prstGeom>
-          <a:ln w="50673">
+          <a:ln w="49276">
             <a:solidFill>
               <a:srgbClr val="C00000"/>
             </a:solidFill>
@@ -9744,7 +9744,7 @@
           <a:prstGeom prst="straightConnector1">
             <a:avLst/>
           </a:prstGeom>
-          <a:ln w="36576">
+          <a:ln w="35179">
             <a:solidFill>
               <a:schemeClr val="accent1">
                 <a:lumMod val="75000"/>
@@ -9837,86 +9837,6 @@
                 <a:cs typeface="Times New Roman" panose="02020603050405020304" pitchFamily="18" charset="0"/>
               </a:rPr>
               <a:t>area</a:t>
-            </a:r>
-            <a:endParaRPr lang="en-US" sz="3000" b="1" i="1" dirty="0">
-              <a:solidFill>
-                <a:schemeClr val="tx1"/>
-              </a:solidFill>
-              <a:latin typeface="Times New Roman" panose="02020603050405020304" pitchFamily="18" charset="0"/>
-              <a:cs typeface="Times New Roman" panose="02020603050405020304" pitchFamily="18" charset="0"/>
-            </a:endParaRPr>
-          </a:p>
-        </p:txBody>
-      </p:sp>
-      <p:sp>
-        <p:nvSpPr>
-          <p:cNvPr id="152" name="Rectangle 151">
-            <a:extLst>
-              <a:ext uri="{FF2B5EF4-FFF2-40B4-BE49-F238E27FC236}">
-                <a16:creationId xmlns:a16="http://schemas.microsoft.com/office/drawing/2014/main" id="{2D17192C-937C-49F2-AB55-CCF25B817752}"/>
-              </a:ext>
-            </a:extLst>
-          </p:cNvPr>
-          <p:cNvSpPr/>
-          <p:nvPr/>
-        </p:nvSpPr>
-        <p:spPr>
-          <a:xfrm>
-            <a:off x="9703252" y="9758280"/>
-            <a:ext cx="1819398" cy="877223"/>
-          </a:xfrm>
-          <a:prstGeom prst="rect">
-            <a:avLst/>
-          </a:prstGeom>
-          <a:solidFill>
-            <a:schemeClr val="bg1"/>
-          </a:solidFill>
-          <a:ln w="38100">
-            <a:solidFill>
-              <a:schemeClr val="tx1"/>
-            </a:solidFill>
-          </a:ln>
-        </p:spPr>
-        <p:style>
-          <a:lnRef idx="2">
-            <a:schemeClr val="accent1">
-              <a:shade val="50000"/>
-            </a:schemeClr>
-          </a:lnRef>
-          <a:fillRef idx="1">
-            <a:schemeClr val="accent1"/>
-          </a:fillRef>
-          <a:effectRef idx="0">
-            <a:schemeClr val="accent1"/>
-          </a:effectRef>
-          <a:fontRef idx="minor">
-            <a:schemeClr val="lt1"/>
-          </a:fontRef>
-        </p:style>
-        <p:txBody>
-          <a:bodyPr rtlCol="0" anchor="ctr"/>
-          <a:lstStyle/>
-          <a:p>
-            <a:pPr algn="ctr"/>
-            <a:r>
-              <a:rPr lang="en-US" sz="3000" b="1" i="1" dirty="0">
-                <a:solidFill>
-                  <a:schemeClr val="tx1"/>
-                </a:solidFill>
-                <a:latin typeface="Times New Roman" panose="02020603050405020304" pitchFamily="18" charset="0"/>
-                <a:cs typeface="Times New Roman" panose="02020603050405020304" pitchFamily="18" charset="0"/>
-              </a:rPr>
-              <a:t>N</a:t>
-            </a:r>
-            <a:r>
-              <a:rPr lang="en-US" sz="3000" b="1" baseline="-25000" dirty="0">
-                <a:solidFill>
-                  <a:schemeClr val="tx1"/>
-                </a:solidFill>
-                <a:latin typeface="Times New Roman" panose="02020603050405020304" pitchFamily="18" charset="0"/>
-                <a:cs typeface="Times New Roman" panose="02020603050405020304" pitchFamily="18" charset="0"/>
-              </a:rPr>
-              <a:t>fixer</a:t>
             </a:r>
             <a:endParaRPr lang="en-US" sz="3000" b="1" i="1" dirty="0">
               <a:solidFill>
@@ -10284,99 +10204,6 @@
       </p:sp>
       <p:sp>
         <p:nvSpPr>
-          <p:cNvPr id="149" name="Rectangle 148">
-            <a:extLst>
-              <a:ext uri="{FF2B5EF4-FFF2-40B4-BE49-F238E27FC236}">
-                <a16:creationId xmlns:a16="http://schemas.microsoft.com/office/drawing/2014/main" id="{37E4791A-A4FE-F459-D539-AC5C8696DD32}"/>
-              </a:ext>
-            </a:extLst>
-          </p:cNvPr>
-          <p:cNvSpPr/>
-          <p:nvPr/>
-        </p:nvSpPr>
-        <p:spPr>
-          <a:xfrm>
-            <a:off x="14258417" y="7033078"/>
-            <a:ext cx="1819398" cy="877223"/>
-          </a:xfrm>
-          <a:prstGeom prst="rect">
-            <a:avLst/>
-          </a:prstGeom>
-          <a:solidFill>
-            <a:schemeClr val="bg1"/>
-          </a:solidFill>
-          <a:ln w="38100">
-            <a:solidFill>
-              <a:schemeClr val="tx1"/>
-            </a:solidFill>
-          </a:ln>
-        </p:spPr>
-        <p:style>
-          <a:lnRef idx="2">
-            <a:schemeClr val="accent1">
-              <a:shade val="50000"/>
-            </a:schemeClr>
-          </a:lnRef>
-          <a:fillRef idx="1">
-            <a:schemeClr val="accent1"/>
-          </a:fillRef>
-          <a:effectRef idx="0">
-            <a:schemeClr val="accent1"/>
-          </a:effectRef>
-          <a:fontRef idx="minor">
-            <a:schemeClr val="lt1"/>
-          </a:fontRef>
-        </p:style>
-        <p:txBody>
-          <a:bodyPr rtlCol="0" anchor="ctr"/>
-          <a:lstStyle/>
-          <a:p>
-            <a:pPr algn="ctr"/>
-            <a:r>
-              <a:rPr lang="en-US" sz="3000" b="1" i="1" dirty="0">
-                <a:solidFill>
-                  <a:schemeClr val="tx1"/>
-                </a:solidFill>
-                <a:latin typeface="Times New Roman" panose="02020603050405020304" pitchFamily="18" charset="0"/>
-                <a:cs typeface="Times New Roman" panose="02020603050405020304" pitchFamily="18" charset="0"/>
-              </a:rPr>
-              <a:t>C</a:t>
-            </a:r>
-            <a:r>
-              <a:rPr lang="en-US" sz="3000" b="1" baseline="-25000" dirty="0">
-                <a:solidFill>
-                  <a:schemeClr val="tx1"/>
-                </a:solidFill>
-                <a:latin typeface="Times New Roman" panose="02020603050405020304" pitchFamily="18" charset="0"/>
-                <a:cs typeface="Times New Roman" panose="02020603050405020304" pitchFamily="18" charset="0"/>
-              </a:rPr>
-              <a:t>i</a:t>
-            </a:r>
-            <a:r>
-              <a:rPr lang="en-US" sz="3000" b="1" i="1" dirty="0">
-                <a:solidFill>
-                  <a:schemeClr val="tx1"/>
-                </a:solidFill>
-                <a:latin typeface="Times New Roman" panose="02020603050405020304" pitchFamily="18" charset="0"/>
-                <a:cs typeface="Times New Roman" panose="02020603050405020304" pitchFamily="18" charset="0"/>
-              </a:rPr>
-              <a:t>:C</a:t>
-            </a:r>
-            <a:r>
-              <a:rPr lang="en-US" sz="3000" b="1" baseline="-25000" dirty="0">
-                <a:solidFill>
-                  <a:schemeClr val="tx1"/>
-                </a:solidFill>
-                <a:latin typeface="Times New Roman" panose="02020603050405020304" pitchFamily="18" charset="0"/>
-                <a:cs typeface="Times New Roman" panose="02020603050405020304" pitchFamily="18" charset="0"/>
-              </a:rPr>
-              <a:t>a</a:t>
-            </a:r>
-          </a:p>
-        </p:txBody>
-      </p:sp>
-      <p:sp>
-        <p:nvSpPr>
           <p:cNvPr id="151" name="Rectangle 150">
             <a:extLst>
               <a:ext uri="{FF2B5EF4-FFF2-40B4-BE49-F238E27FC236}">
@@ -10740,8 +10567,8 @@
           </a:prstGeom>
           <a:ln w="12700">
             <a:solidFill>
-              <a:schemeClr val="bg2">
-                <a:lumMod val="75000"/>
+              <a:schemeClr val="bg1">
+                <a:lumMod val="65000"/>
               </a:schemeClr>
             </a:solidFill>
             <a:prstDash val="dash"/>
@@ -10786,8 +10613,8 @@
           </a:prstGeom>
           <a:ln w="12700">
             <a:solidFill>
-              <a:schemeClr val="bg2">
-                <a:lumMod val="75000"/>
+              <a:schemeClr val="bg1">
+                <a:lumMod val="65000"/>
               </a:schemeClr>
             </a:solidFill>
             <a:prstDash val="dash"/>
@@ -10972,6 +10799,179 @@
               <a:latin typeface="Times New Roman" panose="02020603050405020304" pitchFamily="18" charset="0"/>
               <a:cs typeface="Times New Roman" panose="02020603050405020304" pitchFamily="18" charset="0"/>
             </a:endParaRPr>
+          </a:p>
+        </p:txBody>
+      </p:sp>
+      <p:sp>
+        <p:nvSpPr>
+          <p:cNvPr id="152" name="Rectangle 151">
+            <a:extLst>
+              <a:ext uri="{FF2B5EF4-FFF2-40B4-BE49-F238E27FC236}">
+                <a16:creationId xmlns:a16="http://schemas.microsoft.com/office/drawing/2014/main" id="{2D17192C-937C-49F2-AB55-CCF25B817752}"/>
+              </a:ext>
+            </a:extLst>
+          </p:cNvPr>
+          <p:cNvSpPr/>
+          <p:nvPr/>
+        </p:nvSpPr>
+        <p:spPr>
+          <a:xfrm>
+            <a:off x="9703252" y="9758280"/>
+            <a:ext cx="1819398" cy="877223"/>
+          </a:xfrm>
+          <a:prstGeom prst="rect">
+            <a:avLst/>
+          </a:prstGeom>
+          <a:solidFill>
+            <a:schemeClr val="bg1"/>
+          </a:solidFill>
+          <a:ln w="38100">
+            <a:solidFill>
+              <a:schemeClr val="tx1"/>
+            </a:solidFill>
+          </a:ln>
+        </p:spPr>
+        <p:style>
+          <a:lnRef idx="2">
+            <a:schemeClr val="accent1">
+              <a:shade val="50000"/>
+            </a:schemeClr>
+          </a:lnRef>
+          <a:fillRef idx="1">
+            <a:schemeClr val="accent1"/>
+          </a:fillRef>
+          <a:effectRef idx="0">
+            <a:schemeClr val="accent1"/>
+          </a:effectRef>
+          <a:fontRef idx="minor">
+            <a:schemeClr val="lt1"/>
+          </a:fontRef>
+        </p:style>
+        <p:txBody>
+          <a:bodyPr rtlCol="0" anchor="ctr"/>
+          <a:lstStyle/>
+          <a:p>
+            <a:pPr algn="ctr"/>
+            <a:r>
+              <a:rPr lang="en-US" sz="3000" b="1" i="1" dirty="0">
+                <a:solidFill>
+                  <a:schemeClr val="tx1"/>
+                </a:solidFill>
+                <a:latin typeface="Times New Roman" panose="02020603050405020304" pitchFamily="18" charset="0"/>
+                <a:cs typeface="Times New Roman" panose="02020603050405020304" pitchFamily="18" charset="0"/>
+              </a:rPr>
+              <a:t>N</a:t>
+            </a:r>
+            <a:r>
+              <a:rPr lang="en-US" sz="3000" b="1" baseline="-25000" dirty="0">
+                <a:solidFill>
+                  <a:schemeClr val="tx1"/>
+                </a:solidFill>
+                <a:latin typeface="Times New Roman" panose="02020603050405020304" pitchFamily="18" charset="0"/>
+                <a:cs typeface="Times New Roman" panose="02020603050405020304" pitchFamily="18" charset="0"/>
+              </a:rPr>
+              <a:t>fixer</a:t>
+            </a:r>
+            <a:endParaRPr lang="en-US" sz="3000" b="1" i="1" dirty="0">
+              <a:solidFill>
+                <a:schemeClr val="tx1"/>
+              </a:solidFill>
+              <a:latin typeface="Times New Roman" panose="02020603050405020304" pitchFamily="18" charset="0"/>
+              <a:cs typeface="Times New Roman" panose="02020603050405020304" pitchFamily="18" charset="0"/>
+            </a:endParaRPr>
+          </a:p>
+        </p:txBody>
+      </p:sp>
+      <p:sp>
+        <p:nvSpPr>
+          <p:cNvPr id="149" name="Rectangle 148">
+            <a:extLst>
+              <a:ext uri="{FF2B5EF4-FFF2-40B4-BE49-F238E27FC236}">
+                <a16:creationId xmlns:a16="http://schemas.microsoft.com/office/drawing/2014/main" id="{37E4791A-A4FE-F459-D539-AC5C8696DD32}"/>
+              </a:ext>
+            </a:extLst>
+          </p:cNvPr>
+          <p:cNvSpPr/>
+          <p:nvPr/>
+        </p:nvSpPr>
+        <p:spPr>
+          <a:xfrm>
+            <a:off x="14258417" y="7033078"/>
+            <a:ext cx="1819398" cy="877223"/>
+          </a:xfrm>
+          <a:prstGeom prst="rect">
+            <a:avLst/>
+          </a:prstGeom>
+          <a:solidFill>
+            <a:schemeClr val="bg1"/>
+          </a:solidFill>
+          <a:ln w="38100">
+            <a:solidFill>
+              <a:schemeClr val="tx1"/>
+            </a:solidFill>
+          </a:ln>
+        </p:spPr>
+        <p:style>
+          <a:lnRef idx="2">
+            <a:schemeClr val="accent1">
+              <a:shade val="50000"/>
+            </a:schemeClr>
+          </a:lnRef>
+          <a:fillRef idx="1">
+            <a:schemeClr val="accent1"/>
+          </a:fillRef>
+          <a:effectRef idx="0">
+            <a:schemeClr val="accent1"/>
+          </a:effectRef>
+          <a:fontRef idx="minor">
+            <a:schemeClr val="lt1"/>
+          </a:fontRef>
+        </p:style>
+        <p:txBody>
+          <a:bodyPr rtlCol="0" anchor="ctr"/>
+          <a:lstStyle/>
+          <a:p>
+            <a:pPr algn="ctr"/>
+            <a:r>
+              <a:rPr lang="en-US" sz="3000" b="1" i="1" dirty="0">
+                <a:solidFill>
+                  <a:schemeClr val="tx1"/>
+                </a:solidFill>
+                <a:latin typeface="Times New Roman" panose="02020603050405020304" pitchFamily="18" charset="0"/>
+                <a:cs typeface="Times New Roman" panose="02020603050405020304" pitchFamily="18" charset="0"/>
+              </a:rPr>
+              <a:t>C</a:t>
+            </a:r>
+            <a:r>
+              <a:rPr lang="en-US" sz="3000" b="1" baseline="-25000" dirty="0">
+                <a:solidFill>
+                  <a:schemeClr val="tx1"/>
+                </a:solidFill>
+                <a:latin typeface="Times New Roman" panose="02020603050405020304" pitchFamily="18" charset="0"/>
+                <a:cs typeface="Times New Roman" panose="02020603050405020304" pitchFamily="18" charset="0"/>
+              </a:rPr>
+              <a:t>i</a:t>
+            </a:r>
+            <a:r>
+              <a:rPr lang="en-US" sz="3000" b="1" i="1" dirty="0">
+                <a:solidFill>
+                  <a:schemeClr val="tx1"/>
+                </a:solidFill>
+                <a:latin typeface="Times New Roman" panose="02020603050405020304" pitchFamily="18" charset="0"/>
+                <a:cs typeface="Times New Roman" panose="02020603050405020304" pitchFamily="18" charset="0"/>
+              </a:rPr>
+              <a:t>:C</a:t>
+            </a:r>
+            <a:r>
+              <a:rPr lang="en-US" sz="3000" b="1" baseline="-25000" dirty="0">
+                <a:solidFill>
+                  <a:schemeClr val="tx1"/>
+                </a:solidFill>
+                <a:latin typeface="Times New Roman" panose="02020603050405020304" pitchFamily="18" charset="0"/>
+                <a:cs typeface="Times New Roman" panose="02020603050405020304" pitchFamily="18" charset="0"/>
+              </a:rPr>
+              <a:t>a</a:t>
+            </a:r>
           </a:p>
         </p:txBody>
       </p:sp>

</xml_diff>

<commit_message>
add final revisions before sending to Nick for feedback
</commit_message>
<xml_diff>
--- a/working_drafts/figs/TXeco_SEM_ppt_fig.pptx
+++ b/working_drafts/figs/TXeco_SEM_ppt_fig.pptx
@@ -199,7 +199,7 @@
           <a:p>
             <a:fld id="{9C8338E3-F40D-F146-8D3B-4726E84D5200}" type="datetimeFigureOut">
               <a:rPr lang="en-US" smtClean="0"/>
-              <a:t>2/13/23</a:t>
+              <a:t>2/14/23</a:t>
             </a:fld>
             <a:endParaRPr lang="en-US"/>
           </a:p>
@@ -854,7 +854,7 @@
           <a:p>
             <a:fld id="{D3A28AA4-801E-B147-9E5C-6E6DBA6E23D1}" type="datetimeFigureOut">
               <a:rPr lang="en-US" smtClean="0"/>
-              <a:t>2/13/23</a:t>
+              <a:t>2/14/23</a:t>
             </a:fld>
             <a:endParaRPr lang="en-US"/>
           </a:p>
@@ -1024,7 +1024,7 @@
           <a:p>
             <a:fld id="{D3A28AA4-801E-B147-9E5C-6E6DBA6E23D1}" type="datetimeFigureOut">
               <a:rPr lang="en-US" smtClean="0"/>
-              <a:t>2/13/23</a:t>
+              <a:t>2/14/23</a:t>
             </a:fld>
             <a:endParaRPr lang="en-US"/>
           </a:p>
@@ -1204,7 +1204,7 @@
           <a:p>
             <a:fld id="{D3A28AA4-801E-B147-9E5C-6E6DBA6E23D1}" type="datetimeFigureOut">
               <a:rPr lang="en-US" smtClean="0"/>
-              <a:t>2/13/23</a:t>
+              <a:t>2/14/23</a:t>
             </a:fld>
             <a:endParaRPr lang="en-US"/>
           </a:p>
@@ -1374,7 +1374,7 @@
           <a:p>
             <a:fld id="{D3A28AA4-801E-B147-9E5C-6E6DBA6E23D1}" type="datetimeFigureOut">
               <a:rPr lang="en-US" smtClean="0"/>
-              <a:t>2/13/23</a:t>
+              <a:t>2/14/23</a:t>
             </a:fld>
             <a:endParaRPr lang="en-US"/>
           </a:p>
@@ -1618,7 +1618,7 @@
           <a:p>
             <a:fld id="{D3A28AA4-801E-B147-9E5C-6E6DBA6E23D1}" type="datetimeFigureOut">
               <a:rPr lang="en-US" smtClean="0"/>
-              <a:t>2/13/23</a:t>
+              <a:t>2/14/23</a:t>
             </a:fld>
             <a:endParaRPr lang="en-US"/>
           </a:p>
@@ -1850,7 +1850,7 @@
           <a:p>
             <a:fld id="{D3A28AA4-801E-B147-9E5C-6E6DBA6E23D1}" type="datetimeFigureOut">
               <a:rPr lang="en-US" smtClean="0"/>
-              <a:t>2/13/23</a:t>
+              <a:t>2/14/23</a:t>
             </a:fld>
             <a:endParaRPr lang="en-US"/>
           </a:p>
@@ -2217,7 +2217,7 @@
           <a:p>
             <a:fld id="{D3A28AA4-801E-B147-9E5C-6E6DBA6E23D1}" type="datetimeFigureOut">
               <a:rPr lang="en-US" smtClean="0"/>
-              <a:t>2/13/23</a:t>
+              <a:t>2/14/23</a:t>
             </a:fld>
             <a:endParaRPr lang="en-US"/>
           </a:p>
@@ -2335,7 +2335,7 @@
           <a:p>
             <a:fld id="{D3A28AA4-801E-B147-9E5C-6E6DBA6E23D1}" type="datetimeFigureOut">
               <a:rPr lang="en-US" smtClean="0"/>
-              <a:t>2/13/23</a:t>
+              <a:t>2/14/23</a:t>
             </a:fld>
             <a:endParaRPr lang="en-US"/>
           </a:p>
@@ -2430,7 +2430,7 @@
           <a:p>
             <a:fld id="{D3A28AA4-801E-B147-9E5C-6E6DBA6E23D1}" type="datetimeFigureOut">
               <a:rPr lang="en-US" smtClean="0"/>
-              <a:t>2/13/23</a:t>
+              <a:t>2/14/23</a:t>
             </a:fld>
             <a:endParaRPr lang="en-US"/>
           </a:p>
@@ -2707,7 +2707,7 @@
           <a:p>
             <a:fld id="{D3A28AA4-801E-B147-9E5C-6E6DBA6E23D1}" type="datetimeFigureOut">
               <a:rPr lang="en-US" smtClean="0"/>
-              <a:t>2/13/23</a:t>
+              <a:t>2/14/23</a:t>
             </a:fld>
             <a:endParaRPr lang="en-US"/>
           </a:p>
@@ -2964,7 +2964,7 @@
           <a:p>
             <a:fld id="{D3A28AA4-801E-B147-9E5C-6E6DBA6E23D1}" type="datetimeFigureOut">
               <a:rPr lang="en-US" smtClean="0"/>
-              <a:t>2/13/23</a:t>
+              <a:t>2/14/23</a:t>
             </a:fld>
             <a:endParaRPr lang="en-US"/>
           </a:p>
@@ -3177,7 +3177,7 @@
           <a:p>
             <a:fld id="{D3A28AA4-801E-B147-9E5C-6E6DBA6E23D1}" type="datetimeFigureOut">
               <a:rPr lang="en-US" smtClean="0"/>
-              <a:t>2/13/23</a:t>
+              <a:t>2/14/23</a:t>
             </a:fld>
             <a:endParaRPr lang="en-US"/>
           </a:p>
@@ -8450,82 +8450,6 @@
           <a:chExt cx="0" cy="0"/>
         </a:xfrm>
       </p:grpSpPr>
-      <p:sp>
-        <p:nvSpPr>
-          <p:cNvPr id="17" name="TextBox 16">
-            <a:extLst>
-              <a:ext uri="{FF2B5EF4-FFF2-40B4-BE49-F238E27FC236}">
-                <a16:creationId xmlns:a16="http://schemas.microsoft.com/office/drawing/2014/main" id="{43B64199-3D23-58AE-E069-F2069310001E}"/>
-              </a:ext>
-            </a:extLst>
-          </p:cNvPr>
-          <p:cNvSpPr txBox="1"/>
-          <p:nvPr/>
-        </p:nvSpPr>
-        <p:spPr>
-          <a:xfrm>
-            <a:off x="16581801" y="11674361"/>
-            <a:ext cx="885179" cy="553998"/>
-          </a:xfrm>
-          <a:prstGeom prst="rect">
-            <a:avLst/>
-          </a:prstGeom>
-          <a:noFill/>
-        </p:spPr>
-        <p:txBody>
-          <a:bodyPr wrap="none" rtlCol="0">
-            <a:spAutoFit/>
-          </a:bodyPr>
-          <a:lstStyle/>
-          <a:p>
-            <a:r>
-              <a:rPr lang="en-US" sz="3000" b="1" dirty="0">
-                <a:latin typeface="Times New Roman" panose="02020603050405020304" pitchFamily="18" charset="0"/>
-                <a:cs typeface="Times New Roman" panose="02020603050405020304" pitchFamily="18" charset="0"/>
-              </a:rPr>
-              <a:t>&lt;0.2</a:t>
-            </a:r>
-          </a:p>
-        </p:txBody>
-      </p:sp>
-      <p:sp>
-        <p:nvSpPr>
-          <p:cNvPr id="18" name="TextBox 17">
-            <a:extLst>
-              <a:ext uri="{FF2B5EF4-FFF2-40B4-BE49-F238E27FC236}">
-                <a16:creationId xmlns:a16="http://schemas.microsoft.com/office/drawing/2014/main" id="{2B1FC7C2-C68C-BA39-1068-10437B04D4B0}"/>
-              </a:ext>
-            </a:extLst>
-          </p:cNvPr>
-          <p:cNvSpPr txBox="1"/>
-          <p:nvPr/>
-        </p:nvSpPr>
-        <p:spPr>
-          <a:xfrm>
-            <a:off x="9849892" y="11674361"/>
-            <a:ext cx="1013419" cy="553998"/>
-          </a:xfrm>
-          <a:prstGeom prst="rect">
-            <a:avLst/>
-          </a:prstGeom>
-          <a:noFill/>
-        </p:spPr>
-        <p:txBody>
-          <a:bodyPr wrap="none" rtlCol="0">
-            <a:spAutoFit/>
-          </a:bodyPr>
-          <a:lstStyle/>
-          <a:p>
-            <a:r>
-              <a:rPr lang="en-US" sz="3000" b="1" dirty="0">
-                <a:latin typeface="Times New Roman" panose="02020603050405020304" pitchFamily="18" charset="0"/>
-                <a:cs typeface="Times New Roman" panose="02020603050405020304" pitchFamily="18" charset="0"/>
-              </a:rPr>
-              <a:t>&lt;-0.2</a:t>
-            </a:r>
-          </a:p>
-        </p:txBody>
-      </p:sp>
       <p:cxnSp>
         <p:nvCxnSpPr>
           <p:cNvPr id="179" name="Straight Arrow Connector 178">
@@ -8550,7 +8474,7 @@
           <a:prstGeom prst="straightConnector1">
             <a:avLst/>
           </a:prstGeom>
-          <a:ln w="169926">
+          <a:ln w="169799">
             <a:solidFill>
               <a:schemeClr val="accent1">
                 <a:lumMod val="75000"/>
@@ -8574,588 +8498,6 @@
           </a:fontRef>
         </p:style>
       </p:cxnSp>
-      <p:cxnSp>
-        <p:nvCxnSpPr>
-          <p:cNvPr id="304" name="Straight Connector 303">
-            <a:extLst>
-              <a:ext uri="{FF2B5EF4-FFF2-40B4-BE49-F238E27FC236}">
-                <a16:creationId xmlns:a16="http://schemas.microsoft.com/office/drawing/2014/main" id="{BCE3271A-5208-23E5-DCE3-3408CD77B59D}"/>
-              </a:ext>
-            </a:extLst>
-          </p:cNvPr>
-          <p:cNvCxnSpPr>
-            <a:cxnSpLocks/>
-          </p:cNvCxnSpPr>
-          <p:nvPr/>
-        </p:nvCxnSpPr>
-        <p:spPr>
-          <a:xfrm>
-            <a:off x="11810799" y="11674361"/>
-            <a:ext cx="951115" cy="0"/>
-          </a:xfrm>
-          <a:prstGeom prst="line">
-            <a:avLst/>
-          </a:prstGeom>
-          <a:ln w="95250">
-            <a:solidFill>
-              <a:srgbClr val="C00000"/>
-            </a:solidFill>
-          </a:ln>
-        </p:spPr>
-        <p:style>
-          <a:lnRef idx="1">
-            <a:schemeClr val="accent1"/>
-          </a:lnRef>
-          <a:fillRef idx="0">
-            <a:schemeClr val="accent1"/>
-          </a:fillRef>
-          <a:effectRef idx="0">
-            <a:schemeClr val="accent1"/>
-          </a:effectRef>
-          <a:fontRef idx="minor">
-            <a:schemeClr val="tx1"/>
-          </a:fontRef>
-        </p:style>
-      </p:cxnSp>
-      <p:cxnSp>
-        <p:nvCxnSpPr>
-          <p:cNvPr id="307" name="Straight Connector 306">
-            <a:extLst>
-              <a:ext uri="{FF2B5EF4-FFF2-40B4-BE49-F238E27FC236}">
-                <a16:creationId xmlns:a16="http://schemas.microsoft.com/office/drawing/2014/main" id="{EA94A156-E109-774D-5FDF-8043EC42050A}"/>
-              </a:ext>
-            </a:extLst>
-          </p:cNvPr>
-          <p:cNvCxnSpPr>
-            <a:cxnSpLocks/>
-          </p:cNvCxnSpPr>
-          <p:nvPr/>
-        </p:nvCxnSpPr>
-        <p:spPr>
-          <a:xfrm>
-            <a:off x="10877727" y="11695382"/>
-            <a:ext cx="951115" cy="0"/>
-          </a:xfrm>
-          <a:prstGeom prst="line">
-            <a:avLst/>
-          </a:prstGeom>
-          <a:ln w="47625">
-            <a:solidFill>
-              <a:srgbClr val="C00000"/>
-            </a:solidFill>
-          </a:ln>
-        </p:spPr>
-        <p:style>
-          <a:lnRef idx="1">
-            <a:schemeClr val="accent1"/>
-          </a:lnRef>
-          <a:fillRef idx="0">
-            <a:schemeClr val="accent1"/>
-          </a:fillRef>
-          <a:effectRef idx="0">
-            <a:schemeClr val="accent1"/>
-          </a:effectRef>
-          <a:fontRef idx="minor">
-            <a:schemeClr val="tx1"/>
-          </a:fontRef>
-        </p:style>
-      </p:cxnSp>
-      <p:cxnSp>
-        <p:nvCxnSpPr>
-          <p:cNvPr id="309" name="Straight Connector 308">
-            <a:extLst>
-              <a:ext uri="{FF2B5EF4-FFF2-40B4-BE49-F238E27FC236}">
-                <a16:creationId xmlns:a16="http://schemas.microsoft.com/office/drawing/2014/main" id="{01368AB0-6FEC-4E40-EF20-C123FBCFFF29}"/>
-              </a:ext>
-            </a:extLst>
-          </p:cNvPr>
-          <p:cNvCxnSpPr>
-            <a:cxnSpLocks/>
-          </p:cNvCxnSpPr>
-          <p:nvPr/>
-        </p:nvCxnSpPr>
-        <p:spPr>
-          <a:xfrm>
-            <a:off x="14650162" y="11677536"/>
-            <a:ext cx="951115" cy="0"/>
-          </a:xfrm>
-          <a:prstGeom prst="line">
-            <a:avLst/>
-          </a:prstGeom>
-          <a:ln w="95250">
-            <a:solidFill>
-              <a:schemeClr val="accent1">
-                <a:lumMod val="75000"/>
-              </a:schemeClr>
-            </a:solidFill>
-          </a:ln>
-        </p:spPr>
-        <p:style>
-          <a:lnRef idx="1">
-            <a:schemeClr val="accent1"/>
-          </a:lnRef>
-          <a:fillRef idx="0">
-            <a:schemeClr val="accent1"/>
-          </a:fillRef>
-          <a:effectRef idx="0">
-            <a:schemeClr val="accent1"/>
-          </a:effectRef>
-          <a:fontRef idx="minor">
-            <a:schemeClr val="tx1"/>
-          </a:fontRef>
-        </p:style>
-      </p:cxnSp>
-      <p:cxnSp>
-        <p:nvCxnSpPr>
-          <p:cNvPr id="310" name="Straight Connector 309">
-            <a:extLst>
-              <a:ext uri="{FF2B5EF4-FFF2-40B4-BE49-F238E27FC236}">
-                <a16:creationId xmlns:a16="http://schemas.microsoft.com/office/drawing/2014/main" id="{5459AFEF-BF27-F9DA-C489-E82435FED1A2}"/>
-              </a:ext>
-            </a:extLst>
-          </p:cNvPr>
-          <p:cNvCxnSpPr>
-            <a:cxnSpLocks/>
-          </p:cNvCxnSpPr>
-          <p:nvPr/>
-        </p:nvCxnSpPr>
-        <p:spPr>
-          <a:xfrm>
-            <a:off x="15597719" y="11699536"/>
-            <a:ext cx="951115" cy="0"/>
-          </a:xfrm>
-          <a:prstGeom prst="line">
-            <a:avLst/>
-          </a:prstGeom>
-          <a:ln w="47625">
-            <a:solidFill>
-              <a:schemeClr val="accent1">
-                <a:lumMod val="75000"/>
-              </a:schemeClr>
-            </a:solidFill>
-          </a:ln>
-        </p:spPr>
-        <p:style>
-          <a:lnRef idx="1">
-            <a:schemeClr val="accent1"/>
-          </a:lnRef>
-          <a:fillRef idx="0">
-            <a:schemeClr val="accent1"/>
-          </a:fillRef>
-          <a:effectRef idx="0">
-            <a:schemeClr val="accent1"/>
-          </a:effectRef>
-          <a:fontRef idx="minor">
-            <a:schemeClr val="tx1"/>
-          </a:fontRef>
-        </p:style>
-      </p:cxnSp>
-      <p:sp>
-        <p:nvSpPr>
-          <p:cNvPr id="311" name="TextBox 310">
-            <a:extLst>
-              <a:ext uri="{FF2B5EF4-FFF2-40B4-BE49-F238E27FC236}">
-                <a16:creationId xmlns:a16="http://schemas.microsoft.com/office/drawing/2014/main" id="{405F3348-AF82-CF3A-4B6F-13F81E3AE869}"/>
-              </a:ext>
-            </a:extLst>
-          </p:cNvPr>
-          <p:cNvSpPr txBox="1"/>
-          <p:nvPr/>
-        </p:nvSpPr>
-        <p:spPr>
-          <a:xfrm>
-            <a:off x="12834232" y="11682129"/>
-            <a:ext cx="790601" cy="553998"/>
-          </a:xfrm>
-          <a:prstGeom prst="rect">
-            <a:avLst/>
-          </a:prstGeom>
-          <a:noFill/>
-        </p:spPr>
-        <p:txBody>
-          <a:bodyPr wrap="none" rtlCol="0">
-            <a:spAutoFit/>
-          </a:bodyPr>
-          <a:lstStyle/>
-          <a:p>
-            <a:r>
-              <a:rPr lang="en-US" sz="3000" b="1" dirty="0">
-                <a:latin typeface="Times New Roman" panose="02020603050405020304" pitchFamily="18" charset="0"/>
-                <a:cs typeface="Times New Roman" panose="02020603050405020304" pitchFamily="18" charset="0"/>
-              </a:rPr>
-              <a:t>-0.8</a:t>
-            </a:r>
-          </a:p>
-        </p:txBody>
-      </p:sp>
-      <p:sp>
-        <p:nvSpPr>
-          <p:cNvPr id="312" name="TextBox 311">
-            <a:extLst>
-              <a:ext uri="{FF2B5EF4-FFF2-40B4-BE49-F238E27FC236}">
-                <a16:creationId xmlns:a16="http://schemas.microsoft.com/office/drawing/2014/main" id="{03905A61-A4AE-A9C3-7600-29CDFA24E9CE}"/>
-              </a:ext>
-            </a:extLst>
-          </p:cNvPr>
-          <p:cNvSpPr txBox="1"/>
-          <p:nvPr/>
-        </p:nvSpPr>
-        <p:spPr>
-          <a:xfrm>
-            <a:off x="13840682" y="11689171"/>
-            <a:ext cx="673582" cy="553998"/>
-          </a:xfrm>
-          <a:prstGeom prst="rect">
-            <a:avLst/>
-          </a:prstGeom>
-          <a:noFill/>
-        </p:spPr>
-        <p:txBody>
-          <a:bodyPr wrap="none" rtlCol="0">
-            <a:spAutoFit/>
-          </a:bodyPr>
-          <a:lstStyle/>
-          <a:p>
-            <a:r>
-              <a:rPr lang="en-US" sz="3000" b="1" dirty="0">
-                <a:latin typeface="Times New Roman" panose="02020603050405020304" pitchFamily="18" charset="0"/>
-                <a:cs typeface="Times New Roman" panose="02020603050405020304" pitchFamily="18" charset="0"/>
-              </a:rPr>
-              <a:t>0.8</a:t>
-            </a:r>
-          </a:p>
-        </p:txBody>
-      </p:sp>
-      <p:sp>
-        <p:nvSpPr>
-          <p:cNvPr id="313" name="TextBox 312">
-            <a:extLst>
-              <a:ext uri="{FF2B5EF4-FFF2-40B4-BE49-F238E27FC236}">
-                <a16:creationId xmlns:a16="http://schemas.microsoft.com/office/drawing/2014/main" id="{A5185E2D-DB4F-1D37-75C3-0550DED89ED4}"/>
-              </a:ext>
-            </a:extLst>
-          </p:cNvPr>
-          <p:cNvSpPr txBox="1"/>
-          <p:nvPr/>
-        </p:nvSpPr>
-        <p:spPr>
-          <a:xfrm>
-            <a:off x="11891055" y="11689171"/>
-            <a:ext cx="790601" cy="553998"/>
-          </a:xfrm>
-          <a:prstGeom prst="rect">
-            <a:avLst/>
-          </a:prstGeom>
-          <a:noFill/>
-        </p:spPr>
-        <p:txBody>
-          <a:bodyPr wrap="none" rtlCol="0">
-            <a:spAutoFit/>
-          </a:bodyPr>
-          <a:lstStyle/>
-          <a:p>
-            <a:r>
-              <a:rPr lang="en-US" sz="3000" b="1" dirty="0">
-                <a:latin typeface="Times New Roman" panose="02020603050405020304" pitchFamily="18" charset="0"/>
-                <a:cs typeface="Times New Roman" panose="02020603050405020304" pitchFamily="18" charset="0"/>
-              </a:rPr>
-              <a:t>-0.4</a:t>
-            </a:r>
-          </a:p>
-        </p:txBody>
-      </p:sp>
-      <p:sp>
-        <p:nvSpPr>
-          <p:cNvPr id="314" name="TextBox 313">
-            <a:extLst>
-              <a:ext uri="{FF2B5EF4-FFF2-40B4-BE49-F238E27FC236}">
-                <a16:creationId xmlns:a16="http://schemas.microsoft.com/office/drawing/2014/main" id="{336C6BA1-652E-4332-3874-0C406AC32821}"/>
-              </a:ext>
-            </a:extLst>
-          </p:cNvPr>
-          <p:cNvSpPr txBox="1"/>
-          <p:nvPr/>
-        </p:nvSpPr>
-        <p:spPr>
-          <a:xfrm>
-            <a:off x="14783859" y="11692624"/>
-            <a:ext cx="673582" cy="553998"/>
-          </a:xfrm>
-          <a:prstGeom prst="rect">
-            <a:avLst/>
-          </a:prstGeom>
-          <a:noFill/>
-        </p:spPr>
-        <p:txBody>
-          <a:bodyPr wrap="none" rtlCol="0">
-            <a:spAutoFit/>
-          </a:bodyPr>
-          <a:lstStyle/>
-          <a:p>
-            <a:r>
-              <a:rPr lang="en-US" sz="3000" b="1" dirty="0">
-                <a:latin typeface="Times New Roman" panose="02020603050405020304" pitchFamily="18" charset="0"/>
-                <a:cs typeface="Times New Roman" panose="02020603050405020304" pitchFamily="18" charset="0"/>
-              </a:rPr>
-              <a:t>0.4</a:t>
-            </a:r>
-          </a:p>
-        </p:txBody>
-      </p:sp>
-      <p:sp>
-        <p:nvSpPr>
-          <p:cNvPr id="315" name="TextBox 314">
-            <a:extLst>
-              <a:ext uri="{FF2B5EF4-FFF2-40B4-BE49-F238E27FC236}">
-                <a16:creationId xmlns:a16="http://schemas.microsoft.com/office/drawing/2014/main" id="{0A735BE5-8F12-20AC-B7DA-99178782D0A5}"/>
-              </a:ext>
-            </a:extLst>
-          </p:cNvPr>
-          <p:cNvSpPr txBox="1"/>
-          <p:nvPr/>
-        </p:nvSpPr>
-        <p:spPr>
-          <a:xfrm>
-            <a:off x="15740043" y="11674800"/>
-            <a:ext cx="673582" cy="553998"/>
-          </a:xfrm>
-          <a:prstGeom prst="rect">
-            <a:avLst/>
-          </a:prstGeom>
-          <a:noFill/>
-        </p:spPr>
-        <p:txBody>
-          <a:bodyPr wrap="none" rtlCol="0">
-            <a:spAutoFit/>
-          </a:bodyPr>
-          <a:lstStyle/>
-          <a:p>
-            <a:r>
-              <a:rPr lang="en-US" sz="3000" b="1" dirty="0">
-                <a:latin typeface="Times New Roman" panose="02020603050405020304" pitchFamily="18" charset="0"/>
-                <a:cs typeface="Times New Roman" panose="02020603050405020304" pitchFamily="18" charset="0"/>
-              </a:rPr>
-              <a:t>0.2</a:t>
-            </a:r>
-          </a:p>
-        </p:txBody>
-      </p:sp>
-      <p:sp>
-        <p:nvSpPr>
-          <p:cNvPr id="317" name="TextBox 316">
-            <a:extLst>
-              <a:ext uri="{FF2B5EF4-FFF2-40B4-BE49-F238E27FC236}">
-                <a16:creationId xmlns:a16="http://schemas.microsoft.com/office/drawing/2014/main" id="{E5B0E893-4292-A9DA-E31F-4F434D6BA189}"/>
-              </a:ext>
-            </a:extLst>
-          </p:cNvPr>
-          <p:cNvSpPr txBox="1"/>
-          <p:nvPr/>
-        </p:nvSpPr>
-        <p:spPr>
-          <a:xfrm>
-            <a:off x="10994295" y="11694225"/>
-            <a:ext cx="790601" cy="553998"/>
-          </a:xfrm>
-          <a:prstGeom prst="rect">
-            <a:avLst/>
-          </a:prstGeom>
-          <a:noFill/>
-        </p:spPr>
-        <p:txBody>
-          <a:bodyPr wrap="none" rtlCol="0">
-            <a:spAutoFit/>
-          </a:bodyPr>
-          <a:lstStyle/>
-          <a:p>
-            <a:r>
-              <a:rPr lang="en-US" sz="3000" b="1" dirty="0">
-                <a:latin typeface="Times New Roman" panose="02020603050405020304" pitchFamily="18" charset="0"/>
-                <a:cs typeface="Times New Roman" panose="02020603050405020304" pitchFamily="18" charset="0"/>
-              </a:rPr>
-              <a:t>-0.2</a:t>
-            </a:r>
-          </a:p>
-        </p:txBody>
-      </p:sp>
-      <p:sp>
-        <p:nvSpPr>
-          <p:cNvPr id="318" name="TextBox 317">
-            <a:extLst>
-              <a:ext uri="{FF2B5EF4-FFF2-40B4-BE49-F238E27FC236}">
-                <a16:creationId xmlns:a16="http://schemas.microsoft.com/office/drawing/2014/main" id="{381CB219-7134-E7DD-E806-9373BDC6B8E3}"/>
-              </a:ext>
-            </a:extLst>
-          </p:cNvPr>
-          <p:cNvSpPr txBox="1"/>
-          <p:nvPr/>
-        </p:nvSpPr>
-        <p:spPr>
-          <a:xfrm>
-            <a:off x="11562548" y="12565702"/>
-            <a:ext cx="4278735" cy="553998"/>
-          </a:xfrm>
-          <a:prstGeom prst="rect">
-            <a:avLst/>
-          </a:prstGeom>
-          <a:noFill/>
-        </p:spPr>
-        <p:txBody>
-          <a:bodyPr wrap="none" rtlCol="0">
-            <a:spAutoFit/>
-          </a:bodyPr>
-          <a:lstStyle/>
-          <a:p>
-            <a:r>
-              <a:rPr lang="en-US" sz="3000" b="1" dirty="0">
-                <a:latin typeface="Times New Roman" panose="02020603050405020304" pitchFamily="18" charset="0"/>
-                <a:cs typeface="Times New Roman" panose="02020603050405020304" pitchFamily="18" charset="0"/>
-              </a:rPr>
-              <a:t>Standardized Coefficient</a:t>
-            </a:r>
-          </a:p>
-        </p:txBody>
-      </p:sp>
-      <p:cxnSp>
-        <p:nvCxnSpPr>
-          <p:cNvPr id="306" name="Straight Connector 305">
-            <a:extLst>
-              <a:ext uri="{FF2B5EF4-FFF2-40B4-BE49-F238E27FC236}">
-                <a16:creationId xmlns:a16="http://schemas.microsoft.com/office/drawing/2014/main" id="{D1A9DA54-E777-BA6D-9268-2E5E984EB1E2}"/>
-              </a:ext>
-            </a:extLst>
-          </p:cNvPr>
-          <p:cNvCxnSpPr>
-            <a:cxnSpLocks/>
-          </p:cNvCxnSpPr>
-          <p:nvPr/>
-        </p:nvCxnSpPr>
-        <p:spPr>
-          <a:xfrm>
-            <a:off x="12753976" y="11629144"/>
-            <a:ext cx="951115" cy="0"/>
-          </a:xfrm>
-          <a:prstGeom prst="line">
-            <a:avLst/>
-          </a:prstGeom>
-          <a:ln w="190500">
-            <a:solidFill>
-              <a:srgbClr val="C00000"/>
-            </a:solidFill>
-          </a:ln>
-        </p:spPr>
-        <p:style>
-          <a:lnRef idx="1">
-            <a:schemeClr val="accent1"/>
-          </a:lnRef>
-          <a:fillRef idx="0">
-            <a:schemeClr val="accent1"/>
-          </a:fillRef>
-          <a:effectRef idx="0">
-            <a:schemeClr val="accent1"/>
-          </a:effectRef>
-          <a:fontRef idx="minor">
-            <a:schemeClr val="tx1"/>
-          </a:fontRef>
-        </p:style>
-      </p:cxnSp>
-      <p:cxnSp>
-        <p:nvCxnSpPr>
-          <p:cNvPr id="308" name="Straight Connector 307">
-            <a:extLst>
-              <a:ext uri="{FF2B5EF4-FFF2-40B4-BE49-F238E27FC236}">
-                <a16:creationId xmlns:a16="http://schemas.microsoft.com/office/drawing/2014/main" id="{58FCCEEE-319F-0DEB-6973-1CFE1856B2B0}"/>
-              </a:ext>
-            </a:extLst>
-          </p:cNvPr>
-          <p:cNvCxnSpPr>
-            <a:cxnSpLocks/>
-          </p:cNvCxnSpPr>
-          <p:nvPr/>
-        </p:nvCxnSpPr>
-        <p:spPr>
-          <a:xfrm>
-            <a:off x="13701916" y="11628152"/>
-            <a:ext cx="951115" cy="0"/>
-          </a:xfrm>
-          <a:prstGeom prst="line">
-            <a:avLst/>
-          </a:prstGeom>
-          <a:ln w="190500">
-            <a:solidFill>
-              <a:schemeClr val="accent1">
-                <a:lumMod val="75000"/>
-              </a:schemeClr>
-            </a:solidFill>
-          </a:ln>
-        </p:spPr>
-        <p:style>
-          <a:lnRef idx="1">
-            <a:schemeClr val="accent1"/>
-          </a:lnRef>
-          <a:fillRef idx="0">
-            <a:schemeClr val="accent1"/>
-          </a:fillRef>
-          <a:effectRef idx="0">
-            <a:schemeClr val="accent1"/>
-          </a:effectRef>
-          <a:fontRef idx="minor">
-            <a:schemeClr val="tx1"/>
-          </a:fontRef>
-        </p:style>
-      </p:cxnSp>
-      <p:sp>
-        <p:nvSpPr>
-          <p:cNvPr id="2" name="Rectangle 1">
-            <a:extLst>
-              <a:ext uri="{FF2B5EF4-FFF2-40B4-BE49-F238E27FC236}">
-                <a16:creationId xmlns:a16="http://schemas.microsoft.com/office/drawing/2014/main" id="{0505CCCA-23EC-02F8-8E02-93D20241DF45}"/>
-              </a:ext>
-            </a:extLst>
-          </p:cNvPr>
-          <p:cNvSpPr/>
-          <p:nvPr/>
-        </p:nvSpPr>
-        <p:spPr>
-          <a:xfrm>
-            <a:off x="10840085" y="11723601"/>
-            <a:ext cx="5751830" cy="56852"/>
-          </a:xfrm>
-          <a:prstGeom prst="rect">
-            <a:avLst/>
-          </a:prstGeom>
-          <a:solidFill>
-            <a:schemeClr val="bg1"/>
-          </a:solidFill>
-          <a:ln>
-            <a:noFill/>
-          </a:ln>
-        </p:spPr>
-        <p:style>
-          <a:lnRef idx="2">
-            <a:schemeClr val="accent1">
-              <a:shade val="50000"/>
-            </a:schemeClr>
-          </a:lnRef>
-          <a:fillRef idx="1">
-            <a:schemeClr val="accent1"/>
-          </a:fillRef>
-          <a:effectRef idx="0">
-            <a:schemeClr val="accent1"/>
-          </a:effectRef>
-          <a:fontRef idx="minor">
-            <a:schemeClr val="lt1"/>
-          </a:fontRef>
-        </p:style>
-        <p:txBody>
-          <a:bodyPr rtlCol="0" anchor="ctr"/>
-          <a:lstStyle/>
-          <a:p>
-            <a:pPr algn="ctr"/>
-            <a:endParaRPr lang="en-US"/>
-          </a:p>
-        </p:txBody>
-      </p:sp>
       <p:sp>
         <p:nvSpPr>
           <p:cNvPr id="7" name="TextBox 6">
@@ -9303,7 +8645,7 @@
                 <a:latin typeface="Times New Roman" panose="02020603050405020304" pitchFamily="18" charset="0"/>
                 <a:cs typeface="Times New Roman" panose="02020603050405020304" pitchFamily="18" charset="0"/>
               </a:rPr>
-              <a:t>57%</a:t>
+              <a:t>56%</a:t>
             </a:r>
           </a:p>
         </p:txBody>
@@ -9421,7 +8763,7 @@
           <a:prstGeom prst="straightConnector1">
             <a:avLst/>
           </a:prstGeom>
-          <a:ln w="185166">
+          <a:ln w="185420">
             <a:solidFill>
               <a:schemeClr val="accent1">
                 <a:lumMod val="75000"/>
@@ -9469,7 +8811,7 @@
           <a:prstGeom prst="straightConnector1">
             <a:avLst/>
           </a:prstGeom>
-          <a:ln w="59563">
+          <a:ln w="53467">
             <a:solidFill>
               <a:srgbClr val="C00000"/>
             </a:solidFill>
@@ -10439,202 +9781,881 @@
           </a:p>
         </p:txBody>
       </p:sp>
-      <p:sp>
-        <p:nvSpPr>
-          <p:cNvPr id="4" name="Rectangle 3">
+      <p:grpSp>
+        <p:nvGrpSpPr>
+          <p:cNvPr id="51" name="Group 50">
             <a:extLst>
               <a:ext uri="{FF2B5EF4-FFF2-40B4-BE49-F238E27FC236}">
-                <a16:creationId xmlns:a16="http://schemas.microsoft.com/office/drawing/2014/main" id="{02C00127-0A1A-2C99-C54F-607878A28FA7}"/>
+                <a16:creationId xmlns:a16="http://schemas.microsoft.com/office/drawing/2014/main" id="{E2BBCE24-12CA-4B3B-CF65-CA006F7B2363}"/>
               </a:ext>
             </a:extLst>
           </p:cNvPr>
-          <p:cNvSpPr/>
+          <p:cNvGrpSpPr/>
           <p:nvPr/>
-        </p:nvSpPr>
-        <p:spPr>
+        </p:nvGrpSpPr>
+        <p:grpSpPr>
           <a:xfrm>
-            <a:off x="10137058" y="11719001"/>
-            <a:ext cx="7010400" cy="45719"/>
-          </a:xfrm>
-          <a:prstGeom prst="rect">
-            <a:avLst/>
-          </a:prstGeom>
-          <a:solidFill>
-            <a:schemeClr val="bg1"/>
-          </a:solidFill>
-          <a:ln>
+            <a:off x="9065503" y="13742842"/>
+            <a:ext cx="7650057" cy="1604907"/>
+            <a:chOff x="9849892" y="14833724"/>
+            <a:chExt cx="7650057" cy="1604907"/>
+          </a:xfrm>
+        </p:grpSpPr>
+        <p:sp>
+          <p:nvSpPr>
+            <p:cNvPr id="17" name="TextBox 16">
+              <a:extLst>
+                <a:ext uri="{FF2B5EF4-FFF2-40B4-BE49-F238E27FC236}">
+                  <a16:creationId xmlns:a16="http://schemas.microsoft.com/office/drawing/2014/main" id="{43B64199-3D23-58AE-E069-F2069310001E}"/>
+                </a:ext>
+              </a:extLst>
+            </p:cNvPr>
+            <p:cNvSpPr txBox="1"/>
+            <p:nvPr/>
+          </p:nvSpPr>
+          <p:spPr>
+            <a:xfrm>
+              <a:off x="16581801" y="14993292"/>
+              <a:ext cx="885179" cy="553998"/>
+            </a:xfrm>
+            <a:prstGeom prst="rect">
+              <a:avLst/>
+            </a:prstGeom>
             <a:noFill/>
-          </a:ln>
-        </p:spPr>
-        <p:style>
-          <a:lnRef idx="2">
-            <a:schemeClr val="accent1">
-              <a:shade val="50000"/>
-            </a:schemeClr>
-          </a:lnRef>
-          <a:fillRef idx="1">
-            <a:schemeClr val="accent1"/>
-          </a:fillRef>
-          <a:effectRef idx="0">
-            <a:schemeClr val="accent1"/>
-          </a:effectRef>
-          <a:fontRef idx="minor">
-            <a:schemeClr val="lt1"/>
-          </a:fontRef>
-        </p:style>
-        <p:txBody>
-          <a:bodyPr rtlCol="0" anchor="ctr"/>
-          <a:lstStyle/>
-          <a:p>
-            <a:pPr algn="ctr"/>
-            <a:endParaRPr lang="en-US"/>
-          </a:p>
-        </p:txBody>
-      </p:sp>
-      <p:sp>
-        <p:nvSpPr>
-          <p:cNvPr id="5" name="Rectangle 4">
-            <a:extLst>
-              <a:ext uri="{FF2B5EF4-FFF2-40B4-BE49-F238E27FC236}">
-                <a16:creationId xmlns:a16="http://schemas.microsoft.com/office/drawing/2014/main" id="{AEA1F572-8465-B16E-D0EB-AE36EA9F14C4}"/>
-              </a:ext>
-            </a:extLst>
-          </p:cNvPr>
-          <p:cNvSpPr/>
-          <p:nvPr/>
-        </p:nvSpPr>
-        <p:spPr>
-          <a:xfrm>
-            <a:off x="10335482" y="11514793"/>
-            <a:ext cx="7010400" cy="45719"/>
-          </a:xfrm>
-          <a:prstGeom prst="rect">
-            <a:avLst/>
-          </a:prstGeom>
-          <a:solidFill>
-            <a:schemeClr val="bg1"/>
-          </a:solidFill>
-          <a:ln>
+          </p:spPr>
+          <p:txBody>
+            <a:bodyPr wrap="none" rtlCol="0">
+              <a:spAutoFit/>
+            </a:bodyPr>
+            <a:lstStyle/>
+            <a:p>
+              <a:r>
+                <a:rPr lang="en-US" sz="3000" b="1" dirty="0">
+                  <a:latin typeface="Times New Roman" panose="02020603050405020304" pitchFamily="18" charset="0"/>
+                  <a:cs typeface="Times New Roman" panose="02020603050405020304" pitchFamily="18" charset="0"/>
+                </a:rPr>
+                <a:t>&lt;0.2</a:t>
+              </a:r>
+            </a:p>
+          </p:txBody>
+        </p:sp>
+        <p:sp>
+          <p:nvSpPr>
+            <p:cNvPr id="18" name="TextBox 17">
+              <a:extLst>
+                <a:ext uri="{FF2B5EF4-FFF2-40B4-BE49-F238E27FC236}">
+                  <a16:creationId xmlns:a16="http://schemas.microsoft.com/office/drawing/2014/main" id="{2B1FC7C2-C68C-BA39-1068-10437B04D4B0}"/>
+                </a:ext>
+              </a:extLst>
+            </p:cNvPr>
+            <p:cNvSpPr txBox="1"/>
+            <p:nvPr/>
+          </p:nvSpPr>
+          <p:spPr>
+            <a:xfrm>
+              <a:off x="9849892" y="14993292"/>
+              <a:ext cx="1013419" cy="553998"/>
+            </a:xfrm>
+            <a:prstGeom prst="rect">
+              <a:avLst/>
+            </a:prstGeom>
             <a:noFill/>
-          </a:ln>
-        </p:spPr>
-        <p:style>
-          <a:lnRef idx="2">
-            <a:schemeClr val="accent1">
-              <a:shade val="50000"/>
-            </a:schemeClr>
-          </a:lnRef>
-          <a:fillRef idx="1">
-            <a:schemeClr val="accent1"/>
-          </a:fillRef>
-          <a:effectRef idx="0">
-            <a:schemeClr val="accent1"/>
-          </a:effectRef>
-          <a:fontRef idx="minor">
-            <a:schemeClr val="lt1"/>
-          </a:fontRef>
-        </p:style>
-        <p:txBody>
-          <a:bodyPr rtlCol="0" anchor="ctr"/>
-          <a:lstStyle/>
-          <a:p>
-            <a:pPr algn="ctr"/>
-            <a:endParaRPr lang="en-US"/>
-          </a:p>
-        </p:txBody>
-      </p:sp>
-      <p:cxnSp>
-        <p:nvCxnSpPr>
-          <p:cNvPr id="12" name="Straight Connector 11">
-            <a:extLst>
-              <a:ext uri="{FF2B5EF4-FFF2-40B4-BE49-F238E27FC236}">
-                <a16:creationId xmlns:a16="http://schemas.microsoft.com/office/drawing/2014/main" id="{AA90B932-5758-80DF-51AD-81085E11F480}"/>
-              </a:ext>
-            </a:extLst>
-          </p:cNvPr>
-          <p:cNvCxnSpPr>
-            <a:cxnSpLocks/>
-          </p:cNvCxnSpPr>
-          <p:nvPr/>
-        </p:nvCxnSpPr>
-        <p:spPr>
-          <a:xfrm>
-            <a:off x="9920571" y="11709061"/>
-            <a:ext cx="951115" cy="0"/>
-          </a:xfrm>
-          <a:prstGeom prst="line">
-            <a:avLst/>
-          </a:prstGeom>
-          <a:ln w="12700">
+          </p:spPr>
+          <p:txBody>
+            <a:bodyPr wrap="none" rtlCol="0">
+              <a:spAutoFit/>
+            </a:bodyPr>
+            <a:lstStyle/>
+            <a:p>
+              <a:r>
+                <a:rPr lang="en-US" sz="3000" b="1" dirty="0">
+                  <a:latin typeface="Times New Roman" panose="02020603050405020304" pitchFamily="18" charset="0"/>
+                  <a:cs typeface="Times New Roman" panose="02020603050405020304" pitchFamily="18" charset="0"/>
+                </a:rPr>
+                <a:t>&lt;-0.2</a:t>
+              </a:r>
+            </a:p>
+          </p:txBody>
+        </p:sp>
+        <p:cxnSp>
+          <p:nvCxnSpPr>
+            <p:cNvPr id="304" name="Straight Connector 303">
+              <a:extLst>
+                <a:ext uri="{FF2B5EF4-FFF2-40B4-BE49-F238E27FC236}">
+                  <a16:creationId xmlns:a16="http://schemas.microsoft.com/office/drawing/2014/main" id="{BCE3271A-5208-23E5-DCE3-3408CD77B59D}"/>
+                </a:ext>
+              </a:extLst>
+            </p:cNvPr>
+            <p:cNvCxnSpPr>
+              <a:cxnSpLocks/>
+            </p:cNvCxnSpPr>
+            <p:nvPr/>
+          </p:nvCxnSpPr>
+          <p:spPr>
+            <a:xfrm>
+              <a:off x="11810799" y="14993292"/>
+              <a:ext cx="951115" cy="0"/>
+            </a:xfrm>
+            <a:prstGeom prst="line">
+              <a:avLst/>
+            </a:prstGeom>
+            <a:ln w="95250">
+              <a:solidFill>
+                <a:srgbClr val="C00000"/>
+              </a:solidFill>
+            </a:ln>
+          </p:spPr>
+          <p:style>
+            <a:lnRef idx="1">
+              <a:schemeClr val="accent1"/>
+            </a:lnRef>
+            <a:fillRef idx="0">
+              <a:schemeClr val="accent1"/>
+            </a:fillRef>
+            <a:effectRef idx="0">
+              <a:schemeClr val="accent1"/>
+            </a:effectRef>
+            <a:fontRef idx="minor">
+              <a:schemeClr val="tx1"/>
+            </a:fontRef>
+          </p:style>
+        </p:cxnSp>
+        <p:cxnSp>
+          <p:nvCxnSpPr>
+            <p:cNvPr id="307" name="Straight Connector 306">
+              <a:extLst>
+                <a:ext uri="{FF2B5EF4-FFF2-40B4-BE49-F238E27FC236}">
+                  <a16:creationId xmlns:a16="http://schemas.microsoft.com/office/drawing/2014/main" id="{EA94A156-E109-774D-5FDF-8043EC42050A}"/>
+                </a:ext>
+              </a:extLst>
+            </p:cNvPr>
+            <p:cNvCxnSpPr>
+              <a:cxnSpLocks/>
+            </p:cNvCxnSpPr>
+            <p:nvPr/>
+          </p:nvCxnSpPr>
+          <p:spPr>
+            <a:xfrm>
+              <a:off x="10877727" y="15014313"/>
+              <a:ext cx="951115" cy="0"/>
+            </a:xfrm>
+            <a:prstGeom prst="line">
+              <a:avLst/>
+            </a:prstGeom>
+            <a:ln w="47625">
+              <a:solidFill>
+                <a:srgbClr val="C00000"/>
+              </a:solidFill>
+            </a:ln>
+          </p:spPr>
+          <p:style>
+            <a:lnRef idx="1">
+              <a:schemeClr val="accent1"/>
+            </a:lnRef>
+            <a:fillRef idx="0">
+              <a:schemeClr val="accent1"/>
+            </a:fillRef>
+            <a:effectRef idx="0">
+              <a:schemeClr val="accent1"/>
+            </a:effectRef>
+            <a:fontRef idx="minor">
+              <a:schemeClr val="tx1"/>
+            </a:fontRef>
+          </p:style>
+        </p:cxnSp>
+        <p:cxnSp>
+          <p:nvCxnSpPr>
+            <p:cNvPr id="309" name="Straight Connector 308">
+              <a:extLst>
+                <a:ext uri="{FF2B5EF4-FFF2-40B4-BE49-F238E27FC236}">
+                  <a16:creationId xmlns:a16="http://schemas.microsoft.com/office/drawing/2014/main" id="{01368AB0-6FEC-4E40-EF20-C123FBCFFF29}"/>
+                </a:ext>
+              </a:extLst>
+            </p:cNvPr>
+            <p:cNvCxnSpPr>
+              <a:cxnSpLocks/>
+            </p:cNvCxnSpPr>
+            <p:nvPr/>
+          </p:nvCxnSpPr>
+          <p:spPr>
+            <a:xfrm>
+              <a:off x="14650162" y="14996467"/>
+              <a:ext cx="951115" cy="0"/>
+            </a:xfrm>
+            <a:prstGeom prst="line">
+              <a:avLst/>
+            </a:prstGeom>
+            <a:ln w="95250">
+              <a:solidFill>
+                <a:schemeClr val="accent1">
+                  <a:lumMod val="75000"/>
+                </a:schemeClr>
+              </a:solidFill>
+            </a:ln>
+          </p:spPr>
+          <p:style>
+            <a:lnRef idx="1">
+              <a:schemeClr val="accent1"/>
+            </a:lnRef>
+            <a:fillRef idx="0">
+              <a:schemeClr val="accent1"/>
+            </a:fillRef>
+            <a:effectRef idx="0">
+              <a:schemeClr val="accent1"/>
+            </a:effectRef>
+            <a:fontRef idx="minor">
+              <a:schemeClr val="tx1"/>
+            </a:fontRef>
+          </p:style>
+        </p:cxnSp>
+        <p:cxnSp>
+          <p:nvCxnSpPr>
+            <p:cNvPr id="310" name="Straight Connector 309">
+              <a:extLst>
+                <a:ext uri="{FF2B5EF4-FFF2-40B4-BE49-F238E27FC236}">
+                  <a16:creationId xmlns:a16="http://schemas.microsoft.com/office/drawing/2014/main" id="{5459AFEF-BF27-F9DA-C489-E82435FED1A2}"/>
+                </a:ext>
+              </a:extLst>
+            </p:cNvPr>
+            <p:cNvCxnSpPr>
+              <a:cxnSpLocks/>
+            </p:cNvCxnSpPr>
+            <p:nvPr/>
+          </p:nvCxnSpPr>
+          <p:spPr>
+            <a:xfrm>
+              <a:off x="15597719" y="15018467"/>
+              <a:ext cx="951115" cy="0"/>
+            </a:xfrm>
+            <a:prstGeom prst="line">
+              <a:avLst/>
+            </a:prstGeom>
+            <a:ln w="47625">
+              <a:solidFill>
+                <a:schemeClr val="accent1">
+                  <a:lumMod val="75000"/>
+                </a:schemeClr>
+              </a:solidFill>
+            </a:ln>
+          </p:spPr>
+          <p:style>
+            <a:lnRef idx="1">
+              <a:schemeClr val="accent1"/>
+            </a:lnRef>
+            <a:fillRef idx="0">
+              <a:schemeClr val="accent1"/>
+            </a:fillRef>
+            <a:effectRef idx="0">
+              <a:schemeClr val="accent1"/>
+            </a:effectRef>
+            <a:fontRef idx="minor">
+              <a:schemeClr val="tx1"/>
+            </a:fontRef>
+          </p:style>
+        </p:cxnSp>
+        <p:sp>
+          <p:nvSpPr>
+            <p:cNvPr id="311" name="TextBox 310">
+              <a:extLst>
+                <a:ext uri="{FF2B5EF4-FFF2-40B4-BE49-F238E27FC236}">
+                  <a16:creationId xmlns:a16="http://schemas.microsoft.com/office/drawing/2014/main" id="{405F3348-AF82-CF3A-4B6F-13F81E3AE869}"/>
+                </a:ext>
+              </a:extLst>
+            </p:cNvPr>
+            <p:cNvSpPr txBox="1"/>
+            <p:nvPr/>
+          </p:nvSpPr>
+          <p:spPr>
+            <a:xfrm>
+              <a:off x="12834232" y="15001060"/>
+              <a:ext cx="790601" cy="553998"/>
+            </a:xfrm>
+            <a:prstGeom prst="rect">
+              <a:avLst/>
+            </a:prstGeom>
+            <a:noFill/>
+          </p:spPr>
+          <p:txBody>
+            <a:bodyPr wrap="none" rtlCol="0">
+              <a:spAutoFit/>
+            </a:bodyPr>
+            <a:lstStyle/>
+            <a:p>
+              <a:r>
+                <a:rPr lang="en-US" sz="3000" b="1" dirty="0">
+                  <a:latin typeface="Times New Roman" panose="02020603050405020304" pitchFamily="18" charset="0"/>
+                  <a:cs typeface="Times New Roman" panose="02020603050405020304" pitchFamily="18" charset="0"/>
+                </a:rPr>
+                <a:t>-0.8</a:t>
+              </a:r>
+            </a:p>
+          </p:txBody>
+        </p:sp>
+        <p:sp>
+          <p:nvSpPr>
+            <p:cNvPr id="312" name="TextBox 311">
+              <a:extLst>
+                <a:ext uri="{FF2B5EF4-FFF2-40B4-BE49-F238E27FC236}">
+                  <a16:creationId xmlns:a16="http://schemas.microsoft.com/office/drawing/2014/main" id="{03905A61-A4AE-A9C3-7600-29CDFA24E9CE}"/>
+                </a:ext>
+              </a:extLst>
+            </p:cNvPr>
+            <p:cNvSpPr txBox="1"/>
+            <p:nvPr/>
+          </p:nvSpPr>
+          <p:spPr>
+            <a:xfrm>
+              <a:off x="13840682" y="15008102"/>
+              <a:ext cx="673582" cy="553998"/>
+            </a:xfrm>
+            <a:prstGeom prst="rect">
+              <a:avLst/>
+            </a:prstGeom>
+            <a:noFill/>
+          </p:spPr>
+          <p:txBody>
+            <a:bodyPr wrap="none" rtlCol="0">
+              <a:spAutoFit/>
+            </a:bodyPr>
+            <a:lstStyle/>
+            <a:p>
+              <a:r>
+                <a:rPr lang="en-US" sz="3000" b="1" dirty="0">
+                  <a:latin typeface="Times New Roman" panose="02020603050405020304" pitchFamily="18" charset="0"/>
+                  <a:cs typeface="Times New Roman" panose="02020603050405020304" pitchFamily="18" charset="0"/>
+                </a:rPr>
+                <a:t>0.8</a:t>
+              </a:r>
+            </a:p>
+          </p:txBody>
+        </p:sp>
+        <p:sp>
+          <p:nvSpPr>
+            <p:cNvPr id="313" name="TextBox 312">
+              <a:extLst>
+                <a:ext uri="{FF2B5EF4-FFF2-40B4-BE49-F238E27FC236}">
+                  <a16:creationId xmlns:a16="http://schemas.microsoft.com/office/drawing/2014/main" id="{A5185E2D-DB4F-1D37-75C3-0550DED89ED4}"/>
+                </a:ext>
+              </a:extLst>
+            </p:cNvPr>
+            <p:cNvSpPr txBox="1"/>
+            <p:nvPr/>
+          </p:nvSpPr>
+          <p:spPr>
+            <a:xfrm>
+              <a:off x="11891055" y="15008102"/>
+              <a:ext cx="790601" cy="553998"/>
+            </a:xfrm>
+            <a:prstGeom prst="rect">
+              <a:avLst/>
+            </a:prstGeom>
+            <a:noFill/>
+          </p:spPr>
+          <p:txBody>
+            <a:bodyPr wrap="none" rtlCol="0">
+              <a:spAutoFit/>
+            </a:bodyPr>
+            <a:lstStyle/>
+            <a:p>
+              <a:r>
+                <a:rPr lang="en-US" sz="3000" b="1" dirty="0">
+                  <a:latin typeface="Times New Roman" panose="02020603050405020304" pitchFamily="18" charset="0"/>
+                  <a:cs typeface="Times New Roman" panose="02020603050405020304" pitchFamily="18" charset="0"/>
+                </a:rPr>
+                <a:t>-0.4</a:t>
+              </a:r>
+            </a:p>
+          </p:txBody>
+        </p:sp>
+        <p:sp>
+          <p:nvSpPr>
+            <p:cNvPr id="314" name="TextBox 313">
+              <a:extLst>
+                <a:ext uri="{FF2B5EF4-FFF2-40B4-BE49-F238E27FC236}">
+                  <a16:creationId xmlns:a16="http://schemas.microsoft.com/office/drawing/2014/main" id="{336C6BA1-652E-4332-3874-0C406AC32821}"/>
+                </a:ext>
+              </a:extLst>
+            </p:cNvPr>
+            <p:cNvSpPr txBox="1"/>
+            <p:nvPr/>
+          </p:nvSpPr>
+          <p:spPr>
+            <a:xfrm>
+              <a:off x="14783859" y="15011555"/>
+              <a:ext cx="673582" cy="553998"/>
+            </a:xfrm>
+            <a:prstGeom prst="rect">
+              <a:avLst/>
+            </a:prstGeom>
+            <a:noFill/>
+          </p:spPr>
+          <p:txBody>
+            <a:bodyPr wrap="none" rtlCol="0">
+              <a:spAutoFit/>
+            </a:bodyPr>
+            <a:lstStyle/>
+            <a:p>
+              <a:r>
+                <a:rPr lang="en-US" sz="3000" b="1" dirty="0">
+                  <a:latin typeface="Times New Roman" panose="02020603050405020304" pitchFamily="18" charset="0"/>
+                  <a:cs typeface="Times New Roman" panose="02020603050405020304" pitchFamily="18" charset="0"/>
+                </a:rPr>
+                <a:t>0.4</a:t>
+              </a:r>
+            </a:p>
+          </p:txBody>
+        </p:sp>
+        <p:sp>
+          <p:nvSpPr>
+            <p:cNvPr id="315" name="TextBox 314">
+              <a:extLst>
+                <a:ext uri="{FF2B5EF4-FFF2-40B4-BE49-F238E27FC236}">
+                  <a16:creationId xmlns:a16="http://schemas.microsoft.com/office/drawing/2014/main" id="{0A735BE5-8F12-20AC-B7DA-99178782D0A5}"/>
+                </a:ext>
+              </a:extLst>
+            </p:cNvPr>
+            <p:cNvSpPr txBox="1"/>
+            <p:nvPr/>
+          </p:nvSpPr>
+          <p:spPr>
+            <a:xfrm>
+              <a:off x="15740043" y="14993731"/>
+              <a:ext cx="673582" cy="553998"/>
+            </a:xfrm>
+            <a:prstGeom prst="rect">
+              <a:avLst/>
+            </a:prstGeom>
+            <a:noFill/>
+          </p:spPr>
+          <p:txBody>
+            <a:bodyPr wrap="none" rtlCol="0">
+              <a:spAutoFit/>
+            </a:bodyPr>
+            <a:lstStyle/>
+            <a:p>
+              <a:r>
+                <a:rPr lang="en-US" sz="3000" b="1" dirty="0">
+                  <a:latin typeface="Times New Roman" panose="02020603050405020304" pitchFamily="18" charset="0"/>
+                  <a:cs typeface="Times New Roman" panose="02020603050405020304" pitchFamily="18" charset="0"/>
+                </a:rPr>
+                <a:t>0.2</a:t>
+              </a:r>
+            </a:p>
+          </p:txBody>
+        </p:sp>
+        <p:sp>
+          <p:nvSpPr>
+            <p:cNvPr id="317" name="TextBox 316">
+              <a:extLst>
+                <a:ext uri="{FF2B5EF4-FFF2-40B4-BE49-F238E27FC236}">
+                  <a16:creationId xmlns:a16="http://schemas.microsoft.com/office/drawing/2014/main" id="{E5B0E893-4292-A9DA-E31F-4F434D6BA189}"/>
+                </a:ext>
+              </a:extLst>
+            </p:cNvPr>
+            <p:cNvSpPr txBox="1"/>
+            <p:nvPr/>
+          </p:nvSpPr>
+          <p:spPr>
+            <a:xfrm>
+              <a:off x="10994295" y="15013156"/>
+              <a:ext cx="790601" cy="553998"/>
+            </a:xfrm>
+            <a:prstGeom prst="rect">
+              <a:avLst/>
+            </a:prstGeom>
+            <a:noFill/>
+          </p:spPr>
+          <p:txBody>
+            <a:bodyPr wrap="none" rtlCol="0">
+              <a:spAutoFit/>
+            </a:bodyPr>
+            <a:lstStyle/>
+            <a:p>
+              <a:r>
+                <a:rPr lang="en-US" sz="3000" b="1" dirty="0">
+                  <a:latin typeface="Times New Roman" panose="02020603050405020304" pitchFamily="18" charset="0"/>
+                  <a:cs typeface="Times New Roman" panose="02020603050405020304" pitchFamily="18" charset="0"/>
+                </a:rPr>
+                <a:t>-0.2</a:t>
+              </a:r>
+            </a:p>
+          </p:txBody>
+        </p:sp>
+        <p:sp>
+          <p:nvSpPr>
+            <p:cNvPr id="318" name="TextBox 317">
+              <a:extLst>
+                <a:ext uri="{FF2B5EF4-FFF2-40B4-BE49-F238E27FC236}">
+                  <a16:creationId xmlns:a16="http://schemas.microsoft.com/office/drawing/2014/main" id="{381CB219-7134-E7DD-E806-9373BDC6B8E3}"/>
+                </a:ext>
+              </a:extLst>
+            </p:cNvPr>
+            <p:cNvSpPr txBox="1"/>
+            <p:nvPr/>
+          </p:nvSpPr>
+          <p:spPr>
+            <a:xfrm>
+              <a:off x="11562548" y="15884633"/>
+              <a:ext cx="4278735" cy="553998"/>
+            </a:xfrm>
+            <a:prstGeom prst="rect">
+              <a:avLst/>
+            </a:prstGeom>
+            <a:noFill/>
+          </p:spPr>
+          <p:txBody>
+            <a:bodyPr wrap="none" rtlCol="0">
+              <a:spAutoFit/>
+            </a:bodyPr>
+            <a:lstStyle/>
+            <a:p>
+              <a:r>
+                <a:rPr lang="en-US" sz="3000" b="1" dirty="0">
+                  <a:latin typeface="Times New Roman" panose="02020603050405020304" pitchFamily="18" charset="0"/>
+                  <a:cs typeface="Times New Roman" panose="02020603050405020304" pitchFamily="18" charset="0"/>
+                </a:rPr>
+                <a:t>Standardized Coefficient</a:t>
+              </a:r>
+            </a:p>
+          </p:txBody>
+        </p:sp>
+        <p:cxnSp>
+          <p:nvCxnSpPr>
+            <p:cNvPr id="306" name="Straight Connector 305">
+              <a:extLst>
+                <a:ext uri="{FF2B5EF4-FFF2-40B4-BE49-F238E27FC236}">
+                  <a16:creationId xmlns:a16="http://schemas.microsoft.com/office/drawing/2014/main" id="{D1A9DA54-E777-BA6D-9268-2E5E984EB1E2}"/>
+                </a:ext>
+              </a:extLst>
+            </p:cNvPr>
+            <p:cNvCxnSpPr>
+              <a:cxnSpLocks/>
+            </p:cNvCxnSpPr>
+            <p:nvPr/>
+          </p:nvCxnSpPr>
+          <p:spPr>
+            <a:xfrm>
+              <a:off x="12753976" y="14948075"/>
+              <a:ext cx="951115" cy="0"/>
+            </a:xfrm>
+            <a:prstGeom prst="line">
+              <a:avLst/>
+            </a:prstGeom>
+            <a:ln w="190500">
+              <a:solidFill>
+                <a:srgbClr val="C00000"/>
+              </a:solidFill>
+            </a:ln>
+          </p:spPr>
+          <p:style>
+            <a:lnRef idx="1">
+              <a:schemeClr val="accent1"/>
+            </a:lnRef>
+            <a:fillRef idx="0">
+              <a:schemeClr val="accent1"/>
+            </a:fillRef>
+            <a:effectRef idx="0">
+              <a:schemeClr val="accent1"/>
+            </a:effectRef>
+            <a:fontRef idx="minor">
+              <a:schemeClr val="tx1"/>
+            </a:fontRef>
+          </p:style>
+        </p:cxnSp>
+        <p:cxnSp>
+          <p:nvCxnSpPr>
+            <p:cNvPr id="308" name="Straight Connector 307">
+              <a:extLst>
+                <a:ext uri="{FF2B5EF4-FFF2-40B4-BE49-F238E27FC236}">
+                  <a16:creationId xmlns:a16="http://schemas.microsoft.com/office/drawing/2014/main" id="{58FCCEEE-319F-0DEB-6973-1CFE1856B2B0}"/>
+                </a:ext>
+              </a:extLst>
+            </p:cNvPr>
+            <p:cNvCxnSpPr>
+              <a:cxnSpLocks/>
+            </p:cNvCxnSpPr>
+            <p:nvPr/>
+          </p:nvCxnSpPr>
+          <p:spPr>
+            <a:xfrm>
+              <a:off x="13701916" y="14947083"/>
+              <a:ext cx="951115" cy="0"/>
+            </a:xfrm>
+            <a:prstGeom prst="line">
+              <a:avLst/>
+            </a:prstGeom>
+            <a:ln w="190500">
+              <a:solidFill>
+                <a:schemeClr val="accent1">
+                  <a:lumMod val="75000"/>
+                </a:schemeClr>
+              </a:solidFill>
+            </a:ln>
+          </p:spPr>
+          <p:style>
+            <a:lnRef idx="1">
+              <a:schemeClr val="accent1"/>
+            </a:lnRef>
+            <a:fillRef idx="0">
+              <a:schemeClr val="accent1"/>
+            </a:fillRef>
+            <a:effectRef idx="0">
+              <a:schemeClr val="accent1"/>
+            </a:effectRef>
+            <a:fontRef idx="minor">
+              <a:schemeClr val="tx1"/>
+            </a:fontRef>
+          </p:style>
+        </p:cxnSp>
+        <p:sp>
+          <p:nvSpPr>
+            <p:cNvPr id="2" name="Rectangle 1">
+              <a:extLst>
+                <a:ext uri="{FF2B5EF4-FFF2-40B4-BE49-F238E27FC236}">
+                  <a16:creationId xmlns:a16="http://schemas.microsoft.com/office/drawing/2014/main" id="{0505CCCA-23EC-02F8-8E02-93D20241DF45}"/>
+                </a:ext>
+              </a:extLst>
+            </p:cNvPr>
+            <p:cNvSpPr/>
+            <p:nvPr/>
+          </p:nvSpPr>
+          <p:spPr>
+            <a:xfrm>
+              <a:off x="10840085" y="15042532"/>
+              <a:ext cx="5751830" cy="56852"/>
+            </a:xfrm>
+            <a:prstGeom prst="rect">
+              <a:avLst/>
+            </a:prstGeom>
             <a:solidFill>
-              <a:schemeClr val="bg1">
-                <a:lumMod val="65000"/>
+              <a:schemeClr val="bg1"/>
+            </a:solidFill>
+            <a:ln>
+              <a:noFill/>
+            </a:ln>
+          </p:spPr>
+          <p:style>
+            <a:lnRef idx="2">
+              <a:schemeClr val="accent1">
+                <a:shade val="50000"/>
               </a:schemeClr>
+            </a:lnRef>
+            <a:fillRef idx="1">
+              <a:schemeClr val="accent1"/>
+            </a:fillRef>
+            <a:effectRef idx="0">
+              <a:schemeClr val="accent1"/>
+            </a:effectRef>
+            <a:fontRef idx="minor">
+              <a:schemeClr val="lt1"/>
+            </a:fontRef>
+          </p:style>
+          <p:txBody>
+            <a:bodyPr rtlCol="0" anchor="ctr"/>
+            <a:lstStyle/>
+            <a:p>
+              <a:pPr algn="ctr"/>
+              <a:endParaRPr lang="en-US"/>
+            </a:p>
+          </p:txBody>
+        </p:sp>
+        <p:sp>
+          <p:nvSpPr>
+            <p:cNvPr id="4" name="Rectangle 3">
+              <a:extLst>
+                <a:ext uri="{FF2B5EF4-FFF2-40B4-BE49-F238E27FC236}">
+                  <a16:creationId xmlns:a16="http://schemas.microsoft.com/office/drawing/2014/main" id="{02C00127-0A1A-2C99-C54F-607878A28FA7}"/>
+                </a:ext>
+              </a:extLst>
+            </p:cNvPr>
+            <p:cNvSpPr/>
+            <p:nvPr/>
+          </p:nvSpPr>
+          <p:spPr>
+            <a:xfrm>
+              <a:off x="10137058" y="15037932"/>
+              <a:ext cx="7010400" cy="45719"/>
+            </a:xfrm>
+            <a:prstGeom prst="rect">
+              <a:avLst/>
+            </a:prstGeom>
+            <a:solidFill>
+              <a:schemeClr val="bg1"/>
             </a:solidFill>
-            <a:prstDash val="dash"/>
-          </a:ln>
-        </p:spPr>
-        <p:style>
-          <a:lnRef idx="1">
-            <a:schemeClr val="accent1"/>
-          </a:lnRef>
-          <a:fillRef idx="0">
-            <a:schemeClr val="accent1"/>
-          </a:fillRef>
-          <a:effectRef idx="0">
-            <a:schemeClr val="accent1"/>
-          </a:effectRef>
-          <a:fontRef idx="minor">
-            <a:schemeClr val="tx1"/>
-          </a:fontRef>
-        </p:style>
-      </p:cxnSp>
-      <p:cxnSp>
-        <p:nvCxnSpPr>
-          <p:cNvPr id="15" name="Straight Connector 14">
-            <a:extLst>
-              <a:ext uri="{FF2B5EF4-FFF2-40B4-BE49-F238E27FC236}">
-                <a16:creationId xmlns:a16="http://schemas.microsoft.com/office/drawing/2014/main" id="{49F574BE-1AF9-E987-F987-E560963924AE}"/>
-              </a:ext>
-            </a:extLst>
-          </p:cNvPr>
-          <p:cNvCxnSpPr>
-            <a:cxnSpLocks/>
-          </p:cNvCxnSpPr>
-          <p:nvPr/>
-        </p:nvCxnSpPr>
-        <p:spPr>
-          <a:xfrm>
-            <a:off x="16548834" y="11709061"/>
-            <a:ext cx="951115" cy="0"/>
-          </a:xfrm>
-          <a:prstGeom prst="line">
-            <a:avLst/>
-          </a:prstGeom>
-          <a:ln w="12700">
+            <a:ln>
+              <a:noFill/>
+            </a:ln>
+          </p:spPr>
+          <p:style>
+            <a:lnRef idx="2">
+              <a:schemeClr val="accent1">
+                <a:shade val="50000"/>
+              </a:schemeClr>
+            </a:lnRef>
+            <a:fillRef idx="1">
+              <a:schemeClr val="accent1"/>
+            </a:fillRef>
+            <a:effectRef idx="0">
+              <a:schemeClr val="accent1"/>
+            </a:effectRef>
+            <a:fontRef idx="minor">
+              <a:schemeClr val="lt1"/>
+            </a:fontRef>
+          </p:style>
+          <p:txBody>
+            <a:bodyPr rtlCol="0" anchor="ctr"/>
+            <a:lstStyle/>
+            <a:p>
+              <a:pPr algn="ctr"/>
+              <a:endParaRPr lang="en-US"/>
+            </a:p>
+          </p:txBody>
+        </p:sp>
+        <p:sp>
+          <p:nvSpPr>
+            <p:cNvPr id="5" name="Rectangle 4">
+              <a:extLst>
+                <a:ext uri="{FF2B5EF4-FFF2-40B4-BE49-F238E27FC236}">
+                  <a16:creationId xmlns:a16="http://schemas.microsoft.com/office/drawing/2014/main" id="{AEA1F572-8465-B16E-D0EB-AE36EA9F14C4}"/>
+                </a:ext>
+              </a:extLst>
+            </p:cNvPr>
+            <p:cNvSpPr/>
+            <p:nvPr/>
+          </p:nvSpPr>
+          <p:spPr>
+            <a:xfrm>
+              <a:off x="10335482" y="14833724"/>
+              <a:ext cx="7010400" cy="45719"/>
+            </a:xfrm>
+            <a:prstGeom prst="rect">
+              <a:avLst/>
+            </a:prstGeom>
             <a:solidFill>
-              <a:schemeClr val="bg1">
-                <a:lumMod val="65000"/>
+              <a:schemeClr val="bg1"/>
+            </a:solidFill>
+            <a:ln>
+              <a:noFill/>
+            </a:ln>
+          </p:spPr>
+          <p:style>
+            <a:lnRef idx="2">
+              <a:schemeClr val="accent1">
+                <a:shade val="50000"/>
               </a:schemeClr>
-            </a:solidFill>
-            <a:prstDash val="dash"/>
-          </a:ln>
-        </p:spPr>
-        <p:style>
-          <a:lnRef idx="1">
-            <a:schemeClr val="accent1"/>
-          </a:lnRef>
-          <a:fillRef idx="0">
-            <a:schemeClr val="accent1"/>
-          </a:fillRef>
-          <a:effectRef idx="0">
-            <a:schemeClr val="accent1"/>
-          </a:effectRef>
-          <a:fontRef idx="minor">
-            <a:schemeClr val="tx1"/>
-          </a:fontRef>
-        </p:style>
-      </p:cxnSp>
+            </a:lnRef>
+            <a:fillRef idx="1">
+              <a:schemeClr val="accent1"/>
+            </a:fillRef>
+            <a:effectRef idx="0">
+              <a:schemeClr val="accent1"/>
+            </a:effectRef>
+            <a:fontRef idx="minor">
+              <a:schemeClr val="lt1"/>
+            </a:fontRef>
+          </p:style>
+          <p:txBody>
+            <a:bodyPr rtlCol="0" anchor="ctr"/>
+            <a:lstStyle/>
+            <a:p>
+              <a:pPr algn="ctr"/>
+              <a:endParaRPr lang="en-US"/>
+            </a:p>
+          </p:txBody>
+        </p:sp>
+        <p:cxnSp>
+          <p:nvCxnSpPr>
+            <p:cNvPr id="12" name="Straight Connector 11">
+              <a:extLst>
+                <a:ext uri="{FF2B5EF4-FFF2-40B4-BE49-F238E27FC236}">
+                  <a16:creationId xmlns:a16="http://schemas.microsoft.com/office/drawing/2014/main" id="{AA90B932-5758-80DF-51AD-81085E11F480}"/>
+                </a:ext>
+              </a:extLst>
+            </p:cNvPr>
+            <p:cNvCxnSpPr>
+              <a:cxnSpLocks/>
+            </p:cNvCxnSpPr>
+            <p:nvPr/>
+          </p:nvCxnSpPr>
+          <p:spPr>
+            <a:xfrm>
+              <a:off x="9920571" y="15027992"/>
+              <a:ext cx="951115" cy="0"/>
+            </a:xfrm>
+            <a:prstGeom prst="line">
+              <a:avLst/>
+            </a:prstGeom>
+            <a:ln w="12700">
+              <a:solidFill>
+                <a:schemeClr val="bg1">
+                  <a:lumMod val="65000"/>
+                </a:schemeClr>
+              </a:solidFill>
+              <a:prstDash val="dash"/>
+            </a:ln>
+          </p:spPr>
+          <p:style>
+            <a:lnRef idx="1">
+              <a:schemeClr val="accent1"/>
+            </a:lnRef>
+            <a:fillRef idx="0">
+              <a:schemeClr val="accent1"/>
+            </a:fillRef>
+            <a:effectRef idx="0">
+              <a:schemeClr val="accent1"/>
+            </a:effectRef>
+            <a:fontRef idx="minor">
+              <a:schemeClr val="tx1"/>
+            </a:fontRef>
+          </p:style>
+        </p:cxnSp>
+        <p:cxnSp>
+          <p:nvCxnSpPr>
+            <p:cNvPr id="15" name="Straight Connector 14">
+              <a:extLst>
+                <a:ext uri="{FF2B5EF4-FFF2-40B4-BE49-F238E27FC236}">
+                  <a16:creationId xmlns:a16="http://schemas.microsoft.com/office/drawing/2014/main" id="{49F574BE-1AF9-E987-F987-E560963924AE}"/>
+                </a:ext>
+              </a:extLst>
+            </p:cNvPr>
+            <p:cNvCxnSpPr>
+              <a:cxnSpLocks/>
+            </p:cNvCxnSpPr>
+            <p:nvPr/>
+          </p:nvCxnSpPr>
+          <p:spPr>
+            <a:xfrm>
+              <a:off x="16548834" y="15027992"/>
+              <a:ext cx="951115" cy="0"/>
+            </a:xfrm>
+            <a:prstGeom prst="line">
+              <a:avLst/>
+            </a:prstGeom>
+            <a:ln w="12700">
+              <a:solidFill>
+                <a:schemeClr val="bg1">
+                  <a:lumMod val="65000"/>
+                </a:schemeClr>
+              </a:solidFill>
+              <a:prstDash val="dash"/>
+            </a:ln>
+          </p:spPr>
+          <p:style>
+            <a:lnRef idx="1">
+              <a:schemeClr val="accent1"/>
+            </a:lnRef>
+            <a:fillRef idx="0">
+              <a:schemeClr val="accent1"/>
+            </a:fillRef>
+            <a:effectRef idx="0">
+              <a:schemeClr val="accent1"/>
+            </a:effectRef>
+            <a:fontRef idx="minor">
+              <a:schemeClr val="tx1"/>
+            </a:fontRef>
+          </p:style>
+        </p:cxnSp>
+      </p:grpSp>
       <p:cxnSp>
         <p:nvCxnSpPr>
           <p:cNvPr id="19" name="Straight Arrow Connector 18">
@@ -10975,6 +10996,154 @@
           </a:p>
         </p:txBody>
       </p:sp>
+      <p:cxnSp>
+        <p:nvCxnSpPr>
+          <p:cNvPr id="24" name="Elbow Connector 23">
+            <a:extLst>
+              <a:ext uri="{FF2B5EF4-FFF2-40B4-BE49-F238E27FC236}">
+                <a16:creationId xmlns:a16="http://schemas.microsoft.com/office/drawing/2014/main" id="{60C8DD06-DA23-8938-44D0-F43CB30206D5}"/>
+              </a:ext>
+            </a:extLst>
+          </p:cNvPr>
+          <p:cNvCxnSpPr>
+            <a:cxnSpLocks/>
+          </p:cNvCxnSpPr>
+          <p:nvPr/>
+        </p:nvCxnSpPr>
+        <p:spPr>
+          <a:xfrm rot="10800000" flipH="1">
+            <a:off x="5139574" y="7644040"/>
+            <a:ext cx="15501917" cy="2740744"/>
+          </a:xfrm>
+          <a:prstGeom prst="bentConnector5">
+            <a:avLst>
+              <a:gd name="adj1" fmla="val -4315"/>
+              <a:gd name="adj2" fmla="val -85924"/>
+              <a:gd name="adj3" fmla="val 101475"/>
+            </a:avLst>
+          </a:prstGeom>
+          <a:ln w="12700">
+            <a:solidFill>
+              <a:schemeClr val="bg1">
+                <a:lumMod val="65000"/>
+              </a:schemeClr>
+            </a:solidFill>
+            <a:prstDash val="dash"/>
+            <a:tailEnd type="triangle"/>
+          </a:ln>
+        </p:spPr>
+        <p:style>
+          <a:lnRef idx="1">
+            <a:schemeClr val="accent1"/>
+          </a:lnRef>
+          <a:fillRef idx="0">
+            <a:schemeClr val="accent1"/>
+          </a:fillRef>
+          <a:effectRef idx="0">
+            <a:schemeClr val="accent1"/>
+          </a:effectRef>
+          <a:fontRef idx="minor">
+            <a:schemeClr val="tx1"/>
+          </a:fontRef>
+        </p:style>
+      </p:cxnSp>
+      <p:cxnSp>
+        <p:nvCxnSpPr>
+          <p:cNvPr id="35" name="Elbow Connector 34">
+            <a:extLst>
+              <a:ext uri="{FF2B5EF4-FFF2-40B4-BE49-F238E27FC236}">
+                <a16:creationId xmlns:a16="http://schemas.microsoft.com/office/drawing/2014/main" id="{EF3AFABA-7183-05E9-2B6C-1002C13152CA}"/>
+              </a:ext>
+            </a:extLst>
+          </p:cNvPr>
+          <p:cNvCxnSpPr>
+            <a:stCxn id="144" idx="2"/>
+            <a:endCxn id="146" idx="2"/>
+          </p:cNvCxnSpPr>
+          <p:nvPr/>
+        </p:nvCxnSpPr>
+        <p:spPr>
+          <a:xfrm rot="16200000" flipH="1">
+            <a:off x="12893116" y="3793289"/>
+            <a:ext cx="12700" cy="13687685"/>
+          </a:xfrm>
+          <a:prstGeom prst="bentConnector3">
+            <a:avLst>
+              <a:gd name="adj1" fmla="val 7133339"/>
+            </a:avLst>
+          </a:prstGeom>
+          <a:ln w="47244">
+            <a:solidFill>
+              <a:srgbClr val="C00000"/>
+            </a:solidFill>
+            <a:tailEnd type="triangle"/>
+          </a:ln>
+        </p:spPr>
+        <p:style>
+          <a:lnRef idx="1">
+            <a:schemeClr val="accent1"/>
+          </a:lnRef>
+          <a:fillRef idx="0">
+            <a:schemeClr val="accent1"/>
+          </a:fillRef>
+          <a:effectRef idx="0">
+            <a:schemeClr val="accent1"/>
+          </a:effectRef>
+          <a:fontRef idx="minor">
+            <a:schemeClr val="tx1"/>
+          </a:fontRef>
+        </p:style>
+      </p:cxnSp>
+      <p:cxnSp>
+        <p:nvCxnSpPr>
+          <p:cNvPr id="41" name="Elbow Connector 40">
+            <a:extLst>
+              <a:ext uri="{FF2B5EF4-FFF2-40B4-BE49-F238E27FC236}">
+                <a16:creationId xmlns:a16="http://schemas.microsoft.com/office/drawing/2014/main" id="{3030AE49-D227-9D49-95F9-423367B4D592}"/>
+              </a:ext>
+            </a:extLst>
+          </p:cNvPr>
+          <p:cNvCxnSpPr>
+            <a:cxnSpLocks/>
+            <a:endCxn id="145" idx="0"/>
+          </p:cNvCxnSpPr>
+          <p:nvPr/>
+        </p:nvCxnSpPr>
+        <p:spPr>
+          <a:xfrm flipV="1">
+            <a:off x="5139575" y="4285983"/>
+            <a:ext cx="14592218" cy="5743208"/>
+          </a:xfrm>
+          <a:prstGeom prst="bentConnector4">
+            <a:avLst>
+              <a:gd name="adj1" fmla="val -4524"/>
+              <a:gd name="adj2" fmla="val 111646"/>
+            </a:avLst>
+          </a:prstGeom>
+          <a:ln w="57150">
+            <a:solidFill>
+              <a:schemeClr val="accent1">
+                <a:lumMod val="75000"/>
+              </a:schemeClr>
+            </a:solidFill>
+            <a:tailEnd type="triangle"/>
+          </a:ln>
+        </p:spPr>
+        <p:style>
+          <a:lnRef idx="1">
+            <a:schemeClr val="accent1"/>
+          </a:lnRef>
+          <a:fillRef idx="0">
+            <a:schemeClr val="accent1"/>
+          </a:fillRef>
+          <a:effectRef idx="0">
+            <a:schemeClr val="accent1"/>
+          </a:effectRef>
+          <a:fontRef idx="minor">
+            <a:schemeClr val="tx1"/>
+          </a:fontRef>
+        </p:style>
+      </p:cxnSp>
     </p:spTree>
     <p:extLst>
       <p:ext uri="{BB962C8B-B14F-4D97-AF65-F5344CB8AC3E}">

</xml_diff>

<commit_message>
add final edits to manuscript before sending to nick for 3rd round of revisions
</commit_message>
<xml_diff>
--- a/working_drafts/figs/TXeco_SEM_ppt_fig.pptx
+++ b/working_drafts/figs/TXeco_SEM_ppt_fig.pptx
@@ -199,7 +199,7 @@
           <a:p>
             <a:fld id="{9C8338E3-F40D-F146-8D3B-4726E84D5200}" type="datetimeFigureOut">
               <a:rPr lang="en-US" smtClean="0"/>
-              <a:t>2/14/23</a:t>
+              <a:t>2/15/23</a:t>
             </a:fld>
             <a:endParaRPr lang="en-US"/>
           </a:p>
@@ -854,7 +854,7 @@
           <a:p>
             <a:fld id="{D3A28AA4-801E-B147-9E5C-6E6DBA6E23D1}" type="datetimeFigureOut">
               <a:rPr lang="en-US" smtClean="0"/>
-              <a:t>2/14/23</a:t>
+              <a:t>2/15/23</a:t>
             </a:fld>
             <a:endParaRPr lang="en-US"/>
           </a:p>
@@ -1024,7 +1024,7 @@
           <a:p>
             <a:fld id="{D3A28AA4-801E-B147-9E5C-6E6DBA6E23D1}" type="datetimeFigureOut">
               <a:rPr lang="en-US" smtClean="0"/>
-              <a:t>2/14/23</a:t>
+              <a:t>2/15/23</a:t>
             </a:fld>
             <a:endParaRPr lang="en-US"/>
           </a:p>
@@ -1204,7 +1204,7 @@
           <a:p>
             <a:fld id="{D3A28AA4-801E-B147-9E5C-6E6DBA6E23D1}" type="datetimeFigureOut">
               <a:rPr lang="en-US" smtClean="0"/>
-              <a:t>2/14/23</a:t>
+              <a:t>2/15/23</a:t>
             </a:fld>
             <a:endParaRPr lang="en-US"/>
           </a:p>
@@ -1374,7 +1374,7 @@
           <a:p>
             <a:fld id="{D3A28AA4-801E-B147-9E5C-6E6DBA6E23D1}" type="datetimeFigureOut">
               <a:rPr lang="en-US" smtClean="0"/>
-              <a:t>2/14/23</a:t>
+              <a:t>2/15/23</a:t>
             </a:fld>
             <a:endParaRPr lang="en-US"/>
           </a:p>
@@ -1618,7 +1618,7 @@
           <a:p>
             <a:fld id="{D3A28AA4-801E-B147-9E5C-6E6DBA6E23D1}" type="datetimeFigureOut">
               <a:rPr lang="en-US" smtClean="0"/>
-              <a:t>2/14/23</a:t>
+              <a:t>2/15/23</a:t>
             </a:fld>
             <a:endParaRPr lang="en-US"/>
           </a:p>
@@ -1850,7 +1850,7 @@
           <a:p>
             <a:fld id="{D3A28AA4-801E-B147-9E5C-6E6DBA6E23D1}" type="datetimeFigureOut">
               <a:rPr lang="en-US" smtClean="0"/>
-              <a:t>2/14/23</a:t>
+              <a:t>2/15/23</a:t>
             </a:fld>
             <a:endParaRPr lang="en-US"/>
           </a:p>
@@ -2217,7 +2217,7 @@
           <a:p>
             <a:fld id="{D3A28AA4-801E-B147-9E5C-6E6DBA6E23D1}" type="datetimeFigureOut">
               <a:rPr lang="en-US" smtClean="0"/>
-              <a:t>2/14/23</a:t>
+              <a:t>2/15/23</a:t>
             </a:fld>
             <a:endParaRPr lang="en-US"/>
           </a:p>
@@ -2335,7 +2335,7 @@
           <a:p>
             <a:fld id="{D3A28AA4-801E-B147-9E5C-6E6DBA6E23D1}" type="datetimeFigureOut">
               <a:rPr lang="en-US" smtClean="0"/>
-              <a:t>2/14/23</a:t>
+              <a:t>2/15/23</a:t>
             </a:fld>
             <a:endParaRPr lang="en-US"/>
           </a:p>
@@ -2430,7 +2430,7 @@
           <a:p>
             <a:fld id="{D3A28AA4-801E-B147-9E5C-6E6DBA6E23D1}" type="datetimeFigureOut">
               <a:rPr lang="en-US" smtClean="0"/>
-              <a:t>2/14/23</a:t>
+              <a:t>2/15/23</a:t>
             </a:fld>
             <a:endParaRPr lang="en-US"/>
           </a:p>
@@ -2707,7 +2707,7 @@
           <a:p>
             <a:fld id="{D3A28AA4-801E-B147-9E5C-6E6DBA6E23D1}" type="datetimeFigureOut">
               <a:rPr lang="en-US" smtClean="0"/>
-              <a:t>2/14/23</a:t>
+              <a:t>2/15/23</a:t>
             </a:fld>
             <a:endParaRPr lang="en-US"/>
           </a:p>
@@ -2964,7 +2964,7 @@
           <a:p>
             <a:fld id="{D3A28AA4-801E-B147-9E5C-6E6DBA6E23D1}" type="datetimeFigureOut">
               <a:rPr lang="en-US" smtClean="0"/>
-              <a:t>2/14/23</a:t>
+              <a:t>2/15/23</a:t>
             </a:fld>
             <a:endParaRPr lang="en-US"/>
           </a:p>
@@ -3177,7 +3177,7 @@
           <a:p>
             <a:fld id="{D3A28AA4-801E-B147-9E5C-6E6DBA6E23D1}" type="datetimeFigureOut">
               <a:rPr lang="en-US" smtClean="0"/>
-              <a:t>2/14/23</a:t>
+              <a:t>2/15/23</a:t>
             </a:fld>
             <a:endParaRPr lang="en-US"/>
           </a:p>
@@ -8436,6 +8436,14 @@
 <file path=ppt/slides/slide3.xml><?xml version="1.0" encoding="utf-8"?>
 <p:sld xmlns:a="http://schemas.openxmlformats.org/drawingml/2006/main" xmlns:r="http://schemas.openxmlformats.org/officeDocument/2006/relationships" xmlns:p="http://schemas.openxmlformats.org/presentationml/2006/main">
   <p:cSld>
+    <p:bg>
+      <p:bgPr>
+        <a:solidFill>
+          <a:schemeClr val="bg1"/>
+        </a:solidFill>
+        <a:effectLst/>
+      </p:bgPr>
+    </p:bg>
     <p:spTree>
       <p:nvGrpSpPr>
         <p:cNvPr id="1" name=""/>
@@ -8461,20 +8469,18 @@
           </p:cNvPr>
           <p:cNvCxnSpPr>
             <a:cxnSpLocks/>
-            <a:stCxn id="146" idx="0"/>
-            <a:endCxn id="143" idx="2"/>
           </p:cNvCxnSpPr>
           <p:nvPr/>
         </p:nvCxnSpPr>
         <p:spPr>
           <a:xfrm flipH="1" flipV="1">
-            <a:off x="19731793" y="7896388"/>
+            <a:off x="19731793" y="7913320"/>
             <a:ext cx="5166" cy="1863521"/>
           </a:xfrm>
           <a:prstGeom prst="straightConnector1">
             <a:avLst/>
           </a:prstGeom>
-          <a:ln w="169799">
+          <a:ln w="169926">
             <a:solidFill>
               <a:schemeClr val="accent1">
                 <a:lumMod val="75000"/>
@@ -8750,20 +8756,19 @@
             </a:extLst>
           </p:cNvPr>
           <p:cNvCxnSpPr>
-            <a:stCxn id="145" idx="2"/>
-            <a:endCxn id="143" idx="0"/>
+            <a:cxnSpLocks/>
           </p:cNvCxnSpPr>
           <p:nvPr/>
         </p:nvCxnSpPr>
         <p:spPr>
           <a:xfrm>
-            <a:off x="19731793" y="5163206"/>
+            <a:off x="19731793" y="5146273"/>
             <a:ext cx="0" cy="1855959"/>
           </a:xfrm>
           <a:prstGeom prst="straightConnector1">
             <a:avLst/>
           </a:prstGeom>
-          <a:ln w="185420">
+          <a:ln w="185166">
             <a:solidFill>
               <a:schemeClr val="accent1">
                 <a:lumMod val="75000"/>
@@ -8798,15 +8803,13 @@
           </p:cNvPr>
           <p:cNvCxnSpPr>
             <a:cxnSpLocks/>
-            <a:stCxn id="149" idx="3"/>
-            <a:endCxn id="146" idx="1"/>
           </p:cNvCxnSpPr>
           <p:nvPr/>
         </p:nvCxnSpPr>
         <p:spPr>
           <a:xfrm>
-            <a:off x="16077815" y="7471690"/>
-            <a:ext cx="2749445" cy="2726831"/>
+            <a:off x="15567380" y="7483455"/>
+            <a:ext cx="3237304" cy="2703778"/>
           </a:xfrm>
           <a:prstGeom prst="straightConnector1">
             <a:avLst/>
@@ -8843,22 +8846,21 @@
             </a:extLst>
           </p:cNvPr>
           <p:cNvCxnSpPr>
-            <a:stCxn id="146" idx="3"/>
-            <a:endCxn id="145" idx="3"/>
+            <a:cxnSpLocks/>
           </p:cNvCxnSpPr>
           <p:nvPr/>
         </p:nvCxnSpPr>
         <p:spPr>
           <a:xfrm flipH="1" flipV="1">
-            <a:off x="20641492" y="4724595"/>
+            <a:off x="20658424" y="4724595"/>
             <a:ext cx="5166" cy="5473926"/>
           </a:xfrm>
           <a:prstGeom prst="bentConnector3">
             <a:avLst>
-              <a:gd name="adj1" fmla="val -16962834"/>
+              <a:gd name="adj1" fmla="val -7214828"/>
             </a:avLst>
           </a:prstGeom>
-          <a:ln w="60833">
+          <a:ln w="47879">
             <a:solidFill>
               <a:srgbClr val="C00000"/>
             </a:solidFill>
@@ -8937,14 +8939,13 @@
             </a:extLst>
           </p:cNvPr>
           <p:cNvCxnSpPr>
-            <a:stCxn id="151" idx="2"/>
-            <a:endCxn id="149" idx="0"/>
+            <a:cxnSpLocks/>
           </p:cNvCxnSpPr>
           <p:nvPr/>
         </p:nvCxnSpPr>
         <p:spPr>
           <a:xfrm>
-            <a:off x="15168116" y="5168574"/>
+            <a:off x="15168116" y="5151642"/>
             <a:ext cx="0" cy="1864504"/>
           </a:xfrm>
           <a:prstGeom prst="straightConnector1">
@@ -8988,7 +8989,7 @@
         </p:nvCxnSpPr>
         <p:spPr>
           <a:xfrm flipV="1">
-            <a:off x="6630888" y="7896388"/>
+            <a:off x="6625244" y="7918964"/>
             <a:ext cx="3072364" cy="2619212"/>
           </a:xfrm>
           <a:prstGeom prst="straightConnector1">
@@ -9026,15 +9027,14 @@
             </a:extLst>
           </p:cNvPr>
           <p:cNvCxnSpPr>
-            <a:stCxn id="147" idx="2"/>
-            <a:endCxn id="148" idx="0"/>
+            <a:cxnSpLocks/>
           </p:cNvCxnSpPr>
           <p:nvPr/>
         </p:nvCxnSpPr>
         <p:spPr>
-          <a:xfrm>
-            <a:off x="10617421" y="5163206"/>
-            <a:ext cx="0" cy="1869870"/>
+          <a:xfrm flipH="1" flipV="1">
+            <a:off x="10617421" y="7927231"/>
+            <a:ext cx="1102" cy="2723658"/>
           </a:xfrm>
           <a:prstGeom prst="straightConnector1">
             <a:avLst/>
@@ -9192,10 +9192,10 @@
       </p:sp>
       <p:sp>
         <p:nvSpPr>
-          <p:cNvPr id="150" name="Rectangle 149">
+          <p:cNvPr id="147" name="Rectangle 146">
             <a:extLst>
               <a:ext uri="{FF2B5EF4-FFF2-40B4-BE49-F238E27FC236}">
-                <a16:creationId xmlns:a16="http://schemas.microsoft.com/office/drawing/2014/main" id="{EC6E95A2-A99B-1EAD-2343-C2D4995139F9}"/>
+                <a16:creationId xmlns:a16="http://schemas.microsoft.com/office/drawing/2014/main" id="{C5E78A6B-70A3-51B7-4E35-61DC0344F209}"/>
               </a:ext>
             </a:extLst>
           </p:cNvPr>
@@ -9204,7 +9204,7 @@
         </p:nvSpPr>
         <p:spPr>
           <a:xfrm>
-            <a:off x="5139575" y="4285983"/>
+            <a:off x="9708824" y="9756734"/>
             <a:ext cx="1819398" cy="877223"/>
           </a:xfrm>
           <a:prstGeom prst="rect">
@@ -9241,28 +9241,62 @@
           <a:p>
             <a:pPr algn="ctr"/>
             <a:r>
-              <a:rPr lang="en-US" sz="3000" b="1" i="1" dirty="0">
+              <a:rPr lang="en-US" sz="3000" b="1" dirty="0">
+                <a:solidFill>
+                  <a:schemeClr val="accent1">
+                    <a:lumMod val="75000"/>
+                  </a:schemeClr>
+                </a:solidFill>
+                <a:latin typeface="Times New Roman" panose="02020603050405020304" pitchFamily="18" charset="0"/>
+                <a:cs typeface="Times New Roman" panose="02020603050405020304" pitchFamily="18" charset="0"/>
+              </a:rPr>
+              <a:t>C</a:t>
+            </a:r>
+            <a:r>
+              <a:rPr lang="en-US" sz="3000" b="1" baseline="-25000" dirty="0">
+                <a:solidFill>
+                  <a:schemeClr val="accent1">
+                    <a:lumMod val="75000"/>
+                  </a:schemeClr>
+                </a:solidFill>
+                <a:latin typeface="Times New Roman" panose="02020603050405020304" pitchFamily="18" charset="0"/>
+                <a:cs typeface="Times New Roman" panose="02020603050405020304" pitchFamily="18" charset="0"/>
+              </a:rPr>
+              <a:t>3</a:t>
+            </a:r>
+            <a:r>
+              <a:rPr lang="en-US" sz="3000" b="1" dirty="0">
                 <a:solidFill>
                   <a:schemeClr val="tx1"/>
                 </a:solidFill>
                 <a:latin typeface="Times New Roman" panose="02020603050405020304" pitchFamily="18" charset="0"/>
                 <a:cs typeface="Times New Roman" panose="02020603050405020304" pitchFamily="18" charset="0"/>
               </a:rPr>
-              <a:t>SM</a:t>
-            </a:r>
-            <a:r>
-              <a:rPr lang="en-US" sz="3000" b="1" baseline="-25000" dirty="0">
+              <a:t>/</a:t>
+            </a:r>
+            <a:r>
+              <a:rPr lang="en-US" sz="3000" b="1" dirty="0">
                 <a:solidFill>
-                  <a:schemeClr val="tx1"/>
+                  <a:srgbClr val="C00000"/>
                 </a:solidFill>
                 <a:latin typeface="Times New Roman" panose="02020603050405020304" pitchFamily="18" charset="0"/>
                 <a:cs typeface="Times New Roman" panose="02020603050405020304" pitchFamily="18" charset="0"/>
               </a:rPr>
-              <a:t>90</a:t>
+              <a:t>C</a:t>
+            </a:r>
+            <a:r>
+              <a:rPr lang="en-US" sz="3000" b="1" baseline="-25000" dirty="0">
+                <a:solidFill>
+                  <a:srgbClr val="C00000"/>
+                </a:solidFill>
+                <a:latin typeface="Times New Roman" panose="02020603050405020304" pitchFamily="18" charset="0"/>
+                <a:cs typeface="Times New Roman" panose="02020603050405020304" pitchFamily="18" charset="0"/>
+              </a:rPr>
+              <a:t>4</a:t>
             </a:r>
             <a:endParaRPr lang="en-US" sz="3000" b="1" dirty="0">
               <a:solidFill>
-                <a:schemeClr val="tx1"/>
+                <a:srgbClr val="C00000"/>
               </a:solidFill>
               <a:latin typeface="Times New Roman" panose="02020603050405020304" pitchFamily="18" charset="0"/>
               <a:cs typeface="Times New Roman" panose="02020603050405020304" pitchFamily="18" charset="0"/>
@@ -9272,10 +9306,10 @@
       </p:sp>
       <p:sp>
         <p:nvSpPr>
-          <p:cNvPr id="147" name="Rectangle 146">
+          <p:cNvPr id="146" name="Rectangle 145">
             <a:extLst>
               <a:ext uri="{FF2B5EF4-FFF2-40B4-BE49-F238E27FC236}">
-                <a16:creationId xmlns:a16="http://schemas.microsoft.com/office/drawing/2014/main" id="{C5E78A6B-70A3-51B7-4E35-61DC0344F209}"/>
+                <a16:creationId xmlns:a16="http://schemas.microsoft.com/office/drawing/2014/main" id="{831EFE87-5954-79FB-5410-F4BC8563FCDF}"/>
               </a:ext>
             </a:extLst>
           </p:cNvPr>
@@ -9284,7 +9318,7 @@
         </p:nvSpPr>
         <p:spPr>
           <a:xfrm>
-            <a:off x="9707722" y="4285983"/>
+            <a:off x="18827260" y="9759909"/>
             <a:ext cx="1819398" cy="877223"/>
           </a:xfrm>
           <a:prstGeom prst="rect">
@@ -9321,62 +9355,28 @@
           <a:p>
             <a:pPr algn="ctr"/>
             <a:r>
-              <a:rPr lang="en-US" sz="3000" b="1" dirty="0">
-                <a:solidFill>
-                  <a:schemeClr val="accent1">
-                    <a:lumMod val="75000"/>
-                  </a:schemeClr>
-                </a:solidFill>
-                <a:latin typeface="Times New Roman" panose="02020603050405020304" pitchFamily="18" charset="0"/>
-                <a:cs typeface="Times New Roman" panose="02020603050405020304" pitchFamily="18" charset="0"/>
-              </a:rPr>
-              <a:t>C</a:t>
-            </a:r>
-            <a:r>
-              <a:rPr lang="en-US" sz="3000" b="1" baseline="-25000" dirty="0">
-                <a:solidFill>
-                  <a:schemeClr val="accent1">
-                    <a:lumMod val="75000"/>
-                  </a:schemeClr>
-                </a:solidFill>
-                <a:latin typeface="Times New Roman" panose="02020603050405020304" pitchFamily="18" charset="0"/>
-                <a:cs typeface="Times New Roman" panose="02020603050405020304" pitchFamily="18" charset="0"/>
-              </a:rPr>
-              <a:t>3</a:t>
-            </a:r>
-            <a:r>
-              <a:rPr lang="en-US" sz="3000" b="1" dirty="0">
+              <a:rPr lang="en-US" sz="3000" b="1" i="1" dirty="0">
                 <a:solidFill>
                   <a:schemeClr val="tx1"/>
                 </a:solidFill>
                 <a:latin typeface="Times New Roman" panose="02020603050405020304" pitchFamily="18" charset="0"/>
                 <a:cs typeface="Times New Roman" panose="02020603050405020304" pitchFamily="18" charset="0"/>
               </a:rPr>
-              <a:t>/</a:t>
-            </a:r>
-            <a:r>
-              <a:rPr lang="en-US" sz="3000" b="1" dirty="0">
+              <a:t>M</a:t>
+            </a:r>
+            <a:r>
+              <a:rPr lang="en-US" sz="3000" b="1" baseline="-25000" dirty="0">
                 <a:solidFill>
-                  <a:srgbClr val="C00000"/>
+                  <a:schemeClr val="tx1"/>
                 </a:solidFill>
                 <a:latin typeface="Times New Roman" panose="02020603050405020304" pitchFamily="18" charset="0"/>
                 <a:cs typeface="Times New Roman" panose="02020603050405020304" pitchFamily="18" charset="0"/>
               </a:rPr>
-              <a:t>C</a:t>
-            </a:r>
-            <a:r>
-              <a:rPr lang="en-US" sz="3000" b="1" baseline="-25000" dirty="0">
-                <a:solidFill>
-                  <a:srgbClr val="C00000"/>
-                </a:solidFill>
-                <a:latin typeface="Times New Roman" panose="02020603050405020304" pitchFamily="18" charset="0"/>
-                <a:cs typeface="Times New Roman" panose="02020603050405020304" pitchFamily="18" charset="0"/>
-              </a:rPr>
-              <a:t>4</a:t>
-            </a:r>
-            <a:endParaRPr lang="en-US" sz="3000" b="1" dirty="0">
+              <a:t>area</a:t>
+            </a:r>
+            <a:endParaRPr lang="en-US" sz="3000" b="1" i="1" dirty="0">
               <a:solidFill>
-                <a:srgbClr val="C00000"/>
+                <a:schemeClr val="tx1"/>
               </a:solidFill>
               <a:latin typeface="Times New Roman" panose="02020603050405020304" pitchFamily="18" charset="0"/>
               <a:cs typeface="Times New Roman" panose="02020603050405020304" pitchFamily="18" charset="0"/>
@@ -9386,10 +9386,10 @@
       </p:sp>
       <p:sp>
         <p:nvSpPr>
-          <p:cNvPr id="146" name="Rectangle 145">
+          <p:cNvPr id="145" name="Rectangle 144">
             <a:extLst>
               <a:ext uri="{FF2B5EF4-FFF2-40B4-BE49-F238E27FC236}">
-                <a16:creationId xmlns:a16="http://schemas.microsoft.com/office/drawing/2014/main" id="{831EFE87-5954-79FB-5410-F4BC8563FCDF}"/>
+                <a16:creationId xmlns:a16="http://schemas.microsoft.com/office/drawing/2014/main" id="{196DCF3C-1E9F-84BF-A1CB-74EFF6943139}"/>
               </a:ext>
             </a:extLst>
           </p:cNvPr>
@@ -9398,7 +9398,7 @@
         </p:nvSpPr>
         <p:spPr>
           <a:xfrm>
-            <a:off x="18827260" y="9759909"/>
+            <a:off x="18822094" y="4285983"/>
             <a:ext cx="1819398" cy="877223"/>
           </a:xfrm>
           <a:prstGeom prst="rect">
@@ -9442,7 +9442,7 @@
                 <a:latin typeface="Times New Roman" panose="02020603050405020304" pitchFamily="18" charset="0"/>
                 <a:cs typeface="Times New Roman" panose="02020603050405020304" pitchFamily="18" charset="0"/>
               </a:rPr>
-              <a:t>M</a:t>
+              <a:t>N</a:t>
             </a:r>
             <a:r>
               <a:rPr lang="en-US" sz="3000" b="1" baseline="-25000" dirty="0">
@@ -9452,7 +9452,7 @@
                 <a:latin typeface="Times New Roman" panose="02020603050405020304" pitchFamily="18" charset="0"/>
                 <a:cs typeface="Times New Roman" panose="02020603050405020304" pitchFamily="18" charset="0"/>
               </a:rPr>
-              <a:t>area</a:t>
+              <a:t>mass</a:t>
             </a:r>
             <a:endParaRPr lang="en-US" sz="3000" b="1" i="1" dirty="0">
               <a:solidFill>
@@ -9466,10 +9466,10 @@
       </p:sp>
       <p:sp>
         <p:nvSpPr>
-          <p:cNvPr id="145" name="Rectangle 144">
+          <p:cNvPr id="151" name="Rectangle 150">
             <a:extLst>
               <a:ext uri="{FF2B5EF4-FFF2-40B4-BE49-F238E27FC236}">
-                <a16:creationId xmlns:a16="http://schemas.microsoft.com/office/drawing/2014/main" id="{196DCF3C-1E9F-84BF-A1CB-74EFF6943139}"/>
+                <a16:creationId xmlns:a16="http://schemas.microsoft.com/office/drawing/2014/main" id="{52423B29-35B5-9B6F-567C-E9C20E59598B}"/>
               </a:ext>
             </a:extLst>
           </p:cNvPr>
@@ -9478,7 +9478,7 @@
         </p:nvSpPr>
         <p:spPr>
           <a:xfrm>
-            <a:off x="18822094" y="4285983"/>
+            <a:off x="14258417" y="4291351"/>
             <a:ext cx="1819398" cy="877223"/>
           </a:xfrm>
           <a:prstGeom prst="rect">
@@ -9522,86 +9522,6 @@
                 <a:latin typeface="Times New Roman" panose="02020603050405020304" pitchFamily="18" charset="0"/>
                 <a:cs typeface="Times New Roman" panose="02020603050405020304" pitchFamily="18" charset="0"/>
               </a:rPr>
-              <a:t>N</a:t>
-            </a:r>
-            <a:r>
-              <a:rPr lang="en-US" sz="3000" b="1" baseline="-25000" dirty="0">
-                <a:solidFill>
-                  <a:schemeClr val="tx1"/>
-                </a:solidFill>
-                <a:latin typeface="Times New Roman" panose="02020603050405020304" pitchFamily="18" charset="0"/>
-                <a:cs typeface="Times New Roman" panose="02020603050405020304" pitchFamily="18" charset="0"/>
-              </a:rPr>
-              <a:t>mass</a:t>
-            </a:r>
-            <a:endParaRPr lang="en-US" sz="3000" b="1" i="1" dirty="0">
-              <a:solidFill>
-                <a:schemeClr val="tx1"/>
-              </a:solidFill>
-              <a:latin typeface="Times New Roman" panose="02020603050405020304" pitchFamily="18" charset="0"/>
-              <a:cs typeface="Times New Roman" panose="02020603050405020304" pitchFamily="18" charset="0"/>
-            </a:endParaRPr>
-          </a:p>
-        </p:txBody>
-      </p:sp>
-      <p:sp>
-        <p:nvSpPr>
-          <p:cNvPr id="151" name="Rectangle 150">
-            <a:extLst>
-              <a:ext uri="{FF2B5EF4-FFF2-40B4-BE49-F238E27FC236}">
-                <a16:creationId xmlns:a16="http://schemas.microsoft.com/office/drawing/2014/main" id="{52423B29-35B5-9B6F-567C-E9C20E59598B}"/>
-              </a:ext>
-            </a:extLst>
-          </p:cNvPr>
-          <p:cNvSpPr/>
-          <p:nvPr/>
-        </p:nvSpPr>
-        <p:spPr>
-          <a:xfrm>
-            <a:off x="14258417" y="4291351"/>
-            <a:ext cx="1819398" cy="877223"/>
-          </a:xfrm>
-          <a:prstGeom prst="rect">
-            <a:avLst/>
-          </a:prstGeom>
-          <a:solidFill>
-            <a:schemeClr val="bg1"/>
-          </a:solidFill>
-          <a:ln w="38100">
-            <a:solidFill>
-              <a:schemeClr val="tx1"/>
-            </a:solidFill>
-          </a:ln>
-        </p:spPr>
-        <p:style>
-          <a:lnRef idx="2">
-            <a:schemeClr val="accent1">
-              <a:shade val="50000"/>
-            </a:schemeClr>
-          </a:lnRef>
-          <a:fillRef idx="1">
-            <a:schemeClr val="accent1"/>
-          </a:fillRef>
-          <a:effectRef idx="0">
-            <a:schemeClr val="accent1"/>
-          </a:effectRef>
-          <a:fontRef idx="minor">
-            <a:schemeClr val="lt1"/>
-          </a:fontRef>
-        </p:style>
-        <p:txBody>
-          <a:bodyPr rtlCol="0" anchor="ctr"/>
-          <a:lstStyle/>
-          <a:p>
-            <a:pPr algn="ctr"/>
-            <a:r>
-              <a:rPr lang="en-US" sz="3000" b="1" i="1" dirty="0">
-                <a:solidFill>
-                  <a:schemeClr val="tx1"/>
-                </a:solidFill>
-                <a:latin typeface="Times New Roman" panose="02020603050405020304" pitchFamily="18" charset="0"/>
-                <a:cs typeface="Times New Roman" panose="02020603050405020304" pitchFamily="18" charset="0"/>
-              </a:rPr>
               <a:t>VPD</a:t>
             </a:r>
             <a:r>
@@ -9613,76 +9533,6 @@
                 <a:cs typeface="Times New Roman" panose="02020603050405020304" pitchFamily="18" charset="0"/>
               </a:rPr>
               <a:t>4</a:t>
-            </a:r>
-            <a:endParaRPr lang="en-US" sz="3000" b="1" dirty="0">
-              <a:solidFill>
-                <a:schemeClr val="tx1"/>
-              </a:solidFill>
-              <a:latin typeface="Times New Roman" panose="02020603050405020304" pitchFamily="18" charset="0"/>
-              <a:cs typeface="Times New Roman" panose="02020603050405020304" pitchFamily="18" charset="0"/>
-            </a:endParaRPr>
-          </a:p>
-        </p:txBody>
-      </p:sp>
-      <p:sp>
-        <p:nvSpPr>
-          <p:cNvPr id="144" name="Rectangle 143">
-            <a:extLst>
-              <a:ext uri="{FF2B5EF4-FFF2-40B4-BE49-F238E27FC236}">
-                <a16:creationId xmlns:a16="http://schemas.microsoft.com/office/drawing/2014/main" id="{A78B38F8-81B3-D1FA-0AD1-5773256590EC}"/>
-              </a:ext>
-            </a:extLst>
-          </p:cNvPr>
-          <p:cNvSpPr/>
-          <p:nvPr/>
-        </p:nvSpPr>
-        <p:spPr>
-          <a:xfrm>
-            <a:off x="5139575" y="9759909"/>
-            <a:ext cx="1819398" cy="877223"/>
-          </a:xfrm>
-          <a:prstGeom prst="rect">
-            <a:avLst/>
-          </a:prstGeom>
-          <a:solidFill>
-            <a:schemeClr val="bg1"/>
-          </a:solidFill>
-          <a:ln w="38100">
-            <a:solidFill>
-              <a:schemeClr val="tx1"/>
-            </a:solidFill>
-          </a:ln>
-        </p:spPr>
-        <p:style>
-          <a:lnRef idx="2">
-            <a:schemeClr val="accent1">
-              <a:shade val="50000"/>
-            </a:schemeClr>
-          </a:lnRef>
-          <a:fillRef idx="1">
-            <a:schemeClr val="accent1"/>
-          </a:fillRef>
-          <a:effectRef idx="0">
-            <a:schemeClr val="accent1"/>
-          </a:effectRef>
-          <a:fontRef idx="minor">
-            <a:schemeClr val="lt1"/>
-          </a:fontRef>
-        </p:style>
-        <p:txBody>
-          <a:bodyPr rtlCol="0" anchor="ctr"/>
-          <a:lstStyle/>
-          <a:p>
-            <a:pPr algn="ctr"/>
-            <a:r>
-              <a:rPr lang="en-US" sz="3000" b="1" i="1" dirty="0">
-                <a:solidFill>
-                  <a:schemeClr val="tx1"/>
-                </a:solidFill>
-                <a:latin typeface="Times New Roman" panose="02020603050405020304" pitchFamily="18" charset="0"/>
-                <a:cs typeface="Times New Roman" panose="02020603050405020304" pitchFamily="18" charset="0"/>
-              </a:rPr>
-              <a:t>Soil N</a:t>
             </a:r>
             <a:endParaRPr lang="en-US" sz="3000" b="1" dirty="0">
               <a:solidFill>
@@ -9705,26 +9555,24 @@
           </p:cNvPr>
           <p:cNvCxnSpPr>
             <a:cxnSpLocks/>
-            <a:stCxn id="149" idx="3"/>
-            <a:endCxn id="145" idx="1"/>
           </p:cNvCxnSpPr>
           <p:nvPr/>
         </p:nvCxnSpPr>
         <p:spPr>
           <a:xfrm flipV="1">
-            <a:off x="16077815" y="4724595"/>
-            <a:ext cx="2744279" cy="2747095"/>
+            <a:off x="15792830" y="4741527"/>
+            <a:ext cx="3012332" cy="2517656"/>
           </a:xfrm>
           <a:prstGeom prst="straightConnector1">
             <a:avLst/>
           </a:prstGeom>
-          <a:ln w="12700">
+          <a:ln w="26797">
             <a:solidFill>
-              <a:schemeClr val="bg1">
-                <a:lumMod val="65000"/>
+              <a:schemeClr val="accent1">
+                <a:lumMod val="75000"/>
               </a:schemeClr>
             </a:solidFill>
-            <a:prstDash val="dash"/>
+            <a:prstDash val="solid"/>
             <a:tailEnd type="triangle"/>
           </a:ln>
         </p:spPr>
@@ -9795,7 +9643,7 @@
         </p:nvGrpSpPr>
         <p:grpSpPr>
           <a:xfrm>
-            <a:off x="9065503" y="13742842"/>
+            <a:off x="9067739" y="12143162"/>
             <a:ext cx="7650057" cy="1604907"/>
             <a:chOff x="9849892" y="14833724"/>
             <a:chExt cx="7650057" cy="1604907"/>
@@ -10667,13 +10515,12 @@
           </p:cNvPr>
           <p:cNvCxnSpPr>
             <a:cxnSpLocks/>
-            <a:stCxn id="150" idx="3"/>
           </p:cNvCxnSpPr>
           <p:nvPr/>
         </p:nvCxnSpPr>
         <p:spPr>
           <a:xfrm>
-            <a:off x="6958973" y="4724595"/>
+            <a:off x="6947685" y="4718951"/>
             <a:ext cx="2748749" cy="2294570"/>
           </a:xfrm>
           <a:prstGeom prst="straightConnector1">
@@ -10715,15 +10562,13 @@
           </p:cNvPr>
           <p:cNvCxnSpPr>
             <a:cxnSpLocks/>
-            <a:stCxn id="152" idx="0"/>
-            <a:endCxn id="148" idx="2"/>
           </p:cNvCxnSpPr>
           <p:nvPr/>
         </p:nvCxnSpPr>
         <p:spPr>
-          <a:xfrm flipV="1">
-            <a:off x="10612951" y="7910299"/>
-            <a:ext cx="4470" cy="1847981"/>
+          <a:xfrm>
+            <a:off x="10608695" y="5169709"/>
+            <a:ext cx="8726" cy="1846435"/>
           </a:xfrm>
           <a:prstGeom prst="straightConnector1">
             <a:avLst/>
@@ -10825,10 +10670,10 @@
       </p:sp>
       <p:sp>
         <p:nvSpPr>
-          <p:cNvPr id="152" name="Rectangle 151">
+          <p:cNvPr id="149" name="Rectangle 148">
             <a:extLst>
               <a:ext uri="{FF2B5EF4-FFF2-40B4-BE49-F238E27FC236}">
-                <a16:creationId xmlns:a16="http://schemas.microsoft.com/office/drawing/2014/main" id="{2D17192C-937C-49F2-AB55-CCF25B817752}"/>
+                <a16:creationId xmlns:a16="http://schemas.microsoft.com/office/drawing/2014/main" id="{37E4791A-A4FE-F459-D539-AC5C8696DD32}"/>
               </a:ext>
             </a:extLst>
           </p:cNvPr>
@@ -10837,7 +10682,7 @@
         </p:nvSpPr>
         <p:spPr>
           <a:xfrm>
-            <a:off x="9703252" y="9758280"/>
+            <a:off x="14258417" y="7033078"/>
             <a:ext cx="1819398" cy="877223"/>
           </a:xfrm>
           <a:prstGeom prst="rect">
@@ -10881,86 +10726,6 @@
                 <a:latin typeface="Times New Roman" panose="02020603050405020304" pitchFamily="18" charset="0"/>
                 <a:cs typeface="Times New Roman" panose="02020603050405020304" pitchFamily="18" charset="0"/>
               </a:rPr>
-              <a:t>N</a:t>
-            </a:r>
-            <a:r>
-              <a:rPr lang="en-US" sz="3000" b="1" baseline="-25000" dirty="0">
-                <a:solidFill>
-                  <a:schemeClr val="tx1"/>
-                </a:solidFill>
-                <a:latin typeface="Times New Roman" panose="02020603050405020304" pitchFamily="18" charset="0"/>
-                <a:cs typeface="Times New Roman" panose="02020603050405020304" pitchFamily="18" charset="0"/>
-              </a:rPr>
-              <a:t>fixer</a:t>
-            </a:r>
-            <a:endParaRPr lang="en-US" sz="3000" b="1" i="1" dirty="0">
-              <a:solidFill>
-                <a:schemeClr val="tx1"/>
-              </a:solidFill>
-              <a:latin typeface="Times New Roman" panose="02020603050405020304" pitchFamily="18" charset="0"/>
-              <a:cs typeface="Times New Roman" panose="02020603050405020304" pitchFamily="18" charset="0"/>
-            </a:endParaRPr>
-          </a:p>
-        </p:txBody>
-      </p:sp>
-      <p:sp>
-        <p:nvSpPr>
-          <p:cNvPr id="149" name="Rectangle 148">
-            <a:extLst>
-              <a:ext uri="{FF2B5EF4-FFF2-40B4-BE49-F238E27FC236}">
-                <a16:creationId xmlns:a16="http://schemas.microsoft.com/office/drawing/2014/main" id="{37E4791A-A4FE-F459-D539-AC5C8696DD32}"/>
-              </a:ext>
-            </a:extLst>
-          </p:cNvPr>
-          <p:cNvSpPr/>
-          <p:nvPr/>
-        </p:nvSpPr>
-        <p:spPr>
-          <a:xfrm>
-            <a:off x="14258417" y="7033078"/>
-            <a:ext cx="1819398" cy="877223"/>
-          </a:xfrm>
-          <a:prstGeom prst="rect">
-            <a:avLst/>
-          </a:prstGeom>
-          <a:solidFill>
-            <a:schemeClr val="bg1"/>
-          </a:solidFill>
-          <a:ln w="38100">
-            <a:solidFill>
-              <a:schemeClr val="tx1"/>
-            </a:solidFill>
-          </a:ln>
-        </p:spPr>
-        <p:style>
-          <a:lnRef idx="2">
-            <a:schemeClr val="accent1">
-              <a:shade val="50000"/>
-            </a:schemeClr>
-          </a:lnRef>
-          <a:fillRef idx="1">
-            <a:schemeClr val="accent1"/>
-          </a:fillRef>
-          <a:effectRef idx="0">
-            <a:schemeClr val="accent1"/>
-          </a:effectRef>
-          <a:fontRef idx="minor">
-            <a:schemeClr val="lt1"/>
-          </a:fontRef>
-        </p:style>
-        <p:txBody>
-          <a:bodyPr rtlCol="0" anchor="ctr"/>
-          <a:lstStyle/>
-          <a:p>
-            <a:pPr algn="ctr"/>
-            <a:r>
-              <a:rPr lang="en-US" sz="3000" b="1" i="1" dirty="0">
-                <a:solidFill>
-                  <a:schemeClr val="tx1"/>
-                </a:solidFill>
-                <a:latin typeface="Times New Roman" panose="02020603050405020304" pitchFamily="18" charset="0"/>
-                <a:cs typeface="Times New Roman" panose="02020603050405020304" pitchFamily="18" charset="0"/>
-              </a:rPr>
               <a:t>C</a:t>
             </a:r>
             <a:r>
@@ -10996,57 +10761,6 @@
           </a:p>
         </p:txBody>
       </p:sp>
-      <p:cxnSp>
-        <p:nvCxnSpPr>
-          <p:cNvPr id="24" name="Elbow Connector 23">
-            <a:extLst>
-              <a:ext uri="{FF2B5EF4-FFF2-40B4-BE49-F238E27FC236}">
-                <a16:creationId xmlns:a16="http://schemas.microsoft.com/office/drawing/2014/main" id="{60C8DD06-DA23-8938-44D0-F43CB30206D5}"/>
-              </a:ext>
-            </a:extLst>
-          </p:cNvPr>
-          <p:cNvCxnSpPr>
-            <a:cxnSpLocks/>
-          </p:cNvCxnSpPr>
-          <p:nvPr/>
-        </p:nvCxnSpPr>
-        <p:spPr>
-          <a:xfrm rot="10800000" flipH="1">
-            <a:off x="5139574" y="7644040"/>
-            <a:ext cx="15501917" cy="2740744"/>
-          </a:xfrm>
-          <a:prstGeom prst="bentConnector5">
-            <a:avLst>
-              <a:gd name="adj1" fmla="val -4315"/>
-              <a:gd name="adj2" fmla="val -85924"/>
-              <a:gd name="adj3" fmla="val 101475"/>
-            </a:avLst>
-          </a:prstGeom>
-          <a:ln w="12700">
-            <a:solidFill>
-              <a:schemeClr val="bg1">
-                <a:lumMod val="65000"/>
-              </a:schemeClr>
-            </a:solidFill>
-            <a:prstDash val="dash"/>
-            <a:tailEnd type="triangle"/>
-          </a:ln>
-        </p:spPr>
-        <p:style>
-          <a:lnRef idx="1">
-            <a:schemeClr val="accent1"/>
-          </a:lnRef>
-          <a:fillRef idx="0">
-            <a:schemeClr val="accent1"/>
-          </a:fillRef>
-          <a:effectRef idx="0">
-            <a:schemeClr val="accent1"/>
-          </a:effectRef>
-          <a:fontRef idx="minor">
-            <a:schemeClr val="tx1"/>
-          </a:fontRef>
-        </p:style>
-      </p:cxnSp>
       <p:cxnSp>
         <p:nvCxnSpPr>
           <p:cNvPr id="35" name="Elbow Connector 34">
@@ -11057,19 +10771,18 @@
             </a:extLst>
           </p:cNvPr>
           <p:cNvCxnSpPr>
-            <a:stCxn id="144" idx="2"/>
-            <a:endCxn id="146" idx="2"/>
+            <a:cxnSpLocks/>
           </p:cNvCxnSpPr>
           <p:nvPr/>
         </p:nvCxnSpPr>
         <p:spPr>
           <a:xfrm rot="16200000" flipH="1">
-            <a:off x="12893116" y="3793289"/>
+            <a:off x="12893116" y="3798933"/>
             <a:ext cx="12700" cy="13687685"/>
           </a:xfrm>
           <a:prstGeom prst="bentConnector3">
             <a:avLst>
-              <a:gd name="adj1" fmla="val 7133339"/>
+              <a:gd name="adj1" fmla="val 2959425"/>
             </a:avLst>
           </a:prstGeom>
           <a:ln w="47244">
@@ -11105,22 +10818,21 @@
           </p:cNvPr>
           <p:cNvCxnSpPr>
             <a:cxnSpLocks/>
-            <a:endCxn id="145" idx="0"/>
           </p:cNvCxnSpPr>
           <p:nvPr/>
         </p:nvCxnSpPr>
         <p:spPr>
-          <a:xfrm flipV="1">
-            <a:off x="5139575" y="4285983"/>
-            <a:ext cx="14592218" cy="5743208"/>
+          <a:xfrm rot="10800000" flipH="1">
+            <a:off x="5417867" y="4269051"/>
+            <a:ext cx="14592218" cy="5912538"/>
           </a:xfrm>
           <a:prstGeom prst="bentConnector4">
             <a:avLst>
-              <a:gd name="adj1" fmla="val -4524"/>
-              <a:gd name="adj2" fmla="val 111646"/>
+              <a:gd name="adj1" fmla="val -4110"/>
+              <a:gd name="adj2" fmla="val 117091"/>
             </a:avLst>
           </a:prstGeom>
-          <a:ln w="57150">
+          <a:ln w="58547">
             <a:solidFill>
               <a:schemeClr val="accent1">
                 <a:lumMod val="75000"/>
@@ -11144,6 +10856,284 @@
           </a:fontRef>
         </p:style>
       </p:cxnSp>
+      <p:cxnSp>
+        <p:nvCxnSpPr>
+          <p:cNvPr id="39" name="Elbow Connector 38">
+            <a:extLst>
+              <a:ext uri="{FF2B5EF4-FFF2-40B4-BE49-F238E27FC236}">
+                <a16:creationId xmlns:a16="http://schemas.microsoft.com/office/drawing/2014/main" id="{76C9AC02-5667-9947-5F6F-6A46E82BFB4E}"/>
+              </a:ext>
+            </a:extLst>
+          </p:cNvPr>
+          <p:cNvCxnSpPr>
+            <a:cxnSpLocks/>
+          </p:cNvCxnSpPr>
+          <p:nvPr/>
+        </p:nvCxnSpPr>
+        <p:spPr>
+          <a:xfrm rot="5400000" flipH="1" flipV="1">
+            <a:off x="15158527" y="-275136"/>
+            <a:ext cx="23435" cy="9123098"/>
+          </a:xfrm>
+          <a:prstGeom prst="bentConnector3">
+            <a:avLst>
+              <a:gd name="adj1" fmla="val 2771922"/>
+            </a:avLst>
+          </a:prstGeom>
+          <a:ln w="77470">
+            <a:solidFill>
+              <a:schemeClr val="accent1">
+                <a:lumMod val="75000"/>
+              </a:schemeClr>
+            </a:solidFill>
+            <a:tailEnd type="triangle"/>
+          </a:ln>
+        </p:spPr>
+        <p:style>
+          <a:lnRef idx="1">
+            <a:schemeClr val="accent1"/>
+          </a:lnRef>
+          <a:fillRef idx="0">
+            <a:schemeClr val="accent1"/>
+          </a:fillRef>
+          <a:effectRef idx="0">
+            <a:schemeClr val="accent1"/>
+          </a:effectRef>
+          <a:fontRef idx="minor">
+            <a:schemeClr val="tx1"/>
+          </a:fontRef>
+        </p:style>
+      </p:cxnSp>
+      <p:sp>
+        <p:nvSpPr>
+          <p:cNvPr id="144" name="Rectangle 143">
+            <a:extLst>
+              <a:ext uri="{FF2B5EF4-FFF2-40B4-BE49-F238E27FC236}">
+                <a16:creationId xmlns:a16="http://schemas.microsoft.com/office/drawing/2014/main" id="{A78B38F8-81B3-D1FA-0AD1-5773256590EC}"/>
+              </a:ext>
+            </a:extLst>
+          </p:cNvPr>
+          <p:cNvSpPr/>
+          <p:nvPr/>
+        </p:nvSpPr>
+        <p:spPr>
+          <a:xfrm>
+            <a:off x="5139575" y="9759909"/>
+            <a:ext cx="1819398" cy="877223"/>
+          </a:xfrm>
+          <a:prstGeom prst="rect">
+            <a:avLst/>
+          </a:prstGeom>
+          <a:solidFill>
+            <a:schemeClr val="bg1"/>
+          </a:solidFill>
+          <a:ln w="38100">
+            <a:solidFill>
+              <a:schemeClr val="tx1"/>
+            </a:solidFill>
+          </a:ln>
+        </p:spPr>
+        <p:style>
+          <a:lnRef idx="2">
+            <a:schemeClr val="accent1">
+              <a:shade val="50000"/>
+            </a:schemeClr>
+          </a:lnRef>
+          <a:fillRef idx="1">
+            <a:schemeClr val="accent1"/>
+          </a:fillRef>
+          <a:effectRef idx="0">
+            <a:schemeClr val="accent1"/>
+          </a:effectRef>
+          <a:fontRef idx="minor">
+            <a:schemeClr val="lt1"/>
+          </a:fontRef>
+        </p:style>
+        <p:txBody>
+          <a:bodyPr rtlCol="0" anchor="ctr"/>
+          <a:lstStyle/>
+          <a:p>
+            <a:pPr algn="ctr"/>
+            <a:r>
+              <a:rPr lang="en-US" sz="3000" b="1" i="1" dirty="0">
+                <a:solidFill>
+                  <a:schemeClr val="tx1"/>
+                </a:solidFill>
+                <a:latin typeface="Times New Roman" panose="02020603050405020304" pitchFamily="18" charset="0"/>
+                <a:cs typeface="Times New Roman" panose="02020603050405020304" pitchFamily="18" charset="0"/>
+              </a:rPr>
+              <a:t>Soil N</a:t>
+            </a:r>
+            <a:endParaRPr lang="en-US" sz="3000" b="1" dirty="0">
+              <a:solidFill>
+                <a:schemeClr val="tx1"/>
+              </a:solidFill>
+              <a:latin typeface="Times New Roman" panose="02020603050405020304" pitchFamily="18" charset="0"/>
+              <a:cs typeface="Times New Roman" panose="02020603050405020304" pitchFamily="18" charset="0"/>
+            </a:endParaRPr>
+          </a:p>
+        </p:txBody>
+      </p:sp>
+      <p:sp>
+        <p:nvSpPr>
+          <p:cNvPr id="152" name="Rectangle 151">
+            <a:extLst>
+              <a:ext uri="{FF2B5EF4-FFF2-40B4-BE49-F238E27FC236}">
+                <a16:creationId xmlns:a16="http://schemas.microsoft.com/office/drawing/2014/main" id="{2D17192C-937C-49F2-AB55-CCF25B817752}"/>
+              </a:ext>
+            </a:extLst>
+          </p:cNvPr>
+          <p:cNvSpPr/>
+          <p:nvPr/>
+        </p:nvSpPr>
+        <p:spPr>
+          <a:xfrm>
+            <a:off x="9698996" y="4309418"/>
+            <a:ext cx="1819398" cy="877223"/>
+          </a:xfrm>
+          <a:prstGeom prst="rect">
+            <a:avLst/>
+          </a:prstGeom>
+          <a:solidFill>
+            <a:schemeClr val="bg1"/>
+          </a:solidFill>
+          <a:ln w="38100">
+            <a:solidFill>
+              <a:schemeClr val="tx1"/>
+            </a:solidFill>
+          </a:ln>
+        </p:spPr>
+        <p:style>
+          <a:lnRef idx="2">
+            <a:schemeClr val="accent1">
+              <a:shade val="50000"/>
+            </a:schemeClr>
+          </a:lnRef>
+          <a:fillRef idx="1">
+            <a:schemeClr val="accent1"/>
+          </a:fillRef>
+          <a:effectRef idx="0">
+            <a:schemeClr val="accent1"/>
+          </a:effectRef>
+          <a:fontRef idx="minor">
+            <a:schemeClr val="lt1"/>
+          </a:fontRef>
+        </p:style>
+        <p:txBody>
+          <a:bodyPr rtlCol="0" anchor="ctr"/>
+          <a:lstStyle/>
+          <a:p>
+            <a:pPr algn="ctr"/>
+            <a:r>
+              <a:rPr lang="en-US" sz="3000" b="1" i="1" dirty="0">
+                <a:solidFill>
+                  <a:schemeClr val="tx1"/>
+                </a:solidFill>
+                <a:latin typeface="Times New Roman" panose="02020603050405020304" pitchFamily="18" charset="0"/>
+                <a:cs typeface="Times New Roman" panose="02020603050405020304" pitchFamily="18" charset="0"/>
+              </a:rPr>
+              <a:t>N</a:t>
+            </a:r>
+            <a:r>
+              <a:rPr lang="en-US" sz="3000" b="1" baseline="-25000" dirty="0">
+                <a:solidFill>
+                  <a:schemeClr val="tx1"/>
+                </a:solidFill>
+                <a:latin typeface="Times New Roman" panose="02020603050405020304" pitchFamily="18" charset="0"/>
+                <a:cs typeface="Times New Roman" panose="02020603050405020304" pitchFamily="18" charset="0"/>
+              </a:rPr>
+              <a:t>fixer</a:t>
+            </a:r>
+            <a:endParaRPr lang="en-US" sz="3000" b="1" i="1" dirty="0">
+              <a:solidFill>
+                <a:schemeClr val="tx1"/>
+              </a:solidFill>
+              <a:latin typeface="Times New Roman" panose="02020603050405020304" pitchFamily="18" charset="0"/>
+              <a:cs typeface="Times New Roman" panose="02020603050405020304" pitchFamily="18" charset="0"/>
+            </a:endParaRPr>
+          </a:p>
+        </p:txBody>
+      </p:sp>
+      <p:sp>
+        <p:nvSpPr>
+          <p:cNvPr id="150" name="Rectangle 149">
+            <a:extLst>
+              <a:ext uri="{FF2B5EF4-FFF2-40B4-BE49-F238E27FC236}">
+                <a16:creationId xmlns:a16="http://schemas.microsoft.com/office/drawing/2014/main" id="{EC6E95A2-A99B-1EAD-2343-C2D4995139F9}"/>
+              </a:ext>
+            </a:extLst>
+          </p:cNvPr>
+          <p:cNvSpPr/>
+          <p:nvPr/>
+        </p:nvSpPr>
+        <p:spPr>
+          <a:xfrm>
+            <a:off x="5139575" y="4285983"/>
+            <a:ext cx="1819398" cy="877223"/>
+          </a:xfrm>
+          <a:prstGeom prst="rect">
+            <a:avLst/>
+          </a:prstGeom>
+          <a:solidFill>
+            <a:schemeClr val="bg1"/>
+          </a:solidFill>
+          <a:ln w="38100">
+            <a:solidFill>
+              <a:schemeClr val="tx1"/>
+            </a:solidFill>
+          </a:ln>
+        </p:spPr>
+        <p:style>
+          <a:lnRef idx="2">
+            <a:schemeClr val="accent1">
+              <a:shade val="50000"/>
+            </a:schemeClr>
+          </a:lnRef>
+          <a:fillRef idx="1">
+            <a:schemeClr val="accent1"/>
+          </a:fillRef>
+          <a:effectRef idx="0">
+            <a:schemeClr val="accent1"/>
+          </a:effectRef>
+          <a:fontRef idx="minor">
+            <a:schemeClr val="lt1"/>
+          </a:fontRef>
+        </p:style>
+        <p:txBody>
+          <a:bodyPr rtlCol="0" anchor="ctr"/>
+          <a:lstStyle/>
+          <a:p>
+            <a:pPr algn="ctr"/>
+            <a:r>
+              <a:rPr lang="en-US" sz="3000" b="1" i="1" dirty="0">
+                <a:solidFill>
+                  <a:schemeClr val="tx1"/>
+                </a:solidFill>
+                <a:latin typeface="Times New Roman" panose="02020603050405020304" pitchFamily="18" charset="0"/>
+                <a:cs typeface="Times New Roman" panose="02020603050405020304" pitchFamily="18" charset="0"/>
+              </a:rPr>
+              <a:t>SM</a:t>
+            </a:r>
+            <a:r>
+              <a:rPr lang="en-US" sz="3000" b="1" baseline="-25000" dirty="0">
+                <a:solidFill>
+                  <a:schemeClr val="tx1"/>
+                </a:solidFill>
+                <a:latin typeface="Times New Roman" panose="02020603050405020304" pitchFamily="18" charset="0"/>
+                <a:cs typeface="Times New Roman" panose="02020603050405020304" pitchFamily="18" charset="0"/>
+              </a:rPr>
+              <a:t>90</a:t>
+            </a:r>
+            <a:endParaRPr lang="en-US" sz="3000" b="1" dirty="0">
+              <a:solidFill>
+                <a:schemeClr val="tx1"/>
+              </a:solidFill>
+              <a:latin typeface="Times New Roman" panose="02020603050405020304" pitchFamily="18" charset="0"/>
+              <a:cs typeface="Times New Roman" panose="02020603050405020304" pitchFamily="18" charset="0"/>
+            </a:endParaRPr>
+          </a:p>
+        </p:txBody>
+      </p:sp>
     </p:spTree>
     <p:extLst>
       <p:ext uri="{BB962C8B-B14F-4D97-AF65-F5344CB8AC3E}">

</xml_diff>

<commit_message>
correct error in calculating beta, move d13C in air back to -8, start revising manuscript draft per comments from Nick
</commit_message>
<xml_diff>
--- a/working_drafts/figs/TXeco_SEM_ppt_fig.pptx
+++ b/working_drafts/figs/TXeco_SEM_ppt_fig.pptx
@@ -5,12 +5,11 @@
     <p:sldMasterId id="2147483708" r:id="rId1"/>
   </p:sldMasterIdLst>
   <p:notesMasterIdLst>
-    <p:notesMasterId r:id="rId5"/>
+    <p:notesMasterId r:id="rId4"/>
   </p:notesMasterIdLst>
   <p:sldIdLst>
     <p:sldId id="276" r:id="rId2"/>
-    <p:sldId id="277" r:id="rId3"/>
-    <p:sldId id="278" r:id="rId4"/>
+    <p:sldId id="278" r:id="rId3"/>
   </p:sldIdLst>
   <p:sldSz cx="27432000" cy="18288000"/>
   <p:notesSz cx="6858000" cy="9144000"/>
@@ -199,7 +198,7 @@
           <a:p>
             <a:fld id="{9C8338E3-F40D-F146-8D3B-4726E84D5200}" type="datetimeFigureOut">
               <a:rPr lang="en-US" smtClean="0"/>
-              <a:t>2/15/23</a:t>
+              <a:t>3/20/23</a:t>
             </a:fld>
             <a:endParaRPr lang="en-US"/>
           </a:p>
@@ -629,90 +628,6 @@
     </p:spTree>
     <p:extLst>
       <p:ext uri="{BB962C8B-B14F-4D97-AF65-F5344CB8AC3E}">
-        <p14:creationId xmlns:p14="http://schemas.microsoft.com/office/powerpoint/2010/main" val="3251322014"/>
-      </p:ext>
-    </p:extLst>
-  </p:cSld>
-  <p:clrMapOvr>
-    <a:masterClrMapping/>
-  </p:clrMapOvr>
-</p:notes>
-</file>
-
-<file path=ppt/notesSlides/notesSlide3.xml><?xml version="1.0" encoding="utf-8"?>
-<p:notes xmlns:a="http://schemas.openxmlformats.org/drawingml/2006/main" xmlns:r="http://schemas.openxmlformats.org/officeDocument/2006/relationships" xmlns:p="http://schemas.openxmlformats.org/presentationml/2006/main">
-  <p:cSld>
-    <p:spTree>
-      <p:nvGrpSpPr>
-        <p:cNvPr id="1" name=""/>
-        <p:cNvGrpSpPr/>
-        <p:nvPr/>
-      </p:nvGrpSpPr>
-      <p:grpSpPr>
-        <a:xfrm>
-          <a:off x="0" y="0"/>
-          <a:ext cx="0" cy="0"/>
-          <a:chOff x="0" y="0"/>
-          <a:chExt cx="0" cy="0"/>
-        </a:xfrm>
-      </p:grpSpPr>
-      <p:sp>
-        <p:nvSpPr>
-          <p:cNvPr id="2" name="Slide Image Placeholder 1"/>
-          <p:cNvSpPr>
-            <a:spLocks noGrp="1" noRot="1" noChangeAspect="1"/>
-          </p:cNvSpPr>
-          <p:nvPr>
-            <p:ph type="sldImg"/>
-          </p:nvPr>
-        </p:nvSpPr>
-        <p:spPr/>
-      </p:sp>
-      <p:sp>
-        <p:nvSpPr>
-          <p:cNvPr id="3" name="Notes Placeholder 2"/>
-          <p:cNvSpPr>
-            <a:spLocks noGrp="1"/>
-          </p:cNvSpPr>
-          <p:nvPr>
-            <p:ph type="body" idx="1"/>
-          </p:nvPr>
-        </p:nvSpPr>
-        <p:spPr/>
-        <p:txBody>
-          <a:bodyPr/>
-          <a:lstStyle/>
-          <a:p>
-            <a:endParaRPr lang="en-US" dirty="0"/>
-          </a:p>
-        </p:txBody>
-      </p:sp>
-      <p:sp>
-        <p:nvSpPr>
-          <p:cNvPr id="4" name="Slide Number Placeholder 3"/>
-          <p:cNvSpPr>
-            <a:spLocks noGrp="1"/>
-          </p:cNvSpPr>
-          <p:nvPr>
-            <p:ph type="sldNum" sz="quarter" idx="5"/>
-          </p:nvPr>
-        </p:nvSpPr>
-        <p:spPr/>
-        <p:txBody>
-          <a:bodyPr/>
-          <a:lstStyle/>
-          <a:p>
-            <a:fld id="{C2800238-33D2-A44F-8135-A0F534DB873D}" type="slidenum">
-              <a:rPr lang="en-US" smtClean="0"/>
-              <a:t>3</a:t>
-            </a:fld>
-            <a:endParaRPr lang="en-US"/>
-          </a:p>
-        </p:txBody>
-      </p:sp>
-    </p:spTree>
-    <p:extLst>
-      <p:ext uri="{BB962C8B-B14F-4D97-AF65-F5344CB8AC3E}">
         <p14:creationId xmlns:p14="http://schemas.microsoft.com/office/powerpoint/2010/main" val="3891430142"/>
       </p:ext>
     </p:extLst>
@@ -854,7 +769,7 @@
           <a:p>
             <a:fld id="{D3A28AA4-801E-B147-9E5C-6E6DBA6E23D1}" type="datetimeFigureOut">
               <a:rPr lang="en-US" smtClean="0"/>
-              <a:t>2/15/23</a:t>
+              <a:t>3/20/23</a:t>
             </a:fld>
             <a:endParaRPr lang="en-US"/>
           </a:p>
@@ -1024,7 +939,7 @@
           <a:p>
             <a:fld id="{D3A28AA4-801E-B147-9E5C-6E6DBA6E23D1}" type="datetimeFigureOut">
               <a:rPr lang="en-US" smtClean="0"/>
-              <a:t>2/15/23</a:t>
+              <a:t>3/20/23</a:t>
             </a:fld>
             <a:endParaRPr lang="en-US"/>
           </a:p>
@@ -1204,7 +1119,7 @@
           <a:p>
             <a:fld id="{D3A28AA4-801E-B147-9E5C-6E6DBA6E23D1}" type="datetimeFigureOut">
               <a:rPr lang="en-US" smtClean="0"/>
-              <a:t>2/15/23</a:t>
+              <a:t>3/20/23</a:t>
             </a:fld>
             <a:endParaRPr lang="en-US"/>
           </a:p>
@@ -1374,7 +1289,7 @@
           <a:p>
             <a:fld id="{D3A28AA4-801E-B147-9E5C-6E6DBA6E23D1}" type="datetimeFigureOut">
               <a:rPr lang="en-US" smtClean="0"/>
-              <a:t>2/15/23</a:t>
+              <a:t>3/20/23</a:t>
             </a:fld>
             <a:endParaRPr lang="en-US"/>
           </a:p>
@@ -1618,7 +1533,7 @@
           <a:p>
             <a:fld id="{D3A28AA4-801E-B147-9E5C-6E6DBA6E23D1}" type="datetimeFigureOut">
               <a:rPr lang="en-US" smtClean="0"/>
-              <a:t>2/15/23</a:t>
+              <a:t>3/20/23</a:t>
             </a:fld>
             <a:endParaRPr lang="en-US"/>
           </a:p>
@@ -1850,7 +1765,7 @@
           <a:p>
             <a:fld id="{D3A28AA4-801E-B147-9E5C-6E6DBA6E23D1}" type="datetimeFigureOut">
               <a:rPr lang="en-US" smtClean="0"/>
-              <a:t>2/15/23</a:t>
+              <a:t>3/20/23</a:t>
             </a:fld>
             <a:endParaRPr lang="en-US"/>
           </a:p>
@@ -2217,7 +2132,7 @@
           <a:p>
             <a:fld id="{D3A28AA4-801E-B147-9E5C-6E6DBA6E23D1}" type="datetimeFigureOut">
               <a:rPr lang="en-US" smtClean="0"/>
-              <a:t>2/15/23</a:t>
+              <a:t>3/20/23</a:t>
             </a:fld>
             <a:endParaRPr lang="en-US"/>
           </a:p>
@@ -2335,7 +2250,7 @@
           <a:p>
             <a:fld id="{D3A28AA4-801E-B147-9E5C-6E6DBA6E23D1}" type="datetimeFigureOut">
               <a:rPr lang="en-US" smtClean="0"/>
-              <a:t>2/15/23</a:t>
+              <a:t>3/20/23</a:t>
             </a:fld>
             <a:endParaRPr lang="en-US"/>
           </a:p>
@@ -2430,7 +2345,7 @@
           <a:p>
             <a:fld id="{D3A28AA4-801E-B147-9E5C-6E6DBA6E23D1}" type="datetimeFigureOut">
               <a:rPr lang="en-US" smtClean="0"/>
-              <a:t>2/15/23</a:t>
+              <a:t>3/20/23</a:t>
             </a:fld>
             <a:endParaRPr lang="en-US"/>
           </a:p>
@@ -2707,7 +2622,7 @@
           <a:p>
             <a:fld id="{D3A28AA4-801E-B147-9E5C-6E6DBA6E23D1}" type="datetimeFigureOut">
               <a:rPr lang="en-US" smtClean="0"/>
-              <a:t>2/15/23</a:t>
+              <a:t>3/20/23</a:t>
             </a:fld>
             <a:endParaRPr lang="en-US"/>
           </a:p>
@@ -2964,7 +2879,7 @@
           <a:p>
             <a:fld id="{D3A28AA4-801E-B147-9E5C-6E6DBA6E23D1}" type="datetimeFigureOut">
               <a:rPr lang="en-US" smtClean="0"/>
-              <a:t>2/15/23</a:t>
+              <a:t>3/20/23</a:t>
             </a:fld>
             <a:endParaRPr lang="en-US"/>
           </a:p>
@@ -3177,7 +3092,7 @@
           <a:p>
             <a:fld id="{D3A28AA4-801E-B147-9E5C-6E6DBA6E23D1}" type="datetimeFigureOut">
               <a:rPr lang="en-US" smtClean="0"/>
-              <a:t>2/15/23</a:t>
+              <a:t>3/20/23</a:t>
             </a:fld>
             <a:endParaRPr lang="en-US"/>
           </a:p>
@@ -5882,2560 +5797,6 @@
 <file path=ppt/slides/slide2.xml><?xml version="1.0" encoding="utf-8"?>
 <p:sld xmlns:a="http://schemas.openxmlformats.org/drawingml/2006/main" xmlns:r="http://schemas.openxmlformats.org/officeDocument/2006/relationships" xmlns:p="http://schemas.openxmlformats.org/presentationml/2006/main">
   <p:cSld>
-    <p:spTree>
-      <p:nvGrpSpPr>
-        <p:cNvPr id="1" name=""/>
-        <p:cNvGrpSpPr/>
-        <p:nvPr/>
-      </p:nvGrpSpPr>
-      <p:grpSpPr>
-        <a:xfrm>
-          <a:off x="0" y="0"/>
-          <a:ext cx="0" cy="0"/>
-          <a:chOff x="0" y="0"/>
-          <a:chExt cx="0" cy="0"/>
-        </a:xfrm>
-      </p:grpSpPr>
-      <p:sp>
-        <p:nvSpPr>
-          <p:cNvPr id="143" name="Rectangle 142">
-            <a:extLst>
-              <a:ext uri="{FF2B5EF4-FFF2-40B4-BE49-F238E27FC236}">
-                <a16:creationId xmlns:a16="http://schemas.microsoft.com/office/drawing/2014/main" id="{23213933-7EA2-A749-1F7B-2F2186FA569E}"/>
-              </a:ext>
-            </a:extLst>
-          </p:cNvPr>
-          <p:cNvSpPr/>
-          <p:nvPr/>
-        </p:nvSpPr>
-        <p:spPr>
-          <a:xfrm>
-            <a:off x="18822094" y="7019165"/>
-            <a:ext cx="1819398" cy="877223"/>
-          </a:xfrm>
-          <a:prstGeom prst="rect">
-            <a:avLst/>
-          </a:prstGeom>
-          <a:solidFill>
-            <a:schemeClr val="bg1"/>
-          </a:solidFill>
-          <a:ln w="38100">
-            <a:solidFill>
-              <a:schemeClr val="tx1"/>
-            </a:solidFill>
-          </a:ln>
-        </p:spPr>
-        <p:style>
-          <a:lnRef idx="2">
-            <a:schemeClr val="accent1">
-              <a:shade val="50000"/>
-            </a:schemeClr>
-          </a:lnRef>
-          <a:fillRef idx="1">
-            <a:schemeClr val="accent1"/>
-          </a:fillRef>
-          <a:effectRef idx="0">
-            <a:schemeClr val="accent1"/>
-          </a:effectRef>
-          <a:fontRef idx="minor">
-            <a:schemeClr val="lt1"/>
-          </a:fontRef>
-        </p:style>
-        <p:txBody>
-          <a:bodyPr rtlCol="0" anchor="ctr"/>
-          <a:lstStyle/>
-          <a:p>
-            <a:pPr algn="ctr"/>
-            <a:r>
-              <a:rPr lang="el-GR" sz="3000" b="1" i="1" dirty="0">
-                <a:solidFill>
-                  <a:schemeClr val="tx1"/>
-                </a:solidFill>
-                <a:latin typeface="Times New Roman" panose="02020603050405020304" pitchFamily="18" charset="0"/>
-                <a:cs typeface="Times New Roman" panose="02020603050405020304" pitchFamily="18" charset="0"/>
-              </a:rPr>
-              <a:t>Ν</a:t>
-            </a:r>
-            <a:r>
-              <a:rPr lang="en-US" sz="3000" b="1" baseline="-25000" dirty="0">
-                <a:solidFill>
-                  <a:schemeClr val="tx1"/>
-                </a:solidFill>
-                <a:latin typeface="Times New Roman" panose="02020603050405020304" pitchFamily="18" charset="0"/>
-                <a:cs typeface="Times New Roman" panose="02020603050405020304" pitchFamily="18" charset="0"/>
-              </a:rPr>
-              <a:t>area</a:t>
-            </a:r>
-            <a:endParaRPr lang="en-US" sz="3000" b="1" i="1" dirty="0">
-              <a:solidFill>
-                <a:schemeClr val="tx1"/>
-              </a:solidFill>
-              <a:latin typeface="Times New Roman" panose="02020603050405020304" pitchFamily="18" charset="0"/>
-              <a:cs typeface="Times New Roman" panose="02020603050405020304" pitchFamily="18" charset="0"/>
-            </a:endParaRPr>
-          </a:p>
-        </p:txBody>
-      </p:sp>
-      <p:cxnSp>
-        <p:nvCxnSpPr>
-          <p:cNvPr id="154" name="Straight Arrow Connector 153">
-            <a:extLst>
-              <a:ext uri="{FF2B5EF4-FFF2-40B4-BE49-F238E27FC236}">
-                <a16:creationId xmlns:a16="http://schemas.microsoft.com/office/drawing/2014/main" id="{706FE09F-1166-D3EA-09AE-6462ACA90433}"/>
-              </a:ext>
-            </a:extLst>
-          </p:cNvPr>
-          <p:cNvCxnSpPr>
-            <a:cxnSpLocks/>
-            <a:stCxn id="151" idx="1"/>
-            <a:endCxn id="150" idx="3"/>
-          </p:cNvCxnSpPr>
-          <p:nvPr/>
-        </p:nvCxnSpPr>
-        <p:spPr>
-          <a:xfrm flipH="1" flipV="1">
-            <a:off x="6958973" y="4724595"/>
-            <a:ext cx="2707333" cy="7531"/>
-          </a:xfrm>
-          <a:prstGeom prst="straightConnector1">
-            <a:avLst/>
-          </a:prstGeom>
-          <a:ln w="149098">
-            <a:solidFill>
-              <a:srgbClr val="C00000"/>
-            </a:solidFill>
-            <a:tailEnd type="triangle"/>
-          </a:ln>
-        </p:spPr>
-        <p:style>
-          <a:lnRef idx="1">
-            <a:schemeClr val="accent1"/>
-          </a:lnRef>
-          <a:fillRef idx="0">
-            <a:schemeClr val="accent1"/>
-          </a:fillRef>
-          <a:effectRef idx="0">
-            <a:schemeClr val="accent1"/>
-          </a:effectRef>
-          <a:fontRef idx="minor">
-            <a:schemeClr val="tx1"/>
-          </a:fontRef>
-        </p:style>
-      </p:cxnSp>
-      <p:cxnSp>
-        <p:nvCxnSpPr>
-          <p:cNvPr id="155" name="Straight Arrow Connector 154">
-            <a:extLst>
-              <a:ext uri="{FF2B5EF4-FFF2-40B4-BE49-F238E27FC236}">
-                <a16:creationId xmlns:a16="http://schemas.microsoft.com/office/drawing/2014/main" id="{E3174060-880C-85BE-973E-5A3CB9A219CC}"/>
-              </a:ext>
-            </a:extLst>
-          </p:cNvPr>
-          <p:cNvCxnSpPr>
-            <a:cxnSpLocks/>
-            <a:stCxn id="150" idx="2"/>
-            <a:endCxn id="144" idx="0"/>
-          </p:cNvCxnSpPr>
-          <p:nvPr/>
-        </p:nvCxnSpPr>
-        <p:spPr>
-          <a:xfrm>
-            <a:off x="6049274" y="5163206"/>
-            <a:ext cx="0" cy="4596703"/>
-          </a:xfrm>
-          <a:prstGeom prst="straightConnector1">
-            <a:avLst/>
-          </a:prstGeom>
-          <a:ln w="97790">
-            <a:solidFill>
-              <a:schemeClr val="accent1">
-                <a:lumMod val="75000"/>
-              </a:schemeClr>
-            </a:solidFill>
-            <a:tailEnd type="triangle"/>
-          </a:ln>
-        </p:spPr>
-        <p:style>
-          <a:lnRef idx="1">
-            <a:schemeClr val="accent1"/>
-          </a:lnRef>
-          <a:fillRef idx="0">
-            <a:schemeClr val="accent1"/>
-          </a:fillRef>
-          <a:effectRef idx="0">
-            <a:schemeClr val="accent1"/>
-          </a:effectRef>
-          <a:fontRef idx="minor">
-            <a:schemeClr val="tx1"/>
-          </a:fontRef>
-        </p:style>
-      </p:cxnSp>
-      <p:cxnSp>
-        <p:nvCxnSpPr>
-          <p:cNvPr id="162" name="Straight Arrow Connector 161">
-            <a:extLst>
-              <a:ext uri="{FF2B5EF4-FFF2-40B4-BE49-F238E27FC236}">
-                <a16:creationId xmlns:a16="http://schemas.microsoft.com/office/drawing/2014/main" id="{71E57B4B-E988-43AE-3D45-43FD109A5FB7}"/>
-              </a:ext>
-            </a:extLst>
-          </p:cNvPr>
-          <p:cNvCxnSpPr>
-            <a:cxnSpLocks/>
-            <a:endCxn id="148" idx="1"/>
-          </p:cNvCxnSpPr>
-          <p:nvPr/>
-        </p:nvCxnSpPr>
-        <p:spPr>
-          <a:xfrm flipV="1">
-            <a:off x="6701800" y="7471688"/>
-            <a:ext cx="3005922" cy="2477973"/>
-          </a:xfrm>
-          <a:prstGeom prst="straightConnector1">
-            <a:avLst/>
-          </a:prstGeom>
-          <a:ln w="48006">
-            <a:solidFill>
-              <a:srgbClr val="C00000"/>
-            </a:solidFill>
-            <a:tailEnd type="triangle"/>
-          </a:ln>
-        </p:spPr>
-        <p:style>
-          <a:lnRef idx="1">
-            <a:schemeClr val="accent1"/>
-          </a:lnRef>
-          <a:fillRef idx="0">
-            <a:schemeClr val="accent1"/>
-          </a:fillRef>
-          <a:effectRef idx="0">
-            <a:schemeClr val="accent1"/>
-          </a:effectRef>
-          <a:fontRef idx="minor">
-            <a:schemeClr val="tx1"/>
-          </a:fontRef>
-        </p:style>
-      </p:cxnSp>
-      <p:cxnSp>
-        <p:nvCxnSpPr>
-          <p:cNvPr id="165" name="Straight Arrow Connector 164">
-            <a:extLst>
-              <a:ext uri="{FF2B5EF4-FFF2-40B4-BE49-F238E27FC236}">
-                <a16:creationId xmlns:a16="http://schemas.microsoft.com/office/drawing/2014/main" id="{04CC1E2A-0496-1BB7-936C-437D17351894}"/>
-              </a:ext>
-            </a:extLst>
-          </p:cNvPr>
-          <p:cNvCxnSpPr>
-            <a:cxnSpLocks/>
-          </p:cNvCxnSpPr>
-          <p:nvPr/>
-        </p:nvCxnSpPr>
-        <p:spPr>
-          <a:xfrm>
-            <a:off x="11504857" y="7471687"/>
-            <a:ext cx="2731297" cy="2"/>
-          </a:xfrm>
-          <a:prstGeom prst="straightConnector1">
-            <a:avLst/>
-          </a:prstGeom>
-          <a:ln w="62102">
-            <a:solidFill>
-              <a:schemeClr val="accent1">
-                <a:lumMod val="75000"/>
-              </a:schemeClr>
-            </a:solidFill>
-            <a:tailEnd type="triangle"/>
-          </a:ln>
-        </p:spPr>
-        <p:style>
-          <a:lnRef idx="1">
-            <a:schemeClr val="accent1"/>
-          </a:lnRef>
-          <a:fillRef idx="0">
-            <a:schemeClr val="accent1"/>
-          </a:fillRef>
-          <a:effectRef idx="0">
-            <a:schemeClr val="accent1"/>
-          </a:effectRef>
-          <a:fontRef idx="minor">
-            <a:schemeClr val="tx1"/>
-          </a:fontRef>
-        </p:style>
-      </p:cxnSp>
-      <p:cxnSp>
-        <p:nvCxnSpPr>
-          <p:cNvPr id="178" name="Straight Arrow Connector 177">
-            <a:extLst>
-              <a:ext uri="{FF2B5EF4-FFF2-40B4-BE49-F238E27FC236}">
-                <a16:creationId xmlns:a16="http://schemas.microsoft.com/office/drawing/2014/main" id="{AD58EF09-8B95-4F31-0758-52C1BD1A684D}"/>
-              </a:ext>
-            </a:extLst>
-          </p:cNvPr>
-          <p:cNvCxnSpPr>
-            <a:cxnSpLocks/>
-            <a:stCxn id="145" idx="2"/>
-            <a:endCxn id="143" idx="0"/>
-          </p:cNvCxnSpPr>
-          <p:nvPr/>
-        </p:nvCxnSpPr>
-        <p:spPr>
-          <a:xfrm flipH="1">
-            <a:off x="19731793" y="5163206"/>
-            <a:ext cx="19454" cy="1855959"/>
-          </a:xfrm>
-          <a:prstGeom prst="straightConnector1">
-            <a:avLst/>
-          </a:prstGeom>
-          <a:ln w="185928">
-            <a:solidFill>
-              <a:schemeClr val="accent1">
-                <a:lumMod val="75000"/>
-              </a:schemeClr>
-            </a:solidFill>
-            <a:tailEnd type="triangle"/>
-          </a:ln>
-        </p:spPr>
-        <p:style>
-          <a:lnRef idx="1">
-            <a:schemeClr val="accent1"/>
-          </a:lnRef>
-          <a:fillRef idx="0">
-            <a:schemeClr val="accent1"/>
-          </a:fillRef>
-          <a:effectRef idx="0">
-            <a:schemeClr val="accent1"/>
-          </a:effectRef>
-          <a:fontRef idx="minor">
-            <a:schemeClr val="tx1"/>
-          </a:fontRef>
-        </p:style>
-      </p:cxnSp>
-      <p:cxnSp>
-        <p:nvCxnSpPr>
-          <p:cNvPr id="179" name="Straight Arrow Connector 178">
-            <a:extLst>
-              <a:ext uri="{FF2B5EF4-FFF2-40B4-BE49-F238E27FC236}">
-                <a16:creationId xmlns:a16="http://schemas.microsoft.com/office/drawing/2014/main" id="{64137A6B-9D81-CC04-4A56-CB43F3FBE38A}"/>
-              </a:ext>
-            </a:extLst>
-          </p:cNvPr>
-          <p:cNvCxnSpPr>
-            <a:cxnSpLocks/>
-            <a:stCxn id="146" idx="0"/>
-            <a:endCxn id="143" idx="2"/>
-          </p:cNvCxnSpPr>
-          <p:nvPr/>
-        </p:nvCxnSpPr>
-        <p:spPr>
-          <a:xfrm flipH="1" flipV="1">
-            <a:off x="19731793" y="7896388"/>
-            <a:ext cx="5166" cy="1863521"/>
-          </a:xfrm>
-          <a:prstGeom prst="straightConnector1">
-            <a:avLst/>
-          </a:prstGeom>
-          <a:ln w="189738">
-            <a:solidFill>
-              <a:schemeClr val="accent1">
-                <a:lumMod val="75000"/>
-              </a:schemeClr>
-            </a:solidFill>
-            <a:tailEnd type="triangle"/>
-          </a:ln>
-        </p:spPr>
-        <p:style>
-          <a:lnRef idx="1">
-            <a:schemeClr val="accent1"/>
-          </a:lnRef>
-          <a:fillRef idx="0">
-            <a:schemeClr val="accent1"/>
-          </a:fillRef>
-          <a:effectRef idx="0">
-            <a:schemeClr val="accent1"/>
-          </a:effectRef>
-          <a:fontRef idx="minor">
-            <a:schemeClr val="tx1"/>
-          </a:fontRef>
-        </p:style>
-      </p:cxnSp>
-      <p:sp>
-        <p:nvSpPr>
-          <p:cNvPr id="145" name="Rectangle 144">
-            <a:extLst>
-              <a:ext uri="{FF2B5EF4-FFF2-40B4-BE49-F238E27FC236}">
-                <a16:creationId xmlns:a16="http://schemas.microsoft.com/office/drawing/2014/main" id="{196DCF3C-1E9F-84BF-A1CB-74EFF6943139}"/>
-              </a:ext>
-            </a:extLst>
-          </p:cNvPr>
-          <p:cNvSpPr/>
-          <p:nvPr/>
-        </p:nvSpPr>
-        <p:spPr>
-          <a:xfrm>
-            <a:off x="18841548" y="4285983"/>
-            <a:ext cx="1819398" cy="877223"/>
-          </a:xfrm>
-          <a:prstGeom prst="rect">
-            <a:avLst/>
-          </a:prstGeom>
-          <a:solidFill>
-            <a:schemeClr val="bg1"/>
-          </a:solidFill>
-          <a:ln w="38100">
-            <a:solidFill>
-              <a:schemeClr val="tx1"/>
-            </a:solidFill>
-          </a:ln>
-        </p:spPr>
-        <p:style>
-          <a:lnRef idx="2">
-            <a:schemeClr val="accent1">
-              <a:shade val="50000"/>
-            </a:schemeClr>
-          </a:lnRef>
-          <a:fillRef idx="1">
-            <a:schemeClr val="accent1"/>
-          </a:fillRef>
-          <a:effectRef idx="0">
-            <a:schemeClr val="accent1"/>
-          </a:effectRef>
-          <a:fontRef idx="minor">
-            <a:schemeClr val="lt1"/>
-          </a:fontRef>
-        </p:style>
-        <p:txBody>
-          <a:bodyPr rtlCol="0" anchor="ctr"/>
-          <a:lstStyle/>
-          <a:p>
-            <a:pPr algn="ctr"/>
-            <a:r>
-              <a:rPr lang="en-US" sz="3000" b="1" i="1" dirty="0">
-                <a:solidFill>
-                  <a:schemeClr val="tx1"/>
-                </a:solidFill>
-                <a:latin typeface="Times New Roman" panose="02020603050405020304" pitchFamily="18" charset="0"/>
-                <a:cs typeface="Times New Roman" panose="02020603050405020304" pitchFamily="18" charset="0"/>
-              </a:rPr>
-              <a:t>N</a:t>
-            </a:r>
-            <a:r>
-              <a:rPr lang="en-US" sz="3000" b="1" baseline="-25000" dirty="0">
-                <a:solidFill>
-                  <a:schemeClr val="tx1"/>
-                </a:solidFill>
-                <a:latin typeface="Times New Roman" panose="02020603050405020304" pitchFamily="18" charset="0"/>
-                <a:cs typeface="Times New Roman" panose="02020603050405020304" pitchFamily="18" charset="0"/>
-              </a:rPr>
-              <a:t>mass</a:t>
-            </a:r>
-            <a:endParaRPr lang="en-US" sz="3000" b="1" i="1" dirty="0">
-              <a:solidFill>
-                <a:schemeClr val="tx1"/>
-              </a:solidFill>
-              <a:latin typeface="Times New Roman" panose="02020603050405020304" pitchFamily="18" charset="0"/>
-              <a:cs typeface="Times New Roman" panose="02020603050405020304" pitchFamily="18" charset="0"/>
-            </a:endParaRPr>
-          </a:p>
-        </p:txBody>
-      </p:sp>
-      <p:sp>
-        <p:nvSpPr>
-          <p:cNvPr id="146" name="Rectangle 145">
-            <a:extLst>
-              <a:ext uri="{FF2B5EF4-FFF2-40B4-BE49-F238E27FC236}">
-                <a16:creationId xmlns:a16="http://schemas.microsoft.com/office/drawing/2014/main" id="{831EFE87-5954-79FB-5410-F4BC8563FCDF}"/>
-              </a:ext>
-            </a:extLst>
-          </p:cNvPr>
-          <p:cNvSpPr/>
-          <p:nvPr/>
-        </p:nvSpPr>
-        <p:spPr>
-          <a:xfrm>
-            <a:off x="18827260" y="9759909"/>
-            <a:ext cx="1819398" cy="877223"/>
-          </a:xfrm>
-          <a:prstGeom prst="rect">
-            <a:avLst/>
-          </a:prstGeom>
-          <a:solidFill>
-            <a:schemeClr val="bg1"/>
-          </a:solidFill>
-          <a:ln w="38100">
-            <a:solidFill>
-              <a:schemeClr val="tx1"/>
-            </a:solidFill>
-          </a:ln>
-        </p:spPr>
-        <p:style>
-          <a:lnRef idx="2">
-            <a:schemeClr val="accent1">
-              <a:shade val="50000"/>
-            </a:schemeClr>
-          </a:lnRef>
-          <a:fillRef idx="1">
-            <a:schemeClr val="accent1"/>
-          </a:fillRef>
-          <a:effectRef idx="0">
-            <a:schemeClr val="accent1"/>
-          </a:effectRef>
-          <a:fontRef idx="minor">
-            <a:schemeClr val="lt1"/>
-          </a:fontRef>
-        </p:style>
-        <p:txBody>
-          <a:bodyPr rtlCol="0" anchor="ctr"/>
-          <a:lstStyle/>
-          <a:p>
-            <a:pPr algn="ctr"/>
-            <a:r>
-              <a:rPr lang="en-US" sz="3000" b="1" i="1" dirty="0">
-                <a:solidFill>
-                  <a:schemeClr val="tx1"/>
-                </a:solidFill>
-                <a:latin typeface="Times New Roman" panose="02020603050405020304" pitchFamily="18" charset="0"/>
-                <a:cs typeface="Times New Roman" panose="02020603050405020304" pitchFamily="18" charset="0"/>
-              </a:rPr>
-              <a:t>M</a:t>
-            </a:r>
-            <a:r>
-              <a:rPr lang="en-US" sz="3000" b="1" baseline="-25000" dirty="0">
-                <a:solidFill>
-                  <a:schemeClr val="tx1"/>
-                </a:solidFill>
-                <a:latin typeface="Times New Roman" panose="02020603050405020304" pitchFamily="18" charset="0"/>
-                <a:cs typeface="Times New Roman" panose="02020603050405020304" pitchFamily="18" charset="0"/>
-              </a:rPr>
-              <a:t>area</a:t>
-            </a:r>
-            <a:endParaRPr lang="en-US" sz="3000" b="1" i="1" dirty="0">
-              <a:solidFill>
-                <a:schemeClr val="tx1"/>
-              </a:solidFill>
-              <a:latin typeface="Times New Roman" panose="02020603050405020304" pitchFamily="18" charset="0"/>
-              <a:cs typeface="Times New Roman" panose="02020603050405020304" pitchFamily="18" charset="0"/>
-            </a:endParaRPr>
-          </a:p>
-        </p:txBody>
-      </p:sp>
-      <p:cxnSp>
-        <p:nvCxnSpPr>
-          <p:cNvPr id="185" name="Straight Arrow Connector 184">
-            <a:extLst>
-              <a:ext uri="{FF2B5EF4-FFF2-40B4-BE49-F238E27FC236}">
-                <a16:creationId xmlns:a16="http://schemas.microsoft.com/office/drawing/2014/main" id="{258C187C-B6A3-5852-85DF-896F3B7E817C}"/>
-              </a:ext>
-            </a:extLst>
-          </p:cNvPr>
-          <p:cNvCxnSpPr>
-            <a:cxnSpLocks/>
-            <a:endCxn id="146" idx="1"/>
-          </p:cNvCxnSpPr>
-          <p:nvPr/>
-        </p:nvCxnSpPr>
-        <p:spPr>
-          <a:xfrm>
-            <a:off x="14910942" y="7737567"/>
-            <a:ext cx="3916318" cy="2460954"/>
-          </a:xfrm>
-          <a:prstGeom prst="straightConnector1">
-            <a:avLst/>
-          </a:prstGeom>
-          <a:ln w="94869">
-            <a:solidFill>
-              <a:srgbClr val="C00000"/>
-            </a:solidFill>
-            <a:tailEnd type="triangle"/>
-          </a:ln>
-        </p:spPr>
-        <p:style>
-          <a:lnRef idx="1">
-            <a:schemeClr val="accent1"/>
-          </a:lnRef>
-          <a:fillRef idx="0">
-            <a:schemeClr val="accent1"/>
-          </a:fillRef>
-          <a:effectRef idx="0">
-            <a:schemeClr val="accent1"/>
-          </a:effectRef>
-          <a:fontRef idx="minor">
-            <a:schemeClr val="tx1"/>
-          </a:fontRef>
-        </p:style>
-      </p:cxnSp>
-      <p:cxnSp>
-        <p:nvCxnSpPr>
-          <p:cNvPr id="186" name="Straight Arrow Connector 185">
-            <a:extLst>
-              <a:ext uri="{FF2B5EF4-FFF2-40B4-BE49-F238E27FC236}">
-                <a16:creationId xmlns:a16="http://schemas.microsoft.com/office/drawing/2014/main" id="{8F9CC82C-68F6-632C-D6BC-9D720D68E3E7}"/>
-              </a:ext>
-            </a:extLst>
-          </p:cNvPr>
-          <p:cNvCxnSpPr>
-            <a:cxnSpLocks/>
-          </p:cNvCxnSpPr>
-          <p:nvPr/>
-        </p:nvCxnSpPr>
-        <p:spPr>
-          <a:xfrm>
-            <a:off x="6958973" y="10527145"/>
-            <a:ext cx="11868287" cy="0"/>
-          </a:xfrm>
-          <a:prstGeom prst="straightConnector1">
-            <a:avLst/>
-          </a:prstGeom>
-          <a:ln w="32004">
-            <a:solidFill>
-              <a:srgbClr val="C00000"/>
-            </a:solidFill>
-            <a:tailEnd type="triangle"/>
-          </a:ln>
-        </p:spPr>
-        <p:style>
-          <a:lnRef idx="1">
-            <a:schemeClr val="accent1"/>
-          </a:lnRef>
-          <a:fillRef idx="0">
-            <a:schemeClr val="accent1"/>
-          </a:fillRef>
-          <a:effectRef idx="0">
-            <a:schemeClr val="accent1"/>
-          </a:effectRef>
-          <a:fontRef idx="minor">
-            <a:schemeClr val="tx1"/>
-          </a:fontRef>
-        </p:style>
-      </p:cxnSp>
-      <p:cxnSp>
-        <p:nvCxnSpPr>
-          <p:cNvPr id="192" name="Elbow Connector 191">
-            <a:extLst>
-              <a:ext uri="{FF2B5EF4-FFF2-40B4-BE49-F238E27FC236}">
-                <a16:creationId xmlns:a16="http://schemas.microsoft.com/office/drawing/2014/main" id="{70E41ED9-E24C-CA45-C448-4A15D4E18233}"/>
-              </a:ext>
-            </a:extLst>
-          </p:cNvPr>
-          <p:cNvCxnSpPr>
-            <a:cxnSpLocks/>
-            <a:stCxn id="150" idx="1"/>
-            <a:endCxn id="146" idx="2"/>
-          </p:cNvCxnSpPr>
-          <p:nvPr/>
-        </p:nvCxnSpPr>
-        <p:spPr>
-          <a:xfrm rot="10800000" flipH="1" flipV="1">
-            <a:off x="5139575" y="4724594"/>
-            <a:ext cx="14597384" cy="5912537"/>
-          </a:xfrm>
-          <a:prstGeom prst="bentConnector4">
-            <a:avLst>
-              <a:gd name="adj1" fmla="val -6460"/>
-              <a:gd name="adj2" fmla="val 115948"/>
-            </a:avLst>
-          </a:prstGeom>
-          <a:ln w="27051">
-            <a:solidFill>
-              <a:srgbClr val="C00000"/>
-            </a:solidFill>
-            <a:tailEnd type="triangle"/>
-          </a:ln>
-        </p:spPr>
-        <p:style>
-          <a:lnRef idx="1">
-            <a:schemeClr val="accent1"/>
-          </a:lnRef>
-          <a:fillRef idx="0">
-            <a:schemeClr val="accent1"/>
-          </a:fillRef>
-          <a:effectRef idx="0">
-            <a:schemeClr val="accent1"/>
-          </a:effectRef>
-          <a:fontRef idx="minor">
-            <a:schemeClr val="tx1"/>
-          </a:fontRef>
-        </p:style>
-      </p:cxnSp>
-      <p:cxnSp>
-        <p:nvCxnSpPr>
-          <p:cNvPr id="196" name="Straight Arrow Connector 195">
-            <a:extLst>
-              <a:ext uri="{FF2B5EF4-FFF2-40B4-BE49-F238E27FC236}">
-                <a16:creationId xmlns:a16="http://schemas.microsoft.com/office/drawing/2014/main" id="{D3D39525-618A-0E5E-5962-FA061AF403E3}"/>
-              </a:ext>
-            </a:extLst>
-          </p:cNvPr>
-          <p:cNvCxnSpPr>
-            <a:cxnSpLocks/>
-          </p:cNvCxnSpPr>
-          <p:nvPr/>
-        </p:nvCxnSpPr>
-        <p:spPr>
-          <a:xfrm flipV="1">
-            <a:off x="6772327" y="5170830"/>
-            <a:ext cx="12040183" cy="5027690"/>
-          </a:xfrm>
-          <a:prstGeom prst="straightConnector1">
-            <a:avLst/>
-          </a:prstGeom>
-          <a:ln w="51181">
-            <a:solidFill>
-              <a:schemeClr val="accent1">
-                <a:lumMod val="75000"/>
-              </a:schemeClr>
-            </a:solidFill>
-            <a:tailEnd type="triangle"/>
-          </a:ln>
-        </p:spPr>
-        <p:style>
-          <a:lnRef idx="1">
-            <a:schemeClr val="accent1"/>
-          </a:lnRef>
-          <a:fillRef idx="0">
-            <a:schemeClr val="accent1"/>
-          </a:fillRef>
-          <a:effectRef idx="0">
-            <a:schemeClr val="accent1"/>
-          </a:effectRef>
-          <a:fontRef idx="minor">
-            <a:schemeClr val="tx1"/>
-          </a:fontRef>
-        </p:style>
-      </p:cxnSp>
-      <p:cxnSp>
-        <p:nvCxnSpPr>
-          <p:cNvPr id="168" name="Straight Arrow Connector 167">
-            <a:extLst>
-              <a:ext uri="{FF2B5EF4-FFF2-40B4-BE49-F238E27FC236}">
-                <a16:creationId xmlns:a16="http://schemas.microsoft.com/office/drawing/2014/main" id="{1EF4A41A-5F73-8BC5-33B7-31C8F1EBE768}"/>
-              </a:ext>
-            </a:extLst>
-          </p:cNvPr>
-          <p:cNvCxnSpPr>
-            <a:cxnSpLocks/>
-          </p:cNvCxnSpPr>
-          <p:nvPr/>
-        </p:nvCxnSpPr>
-        <p:spPr>
-          <a:xfrm>
-            <a:off x="11121594" y="4926755"/>
-            <a:ext cx="3114560" cy="2079681"/>
-          </a:xfrm>
-          <a:prstGeom prst="straightConnector1">
-            <a:avLst/>
-          </a:prstGeom>
-          <a:ln w="29209">
-            <a:solidFill>
-              <a:srgbClr val="C00000"/>
-            </a:solidFill>
-            <a:tailEnd type="triangle"/>
-          </a:ln>
-        </p:spPr>
-        <p:style>
-          <a:lnRef idx="1">
-            <a:schemeClr val="accent1"/>
-          </a:lnRef>
-          <a:fillRef idx="0">
-            <a:schemeClr val="accent1"/>
-          </a:fillRef>
-          <a:effectRef idx="0">
-            <a:schemeClr val="accent1"/>
-          </a:effectRef>
-          <a:fontRef idx="minor">
-            <a:schemeClr val="tx1"/>
-          </a:fontRef>
-        </p:style>
-      </p:cxnSp>
-      <p:sp>
-        <p:nvSpPr>
-          <p:cNvPr id="151" name="Rectangle 150">
-            <a:extLst>
-              <a:ext uri="{FF2B5EF4-FFF2-40B4-BE49-F238E27FC236}">
-                <a16:creationId xmlns:a16="http://schemas.microsoft.com/office/drawing/2014/main" id="{52423B29-35B5-9B6F-567C-E9C20E59598B}"/>
-              </a:ext>
-            </a:extLst>
-          </p:cNvPr>
-          <p:cNvSpPr/>
-          <p:nvPr/>
-        </p:nvSpPr>
-        <p:spPr>
-          <a:xfrm>
-            <a:off x="9666306" y="4293514"/>
-            <a:ext cx="1819398" cy="877223"/>
-          </a:xfrm>
-          <a:prstGeom prst="rect">
-            <a:avLst/>
-          </a:prstGeom>
-          <a:solidFill>
-            <a:schemeClr val="bg1"/>
-          </a:solidFill>
-          <a:ln w="38100">
-            <a:solidFill>
-              <a:schemeClr val="tx1"/>
-            </a:solidFill>
-          </a:ln>
-        </p:spPr>
-        <p:style>
-          <a:lnRef idx="2">
-            <a:schemeClr val="accent1">
-              <a:shade val="50000"/>
-            </a:schemeClr>
-          </a:lnRef>
-          <a:fillRef idx="1">
-            <a:schemeClr val="accent1"/>
-          </a:fillRef>
-          <a:effectRef idx="0">
-            <a:schemeClr val="accent1"/>
-          </a:effectRef>
-          <a:fontRef idx="minor">
-            <a:schemeClr val="lt1"/>
-          </a:fontRef>
-        </p:style>
-        <p:txBody>
-          <a:bodyPr rtlCol="0" anchor="ctr"/>
-          <a:lstStyle/>
-          <a:p>
-            <a:pPr algn="ctr"/>
-            <a:r>
-              <a:rPr lang="en-US" sz="3000" b="1" i="1" dirty="0">
-                <a:solidFill>
-                  <a:schemeClr val="tx1"/>
-                </a:solidFill>
-                <a:latin typeface="Times New Roman" panose="02020603050405020304" pitchFamily="18" charset="0"/>
-                <a:cs typeface="Times New Roman" panose="02020603050405020304" pitchFamily="18" charset="0"/>
-              </a:rPr>
-              <a:t>VPD</a:t>
-            </a:r>
-            <a:r>
-              <a:rPr lang="en-US" sz="3000" b="1" baseline="-25000" dirty="0">
-                <a:solidFill>
-                  <a:schemeClr val="tx1"/>
-                </a:solidFill>
-                <a:latin typeface="Times New Roman" panose="02020603050405020304" pitchFamily="18" charset="0"/>
-                <a:cs typeface="Times New Roman" panose="02020603050405020304" pitchFamily="18" charset="0"/>
-              </a:rPr>
-              <a:t>4</a:t>
-            </a:r>
-            <a:endParaRPr lang="en-US" sz="3000" b="1" dirty="0">
-              <a:solidFill>
-                <a:schemeClr val="tx1"/>
-              </a:solidFill>
-              <a:latin typeface="Times New Roman" panose="02020603050405020304" pitchFamily="18" charset="0"/>
-              <a:cs typeface="Times New Roman" panose="02020603050405020304" pitchFamily="18" charset="0"/>
-            </a:endParaRPr>
-          </a:p>
-        </p:txBody>
-      </p:sp>
-      <p:cxnSp>
-        <p:nvCxnSpPr>
-          <p:cNvPr id="211" name="Straight Arrow Connector 210">
-            <a:extLst>
-              <a:ext uri="{FF2B5EF4-FFF2-40B4-BE49-F238E27FC236}">
-                <a16:creationId xmlns:a16="http://schemas.microsoft.com/office/drawing/2014/main" id="{4110BDE9-8908-F5D6-4156-0F3FAA1D6E32}"/>
-              </a:ext>
-            </a:extLst>
-          </p:cNvPr>
-          <p:cNvCxnSpPr>
-            <a:cxnSpLocks/>
-          </p:cNvCxnSpPr>
-          <p:nvPr/>
-        </p:nvCxnSpPr>
-        <p:spPr>
-          <a:xfrm flipV="1">
-            <a:off x="16019543" y="4715747"/>
-            <a:ext cx="2785996" cy="7531"/>
-          </a:xfrm>
-          <a:prstGeom prst="straightConnector1">
-            <a:avLst/>
-          </a:prstGeom>
-          <a:ln w="109728">
-            <a:solidFill>
-              <a:schemeClr val="accent1">
-                <a:lumMod val="75000"/>
-              </a:schemeClr>
-            </a:solidFill>
-            <a:tailEnd type="triangle"/>
-          </a:ln>
-        </p:spPr>
-        <p:style>
-          <a:lnRef idx="1">
-            <a:schemeClr val="accent1"/>
-          </a:lnRef>
-          <a:fillRef idx="0">
-            <a:schemeClr val="accent1"/>
-          </a:fillRef>
-          <a:effectRef idx="0">
-            <a:schemeClr val="accent1"/>
-          </a:effectRef>
-          <a:fontRef idx="minor">
-            <a:schemeClr val="tx1"/>
-          </a:fontRef>
-        </p:style>
-      </p:cxnSp>
-      <p:sp>
-        <p:nvSpPr>
-          <p:cNvPr id="152" name="Rectangle 151">
-            <a:extLst>
-              <a:ext uri="{FF2B5EF4-FFF2-40B4-BE49-F238E27FC236}">
-                <a16:creationId xmlns:a16="http://schemas.microsoft.com/office/drawing/2014/main" id="{2D17192C-937C-49F2-AB55-CCF25B817752}"/>
-              </a:ext>
-            </a:extLst>
-          </p:cNvPr>
-          <p:cNvSpPr/>
-          <p:nvPr/>
-        </p:nvSpPr>
-        <p:spPr>
-          <a:xfrm>
-            <a:off x="22468256" y="7019165"/>
-            <a:ext cx="1819398" cy="877223"/>
-          </a:xfrm>
-          <a:prstGeom prst="rect">
-            <a:avLst/>
-          </a:prstGeom>
-          <a:solidFill>
-            <a:schemeClr val="bg1"/>
-          </a:solidFill>
-          <a:ln w="38100">
-            <a:solidFill>
-              <a:schemeClr val="tx1"/>
-            </a:solidFill>
-          </a:ln>
-        </p:spPr>
-        <p:style>
-          <a:lnRef idx="2">
-            <a:schemeClr val="accent1">
-              <a:shade val="50000"/>
-            </a:schemeClr>
-          </a:lnRef>
-          <a:fillRef idx="1">
-            <a:schemeClr val="accent1"/>
-          </a:fillRef>
-          <a:effectRef idx="0">
-            <a:schemeClr val="accent1"/>
-          </a:effectRef>
-          <a:fontRef idx="minor">
-            <a:schemeClr val="lt1"/>
-          </a:fontRef>
-        </p:style>
-        <p:txBody>
-          <a:bodyPr rtlCol="0" anchor="ctr"/>
-          <a:lstStyle/>
-          <a:p>
-            <a:pPr algn="ctr"/>
-            <a:r>
-              <a:rPr lang="en-US" sz="3000" b="1" i="1" dirty="0">
-                <a:solidFill>
-                  <a:schemeClr val="tx1"/>
-                </a:solidFill>
-                <a:latin typeface="Times New Roman" panose="02020603050405020304" pitchFamily="18" charset="0"/>
-                <a:cs typeface="Times New Roman" panose="02020603050405020304" pitchFamily="18" charset="0"/>
-              </a:rPr>
-              <a:t>N</a:t>
-            </a:r>
-            <a:r>
-              <a:rPr lang="en-US" sz="3000" b="1" baseline="-25000" dirty="0">
-                <a:solidFill>
-                  <a:schemeClr val="tx1"/>
-                </a:solidFill>
-                <a:latin typeface="Times New Roman" panose="02020603050405020304" pitchFamily="18" charset="0"/>
-                <a:cs typeface="Times New Roman" panose="02020603050405020304" pitchFamily="18" charset="0"/>
-              </a:rPr>
-              <a:t>fixer</a:t>
-            </a:r>
-            <a:endParaRPr lang="en-US" sz="3000" b="1" i="1" dirty="0">
-              <a:solidFill>
-                <a:schemeClr val="tx1"/>
-              </a:solidFill>
-              <a:latin typeface="Times New Roman" panose="02020603050405020304" pitchFamily="18" charset="0"/>
-              <a:cs typeface="Times New Roman" panose="02020603050405020304" pitchFamily="18" charset="0"/>
-            </a:endParaRPr>
-          </a:p>
-        </p:txBody>
-      </p:sp>
-      <p:cxnSp>
-        <p:nvCxnSpPr>
-          <p:cNvPr id="267" name="Straight Arrow Connector 266">
-            <a:extLst>
-              <a:ext uri="{FF2B5EF4-FFF2-40B4-BE49-F238E27FC236}">
-                <a16:creationId xmlns:a16="http://schemas.microsoft.com/office/drawing/2014/main" id="{82DEA27F-935B-D94A-2D5F-8264EAC3FDDF}"/>
-              </a:ext>
-            </a:extLst>
-          </p:cNvPr>
-          <p:cNvCxnSpPr>
-            <a:cxnSpLocks/>
-          </p:cNvCxnSpPr>
-          <p:nvPr/>
-        </p:nvCxnSpPr>
-        <p:spPr>
-          <a:xfrm>
-            <a:off x="15858907" y="4842205"/>
-            <a:ext cx="2961190" cy="4917704"/>
-          </a:xfrm>
-          <a:prstGeom prst="straightConnector1">
-            <a:avLst/>
-          </a:prstGeom>
-          <a:ln w="124079">
-            <a:solidFill>
-              <a:schemeClr val="accent1">
-                <a:lumMod val="75000"/>
-              </a:schemeClr>
-            </a:solidFill>
-            <a:tailEnd type="triangle"/>
-          </a:ln>
-        </p:spPr>
-        <p:style>
-          <a:lnRef idx="1">
-            <a:schemeClr val="accent1"/>
-          </a:lnRef>
-          <a:fillRef idx="0">
-            <a:schemeClr val="accent1"/>
-          </a:fillRef>
-          <a:effectRef idx="0">
-            <a:schemeClr val="accent1"/>
-          </a:effectRef>
-          <a:fontRef idx="minor">
-            <a:schemeClr val="tx1"/>
-          </a:fontRef>
-        </p:style>
-      </p:cxnSp>
-      <p:sp>
-        <p:nvSpPr>
-          <p:cNvPr id="144" name="Rectangle 143">
-            <a:extLst>
-              <a:ext uri="{FF2B5EF4-FFF2-40B4-BE49-F238E27FC236}">
-                <a16:creationId xmlns:a16="http://schemas.microsoft.com/office/drawing/2014/main" id="{A78B38F8-81B3-D1FA-0AD1-5773256590EC}"/>
-              </a:ext>
-            </a:extLst>
-          </p:cNvPr>
-          <p:cNvSpPr/>
-          <p:nvPr/>
-        </p:nvSpPr>
-        <p:spPr>
-          <a:xfrm>
-            <a:off x="5139575" y="9759909"/>
-            <a:ext cx="1819398" cy="877223"/>
-          </a:xfrm>
-          <a:prstGeom prst="rect">
-            <a:avLst/>
-          </a:prstGeom>
-          <a:solidFill>
-            <a:schemeClr val="bg1"/>
-          </a:solidFill>
-          <a:ln w="38100">
-            <a:solidFill>
-              <a:schemeClr val="tx1"/>
-            </a:solidFill>
-          </a:ln>
-        </p:spPr>
-        <p:style>
-          <a:lnRef idx="2">
-            <a:schemeClr val="accent1">
-              <a:shade val="50000"/>
-            </a:schemeClr>
-          </a:lnRef>
-          <a:fillRef idx="1">
-            <a:schemeClr val="accent1"/>
-          </a:fillRef>
-          <a:effectRef idx="0">
-            <a:schemeClr val="accent1"/>
-          </a:effectRef>
-          <a:fontRef idx="minor">
-            <a:schemeClr val="lt1"/>
-          </a:fontRef>
-        </p:style>
-        <p:txBody>
-          <a:bodyPr rtlCol="0" anchor="ctr"/>
-          <a:lstStyle/>
-          <a:p>
-            <a:pPr algn="ctr"/>
-            <a:r>
-              <a:rPr lang="en-US" sz="3000" b="1" i="1" dirty="0">
-                <a:solidFill>
-                  <a:schemeClr val="tx1"/>
-                </a:solidFill>
-                <a:latin typeface="Times New Roman" panose="02020603050405020304" pitchFamily="18" charset="0"/>
-                <a:cs typeface="Times New Roman" panose="02020603050405020304" pitchFamily="18" charset="0"/>
-              </a:rPr>
-              <a:t>Soil N</a:t>
-            </a:r>
-            <a:endParaRPr lang="en-US" sz="3000" b="1" dirty="0">
-              <a:solidFill>
-                <a:schemeClr val="tx1"/>
-              </a:solidFill>
-              <a:latin typeface="Times New Roman" panose="02020603050405020304" pitchFamily="18" charset="0"/>
-              <a:cs typeface="Times New Roman" panose="02020603050405020304" pitchFamily="18" charset="0"/>
-            </a:endParaRPr>
-          </a:p>
-        </p:txBody>
-      </p:sp>
-      <p:sp>
-        <p:nvSpPr>
-          <p:cNvPr id="149" name="Rectangle 148">
-            <a:extLst>
-              <a:ext uri="{FF2B5EF4-FFF2-40B4-BE49-F238E27FC236}">
-                <a16:creationId xmlns:a16="http://schemas.microsoft.com/office/drawing/2014/main" id="{37E4791A-A4FE-F459-D539-AC5C8696DD32}"/>
-              </a:ext>
-            </a:extLst>
-          </p:cNvPr>
-          <p:cNvSpPr/>
-          <p:nvPr/>
-        </p:nvSpPr>
-        <p:spPr>
-          <a:xfrm>
-            <a:off x="14258417" y="7033078"/>
-            <a:ext cx="1819398" cy="877223"/>
-          </a:xfrm>
-          <a:prstGeom prst="rect">
-            <a:avLst/>
-          </a:prstGeom>
-          <a:solidFill>
-            <a:schemeClr val="bg1"/>
-          </a:solidFill>
-          <a:ln w="38100">
-            <a:solidFill>
-              <a:schemeClr val="tx1"/>
-            </a:solidFill>
-          </a:ln>
-        </p:spPr>
-        <p:style>
-          <a:lnRef idx="2">
-            <a:schemeClr val="accent1">
-              <a:shade val="50000"/>
-            </a:schemeClr>
-          </a:lnRef>
-          <a:fillRef idx="1">
-            <a:schemeClr val="accent1"/>
-          </a:fillRef>
-          <a:effectRef idx="0">
-            <a:schemeClr val="accent1"/>
-          </a:effectRef>
-          <a:fontRef idx="minor">
-            <a:schemeClr val="lt1"/>
-          </a:fontRef>
-        </p:style>
-        <p:txBody>
-          <a:bodyPr rtlCol="0" anchor="ctr"/>
-          <a:lstStyle/>
-          <a:p>
-            <a:pPr algn="ctr"/>
-            <a:r>
-              <a:rPr lang="en-US" sz="3000" b="1" i="1" dirty="0">
-                <a:solidFill>
-                  <a:schemeClr val="tx1"/>
-                </a:solidFill>
-                <a:latin typeface="Times New Roman" panose="02020603050405020304" pitchFamily="18" charset="0"/>
-                <a:cs typeface="Times New Roman" panose="02020603050405020304" pitchFamily="18" charset="0"/>
-              </a:rPr>
-              <a:t>Leaf Ci:Ca</a:t>
-            </a:r>
-          </a:p>
-        </p:txBody>
-      </p:sp>
-      <p:cxnSp>
-        <p:nvCxnSpPr>
-          <p:cNvPr id="276" name="Elbow Connector 275">
-            <a:extLst>
-              <a:ext uri="{FF2B5EF4-FFF2-40B4-BE49-F238E27FC236}">
-                <a16:creationId xmlns:a16="http://schemas.microsoft.com/office/drawing/2014/main" id="{A30ACE67-B7B9-B0CA-D90B-859AF06A0A79}"/>
-              </a:ext>
-            </a:extLst>
-          </p:cNvPr>
-          <p:cNvCxnSpPr>
-            <a:cxnSpLocks/>
-          </p:cNvCxnSpPr>
-          <p:nvPr/>
-        </p:nvCxnSpPr>
-        <p:spPr>
-          <a:xfrm flipV="1">
-            <a:off x="20646658" y="5004807"/>
-            <a:ext cx="14288" cy="5473926"/>
-          </a:xfrm>
-          <a:prstGeom prst="bentConnector3">
-            <a:avLst>
-              <a:gd name="adj1" fmla="val 6499776"/>
-            </a:avLst>
-          </a:prstGeom>
-          <a:ln w="61976">
-            <a:solidFill>
-              <a:srgbClr val="C00000"/>
-            </a:solidFill>
-            <a:tailEnd type="triangle"/>
-          </a:ln>
-        </p:spPr>
-        <p:style>
-          <a:lnRef idx="1">
-            <a:schemeClr val="accent1"/>
-          </a:lnRef>
-          <a:fillRef idx="0">
-            <a:schemeClr val="accent1"/>
-          </a:fillRef>
-          <a:effectRef idx="0">
-            <a:schemeClr val="accent1"/>
-          </a:effectRef>
-          <a:fontRef idx="minor">
-            <a:schemeClr val="tx1"/>
-          </a:fontRef>
-        </p:style>
-      </p:cxnSp>
-      <p:sp>
-        <p:nvSpPr>
-          <p:cNvPr id="150" name="Rectangle 149">
-            <a:extLst>
-              <a:ext uri="{FF2B5EF4-FFF2-40B4-BE49-F238E27FC236}">
-                <a16:creationId xmlns:a16="http://schemas.microsoft.com/office/drawing/2014/main" id="{EC6E95A2-A99B-1EAD-2343-C2D4995139F9}"/>
-              </a:ext>
-            </a:extLst>
-          </p:cNvPr>
-          <p:cNvSpPr/>
-          <p:nvPr/>
-        </p:nvSpPr>
-        <p:spPr>
-          <a:xfrm>
-            <a:off x="5139575" y="4285983"/>
-            <a:ext cx="1819398" cy="877223"/>
-          </a:xfrm>
-          <a:prstGeom prst="rect">
-            <a:avLst/>
-          </a:prstGeom>
-          <a:solidFill>
-            <a:schemeClr val="bg1"/>
-          </a:solidFill>
-          <a:ln w="38100">
-            <a:solidFill>
-              <a:schemeClr val="tx1"/>
-            </a:solidFill>
-          </a:ln>
-        </p:spPr>
-        <p:style>
-          <a:lnRef idx="2">
-            <a:schemeClr val="accent1">
-              <a:shade val="50000"/>
-            </a:schemeClr>
-          </a:lnRef>
-          <a:fillRef idx="1">
-            <a:schemeClr val="accent1"/>
-          </a:fillRef>
-          <a:effectRef idx="0">
-            <a:schemeClr val="accent1"/>
-          </a:effectRef>
-          <a:fontRef idx="minor">
-            <a:schemeClr val="lt1"/>
-          </a:fontRef>
-        </p:style>
-        <p:txBody>
-          <a:bodyPr rtlCol="0" anchor="ctr"/>
-          <a:lstStyle/>
-          <a:p>
-            <a:pPr algn="ctr"/>
-            <a:r>
-              <a:rPr lang="en-US" sz="3000" b="1" i="1" dirty="0">
-                <a:solidFill>
-                  <a:schemeClr val="tx1"/>
-                </a:solidFill>
-                <a:latin typeface="Times New Roman" panose="02020603050405020304" pitchFamily="18" charset="0"/>
-                <a:cs typeface="Times New Roman" panose="02020603050405020304" pitchFamily="18" charset="0"/>
-              </a:rPr>
-              <a:t>SM</a:t>
-            </a:r>
-            <a:r>
-              <a:rPr lang="en-US" sz="3000" b="1" baseline="-25000" dirty="0">
-                <a:solidFill>
-                  <a:schemeClr val="tx1"/>
-                </a:solidFill>
-                <a:latin typeface="Times New Roman" panose="02020603050405020304" pitchFamily="18" charset="0"/>
-                <a:cs typeface="Times New Roman" panose="02020603050405020304" pitchFamily="18" charset="0"/>
-              </a:rPr>
-              <a:t>2</a:t>
-            </a:r>
-            <a:endParaRPr lang="en-US" sz="3000" b="1" dirty="0">
-              <a:solidFill>
-                <a:schemeClr val="tx1"/>
-              </a:solidFill>
-              <a:latin typeface="Times New Roman" panose="02020603050405020304" pitchFamily="18" charset="0"/>
-              <a:cs typeface="Times New Roman" panose="02020603050405020304" pitchFamily="18" charset="0"/>
-            </a:endParaRPr>
-          </a:p>
-        </p:txBody>
-      </p:sp>
-      <p:cxnSp>
-        <p:nvCxnSpPr>
-          <p:cNvPr id="299" name="Elbow Connector 298">
-            <a:extLst>
-              <a:ext uri="{FF2B5EF4-FFF2-40B4-BE49-F238E27FC236}">
-                <a16:creationId xmlns:a16="http://schemas.microsoft.com/office/drawing/2014/main" id="{056E95C4-C923-6172-ED5A-038375542915}"/>
-              </a:ext>
-            </a:extLst>
-          </p:cNvPr>
-          <p:cNvCxnSpPr>
-            <a:stCxn id="150" idx="0"/>
-            <a:endCxn id="145" idx="0"/>
-          </p:cNvCxnSpPr>
-          <p:nvPr/>
-        </p:nvCxnSpPr>
-        <p:spPr>
-          <a:xfrm rot="5400000" flipH="1" flipV="1">
-            <a:off x="12900260" y="-2565003"/>
-            <a:ext cx="12700" cy="13701973"/>
-          </a:xfrm>
-          <a:prstGeom prst="bentConnector3">
-            <a:avLst>
-              <a:gd name="adj1" fmla="val 7312504"/>
-            </a:avLst>
-          </a:prstGeom>
-          <a:ln w="22987">
-            <a:solidFill>
-              <a:schemeClr val="accent1">
-                <a:lumMod val="75000"/>
-              </a:schemeClr>
-            </a:solidFill>
-            <a:tailEnd type="triangle"/>
-          </a:ln>
-        </p:spPr>
-        <p:style>
-          <a:lnRef idx="1">
-            <a:schemeClr val="accent1"/>
-          </a:lnRef>
-          <a:fillRef idx="0">
-            <a:schemeClr val="accent1"/>
-          </a:fillRef>
-          <a:effectRef idx="0">
-            <a:schemeClr val="accent1"/>
-          </a:effectRef>
-          <a:fontRef idx="minor">
-            <a:schemeClr val="tx1"/>
-          </a:fontRef>
-        </p:style>
-      </p:cxnSp>
-      <p:cxnSp>
-        <p:nvCxnSpPr>
-          <p:cNvPr id="322" name="Elbow Connector 321">
-            <a:extLst>
-              <a:ext uri="{FF2B5EF4-FFF2-40B4-BE49-F238E27FC236}">
-                <a16:creationId xmlns:a16="http://schemas.microsoft.com/office/drawing/2014/main" id="{439C9AB0-1DA9-E50D-981B-3798293AD17D}"/>
-              </a:ext>
-            </a:extLst>
-          </p:cNvPr>
-          <p:cNvCxnSpPr>
-            <a:cxnSpLocks/>
-            <a:stCxn id="152" idx="0"/>
-            <a:endCxn id="145" idx="3"/>
-          </p:cNvCxnSpPr>
-          <p:nvPr/>
-        </p:nvCxnSpPr>
-        <p:spPr>
-          <a:xfrm rot="16200000" flipV="1">
-            <a:off x="20872166" y="4513375"/>
-            <a:ext cx="2294570" cy="2717009"/>
-          </a:xfrm>
-          <a:prstGeom prst="bentConnector2">
-            <a:avLst/>
-          </a:prstGeom>
-          <a:ln w="66675">
-            <a:solidFill>
-              <a:schemeClr val="accent1">
-                <a:lumMod val="75000"/>
-              </a:schemeClr>
-            </a:solidFill>
-            <a:tailEnd type="triangle"/>
-          </a:ln>
-        </p:spPr>
-        <p:style>
-          <a:lnRef idx="1">
-            <a:schemeClr val="accent1"/>
-          </a:lnRef>
-          <a:fillRef idx="0">
-            <a:schemeClr val="accent1"/>
-          </a:fillRef>
-          <a:effectRef idx="0">
-            <a:schemeClr val="accent1"/>
-          </a:effectRef>
-          <a:fontRef idx="minor">
-            <a:schemeClr val="tx1"/>
-          </a:fontRef>
-        </p:style>
-      </p:cxnSp>
-      <p:cxnSp>
-        <p:nvCxnSpPr>
-          <p:cNvPr id="174" name="Straight Arrow Connector 173">
-            <a:extLst>
-              <a:ext uri="{FF2B5EF4-FFF2-40B4-BE49-F238E27FC236}">
-                <a16:creationId xmlns:a16="http://schemas.microsoft.com/office/drawing/2014/main" id="{10084160-D7B3-7E90-B5E9-8786D36CA910}"/>
-              </a:ext>
-            </a:extLst>
-          </p:cNvPr>
-          <p:cNvCxnSpPr>
-            <a:cxnSpLocks/>
-            <a:stCxn id="149" idx="3"/>
-            <a:endCxn id="143" idx="1"/>
-          </p:cNvCxnSpPr>
-          <p:nvPr/>
-        </p:nvCxnSpPr>
-        <p:spPr>
-          <a:xfrm flipV="1">
-            <a:off x="16077815" y="7457777"/>
-            <a:ext cx="2744279" cy="13913"/>
-          </a:xfrm>
-          <a:prstGeom prst="straightConnector1">
-            <a:avLst/>
-          </a:prstGeom>
-          <a:ln w="43942">
-            <a:solidFill>
-              <a:srgbClr val="C00000"/>
-            </a:solidFill>
-            <a:tailEnd type="triangle"/>
-          </a:ln>
-        </p:spPr>
-        <p:style>
-          <a:lnRef idx="1">
-            <a:schemeClr val="accent1"/>
-          </a:lnRef>
-          <a:fillRef idx="0">
-            <a:schemeClr val="accent1"/>
-          </a:fillRef>
-          <a:effectRef idx="0">
-            <a:schemeClr val="accent1"/>
-          </a:effectRef>
-          <a:fontRef idx="minor">
-            <a:schemeClr val="tx1"/>
-          </a:fontRef>
-        </p:style>
-      </p:cxnSp>
-      <p:sp>
-        <p:nvSpPr>
-          <p:cNvPr id="148" name="Rectangle 147">
-            <a:extLst>
-              <a:ext uri="{FF2B5EF4-FFF2-40B4-BE49-F238E27FC236}">
-                <a16:creationId xmlns:a16="http://schemas.microsoft.com/office/drawing/2014/main" id="{CAEEF86E-BF80-675F-3FA2-55D6B97D4497}"/>
-              </a:ext>
-            </a:extLst>
-          </p:cNvPr>
-          <p:cNvSpPr/>
-          <p:nvPr/>
-        </p:nvSpPr>
-        <p:spPr>
-          <a:xfrm>
-            <a:off x="9707722" y="7033076"/>
-            <a:ext cx="1819398" cy="877223"/>
-          </a:xfrm>
-          <a:prstGeom prst="rect">
-            <a:avLst/>
-          </a:prstGeom>
-          <a:solidFill>
-            <a:schemeClr val="bg1"/>
-          </a:solidFill>
-          <a:ln w="38100">
-            <a:solidFill>
-              <a:schemeClr val="tx1"/>
-            </a:solidFill>
-          </a:ln>
-        </p:spPr>
-        <p:style>
-          <a:lnRef idx="2">
-            <a:schemeClr val="accent1">
-              <a:shade val="50000"/>
-            </a:schemeClr>
-          </a:lnRef>
-          <a:fillRef idx="1">
-            <a:schemeClr val="accent1"/>
-          </a:fillRef>
-          <a:effectRef idx="0">
-            <a:schemeClr val="accent1"/>
-          </a:effectRef>
-          <a:fontRef idx="minor">
-            <a:schemeClr val="lt1"/>
-          </a:fontRef>
-        </p:style>
-        <p:txBody>
-          <a:bodyPr rtlCol="0" anchor="ctr"/>
-          <a:lstStyle/>
-          <a:p>
-            <a:pPr algn="ctr"/>
-            <a:r>
-              <a:rPr lang="el-GR" sz="3000" b="1" i="1" dirty="0">
-                <a:solidFill>
-                  <a:schemeClr val="tx1"/>
-                </a:solidFill>
-                <a:latin typeface="Times New Roman" panose="02020603050405020304" pitchFamily="18" charset="0"/>
-                <a:cs typeface="Times New Roman" panose="02020603050405020304" pitchFamily="18" charset="0"/>
-              </a:rPr>
-              <a:t>β</a:t>
-            </a:r>
-            <a:endParaRPr lang="en-US" sz="3000" b="1" i="1" dirty="0">
-              <a:solidFill>
-                <a:schemeClr val="tx1"/>
-              </a:solidFill>
-              <a:latin typeface="Times New Roman" panose="02020603050405020304" pitchFamily="18" charset="0"/>
-              <a:cs typeface="Times New Roman" panose="02020603050405020304" pitchFamily="18" charset="0"/>
-            </a:endParaRPr>
-          </a:p>
-        </p:txBody>
-      </p:sp>
-      <p:grpSp>
-        <p:nvGrpSpPr>
-          <p:cNvPr id="6" name="Group 5">
-            <a:extLst>
-              <a:ext uri="{FF2B5EF4-FFF2-40B4-BE49-F238E27FC236}">
-                <a16:creationId xmlns:a16="http://schemas.microsoft.com/office/drawing/2014/main" id="{7ACE01A2-12CB-F702-2A3E-6C2772EB6B65}"/>
-              </a:ext>
-            </a:extLst>
-          </p:cNvPr>
-          <p:cNvGrpSpPr/>
-          <p:nvPr/>
-        </p:nvGrpSpPr>
-        <p:grpSpPr>
-          <a:xfrm>
-            <a:off x="9994590" y="12516819"/>
-            <a:ext cx="5751830" cy="1491548"/>
-            <a:chOff x="10433050" y="12808239"/>
-            <a:chExt cx="5751830" cy="1491548"/>
-          </a:xfrm>
-        </p:grpSpPr>
-        <p:cxnSp>
-          <p:nvCxnSpPr>
-            <p:cNvPr id="304" name="Straight Connector 303">
-              <a:extLst>
-                <a:ext uri="{FF2B5EF4-FFF2-40B4-BE49-F238E27FC236}">
-                  <a16:creationId xmlns:a16="http://schemas.microsoft.com/office/drawing/2014/main" id="{BCE3271A-5208-23E5-DCE3-3408CD77B59D}"/>
-                </a:ext>
-              </a:extLst>
-            </p:cNvPr>
-            <p:cNvCxnSpPr>
-              <a:cxnSpLocks/>
-            </p:cNvCxnSpPr>
-            <p:nvPr/>
-          </p:nvCxnSpPr>
-          <p:spPr>
-            <a:xfrm>
-              <a:off x="11403764" y="12854448"/>
-              <a:ext cx="951115" cy="0"/>
-            </a:xfrm>
-            <a:prstGeom prst="line">
-              <a:avLst/>
-            </a:prstGeom>
-            <a:ln w="95250">
-              <a:solidFill>
-                <a:srgbClr val="C00000"/>
-              </a:solidFill>
-            </a:ln>
-          </p:spPr>
-          <p:style>
-            <a:lnRef idx="1">
-              <a:schemeClr val="accent1"/>
-            </a:lnRef>
-            <a:fillRef idx="0">
-              <a:schemeClr val="accent1"/>
-            </a:fillRef>
-            <a:effectRef idx="0">
-              <a:schemeClr val="accent1"/>
-            </a:effectRef>
-            <a:fontRef idx="minor">
-              <a:schemeClr val="tx1"/>
-            </a:fontRef>
-          </p:style>
-        </p:cxnSp>
-        <p:cxnSp>
-          <p:nvCxnSpPr>
-            <p:cNvPr id="307" name="Straight Connector 306">
-              <a:extLst>
-                <a:ext uri="{FF2B5EF4-FFF2-40B4-BE49-F238E27FC236}">
-                  <a16:creationId xmlns:a16="http://schemas.microsoft.com/office/drawing/2014/main" id="{EA94A156-E109-774D-5FDF-8043EC42050A}"/>
-                </a:ext>
-              </a:extLst>
-            </p:cNvPr>
-            <p:cNvCxnSpPr>
-              <a:cxnSpLocks/>
-            </p:cNvCxnSpPr>
-            <p:nvPr/>
-          </p:nvCxnSpPr>
-          <p:spPr>
-            <a:xfrm>
-              <a:off x="10470692" y="12875469"/>
-              <a:ext cx="951115" cy="0"/>
-            </a:xfrm>
-            <a:prstGeom prst="line">
-              <a:avLst/>
-            </a:prstGeom>
-            <a:ln w="47625">
-              <a:solidFill>
-                <a:srgbClr val="C00000"/>
-              </a:solidFill>
-            </a:ln>
-          </p:spPr>
-          <p:style>
-            <a:lnRef idx="1">
-              <a:schemeClr val="accent1"/>
-            </a:lnRef>
-            <a:fillRef idx="0">
-              <a:schemeClr val="accent1"/>
-            </a:fillRef>
-            <a:effectRef idx="0">
-              <a:schemeClr val="accent1"/>
-            </a:effectRef>
-            <a:fontRef idx="minor">
-              <a:schemeClr val="tx1"/>
-            </a:fontRef>
-          </p:style>
-        </p:cxnSp>
-        <p:cxnSp>
-          <p:nvCxnSpPr>
-            <p:cNvPr id="309" name="Straight Connector 308">
-              <a:extLst>
-                <a:ext uri="{FF2B5EF4-FFF2-40B4-BE49-F238E27FC236}">
-                  <a16:creationId xmlns:a16="http://schemas.microsoft.com/office/drawing/2014/main" id="{01368AB0-6FEC-4E40-EF20-C123FBCFFF29}"/>
-                </a:ext>
-              </a:extLst>
-            </p:cNvPr>
-            <p:cNvCxnSpPr>
-              <a:cxnSpLocks/>
-            </p:cNvCxnSpPr>
-            <p:nvPr/>
-          </p:nvCxnSpPr>
-          <p:spPr>
-            <a:xfrm>
-              <a:off x="14243127" y="12857623"/>
-              <a:ext cx="951115" cy="0"/>
-            </a:xfrm>
-            <a:prstGeom prst="line">
-              <a:avLst/>
-            </a:prstGeom>
-            <a:ln w="95250">
-              <a:solidFill>
-                <a:schemeClr val="accent1">
-                  <a:lumMod val="75000"/>
-                </a:schemeClr>
-              </a:solidFill>
-            </a:ln>
-          </p:spPr>
-          <p:style>
-            <a:lnRef idx="1">
-              <a:schemeClr val="accent1"/>
-            </a:lnRef>
-            <a:fillRef idx="0">
-              <a:schemeClr val="accent1"/>
-            </a:fillRef>
-            <a:effectRef idx="0">
-              <a:schemeClr val="accent1"/>
-            </a:effectRef>
-            <a:fontRef idx="minor">
-              <a:schemeClr val="tx1"/>
-            </a:fontRef>
-          </p:style>
-        </p:cxnSp>
-        <p:cxnSp>
-          <p:nvCxnSpPr>
-            <p:cNvPr id="310" name="Straight Connector 309">
-              <a:extLst>
-                <a:ext uri="{FF2B5EF4-FFF2-40B4-BE49-F238E27FC236}">
-                  <a16:creationId xmlns:a16="http://schemas.microsoft.com/office/drawing/2014/main" id="{5459AFEF-BF27-F9DA-C489-E82435FED1A2}"/>
-                </a:ext>
-              </a:extLst>
-            </p:cNvPr>
-            <p:cNvCxnSpPr>
-              <a:cxnSpLocks/>
-            </p:cNvCxnSpPr>
-            <p:nvPr/>
-          </p:nvCxnSpPr>
-          <p:spPr>
-            <a:xfrm>
-              <a:off x="15190684" y="12879623"/>
-              <a:ext cx="951115" cy="0"/>
-            </a:xfrm>
-            <a:prstGeom prst="line">
-              <a:avLst/>
-            </a:prstGeom>
-            <a:ln w="47625">
-              <a:solidFill>
-                <a:schemeClr val="accent1">
-                  <a:lumMod val="75000"/>
-                </a:schemeClr>
-              </a:solidFill>
-            </a:ln>
-          </p:spPr>
-          <p:style>
-            <a:lnRef idx="1">
-              <a:schemeClr val="accent1"/>
-            </a:lnRef>
-            <a:fillRef idx="0">
-              <a:schemeClr val="accent1"/>
-            </a:fillRef>
-            <a:effectRef idx="0">
-              <a:schemeClr val="accent1"/>
-            </a:effectRef>
-            <a:fontRef idx="minor">
-              <a:schemeClr val="tx1"/>
-            </a:fontRef>
-          </p:style>
-        </p:cxnSp>
-        <p:sp>
-          <p:nvSpPr>
-            <p:cNvPr id="311" name="TextBox 310">
-              <a:extLst>
-                <a:ext uri="{FF2B5EF4-FFF2-40B4-BE49-F238E27FC236}">
-                  <a16:creationId xmlns:a16="http://schemas.microsoft.com/office/drawing/2014/main" id="{405F3348-AF82-CF3A-4B6F-13F81E3AE869}"/>
-                </a:ext>
-              </a:extLst>
-            </p:cNvPr>
-            <p:cNvSpPr txBox="1"/>
-            <p:nvPr/>
-          </p:nvSpPr>
-          <p:spPr>
-            <a:xfrm>
-              <a:off x="12427197" y="12862216"/>
-              <a:ext cx="790601" cy="553998"/>
-            </a:xfrm>
-            <a:prstGeom prst="rect">
-              <a:avLst/>
-            </a:prstGeom>
-            <a:noFill/>
-          </p:spPr>
-          <p:txBody>
-            <a:bodyPr wrap="none" rtlCol="0">
-              <a:spAutoFit/>
-            </a:bodyPr>
-            <a:lstStyle/>
-            <a:p>
-              <a:r>
-                <a:rPr lang="en-US" sz="3000" b="1" dirty="0">
-                  <a:latin typeface="Times New Roman" panose="02020603050405020304" pitchFamily="18" charset="0"/>
-                  <a:cs typeface="Times New Roman" panose="02020603050405020304" pitchFamily="18" charset="0"/>
-                </a:rPr>
-                <a:t>-0.8</a:t>
-              </a:r>
-            </a:p>
-          </p:txBody>
-        </p:sp>
-        <p:sp>
-          <p:nvSpPr>
-            <p:cNvPr id="312" name="TextBox 311">
-              <a:extLst>
-                <a:ext uri="{FF2B5EF4-FFF2-40B4-BE49-F238E27FC236}">
-                  <a16:creationId xmlns:a16="http://schemas.microsoft.com/office/drawing/2014/main" id="{03905A61-A4AE-A9C3-7600-29CDFA24E9CE}"/>
-                </a:ext>
-              </a:extLst>
-            </p:cNvPr>
-            <p:cNvSpPr txBox="1"/>
-            <p:nvPr/>
-          </p:nvSpPr>
-          <p:spPr>
-            <a:xfrm>
-              <a:off x="13433647" y="12869258"/>
-              <a:ext cx="673582" cy="553998"/>
-            </a:xfrm>
-            <a:prstGeom prst="rect">
-              <a:avLst/>
-            </a:prstGeom>
-            <a:noFill/>
-          </p:spPr>
-          <p:txBody>
-            <a:bodyPr wrap="none" rtlCol="0">
-              <a:spAutoFit/>
-            </a:bodyPr>
-            <a:lstStyle/>
-            <a:p>
-              <a:r>
-                <a:rPr lang="en-US" sz="3000" b="1" dirty="0">
-                  <a:latin typeface="Times New Roman" panose="02020603050405020304" pitchFamily="18" charset="0"/>
-                  <a:cs typeface="Times New Roman" panose="02020603050405020304" pitchFamily="18" charset="0"/>
-                </a:rPr>
-                <a:t>0.8</a:t>
-              </a:r>
-            </a:p>
-          </p:txBody>
-        </p:sp>
-        <p:sp>
-          <p:nvSpPr>
-            <p:cNvPr id="313" name="TextBox 312">
-              <a:extLst>
-                <a:ext uri="{FF2B5EF4-FFF2-40B4-BE49-F238E27FC236}">
-                  <a16:creationId xmlns:a16="http://schemas.microsoft.com/office/drawing/2014/main" id="{A5185E2D-DB4F-1D37-75C3-0550DED89ED4}"/>
-                </a:ext>
-              </a:extLst>
-            </p:cNvPr>
-            <p:cNvSpPr txBox="1"/>
-            <p:nvPr/>
-          </p:nvSpPr>
-          <p:spPr>
-            <a:xfrm>
-              <a:off x="11484020" y="12869258"/>
-              <a:ext cx="790601" cy="553998"/>
-            </a:xfrm>
-            <a:prstGeom prst="rect">
-              <a:avLst/>
-            </a:prstGeom>
-            <a:noFill/>
-          </p:spPr>
-          <p:txBody>
-            <a:bodyPr wrap="none" rtlCol="0">
-              <a:spAutoFit/>
-            </a:bodyPr>
-            <a:lstStyle/>
-            <a:p>
-              <a:r>
-                <a:rPr lang="en-US" sz="3000" b="1" dirty="0">
-                  <a:latin typeface="Times New Roman" panose="02020603050405020304" pitchFamily="18" charset="0"/>
-                  <a:cs typeface="Times New Roman" panose="02020603050405020304" pitchFamily="18" charset="0"/>
-                </a:rPr>
-                <a:t>-0.4</a:t>
-              </a:r>
-            </a:p>
-          </p:txBody>
-        </p:sp>
-        <p:sp>
-          <p:nvSpPr>
-            <p:cNvPr id="314" name="TextBox 313">
-              <a:extLst>
-                <a:ext uri="{FF2B5EF4-FFF2-40B4-BE49-F238E27FC236}">
-                  <a16:creationId xmlns:a16="http://schemas.microsoft.com/office/drawing/2014/main" id="{336C6BA1-652E-4332-3874-0C406AC32821}"/>
-                </a:ext>
-              </a:extLst>
-            </p:cNvPr>
-            <p:cNvSpPr txBox="1"/>
-            <p:nvPr/>
-          </p:nvSpPr>
-          <p:spPr>
-            <a:xfrm>
-              <a:off x="14376824" y="12872711"/>
-              <a:ext cx="673582" cy="553998"/>
-            </a:xfrm>
-            <a:prstGeom prst="rect">
-              <a:avLst/>
-            </a:prstGeom>
-            <a:noFill/>
-          </p:spPr>
-          <p:txBody>
-            <a:bodyPr wrap="none" rtlCol="0">
-              <a:spAutoFit/>
-            </a:bodyPr>
-            <a:lstStyle/>
-            <a:p>
-              <a:r>
-                <a:rPr lang="en-US" sz="3000" b="1" dirty="0">
-                  <a:latin typeface="Times New Roman" panose="02020603050405020304" pitchFamily="18" charset="0"/>
-                  <a:cs typeface="Times New Roman" panose="02020603050405020304" pitchFamily="18" charset="0"/>
-                </a:rPr>
-                <a:t>0.4</a:t>
-              </a:r>
-            </a:p>
-          </p:txBody>
-        </p:sp>
-        <p:sp>
-          <p:nvSpPr>
-            <p:cNvPr id="315" name="TextBox 314">
-              <a:extLst>
-                <a:ext uri="{FF2B5EF4-FFF2-40B4-BE49-F238E27FC236}">
-                  <a16:creationId xmlns:a16="http://schemas.microsoft.com/office/drawing/2014/main" id="{0A735BE5-8F12-20AC-B7DA-99178782D0A5}"/>
-                </a:ext>
-              </a:extLst>
-            </p:cNvPr>
-            <p:cNvSpPr txBox="1"/>
-            <p:nvPr/>
-          </p:nvSpPr>
-          <p:spPr>
-            <a:xfrm>
-              <a:off x="15333008" y="12854887"/>
-              <a:ext cx="673582" cy="553998"/>
-            </a:xfrm>
-            <a:prstGeom prst="rect">
-              <a:avLst/>
-            </a:prstGeom>
-            <a:noFill/>
-          </p:spPr>
-          <p:txBody>
-            <a:bodyPr wrap="none" rtlCol="0">
-              <a:spAutoFit/>
-            </a:bodyPr>
-            <a:lstStyle/>
-            <a:p>
-              <a:r>
-                <a:rPr lang="en-US" sz="3000" b="1" dirty="0">
-                  <a:latin typeface="Times New Roman" panose="02020603050405020304" pitchFamily="18" charset="0"/>
-                  <a:cs typeface="Times New Roman" panose="02020603050405020304" pitchFamily="18" charset="0"/>
-                </a:rPr>
-                <a:t>0.2</a:t>
-              </a:r>
-            </a:p>
-          </p:txBody>
-        </p:sp>
-        <p:sp>
-          <p:nvSpPr>
-            <p:cNvPr id="317" name="TextBox 316">
-              <a:extLst>
-                <a:ext uri="{FF2B5EF4-FFF2-40B4-BE49-F238E27FC236}">
-                  <a16:creationId xmlns:a16="http://schemas.microsoft.com/office/drawing/2014/main" id="{E5B0E893-4292-A9DA-E31F-4F434D6BA189}"/>
-                </a:ext>
-              </a:extLst>
-            </p:cNvPr>
-            <p:cNvSpPr txBox="1"/>
-            <p:nvPr/>
-          </p:nvSpPr>
-          <p:spPr>
-            <a:xfrm>
-              <a:off x="10587260" y="12874312"/>
-              <a:ext cx="790601" cy="553998"/>
-            </a:xfrm>
-            <a:prstGeom prst="rect">
-              <a:avLst/>
-            </a:prstGeom>
-            <a:noFill/>
-          </p:spPr>
-          <p:txBody>
-            <a:bodyPr wrap="none" rtlCol="0">
-              <a:spAutoFit/>
-            </a:bodyPr>
-            <a:lstStyle/>
-            <a:p>
-              <a:r>
-                <a:rPr lang="en-US" sz="3000" b="1" dirty="0">
-                  <a:latin typeface="Times New Roman" panose="02020603050405020304" pitchFamily="18" charset="0"/>
-                  <a:cs typeface="Times New Roman" panose="02020603050405020304" pitchFamily="18" charset="0"/>
-                </a:rPr>
-                <a:t>-0.2</a:t>
-              </a:r>
-            </a:p>
-          </p:txBody>
-        </p:sp>
-        <p:sp>
-          <p:nvSpPr>
-            <p:cNvPr id="318" name="TextBox 317">
-              <a:extLst>
-                <a:ext uri="{FF2B5EF4-FFF2-40B4-BE49-F238E27FC236}">
-                  <a16:creationId xmlns:a16="http://schemas.microsoft.com/office/drawing/2014/main" id="{381CB219-7134-E7DD-E806-9373BDC6B8E3}"/>
-                </a:ext>
-              </a:extLst>
-            </p:cNvPr>
-            <p:cNvSpPr txBox="1"/>
-            <p:nvPr/>
-          </p:nvSpPr>
-          <p:spPr>
-            <a:xfrm>
-              <a:off x="11155513" y="13745789"/>
-              <a:ext cx="4278735" cy="553998"/>
-            </a:xfrm>
-            <a:prstGeom prst="rect">
-              <a:avLst/>
-            </a:prstGeom>
-            <a:noFill/>
-          </p:spPr>
-          <p:txBody>
-            <a:bodyPr wrap="none" rtlCol="0">
-              <a:spAutoFit/>
-            </a:bodyPr>
-            <a:lstStyle/>
-            <a:p>
-              <a:r>
-                <a:rPr lang="en-US" sz="3000" b="1" dirty="0">
-                  <a:latin typeface="Times New Roman" panose="02020603050405020304" pitchFamily="18" charset="0"/>
-                  <a:cs typeface="Times New Roman" panose="02020603050405020304" pitchFamily="18" charset="0"/>
-                </a:rPr>
-                <a:t>Standardized Coefficient</a:t>
-              </a:r>
-            </a:p>
-          </p:txBody>
-        </p:sp>
-        <p:cxnSp>
-          <p:nvCxnSpPr>
-            <p:cNvPr id="306" name="Straight Connector 305">
-              <a:extLst>
-                <a:ext uri="{FF2B5EF4-FFF2-40B4-BE49-F238E27FC236}">
-                  <a16:creationId xmlns:a16="http://schemas.microsoft.com/office/drawing/2014/main" id="{D1A9DA54-E777-BA6D-9268-2E5E984EB1E2}"/>
-                </a:ext>
-              </a:extLst>
-            </p:cNvPr>
-            <p:cNvCxnSpPr>
-              <a:cxnSpLocks/>
-            </p:cNvCxnSpPr>
-            <p:nvPr/>
-          </p:nvCxnSpPr>
-          <p:spPr>
-            <a:xfrm>
-              <a:off x="12346941" y="12809231"/>
-              <a:ext cx="951115" cy="0"/>
-            </a:xfrm>
-            <a:prstGeom prst="line">
-              <a:avLst/>
-            </a:prstGeom>
-            <a:ln w="190500">
-              <a:solidFill>
-                <a:srgbClr val="C00000"/>
-              </a:solidFill>
-            </a:ln>
-          </p:spPr>
-          <p:style>
-            <a:lnRef idx="1">
-              <a:schemeClr val="accent1"/>
-            </a:lnRef>
-            <a:fillRef idx="0">
-              <a:schemeClr val="accent1"/>
-            </a:fillRef>
-            <a:effectRef idx="0">
-              <a:schemeClr val="accent1"/>
-            </a:effectRef>
-            <a:fontRef idx="minor">
-              <a:schemeClr val="tx1"/>
-            </a:fontRef>
-          </p:style>
-        </p:cxnSp>
-        <p:cxnSp>
-          <p:nvCxnSpPr>
-            <p:cNvPr id="308" name="Straight Connector 307">
-              <a:extLst>
-                <a:ext uri="{FF2B5EF4-FFF2-40B4-BE49-F238E27FC236}">
-                  <a16:creationId xmlns:a16="http://schemas.microsoft.com/office/drawing/2014/main" id="{58FCCEEE-319F-0DEB-6973-1CFE1856B2B0}"/>
-                </a:ext>
-              </a:extLst>
-            </p:cNvPr>
-            <p:cNvCxnSpPr>
-              <a:cxnSpLocks/>
-            </p:cNvCxnSpPr>
-            <p:nvPr/>
-          </p:nvCxnSpPr>
-          <p:spPr>
-            <a:xfrm>
-              <a:off x="13294881" y="12808239"/>
-              <a:ext cx="951115" cy="0"/>
-            </a:xfrm>
-            <a:prstGeom prst="line">
-              <a:avLst/>
-            </a:prstGeom>
-            <a:ln w="190500">
-              <a:solidFill>
-                <a:schemeClr val="accent1">
-                  <a:lumMod val="75000"/>
-                </a:schemeClr>
-              </a:solidFill>
-            </a:ln>
-          </p:spPr>
-          <p:style>
-            <a:lnRef idx="1">
-              <a:schemeClr val="accent1"/>
-            </a:lnRef>
-            <a:fillRef idx="0">
-              <a:schemeClr val="accent1"/>
-            </a:fillRef>
-            <a:effectRef idx="0">
-              <a:schemeClr val="accent1"/>
-            </a:effectRef>
-            <a:fontRef idx="minor">
-              <a:schemeClr val="tx1"/>
-            </a:fontRef>
-          </p:style>
-        </p:cxnSp>
-        <p:sp>
-          <p:nvSpPr>
-            <p:cNvPr id="2" name="Rectangle 1">
-              <a:extLst>
-                <a:ext uri="{FF2B5EF4-FFF2-40B4-BE49-F238E27FC236}">
-                  <a16:creationId xmlns:a16="http://schemas.microsoft.com/office/drawing/2014/main" id="{0505CCCA-23EC-02F8-8E02-93D20241DF45}"/>
-                </a:ext>
-              </a:extLst>
-            </p:cNvPr>
-            <p:cNvSpPr/>
-            <p:nvPr/>
-          </p:nvSpPr>
-          <p:spPr>
-            <a:xfrm>
-              <a:off x="10433050" y="12903688"/>
-              <a:ext cx="5751830" cy="56852"/>
-            </a:xfrm>
-            <a:prstGeom prst="rect">
-              <a:avLst/>
-            </a:prstGeom>
-            <a:solidFill>
-              <a:schemeClr val="bg1"/>
-            </a:solidFill>
-            <a:ln>
-              <a:noFill/>
-            </a:ln>
-          </p:spPr>
-          <p:style>
-            <a:lnRef idx="2">
-              <a:schemeClr val="accent1">
-                <a:shade val="50000"/>
-              </a:schemeClr>
-            </a:lnRef>
-            <a:fillRef idx="1">
-              <a:schemeClr val="accent1"/>
-            </a:fillRef>
-            <a:effectRef idx="0">
-              <a:schemeClr val="accent1"/>
-            </a:effectRef>
-            <a:fontRef idx="minor">
-              <a:schemeClr val="lt1"/>
-            </a:fontRef>
-          </p:style>
-          <p:txBody>
-            <a:bodyPr rtlCol="0" anchor="ctr"/>
-            <a:lstStyle/>
-            <a:p>
-              <a:pPr algn="ctr"/>
-              <a:endParaRPr lang="en-US"/>
-            </a:p>
-          </p:txBody>
-        </p:sp>
-      </p:grpSp>
-      <p:sp>
-        <p:nvSpPr>
-          <p:cNvPr id="7" name="TextBox 6">
-            <a:extLst>
-              <a:ext uri="{FF2B5EF4-FFF2-40B4-BE49-F238E27FC236}">
-                <a16:creationId xmlns:a16="http://schemas.microsoft.com/office/drawing/2014/main" id="{57D6CB6B-2AB0-EAA2-7F43-80EE740A68DC}"/>
-              </a:ext>
-            </a:extLst>
-          </p:cNvPr>
-          <p:cNvSpPr txBox="1"/>
-          <p:nvPr/>
-        </p:nvSpPr>
-        <p:spPr>
-          <a:xfrm>
-            <a:off x="20000893" y="6605491"/>
-            <a:ext cx="800219" cy="461665"/>
-          </a:xfrm>
-          <a:prstGeom prst="rect">
-            <a:avLst/>
-          </a:prstGeom>
-          <a:noFill/>
-        </p:spPr>
-        <p:txBody>
-          <a:bodyPr wrap="none" rtlCol="0">
-            <a:spAutoFit/>
-          </a:bodyPr>
-          <a:lstStyle/>
-          <a:p>
-            <a:r>
-              <a:rPr lang="en-US" sz="2400" b="1" dirty="0">
-                <a:latin typeface="Times New Roman" panose="02020603050405020304" pitchFamily="18" charset="0"/>
-                <a:cs typeface="Times New Roman" panose="02020603050405020304" pitchFamily="18" charset="0"/>
-              </a:rPr>
-              <a:t>91%</a:t>
-            </a:r>
-          </a:p>
-        </p:txBody>
-      </p:sp>
-      <p:sp>
-        <p:nvSpPr>
-          <p:cNvPr id="8" name="TextBox 7">
-            <a:extLst>
-              <a:ext uri="{FF2B5EF4-FFF2-40B4-BE49-F238E27FC236}">
-                <a16:creationId xmlns:a16="http://schemas.microsoft.com/office/drawing/2014/main" id="{E73D4731-015B-1393-5949-6BDFE1D295AE}"/>
-              </a:ext>
-            </a:extLst>
-          </p:cNvPr>
-          <p:cNvSpPr txBox="1"/>
-          <p:nvPr/>
-        </p:nvSpPr>
-        <p:spPr>
-          <a:xfrm>
-            <a:off x="15439196" y="6605491"/>
-            <a:ext cx="800219" cy="461665"/>
-          </a:xfrm>
-          <a:prstGeom prst="rect">
-            <a:avLst/>
-          </a:prstGeom>
-          <a:noFill/>
-        </p:spPr>
-        <p:txBody>
-          <a:bodyPr wrap="none" rtlCol="0">
-            <a:spAutoFit/>
-          </a:bodyPr>
-          <a:lstStyle/>
-          <a:p>
-            <a:r>
-              <a:rPr lang="en-US" sz="2400" b="1" dirty="0">
-                <a:latin typeface="Times New Roman" panose="02020603050405020304" pitchFamily="18" charset="0"/>
-                <a:cs typeface="Times New Roman" panose="02020603050405020304" pitchFamily="18" charset="0"/>
-              </a:rPr>
-              <a:t>92%</a:t>
-            </a:r>
-          </a:p>
-        </p:txBody>
-      </p:sp>
-      <p:sp>
-        <p:nvSpPr>
-          <p:cNvPr id="9" name="TextBox 8">
-            <a:extLst>
-              <a:ext uri="{FF2B5EF4-FFF2-40B4-BE49-F238E27FC236}">
-                <a16:creationId xmlns:a16="http://schemas.microsoft.com/office/drawing/2014/main" id="{27C8939D-FF82-E5EA-6D69-AB10AEAE0B28}"/>
-              </a:ext>
-            </a:extLst>
-          </p:cNvPr>
-          <p:cNvSpPr txBox="1"/>
-          <p:nvPr/>
-        </p:nvSpPr>
-        <p:spPr>
-          <a:xfrm>
-            <a:off x="20000893" y="3846361"/>
-            <a:ext cx="800219" cy="461665"/>
-          </a:xfrm>
-          <a:prstGeom prst="rect">
-            <a:avLst/>
-          </a:prstGeom>
-          <a:noFill/>
-        </p:spPr>
-        <p:txBody>
-          <a:bodyPr wrap="none" rtlCol="0">
-            <a:spAutoFit/>
-          </a:bodyPr>
-          <a:lstStyle/>
-          <a:p>
-            <a:r>
-              <a:rPr lang="en-US" sz="2400" b="1" dirty="0">
-                <a:latin typeface="Times New Roman" panose="02020603050405020304" pitchFamily="18" charset="0"/>
-                <a:cs typeface="Times New Roman" panose="02020603050405020304" pitchFamily="18" charset="0"/>
-              </a:rPr>
-              <a:t>58%</a:t>
-            </a:r>
-          </a:p>
-        </p:txBody>
-      </p:sp>
-      <p:sp>
-        <p:nvSpPr>
-          <p:cNvPr id="10" name="TextBox 9">
-            <a:extLst>
-              <a:ext uri="{FF2B5EF4-FFF2-40B4-BE49-F238E27FC236}">
-                <a16:creationId xmlns:a16="http://schemas.microsoft.com/office/drawing/2014/main" id="{84AF56ED-6C10-30BE-8578-D4C573039D29}"/>
-              </a:ext>
-            </a:extLst>
-          </p:cNvPr>
-          <p:cNvSpPr txBox="1"/>
-          <p:nvPr/>
-        </p:nvSpPr>
-        <p:spPr>
-          <a:xfrm>
-            <a:off x="20000893" y="9309284"/>
-            <a:ext cx="800219" cy="461665"/>
-          </a:xfrm>
-          <a:prstGeom prst="rect">
-            <a:avLst/>
-          </a:prstGeom>
-          <a:noFill/>
-        </p:spPr>
-        <p:txBody>
-          <a:bodyPr wrap="none" rtlCol="0">
-            <a:spAutoFit/>
-          </a:bodyPr>
-          <a:lstStyle/>
-          <a:p>
-            <a:r>
-              <a:rPr lang="en-US" sz="2400" b="1" dirty="0">
-                <a:latin typeface="Times New Roman" panose="02020603050405020304" pitchFamily="18" charset="0"/>
-                <a:cs typeface="Times New Roman" panose="02020603050405020304" pitchFamily="18" charset="0"/>
-              </a:rPr>
-              <a:t>78%</a:t>
-            </a:r>
-          </a:p>
-        </p:txBody>
-      </p:sp>
-      <p:sp>
-        <p:nvSpPr>
-          <p:cNvPr id="14" name="TextBox 13">
-            <a:extLst>
-              <a:ext uri="{FF2B5EF4-FFF2-40B4-BE49-F238E27FC236}">
-                <a16:creationId xmlns:a16="http://schemas.microsoft.com/office/drawing/2014/main" id="{989BE5E6-26A2-D25C-F47A-691F4607216F}"/>
-              </a:ext>
-            </a:extLst>
-          </p:cNvPr>
-          <p:cNvSpPr txBox="1"/>
-          <p:nvPr/>
-        </p:nvSpPr>
-        <p:spPr>
-          <a:xfrm>
-            <a:off x="10874861" y="6599521"/>
-            <a:ext cx="800219" cy="461665"/>
-          </a:xfrm>
-          <a:prstGeom prst="rect">
-            <a:avLst/>
-          </a:prstGeom>
-          <a:noFill/>
-        </p:spPr>
-        <p:txBody>
-          <a:bodyPr wrap="none" rtlCol="0">
-            <a:spAutoFit/>
-          </a:bodyPr>
-          <a:lstStyle/>
-          <a:p>
-            <a:r>
-              <a:rPr lang="en-US" sz="2400" b="1" dirty="0">
-                <a:latin typeface="Times New Roman" panose="02020603050405020304" pitchFamily="18" charset="0"/>
-                <a:cs typeface="Times New Roman" panose="02020603050405020304" pitchFamily="18" charset="0"/>
-              </a:rPr>
-              <a:t>41%</a:t>
-            </a:r>
-          </a:p>
-        </p:txBody>
-      </p:sp>
-      <p:cxnSp>
-        <p:nvCxnSpPr>
-          <p:cNvPr id="20" name="Elbow Connector 19">
-            <a:extLst>
-              <a:ext uri="{FF2B5EF4-FFF2-40B4-BE49-F238E27FC236}">
-                <a16:creationId xmlns:a16="http://schemas.microsoft.com/office/drawing/2014/main" id="{2F9630E7-B665-E4BF-AAE2-743E494E464F}"/>
-              </a:ext>
-            </a:extLst>
-          </p:cNvPr>
-          <p:cNvCxnSpPr>
-            <a:cxnSpLocks/>
-            <a:stCxn id="147" idx="1"/>
-          </p:cNvCxnSpPr>
-          <p:nvPr/>
-        </p:nvCxnSpPr>
-        <p:spPr>
-          <a:xfrm rot="10800000" flipV="1">
-            <a:off x="10544100" y="4732126"/>
-            <a:ext cx="3692054" cy="1462196"/>
-          </a:xfrm>
-          <a:prstGeom prst="bentConnector3">
-            <a:avLst/>
-          </a:prstGeom>
-          <a:ln w="116839">
-            <a:solidFill>
-              <a:schemeClr val="accent1">
-                <a:lumMod val="75000"/>
-              </a:schemeClr>
-            </a:solidFill>
-          </a:ln>
-        </p:spPr>
-        <p:style>
-          <a:lnRef idx="1">
-            <a:schemeClr val="accent1"/>
-          </a:lnRef>
-          <a:fillRef idx="0">
-            <a:schemeClr val="accent1"/>
-          </a:fillRef>
-          <a:effectRef idx="0">
-            <a:schemeClr val="accent1"/>
-          </a:effectRef>
-          <a:fontRef idx="minor">
-            <a:schemeClr val="tx1"/>
-          </a:fontRef>
-        </p:style>
-      </p:cxnSp>
-      <p:cxnSp>
-        <p:nvCxnSpPr>
-          <p:cNvPr id="22" name="Straight Arrow Connector 21">
-            <a:extLst>
-              <a:ext uri="{FF2B5EF4-FFF2-40B4-BE49-F238E27FC236}">
-                <a16:creationId xmlns:a16="http://schemas.microsoft.com/office/drawing/2014/main" id="{758CD8AA-F1B9-60EF-F311-DED381AAFB59}"/>
-              </a:ext>
-            </a:extLst>
-          </p:cNvPr>
-          <p:cNvCxnSpPr>
-            <a:endCxn id="148" idx="0"/>
-          </p:cNvCxnSpPr>
-          <p:nvPr/>
-        </p:nvCxnSpPr>
-        <p:spPr>
-          <a:xfrm>
-            <a:off x="10617421" y="6194322"/>
-            <a:ext cx="0" cy="838754"/>
-          </a:xfrm>
-          <a:prstGeom prst="straightConnector1">
-            <a:avLst/>
-          </a:prstGeom>
-          <a:ln w="116839">
-            <a:solidFill>
-              <a:schemeClr val="accent1">
-                <a:lumMod val="75000"/>
-              </a:schemeClr>
-            </a:solidFill>
-            <a:tailEnd type="triangle"/>
-          </a:ln>
-        </p:spPr>
-        <p:style>
-          <a:lnRef idx="1">
-            <a:schemeClr val="accent1"/>
-          </a:lnRef>
-          <a:fillRef idx="0">
-            <a:schemeClr val="accent1"/>
-          </a:fillRef>
-          <a:effectRef idx="0">
-            <a:schemeClr val="accent1"/>
-          </a:effectRef>
-          <a:fontRef idx="minor">
-            <a:schemeClr val="tx1"/>
-          </a:fontRef>
-        </p:style>
-      </p:cxnSp>
-      <p:sp>
-        <p:nvSpPr>
-          <p:cNvPr id="26" name="Rectangle 25">
-            <a:extLst>
-              <a:ext uri="{FF2B5EF4-FFF2-40B4-BE49-F238E27FC236}">
-                <a16:creationId xmlns:a16="http://schemas.microsoft.com/office/drawing/2014/main" id="{78122B79-003A-2809-E878-A39B4C455359}"/>
-              </a:ext>
-            </a:extLst>
-          </p:cNvPr>
-          <p:cNvSpPr/>
-          <p:nvPr/>
-        </p:nvSpPr>
-        <p:spPr>
-          <a:xfrm>
-            <a:off x="10398125" y="6045200"/>
-            <a:ext cx="158675" cy="225425"/>
-          </a:xfrm>
-          <a:prstGeom prst="rect">
-            <a:avLst/>
-          </a:prstGeom>
-          <a:solidFill>
-            <a:schemeClr val="bg1"/>
-          </a:solidFill>
-          <a:ln>
-            <a:noFill/>
-          </a:ln>
-        </p:spPr>
-        <p:style>
-          <a:lnRef idx="2">
-            <a:schemeClr val="accent1">
-              <a:shade val="50000"/>
-            </a:schemeClr>
-          </a:lnRef>
-          <a:fillRef idx="1">
-            <a:schemeClr val="accent1"/>
-          </a:fillRef>
-          <a:effectRef idx="0">
-            <a:schemeClr val="accent1"/>
-          </a:effectRef>
-          <a:fontRef idx="minor">
-            <a:schemeClr val="lt1"/>
-          </a:fontRef>
-        </p:style>
-        <p:txBody>
-          <a:bodyPr rtlCol="0" anchor="ctr"/>
-          <a:lstStyle/>
-          <a:p>
-            <a:pPr algn="ctr"/>
-            <a:endParaRPr lang="en-US"/>
-          </a:p>
-        </p:txBody>
-      </p:sp>
-      <p:sp>
-        <p:nvSpPr>
-          <p:cNvPr id="147" name="Rectangle 146">
-            <a:extLst>
-              <a:ext uri="{FF2B5EF4-FFF2-40B4-BE49-F238E27FC236}">
-                <a16:creationId xmlns:a16="http://schemas.microsoft.com/office/drawing/2014/main" id="{C5E78A6B-70A3-51B7-4E35-61DC0344F209}"/>
-              </a:ext>
-            </a:extLst>
-          </p:cNvPr>
-          <p:cNvSpPr/>
-          <p:nvPr/>
-        </p:nvSpPr>
-        <p:spPr>
-          <a:xfrm>
-            <a:off x="14236154" y="4293514"/>
-            <a:ext cx="1819398" cy="877223"/>
-          </a:xfrm>
-          <a:prstGeom prst="rect">
-            <a:avLst/>
-          </a:prstGeom>
-          <a:solidFill>
-            <a:schemeClr val="bg1"/>
-          </a:solidFill>
-          <a:ln w="38100">
-            <a:solidFill>
-              <a:schemeClr val="tx1"/>
-            </a:solidFill>
-          </a:ln>
-        </p:spPr>
-        <p:style>
-          <a:lnRef idx="2">
-            <a:schemeClr val="accent1">
-              <a:shade val="50000"/>
-            </a:schemeClr>
-          </a:lnRef>
-          <a:fillRef idx="1">
-            <a:schemeClr val="accent1"/>
-          </a:fillRef>
-          <a:effectRef idx="0">
-            <a:schemeClr val="accent1"/>
-          </a:effectRef>
-          <a:fontRef idx="minor">
-            <a:schemeClr val="lt1"/>
-          </a:fontRef>
-        </p:style>
-        <p:txBody>
-          <a:bodyPr rtlCol="0" anchor="ctr"/>
-          <a:lstStyle/>
-          <a:p>
-            <a:pPr algn="ctr"/>
-            <a:r>
-              <a:rPr lang="en-US" sz="3000" b="1" dirty="0">
-                <a:solidFill>
-                  <a:schemeClr val="accent1">
-                    <a:lumMod val="75000"/>
-                  </a:schemeClr>
-                </a:solidFill>
-                <a:latin typeface="Times New Roman" panose="02020603050405020304" pitchFamily="18" charset="0"/>
-                <a:cs typeface="Times New Roman" panose="02020603050405020304" pitchFamily="18" charset="0"/>
-              </a:rPr>
-              <a:t>C</a:t>
-            </a:r>
-            <a:r>
-              <a:rPr lang="en-US" sz="3000" b="1" baseline="-25000" dirty="0">
-                <a:solidFill>
-                  <a:schemeClr val="accent1">
-                    <a:lumMod val="75000"/>
-                  </a:schemeClr>
-                </a:solidFill>
-                <a:latin typeface="Times New Roman" panose="02020603050405020304" pitchFamily="18" charset="0"/>
-                <a:cs typeface="Times New Roman" panose="02020603050405020304" pitchFamily="18" charset="0"/>
-              </a:rPr>
-              <a:t>3</a:t>
-            </a:r>
-            <a:r>
-              <a:rPr lang="en-US" sz="3000" b="1" dirty="0">
-                <a:solidFill>
-                  <a:schemeClr val="tx1"/>
-                </a:solidFill>
-                <a:latin typeface="Times New Roman" panose="02020603050405020304" pitchFamily="18" charset="0"/>
-                <a:cs typeface="Times New Roman" panose="02020603050405020304" pitchFamily="18" charset="0"/>
-              </a:rPr>
-              <a:t>/</a:t>
-            </a:r>
-            <a:r>
-              <a:rPr lang="en-US" sz="3000" b="1" dirty="0">
-                <a:solidFill>
-                  <a:srgbClr val="C00000"/>
-                </a:solidFill>
-                <a:latin typeface="Times New Roman" panose="02020603050405020304" pitchFamily="18" charset="0"/>
-                <a:cs typeface="Times New Roman" panose="02020603050405020304" pitchFamily="18" charset="0"/>
-              </a:rPr>
-              <a:t>C</a:t>
-            </a:r>
-            <a:r>
-              <a:rPr lang="en-US" sz="3000" b="1" baseline="-25000" dirty="0">
-                <a:solidFill>
-                  <a:srgbClr val="C00000"/>
-                </a:solidFill>
-                <a:latin typeface="Times New Roman" panose="02020603050405020304" pitchFamily="18" charset="0"/>
-                <a:cs typeface="Times New Roman" panose="02020603050405020304" pitchFamily="18" charset="0"/>
-              </a:rPr>
-              <a:t>4</a:t>
-            </a:r>
-            <a:endParaRPr lang="en-US" sz="3000" b="1" dirty="0">
-              <a:solidFill>
-                <a:srgbClr val="C00000"/>
-              </a:solidFill>
-              <a:latin typeface="Times New Roman" panose="02020603050405020304" pitchFamily="18" charset="0"/>
-              <a:cs typeface="Times New Roman" panose="02020603050405020304" pitchFamily="18" charset="0"/>
-            </a:endParaRPr>
-          </a:p>
-        </p:txBody>
-      </p:sp>
-    </p:spTree>
-    <p:extLst>
-      <p:ext uri="{BB962C8B-B14F-4D97-AF65-F5344CB8AC3E}">
-        <p14:creationId xmlns:p14="http://schemas.microsoft.com/office/powerpoint/2010/main" val="14914278"/>
-      </p:ext>
-    </p:extLst>
-  </p:cSld>
-  <p:clrMapOvr>
-    <a:masterClrMapping/>
-  </p:clrMapOvr>
-</p:sld>
-</file>
-
-<file path=ppt/slides/slide3.xml><?xml version="1.0" encoding="utf-8"?>
-<p:sld xmlns:a="http://schemas.openxmlformats.org/drawingml/2006/main" xmlns:r="http://schemas.openxmlformats.org/officeDocument/2006/relationships" xmlns:p="http://schemas.openxmlformats.org/presentationml/2006/main">
-  <p:cSld>
     <p:bg>
       <p:bgPr>
         <a:solidFill>
@@ -8480,7 +5841,7 @@
           <a:prstGeom prst="straightConnector1">
             <a:avLst/>
           </a:prstGeom>
-          <a:ln w="169926">
+          <a:ln w="169799">
             <a:solidFill>
               <a:schemeClr val="accent1">
                 <a:lumMod val="75000"/>
@@ -8518,7 +5879,7 @@
         </p:nvSpPr>
         <p:spPr>
           <a:xfrm>
-            <a:off x="20000893" y="6605491"/>
+            <a:off x="18804683" y="6560915"/>
             <a:ext cx="800219" cy="461665"/>
           </a:xfrm>
           <a:prstGeom prst="rect">
@@ -8575,7 +5936,7 @@
                 <a:latin typeface="Times New Roman" panose="02020603050405020304" pitchFamily="18" charset="0"/>
                 <a:cs typeface="Times New Roman" panose="02020603050405020304" pitchFamily="18" charset="0"/>
               </a:rPr>
-              <a:t>82%</a:t>
+              <a:t>92%</a:t>
             </a:r>
           </a:p>
         </p:txBody>
@@ -8594,7 +5955,7 @@
         </p:nvSpPr>
         <p:spPr>
           <a:xfrm>
-            <a:off x="20000892" y="3852711"/>
+            <a:off x="18804684" y="3847753"/>
             <a:ext cx="800219" cy="461665"/>
           </a:xfrm>
           <a:prstGeom prst="rect">
@@ -8613,7 +5974,7 @@
                 <a:latin typeface="Times New Roman" panose="02020603050405020304" pitchFamily="18" charset="0"/>
                 <a:cs typeface="Times New Roman" panose="02020603050405020304" pitchFamily="18" charset="0"/>
               </a:rPr>
-              <a:t>55%</a:t>
+              <a:t>56%</a:t>
             </a:r>
           </a:p>
         </p:txBody>
@@ -8632,7 +5993,7 @@
         </p:nvSpPr>
         <p:spPr>
           <a:xfrm>
-            <a:off x="20000893" y="9309284"/>
+            <a:off x="18804682" y="9297010"/>
             <a:ext cx="800219" cy="461665"/>
           </a:xfrm>
           <a:prstGeom prst="rect">
@@ -8651,7 +6012,7 @@
                 <a:latin typeface="Times New Roman" panose="02020603050405020304" pitchFamily="18" charset="0"/>
                 <a:cs typeface="Times New Roman" panose="02020603050405020304" pitchFamily="18" charset="0"/>
               </a:rPr>
-              <a:t>56%</a:t>
+              <a:t>58%</a:t>
             </a:r>
           </a:p>
         </p:txBody>
@@ -8689,7 +6050,7 @@
                 <a:latin typeface="Times New Roman" panose="02020603050405020304" pitchFamily="18" charset="0"/>
                 <a:cs typeface="Times New Roman" panose="02020603050405020304" pitchFamily="18" charset="0"/>
               </a:rPr>
-              <a:t>38%</a:t>
+              <a:t>29%</a:t>
             </a:r>
           </a:p>
         </p:txBody>
@@ -8768,7 +6129,7 @@
           <a:prstGeom prst="straightConnector1">
             <a:avLst/>
           </a:prstGeom>
-          <a:ln w="185166">
+          <a:ln w="187325">
             <a:solidFill>
               <a:schemeClr val="accent1">
                 <a:lumMod val="75000"/>
@@ -8814,7 +6175,7 @@
           <a:prstGeom prst="straightConnector1">
             <a:avLst/>
           </a:prstGeom>
-          <a:ln w="53467">
+          <a:ln w="45085">
             <a:solidFill>
               <a:srgbClr val="C00000"/>
             </a:solidFill>
@@ -8860,7 +6221,7 @@
               <a:gd name="adj1" fmla="val -7214828"/>
             </a:avLst>
           </a:prstGeom>
-          <a:ln w="47879">
+          <a:ln w="58927">
             <a:solidFill>
               <a:srgbClr val="C00000"/>
             </a:solidFill>
@@ -8905,7 +6266,7 @@
           <a:prstGeom prst="straightConnector1">
             <a:avLst/>
           </a:prstGeom>
-          <a:ln w="73279">
+          <a:ln w="36957">
             <a:solidFill>
               <a:schemeClr val="accent1">
                 <a:lumMod val="75000"/>
@@ -8951,7 +6312,7 @@
           <a:prstGeom prst="straightConnector1">
             <a:avLst/>
           </a:prstGeom>
-          <a:ln w="26416">
+          <a:ln w="18415">
             <a:solidFill>
               <a:srgbClr val="C00000"/>
             </a:solidFill>
@@ -8995,7 +6356,7 @@
           <a:prstGeom prst="straightConnector1">
             <a:avLst/>
           </a:prstGeom>
-          <a:ln w="49276">
+          <a:ln w="38354">
             <a:solidFill>
               <a:srgbClr val="C00000"/>
             </a:solidFill>
@@ -9039,7 +6400,7 @@
           <a:prstGeom prst="straightConnector1">
             <a:avLst/>
           </a:prstGeom>
-          <a:ln w="106298">
+          <a:ln w="100076">
             <a:solidFill>
               <a:schemeClr val="accent1">
                 <a:lumMod val="75000"/>
@@ -9086,7 +6447,7 @@
           <a:prstGeom prst="straightConnector1">
             <a:avLst/>
           </a:prstGeom>
-          <a:ln w="35179">
+          <a:ln w="95504">
             <a:solidFill>
               <a:schemeClr val="accent1">
                 <a:lumMod val="75000"/>
@@ -9566,7 +6927,7 @@
           <a:prstGeom prst="straightConnector1">
             <a:avLst/>
           </a:prstGeom>
-          <a:ln w="26797">
+          <a:ln w="49276">
             <a:solidFill>
               <a:schemeClr val="accent1">
                 <a:lumMod val="75000"/>
@@ -9624,7 +6985,7 @@
                 <a:latin typeface="Times New Roman" panose="02020603050405020304" pitchFamily="18" charset="0"/>
                 <a:cs typeface="Times New Roman" panose="02020603050405020304" pitchFamily="18" charset="0"/>
               </a:rPr>
-              <a:t>35%</a:t>
+              <a:t>41%</a:t>
             </a:r>
           </a:p>
         </p:txBody>
@@ -10785,7 +8146,7 @@
               <a:gd name="adj1" fmla="val 2959425"/>
             </a:avLst>
           </a:prstGeom>
-          <a:ln w="47244">
+          <a:ln w="50292">
             <a:solidFill>
               <a:srgbClr val="C00000"/>
             </a:solidFill>
@@ -10832,7 +8193,7 @@
               <a:gd name="adj2" fmla="val 117091"/>
             </a:avLst>
           </a:prstGeom>
-          <a:ln w="58547">
+          <a:ln w="58166">
             <a:solidFill>
               <a:schemeClr val="accent1">
                 <a:lumMod val="75000"/>
@@ -10880,7 +8241,7 @@
               <a:gd name="adj1" fmla="val 2771922"/>
             </a:avLst>
           </a:prstGeom>
-          <a:ln w="77470">
+          <a:ln w="79248">
             <a:solidFill>
               <a:schemeClr val="accent1">
                 <a:lumMod val="75000"/>
@@ -11122,7 +8483,7 @@
                 <a:latin typeface="Times New Roman" panose="02020603050405020304" pitchFamily="18" charset="0"/>
                 <a:cs typeface="Times New Roman" panose="02020603050405020304" pitchFamily="18" charset="0"/>
               </a:rPr>
-              <a:t>90</a:t>
+              <a:t>3</a:t>
             </a:r>
             <a:endParaRPr lang="en-US" sz="3000" b="1" dirty="0">
               <a:solidFill>
@@ -11134,6 +8495,123 @@
           </a:p>
         </p:txBody>
       </p:sp>
+      <p:sp>
+        <p:nvSpPr>
+          <p:cNvPr id="6" name="Rectangle 5">
+            <a:extLst>
+              <a:ext uri="{FF2B5EF4-FFF2-40B4-BE49-F238E27FC236}">
+                <a16:creationId xmlns:a16="http://schemas.microsoft.com/office/drawing/2014/main" id="{A7593FE4-6B3D-C1B4-601D-36AC6C1199A2}"/>
+              </a:ext>
+            </a:extLst>
+          </p:cNvPr>
+          <p:cNvSpPr/>
+          <p:nvPr/>
+        </p:nvSpPr>
+        <p:spPr>
+          <a:xfrm>
+            <a:off x="6836545" y="7065034"/>
+            <a:ext cx="1819398" cy="877223"/>
+          </a:xfrm>
+          <a:prstGeom prst="rect">
+            <a:avLst/>
+          </a:prstGeom>
+          <a:solidFill>
+            <a:schemeClr val="bg1"/>
+          </a:solidFill>
+          <a:ln w="38100">
+            <a:solidFill>
+              <a:schemeClr val="tx1"/>
+            </a:solidFill>
+          </a:ln>
+        </p:spPr>
+        <p:style>
+          <a:lnRef idx="2">
+            <a:schemeClr val="accent1">
+              <a:shade val="50000"/>
+            </a:schemeClr>
+          </a:lnRef>
+          <a:fillRef idx="1">
+            <a:schemeClr val="accent1"/>
+          </a:fillRef>
+          <a:effectRef idx="0">
+            <a:schemeClr val="accent1"/>
+          </a:effectRef>
+          <a:fontRef idx="minor">
+            <a:schemeClr val="lt1"/>
+          </a:fontRef>
+        </p:style>
+        <p:txBody>
+          <a:bodyPr rtlCol="0" anchor="ctr"/>
+          <a:lstStyle/>
+          <a:p>
+            <a:pPr algn="ctr"/>
+            <a:r>
+              <a:rPr lang="en-US" sz="3000" b="1" i="1" dirty="0">
+                <a:solidFill>
+                  <a:schemeClr val="tx1"/>
+                </a:solidFill>
+                <a:latin typeface="Times New Roman" panose="02020603050405020304" pitchFamily="18" charset="0"/>
+                <a:cs typeface="Times New Roman" panose="02020603050405020304" pitchFamily="18" charset="0"/>
+              </a:rPr>
+              <a:t>% clay</a:t>
+            </a:r>
+            <a:endParaRPr lang="en-US" sz="3000" b="1" dirty="0">
+              <a:solidFill>
+                <a:schemeClr val="tx1"/>
+              </a:solidFill>
+              <a:latin typeface="Times New Roman" panose="02020603050405020304" pitchFamily="18" charset="0"/>
+              <a:cs typeface="Times New Roman" panose="02020603050405020304" pitchFamily="18" charset="0"/>
+            </a:endParaRPr>
+          </a:p>
+        </p:txBody>
+      </p:sp>
+      <p:cxnSp>
+        <p:nvCxnSpPr>
+          <p:cNvPr id="24" name="Elbow Connector 23">
+            <a:extLst>
+              <a:ext uri="{FF2B5EF4-FFF2-40B4-BE49-F238E27FC236}">
+                <a16:creationId xmlns:a16="http://schemas.microsoft.com/office/drawing/2014/main" id="{5CF21DA1-8F4B-E593-9356-788AE9845D32}"/>
+              </a:ext>
+            </a:extLst>
+          </p:cNvPr>
+          <p:cNvCxnSpPr>
+            <a:stCxn id="6" idx="1"/>
+          </p:cNvCxnSpPr>
+          <p:nvPr/>
+        </p:nvCxnSpPr>
+        <p:spPr>
+          <a:xfrm rot="10800000" flipV="1">
+            <a:off x="5417867" y="7503646"/>
+            <a:ext cx="1418678" cy="2253088"/>
+          </a:xfrm>
+          <a:prstGeom prst="bentConnector2">
+            <a:avLst/>
+          </a:prstGeom>
+          <a:ln w="12700">
+            <a:solidFill>
+              <a:schemeClr val="bg1">
+                <a:lumMod val="65000"/>
+              </a:schemeClr>
+            </a:solidFill>
+            <a:prstDash val="dash"/>
+            <a:tailEnd type="triangle"/>
+          </a:ln>
+        </p:spPr>
+        <p:style>
+          <a:lnRef idx="1">
+            <a:schemeClr val="accent1"/>
+          </a:lnRef>
+          <a:fillRef idx="0">
+            <a:schemeClr val="accent1"/>
+          </a:fillRef>
+          <a:effectRef idx="0">
+            <a:schemeClr val="accent1"/>
+          </a:effectRef>
+          <a:fontRef idx="minor">
+            <a:schemeClr val="tx1"/>
+          </a:fontRef>
+        </p:style>
+      </p:cxnSp>
     </p:spTree>
     <p:extLst>
       <p:ext uri="{BB962C8B-B14F-4D97-AF65-F5344CB8AC3E}">

</xml_diff>

<commit_message>
update analyses and plots for thesis
</commit_message>
<xml_diff>
--- a/working_drafts/figs/TXeco_SEM_ppt_fig.pptx
+++ b/working_drafts/figs/TXeco_SEM_ppt_fig.pptx
@@ -198,7 +198,7 @@
           <a:p>
             <a:fld id="{9C8338E3-F40D-F146-8D3B-4726E84D5200}" type="datetimeFigureOut">
               <a:rPr lang="en-US" smtClean="0"/>
-              <a:t>3/20/23</a:t>
+              <a:t>3/23/23</a:t>
             </a:fld>
             <a:endParaRPr lang="en-US"/>
           </a:p>
@@ -769,7 +769,7 @@
           <a:p>
             <a:fld id="{D3A28AA4-801E-B147-9E5C-6E6DBA6E23D1}" type="datetimeFigureOut">
               <a:rPr lang="en-US" smtClean="0"/>
-              <a:t>3/20/23</a:t>
+              <a:t>3/23/23</a:t>
             </a:fld>
             <a:endParaRPr lang="en-US"/>
           </a:p>
@@ -939,7 +939,7 @@
           <a:p>
             <a:fld id="{D3A28AA4-801E-B147-9E5C-6E6DBA6E23D1}" type="datetimeFigureOut">
               <a:rPr lang="en-US" smtClean="0"/>
-              <a:t>3/20/23</a:t>
+              <a:t>3/23/23</a:t>
             </a:fld>
             <a:endParaRPr lang="en-US"/>
           </a:p>
@@ -1119,7 +1119,7 @@
           <a:p>
             <a:fld id="{D3A28AA4-801E-B147-9E5C-6E6DBA6E23D1}" type="datetimeFigureOut">
               <a:rPr lang="en-US" smtClean="0"/>
-              <a:t>3/20/23</a:t>
+              <a:t>3/23/23</a:t>
             </a:fld>
             <a:endParaRPr lang="en-US"/>
           </a:p>
@@ -1289,7 +1289,7 @@
           <a:p>
             <a:fld id="{D3A28AA4-801E-B147-9E5C-6E6DBA6E23D1}" type="datetimeFigureOut">
               <a:rPr lang="en-US" smtClean="0"/>
-              <a:t>3/20/23</a:t>
+              <a:t>3/23/23</a:t>
             </a:fld>
             <a:endParaRPr lang="en-US"/>
           </a:p>
@@ -1533,7 +1533,7 @@
           <a:p>
             <a:fld id="{D3A28AA4-801E-B147-9E5C-6E6DBA6E23D1}" type="datetimeFigureOut">
               <a:rPr lang="en-US" smtClean="0"/>
-              <a:t>3/20/23</a:t>
+              <a:t>3/23/23</a:t>
             </a:fld>
             <a:endParaRPr lang="en-US"/>
           </a:p>
@@ -1765,7 +1765,7 @@
           <a:p>
             <a:fld id="{D3A28AA4-801E-B147-9E5C-6E6DBA6E23D1}" type="datetimeFigureOut">
               <a:rPr lang="en-US" smtClean="0"/>
-              <a:t>3/20/23</a:t>
+              <a:t>3/23/23</a:t>
             </a:fld>
             <a:endParaRPr lang="en-US"/>
           </a:p>
@@ -2132,7 +2132,7 @@
           <a:p>
             <a:fld id="{D3A28AA4-801E-B147-9E5C-6E6DBA6E23D1}" type="datetimeFigureOut">
               <a:rPr lang="en-US" smtClean="0"/>
-              <a:t>3/20/23</a:t>
+              <a:t>3/23/23</a:t>
             </a:fld>
             <a:endParaRPr lang="en-US"/>
           </a:p>
@@ -2250,7 +2250,7 @@
           <a:p>
             <a:fld id="{D3A28AA4-801E-B147-9E5C-6E6DBA6E23D1}" type="datetimeFigureOut">
               <a:rPr lang="en-US" smtClean="0"/>
-              <a:t>3/20/23</a:t>
+              <a:t>3/23/23</a:t>
             </a:fld>
             <a:endParaRPr lang="en-US"/>
           </a:p>
@@ -2345,7 +2345,7 @@
           <a:p>
             <a:fld id="{D3A28AA4-801E-B147-9E5C-6E6DBA6E23D1}" type="datetimeFigureOut">
               <a:rPr lang="en-US" smtClean="0"/>
-              <a:t>3/20/23</a:t>
+              <a:t>3/23/23</a:t>
             </a:fld>
             <a:endParaRPr lang="en-US"/>
           </a:p>
@@ -2622,7 +2622,7 @@
           <a:p>
             <a:fld id="{D3A28AA4-801E-B147-9E5C-6E6DBA6E23D1}" type="datetimeFigureOut">
               <a:rPr lang="en-US" smtClean="0"/>
-              <a:t>3/20/23</a:t>
+              <a:t>3/23/23</a:t>
             </a:fld>
             <a:endParaRPr lang="en-US"/>
           </a:p>
@@ -2879,7 +2879,7 @@
           <a:p>
             <a:fld id="{D3A28AA4-801E-B147-9E5C-6E6DBA6E23D1}" type="datetimeFigureOut">
               <a:rPr lang="en-US" smtClean="0"/>
-              <a:t>3/20/23</a:t>
+              <a:t>3/23/23</a:t>
             </a:fld>
             <a:endParaRPr lang="en-US"/>
           </a:p>
@@ -3092,7 +3092,7 @@
           <a:p>
             <a:fld id="{D3A28AA4-801E-B147-9E5C-6E6DBA6E23D1}" type="datetimeFigureOut">
               <a:rPr lang="en-US" smtClean="0"/>
-              <a:t>3/20/23</a:t>
+              <a:t>3/23/23</a:t>
             </a:fld>
             <a:endParaRPr lang="en-US"/>
           </a:p>
@@ -5936,7 +5936,7 @@
                 <a:latin typeface="Times New Roman" panose="02020603050405020304" pitchFamily="18" charset="0"/>
                 <a:cs typeface="Times New Roman" panose="02020603050405020304" pitchFamily="18" charset="0"/>
               </a:rPr>
-              <a:t>92%</a:t>
+              <a:t>93%</a:t>
             </a:r>
           </a:p>
         </p:txBody>
@@ -6050,7 +6050,7 @@
                 <a:latin typeface="Times New Roman" panose="02020603050405020304" pitchFamily="18" charset="0"/>
                 <a:cs typeface="Times New Roman" panose="02020603050405020304" pitchFamily="18" charset="0"/>
               </a:rPr>
-              <a:t>29%</a:t>
+              <a:t>28%</a:t>
             </a:r>
           </a:p>
         </p:txBody>
@@ -6175,7 +6175,7 @@
           <a:prstGeom prst="straightConnector1">
             <a:avLst/>
           </a:prstGeom>
-          <a:ln w="45085">
+          <a:ln w="44577">
             <a:solidFill>
               <a:srgbClr val="C00000"/>
             </a:solidFill>
@@ -6221,7 +6221,7 @@
               <a:gd name="adj1" fmla="val -7214828"/>
             </a:avLst>
           </a:prstGeom>
-          <a:ln w="58927">
+          <a:ln w="57150">
             <a:solidFill>
               <a:srgbClr val="C00000"/>
             </a:solidFill>
@@ -6266,7 +6266,7 @@
           <a:prstGeom prst="straightConnector1">
             <a:avLst/>
           </a:prstGeom>
-          <a:ln w="36957">
+          <a:ln w="36576">
             <a:solidFill>
               <a:schemeClr val="accent1">
                 <a:lumMod val="75000"/>
@@ -6312,7 +6312,7 @@
           <a:prstGeom prst="straightConnector1">
             <a:avLst/>
           </a:prstGeom>
-          <a:ln w="18415">
+          <a:ln w="19685">
             <a:solidFill>
               <a:srgbClr val="C00000"/>
             </a:solidFill>
@@ -6400,7 +6400,7 @@
           <a:prstGeom prst="straightConnector1">
             <a:avLst/>
           </a:prstGeom>
-          <a:ln w="100076">
+          <a:ln w="99314">
             <a:solidFill>
               <a:schemeClr val="accent1">
                 <a:lumMod val="75000"/>
@@ -6447,7 +6447,7 @@
           <a:prstGeom prst="straightConnector1">
             <a:avLst/>
           </a:prstGeom>
-          <a:ln w="95504">
+          <a:ln w="97409">
             <a:solidFill>
               <a:schemeClr val="accent1">
                 <a:lumMod val="75000"/>
@@ -8146,7 +8146,7 @@
               <a:gd name="adj1" fmla="val 2959425"/>
             </a:avLst>
           </a:prstGeom>
-          <a:ln w="50292">
+          <a:ln w="49784">
             <a:solidFill>
               <a:srgbClr val="C00000"/>
             </a:solidFill>
@@ -8193,7 +8193,7 @@
               <a:gd name="adj2" fmla="val 117091"/>
             </a:avLst>
           </a:prstGeom>
-          <a:ln w="58166">
+          <a:ln w="57658">
             <a:solidFill>
               <a:schemeClr val="accent1">
                 <a:lumMod val="75000"/>
@@ -8241,7 +8241,7 @@
               <a:gd name="adj1" fmla="val 2771922"/>
             </a:avLst>
           </a:prstGeom>
-          <a:ln w="79248">
+          <a:ln w="79883">
             <a:solidFill>
               <a:schemeClr val="accent1">
                 <a:lumMod val="75000"/>
@@ -8575,25 +8575,24 @@
             </a:extLst>
           </p:cNvPr>
           <p:cNvCxnSpPr>
+            <a:cxnSpLocks/>
             <a:stCxn id="6" idx="1"/>
           </p:cNvCxnSpPr>
           <p:nvPr/>
         </p:nvCxnSpPr>
         <p:spPr>
-          <a:xfrm rot="10800000" flipV="1">
-            <a:off x="5417867" y="7503646"/>
-            <a:ext cx="1418678" cy="2253088"/>
+          <a:xfrm rot="10800000">
+            <a:off x="5417867" y="5186642"/>
+            <a:ext cx="1418678" cy="2317005"/>
           </a:xfrm>
           <a:prstGeom prst="bentConnector2">
             <a:avLst/>
           </a:prstGeom>
-          <a:ln w="12700">
+          <a:ln w="103251">
             <a:solidFill>
-              <a:schemeClr val="bg1">
-                <a:lumMod val="65000"/>
-              </a:schemeClr>
+              <a:srgbClr val="C00000"/>
             </a:solidFill>
-            <a:prstDash val="dash"/>
+            <a:prstDash val="solid"/>
             <a:tailEnd type="triangle"/>
           </a:ln>
         </p:spPr>
@@ -8612,6 +8611,44 @@
           </a:fontRef>
         </p:style>
       </p:cxnSp>
+      <p:sp>
+        <p:nvSpPr>
+          <p:cNvPr id="20" name="TextBox 19">
+            <a:extLst>
+              <a:ext uri="{FF2B5EF4-FFF2-40B4-BE49-F238E27FC236}">
+                <a16:creationId xmlns:a16="http://schemas.microsoft.com/office/drawing/2014/main" id="{EB1B2582-D9EF-4876-FC8A-B4447C93E803}"/>
+              </a:ext>
+            </a:extLst>
+          </p:cNvPr>
+          <p:cNvSpPr txBox="1"/>
+          <p:nvPr/>
+        </p:nvSpPr>
+        <p:spPr>
+          <a:xfrm>
+            <a:off x="6222199" y="3836466"/>
+            <a:ext cx="800219" cy="461665"/>
+          </a:xfrm>
+          <a:prstGeom prst="rect">
+            <a:avLst/>
+          </a:prstGeom>
+          <a:noFill/>
+        </p:spPr>
+        <p:txBody>
+          <a:bodyPr wrap="none" rtlCol="0">
+            <a:spAutoFit/>
+          </a:bodyPr>
+          <a:lstStyle/>
+          <a:p>
+            <a:r>
+              <a:rPr lang="en-US" sz="2400" b="1" dirty="0">
+                <a:latin typeface="Times New Roman" panose="02020603050405020304" pitchFamily="18" charset="0"/>
+                <a:cs typeface="Times New Roman" panose="02020603050405020304" pitchFamily="18" charset="0"/>
+              </a:rPr>
+              <a:t>51%</a:t>
+            </a:r>
+          </a:p>
+        </p:txBody>
+      </p:sp>
     </p:spTree>
     <p:extLst>
       <p:ext uri="{BB962C8B-B14F-4D97-AF65-F5344CB8AC3E}">

</xml_diff>

<commit_message>
update plots per new analyses with measured soil texture data
</commit_message>
<xml_diff>
--- a/working_drafts/figs/TXeco_SEM_ppt_fig.pptx
+++ b/working_drafts/figs/TXeco_SEM_ppt_fig.pptx
@@ -200,7 +200,7 @@
           <a:p>
             <a:fld id="{9C8338E3-F40D-F146-8D3B-4726E84D5200}" type="datetimeFigureOut">
               <a:rPr lang="en-US" smtClean="0"/>
-              <a:t>4/7/23</a:t>
+              <a:t>4/10/23</a:t>
             </a:fld>
             <a:endParaRPr lang="en-US"/>
           </a:p>
@@ -939,7 +939,7 @@
           <a:p>
             <a:fld id="{D3A28AA4-801E-B147-9E5C-6E6DBA6E23D1}" type="datetimeFigureOut">
               <a:rPr lang="en-US" smtClean="0"/>
-              <a:t>4/7/23</a:t>
+              <a:t>4/10/23</a:t>
             </a:fld>
             <a:endParaRPr lang="en-US"/>
           </a:p>
@@ -1109,7 +1109,7 @@
           <a:p>
             <a:fld id="{D3A28AA4-801E-B147-9E5C-6E6DBA6E23D1}" type="datetimeFigureOut">
               <a:rPr lang="en-US" smtClean="0"/>
-              <a:t>4/7/23</a:t>
+              <a:t>4/10/23</a:t>
             </a:fld>
             <a:endParaRPr lang="en-US"/>
           </a:p>
@@ -1289,7 +1289,7 @@
           <a:p>
             <a:fld id="{D3A28AA4-801E-B147-9E5C-6E6DBA6E23D1}" type="datetimeFigureOut">
               <a:rPr lang="en-US" smtClean="0"/>
-              <a:t>4/7/23</a:t>
+              <a:t>4/10/23</a:t>
             </a:fld>
             <a:endParaRPr lang="en-US"/>
           </a:p>
@@ -1459,7 +1459,7 @@
           <a:p>
             <a:fld id="{D3A28AA4-801E-B147-9E5C-6E6DBA6E23D1}" type="datetimeFigureOut">
               <a:rPr lang="en-US" smtClean="0"/>
-              <a:t>4/7/23</a:t>
+              <a:t>4/10/23</a:t>
             </a:fld>
             <a:endParaRPr lang="en-US"/>
           </a:p>
@@ -1703,7 +1703,7 @@
           <a:p>
             <a:fld id="{D3A28AA4-801E-B147-9E5C-6E6DBA6E23D1}" type="datetimeFigureOut">
               <a:rPr lang="en-US" smtClean="0"/>
-              <a:t>4/7/23</a:t>
+              <a:t>4/10/23</a:t>
             </a:fld>
             <a:endParaRPr lang="en-US"/>
           </a:p>
@@ -1935,7 +1935,7 @@
           <a:p>
             <a:fld id="{D3A28AA4-801E-B147-9E5C-6E6DBA6E23D1}" type="datetimeFigureOut">
               <a:rPr lang="en-US" smtClean="0"/>
-              <a:t>4/7/23</a:t>
+              <a:t>4/10/23</a:t>
             </a:fld>
             <a:endParaRPr lang="en-US"/>
           </a:p>
@@ -2302,7 +2302,7 @@
           <a:p>
             <a:fld id="{D3A28AA4-801E-B147-9E5C-6E6DBA6E23D1}" type="datetimeFigureOut">
               <a:rPr lang="en-US" smtClean="0"/>
-              <a:t>4/7/23</a:t>
+              <a:t>4/10/23</a:t>
             </a:fld>
             <a:endParaRPr lang="en-US"/>
           </a:p>
@@ -2420,7 +2420,7 @@
           <a:p>
             <a:fld id="{D3A28AA4-801E-B147-9E5C-6E6DBA6E23D1}" type="datetimeFigureOut">
               <a:rPr lang="en-US" smtClean="0"/>
-              <a:t>4/7/23</a:t>
+              <a:t>4/10/23</a:t>
             </a:fld>
             <a:endParaRPr lang="en-US"/>
           </a:p>
@@ -2515,7 +2515,7 @@
           <a:p>
             <a:fld id="{D3A28AA4-801E-B147-9E5C-6E6DBA6E23D1}" type="datetimeFigureOut">
               <a:rPr lang="en-US" smtClean="0"/>
-              <a:t>4/7/23</a:t>
+              <a:t>4/10/23</a:t>
             </a:fld>
             <a:endParaRPr lang="en-US"/>
           </a:p>
@@ -2792,7 +2792,7 @@
           <a:p>
             <a:fld id="{D3A28AA4-801E-B147-9E5C-6E6DBA6E23D1}" type="datetimeFigureOut">
               <a:rPr lang="en-US" smtClean="0"/>
-              <a:t>4/7/23</a:t>
+              <a:t>4/10/23</a:t>
             </a:fld>
             <a:endParaRPr lang="en-US"/>
           </a:p>
@@ -3049,7 +3049,7 @@
           <a:p>
             <a:fld id="{D3A28AA4-801E-B147-9E5C-6E6DBA6E23D1}" type="datetimeFigureOut">
               <a:rPr lang="en-US" smtClean="0"/>
-              <a:t>4/7/23</a:t>
+              <a:t>4/10/23</a:t>
             </a:fld>
             <a:endParaRPr lang="en-US"/>
           </a:p>
@@ -3262,7 +3262,7 @@
           <a:p>
             <a:fld id="{D3A28AA4-801E-B147-9E5C-6E6DBA6E23D1}" type="datetimeFigureOut">
               <a:rPr lang="en-US" smtClean="0"/>
-              <a:t>4/7/23</a:t>
+              <a:t>4/10/23</a:t>
             </a:fld>
             <a:endParaRPr lang="en-US"/>
           </a:p>

</xml_diff>

<commit_message>
start working through discussion again; revise test statistics and pSEM results after fixed species anomaly
</commit_message>
<xml_diff>
--- a/working_drafts/figs/TXeco_SEM_ppt_fig.pptx
+++ b/working_drafts/figs/TXeco_SEM_ppt_fig.pptx
@@ -200,7 +200,7 @@
           <a:p>
             <a:fld id="{9C8338E3-F40D-F146-8D3B-4726E84D5200}" type="datetimeFigureOut">
               <a:rPr lang="en-US" smtClean="0"/>
-              <a:t>4/10/23</a:t>
+              <a:t>6/2/23</a:t>
             </a:fld>
             <a:endParaRPr lang="en-US"/>
           </a:p>
@@ -939,7 +939,7 @@
           <a:p>
             <a:fld id="{D3A28AA4-801E-B147-9E5C-6E6DBA6E23D1}" type="datetimeFigureOut">
               <a:rPr lang="en-US" smtClean="0"/>
-              <a:t>4/10/23</a:t>
+              <a:t>6/2/23</a:t>
             </a:fld>
             <a:endParaRPr lang="en-US"/>
           </a:p>
@@ -1109,7 +1109,7 @@
           <a:p>
             <a:fld id="{D3A28AA4-801E-B147-9E5C-6E6DBA6E23D1}" type="datetimeFigureOut">
               <a:rPr lang="en-US" smtClean="0"/>
-              <a:t>4/10/23</a:t>
+              <a:t>6/2/23</a:t>
             </a:fld>
             <a:endParaRPr lang="en-US"/>
           </a:p>
@@ -1289,7 +1289,7 @@
           <a:p>
             <a:fld id="{D3A28AA4-801E-B147-9E5C-6E6DBA6E23D1}" type="datetimeFigureOut">
               <a:rPr lang="en-US" smtClean="0"/>
-              <a:t>4/10/23</a:t>
+              <a:t>6/2/23</a:t>
             </a:fld>
             <a:endParaRPr lang="en-US"/>
           </a:p>
@@ -1459,7 +1459,7 @@
           <a:p>
             <a:fld id="{D3A28AA4-801E-B147-9E5C-6E6DBA6E23D1}" type="datetimeFigureOut">
               <a:rPr lang="en-US" smtClean="0"/>
-              <a:t>4/10/23</a:t>
+              <a:t>6/2/23</a:t>
             </a:fld>
             <a:endParaRPr lang="en-US"/>
           </a:p>
@@ -1703,7 +1703,7 @@
           <a:p>
             <a:fld id="{D3A28AA4-801E-B147-9E5C-6E6DBA6E23D1}" type="datetimeFigureOut">
               <a:rPr lang="en-US" smtClean="0"/>
-              <a:t>4/10/23</a:t>
+              <a:t>6/2/23</a:t>
             </a:fld>
             <a:endParaRPr lang="en-US"/>
           </a:p>
@@ -1935,7 +1935,7 @@
           <a:p>
             <a:fld id="{D3A28AA4-801E-B147-9E5C-6E6DBA6E23D1}" type="datetimeFigureOut">
               <a:rPr lang="en-US" smtClean="0"/>
-              <a:t>4/10/23</a:t>
+              <a:t>6/2/23</a:t>
             </a:fld>
             <a:endParaRPr lang="en-US"/>
           </a:p>
@@ -2302,7 +2302,7 @@
           <a:p>
             <a:fld id="{D3A28AA4-801E-B147-9E5C-6E6DBA6E23D1}" type="datetimeFigureOut">
               <a:rPr lang="en-US" smtClean="0"/>
-              <a:t>4/10/23</a:t>
+              <a:t>6/2/23</a:t>
             </a:fld>
             <a:endParaRPr lang="en-US"/>
           </a:p>
@@ -2420,7 +2420,7 @@
           <a:p>
             <a:fld id="{D3A28AA4-801E-B147-9E5C-6E6DBA6E23D1}" type="datetimeFigureOut">
               <a:rPr lang="en-US" smtClean="0"/>
-              <a:t>4/10/23</a:t>
+              <a:t>6/2/23</a:t>
             </a:fld>
             <a:endParaRPr lang="en-US"/>
           </a:p>
@@ -2515,7 +2515,7 @@
           <a:p>
             <a:fld id="{D3A28AA4-801E-B147-9E5C-6E6DBA6E23D1}" type="datetimeFigureOut">
               <a:rPr lang="en-US" smtClean="0"/>
-              <a:t>4/10/23</a:t>
+              <a:t>6/2/23</a:t>
             </a:fld>
             <a:endParaRPr lang="en-US"/>
           </a:p>
@@ -2792,7 +2792,7 @@
           <a:p>
             <a:fld id="{D3A28AA4-801E-B147-9E5C-6E6DBA6E23D1}" type="datetimeFigureOut">
               <a:rPr lang="en-US" smtClean="0"/>
-              <a:t>4/10/23</a:t>
+              <a:t>6/2/23</a:t>
             </a:fld>
             <a:endParaRPr lang="en-US"/>
           </a:p>
@@ -3049,7 +3049,7 @@
           <a:p>
             <a:fld id="{D3A28AA4-801E-B147-9E5C-6E6DBA6E23D1}" type="datetimeFigureOut">
               <a:rPr lang="en-US" smtClean="0"/>
-              <a:t>4/10/23</a:t>
+              <a:t>6/2/23</a:t>
             </a:fld>
             <a:endParaRPr lang="en-US"/>
           </a:p>
@@ -3262,7 +3262,7 @@
           <a:p>
             <a:fld id="{D3A28AA4-801E-B147-9E5C-6E6DBA6E23D1}" type="datetimeFigureOut">
               <a:rPr lang="en-US" smtClean="0"/>
-              <a:t>4/10/23</a:t>
+              <a:t>6/2/23</a:t>
             </a:fld>
             <a:endParaRPr lang="en-US"/>
           </a:p>
@@ -12252,6 +12252,54 @@
           <a:chExt cx="0" cy="0"/>
         </a:xfrm>
       </p:grpSpPr>
+      <p:cxnSp>
+        <p:nvCxnSpPr>
+          <p:cNvPr id="164" name="Elbow Connector 163">
+            <a:extLst>
+              <a:ext uri="{FF2B5EF4-FFF2-40B4-BE49-F238E27FC236}">
+                <a16:creationId xmlns:a16="http://schemas.microsoft.com/office/drawing/2014/main" id="{A8C1E8B5-1696-4F88-7D56-798AB1F20727}"/>
+              </a:ext>
+            </a:extLst>
+          </p:cNvPr>
+          <p:cNvCxnSpPr>
+            <a:cxnSpLocks/>
+          </p:cNvCxnSpPr>
+          <p:nvPr/>
+        </p:nvCxnSpPr>
+        <p:spPr>
+          <a:xfrm rot="5400000" flipH="1" flipV="1">
+            <a:off x="11467488" y="2395880"/>
+            <a:ext cx="2040574" cy="5646710"/>
+          </a:xfrm>
+          <a:prstGeom prst="bentConnector3">
+            <a:avLst>
+              <a:gd name="adj1" fmla="val 116804"/>
+            </a:avLst>
+          </a:prstGeom>
+          <a:ln w="58547">
+            <a:solidFill>
+              <a:schemeClr val="accent1">
+                <a:lumMod val="75000"/>
+              </a:schemeClr>
+            </a:solidFill>
+            <a:tailEnd type="triangle"/>
+          </a:ln>
+        </p:spPr>
+        <p:style>
+          <a:lnRef idx="1">
+            <a:schemeClr val="accent1"/>
+          </a:lnRef>
+          <a:fillRef idx="0">
+            <a:schemeClr val="accent1"/>
+          </a:fillRef>
+          <a:effectRef idx="0">
+            <a:schemeClr val="accent1"/>
+          </a:effectRef>
+          <a:fontRef idx="minor">
+            <a:schemeClr val="tx1"/>
+          </a:fontRef>
+        </p:style>
+      </p:cxnSp>
       <p:sp>
         <p:nvSpPr>
           <p:cNvPr id="26" name="Rectangle 25">
@@ -12319,9 +12367,9 @@
         <p:grpSpPr>
           <a:xfrm>
             <a:off x="10421624" y="12978547"/>
-            <a:ext cx="7208824" cy="1604907"/>
+            <a:ext cx="7208824" cy="1404876"/>
             <a:chOff x="9836749" y="13266385"/>
-            <a:chExt cx="7208824" cy="1604907"/>
+            <a:chExt cx="7208824" cy="1404876"/>
           </a:xfrm>
         </p:grpSpPr>
         <p:cxnSp>
@@ -12742,7 +12790,7 @@
           </p:nvSpPr>
           <p:spPr>
             <a:xfrm>
-              <a:off x="11262239" y="14317294"/>
+              <a:off x="11262239" y="14117263"/>
               <a:ext cx="4278735" cy="553998"/>
             </a:xfrm>
             <a:prstGeom prst="rect">
@@ -13034,7 +13082,7 @@
           <a:prstGeom prst="bentConnector3">
             <a:avLst/>
           </a:prstGeom>
-          <a:ln w="89662">
+          <a:ln w="98171">
             <a:solidFill>
               <a:srgbClr val="C00000">
                 <a:alpha val="20000"/>
@@ -13084,9 +13132,10 @@
           </a:prstGeom>
           <a:ln w="36195">
             <a:solidFill>
-              <a:srgbClr val="C00000">
+              <a:schemeClr val="accent1">
+                <a:lumMod val="75000"/>
                 <a:alpha val="20000"/>
-              </a:srgbClr>
+              </a:schemeClr>
             </a:solidFill>
             <a:tailEnd type="triangle"/>
           </a:ln>
@@ -13209,14 +13258,13 @@
             </a:extLst>
           </p:cNvPr>
           <p:cNvCxnSpPr>
-            <a:stCxn id="147" idx="1"/>
-            <a:endCxn id="149" idx="3"/>
+            <a:cxnSpLocks/>
           </p:cNvCxnSpPr>
           <p:nvPr/>
         </p:nvCxnSpPr>
         <p:spPr>
           <a:xfrm flipH="1">
-            <a:off x="14739160" y="6678135"/>
+            <a:off x="14739160" y="6627335"/>
             <a:ext cx="1824569" cy="1"/>
           </a:xfrm>
           <a:prstGeom prst="straightConnector1">
@@ -13269,7 +13317,7 @@
           <a:prstGeom prst="bentConnector2">
             <a:avLst/>
           </a:prstGeom>
-          <a:ln w="28701">
+          <a:ln w="28575">
             <a:solidFill>
               <a:srgbClr val="C00000"/>
             </a:solidFill>
@@ -13314,7 +13362,7 @@
           <a:prstGeom prst="bentConnector2">
             <a:avLst/>
           </a:prstGeom>
-          <a:ln w="13970">
+          <a:ln w="13843">
             <a:solidFill>
               <a:srgbClr val="C00000"/>
             </a:solidFill>
@@ -13624,7 +13672,7 @@
                 <a:latin typeface="Times New Roman" panose="02020603050405020304" pitchFamily="18" charset="0"/>
                 <a:cs typeface="Times New Roman" panose="02020603050405020304" pitchFamily="18" charset="0"/>
               </a:rPr>
-              <a:t>= 21.328</a:t>
+              <a:t>= 27.553</a:t>
             </a:r>
           </a:p>
           <a:p>
@@ -13638,7 +13686,7 @@
                 <a:latin typeface="Times New Roman" panose="02020603050405020304" pitchFamily="18" charset="0"/>
                 <a:cs typeface="Times New Roman" panose="02020603050405020304" pitchFamily="18" charset="0"/>
               </a:rPr>
-              <a:t>p-value = 0.987</a:t>
+              <a:t>p-value = 0.932</a:t>
             </a:r>
           </a:p>
           <a:p>
@@ -13652,7 +13700,7 @@
                 <a:latin typeface="Times New Roman" panose="02020603050405020304" pitchFamily="18" charset="0"/>
                 <a:cs typeface="Times New Roman" panose="02020603050405020304" pitchFamily="18" charset="0"/>
               </a:rPr>
-              <a:t>AIC = 123.328</a:t>
+              <a:t>AIC = 127.553</a:t>
             </a:r>
           </a:p>
           <a:p>
@@ -13666,7 +13714,7 @@
                 <a:latin typeface="Times New Roman" panose="02020603050405020304" pitchFamily="18" charset="0"/>
                 <a:cs typeface="Times New Roman" panose="02020603050405020304" pitchFamily="18" charset="0"/>
               </a:rPr>
-              <a:t>BIC = 330.462</a:t>
+              <a:t>BIC = 330.626</a:t>
             </a:r>
           </a:p>
           <a:p>
@@ -13680,7 +13728,7 @@
                 <a:latin typeface="Times New Roman" panose="02020603050405020304" pitchFamily="18" charset="0"/>
                 <a:cs typeface="Times New Roman" panose="02020603050405020304" pitchFamily="18" charset="0"/>
               </a:rPr>
-              <a:t>df = 38</a:t>
+              <a:t>df = 40</a:t>
             </a:r>
           </a:p>
         </p:txBody>
@@ -13709,7 +13757,7 @@
               <a:gd name="adj1" fmla="val 75662"/>
             </a:avLst>
           </a:prstGeom>
-          <a:ln w="41529">
+          <a:ln w="40767">
             <a:solidFill>
               <a:srgbClr val="C00000">
                 <a:alpha val="20000"/>
@@ -13922,7 +13970,7 @@
           <a:prstGeom prst="bentConnector2">
             <a:avLst/>
           </a:prstGeom>
-          <a:ln w="57658">
+          <a:ln w="56896">
             <a:solidFill>
               <a:schemeClr val="accent1">
                 <a:lumMod val="75000"/>
@@ -13962,7 +14010,7 @@
         </p:nvCxnSpPr>
         <p:spPr>
           <a:xfrm flipH="1" flipV="1">
-            <a:off x="16577584" y="4346613"/>
+            <a:off x="16577584" y="4930813"/>
             <a:ext cx="1819398" cy="6130977"/>
           </a:xfrm>
           <a:prstGeom prst="bentConnector3">
@@ -13974,6 +14022,7 @@
             <a:solidFill>
               <a:schemeClr val="accent1">
                 <a:lumMod val="75000"/>
+                <a:alpha val="20000"/>
               </a:schemeClr>
             </a:solidFill>
             <a:tailEnd type="triangle"/>
@@ -14112,7 +14161,7 @@
           <a:prstGeom prst="bentConnector2">
             <a:avLst/>
           </a:prstGeom>
-          <a:ln w="69215">
+          <a:ln w="79121">
             <a:solidFill>
               <a:srgbClr val="C00000"/>
             </a:solidFill>
@@ -14144,6 +14193,7 @@
             </a:extLst>
           </p:cNvPr>
           <p:cNvCxnSpPr>
+            <a:cxnSpLocks/>
             <a:stCxn id="144" idx="1"/>
             <a:endCxn id="146" idx="1"/>
           </p:cNvCxnSpPr>
@@ -14159,7 +14209,7 @@
               <a:gd name="adj1" fmla="val -19258"/>
             </a:avLst>
           </a:prstGeom>
-          <a:ln w="52451">
+          <a:ln w="54102">
             <a:solidFill>
               <a:srgbClr val="C00000"/>
             </a:solidFill>
@@ -14203,57 +14253,9 @@
           <a:prstGeom prst="straightConnector1">
             <a:avLst/>
           </a:prstGeom>
-          <a:ln w="67945">
+          <a:ln w="67310">
             <a:solidFill>
               <a:srgbClr val="C00000"/>
-            </a:solidFill>
-            <a:tailEnd type="triangle"/>
-          </a:ln>
-        </p:spPr>
-        <p:style>
-          <a:lnRef idx="1">
-            <a:schemeClr val="accent1"/>
-          </a:lnRef>
-          <a:fillRef idx="0">
-            <a:schemeClr val="accent1"/>
-          </a:fillRef>
-          <a:effectRef idx="0">
-            <a:schemeClr val="accent1"/>
-          </a:effectRef>
-          <a:fontRef idx="minor">
-            <a:schemeClr val="tx1"/>
-          </a:fontRef>
-        </p:style>
-      </p:cxnSp>
-      <p:cxnSp>
-        <p:nvCxnSpPr>
-          <p:cNvPr id="164" name="Elbow Connector 163">
-            <a:extLst>
-              <a:ext uri="{FF2B5EF4-FFF2-40B4-BE49-F238E27FC236}">
-                <a16:creationId xmlns:a16="http://schemas.microsoft.com/office/drawing/2014/main" id="{A8C1E8B5-1696-4F88-7D56-798AB1F20727}"/>
-              </a:ext>
-            </a:extLst>
-          </p:cNvPr>
-          <p:cNvCxnSpPr>
-            <a:cxnSpLocks/>
-          </p:cNvCxnSpPr>
-          <p:nvPr/>
-        </p:nvCxnSpPr>
-        <p:spPr>
-          <a:xfrm rot="5400000" flipH="1" flipV="1">
-            <a:off x="11609415" y="2484968"/>
-            <a:ext cx="2040575" cy="5468536"/>
-          </a:xfrm>
-          <a:prstGeom prst="bentConnector3">
-            <a:avLst>
-              <a:gd name="adj1" fmla="val 117726"/>
-            </a:avLst>
-          </a:prstGeom>
-          <a:ln w="61341">
-            <a:solidFill>
-              <a:schemeClr val="accent1">
-                <a:lumMod val="75000"/>
-              </a:schemeClr>
             </a:solidFill>
             <a:tailEnd type="triangle"/>
           </a:ln>
@@ -14297,6 +14299,7 @@
             <a:solidFill>
               <a:schemeClr val="accent1">
                 <a:lumMod val="75000"/>
+                <a:alpha val="20000"/>
               </a:schemeClr>
             </a:solidFill>
             <a:tailEnd type="triangle"/>
@@ -14340,7 +14343,7 @@
           <a:prstGeom prst="bentConnector2">
             <a:avLst/>
           </a:prstGeom>
-          <a:ln w="66167">
+          <a:ln w="66294">
             <a:solidFill>
               <a:schemeClr val="accent1">
                 <a:lumMod val="75000"/>
@@ -14434,7 +14437,7 @@
           </a:xfrm>
           <a:prstGeom prst="bentConnector3">
             <a:avLst>
-              <a:gd name="adj1" fmla="val -9543458"/>
+              <a:gd name="adj1" fmla="val -7992155"/>
             </a:avLst>
           </a:prstGeom>
           <a:ln w="131826">
@@ -14474,13 +14477,13 @@
           <p:nvPr/>
         </p:nvCxnSpPr>
         <p:spPr>
-          <a:xfrm rot="5400000">
-            <a:off x="12492675" y="9376856"/>
-            <a:ext cx="1881" cy="3643967"/>
+          <a:xfrm rot="10800000" flipV="1">
+            <a:off x="11095194" y="10949787"/>
+            <a:ext cx="1824569" cy="1881"/>
           </a:xfrm>
           <a:prstGeom prst="bentConnector3">
             <a:avLst>
-              <a:gd name="adj1" fmla="val 17791228"/>
+              <a:gd name="adj1" fmla="val 50000"/>
             </a:avLst>
           </a:prstGeom>
           <a:ln w="47498">
@@ -14529,7 +14532,7 @@
               <a:gd name="adj1" fmla="val 59393"/>
             </a:avLst>
           </a:prstGeom>
-          <a:ln w="54991">
+          <a:ln w="54864">
             <a:solidFill>
               <a:schemeClr val="accent1">
                 <a:lumMod val="75000"/>
@@ -14574,7 +14577,7 @@
           <a:prstGeom prst="bentConnector2">
             <a:avLst/>
           </a:prstGeom>
-          <a:ln w="54991">
+          <a:ln w="54864">
             <a:solidFill>
               <a:schemeClr val="accent1">
                 <a:lumMod val="75000"/>
@@ -15106,7 +15109,7 @@
         </p:nvSpPr>
         <p:spPr>
           <a:xfrm>
-            <a:off x="9275795" y="6239523"/>
+            <a:off x="9097621" y="6239522"/>
             <a:ext cx="1819398" cy="877223"/>
           </a:xfrm>
           <a:prstGeom prst="rect">

</xml_diff>

<commit_message>
finalize new results, need new figs now
</commit_message>
<xml_diff>
--- a/working_drafts/figs/TXeco_SEM_ppt_fig.pptx
+++ b/working_drafts/figs/TXeco_SEM_ppt_fig.pptx
@@ -200,7 +200,7 @@
           <a:p>
             <a:fld id="{9C8338E3-F40D-F146-8D3B-4726E84D5200}" type="datetimeFigureOut">
               <a:rPr lang="en-US" smtClean="0"/>
-              <a:t>6/2/23</a:t>
+              <a:t>6/7/23</a:t>
             </a:fld>
             <a:endParaRPr lang="en-US"/>
           </a:p>
@@ -939,7 +939,7 @@
           <a:p>
             <a:fld id="{D3A28AA4-801E-B147-9E5C-6E6DBA6E23D1}" type="datetimeFigureOut">
               <a:rPr lang="en-US" smtClean="0"/>
-              <a:t>6/2/23</a:t>
+              <a:t>6/7/23</a:t>
             </a:fld>
             <a:endParaRPr lang="en-US"/>
           </a:p>
@@ -1109,7 +1109,7 @@
           <a:p>
             <a:fld id="{D3A28AA4-801E-B147-9E5C-6E6DBA6E23D1}" type="datetimeFigureOut">
               <a:rPr lang="en-US" smtClean="0"/>
-              <a:t>6/2/23</a:t>
+              <a:t>6/7/23</a:t>
             </a:fld>
             <a:endParaRPr lang="en-US"/>
           </a:p>
@@ -1289,7 +1289,7 @@
           <a:p>
             <a:fld id="{D3A28AA4-801E-B147-9E5C-6E6DBA6E23D1}" type="datetimeFigureOut">
               <a:rPr lang="en-US" smtClean="0"/>
-              <a:t>6/2/23</a:t>
+              <a:t>6/7/23</a:t>
             </a:fld>
             <a:endParaRPr lang="en-US"/>
           </a:p>
@@ -1459,7 +1459,7 @@
           <a:p>
             <a:fld id="{D3A28AA4-801E-B147-9E5C-6E6DBA6E23D1}" type="datetimeFigureOut">
               <a:rPr lang="en-US" smtClean="0"/>
-              <a:t>6/2/23</a:t>
+              <a:t>6/7/23</a:t>
             </a:fld>
             <a:endParaRPr lang="en-US"/>
           </a:p>
@@ -1703,7 +1703,7 @@
           <a:p>
             <a:fld id="{D3A28AA4-801E-B147-9E5C-6E6DBA6E23D1}" type="datetimeFigureOut">
               <a:rPr lang="en-US" smtClean="0"/>
-              <a:t>6/2/23</a:t>
+              <a:t>6/7/23</a:t>
             </a:fld>
             <a:endParaRPr lang="en-US"/>
           </a:p>
@@ -1935,7 +1935,7 @@
           <a:p>
             <a:fld id="{D3A28AA4-801E-B147-9E5C-6E6DBA6E23D1}" type="datetimeFigureOut">
               <a:rPr lang="en-US" smtClean="0"/>
-              <a:t>6/2/23</a:t>
+              <a:t>6/7/23</a:t>
             </a:fld>
             <a:endParaRPr lang="en-US"/>
           </a:p>
@@ -2302,7 +2302,7 @@
           <a:p>
             <a:fld id="{D3A28AA4-801E-B147-9E5C-6E6DBA6E23D1}" type="datetimeFigureOut">
               <a:rPr lang="en-US" smtClean="0"/>
-              <a:t>6/2/23</a:t>
+              <a:t>6/7/23</a:t>
             </a:fld>
             <a:endParaRPr lang="en-US"/>
           </a:p>
@@ -2420,7 +2420,7 @@
           <a:p>
             <a:fld id="{D3A28AA4-801E-B147-9E5C-6E6DBA6E23D1}" type="datetimeFigureOut">
               <a:rPr lang="en-US" smtClean="0"/>
-              <a:t>6/2/23</a:t>
+              <a:t>6/7/23</a:t>
             </a:fld>
             <a:endParaRPr lang="en-US"/>
           </a:p>
@@ -2515,7 +2515,7 @@
           <a:p>
             <a:fld id="{D3A28AA4-801E-B147-9E5C-6E6DBA6E23D1}" type="datetimeFigureOut">
               <a:rPr lang="en-US" smtClean="0"/>
-              <a:t>6/2/23</a:t>
+              <a:t>6/7/23</a:t>
             </a:fld>
             <a:endParaRPr lang="en-US"/>
           </a:p>
@@ -2792,7 +2792,7 @@
           <a:p>
             <a:fld id="{D3A28AA4-801E-B147-9E5C-6E6DBA6E23D1}" type="datetimeFigureOut">
               <a:rPr lang="en-US" smtClean="0"/>
-              <a:t>6/2/23</a:t>
+              <a:t>6/7/23</a:t>
             </a:fld>
             <a:endParaRPr lang="en-US"/>
           </a:p>
@@ -3049,7 +3049,7 @@
           <a:p>
             <a:fld id="{D3A28AA4-801E-B147-9E5C-6E6DBA6E23D1}" type="datetimeFigureOut">
               <a:rPr lang="en-US" smtClean="0"/>
-              <a:t>6/2/23</a:t>
+              <a:t>6/7/23</a:t>
             </a:fld>
             <a:endParaRPr lang="en-US"/>
           </a:p>
@@ -3262,7 +3262,7 @@
           <a:p>
             <a:fld id="{D3A28AA4-801E-B147-9E5C-6E6DBA6E23D1}" type="datetimeFigureOut">
               <a:rPr lang="en-US" smtClean="0"/>
-              <a:t>6/2/23</a:t>
+              <a:t>6/7/23</a:t>
             </a:fld>
             <a:endParaRPr lang="en-US"/>
           </a:p>
@@ -12276,7 +12276,7 @@
               <a:gd name="adj1" fmla="val 116804"/>
             </a:avLst>
           </a:prstGeom>
-          <a:ln w="58547">
+          <a:ln w="57911">
             <a:solidFill>
               <a:schemeClr val="accent1">
                 <a:lumMod val="75000"/>
@@ -13080,9 +13080,11 @@
             <a:ext cx="1163352" cy="5463365"/>
           </a:xfrm>
           <a:prstGeom prst="bentConnector3">
-            <a:avLst/>
-          </a:prstGeom>
-          <a:ln w="98171">
+            <a:avLst>
+              <a:gd name="adj1" fmla="val 59914"/>
+            </a:avLst>
+          </a:prstGeom>
+          <a:ln w="82550">
             <a:solidFill>
               <a:srgbClr val="C00000">
                 <a:alpha val="20000"/>
@@ -13130,7 +13132,7 @@
               <a:gd name="adj1" fmla="val 44482"/>
             </a:avLst>
           </a:prstGeom>
-          <a:ln w="36195">
+          <a:ln w="35560">
             <a:solidFill>
               <a:schemeClr val="accent1">
                 <a:lumMod val="75000"/>
@@ -13180,7 +13182,7 @@
               <a:gd name="adj1" fmla="val -12565"/>
             </a:avLst>
           </a:prstGeom>
-          <a:ln w="68326">
+          <a:ln w="69469">
             <a:solidFill>
               <a:srgbClr val="C00000">
                 <a:alpha val="20000"/>
@@ -13226,7 +13228,7 @@
           <a:prstGeom prst="bentConnector2">
             <a:avLst/>
           </a:prstGeom>
-          <a:ln w="19431">
+          <a:ln w="19685">
             <a:solidFill>
               <a:srgbClr val="C00000"/>
             </a:solidFill>
@@ -13270,7 +13272,7 @@
           <a:prstGeom prst="straightConnector1">
             <a:avLst/>
           </a:prstGeom>
-          <a:ln w="156972">
+          <a:ln w="156591">
             <a:solidFill>
               <a:srgbClr val="C00000">
                 <a:alpha val="20000"/>
@@ -13317,7 +13319,7 @@
           <a:prstGeom prst="bentConnector2">
             <a:avLst/>
           </a:prstGeom>
-          <a:ln w="28575">
+          <a:ln w="27813">
             <a:solidFill>
               <a:srgbClr val="C00000"/>
             </a:solidFill>
@@ -13362,7 +13364,7 @@
           <a:prstGeom prst="bentConnector2">
             <a:avLst/>
           </a:prstGeom>
-          <a:ln w="13843">
+          <a:ln w="13208">
             <a:solidFill>
               <a:srgbClr val="C00000"/>
             </a:solidFill>
@@ -13407,7 +13409,7 @@
           <a:prstGeom prst="straightConnector1">
             <a:avLst/>
           </a:prstGeom>
-          <a:ln w="34671">
+          <a:ln w="32004">
             <a:solidFill>
               <a:srgbClr val="C00000">
                 <a:alpha val="20000"/>
@@ -13454,7 +13456,7 @@
           <a:prstGeom prst="bentConnector2">
             <a:avLst/>
           </a:prstGeom>
-          <a:ln w="135509">
+          <a:ln w="136906">
             <a:solidFill>
               <a:srgbClr val="C00000">
                 <a:alpha val="20000"/>
@@ -13537,7 +13539,7 @@
               <a:gd name="adj1" fmla="val 32772"/>
             </a:avLst>
           </a:prstGeom>
-          <a:ln w="13970">
+          <a:ln w="14224">
             <a:solidFill>
               <a:srgbClr val="C00000">
                 <a:alpha val="20000"/>
@@ -13582,7 +13584,7 @@
           <a:prstGeom prst="straightConnector1">
             <a:avLst/>
           </a:prstGeom>
-          <a:ln w="13970">
+          <a:ln w="14224">
             <a:solidFill>
               <a:srgbClr val="C00000">
                 <a:alpha val="20000"/>
@@ -13672,7 +13674,7 @@
                 <a:latin typeface="Times New Roman" panose="02020603050405020304" pitchFamily="18" charset="0"/>
                 <a:cs typeface="Times New Roman" panose="02020603050405020304" pitchFamily="18" charset="0"/>
               </a:rPr>
-              <a:t>= 27.553</a:t>
+              <a:t>= 26.790</a:t>
             </a:r>
           </a:p>
           <a:p>
@@ -13682,11 +13684,18 @@
               </a:lnSpc>
             </a:pPr>
             <a:r>
+              <a:rPr lang="en-US" sz="3000" i="1" dirty="0">
+                <a:latin typeface="Times New Roman" panose="02020603050405020304" pitchFamily="18" charset="0"/>
+                <a:cs typeface="Times New Roman" panose="02020603050405020304" pitchFamily="18" charset="0"/>
+              </a:rPr>
+              <a:t>p</a:t>
+            </a:r>
+            <a:r>
               <a:rPr lang="en-US" sz="3000" dirty="0">
                 <a:latin typeface="Times New Roman" panose="02020603050405020304" pitchFamily="18" charset="0"/>
                 <a:cs typeface="Times New Roman" panose="02020603050405020304" pitchFamily="18" charset="0"/>
               </a:rPr>
-              <a:t>p-value = 0.932</a:t>
+              <a:t>-value = 0.946</a:t>
             </a:r>
           </a:p>
           <a:p>
@@ -13700,7 +13709,7 @@
                 <a:latin typeface="Times New Roman" panose="02020603050405020304" pitchFamily="18" charset="0"/>
                 <a:cs typeface="Times New Roman" panose="02020603050405020304" pitchFamily="18" charset="0"/>
               </a:rPr>
-              <a:t>AIC = 127.553</a:t>
+              <a:t>AIC = 126.790</a:t>
             </a:r>
           </a:p>
           <a:p>
@@ -13714,7 +13723,7 @@
                 <a:latin typeface="Times New Roman" panose="02020603050405020304" pitchFamily="18" charset="0"/>
                 <a:cs typeface="Times New Roman" panose="02020603050405020304" pitchFamily="18" charset="0"/>
               </a:rPr>
-              <a:t>BIC = 330.626</a:t>
+              <a:t>BIC = 329.512</a:t>
             </a:r>
           </a:p>
           <a:p>
@@ -13757,7 +13766,7 @@
               <a:gd name="adj1" fmla="val 75662"/>
             </a:avLst>
           </a:prstGeom>
-          <a:ln w="40767">
+          <a:ln w="36576">
             <a:solidFill>
               <a:srgbClr val="C00000">
                 <a:alpha val="20000"/>
@@ -13805,7 +13814,7 @@
               <a:gd name="adj1" fmla="val 46489"/>
             </a:avLst>
           </a:prstGeom>
-          <a:ln w="152400">
+          <a:ln w="156210">
             <a:solidFill>
               <a:srgbClr val="C00000">
                 <a:alpha val="20000"/>
@@ -13950,52 +13959,6 @@
       </p:sp>
       <p:cxnSp>
         <p:nvCxnSpPr>
-          <p:cNvPr id="15" name="Elbow Connector 14">
-            <a:extLst>
-              <a:ext uri="{FF2B5EF4-FFF2-40B4-BE49-F238E27FC236}">
-                <a16:creationId xmlns:a16="http://schemas.microsoft.com/office/drawing/2014/main" id="{B65668E1-7167-F749-8A28-1AB6622865CC}"/>
-              </a:ext>
-            </a:extLst>
-          </p:cNvPr>
-          <p:cNvCxnSpPr>
-            <a:cxnSpLocks/>
-          </p:cNvCxnSpPr>
-          <p:nvPr/>
-        </p:nvCxnSpPr>
-        <p:spPr>
-          <a:xfrm rot="5400000" flipH="1" flipV="1">
-            <a:off x="13648810" y="5115623"/>
-            <a:ext cx="1601963" cy="620331"/>
-          </a:xfrm>
-          <a:prstGeom prst="bentConnector2">
-            <a:avLst/>
-          </a:prstGeom>
-          <a:ln w="56896">
-            <a:solidFill>
-              <a:schemeClr val="accent1">
-                <a:lumMod val="75000"/>
-              </a:schemeClr>
-            </a:solidFill>
-            <a:tailEnd type="triangle"/>
-          </a:ln>
-        </p:spPr>
-        <p:style>
-          <a:lnRef idx="1">
-            <a:schemeClr val="accent1"/>
-          </a:lnRef>
-          <a:fillRef idx="0">
-            <a:schemeClr val="accent1"/>
-          </a:fillRef>
-          <a:effectRef idx="0">
-            <a:schemeClr val="accent1"/>
-          </a:effectRef>
-          <a:fontRef idx="minor">
-            <a:schemeClr val="tx1"/>
-          </a:fontRef>
-        </p:style>
-      </p:cxnSp>
-      <p:cxnSp>
-        <p:nvCxnSpPr>
           <p:cNvPr id="46" name="Elbow Connector 45">
             <a:extLst>
               <a:ext uri="{FF2B5EF4-FFF2-40B4-BE49-F238E27FC236}">
@@ -14018,7 +13981,7 @@
               <a:gd name="adj1" fmla="val -28396"/>
             </a:avLst>
           </a:prstGeom>
-          <a:ln w="30607">
+          <a:ln w="30226">
             <a:solidFill>
               <a:schemeClr val="accent1">
                 <a:lumMod val="75000"/>
@@ -14114,7 +14077,7 @@
           <a:prstGeom prst="bentConnector2">
             <a:avLst/>
           </a:prstGeom>
-          <a:ln w="163703">
+          <a:ln w="164719">
             <a:solidFill>
               <a:schemeClr val="accent1">
                 <a:lumMod val="75000"/>
@@ -14149,19 +14112,20 @@
           </p:cNvPr>
           <p:cNvCxnSpPr>
             <a:cxnSpLocks/>
+            <a:stCxn id="149" idx="0"/>
             <a:endCxn id="146" idx="3"/>
           </p:cNvCxnSpPr>
           <p:nvPr/>
         </p:nvCxnSpPr>
         <p:spPr>
           <a:xfrm rot="16200000" flipV="1">
-            <a:off x="12428947" y="5128376"/>
-            <a:ext cx="1601963" cy="620331"/>
+            <a:off x="12573630" y="4983692"/>
+            <a:ext cx="1601964" cy="909699"/>
           </a:xfrm>
           <a:prstGeom prst="bentConnector2">
             <a:avLst/>
           </a:prstGeom>
-          <a:ln w="79121">
+          <a:ln w="63119">
             <a:solidFill>
               <a:srgbClr val="C00000"/>
             </a:solidFill>
@@ -14209,7 +14173,7 @@
               <a:gd name="adj1" fmla="val -19258"/>
             </a:avLst>
           </a:prstGeom>
-          <a:ln w="54102">
+          <a:ln w="54483">
             <a:solidFill>
               <a:srgbClr val="C00000"/>
             </a:solidFill>
@@ -14253,7 +14217,7 @@
           <a:prstGeom prst="straightConnector1">
             <a:avLst/>
           </a:prstGeom>
-          <a:ln w="67310">
+          <a:ln w="69723">
             <a:solidFill>
               <a:srgbClr val="C00000"/>
             </a:solidFill>
@@ -14295,7 +14259,7 @@
           <a:prstGeom prst="straightConnector1">
             <a:avLst/>
           </a:prstGeom>
-          <a:ln w="34163">
+          <a:ln w="33147">
             <a:solidFill>
               <a:schemeClr val="accent1">
                 <a:lumMod val="75000"/>
@@ -14343,7 +14307,7 @@
           <a:prstGeom prst="bentConnector2">
             <a:avLst/>
           </a:prstGeom>
-          <a:ln w="66294">
+          <a:ln w="66675">
             <a:solidFill>
               <a:schemeClr val="accent1">
                 <a:lumMod val="75000"/>
@@ -14391,7 +14355,7 @@
               <a:gd name="adj1" fmla="val 28765"/>
             </a:avLst>
           </a:prstGeom>
-          <a:ln w="171577">
+          <a:ln w="172720">
             <a:solidFill>
               <a:schemeClr val="accent1">
                 <a:lumMod val="75000"/>
@@ -14440,7 +14404,7 @@
               <a:gd name="adj1" fmla="val -7992155"/>
             </a:avLst>
           </a:prstGeom>
-          <a:ln w="131826">
+          <a:ln w="134620">
             <a:solidFill>
               <a:srgbClr val="C00000"/>
             </a:solidFill>
@@ -14486,7 +14450,7 @@
               <a:gd name="adj1" fmla="val 50000"/>
             </a:avLst>
           </a:prstGeom>
-          <a:ln w="47498">
+          <a:ln w="46863">
             <a:solidFill>
               <a:srgbClr val="C00000"/>
             </a:solidFill>
@@ -14532,7 +14496,7 @@
               <a:gd name="adj1" fmla="val 59393"/>
             </a:avLst>
           </a:prstGeom>
-          <a:ln w="54864">
+          <a:ln w="54736">
             <a:solidFill>
               <a:schemeClr val="accent1">
                 <a:lumMod val="75000"/>
@@ -14577,7 +14541,7 @@
           <a:prstGeom prst="bentConnector2">
             <a:avLst/>
           </a:prstGeom>
-          <a:ln w="54864">
+          <a:ln w="54736">
             <a:solidFill>
               <a:schemeClr val="accent1">
                 <a:lumMod val="75000"/>
@@ -15652,6 +15616,53 @@
           </a:p>
         </p:txBody>
       </p:sp>
+      <p:cxnSp>
+        <p:nvCxnSpPr>
+          <p:cNvPr id="20" name="Straight Arrow Connector 19">
+            <a:extLst>
+              <a:ext uri="{FF2B5EF4-FFF2-40B4-BE49-F238E27FC236}">
+                <a16:creationId xmlns:a16="http://schemas.microsoft.com/office/drawing/2014/main" id="{356AB92F-6BA1-BDF0-D6DE-22B623B145AA}"/>
+              </a:ext>
+            </a:extLst>
+          </p:cNvPr>
+          <p:cNvCxnSpPr>
+            <a:stCxn id="6" idx="3"/>
+            <a:endCxn id="150" idx="1"/>
+          </p:cNvCxnSpPr>
+          <p:nvPr/>
+        </p:nvCxnSpPr>
+        <p:spPr>
+          <a:xfrm>
+            <a:off x="14739160" y="10759288"/>
+            <a:ext cx="1824569" cy="9249"/>
+          </a:xfrm>
+          <a:prstGeom prst="straightConnector1">
+            <a:avLst/>
+          </a:prstGeom>
+          <a:ln w="13462">
+            <a:solidFill>
+              <a:schemeClr val="accent1">
+                <a:lumMod val="75000"/>
+              </a:schemeClr>
+            </a:solidFill>
+            <a:tailEnd type="triangle"/>
+          </a:ln>
+        </p:spPr>
+        <p:style>
+          <a:lnRef idx="1">
+            <a:schemeClr val="accent1"/>
+          </a:lnRef>
+          <a:fillRef idx="0">
+            <a:schemeClr val="accent1"/>
+          </a:fillRef>
+          <a:effectRef idx="0">
+            <a:schemeClr val="accent1"/>
+          </a:effectRef>
+          <a:fontRef idx="minor">
+            <a:schemeClr val="tx1"/>
+          </a:fontRef>
+        </p:style>
+      </p:cxnSp>
     </p:spTree>
     <p:extLst>
       <p:ext uri="{BB962C8B-B14F-4D97-AF65-F5344CB8AC3E}">

</xml_diff>

<commit_message>
add conceptual figure to manuscript; start parsing through discussion
</commit_message>
<xml_diff>
--- a/working_drafts/figs/TXeco_SEM_ppt_fig.pptx
+++ b/working_drafts/figs/TXeco_SEM_ppt_fig.pptx
@@ -5,13 +5,14 @@
     <p:sldMasterId id="2147483708" r:id="rId1"/>
   </p:sldMasterIdLst>
   <p:notesMasterIdLst>
-    <p:notesMasterId r:id="rId6"/>
+    <p:notesMasterId r:id="rId7"/>
   </p:notesMasterIdLst>
   <p:sldIdLst>
     <p:sldId id="276" r:id="rId2"/>
     <p:sldId id="278" r:id="rId3"/>
     <p:sldId id="281" r:id="rId4"/>
     <p:sldId id="282" r:id="rId5"/>
+    <p:sldId id="283" r:id="rId6"/>
   </p:sldIdLst>
   <p:sldSz cx="27432000" cy="18288000"/>
   <p:notesSz cx="6858000" cy="9144000"/>
@@ -200,7 +201,7 @@
           <a:p>
             <a:fld id="{9C8338E3-F40D-F146-8D3B-4726E84D5200}" type="datetimeFigureOut">
               <a:rPr lang="en-US" smtClean="0"/>
-              <a:t>9/8/23</a:t>
+              <a:t>9/12/23</a:t>
             </a:fld>
             <a:endParaRPr lang="en-US"/>
           </a:p>
@@ -808,6 +809,90 @@
 </p:notes>
 </file>
 
+<file path=ppt/notesSlides/notesSlide5.xml><?xml version="1.0" encoding="utf-8"?>
+<p:notes xmlns:a="http://schemas.openxmlformats.org/drawingml/2006/main" xmlns:r="http://schemas.openxmlformats.org/officeDocument/2006/relationships" xmlns:p="http://schemas.openxmlformats.org/presentationml/2006/main">
+  <p:cSld>
+    <p:spTree>
+      <p:nvGrpSpPr>
+        <p:cNvPr id="1" name=""/>
+        <p:cNvGrpSpPr/>
+        <p:nvPr/>
+      </p:nvGrpSpPr>
+      <p:grpSpPr>
+        <a:xfrm>
+          <a:off x="0" y="0"/>
+          <a:ext cx="0" cy="0"/>
+          <a:chOff x="0" y="0"/>
+          <a:chExt cx="0" cy="0"/>
+        </a:xfrm>
+      </p:grpSpPr>
+      <p:sp>
+        <p:nvSpPr>
+          <p:cNvPr id="2" name="Slide Image Placeholder 1"/>
+          <p:cNvSpPr>
+            <a:spLocks noGrp="1" noRot="1" noChangeAspect="1"/>
+          </p:cNvSpPr>
+          <p:nvPr>
+            <p:ph type="sldImg"/>
+          </p:nvPr>
+        </p:nvSpPr>
+        <p:spPr/>
+      </p:sp>
+      <p:sp>
+        <p:nvSpPr>
+          <p:cNvPr id="3" name="Notes Placeholder 2"/>
+          <p:cNvSpPr>
+            <a:spLocks noGrp="1"/>
+          </p:cNvSpPr>
+          <p:nvPr>
+            <p:ph type="body" idx="1"/>
+          </p:nvPr>
+        </p:nvSpPr>
+        <p:spPr/>
+        <p:txBody>
+          <a:bodyPr/>
+          <a:lstStyle/>
+          <a:p>
+            <a:endParaRPr lang="en-US" dirty="0"/>
+          </a:p>
+        </p:txBody>
+      </p:sp>
+      <p:sp>
+        <p:nvSpPr>
+          <p:cNvPr id="4" name="Slide Number Placeholder 3"/>
+          <p:cNvSpPr>
+            <a:spLocks noGrp="1"/>
+          </p:cNvSpPr>
+          <p:nvPr>
+            <p:ph type="sldNum" sz="quarter" idx="5"/>
+          </p:nvPr>
+        </p:nvSpPr>
+        <p:spPr/>
+        <p:txBody>
+          <a:bodyPr/>
+          <a:lstStyle/>
+          <a:p>
+            <a:fld id="{C2800238-33D2-A44F-8135-A0F534DB873D}" type="slidenum">
+              <a:rPr lang="en-US" smtClean="0"/>
+              <a:t>5</a:t>
+            </a:fld>
+            <a:endParaRPr lang="en-US"/>
+          </a:p>
+        </p:txBody>
+      </p:sp>
+    </p:spTree>
+    <p:extLst>
+      <p:ext uri="{BB962C8B-B14F-4D97-AF65-F5344CB8AC3E}">
+        <p14:creationId xmlns:p14="http://schemas.microsoft.com/office/powerpoint/2010/main" val="1904669505"/>
+      </p:ext>
+    </p:extLst>
+  </p:cSld>
+  <p:clrMapOvr>
+    <a:masterClrMapping/>
+  </p:clrMapOvr>
+</p:notes>
+</file>
+
 <file path=ppt/slideLayouts/slideLayout1.xml><?xml version="1.0" encoding="utf-8"?>
 <p:sldLayout xmlns:a="http://schemas.openxmlformats.org/drawingml/2006/main" xmlns:r="http://schemas.openxmlformats.org/officeDocument/2006/relationships" xmlns:p="http://schemas.openxmlformats.org/presentationml/2006/main" type="title" preserve="1">
   <p:cSld name="Title Slide">
@@ -939,7 +1024,7 @@
           <a:p>
             <a:fld id="{D3A28AA4-801E-B147-9E5C-6E6DBA6E23D1}" type="datetimeFigureOut">
               <a:rPr lang="en-US" smtClean="0"/>
-              <a:t>9/8/23</a:t>
+              <a:t>9/12/23</a:t>
             </a:fld>
             <a:endParaRPr lang="en-US"/>
           </a:p>
@@ -1109,7 +1194,7 @@
           <a:p>
             <a:fld id="{D3A28AA4-801E-B147-9E5C-6E6DBA6E23D1}" type="datetimeFigureOut">
               <a:rPr lang="en-US" smtClean="0"/>
-              <a:t>9/8/23</a:t>
+              <a:t>9/12/23</a:t>
             </a:fld>
             <a:endParaRPr lang="en-US"/>
           </a:p>
@@ -1289,7 +1374,7 @@
           <a:p>
             <a:fld id="{D3A28AA4-801E-B147-9E5C-6E6DBA6E23D1}" type="datetimeFigureOut">
               <a:rPr lang="en-US" smtClean="0"/>
-              <a:t>9/8/23</a:t>
+              <a:t>9/12/23</a:t>
             </a:fld>
             <a:endParaRPr lang="en-US"/>
           </a:p>
@@ -1459,7 +1544,7 @@
           <a:p>
             <a:fld id="{D3A28AA4-801E-B147-9E5C-6E6DBA6E23D1}" type="datetimeFigureOut">
               <a:rPr lang="en-US" smtClean="0"/>
-              <a:t>9/8/23</a:t>
+              <a:t>9/12/23</a:t>
             </a:fld>
             <a:endParaRPr lang="en-US"/>
           </a:p>
@@ -1703,7 +1788,7 @@
           <a:p>
             <a:fld id="{D3A28AA4-801E-B147-9E5C-6E6DBA6E23D1}" type="datetimeFigureOut">
               <a:rPr lang="en-US" smtClean="0"/>
-              <a:t>9/8/23</a:t>
+              <a:t>9/12/23</a:t>
             </a:fld>
             <a:endParaRPr lang="en-US"/>
           </a:p>
@@ -1935,7 +2020,7 @@
           <a:p>
             <a:fld id="{D3A28AA4-801E-B147-9E5C-6E6DBA6E23D1}" type="datetimeFigureOut">
               <a:rPr lang="en-US" smtClean="0"/>
-              <a:t>9/8/23</a:t>
+              <a:t>9/12/23</a:t>
             </a:fld>
             <a:endParaRPr lang="en-US"/>
           </a:p>
@@ -2302,7 +2387,7 @@
           <a:p>
             <a:fld id="{D3A28AA4-801E-B147-9E5C-6E6DBA6E23D1}" type="datetimeFigureOut">
               <a:rPr lang="en-US" smtClean="0"/>
-              <a:t>9/8/23</a:t>
+              <a:t>9/12/23</a:t>
             </a:fld>
             <a:endParaRPr lang="en-US"/>
           </a:p>
@@ -2420,7 +2505,7 @@
           <a:p>
             <a:fld id="{D3A28AA4-801E-B147-9E5C-6E6DBA6E23D1}" type="datetimeFigureOut">
               <a:rPr lang="en-US" smtClean="0"/>
-              <a:t>9/8/23</a:t>
+              <a:t>9/12/23</a:t>
             </a:fld>
             <a:endParaRPr lang="en-US"/>
           </a:p>
@@ -2515,7 +2600,7 @@
           <a:p>
             <a:fld id="{D3A28AA4-801E-B147-9E5C-6E6DBA6E23D1}" type="datetimeFigureOut">
               <a:rPr lang="en-US" smtClean="0"/>
-              <a:t>9/8/23</a:t>
+              <a:t>9/12/23</a:t>
             </a:fld>
             <a:endParaRPr lang="en-US"/>
           </a:p>
@@ -2792,7 +2877,7 @@
           <a:p>
             <a:fld id="{D3A28AA4-801E-B147-9E5C-6E6DBA6E23D1}" type="datetimeFigureOut">
               <a:rPr lang="en-US" smtClean="0"/>
-              <a:t>9/8/23</a:t>
+              <a:t>9/12/23</a:t>
             </a:fld>
             <a:endParaRPr lang="en-US"/>
           </a:p>
@@ -3049,7 +3134,7 @@
           <a:p>
             <a:fld id="{D3A28AA4-801E-B147-9E5C-6E6DBA6E23D1}" type="datetimeFigureOut">
               <a:rPr lang="en-US" smtClean="0"/>
-              <a:t>9/8/23</a:t>
+              <a:t>9/12/23</a:t>
             </a:fld>
             <a:endParaRPr lang="en-US"/>
           </a:p>
@@ -3262,7 +3347,7 @@
           <a:p>
             <a:fld id="{D3A28AA4-801E-B147-9E5C-6E6DBA6E23D1}" type="datetimeFigureOut">
               <a:rPr lang="en-US" smtClean="0"/>
-              <a:t>9/8/23</a:t>
+              <a:t>9/12/23</a:t>
             </a:fld>
             <a:endParaRPr lang="en-US"/>
           </a:p>
@@ -6037,196 +6122,6 @@
       </p:cxnSp>
       <p:sp>
         <p:nvSpPr>
-          <p:cNvPr id="7" name="TextBox 6">
-            <a:extLst>
-              <a:ext uri="{FF2B5EF4-FFF2-40B4-BE49-F238E27FC236}">
-                <a16:creationId xmlns:a16="http://schemas.microsoft.com/office/drawing/2014/main" id="{57D6CB6B-2AB0-EAA2-7F43-80EE740A68DC}"/>
-              </a:ext>
-            </a:extLst>
-          </p:cNvPr>
-          <p:cNvSpPr txBox="1"/>
-          <p:nvPr/>
-        </p:nvSpPr>
-        <p:spPr>
-          <a:xfrm>
-            <a:off x="18804683" y="6560915"/>
-            <a:ext cx="800219" cy="461665"/>
-          </a:xfrm>
-          <a:prstGeom prst="rect">
-            <a:avLst/>
-          </a:prstGeom>
-          <a:noFill/>
-        </p:spPr>
-        <p:txBody>
-          <a:bodyPr wrap="none" rtlCol="0">
-            <a:spAutoFit/>
-          </a:bodyPr>
-          <a:lstStyle/>
-          <a:p>
-            <a:r>
-              <a:rPr lang="en-US" sz="2400" b="1" dirty="0">
-                <a:latin typeface="Times New Roman" panose="02020603050405020304" pitchFamily="18" charset="0"/>
-                <a:cs typeface="Times New Roman" panose="02020603050405020304" pitchFamily="18" charset="0"/>
-              </a:rPr>
-              <a:t>89%</a:t>
-            </a:r>
-          </a:p>
-        </p:txBody>
-      </p:sp>
-      <p:sp>
-        <p:nvSpPr>
-          <p:cNvPr id="8" name="TextBox 7">
-            <a:extLst>
-              <a:ext uri="{FF2B5EF4-FFF2-40B4-BE49-F238E27FC236}">
-                <a16:creationId xmlns:a16="http://schemas.microsoft.com/office/drawing/2014/main" id="{E73D4731-015B-1393-5949-6BDFE1D295AE}"/>
-              </a:ext>
-            </a:extLst>
-          </p:cNvPr>
-          <p:cNvSpPr txBox="1"/>
-          <p:nvPr/>
-        </p:nvSpPr>
-        <p:spPr>
-          <a:xfrm>
-            <a:off x="15439196" y="6605491"/>
-            <a:ext cx="800219" cy="461665"/>
-          </a:xfrm>
-          <a:prstGeom prst="rect">
-            <a:avLst/>
-          </a:prstGeom>
-          <a:noFill/>
-        </p:spPr>
-        <p:txBody>
-          <a:bodyPr wrap="none" rtlCol="0">
-            <a:spAutoFit/>
-          </a:bodyPr>
-          <a:lstStyle/>
-          <a:p>
-            <a:r>
-              <a:rPr lang="en-US" sz="2400" b="1" dirty="0">
-                <a:latin typeface="Times New Roman" panose="02020603050405020304" pitchFamily="18" charset="0"/>
-                <a:cs typeface="Times New Roman" panose="02020603050405020304" pitchFamily="18" charset="0"/>
-              </a:rPr>
-              <a:t>93%</a:t>
-            </a:r>
-          </a:p>
-        </p:txBody>
-      </p:sp>
-      <p:sp>
-        <p:nvSpPr>
-          <p:cNvPr id="9" name="TextBox 8">
-            <a:extLst>
-              <a:ext uri="{FF2B5EF4-FFF2-40B4-BE49-F238E27FC236}">
-                <a16:creationId xmlns:a16="http://schemas.microsoft.com/office/drawing/2014/main" id="{27C8939D-FF82-E5EA-6D69-AB10AEAE0B28}"/>
-              </a:ext>
-            </a:extLst>
-          </p:cNvPr>
-          <p:cNvSpPr txBox="1"/>
-          <p:nvPr/>
-        </p:nvSpPr>
-        <p:spPr>
-          <a:xfrm>
-            <a:off x="18804684" y="3847753"/>
-            <a:ext cx="800219" cy="461665"/>
-          </a:xfrm>
-          <a:prstGeom prst="rect">
-            <a:avLst/>
-          </a:prstGeom>
-          <a:noFill/>
-        </p:spPr>
-        <p:txBody>
-          <a:bodyPr wrap="none" rtlCol="0">
-            <a:spAutoFit/>
-          </a:bodyPr>
-          <a:lstStyle/>
-          <a:p>
-            <a:r>
-              <a:rPr lang="en-US" sz="2400" b="1" dirty="0">
-                <a:latin typeface="Times New Roman" panose="02020603050405020304" pitchFamily="18" charset="0"/>
-                <a:cs typeface="Times New Roman" panose="02020603050405020304" pitchFamily="18" charset="0"/>
-              </a:rPr>
-              <a:t>56%</a:t>
-            </a:r>
-          </a:p>
-        </p:txBody>
-      </p:sp>
-      <p:sp>
-        <p:nvSpPr>
-          <p:cNvPr id="10" name="TextBox 9">
-            <a:extLst>
-              <a:ext uri="{FF2B5EF4-FFF2-40B4-BE49-F238E27FC236}">
-                <a16:creationId xmlns:a16="http://schemas.microsoft.com/office/drawing/2014/main" id="{84AF56ED-6C10-30BE-8578-D4C573039D29}"/>
-              </a:ext>
-            </a:extLst>
-          </p:cNvPr>
-          <p:cNvSpPr txBox="1"/>
-          <p:nvPr/>
-        </p:nvSpPr>
-        <p:spPr>
-          <a:xfrm>
-            <a:off x="18804682" y="9297010"/>
-            <a:ext cx="800219" cy="461665"/>
-          </a:xfrm>
-          <a:prstGeom prst="rect">
-            <a:avLst/>
-          </a:prstGeom>
-          <a:noFill/>
-        </p:spPr>
-        <p:txBody>
-          <a:bodyPr wrap="none" rtlCol="0">
-            <a:spAutoFit/>
-          </a:bodyPr>
-          <a:lstStyle/>
-          <a:p>
-            <a:r>
-              <a:rPr lang="en-US" sz="2400" b="1" dirty="0">
-                <a:latin typeface="Times New Roman" panose="02020603050405020304" pitchFamily="18" charset="0"/>
-                <a:cs typeface="Times New Roman" panose="02020603050405020304" pitchFamily="18" charset="0"/>
-              </a:rPr>
-              <a:t>58%</a:t>
-            </a:r>
-          </a:p>
-        </p:txBody>
-      </p:sp>
-      <p:sp>
-        <p:nvSpPr>
-          <p:cNvPr id="14" name="TextBox 13">
-            <a:extLst>
-              <a:ext uri="{FF2B5EF4-FFF2-40B4-BE49-F238E27FC236}">
-                <a16:creationId xmlns:a16="http://schemas.microsoft.com/office/drawing/2014/main" id="{989BE5E6-26A2-D25C-F47A-691F4607216F}"/>
-              </a:ext>
-            </a:extLst>
-          </p:cNvPr>
-          <p:cNvSpPr txBox="1"/>
-          <p:nvPr/>
-        </p:nvSpPr>
-        <p:spPr>
-          <a:xfrm>
-            <a:off x="10874861" y="6599521"/>
-            <a:ext cx="800219" cy="461665"/>
-          </a:xfrm>
-          <a:prstGeom prst="rect">
-            <a:avLst/>
-          </a:prstGeom>
-          <a:noFill/>
-        </p:spPr>
-        <p:txBody>
-          <a:bodyPr wrap="none" rtlCol="0">
-            <a:spAutoFit/>
-          </a:bodyPr>
-          <a:lstStyle/>
-          <a:p>
-            <a:r>
-              <a:rPr lang="en-US" sz="2400" b="1" dirty="0">
-                <a:latin typeface="Times New Roman" panose="02020603050405020304" pitchFamily="18" charset="0"/>
-                <a:cs typeface="Times New Roman" panose="02020603050405020304" pitchFamily="18" charset="0"/>
-              </a:rPr>
-              <a:t>28%</a:t>
-            </a:r>
-          </a:p>
-        </p:txBody>
-      </p:sp>
-      <p:sp>
-        <p:nvSpPr>
           <p:cNvPr id="26" name="Rectangle 25">
             <a:extLst>
               <a:ext uri="{FF2B5EF4-FFF2-40B4-BE49-F238E27FC236}">
@@ -7072,44 +6967,6 @@
               <a:latin typeface="Times New Roman" panose="02020603050405020304" pitchFamily="18" charset="0"/>
               <a:cs typeface="Times New Roman" panose="02020603050405020304" pitchFamily="18" charset="0"/>
             </a:endParaRPr>
-          </a:p>
-        </p:txBody>
-      </p:sp>
-      <p:sp>
-        <p:nvSpPr>
-          <p:cNvPr id="3" name="TextBox 2">
-            <a:extLst>
-              <a:ext uri="{FF2B5EF4-FFF2-40B4-BE49-F238E27FC236}">
-                <a16:creationId xmlns:a16="http://schemas.microsoft.com/office/drawing/2014/main" id="{8B12FFBD-6A30-9919-ED85-1CAA2ED2B6AF}"/>
-              </a:ext>
-            </a:extLst>
-          </p:cNvPr>
-          <p:cNvSpPr txBox="1"/>
-          <p:nvPr/>
-        </p:nvSpPr>
-        <p:spPr>
-          <a:xfrm>
-            <a:off x="6246639" y="9314745"/>
-            <a:ext cx="800219" cy="461665"/>
-          </a:xfrm>
-          <a:prstGeom prst="rect">
-            <a:avLst/>
-          </a:prstGeom>
-          <a:noFill/>
-        </p:spPr>
-        <p:txBody>
-          <a:bodyPr wrap="none" rtlCol="0">
-            <a:spAutoFit/>
-          </a:bodyPr>
-          <a:lstStyle/>
-          <a:p>
-            <a:r>
-              <a:rPr lang="en-US" sz="2400" b="1" dirty="0">
-                <a:latin typeface="Times New Roman" panose="02020603050405020304" pitchFamily="18" charset="0"/>
-                <a:cs typeface="Times New Roman" panose="02020603050405020304" pitchFamily="18" charset="0"/>
-              </a:rPr>
-              <a:t>41%</a:t>
-            </a:r>
           </a:p>
         </p:txBody>
       </p:sp>
@@ -8247,101 +8104,6 @@
       </p:sp>
       <p:cxnSp>
         <p:nvCxnSpPr>
-          <p:cNvPr id="35" name="Elbow Connector 34">
-            <a:extLst>
-              <a:ext uri="{FF2B5EF4-FFF2-40B4-BE49-F238E27FC236}">
-                <a16:creationId xmlns:a16="http://schemas.microsoft.com/office/drawing/2014/main" id="{EF3AFABA-7183-05E9-2B6C-1002C13152CA}"/>
-              </a:ext>
-            </a:extLst>
-          </p:cNvPr>
-          <p:cNvCxnSpPr>
-            <a:cxnSpLocks/>
-          </p:cNvCxnSpPr>
-          <p:nvPr/>
-        </p:nvCxnSpPr>
-        <p:spPr>
-          <a:xfrm rot="16200000" flipH="1">
-            <a:off x="12893116" y="3798933"/>
-            <a:ext cx="12700" cy="13687685"/>
-          </a:xfrm>
-          <a:prstGeom prst="bentConnector3">
-            <a:avLst>
-              <a:gd name="adj1" fmla="val 2959425"/>
-            </a:avLst>
-          </a:prstGeom>
-          <a:ln w="49784">
-            <a:solidFill>
-              <a:srgbClr val="C00000"/>
-            </a:solidFill>
-            <a:tailEnd type="triangle"/>
-          </a:ln>
-        </p:spPr>
-        <p:style>
-          <a:lnRef idx="1">
-            <a:schemeClr val="accent1"/>
-          </a:lnRef>
-          <a:fillRef idx="0">
-            <a:schemeClr val="accent1"/>
-          </a:fillRef>
-          <a:effectRef idx="0">
-            <a:schemeClr val="accent1"/>
-          </a:effectRef>
-          <a:fontRef idx="minor">
-            <a:schemeClr val="tx1"/>
-          </a:fontRef>
-        </p:style>
-      </p:cxnSp>
-      <p:cxnSp>
-        <p:nvCxnSpPr>
-          <p:cNvPr id="41" name="Elbow Connector 40">
-            <a:extLst>
-              <a:ext uri="{FF2B5EF4-FFF2-40B4-BE49-F238E27FC236}">
-                <a16:creationId xmlns:a16="http://schemas.microsoft.com/office/drawing/2014/main" id="{3030AE49-D227-9D49-95F9-423367B4D592}"/>
-              </a:ext>
-            </a:extLst>
-          </p:cNvPr>
-          <p:cNvCxnSpPr>
-            <a:cxnSpLocks/>
-          </p:cNvCxnSpPr>
-          <p:nvPr/>
-        </p:nvCxnSpPr>
-        <p:spPr>
-          <a:xfrm rot="10800000" flipH="1">
-            <a:off x="5417867" y="4269051"/>
-            <a:ext cx="14592218" cy="5912538"/>
-          </a:xfrm>
-          <a:prstGeom prst="bentConnector4">
-            <a:avLst>
-              <a:gd name="adj1" fmla="val -4110"/>
-              <a:gd name="adj2" fmla="val 117091"/>
-            </a:avLst>
-          </a:prstGeom>
-          <a:ln w="57658">
-            <a:solidFill>
-              <a:schemeClr val="accent1">
-                <a:lumMod val="75000"/>
-              </a:schemeClr>
-            </a:solidFill>
-            <a:tailEnd type="triangle"/>
-          </a:ln>
-        </p:spPr>
-        <p:style>
-          <a:lnRef idx="1">
-            <a:schemeClr val="accent1"/>
-          </a:lnRef>
-          <a:fillRef idx="0">
-            <a:schemeClr val="accent1"/>
-          </a:fillRef>
-          <a:effectRef idx="0">
-            <a:schemeClr val="accent1"/>
-          </a:effectRef>
-          <a:fontRef idx="minor">
-            <a:schemeClr val="tx1"/>
-          </a:fontRef>
-        </p:style>
-      </p:cxnSp>
-      <p:cxnSp>
-        <p:nvCxnSpPr>
           <p:cNvPr id="39" name="Elbow Connector 38">
             <a:extLst>
               <a:ext uri="{FF2B5EF4-FFF2-40B4-BE49-F238E27FC236}">
@@ -8615,160 +8377,6 @@
               <a:latin typeface="Times New Roman" panose="02020603050405020304" pitchFamily="18" charset="0"/>
               <a:cs typeface="Times New Roman" panose="02020603050405020304" pitchFamily="18" charset="0"/>
             </a:endParaRPr>
-          </a:p>
-        </p:txBody>
-      </p:sp>
-      <p:sp>
-        <p:nvSpPr>
-          <p:cNvPr id="6" name="Rectangle 5">
-            <a:extLst>
-              <a:ext uri="{FF2B5EF4-FFF2-40B4-BE49-F238E27FC236}">
-                <a16:creationId xmlns:a16="http://schemas.microsoft.com/office/drawing/2014/main" id="{A7593FE4-6B3D-C1B4-601D-36AC6C1199A2}"/>
-              </a:ext>
-            </a:extLst>
-          </p:cNvPr>
-          <p:cNvSpPr/>
-          <p:nvPr/>
-        </p:nvSpPr>
-        <p:spPr>
-          <a:xfrm>
-            <a:off x="6836545" y="7065034"/>
-            <a:ext cx="1819398" cy="877223"/>
-          </a:xfrm>
-          <a:prstGeom prst="rect">
-            <a:avLst/>
-          </a:prstGeom>
-          <a:solidFill>
-            <a:schemeClr val="bg1"/>
-          </a:solidFill>
-          <a:ln w="38100">
-            <a:solidFill>
-              <a:schemeClr val="tx1"/>
-            </a:solidFill>
-          </a:ln>
-        </p:spPr>
-        <p:style>
-          <a:lnRef idx="2">
-            <a:schemeClr val="accent1">
-              <a:shade val="50000"/>
-            </a:schemeClr>
-          </a:lnRef>
-          <a:fillRef idx="1">
-            <a:schemeClr val="accent1"/>
-          </a:fillRef>
-          <a:effectRef idx="0">
-            <a:schemeClr val="accent1"/>
-          </a:effectRef>
-          <a:fontRef idx="minor">
-            <a:schemeClr val="lt1"/>
-          </a:fontRef>
-        </p:style>
-        <p:txBody>
-          <a:bodyPr rtlCol="0" anchor="ctr"/>
-          <a:lstStyle/>
-          <a:p>
-            <a:pPr algn="ctr"/>
-            <a:r>
-              <a:rPr lang="en-US" sz="3000" b="1" i="1" dirty="0">
-                <a:solidFill>
-                  <a:schemeClr val="tx1"/>
-                </a:solidFill>
-                <a:latin typeface="Times New Roman" panose="02020603050405020304" pitchFamily="18" charset="0"/>
-                <a:cs typeface="Times New Roman" panose="02020603050405020304" pitchFamily="18" charset="0"/>
-              </a:rPr>
-              <a:t>% clay</a:t>
-            </a:r>
-            <a:endParaRPr lang="en-US" sz="3000" b="1" dirty="0">
-              <a:solidFill>
-                <a:schemeClr val="tx1"/>
-              </a:solidFill>
-              <a:latin typeface="Times New Roman" panose="02020603050405020304" pitchFamily="18" charset="0"/>
-              <a:cs typeface="Times New Roman" panose="02020603050405020304" pitchFamily="18" charset="0"/>
-            </a:endParaRPr>
-          </a:p>
-        </p:txBody>
-      </p:sp>
-      <p:cxnSp>
-        <p:nvCxnSpPr>
-          <p:cNvPr id="24" name="Elbow Connector 23">
-            <a:extLst>
-              <a:ext uri="{FF2B5EF4-FFF2-40B4-BE49-F238E27FC236}">
-                <a16:creationId xmlns:a16="http://schemas.microsoft.com/office/drawing/2014/main" id="{5CF21DA1-8F4B-E593-9356-788AE9845D32}"/>
-              </a:ext>
-            </a:extLst>
-          </p:cNvPr>
-          <p:cNvCxnSpPr>
-            <a:cxnSpLocks/>
-            <a:stCxn id="6" idx="1"/>
-          </p:cNvCxnSpPr>
-          <p:nvPr/>
-        </p:nvCxnSpPr>
-        <p:spPr>
-          <a:xfrm rot="10800000">
-            <a:off x="5417867" y="5186642"/>
-            <a:ext cx="1418678" cy="2317005"/>
-          </a:xfrm>
-          <a:prstGeom prst="bentConnector2">
-            <a:avLst/>
-          </a:prstGeom>
-          <a:ln w="103251">
-            <a:solidFill>
-              <a:srgbClr val="C00000"/>
-            </a:solidFill>
-            <a:prstDash val="solid"/>
-            <a:tailEnd type="triangle"/>
-          </a:ln>
-        </p:spPr>
-        <p:style>
-          <a:lnRef idx="1">
-            <a:schemeClr val="accent1"/>
-          </a:lnRef>
-          <a:fillRef idx="0">
-            <a:schemeClr val="accent1"/>
-          </a:fillRef>
-          <a:effectRef idx="0">
-            <a:schemeClr val="accent1"/>
-          </a:effectRef>
-          <a:fontRef idx="minor">
-            <a:schemeClr val="tx1"/>
-          </a:fontRef>
-        </p:style>
-      </p:cxnSp>
-      <p:sp>
-        <p:nvSpPr>
-          <p:cNvPr id="20" name="TextBox 19">
-            <a:extLst>
-              <a:ext uri="{FF2B5EF4-FFF2-40B4-BE49-F238E27FC236}">
-                <a16:creationId xmlns:a16="http://schemas.microsoft.com/office/drawing/2014/main" id="{EB1B2582-D9EF-4876-FC8A-B4447C93E803}"/>
-              </a:ext>
-            </a:extLst>
-          </p:cNvPr>
-          <p:cNvSpPr txBox="1"/>
-          <p:nvPr/>
-        </p:nvSpPr>
-        <p:spPr>
-          <a:xfrm>
-            <a:off x="6222199" y="3836466"/>
-            <a:ext cx="800219" cy="461665"/>
-          </a:xfrm>
-          <a:prstGeom prst="rect">
-            <a:avLst/>
-          </a:prstGeom>
-          <a:noFill/>
-        </p:spPr>
-        <p:txBody>
-          <a:bodyPr wrap="none" rtlCol="0">
-            <a:spAutoFit/>
-          </a:bodyPr>
-          <a:lstStyle/>
-          <a:p>
-            <a:r>
-              <a:rPr lang="en-US" sz="2400" b="1" dirty="0">
-                <a:latin typeface="Times New Roman" panose="02020603050405020304" pitchFamily="18" charset="0"/>
-                <a:cs typeface="Times New Roman" panose="02020603050405020304" pitchFamily="18" charset="0"/>
-              </a:rPr>
-              <a:t>51%</a:t>
-            </a:r>
           </a:p>
         </p:txBody>
       </p:sp>
@@ -15171,6 +14779,1549 @@
 </p:sld>
 </file>
 
+<file path=ppt/slides/slide5.xml><?xml version="1.0" encoding="utf-8"?>
+<p:sld xmlns:a="http://schemas.openxmlformats.org/drawingml/2006/main" xmlns:r="http://schemas.openxmlformats.org/officeDocument/2006/relationships" xmlns:p="http://schemas.openxmlformats.org/presentationml/2006/main">
+  <p:cSld>
+    <p:spTree>
+      <p:nvGrpSpPr>
+        <p:cNvPr id="1" name=""/>
+        <p:cNvGrpSpPr/>
+        <p:nvPr/>
+      </p:nvGrpSpPr>
+      <p:grpSpPr>
+        <a:xfrm>
+          <a:off x="0" y="0"/>
+          <a:ext cx="0" cy="0"/>
+          <a:chOff x="0" y="0"/>
+          <a:chExt cx="0" cy="0"/>
+        </a:xfrm>
+      </p:grpSpPr>
+      <p:cxnSp>
+        <p:nvCxnSpPr>
+          <p:cNvPr id="31" name="Elbow Connector 30">
+            <a:extLst>
+              <a:ext uri="{FF2B5EF4-FFF2-40B4-BE49-F238E27FC236}">
+                <a16:creationId xmlns:a16="http://schemas.microsoft.com/office/drawing/2014/main" id="{C7EFE26F-7F6A-1C58-17DB-D9A4DE6DA6A4}"/>
+              </a:ext>
+            </a:extLst>
+          </p:cNvPr>
+          <p:cNvCxnSpPr>
+            <a:cxnSpLocks/>
+          </p:cNvCxnSpPr>
+          <p:nvPr/>
+        </p:nvCxnSpPr>
+        <p:spPr>
+          <a:xfrm rot="16200000" flipH="1">
+            <a:off x="8530795" y="6749500"/>
+            <a:ext cx="601182" cy="1459355"/>
+          </a:xfrm>
+          <a:prstGeom prst="bentConnector2">
+            <a:avLst/>
+          </a:prstGeom>
+          <a:ln w="76200">
+            <a:solidFill>
+              <a:schemeClr val="accent1">
+                <a:lumMod val="75000"/>
+              </a:schemeClr>
+            </a:solidFill>
+            <a:tailEnd type="triangle"/>
+          </a:ln>
+        </p:spPr>
+        <p:style>
+          <a:lnRef idx="1">
+            <a:schemeClr val="accent1"/>
+          </a:lnRef>
+          <a:fillRef idx="0">
+            <a:schemeClr val="accent1"/>
+          </a:fillRef>
+          <a:effectRef idx="0">
+            <a:schemeClr val="accent1"/>
+          </a:effectRef>
+          <a:fontRef idx="minor">
+            <a:schemeClr val="tx1"/>
+          </a:fontRef>
+        </p:style>
+      </p:cxnSp>
+      <p:cxnSp>
+        <p:nvCxnSpPr>
+          <p:cNvPr id="32" name="Elbow Connector 31">
+            <a:extLst>
+              <a:ext uri="{FF2B5EF4-FFF2-40B4-BE49-F238E27FC236}">
+                <a16:creationId xmlns:a16="http://schemas.microsoft.com/office/drawing/2014/main" id="{7C00614C-0DD8-B171-CDE2-93D6B6F27D64}"/>
+              </a:ext>
+            </a:extLst>
+          </p:cNvPr>
+          <p:cNvCxnSpPr>
+            <a:cxnSpLocks/>
+          </p:cNvCxnSpPr>
+          <p:nvPr/>
+        </p:nvCxnSpPr>
+        <p:spPr>
+          <a:xfrm rot="5400000" flipH="1" flipV="1">
+            <a:off x="8514109" y="7789409"/>
+            <a:ext cx="634554" cy="1459355"/>
+          </a:xfrm>
+          <a:prstGeom prst="bentConnector2">
+            <a:avLst/>
+          </a:prstGeom>
+          <a:ln w="76200">
+            <a:solidFill>
+              <a:srgbClr val="C00000"/>
+            </a:solidFill>
+            <a:tailEnd type="triangle"/>
+          </a:ln>
+        </p:spPr>
+        <p:style>
+          <a:lnRef idx="1">
+            <a:schemeClr val="accent1"/>
+          </a:lnRef>
+          <a:fillRef idx="0">
+            <a:schemeClr val="accent1"/>
+          </a:fillRef>
+          <a:effectRef idx="0">
+            <a:schemeClr val="accent1"/>
+          </a:effectRef>
+          <a:fontRef idx="minor">
+            <a:schemeClr val="tx1"/>
+          </a:fontRef>
+        </p:style>
+      </p:cxnSp>
+      <p:sp>
+        <p:nvSpPr>
+          <p:cNvPr id="7" name="TextBox 6">
+            <a:extLst>
+              <a:ext uri="{FF2B5EF4-FFF2-40B4-BE49-F238E27FC236}">
+                <a16:creationId xmlns:a16="http://schemas.microsoft.com/office/drawing/2014/main" id="{FC38E1C0-39FA-01E4-275A-AD658AC19E24}"/>
+              </a:ext>
+            </a:extLst>
+          </p:cNvPr>
+          <p:cNvSpPr txBox="1"/>
+          <p:nvPr/>
+        </p:nvSpPr>
+        <p:spPr>
+          <a:xfrm>
+            <a:off x="298580" y="17504229"/>
+            <a:ext cx="2180533" cy="369332"/>
+          </a:xfrm>
+          <a:prstGeom prst="rect">
+            <a:avLst/>
+          </a:prstGeom>
+          <a:noFill/>
+        </p:spPr>
+        <p:txBody>
+          <a:bodyPr wrap="none" rtlCol="0">
+            <a:spAutoFit/>
+          </a:bodyPr>
+          <a:lstStyle/>
+          <a:p>
+            <a:r>
+              <a:rPr lang="en-US" dirty="0"/>
+              <a:t>manuscript main text</a:t>
+            </a:r>
+          </a:p>
+        </p:txBody>
+      </p:sp>
+      <p:cxnSp>
+        <p:nvCxnSpPr>
+          <p:cNvPr id="43" name="Straight Arrow Connector 42">
+            <a:extLst>
+              <a:ext uri="{FF2B5EF4-FFF2-40B4-BE49-F238E27FC236}">
+                <a16:creationId xmlns:a16="http://schemas.microsoft.com/office/drawing/2014/main" id="{6C8D84F6-E7F2-457E-C6CE-71B0F87335B1}"/>
+              </a:ext>
+            </a:extLst>
+          </p:cNvPr>
+          <p:cNvCxnSpPr>
+            <a:cxnSpLocks/>
+          </p:cNvCxnSpPr>
+          <p:nvPr/>
+        </p:nvCxnSpPr>
+        <p:spPr>
+          <a:xfrm>
+            <a:off x="11380462" y="8009416"/>
+            <a:ext cx="892510" cy="0"/>
+          </a:xfrm>
+          <a:prstGeom prst="straightConnector1">
+            <a:avLst/>
+          </a:prstGeom>
+          <a:ln w="76200">
+            <a:solidFill>
+              <a:schemeClr val="accent1">
+                <a:lumMod val="75000"/>
+              </a:schemeClr>
+            </a:solidFill>
+            <a:tailEnd type="triangle"/>
+          </a:ln>
+        </p:spPr>
+        <p:style>
+          <a:lnRef idx="1">
+            <a:schemeClr val="accent1"/>
+          </a:lnRef>
+          <a:fillRef idx="0">
+            <a:schemeClr val="accent1"/>
+          </a:fillRef>
+          <a:effectRef idx="0">
+            <a:schemeClr val="accent1"/>
+          </a:effectRef>
+          <a:fontRef idx="minor">
+            <a:schemeClr val="tx1"/>
+          </a:fontRef>
+        </p:style>
+      </p:cxnSp>
+      <p:cxnSp>
+        <p:nvCxnSpPr>
+          <p:cNvPr id="45" name="Straight Arrow Connector 44">
+            <a:extLst>
+              <a:ext uri="{FF2B5EF4-FFF2-40B4-BE49-F238E27FC236}">
+                <a16:creationId xmlns:a16="http://schemas.microsoft.com/office/drawing/2014/main" id="{6071B235-6C4D-6C35-571A-EA3AE9A92167}"/>
+              </a:ext>
+            </a:extLst>
+          </p:cNvPr>
+          <p:cNvCxnSpPr>
+            <a:cxnSpLocks/>
+          </p:cNvCxnSpPr>
+          <p:nvPr/>
+        </p:nvCxnSpPr>
+        <p:spPr>
+          <a:xfrm>
+            <a:off x="12695276" y="6472734"/>
+            <a:ext cx="0" cy="1098071"/>
+          </a:xfrm>
+          <a:prstGeom prst="straightConnector1">
+            <a:avLst/>
+          </a:prstGeom>
+          <a:ln w="76200">
+            <a:solidFill>
+              <a:srgbClr val="C00000"/>
+            </a:solidFill>
+            <a:tailEnd type="triangle"/>
+          </a:ln>
+        </p:spPr>
+        <p:style>
+          <a:lnRef idx="1">
+            <a:schemeClr val="accent1"/>
+          </a:lnRef>
+          <a:fillRef idx="0">
+            <a:schemeClr val="accent1"/>
+          </a:fillRef>
+          <a:effectRef idx="0">
+            <a:schemeClr val="accent1"/>
+          </a:effectRef>
+          <a:fontRef idx="minor">
+            <a:schemeClr val="tx1"/>
+          </a:fontRef>
+        </p:style>
+      </p:cxnSp>
+      <p:cxnSp>
+        <p:nvCxnSpPr>
+          <p:cNvPr id="50" name="Elbow Connector 49">
+            <a:extLst>
+              <a:ext uri="{FF2B5EF4-FFF2-40B4-BE49-F238E27FC236}">
+                <a16:creationId xmlns:a16="http://schemas.microsoft.com/office/drawing/2014/main" id="{1A91E203-0108-68AF-3E35-4118D6B6B8BA}"/>
+              </a:ext>
+            </a:extLst>
+          </p:cNvPr>
+          <p:cNvCxnSpPr>
+            <a:stCxn id="24" idx="0"/>
+            <a:endCxn id="20" idx="1"/>
+          </p:cNvCxnSpPr>
+          <p:nvPr/>
+        </p:nvCxnSpPr>
+        <p:spPr>
+          <a:xfrm rot="5400000" flipH="1" flipV="1">
+            <a:off x="13651245" y="6523550"/>
+            <a:ext cx="589520" cy="1504991"/>
+          </a:xfrm>
+          <a:prstGeom prst="bentConnector2">
+            <a:avLst/>
+          </a:prstGeom>
+          <a:ln w="76200">
+            <a:solidFill>
+              <a:srgbClr val="C00000"/>
+            </a:solidFill>
+            <a:tailEnd type="triangle"/>
+          </a:ln>
+        </p:spPr>
+        <p:style>
+          <a:lnRef idx="1">
+            <a:schemeClr val="accent1"/>
+          </a:lnRef>
+          <a:fillRef idx="0">
+            <a:schemeClr val="accent1"/>
+          </a:fillRef>
+          <a:effectRef idx="0">
+            <a:schemeClr val="accent1"/>
+          </a:effectRef>
+          <a:fontRef idx="minor">
+            <a:schemeClr val="tx1"/>
+          </a:fontRef>
+        </p:style>
+      </p:cxnSp>
+      <p:cxnSp>
+        <p:nvCxnSpPr>
+          <p:cNvPr id="51" name="Elbow Connector 50">
+            <a:extLst>
+              <a:ext uri="{FF2B5EF4-FFF2-40B4-BE49-F238E27FC236}">
+                <a16:creationId xmlns:a16="http://schemas.microsoft.com/office/drawing/2014/main" id="{4B9A6050-891E-DD21-BF59-4A2C98309D21}"/>
+              </a:ext>
+            </a:extLst>
+          </p:cNvPr>
+          <p:cNvCxnSpPr>
+            <a:cxnSpLocks/>
+            <a:stCxn id="24" idx="2"/>
+            <a:endCxn id="17" idx="1"/>
+          </p:cNvCxnSpPr>
+          <p:nvPr/>
+        </p:nvCxnSpPr>
+        <p:spPr>
+          <a:xfrm rot="16200000" flipH="1">
+            <a:off x="13628728" y="8012809"/>
+            <a:ext cx="634555" cy="1504991"/>
+          </a:xfrm>
+          <a:prstGeom prst="bentConnector2">
+            <a:avLst/>
+          </a:prstGeom>
+          <a:ln w="76200">
+            <a:solidFill>
+              <a:srgbClr val="C00000"/>
+            </a:solidFill>
+            <a:tailEnd type="triangle"/>
+          </a:ln>
+        </p:spPr>
+        <p:style>
+          <a:lnRef idx="1">
+            <a:schemeClr val="accent1"/>
+          </a:lnRef>
+          <a:fillRef idx="0">
+            <a:schemeClr val="accent1"/>
+          </a:fillRef>
+          <a:effectRef idx="0">
+            <a:schemeClr val="accent1"/>
+          </a:effectRef>
+          <a:fontRef idx="minor">
+            <a:schemeClr val="tx1"/>
+          </a:fontRef>
+        </p:style>
+      </p:cxnSp>
+      <p:cxnSp>
+        <p:nvCxnSpPr>
+          <p:cNvPr id="57" name="Elbow Connector 56">
+            <a:extLst>
+              <a:ext uri="{FF2B5EF4-FFF2-40B4-BE49-F238E27FC236}">
+                <a16:creationId xmlns:a16="http://schemas.microsoft.com/office/drawing/2014/main" id="{C692133E-2952-0ECD-87D3-B8F051B6F346}"/>
+              </a:ext>
+            </a:extLst>
+          </p:cNvPr>
+          <p:cNvCxnSpPr>
+            <a:stCxn id="20" idx="3"/>
+            <a:endCxn id="11" idx="0"/>
+          </p:cNvCxnSpPr>
+          <p:nvPr/>
+        </p:nvCxnSpPr>
+        <p:spPr>
+          <a:xfrm>
+            <a:off x="16517899" y="6981285"/>
+            <a:ext cx="1367213" cy="622683"/>
+          </a:xfrm>
+          <a:prstGeom prst="bentConnector2">
+            <a:avLst/>
+          </a:prstGeom>
+          <a:ln w="76200">
+            <a:solidFill>
+              <a:schemeClr val="accent1">
+                <a:lumMod val="75000"/>
+              </a:schemeClr>
+            </a:solidFill>
+            <a:tailEnd type="triangle"/>
+          </a:ln>
+        </p:spPr>
+        <p:style>
+          <a:lnRef idx="1">
+            <a:schemeClr val="accent1"/>
+          </a:lnRef>
+          <a:fillRef idx="0">
+            <a:schemeClr val="accent1"/>
+          </a:fillRef>
+          <a:effectRef idx="0">
+            <a:schemeClr val="accent1"/>
+          </a:effectRef>
+          <a:fontRef idx="minor">
+            <a:schemeClr val="tx1"/>
+          </a:fontRef>
+        </p:style>
+      </p:cxnSp>
+      <p:cxnSp>
+        <p:nvCxnSpPr>
+          <p:cNvPr id="58" name="Elbow Connector 57">
+            <a:extLst>
+              <a:ext uri="{FF2B5EF4-FFF2-40B4-BE49-F238E27FC236}">
+                <a16:creationId xmlns:a16="http://schemas.microsoft.com/office/drawing/2014/main" id="{2A6C5F73-DA31-2131-4A22-7E2D5FC27865}"/>
+              </a:ext>
+            </a:extLst>
+          </p:cNvPr>
+          <p:cNvCxnSpPr>
+            <a:cxnSpLocks/>
+            <a:stCxn id="17" idx="3"/>
+            <a:endCxn id="11" idx="2"/>
+          </p:cNvCxnSpPr>
+          <p:nvPr/>
+        </p:nvCxnSpPr>
+        <p:spPr>
+          <a:xfrm flipV="1">
+            <a:off x="16517899" y="8481191"/>
+            <a:ext cx="1367213" cy="601392"/>
+          </a:xfrm>
+          <a:prstGeom prst="bentConnector2">
+            <a:avLst/>
+          </a:prstGeom>
+          <a:ln w="76200">
+            <a:solidFill>
+              <a:schemeClr val="accent1">
+                <a:lumMod val="75000"/>
+              </a:schemeClr>
+            </a:solidFill>
+            <a:tailEnd type="triangle"/>
+          </a:ln>
+        </p:spPr>
+        <p:style>
+          <a:lnRef idx="1">
+            <a:schemeClr val="accent1"/>
+          </a:lnRef>
+          <a:fillRef idx="0">
+            <a:schemeClr val="accent1"/>
+          </a:fillRef>
+          <a:effectRef idx="0">
+            <a:schemeClr val="accent1"/>
+          </a:effectRef>
+          <a:fontRef idx="minor">
+            <a:schemeClr val="tx1"/>
+          </a:fontRef>
+        </p:style>
+      </p:cxnSp>
+      <p:cxnSp>
+        <p:nvCxnSpPr>
+          <p:cNvPr id="158" name="Straight Arrow Connector 157">
+            <a:extLst>
+              <a:ext uri="{FF2B5EF4-FFF2-40B4-BE49-F238E27FC236}">
+                <a16:creationId xmlns:a16="http://schemas.microsoft.com/office/drawing/2014/main" id="{774FBE6D-425A-614C-E507-AC3AF7F3D74F}"/>
+              </a:ext>
+            </a:extLst>
+          </p:cNvPr>
+          <p:cNvCxnSpPr>
+            <a:stCxn id="28" idx="2"/>
+            <a:endCxn id="23" idx="0"/>
+          </p:cNvCxnSpPr>
+          <p:nvPr/>
+        </p:nvCxnSpPr>
+        <p:spPr>
+          <a:xfrm>
+            <a:off x="10470763" y="6482167"/>
+            <a:ext cx="0" cy="1099316"/>
+          </a:xfrm>
+          <a:prstGeom prst="straightConnector1">
+            <a:avLst/>
+          </a:prstGeom>
+          <a:ln w="76200">
+            <a:solidFill>
+              <a:schemeClr val="accent1">
+                <a:lumMod val="75000"/>
+              </a:schemeClr>
+            </a:solidFill>
+            <a:tailEnd type="triangle"/>
+          </a:ln>
+        </p:spPr>
+        <p:style>
+          <a:lnRef idx="1">
+            <a:schemeClr val="accent1"/>
+          </a:lnRef>
+          <a:fillRef idx="0">
+            <a:schemeClr val="accent1"/>
+          </a:fillRef>
+          <a:effectRef idx="0">
+            <a:schemeClr val="accent1"/>
+          </a:effectRef>
+          <a:fontRef idx="minor">
+            <a:schemeClr val="tx1"/>
+          </a:fontRef>
+        </p:style>
+      </p:cxnSp>
+      <p:cxnSp>
+        <p:nvCxnSpPr>
+          <p:cNvPr id="160" name="Straight Arrow Connector 159">
+            <a:extLst>
+              <a:ext uri="{FF2B5EF4-FFF2-40B4-BE49-F238E27FC236}">
+                <a16:creationId xmlns:a16="http://schemas.microsoft.com/office/drawing/2014/main" id="{B7BC32FF-CA01-6112-27E7-E36B0ED38566}"/>
+              </a:ext>
+            </a:extLst>
+          </p:cNvPr>
+          <p:cNvCxnSpPr>
+            <a:stCxn id="12" idx="0"/>
+            <a:endCxn id="23" idx="2"/>
+          </p:cNvCxnSpPr>
+          <p:nvPr/>
+        </p:nvCxnSpPr>
+        <p:spPr>
+          <a:xfrm flipV="1">
+            <a:off x="10464413" y="8458706"/>
+            <a:ext cx="6350" cy="1079290"/>
+          </a:xfrm>
+          <a:prstGeom prst="straightConnector1">
+            <a:avLst/>
+          </a:prstGeom>
+          <a:ln w="76200">
+            <a:solidFill>
+              <a:schemeClr val="accent1">
+                <a:lumMod val="75000"/>
+              </a:schemeClr>
+            </a:solidFill>
+            <a:tailEnd type="triangle"/>
+          </a:ln>
+        </p:spPr>
+        <p:style>
+          <a:lnRef idx="1">
+            <a:schemeClr val="accent1"/>
+          </a:lnRef>
+          <a:fillRef idx="0">
+            <a:schemeClr val="accent1"/>
+          </a:fillRef>
+          <a:effectRef idx="0">
+            <a:schemeClr val="accent1"/>
+          </a:effectRef>
+          <a:fontRef idx="minor">
+            <a:schemeClr val="tx1"/>
+          </a:fontRef>
+        </p:style>
+      </p:cxnSp>
+      <p:sp>
+        <p:nvSpPr>
+          <p:cNvPr id="12" name="Rectangle 11">
+            <a:extLst>
+              <a:ext uri="{FF2B5EF4-FFF2-40B4-BE49-F238E27FC236}">
+                <a16:creationId xmlns:a16="http://schemas.microsoft.com/office/drawing/2014/main" id="{80931944-38F4-9378-6003-83D1DE15C050}"/>
+              </a:ext>
+            </a:extLst>
+          </p:cNvPr>
+          <p:cNvSpPr/>
+          <p:nvPr/>
+        </p:nvSpPr>
+        <p:spPr>
+          <a:xfrm>
+            <a:off x="9554714" y="9537996"/>
+            <a:ext cx="1819398" cy="877223"/>
+          </a:xfrm>
+          <a:prstGeom prst="rect">
+            <a:avLst/>
+          </a:prstGeom>
+          <a:solidFill>
+            <a:schemeClr val="bg1"/>
+          </a:solidFill>
+          <a:ln w="38100">
+            <a:solidFill>
+              <a:schemeClr val="tx1"/>
+            </a:solidFill>
+          </a:ln>
+        </p:spPr>
+        <p:style>
+          <a:lnRef idx="2">
+            <a:schemeClr val="accent1">
+              <a:shade val="50000"/>
+            </a:schemeClr>
+          </a:lnRef>
+          <a:fillRef idx="1">
+            <a:schemeClr val="accent1"/>
+          </a:fillRef>
+          <a:effectRef idx="0">
+            <a:schemeClr val="accent1"/>
+          </a:effectRef>
+          <a:fontRef idx="minor">
+            <a:schemeClr val="lt1"/>
+          </a:fontRef>
+        </p:style>
+        <p:txBody>
+          <a:bodyPr rtlCol="0" anchor="ctr"/>
+          <a:lstStyle/>
+          <a:p>
+            <a:pPr algn="ctr"/>
+            <a:r>
+              <a:rPr lang="en-US" sz="3000" b="1" dirty="0">
+                <a:solidFill>
+                  <a:schemeClr val="tx1"/>
+                </a:solidFill>
+                <a:latin typeface="Times New Roman" panose="02020603050405020304" pitchFamily="18" charset="0"/>
+                <a:cs typeface="Times New Roman" panose="02020603050405020304" pitchFamily="18" charset="0"/>
+              </a:rPr>
+              <a:t>C</a:t>
+            </a:r>
+            <a:r>
+              <a:rPr lang="en-US" sz="3000" b="1" baseline="-25000" dirty="0">
+                <a:solidFill>
+                  <a:schemeClr val="tx1"/>
+                </a:solidFill>
+                <a:latin typeface="Times New Roman" panose="02020603050405020304" pitchFamily="18" charset="0"/>
+                <a:cs typeface="Times New Roman" panose="02020603050405020304" pitchFamily="18" charset="0"/>
+              </a:rPr>
+              <a:t>3</a:t>
+            </a:r>
+            <a:r>
+              <a:rPr lang="en-US" sz="3000" b="1" dirty="0">
+                <a:solidFill>
+                  <a:schemeClr val="tx1"/>
+                </a:solidFill>
+                <a:latin typeface="Times New Roman" panose="02020603050405020304" pitchFamily="18" charset="0"/>
+                <a:cs typeface="Times New Roman" panose="02020603050405020304" pitchFamily="18" charset="0"/>
+              </a:rPr>
+              <a:t> photo.</a:t>
+            </a:r>
+            <a:endParaRPr lang="en-US" sz="3000" b="1" dirty="0">
+              <a:solidFill>
+                <a:srgbClr val="C00000"/>
+              </a:solidFill>
+              <a:latin typeface="Times New Roman" panose="02020603050405020304" pitchFamily="18" charset="0"/>
+              <a:cs typeface="Times New Roman" panose="02020603050405020304" pitchFamily="18" charset="0"/>
+            </a:endParaRPr>
+          </a:p>
+        </p:txBody>
+      </p:sp>
+      <p:sp>
+        <p:nvSpPr>
+          <p:cNvPr id="23" name="Rectangle 22">
+            <a:extLst>
+              <a:ext uri="{FF2B5EF4-FFF2-40B4-BE49-F238E27FC236}">
+                <a16:creationId xmlns:a16="http://schemas.microsoft.com/office/drawing/2014/main" id="{C3510981-FE55-509B-F5B4-9D8C4012346D}"/>
+              </a:ext>
+            </a:extLst>
+          </p:cNvPr>
+          <p:cNvSpPr/>
+          <p:nvPr/>
+        </p:nvSpPr>
+        <p:spPr>
+          <a:xfrm>
+            <a:off x="9561064" y="7581483"/>
+            <a:ext cx="1819398" cy="877223"/>
+          </a:xfrm>
+          <a:prstGeom prst="rect">
+            <a:avLst/>
+          </a:prstGeom>
+          <a:solidFill>
+            <a:schemeClr val="bg1"/>
+          </a:solidFill>
+          <a:ln w="38100">
+            <a:solidFill>
+              <a:schemeClr val="tx1"/>
+            </a:solidFill>
+          </a:ln>
+        </p:spPr>
+        <p:style>
+          <a:lnRef idx="2">
+            <a:schemeClr val="accent1">
+              <a:shade val="50000"/>
+            </a:schemeClr>
+          </a:lnRef>
+          <a:fillRef idx="1">
+            <a:schemeClr val="accent1"/>
+          </a:fillRef>
+          <a:effectRef idx="0">
+            <a:schemeClr val="accent1"/>
+          </a:effectRef>
+          <a:fontRef idx="minor">
+            <a:schemeClr val="lt1"/>
+          </a:fontRef>
+        </p:style>
+        <p:txBody>
+          <a:bodyPr rtlCol="0" anchor="ctr"/>
+          <a:lstStyle/>
+          <a:p>
+            <a:pPr algn="ctr"/>
+            <a:r>
+              <a:rPr lang="el-GR" sz="3000" b="1" i="1" dirty="0">
+                <a:solidFill>
+                  <a:schemeClr val="tx1"/>
+                </a:solidFill>
+                <a:latin typeface="Times New Roman" panose="02020603050405020304" pitchFamily="18" charset="0"/>
+                <a:cs typeface="Times New Roman" panose="02020603050405020304" pitchFamily="18" charset="0"/>
+              </a:rPr>
+              <a:t>β</a:t>
+            </a:r>
+            <a:endParaRPr lang="en-US" sz="3000" b="1" i="1" dirty="0">
+              <a:solidFill>
+                <a:schemeClr val="tx1"/>
+              </a:solidFill>
+              <a:latin typeface="Times New Roman" panose="02020603050405020304" pitchFamily="18" charset="0"/>
+              <a:cs typeface="Times New Roman" panose="02020603050405020304" pitchFamily="18" charset="0"/>
+            </a:endParaRPr>
+          </a:p>
+        </p:txBody>
+      </p:sp>
+      <p:sp>
+        <p:nvSpPr>
+          <p:cNvPr id="28" name="Rectangle 27">
+            <a:extLst>
+              <a:ext uri="{FF2B5EF4-FFF2-40B4-BE49-F238E27FC236}">
+                <a16:creationId xmlns:a16="http://schemas.microsoft.com/office/drawing/2014/main" id="{F9845BF1-920A-DFA4-A428-9653A04CD2C8}"/>
+              </a:ext>
+            </a:extLst>
+          </p:cNvPr>
+          <p:cNvSpPr/>
+          <p:nvPr/>
+        </p:nvSpPr>
+        <p:spPr>
+          <a:xfrm>
+            <a:off x="9561064" y="5604944"/>
+            <a:ext cx="1819398" cy="877223"/>
+          </a:xfrm>
+          <a:prstGeom prst="rect">
+            <a:avLst/>
+          </a:prstGeom>
+          <a:solidFill>
+            <a:schemeClr val="bg1"/>
+          </a:solidFill>
+          <a:ln w="38100">
+            <a:solidFill>
+              <a:schemeClr val="tx1"/>
+            </a:solidFill>
+          </a:ln>
+        </p:spPr>
+        <p:style>
+          <a:lnRef idx="2">
+            <a:schemeClr val="accent1">
+              <a:shade val="50000"/>
+            </a:schemeClr>
+          </a:lnRef>
+          <a:fillRef idx="1">
+            <a:schemeClr val="accent1"/>
+          </a:fillRef>
+          <a:effectRef idx="0">
+            <a:schemeClr val="accent1"/>
+          </a:effectRef>
+          <a:fontRef idx="minor">
+            <a:schemeClr val="lt1"/>
+          </a:fontRef>
+        </p:style>
+        <p:txBody>
+          <a:bodyPr rtlCol="0" anchor="ctr"/>
+          <a:lstStyle/>
+          <a:p>
+            <a:pPr algn="ctr"/>
+            <a:r>
+              <a:rPr lang="en-US" sz="3000" b="1" i="1" dirty="0">
+                <a:solidFill>
+                  <a:schemeClr val="tx1"/>
+                </a:solidFill>
+                <a:latin typeface="Times New Roman" panose="02020603050405020304" pitchFamily="18" charset="0"/>
+                <a:cs typeface="Times New Roman" panose="02020603050405020304" pitchFamily="18" charset="0"/>
+              </a:rPr>
+              <a:t>N</a:t>
+            </a:r>
+            <a:r>
+              <a:rPr lang="en-US" sz="3000" b="1" baseline="-25000" dirty="0">
+                <a:solidFill>
+                  <a:schemeClr val="tx1"/>
+                </a:solidFill>
+                <a:latin typeface="Times New Roman" panose="02020603050405020304" pitchFamily="18" charset="0"/>
+                <a:cs typeface="Times New Roman" panose="02020603050405020304" pitchFamily="18" charset="0"/>
+              </a:rPr>
+              <a:t>fixation</a:t>
+            </a:r>
+            <a:endParaRPr lang="en-US" sz="3000" i="1" dirty="0">
+              <a:solidFill>
+                <a:schemeClr val="tx1"/>
+              </a:solidFill>
+              <a:latin typeface="Times New Roman" panose="02020603050405020304" pitchFamily="18" charset="0"/>
+              <a:cs typeface="Times New Roman" panose="02020603050405020304" pitchFamily="18" charset="0"/>
+            </a:endParaRPr>
+          </a:p>
+        </p:txBody>
+      </p:sp>
+      <p:sp>
+        <p:nvSpPr>
+          <p:cNvPr id="11" name="Rectangle 10">
+            <a:extLst>
+              <a:ext uri="{FF2B5EF4-FFF2-40B4-BE49-F238E27FC236}">
+                <a16:creationId xmlns:a16="http://schemas.microsoft.com/office/drawing/2014/main" id="{612EA15D-68B8-4207-39F2-1F2B218F4B4D}"/>
+              </a:ext>
+            </a:extLst>
+          </p:cNvPr>
+          <p:cNvSpPr/>
+          <p:nvPr/>
+        </p:nvSpPr>
+        <p:spPr>
+          <a:xfrm>
+            <a:off x="16975413" y="7603968"/>
+            <a:ext cx="1819398" cy="877223"/>
+          </a:xfrm>
+          <a:prstGeom prst="rect">
+            <a:avLst/>
+          </a:prstGeom>
+          <a:solidFill>
+            <a:schemeClr val="bg1"/>
+          </a:solidFill>
+          <a:ln w="38100">
+            <a:solidFill>
+              <a:schemeClr val="tx1"/>
+            </a:solidFill>
+          </a:ln>
+        </p:spPr>
+        <p:style>
+          <a:lnRef idx="2">
+            <a:schemeClr val="accent1">
+              <a:shade val="50000"/>
+            </a:schemeClr>
+          </a:lnRef>
+          <a:fillRef idx="1">
+            <a:schemeClr val="accent1"/>
+          </a:fillRef>
+          <a:effectRef idx="0">
+            <a:schemeClr val="accent1"/>
+          </a:effectRef>
+          <a:fontRef idx="minor">
+            <a:schemeClr val="lt1"/>
+          </a:fontRef>
+        </p:style>
+        <p:txBody>
+          <a:bodyPr rtlCol="0" anchor="ctr"/>
+          <a:lstStyle/>
+          <a:p>
+            <a:pPr algn="ctr"/>
+            <a:r>
+              <a:rPr lang="el-GR" sz="3000" b="1" i="1" dirty="0">
+                <a:solidFill>
+                  <a:schemeClr val="tx1"/>
+                </a:solidFill>
+                <a:latin typeface="Times New Roman" panose="02020603050405020304" pitchFamily="18" charset="0"/>
+                <a:cs typeface="Times New Roman" panose="02020603050405020304" pitchFamily="18" charset="0"/>
+              </a:rPr>
+              <a:t>Ν</a:t>
+            </a:r>
+            <a:r>
+              <a:rPr lang="en-US" sz="3000" b="1" baseline="-25000" dirty="0">
+                <a:solidFill>
+                  <a:schemeClr val="tx1"/>
+                </a:solidFill>
+                <a:latin typeface="Times New Roman" panose="02020603050405020304" pitchFamily="18" charset="0"/>
+                <a:cs typeface="Times New Roman" panose="02020603050405020304" pitchFamily="18" charset="0"/>
+              </a:rPr>
+              <a:t>area</a:t>
+            </a:r>
+            <a:endParaRPr lang="en-US" sz="3000" b="1" i="1" dirty="0">
+              <a:solidFill>
+                <a:schemeClr val="tx1"/>
+              </a:solidFill>
+              <a:latin typeface="Times New Roman" panose="02020603050405020304" pitchFamily="18" charset="0"/>
+              <a:cs typeface="Times New Roman" panose="02020603050405020304" pitchFamily="18" charset="0"/>
+            </a:endParaRPr>
+          </a:p>
+        </p:txBody>
+      </p:sp>
+      <p:sp>
+        <p:nvSpPr>
+          <p:cNvPr id="17" name="Rectangle 16">
+            <a:extLst>
+              <a:ext uri="{FF2B5EF4-FFF2-40B4-BE49-F238E27FC236}">
+                <a16:creationId xmlns:a16="http://schemas.microsoft.com/office/drawing/2014/main" id="{5CF0D2AF-8598-6EDA-181B-6A30A35A32CE}"/>
+              </a:ext>
+            </a:extLst>
+          </p:cNvPr>
+          <p:cNvSpPr/>
+          <p:nvPr/>
+        </p:nvSpPr>
+        <p:spPr>
+          <a:xfrm>
+            <a:off x="14698501" y="8643971"/>
+            <a:ext cx="1819398" cy="877223"/>
+          </a:xfrm>
+          <a:prstGeom prst="rect">
+            <a:avLst/>
+          </a:prstGeom>
+          <a:solidFill>
+            <a:schemeClr val="bg1"/>
+          </a:solidFill>
+          <a:ln w="38100">
+            <a:solidFill>
+              <a:schemeClr val="tx1"/>
+            </a:solidFill>
+          </a:ln>
+        </p:spPr>
+        <p:style>
+          <a:lnRef idx="2">
+            <a:schemeClr val="accent1">
+              <a:shade val="50000"/>
+            </a:schemeClr>
+          </a:lnRef>
+          <a:fillRef idx="1">
+            <a:schemeClr val="accent1"/>
+          </a:fillRef>
+          <a:effectRef idx="0">
+            <a:schemeClr val="accent1"/>
+          </a:effectRef>
+          <a:fontRef idx="minor">
+            <a:schemeClr val="lt1"/>
+          </a:fontRef>
+        </p:style>
+        <p:txBody>
+          <a:bodyPr rtlCol="0" anchor="ctr"/>
+          <a:lstStyle/>
+          <a:p>
+            <a:pPr algn="ctr"/>
+            <a:r>
+              <a:rPr lang="en-US" sz="3000" b="1" i="1" dirty="0">
+                <a:solidFill>
+                  <a:schemeClr val="tx1"/>
+                </a:solidFill>
+                <a:latin typeface="Times New Roman" panose="02020603050405020304" pitchFamily="18" charset="0"/>
+                <a:cs typeface="Times New Roman" panose="02020603050405020304" pitchFamily="18" charset="0"/>
+              </a:rPr>
+              <a:t>M</a:t>
+            </a:r>
+            <a:r>
+              <a:rPr lang="en-US" sz="3000" b="1" baseline="-25000" dirty="0">
+                <a:solidFill>
+                  <a:schemeClr val="tx1"/>
+                </a:solidFill>
+                <a:latin typeface="Times New Roman" panose="02020603050405020304" pitchFamily="18" charset="0"/>
+                <a:cs typeface="Times New Roman" panose="02020603050405020304" pitchFamily="18" charset="0"/>
+              </a:rPr>
+              <a:t>area</a:t>
+            </a:r>
+            <a:endParaRPr lang="en-US" sz="3000" b="1" i="1" dirty="0">
+              <a:solidFill>
+                <a:schemeClr val="tx1"/>
+              </a:solidFill>
+              <a:latin typeface="Times New Roman" panose="02020603050405020304" pitchFamily="18" charset="0"/>
+              <a:cs typeface="Times New Roman" panose="02020603050405020304" pitchFamily="18" charset="0"/>
+            </a:endParaRPr>
+          </a:p>
+        </p:txBody>
+      </p:sp>
+      <p:sp>
+        <p:nvSpPr>
+          <p:cNvPr id="20" name="Rectangle 19">
+            <a:extLst>
+              <a:ext uri="{FF2B5EF4-FFF2-40B4-BE49-F238E27FC236}">
+                <a16:creationId xmlns:a16="http://schemas.microsoft.com/office/drawing/2014/main" id="{27FC6D2D-F10F-B106-3C23-5AEBE11DFAC5}"/>
+              </a:ext>
+            </a:extLst>
+          </p:cNvPr>
+          <p:cNvSpPr/>
+          <p:nvPr/>
+        </p:nvSpPr>
+        <p:spPr>
+          <a:xfrm>
+            <a:off x="14698501" y="6542673"/>
+            <a:ext cx="1819398" cy="877223"/>
+          </a:xfrm>
+          <a:prstGeom prst="rect">
+            <a:avLst/>
+          </a:prstGeom>
+          <a:solidFill>
+            <a:schemeClr val="bg1"/>
+          </a:solidFill>
+          <a:ln w="38100">
+            <a:solidFill>
+              <a:schemeClr val="tx1"/>
+            </a:solidFill>
+          </a:ln>
+        </p:spPr>
+        <p:style>
+          <a:lnRef idx="2">
+            <a:schemeClr val="accent1">
+              <a:shade val="50000"/>
+            </a:schemeClr>
+          </a:lnRef>
+          <a:fillRef idx="1">
+            <a:schemeClr val="accent1"/>
+          </a:fillRef>
+          <a:effectRef idx="0">
+            <a:schemeClr val="accent1"/>
+          </a:effectRef>
+          <a:fontRef idx="minor">
+            <a:schemeClr val="lt1"/>
+          </a:fontRef>
+        </p:style>
+        <p:txBody>
+          <a:bodyPr rtlCol="0" anchor="ctr"/>
+          <a:lstStyle/>
+          <a:p>
+            <a:pPr algn="ctr"/>
+            <a:r>
+              <a:rPr lang="en-US" sz="3000" b="1" i="1" dirty="0">
+                <a:solidFill>
+                  <a:schemeClr val="tx1"/>
+                </a:solidFill>
+                <a:latin typeface="Times New Roman" panose="02020603050405020304" pitchFamily="18" charset="0"/>
+                <a:cs typeface="Times New Roman" panose="02020603050405020304" pitchFamily="18" charset="0"/>
+              </a:rPr>
+              <a:t>N</a:t>
+            </a:r>
+            <a:r>
+              <a:rPr lang="en-US" sz="3000" b="1" baseline="-25000" dirty="0">
+                <a:solidFill>
+                  <a:schemeClr val="tx1"/>
+                </a:solidFill>
+                <a:latin typeface="Times New Roman" panose="02020603050405020304" pitchFamily="18" charset="0"/>
+                <a:cs typeface="Times New Roman" panose="02020603050405020304" pitchFamily="18" charset="0"/>
+              </a:rPr>
+              <a:t>mass</a:t>
+            </a:r>
+            <a:endParaRPr lang="en-US" sz="3000" b="1" i="1" dirty="0">
+              <a:solidFill>
+                <a:schemeClr val="tx1"/>
+              </a:solidFill>
+              <a:latin typeface="Times New Roman" panose="02020603050405020304" pitchFamily="18" charset="0"/>
+              <a:cs typeface="Times New Roman" panose="02020603050405020304" pitchFamily="18" charset="0"/>
+            </a:endParaRPr>
+          </a:p>
+        </p:txBody>
+      </p:sp>
+      <p:sp>
+        <p:nvSpPr>
+          <p:cNvPr id="22" name="Rectangle 21">
+            <a:extLst>
+              <a:ext uri="{FF2B5EF4-FFF2-40B4-BE49-F238E27FC236}">
+                <a16:creationId xmlns:a16="http://schemas.microsoft.com/office/drawing/2014/main" id="{A80C041E-0131-071A-4799-F8F798234F95}"/>
+              </a:ext>
+            </a:extLst>
+          </p:cNvPr>
+          <p:cNvSpPr/>
+          <p:nvPr/>
+        </p:nvSpPr>
+        <p:spPr>
+          <a:xfrm>
+            <a:off x="11785577" y="5604944"/>
+            <a:ext cx="1819398" cy="877223"/>
+          </a:xfrm>
+          <a:prstGeom prst="rect">
+            <a:avLst/>
+          </a:prstGeom>
+          <a:solidFill>
+            <a:schemeClr val="bg1"/>
+          </a:solidFill>
+          <a:ln w="38100">
+            <a:solidFill>
+              <a:schemeClr val="tx1"/>
+            </a:solidFill>
+          </a:ln>
+        </p:spPr>
+        <p:style>
+          <a:lnRef idx="2">
+            <a:schemeClr val="accent1">
+              <a:shade val="50000"/>
+            </a:schemeClr>
+          </a:lnRef>
+          <a:fillRef idx="1">
+            <a:schemeClr val="accent1"/>
+          </a:fillRef>
+          <a:effectRef idx="0">
+            <a:schemeClr val="accent1"/>
+          </a:effectRef>
+          <a:fontRef idx="minor">
+            <a:schemeClr val="lt1"/>
+          </a:fontRef>
+        </p:style>
+        <p:txBody>
+          <a:bodyPr rtlCol="0" anchor="ctr"/>
+          <a:lstStyle/>
+          <a:p>
+            <a:pPr algn="ctr"/>
+            <a:r>
+              <a:rPr lang="en-US" sz="3000" b="1" i="1" dirty="0">
+                <a:solidFill>
+                  <a:schemeClr val="tx1"/>
+                </a:solidFill>
+                <a:latin typeface="Times New Roman" panose="02020603050405020304" pitchFamily="18" charset="0"/>
+                <a:cs typeface="Times New Roman" panose="02020603050405020304" pitchFamily="18" charset="0"/>
+              </a:rPr>
+              <a:t>VPD</a:t>
+            </a:r>
+            <a:endParaRPr lang="en-US" sz="3000" b="1" dirty="0">
+              <a:solidFill>
+                <a:schemeClr val="tx1"/>
+              </a:solidFill>
+              <a:latin typeface="Times New Roman" panose="02020603050405020304" pitchFamily="18" charset="0"/>
+              <a:cs typeface="Times New Roman" panose="02020603050405020304" pitchFamily="18" charset="0"/>
+            </a:endParaRPr>
+          </a:p>
+        </p:txBody>
+      </p:sp>
+      <p:sp>
+        <p:nvSpPr>
+          <p:cNvPr id="24" name="Rectangle 23">
+            <a:extLst>
+              <a:ext uri="{FF2B5EF4-FFF2-40B4-BE49-F238E27FC236}">
+                <a16:creationId xmlns:a16="http://schemas.microsoft.com/office/drawing/2014/main" id="{B27ADCE2-63D0-A5FF-CAAC-360272DBA0BD}"/>
+              </a:ext>
+            </a:extLst>
+          </p:cNvPr>
+          <p:cNvSpPr/>
+          <p:nvPr/>
+        </p:nvSpPr>
+        <p:spPr>
+          <a:xfrm>
+            <a:off x="12283811" y="7570805"/>
+            <a:ext cx="1819398" cy="877223"/>
+          </a:xfrm>
+          <a:prstGeom prst="rect">
+            <a:avLst/>
+          </a:prstGeom>
+          <a:solidFill>
+            <a:schemeClr val="bg1"/>
+          </a:solidFill>
+          <a:ln w="38100">
+            <a:solidFill>
+              <a:schemeClr val="tx1"/>
+            </a:solidFill>
+          </a:ln>
+        </p:spPr>
+        <p:style>
+          <a:lnRef idx="2">
+            <a:schemeClr val="accent1">
+              <a:shade val="50000"/>
+            </a:schemeClr>
+          </a:lnRef>
+          <a:fillRef idx="1">
+            <a:schemeClr val="accent1"/>
+          </a:fillRef>
+          <a:effectRef idx="0">
+            <a:schemeClr val="accent1"/>
+          </a:effectRef>
+          <a:fontRef idx="minor">
+            <a:schemeClr val="lt1"/>
+          </a:fontRef>
+        </p:style>
+        <p:txBody>
+          <a:bodyPr rtlCol="0" anchor="ctr"/>
+          <a:lstStyle/>
+          <a:p>
+            <a:pPr algn="ctr"/>
+            <a:r>
+              <a:rPr lang="en-US" sz="3000" b="1" i="1" dirty="0">
+                <a:solidFill>
+                  <a:schemeClr val="tx1"/>
+                </a:solidFill>
+                <a:latin typeface="Times New Roman" panose="02020603050405020304" pitchFamily="18" charset="0"/>
+                <a:cs typeface="Times New Roman" panose="02020603050405020304" pitchFamily="18" charset="0"/>
+              </a:rPr>
+              <a:t>C</a:t>
+            </a:r>
+            <a:r>
+              <a:rPr lang="en-US" sz="3000" b="1" baseline="-25000" dirty="0">
+                <a:solidFill>
+                  <a:schemeClr val="tx1"/>
+                </a:solidFill>
+                <a:latin typeface="Times New Roman" panose="02020603050405020304" pitchFamily="18" charset="0"/>
+                <a:cs typeface="Times New Roman" panose="02020603050405020304" pitchFamily="18" charset="0"/>
+              </a:rPr>
+              <a:t>i</a:t>
+            </a:r>
+            <a:r>
+              <a:rPr lang="en-US" sz="3000" b="1" i="1" dirty="0">
+                <a:solidFill>
+                  <a:schemeClr val="tx1"/>
+                </a:solidFill>
+                <a:latin typeface="Times New Roman" panose="02020603050405020304" pitchFamily="18" charset="0"/>
+                <a:cs typeface="Times New Roman" panose="02020603050405020304" pitchFamily="18" charset="0"/>
+              </a:rPr>
+              <a:t>:C</a:t>
+            </a:r>
+            <a:r>
+              <a:rPr lang="en-US" sz="3000" b="1" baseline="-25000" dirty="0">
+                <a:solidFill>
+                  <a:schemeClr val="tx1"/>
+                </a:solidFill>
+                <a:latin typeface="Times New Roman" panose="02020603050405020304" pitchFamily="18" charset="0"/>
+                <a:cs typeface="Times New Roman" panose="02020603050405020304" pitchFamily="18" charset="0"/>
+              </a:rPr>
+              <a:t>a</a:t>
+            </a:r>
+          </a:p>
+        </p:txBody>
+      </p:sp>
+      <p:sp>
+        <p:nvSpPr>
+          <p:cNvPr id="27" name="Rectangle 26">
+            <a:extLst>
+              <a:ext uri="{FF2B5EF4-FFF2-40B4-BE49-F238E27FC236}">
+                <a16:creationId xmlns:a16="http://schemas.microsoft.com/office/drawing/2014/main" id="{66815A72-A478-F607-8624-6D6512D0A23A}"/>
+              </a:ext>
+            </a:extLst>
+          </p:cNvPr>
+          <p:cNvSpPr/>
+          <p:nvPr/>
+        </p:nvSpPr>
+        <p:spPr>
+          <a:xfrm>
+            <a:off x="7096001" y="8654649"/>
+            <a:ext cx="2011416" cy="877223"/>
+          </a:xfrm>
+          <a:prstGeom prst="rect">
+            <a:avLst/>
+          </a:prstGeom>
+          <a:solidFill>
+            <a:schemeClr val="bg1"/>
+          </a:solidFill>
+          <a:ln w="38100">
+            <a:solidFill>
+              <a:schemeClr val="tx1"/>
+            </a:solidFill>
+          </a:ln>
+        </p:spPr>
+        <p:style>
+          <a:lnRef idx="2">
+            <a:schemeClr val="accent1">
+              <a:shade val="50000"/>
+            </a:schemeClr>
+          </a:lnRef>
+          <a:fillRef idx="1">
+            <a:schemeClr val="accent1"/>
+          </a:fillRef>
+          <a:effectRef idx="0">
+            <a:schemeClr val="accent1"/>
+          </a:effectRef>
+          <a:fontRef idx="minor">
+            <a:schemeClr val="lt1"/>
+          </a:fontRef>
+        </p:style>
+        <p:txBody>
+          <a:bodyPr rtlCol="0" anchor="ctr"/>
+          <a:lstStyle/>
+          <a:p>
+            <a:pPr algn="ctr"/>
+            <a:r>
+              <a:rPr lang="en-US" sz="3000" b="1" i="1" dirty="0">
+                <a:solidFill>
+                  <a:schemeClr val="tx1"/>
+                </a:solidFill>
+                <a:latin typeface="Times New Roman" panose="02020603050405020304" pitchFamily="18" charset="0"/>
+                <a:cs typeface="Times New Roman" panose="02020603050405020304" pitchFamily="18" charset="0"/>
+              </a:rPr>
+              <a:t>N availability</a:t>
+            </a:r>
+            <a:endParaRPr lang="en-US" sz="3000" b="1" dirty="0">
+              <a:solidFill>
+                <a:schemeClr val="tx1"/>
+              </a:solidFill>
+              <a:latin typeface="Times New Roman" panose="02020603050405020304" pitchFamily="18" charset="0"/>
+              <a:cs typeface="Times New Roman" panose="02020603050405020304" pitchFamily="18" charset="0"/>
+            </a:endParaRPr>
+          </a:p>
+        </p:txBody>
+      </p:sp>
+      <p:sp>
+        <p:nvSpPr>
+          <p:cNvPr id="29" name="Rectangle 28">
+            <a:extLst>
+              <a:ext uri="{FF2B5EF4-FFF2-40B4-BE49-F238E27FC236}">
+                <a16:creationId xmlns:a16="http://schemas.microsoft.com/office/drawing/2014/main" id="{32327FC8-D9F4-D197-4681-DC89C3E206D2}"/>
+              </a:ext>
+            </a:extLst>
+          </p:cNvPr>
+          <p:cNvSpPr/>
+          <p:nvPr/>
+        </p:nvSpPr>
+        <p:spPr>
+          <a:xfrm>
+            <a:off x="7192010" y="6541690"/>
+            <a:ext cx="1819398" cy="877223"/>
+          </a:xfrm>
+          <a:prstGeom prst="rect">
+            <a:avLst/>
+          </a:prstGeom>
+          <a:solidFill>
+            <a:schemeClr val="bg1"/>
+          </a:solidFill>
+          <a:ln w="38100">
+            <a:solidFill>
+              <a:schemeClr val="tx1"/>
+            </a:solidFill>
+          </a:ln>
+        </p:spPr>
+        <p:style>
+          <a:lnRef idx="2">
+            <a:schemeClr val="accent1">
+              <a:shade val="50000"/>
+            </a:schemeClr>
+          </a:lnRef>
+          <a:fillRef idx="1">
+            <a:schemeClr val="accent1"/>
+          </a:fillRef>
+          <a:effectRef idx="0">
+            <a:schemeClr val="accent1"/>
+          </a:effectRef>
+          <a:fontRef idx="minor">
+            <a:schemeClr val="lt1"/>
+          </a:fontRef>
+        </p:style>
+        <p:txBody>
+          <a:bodyPr rtlCol="0" anchor="ctr"/>
+          <a:lstStyle/>
+          <a:p>
+            <a:pPr algn="ctr"/>
+            <a:r>
+              <a:rPr lang="en-US" sz="3000" b="1" i="1" dirty="0">
+                <a:solidFill>
+                  <a:schemeClr val="tx1"/>
+                </a:solidFill>
+                <a:latin typeface="Times New Roman" panose="02020603050405020304" pitchFamily="18" charset="0"/>
+                <a:cs typeface="Times New Roman" panose="02020603050405020304" pitchFamily="18" charset="0"/>
+              </a:rPr>
+              <a:t>Soil moisture</a:t>
+            </a:r>
+            <a:endParaRPr lang="en-US" sz="3000" b="1" dirty="0">
+              <a:solidFill>
+                <a:schemeClr val="tx1"/>
+              </a:solidFill>
+              <a:latin typeface="Times New Roman" panose="02020603050405020304" pitchFamily="18" charset="0"/>
+              <a:cs typeface="Times New Roman" panose="02020603050405020304" pitchFamily="18" charset="0"/>
+            </a:endParaRPr>
+          </a:p>
+        </p:txBody>
+      </p:sp>
+      <p:grpSp>
+        <p:nvGrpSpPr>
+          <p:cNvPr id="176" name="Group 175">
+            <a:extLst>
+              <a:ext uri="{FF2B5EF4-FFF2-40B4-BE49-F238E27FC236}">
+                <a16:creationId xmlns:a16="http://schemas.microsoft.com/office/drawing/2014/main" id="{C28B6F10-F70F-E086-9002-A58731042844}"/>
+              </a:ext>
+            </a:extLst>
+          </p:cNvPr>
+          <p:cNvGrpSpPr/>
+          <p:nvPr/>
+        </p:nvGrpSpPr>
+        <p:grpSpPr>
+          <a:xfrm>
+            <a:off x="12924649" y="10415219"/>
+            <a:ext cx="2561532" cy="853440"/>
+            <a:chOff x="14336889" y="10167639"/>
+            <a:chExt cx="2561532" cy="853440"/>
+          </a:xfrm>
+        </p:grpSpPr>
+        <p:cxnSp>
+          <p:nvCxnSpPr>
+            <p:cNvPr id="166" name="Straight Arrow Connector 165">
+              <a:extLst>
+                <a:ext uri="{FF2B5EF4-FFF2-40B4-BE49-F238E27FC236}">
+                  <a16:creationId xmlns:a16="http://schemas.microsoft.com/office/drawing/2014/main" id="{B90815B3-A9CD-8F5D-1C47-85B6BA13A86E}"/>
+                </a:ext>
+              </a:extLst>
+            </p:cNvPr>
+            <p:cNvCxnSpPr/>
+            <p:nvPr/>
+          </p:nvCxnSpPr>
+          <p:spPr>
+            <a:xfrm>
+              <a:off x="14498320" y="10441446"/>
+              <a:ext cx="680720" cy="0"/>
+            </a:xfrm>
+            <a:prstGeom prst="straightConnector1">
+              <a:avLst/>
+            </a:prstGeom>
+            <a:ln w="76200">
+              <a:solidFill>
+                <a:schemeClr val="accent1">
+                  <a:lumMod val="75000"/>
+                </a:schemeClr>
+              </a:solidFill>
+              <a:tailEnd type="triangle"/>
+            </a:ln>
+          </p:spPr>
+          <p:style>
+            <a:lnRef idx="1">
+              <a:schemeClr val="accent1"/>
+            </a:lnRef>
+            <a:fillRef idx="0">
+              <a:schemeClr val="accent1"/>
+            </a:fillRef>
+            <a:effectRef idx="0">
+              <a:schemeClr val="accent1"/>
+            </a:effectRef>
+            <a:fontRef idx="minor">
+              <a:schemeClr val="tx1"/>
+            </a:fontRef>
+          </p:style>
+        </p:cxnSp>
+        <p:sp>
+          <p:nvSpPr>
+            <p:cNvPr id="168" name="TextBox 167">
+              <a:extLst>
+                <a:ext uri="{FF2B5EF4-FFF2-40B4-BE49-F238E27FC236}">
+                  <a16:creationId xmlns:a16="http://schemas.microsoft.com/office/drawing/2014/main" id="{BB795558-80F9-C97A-8499-B405AF36EBE4}"/>
+                </a:ext>
+              </a:extLst>
+            </p:cNvPr>
+            <p:cNvSpPr txBox="1"/>
+            <p:nvPr/>
+          </p:nvSpPr>
+          <p:spPr>
+            <a:xfrm>
+              <a:off x="15179040" y="10256780"/>
+              <a:ext cx="1616789" cy="369332"/>
+            </a:xfrm>
+            <a:prstGeom prst="rect">
+              <a:avLst/>
+            </a:prstGeom>
+            <a:noFill/>
+          </p:spPr>
+          <p:txBody>
+            <a:bodyPr wrap="none" rtlCol="0">
+              <a:spAutoFit/>
+            </a:bodyPr>
+            <a:lstStyle/>
+            <a:p>
+              <a:r>
+                <a:rPr lang="en-US" dirty="0">
+                  <a:latin typeface="Arial" panose="020B0604020202020204" pitchFamily="34" charset="0"/>
+                  <a:cs typeface="Arial" panose="020B0604020202020204" pitchFamily="34" charset="0"/>
+                </a:rPr>
+                <a:t>Positive effect</a:t>
+              </a:r>
+            </a:p>
+          </p:txBody>
+        </p:sp>
+        <p:cxnSp>
+          <p:nvCxnSpPr>
+            <p:cNvPr id="170" name="Straight Arrow Connector 169">
+              <a:extLst>
+                <a:ext uri="{FF2B5EF4-FFF2-40B4-BE49-F238E27FC236}">
+                  <a16:creationId xmlns:a16="http://schemas.microsoft.com/office/drawing/2014/main" id="{C986F98D-70EC-4DB6-E1AA-6721C8E12ED4}"/>
+                </a:ext>
+              </a:extLst>
+            </p:cNvPr>
+            <p:cNvCxnSpPr/>
+            <p:nvPr/>
+          </p:nvCxnSpPr>
+          <p:spPr>
+            <a:xfrm>
+              <a:off x="14498320" y="10729878"/>
+              <a:ext cx="680720" cy="0"/>
+            </a:xfrm>
+            <a:prstGeom prst="straightConnector1">
+              <a:avLst/>
+            </a:prstGeom>
+            <a:ln w="76200">
+              <a:solidFill>
+                <a:srgbClr val="C00000"/>
+              </a:solidFill>
+              <a:tailEnd type="triangle"/>
+            </a:ln>
+          </p:spPr>
+          <p:style>
+            <a:lnRef idx="1">
+              <a:schemeClr val="accent1"/>
+            </a:lnRef>
+            <a:fillRef idx="0">
+              <a:schemeClr val="accent1"/>
+            </a:fillRef>
+            <a:effectRef idx="0">
+              <a:schemeClr val="accent1"/>
+            </a:effectRef>
+            <a:fontRef idx="minor">
+              <a:schemeClr val="tx1"/>
+            </a:fontRef>
+          </p:style>
+        </p:cxnSp>
+        <p:sp>
+          <p:nvSpPr>
+            <p:cNvPr id="172" name="TextBox 171">
+              <a:extLst>
+                <a:ext uri="{FF2B5EF4-FFF2-40B4-BE49-F238E27FC236}">
+                  <a16:creationId xmlns:a16="http://schemas.microsoft.com/office/drawing/2014/main" id="{07CE8DC2-51F8-6822-B753-D1D4B10A13E6}"/>
+                </a:ext>
+              </a:extLst>
+            </p:cNvPr>
+            <p:cNvSpPr txBox="1"/>
+            <p:nvPr/>
+          </p:nvSpPr>
+          <p:spPr>
+            <a:xfrm>
+              <a:off x="15179040" y="10545212"/>
+              <a:ext cx="1719381" cy="369332"/>
+            </a:xfrm>
+            <a:prstGeom prst="rect">
+              <a:avLst/>
+            </a:prstGeom>
+            <a:noFill/>
+          </p:spPr>
+          <p:txBody>
+            <a:bodyPr wrap="none" rtlCol="0">
+              <a:spAutoFit/>
+            </a:bodyPr>
+            <a:lstStyle/>
+            <a:p>
+              <a:r>
+                <a:rPr lang="en-US" dirty="0">
+                  <a:latin typeface="Arial" panose="020B0604020202020204" pitchFamily="34" charset="0"/>
+                  <a:cs typeface="Arial" panose="020B0604020202020204" pitchFamily="34" charset="0"/>
+                </a:rPr>
+                <a:t>Negative effect</a:t>
+              </a:r>
+            </a:p>
+          </p:txBody>
+        </p:sp>
+        <p:sp>
+          <p:nvSpPr>
+            <p:cNvPr id="174" name="Rectangle 173">
+              <a:extLst>
+                <a:ext uri="{FF2B5EF4-FFF2-40B4-BE49-F238E27FC236}">
+                  <a16:creationId xmlns:a16="http://schemas.microsoft.com/office/drawing/2014/main" id="{7BEAF243-6676-38EB-E087-B8A557E97B57}"/>
+                </a:ext>
+              </a:extLst>
+            </p:cNvPr>
+            <p:cNvSpPr/>
+            <p:nvPr/>
+          </p:nvSpPr>
+          <p:spPr>
+            <a:xfrm>
+              <a:off x="14336889" y="10167639"/>
+              <a:ext cx="2561532" cy="853440"/>
+            </a:xfrm>
+            <a:prstGeom prst="rect">
+              <a:avLst/>
+            </a:prstGeom>
+            <a:noFill/>
+            <a:ln w="38100">
+              <a:solidFill>
+                <a:schemeClr val="tx1"/>
+              </a:solidFill>
+            </a:ln>
+          </p:spPr>
+          <p:style>
+            <a:lnRef idx="2">
+              <a:schemeClr val="accent1">
+                <a:shade val="15000"/>
+              </a:schemeClr>
+            </a:lnRef>
+            <a:fillRef idx="1">
+              <a:schemeClr val="accent1"/>
+            </a:fillRef>
+            <a:effectRef idx="0">
+              <a:schemeClr val="accent1"/>
+            </a:effectRef>
+            <a:fontRef idx="minor">
+              <a:schemeClr val="lt1"/>
+            </a:fontRef>
+          </p:style>
+          <p:txBody>
+            <a:bodyPr rtlCol="0" anchor="ctr"/>
+            <a:lstStyle/>
+            <a:p>
+              <a:pPr algn="ctr"/>
+              <a:endParaRPr lang="en-US"/>
+            </a:p>
+          </p:txBody>
+        </p:sp>
+      </p:grpSp>
+    </p:spTree>
+    <p:extLst>
+      <p:ext uri="{BB962C8B-B14F-4D97-AF65-F5344CB8AC3E}">
+        <p14:creationId xmlns:p14="http://schemas.microsoft.com/office/powerpoint/2010/main" val="827455332"/>
+      </p:ext>
+    </p:extLst>
+  </p:cSld>
+  <p:clrMapOvr>
+    <a:masterClrMapping/>
+  </p:clrMapOvr>
+</p:sld>
+</file>
+
 <file path=ppt/theme/theme1.xml><?xml version="1.0" encoding="utf-8"?>
 <a:theme xmlns:a="http://schemas.openxmlformats.org/drawingml/2006/main" name="Office Theme">
   <a:themeElements>

</xml_diff>

<commit_message>
add conceptual figure and rework structural equation model fig
</commit_message>
<xml_diff>
--- a/working_drafts/figs/TXeco_SEM_ppt_fig.pptx
+++ b/working_drafts/figs/TXeco_SEM_ppt_fig.pptx
@@ -5,7 +5,7 @@
     <p:sldMasterId id="2147483708" r:id="rId1"/>
   </p:sldMasterIdLst>
   <p:notesMasterIdLst>
-    <p:notesMasterId r:id="rId7"/>
+    <p:notesMasterId r:id="rId8"/>
   </p:notesMasterIdLst>
   <p:sldIdLst>
     <p:sldId id="276" r:id="rId2"/>
@@ -13,6 +13,7 @@
     <p:sldId id="281" r:id="rId4"/>
     <p:sldId id="282" r:id="rId5"/>
     <p:sldId id="283" r:id="rId6"/>
+    <p:sldId id="284" r:id="rId7"/>
   </p:sldIdLst>
   <p:sldSz cx="27432000" cy="18288000"/>
   <p:notesSz cx="6858000" cy="9144000"/>
@@ -201,7 +202,7 @@
           <a:p>
             <a:fld id="{9C8338E3-F40D-F146-8D3B-4726E84D5200}" type="datetimeFigureOut">
               <a:rPr lang="en-US" smtClean="0"/>
-              <a:t>9/12/23</a:t>
+              <a:t>9/15/23</a:t>
             </a:fld>
             <a:endParaRPr lang="en-US"/>
           </a:p>
@@ -893,6 +894,90 @@
 </p:notes>
 </file>
 
+<file path=ppt/notesSlides/notesSlide6.xml><?xml version="1.0" encoding="utf-8"?>
+<p:notes xmlns:a="http://schemas.openxmlformats.org/drawingml/2006/main" xmlns:r="http://schemas.openxmlformats.org/officeDocument/2006/relationships" xmlns:p="http://schemas.openxmlformats.org/presentationml/2006/main">
+  <p:cSld>
+    <p:spTree>
+      <p:nvGrpSpPr>
+        <p:cNvPr id="1" name=""/>
+        <p:cNvGrpSpPr/>
+        <p:nvPr/>
+      </p:nvGrpSpPr>
+      <p:grpSpPr>
+        <a:xfrm>
+          <a:off x="0" y="0"/>
+          <a:ext cx="0" cy="0"/>
+          <a:chOff x="0" y="0"/>
+          <a:chExt cx="0" cy="0"/>
+        </a:xfrm>
+      </p:grpSpPr>
+      <p:sp>
+        <p:nvSpPr>
+          <p:cNvPr id="2" name="Slide Image Placeholder 1"/>
+          <p:cNvSpPr>
+            <a:spLocks noGrp="1" noRot="1" noChangeAspect="1"/>
+          </p:cNvSpPr>
+          <p:nvPr>
+            <p:ph type="sldImg"/>
+          </p:nvPr>
+        </p:nvSpPr>
+        <p:spPr/>
+      </p:sp>
+      <p:sp>
+        <p:nvSpPr>
+          <p:cNvPr id="3" name="Notes Placeholder 2"/>
+          <p:cNvSpPr>
+            <a:spLocks noGrp="1"/>
+          </p:cNvSpPr>
+          <p:nvPr>
+            <p:ph type="body" idx="1"/>
+          </p:nvPr>
+        </p:nvSpPr>
+        <p:spPr/>
+        <p:txBody>
+          <a:bodyPr/>
+          <a:lstStyle/>
+          <a:p>
+            <a:endParaRPr lang="en-US" dirty="0"/>
+          </a:p>
+        </p:txBody>
+      </p:sp>
+      <p:sp>
+        <p:nvSpPr>
+          <p:cNvPr id="4" name="Slide Number Placeholder 3"/>
+          <p:cNvSpPr>
+            <a:spLocks noGrp="1"/>
+          </p:cNvSpPr>
+          <p:nvPr>
+            <p:ph type="sldNum" sz="quarter" idx="5"/>
+          </p:nvPr>
+        </p:nvSpPr>
+        <p:spPr/>
+        <p:txBody>
+          <a:bodyPr/>
+          <a:lstStyle/>
+          <a:p>
+            <a:fld id="{C2800238-33D2-A44F-8135-A0F534DB873D}" type="slidenum">
+              <a:rPr lang="en-US" smtClean="0"/>
+              <a:t>6</a:t>
+            </a:fld>
+            <a:endParaRPr lang="en-US"/>
+          </a:p>
+        </p:txBody>
+      </p:sp>
+    </p:spTree>
+    <p:extLst>
+      <p:ext uri="{BB962C8B-B14F-4D97-AF65-F5344CB8AC3E}">
+        <p14:creationId xmlns:p14="http://schemas.microsoft.com/office/powerpoint/2010/main" val="202218468"/>
+      </p:ext>
+    </p:extLst>
+  </p:cSld>
+  <p:clrMapOvr>
+    <a:masterClrMapping/>
+  </p:clrMapOvr>
+</p:notes>
+</file>
+
 <file path=ppt/slideLayouts/slideLayout1.xml><?xml version="1.0" encoding="utf-8"?>
 <p:sldLayout xmlns:a="http://schemas.openxmlformats.org/drawingml/2006/main" xmlns:r="http://schemas.openxmlformats.org/officeDocument/2006/relationships" xmlns:p="http://schemas.openxmlformats.org/presentationml/2006/main" type="title" preserve="1">
   <p:cSld name="Title Slide">
@@ -1024,7 +1109,7 @@
           <a:p>
             <a:fld id="{D3A28AA4-801E-B147-9E5C-6E6DBA6E23D1}" type="datetimeFigureOut">
               <a:rPr lang="en-US" smtClean="0"/>
-              <a:t>9/12/23</a:t>
+              <a:t>9/15/23</a:t>
             </a:fld>
             <a:endParaRPr lang="en-US"/>
           </a:p>
@@ -1194,7 +1279,7 @@
           <a:p>
             <a:fld id="{D3A28AA4-801E-B147-9E5C-6E6DBA6E23D1}" type="datetimeFigureOut">
               <a:rPr lang="en-US" smtClean="0"/>
-              <a:t>9/12/23</a:t>
+              <a:t>9/15/23</a:t>
             </a:fld>
             <a:endParaRPr lang="en-US"/>
           </a:p>
@@ -1374,7 +1459,7 @@
           <a:p>
             <a:fld id="{D3A28AA4-801E-B147-9E5C-6E6DBA6E23D1}" type="datetimeFigureOut">
               <a:rPr lang="en-US" smtClean="0"/>
-              <a:t>9/12/23</a:t>
+              <a:t>9/15/23</a:t>
             </a:fld>
             <a:endParaRPr lang="en-US"/>
           </a:p>
@@ -1544,7 +1629,7 @@
           <a:p>
             <a:fld id="{D3A28AA4-801E-B147-9E5C-6E6DBA6E23D1}" type="datetimeFigureOut">
               <a:rPr lang="en-US" smtClean="0"/>
-              <a:t>9/12/23</a:t>
+              <a:t>9/15/23</a:t>
             </a:fld>
             <a:endParaRPr lang="en-US"/>
           </a:p>
@@ -1788,7 +1873,7 @@
           <a:p>
             <a:fld id="{D3A28AA4-801E-B147-9E5C-6E6DBA6E23D1}" type="datetimeFigureOut">
               <a:rPr lang="en-US" smtClean="0"/>
-              <a:t>9/12/23</a:t>
+              <a:t>9/15/23</a:t>
             </a:fld>
             <a:endParaRPr lang="en-US"/>
           </a:p>
@@ -2020,7 +2105,7 @@
           <a:p>
             <a:fld id="{D3A28AA4-801E-B147-9E5C-6E6DBA6E23D1}" type="datetimeFigureOut">
               <a:rPr lang="en-US" smtClean="0"/>
-              <a:t>9/12/23</a:t>
+              <a:t>9/15/23</a:t>
             </a:fld>
             <a:endParaRPr lang="en-US"/>
           </a:p>
@@ -2387,7 +2472,7 @@
           <a:p>
             <a:fld id="{D3A28AA4-801E-B147-9E5C-6E6DBA6E23D1}" type="datetimeFigureOut">
               <a:rPr lang="en-US" smtClean="0"/>
-              <a:t>9/12/23</a:t>
+              <a:t>9/15/23</a:t>
             </a:fld>
             <a:endParaRPr lang="en-US"/>
           </a:p>
@@ -2505,7 +2590,7 @@
           <a:p>
             <a:fld id="{D3A28AA4-801E-B147-9E5C-6E6DBA6E23D1}" type="datetimeFigureOut">
               <a:rPr lang="en-US" smtClean="0"/>
-              <a:t>9/12/23</a:t>
+              <a:t>9/15/23</a:t>
             </a:fld>
             <a:endParaRPr lang="en-US"/>
           </a:p>
@@ -2600,7 +2685,7 @@
           <a:p>
             <a:fld id="{D3A28AA4-801E-B147-9E5C-6E6DBA6E23D1}" type="datetimeFigureOut">
               <a:rPr lang="en-US" smtClean="0"/>
-              <a:t>9/12/23</a:t>
+              <a:t>9/15/23</a:t>
             </a:fld>
             <a:endParaRPr lang="en-US"/>
           </a:p>
@@ -2877,7 +2962,7 @@
           <a:p>
             <a:fld id="{D3A28AA4-801E-B147-9E5C-6E6DBA6E23D1}" type="datetimeFigureOut">
               <a:rPr lang="en-US" smtClean="0"/>
-              <a:t>9/12/23</a:t>
+              <a:t>9/15/23</a:t>
             </a:fld>
             <a:endParaRPr lang="en-US"/>
           </a:p>
@@ -3134,7 +3219,7 @@
           <a:p>
             <a:fld id="{D3A28AA4-801E-B147-9E5C-6E6DBA6E23D1}" type="datetimeFigureOut">
               <a:rPr lang="en-US" smtClean="0"/>
-              <a:t>9/12/23</a:t>
+              <a:t>9/15/23</a:t>
             </a:fld>
             <a:endParaRPr lang="en-US"/>
           </a:p>
@@ -3347,7 +3432,7 @@
           <a:p>
             <a:fld id="{D3A28AA4-801E-B147-9E5C-6E6DBA6E23D1}" type="datetimeFigureOut">
               <a:rPr lang="en-US" smtClean="0"/>
-              <a:t>9/12/23</a:t>
+              <a:t>9/15/23</a:t>
             </a:fld>
             <a:endParaRPr lang="en-US"/>
           </a:p>
@@ -15112,18 +15197,21 @@
             </a:extLst>
           </p:cNvPr>
           <p:cNvCxnSpPr>
-            <a:stCxn id="20" idx="3"/>
+            <a:cxnSpLocks/>
+            <a:stCxn id="20" idx="0"/>
             <a:endCxn id="11" idx="0"/>
           </p:cNvCxnSpPr>
           <p:nvPr/>
         </p:nvCxnSpPr>
         <p:spPr>
-          <a:xfrm>
-            <a:off x="16517899" y="6981285"/>
-            <a:ext cx="1367213" cy="622683"/>
-          </a:xfrm>
-          <a:prstGeom prst="bentConnector2">
-            <a:avLst/>
+          <a:xfrm rot="16200000" flipH="1">
+            <a:off x="16216008" y="5934864"/>
+            <a:ext cx="1061295" cy="2276912"/>
+          </a:xfrm>
+          <a:prstGeom prst="bentConnector3">
+            <a:avLst>
+              <a:gd name="adj1" fmla="val -21540"/>
+            </a:avLst>
           </a:prstGeom>
           <a:ln w="76200">
             <a:solidFill>
@@ -15160,18 +15248,20 @@
           </p:cNvPr>
           <p:cNvCxnSpPr>
             <a:cxnSpLocks/>
-            <a:stCxn id="17" idx="3"/>
+            <a:stCxn id="17" idx="2"/>
             <a:endCxn id="11" idx="2"/>
           </p:cNvCxnSpPr>
           <p:nvPr/>
         </p:nvCxnSpPr>
         <p:spPr>
-          <a:xfrm flipV="1">
-            <a:off x="16517899" y="8481191"/>
-            <a:ext cx="1367213" cy="601392"/>
-          </a:xfrm>
-          <a:prstGeom prst="bentConnector2">
-            <a:avLst/>
+          <a:xfrm rot="5400000" flipH="1" flipV="1">
+            <a:off x="16226654" y="7862737"/>
+            <a:ext cx="1040003" cy="2276912"/>
+          </a:xfrm>
+          <a:prstGeom prst="bentConnector3">
+            <a:avLst>
+              <a:gd name="adj1" fmla="val -21981"/>
+            </a:avLst>
           </a:prstGeom>
           <a:ln w="76200">
             <a:solidFill>
@@ -15342,41 +15432,41 @@
           <a:p>
             <a:pPr algn="ctr"/>
             <a:r>
-              <a:rPr lang="en-US" sz="3000" b="1" dirty="0">
+              <a:rPr lang="en-US" sz="2400" b="1" dirty="0">
                 <a:solidFill>
                   <a:schemeClr val="tx1"/>
                 </a:solidFill>
-                <a:latin typeface="Times New Roman" panose="02020603050405020304" pitchFamily="18" charset="0"/>
-                <a:cs typeface="Times New Roman" panose="02020603050405020304" pitchFamily="18" charset="0"/>
+                <a:latin typeface="Arial" panose="020B0604020202020204" pitchFamily="34" charset="0"/>
+                <a:cs typeface="Arial" panose="020B0604020202020204" pitchFamily="34" charset="0"/>
               </a:rPr>
               <a:t>C</a:t>
             </a:r>
             <a:r>
-              <a:rPr lang="en-US" sz="3000" b="1" baseline="-25000" dirty="0">
+              <a:rPr lang="en-US" sz="2400" b="1" baseline="-25000" dirty="0">
                 <a:solidFill>
                   <a:schemeClr val="tx1"/>
                 </a:solidFill>
-                <a:latin typeface="Times New Roman" panose="02020603050405020304" pitchFamily="18" charset="0"/>
-                <a:cs typeface="Times New Roman" panose="02020603050405020304" pitchFamily="18" charset="0"/>
+                <a:latin typeface="Arial" panose="020B0604020202020204" pitchFamily="34" charset="0"/>
+                <a:cs typeface="Arial" panose="020B0604020202020204" pitchFamily="34" charset="0"/>
               </a:rPr>
               <a:t>3</a:t>
             </a:r>
             <a:r>
-              <a:rPr lang="en-US" sz="3000" b="1" dirty="0">
+              <a:rPr lang="en-US" sz="2400" b="1" dirty="0">
                 <a:solidFill>
                   <a:schemeClr val="tx1"/>
                 </a:solidFill>
-                <a:latin typeface="Times New Roman" panose="02020603050405020304" pitchFamily="18" charset="0"/>
-                <a:cs typeface="Times New Roman" panose="02020603050405020304" pitchFamily="18" charset="0"/>
+                <a:latin typeface="Arial" panose="020B0604020202020204" pitchFamily="34" charset="0"/>
+                <a:cs typeface="Arial" panose="020B0604020202020204" pitchFamily="34" charset="0"/>
               </a:rPr>
               <a:t> photo.</a:t>
             </a:r>
-            <a:endParaRPr lang="en-US" sz="3000" b="1" dirty="0">
+            <a:endParaRPr lang="en-US" sz="2400" b="1" dirty="0">
               <a:solidFill>
                 <a:srgbClr val="C00000"/>
               </a:solidFill>
-              <a:latin typeface="Times New Roman" panose="02020603050405020304" pitchFamily="18" charset="0"/>
-              <a:cs typeface="Times New Roman" panose="02020603050405020304" pitchFamily="18" charset="0"/>
+              <a:latin typeface="Arial" panose="020B0604020202020204" pitchFamily="34" charset="0"/>
+              <a:cs typeface="Arial" panose="020B0604020202020204" pitchFamily="34" charset="0"/>
             </a:endParaRPr>
           </a:p>
         </p:txBody>
@@ -15432,21 +15522,21 @@
           <a:p>
             <a:pPr algn="ctr"/>
             <a:r>
-              <a:rPr lang="el-GR" sz="3000" b="1" i="1" dirty="0">
+              <a:rPr lang="el-GR" sz="2400" b="1" i="1" dirty="0">
                 <a:solidFill>
                   <a:schemeClr val="tx1"/>
                 </a:solidFill>
-                <a:latin typeface="Times New Roman" panose="02020603050405020304" pitchFamily="18" charset="0"/>
-                <a:cs typeface="Times New Roman" panose="02020603050405020304" pitchFamily="18" charset="0"/>
+                <a:latin typeface="Arial" panose="020B0604020202020204" pitchFamily="34" charset="0"/>
+                <a:cs typeface="Arial" panose="020B0604020202020204" pitchFamily="34" charset="0"/>
               </a:rPr>
               <a:t>β</a:t>
             </a:r>
-            <a:endParaRPr lang="en-US" sz="3000" b="1" i="1" dirty="0">
+            <a:endParaRPr lang="en-US" sz="2400" b="1" i="1" dirty="0">
               <a:solidFill>
                 <a:schemeClr val="tx1"/>
               </a:solidFill>
-              <a:latin typeface="Times New Roman" panose="02020603050405020304" pitchFamily="18" charset="0"/>
-              <a:cs typeface="Times New Roman" panose="02020603050405020304" pitchFamily="18" charset="0"/>
+              <a:latin typeface="Arial" panose="020B0604020202020204" pitchFamily="34" charset="0"/>
+              <a:cs typeface="Arial" panose="020B0604020202020204" pitchFamily="34" charset="0"/>
             </a:endParaRPr>
           </a:p>
         </p:txBody>
@@ -15502,31 +15592,31 @@
           <a:p>
             <a:pPr algn="ctr"/>
             <a:r>
-              <a:rPr lang="en-US" sz="3000" b="1" i="1" dirty="0">
+              <a:rPr lang="en-US" sz="2400" b="1" i="1" dirty="0">
                 <a:solidFill>
                   <a:schemeClr val="tx1"/>
                 </a:solidFill>
-                <a:latin typeface="Times New Roman" panose="02020603050405020304" pitchFamily="18" charset="0"/>
-                <a:cs typeface="Times New Roman" panose="02020603050405020304" pitchFamily="18" charset="0"/>
+                <a:latin typeface="Arial" panose="020B0604020202020204" pitchFamily="34" charset="0"/>
+                <a:cs typeface="Arial" panose="020B0604020202020204" pitchFamily="34" charset="0"/>
               </a:rPr>
               <a:t>N</a:t>
             </a:r>
             <a:r>
-              <a:rPr lang="en-US" sz="3000" b="1" baseline="-25000" dirty="0">
+              <a:rPr lang="en-US" sz="2400" b="1" baseline="-25000" dirty="0">
                 <a:solidFill>
                   <a:schemeClr val="tx1"/>
                 </a:solidFill>
-                <a:latin typeface="Times New Roman" panose="02020603050405020304" pitchFamily="18" charset="0"/>
-                <a:cs typeface="Times New Roman" panose="02020603050405020304" pitchFamily="18" charset="0"/>
+                <a:latin typeface="Arial" panose="020B0604020202020204" pitchFamily="34" charset="0"/>
+                <a:cs typeface="Arial" panose="020B0604020202020204" pitchFamily="34" charset="0"/>
               </a:rPr>
               <a:t>fixation</a:t>
             </a:r>
-            <a:endParaRPr lang="en-US" sz="3000" i="1" dirty="0">
+            <a:endParaRPr lang="en-US" sz="2400" i="1" dirty="0">
               <a:solidFill>
                 <a:schemeClr val="tx1"/>
               </a:solidFill>
-              <a:latin typeface="Times New Roman" panose="02020603050405020304" pitchFamily="18" charset="0"/>
-              <a:cs typeface="Times New Roman" panose="02020603050405020304" pitchFamily="18" charset="0"/>
+              <a:latin typeface="Arial" panose="020B0604020202020204" pitchFamily="34" charset="0"/>
+              <a:cs typeface="Arial" panose="020B0604020202020204" pitchFamily="34" charset="0"/>
             </a:endParaRPr>
           </a:p>
         </p:txBody>
@@ -15582,31 +15672,31 @@
           <a:p>
             <a:pPr algn="ctr"/>
             <a:r>
-              <a:rPr lang="el-GR" sz="3000" b="1" i="1" dirty="0">
+              <a:rPr lang="el-GR" sz="2400" b="1" i="1" dirty="0">
                 <a:solidFill>
                   <a:schemeClr val="tx1"/>
                 </a:solidFill>
-                <a:latin typeface="Times New Roman" panose="02020603050405020304" pitchFamily="18" charset="0"/>
-                <a:cs typeface="Times New Roman" panose="02020603050405020304" pitchFamily="18" charset="0"/>
+                <a:latin typeface="Arial" panose="020B0604020202020204" pitchFamily="34" charset="0"/>
+                <a:cs typeface="Arial" panose="020B0604020202020204" pitchFamily="34" charset="0"/>
               </a:rPr>
               <a:t>Ν</a:t>
             </a:r>
             <a:r>
-              <a:rPr lang="en-US" sz="3000" b="1" baseline="-25000" dirty="0">
+              <a:rPr lang="en-US" sz="2400" b="1" baseline="-25000" dirty="0">
                 <a:solidFill>
                   <a:schemeClr val="tx1"/>
                 </a:solidFill>
-                <a:latin typeface="Times New Roman" panose="02020603050405020304" pitchFamily="18" charset="0"/>
-                <a:cs typeface="Times New Roman" panose="02020603050405020304" pitchFamily="18" charset="0"/>
+                <a:latin typeface="Arial" panose="020B0604020202020204" pitchFamily="34" charset="0"/>
+                <a:cs typeface="Arial" panose="020B0604020202020204" pitchFamily="34" charset="0"/>
               </a:rPr>
               <a:t>area</a:t>
             </a:r>
-            <a:endParaRPr lang="en-US" sz="3000" b="1" i="1" dirty="0">
+            <a:endParaRPr lang="en-US" sz="2400" b="1" i="1" dirty="0">
               <a:solidFill>
                 <a:schemeClr val="tx1"/>
               </a:solidFill>
-              <a:latin typeface="Times New Roman" panose="02020603050405020304" pitchFamily="18" charset="0"/>
-              <a:cs typeface="Times New Roman" panose="02020603050405020304" pitchFamily="18" charset="0"/>
+              <a:latin typeface="Arial" panose="020B0604020202020204" pitchFamily="34" charset="0"/>
+              <a:cs typeface="Arial" panose="020B0604020202020204" pitchFamily="34" charset="0"/>
             </a:endParaRPr>
           </a:p>
         </p:txBody>
@@ -15662,31 +15752,31 @@
           <a:p>
             <a:pPr algn="ctr"/>
             <a:r>
-              <a:rPr lang="en-US" sz="3000" b="1" i="1" dirty="0">
+              <a:rPr lang="en-US" sz="2400" b="1" i="1" dirty="0">
                 <a:solidFill>
                   <a:schemeClr val="tx1"/>
                 </a:solidFill>
-                <a:latin typeface="Times New Roman" panose="02020603050405020304" pitchFamily="18" charset="0"/>
-                <a:cs typeface="Times New Roman" panose="02020603050405020304" pitchFamily="18" charset="0"/>
+                <a:latin typeface="Arial" panose="020B0604020202020204" pitchFamily="34" charset="0"/>
+                <a:cs typeface="Arial" panose="020B0604020202020204" pitchFamily="34" charset="0"/>
               </a:rPr>
               <a:t>M</a:t>
             </a:r>
             <a:r>
-              <a:rPr lang="en-US" sz="3000" b="1" baseline="-25000" dirty="0">
+              <a:rPr lang="en-US" sz="2400" b="1" baseline="-25000" dirty="0">
                 <a:solidFill>
                   <a:schemeClr val="tx1"/>
                 </a:solidFill>
-                <a:latin typeface="Times New Roman" panose="02020603050405020304" pitchFamily="18" charset="0"/>
-                <a:cs typeface="Times New Roman" panose="02020603050405020304" pitchFamily="18" charset="0"/>
+                <a:latin typeface="Arial" panose="020B0604020202020204" pitchFamily="34" charset="0"/>
+                <a:cs typeface="Arial" panose="020B0604020202020204" pitchFamily="34" charset="0"/>
               </a:rPr>
               <a:t>area</a:t>
             </a:r>
-            <a:endParaRPr lang="en-US" sz="3000" b="1" i="1" dirty="0">
+            <a:endParaRPr lang="en-US" sz="2400" b="1" i="1" dirty="0">
               <a:solidFill>
                 <a:schemeClr val="tx1"/>
               </a:solidFill>
-              <a:latin typeface="Times New Roman" panose="02020603050405020304" pitchFamily="18" charset="0"/>
-              <a:cs typeface="Times New Roman" panose="02020603050405020304" pitchFamily="18" charset="0"/>
+              <a:latin typeface="Arial" panose="020B0604020202020204" pitchFamily="34" charset="0"/>
+              <a:cs typeface="Arial" panose="020B0604020202020204" pitchFamily="34" charset="0"/>
             </a:endParaRPr>
           </a:p>
         </p:txBody>
@@ -15742,31 +15832,31 @@
           <a:p>
             <a:pPr algn="ctr"/>
             <a:r>
-              <a:rPr lang="en-US" sz="3000" b="1" i="1" dirty="0">
+              <a:rPr lang="en-US" sz="2400" b="1" i="1" dirty="0">
                 <a:solidFill>
                   <a:schemeClr val="tx1"/>
                 </a:solidFill>
-                <a:latin typeface="Times New Roman" panose="02020603050405020304" pitchFamily="18" charset="0"/>
-                <a:cs typeface="Times New Roman" panose="02020603050405020304" pitchFamily="18" charset="0"/>
+                <a:latin typeface="Arial" panose="020B0604020202020204" pitchFamily="34" charset="0"/>
+                <a:cs typeface="Arial" panose="020B0604020202020204" pitchFamily="34" charset="0"/>
               </a:rPr>
               <a:t>N</a:t>
             </a:r>
             <a:r>
-              <a:rPr lang="en-US" sz="3000" b="1" baseline="-25000" dirty="0">
+              <a:rPr lang="en-US" sz="2400" b="1" baseline="-25000" dirty="0">
                 <a:solidFill>
                   <a:schemeClr val="tx1"/>
                 </a:solidFill>
-                <a:latin typeface="Times New Roman" panose="02020603050405020304" pitchFamily="18" charset="0"/>
-                <a:cs typeface="Times New Roman" panose="02020603050405020304" pitchFamily="18" charset="0"/>
+                <a:latin typeface="Arial" panose="020B0604020202020204" pitchFamily="34" charset="0"/>
+                <a:cs typeface="Arial" panose="020B0604020202020204" pitchFamily="34" charset="0"/>
               </a:rPr>
               <a:t>mass</a:t>
             </a:r>
-            <a:endParaRPr lang="en-US" sz="3000" b="1" i="1" dirty="0">
+            <a:endParaRPr lang="en-US" sz="2400" b="1" i="1" dirty="0">
               <a:solidFill>
                 <a:schemeClr val="tx1"/>
               </a:solidFill>
-              <a:latin typeface="Times New Roman" panose="02020603050405020304" pitchFamily="18" charset="0"/>
-              <a:cs typeface="Times New Roman" panose="02020603050405020304" pitchFamily="18" charset="0"/>
+              <a:latin typeface="Arial" panose="020B0604020202020204" pitchFamily="34" charset="0"/>
+              <a:cs typeface="Arial" panose="020B0604020202020204" pitchFamily="34" charset="0"/>
             </a:endParaRPr>
           </a:p>
         </p:txBody>
@@ -15822,21 +15912,21 @@
           <a:p>
             <a:pPr algn="ctr"/>
             <a:r>
-              <a:rPr lang="en-US" sz="3000" b="1" i="1" dirty="0">
+              <a:rPr lang="en-US" sz="2400" b="1" i="1" dirty="0">
                 <a:solidFill>
                   <a:schemeClr val="tx1"/>
                 </a:solidFill>
-                <a:latin typeface="Times New Roman" panose="02020603050405020304" pitchFamily="18" charset="0"/>
-                <a:cs typeface="Times New Roman" panose="02020603050405020304" pitchFamily="18" charset="0"/>
+                <a:latin typeface="Arial" panose="020B0604020202020204" pitchFamily="34" charset="0"/>
+                <a:cs typeface="Arial" panose="020B0604020202020204" pitchFamily="34" charset="0"/>
               </a:rPr>
               <a:t>VPD</a:t>
             </a:r>
-            <a:endParaRPr lang="en-US" sz="3000" b="1" dirty="0">
+            <a:endParaRPr lang="en-US" sz="2400" b="1" dirty="0">
               <a:solidFill>
                 <a:schemeClr val="tx1"/>
               </a:solidFill>
-              <a:latin typeface="Times New Roman" panose="02020603050405020304" pitchFamily="18" charset="0"/>
-              <a:cs typeface="Times New Roman" panose="02020603050405020304" pitchFamily="18" charset="0"/>
+              <a:latin typeface="Arial" panose="020B0604020202020204" pitchFamily="34" charset="0"/>
+              <a:cs typeface="Arial" panose="020B0604020202020204" pitchFamily="34" charset="0"/>
             </a:endParaRPr>
           </a:p>
         </p:txBody>
@@ -15892,42 +15982,42 @@
           <a:p>
             <a:pPr algn="ctr"/>
             <a:r>
-              <a:rPr lang="en-US" sz="3000" b="1" i="1" dirty="0">
+              <a:rPr lang="en-US" sz="2400" b="1" i="1" dirty="0">
                 <a:solidFill>
                   <a:schemeClr val="tx1"/>
                 </a:solidFill>
-                <a:latin typeface="Times New Roman" panose="02020603050405020304" pitchFamily="18" charset="0"/>
-                <a:cs typeface="Times New Roman" panose="02020603050405020304" pitchFamily="18" charset="0"/>
+                <a:latin typeface="Arial" panose="020B0604020202020204" pitchFamily="34" charset="0"/>
+                <a:cs typeface="Arial" panose="020B0604020202020204" pitchFamily="34" charset="0"/>
               </a:rPr>
               <a:t>C</a:t>
             </a:r>
             <a:r>
-              <a:rPr lang="en-US" sz="3000" b="1" baseline="-25000" dirty="0">
+              <a:rPr lang="en-US" sz="2400" b="1" baseline="-25000" dirty="0">
                 <a:solidFill>
                   <a:schemeClr val="tx1"/>
                 </a:solidFill>
-                <a:latin typeface="Times New Roman" panose="02020603050405020304" pitchFamily="18" charset="0"/>
-                <a:cs typeface="Times New Roman" panose="02020603050405020304" pitchFamily="18" charset="0"/>
+                <a:latin typeface="Arial" panose="020B0604020202020204" pitchFamily="34" charset="0"/>
+                <a:cs typeface="Arial" panose="020B0604020202020204" pitchFamily="34" charset="0"/>
               </a:rPr>
               <a:t>i</a:t>
             </a:r>
             <a:r>
-              <a:rPr lang="en-US" sz="3000" b="1" i="1" dirty="0">
+              <a:rPr lang="en-US" sz="2400" b="1" i="1" dirty="0">
                 <a:solidFill>
                   <a:schemeClr val="tx1"/>
                 </a:solidFill>
-                <a:latin typeface="Times New Roman" panose="02020603050405020304" pitchFamily="18" charset="0"/>
-                <a:cs typeface="Times New Roman" panose="02020603050405020304" pitchFamily="18" charset="0"/>
+                <a:latin typeface="Arial" panose="020B0604020202020204" pitchFamily="34" charset="0"/>
+                <a:cs typeface="Arial" panose="020B0604020202020204" pitchFamily="34" charset="0"/>
               </a:rPr>
               <a:t>:C</a:t>
             </a:r>
             <a:r>
-              <a:rPr lang="en-US" sz="3000" b="1" baseline="-25000" dirty="0">
+              <a:rPr lang="en-US" sz="2400" b="1" baseline="-25000" dirty="0">
                 <a:solidFill>
                   <a:schemeClr val="tx1"/>
                 </a:solidFill>
-                <a:latin typeface="Times New Roman" panose="02020603050405020304" pitchFamily="18" charset="0"/>
-                <a:cs typeface="Times New Roman" panose="02020603050405020304" pitchFamily="18" charset="0"/>
+                <a:latin typeface="Arial" panose="020B0604020202020204" pitchFamily="34" charset="0"/>
+                <a:cs typeface="Arial" panose="020B0604020202020204" pitchFamily="34" charset="0"/>
               </a:rPr>
               <a:t>a</a:t>
             </a:r>
@@ -15985,21 +16075,21 @@
           <a:p>
             <a:pPr algn="ctr"/>
             <a:r>
-              <a:rPr lang="en-US" sz="3000" b="1" i="1" dirty="0">
+              <a:rPr lang="en-US" sz="2400" b="1" i="1" dirty="0">
                 <a:solidFill>
                   <a:schemeClr val="tx1"/>
                 </a:solidFill>
-                <a:latin typeface="Times New Roman" panose="02020603050405020304" pitchFamily="18" charset="0"/>
-                <a:cs typeface="Times New Roman" panose="02020603050405020304" pitchFamily="18" charset="0"/>
+                <a:latin typeface="Arial" panose="020B0604020202020204" pitchFamily="34" charset="0"/>
+                <a:cs typeface="Arial" panose="020B0604020202020204" pitchFamily="34" charset="0"/>
               </a:rPr>
               <a:t>N availability</a:t>
             </a:r>
-            <a:endParaRPr lang="en-US" sz="3000" b="1" dirty="0">
+            <a:endParaRPr lang="en-US" sz="2400" b="1" dirty="0">
               <a:solidFill>
                 <a:schemeClr val="tx1"/>
               </a:solidFill>
-              <a:latin typeface="Times New Roman" panose="02020603050405020304" pitchFamily="18" charset="0"/>
-              <a:cs typeface="Times New Roman" panose="02020603050405020304" pitchFamily="18" charset="0"/>
+              <a:latin typeface="Arial" panose="020B0604020202020204" pitchFamily="34" charset="0"/>
+              <a:cs typeface="Arial" panose="020B0604020202020204" pitchFamily="34" charset="0"/>
             </a:endParaRPr>
           </a:p>
         </p:txBody>
@@ -16055,21 +16145,21 @@
           <a:p>
             <a:pPr algn="ctr"/>
             <a:r>
-              <a:rPr lang="en-US" sz="3000" b="1" i="1" dirty="0">
+              <a:rPr lang="en-US" sz="2400" b="1" i="1" dirty="0">
                 <a:solidFill>
                   <a:schemeClr val="tx1"/>
                 </a:solidFill>
-                <a:latin typeface="Times New Roman" panose="02020603050405020304" pitchFamily="18" charset="0"/>
-                <a:cs typeface="Times New Roman" panose="02020603050405020304" pitchFamily="18" charset="0"/>
+                <a:latin typeface="Arial" panose="020B0604020202020204" pitchFamily="34" charset="0"/>
+                <a:cs typeface="Arial" panose="020B0604020202020204" pitchFamily="34" charset="0"/>
               </a:rPr>
               <a:t>Soil moisture</a:t>
             </a:r>
-            <a:endParaRPr lang="en-US" sz="3000" b="1" dirty="0">
+            <a:endParaRPr lang="en-US" sz="2400" b="1" dirty="0">
               <a:solidFill>
                 <a:schemeClr val="tx1"/>
               </a:solidFill>
-              <a:latin typeface="Times New Roman" panose="02020603050405020304" pitchFamily="18" charset="0"/>
-              <a:cs typeface="Times New Roman" panose="02020603050405020304" pitchFamily="18" charset="0"/>
+              <a:latin typeface="Arial" panose="020B0604020202020204" pitchFamily="34" charset="0"/>
+              <a:cs typeface="Arial" panose="020B0604020202020204" pitchFamily="34" charset="0"/>
             </a:endParaRPr>
           </a:p>
         </p:txBody>
@@ -16088,7 +16178,7 @@
         </p:nvGrpSpPr>
         <p:grpSpPr>
           <a:xfrm>
-            <a:off x="12924649" y="10415219"/>
+            <a:off x="12447763" y="9988499"/>
             <a:ext cx="2561532" cy="853440"/>
             <a:chOff x="14336889" y="10167639"/>
             <a:chExt cx="2561532" cy="853440"/>
@@ -16309,10 +16399,2475 @@
           </p:txBody>
         </p:sp>
       </p:grpSp>
+      <p:sp>
+        <p:nvSpPr>
+          <p:cNvPr id="2" name="TextBox 1">
+            <a:extLst>
+              <a:ext uri="{FF2B5EF4-FFF2-40B4-BE49-F238E27FC236}">
+                <a16:creationId xmlns:a16="http://schemas.microsoft.com/office/drawing/2014/main" id="{1B6E197D-9D1E-2976-FC1F-DA2F3229DA96}"/>
+              </a:ext>
+            </a:extLst>
+          </p:cNvPr>
+          <p:cNvSpPr txBox="1"/>
+          <p:nvPr/>
+        </p:nvSpPr>
+        <p:spPr>
+          <a:xfrm>
+            <a:off x="8525116" y="8042579"/>
+            <a:ext cx="479618" cy="369332"/>
+          </a:xfrm>
+          <a:prstGeom prst="rect">
+            <a:avLst/>
+          </a:prstGeom>
+          <a:solidFill>
+            <a:schemeClr val="bg1"/>
+          </a:solidFill>
+          <a:ln w="28575">
+            <a:solidFill>
+              <a:srgbClr val="C00000"/>
+            </a:solidFill>
+          </a:ln>
+        </p:spPr>
+        <p:txBody>
+          <a:bodyPr wrap="none" rtlCol="0">
+            <a:spAutoFit/>
+          </a:bodyPr>
+          <a:lstStyle/>
+          <a:p>
+            <a:r>
+              <a:rPr lang="en-US" b="1" dirty="0">
+                <a:latin typeface="Arial" panose="020B0604020202020204" pitchFamily="34" charset="0"/>
+                <a:cs typeface="Arial" panose="020B0604020202020204" pitchFamily="34" charset="0"/>
+              </a:rPr>
+              <a:t>H1</a:t>
+            </a:r>
+          </a:p>
+        </p:txBody>
+      </p:sp>
+      <p:sp>
+        <p:nvSpPr>
+          <p:cNvPr id="4" name="TextBox 3">
+            <a:extLst>
+              <a:ext uri="{FF2B5EF4-FFF2-40B4-BE49-F238E27FC236}">
+                <a16:creationId xmlns:a16="http://schemas.microsoft.com/office/drawing/2014/main" id="{196A0B9A-6DB1-A26B-7E4C-F586E87642CF}"/>
+              </a:ext>
+            </a:extLst>
+          </p:cNvPr>
+          <p:cNvSpPr txBox="1"/>
+          <p:nvPr/>
+        </p:nvSpPr>
+        <p:spPr>
+          <a:xfrm>
+            <a:off x="10230954" y="6792861"/>
+            <a:ext cx="479618" cy="369332"/>
+          </a:xfrm>
+          <a:prstGeom prst="rect">
+            <a:avLst/>
+          </a:prstGeom>
+          <a:solidFill>
+            <a:schemeClr val="bg1"/>
+          </a:solidFill>
+          <a:ln w="28575">
+            <a:solidFill>
+              <a:schemeClr val="accent1">
+                <a:lumMod val="75000"/>
+              </a:schemeClr>
+            </a:solidFill>
+          </a:ln>
+        </p:spPr>
+        <p:txBody>
+          <a:bodyPr wrap="none" rtlCol="0">
+            <a:spAutoFit/>
+          </a:bodyPr>
+          <a:lstStyle/>
+          <a:p>
+            <a:r>
+              <a:rPr lang="en-US" b="1" dirty="0">
+                <a:latin typeface="Arial" panose="020B0604020202020204" pitchFamily="34" charset="0"/>
+                <a:cs typeface="Arial" panose="020B0604020202020204" pitchFamily="34" charset="0"/>
+              </a:rPr>
+              <a:t>H1</a:t>
+            </a:r>
+          </a:p>
+        </p:txBody>
+      </p:sp>
+      <p:sp>
+        <p:nvSpPr>
+          <p:cNvPr id="6" name="TextBox 5">
+            <a:extLst>
+              <a:ext uri="{FF2B5EF4-FFF2-40B4-BE49-F238E27FC236}">
+                <a16:creationId xmlns:a16="http://schemas.microsoft.com/office/drawing/2014/main" id="{D1195281-886B-21E0-3578-5D195C47154A}"/>
+              </a:ext>
+            </a:extLst>
+          </p:cNvPr>
+          <p:cNvSpPr txBox="1"/>
+          <p:nvPr/>
+        </p:nvSpPr>
+        <p:spPr>
+          <a:xfrm>
+            <a:off x="11476013" y="7825666"/>
+            <a:ext cx="479618" cy="369332"/>
+          </a:xfrm>
+          <a:prstGeom prst="rect">
+            <a:avLst/>
+          </a:prstGeom>
+          <a:solidFill>
+            <a:schemeClr val="bg1"/>
+          </a:solidFill>
+          <a:ln w="28575">
+            <a:solidFill>
+              <a:schemeClr val="accent1">
+                <a:lumMod val="75000"/>
+              </a:schemeClr>
+            </a:solidFill>
+          </a:ln>
+        </p:spPr>
+        <p:txBody>
+          <a:bodyPr wrap="none" rtlCol="0">
+            <a:spAutoFit/>
+          </a:bodyPr>
+          <a:lstStyle/>
+          <a:p>
+            <a:r>
+              <a:rPr lang="en-US" b="1" dirty="0">
+                <a:latin typeface="Arial" panose="020B0604020202020204" pitchFamily="34" charset="0"/>
+                <a:cs typeface="Arial" panose="020B0604020202020204" pitchFamily="34" charset="0"/>
+              </a:rPr>
+              <a:t>H2</a:t>
+            </a:r>
+          </a:p>
+        </p:txBody>
+      </p:sp>
+      <p:sp>
+        <p:nvSpPr>
+          <p:cNvPr id="8" name="TextBox 7">
+            <a:extLst>
+              <a:ext uri="{FF2B5EF4-FFF2-40B4-BE49-F238E27FC236}">
+                <a16:creationId xmlns:a16="http://schemas.microsoft.com/office/drawing/2014/main" id="{5B6C2198-EDB1-9DCC-4D28-50B37F8FAD65}"/>
+              </a:ext>
+            </a:extLst>
+          </p:cNvPr>
+          <p:cNvSpPr txBox="1"/>
+          <p:nvPr/>
+        </p:nvSpPr>
+        <p:spPr>
+          <a:xfrm>
+            <a:off x="12440524" y="6792861"/>
+            <a:ext cx="479618" cy="369332"/>
+          </a:xfrm>
+          <a:prstGeom prst="rect">
+            <a:avLst/>
+          </a:prstGeom>
+          <a:solidFill>
+            <a:schemeClr val="bg1"/>
+          </a:solidFill>
+          <a:ln w="28575">
+            <a:solidFill>
+              <a:srgbClr val="C00000"/>
+            </a:solidFill>
+          </a:ln>
+        </p:spPr>
+        <p:txBody>
+          <a:bodyPr wrap="none" rtlCol="0">
+            <a:spAutoFit/>
+          </a:bodyPr>
+          <a:lstStyle/>
+          <a:p>
+            <a:r>
+              <a:rPr lang="en-US" b="1" dirty="0">
+                <a:latin typeface="Arial" panose="020B0604020202020204" pitchFamily="34" charset="0"/>
+                <a:cs typeface="Arial" panose="020B0604020202020204" pitchFamily="34" charset="0"/>
+              </a:rPr>
+              <a:t>H2</a:t>
+            </a:r>
+          </a:p>
+        </p:txBody>
+      </p:sp>
+      <p:sp>
+        <p:nvSpPr>
+          <p:cNvPr id="9" name="TextBox 8">
+            <a:extLst>
+              <a:ext uri="{FF2B5EF4-FFF2-40B4-BE49-F238E27FC236}">
+                <a16:creationId xmlns:a16="http://schemas.microsoft.com/office/drawing/2014/main" id="{8DB1F056-2687-19E2-C5AE-15A91D190D59}"/>
+              </a:ext>
+            </a:extLst>
+          </p:cNvPr>
+          <p:cNvSpPr txBox="1"/>
+          <p:nvPr/>
+        </p:nvSpPr>
+        <p:spPr>
+          <a:xfrm>
+            <a:off x="13624624" y="6792861"/>
+            <a:ext cx="479618" cy="369332"/>
+          </a:xfrm>
+          <a:prstGeom prst="rect">
+            <a:avLst/>
+          </a:prstGeom>
+          <a:solidFill>
+            <a:schemeClr val="bg1"/>
+          </a:solidFill>
+          <a:ln w="28575">
+            <a:solidFill>
+              <a:srgbClr val="C00000"/>
+            </a:solidFill>
+          </a:ln>
+        </p:spPr>
+        <p:txBody>
+          <a:bodyPr wrap="none" rtlCol="0">
+            <a:spAutoFit/>
+          </a:bodyPr>
+          <a:lstStyle/>
+          <a:p>
+            <a:r>
+              <a:rPr lang="en-US" b="1" dirty="0">
+                <a:latin typeface="Arial" panose="020B0604020202020204" pitchFamily="34" charset="0"/>
+                <a:cs typeface="Arial" panose="020B0604020202020204" pitchFamily="34" charset="0"/>
+              </a:rPr>
+              <a:t>H3</a:t>
+            </a:r>
+          </a:p>
+        </p:txBody>
+      </p:sp>
+      <p:sp>
+        <p:nvSpPr>
+          <p:cNvPr id="10" name="TextBox 9">
+            <a:extLst>
+              <a:ext uri="{FF2B5EF4-FFF2-40B4-BE49-F238E27FC236}">
+                <a16:creationId xmlns:a16="http://schemas.microsoft.com/office/drawing/2014/main" id="{1D1D7343-E1F1-392B-7D98-995F8F015045}"/>
+              </a:ext>
+            </a:extLst>
+          </p:cNvPr>
+          <p:cNvSpPr txBox="1"/>
+          <p:nvPr/>
+        </p:nvSpPr>
+        <p:spPr>
+          <a:xfrm>
+            <a:off x="13624624" y="8895919"/>
+            <a:ext cx="479618" cy="369332"/>
+          </a:xfrm>
+          <a:prstGeom prst="rect">
+            <a:avLst/>
+          </a:prstGeom>
+          <a:solidFill>
+            <a:schemeClr val="bg1"/>
+          </a:solidFill>
+          <a:ln w="28575">
+            <a:solidFill>
+              <a:srgbClr val="C00000"/>
+            </a:solidFill>
+          </a:ln>
+        </p:spPr>
+        <p:txBody>
+          <a:bodyPr wrap="none" rtlCol="0">
+            <a:spAutoFit/>
+          </a:bodyPr>
+          <a:lstStyle/>
+          <a:p>
+            <a:r>
+              <a:rPr lang="en-US" b="1" dirty="0">
+                <a:latin typeface="Arial" panose="020B0604020202020204" pitchFamily="34" charset="0"/>
+                <a:cs typeface="Arial" panose="020B0604020202020204" pitchFamily="34" charset="0"/>
+              </a:rPr>
+              <a:t>H3</a:t>
+            </a:r>
+          </a:p>
+        </p:txBody>
+      </p:sp>
+      <p:sp>
+        <p:nvSpPr>
+          <p:cNvPr id="13" name="TextBox 12">
+            <a:extLst>
+              <a:ext uri="{FF2B5EF4-FFF2-40B4-BE49-F238E27FC236}">
+                <a16:creationId xmlns:a16="http://schemas.microsoft.com/office/drawing/2014/main" id="{DF650EA5-7739-1BC9-E264-CE5492D01978}"/>
+              </a:ext>
+            </a:extLst>
+          </p:cNvPr>
+          <p:cNvSpPr txBox="1"/>
+          <p:nvPr/>
+        </p:nvSpPr>
+        <p:spPr>
+          <a:xfrm>
+            <a:off x="8524251" y="7598863"/>
+            <a:ext cx="479618" cy="369332"/>
+          </a:xfrm>
+          <a:prstGeom prst="rect">
+            <a:avLst/>
+          </a:prstGeom>
+          <a:solidFill>
+            <a:schemeClr val="bg1"/>
+          </a:solidFill>
+          <a:ln w="28575">
+            <a:solidFill>
+              <a:schemeClr val="accent1">
+                <a:lumMod val="75000"/>
+              </a:schemeClr>
+            </a:solidFill>
+          </a:ln>
+        </p:spPr>
+        <p:txBody>
+          <a:bodyPr wrap="none" rtlCol="0">
+            <a:spAutoFit/>
+          </a:bodyPr>
+          <a:lstStyle/>
+          <a:p>
+            <a:r>
+              <a:rPr lang="en-US" b="1" dirty="0">
+                <a:latin typeface="Arial" panose="020B0604020202020204" pitchFamily="34" charset="0"/>
+                <a:cs typeface="Arial" panose="020B0604020202020204" pitchFamily="34" charset="0"/>
+              </a:rPr>
+              <a:t>H1</a:t>
+            </a:r>
+          </a:p>
+        </p:txBody>
+      </p:sp>
+      <p:sp>
+        <p:nvSpPr>
+          <p:cNvPr id="14" name="TextBox 13">
+            <a:extLst>
+              <a:ext uri="{FF2B5EF4-FFF2-40B4-BE49-F238E27FC236}">
+                <a16:creationId xmlns:a16="http://schemas.microsoft.com/office/drawing/2014/main" id="{8FBD59DE-BF15-7C30-3D5D-51BFDF7845BA}"/>
+              </a:ext>
+            </a:extLst>
+          </p:cNvPr>
+          <p:cNvSpPr txBox="1"/>
+          <p:nvPr/>
+        </p:nvSpPr>
+        <p:spPr>
+          <a:xfrm>
+            <a:off x="10230954" y="8894216"/>
+            <a:ext cx="479618" cy="369332"/>
+          </a:xfrm>
+          <a:prstGeom prst="rect">
+            <a:avLst/>
+          </a:prstGeom>
+          <a:solidFill>
+            <a:schemeClr val="bg1"/>
+          </a:solidFill>
+          <a:ln w="28575">
+            <a:solidFill>
+              <a:schemeClr val="accent1">
+                <a:lumMod val="75000"/>
+              </a:schemeClr>
+            </a:solidFill>
+          </a:ln>
+        </p:spPr>
+        <p:txBody>
+          <a:bodyPr wrap="none" rtlCol="0">
+            <a:spAutoFit/>
+          </a:bodyPr>
+          <a:lstStyle/>
+          <a:p>
+            <a:r>
+              <a:rPr lang="en-US" b="1" dirty="0">
+                <a:latin typeface="Arial" panose="020B0604020202020204" pitchFamily="34" charset="0"/>
+                <a:cs typeface="Arial" panose="020B0604020202020204" pitchFamily="34" charset="0"/>
+              </a:rPr>
+              <a:t>H1</a:t>
+            </a:r>
+          </a:p>
+        </p:txBody>
+      </p:sp>
+      <p:sp>
+        <p:nvSpPr>
+          <p:cNvPr id="15" name="TextBox 14">
+            <a:extLst>
+              <a:ext uri="{FF2B5EF4-FFF2-40B4-BE49-F238E27FC236}">
+                <a16:creationId xmlns:a16="http://schemas.microsoft.com/office/drawing/2014/main" id="{ED2782B1-6B79-FF48-1706-7B6F70E2F720}"/>
+              </a:ext>
+            </a:extLst>
+          </p:cNvPr>
+          <p:cNvSpPr txBox="1"/>
+          <p:nvPr/>
+        </p:nvSpPr>
+        <p:spPr>
+          <a:xfrm>
+            <a:off x="16807325" y="6126900"/>
+            <a:ext cx="479618" cy="369332"/>
+          </a:xfrm>
+          <a:prstGeom prst="rect">
+            <a:avLst/>
+          </a:prstGeom>
+          <a:solidFill>
+            <a:schemeClr val="bg1"/>
+          </a:solidFill>
+          <a:ln w="28575">
+            <a:solidFill>
+              <a:schemeClr val="accent1">
+                <a:lumMod val="75000"/>
+              </a:schemeClr>
+            </a:solidFill>
+          </a:ln>
+        </p:spPr>
+        <p:txBody>
+          <a:bodyPr wrap="none" rtlCol="0">
+            <a:spAutoFit/>
+          </a:bodyPr>
+          <a:lstStyle/>
+          <a:p>
+            <a:r>
+              <a:rPr lang="en-US" b="1" dirty="0">
+                <a:latin typeface="Arial" panose="020B0604020202020204" pitchFamily="34" charset="0"/>
+                <a:cs typeface="Arial" panose="020B0604020202020204" pitchFamily="34" charset="0"/>
+              </a:rPr>
+              <a:t>H3</a:t>
+            </a:r>
+          </a:p>
+        </p:txBody>
+      </p:sp>
+      <p:sp>
+        <p:nvSpPr>
+          <p:cNvPr id="16" name="TextBox 15">
+            <a:extLst>
+              <a:ext uri="{FF2B5EF4-FFF2-40B4-BE49-F238E27FC236}">
+                <a16:creationId xmlns:a16="http://schemas.microsoft.com/office/drawing/2014/main" id="{D349C3C0-91D3-F7D1-7109-C109AE285947}"/>
+              </a:ext>
+            </a:extLst>
+          </p:cNvPr>
+          <p:cNvSpPr txBox="1"/>
+          <p:nvPr/>
+        </p:nvSpPr>
+        <p:spPr>
+          <a:xfrm>
+            <a:off x="16807325" y="9567635"/>
+            <a:ext cx="479618" cy="369332"/>
+          </a:xfrm>
+          <a:prstGeom prst="rect">
+            <a:avLst/>
+          </a:prstGeom>
+          <a:solidFill>
+            <a:schemeClr val="bg1"/>
+          </a:solidFill>
+          <a:ln w="28575">
+            <a:solidFill>
+              <a:schemeClr val="accent1">
+                <a:lumMod val="75000"/>
+              </a:schemeClr>
+            </a:solidFill>
+          </a:ln>
+        </p:spPr>
+        <p:txBody>
+          <a:bodyPr wrap="none" rtlCol="0">
+            <a:spAutoFit/>
+          </a:bodyPr>
+          <a:lstStyle/>
+          <a:p>
+            <a:r>
+              <a:rPr lang="en-US" b="1" dirty="0">
+                <a:latin typeface="Arial" panose="020B0604020202020204" pitchFamily="34" charset="0"/>
+                <a:cs typeface="Arial" panose="020B0604020202020204" pitchFamily="34" charset="0"/>
+              </a:rPr>
+              <a:t>H3</a:t>
+            </a:r>
+          </a:p>
+        </p:txBody>
+      </p:sp>
     </p:spTree>
     <p:extLst>
       <p:ext uri="{BB962C8B-B14F-4D97-AF65-F5344CB8AC3E}">
         <p14:creationId xmlns:p14="http://schemas.microsoft.com/office/powerpoint/2010/main" val="827455332"/>
+      </p:ext>
+    </p:extLst>
+  </p:cSld>
+  <p:clrMapOvr>
+    <a:masterClrMapping/>
+  </p:clrMapOvr>
+</p:sld>
+</file>
+
+<file path=ppt/slides/slide6.xml><?xml version="1.0" encoding="utf-8"?>
+<p:sld xmlns:a="http://schemas.openxmlformats.org/drawingml/2006/main" xmlns:r="http://schemas.openxmlformats.org/officeDocument/2006/relationships" xmlns:p="http://schemas.openxmlformats.org/presentationml/2006/main">
+  <p:cSld>
+    <p:spTree>
+      <p:nvGrpSpPr>
+        <p:cNvPr id="1" name=""/>
+        <p:cNvGrpSpPr/>
+        <p:nvPr/>
+      </p:nvGrpSpPr>
+      <p:grpSpPr>
+        <a:xfrm>
+          <a:off x="0" y="0"/>
+          <a:ext cx="0" cy="0"/>
+          <a:chOff x="0" y="0"/>
+          <a:chExt cx="0" cy="0"/>
+        </a:xfrm>
+      </p:grpSpPr>
+      <p:cxnSp>
+        <p:nvCxnSpPr>
+          <p:cNvPr id="138" name="Straight Arrow Connector 137">
+            <a:extLst>
+              <a:ext uri="{FF2B5EF4-FFF2-40B4-BE49-F238E27FC236}">
+                <a16:creationId xmlns:a16="http://schemas.microsoft.com/office/drawing/2014/main" id="{178CBA08-89EC-294E-0EC2-191244E430D5}"/>
+              </a:ext>
+            </a:extLst>
+          </p:cNvPr>
+          <p:cNvCxnSpPr/>
+          <p:nvPr/>
+        </p:nvCxnSpPr>
+        <p:spPr>
+          <a:xfrm>
+            <a:off x="9107417" y="9291918"/>
+            <a:ext cx="5556606" cy="0"/>
+          </a:xfrm>
+          <a:prstGeom prst="straightConnector1">
+            <a:avLst/>
+          </a:prstGeom>
+          <a:ln w="54483">
+            <a:solidFill>
+              <a:srgbClr val="C00000">
+                <a:alpha val="50000"/>
+              </a:srgbClr>
+            </a:solidFill>
+            <a:tailEnd type="triangle"/>
+          </a:ln>
+        </p:spPr>
+        <p:style>
+          <a:lnRef idx="1">
+            <a:schemeClr val="accent1"/>
+          </a:lnRef>
+          <a:fillRef idx="0">
+            <a:schemeClr val="accent1"/>
+          </a:fillRef>
+          <a:effectRef idx="0">
+            <a:schemeClr val="accent1"/>
+          </a:effectRef>
+          <a:fontRef idx="minor">
+            <a:schemeClr val="tx1"/>
+          </a:fontRef>
+        </p:style>
+      </p:cxnSp>
+      <p:cxnSp>
+        <p:nvCxnSpPr>
+          <p:cNvPr id="34" name="Elbow Connector 33">
+            <a:extLst>
+              <a:ext uri="{FF2B5EF4-FFF2-40B4-BE49-F238E27FC236}">
+                <a16:creationId xmlns:a16="http://schemas.microsoft.com/office/drawing/2014/main" id="{8FDC0034-D082-9352-93D2-19853D94A13E}"/>
+              </a:ext>
+            </a:extLst>
+          </p:cNvPr>
+          <p:cNvCxnSpPr>
+            <a:cxnSpLocks/>
+          </p:cNvCxnSpPr>
+          <p:nvPr/>
+        </p:nvCxnSpPr>
+        <p:spPr>
+          <a:xfrm flipV="1">
+            <a:off x="10712812" y="7281586"/>
+            <a:ext cx="3985691" cy="346965"/>
+          </a:xfrm>
+          <a:prstGeom prst="bentConnector3">
+            <a:avLst>
+              <a:gd name="adj1" fmla="val 742"/>
+            </a:avLst>
+          </a:prstGeom>
+          <a:ln w="33655">
+            <a:solidFill>
+              <a:schemeClr val="accent1">
+                <a:lumMod val="75000"/>
+                <a:alpha val="50000"/>
+              </a:schemeClr>
+            </a:solidFill>
+            <a:tailEnd type="triangle"/>
+          </a:ln>
+        </p:spPr>
+        <p:style>
+          <a:lnRef idx="1">
+            <a:schemeClr val="accent1"/>
+          </a:lnRef>
+          <a:fillRef idx="0">
+            <a:schemeClr val="accent1"/>
+          </a:fillRef>
+          <a:effectRef idx="0">
+            <a:schemeClr val="accent1"/>
+          </a:effectRef>
+          <a:fontRef idx="minor">
+            <a:schemeClr val="tx1"/>
+          </a:fontRef>
+        </p:style>
+      </p:cxnSp>
+      <p:cxnSp>
+        <p:nvCxnSpPr>
+          <p:cNvPr id="31" name="Elbow Connector 30">
+            <a:extLst>
+              <a:ext uri="{FF2B5EF4-FFF2-40B4-BE49-F238E27FC236}">
+                <a16:creationId xmlns:a16="http://schemas.microsoft.com/office/drawing/2014/main" id="{C7EFE26F-7F6A-1C58-17DB-D9A4DE6DA6A4}"/>
+              </a:ext>
+            </a:extLst>
+          </p:cNvPr>
+          <p:cNvCxnSpPr>
+            <a:cxnSpLocks/>
+          </p:cNvCxnSpPr>
+          <p:nvPr/>
+        </p:nvCxnSpPr>
+        <p:spPr>
+          <a:xfrm rot="16200000" flipH="1">
+            <a:off x="8530795" y="6749500"/>
+            <a:ext cx="601182" cy="1459355"/>
+          </a:xfrm>
+          <a:prstGeom prst="bentConnector2">
+            <a:avLst/>
+          </a:prstGeom>
+          <a:ln w="21463">
+            <a:solidFill>
+              <a:schemeClr val="accent1">
+                <a:lumMod val="75000"/>
+              </a:schemeClr>
+            </a:solidFill>
+            <a:tailEnd type="triangle"/>
+          </a:ln>
+        </p:spPr>
+        <p:style>
+          <a:lnRef idx="1">
+            <a:schemeClr val="accent1"/>
+          </a:lnRef>
+          <a:fillRef idx="0">
+            <a:schemeClr val="accent1"/>
+          </a:fillRef>
+          <a:effectRef idx="0">
+            <a:schemeClr val="accent1"/>
+          </a:effectRef>
+          <a:fontRef idx="minor">
+            <a:schemeClr val="tx1"/>
+          </a:fontRef>
+        </p:style>
+      </p:cxnSp>
+      <p:cxnSp>
+        <p:nvCxnSpPr>
+          <p:cNvPr id="32" name="Elbow Connector 31">
+            <a:extLst>
+              <a:ext uri="{FF2B5EF4-FFF2-40B4-BE49-F238E27FC236}">
+                <a16:creationId xmlns:a16="http://schemas.microsoft.com/office/drawing/2014/main" id="{7C00614C-0DD8-B171-CDE2-93D6B6F27D64}"/>
+              </a:ext>
+            </a:extLst>
+          </p:cNvPr>
+          <p:cNvCxnSpPr>
+            <a:cxnSpLocks/>
+          </p:cNvCxnSpPr>
+          <p:nvPr/>
+        </p:nvCxnSpPr>
+        <p:spPr>
+          <a:xfrm rot="5400000" flipH="1" flipV="1">
+            <a:off x="8514109" y="7789409"/>
+            <a:ext cx="634554" cy="1459355"/>
+          </a:xfrm>
+          <a:prstGeom prst="bentConnector2">
+            <a:avLst/>
+          </a:prstGeom>
+          <a:ln w="17780">
+            <a:solidFill>
+              <a:srgbClr val="C00000"/>
+            </a:solidFill>
+            <a:tailEnd type="triangle"/>
+          </a:ln>
+        </p:spPr>
+        <p:style>
+          <a:lnRef idx="1">
+            <a:schemeClr val="accent1"/>
+          </a:lnRef>
+          <a:fillRef idx="0">
+            <a:schemeClr val="accent1"/>
+          </a:fillRef>
+          <a:effectRef idx="0">
+            <a:schemeClr val="accent1"/>
+          </a:effectRef>
+          <a:fontRef idx="minor">
+            <a:schemeClr val="tx1"/>
+          </a:fontRef>
+        </p:style>
+      </p:cxnSp>
+      <p:sp>
+        <p:nvSpPr>
+          <p:cNvPr id="7" name="TextBox 6">
+            <a:extLst>
+              <a:ext uri="{FF2B5EF4-FFF2-40B4-BE49-F238E27FC236}">
+                <a16:creationId xmlns:a16="http://schemas.microsoft.com/office/drawing/2014/main" id="{FC38E1C0-39FA-01E4-275A-AD658AC19E24}"/>
+              </a:ext>
+            </a:extLst>
+          </p:cNvPr>
+          <p:cNvSpPr txBox="1"/>
+          <p:nvPr/>
+        </p:nvSpPr>
+        <p:spPr>
+          <a:xfrm>
+            <a:off x="298580" y="17504229"/>
+            <a:ext cx="2180533" cy="369332"/>
+          </a:xfrm>
+          <a:prstGeom prst="rect">
+            <a:avLst/>
+          </a:prstGeom>
+          <a:noFill/>
+        </p:spPr>
+        <p:txBody>
+          <a:bodyPr wrap="none" rtlCol="0">
+            <a:spAutoFit/>
+          </a:bodyPr>
+          <a:lstStyle/>
+          <a:p>
+            <a:r>
+              <a:rPr lang="en-US" dirty="0"/>
+              <a:t>manuscript main text</a:t>
+            </a:r>
+          </a:p>
+        </p:txBody>
+      </p:sp>
+      <p:cxnSp>
+        <p:nvCxnSpPr>
+          <p:cNvPr id="43" name="Straight Arrow Connector 42">
+            <a:extLst>
+              <a:ext uri="{FF2B5EF4-FFF2-40B4-BE49-F238E27FC236}">
+                <a16:creationId xmlns:a16="http://schemas.microsoft.com/office/drawing/2014/main" id="{6C8D84F6-E7F2-457E-C6CE-71B0F87335B1}"/>
+              </a:ext>
+            </a:extLst>
+          </p:cNvPr>
+          <p:cNvCxnSpPr>
+            <a:cxnSpLocks/>
+          </p:cNvCxnSpPr>
+          <p:nvPr/>
+        </p:nvCxnSpPr>
+        <p:spPr>
+          <a:xfrm>
+            <a:off x="11380462" y="8009416"/>
+            <a:ext cx="892510" cy="0"/>
+          </a:xfrm>
+          <a:prstGeom prst="straightConnector1">
+            <a:avLst/>
+          </a:prstGeom>
+          <a:ln w="66675">
+            <a:solidFill>
+              <a:schemeClr val="accent1">
+                <a:lumMod val="75000"/>
+              </a:schemeClr>
+            </a:solidFill>
+            <a:tailEnd type="triangle"/>
+          </a:ln>
+        </p:spPr>
+        <p:style>
+          <a:lnRef idx="1">
+            <a:schemeClr val="accent1"/>
+          </a:lnRef>
+          <a:fillRef idx="0">
+            <a:schemeClr val="accent1"/>
+          </a:fillRef>
+          <a:effectRef idx="0">
+            <a:schemeClr val="accent1"/>
+          </a:effectRef>
+          <a:fontRef idx="minor">
+            <a:schemeClr val="tx1"/>
+          </a:fontRef>
+        </p:style>
+      </p:cxnSp>
+      <p:cxnSp>
+        <p:nvCxnSpPr>
+          <p:cNvPr id="45" name="Straight Arrow Connector 44">
+            <a:extLst>
+              <a:ext uri="{FF2B5EF4-FFF2-40B4-BE49-F238E27FC236}">
+                <a16:creationId xmlns:a16="http://schemas.microsoft.com/office/drawing/2014/main" id="{6071B235-6C4D-6C35-571A-EA3AE9A92167}"/>
+              </a:ext>
+            </a:extLst>
+          </p:cNvPr>
+          <p:cNvCxnSpPr>
+            <a:cxnSpLocks/>
+          </p:cNvCxnSpPr>
+          <p:nvPr/>
+        </p:nvCxnSpPr>
+        <p:spPr>
+          <a:xfrm>
+            <a:off x="12695276" y="6472734"/>
+            <a:ext cx="0" cy="1098071"/>
+          </a:xfrm>
+          <a:prstGeom prst="straightConnector1">
+            <a:avLst/>
+          </a:prstGeom>
+          <a:ln w="19685">
+            <a:solidFill>
+              <a:srgbClr val="C00000"/>
+            </a:solidFill>
+            <a:tailEnd type="triangle"/>
+          </a:ln>
+        </p:spPr>
+        <p:style>
+          <a:lnRef idx="1">
+            <a:schemeClr val="accent1"/>
+          </a:lnRef>
+          <a:fillRef idx="0">
+            <a:schemeClr val="accent1"/>
+          </a:fillRef>
+          <a:effectRef idx="0">
+            <a:schemeClr val="accent1"/>
+          </a:effectRef>
+          <a:fontRef idx="minor">
+            <a:schemeClr val="tx1"/>
+          </a:fontRef>
+        </p:style>
+      </p:cxnSp>
+      <p:cxnSp>
+        <p:nvCxnSpPr>
+          <p:cNvPr id="50" name="Elbow Connector 49">
+            <a:extLst>
+              <a:ext uri="{FF2B5EF4-FFF2-40B4-BE49-F238E27FC236}">
+                <a16:creationId xmlns:a16="http://schemas.microsoft.com/office/drawing/2014/main" id="{1A91E203-0108-68AF-3E35-4118D6B6B8BA}"/>
+              </a:ext>
+            </a:extLst>
+          </p:cNvPr>
+          <p:cNvCxnSpPr>
+            <a:stCxn id="24" idx="0"/>
+            <a:endCxn id="20" idx="1"/>
+          </p:cNvCxnSpPr>
+          <p:nvPr/>
+        </p:nvCxnSpPr>
+        <p:spPr>
+          <a:xfrm rot="5400000" flipH="1" flipV="1">
+            <a:off x="13651245" y="6523550"/>
+            <a:ext cx="589520" cy="1504991"/>
+          </a:xfrm>
+          <a:prstGeom prst="bentConnector2">
+            <a:avLst/>
+          </a:prstGeom>
+          <a:ln w="76200">
+            <a:solidFill>
+              <a:schemeClr val="bg1">
+                <a:lumMod val="75000"/>
+              </a:schemeClr>
+            </a:solidFill>
+            <a:prstDash val="sysDash"/>
+            <a:tailEnd type="triangle"/>
+          </a:ln>
+        </p:spPr>
+        <p:style>
+          <a:lnRef idx="1">
+            <a:schemeClr val="accent1"/>
+          </a:lnRef>
+          <a:fillRef idx="0">
+            <a:schemeClr val="accent1"/>
+          </a:fillRef>
+          <a:effectRef idx="0">
+            <a:schemeClr val="accent1"/>
+          </a:effectRef>
+          <a:fontRef idx="minor">
+            <a:schemeClr val="tx1"/>
+          </a:fontRef>
+        </p:style>
+      </p:cxnSp>
+      <p:cxnSp>
+        <p:nvCxnSpPr>
+          <p:cNvPr id="51" name="Elbow Connector 50">
+            <a:extLst>
+              <a:ext uri="{FF2B5EF4-FFF2-40B4-BE49-F238E27FC236}">
+                <a16:creationId xmlns:a16="http://schemas.microsoft.com/office/drawing/2014/main" id="{4B9A6050-891E-DD21-BF59-4A2C98309D21}"/>
+              </a:ext>
+            </a:extLst>
+          </p:cNvPr>
+          <p:cNvCxnSpPr>
+            <a:cxnSpLocks/>
+            <a:stCxn id="24" idx="2"/>
+            <a:endCxn id="17" idx="1"/>
+          </p:cNvCxnSpPr>
+          <p:nvPr/>
+        </p:nvCxnSpPr>
+        <p:spPr>
+          <a:xfrm rot="16200000" flipH="1">
+            <a:off x="13628728" y="8012809"/>
+            <a:ext cx="634555" cy="1504991"/>
+          </a:xfrm>
+          <a:prstGeom prst="bentConnector2">
+            <a:avLst/>
+          </a:prstGeom>
+          <a:ln w="63119">
+            <a:solidFill>
+              <a:srgbClr val="C00000"/>
+            </a:solidFill>
+            <a:tailEnd type="triangle"/>
+          </a:ln>
+        </p:spPr>
+        <p:style>
+          <a:lnRef idx="1">
+            <a:schemeClr val="accent1"/>
+          </a:lnRef>
+          <a:fillRef idx="0">
+            <a:schemeClr val="accent1"/>
+          </a:fillRef>
+          <a:effectRef idx="0">
+            <a:schemeClr val="accent1"/>
+          </a:effectRef>
+          <a:fontRef idx="minor">
+            <a:schemeClr val="tx1"/>
+          </a:fontRef>
+        </p:style>
+      </p:cxnSp>
+      <p:cxnSp>
+        <p:nvCxnSpPr>
+          <p:cNvPr id="57" name="Elbow Connector 56">
+            <a:extLst>
+              <a:ext uri="{FF2B5EF4-FFF2-40B4-BE49-F238E27FC236}">
+                <a16:creationId xmlns:a16="http://schemas.microsoft.com/office/drawing/2014/main" id="{C692133E-2952-0ECD-87D3-B8F051B6F346}"/>
+              </a:ext>
+            </a:extLst>
+          </p:cNvPr>
+          <p:cNvCxnSpPr>
+            <a:cxnSpLocks/>
+            <a:stCxn id="20" idx="0"/>
+            <a:endCxn id="11" idx="0"/>
+          </p:cNvCxnSpPr>
+          <p:nvPr/>
+        </p:nvCxnSpPr>
+        <p:spPr>
+          <a:xfrm rot="16200000" flipH="1">
+            <a:off x="16216008" y="5934864"/>
+            <a:ext cx="1061295" cy="2276912"/>
+          </a:xfrm>
+          <a:prstGeom prst="bentConnector3">
+            <a:avLst>
+              <a:gd name="adj1" fmla="val -21540"/>
+            </a:avLst>
+          </a:prstGeom>
+          <a:ln w="187198">
+            <a:solidFill>
+              <a:schemeClr val="accent1">
+                <a:lumMod val="75000"/>
+              </a:schemeClr>
+            </a:solidFill>
+            <a:tailEnd type="triangle"/>
+          </a:ln>
+        </p:spPr>
+        <p:style>
+          <a:lnRef idx="1">
+            <a:schemeClr val="accent1"/>
+          </a:lnRef>
+          <a:fillRef idx="0">
+            <a:schemeClr val="accent1"/>
+          </a:fillRef>
+          <a:effectRef idx="0">
+            <a:schemeClr val="accent1"/>
+          </a:effectRef>
+          <a:fontRef idx="minor">
+            <a:schemeClr val="tx1"/>
+          </a:fontRef>
+        </p:style>
+      </p:cxnSp>
+      <p:cxnSp>
+        <p:nvCxnSpPr>
+          <p:cNvPr id="58" name="Elbow Connector 57">
+            <a:extLst>
+              <a:ext uri="{FF2B5EF4-FFF2-40B4-BE49-F238E27FC236}">
+                <a16:creationId xmlns:a16="http://schemas.microsoft.com/office/drawing/2014/main" id="{2A6C5F73-DA31-2131-4A22-7E2D5FC27865}"/>
+              </a:ext>
+            </a:extLst>
+          </p:cNvPr>
+          <p:cNvCxnSpPr>
+            <a:cxnSpLocks/>
+            <a:stCxn id="17" idx="2"/>
+            <a:endCxn id="11" idx="2"/>
+          </p:cNvCxnSpPr>
+          <p:nvPr/>
+        </p:nvCxnSpPr>
+        <p:spPr>
+          <a:xfrm rot="5400000" flipH="1" flipV="1">
+            <a:off x="16226654" y="7862737"/>
+            <a:ext cx="1040003" cy="2276912"/>
+          </a:xfrm>
+          <a:prstGeom prst="bentConnector3">
+            <a:avLst>
+              <a:gd name="adj1" fmla="val -21981"/>
+            </a:avLst>
+          </a:prstGeom>
+          <a:ln w="164719">
+            <a:solidFill>
+              <a:schemeClr val="accent1">
+                <a:lumMod val="75000"/>
+              </a:schemeClr>
+            </a:solidFill>
+            <a:tailEnd type="triangle"/>
+          </a:ln>
+        </p:spPr>
+        <p:style>
+          <a:lnRef idx="1">
+            <a:schemeClr val="accent1"/>
+          </a:lnRef>
+          <a:fillRef idx="0">
+            <a:schemeClr val="accent1"/>
+          </a:fillRef>
+          <a:effectRef idx="0">
+            <a:schemeClr val="accent1"/>
+          </a:effectRef>
+          <a:fontRef idx="minor">
+            <a:schemeClr val="tx1"/>
+          </a:fontRef>
+        </p:style>
+      </p:cxnSp>
+      <p:cxnSp>
+        <p:nvCxnSpPr>
+          <p:cNvPr id="158" name="Straight Arrow Connector 157">
+            <a:extLst>
+              <a:ext uri="{FF2B5EF4-FFF2-40B4-BE49-F238E27FC236}">
+                <a16:creationId xmlns:a16="http://schemas.microsoft.com/office/drawing/2014/main" id="{774FBE6D-425A-614C-E507-AC3AF7F3D74F}"/>
+              </a:ext>
+            </a:extLst>
+          </p:cNvPr>
+          <p:cNvCxnSpPr>
+            <a:stCxn id="28" idx="2"/>
+            <a:endCxn id="23" idx="0"/>
+          </p:cNvCxnSpPr>
+          <p:nvPr/>
+        </p:nvCxnSpPr>
+        <p:spPr>
+          <a:xfrm>
+            <a:off x="10470763" y="6482167"/>
+            <a:ext cx="0" cy="1099316"/>
+          </a:xfrm>
+          <a:prstGeom prst="straightConnector1">
+            <a:avLst/>
+          </a:prstGeom>
+          <a:ln w="76200">
+            <a:solidFill>
+              <a:schemeClr val="accent1">
+                <a:lumMod val="75000"/>
+              </a:schemeClr>
+            </a:solidFill>
+            <a:tailEnd type="triangle"/>
+          </a:ln>
+        </p:spPr>
+        <p:style>
+          <a:lnRef idx="1">
+            <a:schemeClr val="accent1"/>
+          </a:lnRef>
+          <a:fillRef idx="0">
+            <a:schemeClr val="accent1"/>
+          </a:fillRef>
+          <a:effectRef idx="0">
+            <a:schemeClr val="accent1"/>
+          </a:effectRef>
+          <a:fontRef idx="minor">
+            <a:schemeClr val="tx1"/>
+          </a:fontRef>
+        </p:style>
+      </p:cxnSp>
+      <p:cxnSp>
+        <p:nvCxnSpPr>
+          <p:cNvPr id="160" name="Straight Arrow Connector 159">
+            <a:extLst>
+              <a:ext uri="{FF2B5EF4-FFF2-40B4-BE49-F238E27FC236}">
+                <a16:creationId xmlns:a16="http://schemas.microsoft.com/office/drawing/2014/main" id="{B7BC32FF-CA01-6112-27E7-E36B0ED38566}"/>
+              </a:ext>
+            </a:extLst>
+          </p:cNvPr>
+          <p:cNvCxnSpPr>
+            <a:stCxn id="12" idx="0"/>
+            <a:endCxn id="23" idx="2"/>
+          </p:cNvCxnSpPr>
+          <p:nvPr/>
+        </p:nvCxnSpPr>
+        <p:spPr>
+          <a:xfrm flipV="1">
+            <a:off x="10464413" y="8458706"/>
+            <a:ext cx="6350" cy="1079290"/>
+          </a:xfrm>
+          <a:prstGeom prst="straightConnector1">
+            <a:avLst/>
+          </a:prstGeom>
+          <a:ln w="172720">
+            <a:solidFill>
+              <a:schemeClr val="accent1">
+                <a:lumMod val="75000"/>
+              </a:schemeClr>
+            </a:solidFill>
+            <a:tailEnd type="triangle"/>
+          </a:ln>
+        </p:spPr>
+        <p:style>
+          <a:lnRef idx="1">
+            <a:schemeClr val="accent1"/>
+          </a:lnRef>
+          <a:fillRef idx="0">
+            <a:schemeClr val="accent1"/>
+          </a:fillRef>
+          <a:effectRef idx="0">
+            <a:schemeClr val="accent1"/>
+          </a:effectRef>
+          <a:fontRef idx="minor">
+            <a:schemeClr val="tx1"/>
+          </a:fontRef>
+        </p:style>
+      </p:cxnSp>
+      <p:sp>
+        <p:nvSpPr>
+          <p:cNvPr id="23" name="Rectangle 22">
+            <a:extLst>
+              <a:ext uri="{FF2B5EF4-FFF2-40B4-BE49-F238E27FC236}">
+                <a16:creationId xmlns:a16="http://schemas.microsoft.com/office/drawing/2014/main" id="{C3510981-FE55-509B-F5B4-9D8C4012346D}"/>
+              </a:ext>
+            </a:extLst>
+          </p:cNvPr>
+          <p:cNvSpPr/>
+          <p:nvPr/>
+        </p:nvSpPr>
+        <p:spPr>
+          <a:xfrm>
+            <a:off x="9561064" y="7581483"/>
+            <a:ext cx="1819398" cy="877223"/>
+          </a:xfrm>
+          <a:prstGeom prst="rect">
+            <a:avLst/>
+          </a:prstGeom>
+          <a:solidFill>
+            <a:schemeClr val="bg1"/>
+          </a:solidFill>
+          <a:ln w="38100">
+            <a:solidFill>
+              <a:schemeClr val="tx1"/>
+            </a:solidFill>
+          </a:ln>
+        </p:spPr>
+        <p:style>
+          <a:lnRef idx="2">
+            <a:schemeClr val="accent1">
+              <a:shade val="50000"/>
+            </a:schemeClr>
+          </a:lnRef>
+          <a:fillRef idx="1">
+            <a:schemeClr val="accent1"/>
+          </a:fillRef>
+          <a:effectRef idx="0">
+            <a:schemeClr val="accent1"/>
+          </a:effectRef>
+          <a:fontRef idx="minor">
+            <a:schemeClr val="lt1"/>
+          </a:fontRef>
+        </p:style>
+        <p:txBody>
+          <a:bodyPr rtlCol="0" anchor="ctr"/>
+          <a:lstStyle/>
+          <a:p>
+            <a:pPr algn="ctr"/>
+            <a:r>
+              <a:rPr lang="el-GR" sz="2400" b="1" i="1" dirty="0">
+                <a:solidFill>
+                  <a:schemeClr val="tx1"/>
+                </a:solidFill>
+                <a:latin typeface="Arial" panose="020B0604020202020204" pitchFamily="34" charset="0"/>
+                <a:cs typeface="Arial" panose="020B0604020202020204" pitchFamily="34" charset="0"/>
+              </a:rPr>
+              <a:t>β</a:t>
+            </a:r>
+            <a:endParaRPr lang="en-US" sz="2400" b="1" i="1" dirty="0">
+              <a:solidFill>
+                <a:schemeClr val="tx1"/>
+              </a:solidFill>
+              <a:latin typeface="Arial" panose="020B0604020202020204" pitchFamily="34" charset="0"/>
+              <a:cs typeface="Arial" panose="020B0604020202020204" pitchFamily="34" charset="0"/>
+            </a:endParaRPr>
+          </a:p>
+        </p:txBody>
+      </p:sp>
+      <p:sp>
+        <p:nvSpPr>
+          <p:cNvPr id="28" name="Rectangle 27">
+            <a:extLst>
+              <a:ext uri="{FF2B5EF4-FFF2-40B4-BE49-F238E27FC236}">
+                <a16:creationId xmlns:a16="http://schemas.microsoft.com/office/drawing/2014/main" id="{F9845BF1-920A-DFA4-A428-9653A04CD2C8}"/>
+              </a:ext>
+            </a:extLst>
+          </p:cNvPr>
+          <p:cNvSpPr/>
+          <p:nvPr/>
+        </p:nvSpPr>
+        <p:spPr>
+          <a:xfrm>
+            <a:off x="9561064" y="5604944"/>
+            <a:ext cx="1819398" cy="877223"/>
+          </a:xfrm>
+          <a:prstGeom prst="rect">
+            <a:avLst/>
+          </a:prstGeom>
+          <a:solidFill>
+            <a:schemeClr val="bg1"/>
+          </a:solidFill>
+          <a:ln w="38100">
+            <a:solidFill>
+              <a:schemeClr val="tx1"/>
+            </a:solidFill>
+          </a:ln>
+        </p:spPr>
+        <p:style>
+          <a:lnRef idx="2">
+            <a:schemeClr val="accent1">
+              <a:shade val="50000"/>
+            </a:schemeClr>
+          </a:lnRef>
+          <a:fillRef idx="1">
+            <a:schemeClr val="accent1"/>
+          </a:fillRef>
+          <a:effectRef idx="0">
+            <a:schemeClr val="accent1"/>
+          </a:effectRef>
+          <a:fontRef idx="minor">
+            <a:schemeClr val="lt1"/>
+          </a:fontRef>
+        </p:style>
+        <p:txBody>
+          <a:bodyPr rtlCol="0" anchor="ctr"/>
+          <a:lstStyle/>
+          <a:p>
+            <a:pPr algn="ctr"/>
+            <a:r>
+              <a:rPr lang="en-US" sz="2400" b="1" i="1" dirty="0">
+                <a:solidFill>
+                  <a:schemeClr val="tx1"/>
+                </a:solidFill>
+                <a:latin typeface="Arial" panose="020B0604020202020204" pitchFamily="34" charset="0"/>
+                <a:cs typeface="Arial" panose="020B0604020202020204" pitchFamily="34" charset="0"/>
+              </a:rPr>
+              <a:t>N</a:t>
+            </a:r>
+            <a:r>
+              <a:rPr lang="en-US" sz="2400" b="1" baseline="-25000" dirty="0">
+                <a:solidFill>
+                  <a:schemeClr val="tx1"/>
+                </a:solidFill>
+                <a:latin typeface="Arial" panose="020B0604020202020204" pitchFamily="34" charset="0"/>
+                <a:cs typeface="Arial" panose="020B0604020202020204" pitchFamily="34" charset="0"/>
+              </a:rPr>
+              <a:t>fixation</a:t>
+            </a:r>
+            <a:endParaRPr lang="en-US" sz="2400" i="1" dirty="0">
+              <a:solidFill>
+                <a:schemeClr val="tx1"/>
+              </a:solidFill>
+              <a:latin typeface="Arial" panose="020B0604020202020204" pitchFamily="34" charset="0"/>
+              <a:cs typeface="Arial" panose="020B0604020202020204" pitchFamily="34" charset="0"/>
+            </a:endParaRPr>
+          </a:p>
+        </p:txBody>
+      </p:sp>
+      <p:sp>
+        <p:nvSpPr>
+          <p:cNvPr id="11" name="Rectangle 10">
+            <a:extLst>
+              <a:ext uri="{FF2B5EF4-FFF2-40B4-BE49-F238E27FC236}">
+                <a16:creationId xmlns:a16="http://schemas.microsoft.com/office/drawing/2014/main" id="{612EA15D-68B8-4207-39F2-1F2B218F4B4D}"/>
+              </a:ext>
+            </a:extLst>
+          </p:cNvPr>
+          <p:cNvSpPr/>
+          <p:nvPr/>
+        </p:nvSpPr>
+        <p:spPr>
+          <a:xfrm>
+            <a:off x="16975413" y="7603968"/>
+            <a:ext cx="1819398" cy="877223"/>
+          </a:xfrm>
+          <a:prstGeom prst="rect">
+            <a:avLst/>
+          </a:prstGeom>
+          <a:solidFill>
+            <a:schemeClr val="bg1"/>
+          </a:solidFill>
+          <a:ln w="38100">
+            <a:solidFill>
+              <a:schemeClr val="tx1"/>
+            </a:solidFill>
+          </a:ln>
+        </p:spPr>
+        <p:style>
+          <a:lnRef idx="2">
+            <a:schemeClr val="accent1">
+              <a:shade val="50000"/>
+            </a:schemeClr>
+          </a:lnRef>
+          <a:fillRef idx="1">
+            <a:schemeClr val="accent1"/>
+          </a:fillRef>
+          <a:effectRef idx="0">
+            <a:schemeClr val="accent1"/>
+          </a:effectRef>
+          <a:fontRef idx="minor">
+            <a:schemeClr val="lt1"/>
+          </a:fontRef>
+        </p:style>
+        <p:txBody>
+          <a:bodyPr rtlCol="0" anchor="ctr"/>
+          <a:lstStyle/>
+          <a:p>
+            <a:pPr algn="ctr"/>
+            <a:r>
+              <a:rPr lang="el-GR" sz="2400" b="1" i="1" dirty="0">
+                <a:solidFill>
+                  <a:schemeClr val="tx1"/>
+                </a:solidFill>
+                <a:latin typeface="Arial" panose="020B0604020202020204" pitchFamily="34" charset="0"/>
+                <a:cs typeface="Arial" panose="020B0604020202020204" pitchFamily="34" charset="0"/>
+              </a:rPr>
+              <a:t>Ν</a:t>
+            </a:r>
+            <a:r>
+              <a:rPr lang="en-US" sz="2400" b="1" baseline="-25000" dirty="0">
+                <a:solidFill>
+                  <a:schemeClr val="tx1"/>
+                </a:solidFill>
+                <a:latin typeface="Arial" panose="020B0604020202020204" pitchFamily="34" charset="0"/>
+                <a:cs typeface="Arial" panose="020B0604020202020204" pitchFamily="34" charset="0"/>
+              </a:rPr>
+              <a:t>area</a:t>
+            </a:r>
+            <a:endParaRPr lang="en-US" sz="2400" b="1" i="1" dirty="0">
+              <a:solidFill>
+                <a:schemeClr val="tx1"/>
+              </a:solidFill>
+              <a:latin typeface="Arial" panose="020B0604020202020204" pitchFamily="34" charset="0"/>
+              <a:cs typeface="Arial" panose="020B0604020202020204" pitchFamily="34" charset="0"/>
+            </a:endParaRPr>
+          </a:p>
+        </p:txBody>
+      </p:sp>
+      <p:sp>
+        <p:nvSpPr>
+          <p:cNvPr id="17" name="Rectangle 16">
+            <a:extLst>
+              <a:ext uri="{FF2B5EF4-FFF2-40B4-BE49-F238E27FC236}">
+                <a16:creationId xmlns:a16="http://schemas.microsoft.com/office/drawing/2014/main" id="{5CF0D2AF-8598-6EDA-181B-6A30A35A32CE}"/>
+              </a:ext>
+            </a:extLst>
+          </p:cNvPr>
+          <p:cNvSpPr/>
+          <p:nvPr/>
+        </p:nvSpPr>
+        <p:spPr>
+          <a:xfrm>
+            <a:off x="14698501" y="8643971"/>
+            <a:ext cx="1819398" cy="877223"/>
+          </a:xfrm>
+          <a:prstGeom prst="rect">
+            <a:avLst/>
+          </a:prstGeom>
+          <a:solidFill>
+            <a:schemeClr val="bg1"/>
+          </a:solidFill>
+          <a:ln w="38100">
+            <a:solidFill>
+              <a:schemeClr val="tx1"/>
+            </a:solidFill>
+          </a:ln>
+        </p:spPr>
+        <p:style>
+          <a:lnRef idx="2">
+            <a:schemeClr val="accent1">
+              <a:shade val="50000"/>
+            </a:schemeClr>
+          </a:lnRef>
+          <a:fillRef idx="1">
+            <a:schemeClr val="accent1"/>
+          </a:fillRef>
+          <a:effectRef idx="0">
+            <a:schemeClr val="accent1"/>
+          </a:effectRef>
+          <a:fontRef idx="minor">
+            <a:schemeClr val="lt1"/>
+          </a:fontRef>
+        </p:style>
+        <p:txBody>
+          <a:bodyPr rtlCol="0" anchor="ctr"/>
+          <a:lstStyle/>
+          <a:p>
+            <a:pPr algn="ctr"/>
+            <a:r>
+              <a:rPr lang="en-US" sz="2400" b="1" i="1" dirty="0">
+                <a:solidFill>
+                  <a:schemeClr val="tx1"/>
+                </a:solidFill>
+                <a:latin typeface="Arial" panose="020B0604020202020204" pitchFamily="34" charset="0"/>
+                <a:cs typeface="Arial" panose="020B0604020202020204" pitchFamily="34" charset="0"/>
+              </a:rPr>
+              <a:t>M</a:t>
+            </a:r>
+            <a:r>
+              <a:rPr lang="en-US" sz="2400" b="1" baseline="-25000" dirty="0">
+                <a:solidFill>
+                  <a:schemeClr val="tx1"/>
+                </a:solidFill>
+                <a:latin typeface="Arial" panose="020B0604020202020204" pitchFamily="34" charset="0"/>
+                <a:cs typeface="Arial" panose="020B0604020202020204" pitchFamily="34" charset="0"/>
+              </a:rPr>
+              <a:t>area</a:t>
+            </a:r>
+            <a:endParaRPr lang="en-US" sz="2400" b="1" i="1" dirty="0">
+              <a:solidFill>
+                <a:schemeClr val="tx1"/>
+              </a:solidFill>
+              <a:latin typeface="Arial" panose="020B0604020202020204" pitchFamily="34" charset="0"/>
+              <a:cs typeface="Arial" panose="020B0604020202020204" pitchFamily="34" charset="0"/>
+            </a:endParaRPr>
+          </a:p>
+        </p:txBody>
+      </p:sp>
+      <p:sp>
+        <p:nvSpPr>
+          <p:cNvPr id="20" name="Rectangle 19">
+            <a:extLst>
+              <a:ext uri="{FF2B5EF4-FFF2-40B4-BE49-F238E27FC236}">
+                <a16:creationId xmlns:a16="http://schemas.microsoft.com/office/drawing/2014/main" id="{27FC6D2D-F10F-B106-3C23-5AEBE11DFAC5}"/>
+              </a:ext>
+            </a:extLst>
+          </p:cNvPr>
+          <p:cNvSpPr/>
+          <p:nvPr/>
+        </p:nvSpPr>
+        <p:spPr>
+          <a:xfrm>
+            <a:off x="14698501" y="6542673"/>
+            <a:ext cx="1819398" cy="877223"/>
+          </a:xfrm>
+          <a:prstGeom prst="rect">
+            <a:avLst/>
+          </a:prstGeom>
+          <a:solidFill>
+            <a:schemeClr val="bg1"/>
+          </a:solidFill>
+          <a:ln w="38100">
+            <a:solidFill>
+              <a:schemeClr val="tx1"/>
+            </a:solidFill>
+          </a:ln>
+        </p:spPr>
+        <p:style>
+          <a:lnRef idx="2">
+            <a:schemeClr val="accent1">
+              <a:shade val="50000"/>
+            </a:schemeClr>
+          </a:lnRef>
+          <a:fillRef idx="1">
+            <a:schemeClr val="accent1"/>
+          </a:fillRef>
+          <a:effectRef idx="0">
+            <a:schemeClr val="accent1"/>
+          </a:effectRef>
+          <a:fontRef idx="minor">
+            <a:schemeClr val="lt1"/>
+          </a:fontRef>
+        </p:style>
+        <p:txBody>
+          <a:bodyPr rtlCol="0" anchor="ctr"/>
+          <a:lstStyle/>
+          <a:p>
+            <a:pPr algn="ctr"/>
+            <a:r>
+              <a:rPr lang="en-US" sz="2400" b="1" i="1" dirty="0">
+                <a:solidFill>
+                  <a:schemeClr val="tx1"/>
+                </a:solidFill>
+                <a:latin typeface="Arial" panose="020B0604020202020204" pitchFamily="34" charset="0"/>
+                <a:cs typeface="Arial" panose="020B0604020202020204" pitchFamily="34" charset="0"/>
+              </a:rPr>
+              <a:t>N</a:t>
+            </a:r>
+            <a:r>
+              <a:rPr lang="en-US" sz="2400" b="1" baseline="-25000" dirty="0">
+                <a:solidFill>
+                  <a:schemeClr val="tx1"/>
+                </a:solidFill>
+                <a:latin typeface="Arial" panose="020B0604020202020204" pitchFamily="34" charset="0"/>
+                <a:cs typeface="Arial" panose="020B0604020202020204" pitchFamily="34" charset="0"/>
+              </a:rPr>
+              <a:t>mass</a:t>
+            </a:r>
+            <a:endParaRPr lang="en-US" sz="2400" b="1" i="1" dirty="0">
+              <a:solidFill>
+                <a:schemeClr val="tx1"/>
+              </a:solidFill>
+              <a:latin typeface="Arial" panose="020B0604020202020204" pitchFamily="34" charset="0"/>
+              <a:cs typeface="Arial" panose="020B0604020202020204" pitchFamily="34" charset="0"/>
+            </a:endParaRPr>
+          </a:p>
+        </p:txBody>
+      </p:sp>
+      <p:sp>
+        <p:nvSpPr>
+          <p:cNvPr id="24" name="Rectangle 23">
+            <a:extLst>
+              <a:ext uri="{FF2B5EF4-FFF2-40B4-BE49-F238E27FC236}">
+                <a16:creationId xmlns:a16="http://schemas.microsoft.com/office/drawing/2014/main" id="{B27ADCE2-63D0-A5FF-CAAC-360272DBA0BD}"/>
+              </a:ext>
+            </a:extLst>
+          </p:cNvPr>
+          <p:cNvSpPr/>
+          <p:nvPr/>
+        </p:nvSpPr>
+        <p:spPr>
+          <a:xfrm>
+            <a:off x="12283811" y="7570805"/>
+            <a:ext cx="1819398" cy="877223"/>
+          </a:xfrm>
+          <a:prstGeom prst="rect">
+            <a:avLst/>
+          </a:prstGeom>
+          <a:solidFill>
+            <a:schemeClr val="bg1"/>
+          </a:solidFill>
+          <a:ln w="38100">
+            <a:solidFill>
+              <a:schemeClr val="tx1"/>
+            </a:solidFill>
+          </a:ln>
+        </p:spPr>
+        <p:style>
+          <a:lnRef idx="2">
+            <a:schemeClr val="accent1">
+              <a:shade val="50000"/>
+            </a:schemeClr>
+          </a:lnRef>
+          <a:fillRef idx="1">
+            <a:schemeClr val="accent1"/>
+          </a:fillRef>
+          <a:effectRef idx="0">
+            <a:schemeClr val="accent1"/>
+          </a:effectRef>
+          <a:fontRef idx="minor">
+            <a:schemeClr val="lt1"/>
+          </a:fontRef>
+        </p:style>
+        <p:txBody>
+          <a:bodyPr rtlCol="0" anchor="ctr"/>
+          <a:lstStyle/>
+          <a:p>
+            <a:pPr algn="ctr"/>
+            <a:r>
+              <a:rPr lang="en-US" sz="2400" b="1" i="1" dirty="0">
+                <a:solidFill>
+                  <a:schemeClr val="tx1"/>
+                </a:solidFill>
+                <a:latin typeface="Arial" panose="020B0604020202020204" pitchFamily="34" charset="0"/>
+                <a:cs typeface="Arial" panose="020B0604020202020204" pitchFamily="34" charset="0"/>
+              </a:rPr>
+              <a:t>C</a:t>
+            </a:r>
+            <a:r>
+              <a:rPr lang="en-US" sz="2400" b="1" baseline="-25000" dirty="0">
+                <a:solidFill>
+                  <a:schemeClr val="tx1"/>
+                </a:solidFill>
+                <a:latin typeface="Arial" panose="020B0604020202020204" pitchFamily="34" charset="0"/>
+                <a:cs typeface="Arial" panose="020B0604020202020204" pitchFamily="34" charset="0"/>
+              </a:rPr>
+              <a:t>i</a:t>
+            </a:r>
+            <a:r>
+              <a:rPr lang="en-US" sz="2400" b="1" i="1" dirty="0">
+                <a:solidFill>
+                  <a:schemeClr val="tx1"/>
+                </a:solidFill>
+                <a:latin typeface="Arial" panose="020B0604020202020204" pitchFamily="34" charset="0"/>
+                <a:cs typeface="Arial" panose="020B0604020202020204" pitchFamily="34" charset="0"/>
+              </a:rPr>
+              <a:t>:C</a:t>
+            </a:r>
+            <a:r>
+              <a:rPr lang="en-US" sz="2400" b="1" baseline="-25000" dirty="0">
+                <a:solidFill>
+                  <a:schemeClr val="tx1"/>
+                </a:solidFill>
+                <a:latin typeface="Arial" panose="020B0604020202020204" pitchFamily="34" charset="0"/>
+                <a:cs typeface="Arial" panose="020B0604020202020204" pitchFamily="34" charset="0"/>
+              </a:rPr>
+              <a:t>a</a:t>
+            </a:r>
+          </a:p>
+        </p:txBody>
+      </p:sp>
+      <p:cxnSp>
+        <p:nvCxnSpPr>
+          <p:cNvPr id="53" name="Elbow Connector 52">
+            <a:extLst>
+              <a:ext uri="{FF2B5EF4-FFF2-40B4-BE49-F238E27FC236}">
+                <a16:creationId xmlns:a16="http://schemas.microsoft.com/office/drawing/2014/main" id="{94EF1EEE-0B30-C75D-DC46-54C3B91F6064}"/>
+              </a:ext>
+            </a:extLst>
+          </p:cNvPr>
+          <p:cNvCxnSpPr>
+            <a:cxnSpLocks/>
+          </p:cNvCxnSpPr>
+          <p:nvPr/>
+        </p:nvCxnSpPr>
+        <p:spPr>
+          <a:xfrm flipV="1">
+            <a:off x="8054783" y="6542673"/>
+            <a:ext cx="7049147" cy="2539909"/>
+          </a:xfrm>
+          <a:prstGeom prst="bentConnector4">
+            <a:avLst>
+              <a:gd name="adj1" fmla="val -27607"/>
+              <a:gd name="adj2" fmla="val 151884"/>
+            </a:avLst>
+          </a:prstGeom>
+          <a:ln w="43307">
+            <a:solidFill>
+              <a:schemeClr val="accent1">
+                <a:lumMod val="75000"/>
+                <a:alpha val="50000"/>
+              </a:schemeClr>
+            </a:solidFill>
+            <a:tailEnd type="triangle"/>
+          </a:ln>
+        </p:spPr>
+        <p:style>
+          <a:lnRef idx="1">
+            <a:schemeClr val="accent1"/>
+          </a:lnRef>
+          <a:fillRef idx="0">
+            <a:schemeClr val="accent1"/>
+          </a:fillRef>
+          <a:effectRef idx="0">
+            <a:schemeClr val="accent1"/>
+          </a:effectRef>
+          <a:fontRef idx="minor">
+            <a:schemeClr val="tx1"/>
+          </a:fontRef>
+        </p:style>
+      </p:cxnSp>
+      <p:sp>
+        <p:nvSpPr>
+          <p:cNvPr id="27" name="Rectangle 26">
+            <a:extLst>
+              <a:ext uri="{FF2B5EF4-FFF2-40B4-BE49-F238E27FC236}">
+                <a16:creationId xmlns:a16="http://schemas.microsoft.com/office/drawing/2014/main" id="{66815A72-A478-F607-8624-6D6512D0A23A}"/>
+              </a:ext>
+            </a:extLst>
+          </p:cNvPr>
+          <p:cNvSpPr/>
+          <p:nvPr/>
+        </p:nvSpPr>
+        <p:spPr>
+          <a:xfrm>
+            <a:off x="7096001" y="8654649"/>
+            <a:ext cx="2011416" cy="877223"/>
+          </a:xfrm>
+          <a:prstGeom prst="rect">
+            <a:avLst/>
+          </a:prstGeom>
+          <a:solidFill>
+            <a:schemeClr val="bg1"/>
+          </a:solidFill>
+          <a:ln w="38100">
+            <a:solidFill>
+              <a:schemeClr val="tx1"/>
+            </a:solidFill>
+          </a:ln>
+        </p:spPr>
+        <p:style>
+          <a:lnRef idx="2">
+            <a:schemeClr val="accent1">
+              <a:shade val="50000"/>
+            </a:schemeClr>
+          </a:lnRef>
+          <a:fillRef idx="1">
+            <a:schemeClr val="accent1"/>
+          </a:fillRef>
+          <a:effectRef idx="0">
+            <a:schemeClr val="accent1"/>
+          </a:effectRef>
+          <a:fontRef idx="minor">
+            <a:schemeClr val="lt1"/>
+          </a:fontRef>
+        </p:style>
+        <p:txBody>
+          <a:bodyPr rtlCol="0" anchor="ctr"/>
+          <a:lstStyle/>
+          <a:p>
+            <a:pPr algn="ctr"/>
+            <a:r>
+              <a:rPr lang="en-US" sz="2400" b="1" i="1" dirty="0">
+                <a:solidFill>
+                  <a:schemeClr val="tx1"/>
+                </a:solidFill>
+                <a:latin typeface="Arial" panose="020B0604020202020204" pitchFamily="34" charset="0"/>
+                <a:cs typeface="Arial" panose="020B0604020202020204" pitchFamily="34" charset="0"/>
+              </a:rPr>
+              <a:t>N availability</a:t>
+            </a:r>
+            <a:endParaRPr lang="en-US" sz="2400" b="1" dirty="0">
+              <a:solidFill>
+                <a:schemeClr val="tx1"/>
+              </a:solidFill>
+              <a:latin typeface="Arial" panose="020B0604020202020204" pitchFamily="34" charset="0"/>
+              <a:cs typeface="Arial" panose="020B0604020202020204" pitchFamily="34" charset="0"/>
+            </a:endParaRPr>
+          </a:p>
+        </p:txBody>
+      </p:sp>
+      <p:cxnSp>
+        <p:nvCxnSpPr>
+          <p:cNvPr id="60" name="Straight Arrow Connector 59">
+            <a:extLst>
+              <a:ext uri="{FF2B5EF4-FFF2-40B4-BE49-F238E27FC236}">
+                <a16:creationId xmlns:a16="http://schemas.microsoft.com/office/drawing/2014/main" id="{6BFAAFA5-88A5-C2BF-2710-B812444BC53D}"/>
+              </a:ext>
+            </a:extLst>
+          </p:cNvPr>
+          <p:cNvCxnSpPr>
+            <a:stCxn id="17" idx="0"/>
+            <a:endCxn id="20" idx="2"/>
+          </p:cNvCxnSpPr>
+          <p:nvPr/>
+        </p:nvCxnSpPr>
+        <p:spPr>
+          <a:xfrm flipV="1">
+            <a:off x="15608200" y="7419896"/>
+            <a:ext cx="0" cy="1224075"/>
+          </a:xfrm>
+          <a:prstGeom prst="straightConnector1">
+            <a:avLst/>
+          </a:prstGeom>
+          <a:ln w="69342">
+            <a:solidFill>
+              <a:srgbClr val="C00000">
+                <a:alpha val="50000"/>
+              </a:srgbClr>
+            </a:solidFill>
+            <a:tailEnd type="triangle"/>
+          </a:ln>
+        </p:spPr>
+        <p:style>
+          <a:lnRef idx="1">
+            <a:schemeClr val="accent1"/>
+          </a:lnRef>
+          <a:fillRef idx="0">
+            <a:schemeClr val="accent1"/>
+          </a:fillRef>
+          <a:effectRef idx="0">
+            <a:schemeClr val="accent1"/>
+          </a:effectRef>
+          <a:fontRef idx="minor">
+            <a:schemeClr val="tx1"/>
+          </a:fontRef>
+        </p:style>
+      </p:cxnSp>
+      <p:cxnSp>
+        <p:nvCxnSpPr>
+          <p:cNvPr id="62" name="Elbow Connector 61">
+            <a:extLst>
+              <a:ext uri="{FF2B5EF4-FFF2-40B4-BE49-F238E27FC236}">
+                <a16:creationId xmlns:a16="http://schemas.microsoft.com/office/drawing/2014/main" id="{0E1FF755-E116-CF23-426C-5D929A3B3406}"/>
+              </a:ext>
+            </a:extLst>
+          </p:cNvPr>
+          <p:cNvCxnSpPr>
+            <a:cxnSpLocks/>
+          </p:cNvCxnSpPr>
+          <p:nvPr/>
+        </p:nvCxnSpPr>
+        <p:spPr>
+          <a:xfrm rot="16200000" flipH="1">
+            <a:off x="12628250" y="4687756"/>
+            <a:ext cx="241362" cy="3830184"/>
+          </a:xfrm>
+          <a:prstGeom prst="bentConnector2">
+            <a:avLst/>
+          </a:prstGeom>
+          <a:ln w="56515">
+            <a:solidFill>
+              <a:schemeClr val="accent1">
+                <a:lumMod val="75000"/>
+                <a:alpha val="50000"/>
+              </a:schemeClr>
+            </a:solidFill>
+            <a:tailEnd type="triangle"/>
+          </a:ln>
+        </p:spPr>
+        <p:style>
+          <a:lnRef idx="1">
+            <a:schemeClr val="accent1"/>
+          </a:lnRef>
+          <a:fillRef idx="0">
+            <a:schemeClr val="accent1"/>
+          </a:fillRef>
+          <a:effectRef idx="0">
+            <a:schemeClr val="accent1"/>
+          </a:effectRef>
+          <a:fontRef idx="minor">
+            <a:schemeClr val="tx1"/>
+          </a:fontRef>
+        </p:style>
+      </p:cxnSp>
+      <p:sp>
+        <p:nvSpPr>
+          <p:cNvPr id="63" name="Rectangle 62">
+            <a:extLst>
+              <a:ext uri="{FF2B5EF4-FFF2-40B4-BE49-F238E27FC236}">
+                <a16:creationId xmlns:a16="http://schemas.microsoft.com/office/drawing/2014/main" id="{A947E591-BFFA-7599-D68F-6084C1444072}"/>
+              </a:ext>
+            </a:extLst>
+          </p:cNvPr>
+          <p:cNvSpPr/>
+          <p:nvPr/>
+        </p:nvSpPr>
+        <p:spPr>
+          <a:xfrm>
+            <a:off x="6389884" y="5399887"/>
+            <a:ext cx="1819398" cy="877223"/>
+          </a:xfrm>
+          <a:prstGeom prst="rect">
+            <a:avLst/>
+          </a:prstGeom>
+          <a:solidFill>
+            <a:schemeClr val="bg1"/>
+          </a:solidFill>
+          <a:ln w="38100">
+            <a:solidFill>
+              <a:schemeClr val="tx1"/>
+            </a:solidFill>
+          </a:ln>
+        </p:spPr>
+        <p:style>
+          <a:lnRef idx="2">
+            <a:schemeClr val="accent1">
+              <a:shade val="50000"/>
+            </a:schemeClr>
+          </a:lnRef>
+          <a:fillRef idx="1">
+            <a:schemeClr val="accent1"/>
+          </a:fillRef>
+          <a:effectRef idx="0">
+            <a:schemeClr val="accent1"/>
+          </a:effectRef>
+          <a:fontRef idx="minor">
+            <a:schemeClr val="lt1"/>
+          </a:fontRef>
+        </p:style>
+        <p:txBody>
+          <a:bodyPr rtlCol="0" anchor="ctr"/>
+          <a:lstStyle/>
+          <a:p>
+            <a:pPr algn="ctr"/>
+            <a:r>
+              <a:rPr lang="en-US" sz="2400" b="1" i="1" dirty="0">
+                <a:solidFill>
+                  <a:schemeClr val="tx1"/>
+                </a:solidFill>
+                <a:latin typeface="Arial" panose="020B0604020202020204" pitchFamily="34" charset="0"/>
+                <a:cs typeface="Arial" panose="020B0604020202020204" pitchFamily="34" charset="0"/>
+              </a:rPr>
+              <a:t>% clay content</a:t>
+            </a:r>
+            <a:endParaRPr lang="en-US" sz="2400" i="1" dirty="0">
+              <a:solidFill>
+                <a:schemeClr val="tx1"/>
+              </a:solidFill>
+              <a:latin typeface="Arial" panose="020B0604020202020204" pitchFamily="34" charset="0"/>
+              <a:cs typeface="Arial" panose="020B0604020202020204" pitchFamily="34" charset="0"/>
+            </a:endParaRPr>
+          </a:p>
+        </p:txBody>
+      </p:sp>
+      <p:cxnSp>
+        <p:nvCxnSpPr>
+          <p:cNvPr id="129" name="Elbow Connector 128">
+            <a:extLst>
+              <a:ext uri="{FF2B5EF4-FFF2-40B4-BE49-F238E27FC236}">
+                <a16:creationId xmlns:a16="http://schemas.microsoft.com/office/drawing/2014/main" id="{CC42D919-D3D4-7A00-7527-A8EF0790A129}"/>
+              </a:ext>
+            </a:extLst>
+          </p:cNvPr>
+          <p:cNvCxnSpPr>
+            <a:cxnSpLocks/>
+            <a:stCxn id="63" idx="0"/>
+          </p:cNvCxnSpPr>
+          <p:nvPr/>
+        </p:nvCxnSpPr>
+        <p:spPr>
+          <a:xfrm rot="16200000" flipH="1">
+            <a:off x="10758429" y="1941041"/>
+            <a:ext cx="1128704" cy="8046396"/>
+          </a:xfrm>
+          <a:prstGeom prst="bentConnector4">
+            <a:avLst>
+              <a:gd name="adj1" fmla="val -39911"/>
+              <a:gd name="adj2" fmla="val 99940"/>
+            </a:avLst>
+          </a:prstGeom>
+          <a:ln w="30734">
+            <a:solidFill>
+              <a:schemeClr val="accent1">
+                <a:lumMod val="75000"/>
+                <a:alpha val="50000"/>
+              </a:schemeClr>
+            </a:solidFill>
+            <a:tailEnd type="triangle"/>
+          </a:ln>
+        </p:spPr>
+        <p:style>
+          <a:lnRef idx="1">
+            <a:schemeClr val="accent1"/>
+          </a:lnRef>
+          <a:fillRef idx="0">
+            <a:schemeClr val="accent1"/>
+          </a:fillRef>
+          <a:effectRef idx="0">
+            <a:schemeClr val="accent1"/>
+          </a:effectRef>
+          <a:fontRef idx="minor">
+            <a:schemeClr val="tx1"/>
+          </a:fontRef>
+        </p:style>
+      </p:cxnSp>
+      <p:cxnSp>
+        <p:nvCxnSpPr>
+          <p:cNvPr id="140" name="Elbow Connector 139">
+            <a:extLst>
+              <a:ext uri="{FF2B5EF4-FFF2-40B4-BE49-F238E27FC236}">
+                <a16:creationId xmlns:a16="http://schemas.microsoft.com/office/drawing/2014/main" id="{3A558BCD-D36E-ACDE-13E4-D1938A2E2DCE}"/>
+              </a:ext>
+            </a:extLst>
+          </p:cNvPr>
+          <p:cNvCxnSpPr>
+            <a:cxnSpLocks/>
+          </p:cNvCxnSpPr>
+          <p:nvPr/>
+        </p:nvCxnSpPr>
+        <p:spPr>
+          <a:xfrm flipV="1">
+            <a:off x="10849673" y="9521194"/>
+            <a:ext cx="4234088" cy="455414"/>
+          </a:xfrm>
+          <a:prstGeom prst="bentConnector2">
+            <a:avLst/>
+          </a:prstGeom>
+          <a:ln w="82550">
+            <a:solidFill>
+              <a:schemeClr val="accent1">
+                <a:lumMod val="75000"/>
+                <a:alpha val="50000"/>
+              </a:schemeClr>
+            </a:solidFill>
+            <a:tailEnd type="triangle"/>
+          </a:ln>
+        </p:spPr>
+        <p:style>
+          <a:lnRef idx="1">
+            <a:schemeClr val="accent1"/>
+          </a:lnRef>
+          <a:fillRef idx="0">
+            <a:schemeClr val="accent1"/>
+          </a:fillRef>
+          <a:effectRef idx="0">
+            <a:schemeClr val="accent1"/>
+          </a:effectRef>
+          <a:fontRef idx="minor">
+            <a:schemeClr val="tx1"/>
+          </a:fontRef>
+        </p:style>
+      </p:cxnSp>
+      <p:cxnSp>
+        <p:nvCxnSpPr>
+          <p:cNvPr id="142" name="Elbow Connector 141">
+            <a:extLst>
+              <a:ext uri="{FF2B5EF4-FFF2-40B4-BE49-F238E27FC236}">
+                <a16:creationId xmlns:a16="http://schemas.microsoft.com/office/drawing/2014/main" id="{43D581EE-7756-8EB7-2A0C-C9DA7CF9127C}"/>
+              </a:ext>
+            </a:extLst>
+          </p:cNvPr>
+          <p:cNvCxnSpPr>
+            <a:cxnSpLocks/>
+          </p:cNvCxnSpPr>
+          <p:nvPr/>
+        </p:nvCxnSpPr>
+        <p:spPr>
+          <a:xfrm flipV="1">
+            <a:off x="11374112" y="8481191"/>
+            <a:ext cx="1315128" cy="1165957"/>
+          </a:xfrm>
+          <a:prstGeom prst="bentConnector3">
+            <a:avLst>
+              <a:gd name="adj1" fmla="val 100102"/>
+            </a:avLst>
+          </a:prstGeom>
+          <a:ln w="156591">
+            <a:solidFill>
+              <a:schemeClr val="accent1">
+                <a:lumMod val="75000"/>
+                <a:alpha val="50000"/>
+              </a:schemeClr>
+            </a:solidFill>
+            <a:tailEnd type="triangle"/>
+          </a:ln>
+        </p:spPr>
+        <p:style>
+          <a:lnRef idx="1">
+            <a:schemeClr val="accent1"/>
+          </a:lnRef>
+          <a:fillRef idx="0">
+            <a:schemeClr val="accent1"/>
+          </a:fillRef>
+          <a:effectRef idx="0">
+            <a:schemeClr val="accent1"/>
+          </a:effectRef>
+          <a:fontRef idx="minor">
+            <a:schemeClr val="tx1"/>
+          </a:fontRef>
+        </p:style>
+      </p:cxnSp>
+      <p:sp>
+        <p:nvSpPr>
+          <p:cNvPr id="12" name="Rectangle 11">
+            <a:extLst>
+              <a:ext uri="{FF2B5EF4-FFF2-40B4-BE49-F238E27FC236}">
+                <a16:creationId xmlns:a16="http://schemas.microsoft.com/office/drawing/2014/main" id="{80931944-38F4-9378-6003-83D1DE15C050}"/>
+              </a:ext>
+            </a:extLst>
+          </p:cNvPr>
+          <p:cNvSpPr/>
+          <p:nvPr/>
+        </p:nvSpPr>
+        <p:spPr>
+          <a:xfrm>
+            <a:off x="9554714" y="9537996"/>
+            <a:ext cx="1819398" cy="877223"/>
+          </a:xfrm>
+          <a:prstGeom prst="rect">
+            <a:avLst/>
+          </a:prstGeom>
+          <a:solidFill>
+            <a:schemeClr val="bg1"/>
+          </a:solidFill>
+          <a:ln w="38100">
+            <a:solidFill>
+              <a:schemeClr val="tx1"/>
+            </a:solidFill>
+          </a:ln>
+        </p:spPr>
+        <p:style>
+          <a:lnRef idx="2">
+            <a:schemeClr val="accent1">
+              <a:shade val="50000"/>
+            </a:schemeClr>
+          </a:lnRef>
+          <a:fillRef idx="1">
+            <a:schemeClr val="accent1"/>
+          </a:fillRef>
+          <a:effectRef idx="0">
+            <a:schemeClr val="accent1"/>
+          </a:effectRef>
+          <a:fontRef idx="minor">
+            <a:schemeClr val="lt1"/>
+          </a:fontRef>
+        </p:style>
+        <p:txBody>
+          <a:bodyPr rtlCol="0" anchor="ctr"/>
+          <a:lstStyle/>
+          <a:p>
+            <a:pPr algn="ctr"/>
+            <a:r>
+              <a:rPr lang="en-US" sz="2400" b="1" dirty="0">
+                <a:solidFill>
+                  <a:schemeClr val="tx1"/>
+                </a:solidFill>
+                <a:latin typeface="Arial" panose="020B0604020202020204" pitchFamily="34" charset="0"/>
+                <a:cs typeface="Arial" panose="020B0604020202020204" pitchFamily="34" charset="0"/>
+              </a:rPr>
+              <a:t>C</a:t>
+            </a:r>
+            <a:r>
+              <a:rPr lang="en-US" sz="2400" b="1" baseline="-25000" dirty="0">
+                <a:solidFill>
+                  <a:schemeClr val="tx1"/>
+                </a:solidFill>
+                <a:latin typeface="Arial" panose="020B0604020202020204" pitchFamily="34" charset="0"/>
+                <a:cs typeface="Arial" panose="020B0604020202020204" pitchFamily="34" charset="0"/>
+              </a:rPr>
+              <a:t>3</a:t>
+            </a:r>
+            <a:r>
+              <a:rPr lang="en-US" sz="2400" b="1" dirty="0">
+                <a:solidFill>
+                  <a:schemeClr val="tx1"/>
+                </a:solidFill>
+                <a:latin typeface="Arial" panose="020B0604020202020204" pitchFamily="34" charset="0"/>
+                <a:cs typeface="Arial" panose="020B0604020202020204" pitchFamily="34" charset="0"/>
+              </a:rPr>
+              <a:t> photo.</a:t>
+            </a:r>
+            <a:endParaRPr lang="en-US" sz="2400" b="1" dirty="0">
+              <a:solidFill>
+                <a:srgbClr val="C00000"/>
+              </a:solidFill>
+              <a:latin typeface="Arial" panose="020B0604020202020204" pitchFamily="34" charset="0"/>
+              <a:cs typeface="Arial" panose="020B0604020202020204" pitchFamily="34" charset="0"/>
+            </a:endParaRPr>
+          </a:p>
+        </p:txBody>
+      </p:sp>
+      <p:cxnSp>
+        <p:nvCxnSpPr>
+          <p:cNvPr id="148" name="Elbow Connector 147">
+            <a:extLst>
+              <a:ext uri="{FF2B5EF4-FFF2-40B4-BE49-F238E27FC236}">
+                <a16:creationId xmlns:a16="http://schemas.microsoft.com/office/drawing/2014/main" id="{EAE41966-968B-FD1C-038F-94171340CB2C}"/>
+              </a:ext>
+            </a:extLst>
+          </p:cNvPr>
+          <p:cNvCxnSpPr>
+            <a:cxnSpLocks/>
+          </p:cNvCxnSpPr>
+          <p:nvPr/>
+        </p:nvCxnSpPr>
+        <p:spPr>
+          <a:xfrm>
+            <a:off x="8720418" y="6900721"/>
+            <a:ext cx="4231040" cy="670084"/>
+          </a:xfrm>
+          <a:prstGeom prst="bentConnector3">
+            <a:avLst>
+              <a:gd name="adj1" fmla="val 100057"/>
+            </a:avLst>
+          </a:prstGeom>
+          <a:ln w="14224">
+            <a:solidFill>
+              <a:srgbClr val="C00000">
+                <a:alpha val="50000"/>
+              </a:srgbClr>
+            </a:solidFill>
+            <a:tailEnd type="triangle"/>
+          </a:ln>
+        </p:spPr>
+        <p:style>
+          <a:lnRef idx="1">
+            <a:schemeClr val="accent1"/>
+          </a:lnRef>
+          <a:fillRef idx="0">
+            <a:schemeClr val="accent1"/>
+          </a:fillRef>
+          <a:effectRef idx="0">
+            <a:schemeClr val="accent1"/>
+          </a:effectRef>
+          <a:fontRef idx="minor">
+            <a:schemeClr val="tx1"/>
+          </a:fontRef>
+        </p:style>
+      </p:cxnSp>
+      <p:sp>
+        <p:nvSpPr>
+          <p:cNvPr id="29" name="Rectangle 28">
+            <a:extLst>
+              <a:ext uri="{FF2B5EF4-FFF2-40B4-BE49-F238E27FC236}">
+                <a16:creationId xmlns:a16="http://schemas.microsoft.com/office/drawing/2014/main" id="{32327FC8-D9F4-D197-4681-DC89C3E206D2}"/>
+              </a:ext>
+            </a:extLst>
+          </p:cNvPr>
+          <p:cNvSpPr/>
+          <p:nvPr/>
+        </p:nvSpPr>
+        <p:spPr>
+          <a:xfrm>
+            <a:off x="7192010" y="6541690"/>
+            <a:ext cx="1819398" cy="877223"/>
+          </a:xfrm>
+          <a:prstGeom prst="rect">
+            <a:avLst/>
+          </a:prstGeom>
+          <a:solidFill>
+            <a:schemeClr val="bg1"/>
+          </a:solidFill>
+          <a:ln w="38100">
+            <a:solidFill>
+              <a:schemeClr val="tx1"/>
+            </a:solidFill>
+          </a:ln>
+        </p:spPr>
+        <p:style>
+          <a:lnRef idx="2">
+            <a:schemeClr val="accent1">
+              <a:shade val="50000"/>
+            </a:schemeClr>
+          </a:lnRef>
+          <a:fillRef idx="1">
+            <a:schemeClr val="accent1"/>
+          </a:fillRef>
+          <a:effectRef idx="0">
+            <a:schemeClr val="accent1"/>
+          </a:effectRef>
+          <a:fontRef idx="minor">
+            <a:schemeClr val="lt1"/>
+          </a:fontRef>
+        </p:style>
+        <p:txBody>
+          <a:bodyPr rtlCol="0" anchor="ctr"/>
+          <a:lstStyle/>
+          <a:p>
+            <a:pPr algn="ctr"/>
+            <a:r>
+              <a:rPr lang="en-US" sz="2400" b="1" i="1" dirty="0">
+                <a:solidFill>
+                  <a:schemeClr val="tx1"/>
+                </a:solidFill>
+                <a:latin typeface="Arial" panose="020B0604020202020204" pitchFamily="34" charset="0"/>
+                <a:cs typeface="Arial" panose="020B0604020202020204" pitchFamily="34" charset="0"/>
+              </a:rPr>
+              <a:t>Soil moisture</a:t>
+            </a:r>
+            <a:endParaRPr lang="en-US" sz="2400" b="1" dirty="0">
+              <a:solidFill>
+                <a:schemeClr val="tx1"/>
+              </a:solidFill>
+              <a:latin typeface="Arial" panose="020B0604020202020204" pitchFamily="34" charset="0"/>
+              <a:cs typeface="Arial" panose="020B0604020202020204" pitchFamily="34" charset="0"/>
+            </a:endParaRPr>
+          </a:p>
+        </p:txBody>
+      </p:sp>
+      <p:cxnSp>
+        <p:nvCxnSpPr>
+          <p:cNvPr id="150" name="Straight Arrow Connector 149">
+            <a:extLst>
+              <a:ext uri="{FF2B5EF4-FFF2-40B4-BE49-F238E27FC236}">
+                <a16:creationId xmlns:a16="http://schemas.microsoft.com/office/drawing/2014/main" id="{69A5FC4C-C100-2E69-CAD6-49962A2ADF0B}"/>
+              </a:ext>
+            </a:extLst>
+          </p:cNvPr>
+          <p:cNvCxnSpPr/>
+          <p:nvPr/>
+        </p:nvCxnSpPr>
+        <p:spPr>
+          <a:xfrm>
+            <a:off x="7550513" y="7429590"/>
+            <a:ext cx="0" cy="1225296"/>
+          </a:xfrm>
+          <a:prstGeom prst="straightConnector1">
+            <a:avLst/>
+          </a:prstGeom>
+          <a:ln w="33274">
+            <a:solidFill>
+              <a:srgbClr val="C00000">
+                <a:alpha val="50000"/>
+              </a:srgbClr>
+            </a:solidFill>
+            <a:tailEnd type="triangle"/>
+          </a:ln>
+        </p:spPr>
+        <p:style>
+          <a:lnRef idx="1">
+            <a:schemeClr val="accent1"/>
+          </a:lnRef>
+          <a:fillRef idx="0">
+            <a:schemeClr val="accent1"/>
+          </a:fillRef>
+          <a:effectRef idx="0">
+            <a:schemeClr val="accent1"/>
+          </a:effectRef>
+          <a:fontRef idx="minor">
+            <a:schemeClr val="tx1"/>
+          </a:fontRef>
+        </p:style>
+      </p:cxnSp>
+      <p:cxnSp>
+        <p:nvCxnSpPr>
+          <p:cNvPr id="152" name="Elbow Connector 151">
+            <a:extLst>
+              <a:ext uri="{FF2B5EF4-FFF2-40B4-BE49-F238E27FC236}">
+                <a16:creationId xmlns:a16="http://schemas.microsoft.com/office/drawing/2014/main" id="{81F7E556-E97A-091B-90E4-5F8880D9B5EE}"/>
+              </a:ext>
+            </a:extLst>
+          </p:cNvPr>
+          <p:cNvCxnSpPr/>
+          <p:nvPr/>
+        </p:nvCxnSpPr>
+        <p:spPr>
+          <a:xfrm rot="16200000" flipH="1">
+            <a:off x="6114961" y="6905849"/>
+            <a:ext cx="2366861" cy="1109382"/>
+          </a:xfrm>
+          <a:prstGeom prst="bentConnector3">
+            <a:avLst>
+              <a:gd name="adj1" fmla="val 72442"/>
+            </a:avLst>
+          </a:prstGeom>
+          <a:ln w="22098">
+            <a:solidFill>
+              <a:srgbClr val="C00000">
+                <a:alpha val="50000"/>
+              </a:srgbClr>
+            </a:solidFill>
+            <a:tailEnd type="triangle"/>
+          </a:ln>
+        </p:spPr>
+        <p:style>
+          <a:lnRef idx="1">
+            <a:schemeClr val="accent1"/>
+          </a:lnRef>
+          <a:fillRef idx="0">
+            <a:schemeClr val="accent1"/>
+          </a:fillRef>
+          <a:effectRef idx="0">
+            <a:schemeClr val="accent1"/>
+          </a:effectRef>
+          <a:fontRef idx="minor">
+            <a:schemeClr val="tx1"/>
+          </a:fontRef>
+        </p:style>
+      </p:cxnSp>
+      <p:cxnSp>
+        <p:nvCxnSpPr>
+          <p:cNvPr id="155" name="Elbow Connector 154">
+            <a:extLst>
+              <a:ext uri="{FF2B5EF4-FFF2-40B4-BE49-F238E27FC236}">
+                <a16:creationId xmlns:a16="http://schemas.microsoft.com/office/drawing/2014/main" id="{3E57EC6F-4D45-9806-2316-EDCAEBCACB1C}"/>
+              </a:ext>
+            </a:extLst>
+          </p:cNvPr>
+          <p:cNvCxnSpPr>
+            <a:stCxn id="63" idx="3"/>
+          </p:cNvCxnSpPr>
+          <p:nvPr/>
+        </p:nvCxnSpPr>
+        <p:spPr>
+          <a:xfrm>
+            <a:off x="8209282" y="5838499"/>
+            <a:ext cx="511136" cy="690092"/>
+          </a:xfrm>
+          <a:prstGeom prst="bentConnector2">
+            <a:avLst/>
+          </a:prstGeom>
+          <a:ln w="13462">
+            <a:solidFill>
+              <a:schemeClr val="accent1">
+                <a:lumMod val="75000"/>
+                <a:alpha val="50000"/>
+              </a:schemeClr>
+            </a:solidFill>
+            <a:tailEnd type="triangle"/>
+          </a:ln>
+        </p:spPr>
+        <p:style>
+          <a:lnRef idx="1">
+            <a:schemeClr val="accent1"/>
+          </a:lnRef>
+          <a:fillRef idx="0">
+            <a:schemeClr val="accent1"/>
+          </a:fillRef>
+          <a:effectRef idx="0">
+            <a:schemeClr val="accent1"/>
+          </a:effectRef>
+          <a:fontRef idx="minor">
+            <a:schemeClr val="tx1"/>
+          </a:fontRef>
+        </p:style>
+      </p:cxnSp>
+      <p:cxnSp>
+        <p:nvCxnSpPr>
+          <p:cNvPr id="157" name="Elbow Connector 156">
+            <a:extLst>
+              <a:ext uri="{FF2B5EF4-FFF2-40B4-BE49-F238E27FC236}">
+                <a16:creationId xmlns:a16="http://schemas.microsoft.com/office/drawing/2014/main" id="{B4DCE2E5-AC18-51CD-AB8B-9196BF3C8A1D}"/>
+              </a:ext>
+            </a:extLst>
+          </p:cNvPr>
+          <p:cNvCxnSpPr>
+            <a:cxnSpLocks/>
+          </p:cNvCxnSpPr>
+          <p:nvPr/>
+        </p:nvCxnSpPr>
+        <p:spPr>
+          <a:xfrm rot="10800000" flipV="1">
+            <a:off x="8991908" y="6472671"/>
+            <a:ext cx="3199099" cy="650028"/>
+          </a:xfrm>
+          <a:prstGeom prst="bentConnector3">
+            <a:avLst>
+              <a:gd name="adj1" fmla="val 2081"/>
+            </a:avLst>
+          </a:prstGeom>
+          <a:ln w="136906">
+            <a:solidFill>
+              <a:schemeClr val="accent1">
+                <a:alpha val="50000"/>
+              </a:schemeClr>
+            </a:solidFill>
+            <a:tailEnd type="triangle"/>
+          </a:ln>
+        </p:spPr>
+        <p:style>
+          <a:lnRef idx="1">
+            <a:schemeClr val="accent1"/>
+          </a:lnRef>
+          <a:fillRef idx="0">
+            <a:schemeClr val="accent1"/>
+          </a:fillRef>
+          <a:effectRef idx="0">
+            <a:schemeClr val="accent1"/>
+          </a:effectRef>
+          <a:fontRef idx="minor">
+            <a:schemeClr val="tx1"/>
+          </a:fontRef>
+        </p:style>
+      </p:cxnSp>
+      <p:sp>
+        <p:nvSpPr>
+          <p:cNvPr id="22" name="Rectangle 21">
+            <a:extLst>
+              <a:ext uri="{FF2B5EF4-FFF2-40B4-BE49-F238E27FC236}">
+                <a16:creationId xmlns:a16="http://schemas.microsoft.com/office/drawing/2014/main" id="{A80C041E-0131-071A-4799-F8F798234F95}"/>
+              </a:ext>
+            </a:extLst>
+          </p:cNvPr>
+          <p:cNvSpPr/>
+          <p:nvPr/>
+        </p:nvSpPr>
+        <p:spPr>
+          <a:xfrm>
+            <a:off x="11785577" y="5604944"/>
+            <a:ext cx="1819398" cy="877223"/>
+          </a:xfrm>
+          <a:prstGeom prst="rect">
+            <a:avLst/>
+          </a:prstGeom>
+          <a:solidFill>
+            <a:schemeClr val="bg1"/>
+          </a:solidFill>
+          <a:ln w="38100">
+            <a:solidFill>
+              <a:schemeClr val="tx1"/>
+            </a:solidFill>
+          </a:ln>
+        </p:spPr>
+        <p:style>
+          <a:lnRef idx="2">
+            <a:schemeClr val="accent1">
+              <a:shade val="50000"/>
+            </a:schemeClr>
+          </a:lnRef>
+          <a:fillRef idx="1">
+            <a:schemeClr val="accent1"/>
+          </a:fillRef>
+          <a:effectRef idx="0">
+            <a:schemeClr val="accent1"/>
+          </a:effectRef>
+          <a:fontRef idx="minor">
+            <a:schemeClr val="lt1"/>
+          </a:fontRef>
+        </p:style>
+        <p:txBody>
+          <a:bodyPr rtlCol="0" anchor="ctr"/>
+          <a:lstStyle/>
+          <a:p>
+            <a:pPr algn="ctr"/>
+            <a:r>
+              <a:rPr lang="en-US" sz="2400" b="1" i="1" dirty="0">
+                <a:solidFill>
+                  <a:schemeClr val="tx1"/>
+                </a:solidFill>
+                <a:latin typeface="Arial" panose="020B0604020202020204" pitchFamily="34" charset="0"/>
+                <a:cs typeface="Arial" panose="020B0604020202020204" pitchFamily="34" charset="0"/>
+              </a:rPr>
+              <a:t>VPD</a:t>
+            </a:r>
+            <a:endParaRPr lang="en-US" sz="2400" b="1" dirty="0">
+              <a:solidFill>
+                <a:schemeClr val="tx1"/>
+              </a:solidFill>
+              <a:latin typeface="Arial" panose="020B0604020202020204" pitchFamily="34" charset="0"/>
+              <a:cs typeface="Arial" panose="020B0604020202020204" pitchFamily="34" charset="0"/>
+            </a:endParaRPr>
+          </a:p>
+        </p:txBody>
+      </p:sp>
+    </p:spTree>
+    <p:extLst>
+      <p:ext uri="{BB962C8B-B14F-4D97-AF65-F5344CB8AC3E}">
+        <p14:creationId xmlns:p14="http://schemas.microsoft.com/office/powerpoint/2010/main" val="1353641297"/>
       </p:ext>
     </p:extLst>
   </p:cSld>

</xml_diff>